<commit_message>
Issue 74: create new icon for spotlight reload Update Issue 74
</commit_message>
<xml_diff>
--- a/doc/Icons.pptx
+++ b/doc/Icons.pptx
@@ -209,7 +209,7 @@
           <a:p>
             <a:fld id="{6699ACB9-486C-4D62-A3A7-AF98E13EFDA3}" type="datetimeFigureOut">
               <a:rPr lang="en-US" smtClean="0"/>
-              <a:t>12/1/2013</a:t>
+              <a:t>12/12/2013</a:t>
             </a:fld>
             <a:endParaRPr lang="en-US"/>
           </a:p>
@@ -659,7 +659,7 @@
             <a:fld id="{1D8BD707-D9CF-40AE-B4C6-C98DA3205C09}" type="datetimeFigureOut">
               <a:rPr lang="en-US" smtClean="0"/>
               <a:pPr/>
-              <a:t>12/1/2013</a:t>
+              <a:t>12/12/2013</a:t>
             </a:fld>
             <a:endParaRPr lang="en-US"/>
           </a:p>
@@ -826,7 +826,7 @@
             <a:fld id="{1D8BD707-D9CF-40AE-B4C6-C98DA3205C09}" type="datetimeFigureOut">
               <a:rPr lang="en-US" smtClean="0"/>
               <a:pPr/>
-              <a:t>12/1/2013</a:t>
+              <a:t>12/12/2013</a:t>
             </a:fld>
             <a:endParaRPr lang="en-US"/>
           </a:p>
@@ -1003,7 +1003,7 @@
             <a:fld id="{1D8BD707-D9CF-40AE-B4C6-C98DA3205C09}" type="datetimeFigureOut">
               <a:rPr lang="en-US" smtClean="0"/>
               <a:pPr/>
-              <a:t>12/1/2013</a:t>
+              <a:t>12/12/2013</a:t>
             </a:fld>
             <a:endParaRPr lang="en-US"/>
           </a:p>
@@ -1170,7 +1170,7 @@
             <a:fld id="{1D8BD707-D9CF-40AE-B4C6-C98DA3205C09}" type="datetimeFigureOut">
               <a:rPr lang="en-US" smtClean="0"/>
               <a:pPr/>
-              <a:t>12/1/2013</a:t>
+              <a:t>12/12/2013</a:t>
             </a:fld>
             <a:endParaRPr lang="en-US"/>
           </a:p>
@@ -1413,7 +1413,7 @@
             <a:fld id="{1D8BD707-D9CF-40AE-B4C6-C98DA3205C09}" type="datetimeFigureOut">
               <a:rPr lang="en-US" smtClean="0"/>
               <a:pPr/>
-              <a:t>12/1/2013</a:t>
+              <a:t>12/12/2013</a:t>
             </a:fld>
             <a:endParaRPr lang="en-US"/>
           </a:p>
@@ -1698,7 +1698,7 @@
             <a:fld id="{1D8BD707-D9CF-40AE-B4C6-C98DA3205C09}" type="datetimeFigureOut">
               <a:rPr lang="en-US" smtClean="0"/>
               <a:pPr/>
-              <a:t>12/1/2013</a:t>
+              <a:t>12/12/2013</a:t>
             </a:fld>
             <a:endParaRPr lang="en-US"/>
           </a:p>
@@ -2117,7 +2117,7 @@
             <a:fld id="{1D8BD707-D9CF-40AE-B4C6-C98DA3205C09}" type="datetimeFigureOut">
               <a:rPr lang="en-US" smtClean="0"/>
               <a:pPr/>
-              <a:t>12/1/2013</a:t>
+              <a:t>12/12/2013</a:t>
             </a:fld>
             <a:endParaRPr lang="en-US"/>
           </a:p>
@@ -2232,7 +2232,7 @@
             <a:fld id="{1D8BD707-D9CF-40AE-B4C6-C98DA3205C09}" type="datetimeFigureOut">
               <a:rPr lang="en-US" smtClean="0"/>
               <a:pPr/>
-              <a:t>12/1/2013</a:t>
+              <a:t>12/12/2013</a:t>
             </a:fld>
             <a:endParaRPr lang="en-US"/>
           </a:p>
@@ -2324,7 +2324,7 @@
             <a:fld id="{1D8BD707-D9CF-40AE-B4C6-C98DA3205C09}" type="datetimeFigureOut">
               <a:rPr lang="en-US" smtClean="0"/>
               <a:pPr/>
-              <a:t>12/1/2013</a:t>
+              <a:t>12/12/2013</a:t>
             </a:fld>
             <a:endParaRPr lang="en-US"/>
           </a:p>
@@ -2598,7 +2598,7 @@
             <a:fld id="{1D8BD707-D9CF-40AE-B4C6-C98DA3205C09}" type="datetimeFigureOut">
               <a:rPr lang="en-US" smtClean="0"/>
               <a:pPr/>
-              <a:t>12/1/2013</a:t>
+              <a:t>12/12/2013</a:t>
             </a:fld>
             <a:endParaRPr lang="en-US"/>
           </a:p>
@@ -2848,7 +2848,7 @@
             <a:fld id="{1D8BD707-D9CF-40AE-B4C6-C98DA3205C09}" type="datetimeFigureOut">
               <a:rPr lang="en-US" smtClean="0"/>
               <a:pPr/>
-              <a:t>12/1/2013</a:t>
+              <a:t>12/12/2013</a:t>
             </a:fld>
             <a:endParaRPr lang="en-US"/>
           </a:p>
@@ -3058,7 +3058,7 @@
             <a:fld id="{1D8BD707-D9CF-40AE-B4C6-C98DA3205C09}" type="datetimeFigureOut">
               <a:rPr lang="en-US" smtClean="0"/>
               <a:pPr/>
-              <a:t>12/1/2013</a:t>
+              <a:t>12/12/2013</a:t>
             </a:fld>
             <a:endParaRPr lang="en-US"/>
           </a:p>
@@ -6073,92 +6073,6 @@
       </p:sp>
       <p:sp>
         <p:nvSpPr>
-          <p:cNvPr id="112" name="Right Brace 111"/>
-          <p:cNvSpPr/>
-          <p:nvPr/>
-        </p:nvSpPr>
-        <p:spPr>
-          <a:xfrm rot="5400000">
-            <a:off x="4647262" y="2710476"/>
-            <a:ext cx="247608" cy="2903855"/>
-          </a:xfrm>
-          <a:prstGeom prst="rightBrace">
-            <a:avLst/>
-          </a:prstGeom>
-        </p:spPr>
-        <p:style>
-          <a:lnRef idx="1">
-            <a:schemeClr val="accent1"/>
-          </a:lnRef>
-          <a:fillRef idx="0">
-            <a:schemeClr val="accent1"/>
-          </a:fillRef>
-          <a:effectRef idx="0">
-            <a:schemeClr val="accent1"/>
-          </a:effectRef>
-          <a:fontRef idx="minor">
-            <a:schemeClr val="tx1"/>
-          </a:fontRef>
-        </p:style>
-        <p:txBody>
-          <a:bodyPr rtlCol="0" anchor="ctr"/>
-          <a:lstStyle/>
-          <a:p>
-            <a:pPr algn="ctr"/>
-            <a:endParaRPr lang="en-SG"/>
-          </a:p>
-        </p:txBody>
-      </p:sp>
-      <p:sp>
-        <p:nvSpPr>
-          <p:cNvPr id="113" name="Rounded Rectangular Callout 112"/>
-          <p:cNvSpPr/>
-          <p:nvPr/>
-        </p:nvSpPr>
-        <p:spPr>
-          <a:xfrm>
-            <a:off x="4338645" y="4466486"/>
-            <a:ext cx="1233404" cy="627246"/>
-          </a:xfrm>
-          <a:prstGeom prst="wedgeRoundRectCallout">
-            <a:avLst>
-              <a:gd name="adj1" fmla="val -16764"/>
-              <a:gd name="adj2" fmla="val -72892"/>
-              <a:gd name="adj3" fmla="val 16667"/>
-            </a:avLst>
-          </a:prstGeom>
-        </p:spPr>
-        <p:style>
-          <a:lnRef idx="2">
-            <a:schemeClr val="accent1">
-              <a:shade val="50000"/>
-            </a:schemeClr>
-          </a:lnRef>
-          <a:fillRef idx="1">
-            <a:schemeClr val="accent1"/>
-          </a:fillRef>
-          <a:effectRef idx="0">
-            <a:schemeClr val="accent1"/>
-          </a:effectRef>
-          <a:fontRef idx="minor">
-            <a:schemeClr val="lt1"/>
-          </a:fontRef>
-        </p:style>
-        <p:txBody>
-          <a:bodyPr rtlCol="0" anchor="ctr"/>
-          <a:lstStyle/>
-          <a:p>
-            <a:pPr algn="ctr"/>
-            <a:r>
-              <a:rPr lang="en-US" sz="1400" dirty="0" smtClean="0"/>
-              <a:t>Feature coming soon!</a:t>
-            </a:r>
-            <a:endParaRPr lang="en-SG" sz="1400" dirty="0"/>
-          </a:p>
-        </p:txBody>
-      </p:sp>
-      <p:sp>
-        <p:nvSpPr>
           <p:cNvPr id="116" name="TextBox 115"/>
           <p:cNvSpPr txBox="1"/>
           <p:nvPr/>
@@ -6948,7 +6862,7 @@
             <a:prstGeom prst="arc">
               <a:avLst>
                 <a:gd name="adj1" fmla="val 372342"/>
-                <a:gd name="adj2" fmla="val 16582742"/>
+                <a:gd name="adj2" fmla="val 14724329"/>
               </a:avLst>
             </a:prstGeom>
             <a:ln w="76200" cap="sq">
@@ -7029,6 +6943,310 @@
           </p:txBody>
         </p:sp>
       </p:grpSp>
+      <p:grpSp>
+        <p:nvGrpSpPr>
+          <p:cNvPr id="14" name="Group 13"/>
+          <p:cNvGrpSpPr/>
+          <p:nvPr/>
+        </p:nvGrpSpPr>
+        <p:grpSpPr>
+          <a:xfrm>
+            <a:off x="2150418" y="3897598"/>
+            <a:ext cx="838200" cy="838200"/>
+            <a:chOff x="2228551" y="4068544"/>
+            <a:chExt cx="838200" cy="838200"/>
+          </a:xfrm>
+        </p:grpSpPr>
+        <p:sp>
+          <p:nvSpPr>
+            <p:cNvPr id="75" name="Rectangle 74"/>
+            <p:cNvSpPr/>
+            <p:nvPr/>
+          </p:nvSpPr>
+          <p:spPr>
+            <a:xfrm>
+              <a:off x="2306684" y="4140217"/>
+              <a:ext cx="587583" cy="541382"/>
+            </a:xfrm>
+            <a:prstGeom prst="rect">
+              <a:avLst/>
+            </a:prstGeom>
+            <a:solidFill>
+              <a:schemeClr val="accent6"/>
+            </a:solidFill>
+            <a:ln>
+              <a:noFill/>
+            </a:ln>
+          </p:spPr>
+          <p:style>
+            <a:lnRef idx="2">
+              <a:schemeClr val="accent1">
+                <a:shade val="50000"/>
+              </a:schemeClr>
+            </a:lnRef>
+            <a:fillRef idx="1">
+              <a:schemeClr val="accent1"/>
+            </a:fillRef>
+            <a:effectRef idx="0">
+              <a:schemeClr val="accent1"/>
+            </a:effectRef>
+            <a:fontRef idx="minor">
+              <a:schemeClr val="lt1"/>
+            </a:fontRef>
+          </p:style>
+          <p:txBody>
+            <a:bodyPr rtlCol="0" anchor="ctr"/>
+            <a:lstStyle/>
+            <a:p>
+              <a:pPr algn="ctr"/>
+              <a:endParaRPr lang="en-US"/>
+            </a:p>
+          </p:txBody>
+        </p:sp>
+        <p:sp>
+          <p:nvSpPr>
+            <p:cNvPr id="84" name="Rectangle 83"/>
+            <p:cNvSpPr/>
+            <p:nvPr/>
+          </p:nvSpPr>
+          <p:spPr>
+            <a:xfrm>
+              <a:off x="2228551" y="4068544"/>
+              <a:ext cx="838200" cy="838200"/>
+            </a:xfrm>
+            <a:prstGeom prst="rect">
+              <a:avLst/>
+            </a:prstGeom>
+            <a:noFill/>
+            <a:ln>
+              <a:noFill/>
+            </a:ln>
+          </p:spPr>
+          <p:style>
+            <a:lnRef idx="2">
+              <a:schemeClr val="accent1">
+                <a:shade val="50000"/>
+              </a:schemeClr>
+            </a:lnRef>
+            <a:fillRef idx="1">
+              <a:schemeClr val="accent1"/>
+            </a:fillRef>
+            <a:effectRef idx="0">
+              <a:schemeClr val="accent1"/>
+            </a:effectRef>
+            <a:fontRef idx="minor">
+              <a:schemeClr val="lt1"/>
+            </a:fontRef>
+          </p:style>
+          <p:txBody>
+            <a:bodyPr rtlCol="0" anchor="ctr"/>
+            <a:lstStyle/>
+            <a:p>
+              <a:pPr algn="ctr"/>
+              <a:endParaRPr lang="en-SG"/>
+            </a:p>
+          </p:txBody>
+        </p:sp>
+        <p:sp>
+          <p:nvSpPr>
+            <p:cNvPr id="91" name="Rectangle 4"/>
+            <p:cNvSpPr/>
+            <p:nvPr/>
+          </p:nvSpPr>
+          <p:spPr>
+            <a:xfrm>
+              <a:off x="2403664" y="4223342"/>
+              <a:ext cx="571012" cy="541382"/>
+            </a:xfrm>
+            <a:custGeom>
+              <a:avLst/>
+              <a:gdLst/>
+              <a:ahLst/>
+              <a:cxnLst/>
+              <a:rect l="l" t="t" r="r" b="b"/>
+              <a:pathLst>
+                <a:path w="571012" h="541382">
+                  <a:moveTo>
+                    <a:pt x="0" y="0"/>
+                  </a:moveTo>
+                  <a:lnTo>
+                    <a:pt x="571012" y="0"/>
+                  </a:lnTo>
+                  <a:lnTo>
+                    <a:pt x="571012" y="541382"/>
+                  </a:lnTo>
+                  <a:lnTo>
+                    <a:pt x="0" y="541382"/>
+                  </a:lnTo>
+                  <a:close/>
+                </a:path>
+              </a:pathLst>
+            </a:custGeom>
+            <a:solidFill>
+              <a:srgbClr val="0070C0">
+                <a:alpha val="67000"/>
+              </a:srgbClr>
+            </a:solidFill>
+            <a:ln>
+              <a:noFill/>
+            </a:ln>
+          </p:spPr>
+          <p:style>
+            <a:lnRef idx="2">
+              <a:schemeClr val="accent1">
+                <a:shade val="50000"/>
+              </a:schemeClr>
+            </a:lnRef>
+            <a:fillRef idx="1">
+              <a:schemeClr val="accent1"/>
+            </a:fillRef>
+            <a:effectRef idx="0">
+              <a:schemeClr val="accent1"/>
+            </a:effectRef>
+            <a:fontRef idx="minor">
+              <a:schemeClr val="lt1"/>
+            </a:fontRef>
+          </p:style>
+          <p:txBody>
+            <a:bodyPr rtlCol="0" anchor="ctr"/>
+            <a:lstStyle/>
+            <a:p>
+              <a:pPr algn="ctr"/>
+              <a:endParaRPr lang="en-US"/>
+            </a:p>
+          </p:txBody>
+        </p:sp>
+        <p:sp>
+          <p:nvSpPr>
+            <p:cNvPr id="88" name="Arc 87"/>
+            <p:cNvSpPr>
+              <a:spLocks noChangeAspect="1"/>
+            </p:cNvSpPr>
+            <p:nvPr/>
+          </p:nvSpPr>
+          <p:spPr>
+            <a:xfrm>
+              <a:off x="2509371" y="4316698"/>
+              <a:ext cx="269264" cy="269264"/>
+            </a:xfrm>
+            <a:prstGeom prst="arc">
+              <a:avLst>
+                <a:gd name="adj1" fmla="val 372342"/>
+                <a:gd name="adj2" fmla="val 14560863"/>
+              </a:avLst>
+            </a:prstGeom>
+            <a:ln w="76200" cap="sq">
+              <a:solidFill>
+                <a:schemeClr val="accent6"/>
+              </a:solidFill>
+              <a:headEnd type="none" w="med" len="med"/>
+              <a:tailEnd type="none" w="med" len="med"/>
+            </a:ln>
+          </p:spPr>
+          <p:style>
+            <a:lnRef idx="1">
+              <a:schemeClr val="accent1"/>
+            </a:lnRef>
+            <a:fillRef idx="0">
+              <a:schemeClr val="accent1"/>
+            </a:fillRef>
+            <a:effectRef idx="0">
+              <a:schemeClr val="accent1"/>
+            </a:effectRef>
+            <a:fontRef idx="minor">
+              <a:schemeClr val="tx1"/>
+            </a:fontRef>
+          </p:style>
+          <p:txBody>
+            <a:bodyPr rtlCol="0" anchor="ctr"/>
+            <a:lstStyle/>
+            <a:p>
+              <a:pPr algn="ctr"/>
+              <a:endParaRPr lang="en-SG"/>
+            </a:p>
+          </p:txBody>
+        </p:sp>
+        <p:sp>
+          <p:nvSpPr>
+            <p:cNvPr id="89" name="Isosceles Triangle 88"/>
+            <p:cNvSpPr/>
+            <p:nvPr/>
+          </p:nvSpPr>
+          <p:spPr>
+            <a:xfrm>
+              <a:off x="2675385" y="4365074"/>
+              <a:ext cx="187446" cy="111564"/>
+            </a:xfrm>
+            <a:prstGeom prst="triangle">
+              <a:avLst/>
+            </a:prstGeom>
+            <a:solidFill>
+              <a:schemeClr val="accent6"/>
+            </a:solidFill>
+            <a:ln>
+              <a:noFill/>
+            </a:ln>
+          </p:spPr>
+          <p:style>
+            <a:lnRef idx="2">
+              <a:schemeClr val="accent1">
+                <a:shade val="50000"/>
+              </a:schemeClr>
+            </a:lnRef>
+            <a:fillRef idx="1">
+              <a:schemeClr val="accent1"/>
+            </a:fillRef>
+            <a:effectRef idx="0">
+              <a:schemeClr val="accent1"/>
+            </a:effectRef>
+            <a:fontRef idx="minor">
+              <a:schemeClr val="lt1"/>
+            </a:fontRef>
+          </p:style>
+          <p:txBody>
+            <a:bodyPr rtlCol="0" anchor="ctr"/>
+            <a:lstStyle/>
+            <a:p>
+              <a:pPr algn="ctr"/>
+              <a:endParaRPr lang="en-SG"/>
+            </a:p>
+          </p:txBody>
+        </p:sp>
+      </p:grpSp>
+      <p:sp>
+        <p:nvSpPr>
+          <p:cNvPr id="92" name="TextBox 91"/>
+          <p:cNvSpPr txBox="1"/>
+          <p:nvPr/>
+        </p:nvSpPr>
+        <p:spPr>
+          <a:xfrm>
+            <a:off x="2252533" y="4735798"/>
+            <a:ext cx="689438" cy="338554"/>
+          </a:xfrm>
+          <a:prstGeom prst="rect">
+            <a:avLst/>
+          </a:prstGeom>
+          <a:noFill/>
+        </p:spPr>
+        <p:txBody>
+          <a:bodyPr wrap="square" rtlCol="0">
+            <a:spAutoFit/>
+          </a:bodyPr>
+          <a:lstStyle/>
+          <a:p>
+            <a:r>
+              <a:rPr lang="en-US" sz="800" dirty="0" smtClean="0"/>
+              <a:t>Recreate </a:t>
+            </a:r>
+            <a:r>
+              <a:rPr lang="en-US" sz="800" dirty="0" smtClean="0"/>
+              <a:t>spotlight</a:t>
+            </a:r>
+            <a:endParaRPr lang="en-SG" sz="800" dirty="0"/>
+          </a:p>
+        </p:txBody>
+      </p:sp>
     </p:spTree>
     <p:extLst>
       <p:ext uri="{BB962C8B-B14F-4D97-AF65-F5344CB8AC3E}">

</xml_diff>

<commit_message>
Issue 160: Create icons for auto narrate and auto captions Update Issue 160
</commit_message>
<xml_diff>
--- a/doc/Icons.pptx
+++ b/doc/Icons.pptx
@@ -14,18 +14,18 @@
   <p:notesSz cx="6858000" cy="9144000"/>
   <p:embeddedFontLst>
     <p:embeddedFont>
-      <p:font typeface="Rockwell Extra Bold" pitchFamily="18" charset="0"/>
+      <p:font typeface="Rockwell Extra Bold" panose="02060903040505020403" pitchFamily="18" charset="0"/>
       <p:bold r:id="rId4"/>
     </p:embeddedFont>
     <p:embeddedFont>
-      <p:font typeface="Calibri" pitchFamily="34" charset="0"/>
+      <p:font typeface="Calibri" panose="020F0502020204030204" pitchFamily="34" charset="0"/>
       <p:regular r:id="rId5"/>
       <p:bold r:id="rId6"/>
       <p:italic r:id="rId7"/>
       <p:boldItalic r:id="rId8"/>
     </p:embeddedFont>
     <p:embeddedFont>
-      <p:font typeface="Arial Black" pitchFamily="34" charset="0"/>
+      <p:font typeface="Arial Black" panose="020B0A04020102020204" pitchFamily="34" charset="0"/>
       <p:bold r:id="rId9"/>
     </p:embeddedFont>
   </p:embeddedFontLst>
@@ -209,7 +209,7 @@
           <a:p>
             <a:fld id="{6699ACB9-486C-4D62-A3A7-AF98E13EFDA3}" type="datetimeFigureOut">
               <a:rPr lang="en-US" smtClean="0"/>
-              <a:t>12/12/2013</a:t>
+              <a:t>1/20/2014</a:t>
             </a:fld>
             <a:endParaRPr lang="en-US"/>
           </a:p>
@@ -659,7 +659,7 @@
             <a:fld id="{1D8BD707-D9CF-40AE-B4C6-C98DA3205C09}" type="datetimeFigureOut">
               <a:rPr lang="en-US" smtClean="0"/>
               <a:pPr/>
-              <a:t>12/12/2013</a:t>
+              <a:t>1/20/2014</a:t>
             </a:fld>
             <a:endParaRPr lang="en-US"/>
           </a:p>
@@ -826,7 +826,7 @@
             <a:fld id="{1D8BD707-D9CF-40AE-B4C6-C98DA3205C09}" type="datetimeFigureOut">
               <a:rPr lang="en-US" smtClean="0"/>
               <a:pPr/>
-              <a:t>12/12/2013</a:t>
+              <a:t>1/20/2014</a:t>
             </a:fld>
             <a:endParaRPr lang="en-US"/>
           </a:p>
@@ -1003,7 +1003,7 @@
             <a:fld id="{1D8BD707-D9CF-40AE-B4C6-C98DA3205C09}" type="datetimeFigureOut">
               <a:rPr lang="en-US" smtClean="0"/>
               <a:pPr/>
-              <a:t>12/12/2013</a:t>
+              <a:t>1/20/2014</a:t>
             </a:fld>
             <a:endParaRPr lang="en-US"/>
           </a:p>
@@ -1170,7 +1170,7 @@
             <a:fld id="{1D8BD707-D9CF-40AE-B4C6-C98DA3205C09}" type="datetimeFigureOut">
               <a:rPr lang="en-US" smtClean="0"/>
               <a:pPr/>
-              <a:t>12/12/2013</a:t>
+              <a:t>1/20/2014</a:t>
             </a:fld>
             <a:endParaRPr lang="en-US"/>
           </a:p>
@@ -1413,7 +1413,7 @@
             <a:fld id="{1D8BD707-D9CF-40AE-B4C6-C98DA3205C09}" type="datetimeFigureOut">
               <a:rPr lang="en-US" smtClean="0"/>
               <a:pPr/>
-              <a:t>12/12/2013</a:t>
+              <a:t>1/20/2014</a:t>
             </a:fld>
             <a:endParaRPr lang="en-US"/>
           </a:p>
@@ -1698,7 +1698,7 @@
             <a:fld id="{1D8BD707-D9CF-40AE-B4C6-C98DA3205C09}" type="datetimeFigureOut">
               <a:rPr lang="en-US" smtClean="0"/>
               <a:pPr/>
-              <a:t>12/12/2013</a:t>
+              <a:t>1/20/2014</a:t>
             </a:fld>
             <a:endParaRPr lang="en-US"/>
           </a:p>
@@ -2117,7 +2117,7 @@
             <a:fld id="{1D8BD707-D9CF-40AE-B4C6-C98DA3205C09}" type="datetimeFigureOut">
               <a:rPr lang="en-US" smtClean="0"/>
               <a:pPr/>
-              <a:t>12/12/2013</a:t>
+              <a:t>1/20/2014</a:t>
             </a:fld>
             <a:endParaRPr lang="en-US"/>
           </a:p>
@@ -2232,7 +2232,7 @@
             <a:fld id="{1D8BD707-D9CF-40AE-B4C6-C98DA3205C09}" type="datetimeFigureOut">
               <a:rPr lang="en-US" smtClean="0"/>
               <a:pPr/>
-              <a:t>12/12/2013</a:t>
+              <a:t>1/20/2014</a:t>
             </a:fld>
             <a:endParaRPr lang="en-US"/>
           </a:p>
@@ -2324,7 +2324,7 @@
             <a:fld id="{1D8BD707-D9CF-40AE-B4C6-C98DA3205C09}" type="datetimeFigureOut">
               <a:rPr lang="en-US" smtClean="0"/>
               <a:pPr/>
-              <a:t>12/12/2013</a:t>
+              <a:t>1/20/2014</a:t>
             </a:fld>
             <a:endParaRPr lang="en-US"/>
           </a:p>
@@ -2598,7 +2598,7 @@
             <a:fld id="{1D8BD707-D9CF-40AE-B4C6-C98DA3205C09}" type="datetimeFigureOut">
               <a:rPr lang="en-US" smtClean="0"/>
               <a:pPr/>
-              <a:t>12/12/2013</a:t>
+              <a:t>1/20/2014</a:t>
             </a:fld>
             <a:endParaRPr lang="en-US"/>
           </a:p>
@@ -2848,7 +2848,7 @@
             <a:fld id="{1D8BD707-D9CF-40AE-B4C6-C98DA3205C09}" type="datetimeFigureOut">
               <a:rPr lang="en-US" smtClean="0"/>
               <a:pPr/>
-              <a:t>12/12/2013</a:t>
+              <a:t>1/20/2014</a:t>
             </a:fld>
             <a:endParaRPr lang="en-US"/>
           </a:p>
@@ -3058,7 +3058,7 @@
             <a:fld id="{1D8BD707-D9CF-40AE-B4C6-C98DA3205C09}" type="datetimeFigureOut">
               <a:rPr lang="en-US" smtClean="0"/>
               <a:pPr/>
-              <a:t>12/12/2013</a:t>
+              <a:t>1/20/2014</a:t>
             </a:fld>
             <a:endParaRPr lang="en-US"/>
           </a:p>
@@ -3415,6 +3415,16 @@
 <file path=ppt/slides/slide1.xml><?xml version="1.0" encoding="utf-8"?>
 <p:sld xmlns:a="http://schemas.openxmlformats.org/drawingml/2006/main" xmlns:r="http://schemas.openxmlformats.org/officeDocument/2006/relationships" xmlns:p="http://schemas.openxmlformats.org/presentationml/2006/main">
   <p:cSld>
+    <p:bg>
+      <p:bgPr>
+        <a:solidFill>
+          <a:schemeClr val="bg1">
+            <a:lumMod val="95000"/>
+          </a:schemeClr>
+        </a:solidFill>
+        <a:effectLst/>
+      </p:bgPr>
+    </p:bg>
     <p:spTree>
       <p:nvGrpSpPr>
         <p:cNvPr id="1" name=""/>
@@ -7237,16 +7247,1246 @@
           <a:p>
             <a:r>
               <a:rPr lang="en-US" sz="800" dirty="0" smtClean="0"/>
-              <a:t>Recreate </a:t>
+              <a:t>Recreate spotlight</a:t>
             </a:r>
+            <a:endParaRPr lang="en-SG" sz="800" dirty="0"/>
+          </a:p>
+        </p:txBody>
+      </p:sp>
+      <p:sp>
+        <p:nvSpPr>
+          <p:cNvPr id="104" name="TextBox 103"/>
+          <p:cNvSpPr txBox="1"/>
+          <p:nvPr/>
+        </p:nvSpPr>
+        <p:spPr>
+          <a:xfrm>
+            <a:off x="3359990" y="4806010"/>
+            <a:ext cx="689438" cy="215444"/>
+          </a:xfrm>
+          <a:prstGeom prst="rect">
+            <a:avLst/>
+          </a:prstGeom>
+          <a:noFill/>
+        </p:spPr>
+        <p:txBody>
+          <a:bodyPr wrap="square" rtlCol="0">
+            <a:spAutoFit/>
+          </a:bodyPr>
+          <a:lstStyle/>
+          <a:p>
             <a:r>
               <a:rPr lang="en-US" sz="800" dirty="0" smtClean="0"/>
-              <a:t>spotlight</a:t>
+              <a:t>Add audio</a:t>
             </a:r>
             <a:endParaRPr lang="en-SG" sz="800" dirty="0"/>
           </a:p>
         </p:txBody>
       </p:sp>
+      <p:sp>
+        <p:nvSpPr>
+          <p:cNvPr id="118" name="TextBox 117"/>
+          <p:cNvSpPr txBox="1"/>
+          <p:nvPr/>
+        </p:nvSpPr>
+        <p:spPr>
+          <a:xfrm>
+            <a:off x="4338644" y="4806010"/>
+            <a:ext cx="689438" cy="338554"/>
+          </a:xfrm>
+          <a:prstGeom prst="rect">
+            <a:avLst/>
+          </a:prstGeom>
+          <a:noFill/>
+        </p:spPr>
+        <p:txBody>
+          <a:bodyPr wrap="square" rtlCol="0">
+            <a:spAutoFit/>
+          </a:bodyPr>
+          <a:lstStyle/>
+          <a:p>
+            <a:r>
+              <a:rPr lang="en-US" sz="800" dirty="0" smtClean="0"/>
+              <a:t>Remove audio</a:t>
+            </a:r>
+            <a:endParaRPr lang="en-SG" sz="800" dirty="0"/>
+          </a:p>
+        </p:txBody>
+      </p:sp>
+      <p:grpSp>
+        <p:nvGrpSpPr>
+          <p:cNvPr id="46" name="Group 45"/>
+          <p:cNvGrpSpPr/>
+          <p:nvPr/>
+        </p:nvGrpSpPr>
+        <p:grpSpPr>
+          <a:xfrm>
+            <a:off x="3263477" y="3954500"/>
+            <a:ext cx="838200" cy="838200"/>
+            <a:chOff x="3370502" y="5305123"/>
+            <a:chExt cx="838200" cy="838200"/>
+          </a:xfrm>
+        </p:grpSpPr>
+        <p:sp>
+          <p:nvSpPr>
+            <p:cNvPr id="155" name="Rectangle 154"/>
+            <p:cNvSpPr/>
+            <p:nvPr/>
+          </p:nvSpPr>
+          <p:spPr>
+            <a:xfrm>
+              <a:off x="3417276" y="5376568"/>
+              <a:ext cx="741789" cy="559065"/>
+            </a:xfrm>
+            <a:prstGeom prst="rect">
+              <a:avLst/>
+            </a:prstGeom>
+            <a:solidFill>
+              <a:schemeClr val="accent6"/>
+            </a:solidFill>
+            <a:ln>
+              <a:noFill/>
+            </a:ln>
+          </p:spPr>
+          <p:style>
+            <a:lnRef idx="2">
+              <a:schemeClr val="accent1">
+                <a:shade val="50000"/>
+              </a:schemeClr>
+            </a:lnRef>
+            <a:fillRef idx="1">
+              <a:schemeClr val="accent1"/>
+            </a:fillRef>
+            <a:effectRef idx="0">
+              <a:schemeClr val="accent1"/>
+            </a:effectRef>
+            <a:fontRef idx="minor">
+              <a:schemeClr val="lt1"/>
+            </a:fontRef>
+          </p:style>
+          <p:txBody>
+            <a:bodyPr rtlCol="0" anchor="ctr"/>
+            <a:lstStyle/>
+            <a:p>
+              <a:pPr algn="ctr"/>
+              <a:endParaRPr lang="en-US"/>
+            </a:p>
+          </p:txBody>
+        </p:sp>
+        <p:sp>
+          <p:nvSpPr>
+            <p:cNvPr id="157" name="Rectangle 156"/>
+            <p:cNvSpPr/>
+            <p:nvPr/>
+          </p:nvSpPr>
+          <p:spPr>
+            <a:xfrm>
+              <a:off x="3370502" y="5305123"/>
+              <a:ext cx="838200" cy="838200"/>
+            </a:xfrm>
+            <a:prstGeom prst="rect">
+              <a:avLst/>
+            </a:prstGeom>
+            <a:noFill/>
+            <a:ln>
+              <a:noFill/>
+            </a:ln>
+          </p:spPr>
+          <p:style>
+            <a:lnRef idx="2">
+              <a:schemeClr val="accent1">
+                <a:shade val="50000"/>
+              </a:schemeClr>
+            </a:lnRef>
+            <a:fillRef idx="1">
+              <a:schemeClr val="accent1"/>
+            </a:fillRef>
+            <a:effectRef idx="0">
+              <a:schemeClr val="accent1"/>
+            </a:effectRef>
+            <a:fontRef idx="minor">
+              <a:schemeClr val="lt1"/>
+            </a:fontRef>
+          </p:style>
+          <p:txBody>
+            <a:bodyPr rtlCol="0" anchor="ctr"/>
+            <a:lstStyle/>
+            <a:p>
+              <a:pPr algn="ctr"/>
+              <a:endParaRPr lang="en-SG"/>
+            </a:p>
+          </p:txBody>
+        </p:sp>
+        <p:sp>
+          <p:nvSpPr>
+            <p:cNvPr id="158" name="Rectangle 5"/>
+            <p:cNvSpPr/>
+            <p:nvPr/>
+          </p:nvSpPr>
+          <p:spPr>
+            <a:xfrm>
+              <a:off x="3874880" y="5437018"/>
+              <a:ext cx="216424" cy="429245"/>
+            </a:xfrm>
+            <a:custGeom>
+              <a:avLst/>
+              <a:gdLst>
+                <a:gd name="connsiteX0" fmla="*/ 0 w 247861"/>
+                <a:gd name="connsiteY0" fmla="*/ 168438 h 491595"/>
+                <a:gd name="connsiteX1" fmla="*/ 83956 w 247861"/>
+                <a:gd name="connsiteY1" fmla="*/ 162984 h 491595"/>
+                <a:gd name="connsiteX2" fmla="*/ 56685 w 247861"/>
+                <a:gd name="connsiteY2" fmla="*/ 318394 h 491595"/>
+                <a:gd name="connsiteX3" fmla="*/ 0 w 247861"/>
+                <a:gd name="connsiteY3" fmla="*/ 318394 h 491595"/>
+                <a:gd name="connsiteX4" fmla="*/ 0 w 247861"/>
+                <a:gd name="connsiteY4" fmla="*/ 168438 h 491595"/>
+                <a:gd name="connsiteX5" fmla="*/ 247861 w 247861"/>
+                <a:gd name="connsiteY5" fmla="*/ 0 h 491595"/>
+                <a:gd name="connsiteX6" fmla="*/ 242826 w 247861"/>
+                <a:gd name="connsiteY6" fmla="*/ 491595 h 491595"/>
+                <a:gd name="connsiteX7" fmla="*/ 82985 w 247861"/>
+                <a:gd name="connsiteY7" fmla="*/ 327947 h 491595"/>
+                <a:gd name="connsiteX8" fmla="*/ 84711 w 247861"/>
+                <a:gd name="connsiteY8" fmla="*/ 159354 h 491595"/>
+                <a:gd name="connsiteX9" fmla="*/ 247861 w 247861"/>
+                <a:gd name="connsiteY9" fmla="*/ 0 h 491595"/>
+                <a:gd name="connsiteX0" fmla="*/ 0 w 247861"/>
+                <a:gd name="connsiteY0" fmla="*/ 168438 h 491595"/>
+                <a:gd name="connsiteX1" fmla="*/ 83956 w 247861"/>
+                <a:gd name="connsiteY1" fmla="*/ 162984 h 491595"/>
+                <a:gd name="connsiteX2" fmla="*/ 81228 w 247861"/>
+                <a:gd name="connsiteY2" fmla="*/ 326575 h 491595"/>
+                <a:gd name="connsiteX3" fmla="*/ 0 w 247861"/>
+                <a:gd name="connsiteY3" fmla="*/ 318394 h 491595"/>
+                <a:gd name="connsiteX4" fmla="*/ 0 w 247861"/>
+                <a:gd name="connsiteY4" fmla="*/ 168438 h 491595"/>
+                <a:gd name="connsiteX5" fmla="*/ 247861 w 247861"/>
+                <a:gd name="connsiteY5" fmla="*/ 0 h 491595"/>
+                <a:gd name="connsiteX6" fmla="*/ 242826 w 247861"/>
+                <a:gd name="connsiteY6" fmla="*/ 491595 h 491595"/>
+                <a:gd name="connsiteX7" fmla="*/ 82985 w 247861"/>
+                <a:gd name="connsiteY7" fmla="*/ 327947 h 491595"/>
+                <a:gd name="connsiteX8" fmla="*/ 84711 w 247861"/>
+                <a:gd name="connsiteY8" fmla="*/ 159354 h 491595"/>
+                <a:gd name="connsiteX9" fmla="*/ 247861 w 247861"/>
+                <a:gd name="connsiteY9" fmla="*/ 0 h 491595"/>
+              </a:gdLst>
+              <a:ahLst/>
+              <a:cxnLst>
+                <a:cxn ang="0">
+                  <a:pos x="connsiteX0" y="connsiteY0"/>
+                </a:cxn>
+                <a:cxn ang="0">
+                  <a:pos x="connsiteX1" y="connsiteY1"/>
+                </a:cxn>
+                <a:cxn ang="0">
+                  <a:pos x="connsiteX2" y="connsiteY2"/>
+                </a:cxn>
+                <a:cxn ang="0">
+                  <a:pos x="connsiteX3" y="connsiteY3"/>
+                </a:cxn>
+                <a:cxn ang="0">
+                  <a:pos x="connsiteX4" y="connsiteY4"/>
+                </a:cxn>
+                <a:cxn ang="0">
+                  <a:pos x="connsiteX5" y="connsiteY5"/>
+                </a:cxn>
+                <a:cxn ang="0">
+                  <a:pos x="connsiteX6" y="connsiteY6"/>
+                </a:cxn>
+                <a:cxn ang="0">
+                  <a:pos x="connsiteX7" y="connsiteY7"/>
+                </a:cxn>
+                <a:cxn ang="0">
+                  <a:pos x="connsiteX8" y="connsiteY8"/>
+                </a:cxn>
+                <a:cxn ang="0">
+                  <a:pos x="connsiteX9" y="connsiteY9"/>
+                </a:cxn>
+              </a:cxnLst>
+              <a:rect l="l" t="t" r="r" b="b"/>
+              <a:pathLst>
+                <a:path w="247861" h="491595">
+                  <a:moveTo>
+                    <a:pt x="0" y="168438"/>
+                  </a:moveTo>
+                  <a:lnTo>
+                    <a:pt x="83956" y="162984"/>
+                  </a:lnTo>
+                  <a:cubicBezTo>
+                    <a:pt x="83047" y="217514"/>
+                    <a:pt x="82137" y="272045"/>
+                    <a:pt x="81228" y="326575"/>
+                  </a:cubicBezTo>
+                  <a:lnTo>
+                    <a:pt x="0" y="318394"/>
+                  </a:lnTo>
+                  <a:lnTo>
+                    <a:pt x="0" y="168438"/>
+                  </a:lnTo>
+                  <a:close/>
+                  <a:moveTo>
+                    <a:pt x="247861" y="0"/>
+                  </a:moveTo>
+                  <a:cubicBezTo>
+                    <a:pt x="246183" y="163865"/>
+                    <a:pt x="244504" y="327730"/>
+                    <a:pt x="242826" y="491595"/>
+                  </a:cubicBezTo>
+                  <a:lnTo>
+                    <a:pt x="82985" y="327947"/>
+                  </a:lnTo>
+                  <a:cubicBezTo>
+                    <a:pt x="83560" y="271749"/>
+                    <a:pt x="84136" y="215552"/>
+                    <a:pt x="84711" y="159354"/>
+                  </a:cubicBezTo>
+                  <a:lnTo>
+                    <a:pt x="247861" y="0"/>
+                  </a:lnTo>
+                  <a:close/>
+                </a:path>
+              </a:pathLst>
+            </a:custGeom>
+            <a:solidFill>
+              <a:srgbClr val="0070C0"/>
+            </a:solidFill>
+            <a:ln>
+              <a:solidFill>
+                <a:schemeClr val="bg1"/>
+              </a:solidFill>
+            </a:ln>
+          </p:spPr>
+          <p:style>
+            <a:lnRef idx="2">
+              <a:schemeClr val="accent1">
+                <a:shade val="50000"/>
+              </a:schemeClr>
+            </a:lnRef>
+            <a:fillRef idx="1">
+              <a:schemeClr val="accent1"/>
+            </a:fillRef>
+            <a:effectRef idx="0">
+              <a:schemeClr val="accent1"/>
+            </a:effectRef>
+            <a:fontRef idx="minor">
+              <a:schemeClr val="lt1"/>
+            </a:fontRef>
+          </p:style>
+          <p:txBody>
+            <a:bodyPr rtlCol="0" anchor="ctr"/>
+            <a:lstStyle/>
+            <a:p>
+              <a:pPr algn="ctr"/>
+              <a:endParaRPr lang="en-SG"/>
+            </a:p>
+          </p:txBody>
+        </p:sp>
+        <p:sp>
+          <p:nvSpPr>
+            <p:cNvPr id="160" name="Right Arrow 159"/>
+            <p:cNvSpPr>
+              <a:spLocks noChangeAspect="1"/>
+            </p:cNvSpPr>
+            <p:nvPr/>
+          </p:nvSpPr>
+          <p:spPr>
+            <a:xfrm rot="18645116">
+              <a:off x="3570659" y="5714549"/>
+              <a:ext cx="304920" cy="304920"/>
+            </a:xfrm>
+            <a:prstGeom prst="rightArrow">
+              <a:avLst/>
+            </a:prstGeom>
+            <a:solidFill>
+              <a:srgbClr val="0070C0"/>
+            </a:solidFill>
+            <a:ln>
+              <a:solidFill>
+                <a:schemeClr val="bg1"/>
+              </a:solidFill>
+            </a:ln>
+          </p:spPr>
+          <p:style>
+            <a:lnRef idx="2">
+              <a:schemeClr val="accent1">
+                <a:shade val="50000"/>
+              </a:schemeClr>
+            </a:lnRef>
+            <a:fillRef idx="1">
+              <a:schemeClr val="accent1"/>
+            </a:fillRef>
+            <a:effectRef idx="0">
+              <a:schemeClr val="accent1"/>
+            </a:effectRef>
+            <a:fontRef idx="minor">
+              <a:schemeClr val="lt1"/>
+            </a:fontRef>
+          </p:style>
+          <p:txBody>
+            <a:bodyPr rtlCol="0" anchor="ctr"/>
+            <a:lstStyle/>
+            <a:p>
+              <a:pPr algn="ctr"/>
+              <a:endParaRPr lang="en-US"/>
+            </a:p>
+          </p:txBody>
+        </p:sp>
+      </p:grpSp>
+      <p:grpSp>
+        <p:nvGrpSpPr>
+          <p:cNvPr id="53" name="Group 52"/>
+          <p:cNvGrpSpPr/>
+          <p:nvPr/>
+        </p:nvGrpSpPr>
+        <p:grpSpPr>
+          <a:xfrm>
+            <a:off x="5571632" y="3954500"/>
+            <a:ext cx="838200" cy="838200"/>
+            <a:chOff x="5550695" y="3954500"/>
+            <a:chExt cx="838200" cy="838200"/>
+          </a:xfrm>
+        </p:grpSpPr>
+        <p:sp>
+          <p:nvSpPr>
+            <p:cNvPr id="137" name="Rectangle 136"/>
+            <p:cNvSpPr/>
+            <p:nvPr/>
+          </p:nvSpPr>
+          <p:spPr>
+            <a:xfrm>
+              <a:off x="5646013" y="4073734"/>
+              <a:ext cx="642016" cy="379712"/>
+            </a:xfrm>
+            <a:prstGeom prst="rect">
+              <a:avLst/>
+            </a:prstGeom>
+            <a:solidFill>
+              <a:schemeClr val="accent6"/>
+            </a:solidFill>
+            <a:ln>
+              <a:solidFill>
+                <a:schemeClr val="accent6"/>
+              </a:solidFill>
+            </a:ln>
+          </p:spPr>
+          <p:style>
+            <a:lnRef idx="2">
+              <a:schemeClr val="accent1">
+                <a:shade val="50000"/>
+              </a:schemeClr>
+            </a:lnRef>
+            <a:fillRef idx="1">
+              <a:schemeClr val="accent1"/>
+            </a:fillRef>
+            <a:effectRef idx="0">
+              <a:schemeClr val="accent1"/>
+            </a:effectRef>
+            <a:fontRef idx="minor">
+              <a:schemeClr val="lt1"/>
+            </a:fontRef>
+          </p:style>
+          <p:txBody>
+            <a:bodyPr rtlCol="0" anchor="ctr"/>
+            <a:lstStyle/>
+            <a:p>
+              <a:pPr algn="ctr"/>
+              <a:endParaRPr lang="en-US"/>
+            </a:p>
+          </p:txBody>
+        </p:sp>
+        <p:sp>
+          <p:nvSpPr>
+            <p:cNvPr id="139" name="Rectangle 138"/>
+            <p:cNvSpPr/>
+            <p:nvPr/>
+          </p:nvSpPr>
+          <p:spPr>
+            <a:xfrm>
+              <a:off x="5550695" y="3954500"/>
+              <a:ext cx="838200" cy="838200"/>
+            </a:xfrm>
+            <a:prstGeom prst="rect">
+              <a:avLst/>
+            </a:prstGeom>
+            <a:noFill/>
+            <a:ln>
+              <a:noFill/>
+            </a:ln>
+          </p:spPr>
+          <p:style>
+            <a:lnRef idx="2">
+              <a:schemeClr val="accent1">
+                <a:shade val="50000"/>
+              </a:schemeClr>
+            </a:lnRef>
+            <a:fillRef idx="1">
+              <a:schemeClr val="accent1"/>
+            </a:fillRef>
+            <a:effectRef idx="0">
+              <a:schemeClr val="accent1"/>
+            </a:effectRef>
+            <a:fontRef idx="minor">
+              <a:schemeClr val="lt1"/>
+            </a:fontRef>
+          </p:style>
+          <p:txBody>
+            <a:bodyPr rtlCol="0" anchor="ctr"/>
+            <a:lstStyle/>
+            <a:p>
+              <a:pPr algn="ctr"/>
+              <a:endParaRPr lang="en-SG"/>
+            </a:p>
+          </p:txBody>
+        </p:sp>
+        <p:sp>
+          <p:nvSpPr>
+            <p:cNvPr id="141" name="Right Arrow 140"/>
+            <p:cNvSpPr>
+              <a:spLocks noChangeAspect="1"/>
+            </p:cNvSpPr>
+            <p:nvPr/>
+          </p:nvSpPr>
+          <p:spPr>
+            <a:xfrm rot="4632386">
+              <a:off x="5805486" y="4170627"/>
+              <a:ext cx="304920" cy="304920"/>
+            </a:xfrm>
+            <a:prstGeom prst="rightArrow">
+              <a:avLst/>
+            </a:prstGeom>
+            <a:solidFill>
+              <a:srgbClr val="0070C0"/>
+            </a:solidFill>
+            <a:ln>
+              <a:solidFill>
+                <a:schemeClr val="bg1"/>
+              </a:solidFill>
+            </a:ln>
+          </p:spPr>
+          <p:style>
+            <a:lnRef idx="2">
+              <a:schemeClr val="accent1">
+                <a:shade val="50000"/>
+              </a:schemeClr>
+            </a:lnRef>
+            <a:fillRef idx="1">
+              <a:schemeClr val="accent1"/>
+            </a:fillRef>
+            <a:effectRef idx="0">
+              <a:schemeClr val="accent1"/>
+            </a:effectRef>
+            <a:fontRef idx="minor">
+              <a:schemeClr val="lt1"/>
+            </a:fontRef>
+          </p:style>
+          <p:txBody>
+            <a:bodyPr rtlCol="0" anchor="ctr"/>
+            <a:lstStyle/>
+            <a:p>
+              <a:pPr algn="ctr"/>
+              <a:endParaRPr lang="en-US"/>
+            </a:p>
+          </p:txBody>
+        </p:sp>
+        <p:sp>
+          <p:nvSpPr>
+            <p:cNvPr id="142" name="Rectangle 141"/>
+            <p:cNvSpPr/>
+            <p:nvPr/>
+          </p:nvSpPr>
+          <p:spPr>
+            <a:xfrm>
+              <a:off x="5621737" y="4465251"/>
+              <a:ext cx="687682" cy="98991"/>
+            </a:xfrm>
+            <a:prstGeom prst="rect">
+              <a:avLst/>
+            </a:prstGeom>
+            <a:solidFill>
+              <a:srgbClr val="0070C0"/>
+            </a:solidFill>
+            <a:ln>
+              <a:solidFill>
+                <a:schemeClr val="bg1"/>
+              </a:solidFill>
+            </a:ln>
+          </p:spPr>
+          <p:style>
+            <a:lnRef idx="2">
+              <a:schemeClr val="accent1">
+                <a:shade val="50000"/>
+              </a:schemeClr>
+            </a:lnRef>
+            <a:fillRef idx="1">
+              <a:schemeClr val="accent1"/>
+            </a:fillRef>
+            <a:effectRef idx="0">
+              <a:schemeClr val="accent1"/>
+            </a:effectRef>
+            <a:fontRef idx="minor">
+              <a:schemeClr val="lt1"/>
+            </a:fontRef>
+          </p:style>
+          <p:txBody>
+            <a:bodyPr rtlCol="0" anchor="ctr"/>
+            <a:lstStyle/>
+            <a:p>
+              <a:pPr algn="ctr"/>
+              <a:endParaRPr lang="en-US"/>
+            </a:p>
+          </p:txBody>
+        </p:sp>
+      </p:grpSp>
+      <p:grpSp>
+        <p:nvGrpSpPr>
+          <p:cNvPr id="62" name="Group 61"/>
+          <p:cNvGrpSpPr/>
+          <p:nvPr/>
+        </p:nvGrpSpPr>
+        <p:grpSpPr>
+          <a:xfrm>
+            <a:off x="6553200" y="3954500"/>
+            <a:ext cx="838200" cy="838200"/>
+            <a:chOff x="6642094" y="3972268"/>
+            <a:chExt cx="838200" cy="838200"/>
+          </a:xfrm>
+        </p:grpSpPr>
+        <p:sp>
+          <p:nvSpPr>
+            <p:cNvPr id="163" name="Rectangle 162"/>
+            <p:cNvSpPr/>
+            <p:nvPr/>
+          </p:nvSpPr>
+          <p:spPr>
+            <a:xfrm>
+              <a:off x="6642094" y="3972268"/>
+              <a:ext cx="838200" cy="838200"/>
+            </a:xfrm>
+            <a:prstGeom prst="rect">
+              <a:avLst/>
+            </a:prstGeom>
+            <a:noFill/>
+            <a:ln>
+              <a:noFill/>
+            </a:ln>
+          </p:spPr>
+          <p:style>
+            <a:lnRef idx="2">
+              <a:schemeClr val="accent1">
+                <a:shade val="50000"/>
+              </a:schemeClr>
+            </a:lnRef>
+            <a:fillRef idx="1">
+              <a:schemeClr val="accent1"/>
+            </a:fillRef>
+            <a:effectRef idx="0">
+              <a:schemeClr val="accent1"/>
+            </a:effectRef>
+            <a:fontRef idx="minor">
+              <a:schemeClr val="lt1"/>
+            </a:fontRef>
+          </p:style>
+          <p:txBody>
+            <a:bodyPr rtlCol="0" anchor="ctr"/>
+            <a:lstStyle/>
+            <a:p>
+              <a:pPr algn="ctr"/>
+              <a:endParaRPr lang="en-SG"/>
+            </a:p>
+          </p:txBody>
+        </p:sp>
+        <p:sp>
+          <p:nvSpPr>
+            <p:cNvPr id="165" name="Rectangle 164"/>
+            <p:cNvSpPr/>
+            <p:nvPr/>
+          </p:nvSpPr>
+          <p:spPr>
+            <a:xfrm>
+              <a:off x="6725420" y="4498895"/>
+              <a:ext cx="488173" cy="94884"/>
+            </a:xfrm>
+            <a:prstGeom prst="rect">
+              <a:avLst/>
+            </a:prstGeom>
+            <a:solidFill>
+              <a:srgbClr val="0070C0"/>
+            </a:solidFill>
+            <a:ln>
+              <a:solidFill>
+                <a:schemeClr val="bg1"/>
+              </a:solidFill>
+            </a:ln>
+          </p:spPr>
+          <p:style>
+            <a:lnRef idx="2">
+              <a:schemeClr val="accent1">
+                <a:shade val="50000"/>
+              </a:schemeClr>
+            </a:lnRef>
+            <a:fillRef idx="1">
+              <a:schemeClr val="accent1"/>
+            </a:fillRef>
+            <a:effectRef idx="0">
+              <a:schemeClr val="accent1"/>
+            </a:effectRef>
+            <a:fontRef idx="minor">
+              <a:schemeClr val="lt1"/>
+            </a:fontRef>
+          </p:style>
+          <p:txBody>
+            <a:bodyPr rtlCol="0" anchor="ctr"/>
+            <a:lstStyle/>
+            <a:p>
+              <a:pPr algn="ctr"/>
+              <a:endParaRPr lang="en-US"/>
+            </a:p>
+          </p:txBody>
+        </p:sp>
+        <p:sp>
+          <p:nvSpPr>
+            <p:cNvPr id="61" name="Freeform 60"/>
+            <p:cNvSpPr/>
+            <p:nvPr/>
+          </p:nvSpPr>
+          <p:spPr>
+            <a:xfrm>
+              <a:off x="6738973" y="4088886"/>
+              <a:ext cx="576262" cy="364697"/>
+            </a:xfrm>
+            <a:custGeom>
+              <a:avLst/>
+              <a:gdLst>
+                <a:gd name="connsiteX0" fmla="*/ 531018 w 576262"/>
+                <a:gd name="connsiteY0" fmla="*/ 378619 h 378619"/>
+                <a:gd name="connsiteX1" fmla="*/ 0 w 576262"/>
+                <a:gd name="connsiteY1" fmla="*/ 378619 h 378619"/>
+                <a:gd name="connsiteX2" fmla="*/ 0 w 576262"/>
+                <a:gd name="connsiteY2" fmla="*/ 0 h 378619"/>
+                <a:gd name="connsiteX3" fmla="*/ 576262 w 576262"/>
+                <a:gd name="connsiteY3" fmla="*/ 0 h 378619"/>
+                <a:gd name="connsiteX4" fmla="*/ 576262 w 576262"/>
+                <a:gd name="connsiteY4" fmla="*/ 304800 h 378619"/>
+                <a:gd name="connsiteX0" fmla="*/ 345281 w 576262"/>
+                <a:gd name="connsiteY0" fmla="*/ 378619 h 378619"/>
+                <a:gd name="connsiteX1" fmla="*/ 0 w 576262"/>
+                <a:gd name="connsiteY1" fmla="*/ 378619 h 378619"/>
+                <a:gd name="connsiteX2" fmla="*/ 0 w 576262"/>
+                <a:gd name="connsiteY2" fmla="*/ 0 h 378619"/>
+                <a:gd name="connsiteX3" fmla="*/ 576262 w 576262"/>
+                <a:gd name="connsiteY3" fmla="*/ 0 h 378619"/>
+                <a:gd name="connsiteX4" fmla="*/ 576262 w 576262"/>
+                <a:gd name="connsiteY4" fmla="*/ 304800 h 378619"/>
+              </a:gdLst>
+              <a:ahLst/>
+              <a:cxnLst>
+                <a:cxn ang="0">
+                  <a:pos x="connsiteX0" y="connsiteY0"/>
+                </a:cxn>
+                <a:cxn ang="0">
+                  <a:pos x="connsiteX1" y="connsiteY1"/>
+                </a:cxn>
+                <a:cxn ang="0">
+                  <a:pos x="connsiteX2" y="connsiteY2"/>
+                </a:cxn>
+                <a:cxn ang="0">
+                  <a:pos x="connsiteX3" y="connsiteY3"/>
+                </a:cxn>
+                <a:cxn ang="0">
+                  <a:pos x="connsiteX4" y="connsiteY4"/>
+                </a:cxn>
+              </a:cxnLst>
+              <a:rect l="l" t="t" r="r" b="b"/>
+              <a:pathLst>
+                <a:path w="576262" h="378619">
+                  <a:moveTo>
+                    <a:pt x="345281" y="378619"/>
+                  </a:moveTo>
+                  <a:lnTo>
+                    <a:pt x="0" y="378619"/>
+                  </a:lnTo>
+                  <a:lnTo>
+                    <a:pt x="0" y="0"/>
+                  </a:lnTo>
+                  <a:lnTo>
+                    <a:pt x="576262" y="0"/>
+                  </a:lnTo>
+                  <a:lnTo>
+                    <a:pt x="576262" y="304800"/>
+                  </a:lnTo>
+                </a:path>
+              </a:pathLst>
+            </a:custGeom>
+            <a:noFill/>
+            <a:ln>
+              <a:solidFill>
+                <a:schemeClr val="bg1">
+                  <a:lumMod val="75000"/>
+                </a:schemeClr>
+              </a:solidFill>
+            </a:ln>
+          </p:spPr>
+          <p:style>
+            <a:lnRef idx="2">
+              <a:schemeClr val="accent1">
+                <a:shade val="50000"/>
+              </a:schemeClr>
+            </a:lnRef>
+            <a:fillRef idx="1">
+              <a:schemeClr val="accent1"/>
+            </a:fillRef>
+            <a:effectRef idx="0">
+              <a:schemeClr val="accent1"/>
+            </a:effectRef>
+            <a:fontRef idx="minor">
+              <a:schemeClr val="lt1"/>
+            </a:fontRef>
+          </p:style>
+          <p:txBody>
+            <a:bodyPr rtlCol="0" anchor="ctr"/>
+            <a:lstStyle/>
+            <a:p>
+              <a:pPr algn="ctr"/>
+              <a:endParaRPr lang="en-SG"/>
+            </a:p>
+          </p:txBody>
+        </p:sp>
+        <p:sp>
+          <p:nvSpPr>
+            <p:cNvPr id="168" name="Plus 167"/>
+            <p:cNvSpPr>
+              <a:spLocks noChangeAspect="1"/>
+            </p:cNvSpPr>
+            <p:nvPr/>
+          </p:nvSpPr>
+          <p:spPr>
+            <a:xfrm rot="2789166">
+              <a:off x="7072329" y="4386141"/>
+              <a:ext cx="304920" cy="304920"/>
+            </a:xfrm>
+            <a:prstGeom prst="mathPlus">
+              <a:avLst/>
+            </a:prstGeom>
+            <a:solidFill>
+              <a:srgbClr val="C00000"/>
+            </a:solidFill>
+            <a:ln>
+              <a:solidFill>
+                <a:schemeClr val="bg1"/>
+              </a:solidFill>
+            </a:ln>
+          </p:spPr>
+          <p:style>
+            <a:lnRef idx="2">
+              <a:schemeClr val="accent1">
+                <a:shade val="50000"/>
+              </a:schemeClr>
+            </a:lnRef>
+            <a:fillRef idx="1">
+              <a:schemeClr val="accent1"/>
+            </a:fillRef>
+            <a:effectRef idx="0">
+              <a:schemeClr val="accent1"/>
+            </a:effectRef>
+            <a:fontRef idx="minor">
+              <a:schemeClr val="lt1"/>
+            </a:fontRef>
+          </p:style>
+          <p:txBody>
+            <a:bodyPr rtlCol="0" anchor="ctr"/>
+            <a:lstStyle/>
+            <a:p>
+              <a:pPr algn="ctr"/>
+              <a:endParaRPr lang="en-US"/>
+            </a:p>
+          </p:txBody>
+        </p:sp>
+      </p:grpSp>
+      <p:sp>
+        <p:nvSpPr>
+          <p:cNvPr id="169" name="TextBox 168"/>
+          <p:cNvSpPr txBox="1"/>
+          <p:nvPr/>
+        </p:nvSpPr>
+        <p:spPr>
+          <a:xfrm>
+            <a:off x="5663440" y="4806010"/>
+            <a:ext cx="689438" cy="338554"/>
+          </a:xfrm>
+          <a:prstGeom prst="rect">
+            <a:avLst/>
+          </a:prstGeom>
+          <a:noFill/>
+        </p:spPr>
+        <p:txBody>
+          <a:bodyPr wrap="square" rtlCol="0">
+            <a:spAutoFit/>
+          </a:bodyPr>
+          <a:lstStyle/>
+          <a:p>
+            <a:r>
+              <a:rPr lang="en-US" sz="800" dirty="0" smtClean="0"/>
+              <a:t>Add captions</a:t>
+            </a:r>
+            <a:endParaRPr lang="en-SG" sz="800" dirty="0"/>
+          </a:p>
+        </p:txBody>
+      </p:sp>
+      <p:sp>
+        <p:nvSpPr>
+          <p:cNvPr id="170" name="TextBox 169"/>
+          <p:cNvSpPr txBox="1"/>
+          <p:nvPr/>
+        </p:nvSpPr>
+        <p:spPr>
+          <a:xfrm>
+            <a:off x="6642094" y="4806010"/>
+            <a:ext cx="689438" cy="338554"/>
+          </a:xfrm>
+          <a:prstGeom prst="rect">
+            <a:avLst/>
+          </a:prstGeom>
+          <a:noFill/>
+        </p:spPr>
+        <p:txBody>
+          <a:bodyPr wrap="square" rtlCol="0">
+            <a:spAutoFit/>
+          </a:bodyPr>
+          <a:lstStyle/>
+          <a:p>
+            <a:r>
+              <a:rPr lang="en-US" sz="800" dirty="0" smtClean="0"/>
+              <a:t>Remove captions</a:t>
+            </a:r>
+            <a:endParaRPr lang="en-SG" sz="800" dirty="0"/>
+          </a:p>
+        </p:txBody>
+      </p:sp>
+      <p:grpSp>
+        <p:nvGrpSpPr>
+          <p:cNvPr id="63" name="Group 62"/>
+          <p:cNvGrpSpPr/>
+          <p:nvPr/>
+        </p:nvGrpSpPr>
+        <p:grpSpPr>
+          <a:xfrm>
+            <a:off x="4255254" y="3954500"/>
+            <a:ext cx="838200" cy="838200"/>
+            <a:chOff x="4255254" y="3955079"/>
+            <a:chExt cx="838200" cy="838200"/>
+          </a:xfrm>
+        </p:grpSpPr>
+        <p:sp>
+          <p:nvSpPr>
+            <p:cNvPr id="121" name="Rectangle 120"/>
+            <p:cNvSpPr/>
+            <p:nvPr/>
+          </p:nvSpPr>
+          <p:spPr>
+            <a:xfrm>
+              <a:off x="4255254" y="3955079"/>
+              <a:ext cx="838200" cy="838200"/>
+            </a:xfrm>
+            <a:prstGeom prst="rect">
+              <a:avLst/>
+            </a:prstGeom>
+            <a:noFill/>
+            <a:ln>
+              <a:noFill/>
+            </a:ln>
+          </p:spPr>
+          <p:style>
+            <a:lnRef idx="2">
+              <a:schemeClr val="accent1">
+                <a:shade val="50000"/>
+              </a:schemeClr>
+            </a:lnRef>
+            <a:fillRef idx="1">
+              <a:schemeClr val="accent1"/>
+            </a:fillRef>
+            <a:effectRef idx="0">
+              <a:schemeClr val="accent1"/>
+            </a:effectRef>
+            <a:fontRef idx="minor">
+              <a:schemeClr val="lt1"/>
+            </a:fontRef>
+          </p:style>
+          <p:txBody>
+            <a:bodyPr rtlCol="0" anchor="ctr"/>
+            <a:lstStyle/>
+            <a:p>
+              <a:pPr algn="ctr"/>
+              <a:endParaRPr lang="en-SG"/>
+            </a:p>
+          </p:txBody>
+        </p:sp>
+        <p:sp>
+          <p:nvSpPr>
+            <p:cNvPr id="134" name="Plus 133"/>
+            <p:cNvSpPr>
+              <a:spLocks noChangeAspect="1"/>
+            </p:cNvSpPr>
+            <p:nvPr/>
+          </p:nvSpPr>
+          <p:spPr>
+            <a:xfrm rot="2789166">
+              <a:off x="4677417" y="4155867"/>
+              <a:ext cx="304920" cy="304920"/>
+            </a:xfrm>
+            <a:prstGeom prst="mathPlus">
+              <a:avLst/>
+            </a:prstGeom>
+            <a:solidFill>
+              <a:srgbClr val="C00000"/>
+            </a:solidFill>
+            <a:ln>
+              <a:solidFill>
+                <a:schemeClr val="bg1"/>
+              </a:solidFill>
+            </a:ln>
+          </p:spPr>
+          <p:style>
+            <a:lnRef idx="2">
+              <a:schemeClr val="accent1">
+                <a:shade val="50000"/>
+              </a:schemeClr>
+            </a:lnRef>
+            <a:fillRef idx="1">
+              <a:schemeClr val="accent1"/>
+            </a:fillRef>
+            <a:effectRef idx="0">
+              <a:schemeClr val="accent1"/>
+            </a:effectRef>
+            <a:fontRef idx="minor">
+              <a:schemeClr val="lt1"/>
+            </a:fontRef>
+          </p:style>
+          <p:txBody>
+            <a:bodyPr rtlCol="0" anchor="ctr"/>
+            <a:lstStyle/>
+            <a:p>
+              <a:pPr algn="ctr"/>
+              <a:endParaRPr lang="en-US"/>
+            </a:p>
+          </p:txBody>
+        </p:sp>
+        <p:sp>
+          <p:nvSpPr>
+            <p:cNvPr id="167" name="Rectangle 166"/>
+            <p:cNvSpPr/>
+            <p:nvPr/>
+          </p:nvSpPr>
+          <p:spPr>
+            <a:xfrm>
+              <a:off x="4314735" y="4033649"/>
+              <a:ext cx="741789" cy="559065"/>
+            </a:xfrm>
+            <a:prstGeom prst="rect">
+              <a:avLst/>
+            </a:prstGeom>
+            <a:noFill/>
+            <a:ln>
+              <a:solidFill>
+                <a:schemeClr val="bg1">
+                  <a:lumMod val="75000"/>
+                </a:schemeClr>
+              </a:solidFill>
+            </a:ln>
+          </p:spPr>
+          <p:style>
+            <a:lnRef idx="2">
+              <a:schemeClr val="accent1">
+                <a:shade val="50000"/>
+              </a:schemeClr>
+            </a:lnRef>
+            <a:fillRef idx="1">
+              <a:schemeClr val="accent1"/>
+            </a:fillRef>
+            <a:effectRef idx="0">
+              <a:schemeClr val="accent1"/>
+            </a:effectRef>
+            <a:fontRef idx="minor">
+              <a:schemeClr val="lt1"/>
+            </a:fontRef>
+          </p:style>
+          <p:txBody>
+            <a:bodyPr rtlCol="0" anchor="ctr"/>
+            <a:lstStyle/>
+            <a:p>
+              <a:pPr algn="ctr"/>
+              <a:endParaRPr lang="en-US"/>
+            </a:p>
+          </p:txBody>
+        </p:sp>
+        <p:sp>
+          <p:nvSpPr>
+            <p:cNvPr id="172" name="Rectangle 5"/>
+            <p:cNvSpPr/>
+            <p:nvPr/>
+          </p:nvSpPr>
+          <p:spPr>
+            <a:xfrm>
+              <a:off x="4415119" y="4102168"/>
+              <a:ext cx="216424" cy="429245"/>
+            </a:xfrm>
+            <a:custGeom>
+              <a:avLst/>
+              <a:gdLst>
+                <a:gd name="connsiteX0" fmla="*/ 0 w 247861"/>
+                <a:gd name="connsiteY0" fmla="*/ 168438 h 491595"/>
+                <a:gd name="connsiteX1" fmla="*/ 83956 w 247861"/>
+                <a:gd name="connsiteY1" fmla="*/ 162984 h 491595"/>
+                <a:gd name="connsiteX2" fmla="*/ 56685 w 247861"/>
+                <a:gd name="connsiteY2" fmla="*/ 318394 h 491595"/>
+                <a:gd name="connsiteX3" fmla="*/ 0 w 247861"/>
+                <a:gd name="connsiteY3" fmla="*/ 318394 h 491595"/>
+                <a:gd name="connsiteX4" fmla="*/ 0 w 247861"/>
+                <a:gd name="connsiteY4" fmla="*/ 168438 h 491595"/>
+                <a:gd name="connsiteX5" fmla="*/ 247861 w 247861"/>
+                <a:gd name="connsiteY5" fmla="*/ 0 h 491595"/>
+                <a:gd name="connsiteX6" fmla="*/ 242826 w 247861"/>
+                <a:gd name="connsiteY6" fmla="*/ 491595 h 491595"/>
+                <a:gd name="connsiteX7" fmla="*/ 82985 w 247861"/>
+                <a:gd name="connsiteY7" fmla="*/ 327947 h 491595"/>
+                <a:gd name="connsiteX8" fmla="*/ 84711 w 247861"/>
+                <a:gd name="connsiteY8" fmla="*/ 159354 h 491595"/>
+                <a:gd name="connsiteX9" fmla="*/ 247861 w 247861"/>
+                <a:gd name="connsiteY9" fmla="*/ 0 h 491595"/>
+                <a:gd name="connsiteX0" fmla="*/ 0 w 247861"/>
+                <a:gd name="connsiteY0" fmla="*/ 168438 h 491595"/>
+                <a:gd name="connsiteX1" fmla="*/ 83956 w 247861"/>
+                <a:gd name="connsiteY1" fmla="*/ 162984 h 491595"/>
+                <a:gd name="connsiteX2" fmla="*/ 81228 w 247861"/>
+                <a:gd name="connsiteY2" fmla="*/ 326575 h 491595"/>
+                <a:gd name="connsiteX3" fmla="*/ 0 w 247861"/>
+                <a:gd name="connsiteY3" fmla="*/ 318394 h 491595"/>
+                <a:gd name="connsiteX4" fmla="*/ 0 w 247861"/>
+                <a:gd name="connsiteY4" fmla="*/ 168438 h 491595"/>
+                <a:gd name="connsiteX5" fmla="*/ 247861 w 247861"/>
+                <a:gd name="connsiteY5" fmla="*/ 0 h 491595"/>
+                <a:gd name="connsiteX6" fmla="*/ 242826 w 247861"/>
+                <a:gd name="connsiteY6" fmla="*/ 491595 h 491595"/>
+                <a:gd name="connsiteX7" fmla="*/ 82985 w 247861"/>
+                <a:gd name="connsiteY7" fmla="*/ 327947 h 491595"/>
+                <a:gd name="connsiteX8" fmla="*/ 84711 w 247861"/>
+                <a:gd name="connsiteY8" fmla="*/ 159354 h 491595"/>
+                <a:gd name="connsiteX9" fmla="*/ 247861 w 247861"/>
+                <a:gd name="connsiteY9" fmla="*/ 0 h 491595"/>
+              </a:gdLst>
+              <a:ahLst/>
+              <a:cxnLst>
+                <a:cxn ang="0">
+                  <a:pos x="connsiteX0" y="connsiteY0"/>
+                </a:cxn>
+                <a:cxn ang="0">
+                  <a:pos x="connsiteX1" y="connsiteY1"/>
+                </a:cxn>
+                <a:cxn ang="0">
+                  <a:pos x="connsiteX2" y="connsiteY2"/>
+                </a:cxn>
+                <a:cxn ang="0">
+                  <a:pos x="connsiteX3" y="connsiteY3"/>
+                </a:cxn>
+                <a:cxn ang="0">
+                  <a:pos x="connsiteX4" y="connsiteY4"/>
+                </a:cxn>
+                <a:cxn ang="0">
+                  <a:pos x="connsiteX5" y="connsiteY5"/>
+                </a:cxn>
+                <a:cxn ang="0">
+                  <a:pos x="connsiteX6" y="connsiteY6"/>
+                </a:cxn>
+                <a:cxn ang="0">
+                  <a:pos x="connsiteX7" y="connsiteY7"/>
+                </a:cxn>
+                <a:cxn ang="0">
+                  <a:pos x="connsiteX8" y="connsiteY8"/>
+                </a:cxn>
+                <a:cxn ang="0">
+                  <a:pos x="connsiteX9" y="connsiteY9"/>
+                </a:cxn>
+              </a:cxnLst>
+              <a:rect l="l" t="t" r="r" b="b"/>
+              <a:pathLst>
+                <a:path w="247861" h="491595">
+                  <a:moveTo>
+                    <a:pt x="0" y="168438"/>
+                  </a:moveTo>
+                  <a:lnTo>
+                    <a:pt x="83956" y="162984"/>
+                  </a:lnTo>
+                  <a:cubicBezTo>
+                    <a:pt x="83047" y="217514"/>
+                    <a:pt x="82137" y="272045"/>
+                    <a:pt x="81228" y="326575"/>
+                  </a:cubicBezTo>
+                  <a:lnTo>
+                    <a:pt x="0" y="318394"/>
+                  </a:lnTo>
+                  <a:lnTo>
+                    <a:pt x="0" y="168438"/>
+                  </a:lnTo>
+                  <a:close/>
+                  <a:moveTo>
+                    <a:pt x="247861" y="0"/>
+                  </a:moveTo>
+                  <a:cubicBezTo>
+                    <a:pt x="246183" y="163865"/>
+                    <a:pt x="244504" y="327730"/>
+                    <a:pt x="242826" y="491595"/>
+                  </a:cubicBezTo>
+                  <a:lnTo>
+                    <a:pt x="82985" y="327947"/>
+                  </a:lnTo>
+                  <a:cubicBezTo>
+                    <a:pt x="83560" y="271749"/>
+                    <a:pt x="84136" y="215552"/>
+                    <a:pt x="84711" y="159354"/>
+                  </a:cubicBezTo>
+                  <a:lnTo>
+                    <a:pt x="247861" y="0"/>
+                  </a:lnTo>
+                  <a:close/>
+                </a:path>
+              </a:pathLst>
+            </a:custGeom>
+            <a:solidFill>
+              <a:srgbClr val="0070C0"/>
+            </a:solidFill>
+            <a:ln>
+              <a:solidFill>
+                <a:schemeClr val="bg1"/>
+              </a:solidFill>
+            </a:ln>
+          </p:spPr>
+          <p:style>
+            <a:lnRef idx="2">
+              <a:schemeClr val="accent1">
+                <a:shade val="50000"/>
+              </a:schemeClr>
+            </a:lnRef>
+            <a:fillRef idx="1">
+              <a:schemeClr val="accent1"/>
+            </a:fillRef>
+            <a:effectRef idx="0">
+              <a:schemeClr val="accent1"/>
+            </a:effectRef>
+            <a:fontRef idx="minor">
+              <a:schemeClr val="lt1"/>
+            </a:fontRef>
+          </p:style>
+          <p:txBody>
+            <a:bodyPr rtlCol="0" anchor="ctr"/>
+            <a:lstStyle/>
+            <a:p>
+              <a:pPr algn="ctr"/>
+              <a:endParaRPr lang="en-SG"/>
+            </a:p>
+          </p:txBody>
+        </p:sp>
+      </p:grpSp>
     </p:spTree>
     <p:extLst>
       <p:ext uri="{BB962C8B-B14F-4D97-AF65-F5344CB8AC3E}">

</xml_diff>

<commit_message>
Issue 66: create icons for context menu items Update Issue 66
</commit_message>
<xml_diff>
--- a/doc/Icons.pptx
+++ b/doc/Icons.pptx
@@ -5,28 +5,29 @@
     <p:sldMasterId id="2147483648" r:id="rId1"/>
   </p:sldMasterIdLst>
   <p:notesMasterIdLst>
-    <p:notesMasterId r:id="rId3"/>
+    <p:notesMasterId r:id="rId4"/>
   </p:notesMasterIdLst>
   <p:sldIdLst>
     <p:sldId id="264" r:id="rId2"/>
+    <p:sldId id="265" r:id="rId3"/>
   </p:sldIdLst>
   <p:sldSz cx="9144000" cy="6858000" type="screen4x3"/>
   <p:notesSz cx="6858000" cy="9144000"/>
   <p:embeddedFontLst>
     <p:embeddedFont>
       <p:font typeface="Rockwell Extra Bold" panose="02060903040505020403" pitchFamily="18" charset="0"/>
-      <p:bold r:id="rId4"/>
+      <p:bold r:id="rId5"/>
     </p:embeddedFont>
     <p:embeddedFont>
       <p:font typeface="Calibri" panose="020F0502020204030204" pitchFamily="34" charset="0"/>
-      <p:regular r:id="rId5"/>
-      <p:bold r:id="rId6"/>
-      <p:italic r:id="rId7"/>
-      <p:boldItalic r:id="rId8"/>
+      <p:regular r:id="rId6"/>
+      <p:bold r:id="rId7"/>
+      <p:italic r:id="rId8"/>
+      <p:boldItalic r:id="rId9"/>
     </p:embeddedFont>
     <p:embeddedFont>
       <p:font typeface="Arial Black" panose="020B0A04020102020204" pitchFamily="34" charset="0"/>
-      <p:bold r:id="rId9"/>
+      <p:bold r:id="rId10"/>
     </p:embeddedFont>
   </p:embeddedFontLst>
   <p:defaultTextStyle>
@@ -209,7 +210,7 @@
           <a:p>
             <a:fld id="{6699ACB9-486C-4D62-A3A7-AF98E13EFDA3}" type="datetimeFigureOut">
               <a:rPr lang="en-US" smtClean="0"/>
-              <a:t>1/20/2014</a:t>
+              <a:t>1/30/2014</a:t>
             </a:fld>
             <a:endParaRPr lang="en-US"/>
           </a:p>
@@ -475,6 +476,90 @@
     </a:lvl9pPr>
   </p:notesStyle>
 </p:notesMaster>
+</file>
+
+<file path=ppt/notesSlides/notesSlide1.xml><?xml version="1.0" encoding="utf-8"?>
+<p:notes xmlns:a="http://schemas.openxmlformats.org/drawingml/2006/main" xmlns:r="http://schemas.openxmlformats.org/officeDocument/2006/relationships" xmlns:p="http://schemas.openxmlformats.org/presentationml/2006/main">
+  <p:cSld>
+    <p:spTree>
+      <p:nvGrpSpPr>
+        <p:cNvPr id="1" name=""/>
+        <p:cNvGrpSpPr/>
+        <p:nvPr/>
+      </p:nvGrpSpPr>
+      <p:grpSpPr>
+        <a:xfrm>
+          <a:off x="0" y="0"/>
+          <a:ext cx="0" cy="0"/>
+          <a:chOff x="0" y="0"/>
+          <a:chExt cx="0" cy="0"/>
+        </a:xfrm>
+      </p:grpSpPr>
+      <p:sp>
+        <p:nvSpPr>
+          <p:cNvPr id="2" name="Slide Image Placeholder 1"/>
+          <p:cNvSpPr>
+            <a:spLocks noGrp="1" noRot="1" noChangeAspect="1"/>
+          </p:cNvSpPr>
+          <p:nvPr>
+            <p:ph type="sldImg"/>
+          </p:nvPr>
+        </p:nvSpPr>
+        <p:spPr/>
+      </p:sp>
+      <p:sp>
+        <p:nvSpPr>
+          <p:cNvPr id="3" name="Notes Placeholder 2"/>
+          <p:cNvSpPr>
+            <a:spLocks noGrp="1"/>
+          </p:cNvSpPr>
+          <p:nvPr>
+            <p:ph type="body" idx="1"/>
+          </p:nvPr>
+        </p:nvSpPr>
+        <p:spPr/>
+        <p:txBody>
+          <a:bodyPr/>
+          <a:lstStyle/>
+          <a:p>
+            <a:endParaRPr lang="en-SG" dirty="0"/>
+          </a:p>
+        </p:txBody>
+      </p:sp>
+      <p:sp>
+        <p:nvSpPr>
+          <p:cNvPr id="4" name="Slide Number Placeholder 3"/>
+          <p:cNvSpPr>
+            <a:spLocks noGrp="1"/>
+          </p:cNvSpPr>
+          <p:nvPr>
+            <p:ph type="sldNum" sz="quarter" idx="10"/>
+          </p:nvPr>
+        </p:nvSpPr>
+        <p:spPr/>
+        <p:txBody>
+          <a:bodyPr/>
+          <a:lstStyle/>
+          <a:p>
+            <a:fld id="{8EC77E60-82A0-4F8A-A861-433B3189FA8C}" type="slidenum">
+              <a:rPr lang="en-US" smtClean="0"/>
+              <a:t>2</a:t>
+            </a:fld>
+            <a:endParaRPr lang="en-US"/>
+          </a:p>
+        </p:txBody>
+      </p:sp>
+    </p:spTree>
+    <p:extLst>
+      <p:ext uri="{BB962C8B-B14F-4D97-AF65-F5344CB8AC3E}">
+        <p14:creationId xmlns:p14="http://schemas.microsoft.com/office/powerpoint/2010/main" val="3758295635"/>
+      </p:ext>
+    </p:extLst>
+  </p:cSld>
+  <p:clrMapOvr>
+    <a:masterClrMapping/>
+  </p:clrMapOvr>
+</p:notes>
 </file>
 
 <file path=ppt/slideLayouts/slideLayout1.xml><?xml version="1.0" encoding="utf-8"?>
@@ -659,7 +744,7 @@
             <a:fld id="{1D8BD707-D9CF-40AE-B4C6-C98DA3205C09}" type="datetimeFigureOut">
               <a:rPr lang="en-US" smtClean="0"/>
               <a:pPr/>
-              <a:t>1/20/2014</a:t>
+              <a:t>1/30/2014</a:t>
             </a:fld>
             <a:endParaRPr lang="en-US"/>
           </a:p>
@@ -826,7 +911,7 @@
             <a:fld id="{1D8BD707-D9CF-40AE-B4C6-C98DA3205C09}" type="datetimeFigureOut">
               <a:rPr lang="en-US" smtClean="0"/>
               <a:pPr/>
-              <a:t>1/20/2014</a:t>
+              <a:t>1/30/2014</a:t>
             </a:fld>
             <a:endParaRPr lang="en-US"/>
           </a:p>
@@ -1003,7 +1088,7 @@
             <a:fld id="{1D8BD707-D9CF-40AE-B4C6-C98DA3205C09}" type="datetimeFigureOut">
               <a:rPr lang="en-US" smtClean="0"/>
               <a:pPr/>
-              <a:t>1/20/2014</a:t>
+              <a:t>1/30/2014</a:t>
             </a:fld>
             <a:endParaRPr lang="en-US"/>
           </a:p>
@@ -1170,7 +1255,7 @@
             <a:fld id="{1D8BD707-D9CF-40AE-B4C6-C98DA3205C09}" type="datetimeFigureOut">
               <a:rPr lang="en-US" smtClean="0"/>
               <a:pPr/>
-              <a:t>1/20/2014</a:t>
+              <a:t>1/30/2014</a:t>
             </a:fld>
             <a:endParaRPr lang="en-US"/>
           </a:p>
@@ -1413,7 +1498,7 @@
             <a:fld id="{1D8BD707-D9CF-40AE-B4C6-C98DA3205C09}" type="datetimeFigureOut">
               <a:rPr lang="en-US" smtClean="0"/>
               <a:pPr/>
-              <a:t>1/20/2014</a:t>
+              <a:t>1/30/2014</a:t>
             </a:fld>
             <a:endParaRPr lang="en-US"/>
           </a:p>
@@ -1698,7 +1783,7 @@
             <a:fld id="{1D8BD707-D9CF-40AE-B4C6-C98DA3205C09}" type="datetimeFigureOut">
               <a:rPr lang="en-US" smtClean="0"/>
               <a:pPr/>
-              <a:t>1/20/2014</a:t>
+              <a:t>1/30/2014</a:t>
             </a:fld>
             <a:endParaRPr lang="en-US"/>
           </a:p>
@@ -2117,7 +2202,7 @@
             <a:fld id="{1D8BD707-D9CF-40AE-B4C6-C98DA3205C09}" type="datetimeFigureOut">
               <a:rPr lang="en-US" smtClean="0"/>
               <a:pPr/>
-              <a:t>1/20/2014</a:t>
+              <a:t>1/30/2014</a:t>
             </a:fld>
             <a:endParaRPr lang="en-US"/>
           </a:p>
@@ -2232,7 +2317,7 @@
             <a:fld id="{1D8BD707-D9CF-40AE-B4C6-C98DA3205C09}" type="datetimeFigureOut">
               <a:rPr lang="en-US" smtClean="0"/>
               <a:pPr/>
-              <a:t>1/20/2014</a:t>
+              <a:t>1/30/2014</a:t>
             </a:fld>
             <a:endParaRPr lang="en-US"/>
           </a:p>
@@ -2324,7 +2409,7 @@
             <a:fld id="{1D8BD707-D9CF-40AE-B4C6-C98DA3205C09}" type="datetimeFigureOut">
               <a:rPr lang="en-US" smtClean="0"/>
               <a:pPr/>
-              <a:t>1/20/2014</a:t>
+              <a:t>1/30/2014</a:t>
             </a:fld>
             <a:endParaRPr lang="en-US"/>
           </a:p>
@@ -2598,7 +2683,7 @@
             <a:fld id="{1D8BD707-D9CF-40AE-B4C6-C98DA3205C09}" type="datetimeFigureOut">
               <a:rPr lang="en-US" smtClean="0"/>
               <a:pPr/>
-              <a:t>1/20/2014</a:t>
+              <a:t>1/30/2014</a:t>
             </a:fld>
             <a:endParaRPr lang="en-US"/>
           </a:p>
@@ -2848,7 +2933,7 @@
             <a:fld id="{1D8BD707-D9CF-40AE-B4C6-C98DA3205C09}" type="datetimeFigureOut">
               <a:rPr lang="en-US" smtClean="0"/>
               <a:pPr/>
-              <a:t>1/20/2014</a:t>
+              <a:t>1/30/2014</a:t>
             </a:fld>
             <a:endParaRPr lang="en-US"/>
           </a:p>
@@ -3058,7 +3143,7 @@
             <a:fld id="{1D8BD707-D9CF-40AE-B4C6-C98DA3205C09}" type="datetimeFigureOut">
               <a:rPr lang="en-US" smtClean="0"/>
               <a:pPr/>
-              <a:t>1/20/2014</a:t>
+              <a:t>1/30/2014</a:t>
             </a:fld>
             <a:endParaRPr lang="en-US"/>
           </a:p>
@@ -8487,10 +8572,2751 @@
           </p:txBody>
         </p:sp>
       </p:grpSp>
+      <p:sp>
+        <p:nvSpPr>
+          <p:cNvPr id="105" name="TextBox 104"/>
+          <p:cNvSpPr txBox="1"/>
+          <p:nvPr/>
+        </p:nvSpPr>
+        <p:spPr>
+          <a:xfrm>
+            <a:off x="423803" y="4822543"/>
+            <a:ext cx="569381" cy="338554"/>
+          </a:xfrm>
+          <a:prstGeom prst="rect">
+            <a:avLst/>
+          </a:prstGeom>
+          <a:noFill/>
+        </p:spPr>
+        <p:txBody>
+          <a:bodyPr wrap="square" rtlCol="0">
+            <a:spAutoFit/>
+          </a:bodyPr>
+          <a:lstStyle/>
+          <a:p>
+            <a:r>
+              <a:rPr lang="en-US" sz="800" dirty="0" smtClean="0"/>
+              <a:t>Animate in-slide</a:t>
+            </a:r>
+            <a:endParaRPr lang="en-SG" sz="800" dirty="0"/>
+          </a:p>
+        </p:txBody>
+      </p:sp>
+      <p:grpSp>
+        <p:nvGrpSpPr>
+          <p:cNvPr id="132" name="Group 131"/>
+          <p:cNvGrpSpPr/>
+          <p:nvPr/>
+        </p:nvGrpSpPr>
+        <p:grpSpPr>
+          <a:xfrm>
+            <a:off x="276083" y="3886200"/>
+            <a:ext cx="838200" cy="838200"/>
+            <a:chOff x="276083" y="3844490"/>
+            <a:chExt cx="838200" cy="838200"/>
+          </a:xfrm>
+        </p:grpSpPr>
+        <p:sp>
+          <p:nvSpPr>
+            <p:cNvPr id="148" name="Rectangle 147"/>
+            <p:cNvSpPr/>
+            <p:nvPr/>
+          </p:nvSpPr>
+          <p:spPr>
+            <a:xfrm>
+              <a:off x="322109" y="3894381"/>
+              <a:ext cx="741789" cy="559065"/>
+            </a:xfrm>
+            <a:prstGeom prst="rect">
+              <a:avLst/>
+            </a:prstGeom>
+            <a:solidFill>
+              <a:schemeClr val="accent6"/>
+            </a:solidFill>
+            <a:ln>
+              <a:solidFill>
+                <a:schemeClr val="bg1"/>
+              </a:solidFill>
+            </a:ln>
+          </p:spPr>
+          <p:style>
+            <a:lnRef idx="2">
+              <a:schemeClr val="accent1">
+                <a:shade val="50000"/>
+              </a:schemeClr>
+            </a:lnRef>
+            <a:fillRef idx="1">
+              <a:schemeClr val="accent1"/>
+            </a:fillRef>
+            <a:effectRef idx="0">
+              <a:schemeClr val="accent1"/>
+            </a:effectRef>
+            <a:fontRef idx="minor">
+              <a:schemeClr val="lt1"/>
+            </a:fontRef>
+          </p:style>
+          <p:txBody>
+            <a:bodyPr rtlCol="0" anchor="ctr"/>
+            <a:lstStyle/>
+            <a:p>
+              <a:pPr algn="ctr"/>
+              <a:endParaRPr lang="en-US"/>
+            </a:p>
+          </p:txBody>
+        </p:sp>
+        <p:sp>
+          <p:nvSpPr>
+            <p:cNvPr id="114" name="Rectangle 113"/>
+            <p:cNvSpPr/>
+            <p:nvPr/>
+          </p:nvSpPr>
+          <p:spPr>
+            <a:xfrm>
+              <a:off x="276083" y="3844490"/>
+              <a:ext cx="838200" cy="838200"/>
+            </a:xfrm>
+            <a:prstGeom prst="rect">
+              <a:avLst/>
+            </a:prstGeom>
+            <a:noFill/>
+            <a:ln>
+              <a:noFill/>
+            </a:ln>
+          </p:spPr>
+          <p:style>
+            <a:lnRef idx="2">
+              <a:schemeClr val="accent1">
+                <a:shade val="50000"/>
+              </a:schemeClr>
+            </a:lnRef>
+            <a:fillRef idx="1">
+              <a:schemeClr val="accent1"/>
+            </a:fillRef>
+            <a:effectRef idx="0">
+              <a:schemeClr val="accent1"/>
+            </a:effectRef>
+            <a:fontRef idx="minor">
+              <a:schemeClr val="lt1"/>
+            </a:fontRef>
+          </p:style>
+          <p:txBody>
+            <a:bodyPr rtlCol="0" anchor="ctr"/>
+            <a:lstStyle/>
+            <a:p>
+              <a:pPr algn="ctr"/>
+              <a:endParaRPr lang="en-SG"/>
+            </a:p>
+          </p:txBody>
+        </p:sp>
+        <p:sp>
+          <p:nvSpPr>
+            <p:cNvPr id="119" name="Flowchart: Connector 118"/>
+            <p:cNvSpPr/>
+            <p:nvPr/>
+          </p:nvSpPr>
+          <p:spPr>
+            <a:xfrm rot="5400000">
+              <a:off x="411597" y="3988277"/>
+              <a:ext cx="113312" cy="113312"/>
+            </a:xfrm>
+            <a:prstGeom prst="flowChartConnector">
+              <a:avLst/>
+            </a:prstGeom>
+            <a:solidFill>
+              <a:schemeClr val="bg1"/>
+            </a:solidFill>
+            <a:ln>
+              <a:solidFill>
+                <a:schemeClr val="bg1"/>
+              </a:solidFill>
+            </a:ln>
+          </p:spPr>
+          <p:style>
+            <a:lnRef idx="2">
+              <a:schemeClr val="accent1">
+                <a:shade val="50000"/>
+              </a:schemeClr>
+            </a:lnRef>
+            <a:fillRef idx="1">
+              <a:schemeClr val="accent1"/>
+            </a:fillRef>
+            <a:effectRef idx="0">
+              <a:schemeClr val="accent1"/>
+            </a:effectRef>
+            <a:fontRef idx="minor">
+              <a:schemeClr val="lt1"/>
+            </a:fontRef>
+          </p:style>
+          <p:txBody>
+            <a:bodyPr rtlCol="0" anchor="ctr"/>
+            <a:lstStyle/>
+            <a:p>
+              <a:pPr algn="ctr"/>
+              <a:endParaRPr lang="en-US"/>
+            </a:p>
+          </p:txBody>
+        </p:sp>
+        <p:sp>
+          <p:nvSpPr>
+            <p:cNvPr id="120" name="Flowchart: Connector 119"/>
+            <p:cNvSpPr/>
+            <p:nvPr/>
+          </p:nvSpPr>
+          <p:spPr>
+            <a:xfrm rot="18937352">
+              <a:off x="892189" y="4066817"/>
+              <a:ext cx="113312" cy="113312"/>
+            </a:xfrm>
+            <a:prstGeom prst="flowChartConnector">
+              <a:avLst/>
+            </a:prstGeom>
+            <a:solidFill>
+              <a:schemeClr val="bg1"/>
+            </a:solidFill>
+            <a:ln>
+              <a:solidFill>
+                <a:schemeClr val="bg1"/>
+              </a:solidFill>
+            </a:ln>
+          </p:spPr>
+          <p:style>
+            <a:lnRef idx="2">
+              <a:schemeClr val="accent1">
+                <a:shade val="50000"/>
+              </a:schemeClr>
+            </a:lnRef>
+            <a:fillRef idx="1">
+              <a:schemeClr val="accent1"/>
+            </a:fillRef>
+            <a:effectRef idx="0">
+              <a:schemeClr val="accent1"/>
+            </a:effectRef>
+            <a:fontRef idx="minor">
+              <a:schemeClr val="lt1"/>
+            </a:fontRef>
+          </p:style>
+          <p:txBody>
+            <a:bodyPr rtlCol="0" anchor="ctr"/>
+            <a:lstStyle/>
+            <a:p>
+              <a:pPr algn="ctr"/>
+              <a:endParaRPr lang="en-US"/>
+            </a:p>
+          </p:txBody>
+        </p:sp>
+        <p:sp>
+          <p:nvSpPr>
+            <p:cNvPr id="99" name="Freeform 98"/>
+            <p:cNvSpPr/>
+            <p:nvPr/>
+          </p:nvSpPr>
+          <p:spPr>
+            <a:xfrm>
+              <a:off x="591699" y="3976411"/>
+              <a:ext cx="262435" cy="94707"/>
+            </a:xfrm>
+            <a:custGeom>
+              <a:avLst/>
+              <a:gdLst>
+                <a:gd name="connsiteX0" fmla="*/ 0 w 365125"/>
+                <a:gd name="connsiteY0" fmla="*/ 0 h 79375"/>
+                <a:gd name="connsiteX1" fmla="*/ 196850 w 365125"/>
+                <a:gd name="connsiteY1" fmla="*/ 0 h 79375"/>
+                <a:gd name="connsiteX2" fmla="*/ 365125 w 365125"/>
+                <a:gd name="connsiteY2" fmla="*/ 79375 h 79375"/>
+                <a:gd name="connsiteX0" fmla="*/ 0 w 365125"/>
+                <a:gd name="connsiteY0" fmla="*/ 5879 h 85254"/>
+                <a:gd name="connsiteX1" fmla="*/ 196850 w 365125"/>
+                <a:gd name="connsiteY1" fmla="*/ 5879 h 85254"/>
+                <a:gd name="connsiteX2" fmla="*/ 365125 w 365125"/>
+                <a:gd name="connsiteY2" fmla="*/ 85254 h 85254"/>
+                <a:gd name="connsiteX0" fmla="*/ 0 w 365125"/>
+                <a:gd name="connsiteY0" fmla="*/ 16459 h 95834"/>
+                <a:gd name="connsiteX1" fmla="*/ 142875 w 365125"/>
+                <a:gd name="connsiteY1" fmla="*/ 3759 h 95834"/>
+                <a:gd name="connsiteX2" fmla="*/ 365125 w 365125"/>
+                <a:gd name="connsiteY2" fmla="*/ 95834 h 95834"/>
+                <a:gd name="connsiteX0" fmla="*/ 0 w 365125"/>
+                <a:gd name="connsiteY0" fmla="*/ 13245 h 92620"/>
+                <a:gd name="connsiteX1" fmla="*/ 142875 w 365125"/>
+                <a:gd name="connsiteY1" fmla="*/ 545 h 92620"/>
+                <a:gd name="connsiteX2" fmla="*/ 365125 w 365125"/>
+                <a:gd name="connsiteY2" fmla="*/ 92620 h 92620"/>
+                <a:gd name="connsiteX0" fmla="*/ 0 w 365125"/>
+                <a:gd name="connsiteY0" fmla="*/ 15332 h 94707"/>
+                <a:gd name="connsiteX1" fmla="*/ 142875 w 365125"/>
+                <a:gd name="connsiteY1" fmla="*/ 2632 h 94707"/>
+                <a:gd name="connsiteX2" fmla="*/ 365125 w 365125"/>
+                <a:gd name="connsiteY2" fmla="*/ 94707 h 94707"/>
+              </a:gdLst>
+              <a:ahLst/>
+              <a:cxnLst>
+                <a:cxn ang="0">
+                  <a:pos x="connsiteX0" y="connsiteY0"/>
+                </a:cxn>
+                <a:cxn ang="0">
+                  <a:pos x="connsiteX1" y="connsiteY1"/>
+                </a:cxn>
+                <a:cxn ang="0">
+                  <a:pos x="connsiteX2" y="connsiteY2"/>
+                </a:cxn>
+              </a:cxnLst>
+              <a:rect l="l" t="t" r="r" b="b"/>
+              <a:pathLst>
+                <a:path w="365125" h="94707">
+                  <a:moveTo>
+                    <a:pt x="0" y="15332"/>
+                  </a:moveTo>
+                  <a:cubicBezTo>
+                    <a:pt x="68792" y="-3718"/>
+                    <a:pt x="75671" y="-1072"/>
+                    <a:pt x="142875" y="2632"/>
+                  </a:cubicBezTo>
+                  <a:cubicBezTo>
+                    <a:pt x="210079" y="6336"/>
+                    <a:pt x="309033" y="68249"/>
+                    <a:pt x="365125" y="94707"/>
+                  </a:cubicBezTo>
+                </a:path>
+              </a:pathLst>
+            </a:custGeom>
+            <a:ln w="38100" cap="rnd">
+              <a:solidFill>
+                <a:srgbClr val="0070C0"/>
+              </a:solidFill>
+              <a:headEnd type="none" w="med" len="med"/>
+              <a:tailEnd type="triangle" w="med" len="med"/>
+            </a:ln>
+          </p:spPr>
+          <p:style>
+            <a:lnRef idx="1">
+              <a:schemeClr val="accent1"/>
+            </a:lnRef>
+            <a:fillRef idx="0">
+              <a:schemeClr val="accent1"/>
+            </a:fillRef>
+            <a:effectRef idx="0">
+              <a:schemeClr val="accent1"/>
+            </a:effectRef>
+            <a:fontRef idx="minor">
+              <a:schemeClr val="tx1"/>
+            </a:fontRef>
+          </p:style>
+          <p:txBody>
+            <a:bodyPr rtlCol="0" anchor="ctr"/>
+            <a:lstStyle/>
+            <a:p>
+              <a:pPr algn="ctr"/>
+              <a:endParaRPr lang="en-US"/>
+            </a:p>
+          </p:txBody>
+        </p:sp>
+        <p:sp>
+          <p:nvSpPr>
+            <p:cNvPr id="123" name="Freeform 122"/>
+            <p:cNvSpPr/>
+            <p:nvPr/>
+          </p:nvSpPr>
+          <p:spPr>
+            <a:xfrm rot="685869">
+              <a:off x="587225" y="4208429"/>
+              <a:ext cx="257326" cy="143906"/>
+            </a:xfrm>
+            <a:custGeom>
+              <a:avLst/>
+              <a:gdLst>
+                <a:gd name="connsiteX0" fmla="*/ 361950 w 361950"/>
+                <a:gd name="connsiteY0" fmla="*/ 0 h 190500"/>
+                <a:gd name="connsiteX1" fmla="*/ 225425 w 361950"/>
+                <a:gd name="connsiteY1" fmla="*/ 146050 h 190500"/>
+                <a:gd name="connsiteX2" fmla="*/ 0 w 361950"/>
+                <a:gd name="connsiteY2" fmla="*/ 190500 h 190500"/>
+                <a:gd name="connsiteX0" fmla="*/ 361950 w 361950"/>
+                <a:gd name="connsiteY0" fmla="*/ 0 h 190500"/>
+                <a:gd name="connsiteX1" fmla="*/ 225425 w 361950"/>
+                <a:gd name="connsiteY1" fmla="*/ 146050 h 190500"/>
+                <a:gd name="connsiteX2" fmla="*/ 0 w 361950"/>
+                <a:gd name="connsiteY2" fmla="*/ 190500 h 190500"/>
+                <a:gd name="connsiteX0" fmla="*/ 361950 w 361950"/>
+                <a:gd name="connsiteY0" fmla="*/ 0 h 190500"/>
+                <a:gd name="connsiteX1" fmla="*/ 225425 w 361950"/>
+                <a:gd name="connsiteY1" fmla="*/ 146050 h 190500"/>
+                <a:gd name="connsiteX2" fmla="*/ 0 w 361950"/>
+                <a:gd name="connsiteY2" fmla="*/ 190500 h 190500"/>
+                <a:gd name="connsiteX0" fmla="*/ 358775 w 358775"/>
+                <a:gd name="connsiteY0" fmla="*/ 0 h 177800"/>
+                <a:gd name="connsiteX1" fmla="*/ 225425 w 358775"/>
+                <a:gd name="connsiteY1" fmla="*/ 133350 h 177800"/>
+                <a:gd name="connsiteX2" fmla="*/ 0 w 358775"/>
+                <a:gd name="connsiteY2" fmla="*/ 177800 h 177800"/>
+                <a:gd name="connsiteX0" fmla="*/ 358775 w 358775"/>
+                <a:gd name="connsiteY0" fmla="*/ 0 h 177800"/>
+                <a:gd name="connsiteX1" fmla="*/ 222250 w 358775"/>
+                <a:gd name="connsiteY1" fmla="*/ 120650 h 177800"/>
+                <a:gd name="connsiteX2" fmla="*/ 0 w 358775"/>
+                <a:gd name="connsiteY2" fmla="*/ 177800 h 177800"/>
+              </a:gdLst>
+              <a:ahLst/>
+              <a:cxnLst>
+                <a:cxn ang="0">
+                  <a:pos x="connsiteX0" y="connsiteY0"/>
+                </a:cxn>
+                <a:cxn ang="0">
+                  <a:pos x="connsiteX1" y="connsiteY1"/>
+                </a:cxn>
+                <a:cxn ang="0">
+                  <a:pos x="connsiteX2" y="connsiteY2"/>
+                </a:cxn>
+              </a:cxnLst>
+              <a:rect l="l" t="t" r="r" b="b"/>
+              <a:pathLst>
+                <a:path w="358775" h="177800">
+                  <a:moveTo>
+                    <a:pt x="358775" y="0"/>
+                  </a:moveTo>
+                  <a:cubicBezTo>
+                    <a:pt x="322792" y="67733"/>
+                    <a:pt x="282046" y="91017"/>
+                    <a:pt x="222250" y="120650"/>
+                  </a:cubicBezTo>
+                  <a:cubicBezTo>
+                    <a:pt x="162454" y="150283"/>
+                    <a:pt x="75142" y="162983"/>
+                    <a:pt x="0" y="177800"/>
+                  </a:cubicBezTo>
+                </a:path>
+              </a:pathLst>
+            </a:custGeom>
+            <a:ln w="38100" cap="rnd">
+              <a:solidFill>
+                <a:srgbClr val="0070C0"/>
+              </a:solidFill>
+              <a:headEnd type="none" w="med" len="med"/>
+              <a:tailEnd type="triangle" w="med" len="med"/>
+            </a:ln>
+          </p:spPr>
+          <p:style>
+            <a:lnRef idx="1">
+              <a:schemeClr val="accent1"/>
+            </a:lnRef>
+            <a:fillRef idx="0">
+              <a:schemeClr val="accent1"/>
+            </a:fillRef>
+            <a:effectRef idx="0">
+              <a:schemeClr val="accent1"/>
+            </a:effectRef>
+            <a:fontRef idx="minor">
+              <a:schemeClr val="tx1"/>
+            </a:fontRef>
+          </p:style>
+          <p:txBody>
+            <a:bodyPr rtlCol="0" anchor="ctr"/>
+            <a:lstStyle/>
+            <a:p>
+              <a:pPr algn="ctr"/>
+              <a:endParaRPr lang="en-US">
+                <a:solidFill>
+                  <a:schemeClr val="tx1"/>
+                </a:solidFill>
+              </a:endParaRPr>
+            </a:p>
+          </p:txBody>
+        </p:sp>
+        <p:sp>
+          <p:nvSpPr>
+            <p:cNvPr id="162" name="Flowchart: Connector 161"/>
+            <p:cNvSpPr/>
+            <p:nvPr/>
+          </p:nvSpPr>
+          <p:spPr>
+            <a:xfrm rot="5400000">
+              <a:off x="420087" y="4242858"/>
+              <a:ext cx="113312" cy="113312"/>
+            </a:xfrm>
+            <a:prstGeom prst="flowChartConnector">
+              <a:avLst/>
+            </a:prstGeom>
+            <a:solidFill>
+              <a:schemeClr val="bg1"/>
+            </a:solidFill>
+            <a:ln>
+              <a:solidFill>
+                <a:schemeClr val="bg1"/>
+              </a:solidFill>
+            </a:ln>
+          </p:spPr>
+          <p:style>
+            <a:lnRef idx="2">
+              <a:schemeClr val="accent1">
+                <a:shade val="50000"/>
+              </a:schemeClr>
+            </a:lnRef>
+            <a:fillRef idx="1">
+              <a:schemeClr val="accent1"/>
+            </a:fillRef>
+            <a:effectRef idx="0">
+              <a:schemeClr val="accent1"/>
+            </a:effectRef>
+            <a:fontRef idx="minor">
+              <a:schemeClr val="lt1"/>
+            </a:fontRef>
+          </p:style>
+          <p:txBody>
+            <a:bodyPr rtlCol="0" anchor="ctr"/>
+            <a:lstStyle/>
+            <a:p>
+              <a:pPr algn="ctr"/>
+              <a:endParaRPr lang="en-US"/>
+            </a:p>
+          </p:txBody>
+        </p:sp>
+      </p:grpSp>
     </p:spTree>
     <p:extLst>
       <p:ext uri="{BB962C8B-B14F-4D97-AF65-F5344CB8AC3E}">
         <p14:creationId xmlns:p14="http://schemas.microsoft.com/office/powerpoint/2010/main" val="2545382946"/>
+      </p:ext>
+    </p:extLst>
+  </p:cSld>
+  <p:clrMapOvr>
+    <a:masterClrMapping/>
+  </p:clrMapOvr>
+  <p:timing>
+    <p:tnLst>
+      <p:par>
+        <p:cTn id="1" dur="indefinite" restart="never" nodeType="tmRoot"/>
+      </p:par>
+    </p:tnLst>
+  </p:timing>
+</p:sld>
+</file>
+
+<file path=ppt/slides/slide2.xml><?xml version="1.0" encoding="utf-8"?>
+<p:sld xmlns:a="http://schemas.openxmlformats.org/drawingml/2006/main" xmlns:r="http://schemas.openxmlformats.org/officeDocument/2006/relationships" xmlns:p="http://schemas.openxmlformats.org/presentationml/2006/main">
+  <p:cSld>
+    <p:bg>
+      <p:bgPr>
+        <a:solidFill>
+          <a:schemeClr val="bg1">
+            <a:lumMod val="95000"/>
+          </a:schemeClr>
+        </a:solidFill>
+        <a:effectLst/>
+      </p:bgPr>
+    </p:bg>
+    <p:spTree>
+      <p:nvGrpSpPr>
+        <p:cNvPr id="1" name=""/>
+        <p:cNvGrpSpPr/>
+        <p:nvPr/>
+      </p:nvGrpSpPr>
+      <p:grpSpPr>
+        <a:xfrm>
+          <a:off x="0" y="0"/>
+          <a:ext cx="0" cy="0"/>
+          <a:chOff x="0" y="0"/>
+          <a:chExt cx="0" cy="0"/>
+        </a:xfrm>
+      </p:grpSpPr>
+      <p:grpSp>
+        <p:nvGrpSpPr>
+          <p:cNvPr id="45" name="Group 44"/>
+          <p:cNvGrpSpPr/>
+          <p:nvPr/>
+        </p:nvGrpSpPr>
+        <p:grpSpPr>
+          <a:xfrm>
+            <a:off x="1434720" y="2626591"/>
+            <a:ext cx="420924" cy="420924"/>
+            <a:chOff x="1434720" y="2626591"/>
+            <a:chExt cx="420924" cy="420924"/>
+          </a:xfrm>
+        </p:grpSpPr>
+        <p:sp>
+          <p:nvSpPr>
+            <p:cNvPr id="12" name="Flowchart: Connector 11"/>
+            <p:cNvSpPr>
+              <a:spLocks noChangeAspect="1"/>
+            </p:cNvSpPr>
+            <p:nvPr/>
+          </p:nvSpPr>
+          <p:spPr>
+            <a:xfrm>
+              <a:off x="1434720" y="2626591"/>
+              <a:ext cx="420924" cy="420924"/>
+            </a:xfrm>
+            <a:prstGeom prst="flowChartConnector">
+              <a:avLst/>
+            </a:prstGeom>
+            <a:solidFill>
+              <a:srgbClr val="0070C0"/>
+            </a:solidFill>
+            <a:ln>
+              <a:solidFill>
+                <a:srgbClr val="0070C0"/>
+              </a:solidFill>
+            </a:ln>
+          </p:spPr>
+          <p:style>
+            <a:lnRef idx="2">
+              <a:schemeClr val="accent1">
+                <a:shade val="50000"/>
+              </a:schemeClr>
+            </a:lnRef>
+            <a:fillRef idx="1">
+              <a:schemeClr val="accent1"/>
+            </a:fillRef>
+            <a:effectRef idx="0">
+              <a:schemeClr val="accent1"/>
+            </a:effectRef>
+            <a:fontRef idx="minor">
+              <a:schemeClr val="lt1"/>
+            </a:fontRef>
+          </p:style>
+          <p:txBody>
+            <a:bodyPr wrap="none" lIns="0" tIns="0" rIns="0" bIns="0" rtlCol="0" anchor="ctr"/>
+            <a:lstStyle/>
+            <a:p>
+              <a:pPr algn="ctr"/>
+              <a:endParaRPr lang="en-SG" b="1" dirty="0"/>
+            </a:p>
+          </p:txBody>
+        </p:sp>
+        <p:sp>
+          <p:nvSpPr>
+            <p:cNvPr id="13" name="Plus 12"/>
+            <p:cNvSpPr>
+              <a:spLocks noChangeAspect="1"/>
+            </p:cNvSpPr>
+            <p:nvPr/>
+          </p:nvSpPr>
+          <p:spPr>
+            <a:xfrm>
+              <a:off x="1492722" y="2687385"/>
+              <a:ext cx="304920" cy="304920"/>
+            </a:xfrm>
+            <a:prstGeom prst="mathPlus">
+              <a:avLst/>
+            </a:prstGeom>
+            <a:solidFill>
+              <a:schemeClr val="bg1"/>
+            </a:solidFill>
+            <a:ln>
+              <a:solidFill>
+                <a:schemeClr val="bg1"/>
+              </a:solidFill>
+            </a:ln>
+          </p:spPr>
+          <p:style>
+            <a:lnRef idx="2">
+              <a:schemeClr val="accent1">
+                <a:shade val="50000"/>
+              </a:schemeClr>
+            </a:lnRef>
+            <a:fillRef idx="1">
+              <a:schemeClr val="accent1"/>
+            </a:fillRef>
+            <a:effectRef idx="0">
+              <a:schemeClr val="accent1"/>
+            </a:effectRef>
+            <a:fontRef idx="minor">
+              <a:schemeClr val="lt1"/>
+            </a:fontRef>
+          </p:style>
+          <p:txBody>
+            <a:bodyPr rtlCol="0" anchor="ctr"/>
+            <a:lstStyle/>
+            <a:p>
+              <a:pPr algn="ctr"/>
+              <a:endParaRPr lang="en-US"/>
+            </a:p>
+          </p:txBody>
+        </p:sp>
+      </p:grpSp>
+      <p:grpSp>
+        <p:nvGrpSpPr>
+          <p:cNvPr id="46" name="Group 45"/>
+          <p:cNvGrpSpPr/>
+          <p:nvPr/>
+        </p:nvGrpSpPr>
+        <p:grpSpPr>
+          <a:xfrm>
+            <a:off x="2518105" y="2630921"/>
+            <a:ext cx="420924" cy="420924"/>
+            <a:chOff x="2518105" y="2630921"/>
+            <a:chExt cx="420924" cy="420924"/>
+          </a:xfrm>
+        </p:grpSpPr>
+        <p:sp>
+          <p:nvSpPr>
+            <p:cNvPr id="21" name="Flowchart: Connector 20"/>
+            <p:cNvSpPr>
+              <a:spLocks noChangeAspect="1"/>
+            </p:cNvSpPr>
+            <p:nvPr/>
+          </p:nvSpPr>
+          <p:spPr>
+            <a:xfrm>
+              <a:off x="2518105" y="2630921"/>
+              <a:ext cx="420924" cy="420924"/>
+            </a:xfrm>
+            <a:prstGeom prst="flowChartConnector">
+              <a:avLst/>
+            </a:prstGeom>
+            <a:solidFill>
+              <a:srgbClr val="0070C0"/>
+            </a:solidFill>
+            <a:ln>
+              <a:solidFill>
+                <a:srgbClr val="0070C0"/>
+              </a:solidFill>
+            </a:ln>
+          </p:spPr>
+          <p:style>
+            <a:lnRef idx="2">
+              <a:schemeClr val="accent1">
+                <a:shade val="50000"/>
+              </a:schemeClr>
+            </a:lnRef>
+            <a:fillRef idx="1">
+              <a:schemeClr val="accent1"/>
+            </a:fillRef>
+            <a:effectRef idx="0">
+              <a:schemeClr val="accent1"/>
+            </a:effectRef>
+            <a:fontRef idx="minor">
+              <a:schemeClr val="lt1"/>
+            </a:fontRef>
+          </p:style>
+          <p:txBody>
+            <a:bodyPr wrap="none" lIns="0" tIns="0" rIns="0" bIns="0" rtlCol="0" anchor="ctr"/>
+            <a:lstStyle/>
+            <a:p>
+              <a:pPr algn="ctr"/>
+              <a:endParaRPr lang="en-SG" b="1" dirty="0"/>
+            </a:p>
+          </p:txBody>
+        </p:sp>
+        <p:sp>
+          <p:nvSpPr>
+            <p:cNvPr id="22" name="Arc 21"/>
+            <p:cNvSpPr>
+              <a:spLocks noChangeAspect="1"/>
+            </p:cNvSpPr>
+            <p:nvPr/>
+          </p:nvSpPr>
+          <p:spPr>
+            <a:xfrm>
+              <a:off x="2595445" y="2723622"/>
+              <a:ext cx="246198" cy="246198"/>
+            </a:xfrm>
+            <a:prstGeom prst="arc">
+              <a:avLst>
+                <a:gd name="adj1" fmla="val 372342"/>
+                <a:gd name="adj2" fmla="val 14724329"/>
+              </a:avLst>
+            </a:prstGeom>
+            <a:noFill/>
+            <a:ln w="76200" cap="sq">
+              <a:solidFill>
+                <a:schemeClr val="bg1"/>
+              </a:solidFill>
+              <a:headEnd type="none" w="med" len="med"/>
+              <a:tailEnd type="none" w="med" len="med"/>
+            </a:ln>
+          </p:spPr>
+          <p:style>
+            <a:lnRef idx="1">
+              <a:schemeClr val="accent1"/>
+            </a:lnRef>
+            <a:fillRef idx="0">
+              <a:schemeClr val="accent1"/>
+            </a:fillRef>
+            <a:effectRef idx="0">
+              <a:schemeClr val="accent1"/>
+            </a:effectRef>
+            <a:fontRef idx="minor">
+              <a:schemeClr val="tx1"/>
+            </a:fontRef>
+          </p:style>
+          <p:txBody>
+            <a:bodyPr rtlCol="0" anchor="ctr"/>
+            <a:lstStyle/>
+            <a:p>
+              <a:pPr algn="ctr"/>
+              <a:endParaRPr lang="en-SG"/>
+            </a:p>
+          </p:txBody>
+        </p:sp>
+        <p:sp>
+          <p:nvSpPr>
+            <p:cNvPr id="23" name="Isosceles Triangle 22"/>
+            <p:cNvSpPr/>
+            <p:nvPr/>
+          </p:nvSpPr>
+          <p:spPr>
+            <a:xfrm>
+              <a:off x="2743576" y="2773165"/>
+              <a:ext cx="187446" cy="111564"/>
+            </a:xfrm>
+            <a:prstGeom prst="triangle">
+              <a:avLst/>
+            </a:prstGeom>
+            <a:solidFill>
+              <a:schemeClr val="bg1"/>
+            </a:solidFill>
+            <a:ln>
+              <a:noFill/>
+            </a:ln>
+          </p:spPr>
+          <p:style>
+            <a:lnRef idx="2">
+              <a:schemeClr val="accent1">
+                <a:shade val="50000"/>
+              </a:schemeClr>
+            </a:lnRef>
+            <a:fillRef idx="1">
+              <a:schemeClr val="accent1"/>
+            </a:fillRef>
+            <a:effectRef idx="0">
+              <a:schemeClr val="accent1"/>
+            </a:effectRef>
+            <a:fontRef idx="minor">
+              <a:schemeClr val="lt1"/>
+            </a:fontRef>
+          </p:style>
+          <p:txBody>
+            <a:bodyPr rtlCol="0" anchor="ctr"/>
+            <a:lstStyle/>
+            <a:p>
+              <a:pPr algn="ctr"/>
+              <a:endParaRPr lang="en-SG"/>
+            </a:p>
+          </p:txBody>
+        </p:sp>
+      </p:grpSp>
+      <p:grpSp>
+        <p:nvGrpSpPr>
+          <p:cNvPr id="47" name="Group 46"/>
+          <p:cNvGrpSpPr/>
+          <p:nvPr/>
+        </p:nvGrpSpPr>
+        <p:grpSpPr>
+          <a:xfrm>
+            <a:off x="5638800" y="5988113"/>
+            <a:ext cx="420924" cy="420924"/>
+            <a:chOff x="3582778" y="2643661"/>
+            <a:chExt cx="420924" cy="420924"/>
+          </a:xfrm>
+        </p:grpSpPr>
+        <p:sp>
+          <p:nvSpPr>
+            <p:cNvPr id="25" name="Flowchart: Connector 24"/>
+            <p:cNvSpPr>
+              <a:spLocks noChangeAspect="1"/>
+            </p:cNvSpPr>
+            <p:nvPr/>
+          </p:nvSpPr>
+          <p:spPr>
+            <a:xfrm>
+              <a:off x="3582778" y="2643661"/>
+              <a:ext cx="420924" cy="420924"/>
+            </a:xfrm>
+            <a:prstGeom prst="flowChartConnector">
+              <a:avLst/>
+            </a:prstGeom>
+            <a:solidFill>
+              <a:srgbClr val="0070C0"/>
+            </a:solidFill>
+            <a:ln>
+              <a:solidFill>
+                <a:srgbClr val="0070C0"/>
+              </a:solidFill>
+            </a:ln>
+          </p:spPr>
+          <p:style>
+            <a:lnRef idx="2">
+              <a:schemeClr val="accent1">
+                <a:shade val="50000"/>
+              </a:schemeClr>
+            </a:lnRef>
+            <a:fillRef idx="1">
+              <a:schemeClr val="accent1"/>
+            </a:fillRef>
+            <a:effectRef idx="0">
+              <a:schemeClr val="accent1"/>
+            </a:effectRef>
+            <a:fontRef idx="minor">
+              <a:schemeClr val="lt1"/>
+            </a:fontRef>
+          </p:style>
+          <p:txBody>
+            <a:bodyPr wrap="none" lIns="0" tIns="0" rIns="0" bIns="0" rtlCol="0" anchor="ctr"/>
+            <a:lstStyle/>
+            <a:p>
+              <a:pPr algn="ctr"/>
+              <a:endParaRPr lang="en-SG" b="1" dirty="0"/>
+            </a:p>
+          </p:txBody>
+        </p:sp>
+        <p:cxnSp>
+          <p:nvCxnSpPr>
+            <p:cNvPr id="27" name="Straight Connector 26"/>
+            <p:cNvCxnSpPr/>
+            <p:nvPr/>
+          </p:nvCxnSpPr>
+          <p:spPr>
+            <a:xfrm>
+              <a:off x="3793240" y="2693787"/>
+              <a:ext cx="0" cy="153069"/>
+            </a:xfrm>
+            <a:prstGeom prst="line">
+              <a:avLst/>
+            </a:prstGeom>
+            <a:ln w="57150" cap="rnd">
+              <a:solidFill>
+                <a:schemeClr val="bg1"/>
+              </a:solidFill>
+            </a:ln>
+          </p:spPr>
+          <p:style>
+            <a:lnRef idx="1">
+              <a:schemeClr val="accent1"/>
+            </a:lnRef>
+            <a:fillRef idx="0">
+              <a:schemeClr val="accent1"/>
+            </a:fillRef>
+            <a:effectRef idx="0">
+              <a:schemeClr val="accent1"/>
+            </a:effectRef>
+            <a:fontRef idx="minor">
+              <a:schemeClr val="tx1"/>
+            </a:fontRef>
+          </p:style>
+        </p:cxnSp>
+        <p:cxnSp>
+          <p:nvCxnSpPr>
+            <p:cNvPr id="28" name="Straight Connector 27"/>
+            <p:cNvCxnSpPr/>
+            <p:nvPr/>
+          </p:nvCxnSpPr>
+          <p:spPr>
+            <a:xfrm>
+              <a:off x="3793017" y="2854123"/>
+              <a:ext cx="101645" cy="37477"/>
+            </a:xfrm>
+            <a:prstGeom prst="line">
+              <a:avLst/>
+            </a:prstGeom>
+            <a:ln w="57150" cap="rnd">
+              <a:solidFill>
+                <a:schemeClr val="bg1"/>
+              </a:solidFill>
+            </a:ln>
+          </p:spPr>
+          <p:style>
+            <a:lnRef idx="1">
+              <a:schemeClr val="accent1"/>
+            </a:lnRef>
+            <a:fillRef idx="0">
+              <a:schemeClr val="accent1"/>
+            </a:fillRef>
+            <a:effectRef idx="0">
+              <a:schemeClr val="accent1"/>
+            </a:effectRef>
+            <a:fontRef idx="minor">
+              <a:schemeClr val="tx1"/>
+            </a:fontRef>
+          </p:style>
+        </p:cxnSp>
+      </p:grpSp>
+      <p:grpSp>
+        <p:nvGrpSpPr>
+          <p:cNvPr id="42" name="Group 41"/>
+          <p:cNvGrpSpPr/>
+          <p:nvPr/>
+        </p:nvGrpSpPr>
+        <p:grpSpPr>
+          <a:xfrm>
+            <a:off x="6488351" y="5943600"/>
+            <a:ext cx="420624" cy="420624"/>
+            <a:chOff x="2174821" y="3581400"/>
+            <a:chExt cx="420624" cy="420624"/>
+          </a:xfrm>
+        </p:grpSpPr>
+        <p:sp>
+          <p:nvSpPr>
+            <p:cNvPr id="38" name="Rectangle 37"/>
+            <p:cNvSpPr/>
+            <p:nvPr/>
+          </p:nvSpPr>
+          <p:spPr>
+            <a:xfrm rot="5400000">
+              <a:off x="2268702" y="3672494"/>
+              <a:ext cx="232105" cy="232105"/>
+            </a:xfrm>
+            <a:prstGeom prst="rect">
+              <a:avLst/>
+            </a:prstGeom>
+            <a:solidFill>
+              <a:srgbClr val="FF6600"/>
+            </a:solidFill>
+            <a:ln>
+              <a:solidFill>
+                <a:srgbClr val="FF6600"/>
+              </a:solidFill>
+            </a:ln>
+          </p:spPr>
+          <p:style>
+            <a:lnRef idx="2">
+              <a:schemeClr val="accent1">
+                <a:shade val="50000"/>
+              </a:schemeClr>
+            </a:lnRef>
+            <a:fillRef idx="1">
+              <a:schemeClr val="accent1"/>
+            </a:fillRef>
+            <a:effectRef idx="0">
+              <a:schemeClr val="accent1"/>
+            </a:effectRef>
+            <a:fontRef idx="minor">
+              <a:schemeClr val="lt1"/>
+            </a:fontRef>
+          </p:style>
+          <p:txBody>
+            <a:bodyPr rtlCol="0" anchor="ctr"/>
+            <a:lstStyle/>
+            <a:p>
+              <a:pPr algn="ctr"/>
+              <a:endParaRPr lang="en-US"/>
+            </a:p>
+          </p:txBody>
+        </p:sp>
+        <p:sp>
+          <p:nvSpPr>
+            <p:cNvPr id="37" name="Right Triangle 36"/>
+            <p:cNvSpPr/>
+            <p:nvPr/>
+          </p:nvSpPr>
+          <p:spPr>
+            <a:xfrm rot="16200000">
+              <a:off x="2174821" y="3581400"/>
+              <a:ext cx="420624" cy="420624"/>
+            </a:xfrm>
+            <a:prstGeom prst="rtTriangle">
+              <a:avLst/>
+            </a:prstGeom>
+            <a:solidFill>
+              <a:srgbClr val="0070C0">
+                <a:alpha val="81000"/>
+              </a:srgbClr>
+            </a:solidFill>
+            <a:ln>
+              <a:noFill/>
+            </a:ln>
+          </p:spPr>
+          <p:style>
+            <a:lnRef idx="2">
+              <a:schemeClr val="accent1">
+                <a:shade val="50000"/>
+              </a:schemeClr>
+            </a:lnRef>
+            <a:fillRef idx="1">
+              <a:schemeClr val="accent1"/>
+            </a:fillRef>
+            <a:effectRef idx="0">
+              <a:schemeClr val="accent1"/>
+            </a:effectRef>
+            <a:fontRef idx="minor">
+              <a:schemeClr val="lt1"/>
+            </a:fontRef>
+          </p:style>
+          <p:txBody>
+            <a:bodyPr wrap="none" lIns="0" tIns="0" rIns="0" bIns="0" rtlCol="0" anchor="ctr"/>
+            <a:lstStyle/>
+            <a:p>
+              <a:pPr algn="ctr"/>
+              <a:endParaRPr lang="en-US" b="1"/>
+            </a:p>
+          </p:txBody>
+        </p:sp>
+      </p:grpSp>
+      <p:grpSp>
+        <p:nvGrpSpPr>
+          <p:cNvPr id="1025" name="Group 1024"/>
+          <p:cNvGrpSpPr/>
+          <p:nvPr/>
+        </p:nvGrpSpPr>
+        <p:grpSpPr>
+          <a:xfrm>
+            <a:off x="3599690" y="2662549"/>
+            <a:ext cx="420624" cy="420624"/>
+            <a:chOff x="3276600" y="3645701"/>
+            <a:chExt cx="420624" cy="420624"/>
+          </a:xfrm>
+        </p:grpSpPr>
+        <p:sp>
+          <p:nvSpPr>
+            <p:cNvPr id="43" name="Rectangle 42"/>
+            <p:cNvSpPr/>
+            <p:nvPr/>
+          </p:nvSpPr>
+          <p:spPr>
+            <a:xfrm rot="10800000">
+              <a:off x="3276600" y="3645701"/>
+              <a:ext cx="420624" cy="420624"/>
+            </a:xfrm>
+            <a:prstGeom prst="rect">
+              <a:avLst/>
+            </a:prstGeom>
+            <a:solidFill>
+              <a:srgbClr val="0070C0"/>
+            </a:solidFill>
+            <a:ln>
+              <a:noFill/>
+            </a:ln>
+          </p:spPr>
+          <p:style>
+            <a:lnRef idx="2">
+              <a:schemeClr val="accent1">
+                <a:shade val="50000"/>
+              </a:schemeClr>
+            </a:lnRef>
+            <a:fillRef idx="1">
+              <a:schemeClr val="accent1"/>
+            </a:fillRef>
+            <a:effectRef idx="0">
+              <a:schemeClr val="accent1"/>
+            </a:effectRef>
+            <a:fontRef idx="minor">
+              <a:schemeClr val="lt1"/>
+            </a:fontRef>
+          </p:style>
+          <p:txBody>
+            <a:bodyPr wrap="none" lIns="0" tIns="0" rIns="0" bIns="0" rtlCol="0" anchor="ctr"/>
+            <a:lstStyle/>
+            <a:p>
+              <a:pPr algn="ctr"/>
+              <a:endParaRPr lang="en-US" b="1"/>
+            </a:p>
+          </p:txBody>
+        </p:sp>
+        <p:sp>
+          <p:nvSpPr>
+            <p:cNvPr id="44" name="Flowchart: Connector 43"/>
+            <p:cNvSpPr/>
+            <p:nvPr/>
+          </p:nvSpPr>
+          <p:spPr>
+            <a:xfrm>
+              <a:off x="3360152" y="3649095"/>
+              <a:ext cx="308933" cy="321475"/>
+            </a:xfrm>
+            <a:prstGeom prst="flowChartConnector">
+              <a:avLst/>
+            </a:prstGeom>
+            <a:solidFill>
+              <a:schemeClr val="bg1"/>
+            </a:solidFill>
+            <a:ln>
+              <a:noFill/>
+            </a:ln>
+            <a:effectLst>
+              <a:softEdge rad="63500"/>
+            </a:effectLst>
+          </p:spPr>
+          <p:style>
+            <a:lnRef idx="2">
+              <a:schemeClr val="accent1">
+                <a:shade val="50000"/>
+              </a:schemeClr>
+            </a:lnRef>
+            <a:fillRef idx="1">
+              <a:schemeClr val="accent1"/>
+            </a:fillRef>
+            <a:effectRef idx="0">
+              <a:schemeClr val="accent1"/>
+            </a:effectRef>
+            <a:fontRef idx="minor">
+              <a:schemeClr val="lt1"/>
+            </a:fontRef>
+          </p:style>
+          <p:txBody>
+            <a:bodyPr rtlCol="0" anchor="ctr"/>
+            <a:lstStyle/>
+            <a:p>
+              <a:pPr algn="ctr"/>
+              <a:endParaRPr lang="en-US"/>
+            </a:p>
+          </p:txBody>
+        </p:sp>
+      </p:grpSp>
+      <p:grpSp>
+        <p:nvGrpSpPr>
+          <p:cNvPr id="1024" name="Group 1023"/>
+          <p:cNvGrpSpPr/>
+          <p:nvPr/>
+        </p:nvGrpSpPr>
+        <p:grpSpPr>
+          <a:xfrm>
+            <a:off x="7402751" y="5988113"/>
+            <a:ext cx="431961" cy="417004"/>
+            <a:chOff x="2489468" y="4419599"/>
+            <a:chExt cx="431961" cy="417004"/>
+          </a:xfrm>
+        </p:grpSpPr>
+        <p:sp>
+          <p:nvSpPr>
+            <p:cNvPr id="49" name="Rectangle 48"/>
+            <p:cNvSpPr/>
+            <p:nvPr/>
+          </p:nvSpPr>
+          <p:spPr>
+            <a:xfrm rot="10800000">
+              <a:off x="2489468" y="4419599"/>
+              <a:ext cx="325984" cy="251587"/>
+            </a:xfrm>
+            <a:prstGeom prst="rect">
+              <a:avLst/>
+            </a:prstGeom>
+            <a:solidFill>
+              <a:srgbClr val="0070C0"/>
+            </a:solidFill>
+            <a:ln>
+              <a:solidFill>
+                <a:schemeClr val="bg1"/>
+              </a:solidFill>
+            </a:ln>
+          </p:spPr>
+          <p:style>
+            <a:lnRef idx="2">
+              <a:schemeClr val="accent1">
+                <a:shade val="50000"/>
+              </a:schemeClr>
+            </a:lnRef>
+            <a:fillRef idx="1">
+              <a:schemeClr val="accent1"/>
+            </a:fillRef>
+            <a:effectRef idx="0">
+              <a:schemeClr val="accent1"/>
+            </a:effectRef>
+            <a:fontRef idx="minor">
+              <a:schemeClr val="lt1"/>
+            </a:fontRef>
+          </p:style>
+          <p:txBody>
+            <a:bodyPr wrap="none" lIns="0" tIns="0" rIns="0" bIns="0" rtlCol="0" anchor="ctr"/>
+            <a:lstStyle/>
+            <a:p>
+              <a:pPr algn="ctr"/>
+              <a:endParaRPr lang="en-US" b="1"/>
+            </a:p>
+          </p:txBody>
+        </p:sp>
+        <p:sp>
+          <p:nvSpPr>
+            <p:cNvPr id="51" name="Rectangle 50"/>
+            <p:cNvSpPr/>
+            <p:nvPr/>
+          </p:nvSpPr>
+          <p:spPr>
+            <a:xfrm rot="10800000">
+              <a:off x="2542456" y="4502308"/>
+              <a:ext cx="325984" cy="251587"/>
+            </a:xfrm>
+            <a:prstGeom prst="rect">
+              <a:avLst/>
+            </a:prstGeom>
+            <a:solidFill>
+              <a:srgbClr val="0070C0"/>
+            </a:solidFill>
+            <a:ln>
+              <a:solidFill>
+                <a:schemeClr val="bg1"/>
+              </a:solidFill>
+            </a:ln>
+          </p:spPr>
+          <p:style>
+            <a:lnRef idx="2">
+              <a:schemeClr val="accent1">
+                <a:shade val="50000"/>
+              </a:schemeClr>
+            </a:lnRef>
+            <a:fillRef idx="1">
+              <a:schemeClr val="accent1"/>
+            </a:fillRef>
+            <a:effectRef idx="0">
+              <a:schemeClr val="accent1"/>
+            </a:effectRef>
+            <a:fontRef idx="minor">
+              <a:schemeClr val="lt1"/>
+            </a:fontRef>
+          </p:style>
+          <p:txBody>
+            <a:bodyPr wrap="none" lIns="0" tIns="0" rIns="0" bIns="0" rtlCol="0" anchor="ctr"/>
+            <a:lstStyle/>
+            <a:p>
+              <a:pPr algn="ctr"/>
+              <a:endParaRPr lang="en-US" b="1"/>
+            </a:p>
+          </p:txBody>
+        </p:sp>
+        <p:sp>
+          <p:nvSpPr>
+            <p:cNvPr id="52" name="Rectangle 51"/>
+            <p:cNvSpPr/>
+            <p:nvPr/>
+          </p:nvSpPr>
+          <p:spPr>
+            <a:xfrm rot="10800000">
+              <a:off x="2595445" y="4585016"/>
+              <a:ext cx="325984" cy="251587"/>
+            </a:xfrm>
+            <a:prstGeom prst="rect">
+              <a:avLst/>
+            </a:prstGeom>
+            <a:solidFill>
+              <a:srgbClr val="0070C0"/>
+            </a:solidFill>
+            <a:ln>
+              <a:solidFill>
+                <a:schemeClr val="bg1"/>
+              </a:solidFill>
+            </a:ln>
+          </p:spPr>
+          <p:style>
+            <a:lnRef idx="2">
+              <a:schemeClr val="accent1">
+                <a:shade val="50000"/>
+              </a:schemeClr>
+            </a:lnRef>
+            <a:fillRef idx="1">
+              <a:schemeClr val="accent1"/>
+            </a:fillRef>
+            <a:effectRef idx="0">
+              <a:schemeClr val="accent1"/>
+            </a:effectRef>
+            <a:fontRef idx="minor">
+              <a:schemeClr val="lt1"/>
+            </a:fontRef>
+          </p:style>
+          <p:txBody>
+            <a:bodyPr wrap="none" lIns="0" tIns="0" rIns="0" bIns="0" rtlCol="0" anchor="ctr"/>
+            <a:lstStyle/>
+            <a:p>
+              <a:pPr algn="ctr"/>
+              <a:endParaRPr lang="en-US" b="1"/>
+            </a:p>
+          </p:txBody>
+        </p:sp>
+      </p:grpSp>
+      <p:grpSp>
+        <p:nvGrpSpPr>
+          <p:cNvPr id="63" name="Group 62"/>
+          <p:cNvGrpSpPr/>
+          <p:nvPr/>
+        </p:nvGrpSpPr>
+        <p:grpSpPr>
+          <a:xfrm>
+            <a:off x="8164751" y="6087546"/>
+            <a:ext cx="420625" cy="187704"/>
+            <a:chOff x="3276597" y="4572000"/>
+            <a:chExt cx="420625" cy="187704"/>
+          </a:xfrm>
+        </p:grpSpPr>
+        <p:sp>
+          <p:nvSpPr>
+            <p:cNvPr id="56" name="Flowchart: Decision 55"/>
+            <p:cNvSpPr/>
+            <p:nvPr/>
+          </p:nvSpPr>
+          <p:spPr>
+            <a:xfrm>
+              <a:off x="3276597" y="4572000"/>
+              <a:ext cx="420625" cy="187704"/>
+            </a:xfrm>
+            <a:custGeom>
+              <a:avLst/>
+              <a:gdLst>
+                <a:gd name="connsiteX0" fmla="*/ 0 w 10000"/>
+                <a:gd name="connsiteY0" fmla="*/ 5000 h 10000"/>
+                <a:gd name="connsiteX1" fmla="*/ 5000 w 10000"/>
+                <a:gd name="connsiteY1" fmla="*/ 0 h 10000"/>
+                <a:gd name="connsiteX2" fmla="*/ 10000 w 10000"/>
+                <a:gd name="connsiteY2" fmla="*/ 5000 h 10000"/>
+                <a:gd name="connsiteX3" fmla="*/ 5000 w 10000"/>
+                <a:gd name="connsiteY3" fmla="*/ 10000 h 10000"/>
+                <a:gd name="connsiteX4" fmla="*/ 0 w 10000"/>
+                <a:gd name="connsiteY4" fmla="*/ 5000 h 10000"/>
+                <a:gd name="connsiteX0" fmla="*/ 0 w 10000"/>
+                <a:gd name="connsiteY0" fmla="*/ 5000 h 10000"/>
+                <a:gd name="connsiteX1" fmla="*/ 5000 w 10000"/>
+                <a:gd name="connsiteY1" fmla="*/ 0 h 10000"/>
+                <a:gd name="connsiteX2" fmla="*/ 10000 w 10000"/>
+                <a:gd name="connsiteY2" fmla="*/ 5000 h 10000"/>
+                <a:gd name="connsiteX3" fmla="*/ 5000 w 10000"/>
+                <a:gd name="connsiteY3" fmla="*/ 10000 h 10000"/>
+                <a:gd name="connsiteX4" fmla="*/ 0 w 10000"/>
+                <a:gd name="connsiteY4" fmla="*/ 5000 h 10000"/>
+                <a:gd name="connsiteX0" fmla="*/ 0 w 10000"/>
+                <a:gd name="connsiteY0" fmla="*/ 5000 h 10335"/>
+                <a:gd name="connsiteX1" fmla="*/ 5000 w 10000"/>
+                <a:gd name="connsiteY1" fmla="*/ 0 h 10335"/>
+                <a:gd name="connsiteX2" fmla="*/ 10000 w 10000"/>
+                <a:gd name="connsiteY2" fmla="*/ 5000 h 10335"/>
+                <a:gd name="connsiteX3" fmla="*/ 5000 w 10000"/>
+                <a:gd name="connsiteY3" fmla="*/ 10000 h 10335"/>
+                <a:gd name="connsiteX4" fmla="*/ 0 w 10000"/>
+                <a:gd name="connsiteY4" fmla="*/ 5000 h 10335"/>
+                <a:gd name="connsiteX0" fmla="*/ 0 w 10000"/>
+                <a:gd name="connsiteY0" fmla="*/ 5000 h 10000"/>
+                <a:gd name="connsiteX1" fmla="*/ 5000 w 10000"/>
+                <a:gd name="connsiteY1" fmla="*/ 0 h 10000"/>
+                <a:gd name="connsiteX2" fmla="*/ 10000 w 10000"/>
+                <a:gd name="connsiteY2" fmla="*/ 5000 h 10000"/>
+                <a:gd name="connsiteX3" fmla="*/ 5000 w 10000"/>
+                <a:gd name="connsiteY3" fmla="*/ 10000 h 10000"/>
+                <a:gd name="connsiteX4" fmla="*/ 0 w 10000"/>
+                <a:gd name="connsiteY4" fmla="*/ 5000 h 10000"/>
+                <a:gd name="connsiteX0" fmla="*/ 0 w 10000"/>
+                <a:gd name="connsiteY0" fmla="*/ 5000 h 10000"/>
+                <a:gd name="connsiteX1" fmla="*/ 5000 w 10000"/>
+                <a:gd name="connsiteY1" fmla="*/ 0 h 10000"/>
+                <a:gd name="connsiteX2" fmla="*/ 10000 w 10000"/>
+                <a:gd name="connsiteY2" fmla="*/ 5000 h 10000"/>
+                <a:gd name="connsiteX3" fmla="*/ 5000 w 10000"/>
+                <a:gd name="connsiteY3" fmla="*/ 10000 h 10000"/>
+                <a:gd name="connsiteX4" fmla="*/ 0 w 10000"/>
+                <a:gd name="connsiteY4" fmla="*/ 5000 h 10000"/>
+                <a:gd name="connsiteX0" fmla="*/ 0 w 10000"/>
+                <a:gd name="connsiteY0" fmla="*/ 5000 h 10000"/>
+                <a:gd name="connsiteX1" fmla="*/ 5000 w 10000"/>
+                <a:gd name="connsiteY1" fmla="*/ 0 h 10000"/>
+                <a:gd name="connsiteX2" fmla="*/ 10000 w 10000"/>
+                <a:gd name="connsiteY2" fmla="*/ 5000 h 10000"/>
+                <a:gd name="connsiteX3" fmla="*/ 5000 w 10000"/>
+                <a:gd name="connsiteY3" fmla="*/ 10000 h 10000"/>
+                <a:gd name="connsiteX4" fmla="*/ 0 w 10000"/>
+                <a:gd name="connsiteY4" fmla="*/ 5000 h 10000"/>
+                <a:gd name="connsiteX0" fmla="*/ 0 w 10000"/>
+                <a:gd name="connsiteY0" fmla="*/ 5000 h 10000"/>
+                <a:gd name="connsiteX1" fmla="*/ 5000 w 10000"/>
+                <a:gd name="connsiteY1" fmla="*/ 0 h 10000"/>
+                <a:gd name="connsiteX2" fmla="*/ 10000 w 10000"/>
+                <a:gd name="connsiteY2" fmla="*/ 5000 h 10000"/>
+                <a:gd name="connsiteX3" fmla="*/ 5000 w 10000"/>
+                <a:gd name="connsiteY3" fmla="*/ 10000 h 10000"/>
+                <a:gd name="connsiteX4" fmla="*/ 0 w 10000"/>
+                <a:gd name="connsiteY4" fmla="*/ 5000 h 10000"/>
+                <a:gd name="connsiteX0" fmla="*/ 0 w 10000"/>
+                <a:gd name="connsiteY0" fmla="*/ 5000 h 7803"/>
+                <a:gd name="connsiteX1" fmla="*/ 5000 w 10000"/>
+                <a:gd name="connsiteY1" fmla="*/ 0 h 7803"/>
+                <a:gd name="connsiteX2" fmla="*/ 10000 w 10000"/>
+                <a:gd name="connsiteY2" fmla="*/ 5000 h 7803"/>
+                <a:gd name="connsiteX3" fmla="*/ 5057 w 10000"/>
+                <a:gd name="connsiteY3" fmla="*/ 7803 h 7803"/>
+                <a:gd name="connsiteX4" fmla="*/ 0 w 10000"/>
+                <a:gd name="connsiteY4" fmla="*/ 5000 h 7803"/>
+                <a:gd name="connsiteX0" fmla="*/ 0 w 10000"/>
+                <a:gd name="connsiteY0" fmla="*/ 3484 h 7076"/>
+                <a:gd name="connsiteX1" fmla="*/ 5000 w 10000"/>
+                <a:gd name="connsiteY1" fmla="*/ 0 h 7076"/>
+                <a:gd name="connsiteX2" fmla="*/ 10000 w 10000"/>
+                <a:gd name="connsiteY2" fmla="*/ 3484 h 7076"/>
+                <a:gd name="connsiteX3" fmla="*/ 5057 w 10000"/>
+                <a:gd name="connsiteY3" fmla="*/ 7076 h 7076"/>
+                <a:gd name="connsiteX4" fmla="*/ 0 w 10000"/>
+                <a:gd name="connsiteY4" fmla="*/ 3484 h 7076"/>
+                <a:gd name="connsiteX0" fmla="*/ 0 w 10000"/>
+                <a:gd name="connsiteY0" fmla="*/ 4924 h 10612"/>
+                <a:gd name="connsiteX1" fmla="*/ 5000 w 10000"/>
+                <a:gd name="connsiteY1" fmla="*/ 0 h 10612"/>
+                <a:gd name="connsiteX2" fmla="*/ 10000 w 10000"/>
+                <a:gd name="connsiteY2" fmla="*/ 4924 h 10612"/>
+                <a:gd name="connsiteX3" fmla="*/ 5057 w 10000"/>
+                <a:gd name="connsiteY3" fmla="*/ 10612 h 10612"/>
+                <a:gd name="connsiteX4" fmla="*/ 0 w 10000"/>
+                <a:gd name="connsiteY4" fmla="*/ 4924 h 10612"/>
+                <a:gd name="connsiteX0" fmla="*/ 0 w 10000"/>
+                <a:gd name="connsiteY0" fmla="*/ 4924 h 10612"/>
+                <a:gd name="connsiteX1" fmla="*/ 5000 w 10000"/>
+                <a:gd name="connsiteY1" fmla="*/ 0 h 10612"/>
+                <a:gd name="connsiteX2" fmla="*/ 10000 w 10000"/>
+                <a:gd name="connsiteY2" fmla="*/ 4924 h 10612"/>
+                <a:gd name="connsiteX3" fmla="*/ 5057 w 10000"/>
+                <a:gd name="connsiteY3" fmla="*/ 10612 h 10612"/>
+                <a:gd name="connsiteX4" fmla="*/ 0 w 10000"/>
+                <a:gd name="connsiteY4" fmla="*/ 4924 h 10612"/>
+                <a:gd name="connsiteX0" fmla="*/ 0 w 10000"/>
+                <a:gd name="connsiteY0" fmla="*/ 4924 h 10612"/>
+                <a:gd name="connsiteX1" fmla="*/ 5000 w 10000"/>
+                <a:gd name="connsiteY1" fmla="*/ 0 h 10612"/>
+                <a:gd name="connsiteX2" fmla="*/ 10000 w 10000"/>
+                <a:gd name="connsiteY2" fmla="*/ 4924 h 10612"/>
+                <a:gd name="connsiteX3" fmla="*/ 5057 w 10000"/>
+                <a:gd name="connsiteY3" fmla="*/ 10612 h 10612"/>
+                <a:gd name="connsiteX4" fmla="*/ 0 w 10000"/>
+                <a:gd name="connsiteY4" fmla="*/ 4924 h 10612"/>
+                <a:gd name="connsiteX0" fmla="*/ 0 w 10000"/>
+                <a:gd name="connsiteY0" fmla="*/ 4924 h 10612"/>
+                <a:gd name="connsiteX1" fmla="*/ 5000 w 10000"/>
+                <a:gd name="connsiteY1" fmla="*/ 0 h 10612"/>
+                <a:gd name="connsiteX2" fmla="*/ 10000 w 10000"/>
+                <a:gd name="connsiteY2" fmla="*/ 4924 h 10612"/>
+                <a:gd name="connsiteX3" fmla="*/ 5057 w 10000"/>
+                <a:gd name="connsiteY3" fmla="*/ 10612 h 10612"/>
+                <a:gd name="connsiteX4" fmla="*/ 0 w 10000"/>
+                <a:gd name="connsiteY4" fmla="*/ 4924 h 10612"/>
+                <a:gd name="connsiteX0" fmla="*/ 0 w 10000"/>
+                <a:gd name="connsiteY0" fmla="*/ 4924 h 10612"/>
+                <a:gd name="connsiteX1" fmla="*/ 5000 w 10000"/>
+                <a:gd name="connsiteY1" fmla="*/ 0 h 10612"/>
+                <a:gd name="connsiteX2" fmla="*/ 10000 w 10000"/>
+                <a:gd name="connsiteY2" fmla="*/ 4924 h 10612"/>
+                <a:gd name="connsiteX3" fmla="*/ 5057 w 10000"/>
+                <a:gd name="connsiteY3" fmla="*/ 10612 h 10612"/>
+                <a:gd name="connsiteX4" fmla="*/ 0 w 10000"/>
+                <a:gd name="connsiteY4" fmla="*/ 4924 h 10612"/>
+                <a:gd name="connsiteX0" fmla="*/ 0 w 10000"/>
+                <a:gd name="connsiteY0" fmla="*/ 4924 h 10612"/>
+                <a:gd name="connsiteX1" fmla="*/ 5000 w 10000"/>
+                <a:gd name="connsiteY1" fmla="*/ 0 h 10612"/>
+                <a:gd name="connsiteX2" fmla="*/ 10000 w 10000"/>
+                <a:gd name="connsiteY2" fmla="*/ 4924 h 10612"/>
+                <a:gd name="connsiteX3" fmla="*/ 5057 w 10000"/>
+                <a:gd name="connsiteY3" fmla="*/ 10612 h 10612"/>
+                <a:gd name="connsiteX4" fmla="*/ 0 w 10000"/>
+                <a:gd name="connsiteY4" fmla="*/ 4924 h 10612"/>
+              </a:gdLst>
+              <a:ahLst/>
+              <a:cxnLst>
+                <a:cxn ang="0">
+                  <a:pos x="connsiteX0" y="connsiteY0"/>
+                </a:cxn>
+                <a:cxn ang="0">
+                  <a:pos x="connsiteX1" y="connsiteY1"/>
+                </a:cxn>
+                <a:cxn ang="0">
+                  <a:pos x="connsiteX2" y="connsiteY2"/>
+                </a:cxn>
+                <a:cxn ang="0">
+                  <a:pos x="connsiteX3" y="connsiteY3"/>
+                </a:cxn>
+                <a:cxn ang="0">
+                  <a:pos x="connsiteX4" y="connsiteY4"/>
+                </a:cxn>
+              </a:cxnLst>
+              <a:rect l="l" t="t" r="r" b="b"/>
+              <a:pathLst>
+                <a:path w="10000" h="10612">
+                  <a:moveTo>
+                    <a:pt x="0" y="4924"/>
+                  </a:moveTo>
+                  <a:cubicBezTo>
+                    <a:pt x="679" y="2210"/>
+                    <a:pt x="3333" y="0"/>
+                    <a:pt x="5000" y="0"/>
+                  </a:cubicBezTo>
+                  <a:cubicBezTo>
+                    <a:pt x="6667" y="0"/>
+                    <a:pt x="9264" y="1904"/>
+                    <a:pt x="10000" y="4924"/>
+                  </a:cubicBezTo>
+                  <a:cubicBezTo>
+                    <a:pt x="9295" y="8707"/>
+                    <a:pt x="7290" y="10653"/>
+                    <a:pt x="5057" y="10612"/>
+                  </a:cubicBezTo>
+                  <a:cubicBezTo>
+                    <a:pt x="2824" y="10571"/>
+                    <a:pt x="793" y="8248"/>
+                    <a:pt x="0" y="4924"/>
+                  </a:cubicBezTo>
+                  <a:close/>
+                </a:path>
+              </a:pathLst>
+            </a:custGeom>
+            <a:solidFill>
+              <a:srgbClr val="0070C0"/>
+            </a:solidFill>
+            <a:ln>
+              <a:noFill/>
+            </a:ln>
+          </p:spPr>
+          <p:style>
+            <a:lnRef idx="2">
+              <a:schemeClr val="accent1">
+                <a:shade val="50000"/>
+              </a:schemeClr>
+            </a:lnRef>
+            <a:fillRef idx="1">
+              <a:schemeClr val="accent1"/>
+            </a:fillRef>
+            <a:effectRef idx="0">
+              <a:schemeClr val="accent1"/>
+            </a:effectRef>
+            <a:fontRef idx="minor">
+              <a:schemeClr val="lt1"/>
+            </a:fontRef>
+          </p:style>
+          <p:txBody>
+            <a:bodyPr wrap="none" lIns="0" tIns="0" rIns="0" bIns="0" rtlCol="0" anchor="ctr"/>
+            <a:lstStyle/>
+            <a:p>
+              <a:pPr algn="ctr"/>
+              <a:endParaRPr lang="en-US" b="1"/>
+            </a:p>
+          </p:txBody>
+        </p:sp>
+        <p:sp>
+          <p:nvSpPr>
+            <p:cNvPr id="57" name="Flowchart: Connector 56"/>
+            <p:cNvSpPr/>
+            <p:nvPr/>
+          </p:nvSpPr>
+          <p:spPr>
+            <a:xfrm>
+              <a:off x="3416537" y="4595016"/>
+              <a:ext cx="140605" cy="133781"/>
+            </a:xfrm>
+            <a:prstGeom prst="flowChartConnector">
+              <a:avLst/>
+            </a:prstGeom>
+            <a:solidFill>
+              <a:schemeClr val="bg1"/>
+            </a:solidFill>
+            <a:ln>
+              <a:solidFill>
+                <a:schemeClr val="bg1"/>
+              </a:solidFill>
+            </a:ln>
+          </p:spPr>
+          <p:style>
+            <a:lnRef idx="2">
+              <a:schemeClr val="accent1">
+                <a:shade val="50000"/>
+              </a:schemeClr>
+            </a:lnRef>
+            <a:fillRef idx="1">
+              <a:schemeClr val="accent1"/>
+            </a:fillRef>
+            <a:effectRef idx="0">
+              <a:schemeClr val="accent1"/>
+            </a:effectRef>
+            <a:fontRef idx="minor">
+              <a:schemeClr val="lt1"/>
+            </a:fontRef>
+          </p:style>
+          <p:txBody>
+            <a:bodyPr rtlCol="0" anchor="ctr"/>
+            <a:lstStyle/>
+            <a:p>
+              <a:pPr algn="ctr"/>
+              <a:endParaRPr lang="en-US"/>
+            </a:p>
+          </p:txBody>
+        </p:sp>
+      </p:grpSp>
+      <p:sp>
+        <p:nvSpPr>
+          <p:cNvPr id="2" name="TextBox 1"/>
+          <p:cNvSpPr txBox="1"/>
+          <p:nvPr/>
+        </p:nvSpPr>
+        <p:spPr>
+          <a:xfrm>
+            <a:off x="6582232" y="5410200"/>
+            <a:ext cx="2333168" cy="307777"/>
+          </a:xfrm>
+          <a:prstGeom prst="rect">
+            <a:avLst/>
+          </a:prstGeom>
+          <a:noFill/>
+        </p:spPr>
+        <p:txBody>
+          <a:bodyPr wrap="square" rtlCol="0">
+            <a:spAutoFit/>
+          </a:bodyPr>
+          <a:lstStyle/>
+          <a:p>
+            <a:r>
+              <a:rPr lang="en-US" sz="1400" dirty="0" smtClean="0"/>
+              <a:t>Not used</a:t>
+            </a:r>
+            <a:endParaRPr lang="en-SG" sz="1400" dirty="0"/>
+          </a:p>
+        </p:txBody>
+      </p:sp>
+      <p:sp>
+        <p:nvSpPr>
+          <p:cNvPr id="29" name="TextBox 28"/>
+          <p:cNvSpPr txBox="1"/>
+          <p:nvPr/>
+        </p:nvSpPr>
+        <p:spPr>
+          <a:xfrm>
+            <a:off x="1416642" y="3181927"/>
+            <a:ext cx="762000" cy="600164"/>
+          </a:xfrm>
+          <a:prstGeom prst="rect">
+            <a:avLst/>
+          </a:prstGeom>
+          <a:noFill/>
+        </p:spPr>
+        <p:txBody>
+          <a:bodyPr wrap="square" rtlCol="0">
+            <a:spAutoFit/>
+          </a:bodyPr>
+          <a:lstStyle/>
+          <a:p>
+            <a:pPr algn="ctr"/>
+            <a:r>
+              <a:rPr lang="en-US" sz="1100" dirty="0" smtClean="0"/>
+              <a:t>Add animation slide</a:t>
+            </a:r>
+            <a:endParaRPr lang="en-SG" sz="1100" dirty="0"/>
+          </a:p>
+        </p:txBody>
+      </p:sp>
+      <p:sp>
+        <p:nvSpPr>
+          <p:cNvPr id="30" name="TextBox 29"/>
+          <p:cNvSpPr txBox="1"/>
+          <p:nvPr/>
+        </p:nvSpPr>
+        <p:spPr>
+          <a:xfrm>
+            <a:off x="2456299" y="3181927"/>
+            <a:ext cx="762000" cy="600164"/>
+          </a:xfrm>
+          <a:prstGeom prst="rect">
+            <a:avLst/>
+          </a:prstGeom>
+          <a:noFill/>
+        </p:spPr>
+        <p:txBody>
+          <a:bodyPr wrap="square" rtlCol="0">
+            <a:spAutoFit/>
+          </a:bodyPr>
+          <a:lstStyle/>
+          <a:p>
+            <a:pPr algn="ctr"/>
+            <a:r>
+              <a:rPr lang="en-US" sz="1100" dirty="0" smtClean="0"/>
+              <a:t>Recreate animation slide</a:t>
+            </a:r>
+            <a:endParaRPr lang="en-SG" sz="1100" dirty="0"/>
+          </a:p>
+        </p:txBody>
+      </p:sp>
+      <p:sp>
+        <p:nvSpPr>
+          <p:cNvPr id="32" name="TextBox 31"/>
+          <p:cNvSpPr txBox="1"/>
+          <p:nvPr/>
+        </p:nvSpPr>
+        <p:spPr>
+          <a:xfrm>
+            <a:off x="3429000" y="3306418"/>
+            <a:ext cx="762000" cy="261610"/>
+          </a:xfrm>
+          <a:prstGeom prst="rect">
+            <a:avLst/>
+          </a:prstGeom>
+          <a:noFill/>
+        </p:spPr>
+        <p:txBody>
+          <a:bodyPr wrap="square" rtlCol="0">
+            <a:spAutoFit/>
+          </a:bodyPr>
+          <a:lstStyle/>
+          <a:p>
+            <a:pPr algn="ctr"/>
+            <a:r>
+              <a:rPr lang="en-US" sz="1100" dirty="0" smtClean="0"/>
+              <a:t>spotlight</a:t>
+            </a:r>
+            <a:endParaRPr lang="en-SG" sz="1100" dirty="0"/>
+          </a:p>
+        </p:txBody>
+      </p:sp>
+      <p:grpSp>
+        <p:nvGrpSpPr>
+          <p:cNvPr id="3" name="Group 2"/>
+          <p:cNvGrpSpPr/>
+          <p:nvPr/>
+        </p:nvGrpSpPr>
+        <p:grpSpPr>
+          <a:xfrm>
+            <a:off x="4644415" y="2654369"/>
+            <a:ext cx="420625" cy="421196"/>
+            <a:chOff x="4644415" y="2654369"/>
+            <a:chExt cx="420625" cy="423587"/>
+          </a:xfrm>
+        </p:grpSpPr>
+        <p:sp>
+          <p:nvSpPr>
+            <p:cNvPr id="36" name="Right Arrow 35"/>
+            <p:cNvSpPr>
+              <a:spLocks noChangeAspect="1"/>
+            </p:cNvSpPr>
+            <p:nvPr/>
+          </p:nvSpPr>
+          <p:spPr>
+            <a:xfrm rot="4632386">
+              <a:off x="4681534" y="2696250"/>
+              <a:ext cx="304920" cy="304920"/>
+            </a:xfrm>
+            <a:prstGeom prst="rightArrow">
+              <a:avLst/>
+            </a:prstGeom>
+            <a:solidFill>
+              <a:srgbClr val="0070C0"/>
+            </a:solidFill>
+            <a:ln>
+              <a:noFill/>
+            </a:ln>
+          </p:spPr>
+          <p:style>
+            <a:lnRef idx="2">
+              <a:schemeClr val="accent1">
+                <a:shade val="50000"/>
+              </a:schemeClr>
+            </a:lnRef>
+            <a:fillRef idx="1">
+              <a:schemeClr val="accent1"/>
+            </a:fillRef>
+            <a:effectRef idx="0">
+              <a:schemeClr val="accent1"/>
+            </a:effectRef>
+            <a:fontRef idx="minor">
+              <a:schemeClr val="lt1"/>
+            </a:fontRef>
+          </p:style>
+          <p:txBody>
+            <a:bodyPr rtlCol="0" anchor="ctr"/>
+            <a:lstStyle/>
+            <a:p>
+              <a:pPr algn="ctr"/>
+              <a:endParaRPr lang="en-US"/>
+            </a:p>
+          </p:txBody>
+        </p:sp>
+        <p:sp>
+          <p:nvSpPr>
+            <p:cNvPr id="39" name="Rectangle 38"/>
+            <p:cNvSpPr/>
+            <p:nvPr/>
+          </p:nvSpPr>
+          <p:spPr>
+            <a:xfrm>
+              <a:off x="4644416" y="2978965"/>
+              <a:ext cx="420624" cy="98991"/>
+            </a:xfrm>
+            <a:prstGeom prst="rect">
+              <a:avLst/>
+            </a:prstGeom>
+            <a:solidFill>
+              <a:srgbClr val="0070C0"/>
+            </a:solidFill>
+            <a:ln>
+              <a:noFill/>
+            </a:ln>
+          </p:spPr>
+          <p:style>
+            <a:lnRef idx="2">
+              <a:schemeClr val="accent1">
+                <a:shade val="50000"/>
+              </a:schemeClr>
+            </a:lnRef>
+            <a:fillRef idx="1">
+              <a:schemeClr val="accent1"/>
+            </a:fillRef>
+            <a:effectRef idx="0">
+              <a:schemeClr val="accent1"/>
+            </a:effectRef>
+            <a:fontRef idx="minor">
+              <a:schemeClr val="lt1"/>
+            </a:fontRef>
+          </p:style>
+          <p:txBody>
+            <a:bodyPr rtlCol="0" anchor="ctr"/>
+            <a:lstStyle/>
+            <a:p>
+              <a:pPr algn="ctr"/>
+              <a:endParaRPr lang="en-US"/>
+            </a:p>
+          </p:txBody>
+        </p:sp>
+        <p:sp>
+          <p:nvSpPr>
+            <p:cNvPr id="40" name="Rectangle 39"/>
+            <p:cNvSpPr/>
+            <p:nvPr/>
+          </p:nvSpPr>
+          <p:spPr>
+            <a:xfrm rot="10800000">
+              <a:off x="4644415" y="2654369"/>
+              <a:ext cx="420624" cy="420624"/>
+            </a:xfrm>
+            <a:prstGeom prst="rect">
+              <a:avLst/>
+            </a:prstGeom>
+            <a:noFill/>
+            <a:ln>
+              <a:noFill/>
+            </a:ln>
+          </p:spPr>
+          <p:style>
+            <a:lnRef idx="2">
+              <a:schemeClr val="accent1">
+                <a:shade val="50000"/>
+              </a:schemeClr>
+            </a:lnRef>
+            <a:fillRef idx="1">
+              <a:schemeClr val="accent1"/>
+            </a:fillRef>
+            <a:effectRef idx="0">
+              <a:schemeClr val="accent1"/>
+            </a:effectRef>
+            <a:fontRef idx="minor">
+              <a:schemeClr val="lt1"/>
+            </a:fontRef>
+          </p:style>
+          <p:txBody>
+            <a:bodyPr wrap="none" lIns="0" tIns="0" rIns="0" bIns="0" rtlCol="0" anchor="ctr"/>
+            <a:lstStyle/>
+            <a:p>
+              <a:pPr algn="ctr"/>
+              <a:endParaRPr lang="en-US" b="1"/>
+            </a:p>
+          </p:txBody>
+        </p:sp>
+      </p:grpSp>
+      <p:sp>
+        <p:nvSpPr>
+          <p:cNvPr id="41" name="TextBox 40"/>
+          <p:cNvSpPr txBox="1"/>
+          <p:nvPr/>
+        </p:nvSpPr>
+        <p:spPr>
+          <a:xfrm>
+            <a:off x="4473728" y="3352584"/>
+            <a:ext cx="762000" cy="430887"/>
+          </a:xfrm>
+          <a:prstGeom prst="rect">
+            <a:avLst/>
+          </a:prstGeom>
+          <a:noFill/>
+        </p:spPr>
+        <p:txBody>
+          <a:bodyPr wrap="square" rtlCol="0">
+            <a:spAutoFit/>
+          </a:bodyPr>
+          <a:lstStyle/>
+          <a:p>
+            <a:pPr algn="ctr"/>
+            <a:r>
+              <a:rPr lang="en-US" sz="1100" dirty="0" smtClean="0"/>
+              <a:t>Add captions</a:t>
+            </a:r>
+            <a:endParaRPr lang="en-SG" sz="1100" dirty="0"/>
+          </a:p>
+        </p:txBody>
+      </p:sp>
+      <p:sp>
+        <p:nvSpPr>
+          <p:cNvPr id="53" name="Rectangle 52"/>
+          <p:cNvSpPr/>
+          <p:nvPr/>
+        </p:nvSpPr>
+        <p:spPr>
+          <a:xfrm>
+            <a:off x="3263477" y="3954500"/>
+            <a:ext cx="838200" cy="838200"/>
+          </a:xfrm>
+          <a:prstGeom prst="rect">
+            <a:avLst/>
+          </a:prstGeom>
+          <a:noFill/>
+          <a:ln>
+            <a:noFill/>
+          </a:ln>
+        </p:spPr>
+        <p:style>
+          <a:lnRef idx="2">
+            <a:schemeClr val="accent1">
+              <a:shade val="50000"/>
+            </a:schemeClr>
+          </a:lnRef>
+          <a:fillRef idx="1">
+            <a:schemeClr val="accent1"/>
+          </a:fillRef>
+          <a:effectRef idx="0">
+            <a:schemeClr val="accent1"/>
+          </a:effectRef>
+          <a:fontRef idx="minor">
+            <a:schemeClr val="lt1"/>
+          </a:fontRef>
+        </p:style>
+        <p:txBody>
+          <a:bodyPr rtlCol="0" anchor="ctr"/>
+          <a:lstStyle/>
+          <a:p>
+            <a:pPr algn="ctr"/>
+            <a:endParaRPr lang="en-SG"/>
+          </a:p>
+        </p:txBody>
+      </p:sp>
+      <p:grpSp>
+        <p:nvGrpSpPr>
+          <p:cNvPr id="4" name="Group 3"/>
+          <p:cNvGrpSpPr/>
+          <p:nvPr/>
+        </p:nvGrpSpPr>
+        <p:grpSpPr>
+          <a:xfrm>
+            <a:off x="5740371" y="2666016"/>
+            <a:ext cx="420624" cy="418250"/>
+            <a:chOff x="5740371" y="2666016"/>
+            <a:chExt cx="420624" cy="418250"/>
+          </a:xfrm>
+        </p:grpSpPr>
+        <p:sp>
+          <p:nvSpPr>
+            <p:cNvPr id="54" name="Rectangle 5"/>
+            <p:cNvSpPr/>
+            <p:nvPr/>
+          </p:nvSpPr>
+          <p:spPr>
+            <a:xfrm>
+              <a:off x="5832826" y="2691000"/>
+              <a:ext cx="199554" cy="363398"/>
+            </a:xfrm>
+            <a:custGeom>
+              <a:avLst/>
+              <a:gdLst>
+                <a:gd name="connsiteX0" fmla="*/ 0 w 247861"/>
+                <a:gd name="connsiteY0" fmla="*/ 168438 h 491595"/>
+                <a:gd name="connsiteX1" fmla="*/ 83956 w 247861"/>
+                <a:gd name="connsiteY1" fmla="*/ 162984 h 491595"/>
+                <a:gd name="connsiteX2" fmla="*/ 56685 w 247861"/>
+                <a:gd name="connsiteY2" fmla="*/ 318394 h 491595"/>
+                <a:gd name="connsiteX3" fmla="*/ 0 w 247861"/>
+                <a:gd name="connsiteY3" fmla="*/ 318394 h 491595"/>
+                <a:gd name="connsiteX4" fmla="*/ 0 w 247861"/>
+                <a:gd name="connsiteY4" fmla="*/ 168438 h 491595"/>
+                <a:gd name="connsiteX5" fmla="*/ 247861 w 247861"/>
+                <a:gd name="connsiteY5" fmla="*/ 0 h 491595"/>
+                <a:gd name="connsiteX6" fmla="*/ 242826 w 247861"/>
+                <a:gd name="connsiteY6" fmla="*/ 491595 h 491595"/>
+                <a:gd name="connsiteX7" fmla="*/ 82985 w 247861"/>
+                <a:gd name="connsiteY7" fmla="*/ 327947 h 491595"/>
+                <a:gd name="connsiteX8" fmla="*/ 84711 w 247861"/>
+                <a:gd name="connsiteY8" fmla="*/ 159354 h 491595"/>
+                <a:gd name="connsiteX9" fmla="*/ 247861 w 247861"/>
+                <a:gd name="connsiteY9" fmla="*/ 0 h 491595"/>
+                <a:gd name="connsiteX0" fmla="*/ 0 w 247861"/>
+                <a:gd name="connsiteY0" fmla="*/ 168438 h 491595"/>
+                <a:gd name="connsiteX1" fmla="*/ 83956 w 247861"/>
+                <a:gd name="connsiteY1" fmla="*/ 162984 h 491595"/>
+                <a:gd name="connsiteX2" fmla="*/ 81228 w 247861"/>
+                <a:gd name="connsiteY2" fmla="*/ 326575 h 491595"/>
+                <a:gd name="connsiteX3" fmla="*/ 0 w 247861"/>
+                <a:gd name="connsiteY3" fmla="*/ 318394 h 491595"/>
+                <a:gd name="connsiteX4" fmla="*/ 0 w 247861"/>
+                <a:gd name="connsiteY4" fmla="*/ 168438 h 491595"/>
+                <a:gd name="connsiteX5" fmla="*/ 247861 w 247861"/>
+                <a:gd name="connsiteY5" fmla="*/ 0 h 491595"/>
+                <a:gd name="connsiteX6" fmla="*/ 242826 w 247861"/>
+                <a:gd name="connsiteY6" fmla="*/ 491595 h 491595"/>
+                <a:gd name="connsiteX7" fmla="*/ 82985 w 247861"/>
+                <a:gd name="connsiteY7" fmla="*/ 327947 h 491595"/>
+                <a:gd name="connsiteX8" fmla="*/ 84711 w 247861"/>
+                <a:gd name="connsiteY8" fmla="*/ 159354 h 491595"/>
+                <a:gd name="connsiteX9" fmla="*/ 247861 w 247861"/>
+                <a:gd name="connsiteY9" fmla="*/ 0 h 491595"/>
+              </a:gdLst>
+              <a:ahLst/>
+              <a:cxnLst>
+                <a:cxn ang="0">
+                  <a:pos x="connsiteX0" y="connsiteY0"/>
+                </a:cxn>
+                <a:cxn ang="0">
+                  <a:pos x="connsiteX1" y="connsiteY1"/>
+                </a:cxn>
+                <a:cxn ang="0">
+                  <a:pos x="connsiteX2" y="connsiteY2"/>
+                </a:cxn>
+                <a:cxn ang="0">
+                  <a:pos x="connsiteX3" y="connsiteY3"/>
+                </a:cxn>
+                <a:cxn ang="0">
+                  <a:pos x="connsiteX4" y="connsiteY4"/>
+                </a:cxn>
+                <a:cxn ang="0">
+                  <a:pos x="connsiteX5" y="connsiteY5"/>
+                </a:cxn>
+                <a:cxn ang="0">
+                  <a:pos x="connsiteX6" y="connsiteY6"/>
+                </a:cxn>
+                <a:cxn ang="0">
+                  <a:pos x="connsiteX7" y="connsiteY7"/>
+                </a:cxn>
+                <a:cxn ang="0">
+                  <a:pos x="connsiteX8" y="connsiteY8"/>
+                </a:cxn>
+                <a:cxn ang="0">
+                  <a:pos x="connsiteX9" y="connsiteY9"/>
+                </a:cxn>
+              </a:cxnLst>
+              <a:rect l="l" t="t" r="r" b="b"/>
+              <a:pathLst>
+                <a:path w="247861" h="491595">
+                  <a:moveTo>
+                    <a:pt x="0" y="168438"/>
+                  </a:moveTo>
+                  <a:lnTo>
+                    <a:pt x="83956" y="162984"/>
+                  </a:lnTo>
+                  <a:cubicBezTo>
+                    <a:pt x="83047" y="217514"/>
+                    <a:pt x="82137" y="272045"/>
+                    <a:pt x="81228" y="326575"/>
+                  </a:cubicBezTo>
+                  <a:lnTo>
+                    <a:pt x="0" y="318394"/>
+                  </a:lnTo>
+                  <a:lnTo>
+                    <a:pt x="0" y="168438"/>
+                  </a:lnTo>
+                  <a:close/>
+                  <a:moveTo>
+                    <a:pt x="247861" y="0"/>
+                  </a:moveTo>
+                  <a:cubicBezTo>
+                    <a:pt x="246183" y="163865"/>
+                    <a:pt x="244504" y="327730"/>
+                    <a:pt x="242826" y="491595"/>
+                  </a:cubicBezTo>
+                  <a:lnTo>
+                    <a:pt x="82985" y="327947"/>
+                  </a:lnTo>
+                  <a:cubicBezTo>
+                    <a:pt x="83560" y="271749"/>
+                    <a:pt x="84136" y="215552"/>
+                    <a:pt x="84711" y="159354"/>
+                  </a:cubicBezTo>
+                  <a:lnTo>
+                    <a:pt x="247861" y="0"/>
+                  </a:lnTo>
+                  <a:close/>
+                </a:path>
+              </a:pathLst>
+            </a:custGeom>
+            <a:solidFill>
+              <a:srgbClr val="0070C0"/>
+            </a:solidFill>
+            <a:ln w="9525">
+              <a:solidFill>
+                <a:srgbClr val="0070C0"/>
+              </a:solidFill>
+            </a:ln>
+          </p:spPr>
+          <p:style>
+            <a:lnRef idx="2">
+              <a:schemeClr val="accent1">
+                <a:shade val="50000"/>
+              </a:schemeClr>
+            </a:lnRef>
+            <a:fillRef idx="1">
+              <a:schemeClr val="accent1"/>
+            </a:fillRef>
+            <a:effectRef idx="0">
+              <a:schemeClr val="accent1"/>
+            </a:effectRef>
+            <a:fontRef idx="minor">
+              <a:schemeClr val="lt1"/>
+            </a:fontRef>
+          </p:style>
+          <p:txBody>
+            <a:bodyPr rtlCol="0" anchor="ctr"/>
+            <a:lstStyle/>
+            <a:p>
+              <a:pPr algn="ctr"/>
+              <a:endParaRPr lang="en-SG"/>
+            </a:p>
+          </p:txBody>
+        </p:sp>
+        <p:sp>
+          <p:nvSpPr>
+            <p:cNvPr id="61" name="Rectangle 60"/>
+            <p:cNvSpPr/>
+            <p:nvPr/>
+          </p:nvSpPr>
+          <p:spPr>
+            <a:xfrm rot="10800000">
+              <a:off x="5740371" y="2666016"/>
+              <a:ext cx="420624" cy="418250"/>
+            </a:xfrm>
+            <a:prstGeom prst="rect">
+              <a:avLst/>
+            </a:prstGeom>
+            <a:noFill/>
+            <a:ln>
+              <a:noFill/>
+            </a:ln>
+          </p:spPr>
+          <p:style>
+            <a:lnRef idx="2">
+              <a:schemeClr val="accent1">
+                <a:shade val="50000"/>
+              </a:schemeClr>
+            </a:lnRef>
+            <a:fillRef idx="1">
+              <a:schemeClr val="accent1"/>
+            </a:fillRef>
+            <a:effectRef idx="0">
+              <a:schemeClr val="accent1"/>
+            </a:effectRef>
+            <a:fontRef idx="minor">
+              <a:schemeClr val="lt1"/>
+            </a:fontRef>
+          </p:style>
+          <p:txBody>
+            <a:bodyPr wrap="none" lIns="0" tIns="0" rIns="0" bIns="0" rtlCol="0" anchor="ctr"/>
+            <a:lstStyle/>
+            <a:p>
+              <a:pPr algn="ctr"/>
+              <a:endParaRPr lang="en-US" b="1"/>
+            </a:p>
+          </p:txBody>
+        </p:sp>
+      </p:grpSp>
+      <p:sp>
+        <p:nvSpPr>
+          <p:cNvPr id="62" name="TextBox 61"/>
+          <p:cNvSpPr txBox="1"/>
+          <p:nvPr/>
+        </p:nvSpPr>
+        <p:spPr>
+          <a:xfrm>
+            <a:off x="5569683" y="3364231"/>
+            <a:ext cx="918667" cy="430887"/>
+          </a:xfrm>
+          <a:prstGeom prst="rect">
+            <a:avLst/>
+          </a:prstGeom>
+          <a:noFill/>
+        </p:spPr>
+        <p:txBody>
+          <a:bodyPr wrap="square" rtlCol="0">
+            <a:spAutoFit/>
+          </a:bodyPr>
+          <a:lstStyle/>
+          <a:p>
+            <a:pPr algn="ctr"/>
+            <a:r>
+              <a:rPr lang="en-US" sz="1100" dirty="0" smtClean="0"/>
+              <a:t>Speak selected text</a:t>
+            </a:r>
+            <a:endParaRPr lang="en-SG" sz="1100" dirty="0"/>
+          </a:p>
+        </p:txBody>
+      </p:sp>
+      <p:sp>
+        <p:nvSpPr>
+          <p:cNvPr id="5" name="TextBox 4"/>
+          <p:cNvSpPr txBox="1"/>
+          <p:nvPr/>
+        </p:nvSpPr>
+        <p:spPr>
+          <a:xfrm>
+            <a:off x="2057400" y="304800"/>
+            <a:ext cx="2958840" cy="369332"/>
+          </a:xfrm>
+          <a:prstGeom prst="rect">
+            <a:avLst/>
+          </a:prstGeom>
+          <a:noFill/>
+        </p:spPr>
+        <p:txBody>
+          <a:bodyPr wrap="square" rtlCol="0">
+            <a:spAutoFit/>
+          </a:bodyPr>
+          <a:lstStyle/>
+          <a:p>
+            <a:r>
+              <a:rPr lang="en-US" dirty="0" smtClean="0"/>
+              <a:t>Context menu icons</a:t>
+            </a:r>
+            <a:endParaRPr lang="en-SG" dirty="0"/>
+          </a:p>
+        </p:txBody>
+      </p:sp>
+      <p:sp>
+        <p:nvSpPr>
+          <p:cNvPr id="66" name="Rectangle 65"/>
+          <p:cNvSpPr/>
+          <p:nvPr/>
+        </p:nvSpPr>
+        <p:spPr>
+          <a:xfrm rot="10800000">
+            <a:off x="6698284" y="2638488"/>
+            <a:ext cx="420624" cy="418250"/>
+          </a:xfrm>
+          <a:prstGeom prst="rect">
+            <a:avLst/>
+          </a:prstGeom>
+          <a:solidFill>
+            <a:srgbClr val="0070C0"/>
+          </a:solidFill>
+          <a:ln>
+            <a:noFill/>
+          </a:ln>
+        </p:spPr>
+        <p:style>
+          <a:lnRef idx="2">
+            <a:schemeClr val="accent1">
+              <a:shade val="50000"/>
+            </a:schemeClr>
+          </a:lnRef>
+          <a:fillRef idx="1">
+            <a:schemeClr val="accent1"/>
+          </a:fillRef>
+          <a:effectRef idx="0">
+            <a:schemeClr val="accent1"/>
+          </a:effectRef>
+          <a:fontRef idx="minor">
+            <a:schemeClr val="lt1"/>
+          </a:fontRef>
+        </p:style>
+        <p:txBody>
+          <a:bodyPr wrap="none" lIns="0" tIns="0" rIns="0" bIns="0" rtlCol="0" anchor="ctr"/>
+          <a:lstStyle/>
+          <a:p>
+            <a:pPr algn="ctr"/>
+            <a:endParaRPr lang="en-US" b="1"/>
+          </a:p>
+        </p:txBody>
+      </p:sp>
+      <p:sp>
+        <p:nvSpPr>
+          <p:cNvPr id="67" name="TextBox 66"/>
+          <p:cNvSpPr txBox="1"/>
+          <p:nvPr/>
+        </p:nvSpPr>
+        <p:spPr>
+          <a:xfrm>
+            <a:off x="6629400" y="3336703"/>
+            <a:ext cx="816863" cy="430887"/>
+          </a:xfrm>
+          <a:prstGeom prst="rect">
+            <a:avLst/>
+          </a:prstGeom>
+          <a:noFill/>
+        </p:spPr>
+        <p:txBody>
+          <a:bodyPr wrap="square" rtlCol="0">
+            <a:spAutoFit/>
+          </a:bodyPr>
+          <a:lstStyle/>
+          <a:p>
+            <a:pPr algn="ctr"/>
+            <a:r>
+              <a:rPr lang="en-US" sz="1100" dirty="0" smtClean="0"/>
+              <a:t>Add narrations</a:t>
+            </a:r>
+            <a:endParaRPr lang="en-SG" sz="1100" dirty="0"/>
+          </a:p>
+        </p:txBody>
+      </p:sp>
+      <p:sp>
+        <p:nvSpPr>
+          <p:cNvPr id="65" name="Rectangle 5"/>
+          <p:cNvSpPr/>
+          <p:nvPr/>
+        </p:nvSpPr>
+        <p:spPr>
+          <a:xfrm>
+            <a:off x="6798374" y="2680681"/>
+            <a:ext cx="184284" cy="328980"/>
+          </a:xfrm>
+          <a:custGeom>
+            <a:avLst/>
+            <a:gdLst>
+              <a:gd name="connsiteX0" fmla="*/ 0 w 247861"/>
+              <a:gd name="connsiteY0" fmla="*/ 168438 h 491595"/>
+              <a:gd name="connsiteX1" fmla="*/ 83956 w 247861"/>
+              <a:gd name="connsiteY1" fmla="*/ 162984 h 491595"/>
+              <a:gd name="connsiteX2" fmla="*/ 56685 w 247861"/>
+              <a:gd name="connsiteY2" fmla="*/ 318394 h 491595"/>
+              <a:gd name="connsiteX3" fmla="*/ 0 w 247861"/>
+              <a:gd name="connsiteY3" fmla="*/ 318394 h 491595"/>
+              <a:gd name="connsiteX4" fmla="*/ 0 w 247861"/>
+              <a:gd name="connsiteY4" fmla="*/ 168438 h 491595"/>
+              <a:gd name="connsiteX5" fmla="*/ 247861 w 247861"/>
+              <a:gd name="connsiteY5" fmla="*/ 0 h 491595"/>
+              <a:gd name="connsiteX6" fmla="*/ 242826 w 247861"/>
+              <a:gd name="connsiteY6" fmla="*/ 491595 h 491595"/>
+              <a:gd name="connsiteX7" fmla="*/ 82985 w 247861"/>
+              <a:gd name="connsiteY7" fmla="*/ 327947 h 491595"/>
+              <a:gd name="connsiteX8" fmla="*/ 84711 w 247861"/>
+              <a:gd name="connsiteY8" fmla="*/ 159354 h 491595"/>
+              <a:gd name="connsiteX9" fmla="*/ 247861 w 247861"/>
+              <a:gd name="connsiteY9" fmla="*/ 0 h 491595"/>
+              <a:gd name="connsiteX0" fmla="*/ 0 w 247861"/>
+              <a:gd name="connsiteY0" fmla="*/ 168438 h 491595"/>
+              <a:gd name="connsiteX1" fmla="*/ 83956 w 247861"/>
+              <a:gd name="connsiteY1" fmla="*/ 162984 h 491595"/>
+              <a:gd name="connsiteX2" fmla="*/ 81228 w 247861"/>
+              <a:gd name="connsiteY2" fmla="*/ 326575 h 491595"/>
+              <a:gd name="connsiteX3" fmla="*/ 0 w 247861"/>
+              <a:gd name="connsiteY3" fmla="*/ 318394 h 491595"/>
+              <a:gd name="connsiteX4" fmla="*/ 0 w 247861"/>
+              <a:gd name="connsiteY4" fmla="*/ 168438 h 491595"/>
+              <a:gd name="connsiteX5" fmla="*/ 247861 w 247861"/>
+              <a:gd name="connsiteY5" fmla="*/ 0 h 491595"/>
+              <a:gd name="connsiteX6" fmla="*/ 242826 w 247861"/>
+              <a:gd name="connsiteY6" fmla="*/ 491595 h 491595"/>
+              <a:gd name="connsiteX7" fmla="*/ 82985 w 247861"/>
+              <a:gd name="connsiteY7" fmla="*/ 327947 h 491595"/>
+              <a:gd name="connsiteX8" fmla="*/ 84711 w 247861"/>
+              <a:gd name="connsiteY8" fmla="*/ 159354 h 491595"/>
+              <a:gd name="connsiteX9" fmla="*/ 247861 w 247861"/>
+              <a:gd name="connsiteY9" fmla="*/ 0 h 491595"/>
+            </a:gdLst>
+            <a:ahLst/>
+            <a:cxnLst>
+              <a:cxn ang="0">
+                <a:pos x="connsiteX0" y="connsiteY0"/>
+              </a:cxn>
+              <a:cxn ang="0">
+                <a:pos x="connsiteX1" y="connsiteY1"/>
+              </a:cxn>
+              <a:cxn ang="0">
+                <a:pos x="connsiteX2" y="connsiteY2"/>
+              </a:cxn>
+              <a:cxn ang="0">
+                <a:pos x="connsiteX3" y="connsiteY3"/>
+              </a:cxn>
+              <a:cxn ang="0">
+                <a:pos x="connsiteX4" y="connsiteY4"/>
+              </a:cxn>
+              <a:cxn ang="0">
+                <a:pos x="connsiteX5" y="connsiteY5"/>
+              </a:cxn>
+              <a:cxn ang="0">
+                <a:pos x="connsiteX6" y="connsiteY6"/>
+              </a:cxn>
+              <a:cxn ang="0">
+                <a:pos x="connsiteX7" y="connsiteY7"/>
+              </a:cxn>
+              <a:cxn ang="0">
+                <a:pos x="connsiteX8" y="connsiteY8"/>
+              </a:cxn>
+              <a:cxn ang="0">
+                <a:pos x="connsiteX9" y="connsiteY9"/>
+              </a:cxn>
+            </a:cxnLst>
+            <a:rect l="l" t="t" r="r" b="b"/>
+            <a:pathLst>
+              <a:path w="247861" h="491595">
+                <a:moveTo>
+                  <a:pt x="0" y="168438"/>
+                </a:moveTo>
+                <a:lnTo>
+                  <a:pt x="83956" y="162984"/>
+                </a:lnTo>
+                <a:cubicBezTo>
+                  <a:pt x="83047" y="217514"/>
+                  <a:pt x="82137" y="272045"/>
+                  <a:pt x="81228" y="326575"/>
+                </a:cubicBezTo>
+                <a:lnTo>
+                  <a:pt x="0" y="318394"/>
+                </a:lnTo>
+                <a:lnTo>
+                  <a:pt x="0" y="168438"/>
+                </a:lnTo>
+                <a:close/>
+                <a:moveTo>
+                  <a:pt x="247861" y="0"/>
+                </a:moveTo>
+                <a:cubicBezTo>
+                  <a:pt x="246183" y="163865"/>
+                  <a:pt x="244504" y="327730"/>
+                  <a:pt x="242826" y="491595"/>
+                </a:cubicBezTo>
+                <a:lnTo>
+                  <a:pt x="82985" y="327947"/>
+                </a:lnTo>
+                <a:cubicBezTo>
+                  <a:pt x="83560" y="271749"/>
+                  <a:pt x="84136" y="215552"/>
+                  <a:pt x="84711" y="159354"/>
+                </a:cubicBezTo>
+                <a:lnTo>
+                  <a:pt x="247861" y="0"/>
+                </a:lnTo>
+                <a:close/>
+              </a:path>
+            </a:pathLst>
+          </a:custGeom>
+          <a:solidFill>
+            <a:schemeClr val="bg1"/>
+          </a:solidFill>
+          <a:ln w="9525">
+            <a:solidFill>
+              <a:schemeClr val="bg1"/>
+            </a:solidFill>
+          </a:ln>
+        </p:spPr>
+        <p:style>
+          <a:lnRef idx="2">
+            <a:schemeClr val="accent1">
+              <a:shade val="50000"/>
+            </a:schemeClr>
+          </a:lnRef>
+          <a:fillRef idx="1">
+            <a:schemeClr val="accent1"/>
+          </a:fillRef>
+          <a:effectRef idx="0">
+            <a:schemeClr val="accent1"/>
+          </a:effectRef>
+          <a:fontRef idx="minor">
+            <a:schemeClr val="lt1"/>
+          </a:fontRef>
+        </p:style>
+        <p:txBody>
+          <a:bodyPr rtlCol="0" anchor="ctr"/>
+          <a:lstStyle/>
+          <a:p>
+            <a:pPr algn="ctr"/>
+            <a:endParaRPr lang="en-SG"/>
+          </a:p>
+        </p:txBody>
+      </p:sp>
+      <p:sp>
+        <p:nvSpPr>
+          <p:cNvPr id="69" name="TextBox 68"/>
+          <p:cNvSpPr txBox="1"/>
+          <p:nvPr/>
+        </p:nvSpPr>
+        <p:spPr>
+          <a:xfrm>
+            <a:off x="7598050" y="3309175"/>
+            <a:ext cx="816863" cy="261610"/>
+          </a:xfrm>
+          <a:prstGeom prst="rect">
+            <a:avLst/>
+          </a:prstGeom>
+          <a:noFill/>
+        </p:spPr>
+        <p:txBody>
+          <a:bodyPr wrap="square" rtlCol="0">
+            <a:spAutoFit/>
+          </a:bodyPr>
+          <a:lstStyle/>
+          <a:p>
+            <a:pPr algn="ctr"/>
+            <a:r>
+              <a:rPr lang="en-US" sz="1100" dirty="0" smtClean="0"/>
+              <a:t>Edit name</a:t>
+            </a:r>
+            <a:endParaRPr lang="en-SG" sz="1100" dirty="0"/>
+          </a:p>
+        </p:txBody>
+      </p:sp>
+      <p:grpSp>
+        <p:nvGrpSpPr>
+          <p:cNvPr id="14" name="Group 13"/>
+          <p:cNvGrpSpPr/>
+          <p:nvPr/>
+        </p:nvGrpSpPr>
+        <p:grpSpPr>
+          <a:xfrm>
+            <a:off x="7666934" y="2610960"/>
+            <a:ext cx="420624" cy="418250"/>
+            <a:chOff x="7666934" y="2610960"/>
+            <a:chExt cx="420624" cy="418250"/>
+          </a:xfrm>
+        </p:grpSpPr>
+        <p:sp>
+          <p:nvSpPr>
+            <p:cNvPr id="68" name="Rectangle 67"/>
+            <p:cNvSpPr/>
+            <p:nvPr/>
+          </p:nvSpPr>
+          <p:spPr>
+            <a:xfrm rot="10800000">
+              <a:off x="7666934" y="2610960"/>
+              <a:ext cx="420624" cy="418250"/>
+            </a:xfrm>
+            <a:prstGeom prst="rect">
+              <a:avLst/>
+            </a:prstGeom>
+            <a:solidFill>
+              <a:srgbClr val="0070C0"/>
+            </a:solidFill>
+            <a:ln>
+              <a:noFill/>
+            </a:ln>
+          </p:spPr>
+          <p:style>
+            <a:lnRef idx="2">
+              <a:schemeClr val="accent1">
+                <a:shade val="50000"/>
+              </a:schemeClr>
+            </a:lnRef>
+            <a:fillRef idx="1">
+              <a:schemeClr val="accent1"/>
+            </a:fillRef>
+            <a:effectRef idx="0">
+              <a:schemeClr val="accent1"/>
+            </a:effectRef>
+            <a:fontRef idx="minor">
+              <a:schemeClr val="lt1"/>
+            </a:fontRef>
+          </p:style>
+          <p:txBody>
+            <a:bodyPr wrap="none" lIns="0" tIns="0" rIns="0" bIns="0" rtlCol="0" anchor="ctr"/>
+            <a:lstStyle/>
+            <a:p>
+              <a:pPr algn="ctr"/>
+              <a:endParaRPr lang="en-US" b="1"/>
+            </a:p>
+          </p:txBody>
+        </p:sp>
+        <p:sp>
+          <p:nvSpPr>
+            <p:cNvPr id="6" name="Down Arrow 5"/>
+            <p:cNvSpPr/>
+            <p:nvPr/>
+          </p:nvSpPr>
+          <p:spPr>
+            <a:xfrm rot="18880587">
+              <a:off x="7814525" y="2679809"/>
+              <a:ext cx="130359" cy="340741"/>
+            </a:xfrm>
+            <a:prstGeom prst="downArrow">
+              <a:avLst>
+                <a:gd name="adj1" fmla="val 100000"/>
+                <a:gd name="adj2" fmla="val 60000"/>
+              </a:avLst>
+            </a:prstGeom>
+            <a:solidFill>
+              <a:schemeClr val="bg1"/>
+            </a:solidFill>
+            <a:ln>
+              <a:solidFill>
+                <a:schemeClr val="bg1"/>
+              </a:solidFill>
+            </a:ln>
+          </p:spPr>
+          <p:style>
+            <a:lnRef idx="2">
+              <a:schemeClr val="accent1">
+                <a:shade val="50000"/>
+              </a:schemeClr>
+            </a:lnRef>
+            <a:fillRef idx="1">
+              <a:schemeClr val="accent1"/>
+            </a:fillRef>
+            <a:effectRef idx="0">
+              <a:schemeClr val="accent1"/>
+            </a:effectRef>
+            <a:fontRef idx="minor">
+              <a:schemeClr val="lt1"/>
+            </a:fontRef>
+          </p:style>
+          <p:txBody>
+            <a:bodyPr rtlCol="0" anchor="ctr"/>
+            <a:lstStyle/>
+            <a:p>
+              <a:pPr algn="ctr"/>
+              <a:endParaRPr lang="en-SG"/>
+            </a:p>
+          </p:txBody>
+        </p:sp>
+        <p:sp>
+          <p:nvSpPr>
+            <p:cNvPr id="71" name="Freeform 70"/>
+            <p:cNvSpPr/>
+            <p:nvPr/>
+          </p:nvSpPr>
+          <p:spPr>
+            <a:xfrm rot="16200000">
+              <a:off x="7865986" y="2827577"/>
+              <a:ext cx="152400" cy="152400"/>
+            </a:xfrm>
+            <a:custGeom>
+              <a:avLst/>
+              <a:gdLst>
+                <a:gd name="connsiteX0" fmla="*/ 152400 w 152400"/>
+                <a:gd name="connsiteY0" fmla="*/ 152400 h 152400"/>
+                <a:gd name="connsiteX1" fmla="*/ 0 w 152400"/>
+                <a:gd name="connsiteY1" fmla="*/ 0 h 152400"/>
+              </a:gdLst>
+              <a:ahLst/>
+              <a:cxnLst>
+                <a:cxn ang="0">
+                  <a:pos x="connsiteX0" y="connsiteY0"/>
+                </a:cxn>
+                <a:cxn ang="0">
+                  <a:pos x="connsiteX1" y="connsiteY1"/>
+                </a:cxn>
+              </a:cxnLst>
+              <a:rect l="l" t="t" r="r" b="b"/>
+              <a:pathLst>
+                <a:path w="152400" h="152400">
+                  <a:moveTo>
+                    <a:pt x="152400" y="152400"/>
+                  </a:moveTo>
+                  <a:lnTo>
+                    <a:pt x="0" y="0"/>
+                  </a:lnTo>
+                </a:path>
+              </a:pathLst>
+            </a:custGeom>
+            <a:noFill/>
+            <a:ln cap="rnd">
+              <a:solidFill>
+                <a:srgbClr val="0070C0"/>
+              </a:solidFill>
+            </a:ln>
+          </p:spPr>
+          <p:style>
+            <a:lnRef idx="2">
+              <a:schemeClr val="accent1">
+                <a:shade val="50000"/>
+              </a:schemeClr>
+            </a:lnRef>
+            <a:fillRef idx="1">
+              <a:schemeClr val="accent1"/>
+            </a:fillRef>
+            <a:effectRef idx="0">
+              <a:schemeClr val="accent1"/>
+            </a:effectRef>
+            <a:fontRef idx="minor">
+              <a:schemeClr val="lt1"/>
+            </a:fontRef>
+          </p:style>
+          <p:txBody>
+            <a:bodyPr rtlCol="0" anchor="ctr"/>
+            <a:lstStyle/>
+            <a:p>
+              <a:pPr algn="ctr"/>
+              <a:endParaRPr lang="en-SG"/>
+            </a:p>
+          </p:txBody>
+        </p:sp>
+      </p:grpSp>
+    </p:spTree>
+    <p:extLst>
+      <p:ext uri="{BB962C8B-B14F-4D97-AF65-F5344CB8AC3E}">
+        <p14:creationId xmlns:p14="http://schemas.microsoft.com/office/powerpoint/2010/main" val="1369861174"/>
       </p:ext>
     </p:extLst>
   </p:cSld>

</xml_diff>

<commit_message>
Issue 66: create icons for context menu items (continued) Update Issue 66 Added missing icon
</commit_message>
<xml_diff>
--- a/doc/Icons.pptx
+++ b/doc/Icons.pptx
@@ -8596,7 +8596,11 @@
           <a:p>
             <a:r>
               <a:rPr lang="en-US" sz="800" dirty="0" smtClean="0"/>
-              <a:t>Animate in-slide</a:t>
+              <a:t>Animate </a:t>
+            </a:r>
+            <a:r>
+              <a:rPr lang="en-US" sz="800" dirty="0" smtClean="0"/>
+              <a:t>in slide</a:t>
             </a:r>
             <a:endParaRPr lang="en-SG" sz="800" dirty="0"/>
           </a:p>
@@ -10525,50 +10529,6 @@
           </a:p>
         </p:txBody>
       </p:sp>
-      <p:sp>
-        <p:nvSpPr>
-          <p:cNvPr id="53" name="Rectangle 52"/>
-          <p:cNvSpPr/>
-          <p:nvPr/>
-        </p:nvSpPr>
-        <p:spPr>
-          <a:xfrm>
-            <a:off x="3263477" y="3954500"/>
-            <a:ext cx="838200" cy="838200"/>
-          </a:xfrm>
-          <a:prstGeom prst="rect">
-            <a:avLst/>
-          </a:prstGeom>
-          <a:noFill/>
-          <a:ln>
-            <a:noFill/>
-          </a:ln>
-        </p:spPr>
-        <p:style>
-          <a:lnRef idx="2">
-            <a:schemeClr val="accent1">
-              <a:shade val="50000"/>
-            </a:schemeClr>
-          </a:lnRef>
-          <a:fillRef idx="1">
-            <a:schemeClr val="accent1"/>
-          </a:fillRef>
-          <a:effectRef idx="0">
-            <a:schemeClr val="accent1"/>
-          </a:effectRef>
-          <a:fontRef idx="minor">
-            <a:schemeClr val="lt1"/>
-          </a:fontRef>
-        </p:style>
-        <p:txBody>
-          <a:bodyPr rtlCol="0" anchor="ctr"/>
-          <a:lstStyle/>
-          <a:p>
-            <a:pPr algn="ctr"/>
-            <a:endParaRPr lang="en-SG"/>
-          </a:p>
-        </p:txBody>
-      </p:sp>
       <p:grpSp>
         <p:nvGrpSpPr>
           <p:cNvPr id="4" name="Group 3"/>
@@ -11312,6 +11272,235 @@
             </a:p>
           </p:txBody>
         </p:sp>
+      </p:grpSp>
+      <p:sp>
+        <p:nvSpPr>
+          <p:cNvPr id="59" name="TextBox 58"/>
+          <p:cNvSpPr txBox="1"/>
+          <p:nvPr/>
+        </p:nvSpPr>
+        <p:spPr>
+          <a:xfrm>
+            <a:off x="1338308" y="4876800"/>
+            <a:ext cx="918667" cy="430887"/>
+          </a:xfrm>
+          <a:prstGeom prst="rect">
+            <a:avLst/>
+          </a:prstGeom>
+          <a:noFill/>
+        </p:spPr>
+        <p:txBody>
+          <a:bodyPr wrap="square" rtlCol="0">
+            <a:spAutoFit/>
+          </a:bodyPr>
+          <a:lstStyle/>
+          <a:p>
+            <a:pPr algn="ctr"/>
+            <a:r>
+              <a:rPr lang="en-US" sz="1100" dirty="0" smtClean="0"/>
+              <a:t>Animat</a:t>
+            </a:r>
+            <a:r>
+              <a:rPr lang="en-US" sz="1100" dirty="0" smtClean="0"/>
+              <a:t>e in slide</a:t>
+            </a:r>
+            <a:endParaRPr lang="en-SG" sz="1100" dirty="0"/>
+          </a:p>
+        </p:txBody>
+      </p:sp>
+      <p:grpSp>
+        <p:nvGrpSpPr>
+          <p:cNvPr id="18" name="Group 17"/>
+          <p:cNvGrpSpPr/>
+          <p:nvPr/>
+        </p:nvGrpSpPr>
+        <p:grpSpPr>
+          <a:xfrm>
+            <a:off x="1508996" y="4178585"/>
+            <a:ext cx="420624" cy="421200"/>
+            <a:chOff x="1508996" y="4178585"/>
+            <a:chExt cx="420624" cy="418250"/>
+          </a:xfrm>
+        </p:grpSpPr>
+        <p:sp>
+          <p:nvSpPr>
+            <p:cNvPr id="58" name="Rectangle 57"/>
+            <p:cNvSpPr/>
+            <p:nvPr/>
+          </p:nvSpPr>
+          <p:spPr>
+            <a:xfrm rot="10800000">
+              <a:off x="1508996" y="4178585"/>
+              <a:ext cx="420624" cy="418250"/>
+            </a:xfrm>
+            <a:prstGeom prst="rect">
+              <a:avLst/>
+            </a:prstGeom>
+            <a:solidFill>
+              <a:srgbClr val="0070C0"/>
+            </a:solidFill>
+            <a:ln>
+              <a:noFill/>
+            </a:ln>
+          </p:spPr>
+          <p:style>
+            <a:lnRef idx="2">
+              <a:schemeClr val="accent1">
+                <a:shade val="50000"/>
+              </a:schemeClr>
+            </a:lnRef>
+            <a:fillRef idx="1">
+              <a:schemeClr val="accent1"/>
+            </a:fillRef>
+            <a:effectRef idx="0">
+              <a:schemeClr val="accent1"/>
+            </a:effectRef>
+            <a:fontRef idx="minor">
+              <a:schemeClr val="lt1"/>
+            </a:fontRef>
+          </p:style>
+          <p:txBody>
+            <a:bodyPr wrap="none" lIns="0" tIns="0" rIns="0" bIns="0" rtlCol="0" anchor="ctr"/>
+            <a:lstStyle/>
+            <a:p>
+              <a:pPr algn="ctr"/>
+              <a:endParaRPr lang="en-US" b="1"/>
+            </a:p>
+          </p:txBody>
+        </p:sp>
+        <p:sp>
+          <p:nvSpPr>
+            <p:cNvPr id="7" name="Flowchart: Connector 6"/>
+            <p:cNvSpPr>
+              <a:spLocks noChangeAspect="1"/>
+            </p:cNvSpPr>
+            <p:nvPr/>
+          </p:nvSpPr>
+          <p:spPr>
+            <a:xfrm>
+              <a:off x="1524472" y="4191285"/>
+              <a:ext cx="122720" cy="122720"/>
+            </a:xfrm>
+            <a:prstGeom prst="flowChartConnector">
+              <a:avLst/>
+            </a:prstGeom>
+            <a:solidFill>
+              <a:schemeClr val="bg1"/>
+            </a:solidFill>
+            <a:ln>
+              <a:noFill/>
+            </a:ln>
+          </p:spPr>
+          <p:style>
+            <a:lnRef idx="2">
+              <a:schemeClr val="accent1">
+                <a:shade val="50000"/>
+              </a:schemeClr>
+            </a:lnRef>
+            <a:fillRef idx="1">
+              <a:schemeClr val="accent1"/>
+            </a:fillRef>
+            <a:effectRef idx="0">
+              <a:schemeClr val="accent1"/>
+            </a:effectRef>
+            <a:fontRef idx="minor">
+              <a:schemeClr val="lt1"/>
+            </a:fontRef>
+          </p:style>
+          <p:txBody>
+            <a:bodyPr rtlCol="0" anchor="ctr"/>
+            <a:lstStyle/>
+            <a:p>
+              <a:pPr algn="ctr"/>
+              <a:endParaRPr lang="en-SG"/>
+            </a:p>
+          </p:txBody>
+        </p:sp>
+        <p:sp>
+          <p:nvSpPr>
+            <p:cNvPr id="60" name="Flowchart: Connector 59"/>
+            <p:cNvSpPr>
+              <a:spLocks noChangeAspect="1"/>
+            </p:cNvSpPr>
+            <p:nvPr/>
+          </p:nvSpPr>
+          <p:spPr>
+            <a:xfrm>
+              <a:off x="1789294" y="4455065"/>
+              <a:ext cx="122720" cy="122720"/>
+            </a:xfrm>
+            <a:prstGeom prst="flowChartConnector">
+              <a:avLst/>
+            </a:prstGeom>
+            <a:solidFill>
+              <a:schemeClr val="bg1"/>
+            </a:solidFill>
+            <a:ln>
+              <a:noFill/>
+            </a:ln>
+          </p:spPr>
+          <p:style>
+            <a:lnRef idx="2">
+              <a:schemeClr val="accent1">
+                <a:shade val="50000"/>
+              </a:schemeClr>
+            </a:lnRef>
+            <a:fillRef idx="1">
+              <a:schemeClr val="accent1"/>
+            </a:fillRef>
+            <a:effectRef idx="0">
+              <a:schemeClr val="accent1"/>
+            </a:effectRef>
+            <a:fontRef idx="minor">
+              <a:schemeClr val="lt1"/>
+            </a:fontRef>
+          </p:style>
+          <p:txBody>
+            <a:bodyPr rtlCol="0" anchor="ctr"/>
+            <a:lstStyle/>
+            <a:p>
+              <a:pPr algn="ctr"/>
+              <a:endParaRPr lang="en-SG"/>
+            </a:p>
+          </p:txBody>
+        </p:sp>
+        <p:cxnSp>
+          <p:nvCxnSpPr>
+            <p:cNvPr id="9" name="Straight Arrow Connector 8"/>
+            <p:cNvCxnSpPr/>
+            <p:nvPr/>
+          </p:nvCxnSpPr>
+          <p:spPr>
+            <a:xfrm>
+              <a:off x="1652761" y="4305300"/>
+              <a:ext cx="151588" cy="152400"/>
+            </a:xfrm>
+            <a:prstGeom prst="straightConnector1">
+              <a:avLst/>
+            </a:prstGeom>
+            <a:ln w="38100">
+              <a:solidFill>
+                <a:schemeClr val="bg1"/>
+              </a:solidFill>
+              <a:headEnd type="none" w="med" len="med"/>
+              <a:tailEnd type="triangle" w="med" len="med"/>
+            </a:ln>
+          </p:spPr>
+          <p:style>
+            <a:lnRef idx="1">
+              <a:schemeClr val="accent1"/>
+            </a:lnRef>
+            <a:fillRef idx="0">
+              <a:schemeClr val="accent1"/>
+            </a:fillRef>
+            <a:effectRef idx="0">
+              <a:schemeClr val="accent1"/>
+            </a:effectRef>
+            <a:fontRef idx="minor">
+              <a:schemeClr val="tx1"/>
+            </a:fontRef>
+          </p:style>
+        </p:cxnSp>
       </p:grpSp>
     </p:spTree>
     <p:extLst>

</xml_diff>

<commit_message>
Issue 185: add icons for fit to width/height Update Issue 185
</commit_message>
<xml_diff>
--- a/doc/Icons.pptx
+++ b/doc/Icons.pptx
@@ -15,18 +15,18 @@
   <p:notesSz cx="6858000" cy="9144000"/>
   <p:embeddedFontLst>
     <p:embeddedFont>
-      <p:font typeface="Rockwell Extra Bold" panose="02060903040505020403" pitchFamily="18" charset="0"/>
-      <p:bold r:id="rId5"/>
+      <p:font typeface="Calibri" pitchFamily="34" charset="0"/>
+      <p:regular r:id="rId5"/>
+      <p:bold r:id="rId6"/>
+      <p:italic r:id="rId7"/>
+      <p:boldItalic r:id="rId8"/>
     </p:embeddedFont>
     <p:embeddedFont>
-      <p:font typeface="Calibri" panose="020F0502020204030204" pitchFamily="34" charset="0"/>
-      <p:regular r:id="rId6"/>
-      <p:bold r:id="rId7"/>
-      <p:italic r:id="rId8"/>
-      <p:boldItalic r:id="rId9"/>
+      <p:font typeface="Arial Black" pitchFamily="34" charset="0"/>
+      <p:bold r:id="rId9"/>
     </p:embeddedFont>
     <p:embeddedFont>
-      <p:font typeface="Arial Black" panose="020B0A04020102020204" pitchFamily="34" charset="0"/>
+      <p:font typeface="Rockwell Extra Bold" pitchFamily="18" charset="0"/>
       <p:bold r:id="rId10"/>
     </p:embeddedFont>
   </p:embeddedFontLst>
@@ -210,7 +210,7 @@
           <a:p>
             <a:fld id="{6699ACB9-486C-4D62-A3A7-AF98E13EFDA3}" type="datetimeFigureOut">
               <a:rPr lang="en-US" smtClean="0"/>
-              <a:t>1/30/2014</a:t>
+              <a:t>2/7/2014</a:t>
             </a:fld>
             <a:endParaRPr lang="en-US"/>
           </a:p>
@@ -744,7 +744,7 @@
             <a:fld id="{1D8BD707-D9CF-40AE-B4C6-C98DA3205C09}" type="datetimeFigureOut">
               <a:rPr lang="en-US" smtClean="0"/>
               <a:pPr/>
-              <a:t>1/30/2014</a:t>
+              <a:t>2/7/2014</a:t>
             </a:fld>
             <a:endParaRPr lang="en-US"/>
           </a:p>
@@ -911,7 +911,7 @@
             <a:fld id="{1D8BD707-D9CF-40AE-B4C6-C98DA3205C09}" type="datetimeFigureOut">
               <a:rPr lang="en-US" smtClean="0"/>
               <a:pPr/>
-              <a:t>1/30/2014</a:t>
+              <a:t>2/7/2014</a:t>
             </a:fld>
             <a:endParaRPr lang="en-US"/>
           </a:p>
@@ -1088,7 +1088,7 @@
             <a:fld id="{1D8BD707-D9CF-40AE-B4C6-C98DA3205C09}" type="datetimeFigureOut">
               <a:rPr lang="en-US" smtClean="0"/>
               <a:pPr/>
-              <a:t>1/30/2014</a:t>
+              <a:t>2/7/2014</a:t>
             </a:fld>
             <a:endParaRPr lang="en-US"/>
           </a:p>
@@ -1255,7 +1255,7 @@
             <a:fld id="{1D8BD707-D9CF-40AE-B4C6-C98DA3205C09}" type="datetimeFigureOut">
               <a:rPr lang="en-US" smtClean="0"/>
               <a:pPr/>
-              <a:t>1/30/2014</a:t>
+              <a:t>2/7/2014</a:t>
             </a:fld>
             <a:endParaRPr lang="en-US"/>
           </a:p>
@@ -1498,7 +1498,7 @@
             <a:fld id="{1D8BD707-D9CF-40AE-B4C6-C98DA3205C09}" type="datetimeFigureOut">
               <a:rPr lang="en-US" smtClean="0"/>
               <a:pPr/>
-              <a:t>1/30/2014</a:t>
+              <a:t>2/7/2014</a:t>
             </a:fld>
             <a:endParaRPr lang="en-US"/>
           </a:p>
@@ -1783,7 +1783,7 @@
             <a:fld id="{1D8BD707-D9CF-40AE-B4C6-C98DA3205C09}" type="datetimeFigureOut">
               <a:rPr lang="en-US" smtClean="0"/>
               <a:pPr/>
-              <a:t>1/30/2014</a:t>
+              <a:t>2/7/2014</a:t>
             </a:fld>
             <a:endParaRPr lang="en-US"/>
           </a:p>
@@ -2202,7 +2202,7 @@
             <a:fld id="{1D8BD707-D9CF-40AE-B4C6-C98DA3205C09}" type="datetimeFigureOut">
               <a:rPr lang="en-US" smtClean="0"/>
               <a:pPr/>
-              <a:t>1/30/2014</a:t>
+              <a:t>2/7/2014</a:t>
             </a:fld>
             <a:endParaRPr lang="en-US"/>
           </a:p>
@@ -2317,7 +2317,7 @@
             <a:fld id="{1D8BD707-D9CF-40AE-B4C6-C98DA3205C09}" type="datetimeFigureOut">
               <a:rPr lang="en-US" smtClean="0"/>
               <a:pPr/>
-              <a:t>1/30/2014</a:t>
+              <a:t>2/7/2014</a:t>
             </a:fld>
             <a:endParaRPr lang="en-US"/>
           </a:p>
@@ -2409,7 +2409,7 @@
             <a:fld id="{1D8BD707-D9CF-40AE-B4C6-C98DA3205C09}" type="datetimeFigureOut">
               <a:rPr lang="en-US" smtClean="0"/>
               <a:pPr/>
-              <a:t>1/30/2014</a:t>
+              <a:t>2/7/2014</a:t>
             </a:fld>
             <a:endParaRPr lang="en-US"/>
           </a:p>
@@ -2683,7 +2683,7 @@
             <a:fld id="{1D8BD707-D9CF-40AE-B4C6-C98DA3205C09}" type="datetimeFigureOut">
               <a:rPr lang="en-US" smtClean="0"/>
               <a:pPr/>
-              <a:t>1/30/2014</a:t>
+              <a:t>2/7/2014</a:t>
             </a:fld>
             <a:endParaRPr lang="en-US"/>
           </a:p>
@@ -2933,7 +2933,7 @@
             <a:fld id="{1D8BD707-D9CF-40AE-B4C6-C98DA3205C09}" type="datetimeFigureOut">
               <a:rPr lang="en-US" smtClean="0"/>
               <a:pPr/>
-              <a:t>1/30/2014</a:t>
+              <a:t>2/7/2014</a:t>
             </a:fld>
             <a:endParaRPr lang="en-US"/>
           </a:p>
@@ -3143,7 +3143,7 @@
             <a:fld id="{1D8BD707-D9CF-40AE-B4C6-C98DA3205C09}" type="datetimeFigureOut">
               <a:rPr lang="en-US" smtClean="0"/>
               <a:pPr/>
-              <a:t>1/30/2014</a:t>
+              <a:t>2/7/2014</a:t>
             </a:fld>
             <a:endParaRPr lang="en-US"/>
           </a:p>
@@ -8596,11 +8596,7 @@
           <a:p>
             <a:r>
               <a:rPr lang="en-US" sz="800" dirty="0" smtClean="0"/>
-              <a:t>Animate </a:t>
-            </a:r>
-            <a:r>
-              <a:rPr lang="en-US" sz="800" dirty="0" smtClean="0"/>
-              <a:t>in slide</a:t>
+              <a:t>Animate in slide</a:t>
             </a:r>
             <a:endParaRPr lang="en-SG" sz="800" dirty="0"/>
           </a:p>
@@ -11298,11 +11294,7 @@
             <a:pPr algn="ctr"/>
             <a:r>
               <a:rPr lang="en-US" sz="1100" dirty="0" smtClean="0"/>
-              <a:t>Animat</a:t>
-            </a:r>
-            <a:r>
-              <a:rPr lang="en-US" sz="1100" dirty="0" smtClean="0"/>
-              <a:t>e in slide</a:t>
+              <a:t>Animate in slide</a:t>
             </a:r>
             <a:endParaRPr lang="en-SG" sz="1100" dirty="0"/>
           </a:p>
@@ -11474,6 +11466,360 @@
             <a:xfrm>
               <a:off x="1652761" y="4305300"/>
               <a:ext cx="151588" cy="152400"/>
+            </a:xfrm>
+            <a:prstGeom prst="straightConnector1">
+              <a:avLst/>
+            </a:prstGeom>
+            <a:ln w="38100">
+              <a:solidFill>
+                <a:schemeClr val="bg1"/>
+              </a:solidFill>
+              <a:headEnd type="none" w="med" len="med"/>
+              <a:tailEnd type="triangle" w="med" len="med"/>
+            </a:ln>
+          </p:spPr>
+          <p:style>
+            <a:lnRef idx="1">
+              <a:schemeClr val="accent1"/>
+            </a:lnRef>
+            <a:fillRef idx="0">
+              <a:schemeClr val="accent1"/>
+            </a:fillRef>
+            <a:effectRef idx="0">
+              <a:schemeClr val="accent1"/>
+            </a:effectRef>
+            <a:fontRef idx="minor">
+              <a:schemeClr val="tx1"/>
+            </a:fontRef>
+          </p:style>
+        </p:cxnSp>
+      </p:grpSp>
+      <p:sp>
+        <p:nvSpPr>
+          <p:cNvPr id="73" name="TextBox 72"/>
+          <p:cNvSpPr txBox="1"/>
+          <p:nvPr/>
+        </p:nvSpPr>
+        <p:spPr>
+          <a:xfrm>
+            <a:off x="2424757" y="4946209"/>
+            <a:ext cx="918667" cy="261610"/>
+          </a:xfrm>
+          <a:prstGeom prst="rect">
+            <a:avLst/>
+          </a:prstGeom>
+          <a:noFill/>
+        </p:spPr>
+        <p:txBody>
+          <a:bodyPr wrap="square" rtlCol="0">
+            <a:spAutoFit/>
+          </a:bodyPr>
+          <a:lstStyle/>
+          <a:p>
+            <a:pPr algn="ctr"/>
+            <a:r>
+              <a:rPr lang="en-US" sz="1100" dirty="0" smtClean="0"/>
+              <a:t>Fit to width</a:t>
+            </a:r>
+            <a:endParaRPr lang="en-SG" sz="1100" dirty="0"/>
+          </a:p>
+        </p:txBody>
+      </p:sp>
+      <p:grpSp>
+        <p:nvGrpSpPr>
+          <p:cNvPr id="31" name="Group 30"/>
+          <p:cNvGrpSpPr/>
+          <p:nvPr/>
+        </p:nvGrpSpPr>
+        <p:grpSpPr>
+          <a:xfrm>
+            <a:off x="2595445" y="4247994"/>
+            <a:ext cx="422068" cy="421200"/>
+            <a:chOff x="2595445" y="4247994"/>
+            <a:chExt cx="422068" cy="421200"/>
+          </a:xfrm>
+        </p:grpSpPr>
+        <p:sp>
+          <p:nvSpPr>
+            <p:cNvPr id="75" name="Rectangle 74"/>
+            <p:cNvSpPr/>
+            <p:nvPr/>
+          </p:nvSpPr>
+          <p:spPr>
+            <a:xfrm rot="10800000">
+              <a:off x="2595445" y="4247994"/>
+              <a:ext cx="420624" cy="421200"/>
+            </a:xfrm>
+            <a:prstGeom prst="rect">
+              <a:avLst/>
+            </a:prstGeom>
+            <a:solidFill>
+              <a:srgbClr val="0070C0"/>
+            </a:solidFill>
+            <a:ln>
+              <a:noFill/>
+            </a:ln>
+          </p:spPr>
+          <p:style>
+            <a:lnRef idx="2">
+              <a:schemeClr val="accent1">
+                <a:shade val="50000"/>
+              </a:schemeClr>
+            </a:lnRef>
+            <a:fillRef idx="1">
+              <a:schemeClr val="accent1"/>
+            </a:fillRef>
+            <a:effectRef idx="0">
+              <a:schemeClr val="accent1"/>
+            </a:effectRef>
+            <a:fontRef idx="minor">
+              <a:schemeClr val="lt1"/>
+            </a:fontRef>
+          </p:style>
+          <p:txBody>
+            <a:bodyPr wrap="none" lIns="0" tIns="0" rIns="0" bIns="0" rtlCol="0" anchor="ctr"/>
+            <a:lstStyle/>
+            <a:p>
+              <a:pPr algn="ctr"/>
+              <a:endParaRPr lang="en-US" b="1"/>
+            </a:p>
+          </p:txBody>
+        </p:sp>
+        <p:sp>
+          <p:nvSpPr>
+            <p:cNvPr id="77" name="Rectangle 76"/>
+            <p:cNvSpPr>
+              <a:spLocks noChangeAspect="1"/>
+            </p:cNvSpPr>
+            <p:nvPr/>
+          </p:nvSpPr>
+          <p:spPr>
+            <a:xfrm>
+              <a:off x="2805756" y="4389185"/>
+              <a:ext cx="211757" cy="280009"/>
+            </a:xfrm>
+            <a:prstGeom prst="rect">
+              <a:avLst/>
+            </a:prstGeom>
+            <a:solidFill>
+              <a:schemeClr val="bg1"/>
+            </a:solidFill>
+            <a:ln>
+              <a:noFill/>
+            </a:ln>
+          </p:spPr>
+          <p:style>
+            <a:lnRef idx="2">
+              <a:schemeClr val="accent1">
+                <a:shade val="50000"/>
+              </a:schemeClr>
+            </a:lnRef>
+            <a:fillRef idx="1">
+              <a:schemeClr val="accent1"/>
+            </a:fillRef>
+            <a:effectRef idx="0">
+              <a:schemeClr val="accent1"/>
+            </a:effectRef>
+            <a:fontRef idx="minor">
+              <a:schemeClr val="lt1"/>
+            </a:fontRef>
+          </p:style>
+          <p:txBody>
+            <a:bodyPr rtlCol="0" anchor="ctr"/>
+            <a:lstStyle/>
+            <a:p>
+              <a:pPr algn="ctr"/>
+              <a:endParaRPr lang="en-SG"/>
+            </a:p>
+          </p:txBody>
+        </p:sp>
+        <p:cxnSp>
+          <p:nvCxnSpPr>
+            <p:cNvPr id="78" name="Straight Arrow Connector 77"/>
+            <p:cNvCxnSpPr/>
+            <p:nvPr/>
+          </p:nvCxnSpPr>
+          <p:spPr>
+            <a:xfrm flipH="1">
+              <a:off x="2595448" y="4407794"/>
+              <a:ext cx="210308" cy="0"/>
+            </a:xfrm>
+            <a:prstGeom prst="straightConnector1">
+              <a:avLst/>
+            </a:prstGeom>
+            <a:ln w="38100">
+              <a:solidFill>
+                <a:schemeClr val="bg1"/>
+              </a:solidFill>
+              <a:headEnd type="none" w="med" len="med"/>
+              <a:tailEnd type="triangle" w="med" len="med"/>
+            </a:ln>
+          </p:spPr>
+          <p:style>
+            <a:lnRef idx="1">
+              <a:schemeClr val="accent1"/>
+            </a:lnRef>
+            <a:fillRef idx="0">
+              <a:schemeClr val="accent1"/>
+            </a:fillRef>
+            <a:effectRef idx="0">
+              <a:schemeClr val="accent1"/>
+            </a:effectRef>
+            <a:fontRef idx="minor">
+              <a:schemeClr val="tx1"/>
+            </a:fontRef>
+          </p:style>
+        </p:cxnSp>
+      </p:grpSp>
+      <p:sp>
+        <p:nvSpPr>
+          <p:cNvPr id="79" name="TextBox 78"/>
+          <p:cNvSpPr txBox="1"/>
+          <p:nvPr/>
+        </p:nvSpPr>
+        <p:spPr>
+          <a:xfrm>
+            <a:off x="3423816" y="4946209"/>
+            <a:ext cx="918667" cy="261610"/>
+          </a:xfrm>
+          <a:prstGeom prst="rect">
+            <a:avLst/>
+          </a:prstGeom>
+          <a:noFill/>
+        </p:spPr>
+        <p:txBody>
+          <a:bodyPr wrap="square" rtlCol="0">
+            <a:spAutoFit/>
+          </a:bodyPr>
+          <a:lstStyle/>
+          <a:p>
+            <a:pPr algn="ctr"/>
+            <a:r>
+              <a:rPr lang="en-US" sz="1100" dirty="0" smtClean="0"/>
+              <a:t>Fit to height</a:t>
+            </a:r>
+            <a:endParaRPr lang="en-SG" sz="1100" dirty="0"/>
+          </a:p>
+        </p:txBody>
+      </p:sp>
+      <p:grpSp>
+        <p:nvGrpSpPr>
+          <p:cNvPr id="89" name="Group 88"/>
+          <p:cNvGrpSpPr/>
+          <p:nvPr/>
+        </p:nvGrpSpPr>
+        <p:grpSpPr>
+          <a:xfrm rot="16200000" flipH="1">
+            <a:off x="3688937" y="4247994"/>
+            <a:ext cx="422068" cy="421200"/>
+            <a:chOff x="2595445" y="4247994"/>
+            <a:chExt cx="422068" cy="421200"/>
+          </a:xfrm>
+        </p:grpSpPr>
+        <p:sp>
+          <p:nvSpPr>
+            <p:cNvPr id="90" name="Rectangle 89"/>
+            <p:cNvSpPr/>
+            <p:nvPr/>
+          </p:nvSpPr>
+          <p:spPr>
+            <a:xfrm rot="10800000">
+              <a:off x="2595445" y="4247994"/>
+              <a:ext cx="420624" cy="421200"/>
+            </a:xfrm>
+            <a:prstGeom prst="rect">
+              <a:avLst/>
+            </a:prstGeom>
+            <a:solidFill>
+              <a:srgbClr val="0070C0"/>
+            </a:solidFill>
+            <a:ln>
+              <a:noFill/>
+            </a:ln>
+          </p:spPr>
+          <p:style>
+            <a:lnRef idx="2">
+              <a:schemeClr val="accent1">
+                <a:shade val="50000"/>
+              </a:schemeClr>
+            </a:lnRef>
+            <a:fillRef idx="1">
+              <a:schemeClr val="accent1"/>
+            </a:fillRef>
+            <a:effectRef idx="0">
+              <a:schemeClr val="accent1"/>
+            </a:effectRef>
+            <a:fontRef idx="minor">
+              <a:schemeClr val="lt1"/>
+            </a:fontRef>
+          </p:style>
+          <p:txBody>
+            <a:bodyPr wrap="none" lIns="0" tIns="0" rIns="0" bIns="0" rtlCol="0" anchor="ctr"/>
+            <a:lstStyle/>
+            <a:p>
+              <a:pPr algn="ctr"/>
+              <a:endParaRPr lang="en-US" b="1"/>
+            </a:p>
+          </p:txBody>
+        </p:sp>
+        <p:sp>
+          <p:nvSpPr>
+            <p:cNvPr id="91" name="Rectangle 90"/>
+            <p:cNvSpPr>
+              <a:spLocks noChangeAspect="1"/>
+            </p:cNvSpPr>
+            <p:nvPr/>
+          </p:nvSpPr>
+          <p:spPr>
+            <a:xfrm>
+              <a:off x="2805756" y="4389185"/>
+              <a:ext cx="211757" cy="280009"/>
+            </a:xfrm>
+            <a:prstGeom prst="rect">
+              <a:avLst/>
+            </a:prstGeom>
+            <a:solidFill>
+              <a:schemeClr val="bg1"/>
+            </a:solidFill>
+            <a:ln>
+              <a:noFill/>
+            </a:ln>
+          </p:spPr>
+          <p:style>
+            <a:lnRef idx="2">
+              <a:schemeClr val="accent1">
+                <a:shade val="50000"/>
+              </a:schemeClr>
+            </a:lnRef>
+            <a:fillRef idx="1">
+              <a:schemeClr val="accent1"/>
+            </a:fillRef>
+            <a:effectRef idx="0">
+              <a:schemeClr val="accent1"/>
+            </a:effectRef>
+            <a:fontRef idx="minor">
+              <a:schemeClr val="lt1"/>
+            </a:fontRef>
+          </p:style>
+          <p:txBody>
+            <a:bodyPr rtlCol="0" anchor="ctr"/>
+            <a:lstStyle/>
+            <a:p>
+              <a:pPr algn="ctr"/>
+              <a:endParaRPr lang="en-SG"/>
+            </a:p>
+          </p:txBody>
+        </p:sp>
+        <p:cxnSp>
+          <p:nvCxnSpPr>
+            <p:cNvPr id="92" name="Straight Arrow Connector 91"/>
+            <p:cNvCxnSpPr/>
+            <p:nvPr/>
+          </p:nvCxnSpPr>
+          <p:spPr>
+            <a:xfrm flipH="1">
+              <a:off x="2595448" y="4407794"/>
+              <a:ext cx="210308" cy="0"/>
             </a:xfrm>
             <a:prstGeom prst="straightConnector1">
               <a:avLst/>

</xml_diff>

<commit_message>
Issue 198: create icons for V1.5 Update Issue 198
</commit_message>
<xml_diff>
--- a/doc/Icons.pptx
+++ b/doc/Icons.pptx
@@ -15,19 +15,19 @@
   <p:notesSz cx="6858000" cy="9144000"/>
   <p:embeddedFontLst>
     <p:embeddedFont>
-      <p:font typeface="Calibri" pitchFamily="34" charset="0"/>
-      <p:regular r:id="rId5"/>
-      <p:bold r:id="rId6"/>
-      <p:italic r:id="rId7"/>
-      <p:boldItalic r:id="rId8"/>
+      <p:font typeface="Arial Black" panose="020B0A04020102020204" pitchFamily="34" charset="0"/>
+      <p:bold r:id="rId5"/>
     </p:embeddedFont>
     <p:embeddedFont>
-      <p:font typeface="Arial Black" pitchFamily="34" charset="0"/>
-      <p:bold r:id="rId9"/>
+      <p:font typeface="Rockwell Extra Bold" panose="02060903040505020403" pitchFamily="18" charset="0"/>
+      <p:bold r:id="rId6"/>
     </p:embeddedFont>
     <p:embeddedFont>
-      <p:font typeface="Rockwell Extra Bold" pitchFamily="18" charset="0"/>
-      <p:bold r:id="rId10"/>
+      <p:font typeface="Calibri" panose="020F0502020204030204" pitchFamily="34" charset="0"/>
+      <p:regular r:id="rId7"/>
+      <p:bold r:id="rId8"/>
+      <p:italic r:id="rId9"/>
+      <p:boldItalic r:id="rId10"/>
     </p:embeddedFont>
   </p:embeddedFontLst>
   <p:defaultTextStyle>
@@ -210,7 +210,7 @@
           <a:p>
             <a:fld id="{6699ACB9-486C-4D62-A3A7-AF98E13EFDA3}" type="datetimeFigureOut">
               <a:rPr lang="en-US" smtClean="0"/>
-              <a:t>2/7/2014</a:t>
+              <a:t>2/15/2014</a:t>
             </a:fld>
             <a:endParaRPr lang="en-US"/>
           </a:p>
@@ -744,7 +744,7 @@
             <a:fld id="{1D8BD707-D9CF-40AE-B4C6-C98DA3205C09}" type="datetimeFigureOut">
               <a:rPr lang="en-US" smtClean="0"/>
               <a:pPr/>
-              <a:t>2/7/2014</a:t>
+              <a:t>2/15/2014</a:t>
             </a:fld>
             <a:endParaRPr lang="en-US"/>
           </a:p>
@@ -911,7 +911,7 @@
             <a:fld id="{1D8BD707-D9CF-40AE-B4C6-C98DA3205C09}" type="datetimeFigureOut">
               <a:rPr lang="en-US" smtClean="0"/>
               <a:pPr/>
-              <a:t>2/7/2014</a:t>
+              <a:t>2/15/2014</a:t>
             </a:fld>
             <a:endParaRPr lang="en-US"/>
           </a:p>
@@ -1088,7 +1088,7 @@
             <a:fld id="{1D8BD707-D9CF-40AE-B4C6-C98DA3205C09}" type="datetimeFigureOut">
               <a:rPr lang="en-US" smtClean="0"/>
               <a:pPr/>
-              <a:t>2/7/2014</a:t>
+              <a:t>2/15/2014</a:t>
             </a:fld>
             <a:endParaRPr lang="en-US"/>
           </a:p>
@@ -1255,7 +1255,7 @@
             <a:fld id="{1D8BD707-D9CF-40AE-B4C6-C98DA3205C09}" type="datetimeFigureOut">
               <a:rPr lang="en-US" smtClean="0"/>
               <a:pPr/>
-              <a:t>2/7/2014</a:t>
+              <a:t>2/15/2014</a:t>
             </a:fld>
             <a:endParaRPr lang="en-US"/>
           </a:p>
@@ -1498,7 +1498,7 @@
             <a:fld id="{1D8BD707-D9CF-40AE-B4C6-C98DA3205C09}" type="datetimeFigureOut">
               <a:rPr lang="en-US" smtClean="0"/>
               <a:pPr/>
-              <a:t>2/7/2014</a:t>
+              <a:t>2/15/2014</a:t>
             </a:fld>
             <a:endParaRPr lang="en-US"/>
           </a:p>
@@ -1783,7 +1783,7 @@
             <a:fld id="{1D8BD707-D9CF-40AE-B4C6-C98DA3205C09}" type="datetimeFigureOut">
               <a:rPr lang="en-US" smtClean="0"/>
               <a:pPr/>
-              <a:t>2/7/2014</a:t>
+              <a:t>2/15/2014</a:t>
             </a:fld>
             <a:endParaRPr lang="en-US"/>
           </a:p>
@@ -2202,7 +2202,7 @@
             <a:fld id="{1D8BD707-D9CF-40AE-B4C6-C98DA3205C09}" type="datetimeFigureOut">
               <a:rPr lang="en-US" smtClean="0"/>
               <a:pPr/>
-              <a:t>2/7/2014</a:t>
+              <a:t>2/15/2014</a:t>
             </a:fld>
             <a:endParaRPr lang="en-US"/>
           </a:p>
@@ -2317,7 +2317,7 @@
             <a:fld id="{1D8BD707-D9CF-40AE-B4C6-C98DA3205C09}" type="datetimeFigureOut">
               <a:rPr lang="en-US" smtClean="0"/>
               <a:pPr/>
-              <a:t>2/7/2014</a:t>
+              <a:t>2/15/2014</a:t>
             </a:fld>
             <a:endParaRPr lang="en-US"/>
           </a:p>
@@ -2409,7 +2409,7 @@
             <a:fld id="{1D8BD707-D9CF-40AE-B4C6-C98DA3205C09}" type="datetimeFigureOut">
               <a:rPr lang="en-US" smtClean="0"/>
               <a:pPr/>
-              <a:t>2/7/2014</a:t>
+              <a:t>2/15/2014</a:t>
             </a:fld>
             <a:endParaRPr lang="en-US"/>
           </a:p>
@@ -2683,7 +2683,7 @@
             <a:fld id="{1D8BD707-D9CF-40AE-B4C6-C98DA3205C09}" type="datetimeFigureOut">
               <a:rPr lang="en-US" smtClean="0"/>
               <a:pPr/>
-              <a:t>2/7/2014</a:t>
+              <a:t>2/15/2014</a:t>
             </a:fld>
             <a:endParaRPr lang="en-US"/>
           </a:p>
@@ -2933,7 +2933,7 @@
             <a:fld id="{1D8BD707-D9CF-40AE-B4C6-C98DA3205C09}" type="datetimeFigureOut">
               <a:rPr lang="en-US" smtClean="0"/>
               <a:pPr/>
-              <a:t>2/7/2014</a:t>
+              <a:t>2/15/2014</a:t>
             </a:fld>
             <a:endParaRPr lang="en-US"/>
           </a:p>
@@ -3143,7 +3143,7 @@
             <a:fld id="{1D8BD707-D9CF-40AE-B4C6-C98DA3205C09}" type="datetimeFigureOut">
               <a:rPr lang="en-US" smtClean="0"/>
               <a:pPr/>
-              <a:t>2/7/2014</a:t>
+              <a:t>2/15/2014</a:t>
             </a:fld>
             <a:endParaRPr lang="en-US"/>
           </a:p>
@@ -3766,394 +3766,6 @@
           </a:p>
         </p:txBody>
       </p:sp>
-      <p:grpSp>
-        <p:nvGrpSpPr>
-          <p:cNvPr id="102" name="Group 101"/>
-          <p:cNvGrpSpPr/>
-          <p:nvPr/>
-        </p:nvGrpSpPr>
-        <p:grpSpPr>
-          <a:xfrm>
-            <a:off x="4238346" y="2360100"/>
-            <a:ext cx="838200" cy="838200"/>
-            <a:chOff x="4238346" y="2360100"/>
-            <a:chExt cx="838200" cy="838200"/>
-          </a:xfrm>
-        </p:grpSpPr>
-        <p:sp>
-          <p:nvSpPr>
-            <p:cNvPr id="23" name="Rectangle 22"/>
-            <p:cNvSpPr/>
-            <p:nvPr/>
-          </p:nvSpPr>
-          <p:spPr>
-            <a:xfrm>
-              <a:off x="4271351" y="2439535"/>
-              <a:ext cx="596266" cy="454165"/>
-            </a:xfrm>
-            <a:prstGeom prst="rect">
-              <a:avLst/>
-            </a:prstGeom>
-            <a:solidFill>
-              <a:schemeClr val="accent6"/>
-            </a:solidFill>
-            <a:ln>
-              <a:noFill/>
-            </a:ln>
-          </p:spPr>
-          <p:style>
-            <a:lnRef idx="2">
-              <a:schemeClr val="accent1">
-                <a:shade val="50000"/>
-              </a:schemeClr>
-            </a:lnRef>
-            <a:fillRef idx="1">
-              <a:schemeClr val="accent1"/>
-            </a:fillRef>
-            <a:effectRef idx="0">
-              <a:schemeClr val="accent1"/>
-            </a:effectRef>
-            <a:fontRef idx="minor">
-              <a:schemeClr val="lt1"/>
-            </a:fontRef>
-          </p:style>
-          <p:txBody>
-            <a:bodyPr rtlCol="0" anchor="ctr"/>
-            <a:lstStyle/>
-            <a:p>
-              <a:pPr algn="ctr"/>
-              <a:endParaRPr lang="en-US"/>
-            </a:p>
-          </p:txBody>
-        </p:sp>
-        <p:sp>
-          <p:nvSpPr>
-            <p:cNvPr id="25" name="Rectangle 24"/>
-            <p:cNvSpPr/>
-            <p:nvPr/>
-          </p:nvSpPr>
-          <p:spPr>
-            <a:xfrm>
-              <a:off x="4324458" y="2496685"/>
-              <a:ext cx="181322" cy="117043"/>
-            </a:xfrm>
-            <a:prstGeom prst="rect">
-              <a:avLst/>
-            </a:prstGeom>
-            <a:solidFill>
-              <a:srgbClr val="0070C0"/>
-            </a:solidFill>
-            <a:ln>
-              <a:solidFill>
-                <a:schemeClr val="bg1"/>
-              </a:solidFill>
-            </a:ln>
-          </p:spPr>
-          <p:style>
-            <a:lnRef idx="2">
-              <a:schemeClr val="accent1">
-                <a:shade val="50000"/>
-              </a:schemeClr>
-            </a:lnRef>
-            <a:fillRef idx="1">
-              <a:schemeClr val="accent1"/>
-            </a:fillRef>
-            <a:effectRef idx="0">
-              <a:schemeClr val="accent1"/>
-            </a:effectRef>
-            <a:fontRef idx="minor">
-              <a:schemeClr val="lt1"/>
-            </a:fontRef>
-          </p:style>
-          <p:txBody>
-            <a:bodyPr rtlCol="0" anchor="ctr"/>
-            <a:lstStyle/>
-            <a:p>
-              <a:pPr algn="ctr"/>
-              <a:endParaRPr lang="en-US"/>
-            </a:p>
-          </p:txBody>
-        </p:sp>
-        <p:sp>
-          <p:nvSpPr>
-            <p:cNvPr id="30" name="Freeform 29"/>
-            <p:cNvSpPr/>
-            <p:nvPr/>
-          </p:nvSpPr>
-          <p:spPr>
-            <a:xfrm>
-              <a:off x="4338644" y="2510753"/>
-              <a:ext cx="693452" cy="652320"/>
-            </a:xfrm>
-            <a:custGeom>
-              <a:avLst/>
-              <a:gdLst>
-                <a:gd name="connsiteX0" fmla="*/ 4763 w 1209675"/>
-                <a:gd name="connsiteY0" fmla="*/ 119063 h 838200"/>
-                <a:gd name="connsiteX1" fmla="*/ 171450 w 1209675"/>
-                <a:gd name="connsiteY1" fmla="*/ 838200 h 838200"/>
-                <a:gd name="connsiteX2" fmla="*/ 1209675 w 1209675"/>
-                <a:gd name="connsiteY2" fmla="*/ 838200 h 838200"/>
-                <a:gd name="connsiteX3" fmla="*/ 1209675 w 1209675"/>
-                <a:gd name="connsiteY3" fmla="*/ 247650 h 838200"/>
-                <a:gd name="connsiteX4" fmla="*/ 238125 w 1209675"/>
-                <a:gd name="connsiteY4" fmla="*/ 0 h 838200"/>
-                <a:gd name="connsiteX5" fmla="*/ 0 w 1209675"/>
-                <a:gd name="connsiteY5" fmla="*/ 0 h 838200"/>
-                <a:gd name="connsiteX6" fmla="*/ 4763 w 1209675"/>
-                <a:gd name="connsiteY6" fmla="*/ 119063 h 838200"/>
-                <a:gd name="connsiteX0" fmla="*/ 4763 w 1209675"/>
-                <a:gd name="connsiteY0" fmla="*/ 119063 h 838200"/>
-                <a:gd name="connsiteX1" fmla="*/ 224786 w 1209675"/>
-                <a:gd name="connsiteY1" fmla="*/ 838200 h 838200"/>
-                <a:gd name="connsiteX2" fmla="*/ 1209675 w 1209675"/>
-                <a:gd name="connsiteY2" fmla="*/ 838200 h 838200"/>
-                <a:gd name="connsiteX3" fmla="*/ 1209675 w 1209675"/>
-                <a:gd name="connsiteY3" fmla="*/ 247650 h 838200"/>
-                <a:gd name="connsiteX4" fmla="*/ 238125 w 1209675"/>
-                <a:gd name="connsiteY4" fmla="*/ 0 h 838200"/>
-                <a:gd name="connsiteX5" fmla="*/ 0 w 1209675"/>
-                <a:gd name="connsiteY5" fmla="*/ 0 h 838200"/>
-                <a:gd name="connsiteX6" fmla="*/ 4763 w 1209675"/>
-                <a:gd name="connsiteY6" fmla="*/ 119063 h 838200"/>
-                <a:gd name="connsiteX0" fmla="*/ 4763 w 1209675"/>
-                <a:gd name="connsiteY0" fmla="*/ 119063 h 838200"/>
-                <a:gd name="connsiteX1" fmla="*/ 224786 w 1209675"/>
-                <a:gd name="connsiteY1" fmla="*/ 822358 h 838200"/>
-                <a:gd name="connsiteX2" fmla="*/ 1209675 w 1209675"/>
-                <a:gd name="connsiteY2" fmla="*/ 838200 h 838200"/>
-                <a:gd name="connsiteX3" fmla="*/ 1209675 w 1209675"/>
-                <a:gd name="connsiteY3" fmla="*/ 247650 h 838200"/>
-                <a:gd name="connsiteX4" fmla="*/ 238125 w 1209675"/>
-                <a:gd name="connsiteY4" fmla="*/ 0 h 838200"/>
-                <a:gd name="connsiteX5" fmla="*/ 0 w 1209675"/>
-                <a:gd name="connsiteY5" fmla="*/ 0 h 838200"/>
-                <a:gd name="connsiteX6" fmla="*/ 4763 w 1209675"/>
-                <a:gd name="connsiteY6" fmla="*/ 119063 h 838200"/>
-                <a:gd name="connsiteX0" fmla="*/ 4763 w 1209675"/>
-                <a:gd name="connsiteY0" fmla="*/ 119063 h 838200"/>
-                <a:gd name="connsiteX1" fmla="*/ 224786 w 1209675"/>
-                <a:gd name="connsiteY1" fmla="*/ 822358 h 838200"/>
-                <a:gd name="connsiteX2" fmla="*/ 1209675 w 1209675"/>
-                <a:gd name="connsiteY2" fmla="*/ 838200 h 838200"/>
-                <a:gd name="connsiteX3" fmla="*/ 1188340 w 1209675"/>
-                <a:gd name="connsiteY3" fmla="*/ 247650 h 838200"/>
-                <a:gd name="connsiteX4" fmla="*/ 238125 w 1209675"/>
-                <a:gd name="connsiteY4" fmla="*/ 0 h 838200"/>
-                <a:gd name="connsiteX5" fmla="*/ 0 w 1209675"/>
-                <a:gd name="connsiteY5" fmla="*/ 0 h 838200"/>
-                <a:gd name="connsiteX6" fmla="*/ 4763 w 1209675"/>
-                <a:gd name="connsiteY6" fmla="*/ 119063 h 838200"/>
-                <a:gd name="connsiteX0" fmla="*/ 4763 w 1188340"/>
-                <a:gd name="connsiteY0" fmla="*/ 119063 h 822358"/>
-                <a:gd name="connsiteX1" fmla="*/ 224786 w 1188340"/>
-                <a:gd name="connsiteY1" fmla="*/ 822358 h 822358"/>
-                <a:gd name="connsiteX2" fmla="*/ 1183007 w 1188340"/>
-                <a:gd name="connsiteY2" fmla="*/ 818397 h 822358"/>
-                <a:gd name="connsiteX3" fmla="*/ 1188340 w 1188340"/>
-                <a:gd name="connsiteY3" fmla="*/ 247650 h 822358"/>
-                <a:gd name="connsiteX4" fmla="*/ 238125 w 1188340"/>
-                <a:gd name="connsiteY4" fmla="*/ 0 h 822358"/>
-                <a:gd name="connsiteX5" fmla="*/ 0 w 1188340"/>
-                <a:gd name="connsiteY5" fmla="*/ 0 h 822358"/>
-                <a:gd name="connsiteX6" fmla="*/ 4763 w 1188340"/>
-                <a:gd name="connsiteY6" fmla="*/ 119063 h 822358"/>
-                <a:gd name="connsiteX0" fmla="*/ 4763 w 1188340"/>
-                <a:gd name="connsiteY0" fmla="*/ 119063 h 822358"/>
-                <a:gd name="connsiteX1" fmla="*/ 224786 w 1188340"/>
-                <a:gd name="connsiteY1" fmla="*/ 822358 h 822358"/>
-                <a:gd name="connsiteX2" fmla="*/ 1183007 w 1188340"/>
-                <a:gd name="connsiteY2" fmla="*/ 818397 h 822358"/>
-                <a:gd name="connsiteX3" fmla="*/ 1188340 w 1188340"/>
-                <a:gd name="connsiteY3" fmla="*/ 283674 h 822358"/>
-                <a:gd name="connsiteX4" fmla="*/ 238125 w 1188340"/>
-                <a:gd name="connsiteY4" fmla="*/ 0 h 822358"/>
-                <a:gd name="connsiteX5" fmla="*/ 0 w 1188340"/>
-                <a:gd name="connsiteY5" fmla="*/ 0 h 822358"/>
-                <a:gd name="connsiteX6" fmla="*/ 4763 w 1188340"/>
-                <a:gd name="connsiteY6" fmla="*/ 119063 h 822358"/>
-              </a:gdLst>
-              <a:ahLst/>
-              <a:cxnLst>
-                <a:cxn ang="0">
-                  <a:pos x="connsiteX0" y="connsiteY0"/>
-                </a:cxn>
-                <a:cxn ang="0">
-                  <a:pos x="connsiteX1" y="connsiteY1"/>
-                </a:cxn>
-                <a:cxn ang="0">
-                  <a:pos x="connsiteX2" y="connsiteY2"/>
-                </a:cxn>
-                <a:cxn ang="0">
-                  <a:pos x="connsiteX3" y="connsiteY3"/>
-                </a:cxn>
-                <a:cxn ang="0">
-                  <a:pos x="connsiteX4" y="connsiteY4"/>
-                </a:cxn>
-                <a:cxn ang="0">
-                  <a:pos x="connsiteX5" y="connsiteY5"/>
-                </a:cxn>
-                <a:cxn ang="0">
-                  <a:pos x="connsiteX6" y="connsiteY6"/>
-                </a:cxn>
-              </a:cxnLst>
-              <a:rect l="l" t="t" r="r" b="b"/>
-              <a:pathLst>
-                <a:path w="1188340" h="822358">
-                  <a:moveTo>
-                    <a:pt x="4763" y="119063"/>
-                  </a:moveTo>
-                  <a:lnTo>
-                    <a:pt x="224786" y="822358"/>
-                  </a:lnTo>
-                  <a:lnTo>
-                    <a:pt x="1183007" y="818397"/>
-                  </a:lnTo>
-                  <a:cubicBezTo>
-                    <a:pt x="1184785" y="628148"/>
-                    <a:pt x="1186562" y="473923"/>
-                    <a:pt x="1188340" y="283674"/>
-                  </a:cubicBezTo>
-                  <a:lnTo>
-                    <a:pt x="238125" y="0"/>
-                  </a:lnTo>
-                  <a:lnTo>
-                    <a:pt x="0" y="0"/>
-                  </a:lnTo>
-                  <a:lnTo>
-                    <a:pt x="4763" y="119063"/>
-                  </a:lnTo>
-                  <a:close/>
-                </a:path>
-              </a:pathLst>
-            </a:custGeom>
-            <a:solidFill>
-              <a:srgbClr val="0070C0">
-                <a:alpha val="55000"/>
-              </a:srgbClr>
-            </a:solidFill>
-            <a:ln>
-              <a:noFill/>
-            </a:ln>
-          </p:spPr>
-          <p:style>
-            <a:lnRef idx="2">
-              <a:schemeClr val="accent1">
-                <a:shade val="50000"/>
-              </a:schemeClr>
-            </a:lnRef>
-            <a:fillRef idx="1">
-              <a:schemeClr val="accent1"/>
-            </a:fillRef>
-            <a:effectRef idx="0">
-              <a:schemeClr val="accent1"/>
-            </a:effectRef>
-            <a:fontRef idx="minor">
-              <a:schemeClr val="lt1"/>
-            </a:fontRef>
-          </p:style>
-          <p:txBody>
-            <a:bodyPr rtlCol="0" anchor="ctr"/>
-            <a:lstStyle/>
-            <a:p>
-              <a:pPr algn="ctr"/>
-              <a:endParaRPr lang="en-US"/>
-            </a:p>
-          </p:txBody>
-        </p:sp>
-        <p:sp>
-          <p:nvSpPr>
-            <p:cNvPr id="24" name="Rectangle 23"/>
-            <p:cNvSpPr/>
-            <p:nvPr/>
-          </p:nvSpPr>
-          <p:spPr>
-            <a:xfrm>
-              <a:off x="4475693" y="2742317"/>
-              <a:ext cx="569723" cy="409283"/>
-            </a:xfrm>
-            <a:prstGeom prst="rect">
-              <a:avLst/>
-            </a:prstGeom>
-            <a:solidFill>
-              <a:srgbClr val="0070C0"/>
-            </a:solidFill>
-            <a:ln>
-              <a:solidFill>
-                <a:schemeClr val="bg1"/>
-              </a:solidFill>
-            </a:ln>
-          </p:spPr>
-          <p:style>
-            <a:lnRef idx="2">
-              <a:schemeClr val="accent1">
-                <a:shade val="50000"/>
-              </a:schemeClr>
-            </a:lnRef>
-            <a:fillRef idx="1">
-              <a:schemeClr val="accent1"/>
-            </a:fillRef>
-            <a:effectRef idx="0">
-              <a:schemeClr val="accent1"/>
-            </a:effectRef>
-            <a:fontRef idx="minor">
-              <a:schemeClr val="lt1"/>
-            </a:fontRef>
-          </p:style>
-          <p:txBody>
-            <a:bodyPr rtlCol="0" anchor="ctr"/>
-            <a:lstStyle/>
-            <a:p>
-              <a:pPr algn="ctr"/>
-              <a:endParaRPr lang="en-US"/>
-            </a:p>
-          </p:txBody>
-        </p:sp>
-        <p:sp>
-          <p:nvSpPr>
-            <p:cNvPr id="49" name="Rectangle 48"/>
-            <p:cNvSpPr/>
-            <p:nvPr/>
-          </p:nvSpPr>
-          <p:spPr>
-            <a:xfrm>
-              <a:off x="4238346" y="2360100"/>
-              <a:ext cx="838200" cy="838200"/>
-            </a:xfrm>
-            <a:prstGeom prst="rect">
-              <a:avLst/>
-            </a:prstGeom>
-            <a:noFill/>
-            <a:ln>
-              <a:noFill/>
-            </a:ln>
-          </p:spPr>
-          <p:style>
-            <a:lnRef idx="2">
-              <a:schemeClr val="accent1">
-                <a:shade val="50000"/>
-              </a:schemeClr>
-            </a:lnRef>
-            <a:fillRef idx="1">
-              <a:schemeClr val="accent1"/>
-            </a:fillRef>
-            <a:effectRef idx="0">
-              <a:schemeClr val="accent1"/>
-            </a:effectRef>
-            <a:fontRef idx="minor">
-              <a:schemeClr val="lt1"/>
-            </a:fontRef>
-          </p:style>
-          <p:txBody>
-            <a:bodyPr rtlCol="0" anchor="ctr"/>
-            <a:lstStyle/>
-            <a:p>
-              <a:pPr algn="ctr"/>
-              <a:endParaRPr lang="en-SG"/>
-            </a:p>
-          </p:txBody>
-        </p:sp>
-      </p:grpSp>
       <p:grpSp>
         <p:nvGrpSpPr>
           <p:cNvPr id="101" name="Group 100"/>
@@ -6025,7 +5637,7 @@
         <p:spPr>
           <a:xfrm>
             <a:off x="4311964" y="3342375"/>
-            <a:ext cx="689438" cy="338554"/>
+            <a:ext cx="689438" cy="215444"/>
           </a:xfrm>
           <a:prstGeom prst="rect">
             <a:avLst/>
@@ -6040,7 +5652,11 @@
           <a:p>
             <a:r>
               <a:rPr lang="en-US" sz="800" dirty="0" smtClean="0"/>
-              <a:t>Zoom to area</a:t>
+              <a:t>Zoom </a:t>
+            </a:r>
+            <a:r>
+              <a:rPr lang="en-US" sz="800" dirty="0" smtClean="0"/>
+              <a:t>In</a:t>
             </a:r>
             <a:endParaRPr lang="en-SG" sz="800" dirty="0"/>
           </a:p>
@@ -6174,7 +5790,7 @@
         </p:nvSpPr>
         <p:spPr>
           <a:xfrm>
-            <a:off x="1066800" y="1295400"/>
+            <a:off x="276083" y="304800"/>
             <a:ext cx="3502684" cy="369332"/>
           </a:xfrm>
           <a:prstGeom prst="rect">
@@ -9043,6 +8659,858 @@
               <a:solidFill>
                 <a:schemeClr val="bg1"/>
               </a:solidFill>
+            </a:ln>
+          </p:spPr>
+          <p:style>
+            <a:lnRef idx="2">
+              <a:schemeClr val="accent1">
+                <a:shade val="50000"/>
+              </a:schemeClr>
+            </a:lnRef>
+            <a:fillRef idx="1">
+              <a:schemeClr val="accent1"/>
+            </a:fillRef>
+            <a:effectRef idx="0">
+              <a:schemeClr val="accent1"/>
+            </a:effectRef>
+            <a:fontRef idx="minor">
+              <a:schemeClr val="lt1"/>
+            </a:fontRef>
+          </p:style>
+          <p:txBody>
+            <a:bodyPr rtlCol="0" anchor="ctr"/>
+            <a:lstStyle/>
+            <a:p>
+              <a:pPr algn="ctr"/>
+              <a:endParaRPr lang="en-US"/>
+            </a:p>
+          </p:txBody>
+        </p:sp>
+      </p:grpSp>
+      <p:sp>
+        <p:nvSpPr>
+          <p:cNvPr id="135" name="TextBox 134"/>
+          <p:cNvSpPr txBox="1"/>
+          <p:nvPr/>
+        </p:nvSpPr>
+        <p:spPr>
+          <a:xfrm>
+            <a:off x="4308476" y="2002895"/>
+            <a:ext cx="689438" cy="215444"/>
+          </a:xfrm>
+          <a:prstGeom prst="rect">
+            <a:avLst/>
+          </a:prstGeom>
+          <a:noFill/>
+        </p:spPr>
+        <p:txBody>
+          <a:bodyPr wrap="square" rtlCol="0">
+            <a:spAutoFit/>
+          </a:bodyPr>
+          <a:lstStyle/>
+          <a:p>
+            <a:r>
+              <a:rPr lang="en-US" sz="800" dirty="0" smtClean="0"/>
+              <a:t>Zoom </a:t>
+            </a:r>
+            <a:r>
+              <a:rPr lang="en-US" sz="800" dirty="0" smtClean="0"/>
+              <a:t>out</a:t>
+            </a:r>
+            <a:endParaRPr lang="en-SG" sz="800" dirty="0"/>
+          </a:p>
+        </p:txBody>
+      </p:sp>
+      <p:grpSp>
+        <p:nvGrpSpPr>
+          <p:cNvPr id="86" name="Group 85"/>
+          <p:cNvGrpSpPr/>
+          <p:nvPr/>
+        </p:nvGrpSpPr>
+        <p:grpSpPr>
+          <a:xfrm>
+            <a:off x="4234858" y="1066800"/>
+            <a:ext cx="838200" cy="838200"/>
+            <a:chOff x="4234858" y="1066800"/>
+            <a:chExt cx="838200" cy="838200"/>
+          </a:xfrm>
+        </p:grpSpPr>
+        <p:sp>
+          <p:nvSpPr>
+            <p:cNvPr id="113" name="Rectangle 112"/>
+            <p:cNvSpPr/>
+            <p:nvPr/>
+          </p:nvSpPr>
+          <p:spPr>
+            <a:xfrm>
+              <a:off x="4267863" y="1146235"/>
+              <a:ext cx="596266" cy="454165"/>
+            </a:xfrm>
+            <a:prstGeom prst="rect">
+              <a:avLst/>
+            </a:prstGeom>
+            <a:solidFill>
+              <a:srgbClr val="0070C0"/>
+            </a:solidFill>
+            <a:ln>
+              <a:noFill/>
+            </a:ln>
+          </p:spPr>
+          <p:style>
+            <a:lnRef idx="2">
+              <a:schemeClr val="accent1">
+                <a:shade val="50000"/>
+              </a:schemeClr>
+            </a:lnRef>
+            <a:fillRef idx="1">
+              <a:schemeClr val="accent1"/>
+            </a:fillRef>
+            <a:effectRef idx="0">
+              <a:schemeClr val="accent1"/>
+            </a:effectRef>
+            <a:fontRef idx="minor">
+              <a:schemeClr val="lt1"/>
+            </a:fontRef>
+          </p:style>
+          <p:txBody>
+            <a:bodyPr rtlCol="0" anchor="ctr"/>
+            <a:lstStyle/>
+            <a:p>
+              <a:pPr algn="ctr"/>
+              <a:endParaRPr lang="en-US"/>
+            </a:p>
+          </p:txBody>
+        </p:sp>
+        <p:sp>
+          <p:nvSpPr>
+            <p:cNvPr id="133" name="Rectangle 132"/>
+            <p:cNvSpPr/>
+            <p:nvPr/>
+          </p:nvSpPr>
+          <p:spPr>
+            <a:xfrm>
+              <a:off x="4234858" y="1066800"/>
+              <a:ext cx="838200" cy="838200"/>
+            </a:xfrm>
+            <a:prstGeom prst="rect">
+              <a:avLst/>
+            </a:prstGeom>
+            <a:noFill/>
+            <a:ln>
+              <a:noFill/>
+            </a:ln>
+          </p:spPr>
+          <p:style>
+            <a:lnRef idx="2">
+              <a:schemeClr val="accent1">
+                <a:shade val="50000"/>
+              </a:schemeClr>
+            </a:lnRef>
+            <a:fillRef idx="1">
+              <a:schemeClr val="accent1"/>
+            </a:fillRef>
+            <a:effectRef idx="0">
+              <a:schemeClr val="accent1"/>
+            </a:effectRef>
+            <a:fontRef idx="minor">
+              <a:schemeClr val="lt1"/>
+            </a:fontRef>
+          </p:style>
+          <p:txBody>
+            <a:bodyPr rtlCol="0" anchor="ctr"/>
+            <a:lstStyle/>
+            <a:p>
+              <a:pPr algn="ctr"/>
+              <a:endParaRPr lang="en-SG"/>
+            </a:p>
+          </p:txBody>
+        </p:sp>
+        <p:sp>
+          <p:nvSpPr>
+            <p:cNvPr id="51" name="Freeform 50"/>
+            <p:cNvSpPr/>
+            <p:nvPr/>
+          </p:nvSpPr>
+          <p:spPr>
+            <a:xfrm>
+              <a:off x="4264819" y="1147763"/>
+              <a:ext cx="726281" cy="650081"/>
+            </a:xfrm>
+            <a:custGeom>
+              <a:avLst/>
+              <a:gdLst>
+                <a:gd name="connsiteX0" fmla="*/ 4762 w 692944"/>
+                <a:gd name="connsiteY0" fmla="*/ 452437 h 514350"/>
+                <a:gd name="connsiteX1" fmla="*/ 514350 w 692944"/>
+                <a:gd name="connsiteY1" fmla="*/ 514350 h 514350"/>
+                <a:gd name="connsiteX2" fmla="*/ 692944 w 692944"/>
+                <a:gd name="connsiteY2" fmla="*/ 514350 h 514350"/>
+                <a:gd name="connsiteX3" fmla="*/ 692944 w 692944"/>
+                <a:gd name="connsiteY3" fmla="*/ 402431 h 514350"/>
+                <a:gd name="connsiteX4" fmla="*/ 590550 w 692944"/>
+                <a:gd name="connsiteY4" fmla="*/ 0 h 514350"/>
+                <a:gd name="connsiteX5" fmla="*/ 0 w 692944"/>
+                <a:gd name="connsiteY5" fmla="*/ 0 h 514350"/>
+                <a:gd name="connsiteX6" fmla="*/ 4762 w 692944"/>
+                <a:gd name="connsiteY6" fmla="*/ 452437 h 514350"/>
+                <a:gd name="connsiteX0" fmla="*/ 4762 w 692944"/>
+                <a:gd name="connsiteY0" fmla="*/ 452437 h 514350"/>
+                <a:gd name="connsiteX1" fmla="*/ 514350 w 692944"/>
+                <a:gd name="connsiteY1" fmla="*/ 514350 h 514350"/>
+                <a:gd name="connsiteX2" fmla="*/ 692944 w 692944"/>
+                <a:gd name="connsiteY2" fmla="*/ 514350 h 514350"/>
+                <a:gd name="connsiteX3" fmla="*/ 692944 w 692944"/>
+                <a:gd name="connsiteY3" fmla="*/ 402431 h 514350"/>
+                <a:gd name="connsiteX4" fmla="*/ 600075 w 692944"/>
+                <a:gd name="connsiteY4" fmla="*/ 0 h 514350"/>
+                <a:gd name="connsiteX5" fmla="*/ 0 w 692944"/>
+                <a:gd name="connsiteY5" fmla="*/ 0 h 514350"/>
+                <a:gd name="connsiteX6" fmla="*/ 4762 w 692944"/>
+                <a:gd name="connsiteY6" fmla="*/ 452437 h 514350"/>
+                <a:gd name="connsiteX0" fmla="*/ 4762 w 692944"/>
+                <a:gd name="connsiteY0" fmla="*/ 452437 h 514350"/>
+                <a:gd name="connsiteX1" fmla="*/ 514350 w 692944"/>
+                <a:gd name="connsiteY1" fmla="*/ 514350 h 514350"/>
+                <a:gd name="connsiteX2" fmla="*/ 692944 w 692944"/>
+                <a:gd name="connsiteY2" fmla="*/ 514350 h 514350"/>
+                <a:gd name="connsiteX3" fmla="*/ 688181 w 692944"/>
+                <a:gd name="connsiteY3" fmla="*/ 373856 h 514350"/>
+                <a:gd name="connsiteX4" fmla="*/ 600075 w 692944"/>
+                <a:gd name="connsiteY4" fmla="*/ 0 h 514350"/>
+                <a:gd name="connsiteX5" fmla="*/ 0 w 692944"/>
+                <a:gd name="connsiteY5" fmla="*/ 0 h 514350"/>
+                <a:gd name="connsiteX6" fmla="*/ 4762 w 692944"/>
+                <a:gd name="connsiteY6" fmla="*/ 452437 h 514350"/>
+                <a:gd name="connsiteX0" fmla="*/ 4762 w 692944"/>
+                <a:gd name="connsiteY0" fmla="*/ 452437 h 514350"/>
+                <a:gd name="connsiteX1" fmla="*/ 514350 w 692944"/>
+                <a:gd name="connsiteY1" fmla="*/ 514350 h 514350"/>
+                <a:gd name="connsiteX2" fmla="*/ 692944 w 692944"/>
+                <a:gd name="connsiteY2" fmla="*/ 514350 h 514350"/>
+                <a:gd name="connsiteX3" fmla="*/ 692943 w 692944"/>
+                <a:gd name="connsiteY3" fmla="*/ 385762 h 514350"/>
+                <a:gd name="connsiteX4" fmla="*/ 600075 w 692944"/>
+                <a:gd name="connsiteY4" fmla="*/ 0 h 514350"/>
+                <a:gd name="connsiteX5" fmla="*/ 0 w 692944"/>
+                <a:gd name="connsiteY5" fmla="*/ 0 h 514350"/>
+                <a:gd name="connsiteX6" fmla="*/ 4762 w 692944"/>
+                <a:gd name="connsiteY6" fmla="*/ 452437 h 514350"/>
+                <a:gd name="connsiteX0" fmla="*/ 4762 w 692944"/>
+                <a:gd name="connsiteY0" fmla="*/ 452437 h 514350"/>
+                <a:gd name="connsiteX1" fmla="*/ 514350 w 692944"/>
+                <a:gd name="connsiteY1" fmla="*/ 514350 h 514350"/>
+                <a:gd name="connsiteX2" fmla="*/ 692944 w 692944"/>
+                <a:gd name="connsiteY2" fmla="*/ 514350 h 514350"/>
+                <a:gd name="connsiteX3" fmla="*/ 690561 w 692944"/>
+                <a:gd name="connsiteY3" fmla="*/ 373856 h 514350"/>
+                <a:gd name="connsiteX4" fmla="*/ 600075 w 692944"/>
+                <a:gd name="connsiteY4" fmla="*/ 0 h 514350"/>
+                <a:gd name="connsiteX5" fmla="*/ 0 w 692944"/>
+                <a:gd name="connsiteY5" fmla="*/ 0 h 514350"/>
+                <a:gd name="connsiteX6" fmla="*/ 4762 w 692944"/>
+                <a:gd name="connsiteY6" fmla="*/ 452437 h 514350"/>
+                <a:gd name="connsiteX0" fmla="*/ 4762 w 692944"/>
+                <a:gd name="connsiteY0" fmla="*/ 452437 h 647700"/>
+                <a:gd name="connsiteX1" fmla="*/ 528638 w 692944"/>
+                <a:gd name="connsiteY1" fmla="*/ 647700 h 647700"/>
+                <a:gd name="connsiteX2" fmla="*/ 692944 w 692944"/>
+                <a:gd name="connsiteY2" fmla="*/ 514350 h 647700"/>
+                <a:gd name="connsiteX3" fmla="*/ 690561 w 692944"/>
+                <a:gd name="connsiteY3" fmla="*/ 373856 h 647700"/>
+                <a:gd name="connsiteX4" fmla="*/ 600075 w 692944"/>
+                <a:gd name="connsiteY4" fmla="*/ 0 h 647700"/>
+                <a:gd name="connsiteX5" fmla="*/ 0 w 692944"/>
+                <a:gd name="connsiteY5" fmla="*/ 0 h 647700"/>
+                <a:gd name="connsiteX6" fmla="*/ 4762 w 692944"/>
+                <a:gd name="connsiteY6" fmla="*/ 452437 h 647700"/>
+                <a:gd name="connsiteX0" fmla="*/ 4762 w 726281"/>
+                <a:gd name="connsiteY0" fmla="*/ 452437 h 650081"/>
+                <a:gd name="connsiteX1" fmla="*/ 528638 w 726281"/>
+                <a:gd name="connsiteY1" fmla="*/ 647700 h 650081"/>
+                <a:gd name="connsiteX2" fmla="*/ 726281 w 726281"/>
+                <a:gd name="connsiteY2" fmla="*/ 650081 h 650081"/>
+                <a:gd name="connsiteX3" fmla="*/ 690561 w 726281"/>
+                <a:gd name="connsiteY3" fmla="*/ 373856 h 650081"/>
+                <a:gd name="connsiteX4" fmla="*/ 600075 w 726281"/>
+                <a:gd name="connsiteY4" fmla="*/ 0 h 650081"/>
+                <a:gd name="connsiteX5" fmla="*/ 0 w 726281"/>
+                <a:gd name="connsiteY5" fmla="*/ 0 h 650081"/>
+                <a:gd name="connsiteX6" fmla="*/ 4762 w 726281"/>
+                <a:gd name="connsiteY6" fmla="*/ 452437 h 650081"/>
+                <a:gd name="connsiteX0" fmla="*/ 4762 w 726281"/>
+                <a:gd name="connsiteY0" fmla="*/ 452437 h 650081"/>
+                <a:gd name="connsiteX1" fmla="*/ 528638 w 726281"/>
+                <a:gd name="connsiteY1" fmla="*/ 647700 h 650081"/>
+                <a:gd name="connsiteX2" fmla="*/ 726281 w 726281"/>
+                <a:gd name="connsiteY2" fmla="*/ 650081 h 650081"/>
+                <a:gd name="connsiteX3" fmla="*/ 726280 w 726281"/>
+                <a:gd name="connsiteY3" fmla="*/ 514350 h 650081"/>
+                <a:gd name="connsiteX4" fmla="*/ 600075 w 726281"/>
+                <a:gd name="connsiteY4" fmla="*/ 0 h 650081"/>
+                <a:gd name="connsiteX5" fmla="*/ 0 w 726281"/>
+                <a:gd name="connsiteY5" fmla="*/ 0 h 650081"/>
+                <a:gd name="connsiteX6" fmla="*/ 4762 w 726281"/>
+                <a:gd name="connsiteY6" fmla="*/ 452437 h 650081"/>
+              </a:gdLst>
+              <a:ahLst/>
+              <a:cxnLst>
+                <a:cxn ang="0">
+                  <a:pos x="connsiteX0" y="connsiteY0"/>
+                </a:cxn>
+                <a:cxn ang="0">
+                  <a:pos x="connsiteX1" y="connsiteY1"/>
+                </a:cxn>
+                <a:cxn ang="0">
+                  <a:pos x="connsiteX2" y="connsiteY2"/>
+                </a:cxn>
+                <a:cxn ang="0">
+                  <a:pos x="connsiteX3" y="connsiteY3"/>
+                </a:cxn>
+                <a:cxn ang="0">
+                  <a:pos x="connsiteX4" y="connsiteY4"/>
+                </a:cxn>
+                <a:cxn ang="0">
+                  <a:pos x="connsiteX5" y="connsiteY5"/>
+                </a:cxn>
+                <a:cxn ang="0">
+                  <a:pos x="connsiteX6" y="connsiteY6"/>
+                </a:cxn>
+              </a:cxnLst>
+              <a:rect l="l" t="t" r="r" b="b"/>
+              <a:pathLst>
+                <a:path w="726281" h="650081">
+                  <a:moveTo>
+                    <a:pt x="4762" y="452437"/>
+                  </a:moveTo>
+                  <a:lnTo>
+                    <a:pt x="528638" y="647700"/>
+                  </a:lnTo>
+                  <a:lnTo>
+                    <a:pt x="726281" y="650081"/>
+                  </a:lnTo>
+                  <a:cubicBezTo>
+                    <a:pt x="726281" y="607218"/>
+                    <a:pt x="726280" y="557213"/>
+                    <a:pt x="726280" y="514350"/>
+                  </a:cubicBezTo>
+                  <a:lnTo>
+                    <a:pt x="600075" y="0"/>
+                  </a:lnTo>
+                  <a:lnTo>
+                    <a:pt x="0" y="0"/>
+                  </a:lnTo>
+                  <a:cubicBezTo>
+                    <a:pt x="1587" y="150812"/>
+                    <a:pt x="3175" y="301625"/>
+                    <a:pt x="4762" y="452437"/>
+                  </a:cubicBezTo>
+                  <a:close/>
+                </a:path>
+              </a:pathLst>
+            </a:custGeom>
+            <a:solidFill>
+              <a:srgbClr val="0070C0">
+                <a:alpha val="55000"/>
+              </a:srgbClr>
+            </a:solidFill>
+            <a:ln>
+              <a:noFill/>
+            </a:ln>
+          </p:spPr>
+          <p:style>
+            <a:lnRef idx="2">
+              <a:schemeClr val="accent1">
+                <a:shade val="50000"/>
+              </a:schemeClr>
+            </a:lnRef>
+            <a:fillRef idx="1">
+              <a:schemeClr val="accent1"/>
+            </a:fillRef>
+            <a:effectRef idx="0">
+              <a:schemeClr val="accent1"/>
+            </a:effectRef>
+            <a:fontRef idx="minor">
+              <a:schemeClr val="lt1"/>
+            </a:fontRef>
+          </p:style>
+          <p:txBody>
+            <a:bodyPr rtlCol="0" anchor="ctr"/>
+            <a:lstStyle/>
+            <a:p>
+              <a:pPr algn="ctr"/>
+              <a:endParaRPr lang="en-SG"/>
+            </a:p>
+          </p:txBody>
+        </p:sp>
+        <p:sp>
+          <p:nvSpPr>
+            <p:cNvPr id="122" name="Rectangle 121"/>
+            <p:cNvSpPr/>
+            <p:nvPr/>
+          </p:nvSpPr>
+          <p:spPr>
+            <a:xfrm>
+              <a:off x="4472205" y="1449017"/>
+              <a:ext cx="569723" cy="409283"/>
+            </a:xfrm>
+            <a:prstGeom prst="rect">
+              <a:avLst/>
+            </a:prstGeom>
+            <a:solidFill>
+              <a:schemeClr val="accent6">
+                <a:lumMod val="75000"/>
+                <a:alpha val="65000"/>
+              </a:schemeClr>
+            </a:solidFill>
+            <a:ln>
+              <a:solidFill>
+                <a:schemeClr val="bg1"/>
+              </a:solidFill>
+              <a:miter lim="800000"/>
+            </a:ln>
+          </p:spPr>
+          <p:style>
+            <a:lnRef idx="2">
+              <a:schemeClr val="accent1">
+                <a:shade val="50000"/>
+              </a:schemeClr>
+            </a:lnRef>
+            <a:fillRef idx="1">
+              <a:schemeClr val="accent1"/>
+            </a:fillRef>
+            <a:effectRef idx="0">
+              <a:schemeClr val="accent1"/>
+            </a:effectRef>
+            <a:fontRef idx="minor">
+              <a:schemeClr val="lt1"/>
+            </a:fontRef>
+          </p:style>
+          <p:txBody>
+            <a:bodyPr rtlCol="0" anchor="ctr"/>
+            <a:lstStyle/>
+            <a:p>
+              <a:pPr algn="ctr"/>
+              <a:endParaRPr lang="en-US"/>
+            </a:p>
+          </p:txBody>
+        </p:sp>
+        <p:sp>
+          <p:nvSpPr>
+            <p:cNvPr id="115" name="Rectangle 114"/>
+            <p:cNvSpPr/>
+            <p:nvPr/>
+          </p:nvSpPr>
+          <p:spPr>
+            <a:xfrm>
+              <a:off x="4798389" y="1665566"/>
+              <a:ext cx="181322" cy="117043"/>
+            </a:xfrm>
+            <a:prstGeom prst="rect">
+              <a:avLst/>
+            </a:prstGeom>
+            <a:solidFill>
+              <a:srgbClr val="0070C0"/>
+            </a:solidFill>
+            <a:ln>
+              <a:solidFill>
+                <a:schemeClr val="bg1"/>
+              </a:solidFill>
+              <a:miter lim="800000"/>
+            </a:ln>
+          </p:spPr>
+          <p:style>
+            <a:lnRef idx="2">
+              <a:schemeClr val="accent1">
+                <a:shade val="50000"/>
+              </a:schemeClr>
+            </a:lnRef>
+            <a:fillRef idx="1">
+              <a:schemeClr val="accent1"/>
+            </a:fillRef>
+            <a:effectRef idx="0">
+              <a:schemeClr val="accent1"/>
+            </a:effectRef>
+            <a:fontRef idx="minor">
+              <a:schemeClr val="lt1"/>
+            </a:fontRef>
+          </p:style>
+          <p:txBody>
+            <a:bodyPr rtlCol="0" anchor="ctr"/>
+            <a:lstStyle/>
+            <a:p>
+              <a:pPr algn="ctr"/>
+              <a:endParaRPr lang="en-US"/>
+            </a:p>
+          </p:txBody>
+        </p:sp>
+      </p:grpSp>
+      <p:grpSp>
+        <p:nvGrpSpPr>
+          <p:cNvPr id="83" name="Group 82"/>
+          <p:cNvGrpSpPr/>
+          <p:nvPr/>
+        </p:nvGrpSpPr>
+        <p:grpSpPr>
+          <a:xfrm>
+            <a:off x="4238346" y="2360100"/>
+            <a:ext cx="838200" cy="838200"/>
+            <a:chOff x="4238346" y="2360100"/>
+            <a:chExt cx="838200" cy="838200"/>
+          </a:xfrm>
+        </p:grpSpPr>
+        <p:sp>
+          <p:nvSpPr>
+            <p:cNvPr id="23" name="Rectangle 22"/>
+            <p:cNvSpPr/>
+            <p:nvPr/>
+          </p:nvSpPr>
+          <p:spPr>
+            <a:xfrm>
+              <a:off x="4271351" y="2439535"/>
+              <a:ext cx="596266" cy="454165"/>
+            </a:xfrm>
+            <a:prstGeom prst="rect">
+              <a:avLst/>
+            </a:prstGeom>
+            <a:solidFill>
+              <a:schemeClr val="accent6">
+                <a:lumMod val="75000"/>
+                <a:alpha val="65000"/>
+              </a:schemeClr>
+            </a:solidFill>
+            <a:ln>
+              <a:noFill/>
+            </a:ln>
+          </p:spPr>
+          <p:style>
+            <a:lnRef idx="2">
+              <a:schemeClr val="accent1">
+                <a:shade val="50000"/>
+              </a:schemeClr>
+            </a:lnRef>
+            <a:fillRef idx="1">
+              <a:schemeClr val="accent1"/>
+            </a:fillRef>
+            <a:effectRef idx="0">
+              <a:schemeClr val="accent1"/>
+            </a:effectRef>
+            <a:fontRef idx="minor">
+              <a:schemeClr val="lt1"/>
+            </a:fontRef>
+          </p:style>
+          <p:txBody>
+            <a:bodyPr rtlCol="0" anchor="ctr"/>
+            <a:lstStyle/>
+            <a:p>
+              <a:pPr algn="ctr"/>
+              <a:endParaRPr lang="en-US"/>
+            </a:p>
+          </p:txBody>
+        </p:sp>
+        <p:sp>
+          <p:nvSpPr>
+            <p:cNvPr id="25" name="Rectangle 24"/>
+            <p:cNvSpPr/>
+            <p:nvPr/>
+          </p:nvSpPr>
+          <p:spPr>
+            <a:xfrm>
+              <a:off x="4324458" y="2496685"/>
+              <a:ext cx="181322" cy="117043"/>
+            </a:xfrm>
+            <a:prstGeom prst="rect">
+              <a:avLst/>
+            </a:prstGeom>
+            <a:solidFill>
+              <a:srgbClr val="0070C0"/>
+            </a:solidFill>
+            <a:ln>
+              <a:solidFill>
+                <a:schemeClr val="bg1"/>
+              </a:solidFill>
+              <a:miter lim="800000"/>
+            </a:ln>
+          </p:spPr>
+          <p:style>
+            <a:lnRef idx="2">
+              <a:schemeClr val="accent1">
+                <a:shade val="50000"/>
+              </a:schemeClr>
+            </a:lnRef>
+            <a:fillRef idx="1">
+              <a:schemeClr val="accent1"/>
+            </a:fillRef>
+            <a:effectRef idx="0">
+              <a:schemeClr val="accent1"/>
+            </a:effectRef>
+            <a:fontRef idx="minor">
+              <a:schemeClr val="lt1"/>
+            </a:fontRef>
+          </p:style>
+          <p:txBody>
+            <a:bodyPr rtlCol="0" anchor="ctr"/>
+            <a:lstStyle/>
+            <a:p>
+              <a:pPr algn="ctr"/>
+              <a:endParaRPr lang="en-US"/>
+            </a:p>
+          </p:txBody>
+        </p:sp>
+        <p:sp>
+          <p:nvSpPr>
+            <p:cNvPr id="30" name="Freeform 29"/>
+            <p:cNvSpPr/>
+            <p:nvPr/>
+          </p:nvSpPr>
+          <p:spPr>
+            <a:xfrm>
+              <a:off x="4338644" y="2510753"/>
+              <a:ext cx="693452" cy="652320"/>
+            </a:xfrm>
+            <a:custGeom>
+              <a:avLst/>
+              <a:gdLst>
+                <a:gd name="connsiteX0" fmla="*/ 4763 w 1209675"/>
+                <a:gd name="connsiteY0" fmla="*/ 119063 h 838200"/>
+                <a:gd name="connsiteX1" fmla="*/ 171450 w 1209675"/>
+                <a:gd name="connsiteY1" fmla="*/ 838200 h 838200"/>
+                <a:gd name="connsiteX2" fmla="*/ 1209675 w 1209675"/>
+                <a:gd name="connsiteY2" fmla="*/ 838200 h 838200"/>
+                <a:gd name="connsiteX3" fmla="*/ 1209675 w 1209675"/>
+                <a:gd name="connsiteY3" fmla="*/ 247650 h 838200"/>
+                <a:gd name="connsiteX4" fmla="*/ 238125 w 1209675"/>
+                <a:gd name="connsiteY4" fmla="*/ 0 h 838200"/>
+                <a:gd name="connsiteX5" fmla="*/ 0 w 1209675"/>
+                <a:gd name="connsiteY5" fmla="*/ 0 h 838200"/>
+                <a:gd name="connsiteX6" fmla="*/ 4763 w 1209675"/>
+                <a:gd name="connsiteY6" fmla="*/ 119063 h 838200"/>
+                <a:gd name="connsiteX0" fmla="*/ 4763 w 1209675"/>
+                <a:gd name="connsiteY0" fmla="*/ 119063 h 838200"/>
+                <a:gd name="connsiteX1" fmla="*/ 224786 w 1209675"/>
+                <a:gd name="connsiteY1" fmla="*/ 838200 h 838200"/>
+                <a:gd name="connsiteX2" fmla="*/ 1209675 w 1209675"/>
+                <a:gd name="connsiteY2" fmla="*/ 838200 h 838200"/>
+                <a:gd name="connsiteX3" fmla="*/ 1209675 w 1209675"/>
+                <a:gd name="connsiteY3" fmla="*/ 247650 h 838200"/>
+                <a:gd name="connsiteX4" fmla="*/ 238125 w 1209675"/>
+                <a:gd name="connsiteY4" fmla="*/ 0 h 838200"/>
+                <a:gd name="connsiteX5" fmla="*/ 0 w 1209675"/>
+                <a:gd name="connsiteY5" fmla="*/ 0 h 838200"/>
+                <a:gd name="connsiteX6" fmla="*/ 4763 w 1209675"/>
+                <a:gd name="connsiteY6" fmla="*/ 119063 h 838200"/>
+                <a:gd name="connsiteX0" fmla="*/ 4763 w 1209675"/>
+                <a:gd name="connsiteY0" fmla="*/ 119063 h 838200"/>
+                <a:gd name="connsiteX1" fmla="*/ 224786 w 1209675"/>
+                <a:gd name="connsiteY1" fmla="*/ 822358 h 838200"/>
+                <a:gd name="connsiteX2" fmla="*/ 1209675 w 1209675"/>
+                <a:gd name="connsiteY2" fmla="*/ 838200 h 838200"/>
+                <a:gd name="connsiteX3" fmla="*/ 1209675 w 1209675"/>
+                <a:gd name="connsiteY3" fmla="*/ 247650 h 838200"/>
+                <a:gd name="connsiteX4" fmla="*/ 238125 w 1209675"/>
+                <a:gd name="connsiteY4" fmla="*/ 0 h 838200"/>
+                <a:gd name="connsiteX5" fmla="*/ 0 w 1209675"/>
+                <a:gd name="connsiteY5" fmla="*/ 0 h 838200"/>
+                <a:gd name="connsiteX6" fmla="*/ 4763 w 1209675"/>
+                <a:gd name="connsiteY6" fmla="*/ 119063 h 838200"/>
+                <a:gd name="connsiteX0" fmla="*/ 4763 w 1209675"/>
+                <a:gd name="connsiteY0" fmla="*/ 119063 h 838200"/>
+                <a:gd name="connsiteX1" fmla="*/ 224786 w 1209675"/>
+                <a:gd name="connsiteY1" fmla="*/ 822358 h 838200"/>
+                <a:gd name="connsiteX2" fmla="*/ 1209675 w 1209675"/>
+                <a:gd name="connsiteY2" fmla="*/ 838200 h 838200"/>
+                <a:gd name="connsiteX3" fmla="*/ 1188340 w 1209675"/>
+                <a:gd name="connsiteY3" fmla="*/ 247650 h 838200"/>
+                <a:gd name="connsiteX4" fmla="*/ 238125 w 1209675"/>
+                <a:gd name="connsiteY4" fmla="*/ 0 h 838200"/>
+                <a:gd name="connsiteX5" fmla="*/ 0 w 1209675"/>
+                <a:gd name="connsiteY5" fmla="*/ 0 h 838200"/>
+                <a:gd name="connsiteX6" fmla="*/ 4763 w 1209675"/>
+                <a:gd name="connsiteY6" fmla="*/ 119063 h 838200"/>
+                <a:gd name="connsiteX0" fmla="*/ 4763 w 1188340"/>
+                <a:gd name="connsiteY0" fmla="*/ 119063 h 822358"/>
+                <a:gd name="connsiteX1" fmla="*/ 224786 w 1188340"/>
+                <a:gd name="connsiteY1" fmla="*/ 822358 h 822358"/>
+                <a:gd name="connsiteX2" fmla="*/ 1183007 w 1188340"/>
+                <a:gd name="connsiteY2" fmla="*/ 818397 h 822358"/>
+                <a:gd name="connsiteX3" fmla="*/ 1188340 w 1188340"/>
+                <a:gd name="connsiteY3" fmla="*/ 247650 h 822358"/>
+                <a:gd name="connsiteX4" fmla="*/ 238125 w 1188340"/>
+                <a:gd name="connsiteY4" fmla="*/ 0 h 822358"/>
+                <a:gd name="connsiteX5" fmla="*/ 0 w 1188340"/>
+                <a:gd name="connsiteY5" fmla="*/ 0 h 822358"/>
+                <a:gd name="connsiteX6" fmla="*/ 4763 w 1188340"/>
+                <a:gd name="connsiteY6" fmla="*/ 119063 h 822358"/>
+                <a:gd name="connsiteX0" fmla="*/ 4763 w 1188340"/>
+                <a:gd name="connsiteY0" fmla="*/ 119063 h 822358"/>
+                <a:gd name="connsiteX1" fmla="*/ 224786 w 1188340"/>
+                <a:gd name="connsiteY1" fmla="*/ 822358 h 822358"/>
+                <a:gd name="connsiteX2" fmla="*/ 1183007 w 1188340"/>
+                <a:gd name="connsiteY2" fmla="*/ 818397 h 822358"/>
+                <a:gd name="connsiteX3" fmla="*/ 1188340 w 1188340"/>
+                <a:gd name="connsiteY3" fmla="*/ 283674 h 822358"/>
+                <a:gd name="connsiteX4" fmla="*/ 238125 w 1188340"/>
+                <a:gd name="connsiteY4" fmla="*/ 0 h 822358"/>
+                <a:gd name="connsiteX5" fmla="*/ 0 w 1188340"/>
+                <a:gd name="connsiteY5" fmla="*/ 0 h 822358"/>
+                <a:gd name="connsiteX6" fmla="*/ 4763 w 1188340"/>
+                <a:gd name="connsiteY6" fmla="*/ 119063 h 822358"/>
+              </a:gdLst>
+              <a:ahLst/>
+              <a:cxnLst>
+                <a:cxn ang="0">
+                  <a:pos x="connsiteX0" y="connsiteY0"/>
+                </a:cxn>
+                <a:cxn ang="0">
+                  <a:pos x="connsiteX1" y="connsiteY1"/>
+                </a:cxn>
+                <a:cxn ang="0">
+                  <a:pos x="connsiteX2" y="connsiteY2"/>
+                </a:cxn>
+                <a:cxn ang="0">
+                  <a:pos x="connsiteX3" y="connsiteY3"/>
+                </a:cxn>
+                <a:cxn ang="0">
+                  <a:pos x="connsiteX4" y="connsiteY4"/>
+                </a:cxn>
+                <a:cxn ang="0">
+                  <a:pos x="connsiteX5" y="connsiteY5"/>
+                </a:cxn>
+                <a:cxn ang="0">
+                  <a:pos x="connsiteX6" y="connsiteY6"/>
+                </a:cxn>
+              </a:cxnLst>
+              <a:rect l="l" t="t" r="r" b="b"/>
+              <a:pathLst>
+                <a:path w="1188340" h="822358">
+                  <a:moveTo>
+                    <a:pt x="4763" y="119063"/>
+                  </a:moveTo>
+                  <a:lnTo>
+                    <a:pt x="224786" y="822358"/>
+                  </a:lnTo>
+                  <a:lnTo>
+                    <a:pt x="1183007" y="818397"/>
+                  </a:lnTo>
+                  <a:cubicBezTo>
+                    <a:pt x="1184785" y="628148"/>
+                    <a:pt x="1186562" y="473923"/>
+                    <a:pt x="1188340" y="283674"/>
+                  </a:cubicBezTo>
+                  <a:lnTo>
+                    <a:pt x="238125" y="0"/>
+                  </a:lnTo>
+                  <a:lnTo>
+                    <a:pt x="0" y="0"/>
+                  </a:lnTo>
+                  <a:lnTo>
+                    <a:pt x="4763" y="119063"/>
+                  </a:lnTo>
+                  <a:close/>
+                </a:path>
+              </a:pathLst>
+            </a:custGeom>
+            <a:solidFill>
+              <a:srgbClr val="0070C0">
+                <a:alpha val="55000"/>
+              </a:srgbClr>
+            </a:solidFill>
+            <a:ln>
+              <a:noFill/>
+            </a:ln>
+          </p:spPr>
+          <p:style>
+            <a:lnRef idx="2">
+              <a:schemeClr val="accent1">
+                <a:shade val="50000"/>
+              </a:schemeClr>
+            </a:lnRef>
+            <a:fillRef idx="1">
+              <a:schemeClr val="accent1"/>
+            </a:fillRef>
+            <a:effectRef idx="0">
+              <a:schemeClr val="accent1"/>
+            </a:effectRef>
+            <a:fontRef idx="minor">
+              <a:schemeClr val="lt1"/>
+            </a:fontRef>
+          </p:style>
+          <p:txBody>
+            <a:bodyPr rtlCol="0" anchor="ctr"/>
+            <a:lstStyle/>
+            <a:p>
+              <a:pPr algn="ctr"/>
+              <a:endParaRPr lang="en-US"/>
+            </a:p>
+          </p:txBody>
+        </p:sp>
+        <p:sp>
+          <p:nvSpPr>
+            <p:cNvPr id="49" name="Rectangle 48"/>
+            <p:cNvSpPr/>
+            <p:nvPr/>
+          </p:nvSpPr>
+          <p:spPr>
+            <a:xfrm>
+              <a:off x="4238346" y="2360100"/>
+              <a:ext cx="838200" cy="838200"/>
+            </a:xfrm>
+            <a:prstGeom prst="rect">
+              <a:avLst/>
+            </a:prstGeom>
+            <a:noFill/>
+            <a:ln>
+              <a:noFill/>
+            </a:ln>
+          </p:spPr>
+          <p:style>
+            <a:lnRef idx="2">
+              <a:schemeClr val="accent1">
+                <a:shade val="50000"/>
+              </a:schemeClr>
+            </a:lnRef>
+            <a:fillRef idx="1">
+              <a:schemeClr val="accent1"/>
+            </a:fillRef>
+            <a:effectRef idx="0">
+              <a:schemeClr val="accent1"/>
+            </a:effectRef>
+            <a:fontRef idx="minor">
+              <a:schemeClr val="lt1"/>
+            </a:fontRef>
+          </p:style>
+          <p:txBody>
+            <a:bodyPr rtlCol="0" anchor="ctr"/>
+            <a:lstStyle/>
+            <a:p>
+              <a:pPr algn="ctr"/>
+              <a:endParaRPr lang="en-SG"/>
+            </a:p>
+          </p:txBody>
+        </p:sp>
+        <p:sp>
+          <p:nvSpPr>
+            <p:cNvPr id="24" name="Rectangle 23"/>
+            <p:cNvSpPr/>
+            <p:nvPr/>
+          </p:nvSpPr>
+          <p:spPr>
+            <a:xfrm>
+              <a:off x="4475693" y="2742317"/>
+              <a:ext cx="569723" cy="409283"/>
+            </a:xfrm>
+            <a:prstGeom prst="rect">
+              <a:avLst/>
+            </a:prstGeom>
+            <a:solidFill>
+              <a:srgbClr val="00589A">
+                <a:alpha val="60784"/>
+              </a:srgbClr>
+            </a:solidFill>
+            <a:ln>
+              <a:solidFill>
+                <a:schemeClr val="bg1"/>
+              </a:solidFill>
+              <a:miter lim="800000"/>
             </a:ln>
           </p:spPr>
           <p:style>
@@ -11300,200 +11768,6 @@
           </a:p>
         </p:txBody>
       </p:sp>
-      <p:grpSp>
-        <p:nvGrpSpPr>
-          <p:cNvPr id="18" name="Group 17"/>
-          <p:cNvGrpSpPr/>
-          <p:nvPr/>
-        </p:nvGrpSpPr>
-        <p:grpSpPr>
-          <a:xfrm>
-            <a:off x="1508996" y="4178585"/>
-            <a:ext cx="420624" cy="421200"/>
-            <a:chOff x="1508996" y="4178585"/>
-            <a:chExt cx="420624" cy="418250"/>
-          </a:xfrm>
-        </p:grpSpPr>
-        <p:sp>
-          <p:nvSpPr>
-            <p:cNvPr id="58" name="Rectangle 57"/>
-            <p:cNvSpPr/>
-            <p:nvPr/>
-          </p:nvSpPr>
-          <p:spPr>
-            <a:xfrm rot="10800000">
-              <a:off x="1508996" y="4178585"/>
-              <a:ext cx="420624" cy="418250"/>
-            </a:xfrm>
-            <a:prstGeom prst="rect">
-              <a:avLst/>
-            </a:prstGeom>
-            <a:solidFill>
-              <a:srgbClr val="0070C0"/>
-            </a:solidFill>
-            <a:ln>
-              <a:noFill/>
-            </a:ln>
-          </p:spPr>
-          <p:style>
-            <a:lnRef idx="2">
-              <a:schemeClr val="accent1">
-                <a:shade val="50000"/>
-              </a:schemeClr>
-            </a:lnRef>
-            <a:fillRef idx="1">
-              <a:schemeClr val="accent1"/>
-            </a:fillRef>
-            <a:effectRef idx="0">
-              <a:schemeClr val="accent1"/>
-            </a:effectRef>
-            <a:fontRef idx="minor">
-              <a:schemeClr val="lt1"/>
-            </a:fontRef>
-          </p:style>
-          <p:txBody>
-            <a:bodyPr wrap="none" lIns="0" tIns="0" rIns="0" bIns="0" rtlCol="0" anchor="ctr"/>
-            <a:lstStyle/>
-            <a:p>
-              <a:pPr algn="ctr"/>
-              <a:endParaRPr lang="en-US" b="1"/>
-            </a:p>
-          </p:txBody>
-        </p:sp>
-        <p:sp>
-          <p:nvSpPr>
-            <p:cNvPr id="7" name="Flowchart: Connector 6"/>
-            <p:cNvSpPr>
-              <a:spLocks noChangeAspect="1"/>
-            </p:cNvSpPr>
-            <p:nvPr/>
-          </p:nvSpPr>
-          <p:spPr>
-            <a:xfrm>
-              <a:off x="1524472" y="4191285"/>
-              <a:ext cx="122720" cy="122720"/>
-            </a:xfrm>
-            <a:prstGeom prst="flowChartConnector">
-              <a:avLst/>
-            </a:prstGeom>
-            <a:solidFill>
-              <a:schemeClr val="bg1"/>
-            </a:solidFill>
-            <a:ln>
-              <a:noFill/>
-            </a:ln>
-          </p:spPr>
-          <p:style>
-            <a:lnRef idx="2">
-              <a:schemeClr val="accent1">
-                <a:shade val="50000"/>
-              </a:schemeClr>
-            </a:lnRef>
-            <a:fillRef idx="1">
-              <a:schemeClr val="accent1"/>
-            </a:fillRef>
-            <a:effectRef idx="0">
-              <a:schemeClr val="accent1"/>
-            </a:effectRef>
-            <a:fontRef idx="minor">
-              <a:schemeClr val="lt1"/>
-            </a:fontRef>
-          </p:style>
-          <p:txBody>
-            <a:bodyPr rtlCol="0" anchor="ctr"/>
-            <a:lstStyle/>
-            <a:p>
-              <a:pPr algn="ctr"/>
-              <a:endParaRPr lang="en-SG"/>
-            </a:p>
-          </p:txBody>
-        </p:sp>
-        <p:sp>
-          <p:nvSpPr>
-            <p:cNvPr id="60" name="Flowchart: Connector 59"/>
-            <p:cNvSpPr>
-              <a:spLocks noChangeAspect="1"/>
-            </p:cNvSpPr>
-            <p:nvPr/>
-          </p:nvSpPr>
-          <p:spPr>
-            <a:xfrm>
-              <a:off x="1789294" y="4455065"/>
-              <a:ext cx="122720" cy="122720"/>
-            </a:xfrm>
-            <a:prstGeom prst="flowChartConnector">
-              <a:avLst/>
-            </a:prstGeom>
-            <a:solidFill>
-              <a:schemeClr val="bg1"/>
-            </a:solidFill>
-            <a:ln>
-              <a:noFill/>
-            </a:ln>
-          </p:spPr>
-          <p:style>
-            <a:lnRef idx="2">
-              <a:schemeClr val="accent1">
-                <a:shade val="50000"/>
-              </a:schemeClr>
-            </a:lnRef>
-            <a:fillRef idx="1">
-              <a:schemeClr val="accent1"/>
-            </a:fillRef>
-            <a:effectRef idx="0">
-              <a:schemeClr val="accent1"/>
-            </a:effectRef>
-            <a:fontRef idx="minor">
-              <a:schemeClr val="lt1"/>
-            </a:fontRef>
-          </p:style>
-          <p:txBody>
-            <a:bodyPr rtlCol="0" anchor="ctr"/>
-            <a:lstStyle/>
-            <a:p>
-              <a:pPr algn="ctr"/>
-              <a:endParaRPr lang="en-SG"/>
-            </a:p>
-          </p:txBody>
-        </p:sp>
-        <p:cxnSp>
-          <p:nvCxnSpPr>
-            <p:cNvPr id="9" name="Straight Arrow Connector 8"/>
-            <p:cNvCxnSpPr/>
-            <p:nvPr/>
-          </p:nvCxnSpPr>
-          <p:spPr>
-            <a:xfrm>
-              <a:off x="1652761" y="4305300"/>
-              <a:ext cx="151588" cy="152400"/>
-            </a:xfrm>
-            <a:prstGeom prst="straightConnector1">
-              <a:avLst/>
-            </a:prstGeom>
-            <a:ln w="38100">
-              <a:solidFill>
-                <a:schemeClr val="bg1"/>
-              </a:solidFill>
-              <a:headEnd type="none" w="med" len="med"/>
-              <a:tailEnd type="triangle" w="med" len="med"/>
-            </a:ln>
-          </p:spPr>
-          <p:style>
-            <a:lnRef idx="1">
-              <a:schemeClr val="accent1"/>
-            </a:lnRef>
-            <a:fillRef idx="0">
-              <a:schemeClr val="accent1"/>
-            </a:fillRef>
-            <a:effectRef idx="0">
-              <a:schemeClr val="accent1"/>
-            </a:effectRef>
-            <a:fontRef idx="minor">
-              <a:schemeClr val="tx1"/>
-            </a:fontRef>
-          </p:style>
-        </p:cxnSp>
-      </p:grpSp>
       <p:sp>
         <p:nvSpPr>
           <p:cNvPr id="73" name="TextBox 72"/>
@@ -11525,152 +11799,6 @@
           </a:p>
         </p:txBody>
       </p:sp>
-      <p:grpSp>
-        <p:nvGrpSpPr>
-          <p:cNvPr id="31" name="Group 30"/>
-          <p:cNvGrpSpPr/>
-          <p:nvPr/>
-        </p:nvGrpSpPr>
-        <p:grpSpPr>
-          <a:xfrm>
-            <a:off x="2595445" y="4247994"/>
-            <a:ext cx="422068" cy="421200"/>
-            <a:chOff x="2595445" y="4247994"/>
-            <a:chExt cx="422068" cy="421200"/>
-          </a:xfrm>
-        </p:grpSpPr>
-        <p:sp>
-          <p:nvSpPr>
-            <p:cNvPr id="75" name="Rectangle 74"/>
-            <p:cNvSpPr/>
-            <p:nvPr/>
-          </p:nvSpPr>
-          <p:spPr>
-            <a:xfrm rot="10800000">
-              <a:off x="2595445" y="4247994"/>
-              <a:ext cx="420624" cy="421200"/>
-            </a:xfrm>
-            <a:prstGeom prst="rect">
-              <a:avLst/>
-            </a:prstGeom>
-            <a:solidFill>
-              <a:srgbClr val="0070C0"/>
-            </a:solidFill>
-            <a:ln>
-              <a:noFill/>
-            </a:ln>
-          </p:spPr>
-          <p:style>
-            <a:lnRef idx="2">
-              <a:schemeClr val="accent1">
-                <a:shade val="50000"/>
-              </a:schemeClr>
-            </a:lnRef>
-            <a:fillRef idx="1">
-              <a:schemeClr val="accent1"/>
-            </a:fillRef>
-            <a:effectRef idx="0">
-              <a:schemeClr val="accent1"/>
-            </a:effectRef>
-            <a:fontRef idx="minor">
-              <a:schemeClr val="lt1"/>
-            </a:fontRef>
-          </p:style>
-          <p:txBody>
-            <a:bodyPr wrap="none" lIns="0" tIns="0" rIns="0" bIns="0" rtlCol="0" anchor="ctr"/>
-            <a:lstStyle/>
-            <a:p>
-              <a:pPr algn="ctr"/>
-              <a:endParaRPr lang="en-US" b="1"/>
-            </a:p>
-          </p:txBody>
-        </p:sp>
-        <p:sp>
-          <p:nvSpPr>
-            <p:cNvPr id="77" name="Rectangle 76"/>
-            <p:cNvSpPr>
-              <a:spLocks noChangeAspect="1"/>
-            </p:cNvSpPr>
-            <p:nvPr/>
-          </p:nvSpPr>
-          <p:spPr>
-            <a:xfrm>
-              <a:off x="2805756" y="4389185"/>
-              <a:ext cx="211757" cy="280009"/>
-            </a:xfrm>
-            <a:prstGeom prst="rect">
-              <a:avLst/>
-            </a:prstGeom>
-            <a:solidFill>
-              <a:schemeClr val="bg1"/>
-            </a:solidFill>
-            <a:ln>
-              <a:noFill/>
-            </a:ln>
-          </p:spPr>
-          <p:style>
-            <a:lnRef idx="2">
-              <a:schemeClr val="accent1">
-                <a:shade val="50000"/>
-              </a:schemeClr>
-            </a:lnRef>
-            <a:fillRef idx="1">
-              <a:schemeClr val="accent1"/>
-            </a:fillRef>
-            <a:effectRef idx="0">
-              <a:schemeClr val="accent1"/>
-            </a:effectRef>
-            <a:fontRef idx="minor">
-              <a:schemeClr val="lt1"/>
-            </a:fontRef>
-          </p:style>
-          <p:txBody>
-            <a:bodyPr rtlCol="0" anchor="ctr"/>
-            <a:lstStyle/>
-            <a:p>
-              <a:pPr algn="ctr"/>
-              <a:endParaRPr lang="en-SG"/>
-            </a:p>
-          </p:txBody>
-        </p:sp>
-        <p:cxnSp>
-          <p:nvCxnSpPr>
-            <p:cNvPr id="78" name="Straight Arrow Connector 77"/>
-            <p:cNvCxnSpPr/>
-            <p:nvPr/>
-          </p:nvCxnSpPr>
-          <p:spPr>
-            <a:xfrm flipH="1">
-              <a:off x="2595448" y="4407794"/>
-              <a:ext cx="210308" cy="0"/>
-            </a:xfrm>
-            <a:prstGeom prst="straightConnector1">
-              <a:avLst/>
-            </a:prstGeom>
-            <a:ln w="38100">
-              <a:solidFill>
-                <a:schemeClr val="bg1"/>
-              </a:solidFill>
-              <a:headEnd type="none" w="med" len="med"/>
-              <a:tailEnd type="triangle" w="med" len="med"/>
-            </a:ln>
-          </p:spPr>
-          <p:style>
-            <a:lnRef idx="1">
-              <a:schemeClr val="accent1"/>
-            </a:lnRef>
-            <a:fillRef idx="0">
-              <a:schemeClr val="accent1"/>
-            </a:fillRef>
-            <a:effectRef idx="0">
-              <a:schemeClr val="accent1"/>
-            </a:effectRef>
-            <a:fontRef idx="minor">
-              <a:schemeClr val="tx1"/>
-            </a:fontRef>
-          </p:style>
-        </p:cxnSp>
-      </p:grpSp>
       <p:sp>
         <p:nvSpPr>
           <p:cNvPr id="79" name="TextBox 78"/>
@@ -11710,10 +11838,10 @@
         </p:nvGrpSpPr>
         <p:grpSpPr>
           <a:xfrm rot="16200000" flipH="1">
-            <a:off x="3688937" y="4247994"/>
-            <a:ext cx="422068" cy="421200"/>
+            <a:off x="3689661" y="4247274"/>
+            <a:ext cx="420624" cy="421200"/>
             <a:chOff x="2595445" y="4247994"/>
-            <a:chExt cx="422068" cy="421200"/>
+            <a:chExt cx="420624" cy="421200"/>
           </a:xfrm>
         </p:grpSpPr>
         <p:sp>
@@ -11772,8 +11900,8 @@
           </p:nvSpPr>
           <p:spPr>
             <a:xfrm>
-              <a:off x="2805756" y="4389185"/>
-              <a:ext cx="211757" cy="280009"/>
+              <a:off x="2849797" y="4292425"/>
+              <a:ext cx="123206" cy="258373"/>
             </a:xfrm>
             <a:prstGeom prst="rect">
               <a:avLst/>
@@ -11817,14 +11945,14 @@
             <p:nvPr/>
           </p:nvCxnSpPr>
           <p:spPr>
-            <a:xfrm flipH="1">
-              <a:off x="2595448" y="4407794"/>
-              <a:ext cx="210308" cy="0"/>
+            <a:xfrm rot="16200000" flipH="1" flipV="1">
+              <a:off x="2724209" y="4279034"/>
+              <a:ext cx="0" cy="257521"/>
             </a:xfrm>
             <a:prstGeom prst="straightConnector1">
               <a:avLst/>
             </a:prstGeom>
-            <a:ln w="38100">
+            <a:ln w="57150">
               <a:solidFill>
                 <a:schemeClr val="bg1"/>
               </a:solidFill>
@@ -11847,6 +11975,1033 @@
             </a:fontRef>
           </p:style>
         </p:cxnSp>
+      </p:grpSp>
+      <p:grpSp>
+        <p:nvGrpSpPr>
+          <p:cNvPr id="76" name="Group 75"/>
+          <p:cNvGrpSpPr/>
+          <p:nvPr/>
+        </p:nvGrpSpPr>
+        <p:grpSpPr>
+          <a:xfrm rot="10800000" flipH="1">
+            <a:off x="2627088" y="4247562"/>
+            <a:ext cx="420624" cy="421200"/>
+            <a:chOff x="2595445" y="4247994"/>
+            <a:chExt cx="420624" cy="421200"/>
+          </a:xfrm>
+        </p:grpSpPr>
+        <p:sp>
+          <p:nvSpPr>
+            <p:cNvPr id="80" name="Rectangle 79"/>
+            <p:cNvSpPr/>
+            <p:nvPr/>
+          </p:nvSpPr>
+          <p:spPr>
+            <a:xfrm rot="10800000">
+              <a:off x="2595445" y="4247994"/>
+              <a:ext cx="420624" cy="421200"/>
+            </a:xfrm>
+            <a:prstGeom prst="rect">
+              <a:avLst/>
+            </a:prstGeom>
+            <a:solidFill>
+              <a:srgbClr val="0070C0"/>
+            </a:solidFill>
+            <a:ln>
+              <a:noFill/>
+            </a:ln>
+          </p:spPr>
+          <p:style>
+            <a:lnRef idx="2">
+              <a:schemeClr val="accent1">
+                <a:shade val="50000"/>
+              </a:schemeClr>
+            </a:lnRef>
+            <a:fillRef idx="1">
+              <a:schemeClr val="accent1"/>
+            </a:fillRef>
+            <a:effectRef idx="0">
+              <a:schemeClr val="accent1"/>
+            </a:effectRef>
+            <a:fontRef idx="minor">
+              <a:schemeClr val="lt1"/>
+            </a:fontRef>
+          </p:style>
+          <p:txBody>
+            <a:bodyPr wrap="none" lIns="0" tIns="0" rIns="0" bIns="0" rtlCol="0" anchor="ctr"/>
+            <a:lstStyle/>
+            <a:p>
+              <a:pPr algn="ctr"/>
+              <a:endParaRPr lang="en-US" b="1"/>
+            </a:p>
+          </p:txBody>
+        </p:sp>
+        <p:sp>
+          <p:nvSpPr>
+            <p:cNvPr id="81" name="Rectangle 80"/>
+            <p:cNvSpPr>
+              <a:spLocks noChangeAspect="1"/>
+            </p:cNvSpPr>
+            <p:nvPr/>
+          </p:nvSpPr>
+          <p:spPr>
+            <a:xfrm>
+              <a:off x="2849796" y="4292424"/>
+              <a:ext cx="123206" cy="258373"/>
+            </a:xfrm>
+            <a:prstGeom prst="rect">
+              <a:avLst/>
+            </a:prstGeom>
+            <a:solidFill>
+              <a:schemeClr val="bg1"/>
+            </a:solidFill>
+            <a:ln>
+              <a:noFill/>
+            </a:ln>
+          </p:spPr>
+          <p:style>
+            <a:lnRef idx="2">
+              <a:schemeClr val="accent1">
+                <a:shade val="50000"/>
+              </a:schemeClr>
+            </a:lnRef>
+            <a:fillRef idx="1">
+              <a:schemeClr val="accent1"/>
+            </a:fillRef>
+            <a:effectRef idx="0">
+              <a:schemeClr val="accent1"/>
+            </a:effectRef>
+            <a:fontRef idx="minor">
+              <a:schemeClr val="lt1"/>
+            </a:fontRef>
+          </p:style>
+          <p:txBody>
+            <a:bodyPr rtlCol="0" anchor="ctr"/>
+            <a:lstStyle/>
+            <a:p>
+              <a:pPr algn="ctr"/>
+              <a:endParaRPr lang="en-SG"/>
+            </a:p>
+          </p:txBody>
+        </p:sp>
+        <p:cxnSp>
+          <p:nvCxnSpPr>
+            <p:cNvPr id="82" name="Straight Arrow Connector 81"/>
+            <p:cNvCxnSpPr/>
+            <p:nvPr/>
+          </p:nvCxnSpPr>
+          <p:spPr>
+            <a:xfrm rot="16200000" flipH="1" flipV="1">
+              <a:off x="2724209" y="4279034"/>
+              <a:ext cx="0" cy="257521"/>
+            </a:xfrm>
+            <a:prstGeom prst="straightConnector1">
+              <a:avLst/>
+            </a:prstGeom>
+            <a:ln w="57150">
+              <a:solidFill>
+                <a:schemeClr val="bg1"/>
+              </a:solidFill>
+              <a:headEnd type="none" w="med" len="med"/>
+              <a:tailEnd type="triangle" w="med" len="med"/>
+            </a:ln>
+          </p:spPr>
+          <p:style>
+            <a:lnRef idx="1">
+              <a:schemeClr val="accent1"/>
+            </a:lnRef>
+            <a:fillRef idx="0">
+              <a:schemeClr val="accent1"/>
+            </a:fillRef>
+            <a:effectRef idx="0">
+              <a:schemeClr val="accent1"/>
+            </a:effectRef>
+            <a:fontRef idx="minor">
+              <a:schemeClr val="tx1"/>
+            </a:fontRef>
+          </p:style>
+        </p:cxnSp>
+      </p:grpSp>
+      <p:grpSp>
+        <p:nvGrpSpPr>
+          <p:cNvPr id="26" name="Group 25"/>
+          <p:cNvGrpSpPr/>
+          <p:nvPr/>
+        </p:nvGrpSpPr>
+        <p:grpSpPr>
+          <a:xfrm>
+            <a:off x="4120945" y="6071395"/>
+            <a:ext cx="421200" cy="420624"/>
+            <a:chOff x="4793746" y="4240791"/>
+            <a:chExt cx="421200" cy="420624"/>
+          </a:xfrm>
+        </p:grpSpPr>
+        <p:sp>
+          <p:nvSpPr>
+            <p:cNvPr id="84" name="Rectangle 83"/>
+            <p:cNvSpPr/>
+            <p:nvPr/>
+          </p:nvSpPr>
+          <p:spPr>
+            <a:xfrm rot="5400000" flipH="1">
+              <a:off x="4794034" y="4240503"/>
+              <a:ext cx="420624" cy="421200"/>
+            </a:xfrm>
+            <a:prstGeom prst="rect">
+              <a:avLst/>
+            </a:prstGeom>
+            <a:solidFill>
+              <a:srgbClr val="0070C0"/>
+            </a:solidFill>
+            <a:ln>
+              <a:noFill/>
+            </a:ln>
+          </p:spPr>
+          <p:style>
+            <a:lnRef idx="2">
+              <a:schemeClr val="accent1">
+                <a:shade val="50000"/>
+              </a:schemeClr>
+            </a:lnRef>
+            <a:fillRef idx="1">
+              <a:schemeClr val="accent1"/>
+            </a:fillRef>
+            <a:effectRef idx="0">
+              <a:schemeClr val="accent1"/>
+            </a:effectRef>
+            <a:fontRef idx="minor">
+              <a:schemeClr val="lt1"/>
+            </a:fontRef>
+          </p:style>
+          <p:txBody>
+            <a:bodyPr wrap="none" lIns="0" tIns="0" rIns="0" bIns="0" rtlCol="0" anchor="ctr"/>
+            <a:lstStyle/>
+            <a:p>
+              <a:pPr algn="ctr"/>
+              <a:endParaRPr lang="en-US" b="1"/>
+            </a:p>
+          </p:txBody>
+        </p:sp>
+        <p:sp>
+          <p:nvSpPr>
+            <p:cNvPr id="85" name="Rectangle 84"/>
+            <p:cNvSpPr>
+              <a:spLocks noChangeAspect="1"/>
+            </p:cNvSpPr>
+            <p:nvPr/>
+          </p:nvSpPr>
+          <p:spPr>
+            <a:xfrm rot="16200000" flipH="1">
+              <a:off x="4952432" y="4399920"/>
+              <a:ext cx="103414" cy="108887"/>
+            </a:xfrm>
+            <a:prstGeom prst="rect">
+              <a:avLst/>
+            </a:prstGeom>
+            <a:solidFill>
+              <a:schemeClr val="bg1"/>
+            </a:solidFill>
+            <a:ln>
+              <a:noFill/>
+            </a:ln>
+          </p:spPr>
+          <p:style>
+            <a:lnRef idx="2">
+              <a:schemeClr val="accent1">
+                <a:shade val="50000"/>
+              </a:schemeClr>
+            </a:lnRef>
+            <a:fillRef idx="1">
+              <a:schemeClr val="accent1"/>
+            </a:fillRef>
+            <a:effectRef idx="0">
+              <a:schemeClr val="accent1"/>
+            </a:effectRef>
+            <a:fontRef idx="minor">
+              <a:schemeClr val="lt1"/>
+            </a:fontRef>
+          </p:style>
+          <p:txBody>
+            <a:bodyPr rtlCol="0" anchor="ctr"/>
+            <a:lstStyle/>
+            <a:p>
+              <a:pPr algn="ctr"/>
+              <a:endParaRPr lang="en-SG"/>
+            </a:p>
+          </p:txBody>
+        </p:sp>
+        <p:cxnSp>
+          <p:nvCxnSpPr>
+            <p:cNvPr id="11" name="Straight Arrow Connector 10"/>
+            <p:cNvCxnSpPr/>
+            <p:nvPr/>
+          </p:nvCxnSpPr>
+          <p:spPr>
+            <a:xfrm flipV="1">
+              <a:off x="4793746" y="4240791"/>
+              <a:ext cx="421200" cy="420624"/>
+            </a:xfrm>
+            <a:prstGeom prst="straightConnector1">
+              <a:avLst/>
+            </a:prstGeom>
+            <a:ln w="57150">
+              <a:solidFill>
+                <a:schemeClr val="bg1"/>
+              </a:solidFill>
+              <a:headEnd type="triangle" w="med" len="med"/>
+              <a:tailEnd type="triangle" w="med" len="med"/>
+            </a:ln>
+          </p:spPr>
+          <p:style>
+            <a:lnRef idx="1">
+              <a:schemeClr val="accent1"/>
+            </a:lnRef>
+            <a:fillRef idx="0">
+              <a:schemeClr val="accent1"/>
+            </a:fillRef>
+            <a:effectRef idx="0">
+              <a:schemeClr val="accent1"/>
+            </a:effectRef>
+            <a:fontRef idx="minor">
+              <a:schemeClr val="tx1"/>
+            </a:fontRef>
+          </p:style>
+        </p:cxnSp>
+        <p:cxnSp>
+          <p:nvCxnSpPr>
+            <p:cNvPr id="87" name="Straight Arrow Connector 86"/>
+            <p:cNvCxnSpPr/>
+            <p:nvPr/>
+          </p:nvCxnSpPr>
+          <p:spPr>
+            <a:xfrm>
+              <a:off x="4793746" y="4247562"/>
+              <a:ext cx="421200" cy="413853"/>
+            </a:xfrm>
+            <a:prstGeom prst="straightConnector1">
+              <a:avLst/>
+            </a:prstGeom>
+            <a:ln w="57150">
+              <a:solidFill>
+                <a:schemeClr val="bg1"/>
+              </a:solidFill>
+              <a:headEnd type="triangle" w="med" len="med"/>
+              <a:tailEnd type="triangle" w="med" len="med"/>
+            </a:ln>
+          </p:spPr>
+          <p:style>
+            <a:lnRef idx="1">
+              <a:schemeClr val="accent1"/>
+            </a:lnRef>
+            <a:fillRef idx="0">
+              <a:schemeClr val="accent1"/>
+            </a:fillRef>
+            <a:effectRef idx="0">
+              <a:schemeClr val="accent1"/>
+            </a:effectRef>
+            <a:fontRef idx="minor">
+              <a:schemeClr val="tx1"/>
+            </a:fontRef>
+          </p:style>
+        </p:cxnSp>
+      </p:grpSp>
+      <p:grpSp>
+        <p:nvGrpSpPr>
+          <p:cNvPr id="33" name="Group 32"/>
+          <p:cNvGrpSpPr/>
+          <p:nvPr/>
+        </p:nvGrpSpPr>
+        <p:grpSpPr>
+          <a:xfrm>
+            <a:off x="4990894" y="6038275"/>
+            <a:ext cx="421200" cy="420624"/>
+            <a:chOff x="5663695" y="4207671"/>
+            <a:chExt cx="421200" cy="420624"/>
+          </a:xfrm>
+        </p:grpSpPr>
+        <p:sp>
+          <p:nvSpPr>
+            <p:cNvPr id="101" name="Rectangle 100"/>
+            <p:cNvSpPr/>
+            <p:nvPr/>
+          </p:nvSpPr>
+          <p:spPr>
+            <a:xfrm rot="5400000" flipH="1">
+              <a:off x="5663983" y="4207383"/>
+              <a:ext cx="420624" cy="421200"/>
+            </a:xfrm>
+            <a:prstGeom prst="rect">
+              <a:avLst/>
+            </a:prstGeom>
+            <a:noFill/>
+            <a:ln>
+              <a:noFill/>
+            </a:ln>
+          </p:spPr>
+          <p:style>
+            <a:lnRef idx="2">
+              <a:schemeClr val="accent1">
+                <a:shade val="50000"/>
+              </a:schemeClr>
+            </a:lnRef>
+            <a:fillRef idx="1">
+              <a:schemeClr val="accent1"/>
+            </a:fillRef>
+            <a:effectRef idx="0">
+              <a:schemeClr val="accent1"/>
+            </a:effectRef>
+            <a:fontRef idx="minor">
+              <a:schemeClr val="lt1"/>
+            </a:fontRef>
+          </p:style>
+          <p:txBody>
+            <a:bodyPr wrap="none" lIns="0" tIns="0" rIns="0" bIns="0" rtlCol="0" anchor="ctr"/>
+            <a:lstStyle/>
+            <a:p>
+              <a:pPr algn="ctr"/>
+              <a:endParaRPr lang="en-US" b="1"/>
+            </a:p>
+          </p:txBody>
+        </p:sp>
+        <p:cxnSp>
+          <p:nvCxnSpPr>
+            <p:cNvPr id="94" name="Straight Arrow Connector 93"/>
+            <p:cNvCxnSpPr/>
+            <p:nvPr/>
+          </p:nvCxnSpPr>
+          <p:spPr>
+            <a:xfrm flipV="1">
+              <a:off x="5691904" y="4425911"/>
+              <a:ext cx="182391" cy="179443"/>
+            </a:xfrm>
+            <a:prstGeom prst="straightConnector1">
+              <a:avLst/>
+            </a:prstGeom>
+            <a:ln w="57150">
+              <a:solidFill>
+                <a:srgbClr val="0070C0"/>
+              </a:solidFill>
+              <a:headEnd type="none" w="med" len="med"/>
+              <a:tailEnd type="triangle" w="med" len="med"/>
+            </a:ln>
+          </p:spPr>
+          <p:style>
+            <a:lnRef idx="1">
+              <a:schemeClr val="accent1"/>
+            </a:lnRef>
+            <a:fillRef idx="0">
+              <a:schemeClr val="accent1"/>
+            </a:fillRef>
+            <a:effectRef idx="0">
+              <a:schemeClr val="accent1"/>
+            </a:effectRef>
+            <a:fontRef idx="minor">
+              <a:schemeClr val="tx1"/>
+            </a:fontRef>
+          </p:style>
+        </p:cxnSp>
+        <p:cxnSp>
+          <p:nvCxnSpPr>
+            <p:cNvPr id="96" name="Straight Arrow Connector 95"/>
+            <p:cNvCxnSpPr/>
+            <p:nvPr/>
+          </p:nvCxnSpPr>
+          <p:spPr>
+            <a:xfrm flipH="1" flipV="1">
+              <a:off x="5884394" y="4424470"/>
+              <a:ext cx="182391" cy="179443"/>
+            </a:xfrm>
+            <a:prstGeom prst="straightConnector1">
+              <a:avLst/>
+            </a:prstGeom>
+            <a:ln w="57150">
+              <a:solidFill>
+                <a:srgbClr val="0070C0"/>
+              </a:solidFill>
+              <a:headEnd type="none" w="med" len="med"/>
+              <a:tailEnd type="triangle" w="med" len="med"/>
+            </a:ln>
+          </p:spPr>
+          <p:style>
+            <a:lnRef idx="1">
+              <a:schemeClr val="accent1"/>
+            </a:lnRef>
+            <a:fillRef idx="0">
+              <a:schemeClr val="accent1"/>
+            </a:fillRef>
+            <a:effectRef idx="0">
+              <a:schemeClr val="accent1"/>
+            </a:effectRef>
+            <a:fontRef idx="minor">
+              <a:schemeClr val="tx1"/>
+            </a:fontRef>
+          </p:style>
+        </p:cxnSp>
+        <p:cxnSp>
+          <p:nvCxnSpPr>
+            <p:cNvPr id="97" name="Straight Arrow Connector 96"/>
+            <p:cNvCxnSpPr/>
+            <p:nvPr/>
+          </p:nvCxnSpPr>
+          <p:spPr>
+            <a:xfrm>
+              <a:off x="5696387" y="4237615"/>
+              <a:ext cx="182391" cy="179443"/>
+            </a:xfrm>
+            <a:prstGeom prst="straightConnector1">
+              <a:avLst/>
+            </a:prstGeom>
+            <a:ln w="57150">
+              <a:solidFill>
+                <a:srgbClr val="0070C0"/>
+              </a:solidFill>
+              <a:headEnd type="none" w="med" len="med"/>
+              <a:tailEnd type="triangle" w="med" len="med"/>
+            </a:ln>
+          </p:spPr>
+          <p:style>
+            <a:lnRef idx="1">
+              <a:schemeClr val="accent1"/>
+            </a:lnRef>
+            <a:fillRef idx="0">
+              <a:schemeClr val="accent1"/>
+            </a:fillRef>
+            <a:effectRef idx="0">
+              <a:schemeClr val="accent1"/>
+            </a:effectRef>
+            <a:fontRef idx="minor">
+              <a:schemeClr val="tx1"/>
+            </a:fontRef>
+          </p:style>
+        </p:cxnSp>
+        <p:cxnSp>
+          <p:nvCxnSpPr>
+            <p:cNvPr id="98" name="Straight Arrow Connector 97"/>
+            <p:cNvCxnSpPr/>
+            <p:nvPr/>
+          </p:nvCxnSpPr>
+          <p:spPr>
+            <a:xfrm flipH="1">
+              <a:off x="5878778" y="4237616"/>
+              <a:ext cx="182391" cy="179443"/>
+            </a:xfrm>
+            <a:prstGeom prst="straightConnector1">
+              <a:avLst/>
+            </a:prstGeom>
+            <a:ln w="57150">
+              <a:solidFill>
+                <a:srgbClr val="0070C0"/>
+              </a:solidFill>
+              <a:headEnd type="none" w="med" len="med"/>
+              <a:tailEnd type="triangle" w="med" len="med"/>
+            </a:ln>
+          </p:spPr>
+          <p:style>
+            <a:lnRef idx="1">
+              <a:schemeClr val="accent1"/>
+            </a:lnRef>
+            <a:fillRef idx="0">
+              <a:schemeClr val="accent1"/>
+            </a:fillRef>
+            <a:effectRef idx="0">
+              <a:schemeClr val="accent1"/>
+            </a:effectRef>
+            <a:fontRef idx="minor">
+              <a:schemeClr val="tx1"/>
+            </a:fontRef>
+          </p:style>
+        </p:cxnSp>
+      </p:grpSp>
+      <p:sp>
+        <p:nvSpPr>
+          <p:cNvPr id="115" name="TextBox 114"/>
+          <p:cNvSpPr txBox="1"/>
+          <p:nvPr/>
+        </p:nvSpPr>
+        <p:spPr>
+          <a:xfrm>
+            <a:off x="4493427" y="4942281"/>
+            <a:ext cx="918667" cy="261610"/>
+          </a:xfrm>
+          <a:prstGeom prst="rect">
+            <a:avLst/>
+          </a:prstGeom>
+          <a:noFill/>
+        </p:spPr>
+        <p:txBody>
+          <a:bodyPr wrap="square" rtlCol="0">
+            <a:spAutoFit/>
+          </a:bodyPr>
+          <a:lstStyle/>
+          <a:p>
+            <a:pPr algn="ctr"/>
+            <a:r>
+              <a:rPr lang="en-US" sz="1100" dirty="0" smtClean="0"/>
+              <a:t>Zoom out</a:t>
+            </a:r>
+            <a:endParaRPr lang="en-SG" sz="1100" dirty="0"/>
+          </a:p>
+        </p:txBody>
+      </p:sp>
+      <p:sp>
+        <p:nvSpPr>
+          <p:cNvPr id="116" name="TextBox 115"/>
+          <p:cNvSpPr txBox="1"/>
+          <p:nvPr/>
+        </p:nvSpPr>
+        <p:spPr>
+          <a:xfrm>
+            <a:off x="5342861" y="4942281"/>
+            <a:ext cx="918667" cy="261610"/>
+          </a:xfrm>
+          <a:prstGeom prst="rect">
+            <a:avLst/>
+          </a:prstGeom>
+          <a:noFill/>
+        </p:spPr>
+        <p:txBody>
+          <a:bodyPr wrap="square" rtlCol="0">
+            <a:spAutoFit/>
+          </a:bodyPr>
+          <a:lstStyle/>
+          <a:p>
+            <a:pPr algn="ctr"/>
+            <a:r>
+              <a:rPr lang="en-US" sz="1100" dirty="0" smtClean="0"/>
+              <a:t>Zoom in</a:t>
+            </a:r>
+            <a:endParaRPr lang="en-SG" sz="1100" dirty="0"/>
+          </a:p>
+        </p:txBody>
+      </p:sp>
+      <p:grpSp>
+        <p:nvGrpSpPr>
+          <p:cNvPr id="50" name="Group 49"/>
+          <p:cNvGrpSpPr/>
+          <p:nvPr/>
+        </p:nvGrpSpPr>
+        <p:grpSpPr>
+          <a:xfrm>
+            <a:off x="4663338" y="4221634"/>
+            <a:ext cx="421202" cy="420627"/>
+            <a:chOff x="6745788" y="4166928"/>
+            <a:chExt cx="421202" cy="420627"/>
+          </a:xfrm>
+        </p:grpSpPr>
+        <p:sp>
+          <p:nvSpPr>
+            <p:cNvPr id="105" name="Rectangle 104"/>
+            <p:cNvSpPr/>
+            <p:nvPr/>
+          </p:nvSpPr>
+          <p:spPr>
+            <a:xfrm rot="5400000" flipH="1">
+              <a:off x="6787274" y="4125442"/>
+              <a:ext cx="250130" cy="333102"/>
+            </a:xfrm>
+            <a:prstGeom prst="rect">
+              <a:avLst/>
+            </a:prstGeom>
+            <a:solidFill>
+              <a:srgbClr val="0070C0"/>
+            </a:solidFill>
+            <a:ln>
+              <a:noFill/>
+            </a:ln>
+          </p:spPr>
+          <p:style>
+            <a:lnRef idx="2">
+              <a:schemeClr val="accent1">
+                <a:shade val="50000"/>
+              </a:schemeClr>
+            </a:lnRef>
+            <a:fillRef idx="1">
+              <a:schemeClr val="accent1"/>
+            </a:fillRef>
+            <a:effectRef idx="0">
+              <a:schemeClr val="accent1"/>
+            </a:effectRef>
+            <a:fontRef idx="minor">
+              <a:schemeClr val="lt1"/>
+            </a:fontRef>
+          </p:style>
+          <p:txBody>
+            <a:bodyPr wrap="none" lIns="0" tIns="0" rIns="0" bIns="0" rtlCol="0" anchor="ctr"/>
+            <a:lstStyle/>
+            <a:p>
+              <a:pPr algn="ctr"/>
+              <a:endParaRPr lang="en-US" b="1"/>
+            </a:p>
+          </p:txBody>
+        </p:sp>
+        <p:sp>
+          <p:nvSpPr>
+            <p:cNvPr id="106" name="Rectangle 105"/>
+            <p:cNvSpPr>
+              <a:spLocks noChangeAspect="1"/>
+            </p:cNvSpPr>
+            <p:nvPr/>
+          </p:nvSpPr>
+          <p:spPr>
+            <a:xfrm rot="16200000" flipH="1">
+              <a:off x="7014051" y="4434615"/>
+              <a:ext cx="129680" cy="176199"/>
+            </a:xfrm>
+            <a:prstGeom prst="rect">
+              <a:avLst/>
+            </a:prstGeom>
+            <a:solidFill>
+              <a:srgbClr val="0070C0"/>
+            </a:solidFill>
+            <a:ln>
+              <a:noFill/>
+            </a:ln>
+          </p:spPr>
+          <p:style>
+            <a:lnRef idx="2">
+              <a:schemeClr val="accent1">
+                <a:shade val="50000"/>
+              </a:schemeClr>
+            </a:lnRef>
+            <a:fillRef idx="1">
+              <a:schemeClr val="accent1"/>
+            </a:fillRef>
+            <a:effectRef idx="0">
+              <a:schemeClr val="accent1"/>
+            </a:effectRef>
+            <a:fontRef idx="minor">
+              <a:schemeClr val="lt1"/>
+            </a:fontRef>
+          </p:style>
+          <p:txBody>
+            <a:bodyPr wrap="none" lIns="0" tIns="0" rIns="0" bIns="0" rtlCol="0" anchor="ctr"/>
+            <a:lstStyle/>
+            <a:p>
+              <a:pPr algn="ctr"/>
+              <a:endParaRPr lang="en-SG" b="1"/>
+            </a:p>
+          </p:txBody>
+        </p:sp>
+      </p:grpSp>
+      <p:grpSp>
+        <p:nvGrpSpPr>
+          <p:cNvPr id="53" name="Group 52"/>
+          <p:cNvGrpSpPr/>
+          <p:nvPr/>
+        </p:nvGrpSpPr>
+        <p:grpSpPr>
+          <a:xfrm>
+            <a:off x="5572934" y="4262375"/>
+            <a:ext cx="421203" cy="420626"/>
+            <a:chOff x="7655384" y="4207669"/>
+            <a:chExt cx="421203" cy="420626"/>
+          </a:xfrm>
+        </p:grpSpPr>
+        <p:sp>
+          <p:nvSpPr>
+            <p:cNvPr id="123" name="Rectangle 122"/>
+            <p:cNvSpPr/>
+            <p:nvPr/>
+          </p:nvSpPr>
+          <p:spPr>
+            <a:xfrm rot="16200000" flipH="1">
+              <a:off x="7784971" y="4336679"/>
+              <a:ext cx="250130" cy="333102"/>
+            </a:xfrm>
+            <a:prstGeom prst="rect">
+              <a:avLst/>
+            </a:prstGeom>
+            <a:solidFill>
+              <a:srgbClr val="0070C0"/>
+            </a:solidFill>
+            <a:ln>
+              <a:noFill/>
+            </a:ln>
+          </p:spPr>
+          <p:style>
+            <a:lnRef idx="2">
+              <a:schemeClr val="accent1">
+                <a:shade val="50000"/>
+              </a:schemeClr>
+            </a:lnRef>
+            <a:fillRef idx="1">
+              <a:schemeClr val="accent1"/>
+            </a:fillRef>
+            <a:effectRef idx="0">
+              <a:schemeClr val="accent1"/>
+            </a:effectRef>
+            <a:fontRef idx="minor">
+              <a:schemeClr val="lt1"/>
+            </a:fontRef>
+          </p:style>
+          <p:txBody>
+            <a:bodyPr wrap="none" lIns="0" tIns="0" rIns="0" bIns="0" rtlCol="0" anchor="ctr"/>
+            <a:lstStyle/>
+            <a:p>
+              <a:pPr algn="ctr"/>
+              <a:endParaRPr lang="en-US" b="1"/>
+            </a:p>
+          </p:txBody>
+        </p:sp>
+        <p:sp>
+          <p:nvSpPr>
+            <p:cNvPr id="124" name="Rectangle 123"/>
+            <p:cNvSpPr>
+              <a:spLocks noChangeAspect="1"/>
+            </p:cNvSpPr>
+            <p:nvPr/>
+          </p:nvSpPr>
+          <p:spPr>
+            <a:xfrm rot="5400000" flipH="1">
+              <a:off x="7678644" y="4184409"/>
+              <a:ext cx="129680" cy="176199"/>
+            </a:xfrm>
+            <a:prstGeom prst="rect">
+              <a:avLst/>
+            </a:prstGeom>
+            <a:solidFill>
+              <a:srgbClr val="0070C0"/>
+            </a:solidFill>
+            <a:ln>
+              <a:noFill/>
+            </a:ln>
+          </p:spPr>
+          <p:style>
+            <a:lnRef idx="2">
+              <a:schemeClr val="accent1">
+                <a:shade val="50000"/>
+              </a:schemeClr>
+            </a:lnRef>
+            <a:fillRef idx="1">
+              <a:schemeClr val="accent1"/>
+            </a:fillRef>
+            <a:effectRef idx="0">
+              <a:schemeClr val="accent1"/>
+            </a:effectRef>
+            <a:fontRef idx="minor">
+              <a:schemeClr val="lt1"/>
+            </a:fontRef>
+          </p:style>
+          <p:txBody>
+            <a:bodyPr wrap="none" lIns="0" tIns="0" rIns="0" bIns="0" rtlCol="0" anchor="ctr"/>
+            <a:lstStyle/>
+            <a:p>
+              <a:pPr algn="ctr"/>
+              <a:endParaRPr lang="en-SG" b="1"/>
+            </a:p>
+          </p:txBody>
+        </p:sp>
+      </p:grpSp>
+      <p:grpSp>
+        <p:nvGrpSpPr>
+          <p:cNvPr id="127" name="Group 126"/>
+          <p:cNvGrpSpPr/>
+          <p:nvPr/>
+        </p:nvGrpSpPr>
+        <p:grpSpPr>
+          <a:xfrm>
+            <a:off x="1508996" y="4178585"/>
+            <a:ext cx="420624" cy="421200"/>
+            <a:chOff x="1508996" y="4178585"/>
+            <a:chExt cx="420624" cy="421200"/>
+          </a:xfrm>
+        </p:grpSpPr>
+        <p:sp>
+          <p:nvSpPr>
+            <p:cNvPr id="58" name="Rectangle 57"/>
+            <p:cNvSpPr/>
+            <p:nvPr/>
+          </p:nvSpPr>
+          <p:spPr>
+            <a:xfrm rot="10800000">
+              <a:off x="1508996" y="4178585"/>
+              <a:ext cx="420624" cy="421200"/>
+            </a:xfrm>
+            <a:prstGeom prst="rect">
+              <a:avLst/>
+            </a:prstGeom>
+            <a:solidFill>
+              <a:srgbClr val="0070C0"/>
+            </a:solidFill>
+            <a:ln>
+              <a:noFill/>
+            </a:ln>
+          </p:spPr>
+          <p:style>
+            <a:lnRef idx="2">
+              <a:schemeClr val="accent1">
+                <a:shade val="50000"/>
+              </a:schemeClr>
+            </a:lnRef>
+            <a:fillRef idx="1">
+              <a:schemeClr val="accent1"/>
+            </a:fillRef>
+            <a:effectRef idx="0">
+              <a:schemeClr val="accent1"/>
+            </a:effectRef>
+            <a:fontRef idx="minor">
+              <a:schemeClr val="lt1"/>
+            </a:fontRef>
+          </p:style>
+          <p:txBody>
+            <a:bodyPr wrap="none" lIns="0" tIns="0" rIns="0" bIns="0" rtlCol="0" anchor="ctr"/>
+            <a:lstStyle/>
+            <a:p>
+              <a:pPr algn="ctr"/>
+              <a:endParaRPr lang="en-US" b="1"/>
+            </a:p>
+          </p:txBody>
+        </p:sp>
+        <p:sp>
+          <p:nvSpPr>
+            <p:cNvPr id="7" name="Flowchart: Connector 6"/>
+            <p:cNvSpPr>
+              <a:spLocks noChangeAspect="1"/>
+            </p:cNvSpPr>
+            <p:nvPr/>
+          </p:nvSpPr>
+          <p:spPr>
+            <a:xfrm>
+              <a:off x="1537571" y="4199768"/>
+              <a:ext cx="122720" cy="123586"/>
+            </a:xfrm>
+            <a:prstGeom prst="flowChartConnector">
+              <a:avLst/>
+            </a:prstGeom>
+            <a:solidFill>
+              <a:schemeClr val="bg1"/>
+            </a:solidFill>
+            <a:ln>
+              <a:solidFill>
+                <a:schemeClr val="bg1"/>
+              </a:solidFill>
+            </a:ln>
+          </p:spPr>
+          <p:style>
+            <a:lnRef idx="2">
+              <a:schemeClr val="accent1">
+                <a:shade val="50000"/>
+              </a:schemeClr>
+            </a:lnRef>
+            <a:fillRef idx="1">
+              <a:schemeClr val="accent1"/>
+            </a:fillRef>
+            <a:effectRef idx="0">
+              <a:schemeClr val="accent1"/>
+            </a:effectRef>
+            <a:fontRef idx="minor">
+              <a:schemeClr val="lt1"/>
+            </a:fontRef>
+          </p:style>
+          <p:txBody>
+            <a:bodyPr rtlCol="0" anchor="ctr"/>
+            <a:lstStyle/>
+            <a:p>
+              <a:pPr algn="ctr"/>
+              <a:endParaRPr lang="en-SG"/>
+            </a:p>
+          </p:txBody>
+        </p:sp>
+        <p:sp>
+          <p:nvSpPr>
+            <p:cNvPr id="60" name="Flowchart: Connector 59"/>
+            <p:cNvSpPr>
+              <a:spLocks noChangeAspect="1"/>
+            </p:cNvSpPr>
+            <p:nvPr/>
+          </p:nvSpPr>
+          <p:spPr>
+            <a:xfrm>
+              <a:off x="1784304" y="4323390"/>
+              <a:ext cx="122720" cy="123586"/>
+            </a:xfrm>
+            <a:prstGeom prst="flowChartConnector">
+              <a:avLst/>
+            </a:prstGeom>
+            <a:solidFill>
+              <a:schemeClr val="bg1"/>
+            </a:solidFill>
+            <a:ln>
+              <a:solidFill>
+                <a:schemeClr val="bg1"/>
+              </a:solidFill>
+            </a:ln>
+          </p:spPr>
+          <p:style>
+            <a:lnRef idx="2">
+              <a:schemeClr val="accent1">
+                <a:shade val="50000"/>
+              </a:schemeClr>
+            </a:lnRef>
+            <a:fillRef idx="1">
+              <a:schemeClr val="accent1"/>
+            </a:fillRef>
+            <a:effectRef idx="0">
+              <a:schemeClr val="accent1"/>
+            </a:effectRef>
+            <a:fontRef idx="minor">
+              <a:schemeClr val="lt1"/>
+            </a:fontRef>
+          </p:style>
+          <p:txBody>
+            <a:bodyPr rtlCol="0" anchor="ctr"/>
+            <a:lstStyle/>
+            <a:p>
+              <a:pPr algn="ctr"/>
+              <a:endParaRPr lang="en-SG"/>
+            </a:p>
+          </p:txBody>
+        </p:sp>
+        <p:sp>
+          <p:nvSpPr>
+            <p:cNvPr id="128" name="Flowchart: Connector 127"/>
+            <p:cNvSpPr>
+              <a:spLocks noChangeAspect="1"/>
+            </p:cNvSpPr>
+            <p:nvPr/>
+          </p:nvSpPr>
+          <p:spPr>
+            <a:xfrm>
+              <a:off x="1531221" y="4451752"/>
+              <a:ext cx="122720" cy="123586"/>
+            </a:xfrm>
+            <a:prstGeom prst="flowChartConnector">
+              <a:avLst/>
+            </a:prstGeom>
+            <a:solidFill>
+              <a:schemeClr val="bg1"/>
+            </a:solidFill>
+            <a:ln>
+              <a:solidFill>
+                <a:schemeClr val="bg1"/>
+              </a:solidFill>
+            </a:ln>
+          </p:spPr>
+          <p:style>
+            <a:lnRef idx="2">
+              <a:schemeClr val="accent1">
+                <a:shade val="50000"/>
+              </a:schemeClr>
+            </a:lnRef>
+            <a:fillRef idx="1">
+              <a:schemeClr val="accent1"/>
+            </a:fillRef>
+            <a:effectRef idx="0">
+              <a:schemeClr val="accent1"/>
+            </a:effectRef>
+            <a:fontRef idx="minor">
+              <a:schemeClr val="lt1"/>
+            </a:fontRef>
+          </p:style>
+          <p:txBody>
+            <a:bodyPr rtlCol="0" anchor="ctr"/>
+            <a:lstStyle/>
+            <a:p>
+              <a:pPr algn="ctr"/>
+              <a:endParaRPr lang="en-SG"/>
+            </a:p>
+          </p:txBody>
+        </p:sp>
       </p:grpSp>
     </p:spTree>
     <p:extLst>

</xml_diff>

<commit_message>
Issue 207: create icons for magnify, cut to shape Update Issue 207
</commit_message>
<xml_diff>
--- a/doc/Icons.pptx
+++ b/doc/Icons.pptx
@@ -210,7 +210,7 @@
           <a:p>
             <a:fld id="{6699ACB9-486C-4D62-A3A7-AF98E13EFDA3}" type="datetimeFigureOut">
               <a:rPr lang="en-US" smtClean="0"/>
-              <a:t>2/15/2014</a:t>
+              <a:t>2/21/2014</a:t>
             </a:fld>
             <a:endParaRPr lang="en-US"/>
           </a:p>
@@ -744,7 +744,7 @@
             <a:fld id="{1D8BD707-D9CF-40AE-B4C6-C98DA3205C09}" type="datetimeFigureOut">
               <a:rPr lang="en-US" smtClean="0"/>
               <a:pPr/>
-              <a:t>2/15/2014</a:t>
+              <a:t>2/21/2014</a:t>
             </a:fld>
             <a:endParaRPr lang="en-US"/>
           </a:p>
@@ -911,7 +911,7 @@
             <a:fld id="{1D8BD707-D9CF-40AE-B4C6-C98DA3205C09}" type="datetimeFigureOut">
               <a:rPr lang="en-US" smtClean="0"/>
               <a:pPr/>
-              <a:t>2/15/2014</a:t>
+              <a:t>2/21/2014</a:t>
             </a:fld>
             <a:endParaRPr lang="en-US"/>
           </a:p>
@@ -1088,7 +1088,7 @@
             <a:fld id="{1D8BD707-D9CF-40AE-B4C6-C98DA3205C09}" type="datetimeFigureOut">
               <a:rPr lang="en-US" smtClean="0"/>
               <a:pPr/>
-              <a:t>2/15/2014</a:t>
+              <a:t>2/21/2014</a:t>
             </a:fld>
             <a:endParaRPr lang="en-US"/>
           </a:p>
@@ -1255,7 +1255,7 @@
             <a:fld id="{1D8BD707-D9CF-40AE-B4C6-C98DA3205C09}" type="datetimeFigureOut">
               <a:rPr lang="en-US" smtClean="0"/>
               <a:pPr/>
-              <a:t>2/15/2014</a:t>
+              <a:t>2/21/2014</a:t>
             </a:fld>
             <a:endParaRPr lang="en-US"/>
           </a:p>
@@ -1498,7 +1498,7 @@
             <a:fld id="{1D8BD707-D9CF-40AE-B4C6-C98DA3205C09}" type="datetimeFigureOut">
               <a:rPr lang="en-US" smtClean="0"/>
               <a:pPr/>
-              <a:t>2/15/2014</a:t>
+              <a:t>2/21/2014</a:t>
             </a:fld>
             <a:endParaRPr lang="en-US"/>
           </a:p>
@@ -1783,7 +1783,7 @@
             <a:fld id="{1D8BD707-D9CF-40AE-B4C6-C98DA3205C09}" type="datetimeFigureOut">
               <a:rPr lang="en-US" smtClean="0"/>
               <a:pPr/>
-              <a:t>2/15/2014</a:t>
+              <a:t>2/21/2014</a:t>
             </a:fld>
             <a:endParaRPr lang="en-US"/>
           </a:p>
@@ -2202,7 +2202,7 @@
             <a:fld id="{1D8BD707-D9CF-40AE-B4C6-C98DA3205C09}" type="datetimeFigureOut">
               <a:rPr lang="en-US" smtClean="0"/>
               <a:pPr/>
-              <a:t>2/15/2014</a:t>
+              <a:t>2/21/2014</a:t>
             </a:fld>
             <a:endParaRPr lang="en-US"/>
           </a:p>
@@ -2317,7 +2317,7 @@
             <a:fld id="{1D8BD707-D9CF-40AE-B4C6-C98DA3205C09}" type="datetimeFigureOut">
               <a:rPr lang="en-US" smtClean="0"/>
               <a:pPr/>
-              <a:t>2/15/2014</a:t>
+              <a:t>2/21/2014</a:t>
             </a:fld>
             <a:endParaRPr lang="en-US"/>
           </a:p>
@@ -2409,7 +2409,7 @@
             <a:fld id="{1D8BD707-D9CF-40AE-B4C6-C98DA3205C09}" type="datetimeFigureOut">
               <a:rPr lang="en-US" smtClean="0"/>
               <a:pPr/>
-              <a:t>2/15/2014</a:t>
+              <a:t>2/21/2014</a:t>
             </a:fld>
             <a:endParaRPr lang="en-US"/>
           </a:p>
@@ -2683,7 +2683,7 @@
             <a:fld id="{1D8BD707-D9CF-40AE-B4C6-C98DA3205C09}" type="datetimeFigureOut">
               <a:rPr lang="en-US" smtClean="0"/>
               <a:pPr/>
-              <a:t>2/15/2014</a:t>
+              <a:t>2/21/2014</a:t>
             </a:fld>
             <a:endParaRPr lang="en-US"/>
           </a:p>
@@ -2933,7 +2933,7 @@
             <a:fld id="{1D8BD707-D9CF-40AE-B4C6-C98DA3205C09}" type="datetimeFigureOut">
               <a:rPr lang="en-US" smtClean="0"/>
               <a:pPr/>
-              <a:t>2/15/2014</a:t>
+              <a:t>2/21/2014</a:t>
             </a:fld>
             <a:endParaRPr lang="en-US"/>
           </a:p>
@@ -3143,7 +3143,7 @@
             <a:fld id="{1D8BD707-D9CF-40AE-B4C6-C98DA3205C09}" type="datetimeFigureOut">
               <a:rPr lang="en-US" smtClean="0"/>
               <a:pPr/>
-              <a:t>2/15/2014</a:t>
+              <a:t>2/21/2014</a:t>
             </a:fld>
             <a:endParaRPr lang="en-US"/>
           </a:p>
@@ -5652,11 +5652,7 @@
           <a:p>
             <a:r>
               <a:rPr lang="en-US" sz="800" dirty="0" smtClean="0"/>
-              <a:t>Zoom </a:t>
-            </a:r>
-            <a:r>
-              <a:rPr lang="en-US" sz="800" dirty="0" smtClean="0"/>
-              <a:t>In</a:t>
+              <a:t>Drill down</a:t>
             </a:r>
             <a:endParaRPr lang="en-SG" sz="800" dirty="0"/>
           </a:p>
@@ -8711,11 +8707,7 @@
           <a:p>
             <a:r>
               <a:rPr lang="en-US" sz="800" dirty="0" smtClean="0"/>
-              <a:t>Zoom </a:t>
-            </a:r>
-            <a:r>
-              <a:rPr lang="en-US" sz="800" dirty="0" smtClean="0"/>
-              <a:t>out</a:t>
+              <a:t>Step back</a:t>
             </a:r>
             <a:endParaRPr lang="en-SG" sz="800" dirty="0"/>
           </a:p>
@@ -9505,6 +9497,382 @@
               <a:srgbClr val="00589A">
                 <a:alpha val="60784"/>
               </a:srgbClr>
+            </a:solidFill>
+            <a:ln>
+              <a:solidFill>
+                <a:schemeClr val="bg1"/>
+              </a:solidFill>
+              <a:miter lim="800000"/>
+            </a:ln>
+          </p:spPr>
+          <p:style>
+            <a:lnRef idx="2">
+              <a:schemeClr val="accent1">
+                <a:shade val="50000"/>
+              </a:schemeClr>
+            </a:lnRef>
+            <a:fillRef idx="1">
+              <a:schemeClr val="accent1"/>
+            </a:fillRef>
+            <a:effectRef idx="0">
+              <a:schemeClr val="accent1"/>
+            </a:effectRef>
+            <a:fontRef idx="minor">
+              <a:schemeClr val="lt1"/>
+            </a:fontRef>
+          </p:style>
+          <p:txBody>
+            <a:bodyPr rtlCol="0" anchor="ctr"/>
+            <a:lstStyle/>
+            <a:p>
+              <a:pPr algn="ctr"/>
+              <a:endParaRPr lang="en-US"/>
+            </a:p>
+          </p:txBody>
+        </p:sp>
+      </p:grpSp>
+      <p:sp>
+        <p:nvSpPr>
+          <p:cNvPr id="136" name="TextBox 135"/>
+          <p:cNvSpPr txBox="1"/>
+          <p:nvPr/>
+        </p:nvSpPr>
+        <p:spPr>
+          <a:xfrm>
+            <a:off x="5321468" y="2032904"/>
+            <a:ext cx="689438" cy="215444"/>
+          </a:xfrm>
+          <a:prstGeom prst="rect">
+            <a:avLst/>
+          </a:prstGeom>
+          <a:noFill/>
+        </p:spPr>
+        <p:txBody>
+          <a:bodyPr wrap="square" rtlCol="0">
+            <a:spAutoFit/>
+          </a:bodyPr>
+          <a:lstStyle/>
+          <a:p>
+            <a:r>
+              <a:rPr lang="en-US" sz="800" dirty="0" smtClean="0"/>
+              <a:t>Magnify</a:t>
+            </a:r>
+            <a:endParaRPr lang="en-SG" sz="800" dirty="0"/>
+          </a:p>
+        </p:txBody>
+      </p:sp>
+      <p:grpSp>
+        <p:nvGrpSpPr>
+          <p:cNvPr id="12" name="Group 11"/>
+          <p:cNvGrpSpPr/>
+          <p:nvPr/>
+        </p:nvGrpSpPr>
+        <p:grpSpPr>
+          <a:xfrm>
+            <a:off x="5247850" y="1096809"/>
+            <a:ext cx="838200" cy="838200"/>
+            <a:chOff x="5247850" y="1096809"/>
+            <a:chExt cx="838200" cy="838200"/>
+          </a:xfrm>
+        </p:grpSpPr>
+        <p:sp>
+          <p:nvSpPr>
+            <p:cNvPr id="140" name="Rectangle 139"/>
+            <p:cNvSpPr/>
+            <p:nvPr/>
+          </p:nvSpPr>
+          <p:spPr>
+            <a:xfrm>
+              <a:off x="5280854" y="1176244"/>
+              <a:ext cx="774065" cy="547843"/>
+            </a:xfrm>
+            <a:prstGeom prst="rect">
+              <a:avLst/>
+            </a:prstGeom>
+            <a:solidFill>
+              <a:schemeClr val="accent6"/>
+            </a:solidFill>
+            <a:ln>
+              <a:noFill/>
+            </a:ln>
+          </p:spPr>
+          <p:style>
+            <a:lnRef idx="2">
+              <a:schemeClr val="accent1">
+                <a:shade val="50000"/>
+              </a:schemeClr>
+            </a:lnRef>
+            <a:fillRef idx="1">
+              <a:schemeClr val="accent1"/>
+            </a:fillRef>
+            <a:effectRef idx="0">
+              <a:schemeClr val="accent1"/>
+            </a:effectRef>
+            <a:fontRef idx="minor">
+              <a:schemeClr val="lt1"/>
+            </a:fontRef>
+          </p:style>
+          <p:txBody>
+            <a:bodyPr rtlCol="0" anchor="ctr"/>
+            <a:lstStyle/>
+            <a:p>
+              <a:pPr algn="ctr"/>
+              <a:endParaRPr lang="en-US"/>
+            </a:p>
+          </p:txBody>
+        </p:sp>
+        <p:sp>
+          <p:nvSpPr>
+            <p:cNvPr id="143" name="Rectangle 142"/>
+            <p:cNvSpPr/>
+            <p:nvPr/>
+          </p:nvSpPr>
+          <p:spPr>
+            <a:xfrm>
+              <a:off x="5247850" y="1096809"/>
+              <a:ext cx="838200" cy="838200"/>
+            </a:xfrm>
+            <a:prstGeom prst="rect">
+              <a:avLst/>
+            </a:prstGeom>
+            <a:noFill/>
+            <a:ln>
+              <a:noFill/>
+            </a:ln>
+          </p:spPr>
+          <p:style>
+            <a:lnRef idx="2">
+              <a:schemeClr val="accent1">
+                <a:shade val="50000"/>
+              </a:schemeClr>
+            </a:lnRef>
+            <a:fillRef idx="1">
+              <a:schemeClr val="accent1"/>
+            </a:fillRef>
+            <a:effectRef idx="0">
+              <a:schemeClr val="accent1"/>
+            </a:effectRef>
+            <a:fontRef idx="minor">
+              <a:schemeClr val="lt1"/>
+            </a:fontRef>
+          </p:style>
+          <p:txBody>
+            <a:bodyPr rtlCol="0" anchor="ctr"/>
+            <a:lstStyle/>
+            <a:p>
+              <a:pPr algn="ctr"/>
+              <a:endParaRPr lang="en-SG"/>
+            </a:p>
+          </p:txBody>
+        </p:sp>
+        <p:sp>
+          <p:nvSpPr>
+            <p:cNvPr id="6" name="Up Arrow 5"/>
+            <p:cNvSpPr/>
+            <p:nvPr/>
+          </p:nvSpPr>
+          <p:spPr>
+            <a:xfrm>
+              <a:off x="5542805" y="1185743"/>
+              <a:ext cx="144988" cy="220324"/>
+            </a:xfrm>
+            <a:prstGeom prst="upArrow">
+              <a:avLst/>
+            </a:prstGeom>
+            <a:solidFill>
+              <a:schemeClr val="bg1"/>
+            </a:solidFill>
+            <a:ln>
+              <a:solidFill>
+                <a:schemeClr val="bg1"/>
+              </a:solidFill>
+            </a:ln>
+          </p:spPr>
+          <p:style>
+            <a:lnRef idx="2">
+              <a:schemeClr val="accent1">
+                <a:shade val="50000"/>
+              </a:schemeClr>
+            </a:lnRef>
+            <a:fillRef idx="1">
+              <a:schemeClr val="accent1"/>
+            </a:fillRef>
+            <a:effectRef idx="0">
+              <a:schemeClr val="accent1"/>
+            </a:effectRef>
+            <a:fontRef idx="minor">
+              <a:schemeClr val="lt1"/>
+            </a:fontRef>
+          </p:style>
+          <p:txBody>
+            <a:bodyPr rtlCol="0" anchor="ctr"/>
+            <a:lstStyle/>
+            <a:p>
+              <a:pPr algn="ctr"/>
+              <a:endParaRPr lang="en-SG"/>
+            </a:p>
+          </p:txBody>
+        </p:sp>
+        <p:sp>
+          <p:nvSpPr>
+            <p:cNvPr id="147" name="Up Arrow 146"/>
+            <p:cNvSpPr/>
+            <p:nvPr/>
+          </p:nvSpPr>
+          <p:spPr>
+            <a:xfrm rot="10800000">
+              <a:off x="5542805" y="1491856"/>
+              <a:ext cx="144988" cy="220324"/>
+            </a:xfrm>
+            <a:prstGeom prst="upArrow">
+              <a:avLst/>
+            </a:prstGeom>
+            <a:solidFill>
+              <a:schemeClr val="bg1"/>
+            </a:solidFill>
+            <a:ln>
+              <a:solidFill>
+                <a:schemeClr val="bg1"/>
+              </a:solidFill>
+            </a:ln>
+          </p:spPr>
+          <p:style>
+            <a:lnRef idx="2">
+              <a:schemeClr val="accent1">
+                <a:shade val="50000"/>
+              </a:schemeClr>
+            </a:lnRef>
+            <a:fillRef idx="1">
+              <a:schemeClr val="accent1"/>
+            </a:fillRef>
+            <a:effectRef idx="0">
+              <a:schemeClr val="accent1"/>
+            </a:effectRef>
+            <a:fontRef idx="minor">
+              <a:schemeClr val="lt1"/>
+            </a:fontRef>
+          </p:style>
+          <p:txBody>
+            <a:bodyPr rtlCol="0" anchor="ctr"/>
+            <a:lstStyle/>
+            <a:p>
+              <a:pPr algn="ctr"/>
+              <a:endParaRPr lang="en-SG"/>
+            </a:p>
+          </p:txBody>
+        </p:sp>
+        <p:sp>
+          <p:nvSpPr>
+            <p:cNvPr id="149" name="Up Arrow 148"/>
+            <p:cNvSpPr/>
+            <p:nvPr/>
+          </p:nvSpPr>
+          <p:spPr>
+            <a:xfrm rot="5400000">
+              <a:off x="5780554" y="1228522"/>
+              <a:ext cx="144988" cy="379216"/>
+            </a:xfrm>
+            <a:prstGeom prst="upArrow">
+              <a:avLst/>
+            </a:prstGeom>
+            <a:solidFill>
+              <a:schemeClr val="bg1"/>
+            </a:solidFill>
+            <a:ln>
+              <a:solidFill>
+                <a:schemeClr val="bg1"/>
+              </a:solidFill>
+            </a:ln>
+          </p:spPr>
+          <p:style>
+            <a:lnRef idx="2">
+              <a:schemeClr val="accent1">
+                <a:shade val="50000"/>
+              </a:schemeClr>
+            </a:lnRef>
+            <a:fillRef idx="1">
+              <a:schemeClr val="accent1"/>
+            </a:fillRef>
+            <a:effectRef idx="0">
+              <a:schemeClr val="accent1"/>
+            </a:effectRef>
+            <a:fontRef idx="minor">
+              <a:schemeClr val="lt1"/>
+            </a:fontRef>
+          </p:style>
+          <p:txBody>
+            <a:bodyPr rtlCol="0" anchor="ctr"/>
+            <a:lstStyle/>
+            <a:p>
+              <a:pPr algn="ctr"/>
+              <a:endParaRPr lang="en-SG"/>
+            </a:p>
+          </p:txBody>
+        </p:sp>
+        <p:sp>
+          <p:nvSpPr>
+            <p:cNvPr id="150" name="Up Arrow 149"/>
+            <p:cNvSpPr/>
+            <p:nvPr/>
+          </p:nvSpPr>
+          <p:spPr>
+            <a:xfrm rot="16200000" flipH="1">
+              <a:off x="5363324" y="1276712"/>
+              <a:ext cx="144988" cy="274552"/>
+            </a:xfrm>
+            <a:prstGeom prst="upArrow">
+              <a:avLst/>
+            </a:prstGeom>
+            <a:solidFill>
+              <a:schemeClr val="bg1"/>
+            </a:solidFill>
+            <a:ln>
+              <a:solidFill>
+                <a:schemeClr val="bg1"/>
+              </a:solidFill>
+            </a:ln>
+          </p:spPr>
+          <p:style>
+            <a:lnRef idx="2">
+              <a:schemeClr val="accent1">
+                <a:shade val="50000"/>
+              </a:schemeClr>
+            </a:lnRef>
+            <a:fillRef idx="1">
+              <a:schemeClr val="accent1"/>
+            </a:fillRef>
+            <a:effectRef idx="0">
+              <a:schemeClr val="accent1"/>
+            </a:effectRef>
+            <a:fontRef idx="minor">
+              <a:schemeClr val="lt1"/>
+            </a:fontRef>
+          </p:style>
+          <p:txBody>
+            <a:bodyPr rtlCol="0" anchor="ctr"/>
+            <a:lstStyle/>
+            <a:p>
+              <a:pPr algn="ctr"/>
+              <a:endParaRPr lang="en-SG"/>
+            </a:p>
+          </p:txBody>
+        </p:sp>
+        <p:sp>
+          <p:nvSpPr>
+            <p:cNvPr id="146" name="Rectangle 145"/>
+            <p:cNvSpPr/>
+            <p:nvPr/>
+          </p:nvSpPr>
+          <p:spPr>
+            <a:xfrm>
+              <a:off x="5486595" y="1331707"/>
+              <a:ext cx="253034" cy="184202"/>
+            </a:xfrm>
+            <a:prstGeom prst="rect">
+              <a:avLst/>
+            </a:prstGeom>
+            <a:solidFill>
+              <a:srgbClr val="0070C0"/>
             </a:solidFill>
             <a:ln>
               <a:solidFill>
@@ -12537,7 +12905,7 @@
             <a:pPr algn="ctr"/>
             <a:r>
               <a:rPr lang="en-US" sz="1100" dirty="0" smtClean="0"/>
-              <a:t>Zoom out</a:t>
+              <a:t>Step back</a:t>
             </a:r>
             <a:endParaRPr lang="en-SG" sz="1100" dirty="0"/>
           </a:p>
@@ -12568,7 +12936,7 @@
             <a:pPr algn="ctr"/>
             <a:r>
               <a:rPr lang="en-US" sz="1100" dirty="0" smtClean="0"/>
-              <a:t>Zoom in</a:t>
+              <a:t>Drill down</a:t>
             </a:r>
             <a:endParaRPr lang="en-SG" sz="1100" dirty="0"/>
           </a:p>
@@ -12999,6 +13367,418 @@
             <a:p>
               <a:pPr algn="ctr"/>
               <a:endParaRPr lang="en-SG"/>
+            </a:p>
+          </p:txBody>
+        </p:sp>
+      </p:grpSp>
+      <p:grpSp>
+        <p:nvGrpSpPr>
+          <p:cNvPr id="8" name="Group 7"/>
+          <p:cNvGrpSpPr/>
+          <p:nvPr/>
+        </p:nvGrpSpPr>
+        <p:grpSpPr>
+          <a:xfrm>
+            <a:off x="6377174" y="4284833"/>
+            <a:ext cx="421200" cy="420624"/>
+            <a:chOff x="6377174" y="4284833"/>
+            <a:chExt cx="421200" cy="420624"/>
+          </a:xfrm>
+        </p:grpSpPr>
+        <p:sp>
+          <p:nvSpPr>
+            <p:cNvPr id="86" name="Rectangle 85"/>
+            <p:cNvSpPr/>
+            <p:nvPr/>
+          </p:nvSpPr>
+          <p:spPr>
+            <a:xfrm rot="5400000" flipH="1">
+              <a:off x="6377462" y="4284545"/>
+              <a:ext cx="420624" cy="421200"/>
+            </a:xfrm>
+            <a:prstGeom prst="rect">
+              <a:avLst/>
+            </a:prstGeom>
+            <a:solidFill>
+              <a:srgbClr val="0070C0"/>
+            </a:solidFill>
+            <a:ln>
+              <a:noFill/>
+            </a:ln>
+          </p:spPr>
+          <p:style>
+            <a:lnRef idx="2">
+              <a:schemeClr val="accent1">
+                <a:shade val="50000"/>
+              </a:schemeClr>
+            </a:lnRef>
+            <a:fillRef idx="1">
+              <a:schemeClr val="accent1"/>
+            </a:fillRef>
+            <a:effectRef idx="0">
+              <a:schemeClr val="accent1"/>
+            </a:effectRef>
+            <a:fontRef idx="minor">
+              <a:schemeClr val="lt1"/>
+            </a:fontRef>
+          </p:style>
+          <p:txBody>
+            <a:bodyPr wrap="none" lIns="0" tIns="0" rIns="0" bIns="0" rtlCol="0" anchor="ctr"/>
+            <a:lstStyle/>
+            <a:p>
+              <a:pPr algn="ctr"/>
+              <a:endParaRPr lang="en-US" b="1"/>
+            </a:p>
+          </p:txBody>
+        </p:sp>
+        <p:sp>
+          <p:nvSpPr>
+            <p:cNvPr id="88" name="Rectangle 87"/>
+            <p:cNvSpPr>
+              <a:spLocks noChangeAspect="1"/>
+            </p:cNvSpPr>
+            <p:nvPr/>
+          </p:nvSpPr>
+          <p:spPr>
+            <a:xfrm rot="16200000" flipH="1">
+              <a:off x="6511863" y="4418694"/>
+              <a:ext cx="151408" cy="159422"/>
+            </a:xfrm>
+            <a:prstGeom prst="rect">
+              <a:avLst/>
+            </a:prstGeom>
+            <a:solidFill>
+              <a:schemeClr val="bg1"/>
+            </a:solidFill>
+            <a:ln>
+              <a:noFill/>
+            </a:ln>
+          </p:spPr>
+          <p:style>
+            <a:lnRef idx="2">
+              <a:schemeClr val="accent1">
+                <a:shade val="50000"/>
+              </a:schemeClr>
+            </a:lnRef>
+            <a:fillRef idx="1">
+              <a:schemeClr val="accent1"/>
+            </a:fillRef>
+            <a:effectRef idx="0">
+              <a:schemeClr val="accent1"/>
+            </a:effectRef>
+            <a:fontRef idx="minor">
+              <a:schemeClr val="lt1"/>
+            </a:fontRef>
+          </p:style>
+          <p:txBody>
+            <a:bodyPr rtlCol="0" anchor="ctr"/>
+            <a:lstStyle/>
+            <a:p>
+              <a:pPr algn="ctr"/>
+              <a:endParaRPr lang="en-SG"/>
+            </a:p>
+          </p:txBody>
+        </p:sp>
+        <p:cxnSp>
+          <p:nvCxnSpPr>
+            <p:cNvPr id="93" name="Straight Arrow Connector 92"/>
+            <p:cNvCxnSpPr/>
+            <p:nvPr/>
+          </p:nvCxnSpPr>
+          <p:spPr>
+            <a:xfrm flipV="1">
+              <a:off x="6377174" y="4284833"/>
+              <a:ext cx="421200" cy="420624"/>
+            </a:xfrm>
+            <a:prstGeom prst="straightConnector1">
+              <a:avLst/>
+            </a:prstGeom>
+            <a:ln w="57150">
+              <a:solidFill>
+                <a:schemeClr val="bg1"/>
+              </a:solidFill>
+              <a:headEnd type="triangle" w="med" len="med"/>
+              <a:tailEnd type="triangle" w="med" len="med"/>
+            </a:ln>
+          </p:spPr>
+          <p:style>
+            <a:lnRef idx="1">
+              <a:schemeClr val="accent1"/>
+            </a:lnRef>
+            <a:fillRef idx="0">
+              <a:schemeClr val="accent1"/>
+            </a:fillRef>
+            <a:effectRef idx="0">
+              <a:schemeClr val="accent1"/>
+            </a:effectRef>
+            <a:fontRef idx="minor">
+              <a:schemeClr val="tx1"/>
+            </a:fontRef>
+          </p:style>
+        </p:cxnSp>
+        <p:cxnSp>
+          <p:nvCxnSpPr>
+            <p:cNvPr id="95" name="Straight Arrow Connector 94"/>
+            <p:cNvCxnSpPr/>
+            <p:nvPr/>
+          </p:nvCxnSpPr>
+          <p:spPr>
+            <a:xfrm>
+              <a:off x="6377174" y="4291604"/>
+              <a:ext cx="421200" cy="413853"/>
+            </a:xfrm>
+            <a:prstGeom prst="straightConnector1">
+              <a:avLst/>
+            </a:prstGeom>
+            <a:ln w="57150">
+              <a:solidFill>
+                <a:schemeClr val="bg1"/>
+              </a:solidFill>
+              <a:headEnd type="triangle" w="med" len="med"/>
+              <a:tailEnd type="triangle" w="med" len="med"/>
+            </a:ln>
+          </p:spPr>
+          <p:style>
+            <a:lnRef idx="1">
+              <a:schemeClr val="accent1"/>
+            </a:lnRef>
+            <a:fillRef idx="0">
+              <a:schemeClr val="accent1"/>
+            </a:fillRef>
+            <a:effectRef idx="0">
+              <a:schemeClr val="accent1"/>
+            </a:effectRef>
+            <a:fontRef idx="minor">
+              <a:schemeClr val="tx1"/>
+            </a:fontRef>
+          </p:style>
+        </p:cxnSp>
+      </p:grpSp>
+      <p:sp>
+        <p:nvSpPr>
+          <p:cNvPr id="99" name="TextBox 98"/>
+          <p:cNvSpPr txBox="1"/>
+          <p:nvPr/>
+        </p:nvSpPr>
+        <p:spPr>
+          <a:xfrm>
+            <a:off x="6261527" y="4935223"/>
+            <a:ext cx="918667" cy="261610"/>
+          </a:xfrm>
+          <a:prstGeom prst="rect">
+            <a:avLst/>
+          </a:prstGeom>
+          <a:noFill/>
+        </p:spPr>
+        <p:txBody>
+          <a:bodyPr wrap="square" rtlCol="0">
+            <a:spAutoFit/>
+          </a:bodyPr>
+          <a:lstStyle/>
+          <a:p>
+            <a:pPr algn="ctr"/>
+            <a:r>
+              <a:rPr lang="en-US" sz="1100" dirty="0" smtClean="0"/>
+              <a:t>Magnify</a:t>
+            </a:r>
+            <a:endParaRPr lang="en-SG" sz="1100" dirty="0"/>
+          </a:p>
+        </p:txBody>
+      </p:sp>
+      <p:sp>
+        <p:nvSpPr>
+          <p:cNvPr id="100" name="TextBox 99"/>
+          <p:cNvSpPr txBox="1"/>
+          <p:nvPr/>
+        </p:nvSpPr>
+        <p:spPr>
+          <a:xfrm>
+            <a:off x="7322389" y="4942281"/>
+            <a:ext cx="918667" cy="261610"/>
+          </a:xfrm>
+          <a:prstGeom prst="rect">
+            <a:avLst/>
+          </a:prstGeom>
+          <a:noFill/>
+        </p:spPr>
+        <p:txBody>
+          <a:bodyPr wrap="square" rtlCol="0">
+            <a:spAutoFit/>
+          </a:bodyPr>
+          <a:lstStyle/>
+          <a:p>
+            <a:pPr algn="ctr"/>
+            <a:r>
+              <a:rPr lang="en-US" sz="1100" dirty="0" smtClean="0"/>
+              <a:t>Cut to shape</a:t>
+            </a:r>
+            <a:endParaRPr lang="en-SG" sz="1100" dirty="0"/>
+          </a:p>
+        </p:txBody>
+      </p:sp>
+      <p:grpSp>
+        <p:nvGrpSpPr>
+          <p:cNvPr id="10" name="Group 9"/>
+          <p:cNvGrpSpPr/>
+          <p:nvPr/>
+        </p:nvGrpSpPr>
+        <p:grpSpPr>
+          <a:xfrm>
+            <a:off x="7524720" y="4243634"/>
+            <a:ext cx="420624" cy="421200"/>
+            <a:chOff x="7524720" y="4243634"/>
+            <a:chExt cx="420624" cy="421200"/>
+          </a:xfrm>
+        </p:grpSpPr>
+        <p:sp>
+          <p:nvSpPr>
+            <p:cNvPr id="103" name="Rectangle 102"/>
+            <p:cNvSpPr/>
+            <p:nvPr/>
+          </p:nvSpPr>
+          <p:spPr>
+            <a:xfrm flipH="1">
+              <a:off x="7524720" y="4243634"/>
+              <a:ext cx="420624" cy="421200"/>
+            </a:xfrm>
+            <a:prstGeom prst="rect">
+              <a:avLst/>
+            </a:prstGeom>
+            <a:solidFill>
+              <a:srgbClr val="0070C0"/>
+            </a:solidFill>
+            <a:ln>
+              <a:noFill/>
+            </a:ln>
+          </p:spPr>
+          <p:style>
+            <a:lnRef idx="2">
+              <a:schemeClr val="accent1">
+                <a:shade val="50000"/>
+              </a:schemeClr>
+            </a:lnRef>
+            <a:fillRef idx="1">
+              <a:schemeClr val="accent1"/>
+            </a:fillRef>
+            <a:effectRef idx="0">
+              <a:schemeClr val="accent1"/>
+            </a:effectRef>
+            <a:fontRef idx="minor">
+              <a:schemeClr val="lt1"/>
+            </a:fontRef>
+          </p:style>
+          <p:txBody>
+            <a:bodyPr wrap="none" lIns="0" tIns="0" rIns="0" bIns="0" rtlCol="0" anchor="ctr"/>
+            <a:lstStyle/>
+            <a:p>
+              <a:pPr algn="ctr"/>
+              <a:endParaRPr lang="en-US" b="1"/>
+            </a:p>
+          </p:txBody>
+        </p:sp>
+        <p:sp>
+          <p:nvSpPr>
+            <p:cNvPr id="108" name="Flowchart: Connector 41"/>
+            <p:cNvSpPr/>
+            <p:nvPr/>
+          </p:nvSpPr>
+          <p:spPr>
+            <a:xfrm rot="771170">
+              <a:off x="7598281" y="4279539"/>
+              <a:ext cx="304205" cy="315702"/>
+            </a:xfrm>
+            <a:custGeom>
+              <a:avLst/>
+              <a:gdLst/>
+              <a:ahLst/>
+              <a:cxnLst/>
+              <a:rect l="l" t="t" r="r" b="b"/>
+              <a:pathLst>
+                <a:path w="469900" h="582615">
+                  <a:moveTo>
+                    <a:pt x="228600" y="0"/>
+                  </a:moveTo>
+                  <a:cubicBezTo>
+                    <a:pt x="314512" y="0"/>
+                    <a:pt x="387142" y="56871"/>
+                    <a:pt x="410009" y="135289"/>
+                  </a:cubicBezTo>
+                  <a:lnTo>
+                    <a:pt x="412750" y="131765"/>
+                  </a:lnTo>
+                  <a:lnTo>
+                    <a:pt x="469900" y="265115"/>
+                  </a:lnTo>
+                  <a:lnTo>
+                    <a:pt x="406551" y="256852"/>
+                  </a:lnTo>
+                  <a:cubicBezTo>
+                    <a:pt x="387409" y="309479"/>
+                    <a:pt x="345491" y="351043"/>
+                    <a:pt x="292452" y="369176"/>
+                  </a:cubicBezTo>
+                  <a:lnTo>
+                    <a:pt x="298450" y="411165"/>
+                  </a:lnTo>
+                  <a:lnTo>
+                    <a:pt x="444500" y="569915"/>
+                  </a:lnTo>
+                  <a:lnTo>
+                    <a:pt x="0" y="582615"/>
+                  </a:lnTo>
+                  <a:lnTo>
+                    <a:pt x="6350" y="474665"/>
+                  </a:lnTo>
+                  <a:lnTo>
+                    <a:pt x="158750" y="411165"/>
+                  </a:lnTo>
+                  <a:lnTo>
+                    <a:pt x="158750" y="367365"/>
+                  </a:lnTo>
+                  <a:cubicBezTo>
+                    <a:pt x="88028" y="339833"/>
+                    <a:pt x="38100" y="270997"/>
+                    <a:pt x="38100" y="190500"/>
+                  </a:cubicBezTo>
+                  <a:cubicBezTo>
+                    <a:pt x="38100" y="85290"/>
+                    <a:pt x="123390" y="0"/>
+                    <a:pt x="228600" y="0"/>
+                  </a:cubicBezTo>
+                  <a:close/>
+                </a:path>
+              </a:pathLst>
+            </a:custGeom>
+            <a:solidFill>
+              <a:schemeClr val="bg1"/>
+            </a:solidFill>
+            <a:ln>
+              <a:noFill/>
+            </a:ln>
+            <a:effectLst/>
+          </p:spPr>
+          <p:style>
+            <a:lnRef idx="2">
+              <a:schemeClr val="accent1">
+                <a:shade val="50000"/>
+              </a:schemeClr>
+            </a:lnRef>
+            <a:fillRef idx="1">
+              <a:schemeClr val="accent1"/>
+            </a:fillRef>
+            <a:effectRef idx="0">
+              <a:schemeClr val="accent1"/>
+            </a:effectRef>
+            <a:fontRef idx="minor">
+              <a:schemeClr val="lt1"/>
+            </a:fontRef>
+          </p:style>
+          <p:txBody>
+            <a:bodyPr rtlCol="0" anchor="ctr"/>
+            <a:lstStyle/>
+            <a:p>
+              <a:pPr algn="ctr"/>
+              <a:endParaRPr lang="en-US"/>
             </a:p>
           </p:txBody>
         </p:sp>

</xml_diff>

<commit_message>
Issue 223: Create icon for convert to picture Update Issue 223
</commit_message>
<xml_diff>
--- a/doc/Icons.pptx
+++ b/doc/Icons.pptx
@@ -210,7 +210,7 @@
           <a:p>
             <a:fld id="{6699ACB9-486C-4D62-A3A7-AF98E13EFDA3}" type="datetimeFigureOut">
               <a:rPr lang="en-US" smtClean="0"/>
-              <a:t>2/21/2014</a:t>
+              <a:t>2/24/2014</a:t>
             </a:fld>
             <a:endParaRPr lang="en-US"/>
           </a:p>
@@ -744,7 +744,7 @@
             <a:fld id="{1D8BD707-D9CF-40AE-B4C6-C98DA3205C09}" type="datetimeFigureOut">
               <a:rPr lang="en-US" smtClean="0"/>
               <a:pPr/>
-              <a:t>2/21/2014</a:t>
+              <a:t>2/24/2014</a:t>
             </a:fld>
             <a:endParaRPr lang="en-US"/>
           </a:p>
@@ -911,7 +911,7 @@
             <a:fld id="{1D8BD707-D9CF-40AE-B4C6-C98DA3205C09}" type="datetimeFigureOut">
               <a:rPr lang="en-US" smtClean="0"/>
               <a:pPr/>
-              <a:t>2/21/2014</a:t>
+              <a:t>2/24/2014</a:t>
             </a:fld>
             <a:endParaRPr lang="en-US"/>
           </a:p>
@@ -1088,7 +1088,7 @@
             <a:fld id="{1D8BD707-D9CF-40AE-B4C6-C98DA3205C09}" type="datetimeFigureOut">
               <a:rPr lang="en-US" smtClean="0"/>
               <a:pPr/>
-              <a:t>2/21/2014</a:t>
+              <a:t>2/24/2014</a:t>
             </a:fld>
             <a:endParaRPr lang="en-US"/>
           </a:p>
@@ -1255,7 +1255,7 @@
             <a:fld id="{1D8BD707-D9CF-40AE-B4C6-C98DA3205C09}" type="datetimeFigureOut">
               <a:rPr lang="en-US" smtClean="0"/>
               <a:pPr/>
-              <a:t>2/21/2014</a:t>
+              <a:t>2/24/2014</a:t>
             </a:fld>
             <a:endParaRPr lang="en-US"/>
           </a:p>
@@ -1498,7 +1498,7 @@
             <a:fld id="{1D8BD707-D9CF-40AE-B4C6-C98DA3205C09}" type="datetimeFigureOut">
               <a:rPr lang="en-US" smtClean="0"/>
               <a:pPr/>
-              <a:t>2/21/2014</a:t>
+              <a:t>2/24/2014</a:t>
             </a:fld>
             <a:endParaRPr lang="en-US"/>
           </a:p>
@@ -1783,7 +1783,7 @@
             <a:fld id="{1D8BD707-D9CF-40AE-B4C6-C98DA3205C09}" type="datetimeFigureOut">
               <a:rPr lang="en-US" smtClean="0"/>
               <a:pPr/>
-              <a:t>2/21/2014</a:t>
+              <a:t>2/24/2014</a:t>
             </a:fld>
             <a:endParaRPr lang="en-US"/>
           </a:p>
@@ -2202,7 +2202,7 @@
             <a:fld id="{1D8BD707-D9CF-40AE-B4C6-C98DA3205C09}" type="datetimeFigureOut">
               <a:rPr lang="en-US" smtClean="0"/>
               <a:pPr/>
-              <a:t>2/21/2014</a:t>
+              <a:t>2/24/2014</a:t>
             </a:fld>
             <a:endParaRPr lang="en-US"/>
           </a:p>
@@ -2317,7 +2317,7 @@
             <a:fld id="{1D8BD707-D9CF-40AE-B4C6-C98DA3205C09}" type="datetimeFigureOut">
               <a:rPr lang="en-US" smtClean="0"/>
               <a:pPr/>
-              <a:t>2/21/2014</a:t>
+              <a:t>2/24/2014</a:t>
             </a:fld>
             <a:endParaRPr lang="en-US"/>
           </a:p>
@@ -2409,7 +2409,7 @@
             <a:fld id="{1D8BD707-D9CF-40AE-B4C6-C98DA3205C09}" type="datetimeFigureOut">
               <a:rPr lang="en-US" smtClean="0"/>
               <a:pPr/>
-              <a:t>2/21/2014</a:t>
+              <a:t>2/24/2014</a:t>
             </a:fld>
             <a:endParaRPr lang="en-US"/>
           </a:p>
@@ -2683,7 +2683,7 @@
             <a:fld id="{1D8BD707-D9CF-40AE-B4C6-C98DA3205C09}" type="datetimeFigureOut">
               <a:rPr lang="en-US" smtClean="0"/>
               <a:pPr/>
-              <a:t>2/21/2014</a:t>
+              <a:t>2/24/2014</a:t>
             </a:fld>
             <a:endParaRPr lang="en-US"/>
           </a:p>
@@ -2933,7 +2933,7 @@
             <a:fld id="{1D8BD707-D9CF-40AE-B4C6-C98DA3205C09}" type="datetimeFigureOut">
               <a:rPr lang="en-US" smtClean="0"/>
               <a:pPr/>
-              <a:t>2/21/2014</a:t>
+              <a:t>2/24/2014</a:t>
             </a:fld>
             <a:endParaRPr lang="en-US"/>
           </a:p>
@@ -3143,7 +3143,7 @@
             <a:fld id="{1D8BD707-D9CF-40AE-B4C6-C98DA3205C09}" type="datetimeFigureOut">
               <a:rPr lang="en-US" smtClean="0"/>
               <a:pPr/>
-              <a:t>2/21/2014</a:t>
+              <a:t>2/24/2014</a:t>
             </a:fld>
             <a:endParaRPr lang="en-US"/>
           </a:p>
@@ -13783,6 +13783,705 @@
           </p:txBody>
         </p:sp>
       </p:grpSp>
+      <p:sp>
+        <p:nvSpPr>
+          <p:cNvPr id="102" name="TextBox 101"/>
+          <p:cNvSpPr txBox="1"/>
+          <p:nvPr/>
+        </p:nvSpPr>
+        <p:spPr>
+          <a:xfrm>
+            <a:off x="1341794" y="6148370"/>
+            <a:ext cx="918667" cy="600164"/>
+          </a:xfrm>
+          <a:prstGeom prst="rect">
+            <a:avLst/>
+          </a:prstGeom>
+          <a:noFill/>
+        </p:spPr>
+        <p:txBody>
+          <a:bodyPr wrap="square" rtlCol="0">
+            <a:spAutoFit/>
+          </a:bodyPr>
+          <a:lstStyle/>
+          <a:p>
+            <a:pPr algn="ctr"/>
+            <a:r>
+              <a:rPr lang="en-US" sz="1100" dirty="0" smtClean="0"/>
+              <a:t>Double click to open properties</a:t>
+            </a:r>
+            <a:endParaRPr lang="en-SG" sz="1100" dirty="0"/>
+          </a:p>
+        </p:txBody>
+      </p:sp>
+      <p:grpSp>
+        <p:nvGrpSpPr>
+          <p:cNvPr id="20" name="Group 19"/>
+          <p:cNvGrpSpPr/>
+          <p:nvPr/>
+        </p:nvGrpSpPr>
+        <p:grpSpPr>
+          <a:xfrm>
+            <a:off x="1590527" y="5606506"/>
+            <a:ext cx="421200" cy="420624"/>
+            <a:chOff x="1590527" y="5606506"/>
+            <a:chExt cx="421200" cy="420624"/>
+          </a:xfrm>
+        </p:grpSpPr>
+        <p:sp>
+          <p:nvSpPr>
+            <p:cNvPr id="107" name="Rectangle 106"/>
+            <p:cNvSpPr/>
+            <p:nvPr/>
+          </p:nvSpPr>
+          <p:spPr>
+            <a:xfrm rot="5400000" flipH="1">
+              <a:off x="1590815" y="5606218"/>
+              <a:ext cx="420624" cy="421200"/>
+            </a:xfrm>
+            <a:prstGeom prst="rect">
+              <a:avLst/>
+            </a:prstGeom>
+            <a:solidFill>
+              <a:srgbClr val="0070C0"/>
+            </a:solidFill>
+            <a:ln>
+              <a:noFill/>
+            </a:ln>
+          </p:spPr>
+          <p:style>
+            <a:lnRef idx="2">
+              <a:schemeClr val="accent1">
+                <a:shade val="50000"/>
+              </a:schemeClr>
+            </a:lnRef>
+            <a:fillRef idx="1">
+              <a:schemeClr val="accent1"/>
+            </a:fillRef>
+            <a:effectRef idx="0">
+              <a:schemeClr val="accent1"/>
+            </a:effectRef>
+            <a:fontRef idx="minor">
+              <a:schemeClr val="lt1"/>
+            </a:fontRef>
+          </p:style>
+          <p:txBody>
+            <a:bodyPr wrap="none" lIns="0" tIns="0" rIns="0" bIns="0" rtlCol="0" anchor="ctr"/>
+            <a:lstStyle/>
+            <a:p>
+              <a:pPr algn="ctr"/>
+              <a:endParaRPr lang="en-US" b="1"/>
+            </a:p>
+          </p:txBody>
+        </p:sp>
+        <p:sp>
+          <p:nvSpPr>
+            <p:cNvPr id="15" name="Flowchart: Delay 14"/>
+            <p:cNvSpPr/>
+            <p:nvPr/>
+          </p:nvSpPr>
+          <p:spPr>
+            <a:xfrm rot="16200000">
+              <a:off x="1648697" y="5650130"/>
+              <a:ext cx="304863" cy="333375"/>
+            </a:xfrm>
+            <a:prstGeom prst="flowChartDelay">
+              <a:avLst/>
+            </a:prstGeom>
+            <a:solidFill>
+              <a:schemeClr val="bg1"/>
+            </a:solidFill>
+            <a:ln>
+              <a:noFill/>
+            </a:ln>
+          </p:spPr>
+          <p:style>
+            <a:lnRef idx="2">
+              <a:schemeClr val="accent1">
+                <a:shade val="50000"/>
+              </a:schemeClr>
+            </a:lnRef>
+            <a:fillRef idx="1">
+              <a:schemeClr val="accent1"/>
+            </a:fillRef>
+            <a:effectRef idx="0">
+              <a:schemeClr val="accent1"/>
+            </a:effectRef>
+            <a:fontRef idx="minor">
+              <a:schemeClr val="lt1"/>
+            </a:fontRef>
+          </p:style>
+          <p:txBody>
+            <a:bodyPr rtlCol="0" anchor="ctr"/>
+            <a:lstStyle/>
+            <a:p>
+              <a:pPr algn="ctr"/>
+              <a:endParaRPr lang="en-SG"/>
+            </a:p>
+          </p:txBody>
+        </p:sp>
+        <p:sp>
+          <p:nvSpPr>
+            <p:cNvPr id="112" name="Flowchart: Delay 110"/>
+            <p:cNvSpPr/>
+            <p:nvPr/>
+          </p:nvSpPr>
+          <p:spPr>
+            <a:xfrm rot="5400000" flipH="1">
+              <a:off x="1801444" y="5735162"/>
+              <a:ext cx="134696" cy="88795"/>
+            </a:xfrm>
+            <a:custGeom>
+              <a:avLst/>
+              <a:gdLst>
+                <a:gd name="connsiteX0" fmla="*/ 304864 w 304864"/>
+                <a:gd name="connsiteY0" fmla="*/ 166688 h 173037"/>
+                <a:gd name="connsiteX1" fmla="*/ 303692 w 304864"/>
+                <a:gd name="connsiteY1" fmla="*/ 173037 h 173037"/>
+                <a:gd name="connsiteX2" fmla="*/ 0 w 304864"/>
+                <a:gd name="connsiteY2" fmla="*/ 173037 h 173037"/>
+                <a:gd name="connsiteX3" fmla="*/ 0 w 304864"/>
+                <a:gd name="connsiteY3" fmla="*/ 0 h 173037"/>
+                <a:gd name="connsiteX4" fmla="*/ 112345 w 304864"/>
+                <a:gd name="connsiteY4" fmla="*/ 4 h 173037"/>
+                <a:gd name="connsiteX5" fmla="*/ 304864 w 304864"/>
+                <a:gd name="connsiteY5" fmla="*/ 166688 h 173037"/>
+              </a:gdLst>
+              <a:ahLst/>
+              <a:cxnLst>
+                <a:cxn ang="0">
+                  <a:pos x="connsiteX0" y="connsiteY0"/>
+                </a:cxn>
+                <a:cxn ang="0">
+                  <a:pos x="connsiteX1" y="connsiteY1"/>
+                </a:cxn>
+                <a:cxn ang="0">
+                  <a:pos x="connsiteX2" y="connsiteY2"/>
+                </a:cxn>
+                <a:cxn ang="0">
+                  <a:pos x="connsiteX3" y="connsiteY3"/>
+                </a:cxn>
+                <a:cxn ang="0">
+                  <a:pos x="connsiteX4" y="connsiteY4"/>
+                </a:cxn>
+                <a:cxn ang="0">
+                  <a:pos x="connsiteX5" y="connsiteY5"/>
+                </a:cxn>
+              </a:cxnLst>
+              <a:rect l="l" t="t" r="r" b="b"/>
+              <a:pathLst>
+                <a:path w="304864" h="173037">
+                  <a:moveTo>
+                    <a:pt x="304864" y="166688"/>
+                  </a:moveTo>
+                  <a:lnTo>
+                    <a:pt x="303692" y="173037"/>
+                  </a:lnTo>
+                  <a:lnTo>
+                    <a:pt x="0" y="173037"/>
+                  </a:lnTo>
+                  <a:lnTo>
+                    <a:pt x="0" y="0"/>
+                  </a:lnTo>
+                  <a:lnTo>
+                    <a:pt x="112345" y="4"/>
+                  </a:lnTo>
+                  <a:cubicBezTo>
+                    <a:pt x="196531" y="4"/>
+                    <a:pt x="304864" y="74629"/>
+                    <a:pt x="304864" y="166688"/>
+                  </a:cubicBezTo>
+                  <a:close/>
+                </a:path>
+              </a:pathLst>
+            </a:custGeom>
+            <a:solidFill>
+              <a:schemeClr val="bg1"/>
+            </a:solidFill>
+            <a:ln>
+              <a:solidFill>
+                <a:srgbClr val="0070C0"/>
+              </a:solidFill>
+            </a:ln>
+          </p:spPr>
+          <p:style>
+            <a:lnRef idx="2">
+              <a:schemeClr val="accent1">
+                <a:shade val="50000"/>
+              </a:schemeClr>
+            </a:lnRef>
+            <a:fillRef idx="1">
+              <a:schemeClr val="accent1"/>
+            </a:fillRef>
+            <a:effectRef idx="0">
+              <a:schemeClr val="accent1"/>
+            </a:effectRef>
+            <a:fontRef idx="minor">
+              <a:schemeClr val="lt1"/>
+            </a:fontRef>
+          </p:style>
+          <p:txBody>
+            <a:bodyPr rtlCol="0" anchor="ctr"/>
+            <a:lstStyle/>
+            <a:p>
+              <a:pPr algn="ctr"/>
+              <a:endParaRPr lang="en-SG"/>
+            </a:p>
+          </p:txBody>
+        </p:sp>
+        <p:sp>
+          <p:nvSpPr>
+            <p:cNvPr id="113" name="Flowchart: Delay 110"/>
+            <p:cNvSpPr/>
+            <p:nvPr/>
+          </p:nvSpPr>
+          <p:spPr>
+            <a:xfrm rot="16200000">
+              <a:off x="1665415" y="5735161"/>
+              <a:ext cx="134696" cy="88795"/>
+            </a:xfrm>
+            <a:custGeom>
+              <a:avLst/>
+              <a:gdLst>
+                <a:gd name="connsiteX0" fmla="*/ 304864 w 304864"/>
+                <a:gd name="connsiteY0" fmla="*/ 166688 h 173037"/>
+                <a:gd name="connsiteX1" fmla="*/ 303692 w 304864"/>
+                <a:gd name="connsiteY1" fmla="*/ 173037 h 173037"/>
+                <a:gd name="connsiteX2" fmla="*/ 0 w 304864"/>
+                <a:gd name="connsiteY2" fmla="*/ 173037 h 173037"/>
+                <a:gd name="connsiteX3" fmla="*/ 0 w 304864"/>
+                <a:gd name="connsiteY3" fmla="*/ 0 h 173037"/>
+                <a:gd name="connsiteX4" fmla="*/ 112345 w 304864"/>
+                <a:gd name="connsiteY4" fmla="*/ 4 h 173037"/>
+                <a:gd name="connsiteX5" fmla="*/ 304864 w 304864"/>
+                <a:gd name="connsiteY5" fmla="*/ 166688 h 173037"/>
+              </a:gdLst>
+              <a:ahLst/>
+              <a:cxnLst>
+                <a:cxn ang="0">
+                  <a:pos x="connsiteX0" y="connsiteY0"/>
+                </a:cxn>
+                <a:cxn ang="0">
+                  <a:pos x="connsiteX1" y="connsiteY1"/>
+                </a:cxn>
+                <a:cxn ang="0">
+                  <a:pos x="connsiteX2" y="connsiteY2"/>
+                </a:cxn>
+                <a:cxn ang="0">
+                  <a:pos x="connsiteX3" y="connsiteY3"/>
+                </a:cxn>
+                <a:cxn ang="0">
+                  <a:pos x="connsiteX4" y="connsiteY4"/>
+                </a:cxn>
+                <a:cxn ang="0">
+                  <a:pos x="connsiteX5" y="connsiteY5"/>
+                </a:cxn>
+              </a:cxnLst>
+              <a:rect l="l" t="t" r="r" b="b"/>
+              <a:pathLst>
+                <a:path w="304864" h="173037">
+                  <a:moveTo>
+                    <a:pt x="304864" y="166688"/>
+                  </a:moveTo>
+                  <a:lnTo>
+                    <a:pt x="303692" y="173037"/>
+                  </a:lnTo>
+                  <a:lnTo>
+                    <a:pt x="0" y="173037"/>
+                  </a:lnTo>
+                  <a:lnTo>
+                    <a:pt x="0" y="0"/>
+                  </a:lnTo>
+                  <a:lnTo>
+                    <a:pt x="112345" y="4"/>
+                  </a:lnTo>
+                  <a:cubicBezTo>
+                    <a:pt x="196531" y="4"/>
+                    <a:pt x="304864" y="74629"/>
+                    <a:pt x="304864" y="166688"/>
+                  </a:cubicBezTo>
+                  <a:close/>
+                </a:path>
+              </a:pathLst>
+            </a:custGeom>
+            <a:solidFill>
+              <a:srgbClr val="0070C0"/>
+            </a:solidFill>
+            <a:ln>
+              <a:solidFill>
+                <a:srgbClr val="0070C0"/>
+              </a:solidFill>
+            </a:ln>
+          </p:spPr>
+          <p:style>
+            <a:lnRef idx="2">
+              <a:schemeClr val="accent1">
+                <a:shade val="50000"/>
+              </a:schemeClr>
+            </a:lnRef>
+            <a:fillRef idx="1">
+              <a:schemeClr val="accent1"/>
+            </a:fillRef>
+            <a:effectRef idx="0">
+              <a:schemeClr val="accent1"/>
+            </a:effectRef>
+            <a:fontRef idx="minor">
+              <a:schemeClr val="lt1"/>
+            </a:fontRef>
+          </p:style>
+          <p:txBody>
+            <a:bodyPr rtlCol="0" anchor="ctr"/>
+            <a:lstStyle/>
+            <a:p>
+              <a:pPr algn="ctr"/>
+              <a:endParaRPr lang="en-SG"/>
+            </a:p>
+          </p:txBody>
+        </p:sp>
+      </p:grpSp>
+      <p:sp>
+        <p:nvSpPr>
+          <p:cNvPr id="114" name="TextBox 113"/>
+          <p:cNvSpPr txBox="1"/>
+          <p:nvPr/>
+        </p:nvSpPr>
+        <p:spPr>
+          <a:xfrm>
+            <a:off x="2471688" y="6179530"/>
+            <a:ext cx="918667" cy="430887"/>
+          </a:xfrm>
+          <a:prstGeom prst="rect">
+            <a:avLst/>
+          </a:prstGeom>
+          <a:noFill/>
+        </p:spPr>
+        <p:txBody>
+          <a:bodyPr wrap="square" rtlCol="0">
+            <a:spAutoFit/>
+          </a:bodyPr>
+          <a:lstStyle/>
+          <a:p>
+            <a:pPr algn="ctr"/>
+            <a:r>
+              <a:rPr lang="en-US" sz="1100" dirty="0" smtClean="0"/>
+              <a:t>Convert to picture</a:t>
+            </a:r>
+            <a:endParaRPr lang="en-SG" sz="1100" dirty="0"/>
+          </a:p>
+        </p:txBody>
+      </p:sp>
+      <p:grpSp>
+        <p:nvGrpSpPr>
+          <p:cNvPr id="35" name="Group 34"/>
+          <p:cNvGrpSpPr/>
+          <p:nvPr/>
+        </p:nvGrpSpPr>
+        <p:grpSpPr>
+          <a:xfrm>
+            <a:off x="2720421" y="5637666"/>
+            <a:ext cx="421200" cy="420624"/>
+            <a:chOff x="2720421" y="5637666"/>
+            <a:chExt cx="421200" cy="420624"/>
+          </a:xfrm>
+        </p:grpSpPr>
+        <p:sp>
+          <p:nvSpPr>
+            <p:cNvPr id="118" name="Rectangle 117"/>
+            <p:cNvSpPr/>
+            <p:nvPr/>
+          </p:nvSpPr>
+          <p:spPr>
+            <a:xfrm rot="5400000" flipH="1">
+              <a:off x="2720709" y="5637378"/>
+              <a:ext cx="420624" cy="421200"/>
+            </a:xfrm>
+            <a:prstGeom prst="rect">
+              <a:avLst/>
+            </a:prstGeom>
+            <a:solidFill>
+              <a:srgbClr val="0070C0"/>
+            </a:solidFill>
+            <a:ln>
+              <a:noFill/>
+            </a:ln>
+          </p:spPr>
+          <p:style>
+            <a:lnRef idx="2">
+              <a:schemeClr val="accent1">
+                <a:shade val="50000"/>
+              </a:schemeClr>
+            </a:lnRef>
+            <a:fillRef idx="1">
+              <a:schemeClr val="accent1"/>
+            </a:fillRef>
+            <a:effectRef idx="0">
+              <a:schemeClr val="accent1"/>
+            </a:effectRef>
+            <a:fontRef idx="minor">
+              <a:schemeClr val="lt1"/>
+            </a:fontRef>
+          </p:style>
+          <p:txBody>
+            <a:bodyPr wrap="none" lIns="0" tIns="0" rIns="0" bIns="0" rtlCol="0" anchor="ctr"/>
+            <a:lstStyle/>
+            <a:p>
+              <a:pPr algn="ctr"/>
+              <a:endParaRPr lang="en-US" b="1"/>
+            </a:p>
+          </p:txBody>
+        </p:sp>
+        <p:sp>
+          <p:nvSpPr>
+            <p:cNvPr id="119" name="Rectangle 118"/>
+            <p:cNvSpPr/>
+            <p:nvPr/>
+          </p:nvSpPr>
+          <p:spPr>
+            <a:xfrm rot="16200000">
+              <a:off x="2778591" y="5681290"/>
+              <a:ext cx="304863" cy="333375"/>
+            </a:xfrm>
+            <a:prstGeom prst="rect">
+              <a:avLst/>
+            </a:prstGeom>
+            <a:solidFill>
+              <a:schemeClr val="bg1"/>
+            </a:solidFill>
+            <a:ln>
+              <a:noFill/>
+            </a:ln>
+          </p:spPr>
+          <p:style>
+            <a:lnRef idx="2">
+              <a:schemeClr val="accent1">
+                <a:shade val="50000"/>
+              </a:schemeClr>
+            </a:lnRef>
+            <a:fillRef idx="1">
+              <a:schemeClr val="accent1"/>
+            </a:fillRef>
+            <a:effectRef idx="0">
+              <a:schemeClr val="accent1"/>
+            </a:effectRef>
+            <a:fontRef idx="minor">
+              <a:schemeClr val="lt1"/>
+            </a:fontRef>
+          </p:style>
+          <p:txBody>
+            <a:bodyPr rtlCol="0" anchor="ctr"/>
+            <a:lstStyle/>
+            <a:p>
+              <a:pPr algn="ctr"/>
+              <a:endParaRPr lang="en-SG"/>
+            </a:p>
+          </p:txBody>
+        </p:sp>
+      </p:grpSp>
+      <p:sp>
+        <p:nvSpPr>
+          <p:cNvPr id="24" name="Freeform 23"/>
+          <p:cNvSpPr/>
+          <p:nvPr/>
+        </p:nvSpPr>
+        <p:spPr>
+          <a:xfrm>
+            <a:off x="2747963" y="5762625"/>
+            <a:ext cx="333375" cy="254793"/>
+          </a:xfrm>
+          <a:custGeom>
+            <a:avLst/>
+            <a:gdLst>
+              <a:gd name="connsiteX0" fmla="*/ 0 w 357187"/>
+              <a:gd name="connsiteY0" fmla="*/ 104775 h 180975"/>
+              <a:gd name="connsiteX1" fmla="*/ 104775 w 357187"/>
+              <a:gd name="connsiteY1" fmla="*/ 0 h 180975"/>
+              <a:gd name="connsiteX2" fmla="*/ 357187 w 357187"/>
+              <a:gd name="connsiteY2" fmla="*/ 180975 h 180975"/>
+              <a:gd name="connsiteX0" fmla="*/ 0 w 333375"/>
+              <a:gd name="connsiteY0" fmla="*/ 104775 h 254793"/>
+              <a:gd name="connsiteX1" fmla="*/ 104775 w 333375"/>
+              <a:gd name="connsiteY1" fmla="*/ 0 h 254793"/>
+              <a:gd name="connsiteX2" fmla="*/ 333375 w 333375"/>
+              <a:gd name="connsiteY2" fmla="*/ 254793 h 254793"/>
+            </a:gdLst>
+            <a:ahLst/>
+            <a:cxnLst>
+              <a:cxn ang="0">
+                <a:pos x="connsiteX0" y="connsiteY0"/>
+              </a:cxn>
+              <a:cxn ang="0">
+                <a:pos x="connsiteX1" y="connsiteY1"/>
+              </a:cxn>
+              <a:cxn ang="0">
+                <a:pos x="connsiteX2" y="connsiteY2"/>
+              </a:cxn>
+            </a:cxnLst>
+            <a:rect l="l" t="t" r="r" b="b"/>
+            <a:pathLst>
+              <a:path w="333375" h="254793">
+                <a:moveTo>
+                  <a:pt x="0" y="104775"/>
+                </a:moveTo>
+                <a:lnTo>
+                  <a:pt x="104775" y="0"/>
+                </a:lnTo>
+                <a:lnTo>
+                  <a:pt x="333375" y="254793"/>
+                </a:lnTo>
+              </a:path>
+            </a:pathLst>
+          </a:custGeom>
+          <a:noFill/>
+          <a:ln w="38100">
+            <a:solidFill>
+              <a:srgbClr val="0070C0"/>
+            </a:solidFill>
+          </a:ln>
+        </p:spPr>
+        <p:style>
+          <a:lnRef idx="2">
+            <a:schemeClr val="accent1">
+              <a:shade val="50000"/>
+            </a:schemeClr>
+          </a:lnRef>
+          <a:fillRef idx="1">
+            <a:schemeClr val="accent1"/>
+          </a:fillRef>
+          <a:effectRef idx="0">
+            <a:schemeClr val="accent1"/>
+          </a:effectRef>
+          <a:fontRef idx="minor">
+            <a:schemeClr val="lt1"/>
+          </a:fontRef>
+        </p:style>
+        <p:txBody>
+          <a:bodyPr rtlCol="0" anchor="ctr"/>
+          <a:lstStyle/>
+          <a:p>
+            <a:pPr algn="ctr"/>
+            <a:endParaRPr lang="en-SG"/>
+          </a:p>
+        </p:txBody>
+      </p:sp>
+      <p:sp>
+        <p:nvSpPr>
+          <p:cNvPr id="31" name="Freeform 30"/>
+          <p:cNvSpPr/>
+          <p:nvPr/>
+        </p:nvSpPr>
+        <p:spPr>
+          <a:xfrm>
+            <a:off x="2933701" y="5781675"/>
+            <a:ext cx="180974" cy="245269"/>
+          </a:xfrm>
+          <a:custGeom>
+            <a:avLst/>
+            <a:gdLst>
+              <a:gd name="connsiteX0" fmla="*/ 0 w 147637"/>
+              <a:gd name="connsiteY0" fmla="*/ 42863 h 171450"/>
+              <a:gd name="connsiteX1" fmla="*/ 57150 w 147637"/>
+              <a:gd name="connsiteY1" fmla="*/ 0 h 171450"/>
+              <a:gd name="connsiteX2" fmla="*/ 147637 w 147637"/>
+              <a:gd name="connsiteY2" fmla="*/ 28575 h 171450"/>
+              <a:gd name="connsiteX3" fmla="*/ 138112 w 147637"/>
+              <a:gd name="connsiteY3" fmla="*/ 171450 h 171450"/>
+              <a:gd name="connsiteX4" fmla="*/ 0 w 147637"/>
+              <a:gd name="connsiteY4" fmla="*/ 42863 h 171450"/>
+              <a:gd name="connsiteX0" fmla="*/ 0 w 180974"/>
+              <a:gd name="connsiteY0" fmla="*/ 45244 h 171450"/>
+              <a:gd name="connsiteX1" fmla="*/ 90487 w 180974"/>
+              <a:gd name="connsiteY1" fmla="*/ 0 h 171450"/>
+              <a:gd name="connsiteX2" fmla="*/ 180974 w 180974"/>
+              <a:gd name="connsiteY2" fmla="*/ 28575 h 171450"/>
+              <a:gd name="connsiteX3" fmla="*/ 171449 w 180974"/>
+              <a:gd name="connsiteY3" fmla="*/ 171450 h 171450"/>
+              <a:gd name="connsiteX4" fmla="*/ 0 w 180974"/>
+              <a:gd name="connsiteY4" fmla="*/ 45244 h 171450"/>
+              <a:gd name="connsiteX0" fmla="*/ 0 w 180974"/>
+              <a:gd name="connsiteY0" fmla="*/ 45244 h 245269"/>
+              <a:gd name="connsiteX1" fmla="*/ 90487 w 180974"/>
+              <a:gd name="connsiteY1" fmla="*/ 0 h 245269"/>
+              <a:gd name="connsiteX2" fmla="*/ 180974 w 180974"/>
+              <a:gd name="connsiteY2" fmla="*/ 28575 h 245269"/>
+              <a:gd name="connsiteX3" fmla="*/ 171449 w 180974"/>
+              <a:gd name="connsiteY3" fmla="*/ 245269 h 245269"/>
+              <a:gd name="connsiteX4" fmla="*/ 0 w 180974"/>
+              <a:gd name="connsiteY4" fmla="*/ 45244 h 245269"/>
+            </a:gdLst>
+            <a:ahLst/>
+            <a:cxnLst>
+              <a:cxn ang="0">
+                <a:pos x="connsiteX0" y="connsiteY0"/>
+              </a:cxn>
+              <a:cxn ang="0">
+                <a:pos x="connsiteX1" y="connsiteY1"/>
+              </a:cxn>
+              <a:cxn ang="0">
+                <a:pos x="connsiteX2" y="connsiteY2"/>
+              </a:cxn>
+              <a:cxn ang="0">
+                <a:pos x="connsiteX3" y="connsiteY3"/>
+              </a:cxn>
+              <a:cxn ang="0">
+                <a:pos x="connsiteX4" y="connsiteY4"/>
+              </a:cxn>
+            </a:cxnLst>
+            <a:rect l="l" t="t" r="r" b="b"/>
+            <a:pathLst>
+              <a:path w="180974" h="245269">
+                <a:moveTo>
+                  <a:pt x="0" y="45244"/>
+                </a:moveTo>
+                <a:lnTo>
+                  <a:pt x="90487" y="0"/>
+                </a:lnTo>
+                <a:lnTo>
+                  <a:pt x="180974" y="28575"/>
+                </a:lnTo>
+                <a:lnTo>
+                  <a:pt x="171449" y="245269"/>
+                </a:lnTo>
+                <a:lnTo>
+                  <a:pt x="0" y="45244"/>
+                </a:lnTo>
+                <a:close/>
+              </a:path>
+            </a:pathLst>
+          </a:custGeom>
+          <a:solidFill>
+            <a:srgbClr val="0070C0"/>
+          </a:solidFill>
+          <a:ln>
+            <a:solidFill>
+              <a:srgbClr val="0070C0"/>
+            </a:solidFill>
+          </a:ln>
+        </p:spPr>
+        <p:style>
+          <a:lnRef idx="2">
+            <a:schemeClr val="accent1">
+              <a:shade val="50000"/>
+            </a:schemeClr>
+          </a:lnRef>
+          <a:fillRef idx="1">
+            <a:schemeClr val="accent1"/>
+          </a:fillRef>
+          <a:effectRef idx="0">
+            <a:schemeClr val="accent1"/>
+          </a:effectRef>
+          <a:fontRef idx="minor">
+            <a:schemeClr val="lt1"/>
+          </a:fontRef>
+        </p:style>
+        <p:txBody>
+          <a:bodyPr rtlCol="0" anchor="ctr"/>
+          <a:lstStyle/>
+          <a:p>
+            <a:pPr algn="ctr"/>
+            <a:endParaRPr lang="en-SG"/>
+          </a:p>
+        </p:txBody>
+      </p:sp>
     </p:spTree>
     <p:extLst>
       <p:ext uri="{BB962C8B-B14F-4D97-AF65-F5344CB8AC3E}">

</xml_diff>

<commit_message>
Issue 278: Update icons for highlight bulletpoints  Update Issue 278  Status: Done
</commit_message>
<xml_diff>
--- a/doc/Icons.pptx
+++ b/doc/Icons.pptx
@@ -15,19 +15,19 @@
   <p:notesSz cx="6858000" cy="9144000"/>
   <p:embeddedFontLst>
     <p:embeddedFont>
+      <p:font typeface="Calibri" panose="020F0502020204030204" pitchFamily="34" charset="0"/>
+      <p:regular r:id="rId5"/>
+      <p:bold r:id="rId6"/>
+      <p:italic r:id="rId7"/>
+      <p:boldItalic r:id="rId8"/>
+    </p:embeddedFont>
+    <p:embeddedFont>
       <p:font typeface="Arial Black" panose="020B0A04020102020204" pitchFamily="34" charset="0"/>
-      <p:bold r:id="rId5"/>
+      <p:bold r:id="rId9"/>
     </p:embeddedFont>
     <p:embeddedFont>
       <p:font typeface="Rockwell Extra Bold" panose="02060903040505020403" pitchFamily="18" charset="0"/>
-      <p:bold r:id="rId6"/>
-    </p:embeddedFont>
-    <p:embeddedFont>
-      <p:font typeface="Calibri" panose="020F0502020204030204" pitchFamily="34" charset="0"/>
-      <p:regular r:id="rId7"/>
-      <p:bold r:id="rId8"/>
-      <p:italic r:id="rId9"/>
-      <p:boldItalic r:id="rId10"/>
+      <p:bold r:id="rId10"/>
     </p:embeddedFont>
   </p:embeddedFontLst>
   <p:defaultTextStyle>
@@ -210,7 +210,7 @@
           <a:p>
             <a:fld id="{6699ACB9-486C-4D62-A3A7-AF98E13EFDA3}" type="datetimeFigureOut">
               <a:rPr lang="en-US" smtClean="0"/>
-              <a:t>2/24/2014</a:t>
+              <a:t>3/29/2014</a:t>
             </a:fld>
             <a:endParaRPr lang="en-US"/>
           </a:p>
@@ -744,7 +744,7 @@
             <a:fld id="{1D8BD707-D9CF-40AE-B4C6-C98DA3205C09}" type="datetimeFigureOut">
               <a:rPr lang="en-US" smtClean="0"/>
               <a:pPr/>
-              <a:t>2/24/2014</a:t>
+              <a:t>3/29/2014</a:t>
             </a:fld>
             <a:endParaRPr lang="en-US"/>
           </a:p>
@@ -911,7 +911,7 @@
             <a:fld id="{1D8BD707-D9CF-40AE-B4C6-C98DA3205C09}" type="datetimeFigureOut">
               <a:rPr lang="en-US" smtClean="0"/>
               <a:pPr/>
-              <a:t>2/24/2014</a:t>
+              <a:t>3/29/2014</a:t>
             </a:fld>
             <a:endParaRPr lang="en-US"/>
           </a:p>
@@ -1088,7 +1088,7 @@
             <a:fld id="{1D8BD707-D9CF-40AE-B4C6-C98DA3205C09}" type="datetimeFigureOut">
               <a:rPr lang="en-US" smtClean="0"/>
               <a:pPr/>
-              <a:t>2/24/2014</a:t>
+              <a:t>3/29/2014</a:t>
             </a:fld>
             <a:endParaRPr lang="en-US"/>
           </a:p>
@@ -1255,7 +1255,7 @@
             <a:fld id="{1D8BD707-D9CF-40AE-B4C6-C98DA3205C09}" type="datetimeFigureOut">
               <a:rPr lang="en-US" smtClean="0"/>
               <a:pPr/>
-              <a:t>2/24/2014</a:t>
+              <a:t>3/29/2014</a:t>
             </a:fld>
             <a:endParaRPr lang="en-US"/>
           </a:p>
@@ -1498,7 +1498,7 @@
             <a:fld id="{1D8BD707-D9CF-40AE-B4C6-C98DA3205C09}" type="datetimeFigureOut">
               <a:rPr lang="en-US" smtClean="0"/>
               <a:pPr/>
-              <a:t>2/24/2014</a:t>
+              <a:t>3/29/2014</a:t>
             </a:fld>
             <a:endParaRPr lang="en-US"/>
           </a:p>
@@ -1783,7 +1783,7 @@
             <a:fld id="{1D8BD707-D9CF-40AE-B4C6-C98DA3205C09}" type="datetimeFigureOut">
               <a:rPr lang="en-US" smtClean="0"/>
               <a:pPr/>
-              <a:t>2/24/2014</a:t>
+              <a:t>3/29/2014</a:t>
             </a:fld>
             <a:endParaRPr lang="en-US"/>
           </a:p>
@@ -2202,7 +2202,7 @@
             <a:fld id="{1D8BD707-D9CF-40AE-B4C6-C98DA3205C09}" type="datetimeFigureOut">
               <a:rPr lang="en-US" smtClean="0"/>
               <a:pPr/>
-              <a:t>2/24/2014</a:t>
+              <a:t>3/29/2014</a:t>
             </a:fld>
             <a:endParaRPr lang="en-US"/>
           </a:p>
@@ -2317,7 +2317,7 @@
             <a:fld id="{1D8BD707-D9CF-40AE-B4C6-C98DA3205C09}" type="datetimeFigureOut">
               <a:rPr lang="en-US" smtClean="0"/>
               <a:pPr/>
-              <a:t>2/24/2014</a:t>
+              <a:t>3/29/2014</a:t>
             </a:fld>
             <a:endParaRPr lang="en-US"/>
           </a:p>
@@ -2409,7 +2409,7 @@
             <a:fld id="{1D8BD707-D9CF-40AE-B4C6-C98DA3205C09}" type="datetimeFigureOut">
               <a:rPr lang="en-US" smtClean="0"/>
               <a:pPr/>
-              <a:t>2/24/2014</a:t>
+              <a:t>3/29/2014</a:t>
             </a:fld>
             <a:endParaRPr lang="en-US"/>
           </a:p>
@@ -2683,7 +2683,7 @@
             <a:fld id="{1D8BD707-D9CF-40AE-B4C6-C98DA3205C09}" type="datetimeFigureOut">
               <a:rPr lang="en-US" smtClean="0"/>
               <a:pPr/>
-              <a:t>2/24/2014</a:t>
+              <a:t>3/29/2014</a:t>
             </a:fld>
             <a:endParaRPr lang="en-US"/>
           </a:p>
@@ -2933,7 +2933,7 @@
             <a:fld id="{1D8BD707-D9CF-40AE-B4C6-C98DA3205C09}" type="datetimeFigureOut">
               <a:rPr lang="en-US" smtClean="0"/>
               <a:pPr/>
-              <a:t>2/24/2014</a:t>
+              <a:t>3/29/2014</a:t>
             </a:fld>
             <a:endParaRPr lang="en-US"/>
           </a:p>
@@ -3143,7 +3143,7 @@
             <a:fld id="{1D8BD707-D9CF-40AE-B4C6-C98DA3205C09}" type="datetimeFigureOut">
               <a:rPr lang="en-US" smtClean="0"/>
               <a:pPr/>
-              <a:t>2/24/2014</a:t>
+              <a:t>3/29/2014</a:t>
             </a:fld>
             <a:endParaRPr lang="en-US"/>
           </a:p>
@@ -3768,7 +3768,7 @@
       </p:sp>
       <p:grpSp>
         <p:nvGrpSpPr>
-          <p:cNvPr id="101" name="Group 100"/>
+          <p:cNvPr id="44" name="Group 43"/>
           <p:cNvGrpSpPr/>
           <p:nvPr/>
         </p:nvGrpSpPr>
@@ -3780,420 +3780,388 @@
             <a:chExt cx="838200" cy="838200"/>
           </a:xfrm>
         </p:grpSpPr>
-        <p:sp>
-          <p:nvSpPr>
-            <p:cNvPr id="31" name="Rectangle 30"/>
-            <p:cNvSpPr/>
+        <p:grpSp>
+          <p:nvGrpSpPr>
+            <p:cNvPr id="29" name="Group 28"/>
+            <p:cNvGrpSpPr/>
             <p:nvPr/>
-          </p:nvSpPr>
-          <p:spPr>
+          </p:nvGrpSpPr>
+          <p:grpSpPr>
             <a:xfrm>
               <a:off x="3247174" y="2432490"/>
               <a:ext cx="741789" cy="559065"/>
+              <a:chOff x="3247174" y="2432490"/>
+              <a:chExt cx="741789" cy="559065"/>
             </a:xfrm>
-            <a:prstGeom prst="rect">
-              <a:avLst/>
-            </a:prstGeom>
-            <a:solidFill>
-              <a:schemeClr val="accent6"/>
-            </a:solidFill>
-            <a:ln>
-              <a:noFill/>
-            </a:ln>
-          </p:spPr>
-          <p:style>
-            <a:lnRef idx="2">
-              <a:schemeClr val="accent1">
-                <a:shade val="50000"/>
-              </a:schemeClr>
-            </a:lnRef>
-            <a:fillRef idx="1">
-              <a:schemeClr val="accent1"/>
-            </a:fillRef>
-            <a:effectRef idx="0">
-              <a:schemeClr val="accent1"/>
-            </a:effectRef>
-            <a:fontRef idx="minor">
-              <a:schemeClr val="lt1"/>
-            </a:fontRef>
-          </p:style>
-          <p:txBody>
-            <a:bodyPr rtlCol="0" anchor="ctr"/>
-            <a:lstStyle/>
-            <a:p>
-              <a:pPr algn="ctr"/>
-              <a:endParaRPr lang="en-US"/>
-            </a:p>
-          </p:txBody>
-        </p:sp>
-        <p:sp>
-          <p:nvSpPr>
-            <p:cNvPr id="32" name="Rounded Rectangle 31"/>
-            <p:cNvSpPr/>
-            <p:nvPr/>
-          </p:nvSpPr>
-          <p:spPr>
-            <a:xfrm>
-              <a:off x="3483859" y="2494280"/>
-              <a:ext cx="408850" cy="64353"/>
-            </a:xfrm>
-            <a:prstGeom prst="roundRect">
-              <a:avLst/>
-            </a:prstGeom>
-            <a:solidFill>
-              <a:schemeClr val="bg1"/>
-            </a:solidFill>
-            <a:ln>
-              <a:noFill/>
-            </a:ln>
-          </p:spPr>
-          <p:style>
-            <a:lnRef idx="2">
-              <a:schemeClr val="accent1">
-                <a:shade val="50000"/>
-              </a:schemeClr>
-            </a:lnRef>
-            <a:fillRef idx="1">
-              <a:schemeClr val="accent1"/>
-            </a:fillRef>
-            <a:effectRef idx="0">
-              <a:schemeClr val="accent1"/>
-            </a:effectRef>
-            <a:fontRef idx="minor">
-              <a:schemeClr val="lt1"/>
-            </a:fontRef>
-          </p:style>
-          <p:txBody>
-            <a:bodyPr rtlCol="0" anchor="ctr"/>
-            <a:lstStyle/>
-            <a:p>
-              <a:pPr algn="ctr"/>
-              <a:endParaRPr lang="en-US"/>
-            </a:p>
-          </p:txBody>
-        </p:sp>
-        <p:sp>
-          <p:nvSpPr>
-            <p:cNvPr id="33" name="Rounded Rectangle 32"/>
-            <p:cNvSpPr/>
-            <p:nvPr/>
-          </p:nvSpPr>
-          <p:spPr>
-            <a:xfrm>
-              <a:off x="3370502" y="2494280"/>
-              <a:ext cx="51086" cy="64353"/>
-            </a:xfrm>
-            <a:prstGeom prst="roundRect">
-              <a:avLst/>
-            </a:prstGeom>
-            <a:solidFill>
-              <a:schemeClr val="bg1"/>
-            </a:solidFill>
-            <a:ln>
-              <a:noFill/>
-            </a:ln>
-          </p:spPr>
-          <p:style>
-            <a:lnRef idx="2">
-              <a:schemeClr val="accent1">
-                <a:shade val="50000"/>
-              </a:schemeClr>
-            </a:lnRef>
-            <a:fillRef idx="1">
-              <a:schemeClr val="accent1"/>
-            </a:fillRef>
-            <a:effectRef idx="0">
-              <a:schemeClr val="accent1"/>
-            </a:effectRef>
-            <a:fontRef idx="minor">
-              <a:schemeClr val="lt1"/>
-            </a:fontRef>
-          </p:style>
-          <p:txBody>
-            <a:bodyPr rtlCol="0" anchor="ctr"/>
-            <a:lstStyle/>
-            <a:p>
-              <a:pPr algn="ctr"/>
-              <a:endParaRPr lang="en-US"/>
-            </a:p>
-          </p:txBody>
-        </p:sp>
-        <p:sp>
-          <p:nvSpPr>
-            <p:cNvPr id="34" name="Rounded Rectangle 33"/>
-            <p:cNvSpPr/>
-            <p:nvPr/>
-          </p:nvSpPr>
-          <p:spPr>
-            <a:xfrm>
-              <a:off x="3483859" y="2622986"/>
-              <a:ext cx="408850" cy="64353"/>
-            </a:xfrm>
-            <a:prstGeom prst="roundRect">
-              <a:avLst/>
-            </a:prstGeom>
-            <a:solidFill>
-              <a:schemeClr val="bg1"/>
-            </a:solidFill>
-            <a:ln>
-              <a:noFill/>
-            </a:ln>
-          </p:spPr>
-          <p:style>
-            <a:lnRef idx="2">
-              <a:schemeClr val="accent1">
-                <a:shade val="50000"/>
-              </a:schemeClr>
-            </a:lnRef>
-            <a:fillRef idx="1">
-              <a:schemeClr val="accent1"/>
-            </a:fillRef>
-            <a:effectRef idx="0">
-              <a:schemeClr val="accent1"/>
-            </a:effectRef>
-            <a:fontRef idx="minor">
-              <a:schemeClr val="lt1"/>
-            </a:fontRef>
-          </p:style>
-          <p:txBody>
-            <a:bodyPr rtlCol="0" anchor="ctr"/>
-            <a:lstStyle/>
-            <a:p>
-              <a:pPr algn="ctr"/>
-              <a:endParaRPr lang="en-US"/>
-            </a:p>
-          </p:txBody>
-        </p:sp>
-        <p:sp>
-          <p:nvSpPr>
-            <p:cNvPr id="35" name="Rounded Rectangle 34"/>
-            <p:cNvSpPr/>
-            <p:nvPr/>
-          </p:nvSpPr>
-          <p:spPr>
-            <a:xfrm>
-              <a:off x="3370502" y="2622986"/>
-              <a:ext cx="51086" cy="64353"/>
-            </a:xfrm>
-            <a:prstGeom prst="roundRect">
-              <a:avLst/>
-            </a:prstGeom>
-            <a:solidFill>
-              <a:schemeClr val="bg1"/>
-            </a:solidFill>
-            <a:ln>
-              <a:noFill/>
-            </a:ln>
-          </p:spPr>
-          <p:style>
-            <a:lnRef idx="2">
-              <a:schemeClr val="accent1">
-                <a:shade val="50000"/>
-              </a:schemeClr>
-            </a:lnRef>
-            <a:fillRef idx="1">
-              <a:schemeClr val="accent1"/>
-            </a:fillRef>
-            <a:effectRef idx="0">
-              <a:schemeClr val="accent1"/>
-            </a:effectRef>
-            <a:fontRef idx="minor">
-              <a:schemeClr val="lt1"/>
-            </a:fontRef>
-          </p:style>
-          <p:txBody>
-            <a:bodyPr rtlCol="0" anchor="ctr"/>
-            <a:lstStyle/>
-            <a:p>
-              <a:pPr algn="ctr"/>
-              <a:endParaRPr lang="en-US"/>
-            </a:p>
-          </p:txBody>
-        </p:sp>
-        <p:sp>
-          <p:nvSpPr>
-            <p:cNvPr id="36" name="Rounded Rectangle 35"/>
-            <p:cNvSpPr/>
-            <p:nvPr/>
-          </p:nvSpPr>
-          <p:spPr>
-            <a:xfrm>
-              <a:off x="3487068" y="2751692"/>
-              <a:ext cx="408850" cy="64353"/>
-            </a:xfrm>
-            <a:prstGeom prst="roundRect">
-              <a:avLst/>
-            </a:prstGeom>
-            <a:solidFill>
-              <a:srgbClr val="0070C0"/>
-            </a:solidFill>
-            <a:ln>
-              <a:noFill/>
-            </a:ln>
-          </p:spPr>
-          <p:style>
-            <a:lnRef idx="2">
-              <a:schemeClr val="accent1">
-                <a:shade val="50000"/>
-              </a:schemeClr>
-            </a:lnRef>
-            <a:fillRef idx="1">
-              <a:schemeClr val="accent1"/>
-            </a:fillRef>
-            <a:effectRef idx="0">
-              <a:schemeClr val="accent1"/>
-            </a:effectRef>
-            <a:fontRef idx="minor">
-              <a:schemeClr val="lt1"/>
-            </a:fontRef>
-          </p:style>
-          <p:txBody>
-            <a:bodyPr rtlCol="0" anchor="ctr"/>
-            <a:lstStyle/>
-            <a:p>
-              <a:pPr algn="ctr"/>
-              <a:endParaRPr lang="en-US"/>
-            </a:p>
-          </p:txBody>
-        </p:sp>
-        <p:sp>
-          <p:nvSpPr>
-            <p:cNvPr id="37" name="Rounded Rectangle 36"/>
-            <p:cNvSpPr/>
-            <p:nvPr/>
-          </p:nvSpPr>
-          <p:spPr>
-            <a:xfrm>
-              <a:off x="3373711" y="2751692"/>
-              <a:ext cx="51086" cy="64353"/>
-            </a:xfrm>
-            <a:prstGeom prst="roundRect">
-              <a:avLst/>
-            </a:prstGeom>
-            <a:solidFill>
-              <a:srgbClr val="0070C0"/>
-            </a:solidFill>
-            <a:ln>
-              <a:noFill/>
-            </a:ln>
-          </p:spPr>
-          <p:style>
-            <a:lnRef idx="2">
-              <a:schemeClr val="accent1">
-                <a:shade val="50000"/>
-              </a:schemeClr>
-            </a:lnRef>
-            <a:fillRef idx="1">
-              <a:schemeClr val="accent1"/>
-            </a:fillRef>
-            <a:effectRef idx="0">
-              <a:schemeClr val="accent1"/>
-            </a:effectRef>
-            <a:fontRef idx="minor">
-              <a:schemeClr val="lt1"/>
-            </a:fontRef>
-          </p:style>
-          <p:txBody>
-            <a:bodyPr rtlCol="0" anchor="ctr"/>
-            <a:lstStyle/>
-            <a:p>
-              <a:pPr algn="ctr"/>
-              <a:endParaRPr lang="en-US"/>
-            </a:p>
-          </p:txBody>
-        </p:sp>
-        <p:sp>
-          <p:nvSpPr>
-            <p:cNvPr id="38" name="Rounded Rectangle 37"/>
-            <p:cNvSpPr/>
-            <p:nvPr/>
-          </p:nvSpPr>
-          <p:spPr>
-            <a:xfrm>
-              <a:off x="3486723" y="2880398"/>
-              <a:ext cx="408850" cy="64353"/>
-            </a:xfrm>
-            <a:prstGeom prst="roundRect">
-              <a:avLst/>
-            </a:prstGeom>
-            <a:solidFill>
-              <a:schemeClr val="bg1"/>
-            </a:solidFill>
-            <a:ln>
-              <a:noFill/>
-            </a:ln>
-          </p:spPr>
-          <p:style>
-            <a:lnRef idx="2">
-              <a:schemeClr val="accent1">
-                <a:shade val="50000"/>
-              </a:schemeClr>
-            </a:lnRef>
-            <a:fillRef idx="1">
-              <a:schemeClr val="accent1"/>
-            </a:fillRef>
-            <a:effectRef idx="0">
-              <a:schemeClr val="accent1"/>
-            </a:effectRef>
-            <a:fontRef idx="minor">
-              <a:schemeClr val="lt1"/>
-            </a:fontRef>
-          </p:style>
-          <p:txBody>
-            <a:bodyPr rtlCol="0" anchor="ctr"/>
-            <a:lstStyle/>
-            <a:p>
-              <a:pPr algn="ctr"/>
-              <a:endParaRPr lang="en-US"/>
-            </a:p>
-          </p:txBody>
-        </p:sp>
-        <p:sp>
-          <p:nvSpPr>
-            <p:cNvPr id="39" name="Rounded Rectangle 38"/>
-            <p:cNvSpPr/>
-            <p:nvPr/>
-          </p:nvSpPr>
-          <p:spPr>
-            <a:xfrm>
-              <a:off x="3373366" y="2880398"/>
-              <a:ext cx="51086" cy="64353"/>
-            </a:xfrm>
-            <a:prstGeom prst="roundRect">
-              <a:avLst/>
-            </a:prstGeom>
-            <a:solidFill>
-              <a:schemeClr val="bg1"/>
-            </a:solidFill>
-            <a:ln>
-              <a:noFill/>
-            </a:ln>
-          </p:spPr>
-          <p:style>
-            <a:lnRef idx="2">
-              <a:schemeClr val="accent1">
-                <a:shade val="50000"/>
-              </a:schemeClr>
-            </a:lnRef>
-            <a:fillRef idx="1">
-              <a:schemeClr val="accent1"/>
-            </a:fillRef>
-            <a:effectRef idx="0">
-              <a:schemeClr val="accent1"/>
-            </a:effectRef>
-            <a:fontRef idx="minor">
-              <a:schemeClr val="lt1"/>
-            </a:fontRef>
-          </p:style>
-          <p:txBody>
-            <a:bodyPr rtlCol="0" anchor="ctr"/>
-            <a:lstStyle/>
-            <a:p>
-              <a:pPr algn="ctr"/>
-              <a:endParaRPr lang="en-US"/>
-            </a:p>
-          </p:txBody>
-        </p:sp>
+          </p:grpSpPr>
+          <p:sp>
+            <p:nvSpPr>
+              <p:cNvPr id="31" name="Rectangle 30"/>
+              <p:cNvSpPr/>
+              <p:nvPr/>
+            </p:nvSpPr>
+            <p:spPr>
+              <a:xfrm>
+                <a:off x="3247174" y="2432490"/>
+                <a:ext cx="741789" cy="559065"/>
+              </a:xfrm>
+              <a:prstGeom prst="rect">
+                <a:avLst/>
+              </a:prstGeom>
+              <a:solidFill>
+                <a:schemeClr val="accent6"/>
+              </a:solidFill>
+              <a:ln>
+                <a:noFill/>
+              </a:ln>
+            </p:spPr>
+            <p:style>
+              <a:lnRef idx="2">
+                <a:schemeClr val="accent1">
+                  <a:shade val="50000"/>
+                </a:schemeClr>
+              </a:lnRef>
+              <a:fillRef idx="1">
+                <a:schemeClr val="accent1"/>
+              </a:fillRef>
+              <a:effectRef idx="0">
+                <a:schemeClr val="accent1"/>
+              </a:effectRef>
+              <a:fontRef idx="minor">
+                <a:schemeClr val="lt1"/>
+              </a:fontRef>
+            </p:style>
+            <p:txBody>
+              <a:bodyPr rtlCol="0" anchor="ctr"/>
+              <a:lstStyle/>
+              <a:p>
+                <a:pPr algn="ctr"/>
+                <a:endParaRPr lang="en-US"/>
+              </a:p>
+            </p:txBody>
+          </p:sp>
+          <p:grpSp>
+            <p:nvGrpSpPr>
+              <p:cNvPr id="18" name="Group 17"/>
+              <p:cNvGrpSpPr/>
+              <p:nvPr/>
+            </p:nvGrpSpPr>
+            <p:grpSpPr>
+              <a:xfrm>
+                <a:off x="3370502" y="2506571"/>
+                <a:ext cx="522207" cy="77867"/>
+                <a:chOff x="3370502" y="2487523"/>
+                <a:chExt cx="522207" cy="77867"/>
+              </a:xfrm>
+            </p:grpSpPr>
+            <p:sp>
+              <p:nvSpPr>
+                <p:cNvPr id="32" name="Rounded Rectangle 31"/>
+                <p:cNvSpPr/>
+                <p:nvPr/>
+              </p:nvSpPr>
+              <p:spPr>
+                <a:xfrm>
+                  <a:off x="3483859" y="2487523"/>
+                  <a:ext cx="408850" cy="77867"/>
+                </a:xfrm>
+                <a:prstGeom prst="roundRect">
+                  <a:avLst/>
+                </a:prstGeom>
+                <a:solidFill>
+                  <a:schemeClr val="bg1"/>
+                </a:solidFill>
+                <a:ln>
+                  <a:noFill/>
+                </a:ln>
+              </p:spPr>
+              <p:style>
+                <a:lnRef idx="2">
+                  <a:schemeClr val="accent1">
+                    <a:shade val="50000"/>
+                  </a:schemeClr>
+                </a:lnRef>
+                <a:fillRef idx="1">
+                  <a:schemeClr val="accent1"/>
+                </a:fillRef>
+                <a:effectRef idx="0">
+                  <a:schemeClr val="accent1"/>
+                </a:effectRef>
+                <a:fontRef idx="minor">
+                  <a:schemeClr val="lt1"/>
+                </a:fontRef>
+              </p:style>
+              <p:txBody>
+                <a:bodyPr rtlCol="0" anchor="ctr"/>
+                <a:lstStyle/>
+                <a:p>
+                  <a:pPr algn="ctr"/>
+                  <a:endParaRPr lang="en-US"/>
+                </a:p>
+              </p:txBody>
+            </p:sp>
+            <p:sp>
+              <p:nvSpPr>
+                <p:cNvPr id="33" name="Rounded Rectangle 32"/>
+                <p:cNvSpPr/>
+                <p:nvPr/>
+              </p:nvSpPr>
+              <p:spPr>
+                <a:xfrm>
+                  <a:off x="3370502" y="2487523"/>
+                  <a:ext cx="51086" cy="77867"/>
+                </a:xfrm>
+                <a:prstGeom prst="roundRect">
+                  <a:avLst/>
+                </a:prstGeom>
+                <a:solidFill>
+                  <a:schemeClr val="bg1"/>
+                </a:solidFill>
+                <a:ln>
+                  <a:noFill/>
+                </a:ln>
+              </p:spPr>
+              <p:style>
+                <a:lnRef idx="2">
+                  <a:schemeClr val="accent1">
+                    <a:shade val="50000"/>
+                  </a:schemeClr>
+                </a:lnRef>
+                <a:fillRef idx="1">
+                  <a:schemeClr val="accent1"/>
+                </a:fillRef>
+                <a:effectRef idx="0">
+                  <a:schemeClr val="accent1"/>
+                </a:effectRef>
+                <a:fontRef idx="minor">
+                  <a:schemeClr val="lt1"/>
+                </a:fontRef>
+              </p:style>
+              <p:txBody>
+                <a:bodyPr rtlCol="0" anchor="ctr"/>
+                <a:lstStyle/>
+                <a:p>
+                  <a:pPr algn="ctr"/>
+                  <a:endParaRPr lang="en-US"/>
+                </a:p>
+              </p:txBody>
+            </p:sp>
+          </p:grpSp>
+          <p:grpSp>
+            <p:nvGrpSpPr>
+              <p:cNvPr id="19" name="Group 18"/>
+              <p:cNvGrpSpPr/>
+              <p:nvPr/>
+            </p:nvGrpSpPr>
+            <p:grpSpPr>
+              <a:xfrm>
+                <a:off x="3373711" y="2675643"/>
+                <a:ext cx="522207" cy="87744"/>
+                <a:chOff x="3373711" y="2739996"/>
+                <a:chExt cx="522207" cy="87744"/>
+              </a:xfrm>
+            </p:grpSpPr>
+            <p:sp>
+              <p:nvSpPr>
+                <p:cNvPr id="36" name="Rounded Rectangle 35"/>
+                <p:cNvSpPr/>
+                <p:nvPr/>
+              </p:nvSpPr>
+              <p:spPr>
+                <a:xfrm>
+                  <a:off x="3487068" y="2739996"/>
+                  <a:ext cx="408850" cy="87744"/>
+                </a:xfrm>
+                <a:prstGeom prst="roundRect">
+                  <a:avLst/>
+                </a:prstGeom>
+                <a:solidFill>
+                  <a:srgbClr val="0070C0"/>
+                </a:solidFill>
+                <a:ln>
+                  <a:noFill/>
+                </a:ln>
+              </p:spPr>
+              <p:style>
+                <a:lnRef idx="2">
+                  <a:schemeClr val="accent1">
+                    <a:shade val="50000"/>
+                  </a:schemeClr>
+                </a:lnRef>
+                <a:fillRef idx="1">
+                  <a:schemeClr val="accent1"/>
+                </a:fillRef>
+                <a:effectRef idx="0">
+                  <a:schemeClr val="accent1"/>
+                </a:effectRef>
+                <a:fontRef idx="minor">
+                  <a:schemeClr val="lt1"/>
+                </a:fontRef>
+              </p:style>
+              <p:txBody>
+                <a:bodyPr rtlCol="0" anchor="ctr"/>
+                <a:lstStyle/>
+                <a:p>
+                  <a:pPr algn="ctr"/>
+                  <a:endParaRPr lang="en-US"/>
+                </a:p>
+              </p:txBody>
+            </p:sp>
+            <p:sp>
+              <p:nvSpPr>
+                <p:cNvPr id="37" name="Rounded Rectangle 36"/>
+                <p:cNvSpPr/>
+                <p:nvPr/>
+              </p:nvSpPr>
+              <p:spPr>
+                <a:xfrm>
+                  <a:off x="3373711" y="2739996"/>
+                  <a:ext cx="51086" cy="87744"/>
+                </a:xfrm>
+                <a:prstGeom prst="roundRect">
+                  <a:avLst/>
+                </a:prstGeom>
+                <a:solidFill>
+                  <a:srgbClr val="0070C0"/>
+                </a:solidFill>
+                <a:ln>
+                  <a:noFill/>
+                </a:ln>
+              </p:spPr>
+              <p:style>
+                <a:lnRef idx="2">
+                  <a:schemeClr val="accent1">
+                    <a:shade val="50000"/>
+                  </a:schemeClr>
+                </a:lnRef>
+                <a:fillRef idx="1">
+                  <a:schemeClr val="accent1"/>
+                </a:fillRef>
+                <a:effectRef idx="0">
+                  <a:schemeClr val="accent1"/>
+                </a:effectRef>
+                <a:fontRef idx="minor">
+                  <a:schemeClr val="lt1"/>
+                </a:fontRef>
+              </p:style>
+              <p:txBody>
+                <a:bodyPr rtlCol="0" anchor="ctr"/>
+                <a:lstStyle/>
+                <a:p>
+                  <a:pPr algn="ctr"/>
+                  <a:endParaRPr lang="en-US"/>
+                </a:p>
+              </p:txBody>
+            </p:sp>
+          </p:grpSp>
+          <p:grpSp>
+            <p:nvGrpSpPr>
+              <p:cNvPr id="27" name="Group 26"/>
+              <p:cNvGrpSpPr/>
+              <p:nvPr/>
+            </p:nvGrpSpPr>
+            <p:grpSpPr>
+              <a:xfrm>
+                <a:off x="3373366" y="2854593"/>
+                <a:ext cx="522207" cy="77867"/>
+                <a:chOff x="3373366" y="2873641"/>
+                <a:chExt cx="522207" cy="77867"/>
+              </a:xfrm>
+            </p:grpSpPr>
+            <p:sp>
+              <p:nvSpPr>
+                <p:cNvPr id="38" name="Rounded Rectangle 37"/>
+                <p:cNvSpPr/>
+                <p:nvPr/>
+              </p:nvSpPr>
+              <p:spPr>
+                <a:xfrm>
+                  <a:off x="3486723" y="2873641"/>
+                  <a:ext cx="408850" cy="77867"/>
+                </a:xfrm>
+                <a:prstGeom prst="roundRect">
+                  <a:avLst/>
+                </a:prstGeom>
+                <a:solidFill>
+                  <a:schemeClr val="bg1"/>
+                </a:solidFill>
+                <a:ln>
+                  <a:noFill/>
+                </a:ln>
+              </p:spPr>
+              <p:style>
+                <a:lnRef idx="2">
+                  <a:schemeClr val="accent1">
+                    <a:shade val="50000"/>
+                  </a:schemeClr>
+                </a:lnRef>
+                <a:fillRef idx="1">
+                  <a:schemeClr val="accent1"/>
+                </a:fillRef>
+                <a:effectRef idx="0">
+                  <a:schemeClr val="accent1"/>
+                </a:effectRef>
+                <a:fontRef idx="minor">
+                  <a:schemeClr val="lt1"/>
+                </a:fontRef>
+              </p:style>
+              <p:txBody>
+                <a:bodyPr rtlCol="0" anchor="ctr"/>
+                <a:lstStyle/>
+                <a:p>
+                  <a:pPr algn="ctr"/>
+                  <a:endParaRPr lang="en-US"/>
+                </a:p>
+              </p:txBody>
+            </p:sp>
+            <p:sp>
+              <p:nvSpPr>
+                <p:cNvPr id="39" name="Rounded Rectangle 38"/>
+                <p:cNvSpPr/>
+                <p:nvPr/>
+              </p:nvSpPr>
+              <p:spPr>
+                <a:xfrm>
+                  <a:off x="3373366" y="2873641"/>
+                  <a:ext cx="51086" cy="77867"/>
+                </a:xfrm>
+                <a:prstGeom prst="roundRect">
+                  <a:avLst/>
+                </a:prstGeom>
+                <a:solidFill>
+                  <a:schemeClr val="bg1"/>
+                </a:solidFill>
+                <a:ln>
+                  <a:noFill/>
+                </a:ln>
+              </p:spPr>
+              <p:style>
+                <a:lnRef idx="2">
+                  <a:schemeClr val="accent1">
+                    <a:shade val="50000"/>
+                  </a:schemeClr>
+                </a:lnRef>
+                <a:fillRef idx="1">
+                  <a:schemeClr val="accent1"/>
+                </a:fillRef>
+                <a:effectRef idx="0">
+                  <a:schemeClr val="accent1"/>
+                </a:effectRef>
+                <a:fontRef idx="minor">
+                  <a:schemeClr val="lt1"/>
+                </a:fontRef>
+              </p:style>
+              <p:txBody>
+                <a:bodyPr rtlCol="0" anchor="ctr"/>
+                <a:lstStyle/>
+                <a:p>
+                  <a:pPr algn="ctr"/>
+                  <a:endParaRPr lang="en-US"/>
+                </a:p>
+              </p:txBody>
+            </p:sp>
+          </p:grpSp>
+        </p:grpSp>
         <p:sp>
           <p:nvSpPr>
             <p:cNvPr id="50" name="Rectangle 49"/>
@@ -9907,6 +9875,492 @@
           </p:txBody>
         </p:sp>
       </p:grpSp>
+      <p:grpSp>
+        <p:nvGrpSpPr>
+          <p:cNvPr id="54" name="Group 53"/>
+          <p:cNvGrpSpPr/>
+          <p:nvPr/>
+        </p:nvGrpSpPr>
+        <p:grpSpPr>
+          <a:xfrm>
+            <a:off x="3187290" y="1107035"/>
+            <a:ext cx="838200" cy="838200"/>
+            <a:chOff x="3187290" y="1107035"/>
+            <a:chExt cx="838200" cy="838200"/>
+          </a:xfrm>
+        </p:grpSpPr>
+        <p:sp>
+          <p:nvSpPr>
+            <p:cNvPr id="174" name="Rectangle 173"/>
+            <p:cNvSpPr/>
+            <p:nvPr/>
+          </p:nvSpPr>
+          <p:spPr>
+            <a:xfrm>
+              <a:off x="3187290" y="1107035"/>
+              <a:ext cx="838200" cy="838200"/>
+            </a:xfrm>
+            <a:prstGeom prst="rect">
+              <a:avLst/>
+            </a:prstGeom>
+            <a:noFill/>
+            <a:ln>
+              <a:noFill/>
+            </a:ln>
+          </p:spPr>
+          <p:style>
+            <a:lnRef idx="2">
+              <a:schemeClr val="accent1">
+                <a:shade val="50000"/>
+              </a:schemeClr>
+            </a:lnRef>
+            <a:fillRef idx="1">
+              <a:schemeClr val="accent1"/>
+            </a:fillRef>
+            <a:effectRef idx="0">
+              <a:schemeClr val="accent1"/>
+            </a:effectRef>
+            <a:fontRef idx="minor">
+              <a:schemeClr val="lt1"/>
+            </a:fontRef>
+          </p:style>
+          <p:txBody>
+            <a:bodyPr rtlCol="0" anchor="ctr"/>
+            <a:lstStyle/>
+            <a:p>
+              <a:pPr algn="ctr"/>
+              <a:endParaRPr lang="en-SG"/>
+            </a:p>
+          </p:txBody>
+        </p:sp>
+        <p:grpSp>
+          <p:nvGrpSpPr>
+            <p:cNvPr id="52" name="Group 51"/>
+            <p:cNvGrpSpPr/>
+            <p:nvPr/>
+          </p:nvGrpSpPr>
+          <p:grpSpPr>
+            <a:xfrm>
+              <a:off x="3234064" y="1178480"/>
+              <a:ext cx="741789" cy="559065"/>
+              <a:chOff x="3234064" y="1178480"/>
+              <a:chExt cx="741789" cy="559065"/>
+            </a:xfrm>
+          </p:grpSpPr>
+          <p:sp>
+            <p:nvSpPr>
+              <p:cNvPr id="175" name="Rectangle 174"/>
+              <p:cNvSpPr/>
+              <p:nvPr/>
+            </p:nvSpPr>
+            <p:spPr>
+              <a:xfrm>
+                <a:off x="3234064" y="1178480"/>
+                <a:ext cx="741789" cy="559065"/>
+              </a:xfrm>
+              <a:prstGeom prst="rect">
+                <a:avLst/>
+              </a:prstGeom>
+              <a:solidFill>
+                <a:schemeClr val="accent6"/>
+              </a:solidFill>
+              <a:ln>
+                <a:noFill/>
+              </a:ln>
+            </p:spPr>
+            <p:style>
+              <a:lnRef idx="2">
+                <a:schemeClr val="accent1">
+                  <a:shade val="50000"/>
+                </a:schemeClr>
+              </a:lnRef>
+              <a:fillRef idx="1">
+                <a:schemeClr val="accent1"/>
+              </a:fillRef>
+              <a:effectRef idx="0">
+                <a:schemeClr val="accent1"/>
+              </a:effectRef>
+              <a:fontRef idx="minor">
+                <a:schemeClr val="lt1"/>
+              </a:fontRef>
+            </p:style>
+            <p:txBody>
+              <a:bodyPr rtlCol="0" anchor="ctr"/>
+              <a:lstStyle/>
+              <a:p>
+                <a:pPr algn="ctr"/>
+                <a:endParaRPr lang="en-US"/>
+              </a:p>
+            </p:txBody>
+          </p:sp>
+          <p:grpSp>
+            <p:nvGrpSpPr>
+              <p:cNvPr id="176" name="Group 175"/>
+              <p:cNvGrpSpPr/>
+              <p:nvPr/>
+            </p:nvGrpSpPr>
+            <p:grpSpPr>
+              <a:xfrm>
+                <a:off x="3357392" y="1259318"/>
+                <a:ext cx="522207" cy="64353"/>
+                <a:chOff x="3370502" y="2494280"/>
+                <a:chExt cx="522207" cy="64353"/>
+              </a:xfrm>
+            </p:grpSpPr>
+            <p:sp>
+              <p:nvSpPr>
+                <p:cNvPr id="183" name="Rounded Rectangle 182"/>
+                <p:cNvSpPr/>
+                <p:nvPr/>
+              </p:nvSpPr>
+              <p:spPr>
+                <a:xfrm>
+                  <a:off x="3483859" y="2494280"/>
+                  <a:ext cx="408850" cy="64353"/>
+                </a:xfrm>
+                <a:prstGeom prst="roundRect">
+                  <a:avLst/>
+                </a:prstGeom>
+                <a:solidFill>
+                  <a:schemeClr val="bg1"/>
+                </a:solidFill>
+                <a:ln>
+                  <a:noFill/>
+                </a:ln>
+              </p:spPr>
+              <p:style>
+                <a:lnRef idx="2">
+                  <a:schemeClr val="accent1">
+                    <a:shade val="50000"/>
+                  </a:schemeClr>
+                </a:lnRef>
+                <a:fillRef idx="1">
+                  <a:schemeClr val="accent1"/>
+                </a:fillRef>
+                <a:effectRef idx="0">
+                  <a:schemeClr val="accent1"/>
+                </a:effectRef>
+                <a:fontRef idx="minor">
+                  <a:schemeClr val="lt1"/>
+                </a:fontRef>
+              </p:style>
+              <p:txBody>
+                <a:bodyPr rtlCol="0" anchor="ctr"/>
+                <a:lstStyle/>
+                <a:p>
+                  <a:pPr algn="ctr"/>
+                  <a:endParaRPr lang="en-US"/>
+                </a:p>
+              </p:txBody>
+            </p:sp>
+            <p:sp>
+              <p:nvSpPr>
+                <p:cNvPr id="184" name="Rounded Rectangle 183"/>
+                <p:cNvSpPr/>
+                <p:nvPr/>
+              </p:nvSpPr>
+              <p:spPr>
+                <a:xfrm>
+                  <a:off x="3370502" y="2494280"/>
+                  <a:ext cx="51086" cy="64353"/>
+                </a:xfrm>
+                <a:prstGeom prst="roundRect">
+                  <a:avLst/>
+                </a:prstGeom>
+                <a:solidFill>
+                  <a:schemeClr val="bg1"/>
+                </a:solidFill>
+                <a:ln>
+                  <a:noFill/>
+                </a:ln>
+              </p:spPr>
+              <p:style>
+                <a:lnRef idx="2">
+                  <a:schemeClr val="accent1">
+                    <a:shade val="50000"/>
+                  </a:schemeClr>
+                </a:lnRef>
+                <a:fillRef idx="1">
+                  <a:schemeClr val="accent1"/>
+                </a:fillRef>
+                <a:effectRef idx="0">
+                  <a:schemeClr val="accent1"/>
+                </a:effectRef>
+                <a:fontRef idx="minor">
+                  <a:schemeClr val="lt1"/>
+                </a:fontRef>
+              </p:style>
+              <p:txBody>
+                <a:bodyPr rtlCol="0" anchor="ctr"/>
+                <a:lstStyle/>
+                <a:p>
+                  <a:pPr algn="ctr"/>
+                  <a:endParaRPr lang="en-US"/>
+                </a:p>
+              </p:txBody>
+            </p:sp>
+          </p:grpSp>
+          <p:grpSp>
+            <p:nvGrpSpPr>
+              <p:cNvPr id="178" name="Group 177"/>
+              <p:cNvGrpSpPr/>
+              <p:nvPr/>
+            </p:nvGrpSpPr>
+            <p:grpSpPr>
+              <a:xfrm>
+                <a:off x="3360256" y="1607340"/>
+                <a:ext cx="522207" cy="64353"/>
+                <a:chOff x="3373366" y="2880398"/>
+                <a:chExt cx="522207" cy="64353"/>
+              </a:xfrm>
+            </p:grpSpPr>
+            <p:sp>
+              <p:nvSpPr>
+                <p:cNvPr id="179" name="Rounded Rectangle 178"/>
+                <p:cNvSpPr/>
+                <p:nvPr/>
+              </p:nvSpPr>
+              <p:spPr>
+                <a:xfrm>
+                  <a:off x="3486723" y="2880398"/>
+                  <a:ext cx="408850" cy="64353"/>
+                </a:xfrm>
+                <a:prstGeom prst="roundRect">
+                  <a:avLst/>
+                </a:prstGeom>
+                <a:solidFill>
+                  <a:schemeClr val="bg1"/>
+                </a:solidFill>
+                <a:ln>
+                  <a:noFill/>
+                </a:ln>
+              </p:spPr>
+              <p:style>
+                <a:lnRef idx="2">
+                  <a:schemeClr val="accent1">
+                    <a:shade val="50000"/>
+                  </a:schemeClr>
+                </a:lnRef>
+                <a:fillRef idx="1">
+                  <a:schemeClr val="accent1"/>
+                </a:fillRef>
+                <a:effectRef idx="0">
+                  <a:schemeClr val="accent1"/>
+                </a:effectRef>
+                <a:fontRef idx="minor">
+                  <a:schemeClr val="lt1"/>
+                </a:fontRef>
+              </p:style>
+              <p:txBody>
+                <a:bodyPr rtlCol="0" anchor="ctr"/>
+                <a:lstStyle/>
+                <a:p>
+                  <a:pPr algn="ctr"/>
+                  <a:endParaRPr lang="en-US"/>
+                </a:p>
+              </p:txBody>
+            </p:sp>
+            <p:sp>
+              <p:nvSpPr>
+                <p:cNvPr id="180" name="Rounded Rectangle 179"/>
+                <p:cNvSpPr/>
+                <p:nvPr/>
+              </p:nvSpPr>
+              <p:spPr>
+                <a:xfrm>
+                  <a:off x="3373366" y="2880398"/>
+                  <a:ext cx="51086" cy="64353"/>
+                </a:xfrm>
+                <a:prstGeom prst="roundRect">
+                  <a:avLst/>
+                </a:prstGeom>
+                <a:solidFill>
+                  <a:schemeClr val="bg1"/>
+                </a:solidFill>
+                <a:ln>
+                  <a:noFill/>
+                </a:ln>
+              </p:spPr>
+              <p:style>
+                <a:lnRef idx="2">
+                  <a:schemeClr val="accent1">
+                    <a:shade val="50000"/>
+                  </a:schemeClr>
+                </a:lnRef>
+                <a:fillRef idx="1">
+                  <a:schemeClr val="accent1"/>
+                </a:fillRef>
+                <a:effectRef idx="0">
+                  <a:schemeClr val="accent1"/>
+                </a:effectRef>
+                <a:fontRef idx="minor">
+                  <a:schemeClr val="lt1"/>
+                </a:fontRef>
+              </p:style>
+              <p:txBody>
+                <a:bodyPr rtlCol="0" anchor="ctr"/>
+                <a:lstStyle/>
+                <a:p>
+                  <a:pPr algn="ctr"/>
+                  <a:endParaRPr lang="en-US"/>
+                </a:p>
+              </p:txBody>
+            </p:sp>
+          </p:grpSp>
+          <p:sp>
+            <p:nvSpPr>
+              <p:cNvPr id="45" name="Rectangle 44"/>
+              <p:cNvSpPr/>
+              <p:nvPr/>
+            </p:nvSpPr>
+            <p:spPr>
+              <a:xfrm>
+                <a:off x="3234064" y="1385222"/>
+                <a:ext cx="741789" cy="152818"/>
+              </a:xfrm>
+              <a:prstGeom prst="rect">
+                <a:avLst/>
+              </a:prstGeom>
+              <a:solidFill>
+                <a:srgbClr val="0070C0"/>
+              </a:solidFill>
+              <a:ln>
+                <a:noFill/>
+              </a:ln>
+            </p:spPr>
+            <p:style>
+              <a:lnRef idx="2">
+                <a:schemeClr val="accent1">
+                  <a:shade val="50000"/>
+                </a:schemeClr>
+              </a:lnRef>
+              <a:fillRef idx="1">
+                <a:schemeClr val="accent1"/>
+              </a:fillRef>
+              <a:effectRef idx="0">
+                <a:schemeClr val="accent1"/>
+              </a:effectRef>
+              <a:fontRef idx="minor">
+                <a:schemeClr val="lt1"/>
+              </a:fontRef>
+            </p:style>
+            <p:txBody>
+              <a:bodyPr rtlCol="0" anchor="ctr"/>
+              <a:lstStyle/>
+              <a:p>
+                <a:pPr algn="ctr"/>
+                <a:endParaRPr lang="en-SG"/>
+              </a:p>
+            </p:txBody>
+          </p:sp>
+          <p:grpSp>
+            <p:nvGrpSpPr>
+              <p:cNvPr id="177" name="Group 176"/>
+              <p:cNvGrpSpPr/>
+              <p:nvPr/>
+            </p:nvGrpSpPr>
+            <p:grpSpPr>
+              <a:xfrm>
+                <a:off x="3360601" y="1433329"/>
+                <a:ext cx="522207" cy="64353"/>
+                <a:chOff x="3373711" y="2751692"/>
+                <a:chExt cx="522207" cy="64353"/>
+              </a:xfrm>
+              <a:solidFill>
+                <a:schemeClr val="bg1"/>
+              </a:solidFill>
+            </p:grpSpPr>
+            <p:sp>
+              <p:nvSpPr>
+                <p:cNvPr id="181" name="Rounded Rectangle 180"/>
+                <p:cNvSpPr/>
+                <p:nvPr/>
+              </p:nvSpPr>
+              <p:spPr>
+                <a:xfrm>
+                  <a:off x="3487068" y="2751692"/>
+                  <a:ext cx="408850" cy="64353"/>
+                </a:xfrm>
+                <a:prstGeom prst="roundRect">
+                  <a:avLst/>
+                </a:prstGeom>
+                <a:grpFill/>
+                <a:ln>
+                  <a:noFill/>
+                </a:ln>
+              </p:spPr>
+              <p:style>
+                <a:lnRef idx="2">
+                  <a:schemeClr val="accent1">
+                    <a:shade val="50000"/>
+                  </a:schemeClr>
+                </a:lnRef>
+                <a:fillRef idx="1">
+                  <a:schemeClr val="accent1"/>
+                </a:fillRef>
+                <a:effectRef idx="0">
+                  <a:schemeClr val="accent1"/>
+                </a:effectRef>
+                <a:fontRef idx="minor">
+                  <a:schemeClr val="lt1"/>
+                </a:fontRef>
+              </p:style>
+              <p:txBody>
+                <a:bodyPr rtlCol="0" anchor="ctr"/>
+                <a:lstStyle/>
+                <a:p>
+                  <a:pPr algn="ctr"/>
+                  <a:endParaRPr lang="en-US"/>
+                </a:p>
+              </p:txBody>
+            </p:sp>
+            <p:sp>
+              <p:nvSpPr>
+                <p:cNvPr id="182" name="Rounded Rectangle 181"/>
+                <p:cNvSpPr/>
+                <p:nvPr/>
+              </p:nvSpPr>
+              <p:spPr>
+                <a:xfrm>
+                  <a:off x="3373711" y="2751692"/>
+                  <a:ext cx="51086" cy="64353"/>
+                </a:xfrm>
+                <a:prstGeom prst="roundRect">
+                  <a:avLst/>
+                </a:prstGeom>
+                <a:grpFill/>
+                <a:ln>
+                  <a:noFill/>
+                </a:ln>
+              </p:spPr>
+              <p:style>
+                <a:lnRef idx="2">
+                  <a:schemeClr val="accent1">
+                    <a:shade val="50000"/>
+                  </a:schemeClr>
+                </a:lnRef>
+                <a:fillRef idx="1">
+                  <a:schemeClr val="accent1"/>
+                </a:fillRef>
+                <a:effectRef idx="0">
+                  <a:schemeClr val="accent1"/>
+                </a:effectRef>
+                <a:fontRef idx="minor">
+                  <a:schemeClr val="lt1"/>
+                </a:fontRef>
+              </p:style>
+              <p:txBody>
+                <a:bodyPr rtlCol="0" anchor="ctr"/>
+                <a:lstStyle/>
+                <a:p>
+                  <a:pPr algn="ctr"/>
+                  <a:endParaRPr lang="en-US"/>
+                </a:p>
+              </p:txBody>
+            </p:sp>
+          </p:grpSp>
+        </p:grpSp>
+      </p:grpSp>
     </p:spTree>
     <p:extLst>
       <p:ext uri="{BB962C8B-B14F-4D97-AF65-F5344CB8AC3E}">
@@ -14482,6 +14936,349 @@
           </a:p>
         </p:txBody>
       </p:sp>
+      <p:sp>
+        <p:nvSpPr>
+          <p:cNvPr id="109" name="TextBox 108"/>
+          <p:cNvSpPr txBox="1"/>
+          <p:nvPr/>
+        </p:nvSpPr>
+        <p:spPr>
+          <a:xfrm>
+            <a:off x="1676455" y="1773387"/>
+            <a:ext cx="918667" cy="430887"/>
+          </a:xfrm>
+          <a:prstGeom prst="rect">
+            <a:avLst/>
+          </a:prstGeom>
+          <a:noFill/>
+        </p:spPr>
+        <p:txBody>
+          <a:bodyPr wrap="square" rtlCol="0">
+            <a:spAutoFit/>
+          </a:bodyPr>
+          <a:lstStyle/>
+          <a:p>
+            <a:pPr algn="ctr"/>
+            <a:r>
+              <a:rPr lang="en-US" sz="1100" dirty="0" smtClean="0"/>
+              <a:t>Highlight points</a:t>
+            </a:r>
+            <a:endParaRPr lang="en-SG" sz="1100" dirty="0"/>
+          </a:p>
+        </p:txBody>
+      </p:sp>
+      <p:grpSp>
+        <p:nvGrpSpPr>
+          <p:cNvPr id="110" name="Group 109"/>
+          <p:cNvGrpSpPr/>
+          <p:nvPr/>
+        </p:nvGrpSpPr>
+        <p:grpSpPr>
+          <a:xfrm>
+            <a:off x="1566998" y="1190622"/>
+            <a:ext cx="420624" cy="421200"/>
+            <a:chOff x="1508996" y="4178585"/>
+            <a:chExt cx="420624" cy="421200"/>
+          </a:xfrm>
+        </p:grpSpPr>
+        <p:sp>
+          <p:nvSpPr>
+            <p:cNvPr id="111" name="Rectangle 110"/>
+            <p:cNvSpPr/>
+            <p:nvPr/>
+          </p:nvSpPr>
+          <p:spPr>
+            <a:xfrm rot="10800000">
+              <a:off x="1508996" y="4178585"/>
+              <a:ext cx="420624" cy="421200"/>
+            </a:xfrm>
+            <a:prstGeom prst="rect">
+              <a:avLst/>
+            </a:prstGeom>
+            <a:solidFill>
+              <a:srgbClr val="0070C0"/>
+            </a:solidFill>
+            <a:ln>
+              <a:noFill/>
+            </a:ln>
+          </p:spPr>
+          <p:style>
+            <a:lnRef idx="2">
+              <a:schemeClr val="accent1">
+                <a:shade val="50000"/>
+              </a:schemeClr>
+            </a:lnRef>
+            <a:fillRef idx="1">
+              <a:schemeClr val="accent1"/>
+            </a:fillRef>
+            <a:effectRef idx="0">
+              <a:schemeClr val="accent1"/>
+            </a:effectRef>
+            <a:fontRef idx="minor">
+              <a:schemeClr val="lt1"/>
+            </a:fontRef>
+          </p:style>
+          <p:txBody>
+            <a:bodyPr wrap="none" lIns="0" tIns="0" rIns="0" bIns="0" rtlCol="0" anchor="ctr"/>
+            <a:lstStyle/>
+            <a:p>
+              <a:pPr algn="ctr"/>
+              <a:endParaRPr lang="en-US" b="1"/>
+            </a:p>
+          </p:txBody>
+        </p:sp>
+        <p:sp>
+          <p:nvSpPr>
+            <p:cNvPr id="117" name="Flowchart: Connector 116"/>
+            <p:cNvSpPr>
+              <a:spLocks noChangeAspect="1"/>
+            </p:cNvSpPr>
+            <p:nvPr/>
+          </p:nvSpPr>
+          <p:spPr>
+            <a:xfrm>
+              <a:off x="1550612" y="4300120"/>
+              <a:ext cx="148491" cy="149540"/>
+            </a:xfrm>
+            <a:prstGeom prst="flowChartConnector">
+              <a:avLst/>
+            </a:prstGeom>
+            <a:solidFill>
+              <a:schemeClr val="bg1"/>
+            </a:solidFill>
+            <a:ln>
+              <a:solidFill>
+                <a:schemeClr val="bg1"/>
+              </a:solidFill>
+            </a:ln>
+          </p:spPr>
+          <p:style>
+            <a:lnRef idx="2">
+              <a:schemeClr val="accent1">
+                <a:shade val="50000"/>
+              </a:schemeClr>
+            </a:lnRef>
+            <a:fillRef idx="1">
+              <a:schemeClr val="accent1"/>
+            </a:fillRef>
+            <a:effectRef idx="0">
+              <a:schemeClr val="accent1"/>
+            </a:effectRef>
+            <a:fontRef idx="minor">
+              <a:schemeClr val="lt1"/>
+            </a:fontRef>
+          </p:style>
+          <p:txBody>
+            <a:bodyPr rtlCol="0" anchor="ctr"/>
+            <a:lstStyle/>
+            <a:p>
+              <a:pPr algn="ctr"/>
+              <a:endParaRPr lang="en-SG"/>
+            </a:p>
+          </p:txBody>
+        </p:sp>
+      </p:grpSp>
+      <p:sp>
+        <p:nvSpPr>
+          <p:cNvPr id="9" name="Rectangle 8"/>
+          <p:cNvSpPr/>
+          <p:nvPr/>
+        </p:nvSpPr>
+        <p:spPr>
+          <a:xfrm>
+            <a:off x="1801128" y="1296456"/>
+            <a:ext cx="186494" cy="180943"/>
+          </a:xfrm>
+          <a:prstGeom prst="rect">
+            <a:avLst/>
+          </a:prstGeom>
+          <a:solidFill>
+            <a:schemeClr val="bg1"/>
+          </a:solidFill>
+          <a:ln>
+            <a:noFill/>
+          </a:ln>
+        </p:spPr>
+        <p:style>
+          <a:lnRef idx="2">
+            <a:schemeClr val="accent1">
+              <a:shade val="50000"/>
+            </a:schemeClr>
+          </a:lnRef>
+          <a:fillRef idx="1">
+            <a:schemeClr val="accent1"/>
+          </a:fillRef>
+          <a:effectRef idx="0">
+            <a:schemeClr val="accent1"/>
+          </a:effectRef>
+          <a:fontRef idx="minor">
+            <a:schemeClr val="lt1"/>
+          </a:fontRef>
+        </p:style>
+        <p:txBody>
+          <a:bodyPr rtlCol="0" anchor="ctr"/>
+          <a:lstStyle/>
+          <a:p>
+            <a:pPr algn="ctr"/>
+            <a:endParaRPr lang="en-SG"/>
+          </a:p>
+        </p:txBody>
+      </p:sp>
+      <p:grpSp>
+        <p:nvGrpSpPr>
+          <p:cNvPr id="16" name="Group 15"/>
+          <p:cNvGrpSpPr/>
+          <p:nvPr/>
+        </p:nvGrpSpPr>
+        <p:grpSpPr>
+          <a:xfrm>
+            <a:off x="2178642" y="1186445"/>
+            <a:ext cx="420624" cy="421200"/>
+            <a:chOff x="533536" y="1101557"/>
+            <a:chExt cx="420624" cy="421200"/>
+          </a:xfrm>
+        </p:grpSpPr>
+        <p:sp>
+          <p:nvSpPr>
+            <p:cNvPr id="125" name="Rectangle 124"/>
+            <p:cNvSpPr/>
+            <p:nvPr/>
+          </p:nvSpPr>
+          <p:spPr>
+            <a:xfrm rot="10800000">
+              <a:off x="533536" y="1101557"/>
+              <a:ext cx="420624" cy="421200"/>
+            </a:xfrm>
+            <a:prstGeom prst="rect">
+              <a:avLst/>
+            </a:prstGeom>
+            <a:solidFill>
+              <a:schemeClr val="bg1"/>
+            </a:solidFill>
+            <a:ln>
+              <a:noFill/>
+            </a:ln>
+          </p:spPr>
+          <p:style>
+            <a:lnRef idx="2">
+              <a:schemeClr val="accent1">
+                <a:shade val="50000"/>
+              </a:schemeClr>
+            </a:lnRef>
+            <a:fillRef idx="1">
+              <a:schemeClr val="accent1"/>
+            </a:fillRef>
+            <a:effectRef idx="0">
+              <a:schemeClr val="accent1"/>
+            </a:effectRef>
+            <a:fontRef idx="minor">
+              <a:schemeClr val="lt1"/>
+            </a:fontRef>
+          </p:style>
+          <p:txBody>
+            <a:bodyPr rtlCol="0" anchor="ctr"/>
+            <a:lstStyle/>
+            <a:p>
+              <a:pPr algn="ctr"/>
+              <a:endParaRPr lang="en-US"/>
+            </a:p>
+          </p:txBody>
+        </p:sp>
+        <p:sp>
+          <p:nvSpPr>
+            <p:cNvPr id="126" name="Flowchart: Connector 125"/>
+            <p:cNvSpPr>
+              <a:spLocks noChangeAspect="1"/>
+            </p:cNvSpPr>
+            <p:nvPr/>
+          </p:nvSpPr>
+          <p:spPr>
+            <a:xfrm>
+              <a:off x="538131" y="1207391"/>
+              <a:ext cx="179674" cy="180943"/>
+            </a:xfrm>
+            <a:prstGeom prst="flowChartConnector">
+              <a:avLst/>
+            </a:prstGeom>
+            <a:solidFill>
+              <a:srgbClr val="0070C0"/>
+            </a:solidFill>
+            <a:ln>
+              <a:noFill/>
+            </a:ln>
+          </p:spPr>
+          <p:style>
+            <a:lnRef idx="2">
+              <a:schemeClr val="accent1">
+                <a:shade val="50000"/>
+              </a:schemeClr>
+            </a:lnRef>
+            <a:fillRef idx="1">
+              <a:schemeClr val="accent1"/>
+            </a:fillRef>
+            <a:effectRef idx="0">
+              <a:schemeClr val="accent1"/>
+            </a:effectRef>
+            <a:fontRef idx="minor">
+              <a:schemeClr val="lt1"/>
+            </a:fontRef>
+          </p:style>
+          <p:txBody>
+            <a:bodyPr wrap="none" lIns="0" tIns="0" rIns="0" bIns="0" rtlCol="0" anchor="ctr"/>
+            <a:lstStyle/>
+            <a:p>
+              <a:pPr algn="ctr"/>
+              <a:endParaRPr lang="en-SG" b="1"/>
+            </a:p>
+          </p:txBody>
+        </p:sp>
+        <p:sp>
+          <p:nvSpPr>
+            <p:cNvPr id="129" name="Rectangle 128"/>
+            <p:cNvSpPr/>
+            <p:nvPr/>
+          </p:nvSpPr>
+          <p:spPr>
+            <a:xfrm>
+              <a:off x="767666" y="1207391"/>
+              <a:ext cx="186494" cy="180943"/>
+            </a:xfrm>
+            <a:prstGeom prst="rect">
+              <a:avLst/>
+            </a:prstGeom>
+            <a:solidFill>
+              <a:srgbClr val="0070C0"/>
+            </a:solidFill>
+            <a:ln>
+              <a:noFill/>
+            </a:ln>
+          </p:spPr>
+          <p:style>
+            <a:lnRef idx="2">
+              <a:schemeClr val="accent1">
+                <a:shade val="50000"/>
+              </a:schemeClr>
+            </a:lnRef>
+            <a:fillRef idx="1">
+              <a:schemeClr val="accent1"/>
+            </a:fillRef>
+            <a:effectRef idx="0">
+              <a:schemeClr val="accent1"/>
+            </a:effectRef>
+            <a:fontRef idx="minor">
+              <a:schemeClr val="lt1"/>
+            </a:fontRef>
+          </p:style>
+          <p:txBody>
+            <a:bodyPr wrap="none" lIns="0" tIns="0" rIns="0" bIns="0" rtlCol="0" anchor="ctr"/>
+            <a:lstStyle/>
+            <a:p>
+              <a:pPr algn="ctr"/>
+              <a:endParaRPr lang="en-SG" b="1"/>
+            </a:p>
+          </p:txBody>
+        </p:sp>
+      </p:grpSp>
     </p:spTree>
     <p:extLst>
       <p:ext uri="{BB962C8B-B14F-4D97-AF65-F5344CB8AC3E}">

</xml_diff>

<commit_message>
Add Highlight Bullets Context Menu Icons
</commit_message>
<xml_diff>
--- a/doc/Icons.pptx
+++ b/doc/Icons.pptx
@@ -15,19 +15,19 @@
   <p:notesSz cx="6858000" cy="9144000"/>
   <p:embeddedFontLst>
     <p:embeddedFont>
-      <p:font typeface="Calibri" panose="020F0502020204030204" pitchFamily="34" charset="0"/>
-      <p:regular r:id="rId5"/>
-      <p:bold r:id="rId6"/>
-      <p:italic r:id="rId7"/>
-      <p:boldItalic r:id="rId8"/>
+      <p:font typeface="Arial Black" pitchFamily="34" charset="0"/>
+      <p:bold r:id="rId5"/>
     </p:embeddedFont>
     <p:embeddedFont>
-      <p:font typeface="Arial Black" panose="020B0A04020102020204" pitchFamily="34" charset="0"/>
-      <p:bold r:id="rId9"/>
+      <p:font typeface="Rockwell Extra Bold" charset="0"/>
+      <p:bold r:id="rId6"/>
     </p:embeddedFont>
     <p:embeddedFont>
-      <p:font typeface="Rockwell Extra Bold" panose="02060903040505020403" pitchFamily="18" charset="0"/>
-      <p:bold r:id="rId10"/>
+      <p:font typeface="Calibri" pitchFamily="34" charset="0"/>
+      <p:regular r:id="rId7"/>
+      <p:bold r:id="rId8"/>
+      <p:italic r:id="rId9"/>
+      <p:boldItalic r:id="rId10"/>
     </p:embeddedFont>
   </p:embeddedFontLst>
   <p:defaultTextStyle>
@@ -210,7 +210,7 @@
           <a:p>
             <a:fld id="{6699ACB9-486C-4D62-A3A7-AF98E13EFDA3}" type="datetimeFigureOut">
               <a:rPr lang="en-US" smtClean="0"/>
-              <a:t>3/29/2014</a:t>
+              <a:t>3/31/2014</a:t>
             </a:fld>
             <a:endParaRPr lang="en-US"/>
           </a:p>
@@ -744,7 +744,7 @@
             <a:fld id="{1D8BD707-D9CF-40AE-B4C6-C98DA3205C09}" type="datetimeFigureOut">
               <a:rPr lang="en-US" smtClean="0"/>
               <a:pPr/>
-              <a:t>3/29/2014</a:t>
+              <a:t>3/31/2014</a:t>
             </a:fld>
             <a:endParaRPr lang="en-US"/>
           </a:p>
@@ -911,7 +911,7 @@
             <a:fld id="{1D8BD707-D9CF-40AE-B4C6-C98DA3205C09}" type="datetimeFigureOut">
               <a:rPr lang="en-US" smtClean="0"/>
               <a:pPr/>
-              <a:t>3/29/2014</a:t>
+              <a:t>3/31/2014</a:t>
             </a:fld>
             <a:endParaRPr lang="en-US"/>
           </a:p>
@@ -1088,7 +1088,7 @@
             <a:fld id="{1D8BD707-D9CF-40AE-B4C6-C98DA3205C09}" type="datetimeFigureOut">
               <a:rPr lang="en-US" smtClean="0"/>
               <a:pPr/>
-              <a:t>3/29/2014</a:t>
+              <a:t>3/31/2014</a:t>
             </a:fld>
             <a:endParaRPr lang="en-US"/>
           </a:p>
@@ -1255,7 +1255,7 @@
             <a:fld id="{1D8BD707-D9CF-40AE-B4C6-C98DA3205C09}" type="datetimeFigureOut">
               <a:rPr lang="en-US" smtClean="0"/>
               <a:pPr/>
-              <a:t>3/29/2014</a:t>
+              <a:t>3/31/2014</a:t>
             </a:fld>
             <a:endParaRPr lang="en-US"/>
           </a:p>
@@ -1498,7 +1498,7 @@
             <a:fld id="{1D8BD707-D9CF-40AE-B4C6-C98DA3205C09}" type="datetimeFigureOut">
               <a:rPr lang="en-US" smtClean="0"/>
               <a:pPr/>
-              <a:t>3/29/2014</a:t>
+              <a:t>3/31/2014</a:t>
             </a:fld>
             <a:endParaRPr lang="en-US"/>
           </a:p>
@@ -1783,7 +1783,7 @@
             <a:fld id="{1D8BD707-D9CF-40AE-B4C6-C98DA3205C09}" type="datetimeFigureOut">
               <a:rPr lang="en-US" smtClean="0"/>
               <a:pPr/>
-              <a:t>3/29/2014</a:t>
+              <a:t>3/31/2014</a:t>
             </a:fld>
             <a:endParaRPr lang="en-US"/>
           </a:p>
@@ -2202,7 +2202,7 @@
             <a:fld id="{1D8BD707-D9CF-40AE-B4C6-C98DA3205C09}" type="datetimeFigureOut">
               <a:rPr lang="en-US" smtClean="0"/>
               <a:pPr/>
-              <a:t>3/29/2014</a:t>
+              <a:t>3/31/2014</a:t>
             </a:fld>
             <a:endParaRPr lang="en-US"/>
           </a:p>
@@ -2317,7 +2317,7 @@
             <a:fld id="{1D8BD707-D9CF-40AE-B4C6-C98DA3205C09}" type="datetimeFigureOut">
               <a:rPr lang="en-US" smtClean="0"/>
               <a:pPr/>
-              <a:t>3/29/2014</a:t>
+              <a:t>3/31/2014</a:t>
             </a:fld>
             <a:endParaRPr lang="en-US"/>
           </a:p>
@@ -2409,7 +2409,7 @@
             <a:fld id="{1D8BD707-D9CF-40AE-B4C6-C98DA3205C09}" type="datetimeFigureOut">
               <a:rPr lang="en-US" smtClean="0"/>
               <a:pPr/>
-              <a:t>3/29/2014</a:t>
+              <a:t>3/31/2014</a:t>
             </a:fld>
             <a:endParaRPr lang="en-US"/>
           </a:p>
@@ -2683,7 +2683,7 @@
             <a:fld id="{1D8BD707-D9CF-40AE-B4C6-C98DA3205C09}" type="datetimeFigureOut">
               <a:rPr lang="en-US" smtClean="0"/>
               <a:pPr/>
-              <a:t>3/29/2014</a:t>
+              <a:t>3/31/2014</a:t>
             </a:fld>
             <a:endParaRPr lang="en-US"/>
           </a:p>
@@ -2933,7 +2933,7 @@
             <a:fld id="{1D8BD707-D9CF-40AE-B4C6-C98DA3205C09}" type="datetimeFigureOut">
               <a:rPr lang="en-US" smtClean="0"/>
               <a:pPr/>
-              <a:t>3/29/2014</a:t>
+              <a:t>3/31/2014</a:t>
             </a:fld>
             <a:endParaRPr lang="en-US"/>
           </a:p>
@@ -3143,7 +3143,7 @@
             <a:fld id="{1D8BD707-D9CF-40AE-B4C6-C98DA3205C09}" type="datetimeFigureOut">
               <a:rPr lang="en-US" smtClean="0"/>
               <a:pPr/>
-              <a:t>3/29/2014</a:t>
+              <a:t>3/31/2014</a:t>
             </a:fld>
             <a:endParaRPr lang="en-US"/>
           </a:p>
@@ -14969,7 +14969,7 @@
       </p:sp>
       <p:grpSp>
         <p:nvGrpSpPr>
-          <p:cNvPr id="110" name="Group 109"/>
+          <p:cNvPr id="17" name="Group 16"/>
           <p:cNvGrpSpPr/>
           <p:nvPr/>
         </p:nvGrpSpPr>
@@ -14977,79 +14977,140 @@
           <a:xfrm>
             <a:off x="1566998" y="1190622"/>
             <a:ext cx="420624" cy="421200"/>
-            <a:chOff x="1508996" y="4178585"/>
+            <a:chOff x="1566998" y="1190622"/>
             <a:chExt cx="420624" cy="421200"/>
           </a:xfrm>
         </p:grpSpPr>
+        <p:grpSp>
+          <p:nvGrpSpPr>
+            <p:cNvPr id="110" name="Group 109"/>
+            <p:cNvGrpSpPr/>
+            <p:nvPr/>
+          </p:nvGrpSpPr>
+          <p:grpSpPr>
+            <a:xfrm>
+              <a:off x="1566998" y="1190622"/>
+              <a:ext cx="420624" cy="421200"/>
+              <a:chOff x="1508996" y="4178585"/>
+              <a:chExt cx="420624" cy="421200"/>
+            </a:xfrm>
+          </p:grpSpPr>
+          <p:sp>
+            <p:nvSpPr>
+              <p:cNvPr id="111" name="Rectangle 110"/>
+              <p:cNvSpPr/>
+              <p:nvPr/>
+            </p:nvSpPr>
+            <p:spPr>
+              <a:xfrm rot="10800000">
+                <a:off x="1508996" y="4178585"/>
+                <a:ext cx="420624" cy="421200"/>
+              </a:xfrm>
+              <a:prstGeom prst="rect">
+                <a:avLst/>
+              </a:prstGeom>
+              <a:solidFill>
+                <a:srgbClr val="0070C0"/>
+              </a:solidFill>
+              <a:ln>
+                <a:noFill/>
+              </a:ln>
+            </p:spPr>
+            <p:style>
+              <a:lnRef idx="2">
+                <a:schemeClr val="accent1">
+                  <a:shade val="50000"/>
+                </a:schemeClr>
+              </a:lnRef>
+              <a:fillRef idx="1">
+                <a:schemeClr val="accent1"/>
+              </a:fillRef>
+              <a:effectRef idx="0">
+                <a:schemeClr val="accent1"/>
+              </a:effectRef>
+              <a:fontRef idx="minor">
+                <a:schemeClr val="lt1"/>
+              </a:fontRef>
+            </p:style>
+            <p:txBody>
+              <a:bodyPr wrap="none" lIns="0" tIns="0" rIns="0" bIns="0" rtlCol="0" anchor="ctr"/>
+              <a:lstStyle/>
+              <a:p>
+                <a:pPr algn="ctr"/>
+                <a:endParaRPr lang="en-US" b="1"/>
+              </a:p>
+            </p:txBody>
+          </p:sp>
+          <p:sp>
+            <p:nvSpPr>
+              <p:cNvPr id="117" name="Flowchart: Connector 116"/>
+              <p:cNvSpPr>
+                <a:spLocks noChangeAspect="1"/>
+              </p:cNvSpPr>
+              <p:nvPr/>
+            </p:nvSpPr>
+            <p:spPr>
+              <a:xfrm>
+                <a:off x="1550612" y="4300120"/>
+                <a:ext cx="148491" cy="149540"/>
+              </a:xfrm>
+              <a:prstGeom prst="flowChartConnector">
+                <a:avLst/>
+              </a:prstGeom>
+              <a:solidFill>
+                <a:schemeClr val="bg1"/>
+              </a:solidFill>
+              <a:ln>
+                <a:solidFill>
+                  <a:schemeClr val="bg1"/>
+                </a:solidFill>
+              </a:ln>
+            </p:spPr>
+            <p:style>
+              <a:lnRef idx="2">
+                <a:schemeClr val="accent1">
+                  <a:shade val="50000"/>
+                </a:schemeClr>
+              </a:lnRef>
+              <a:fillRef idx="1">
+                <a:schemeClr val="accent1"/>
+              </a:fillRef>
+              <a:effectRef idx="0">
+                <a:schemeClr val="accent1"/>
+              </a:effectRef>
+              <a:fontRef idx="minor">
+                <a:schemeClr val="lt1"/>
+              </a:fontRef>
+            </p:style>
+            <p:txBody>
+              <a:bodyPr rtlCol="0" anchor="ctr"/>
+              <a:lstStyle/>
+              <a:p>
+                <a:pPr algn="ctr"/>
+                <a:endParaRPr lang="en-SG"/>
+              </a:p>
+            </p:txBody>
+          </p:sp>
+        </p:grpSp>
         <p:sp>
           <p:nvSpPr>
-            <p:cNvPr id="111" name="Rectangle 110"/>
+            <p:cNvPr id="9" name="Rectangle 8"/>
             <p:cNvSpPr/>
             <p:nvPr/>
           </p:nvSpPr>
           <p:spPr>
-            <a:xfrm rot="10800000">
-              <a:off x="1508996" y="4178585"/>
-              <a:ext cx="420624" cy="421200"/>
+            <a:xfrm>
+              <a:off x="1801128" y="1296456"/>
+              <a:ext cx="186494" cy="180943"/>
             </a:xfrm>
             <a:prstGeom prst="rect">
-              <a:avLst/>
-            </a:prstGeom>
-            <a:solidFill>
-              <a:srgbClr val="0070C0"/>
-            </a:solidFill>
-            <a:ln>
-              <a:noFill/>
-            </a:ln>
-          </p:spPr>
-          <p:style>
-            <a:lnRef idx="2">
-              <a:schemeClr val="accent1">
-                <a:shade val="50000"/>
-              </a:schemeClr>
-            </a:lnRef>
-            <a:fillRef idx="1">
-              <a:schemeClr val="accent1"/>
-            </a:fillRef>
-            <a:effectRef idx="0">
-              <a:schemeClr val="accent1"/>
-            </a:effectRef>
-            <a:fontRef idx="minor">
-              <a:schemeClr val="lt1"/>
-            </a:fontRef>
-          </p:style>
-          <p:txBody>
-            <a:bodyPr wrap="none" lIns="0" tIns="0" rIns="0" bIns="0" rtlCol="0" anchor="ctr"/>
-            <a:lstStyle/>
-            <a:p>
-              <a:pPr algn="ctr"/>
-              <a:endParaRPr lang="en-US" b="1"/>
-            </a:p>
-          </p:txBody>
-        </p:sp>
-        <p:sp>
-          <p:nvSpPr>
-            <p:cNvPr id="117" name="Flowchart: Connector 116"/>
-            <p:cNvSpPr>
-              <a:spLocks noChangeAspect="1"/>
-            </p:cNvSpPr>
-            <p:nvPr/>
-          </p:nvSpPr>
-          <p:spPr>
-            <a:xfrm>
-              <a:off x="1550612" y="4300120"/>
-              <a:ext cx="148491" cy="149540"/>
-            </a:xfrm>
-            <a:prstGeom prst="flowChartConnector">
               <a:avLst/>
             </a:prstGeom>
             <a:solidFill>
               <a:schemeClr val="bg1"/>
             </a:solidFill>
             <a:ln>
-              <a:solidFill>
-                <a:schemeClr val="bg1"/>
-              </a:solidFill>
+              <a:noFill/>
             </a:ln>
           </p:spPr>
           <p:style>
@@ -15078,52 +15139,6 @@
           </p:txBody>
         </p:sp>
       </p:grpSp>
-      <p:sp>
-        <p:nvSpPr>
-          <p:cNvPr id="9" name="Rectangle 8"/>
-          <p:cNvSpPr/>
-          <p:nvPr/>
-        </p:nvSpPr>
-        <p:spPr>
-          <a:xfrm>
-            <a:off x="1801128" y="1296456"/>
-            <a:ext cx="186494" cy="180943"/>
-          </a:xfrm>
-          <a:prstGeom prst="rect">
-            <a:avLst/>
-          </a:prstGeom>
-          <a:solidFill>
-            <a:schemeClr val="bg1"/>
-          </a:solidFill>
-          <a:ln>
-            <a:noFill/>
-          </a:ln>
-        </p:spPr>
-        <p:style>
-          <a:lnRef idx="2">
-            <a:schemeClr val="accent1">
-              <a:shade val="50000"/>
-            </a:schemeClr>
-          </a:lnRef>
-          <a:fillRef idx="1">
-            <a:schemeClr val="accent1"/>
-          </a:fillRef>
-          <a:effectRef idx="0">
-            <a:schemeClr val="accent1"/>
-          </a:effectRef>
-          <a:fontRef idx="minor">
-            <a:schemeClr val="lt1"/>
-          </a:fontRef>
-        </p:style>
-        <p:txBody>
-          <a:bodyPr rtlCol="0" anchor="ctr"/>
-          <a:lstStyle/>
-          <a:p>
-            <a:pPr algn="ctr"/>
-            <a:endParaRPr lang="en-SG"/>
-          </a:p>
-        </p:txBody>
-      </p:sp>
       <p:grpSp>
         <p:nvGrpSpPr>
           <p:cNvPr id="16" name="Group 15"/>

</xml_diff>

<commit_message>
added icons for colors lab, shapes lab, highlight words
</commit_message>
<xml_diff>
--- a/doc/Icons.pptx
+++ b/doc/Icons.pptx
@@ -15,19 +15,19 @@
   <p:notesSz cx="6858000" cy="9144000"/>
   <p:embeddedFontLst>
     <p:embeddedFont>
-      <p:font typeface="Arial Black" pitchFamily="34" charset="0"/>
-      <p:bold r:id="rId5"/>
+      <p:font typeface="Calibri" panose="020F0502020204030204" pitchFamily="34" charset="0"/>
+      <p:regular r:id="rId5"/>
+      <p:bold r:id="rId6"/>
+      <p:italic r:id="rId7"/>
+      <p:boldItalic r:id="rId8"/>
     </p:embeddedFont>
     <p:embeddedFont>
-      <p:font typeface="Rockwell Extra Bold" charset="0"/>
-      <p:bold r:id="rId6"/>
+      <p:font typeface="Arial Black" panose="020B0A04020102020204" pitchFamily="34" charset="0"/>
+      <p:bold r:id="rId9"/>
     </p:embeddedFont>
     <p:embeddedFont>
-      <p:font typeface="Calibri" pitchFamily="34" charset="0"/>
-      <p:regular r:id="rId7"/>
-      <p:bold r:id="rId8"/>
-      <p:italic r:id="rId9"/>
-      <p:boldItalic r:id="rId10"/>
+      <p:font typeface="Rockwell Extra Bold" panose="02060903040505020403" pitchFamily="18" charset="0"/>
+      <p:bold r:id="rId10"/>
     </p:embeddedFont>
   </p:embeddedFontLst>
   <p:defaultTextStyle>
@@ -210,7 +210,7 @@
           <a:p>
             <a:fld id="{6699ACB9-486C-4D62-A3A7-AF98E13EFDA3}" type="datetimeFigureOut">
               <a:rPr lang="en-US" smtClean="0"/>
-              <a:t>3/31/2014</a:t>
+              <a:t>6/26/2014</a:t>
             </a:fld>
             <a:endParaRPr lang="en-US"/>
           </a:p>
@@ -744,7 +744,7 @@
             <a:fld id="{1D8BD707-D9CF-40AE-B4C6-C98DA3205C09}" type="datetimeFigureOut">
               <a:rPr lang="en-US" smtClean="0"/>
               <a:pPr/>
-              <a:t>3/31/2014</a:t>
+              <a:t>6/26/2014</a:t>
             </a:fld>
             <a:endParaRPr lang="en-US"/>
           </a:p>
@@ -911,7 +911,7 @@
             <a:fld id="{1D8BD707-D9CF-40AE-B4C6-C98DA3205C09}" type="datetimeFigureOut">
               <a:rPr lang="en-US" smtClean="0"/>
               <a:pPr/>
-              <a:t>3/31/2014</a:t>
+              <a:t>6/26/2014</a:t>
             </a:fld>
             <a:endParaRPr lang="en-US"/>
           </a:p>
@@ -1088,7 +1088,7 @@
             <a:fld id="{1D8BD707-D9CF-40AE-B4C6-C98DA3205C09}" type="datetimeFigureOut">
               <a:rPr lang="en-US" smtClean="0"/>
               <a:pPr/>
-              <a:t>3/31/2014</a:t>
+              <a:t>6/26/2014</a:t>
             </a:fld>
             <a:endParaRPr lang="en-US"/>
           </a:p>
@@ -1255,7 +1255,7 @@
             <a:fld id="{1D8BD707-D9CF-40AE-B4C6-C98DA3205C09}" type="datetimeFigureOut">
               <a:rPr lang="en-US" smtClean="0"/>
               <a:pPr/>
-              <a:t>3/31/2014</a:t>
+              <a:t>6/26/2014</a:t>
             </a:fld>
             <a:endParaRPr lang="en-US"/>
           </a:p>
@@ -1498,7 +1498,7 @@
             <a:fld id="{1D8BD707-D9CF-40AE-B4C6-C98DA3205C09}" type="datetimeFigureOut">
               <a:rPr lang="en-US" smtClean="0"/>
               <a:pPr/>
-              <a:t>3/31/2014</a:t>
+              <a:t>6/26/2014</a:t>
             </a:fld>
             <a:endParaRPr lang="en-US"/>
           </a:p>
@@ -1783,7 +1783,7 @@
             <a:fld id="{1D8BD707-D9CF-40AE-B4C6-C98DA3205C09}" type="datetimeFigureOut">
               <a:rPr lang="en-US" smtClean="0"/>
               <a:pPr/>
-              <a:t>3/31/2014</a:t>
+              <a:t>6/26/2014</a:t>
             </a:fld>
             <a:endParaRPr lang="en-US"/>
           </a:p>
@@ -2202,7 +2202,7 @@
             <a:fld id="{1D8BD707-D9CF-40AE-B4C6-C98DA3205C09}" type="datetimeFigureOut">
               <a:rPr lang="en-US" smtClean="0"/>
               <a:pPr/>
-              <a:t>3/31/2014</a:t>
+              <a:t>6/26/2014</a:t>
             </a:fld>
             <a:endParaRPr lang="en-US"/>
           </a:p>
@@ -2317,7 +2317,7 @@
             <a:fld id="{1D8BD707-D9CF-40AE-B4C6-C98DA3205C09}" type="datetimeFigureOut">
               <a:rPr lang="en-US" smtClean="0"/>
               <a:pPr/>
-              <a:t>3/31/2014</a:t>
+              <a:t>6/26/2014</a:t>
             </a:fld>
             <a:endParaRPr lang="en-US"/>
           </a:p>
@@ -2409,7 +2409,7 @@
             <a:fld id="{1D8BD707-D9CF-40AE-B4C6-C98DA3205C09}" type="datetimeFigureOut">
               <a:rPr lang="en-US" smtClean="0"/>
               <a:pPr/>
-              <a:t>3/31/2014</a:t>
+              <a:t>6/26/2014</a:t>
             </a:fld>
             <a:endParaRPr lang="en-US"/>
           </a:p>
@@ -2683,7 +2683,7 @@
             <a:fld id="{1D8BD707-D9CF-40AE-B4C6-C98DA3205C09}" type="datetimeFigureOut">
               <a:rPr lang="en-US" smtClean="0"/>
               <a:pPr/>
-              <a:t>3/31/2014</a:t>
+              <a:t>6/26/2014</a:t>
             </a:fld>
             <a:endParaRPr lang="en-US"/>
           </a:p>
@@ -2933,7 +2933,7 @@
             <a:fld id="{1D8BD707-D9CF-40AE-B4C6-C98DA3205C09}" type="datetimeFigureOut">
               <a:rPr lang="en-US" smtClean="0"/>
               <a:pPr/>
-              <a:t>3/31/2014</a:t>
+              <a:t>6/26/2014</a:t>
             </a:fld>
             <a:endParaRPr lang="en-US"/>
           </a:p>
@@ -3143,7 +3143,7 @@
             <a:fld id="{1D8BD707-D9CF-40AE-B4C6-C98DA3205C09}" type="datetimeFigureOut">
               <a:rPr lang="en-US" smtClean="0"/>
               <a:pPr/>
-              <a:t>3/31/2014</a:t>
+              <a:t>6/26/2014</a:t>
             </a:fld>
             <a:endParaRPr lang="en-US"/>
           </a:p>
@@ -5590,7 +5590,11 @@
           <a:p>
             <a:r>
               <a:rPr lang="en-US" sz="800" dirty="0" smtClean="0"/>
-              <a:t>Highlight bullets</a:t>
+              <a:t>Highlight </a:t>
+            </a:r>
+            <a:r>
+              <a:rPr lang="en-US" sz="800" dirty="0" smtClean="0"/>
+              <a:t>point</a:t>
             </a:r>
             <a:endParaRPr lang="en-SG" sz="800" dirty="0"/>
           </a:p>
@@ -10360,6 +10364,1602 @@
             </p:sp>
           </p:grpSp>
         </p:grpSp>
+      </p:grpSp>
+      <p:grpSp>
+        <p:nvGrpSpPr>
+          <p:cNvPr id="35" name="Group 34"/>
+          <p:cNvGrpSpPr/>
+          <p:nvPr/>
+        </p:nvGrpSpPr>
+        <p:grpSpPr>
+          <a:xfrm>
+            <a:off x="2103771" y="1107035"/>
+            <a:ext cx="838200" cy="838200"/>
+            <a:chOff x="2103771" y="1107035"/>
+            <a:chExt cx="838200" cy="838200"/>
+          </a:xfrm>
+        </p:grpSpPr>
+        <p:sp>
+          <p:nvSpPr>
+            <p:cNvPr id="152" name="Rectangle 151"/>
+            <p:cNvSpPr/>
+            <p:nvPr/>
+          </p:nvSpPr>
+          <p:spPr>
+            <a:xfrm>
+              <a:off x="2150016" y="1187458"/>
+              <a:ext cx="741789" cy="559065"/>
+            </a:xfrm>
+            <a:prstGeom prst="rect">
+              <a:avLst/>
+            </a:prstGeom>
+            <a:solidFill>
+              <a:schemeClr val="accent6"/>
+            </a:solidFill>
+            <a:ln>
+              <a:noFill/>
+            </a:ln>
+          </p:spPr>
+          <p:style>
+            <a:lnRef idx="2">
+              <a:schemeClr val="accent1">
+                <a:shade val="50000"/>
+              </a:schemeClr>
+            </a:lnRef>
+            <a:fillRef idx="1">
+              <a:schemeClr val="accent1"/>
+            </a:fillRef>
+            <a:effectRef idx="0">
+              <a:schemeClr val="accent1"/>
+            </a:effectRef>
+            <a:fontRef idx="minor">
+              <a:schemeClr val="lt1"/>
+            </a:fontRef>
+          </p:style>
+          <p:txBody>
+            <a:bodyPr rtlCol="0" anchor="ctr"/>
+            <a:lstStyle/>
+            <a:p>
+              <a:pPr algn="ctr"/>
+              <a:endParaRPr lang="en-US"/>
+            </a:p>
+          </p:txBody>
+        </p:sp>
+        <p:sp>
+          <p:nvSpPr>
+            <p:cNvPr id="173" name="Rounded Rectangle 172"/>
+            <p:cNvSpPr/>
+            <p:nvPr/>
+          </p:nvSpPr>
+          <p:spPr>
+            <a:xfrm>
+              <a:off x="2276552" y="1268296"/>
+              <a:ext cx="518999" cy="73271"/>
+            </a:xfrm>
+            <a:prstGeom prst="roundRect">
+              <a:avLst/>
+            </a:prstGeom>
+            <a:solidFill>
+              <a:schemeClr val="bg1"/>
+            </a:solidFill>
+            <a:ln>
+              <a:noFill/>
+            </a:ln>
+          </p:spPr>
+          <p:style>
+            <a:lnRef idx="2">
+              <a:schemeClr val="accent1">
+                <a:shade val="50000"/>
+              </a:schemeClr>
+            </a:lnRef>
+            <a:fillRef idx="1">
+              <a:schemeClr val="accent1"/>
+            </a:fillRef>
+            <a:effectRef idx="0">
+              <a:schemeClr val="accent1"/>
+            </a:effectRef>
+            <a:fontRef idx="minor">
+              <a:schemeClr val="lt1"/>
+            </a:fontRef>
+          </p:style>
+          <p:txBody>
+            <a:bodyPr rtlCol="0" anchor="ctr"/>
+            <a:lstStyle/>
+            <a:p>
+              <a:pPr algn="ctr"/>
+              <a:endParaRPr lang="en-US"/>
+            </a:p>
+          </p:txBody>
+        </p:sp>
+        <p:sp>
+          <p:nvSpPr>
+            <p:cNvPr id="171" name="Rounded Rectangle 170"/>
+            <p:cNvSpPr/>
+            <p:nvPr/>
+          </p:nvSpPr>
+          <p:spPr>
+            <a:xfrm>
+              <a:off x="2276208" y="1616319"/>
+              <a:ext cx="259844" cy="64111"/>
+            </a:xfrm>
+            <a:prstGeom prst="roundRect">
+              <a:avLst/>
+            </a:prstGeom>
+            <a:solidFill>
+              <a:schemeClr val="bg1"/>
+            </a:solidFill>
+            <a:ln>
+              <a:noFill/>
+            </a:ln>
+          </p:spPr>
+          <p:style>
+            <a:lnRef idx="2">
+              <a:schemeClr val="accent1">
+                <a:shade val="50000"/>
+              </a:schemeClr>
+            </a:lnRef>
+            <a:fillRef idx="1">
+              <a:schemeClr val="accent1"/>
+            </a:fillRef>
+            <a:effectRef idx="0">
+              <a:schemeClr val="accent1"/>
+            </a:effectRef>
+            <a:fontRef idx="minor">
+              <a:schemeClr val="lt1"/>
+            </a:fontRef>
+          </p:style>
+          <p:txBody>
+            <a:bodyPr rtlCol="0" anchor="ctr"/>
+            <a:lstStyle/>
+            <a:p>
+              <a:pPr algn="ctr"/>
+              <a:endParaRPr lang="en-US"/>
+            </a:p>
+          </p:txBody>
+        </p:sp>
+        <p:sp>
+          <p:nvSpPr>
+            <p:cNvPr id="156" name="Rectangle 155"/>
+            <p:cNvSpPr/>
+            <p:nvPr/>
+          </p:nvSpPr>
+          <p:spPr>
+            <a:xfrm>
+              <a:off x="2466976" y="1394200"/>
+              <a:ext cx="331440" cy="152818"/>
+            </a:xfrm>
+            <a:prstGeom prst="rect">
+              <a:avLst/>
+            </a:prstGeom>
+            <a:solidFill>
+              <a:srgbClr val="0070C0"/>
+            </a:solidFill>
+            <a:ln>
+              <a:noFill/>
+            </a:ln>
+          </p:spPr>
+          <p:style>
+            <a:lnRef idx="2">
+              <a:schemeClr val="accent1">
+                <a:shade val="50000"/>
+              </a:schemeClr>
+            </a:lnRef>
+            <a:fillRef idx="1">
+              <a:schemeClr val="accent1"/>
+            </a:fillRef>
+            <a:effectRef idx="0">
+              <a:schemeClr val="accent1"/>
+            </a:effectRef>
+            <a:fontRef idx="minor">
+              <a:schemeClr val="lt1"/>
+            </a:fontRef>
+          </p:style>
+          <p:txBody>
+            <a:bodyPr rtlCol="0" anchor="ctr"/>
+            <a:lstStyle/>
+            <a:p>
+              <a:pPr algn="ctr"/>
+              <a:endParaRPr lang="en-SG"/>
+            </a:p>
+          </p:txBody>
+        </p:sp>
+        <p:grpSp>
+          <p:nvGrpSpPr>
+            <p:cNvPr id="159" name="Group 158"/>
+            <p:cNvGrpSpPr/>
+            <p:nvPr/>
+          </p:nvGrpSpPr>
+          <p:grpSpPr>
+            <a:xfrm>
+              <a:off x="2276552" y="1442307"/>
+              <a:ext cx="463473" cy="64353"/>
+              <a:chOff x="3373710" y="2751692"/>
+              <a:chExt cx="463473" cy="64353"/>
+            </a:xfrm>
+            <a:solidFill>
+              <a:schemeClr val="bg1"/>
+            </a:solidFill>
+          </p:grpSpPr>
+          <p:sp>
+            <p:nvSpPr>
+              <p:cNvPr id="161" name="Rounded Rectangle 160"/>
+              <p:cNvSpPr/>
+              <p:nvPr/>
+            </p:nvSpPr>
+            <p:spPr>
+              <a:xfrm>
+                <a:off x="3618068" y="2751692"/>
+                <a:ext cx="219115" cy="64353"/>
+              </a:xfrm>
+              <a:prstGeom prst="roundRect">
+                <a:avLst/>
+              </a:prstGeom>
+              <a:grpFill/>
+              <a:ln>
+                <a:noFill/>
+              </a:ln>
+            </p:spPr>
+            <p:style>
+              <a:lnRef idx="2">
+                <a:schemeClr val="accent1">
+                  <a:shade val="50000"/>
+                </a:schemeClr>
+              </a:lnRef>
+              <a:fillRef idx="1">
+                <a:schemeClr val="accent1"/>
+              </a:fillRef>
+              <a:effectRef idx="0">
+                <a:schemeClr val="accent1"/>
+              </a:effectRef>
+              <a:fontRef idx="minor">
+                <a:schemeClr val="lt1"/>
+              </a:fontRef>
+            </p:style>
+            <p:txBody>
+              <a:bodyPr rtlCol="0" anchor="ctr"/>
+              <a:lstStyle/>
+              <a:p>
+                <a:pPr algn="ctr"/>
+                <a:endParaRPr lang="en-US"/>
+              </a:p>
+            </p:txBody>
+          </p:sp>
+          <p:sp>
+            <p:nvSpPr>
+              <p:cNvPr id="164" name="Rounded Rectangle 163"/>
+              <p:cNvSpPr/>
+              <p:nvPr/>
+            </p:nvSpPr>
+            <p:spPr>
+              <a:xfrm>
+                <a:off x="3373710" y="2751692"/>
+                <a:ext cx="154685" cy="64353"/>
+              </a:xfrm>
+              <a:prstGeom prst="roundRect">
+                <a:avLst/>
+              </a:prstGeom>
+              <a:grpFill/>
+              <a:ln>
+                <a:noFill/>
+              </a:ln>
+            </p:spPr>
+            <p:style>
+              <a:lnRef idx="2">
+                <a:schemeClr val="accent1">
+                  <a:shade val="50000"/>
+                </a:schemeClr>
+              </a:lnRef>
+              <a:fillRef idx="1">
+                <a:schemeClr val="accent1"/>
+              </a:fillRef>
+              <a:effectRef idx="0">
+                <a:schemeClr val="accent1"/>
+              </a:effectRef>
+              <a:fontRef idx="minor">
+                <a:schemeClr val="lt1"/>
+              </a:fontRef>
+            </p:style>
+            <p:txBody>
+              <a:bodyPr rtlCol="0" anchor="ctr"/>
+              <a:lstStyle/>
+              <a:p>
+                <a:pPr algn="ctr"/>
+                <a:endParaRPr lang="en-US"/>
+              </a:p>
+            </p:txBody>
+          </p:sp>
+        </p:grpSp>
+        <p:sp>
+          <p:nvSpPr>
+            <p:cNvPr id="187" name="Rectangle 186"/>
+            <p:cNvSpPr/>
+            <p:nvPr/>
+          </p:nvSpPr>
+          <p:spPr>
+            <a:xfrm>
+              <a:off x="2103771" y="1107035"/>
+              <a:ext cx="838200" cy="838200"/>
+            </a:xfrm>
+            <a:prstGeom prst="rect">
+              <a:avLst/>
+            </a:prstGeom>
+            <a:noFill/>
+            <a:ln>
+              <a:noFill/>
+            </a:ln>
+          </p:spPr>
+          <p:style>
+            <a:lnRef idx="2">
+              <a:schemeClr val="accent1">
+                <a:shade val="50000"/>
+              </a:schemeClr>
+            </a:lnRef>
+            <a:fillRef idx="1">
+              <a:schemeClr val="accent1"/>
+            </a:fillRef>
+            <a:effectRef idx="0">
+              <a:schemeClr val="accent1"/>
+            </a:effectRef>
+            <a:fontRef idx="minor">
+              <a:schemeClr val="lt1"/>
+            </a:fontRef>
+          </p:style>
+          <p:txBody>
+            <a:bodyPr rtlCol="0" anchor="ctr"/>
+            <a:lstStyle/>
+            <a:p>
+              <a:pPr algn="ctr"/>
+              <a:endParaRPr lang="en-SG"/>
+            </a:p>
+          </p:txBody>
+        </p:sp>
+      </p:grpSp>
+      <p:sp>
+        <p:nvSpPr>
+          <p:cNvPr id="200" name="TextBox 199"/>
+          <p:cNvSpPr txBox="1"/>
+          <p:nvPr/>
+        </p:nvSpPr>
+        <p:spPr>
+          <a:xfrm>
+            <a:off x="2071819" y="1945235"/>
+            <a:ext cx="916799" cy="215444"/>
+          </a:xfrm>
+          <a:prstGeom prst="rect">
+            <a:avLst/>
+          </a:prstGeom>
+          <a:noFill/>
+        </p:spPr>
+        <p:txBody>
+          <a:bodyPr wrap="square" rtlCol="0">
+            <a:spAutoFit/>
+          </a:bodyPr>
+          <a:lstStyle/>
+          <a:p>
+            <a:r>
+              <a:rPr lang="en-US" sz="800" dirty="0" smtClean="0"/>
+              <a:t>Highlight words</a:t>
+            </a:r>
+            <a:endParaRPr lang="en-SG" sz="800" dirty="0"/>
+          </a:p>
+        </p:txBody>
+      </p:sp>
+      <p:sp>
+        <p:nvSpPr>
+          <p:cNvPr id="201" name="TextBox 200"/>
+          <p:cNvSpPr txBox="1"/>
+          <p:nvPr/>
+        </p:nvSpPr>
+        <p:spPr>
+          <a:xfrm>
+            <a:off x="3157694" y="1957470"/>
+            <a:ext cx="916799" cy="338554"/>
+          </a:xfrm>
+          <a:prstGeom prst="rect">
+            <a:avLst/>
+          </a:prstGeom>
+          <a:noFill/>
+        </p:spPr>
+        <p:txBody>
+          <a:bodyPr wrap="square" rtlCol="0">
+            <a:spAutoFit/>
+          </a:bodyPr>
+          <a:lstStyle/>
+          <a:p>
+            <a:r>
+              <a:rPr lang="en-US" sz="800" dirty="0" smtClean="0"/>
+              <a:t>Highlight background</a:t>
+            </a:r>
+            <a:endParaRPr lang="en-SG" sz="800" dirty="0"/>
+          </a:p>
+        </p:txBody>
+      </p:sp>
+      <p:sp>
+        <p:nvSpPr>
+          <p:cNvPr id="211" name="TextBox 210"/>
+          <p:cNvSpPr txBox="1"/>
+          <p:nvPr/>
+        </p:nvSpPr>
+        <p:spPr>
+          <a:xfrm>
+            <a:off x="343314" y="6235526"/>
+            <a:ext cx="916799" cy="215444"/>
+          </a:xfrm>
+          <a:prstGeom prst="rect">
+            <a:avLst/>
+          </a:prstGeom>
+          <a:noFill/>
+        </p:spPr>
+        <p:txBody>
+          <a:bodyPr wrap="square" rtlCol="0">
+            <a:spAutoFit/>
+          </a:bodyPr>
+          <a:lstStyle/>
+          <a:p>
+            <a:pPr algn="ctr"/>
+            <a:r>
+              <a:rPr lang="en-US" sz="800" dirty="0" smtClean="0"/>
+              <a:t>Shapes </a:t>
+            </a:r>
+            <a:r>
+              <a:rPr lang="en-US" sz="800" dirty="0"/>
+              <a:t>L</a:t>
+            </a:r>
+            <a:r>
+              <a:rPr lang="en-US" sz="800" dirty="0" smtClean="0"/>
+              <a:t>ab</a:t>
+            </a:r>
+            <a:endParaRPr lang="en-SG" sz="800" dirty="0"/>
+          </a:p>
+        </p:txBody>
+      </p:sp>
+      <p:grpSp>
+        <p:nvGrpSpPr>
+          <p:cNvPr id="66" name="Group 65"/>
+          <p:cNvGrpSpPr/>
+          <p:nvPr/>
+        </p:nvGrpSpPr>
+        <p:grpSpPr>
+          <a:xfrm>
+            <a:off x="375266" y="5397326"/>
+            <a:ext cx="838200" cy="838200"/>
+            <a:chOff x="375266" y="5397326"/>
+            <a:chExt cx="838200" cy="838200"/>
+          </a:xfrm>
+        </p:grpSpPr>
+        <p:sp>
+          <p:nvSpPr>
+            <p:cNvPr id="208" name="Rectangle 207"/>
+            <p:cNvSpPr/>
+            <p:nvPr/>
+          </p:nvSpPr>
+          <p:spPr>
+            <a:xfrm>
+              <a:off x="375266" y="5397326"/>
+              <a:ext cx="838200" cy="838200"/>
+            </a:xfrm>
+            <a:prstGeom prst="rect">
+              <a:avLst/>
+            </a:prstGeom>
+            <a:noFill/>
+            <a:ln>
+              <a:noFill/>
+            </a:ln>
+          </p:spPr>
+          <p:style>
+            <a:lnRef idx="2">
+              <a:schemeClr val="accent1">
+                <a:shade val="50000"/>
+              </a:schemeClr>
+            </a:lnRef>
+            <a:fillRef idx="1">
+              <a:schemeClr val="accent1"/>
+            </a:fillRef>
+            <a:effectRef idx="0">
+              <a:schemeClr val="accent1"/>
+            </a:effectRef>
+            <a:fontRef idx="minor">
+              <a:schemeClr val="lt1"/>
+            </a:fontRef>
+          </p:style>
+          <p:txBody>
+            <a:bodyPr rtlCol="0" anchor="ctr"/>
+            <a:lstStyle/>
+            <a:p>
+              <a:pPr algn="ctr"/>
+              <a:endParaRPr lang="en-SG"/>
+            </a:p>
+          </p:txBody>
+        </p:sp>
+        <p:sp>
+          <p:nvSpPr>
+            <p:cNvPr id="212" name="Rectangle 4"/>
+            <p:cNvSpPr/>
+            <p:nvPr/>
+          </p:nvSpPr>
+          <p:spPr>
+            <a:xfrm rot="16200000">
+              <a:off x="444221" y="5470529"/>
+              <a:ext cx="700291" cy="690781"/>
+            </a:xfrm>
+            <a:custGeom>
+              <a:avLst/>
+              <a:gdLst/>
+              <a:ahLst/>
+              <a:cxnLst/>
+              <a:rect l="l" t="t" r="r" b="b"/>
+              <a:pathLst>
+                <a:path w="1752603" h="1752600">
+                  <a:moveTo>
+                    <a:pt x="533400" y="0"/>
+                  </a:moveTo>
+                  <a:lnTo>
+                    <a:pt x="533403" y="0"/>
+                  </a:lnTo>
+                  <a:lnTo>
+                    <a:pt x="1066800" y="0"/>
+                  </a:lnTo>
+                  <a:lnTo>
+                    <a:pt x="1752603" y="0"/>
+                  </a:lnTo>
+                  <a:lnTo>
+                    <a:pt x="1752603" y="1752600"/>
+                  </a:lnTo>
+                  <a:lnTo>
+                    <a:pt x="1219203" y="1752600"/>
+                  </a:lnTo>
+                  <a:lnTo>
+                    <a:pt x="533403" y="1752600"/>
+                  </a:lnTo>
+                  <a:lnTo>
+                    <a:pt x="3" y="1752600"/>
+                  </a:lnTo>
+                  <a:lnTo>
+                    <a:pt x="3" y="533430"/>
+                  </a:lnTo>
+                  <a:cubicBezTo>
+                    <a:pt x="0" y="533420"/>
+                    <a:pt x="0" y="533410"/>
+                    <a:pt x="0" y="533400"/>
+                  </a:cubicBezTo>
+                  <a:cubicBezTo>
+                    <a:pt x="0" y="238811"/>
+                    <a:pt x="238811" y="0"/>
+                    <a:pt x="533400" y="0"/>
+                  </a:cubicBezTo>
+                  <a:close/>
+                </a:path>
+              </a:pathLst>
+            </a:custGeom>
+            <a:noFill/>
+            <a:ln w="76200" cmpd="sng">
+              <a:solidFill>
+                <a:srgbClr val="0070C0"/>
+              </a:solidFill>
+              <a:miter lim="800000"/>
+            </a:ln>
+          </p:spPr>
+          <p:style>
+            <a:lnRef idx="2">
+              <a:schemeClr val="accent1">
+                <a:shade val="50000"/>
+              </a:schemeClr>
+            </a:lnRef>
+            <a:fillRef idx="1">
+              <a:schemeClr val="accent1"/>
+            </a:fillRef>
+            <a:effectRef idx="0">
+              <a:schemeClr val="accent1"/>
+            </a:effectRef>
+            <a:fontRef idx="minor">
+              <a:schemeClr val="lt1"/>
+            </a:fontRef>
+          </p:style>
+          <p:txBody>
+            <a:bodyPr rtlCol="0" anchor="ctr"/>
+            <a:lstStyle/>
+            <a:p>
+              <a:pPr algn="ctr"/>
+              <a:endParaRPr lang="en-US"/>
+            </a:p>
+          </p:txBody>
+        </p:sp>
+        <p:sp>
+          <p:nvSpPr>
+            <p:cNvPr id="60" name="Teardrop 59"/>
+            <p:cNvSpPr/>
+            <p:nvPr/>
+          </p:nvSpPr>
+          <p:spPr>
+            <a:xfrm>
+              <a:off x="747877" y="5557049"/>
+              <a:ext cx="309672" cy="307175"/>
+            </a:xfrm>
+            <a:prstGeom prst="teardrop">
+              <a:avLst/>
+            </a:prstGeom>
+            <a:solidFill>
+              <a:srgbClr val="0070C0"/>
+            </a:solidFill>
+            <a:ln w="19050">
+              <a:solidFill>
+                <a:schemeClr val="bg1"/>
+              </a:solidFill>
+            </a:ln>
+            <a:effectLst/>
+          </p:spPr>
+          <p:style>
+            <a:lnRef idx="2">
+              <a:schemeClr val="accent1">
+                <a:shade val="50000"/>
+              </a:schemeClr>
+            </a:lnRef>
+            <a:fillRef idx="1">
+              <a:schemeClr val="accent1"/>
+            </a:fillRef>
+            <a:effectRef idx="0">
+              <a:schemeClr val="accent1"/>
+            </a:effectRef>
+            <a:fontRef idx="minor">
+              <a:schemeClr val="lt1"/>
+            </a:fontRef>
+          </p:style>
+          <p:txBody>
+            <a:bodyPr rtlCol="0" anchor="ctr"/>
+            <a:lstStyle/>
+            <a:p>
+              <a:pPr algn="ctr"/>
+              <a:endParaRPr lang="en-SG"/>
+            </a:p>
+          </p:txBody>
+        </p:sp>
+        <p:sp>
+          <p:nvSpPr>
+            <p:cNvPr id="64" name="Flowchart: Process 63"/>
+            <p:cNvSpPr/>
+            <p:nvPr/>
+          </p:nvSpPr>
+          <p:spPr>
+            <a:xfrm>
+              <a:off x="544174" y="5670551"/>
+              <a:ext cx="299506" cy="256598"/>
+            </a:xfrm>
+            <a:prstGeom prst="flowChartProcess">
+              <a:avLst/>
+            </a:prstGeom>
+            <a:solidFill>
+              <a:schemeClr val="accent6"/>
+            </a:solidFill>
+            <a:ln w="19050">
+              <a:solidFill>
+                <a:schemeClr val="bg1"/>
+              </a:solidFill>
+            </a:ln>
+            <a:effectLst/>
+          </p:spPr>
+          <p:style>
+            <a:lnRef idx="2">
+              <a:schemeClr val="accent1">
+                <a:shade val="50000"/>
+              </a:schemeClr>
+            </a:lnRef>
+            <a:fillRef idx="1">
+              <a:schemeClr val="accent1"/>
+            </a:fillRef>
+            <a:effectRef idx="0">
+              <a:schemeClr val="accent1"/>
+            </a:effectRef>
+            <a:fontRef idx="minor">
+              <a:schemeClr val="lt1"/>
+            </a:fontRef>
+          </p:style>
+          <p:txBody>
+            <a:bodyPr rtlCol="0" anchor="ctr"/>
+            <a:lstStyle/>
+            <a:p>
+              <a:pPr algn="ctr"/>
+              <a:endParaRPr lang="en-SG"/>
+            </a:p>
+          </p:txBody>
+        </p:sp>
+        <p:sp>
+          <p:nvSpPr>
+            <p:cNvPr id="65" name="Flowchart: Magnetic Disk 64"/>
+            <p:cNvSpPr/>
+            <p:nvPr/>
+          </p:nvSpPr>
+          <p:spPr>
+            <a:xfrm>
+              <a:off x="721676" y="5747165"/>
+              <a:ext cx="258469" cy="315518"/>
+            </a:xfrm>
+            <a:prstGeom prst="flowChartMagneticDisk">
+              <a:avLst/>
+            </a:prstGeom>
+            <a:solidFill>
+              <a:schemeClr val="accent6"/>
+            </a:solidFill>
+            <a:ln w="19050">
+              <a:solidFill>
+                <a:schemeClr val="bg1"/>
+              </a:solidFill>
+            </a:ln>
+            <a:effectLst/>
+          </p:spPr>
+          <p:style>
+            <a:lnRef idx="2">
+              <a:schemeClr val="accent1">
+                <a:shade val="50000"/>
+              </a:schemeClr>
+            </a:lnRef>
+            <a:fillRef idx="1">
+              <a:schemeClr val="accent1"/>
+            </a:fillRef>
+            <a:effectRef idx="0">
+              <a:schemeClr val="accent1"/>
+            </a:effectRef>
+            <a:fontRef idx="minor">
+              <a:schemeClr val="lt1"/>
+            </a:fontRef>
+          </p:style>
+          <p:txBody>
+            <a:bodyPr rtlCol="0" anchor="ctr"/>
+            <a:lstStyle/>
+            <a:p>
+              <a:pPr algn="ctr"/>
+              <a:endParaRPr lang="en-SG"/>
+            </a:p>
+          </p:txBody>
+        </p:sp>
+      </p:grpSp>
+      <p:sp>
+        <p:nvSpPr>
+          <p:cNvPr id="213" name="Rectangle 212"/>
+          <p:cNvSpPr/>
+          <p:nvPr/>
+        </p:nvSpPr>
+        <p:spPr>
+          <a:xfrm>
+            <a:off x="1636543" y="5404357"/>
+            <a:ext cx="838200" cy="838200"/>
+          </a:xfrm>
+          <a:prstGeom prst="rect">
+            <a:avLst/>
+          </a:prstGeom>
+          <a:noFill/>
+          <a:ln>
+            <a:noFill/>
+          </a:ln>
+        </p:spPr>
+        <p:style>
+          <a:lnRef idx="2">
+            <a:schemeClr val="accent1">
+              <a:shade val="50000"/>
+            </a:schemeClr>
+          </a:lnRef>
+          <a:fillRef idx="1">
+            <a:schemeClr val="accent1"/>
+          </a:fillRef>
+          <a:effectRef idx="0">
+            <a:schemeClr val="accent1"/>
+          </a:effectRef>
+          <a:fontRef idx="minor">
+            <a:schemeClr val="lt1"/>
+          </a:fontRef>
+        </p:style>
+        <p:txBody>
+          <a:bodyPr rtlCol="0" anchor="ctr"/>
+          <a:lstStyle/>
+          <a:p>
+            <a:pPr algn="ctr"/>
+            <a:endParaRPr lang="en-SG"/>
+          </a:p>
+        </p:txBody>
+      </p:sp>
+      <p:sp>
+        <p:nvSpPr>
+          <p:cNvPr id="214" name="TextBox 213"/>
+          <p:cNvSpPr txBox="1"/>
+          <p:nvPr/>
+        </p:nvSpPr>
+        <p:spPr>
+          <a:xfrm>
+            <a:off x="1604591" y="6242557"/>
+            <a:ext cx="916799" cy="215444"/>
+          </a:xfrm>
+          <a:prstGeom prst="rect">
+            <a:avLst/>
+          </a:prstGeom>
+          <a:noFill/>
+        </p:spPr>
+        <p:txBody>
+          <a:bodyPr wrap="square" rtlCol="0">
+            <a:spAutoFit/>
+          </a:bodyPr>
+          <a:lstStyle/>
+          <a:p>
+            <a:pPr algn="ctr"/>
+            <a:r>
+              <a:rPr lang="en-US" sz="800" dirty="0" smtClean="0"/>
+              <a:t>Colors </a:t>
+            </a:r>
+            <a:r>
+              <a:rPr lang="en-US" sz="800" dirty="0"/>
+              <a:t>L</a:t>
+            </a:r>
+            <a:r>
+              <a:rPr lang="en-US" sz="800" dirty="0" smtClean="0"/>
+              <a:t>ab</a:t>
+            </a:r>
+            <a:endParaRPr lang="en-SG" sz="800" dirty="0"/>
+          </a:p>
+        </p:txBody>
+      </p:sp>
+      <p:sp>
+        <p:nvSpPr>
+          <p:cNvPr id="215" name="Rectangle 4"/>
+          <p:cNvSpPr/>
+          <p:nvPr/>
+        </p:nvSpPr>
+        <p:spPr>
+          <a:xfrm rot="16200000">
+            <a:off x="1705498" y="5477560"/>
+            <a:ext cx="700291" cy="690781"/>
+          </a:xfrm>
+          <a:custGeom>
+            <a:avLst/>
+            <a:gdLst/>
+            <a:ahLst/>
+            <a:cxnLst/>
+            <a:rect l="l" t="t" r="r" b="b"/>
+            <a:pathLst>
+              <a:path w="1752603" h="1752600">
+                <a:moveTo>
+                  <a:pt x="533400" y="0"/>
+                </a:moveTo>
+                <a:lnTo>
+                  <a:pt x="533403" y="0"/>
+                </a:lnTo>
+                <a:lnTo>
+                  <a:pt x="1066800" y="0"/>
+                </a:lnTo>
+                <a:lnTo>
+                  <a:pt x="1752603" y="0"/>
+                </a:lnTo>
+                <a:lnTo>
+                  <a:pt x="1752603" y="1752600"/>
+                </a:lnTo>
+                <a:lnTo>
+                  <a:pt x="1219203" y="1752600"/>
+                </a:lnTo>
+                <a:lnTo>
+                  <a:pt x="533403" y="1752600"/>
+                </a:lnTo>
+                <a:lnTo>
+                  <a:pt x="3" y="1752600"/>
+                </a:lnTo>
+                <a:lnTo>
+                  <a:pt x="3" y="533430"/>
+                </a:lnTo>
+                <a:cubicBezTo>
+                  <a:pt x="0" y="533420"/>
+                  <a:pt x="0" y="533410"/>
+                  <a:pt x="0" y="533400"/>
+                </a:cubicBezTo>
+                <a:cubicBezTo>
+                  <a:pt x="0" y="238811"/>
+                  <a:pt x="238811" y="0"/>
+                  <a:pt x="533400" y="0"/>
+                </a:cubicBezTo>
+                <a:close/>
+              </a:path>
+            </a:pathLst>
+          </a:custGeom>
+          <a:noFill/>
+          <a:ln w="76200" cmpd="sng">
+            <a:solidFill>
+              <a:srgbClr val="0070C0"/>
+            </a:solidFill>
+            <a:miter lim="800000"/>
+          </a:ln>
+        </p:spPr>
+        <p:style>
+          <a:lnRef idx="2">
+            <a:schemeClr val="accent1">
+              <a:shade val="50000"/>
+            </a:schemeClr>
+          </a:lnRef>
+          <a:fillRef idx="1">
+            <a:schemeClr val="accent1"/>
+          </a:fillRef>
+          <a:effectRef idx="0">
+            <a:schemeClr val="accent1"/>
+          </a:effectRef>
+          <a:fontRef idx="minor">
+            <a:schemeClr val="lt1"/>
+          </a:fontRef>
+        </p:style>
+        <p:txBody>
+          <a:bodyPr rtlCol="0" anchor="ctr"/>
+          <a:lstStyle/>
+          <a:p>
+            <a:pPr algn="ctr"/>
+            <a:endParaRPr lang="en-US"/>
+          </a:p>
+        </p:txBody>
+      </p:sp>
+      <p:sp>
+        <p:nvSpPr>
+          <p:cNvPr id="71" name="Freeform 70"/>
+          <p:cNvSpPr/>
+          <p:nvPr/>
+        </p:nvSpPr>
+        <p:spPr>
+          <a:xfrm>
+            <a:off x="2110121" y="5463394"/>
+            <a:ext cx="282242" cy="315901"/>
+          </a:xfrm>
+          <a:custGeom>
+            <a:avLst/>
+            <a:gdLst>
+              <a:gd name="connsiteX0" fmla="*/ 0 w 266700"/>
+              <a:gd name="connsiteY0" fmla="*/ 23813 h 302419"/>
+              <a:gd name="connsiteX1" fmla="*/ 259556 w 266700"/>
+              <a:gd name="connsiteY1" fmla="*/ 302419 h 302419"/>
+              <a:gd name="connsiteX2" fmla="*/ 266700 w 266700"/>
+              <a:gd name="connsiteY2" fmla="*/ 0 h 302419"/>
+              <a:gd name="connsiteX3" fmla="*/ 0 w 266700"/>
+              <a:gd name="connsiteY3" fmla="*/ 23813 h 302419"/>
+            </a:gdLst>
+            <a:ahLst/>
+            <a:cxnLst>
+              <a:cxn ang="0">
+                <a:pos x="connsiteX0" y="connsiteY0"/>
+              </a:cxn>
+              <a:cxn ang="0">
+                <a:pos x="connsiteX1" y="connsiteY1"/>
+              </a:cxn>
+              <a:cxn ang="0">
+                <a:pos x="connsiteX2" y="connsiteY2"/>
+              </a:cxn>
+              <a:cxn ang="0">
+                <a:pos x="connsiteX3" y="connsiteY3"/>
+              </a:cxn>
+            </a:cxnLst>
+            <a:rect l="l" t="t" r="r" b="b"/>
+            <a:pathLst>
+              <a:path w="266700" h="302419">
+                <a:moveTo>
+                  <a:pt x="0" y="23813"/>
+                </a:moveTo>
+                <a:lnTo>
+                  <a:pt x="259556" y="302419"/>
+                </a:lnTo>
+                <a:lnTo>
+                  <a:pt x="266700" y="0"/>
+                </a:lnTo>
+                <a:lnTo>
+                  <a:pt x="0" y="23813"/>
+                </a:lnTo>
+                <a:close/>
+              </a:path>
+            </a:pathLst>
+          </a:custGeom>
+          <a:solidFill>
+            <a:srgbClr val="0070C0"/>
+          </a:solidFill>
+          <a:ln>
+            <a:noFill/>
+          </a:ln>
+        </p:spPr>
+        <p:style>
+          <a:lnRef idx="2">
+            <a:schemeClr val="accent1">
+              <a:shade val="50000"/>
+            </a:schemeClr>
+          </a:lnRef>
+          <a:fillRef idx="1">
+            <a:schemeClr val="accent1"/>
+          </a:fillRef>
+          <a:effectRef idx="0">
+            <a:schemeClr val="accent1"/>
+          </a:effectRef>
+          <a:fontRef idx="minor">
+            <a:schemeClr val="lt1"/>
+          </a:fontRef>
+        </p:style>
+        <p:txBody>
+          <a:bodyPr rtlCol="0" anchor="ctr"/>
+          <a:lstStyle/>
+          <a:p>
+            <a:pPr algn="ctr"/>
+            <a:endParaRPr lang="en-SG"/>
+          </a:p>
+        </p:txBody>
+      </p:sp>
+      <p:grpSp>
+        <p:nvGrpSpPr>
+          <p:cNvPr id="70" name="Group 69"/>
+          <p:cNvGrpSpPr/>
+          <p:nvPr/>
+        </p:nvGrpSpPr>
+        <p:grpSpPr>
+          <a:xfrm rot="2832674">
+            <a:off x="1859302" y="5543926"/>
+            <a:ext cx="354223" cy="575756"/>
+            <a:chOff x="2833184" y="5597530"/>
+            <a:chExt cx="354106" cy="575566"/>
+          </a:xfrm>
+        </p:grpSpPr>
+        <p:sp>
+          <p:nvSpPr>
+            <p:cNvPr id="216" name="Rounded Rectangle 215"/>
+            <p:cNvSpPr/>
+            <p:nvPr/>
+          </p:nvSpPr>
+          <p:spPr>
+            <a:xfrm>
+              <a:off x="2833184" y="5833301"/>
+              <a:ext cx="354106" cy="339795"/>
+            </a:xfrm>
+            <a:custGeom>
+              <a:avLst/>
+              <a:gdLst>
+                <a:gd name="connsiteX0" fmla="*/ 0 w 277919"/>
+                <a:gd name="connsiteY0" fmla="*/ 0 h 246465"/>
+                <a:gd name="connsiteX1" fmla="*/ 277919 w 277919"/>
+                <a:gd name="connsiteY1" fmla="*/ 0 h 246465"/>
+                <a:gd name="connsiteX2" fmla="*/ 277919 w 277919"/>
+                <a:gd name="connsiteY2" fmla="*/ 29657 h 246465"/>
+                <a:gd name="connsiteX3" fmla="*/ 243947 w 277919"/>
+                <a:gd name="connsiteY3" fmla="*/ 63629 h 246465"/>
+                <a:gd name="connsiteX4" fmla="*/ 168190 w 277919"/>
+                <a:gd name="connsiteY4" fmla="*/ 63629 h 246465"/>
+                <a:gd name="connsiteX5" fmla="*/ 183567 w 277919"/>
+                <a:gd name="connsiteY5" fmla="*/ 246465 h 246465"/>
+                <a:gd name="connsiteX6" fmla="*/ 94350 w 277919"/>
+                <a:gd name="connsiteY6" fmla="*/ 246465 h 246465"/>
+                <a:gd name="connsiteX7" fmla="*/ 109728 w 277919"/>
+                <a:gd name="connsiteY7" fmla="*/ 63629 h 246465"/>
+                <a:gd name="connsiteX8" fmla="*/ 33972 w 277919"/>
+                <a:gd name="connsiteY8" fmla="*/ 63629 h 246465"/>
+                <a:gd name="connsiteX9" fmla="*/ 0 w 277919"/>
+                <a:gd name="connsiteY9" fmla="*/ 29657 h 246465"/>
+                <a:gd name="connsiteX10" fmla="*/ 0 w 277919"/>
+                <a:gd name="connsiteY10" fmla="*/ 0 h 246465"/>
+                <a:gd name="connsiteX0" fmla="*/ 0 w 277919"/>
+                <a:gd name="connsiteY0" fmla="*/ 0 h 246465"/>
+                <a:gd name="connsiteX1" fmla="*/ 277919 w 277919"/>
+                <a:gd name="connsiteY1" fmla="*/ 0 h 246465"/>
+                <a:gd name="connsiteX2" fmla="*/ 277919 w 277919"/>
+                <a:gd name="connsiteY2" fmla="*/ 29657 h 246465"/>
+                <a:gd name="connsiteX3" fmla="*/ 243947 w 277919"/>
+                <a:gd name="connsiteY3" fmla="*/ 63629 h 246465"/>
+                <a:gd name="connsiteX4" fmla="*/ 168190 w 277919"/>
+                <a:gd name="connsiteY4" fmla="*/ 63629 h 246465"/>
+                <a:gd name="connsiteX5" fmla="*/ 183567 w 277919"/>
+                <a:gd name="connsiteY5" fmla="*/ 246465 h 246465"/>
+                <a:gd name="connsiteX6" fmla="*/ 94350 w 277919"/>
+                <a:gd name="connsiteY6" fmla="*/ 246465 h 246465"/>
+                <a:gd name="connsiteX7" fmla="*/ 109728 w 277919"/>
+                <a:gd name="connsiteY7" fmla="*/ 63629 h 246465"/>
+                <a:gd name="connsiteX8" fmla="*/ 33972 w 277919"/>
+                <a:gd name="connsiteY8" fmla="*/ 63629 h 246465"/>
+                <a:gd name="connsiteX9" fmla="*/ 0 w 277919"/>
+                <a:gd name="connsiteY9" fmla="*/ 29657 h 246465"/>
+                <a:gd name="connsiteX10" fmla="*/ 0 w 277919"/>
+                <a:gd name="connsiteY10" fmla="*/ 0 h 246465"/>
+              </a:gdLst>
+              <a:ahLst/>
+              <a:cxnLst>
+                <a:cxn ang="0">
+                  <a:pos x="connsiteX0" y="connsiteY0"/>
+                </a:cxn>
+                <a:cxn ang="0">
+                  <a:pos x="connsiteX1" y="connsiteY1"/>
+                </a:cxn>
+                <a:cxn ang="0">
+                  <a:pos x="connsiteX2" y="connsiteY2"/>
+                </a:cxn>
+                <a:cxn ang="0">
+                  <a:pos x="connsiteX3" y="connsiteY3"/>
+                </a:cxn>
+                <a:cxn ang="0">
+                  <a:pos x="connsiteX4" y="connsiteY4"/>
+                </a:cxn>
+                <a:cxn ang="0">
+                  <a:pos x="connsiteX5" y="connsiteY5"/>
+                </a:cxn>
+                <a:cxn ang="0">
+                  <a:pos x="connsiteX6" y="connsiteY6"/>
+                </a:cxn>
+                <a:cxn ang="0">
+                  <a:pos x="connsiteX7" y="connsiteY7"/>
+                </a:cxn>
+                <a:cxn ang="0">
+                  <a:pos x="connsiteX8" y="connsiteY8"/>
+                </a:cxn>
+                <a:cxn ang="0">
+                  <a:pos x="connsiteX9" y="connsiteY9"/>
+                </a:cxn>
+                <a:cxn ang="0">
+                  <a:pos x="connsiteX10" y="connsiteY10"/>
+                </a:cxn>
+              </a:cxnLst>
+              <a:rect l="l" t="t" r="r" b="b"/>
+              <a:pathLst>
+                <a:path w="277919" h="246465">
+                  <a:moveTo>
+                    <a:pt x="0" y="0"/>
+                  </a:moveTo>
+                  <a:lnTo>
+                    <a:pt x="277919" y="0"/>
+                  </a:lnTo>
+                  <a:lnTo>
+                    <a:pt x="277919" y="29657"/>
+                  </a:lnTo>
+                  <a:cubicBezTo>
+                    <a:pt x="277919" y="48419"/>
+                    <a:pt x="262709" y="63629"/>
+                    <a:pt x="243947" y="63629"/>
+                  </a:cubicBezTo>
+                  <a:lnTo>
+                    <a:pt x="168190" y="63629"/>
+                  </a:lnTo>
+                  <a:cubicBezTo>
+                    <a:pt x="158127" y="94102"/>
+                    <a:pt x="195874" y="215992"/>
+                    <a:pt x="183567" y="246465"/>
+                  </a:cubicBezTo>
+                  <a:cubicBezTo>
+                    <a:pt x="171260" y="276938"/>
+                    <a:pt x="106657" y="276938"/>
+                    <a:pt x="94350" y="246465"/>
+                  </a:cubicBezTo>
+                  <a:cubicBezTo>
+                    <a:pt x="82043" y="215992"/>
+                    <a:pt x="119791" y="94102"/>
+                    <a:pt x="109728" y="63629"/>
+                  </a:cubicBezTo>
+                  <a:lnTo>
+                    <a:pt x="33972" y="63629"/>
+                  </a:lnTo>
+                  <a:cubicBezTo>
+                    <a:pt x="15210" y="63629"/>
+                    <a:pt x="0" y="48419"/>
+                    <a:pt x="0" y="29657"/>
+                  </a:cubicBezTo>
+                  <a:lnTo>
+                    <a:pt x="0" y="0"/>
+                  </a:lnTo>
+                  <a:close/>
+                </a:path>
+              </a:pathLst>
+            </a:custGeom>
+            <a:solidFill>
+              <a:schemeClr val="accent6"/>
+            </a:solidFill>
+            <a:ln w="19050">
+              <a:solidFill>
+                <a:schemeClr val="bg1"/>
+              </a:solidFill>
+            </a:ln>
+            <a:effectLst/>
+          </p:spPr>
+          <p:style>
+            <a:lnRef idx="2">
+              <a:schemeClr val="accent1">
+                <a:shade val="50000"/>
+              </a:schemeClr>
+            </a:lnRef>
+            <a:fillRef idx="1">
+              <a:schemeClr val="accent1"/>
+            </a:fillRef>
+            <a:effectRef idx="0">
+              <a:schemeClr val="accent1"/>
+            </a:effectRef>
+            <a:fontRef idx="minor">
+              <a:schemeClr val="lt1"/>
+            </a:fontRef>
+          </p:style>
+          <p:txBody>
+            <a:bodyPr rtlCol="0" anchor="ctr"/>
+            <a:lstStyle/>
+            <a:p>
+              <a:pPr algn="ctr"/>
+              <a:endParaRPr lang="en-SG"/>
+            </a:p>
+          </p:txBody>
+        </p:sp>
+        <p:sp>
+          <p:nvSpPr>
+            <p:cNvPr id="68" name="Rectangle 67"/>
+            <p:cNvSpPr/>
+            <p:nvPr/>
+          </p:nvSpPr>
+          <p:spPr>
+            <a:xfrm>
+              <a:off x="2833184" y="5597530"/>
+              <a:ext cx="354106" cy="230801"/>
+            </a:xfrm>
+            <a:prstGeom prst="rect">
+              <a:avLst/>
+            </a:prstGeom>
+            <a:solidFill>
+              <a:srgbClr val="0070C0"/>
+            </a:solidFill>
+            <a:ln w="19050">
+              <a:solidFill>
+                <a:schemeClr val="bg1"/>
+              </a:solidFill>
+            </a:ln>
+            <a:effectLst/>
+          </p:spPr>
+          <p:style>
+            <a:lnRef idx="2">
+              <a:schemeClr val="accent1">
+                <a:shade val="50000"/>
+              </a:schemeClr>
+            </a:lnRef>
+            <a:fillRef idx="1">
+              <a:schemeClr val="accent1"/>
+            </a:fillRef>
+            <a:effectRef idx="0">
+              <a:schemeClr val="accent1"/>
+            </a:effectRef>
+            <a:fontRef idx="minor">
+              <a:schemeClr val="lt1"/>
+            </a:fontRef>
+          </p:style>
+          <p:txBody>
+            <a:bodyPr rtlCol="0" anchor="ctr"/>
+            <a:lstStyle/>
+            <a:p>
+              <a:pPr algn="ctr"/>
+              <a:endParaRPr lang="en-SG"/>
+            </a:p>
+          </p:txBody>
+        </p:sp>
+        <p:sp>
+          <p:nvSpPr>
+            <p:cNvPr id="69" name="Flowchart: Manual Input 68"/>
+            <p:cNvSpPr/>
+            <p:nvPr/>
+          </p:nvSpPr>
+          <p:spPr>
+            <a:xfrm>
+              <a:off x="2833184" y="5657689"/>
+              <a:ext cx="354106" cy="175610"/>
+            </a:xfrm>
+            <a:custGeom>
+              <a:avLst/>
+              <a:gdLst>
+                <a:gd name="connsiteX0" fmla="*/ 0 w 10000"/>
+                <a:gd name="connsiteY0" fmla="*/ 2000 h 10000"/>
+                <a:gd name="connsiteX1" fmla="*/ 10000 w 10000"/>
+                <a:gd name="connsiteY1" fmla="*/ 0 h 10000"/>
+                <a:gd name="connsiteX2" fmla="*/ 10000 w 10000"/>
+                <a:gd name="connsiteY2" fmla="*/ 10000 h 10000"/>
+                <a:gd name="connsiteX3" fmla="*/ 0 w 10000"/>
+                <a:gd name="connsiteY3" fmla="*/ 10000 h 10000"/>
+                <a:gd name="connsiteX4" fmla="*/ 0 w 10000"/>
+                <a:gd name="connsiteY4" fmla="*/ 2000 h 10000"/>
+                <a:gd name="connsiteX0" fmla="*/ 0 w 10000"/>
+                <a:gd name="connsiteY0" fmla="*/ 2000 h 10000"/>
+                <a:gd name="connsiteX1" fmla="*/ 2906 w 10000"/>
+                <a:gd name="connsiteY1" fmla="*/ 1528 h 10000"/>
+                <a:gd name="connsiteX2" fmla="*/ 10000 w 10000"/>
+                <a:gd name="connsiteY2" fmla="*/ 0 h 10000"/>
+                <a:gd name="connsiteX3" fmla="*/ 10000 w 10000"/>
+                <a:gd name="connsiteY3" fmla="*/ 10000 h 10000"/>
+                <a:gd name="connsiteX4" fmla="*/ 0 w 10000"/>
+                <a:gd name="connsiteY4" fmla="*/ 10000 h 10000"/>
+                <a:gd name="connsiteX5" fmla="*/ 0 w 10000"/>
+                <a:gd name="connsiteY5" fmla="*/ 2000 h 10000"/>
+                <a:gd name="connsiteX0" fmla="*/ 0 w 10000"/>
+                <a:gd name="connsiteY0" fmla="*/ 2000 h 10000"/>
+                <a:gd name="connsiteX1" fmla="*/ 2906 w 10000"/>
+                <a:gd name="connsiteY1" fmla="*/ 1528 h 10000"/>
+                <a:gd name="connsiteX2" fmla="*/ 6470 w 10000"/>
+                <a:gd name="connsiteY2" fmla="*/ 652 h 10000"/>
+                <a:gd name="connsiteX3" fmla="*/ 10000 w 10000"/>
+                <a:gd name="connsiteY3" fmla="*/ 0 h 10000"/>
+                <a:gd name="connsiteX4" fmla="*/ 10000 w 10000"/>
+                <a:gd name="connsiteY4" fmla="*/ 10000 h 10000"/>
+                <a:gd name="connsiteX5" fmla="*/ 0 w 10000"/>
+                <a:gd name="connsiteY5" fmla="*/ 10000 h 10000"/>
+                <a:gd name="connsiteX6" fmla="*/ 0 w 10000"/>
+                <a:gd name="connsiteY6" fmla="*/ 2000 h 10000"/>
+                <a:gd name="connsiteX0" fmla="*/ 0 w 10000"/>
+                <a:gd name="connsiteY0" fmla="*/ 7262 h 15262"/>
+                <a:gd name="connsiteX1" fmla="*/ 2906 w 10000"/>
+                <a:gd name="connsiteY1" fmla="*/ 6790 h 15262"/>
+                <a:gd name="connsiteX2" fmla="*/ 6470 w 10000"/>
+                <a:gd name="connsiteY2" fmla="*/ 0 h 15262"/>
+                <a:gd name="connsiteX3" fmla="*/ 10000 w 10000"/>
+                <a:gd name="connsiteY3" fmla="*/ 5262 h 15262"/>
+                <a:gd name="connsiteX4" fmla="*/ 10000 w 10000"/>
+                <a:gd name="connsiteY4" fmla="*/ 15262 h 15262"/>
+                <a:gd name="connsiteX5" fmla="*/ 0 w 10000"/>
+                <a:gd name="connsiteY5" fmla="*/ 15262 h 15262"/>
+                <a:gd name="connsiteX6" fmla="*/ 0 w 10000"/>
+                <a:gd name="connsiteY6" fmla="*/ 7262 h 15262"/>
+                <a:gd name="connsiteX0" fmla="*/ 0 w 10000"/>
+                <a:gd name="connsiteY0" fmla="*/ 7262 h 15262"/>
+                <a:gd name="connsiteX1" fmla="*/ 2772 w 10000"/>
+                <a:gd name="connsiteY1" fmla="*/ 3943 h 15262"/>
+                <a:gd name="connsiteX2" fmla="*/ 6470 w 10000"/>
+                <a:gd name="connsiteY2" fmla="*/ 0 h 15262"/>
+                <a:gd name="connsiteX3" fmla="*/ 10000 w 10000"/>
+                <a:gd name="connsiteY3" fmla="*/ 5262 h 15262"/>
+                <a:gd name="connsiteX4" fmla="*/ 10000 w 10000"/>
+                <a:gd name="connsiteY4" fmla="*/ 15262 h 15262"/>
+                <a:gd name="connsiteX5" fmla="*/ 0 w 10000"/>
+                <a:gd name="connsiteY5" fmla="*/ 15262 h 15262"/>
+                <a:gd name="connsiteX6" fmla="*/ 0 w 10000"/>
+                <a:gd name="connsiteY6" fmla="*/ 7262 h 15262"/>
+                <a:gd name="connsiteX0" fmla="*/ 0 w 10000"/>
+                <a:gd name="connsiteY0" fmla="*/ 7262 h 15262"/>
+                <a:gd name="connsiteX1" fmla="*/ 2772 w 10000"/>
+                <a:gd name="connsiteY1" fmla="*/ 3943 h 15262"/>
+                <a:gd name="connsiteX2" fmla="*/ 4453 w 10000"/>
+                <a:gd name="connsiteY2" fmla="*/ 2190 h 15262"/>
+                <a:gd name="connsiteX3" fmla="*/ 6470 w 10000"/>
+                <a:gd name="connsiteY3" fmla="*/ 0 h 15262"/>
+                <a:gd name="connsiteX4" fmla="*/ 10000 w 10000"/>
+                <a:gd name="connsiteY4" fmla="*/ 5262 h 15262"/>
+                <a:gd name="connsiteX5" fmla="*/ 10000 w 10000"/>
+                <a:gd name="connsiteY5" fmla="*/ 15262 h 15262"/>
+                <a:gd name="connsiteX6" fmla="*/ 0 w 10000"/>
+                <a:gd name="connsiteY6" fmla="*/ 15262 h 15262"/>
+                <a:gd name="connsiteX7" fmla="*/ 0 w 10000"/>
+                <a:gd name="connsiteY7" fmla="*/ 7262 h 15262"/>
+                <a:gd name="connsiteX0" fmla="*/ 0 w 10000"/>
+                <a:gd name="connsiteY0" fmla="*/ 7262 h 15262"/>
+                <a:gd name="connsiteX1" fmla="*/ 2772 w 10000"/>
+                <a:gd name="connsiteY1" fmla="*/ 3943 h 15262"/>
+                <a:gd name="connsiteX2" fmla="*/ 4722 w 10000"/>
+                <a:gd name="connsiteY2" fmla="*/ 3942 h 15262"/>
+                <a:gd name="connsiteX3" fmla="*/ 6470 w 10000"/>
+                <a:gd name="connsiteY3" fmla="*/ 0 h 15262"/>
+                <a:gd name="connsiteX4" fmla="*/ 10000 w 10000"/>
+                <a:gd name="connsiteY4" fmla="*/ 5262 h 15262"/>
+                <a:gd name="connsiteX5" fmla="*/ 10000 w 10000"/>
+                <a:gd name="connsiteY5" fmla="*/ 15262 h 15262"/>
+                <a:gd name="connsiteX6" fmla="*/ 0 w 10000"/>
+                <a:gd name="connsiteY6" fmla="*/ 15262 h 15262"/>
+                <a:gd name="connsiteX7" fmla="*/ 0 w 10000"/>
+                <a:gd name="connsiteY7" fmla="*/ 7262 h 15262"/>
+                <a:gd name="connsiteX0" fmla="*/ 0 w 10000"/>
+                <a:gd name="connsiteY0" fmla="*/ 7262 h 15262"/>
+                <a:gd name="connsiteX1" fmla="*/ 2772 w 10000"/>
+                <a:gd name="connsiteY1" fmla="*/ 3943 h 15262"/>
+                <a:gd name="connsiteX2" fmla="*/ 4722 w 10000"/>
+                <a:gd name="connsiteY2" fmla="*/ 3942 h 15262"/>
+                <a:gd name="connsiteX3" fmla="*/ 6470 w 10000"/>
+                <a:gd name="connsiteY3" fmla="*/ 0 h 15262"/>
+                <a:gd name="connsiteX4" fmla="*/ 10000 w 10000"/>
+                <a:gd name="connsiteY4" fmla="*/ 5262 h 15262"/>
+                <a:gd name="connsiteX5" fmla="*/ 10000 w 10000"/>
+                <a:gd name="connsiteY5" fmla="*/ 15262 h 15262"/>
+                <a:gd name="connsiteX6" fmla="*/ 0 w 10000"/>
+                <a:gd name="connsiteY6" fmla="*/ 15262 h 15262"/>
+                <a:gd name="connsiteX7" fmla="*/ 0 w 10000"/>
+                <a:gd name="connsiteY7" fmla="*/ 7262 h 15262"/>
+                <a:gd name="connsiteX0" fmla="*/ 0 w 10000"/>
+                <a:gd name="connsiteY0" fmla="*/ 7262 h 15262"/>
+                <a:gd name="connsiteX1" fmla="*/ 2772 w 10000"/>
+                <a:gd name="connsiteY1" fmla="*/ 3943 h 15262"/>
+                <a:gd name="connsiteX2" fmla="*/ 4722 w 10000"/>
+                <a:gd name="connsiteY2" fmla="*/ 3942 h 15262"/>
+                <a:gd name="connsiteX3" fmla="*/ 6470 w 10000"/>
+                <a:gd name="connsiteY3" fmla="*/ 0 h 15262"/>
+                <a:gd name="connsiteX4" fmla="*/ 10000 w 10000"/>
+                <a:gd name="connsiteY4" fmla="*/ 5262 h 15262"/>
+                <a:gd name="connsiteX5" fmla="*/ 10000 w 10000"/>
+                <a:gd name="connsiteY5" fmla="*/ 15262 h 15262"/>
+                <a:gd name="connsiteX6" fmla="*/ 0 w 10000"/>
+                <a:gd name="connsiteY6" fmla="*/ 15262 h 15262"/>
+                <a:gd name="connsiteX7" fmla="*/ 0 w 10000"/>
+                <a:gd name="connsiteY7" fmla="*/ 7262 h 15262"/>
+                <a:gd name="connsiteX0" fmla="*/ 0 w 10000"/>
+                <a:gd name="connsiteY0" fmla="*/ 7518 h 15518"/>
+                <a:gd name="connsiteX1" fmla="*/ 2772 w 10000"/>
+                <a:gd name="connsiteY1" fmla="*/ 4199 h 15518"/>
+                <a:gd name="connsiteX2" fmla="*/ 4722 w 10000"/>
+                <a:gd name="connsiteY2" fmla="*/ 4198 h 15518"/>
+                <a:gd name="connsiteX3" fmla="*/ 6470 w 10000"/>
+                <a:gd name="connsiteY3" fmla="*/ 256 h 15518"/>
+                <a:gd name="connsiteX4" fmla="*/ 10000 w 10000"/>
+                <a:gd name="connsiteY4" fmla="*/ 5518 h 15518"/>
+                <a:gd name="connsiteX5" fmla="*/ 10000 w 10000"/>
+                <a:gd name="connsiteY5" fmla="*/ 15518 h 15518"/>
+                <a:gd name="connsiteX6" fmla="*/ 0 w 10000"/>
+                <a:gd name="connsiteY6" fmla="*/ 15518 h 15518"/>
+                <a:gd name="connsiteX7" fmla="*/ 0 w 10000"/>
+                <a:gd name="connsiteY7" fmla="*/ 7518 h 15518"/>
+                <a:gd name="connsiteX0" fmla="*/ 0 w 10000"/>
+                <a:gd name="connsiteY0" fmla="*/ 7518 h 15518"/>
+                <a:gd name="connsiteX1" fmla="*/ 2772 w 10000"/>
+                <a:gd name="connsiteY1" fmla="*/ 4199 h 15518"/>
+                <a:gd name="connsiteX2" fmla="*/ 4722 w 10000"/>
+                <a:gd name="connsiteY2" fmla="*/ 4198 h 15518"/>
+                <a:gd name="connsiteX3" fmla="*/ 6470 w 10000"/>
+                <a:gd name="connsiteY3" fmla="*/ 256 h 15518"/>
+                <a:gd name="connsiteX4" fmla="*/ 10000 w 10000"/>
+                <a:gd name="connsiteY4" fmla="*/ 5518 h 15518"/>
+                <a:gd name="connsiteX5" fmla="*/ 10000 w 10000"/>
+                <a:gd name="connsiteY5" fmla="*/ 15518 h 15518"/>
+                <a:gd name="connsiteX6" fmla="*/ 0 w 10000"/>
+                <a:gd name="connsiteY6" fmla="*/ 15518 h 15518"/>
+                <a:gd name="connsiteX7" fmla="*/ 0 w 10000"/>
+                <a:gd name="connsiteY7" fmla="*/ 7518 h 15518"/>
+                <a:gd name="connsiteX0" fmla="*/ 0 w 10000"/>
+                <a:gd name="connsiteY0" fmla="*/ 7282 h 15282"/>
+                <a:gd name="connsiteX1" fmla="*/ 2772 w 10000"/>
+                <a:gd name="connsiteY1" fmla="*/ 3963 h 15282"/>
+                <a:gd name="connsiteX2" fmla="*/ 4722 w 10000"/>
+                <a:gd name="connsiteY2" fmla="*/ 7028 h 15282"/>
+                <a:gd name="connsiteX3" fmla="*/ 6470 w 10000"/>
+                <a:gd name="connsiteY3" fmla="*/ 20 h 15282"/>
+                <a:gd name="connsiteX4" fmla="*/ 10000 w 10000"/>
+                <a:gd name="connsiteY4" fmla="*/ 5282 h 15282"/>
+                <a:gd name="connsiteX5" fmla="*/ 10000 w 10000"/>
+                <a:gd name="connsiteY5" fmla="*/ 15282 h 15282"/>
+                <a:gd name="connsiteX6" fmla="*/ 0 w 10000"/>
+                <a:gd name="connsiteY6" fmla="*/ 15282 h 15282"/>
+                <a:gd name="connsiteX7" fmla="*/ 0 w 10000"/>
+                <a:gd name="connsiteY7" fmla="*/ 7282 h 15282"/>
+                <a:gd name="connsiteX0" fmla="*/ 0 w 10000"/>
+                <a:gd name="connsiteY0" fmla="*/ 7282 h 15282"/>
+                <a:gd name="connsiteX1" fmla="*/ 2772 w 10000"/>
+                <a:gd name="connsiteY1" fmla="*/ 3963 h 15282"/>
+                <a:gd name="connsiteX2" fmla="*/ 4722 w 10000"/>
+                <a:gd name="connsiteY2" fmla="*/ 7028 h 15282"/>
+                <a:gd name="connsiteX3" fmla="*/ 6470 w 10000"/>
+                <a:gd name="connsiteY3" fmla="*/ 20 h 15282"/>
+                <a:gd name="connsiteX4" fmla="*/ 10000 w 10000"/>
+                <a:gd name="connsiteY4" fmla="*/ 5282 h 15282"/>
+                <a:gd name="connsiteX5" fmla="*/ 10000 w 10000"/>
+                <a:gd name="connsiteY5" fmla="*/ 15282 h 15282"/>
+                <a:gd name="connsiteX6" fmla="*/ 0 w 10000"/>
+                <a:gd name="connsiteY6" fmla="*/ 15282 h 15282"/>
+                <a:gd name="connsiteX7" fmla="*/ 0 w 10000"/>
+                <a:gd name="connsiteY7" fmla="*/ 7282 h 15282"/>
+                <a:gd name="connsiteX0" fmla="*/ 0 w 10000"/>
+                <a:gd name="connsiteY0" fmla="*/ 8153 h 16153"/>
+                <a:gd name="connsiteX1" fmla="*/ 2772 w 10000"/>
+                <a:gd name="connsiteY1" fmla="*/ 4834 h 16153"/>
+                <a:gd name="connsiteX2" fmla="*/ 4722 w 10000"/>
+                <a:gd name="connsiteY2" fmla="*/ 7899 h 16153"/>
+                <a:gd name="connsiteX3" fmla="*/ 6941 w 10000"/>
+                <a:gd name="connsiteY3" fmla="*/ 15 h 16153"/>
+                <a:gd name="connsiteX4" fmla="*/ 10000 w 10000"/>
+                <a:gd name="connsiteY4" fmla="*/ 6153 h 16153"/>
+                <a:gd name="connsiteX5" fmla="*/ 10000 w 10000"/>
+                <a:gd name="connsiteY5" fmla="*/ 16153 h 16153"/>
+                <a:gd name="connsiteX6" fmla="*/ 0 w 10000"/>
+                <a:gd name="connsiteY6" fmla="*/ 16153 h 16153"/>
+                <a:gd name="connsiteX7" fmla="*/ 0 w 10000"/>
+                <a:gd name="connsiteY7" fmla="*/ 8153 h 16153"/>
+                <a:gd name="connsiteX0" fmla="*/ 0 w 10000"/>
+                <a:gd name="connsiteY0" fmla="*/ 8153 h 16153"/>
+                <a:gd name="connsiteX1" fmla="*/ 2100 w 10000"/>
+                <a:gd name="connsiteY1" fmla="*/ 3958 h 16153"/>
+                <a:gd name="connsiteX2" fmla="*/ 4722 w 10000"/>
+                <a:gd name="connsiteY2" fmla="*/ 7899 h 16153"/>
+                <a:gd name="connsiteX3" fmla="*/ 6941 w 10000"/>
+                <a:gd name="connsiteY3" fmla="*/ 15 h 16153"/>
+                <a:gd name="connsiteX4" fmla="*/ 10000 w 10000"/>
+                <a:gd name="connsiteY4" fmla="*/ 6153 h 16153"/>
+                <a:gd name="connsiteX5" fmla="*/ 10000 w 10000"/>
+                <a:gd name="connsiteY5" fmla="*/ 16153 h 16153"/>
+                <a:gd name="connsiteX6" fmla="*/ 0 w 10000"/>
+                <a:gd name="connsiteY6" fmla="*/ 16153 h 16153"/>
+                <a:gd name="connsiteX7" fmla="*/ 0 w 10000"/>
+                <a:gd name="connsiteY7" fmla="*/ 8153 h 16153"/>
+              </a:gdLst>
+              <a:ahLst/>
+              <a:cxnLst>
+                <a:cxn ang="0">
+                  <a:pos x="connsiteX0" y="connsiteY0"/>
+                </a:cxn>
+                <a:cxn ang="0">
+                  <a:pos x="connsiteX1" y="connsiteY1"/>
+                </a:cxn>
+                <a:cxn ang="0">
+                  <a:pos x="connsiteX2" y="connsiteY2"/>
+                </a:cxn>
+                <a:cxn ang="0">
+                  <a:pos x="connsiteX3" y="connsiteY3"/>
+                </a:cxn>
+                <a:cxn ang="0">
+                  <a:pos x="connsiteX4" y="connsiteY4"/>
+                </a:cxn>
+                <a:cxn ang="0">
+                  <a:pos x="connsiteX5" y="connsiteY5"/>
+                </a:cxn>
+                <a:cxn ang="0">
+                  <a:pos x="connsiteX6" y="connsiteY6"/>
+                </a:cxn>
+                <a:cxn ang="0">
+                  <a:pos x="connsiteX7" y="connsiteY7"/>
+                </a:cxn>
+              </a:cxnLst>
+              <a:rect l="l" t="t" r="r" b="b"/>
+              <a:pathLst>
+                <a:path w="10000" h="16153">
+                  <a:moveTo>
+                    <a:pt x="0" y="8153"/>
+                  </a:moveTo>
+                  <a:cubicBezTo>
+                    <a:pt x="462" y="6267"/>
+                    <a:pt x="1313" y="4000"/>
+                    <a:pt x="2100" y="3958"/>
+                  </a:cubicBezTo>
+                  <a:cubicBezTo>
+                    <a:pt x="2887" y="3916"/>
+                    <a:pt x="3915" y="8556"/>
+                    <a:pt x="4722" y="7899"/>
+                  </a:cubicBezTo>
+                  <a:cubicBezTo>
+                    <a:pt x="5529" y="7242"/>
+                    <a:pt x="6061" y="306"/>
+                    <a:pt x="6941" y="15"/>
+                  </a:cubicBezTo>
+                  <a:cubicBezTo>
+                    <a:pt x="7821" y="-276"/>
+                    <a:pt x="9412" y="3609"/>
+                    <a:pt x="10000" y="6153"/>
+                  </a:cubicBezTo>
+                  <a:lnTo>
+                    <a:pt x="10000" y="16153"/>
+                  </a:lnTo>
+                  <a:lnTo>
+                    <a:pt x="0" y="16153"/>
+                  </a:lnTo>
+                  <a:lnTo>
+                    <a:pt x="0" y="8153"/>
+                  </a:lnTo>
+                  <a:close/>
+                </a:path>
+              </a:pathLst>
+            </a:custGeom>
+            <a:solidFill>
+              <a:schemeClr val="accent6"/>
+            </a:solidFill>
+            <a:ln w="19050">
+              <a:solidFill>
+                <a:schemeClr val="bg1"/>
+              </a:solidFill>
+            </a:ln>
+            <a:effectLst/>
+          </p:spPr>
+          <p:style>
+            <a:lnRef idx="2">
+              <a:schemeClr val="accent1">
+                <a:shade val="50000"/>
+              </a:schemeClr>
+            </a:lnRef>
+            <a:fillRef idx="1">
+              <a:schemeClr val="accent1"/>
+            </a:fillRef>
+            <a:effectRef idx="0">
+              <a:schemeClr val="accent1"/>
+            </a:effectRef>
+            <a:fontRef idx="minor">
+              <a:schemeClr val="lt1"/>
+            </a:fontRef>
+          </p:style>
+          <p:txBody>
+            <a:bodyPr rtlCol="0" anchor="ctr"/>
+            <a:lstStyle/>
+            <a:p>
+              <a:pPr algn="ctr"/>
+              <a:endParaRPr lang="en-SG"/>
+            </a:p>
+          </p:txBody>
+        </p:sp>
       </p:grpSp>
     </p:spTree>
     <p:extLst>

</xml_diff>

<commit_message>
added more icons for colors lab
</commit_message>
<xml_diff>
--- a/doc/Icons.pptx
+++ b/doc/Icons.pptx
@@ -5,29 +5,30 @@
     <p:sldMasterId id="2147483648" r:id="rId1"/>
   </p:sldMasterIdLst>
   <p:notesMasterIdLst>
-    <p:notesMasterId r:id="rId4"/>
+    <p:notesMasterId r:id="rId5"/>
   </p:notesMasterIdLst>
   <p:sldIdLst>
     <p:sldId id="264" r:id="rId2"/>
-    <p:sldId id="265" r:id="rId3"/>
+    <p:sldId id="266" r:id="rId3"/>
+    <p:sldId id="265" r:id="rId4"/>
   </p:sldIdLst>
   <p:sldSz cx="9144000" cy="6858000" type="screen4x3"/>
   <p:notesSz cx="6858000" cy="9144000"/>
   <p:embeddedFontLst>
     <p:embeddedFont>
+      <p:font typeface="Rockwell Extra Bold" panose="02060903040505020403" pitchFamily="18" charset="0"/>
+      <p:bold r:id="rId6"/>
+    </p:embeddedFont>
+    <p:embeddedFont>
       <p:font typeface="Calibri" panose="020F0502020204030204" pitchFamily="34" charset="0"/>
-      <p:regular r:id="rId5"/>
-      <p:bold r:id="rId6"/>
-      <p:italic r:id="rId7"/>
-      <p:boldItalic r:id="rId8"/>
+      <p:regular r:id="rId7"/>
+      <p:bold r:id="rId8"/>
+      <p:italic r:id="rId9"/>
+      <p:boldItalic r:id="rId10"/>
     </p:embeddedFont>
     <p:embeddedFont>
       <p:font typeface="Arial Black" panose="020B0A04020102020204" pitchFamily="34" charset="0"/>
-      <p:bold r:id="rId9"/>
-    </p:embeddedFont>
-    <p:embeddedFont>
-      <p:font typeface="Rockwell Extra Bold" panose="02060903040505020403" pitchFamily="18" charset="0"/>
-      <p:bold r:id="rId10"/>
+      <p:bold r:id="rId11"/>
     </p:embeddedFont>
   </p:embeddedFontLst>
   <p:defaultTextStyle>
@@ -210,7 +211,7 @@
           <a:p>
             <a:fld id="{6699ACB9-486C-4D62-A3A7-AF98E13EFDA3}" type="datetimeFigureOut">
               <a:rPr lang="en-US" smtClean="0"/>
-              <a:t>6/26/2014</a:t>
+              <a:t>6/27/2014</a:t>
             </a:fld>
             <a:endParaRPr lang="en-US"/>
           </a:p>
@@ -543,7 +544,7 @@
           <a:p>
             <a:fld id="{8EC77E60-82A0-4F8A-A861-433B3189FA8C}" type="slidenum">
               <a:rPr lang="en-US" smtClean="0"/>
-              <a:t>2</a:t>
+              <a:t>3</a:t>
             </a:fld>
             <a:endParaRPr lang="en-US"/>
           </a:p>
@@ -744,7 +745,7 @@
             <a:fld id="{1D8BD707-D9CF-40AE-B4C6-C98DA3205C09}" type="datetimeFigureOut">
               <a:rPr lang="en-US" smtClean="0"/>
               <a:pPr/>
-              <a:t>6/26/2014</a:t>
+              <a:t>6/27/2014</a:t>
             </a:fld>
             <a:endParaRPr lang="en-US"/>
           </a:p>
@@ -911,7 +912,7 @@
             <a:fld id="{1D8BD707-D9CF-40AE-B4C6-C98DA3205C09}" type="datetimeFigureOut">
               <a:rPr lang="en-US" smtClean="0"/>
               <a:pPr/>
-              <a:t>6/26/2014</a:t>
+              <a:t>6/27/2014</a:t>
             </a:fld>
             <a:endParaRPr lang="en-US"/>
           </a:p>
@@ -1088,7 +1089,7 @@
             <a:fld id="{1D8BD707-D9CF-40AE-B4C6-C98DA3205C09}" type="datetimeFigureOut">
               <a:rPr lang="en-US" smtClean="0"/>
               <a:pPr/>
-              <a:t>6/26/2014</a:t>
+              <a:t>6/27/2014</a:t>
             </a:fld>
             <a:endParaRPr lang="en-US"/>
           </a:p>
@@ -1255,7 +1256,7 @@
             <a:fld id="{1D8BD707-D9CF-40AE-B4C6-C98DA3205C09}" type="datetimeFigureOut">
               <a:rPr lang="en-US" smtClean="0"/>
               <a:pPr/>
-              <a:t>6/26/2014</a:t>
+              <a:t>6/27/2014</a:t>
             </a:fld>
             <a:endParaRPr lang="en-US"/>
           </a:p>
@@ -1498,7 +1499,7 @@
             <a:fld id="{1D8BD707-D9CF-40AE-B4C6-C98DA3205C09}" type="datetimeFigureOut">
               <a:rPr lang="en-US" smtClean="0"/>
               <a:pPr/>
-              <a:t>6/26/2014</a:t>
+              <a:t>6/27/2014</a:t>
             </a:fld>
             <a:endParaRPr lang="en-US"/>
           </a:p>
@@ -1783,7 +1784,7 @@
             <a:fld id="{1D8BD707-D9CF-40AE-B4C6-C98DA3205C09}" type="datetimeFigureOut">
               <a:rPr lang="en-US" smtClean="0"/>
               <a:pPr/>
-              <a:t>6/26/2014</a:t>
+              <a:t>6/27/2014</a:t>
             </a:fld>
             <a:endParaRPr lang="en-US"/>
           </a:p>
@@ -2202,7 +2203,7 @@
             <a:fld id="{1D8BD707-D9CF-40AE-B4C6-C98DA3205C09}" type="datetimeFigureOut">
               <a:rPr lang="en-US" smtClean="0"/>
               <a:pPr/>
-              <a:t>6/26/2014</a:t>
+              <a:t>6/27/2014</a:t>
             </a:fld>
             <a:endParaRPr lang="en-US"/>
           </a:p>
@@ -2317,7 +2318,7 @@
             <a:fld id="{1D8BD707-D9CF-40AE-B4C6-C98DA3205C09}" type="datetimeFigureOut">
               <a:rPr lang="en-US" smtClean="0"/>
               <a:pPr/>
-              <a:t>6/26/2014</a:t>
+              <a:t>6/27/2014</a:t>
             </a:fld>
             <a:endParaRPr lang="en-US"/>
           </a:p>
@@ -2409,7 +2410,7 @@
             <a:fld id="{1D8BD707-D9CF-40AE-B4C6-C98DA3205C09}" type="datetimeFigureOut">
               <a:rPr lang="en-US" smtClean="0"/>
               <a:pPr/>
-              <a:t>6/26/2014</a:t>
+              <a:t>6/27/2014</a:t>
             </a:fld>
             <a:endParaRPr lang="en-US"/>
           </a:p>
@@ -2683,7 +2684,7 @@
             <a:fld id="{1D8BD707-D9CF-40AE-B4C6-C98DA3205C09}" type="datetimeFigureOut">
               <a:rPr lang="en-US" smtClean="0"/>
               <a:pPr/>
-              <a:t>6/26/2014</a:t>
+              <a:t>6/27/2014</a:t>
             </a:fld>
             <a:endParaRPr lang="en-US"/>
           </a:p>
@@ -2933,7 +2934,7 @@
             <a:fld id="{1D8BD707-D9CF-40AE-B4C6-C98DA3205C09}" type="datetimeFigureOut">
               <a:rPr lang="en-US" smtClean="0"/>
               <a:pPr/>
-              <a:t>6/26/2014</a:t>
+              <a:t>6/27/2014</a:t>
             </a:fld>
             <a:endParaRPr lang="en-US"/>
           </a:p>
@@ -3143,7 +3144,7 @@
             <a:fld id="{1D8BD707-D9CF-40AE-B4C6-C98DA3205C09}" type="datetimeFigureOut">
               <a:rPr lang="en-US" smtClean="0"/>
               <a:pPr/>
-              <a:t>6/26/2014</a:t>
+              <a:t>6/27/2014</a:t>
             </a:fld>
             <a:endParaRPr lang="en-US"/>
           </a:p>
@@ -5590,11 +5591,7 @@
           <a:p>
             <a:r>
               <a:rPr lang="en-US" sz="800" dirty="0" smtClean="0"/>
-              <a:t>Highlight </a:t>
-            </a:r>
-            <a:r>
-              <a:rPr lang="en-US" sz="800" dirty="0" smtClean="0"/>
-              <a:t>point</a:t>
+              <a:t>Highlight point</a:t>
             </a:r>
             <a:endParaRPr lang="en-SG" sz="800" dirty="0"/>
           </a:p>
@@ -12008,6 +12005,4052 @@
           <a:chExt cx="0" cy="0"/>
         </a:xfrm>
       </p:grpSpPr>
+      <p:sp>
+        <p:nvSpPr>
+          <p:cNvPr id="116" name="TextBox 115"/>
+          <p:cNvSpPr txBox="1"/>
+          <p:nvPr/>
+        </p:nvSpPr>
+        <p:spPr>
+          <a:xfrm>
+            <a:off x="276083" y="304800"/>
+            <a:ext cx="1220208" cy="369332"/>
+          </a:xfrm>
+          <a:prstGeom prst="rect">
+            <a:avLst/>
+          </a:prstGeom>
+          <a:noFill/>
+        </p:spPr>
+        <p:txBody>
+          <a:bodyPr wrap="square" rtlCol="0">
+            <a:spAutoFit/>
+          </a:bodyPr>
+          <a:lstStyle/>
+          <a:p>
+            <a:r>
+              <a:rPr lang="en-US" dirty="0" smtClean="0"/>
+              <a:t>Colors Lab</a:t>
+            </a:r>
+            <a:endParaRPr lang="en-SG" dirty="0"/>
+          </a:p>
+        </p:txBody>
+      </p:sp>
+      <p:sp>
+        <p:nvSpPr>
+          <p:cNvPr id="213" name="Rectangle 212"/>
+          <p:cNvSpPr/>
+          <p:nvPr/>
+        </p:nvSpPr>
+        <p:spPr>
+          <a:xfrm>
+            <a:off x="1599599" y="1174103"/>
+            <a:ext cx="838200" cy="838200"/>
+          </a:xfrm>
+          <a:prstGeom prst="rect">
+            <a:avLst/>
+          </a:prstGeom>
+          <a:noFill/>
+          <a:ln>
+            <a:noFill/>
+          </a:ln>
+        </p:spPr>
+        <p:style>
+          <a:lnRef idx="2">
+            <a:schemeClr val="accent1">
+              <a:shade val="50000"/>
+            </a:schemeClr>
+          </a:lnRef>
+          <a:fillRef idx="1">
+            <a:schemeClr val="accent1"/>
+          </a:fillRef>
+          <a:effectRef idx="0">
+            <a:schemeClr val="accent1"/>
+          </a:effectRef>
+          <a:fontRef idx="minor">
+            <a:schemeClr val="lt1"/>
+          </a:fontRef>
+        </p:style>
+        <p:txBody>
+          <a:bodyPr rtlCol="0" anchor="ctr"/>
+          <a:lstStyle/>
+          <a:p>
+            <a:pPr algn="ctr"/>
+            <a:endParaRPr lang="en-SG"/>
+          </a:p>
+        </p:txBody>
+      </p:sp>
+      <p:sp>
+        <p:nvSpPr>
+          <p:cNvPr id="214" name="TextBox 213"/>
+          <p:cNvSpPr txBox="1"/>
+          <p:nvPr/>
+        </p:nvSpPr>
+        <p:spPr>
+          <a:xfrm>
+            <a:off x="1567647" y="2012303"/>
+            <a:ext cx="916799" cy="215444"/>
+          </a:xfrm>
+          <a:prstGeom prst="rect">
+            <a:avLst/>
+          </a:prstGeom>
+          <a:noFill/>
+        </p:spPr>
+        <p:txBody>
+          <a:bodyPr wrap="square" rtlCol="0">
+            <a:spAutoFit/>
+          </a:bodyPr>
+          <a:lstStyle/>
+          <a:p>
+            <a:pPr algn="ctr"/>
+            <a:r>
+              <a:rPr lang="en-US" sz="800" dirty="0" smtClean="0"/>
+              <a:t>Colors </a:t>
+            </a:r>
+            <a:r>
+              <a:rPr lang="en-US" sz="800" dirty="0"/>
+              <a:t>L</a:t>
+            </a:r>
+            <a:r>
+              <a:rPr lang="en-US" sz="800" dirty="0" smtClean="0"/>
+              <a:t>ab</a:t>
+            </a:r>
+            <a:endParaRPr lang="en-SG" sz="800" dirty="0"/>
+          </a:p>
+        </p:txBody>
+      </p:sp>
+      <p:sp>
+        <p:nvSpPr>
+          <p:cNvPr id="215" name="Rectangle 4"/>
+          <p:cNvSpPr/>
+          <p:nvPr/>
+        </p:nvSpPr>
+        <p:spPr>
+          <a:xfrm rot="16200000">
+            <a:off x="1668554" y="1247306"/>
+            <a:ext cx="700291" cy="690781"/>
+          </a:xfrm>
+          <a:custGeom>
+            <a:avLst/>
+            <a:gdLst/>
+            <a:ahLst/>
+            <a:cxnLst/>
+            <a:rect l="l" t="t" r="r" b="b"/>
+            <a:pathLst>
+              <a:path w="1752603" h="1752600">
+                <a:moveTo>
+                  <a:pt x="533400" y="0"/>
+                </a:moveTo>
+                <a:lnTo>
+                  <a:pt x="533403" y="0"/>
+                </a:lnTo>
+                <a:lnTo>
+                  <a:pt x="1066800" y="0"/>
+                </a:lnTo>
+                <a:lnTo>
+                  <a:pt x="1752603" y="0"/>
+                </a:lnTo>
+                <a:lnTo>
+                  <a:pt x="1752603" y="1752600"/>
+                </a:lnTo>
+                <a:lnTo>
+                  <a:pt x="1219203" y="1752600"/>
+                </a:lnTo>
+                <a:lnTo>
+                  <a:pt x="533403" y="1752600"/>
+                </a:lnTo>
+                <a:lnTo>
+                  <a:pt x="3" y="1752600"/>
+                </a:lnTo>
+                <a:lnTo>
+                  <a:pt x="3" y="533430"/>
+                </a:lnTo>
+                <a:cubicBezTo>
+                  <a:pt x="0" y="533420"/>
+                  <a:pt x="0" y="533410"/>
+                  <a:pt x="0" y="533400"/>
+                </a:cubicBezTo>
+                <a:cubicBezTo>
+                  <a:pt x="0" y="238811"/>
+                  <a:pt x="238811" y="0"/>
+                  <a:pt x="533400" y="0"/>
+                </a:cubicBezTo>
+                <a:close/>
+              </a:path>
+            </a:pathLst>
+          </a:custGeom>
+          <a:noFill/>
+          <a:ln w="76200" cmpd="sng">
+            <a:solidFill>
+              <a:srgbClr val="0070C0"/>
+            </a:solidFill>
+            <a:miter lim="800000"/>
+          </a:ln>
+        </p:spPr>
+        <p:style>
+          <a:lnRef idx="2">
+            <a:schemeClr val="accent1">
+              <a:shade val="50000"/>
+            </a:schemeClr>
+          </a:lnRef>
+          <a:fillRef idx="1">
+            <a:schemeClr val="accent1"/>
+          </a:fillRef>
+          <a:effectRef idx="0">
+            <a:schemeClr val="accent1"/>
+          </a:effectRef>
+          <a:fontRef idx="minor">
+            <a:schemeClr val="lt1"/>
+          </a:fontRef>
+        </p:style>
+        <p:txBody>
+          <a:bodyPr rtlCol="0" anchor="ctr"/>
+          <a:lstStyle/>
+          <a:p>
+            <a:pPr algn="ctr"/>
+            <a:endParaRPr lang="en-US"/>
+          </a:p>
+        </p:txBody>
+      </p:sp>
+      <p:sp>
+        <p:nvSpPr>
+          <p:cNvPr id="71" name="Freeform 70"/>
+          <p:cNvSpPr/>
+          <p:nvPr/>
+        </p:nvSpPr>
+        <p:spPr>
+          <a:xfrm>
+            <a:off x="2073177" y="1233140"/>
+            <a:ext cx="282242" cy="315901"/>
+          </a:xfrm>
+          <a:custGeom>
+            <a:avLst/>
+            <a:gdLst>
+              <a:gd name="connsiteX0" fmla="*/ 0 w 266700"/>
+              <a:gd name="connsiteY0" fmla="*/ 23813 h 302419"/>
+              <a:gd name="connsiteX1" fmla="*/ 259556 w 266700"/>
+              <a:gd name="connsiteY1" fmla="*/ 302419 h 302419"/>
+              <a:gd name="connsiteX2" fmla="*/ 266700 w 266700"/>
+              <a:gd name="connsiteY2" fmla="*/ 0 h 302419"/>
+              <a:gd name="connsiteX3" fmla="*/ 0 w 266700"/>
+              <a:gd name="connsiteY3" fmla="*/ 23813 h 302419"/>
+            </a:gdLst>
+            <a:ahLst/>
+            <a:cxnLst>
+              <a:cxn ang="0">
+                <a:pos x="connsiteX0" y="connsiteY0"/>
+              </a:cxn>
+              <a:cxn ang="0">
+                <a:pos x="connsiteX1" y="connsiteY1"/>
+              </a:cxn>
+              <a:cxn ang="0">
+                <a:pos x="connsiteX2" y="connsiteY2"/>
+              </a:cxn>
+              <a:cxn ang="0">
+                <a:pos x="connsiteX3" y="connsiteY3"/>
+              </a:cxn>
+            </a:cxnLst>
+            <a:rect l="l" t="t" r="r" b="b"/>
+            <a:pathLst>
+              <a:path w="266700" h="302419">
+                <a:moveTo>
+                  <a:pt x="0" y="23813"/>
+                </a:moveTo>
+                <a:lnTo>
+                  <a:pt x="259556" y="302419"/>
+                </a:lnTo>
+                <a:lnTo>
+                  <a:pt x="266700" y="0"/>
+                </a:lnTo>
+                <a:lnTo>
+                  <a:pt x="0" y="23813"/>
+                </a:lnTo>
+                <a:close/>
+              </a:path>
+            </a:pathLst>
+          </a:custGeom>
+          <a:solidFill>
+            <a:srgbClr val="0070C0"/>
+          </a:solidFill>
+          <a:ln>
+            <a:noFill/>
+          </a:ln>
+        </p:spPr>
+        <p:style>
+          <a:lnRef idx="2">
+            <a:schemeClr val="accent1">
+              <a:shade val="50000"/>
+            </a:schemeClr>
+          </a:lnRef>
+          <a:fillRef idx="1">
+            <a:schemeClr val="accent1"/>
+          </a:fillRef>
+          <a:effectRef idx="0">
+            <a:schemeClr val="accent1"/>
+          </a:effectRef>
+          <a:fontRef idx="minor">
+            <a:schemeClr val="lt1"/>
+          </a:fontRef>
+        </p:style>
+        <p:txBody>
+          <a:bodyPr rtlCol="0" anchor="ctr"/>
+          <a:lstStyle/>
+          <a:p>
+            <a:pPr algn="ctr"/>
+            <a:endParaRPr lang="en-SG"/>
+          </a:p>
+        </p:txBody>
+      </p:sp>
+      <p:grpSp>
+        <p:nvGrpSpPr>
+          <p:cNvPr id="70" name="Group 69"/>
+          <p:cNvGrpSpPr/>
+          <p:nvPr/>
+        </p:nvGrpSpPr>
+        <p:grpSpPr>
+          <a:xfrm rot="2832674">
+            <a:off x="1822358" y="1313672"/>
+            <a:ext cx="354223" cy="575756"/>
+            <a:chOff x="2833184" y="5597530"/>
+            <a:chExt cx="354106" cy="575566"/>
+          </a:xfrm>
+        </p:grpSpPr>
+        <p:sp>
+          <p:nvSpPr>
+            <p:cNvPr id="216" name="Rounded Rectangle 215"/>
+            <p:cNvSpPr/>
+            <p:nvPr/>
+          </p:nvSpPr>
+          <p:spPr>
+            <a:xfrm>
+              <a:off x="2833184" y="5833301"/>
+              <a:ext cx="354106" cy="339795"/>
+            </a:xfrm>
+            <a:custGeom>
+              <a:avLst/>
+              <a:gdLst>
+                <a:gd name="connsiteX0" fmla="*/ 0 w 277919"/>
+                <a:gd name="connsiteY0" fmla="*/ 0 h 246465"/>
+                <a:gd name="connsiteX1" fmla="*/ 277919 w 277919"/>
+                <a:gd name="connsiteY1" fmla="*/ 0 h 246465"/>
+                <a:gd name="connsiteX2" fmla="*/ 277919 w 277919"/>
+                <a:gd name="connsiteY2" fmla="*/ 29657 h 246465"/>
+                <a:gd name="connsiteX3" fmla="*/ 243947 w 277919"/>
+                <a:gd name="connsiteY3" fmla="*/ 63629 h 246465"/>
+                <a:gd name="connsiteX4" fmla="*/ 168190 w 277919"/>
+                <a:gd name="connsiteY4" fmla="*/ 63629 h 246465"/>
+                <a:gd name="connsiteX5" fmla="*/ 183567 w 277919"/>
+                <a:gd name="connsiteY5" fmla="*/ 246465 h 246465"/>
+                <a:gd name="connsiteX6" fmla="*/ 94350 w 277919"/>
+                <a:gd name="connsiteY6" fmla="*/ 246465 h 246465"/>
+                <a:gd name="connsiteX7" fmla="*/ 109728 w 277919"/>
+                <a:gd name="connsiteY7" fmla="*/ 63629 h 246465"/>
+                <a:gd name="connsiteX8" fmla="*/ 33972 w 277919"/>
+                <a:gd name="connsiteY8" fmla="*/ 63629 h 246465"/>
+                <a:gd name="connsiteX9" fmla="*/ 0 w 277919"/>
+                <a:gd name="connsiteY9" fmla="*/ 29657 h 246465"/>
+                <a:gd name="connsiteX10" fmla="*/ 0 w 277919"/>
+                <a:gd name="connsiteY10" fmla="*/ 0 h 246465"/>
+                <a:gd name="connsiteX0" fmla="*/ 0 w 277919"/>
+                <a:gd name="connsiteY0" fmla="*/ 0 h 246465"/>
+                <a:gd name="connsiteX1" fmla="*/ 277919 w 277919"/>
+                <a:gd name="connsiteY1" fmla="*/ 0 h 246465"/>
+                <a:gd name="connsiteX2" fmla="*/ 277919 w 277919"/>
+                <a:gd name="connsiteY2" fmla="*/ 29657 h 246465"/>
+                <a:gd name="connsiteX3" fmla="*/ 243947 w 277919"/>
+                <a:gd name="connsiteY3" fmla="*/ 63629 h 246465"/>
+                <a:gd name="connsiteX4" fmla="*/ 168190 w 277919"/>
+                <a:gd name="connsiteY4" fmla="*/ 63629 h 246465"/>
+                <a:gd name="connsiteX5" fmla="*/ 183567 w 277919"/>
+                <a:gd name="connsiteY5" fmla="*/ 246465 h 246465"/>
+                <a:gd name="connsiteX6" fmla="*/ 94350 w 277919"/>
+                <a:gd name="connsiteY6" fmla="*/ 246465 h 246465"/>
+                <a:gd name="connsiteX7" fmla="*/ 109728 w 277919"/>
+                <a:gd name="connsiteY7" fmla="*/ 63629 h 246465"/>
+                <a:gd name="connsiteX8" fmla="*/ 33972 w 277919"/>
+                <a:gd name="connsiteY8" fmla="*/ 63629 h 246465"/>
+                <a:gd name="connsiteX9" fmla="*/ 0 w 277919"/>
+                <a:gd name="connsiteY9" fmla="*/ 29657 h 246465"/>
+                <a:gd name="connsiteX10" fmla="*/ 0 w 277919"/>
+                <a:gd name="connsiteY10" fmla="*/ 0 h 246465"/>
+              </a:gdLst>
+              <a:ahLst/>
+              <a:cxnLst>
+                <a:cxn ang="0">
+                  <a:pos x="connsiteX0" y="connsiteY0"/>
+                </a:cxn>
+                <a:cxn ang="0">
+                  <a:pos x="connsiteX1" y="connsiteY1"/>
+                </a:cxn>
+                <a:cxn ang="0">
+                  <a:pos x="connsiteX2" y="connsiteY2"/>
+                </a:cxn>
+                <a:cxn ang="0">
+                  <a:pos x="connsiteX3" y="connsiteY3"/>
+                </a:cxn>
+                <a:cxn ang="0">
+                  <a:pos x="connsiteX4" y="connsiteY4"/>
+                </a:cxn>
+                <a:cxn ang="0">
+                  <a:pos x="connsiteX5" y="connsiteY5"/>
+                </a:cxn>
+                <a:cxn ang="0">
+                  <a:pos x="connsiteX6" y="connsiteY6"/>
+                </a:cxn>
+                <a:cxn ang="0">
+                  <a:pos x="connsiteX7" y="connsiteY7"/>
+                </a:cxn>
+                <a:cxn ang="0">
+                  <a:pos x="connsiteX8" y="connsiteY8"/>
+                </a:cxn>
+                <a:cxn ang="0">
+                  <a:pos x="connsiteX9" y="connsiteY9"/>
+                </a:cxn>
+                <a:cxn ang="0">
+                  <a:pos x="connsiteX10" y="connsiteY10"/>
+                </a:cxn>
+              </a:cxnLst>
+              <a:rect l="l" t="t" r="r" b="b"/>
+              <a:pathLst>
+                <a:path w="277919" h="246465">
+                  <a:moveTo>
+                    <a:pt x="0" y="0"/>
+                  </a:moveTo>
+                  <a:lnTo>
+                    <a:pt x="277919" y="0"/>
+                  </a:lnTo>
+                  <a:lnTo>
+                    <a:pt x="277919" y="29657"/>
+                  </a:lnTo>
+                  <a:cubicBezTo>
+                    <a:pt x="277919" y="48419"/>
+                    <a:pt x="262709" y="63629"/>
+                    <a:pt x="243947" y="63629"/>
+                  </a:cubicBezTo>
+                  <a:lnTo>
+                    <a:pt x="168190" y="63629"/>
+                  </a:lnTo>
+                  <a:cubicBezTo>
+                    <a:pt x="158127" y="94102"/>
+                    <a:pt x="195874" y="215992"/>
+                    <a:pt x="183567" y="246465"/>
+                  </a:cubicBezTo>
+                  <a:cubicBezTo>
+                    <a:pt x="171260" y="276938"/>
+                    <a:pt x="106657" y="276938"/>
+                    <a:pt x="94350" y="246465"/>
+                  </a:cubicBezTo>
+                  <a:cubicBezTo>
+                    <a:pt x="82043" y="215992"/>
+                    <a:pt x="119791" y="94102"/>
+                    <a:pt x="109728" y="63629"/>
+                  </a:cubicBezTo>
+                  <a:lnTo>
+                    <a:pt x="33972" y="63629"/>
+                  </a:lnTo>
+                  <a:cubicBezTo>
+                    <a:pt x="15210" y="63629"/>
+                    <a:pt x="0" y="48419"/>
+                    <a:pt x="0" y="29657"/>
+                  </a:cubicBezTo>
+                  <a:lnTo>
+                    <a:pt x="0" y="0"/>
+                  </a:lnTo>
+                  <a:close/>
+                </a:path>
+              </a:pathLst>
+            </a:custGeom>
+            <a:solidFill>
+              <a:schemeClr val="accent6"/>
+            </a:solidFill>
+            <a:ln w="19050">
+              <a:solidFill>
+                <a:schemeClr val="bg1"/>
+              </a:solidFill>
+            </a:ln>
+            <a:effectLst/>
+          </p:spPr>
+          <p:style>
+            <a:lnRef idx="2">
+              <a:schemeClr val="accent1">
+                <a:shade val="50000"/>
+              </a:schemeClr>
+            </a:lnRef>
+            <a:fillRef idx="1">
+              <a:schemeClr val="accent1"/>
+            </a:fillRef>
+            <a:effectRef idx="0">
+              <a:schemeClr val="accent1"/>
+            </a:effectRef>
+            <a:fontRef idx="minor">
+              <a:schemeClr val="lt1"/>
+            </a:fontRef>
+          </p:style>
+          <p:txBody>
+            <a:bodyPr rtlCol="0" anchor="ctr"/>
+            <a:lstStyle/>
+            <a:p>
+              <a:pPr algn="ctr"/>
+              <a:endParaRPr lang="en-SG"/>
+            </a:p>
+          </p:txBody>
+        </p:sp>
+        <p:sp>
+          <p:nvSpPr>
+            <p:cNvPr id="68" name="Rectangle 67"/>
+            <p:cNvSpPr/>
+            <p:nvPr/>
+          </p:nvSpPr>
+          <p:spPr>
+            <a:xfrm>
+              <a:off x="2833184" y="5597530"/>
+              <a:ext cx="354106" cy="230801"/>
+            </a:xfrm>
+            <a:prstGeom prst="rect">
+              <a:avLst/>
+            </a:prstGeom>
+            <a:solidFill>
+              <a:srgbClr val="0070C0"/>
+            </a:solidFill>
+            <a:ln w="19050">
+              <a:solidFill>
+                <a:schemeClr val="bg1"/>
+              </a:solidFill>
+            </a:ln>
+            <a:effectLst/>
+          </p:spPr>
+          <p:style>
+            <a:lnRef idx="2">
+              <a:schemeClr val="accent1">
+                <a:shade val="50000"/>
+              </a:schemeClr>
+            </a:lnRef>
+            <a:fillRef idx="1">
+              <a:schemeClr val="accent1"/>
+            </a:fillRef>
+            <a:effectRef idx="0">
+              <a:schemeClr val="accent1"/>
+            </a:effectRef>
+            <a:fontRef idx="minor">
+              <a:schemeClr val="lt1"/>
+            </a:fontRef>
+          </p:style>
+          <p:txBody>
+            <a:bodyPr rtlCol="0" anchor="ctr"/>
+            <a:lstStyle/>
+            <a:p>
+              <a:pPr algn="ctr"/>
+              <a:endParaRPr lang="en-SG"/>
+            </a:p>
+          </p:txBody>
+        </p:sp>
+        <p:sp>
+          <p:nvSpPr>
+            <p:cNvPr id="69" name="Flowchart: Manual Input 68"/>
+            <p:cNvSpPr/>
+            <p:nvPr/>
+          </p:nvSpPr>
+          <p:spPr>
+            <a:xfrm>
+              <a:off x="2833184" y="5657689"/>
+              <a:ext cx="354106" cy="175610"/>
+            </a:xfrm>
+            <a:custGeom>
+              <a:avLst/>
+              <a:gdLst>
+                <a:gd name="connsiteX0" fmla="*/ 0 w 10000"/>
+                <a:gd name="connsiteY0" fmla="*/ 2000 h 10000"/>
+                <a:gd name="connsiteX1" fmla="*/ 10000 w 10000"/>
+                <a:gd name="connsiteY1" fmla="*/ 0 h 10000"/>
+                <a:gd name="connsiteX2" fmla="*/ 10000 w 10000"/>
+                <a:gd name="connsiteY2" fmla="*/ 10000 h 10000"/>
+                <a:gd name="connsiteX3" fmla="*/ 0 w 10000"/>
+                <a:gd name="connsiteY3" fmla="*/ 10000 h 10000"/>
+                <a:gd name="connsiteX4" fmla="*/ 0 w 10000"/>
+                <a:gd name="connsiteY4" fmla="*/ 2000 h 10000"/>
+                <a:gd name="connsiteX0" fmla="*/ 0 w 10000"/>
+                <a:gd name="connsiteY0" fmla="*/ 2000 h 10000"/>
+                <a:gd name="connsiteX1" fmla="*/ 2906 w 10000"/>
+                <a:gd name="connsiteY1" fmla="*/ 1528 h 10000"/>
+                <a:gd name="connsiteX2" fmla="*/ 10000 w 10000"/>
+                <a:gd name="connsiteY2" fmla="*/ 0 h 10000"/>
+                <a:gd name="connsiteX3" fmla="*/ 10000 w 10000"/>
+                <a:gd name="connsiteY3" fmla="*/ 10000 h 10000"/>
+                <a:gd name="connsiteX4" fmla="*/ 0 w 10000"/>
+                <a:gd name="connsiteY4" fmla="*/ 10000 h 10000"/>
+                <a:gd name="connsiteX5" fmla="*/ 0 w 10000"/>
+                <a:gd name="connsiteY5" fmla="*/ 2000 h 10000"/>
+                <a:gd name="connsiteX0" fmla="*/ 0 w 10000"/>
+                <a:gd name="connsiteY0" fmla="*/ 2000 h 10000"/>
+                <a:gd name="connsiteX1" fmla="*/ 2906 w 10000"/>
+                <a:gd name="connsiteY1" fmla="*/ 1528 h 10000"/>
+                <a:gd name="connsiteX2" fmla="*/ 6470 w 10000"/>
+                <a:gd name="connsiteY2" fmla="*/ 652 h 10000"/>
+                <a:gd name="connsiteX3" fmla="*/ 10000 w 10000"/>
+                <a:gd name="connsiteY3" fmla="*/ 0 h 10000"/>
+                <a:gd name="connsiteX4" fmla="*/ 10000 w 10000"/>
+                <a:gd name="connsiteY4" fmla="*/ 10000 h 10000"/>
+                <a:gd name="connsiteX5" fmla="*/ 0 w 10000"/>
+                <a:gd name="connsiteY5" fmla="*/ 10000 h 10000"/>
+                <a:gd name="connsiteX6" fmla="*/ 0 w 10000"/>
+                <a:gd name="connsiteY6" fmla="*/ 2000 h 10000"/>
+                <a:gd name="connsiteX0" fmla="*/ 0 w 10000"/>
+                <a:gd name="connsiteY0" fmla="*/ 7262 h 15262"/>
+                <a:gd name="connsiteX1" fmla="*/ 2906 w 10000"/>
+                <a:gd name="connsiteY1" fmla="*/ 6790 h 15262"/>
+                <a:gd name="connsiteX2" fmla="*/ 6470 w 10000"/>
+                <a:gd name="connsiteY2" fmla="*/ 0 h 15262"/>
+                <a:gd name="connsiteX3" fmla="*/ 10000 w 10000"/>
+                <a:gd name="connsiteY3" fmla="*/ 5262 h 15262"/>
+                <a:gd name="connsiteX4" fmla="*/ 10000 w 10000"/>
+                <a:gd name="connsiteY4" fmla="*/ 15262 h 15262"/>
+                <a:gd name="connsiteX5" fmla="*/ 0 w 10000"/>
+                <a:gd name="connsiteY5" fmla="*/ 15262 h 15262"/>
+                <a:gd name="connsiteX6" fmla="*/ 0 w 10000"/>
+                <a:gd name="connsiteY6" fmla="*/ 7262 h 15262"/>
+                <a:gd name="connsiteX0" fmla="*/ 0 w 10000"/>
+                <a:gd name="connsiteY0" fmla="*/ 7262 h 15262"/>
+                <a:gd name="connsiteX1" fmla="*/ 2772 w 10000"/>
+                <a:gd name="connsiteY1" fmla="*/ 3943 h 15262"/>
+                <a:gd name="connsiteX2" fmla="*/ 6470 w 10000"/>
+                <a:gd name="connsiteY2" fmla="*/ 0 h 15262"/>
+                <a:gd name="connsiteX3" fmla="*/ 10000 w 10000"/>
+                <a:gd name="connsiteY3" fmla="*/ 5262 h 15262"/>
+                <a:gd name="connsiteX4" fmla="*/ 10000 w 10000"/>
+                <a:gd name="connsiteY4" fmla="*/ 15262 h 15262"/>
+                <a:gd name="connsiteX5" fmla="*/ 0 w 10000"/>
+                <a:gd name="connsiteY5" fmla="*/ 15262 h 15262"/>
+                <a:gd name="connsiteX6" fmla="*/ 0 w 10000"/>
+                <a:gd name="connsiteY6" fmla="*/ 7262 h 15262"/>
+                <a:gd name="connsiteX0" fmla="*/ 0 w 10000"/>
+                <a:gd name="connsiteY0" fmla="*/ 7262 h 15262"/>
+                <a:gd name="connsiteX1" fmla="*/ 2772 w 10000"/>
+                <a:gd name="connsiteY1" fmla="*/ 3943 h 15262"/>
+                <a:gd name="connsiteX2" fmla="*/ 4453 w 10000"/>
+                <a:gd name="connsiteY2" fmla="*/ 2190 h 15262"/>
+                <a:gd name="connsiteX3" fmla="*/ 6470 w 10000"/>
+                <a:gd name="connsiteY3" fmla="*/ 0 h 15262"/>
+                <a:gd name="connsiteX4" fmla="*/ 10000 w 10000"/>
+                <a:gd name="connsiteY4" fmla="*/ 5262 h 15262"/>
+                <a:gd name="connsiteX5" fmla="*/ 10000 w 10000"/>
+                <a:gd name="connsiteY5" fmla="*/ 15262 h 15262"/>
+                <a:gd name="connsiteX6" fmla="*/ 0 w 10000"/>
+                <a:gd name="connsiteY6" fmla="*/ 15262 h 15262"/>
+                <a:gd name="connsiteX7" fmla="*/ 0 w 10000"/>
+                <a:gd name="connsiteY7" fmla="*/ 7262 h 15262"/>
+                <a:gd name="connsiteX0" fmla="*/ 0 w 10000"/>
+                <a:gd name="connsiteY0" fmla="*/ 7262 h 15262"/>
+                <a:gd name="connsiteX1" fmla="*/ 2772 w 10000"/>
+                <a:gd name="connsiteY1" fmla="*/ 3943 h 15262"/>
+                <a:gd name="connsiteX2" fmla="*/ 4722 w 10000"/>
+                <a:gd name="connsiteY2" fmla="*/ 3942 h 15262"/>
+                <a:gd name="connsiteX3" fmla="*/ 6470 w 10000"/>
+                <a:gd name="connsiteY3" fmla="*/ 0 h 15262"/>
+                <a:gd name="connsiteX4" fmla="*/ 10000 w 10000"/>
+                <a:gd name="connsiteY4" fmla="*/ 5262 h 15262"/>
+                <a:gd name="connsiteX5" fmla="*/ 10000 w 10000"/>
+                <a:gd name="connsiteY5" fmla="*/ 15262 h 15262"/>
+                <a:gd name="connsiteX6" fmla="*/ 0 w 10000"/>
+                <a:gd name="connsiteY6" fmla="*/ 15262 h 15262"/>
+                <a:gd name="connsiteX7" fmla="*/ 0 w 10000"/>
+                <a:gd name="connsiteY7" fmla="*/ 7262 h 15262"/>
+                <a:gd name="connsiteX0" fmla="*/ 0 w 10000"/>
+                <a:gd name="connsiteY0" fmla="*/ 7262 h 15262"/>
+                <a:gd name="connsiteX1" fmla="*/ 2772 w 10000"/>
+                <a:gd name="connsiteY1" fmla="*/ 3943 h 15262"/>
+                <a:gd name="connsiteX2" fmla="*/ 4722 w 10000"/>
+                <a:gd name="connsiteY2" fmla="*/ 3942 h 15262"/>
+                <a:gd name="connsiteX3" fmla="*/ 6470 w 10000"/>
+                <a:gd name="connsiteY3" fmla="*/ 0 h 15262"/>
+                <a:gd name="connsiteX4" fmla="*/ 10000 w 10000"/>
+                <a:gd name="connsiteY4" fmla="*/ 5262 h 15262"/>
+                <a:gd name="connsiteX5" fmla="*/ 10000 w 10000"/>
+                <a:gd name="connsiteY5" fmla="*/ 15262 h 15262"/>
+                <a:gd name="connsiteX6" fmla="*/ 0 w 10000"/>
+                <a:gd name="connsiteY6" fmla="*/ 15262 h 15262"/>
+                <a:gd name="connsiteX7" fmla="*/ 0 w 10000"/>
+                <a:gd name="connsiteY7" fmla="*/ 7262 h 15262"/>
+                <a:gd name="connsiteX0" fmla="*/ 0 w 10000"/>
+                <a:gd name="connsiteY0" fmla="*/ 7262 h 15262"/>
+                <a:gd name="connsiteX1" fmla="*/ 2772 w 10000"/>
+                <a:gd name="connsiteY1" fmla="*/ 3943 h 15262"/>
+                <a:gd name="connsiteX2" fmla="*/ 4722 w 10000"/>
+                <a:gd name="connsiteY2" fmla="*/ 3942 h 15262"/>
+                <a:gd name="connsiteX3" fmla="*/ 6470 w 10000"/>
+                <a:gd name="connsiteY3" fmla="*/ 0 h 15262"/>
+                <a:gd name="connsiteX4" fmla="*/ 10000 w 10000"/>
+                <a:gd name="connsiteY4" fmla="*/ 5262 h 15262"/>
+                <a:gd name="connsiteX5" fmla="*/ 10000 w 10000"/>
+                <a:gd name="connsiteY5" fmla="*/ 15262 h 15262"/>
+                <a:gd name="connsiteX6" fmla="*/ 0 w 10000"/>
+                <a:gd name="connsiteY6" fmla="*/ 15262 h 15262"/>
+                <a:gd name="connsiteX7" fmla="*/ 0 w 10000"/>
+                <a:gd name="connsiteY7" fmla="*/ 7262 h 15262"/>
+                <a:gd name="connsiteX0" fmla="*/ 0 w 10000"/>
+                <a:gd name="connsiteY0" fmla="*/ 7518 h 15518"/>
+                <a:gd name="connsiteX1" fmla="*/ 2772 w 10000"/>
+                <a:gd name="connsiteY1" fmla="*/ 4199 h 15518"/>
+                <a:gd name="connsiteX2" fmla="*/ 4722 w 10000"/>
+                <a:gd name="connsiteY2" fmla="*/ 4198 h 15518"/>
+                <a:gd name="connsiteX3" fmla="*/ 6470 w 10000"/>
+                <a:gd name="connsiteY3" fmla="*/ 256 h 15518"/>
+                <a:gd name="connsiteX4" fmla="*/ 10000 w 10000"/>
+                <a:gd name="connsiteY4" fmla="*/ 5518 h 15518"/>
+                <a:gd name="connsiteX5" fmla="*/ 10000 w 10000"/>
+                <a:gd name="connsiteY5" fmla="*/ 15518 h 15518"/>
+                <a:gd name="connsiteX6" fmla="*/ 0 w 10000"/>
+                <a:gd name="connsiteY6" fmla="*/ 15518 h 15518"/>
+                <a:gd name="connsiteX7" fmla="*/ 0 w 10000"/>
+                <a:gd name="connsiteY7" fmla="*/ 7518 h 15518"/>
+                <a:gd name="connsiteX0" fmla="*/ 0 w 10000"/>
+                <a:gd name="connsiteY0" fmla="*/ 7518 h 15518"/>
+                <a:gd name="connsiteX1" fmla="*/ 2772 w 10000"/>
+                <a:gd name="connsiteY1" fmla="*/ 4199 h 15518"/>
+                <a:gd name="connsiteX2" fmla="*/ 4722 w 10000"/>
+                <a:gd name="connsiteY2" fmla="*/ 4198 h 15518"/>
+                <a:gd name="connsiteX3" fmla="*/ 6470 w 10000"/>
+                <a:gd name="connsiteY3" fmla="*/ 256 h 15518"/>
+                <a:gd name="connsiteX4" fmla="*/ 10000 w 10000"/>
+                <a:gd name="connsiteY4" fmla="*/ 5518 h 15518"/>
+                <a:gd name="connsiteX5" fmla="*/ 10000 w 10000"/>
+                <a:gd name="connsiteY5" fmla="*/ 15518 h 15518"/>
+                <a:gd name="connsiteX6" fmla="*/ 0 w 10000"/>
+                <a:gd name="connsiteY6" fmla="*/ 15518 h 15518"/>
+                <a:gd name="connsiteX7" fmla="*/ 0 w 10000"/>
+                <a:gd name="connsiteY7" fmla="*/ 7518 h 15518"/>
+                <a:gd name="connsiteX0" fmla="*/ 0 w 10000"/>
+                <a:gd name="connsiteY0" fmla="*/ 7282 h 15282"/>
+                <a:gd name="connsiteX1" fmla="*/ 2772 w 10000"/>
+                <a:gd name="connsiteY1" fmla="*/ 3963 h 15282"/>
+                <a:gd name="connsiteX2" fmla="*/ 4722 w 10000"/>
+                <a:gd name="connsiteY2" fmla="*/ 7028 h 15282"/>
+                <a:gd name="connsiteX3" fmla="*/ 6470 w 10000"/>
+                <a:gd name="connsiteY3" fmla="*/ 20 h 15282"/>
+                <a:gd name="connsiteX4" fmla="*/ 10000 w 10000"/>
+                <a:gd name="connsiteY4" fmla="*/ 5282 h 15282"/>
+                <a:gd name="connsiteX5" fmla="*/ 10000 w 10000"/>
+                <a:gd name="connsiteY5" fmla="*/ 15282 h 15282"/>
+                <a:gd name="connsiteX6" fmla="*/ 0 w 10000"/>
+                <a:gd name="connsiteY6" fmla="*/ 15282 h 15282"/>
+                <a:gd name="connsiteX7" fmla="*/ 0 w 10000"/>
+                <a:gd name="connsiteY7" fmla="*/ 7282 h 15282"/>
+                <a:gd name="connsiteX0" fmla="*/ 0 w 10000"/>
+                <a:gd name="connsiteY0" fmla="*/ 7282 h 15282"/>
+                <a:gd name="connsiteX1" fmla="*/ 2772 w 10000"/>
+                <a:gd name="connsiteY1" fmla="*/ 3963 h 15282"/>
+                <a:gd name="connsiteX2" fmla="*/ 4722 w 10000"/>
+                <a:gd name="connsiteY2" fmla="*/ 7028 h 15282"/>
+                <a:gd name="connsiteX3" fmla="*/ 6470 w 10000"/>
+                <a:gd name="connsiteY3" fmla="*/ 20 h 15282"/>
+                <a:gd name="connsiteX4" fmla="*/ 10000 w 10000"/>
+                <a:gd name="connsiteY4" fmla="*/ 5282 h 15282"/>
+                <a:gd name="connsiteX5" fmla="*/ 10000 w 10000"/>
+                <a:gd name="connsiteY5" fmla="*/ 15282 h 15282"/>
+                <a:gd name="connsiteX6" fmla="*/ 0 w 10000"/>
+                <a:gd name="connsiteY6" fmla="*/ 15282 h 15282"/>
+                <a:gd name="connsiteX7" fmla="*/ 0 w 10000"/>
+                <a:gd name="connsiteY7" fmla="*/ 7282 h 15282"/>
+                <a:gd name="connsiteX0" fmla="*/ 0 w 10000"/>
+                <a:gd name="connsiteY0" fmla="*/ 8153 h 16153"/>
+                <a:gd name="connsiteX1" fmla="*/ 2772 w 10000"/>
+                <a:gd name="connsiteY1" fmla="*/ 4834 h 16153"/>
+                <a:gd name="connsiteX2" fmla="*/ 4722 w 10000"/>
+                <a:gd name="connsiteY2" fmla="*/ 7899 h 16153"/>
+                <a:gd name="connsiteX3" fmla="*/ 6941 w 10000"/>
+                <a:gd name="connsiteY3" fmla="*/ 15 h 16153"/>
+                <a:gd name="connsiteX4" fmla="*/ 10000 w 10000"/>
+                <a:gd name="connsiteY4" fmla="*/ 6153 h 16153"/>
+                <a:gd name="connsiteX5" fmla="*/ 10000 w 10000"/>
+                <a:gd name="connsiteY5" fmla="*/ 16153 h 16153"/>
+                <a:gd name="connsiteX6" fmla="*/ 0 w 10000"/>
+                <a:gd name="connsiteY6" fmla="*/ 16153 h 16153"/>
+                <a:gd name="connsiteX7" fmla="*/ 0 w 10000"/>
+                <a:gd name="connsiteY7" fmla="*/ 8153 h 16153"/>
+                <a:gd name="connsiteX0" fmla="*/ 0 w 10000"/>
+                <a:gd name="connsiteY0" fmla="*/ 8153 h 16153"/>
+                <a:gd name="connsiteX1" fmla="*/ 2100 w 10000"/>
+                <a:gd name="connsiteY1" fmla="*/ 3958 h 16153"/>
+                <a:gd name="connsiteX2" fmla="*/ 4722 w 10000"/>
+                <a:gd name="connsiteY2" fmla="*/ 7899 h 16153"/>
+                <a:gd name="connsiteX3" fmla="*/ 6941 w 10000"/>
+                <a:gd name="connsiteY3" fmla="*/ 15 h 16153"/>
+                <a:gd name="connsiteX4" fmla="*/ 10000 w 10000"/>
+                <a:gd name="connsiteY4" fmla="*/ 6153 h 16153"/>
+                <a:gd name="connsiteX5" fmla="*/ 10000 w 10000"/>
+                <a:gd name="connsiteY5" fmla="*/ 16153 h 16153"/>
+                <a:gd name="connsiteX6" fmla="*/ 0 w 10000"/>
+                <a:gd name="connsiteY6" fmla="*/ 16153 h 16153"/>
+                <a:gd name="connsiteX7" fmla="*/ 0 w 10000"/>
+                <a:gd name="connsiteY7" fmla="*/ 8153 h 16153"/>
+              </a:gdLst>
+              <a:ahLst/>
+              <a:cxnLst>
+                <a:cxn ang="0">
+                  <a:pos x="connsiteX0" y="connsiteY0"/>
+                </a:cxn>
+                <a:cxn ang="0">
+                  <a:pos x="connsiteX1" y="connsiteY1"/>
+                </a:cxn>
+                <a:cxn ang="0">
+                  <a:pos x="connsiteX2" y="connsiteY2"/>
+                </a:cxn>
+                <a:cxn ang="0">
+                  <a:pos x="connsiteX3" y="connsiteY3"/>
+                </a:cxn>
+                <a:cxn ang="0">
+                  <a:pos x="connsiteX4" y="connsiteY4"/>
+                </a:cxn>
+                <a:cxn ang="0">
+                  <a:pos x="connsiteX5" y="connsiteY5"/>
+                </a:cxn>
+                <a:cxn ang="0">
+                  <a:pos x="connsiteX6" y="connsiteY6"/>
+                </a:cxn>
+                <a:cxn ang="0">
+                  <a:pos x="connsiteX7" y="connsiteY7"/>
+                </a:cxn>
+              </a:cxnLst>
+              <a:rect l="l" t="t" r="r" b="b"/>
+              <a:pathLst>
+                <a:path w="10000" h="16153">
+                  <a:moveTo>
+                    <a:pt x="0" y="8153"/>
+                  </a:moveTo>
+                  <a:cubicBezTo>
+                    <a:pt x="462" y="6267"/>
+                    <a:pt x="1313" y="4000"/>
+                    <a:pt x="2100" y="3958"/>
+                  </a:cubicBezTo>
+                  <a:cubicBezTo>
+                    <a:pt x="2887" y="3916"/>
+                    <a:pt x="3915" y="8556"/>
+                    <a:pt x="4722" y="7899"/>
+                  </a:cubicBezTo>
+                  <a:cubicBezTo>
+                    <a:pt x="5529" y="7242"/>
+                    <a:pt x="6061" y="306"/>
+                    <a:pt x="6941" y="15"/>
+                  </a:cubicBezTo>
+                  <a:cubicBezTo>
+                    <a:pt x="7821" y="-276"/>
+                    <a:pt x="9412" y="3609"/>
+                    <a:pt x="10000" y="6153"/>
+                  </a:cubicBezTo>
+                  <a:lnTo>
+                    <a:pt x="10000" y="16153"/>
+                  </a:lnTo>
+                  <a:lnTo>
+                    <a:pt x="0" y="16153"/>
+                  </a:lnTo>
+                  <a:lnTo>
+                    <a:pt x="0" y="8153"/>
+                  </a:lnTo>
+                  <a:close/>
+                </a:path>
+              </a:pathLst>
+            </a:custGeom>
+            <a:solidFill>
+              <a:schemeClr val="accent6"/>
+            </a:solidFill>
+            <a:ln w="19050">
+              <a:solidFill>
+                <a:schemeClr val="bg1"/>
+              </a:solidFill>
+            </a:ln>
+            <a:effectLst/>
+          </p:spPr>
+          <p:style>
+            <a:lnRef idx="2">
+              <a:schemeClr val="accent1">
+                <a:shade val="50000"/>
+              </a:schemeClr>
+            </a:lnRef>
+            <a:fillRef idx="1">
+              <a:schemeClr val="accent1"/>
+            </a:fillRef>
+            <a:effectRef idx="0">
+              <a:schemeClr val="accent1"/>
+            </a:effectRef>
+            <a:fontRef idx="minor">
+              <a:schemeClr val="lt1"/>
+            </a:fontRef>
+          </p:style>
+          <p:txBody>
+            <a:bodyPr rtlCol="0" anchor="ctr"/>
+            <a:lstStyle/>
+            <a:p>
+              <a:pPr algn="ctr"/>
+              <a:endParaRPr lang="en-SG"/>
+            </a:p>
+          </p:txBody>
+        </p:sp>
+      </p:grpSp>
+      <p:grpSp>
+        <p:nvGrpSpPr>
+          <p:cNvPr id="98" name="Group 97"/>
+          <p:cNvGrpSpPr/>
+          <p:nvPr/>
+        </p:nvGrpSpPr>
+        <p:grpSpPr>
+          <a:xfrm>
+            <a:off x="1592523" y="3463267"/>
+            <a:ext cx="421200" cy="420624"/>
+            <a:chOff x="2605155" y="2844833"/>
+            <a:chExt cx="421200" cy="420624"/>
+          </a:xfrm>
+        </p:grpSpPr>
+        <p:sp>
+          <p:nvSpPr>
+            <p:cNvPr id="193" name="Rectangle 192"/>
+            <p:cNvSpPr/>
+            <p:nvPr/>
+          </p:nvSpPr>
+          <p:spPr>
+            <a:xfrm rot="5400000" flipH="1">
+              <a:off x="2605443" y="2844545"/>
+              <a:ext cx="420624" cy="421200"/>
+            </a:xfrm>
+            <a:prstGeom prst="rect">
+              <a:avLst/>
+            </a:prstGeom>
+            <a:solidFill>
+              <a:srgbClr val="0070C0"/>
+            </a:solidFill>
+            <a:ln>
+              <a:noFill/>
+            </a:ln>
+          </p:spPr>
+          <p:style>
+            <a:lnRef idx="2">
+              <a:schemeClr val="accent1">
+                <a:shade val="50000"/>
+              </a:schemeClr>
+            </a:lnRef>
+            <a:fillRef idx="1">
+              <a:schemeClr val="accent1"/>
+            </a:fillRef>
+            <a:effectRef idx="0">
+              <a:schemeClr val="accent1"/>
+            </a:effectRef>
+            <a:fontRef idx="minor">
+              <a:schemeClr val="lt1"/>
+            </a:fontRef>
+          </p:style>
+          <p:txBody>
+            <a:bodyPr wrap="none" lIns="0" tIns="0" rIns="0" bIns="0" rtlCol="0" anchor="ctr"/>
+            <a:lstStyle/>
+            <a:p>
+              <a:pPr algn="ctr"/>
+              <a:endParaRPr lang="en-US" b="1"/>
+            </a:p>
+          </p:txBody>
+        </p:sp>
+        <p:sp>
+          <p:nvSpPr>
+            <p:cNvPr id="194" name="Rectangle 193"/>
+            <p:cNvSpPr/>
+            <p:nvPr/>
+          </p:nvSpPr>
+          <p:spPr>
+            <a:xfrm>
+              <a:off x="2672422" y="3173339"/>
+              <a:ext cx="286665" cy="53741"/>
+            </a:xfrm>
+            <a:prstGeom prst="rect">
+              <a:avLst/>
+            </a:prstGeom>
+            <a:solidFill>
+              <a:schemeClr val="bg1"/>
+            </a:solidFill>
+            <a:ln>
+              <a:noFill/>
+            </a:ln>
+          </p:spPr>
+          <p:style>
+            <a:lnRef idx="2">
+              <a:schemeClr val="accent1">
+                <a:shade val="50000"/>
+              </a:schemeClr>
+            </a:lnRef>
+            <a:fillRef idx="1">
+              <a:schemeClr val="accent1"/>
+            </a:fillRef>
+            <a:effectRef idx="0">
+              <a:schemeClr val="accent1"/>
+            </a:effectRef>
+            <a:fontRef idx="minor">
+              <a:schemeClr val="lt1"/>
+            </a:fontRef>
+          </p:style>
+          <p:txBody>
+            <a:bodyPr rtlCol="0" anchor="ctr"/>
+            <a:lstStyle/>
+            <a:p>
+              <a:pPr algn="ctr"/>
+              <a:endParaRPr lang="en-SG"/>
+            </a:p>
+          </p:txBody>
+        </p:sp>
+        <p:sp>
+          <p:nvSpPr>
+            <p:cNvPr id="87" name="Freeform 86"/>
+            <p:cNvSpPr/>
+            <p:nvPr/>
+          </p:nvSpPr>
+          <p:spPr>
+            <a:xfrm>
+              <a:off x="2681288" y="2907506"/>
+              <a:ext cx="176212" cy="211932"/>
+            </a:xfrm>
+            <a:custGeom>
+              <a:avLst/>
+              <a:gdLst>
+                <a:gd name="connsiteX0" fmla="*/ 176212 w 176212"/>
+                <a:gd name="connsiteY0" fmla="*/ 0 h 211932"/>
+                <a:gd name="connsiteX1" fmla="*/ 0 w 176212"/>
+                <a:gd name="connsiteY1" fmla="*/ 0 h 211932"/>
+                <a:gd name="connsiteX2" fmla="*/ 0 w 176212"/>
+                <a:gd name="connsiteY2" fmla="*/ 211932 h 211932"/>
+                <a:gd name="connsiteX3" fmla="*/ 69056 w 176212"/>
+                <a:gd name="connsiteY3" fmla="*/ 211932 h 211932"/>
+              </a:gdLst>
+              <a:ahLst/>
+              <a:cxnLst>
+                <a:cxn ang="0">
+                  <a:pos x="connsiteX0" y="connsiteY0"/>
+                </a:cxn>
+                <a:cxn ang="0">
+                  <a:pos x="connsiteX1" y="connsiteY1"/>
+                </a:cxn>
+                <a:cxn ang="0">
+                  <a:pos x="connsiteX2" y="connsiteY2"/>
+                </a:cxn>
+                <a:cxn ang="0">
+                  <a:pos x="connsiteX3" y="connsiteY3"/>
+                </a:cxn>
+              </a:cxnLst>
+              <a:rect l="l" t="t" r="r" b="b"/>
+              <a:pathLst>
+                <a:path w="176212" h="211932">
+                  <a:moveTo>
+                    <a:pt x="176212" y="0"/>
+                  </a:moveTo>
+                  <a:lnTo>
+                    <a:pt x="0" y="0"/>
+                  </a:lnTo>
+                  <a:lnTo>
+                    <a:pt x="0" y="211932"/>
+                  </a:lnTo>
+                  <a:lnTo>
+                    <a:pt x="69056" y="211932"/>
+                  </a:lnTo>
+                </a:path>
+              </a:pathLst>
+            </a:custGeom>
+            <a:noFill/>
+            <a:ln>
+              <a:solidFill>
+                <a:schemeClr val="bg1"/>
+              </a:solidFill>
+            </a:ln>
+          </p:spPr>
+          <p:style>
+            <a:lnRef idx="2">
+              <a:schemeClr val="accent1">
+                <a:shade val="50000"/>
+              </a:schemeClr>
+            </a:lnRef>
+            <a:fillRef idx="1">
+              <a:schemeClr val="accent1"/>
+            </a:fillRef>
+            <a:effectRef idx="0">
+              <a:schemeClr val="accent1"/>
+            </a:effectRef>
+            <a:fontRef idx="minor">
+              <a:schemeClr val="lt1"/>
+            </a:fontRef>
+          </p:style>
+          <p:txBody>
+            <a:bodyPr rtlCol="0" anchor="ctr"/>
+            <a:lstStyle/>
+            <a:p>
+              <a:pPr algn="ctr"/>
+              <a:endParaRPr lang="en-SG"/>
+            </a:p>
+          </p:txBody>
+        </p:sp>
+        <p:grpSp>
+          <p:nvGrpSpPr>
+            <p:cNvPr id="95" name="Group 94"/>
+            <p:cNvGrpSpPr/>
+            <p:nvPr/>
+          </p:nvGrpSpPr>
+          <p:grpSpPr>
+            <a:xfrm rot="13469378">
+              <a:off x="2816394" y="2899622"/>
+              <a:ext cx="92295" cy="269595"/>
+              <a:chOff x="1423988" y="3468049"/>
+              <a:chExt cx="57583" cy="168200"/>
+            </a:xfrm>
+          </p:grpSpPr>
+          <p:sp>
+            <p:nvSpPr>
+              <p:cNvPr id="93" name="Rectangle 92"/>
+              <p:cNvSpPr/>
+              <p:nvPr/>
+            </p:nvSpPr>
+            <p:spPr>
+              <a:xfrm>
+                <a:off x="1423988" y="3526630"/>
+                <a:ext cx="57583" cy="109619"/>
+              </a:xfrm>
+              <a:prstGeom prst="rect">
+                <a:avLst/>
+              </a:prstGeom>
+              <a:solidFill>
+                <a:schemeClr val="bg1"/>
+              </a:solidFill>
+              <a:ln>
+                <a:noFill/>
+              </a:ln>
+            </p:spPr>
+            <p:style>
+              <a:lnRef idx="2">
+                <a:schemeClr val="accent1">
+                  <a:shade val="50000"/>
+                </a:schemeClr>
+              </a:lnRef>
+              <a:fillRef idx="1">
+                <a:schemeClr val="accent1"/>
+              </a:fillRef>
+              <a:effectRef idx="0">
+                <a:schemeClr val="accent1"/>
+              </a:effectRef>
+              <a:fontRef idx="minor">
+                <a:schemeClr val="lt1"/>
+              </a:fontRef>
+            </p:style>
+            <p:txBody>
+              <a:bodyPr rtlCol="0" anchor="ctr"/>
+              <a:lstStyle/>
+              <a:p>
+                <a:pPr algn="ctr"/>
+                <a:endParaRPr lang="en-SG"/>
+              </a:p>
+            </p:txBody>
+          </p:sp>
+          <p:sp>
+            <p:nvSpPr>
+              <p:cNvPr id="94" name="Flowchart: Extract 93"/>
+              <p:cNvSpPr/>
+              <p:nvPr/>
+            </p:nvSpPr>
+            <p:spPr>
+              <a:xfrm>
+                <a:off x="1423988" y="3468049"/>
+                <a:ext cx="57583" cy="45719"/>
+              </a:xfrm>
+              <a:prstGeom prst="flowChartExtract">
+                <a:avLst/>
+              </a:prstGeom>
+              <a:solidFill>
+                <a:schemeClr val="bg1"/>
+              </a:solidFill>
+              <a:ln>
+                <a:noFill/>
+              </a:ln>
+            </p:spPr>
+            <p:style>
+              <a:lnRef idx="2">
+                <a:schemeClr val="accent1">
+                  <a:shade val="50000"/>
+                </a:schemeClr>
+              </a:lnRef>
+              <a:fillRef idx="1">
+                <a:schemeClr val="accent1"/>
+              </a:fillRef>
+              <a:effectRef idx="0">
+                <a:schemeClr val="accent1"/>
+              </a:effectRef>
+              <a:fontRef idx="minor">
+                <a:schemeClr val="lt1"/>
+              </a:fontRef>
+            </p:style>
+            <p:txBody>
+              <a:bodyPr rtlCol="0" anchor="ctr"/>
+              <a:lstStyle/>
+              <a:p>
+                <a:pPr algn="ctr"/>
+                <a:endParaRPr lang="en-SG"/>
+              </a:p>
+            </p:txBody>
+          </p:sp>
+        </p:grpSp>
+      </p:grpSp>
+      <p:grpSp>
+        <p:nvGrpSpPr>
+          <p:cNvPr id="97" name="Group 96"/>
+          <p:cNvGrpSpPr/>
+          <p:nvPr/>
+        </p:nvGrpSpPr>
+        <p:grpSpPr>
+          <a:xfrm>
+            <a:off x="1075091" y="3461555"/>
+            <a:ext cx="421200" cy="420624"/>
+            <a:chOff x="1651977" y="3432908"/>
+            <a:chExt cx="421200" cy="420624"/>
+          </a:xfrm>
+        </p:grpSpPr>
+        <p:sp>
+          <p:nvSpPr>
+            <p:cNvPr id="197" name="Rectangle 196"/>
+            <p:cNvSpPr/>
+            <p:nvPr/>
+          </p:nvSpPr>
+          <p:spPr>
+            <a:xfrm rot="5400000" flipH="1">
+              <a:off x="1652265" y="3432620"/>
+              <a:ext cx="420624" cy="421200"/>
+            </a:xfrm>
+            <a:prstGeom prst="rect">
+              <a:avLst/>
+            </a:prstGeom>
+            <a:solidFill>
+              <a:srgbClr val="0070C0"/>
+            </a:solidFill>
+            <a:ln>
+              <a:noFill/>
+            </a:ln>
+          </p:spPr>
+          <p:style>
+            <a:lnRef idx="2">
+              <a:schemeClr val="accent1">
+                <a:shade val="50000"/>
+              </a:schemeClr>
+            </a:lnRef>
+            <a:fillRef idx="1">
+              <a:schemeClr val="accent1"/>
+            </a:fillRef>
+            <a:effectRef idx="0">
+              <a:schemeClr val="accent1"/>
+            </a:effectRef>
+            <a:fontRef idx="minor">
+              <a:schemeClr val="lt1"/>
+            </a:fontRef>
+          </p:style>
+          <p:txBody>
+            <a:bodyPr wrap="none" lIns="0" tIns="0" rIns="0" bIns="0" rtlCol="0" anchor="ctr"/>
+            <a:lstStyle/>
+            <a:p>
+              <a:pPr algn="ctr"/>
+              <a:endParaRPr lang="en-US" b="1"/>
+            </a:p>
+          </p:txBody>
+        </p:sp>
+        <p:sp>
+          <p:nvSpPr>
+            <p:cNvPr id="198" name="Rectangle 197"/>
+            <p:cNvSpPr/>
+            <p:nvPr/>
+          </p:nvSpPr>
+          <p:spPr>
+            <a:xfrm>
+              <a:off x="1719244" y="3761414"/>
+              <a:ext cx="286665" cy="53741"/>
+            </a:xfrm>
+            <a:prstGeom prst="rect">
+              <a:avLst/>
+            </a:prstGeom>
+            <a:solidFill>
+              <a:schemeClr val="bg1"/>
+            </a:solidFill>
+            <a:ln>
+              <a:noFill/>
+            </a:ln>
+          </p:spPr>
+          <p:style>
+            <a:lnRef idx="2">
+              <a:schemeClr val="accent1">
+                <a:shade val="50000"/>
+              </a:schemeClr>
+            </a:lnRef>
+            <a:fillRef idx="1">
+              <a:schemeClr val="accent1"/>
+            </a:fillRef>
+            <a:effectRef idx="0">
+              <a:schemeClr val="accent1"/>
+            </a:effectRef>
+            <a:fontRef idx="minor">
+              <a:schemeClr val="lt1"/>
+            </a:fontRef>
+          </p:style>
+          <p:txBody>
+            <a:bodyPr rtlCol="0" anchor="ctr"/>
+            <a:lstStyle/>
+            <a:p>
+              <a:pPr algn="ctr"/>
+              <a:endParaRPr lang="en-SG"/>
+            </a:p>
+          </p:txBody>
+        </p:sp>
+        <p:pic>
+          <p:nvPicPr>
+            <p:cNvPr id="1027" name="Picture 3"/>
+            <p:cNvPicPr>
+              <a:picLocks noChangeAspect="1" noChangeArrowheads="1"/>
+            </p:cNvPicPr>
+            <p:nvPr/>
+          </p:nvPicPr>
+          <p:blipFill rotWithShape="1">
+            <a:blip r:embed="rId2" cstate="print">
+              <a:extLst>
+                <a:ext uri="{28A0092B-C50C-407E-A947-70E740481C1C}">
+                  <a14:useLocalDpi xmlns:a14="http://schemas.microsoft.com/office/drawing/2010/main" val="0"/>
+                </a:ext>
+              </a:extLst>
+            </a:blip>
+            <a:srcRect l="27640" t="23050" r="28698" b="39524"/>
+            <a:stretch/>
+          </p:blipFill>
+          <p:spPr bwMode="auto">
+            <a:xfrm>
+              <a:off x="1717647" y="3466529"/>
+              <a:ext cx="286665" cy="260688"/>
+            </a:xfrm>
+            <a:prstGeom prst="rect">
+              <a:avLst/>
+            </a:prstGeom>
+            <a:noFill/>
+            <a:ln>
+              <a:noFill/>
+            </a:ln>
+            <a:effectLst/>
+            <a:extLst>
+              <a:ext uri="{909E8E84-426E-40DD-AFC4-6F175D3DCCD1}">
+                <a14:hiddenFill xmlns:a14="http://schemas.microsoft.com/office/drawing/2010/main">
+                  <a:solidFill>
+                    <a:schemeClr val="accent1"/>
+                  </a:solidFill>
+                </a14:hiddenFill>
+              </a:ext>
+              <a:ext uri="{91240B29-F687-4F45-9708-019B960494DF}">
+                <a14:hiddenLine xmlns:a14="http://schemas.microsoft.com/office/drawing/2010/main" w="9525">
+                  <a:solidFill>
+                    <a:schemeClr val="tx1"/>
+                  </a:solidFill>
+                  <a:miter lim="800000"/>
+                  <a:headEnd/>
+                  <a:tailEnd/>
+                </a14:hiddenLine>
+              </a:ext>
+              <a:ext uri="{AF507438-7753-43E0-B8FC-AC1667EBCBE1}">
+                <a14:hiddenEffects xmlns:a14="http://schemas.microsoft.com/office/drawing/2010/main">
+                  <a:effectLst>
+                    <a:outerShdw dist="35921" dir="2700000" algn="ctr" rotWithShape="0">
+                      <a:schemeClr val="bg2"/>
+                    </a:outerShdw>
+                  </a:effectLst>
+                </a14:hiddenEffects>
+              </a:ext>
+            </a:extLst>
+          </p:spPr>
+        </p:pic>
+      </p:grpSp>
+      <p:sp>
+        <p:nvSpPr>
+          <p:cNvPr id="204" name="Rectangle 203"/>
+          <p:cNvSpPr/>
+          <p:nvPr/>
+        </p:nvSpPr>
+        <p:spPr>
+          <a:xfrm rot="5400000" flipH="1">
+            <a:off x="2126304" y="3466152"/>
+            <a:ext cx="420624" cy="421200"/>
+          </a:xfrm>
+          <a:prstGeom prst="rect">
+            <a:avLst/>
+          </a:prstGeom>
+          <a:solidFill>
+            <a:srgbClr val="0070C0"/>
+          </a:solidFill>
+          <a:ln>
+            <a:noFill/>
+          </a:ln>
+        </p:spPr>
+        <p:style>
+          <a:lnRef idx="2">
+            <a:schemeClr val="accent1">
+              <a:shade val="50000"/>
+            </a:schemeClr>
+          </a:lnRef>
+          <a:fillRef idx="1">
+            <a:schemeClr val="accent1"/>
+          </a:fillRef>
+          <a:effectRef idx="0">
+            <a:schemeClr val="accent1"/>
+          </a:effectRef>
+          <a:fontRef idx="minor">
+            <a:schemeClr val="lt1"/>
+          </a:fontRef>
+        </p:style>
+        <p:txBody>
+          <a:bodyPr wrap="none" lIns="0" tIns="0" rIns="0" bIns="0" rtlCol="0" anchor="ctr"/>
+          <a:lstStyle/>
+          <a:p>
+            <a:pPr algn="ctr"/>
+            <a:endParaRPr lang="en-US" b="1"/>
+          </a:p>
+        </p:txBody>
+      </p:sp>
+      <p:sp>
+        <p:nvSpPr>
+          <p:cNvPr id="85" name="Flowchart: Magnetic Disk 84"/>
+          <p:cNvSpPr/>
+          <p:nvPr/>
+        </p:nvSpPr>
+        <p:spPr>
+          <a:xfrm rot="3019103">
+            <a:off x="2208671" y="3558244"/>
+            <a:ext cx="172717" cy="218436"/>
+          </a:xfrm>
+          <a:prstGeom prst="flowChartMagneticDisk">
+            <a:avLst/>
+          </a:prstGeom>
+          <a:noFill/>
+          <a:ln>
+            <a:solidFill>
+              <a:schemeClr val="bg1"/>
+            </a:solidFill>
+          </a:ln>
+        </p:spPr>
+        <p:style>
+          <a:lnRef idx="2">
+            <a:schemeClr val="accent1">
+              <a:shade val="50000"/>
+            </a:schemeClr>
+          </a:lnRef>
+          <a:fillRef idx="1">
+            <a:schemeClr val="accent1"/>
+          </a:fillRef>
+          <a:effectRef idx="0">
+            <a:schemeClr val="accent1"/>
+          </a:effectRef>
+          <a:fontRef idx="minor">
+            <a:schemeClr val="lt1"/>
+          </a:fontRef>
+        </p:style>
+        <p:txBody>
+          <a:bodyPr rtlCol="0" anchor="ctr"/>
+          <a:lstStyle/>
+          <a:p>
+            <a:pPr algn="ctr"/>
+            <a:endParaRPr lang="en-SG"/>
+          </a:p>
+        </p:txBody>
+      </p:sp>
+      <p:sp>
+        <p:nvSpPr>
+          <p:cNvPr id="101" name="Freeform 100"/>
+          <p:cNvSpPr/>
+          <p:nvPr/>
+        </p:nvSpPr>
+        <p:spPr>
+          <a:xfrm>
+            <a:off x="2338389" y="3650457"/>
+            <a:ext cx="179327" cy="189339"/>
+          </a:xfrm>
+          <a:custGeom>
+            <a:avLst/>
+            <a:gdLst>
+              <a:gd name="connsiteX0" fmla="*/ 0 w 159544"/>
+              <a:gd name="connsiteY0" fmla="*/ 4762 h 164306"/>
+              <a:gd name="connsiteX1" fmla="*/ 66675 w 159544"/>
+              <a:gd name="connsiteY1" fmla="*/ 0 h 164306"/>
+              <a:gd name="connsiteX2" fmla="*/ 90488 w 159544"/>
+              <a:gd name="connsiteY2" fmla="*/ 142875 h 164306"/>
+              <a:gd name="connsiteX3" fmla="*/ 159544 w 159544"/>
+              <a:gd name="connsiteY3" fmla="*/ 142875 h 164306"/>
+              <a:gd name="connsiteX4" fmla="*/ 78582 w 159544"/>
+              <a:gd name="connsiteY4" fmla="*/ 164306 h 164306"/>
+              <a:gd name="connsiteX5" fmla="*/ 9525 w 159544"/>
+              <a:gd name="connsiteY5" fmla="*/ 150019 h 164306"/>
+              <a:gd name="connsiteX6" fmla="*/ 61913 w 159544"/>
+              <a:gd name="connsiteY6" fmla="*/ 140494 h 164306"/>
+              <a:gd name="connsiteX7" fmla="*/ 54769 w 159544"/>
+              <a:gd name="connsiteY7" fmla="*/ 38100 h 164306"/>
+              <a:gd name="connsiteX8" fmla="*/ 0 w 159544"/>
+              <a:gd name="connsiteY8" fmla="*/ 4762 h 164306"/>
+              <a:gd name="connsiteX0" fmla="*/ 0 w 159544"/>
+              <a:gd name="connsiteY0" fmla="*/ 4762 h 173831"/>
+              <a:gd name="connsiteX1" fmla="*/ 66675 w 159544"/>
+              <a:gd name="connsiteY1" fmla="*/ 0 h 173831"/>
+              <a:gd name="connsiteX2" fmla="*/ 90488 w 159544"/>
+              <a:gd name="connsiteY2" fmla="*/ 142875 h 173831"/>
+              <a:gd name="connsiteX3" fmla="*/ 159544 w 159544"/>
+              <a:gd name="connsiteY3" fmla="*/ 142875 h 173831"/>
+              <a:gd name="connsiteX4" fmla="*/ 54770 w 159544"/>
+              <a:gd name="connsiteY4" fmla="*/ 173831 h 173831"/>
+              <a:gd name="connsiteX5" fmla="*/ 9525 w 159544"/>
+              <a:gd name="connsiteY5" fmla="*/ 150019 h 173831"/>
+              <a:gd name="connsiteX6" fmla="*/ 61913 w 159544"/>
+              <a:gd name="connsiteY6" fmla="*/ 140494 h 173831"/>
+              <a:gd name="connsiteX7" fmla="*/ 54769 w 159544"/>
+              <a:gd name="connsiteY7" fmla="*/ 38100 h 173831"/>
+              <a:gd name="connsiteX8" fmla="*/ 0 w 159544"/>
+              <a:gd name="connsiteY8" fmla="*/ 4762 h 173831"/>
+              <a:gd name="connsiteX0" fmla="*/ 0 w 159544"/>
+              <a:gd name="connsiteY0" fmla="*/ 4762 h 173831"/>
+              <a:gd name="connsiteX1" fmla="*/ 66675 w 159544"/>
+              <a:gd name="connsiteY1" fmla="*/ 0 h 173831"/>
+              <a:gd name="connsiteX2" fmla="*/ 90488 w 159544"/>
+              <a:gd name="connsiteY2" fmla="*/ 142875 h 173831"/>
+              <a:gd name="connsiteX3" fmla="*/ 159544 w 159544"/>
+              <a:gd name="connsiteY3" fmla="*/ 142875 h 173831"/>
+              <a:gd name="connsiteX4" fmla="*/ 114300 w 159544"/>
+              <a:gd name="connsiteY4" fmla="*/ 159544 h 173831"/>
+              <a:gd name="connsiteX5" fmla="*/ 54770 w 159544"/>
+              <a:gd name="connsiteY5" fmla="*/ 173831 h 173831"/>
+              <a:gd name="connsiteX6" fmla="*/ 9525 w 159544"/>
+              <a:gd name="connsiteY6" fmla="*/ 150019 h 173831"/>
+              <a:gd name="connsiteX7" fmla="*/ 61913 w 159544"/>
+              <a:gd name="connsiteY7" fmla="*/ 140494 h 173831"/>
+              <a:gd name="connsiteX8" fmla="*/ 54769 w 159544"/>
+              <a:gd name="connsiteY8" fmla="*/ 38100 h 173831"/>
+              <a:gd name="connsiteX9" fmla="*/ 0 w 159544"/>
+              <a:gd name="connsiteY9" fmla="*/ 4762 h 173831"/>
+              <a:gd name="connsiteX0" fmla="*/ 0 w 159544"/>
+              <a:gd name="connsiteY0" fmla="*/ 4762 h 173831"/>
+              <a:gd name="connsiteX1" fmla="*/ 66675 w 159544"/>
+              <a:gd name="connsiteY1" fmla="*/ 0 h 173831"/>
+              <a:gd name="connsiteX2" fmla="*/ 90488 w 159544"/>
+              <a:gd name="connsiteY2" fmla="*/ 142875 h 173831"/>
+              <a:gd name="connsiteX3" fmla="*/ 159544 w 159544"/>
+              <a:gd name="connsiteY3" fmla="*/ 142875 h 173831"/>
+              <a:gd name="connsiteX4" fmla="*/ 126206 w 159544"/>
+              <a:gd name="connsiteY4" fmla="*/ 166688 h 173831"/>
+              <a:gd name="connsiteX5" fmla="*/ 54770 w 159544"/>
+              <a:gd name="connsiteY5" fmla="*/ 173831 h 173831"/>
+              <a:gd name="connsiteX6" fmla="*/ 9525 w 159544"/>
+              <a:gd name="connsiteY6" fmla="*/ 150019 h 173831"/>
+              <a:gd name="connsiteX7" fmla="*/ 61913 w 159544"/>
+              <a:gd name="connsiteY7" fmla="*/ 140494 h 173831"/>
+              <a:gd name="connsiteX8" fmla="*/ 54769 w 159544"/>
+              <a:gd name="connsiteY8" fmla="*/ 38100 h 173831"/>
+              <a:gd name="connsiteX9" fmla="*/ 0 w 159544"/>
+              <a:gd name="connsiteY9" fmla="*/ 4762 h 173831"/>
+              <a:gd name="connsiteX0" fmla="*/ 0 w 160544"/>
+              <a:gd name="connsiteY0" fmla="*/ 4762 h 174650"/>
+              <a:gd name="connsiteX1" fmla="*/ 66675 w 160544"/>
+              <a:gd name="connsiteY1" fmla="*/ 0 h 174650"/>
+              <a:gd name="connsiteX2" fmla="*/ 90488 w 160544"/>
+              <a:gd name="connsiteY2" fmla="*/ 142875 h 174650"/>
+              <a:gd name="connsiteX3" fmla="*/ 159544 w 160544"/>
+              <a:gd name="connsiteY3" fmla="*/ 142875 h 174650"/>
+              <a:gd name="connsiteX4" fmla="*/ 126206 w 160544"/>
+              <a:gd name="connsiteY4" fmla="*/ 166688 h 174650"/>
+              <a:gd name="connsiteX5" fmla="*/ 54770 w 160544"/>
+              <a:gd name="connsiteY5" fmla="*/ 173831 h 174650"/>
+              <a:gd name="connsiteX6" fmla="*/ 9525 w 160544"/>
+              <a:gd name="connsiteY6" fmla="*/ 150019 h 174650"/>
+              <a:gd name="connsiteX7" fmla="*/ 61913 w 160544"/>
+              <a:gd name="connsiteY7" fmla="*/ 140494 h 174650"/>
+              <a:gd name="connsiteX8" fmla="*/ 54769 w 160544"/>
+              <a:gd name="connsiteY8" fmla="*/ 38100 h 174650"/>
+              <a:gd name="connsiteX9" fmla="*/ 0 w 160544"/>
+              <a:gd name="connsiteY9" fmla="*/ 4762 h 174650"/>
+              <a:gd name="connsiteX0" fmla="*/ 0 w 160544"/>
+              <a:gd name="connsiteY0" fmla="*/ 4762 h 176799"/>
+              <a:gd name="connsiteX1" fmla="*/ 66675 w 160544"/>
+              <a:gd name="connsiteY1" fmla="*/ 0 h 176799"/>
+              <a:gd name="connsiteX2" fmla="*/ 90488 w 160544"/>
+              <a:gd name="connsiteY2" fmla="*/ 142875 h 176799"/>
+              <a:gd name="connsiteX3" fmla="*/ 159544 w 160544"/>
+              <a:gd name="connsiteY3" fmla="*/ 142875 h 176799"/>
+              <a:gd name="connsiteX4" fmla="*/ 126206 w 160544"/>
+              <a:gd name="connsiteY4" fmla="*/ 166688 h 176799"/>
+              <a:gd name="connsiteX5" fmla="*/ 54770 w 160544"/>
+              <a:gd name="connsiteY5" fmla="*/ 173831 h 176799"/>
+              <a:gd name="connsiteX6" fmla="*/ 9525 w 160544"/>
+              <a:gd name="connsiteY6" fmla="*/ 150019 h 176799"/>
+              <a:gd name="connsiteX7" fmla="*/ 61913 w 160544"/>
+              <a:gd name="connsiteY7" fmla="*/ 140494 h 176799"/>
+              <a:gd name="connsiteX8" fmla="*/ 54769 w 160544"/>
+              <a:gd name="connsiteY8" fmla="*/ 38100 h 176799"/>
+              <a:gd name="connsiteX9" fmla="*/ 0 w 160544"/>
+              <a:gd name="connsiteY9" fmla="*/ 4762 h 176799"/>
+              <a:gd name="connsiteX0" fmla="*/ 0 w 160544"/>
+              <a:gd name="connsiteY0" fmla="*/ 4762 h 176799"/>
+              <a:gd name="connsiteX1" fmla="*/ 66675 w 160544"/>
+              <a:gd name="connsiteY1" fmla="*/ 0 h 176799"/>
+              <a:gd name="connsiteX2" fmla="*/ 90488 w 160544"/>
+              <a:gd name="connsiteY2" fmla="*/ 142875 h 176799"/>
+              <a:gd name="connsiteX3" fmla="*/ 159544 w 160544"/>
+              <a:gd name="connsiteY3" fmla="*/ 142875 h 176799"/>
+              <a:gd name="connsiteX4" fmla="*/ 126206 w 160544"/>
+              <a:gd name="connsiteY4" fmla="*/ 166688 h 176799"/>
+              <a:gd name="connsiteX5" fmla="*/ 54770 w 160544"/>
+              <a:gd name="connsiteY5" fmla="*/ 173831 h 176799"/>
+              <a:gd name="connsiteX6" fmla="*/ 9525 w 160544"/>
+              <a:gd name="connsiteY6" fmla="*/ 150019 h 176799"/>
+              <a:gd name="connsiteX7" fmla="*/ 61913 w 160544"/>
+              <a:gd name="connsiteY7" fmla="*/ 140494 h 176799"/>
+              <a:gd name="connsiteX8" fmla="*/ 54769 w 160544"/>
+              <a:gd name="connsiteY8" fmla="*/ 38100 h 176799"/>
+              <a:gd name="connsiteX9" fmla="*/ 0 w 160544"/>
+              <a:gd name="connsiteY9" fmla="*/ 4762 h 176799"/>
+              <a:gd name="connsiteX0" fmla="*/ 0 w 160544"/>
+              <a:gd name="connsiteY0" fmla="*/ 4762 h 176799"/>
+              <a:gd name="connsiteX1" fmla="*/ 66675 w 160544"/>
+              <a:gd name="connsiteY1" fmla="*/ 0 h 176799"/>
+              <a:gd name="connsiteX2" fmla="*/ 90488 w 160544"/>
+              <a:gd name="connsiteY2" fmla="*/ 142875 h 176799"/>
+              <a:gd name="connsiteX3" fmla="*/ 159544 w 160544"/>
+              <a:gd name="connsiteY3" fmla="*/ 142875 h 176799"/>
+              <a:gd name="connsiteX4" fmla="*/ 126206 w 160544"/>
+              <a:gd name="connsiteY4" fmla="*/ 166688 h 176799"/>
+              <a:gd name="connsiteX5" fmla="*/ 54770 w 160544"/>
+              <a:gd name="connsiteY5" fmla="*/ 173831 h 176799"/>
+              <a:gd name="connsiteX6" fmla="*/ 9525 w 160544"/>
+              <a:gd name="connsiteY6" fmla="*/ 150019 h 176799"/>
+              <a:gd name="connsiteX7" fmla="*/ 61913 w 160544"/>
+              <a:gd name="connsiteY7" fmla="*/ 140494 h 176799"/>
+              <a:gd name="connsiteX8" fmla="*/ 54769 w 160544"/>
+              <a:gd name="connsiteY8" fmla="*/ 38100 h 176799"/>
+              <a:gd name="connsiteX9" fmla="*/ 0 w 160544"/>
+              <a:gd name="connsiteY9" fmla="*/ 4762 h 176799"/>
+              <a:gd name="connsiteX0" fmla="*/ 0 w 162841"/>
+              <a:gd name="connsiteY0" fmla="*/ 4762 h 176799"/>
+              <a:gd name="connsiteX1" fmla="*/ 66675 w 162841"/>
+              <a:gd name="connsiteY1" fmla="*/ 0 h 176799"/>
+              <a:gd name="connsiteX2" fmla="*/ 90488 w 162841"/>
+              <a:gd name="connsiteY2" fmla="*/ 142875 h 176799"/>
+              <a:gd name="connsiteX3" fmla="*/ 159544 w 162841"/>
+              <a:gd name="connsiteY3" fmla="*/ 142875 h 176799"/>
+              <a:gd name="connsiteX4" fmla="*/ 126206 w 162841"/>
+              <a:gd name="connsiteY4" fmla="*/ 166688 h 176799"/>
+              <a:gd name="connsiteX5" fmla="*/ 54770 w 162841"/>
+              <a:gd name="connsiteY5" fmla="*/ 173831 h 176799"/>
+              <a:gd name="connsiteX6" fmla="*/ 9525 w 162841"/>
+              <a:gd name="connsiteY6" fmla="*/ 150019 h 176799"/>
+              <a:gd name="connsiteX7" fmla="*/ 61913 w 162841"/>
+              <a:gd name="connsiteY7" fmla="*/ 140494 h 176799"/>
+              <a:gd name="connsiteX8" fmla="*/ 54769 w 162841"/>
+              <a:gd name="connsiteY8" fmla="*/ 38100 h 176799"/>
+              <a:gd name="connsiteX9" fmla="*/ 0 w 162841"/>
+              <a:gd name="connsiteY9" fmla="*/ 4762 h 176799"/>
+              <a:gd name="connsiteX0" fmla="*/ 0 w 165066"/>
+              <a:gd name="connsiteY0" fmla="*/ 4762 h 176565"/>
+              <a:gd name="connsiteX1" fmla="*/ 66675 w 165066"/>
+              <a:gd name="connsiteY1" fmla="*/ 0 h 176565"/>
+              <a:gd name="connsiteX2" fmla="*/ 90488 w 165066"/>
+              <a:gd name="connsiteY2" fmla="*/ 142875 h 176565"/>
+              <a:gd name="connsiteX3" fmla="*/ 161925 w 165066"/>
+              <a:gd name="connsiteY3" fmla="*/ 152400 h 176565"/>
+              <a:gd name="connsiteX4" fmla="*/ 126206 w 165066"/>
+              <a:gd name="connsiteY4" fmla="*/ 166688 h 176565"/>
+              <a:gd name="connsiteX5" fmla="*/ 54770 w 165066"/>
+              <a:gd name="connsiteY5" fmla="*/ 173831 h 176565"/>
+              <a:gd name="connsiteX6" fmla="*/ 9525 w 165066"/>
+              <a:gd name="connsiteY6" fmla="*/ 150019 h 176565"/>
+              <a:gd name="connsiteX7" fmla="*/ 61913 w 165066"/>
+              <a:gd name="connsiteY7" fmla="*/ 140494 h 176565"/>
+              <a:gd name="connsiteX8" fmla="*/ 54769 w 165066"/>
+              <a:gd name="connsiteY8" fmla="*/ 38100 h 176565"/>
+              <a:gd name="connsiteX9" fmla="*/ 0 w 165066"/>
+              <a:gd name="connsiteY9" fmla="*/ 4762 h 176565"/>
+              <a:gd name="connsiteX0" fmla="*/ 0 w 162857"/>
+              <a:gd name="connsiteY0" fmla="*/ 4762 h 182108"/>
+              <a:gd name="connsiteX1" fmla="*/ 66675 w 162857"/>
+              <a:gd name="connsiteY1" fmla="*/ 0 h 182108"/>
+              <a:gd name="connsiteX2" fmla="*/ 90488 w 162857"/>
+              <a:gd name="connsiteY2" fmla="*/ 142875 h 182108"/>
+              <a:gd name="connsiteX3" fmla="*/ 161925 w 162857"/>
+              <a:gd name="connsiteY3" fmla="*/ 152400 h 182108"/>
+              <a:gd name="connsiteX4" fmla="*/ 126206 w 162857"/>
+              <a:gd name="connsiteY4" fmla="*/ 180975 h 182108"/>
+              <a:gd name="connsiteX5" fmla="*/ 54770 w 162857"/>
+              <a:gd name="connsiteY5" fmla="*/ 173831 h 182108"/>
+              <a:gd name="connsiteX6" fmla="*/ 9525 w 162857"/>
+              <a:gd name="connsiteY6" fmla="*/ 150019 h 182108"/>
+              <a:gd name="connsiteX7" fmla="*/ 61913 w 162857"/>
+              <a:gd name="connsiteY7" fmla="*/ 140494 h 182108"/>
+              <a:gd name="connsiteX8" fmla="*/ 54769 w 162857"/>
+              <a:gd name="connsiteY8" fmla="*/ 38100 h 182108"/>
+              <a:gd name="connsiteX9" fmla="*/ 0 w 162857"/>
+              <a:gd name="connsiteY9" fmla="*/ 4762 h 182108"/>
+              <a:gd name="connsiteX0" fmla="*/ 0 w 158241"/>
+              <a:gd name="connsiteY0" fmla="*/ 4762 h 182761"/>
+              <a:gd name="connsiteX1" fmla="*/ 66675 w 158241"/>
+              <a:gd name="connsiteY1" fmla="*/ 0 h 182761"/>
+              <a:gd name="connsiteX2" fmla="*/ 90488 w 158241"/>
+              <a:gd name="connsiteY2" fmla="*/ 142875 h 182761"/>
+              <a:gd name="connsiteX3" fmla="*/ 157163 w 158241"/>
+              <a:gd name="connsiteY3" fmla="*/ 142875 h 182761"/>
+              <a:gd name="connsiteX4" fmla="*/ 126206 w 158241"/>
+              <a:gd name="connsiteY4" fmla="*/ 180975 h 182761"/>
+              <a:gd name="connsiteX5" fmla="*/ 54770 w 158241"/>
+              <a:gd name="connsiteY5" fmla="*/ 173831 h 182761"/>
+              <a:gd name="connsiteX6" fmla="*/ 9525 w 158241"/>
+              <a:gd name="connsiteY6" fmla="*/ 150019 h 182761"/>
+              <a:gd name="connsiteX7" fmla="*/ 61913 w 158241"/>
+              <a:gd name="connsiteY7" fmla="*/ 140494 h 182761"/>
+              <a:gd name="connsiteX8" fmla="*/ 54769 w 158241"/>
+              <a:gd name="connsiteY8" fmla="*/ 38100 h 182761"/>
+              <a:gd name="connsiteX9" fmla="*/ 0 w 158241"/>
+              <a:gd name="connsiteY9" fmla="*/ 4762 h 182761"/>
+              <a:gd name="connsiteX0" fmla="*/ 0 w 158356"/>
+              <a:gd name="connsiteY0" fmla="*/ 4762 h 182761"/>
+              <a:gd name="connsiteX1" fmla="*/ 66675 w 158356"/>
+              <a:gd name="connsiteY1" fmla="*/ 0 h 182761"/>
+              <a:gd name="connsiteX2" fmla="*/ 88107 w 158356"/>
+              <a:gd name="connsiteY2" fmla="*/ 130969 h 182761"/>
+              <a:gd name="connsiteX3" fmla="*/ 157163 w 158356"/>
+              <a:gd name="connsiteY3" fmla="*/ 142875 h 182761"/>
+              <a:gd name="connsiteX4" fmla="*/ 126206 w 158356"/>
+              <a:gd name="connsiteY4" fmla="*/ 180975 h 182761"/>
+              <a:gd name="connsiteX5" fmla="*/ 54770 w 158356"/>
+              <a:gd name="connsiteY5" fmla="*/ 173831 h 182761"/>
+              <a:gd name="connsiteX6" fmla="*/ 9525 w 158356"/>
+              <a:gd name="connsiteY6" fmla="*/ 150019 h 182761"/>
+              <a:gd name="connsiteX7" fmla="*/ 61913 w 158356"/>
+              <a:gd name="connsiteY7" fmla="*/ 140494 h 182761"/>
+              <a:gd name="connsiteX8" fmla="*/ 54769 w 158356"/>
+              <a:gd name="connsiteY8" fmla="*/ 38100 h 182761"/>
+              <a:gd name="connsiteX9" fmla="*/ 0 w 158356"/>
+              <a:gd name="connsiteY9" fmla="*/ 4762 h 182761"/>
+              <a:gd name="connsiteX0" fmla="*/ 0 w 158356"/>
+              <a:gd name="connsiteY0" fmla="*/ 4762 h 182761"/>
+              <a:gd name="connsiteX1" fmla="*/ 66675 w 158356"/>
+              <a:gd name="connsiteY1" fmla="*/ 0 h 182761"/>
+              <a:gd name="connsiteX2" fmla="*/ 88107 w 158356"/>
+              <a:gd name="connsiteY2" fmla="*/ 130969 h 182761"/>
+              <a:gd name="connsiteX3" fmla="*/ 157163 w 158356"/>
+              <a:gd name="connsiteY3" fmla="*/ 142875 h 182761"/>
+              <a:gd name="connsiteX4" fmla="*/ 126206 w 158356"/>
+              <a:gd name="connsiteY4" fmla="*/ 180975 h 182761"/>
+              <a:gd name="connsiteX5" fmla="*/ 54770 w 158356"/>
+              <a:gd name="connsiteY5" fmla="*/ 173831 h 182761"/>
+              <a:gd name="connsiteX6" fmla="*/ 9525 w 158356"/>
+              <a:gd name="connsiteY6" fmla="*/ 150019 h 182761"/>
+              <a:gd name="connsiteX7" fmla="*/ 59532 w 158356"/>
+              <a:gd name="connsiteY7" fmla="*/ 128588 h 182761"/>
+              <a:gd name="connsiteX8" fmla="*/ 54769 w 158356"/>
+              <a:gd name="connsiteY8" fmla="*/ 38100 h 182761"/>
+              <a:gd name="connsiteX9" fmla="*/ 0 w 158356"/>
+              <a:gd name="connsiteY9" fmla="*/ 4762 h 182761"/>
+              <a:gd name="connsiteX0" fmla="*/ 0 w 157498"/>
+              <a:gd name="connsiteY0" fmla="*/ 4762 h 180740"/>
+              <a:gd name="connsiteX1" fmla="*/ 66675 w 157498"/>
+              <a:gd name="connsiteY1" fmla="*/ 0 h 180740"/>
+              <a:gd name="connsiteX2" fmla="*/ 88107 w 157498"/>
+              <a:gd name="connsiteY2" fmla="*/ 130969 h 180740"/>
+              <a:gd name="connsiteX3" fmla="*/ 157163 w 157498"/>
+              <a:gd name="connsiteY3" fmla="*/ 142875 h 180740"/>
+              <a:gd name="connsiteX4" fmla="*/ 111918 w 157498"/>
+              <a:gd name="connsiteY4" fmla="*/ 178594 h 180740"/>
+              <a:gd name="connsiteX5" fmla="*/ 54770 w 157498"/>
+              <a:gd name="connsiteY5" fmla="*/ 173831 h 180740"/>
+              <a:gd name="connsiteX6" fmla="*/ 9525 w 157498"/>
+              <a:gd name="connsiteY6" fmla="*/ 150019 h 180740"/>
+              <a:gd name="connsiteX7" fmla="*/ 59532 w 157498"/>
+              <a:gd name="connsiteY7" fmla="*/ 128588 h 180740"/>
+              <a:gd name="connsiteX8" fmla="*/ 54769 w 157498"/>
+              <a:gd name="connsiteY8" fmla="*/ 38100 h 180740"/>
+              <a:gd name="connsiteX9" fmla="*/ 0 w 157498"/>
+              <a:gd name="connsiteY9" fmla="*/ 4762 h 180740"/>
+              <a:gd name="connsiteX0" fmla="*/ 0 w 157498"/>
+              <a:gd name="connsiteY0" fmla="*/ 0 h 175978"/>
+              <a:gd name="connsiteX1" fmla="*/ 88107 w 157498"/>
+              <a:gd name="connsiteY1" fmla="*/ 7144 h 175978"/>
+              <a:gd name="connsiteX2" fmla="*/ 88107 w 157498"/>
+              <a:gd name="connsiteY2" fmla="*/ 126207 h 175978"/>
+              <a:gd name="connsiteX3" fmla="*/ 157163 w 157498"/>
+              <a:gd name="connsiteY3" fmla="*/ 138113 h 175978"/>
+              <a:gd name="connsiteX4" fmla="*/ 111918 w 157498"/>
+              <a:gd name="connsiteY4" fmla="*/ 173832 h 175978"/>
+              <a:gd name="connsiteX5" fmla="*/ 54770 w 157498"/>
+              <a:gd name="connsiteY5" fmla="*/ 169069 h 175978"/>
+              <a:gd name="connsiteX6" fmla="*/ 9525 w 157498"/>
+              <a:gd name="connsiteY6" fmla="*/ 145257 h 175978"/>
+              <a:gd name="connsiteX7" fmla="*/ 59532 w 157498"/>
+              <a:gd name="connsiteY7" fmla="*/ 123826 h 175978"/>
+              <a:gd name="connsiteX8" fmla="*/ 54769 w 157498"/>
+              <a:gd name="connsiteY8" fmla="*/ 33338 h 175978"/>
+              <a:gd name="connsiteX9" fmla="*/ 0 w 157498"/>
+              <a:gd name="connsiteY9" fmla="*/ 0 h 175978"/>
+              <a:gd name="connsiteX0" fmla="*/ 0 w 157498"/>
+              <a:gd name="connsiteY0" fmla="*/ 0 h 175978"/>
+              <a:gd name="connsiteX1" fmla="*/ 80963 w 157498"/>
+              <a:gd name="connsiteY1" fmla="*/ 4763 h 175978"/>
+              <a:gd name="connsiteX2" fmla="*/ 88107 w 157498"/>
+              <a:gd name="connsiteY2" fmla="*/ 126207 h 175978"/>
+              <a:gd name="connsiteX3" fmla="*/ 157163 w 157498"/>
+              <a:gd name="connsiteY3" fmla="*/ 138113 h 175978"/>
+              <a:gd name="connsiteX4" fmla="*/ 111918 w 157498"/>
+              <a:gd name="connsiteY4" fmla="*/ 173832 h 175978"/>
+              <a:gd name="connsiteX5" fmla="*/ 54770 w 157498"/>
+              <a:gd name="connsiteY5" fmla="*/ 169069 h 175978"/>
+              <a:gd name="connsiteX6" fmla="*/ 9525 w 157498"/>
+              <a:gd name="connsiteY6" fmla="*/ 145257 h 175978"/>
+              <a:gd name="connsiteX7" fmla="*/ 59532 w 157498"/>
+              <a:gd name="connsiteY7" fmla="*/ 123826 h 175978"/>
+              <a:gd name="connsiteX8" fmla="*/ 54769 w 157498"/>
+              <a:gd name="connsiteY8" fmla="*/ 33338 h 175978"/>
+              <a:gd name="connsiteX9" fmla="*/ 0 w 157498"/>
+              <a:gd name="connsiteY9" fmla="*/ 0 h 175978"/>
+              <a:gd name="connsiteX0" fmla="*/ 0 w 157498"/>
+              <a:gd name="connsiteY0" fmla="*/ 0 h 175978"/>
+              <a:gd name="connsiteX1" fmla="*/ 80963 w 157498"/>
+              <a:gd name="connsiteY1" fmla="*/ 4763 h 175978"/>
+              <a:gd name="connsiteX2" fmla="*/ 88107 w 157498"/>
+              <a:gd name="connsiteY2" fmla="*/ 126207 h 175978"/>
+              <a:gd name="connsiteX3" fmla="*/ 157163 w 157498"/>
+              <a:gd name="connsiteY3" fmla="*/ 138113 h 175978"/>
+              <a:gd name="connsiteX4" fmla="*/ 111918 w 157498"/>
+              <a:gd name="connsiteY4" fmla="*/ 173832 h 175978"/>
+              <a:gd name="connsiteX5" fmla="*/ 54770 w 157498"/>
+              <a:gd name="connsiteY5" fmla="*/ 169069 h 175978"/>
+              <a:gd name="connsiteX6" fmla="*/ 9525 w 157498"/>
+              <a:gd name="connsiteY6" fmla="*/ 145257 h 175978"/>
+              <a:gd name="connsiteX7" fmla="*/ 45244 w 157498"/>
+              <a:gd name="connsiteY7" fmla="*/ 123826 h 175978"/>
+              <a:gd name="connsiteX8" fmla="*/ 54769 w 157498"/>
+              <a:gd name="connsiteY8" fmla="*/ 33338 h 175978"/>
+              <a:gd name="connsiteX9" fmla="*/ 0 w 157498"/>
+              <a:gd name="connsiteY9" fmla="*/ 0 h 175978"/>
+              <a:gd name="connsiteX0" fmla="*/ 0 w 157256"/>
+              <a:gd name="connsiteY0" fmla="*/ 0 h 175978"/>
+              <a:gd name="connsiteX1" fmla="*/ 80963 w 157256"/>
+              <a:gd name="connsiteY1" fmla="*/ 4763 h 175978"/>
+              <a:gd name="connsiteX2" fmla="*/ 100014 w 157256"/>
+              <a:gd name="connsiteY2" fmla="*/ 123825 h 175978"/>
+              <a:gd name="connsiteX3" fmla="*/ 157163 w 157256"/>
+              <a:gd name="connsiteY3" fmla="*/ 138113 h 175978"/>
+              <a:gd name="connsiteX4" fmla="*/ 111918 w 157256"/>
+              <a:gd name="connsiteY4" fmla="*/ 173832 h 175978"/>
+              <a:gd name="connsiteX5" fmla="*/ 54770 w 157256"/>
+              <a:gd name="connsiteY5" fmla="*/ 169069 h 175978"/>
+              <a:gd name="connsiteX6" fmla="*/ 9525 w 157256"/>
+              <a:gd name="connsiteY6" fmla="*/ 145257 h 175978"/>
+              <a:gd name="connsiteX7" fmla="*/ 45244 w 157256"/>
+              <a:gd name="connsiteY7" fmla="*/ 123826 h 175978"/>
+              <a:gd name="connsiteX8" fmla="*/ 54769 w 157256"/>
+              <a:gd name="connsiteY8" fmla="*/ 33338 h 175978"/>
+              <a:gd name="connsiteX9" fmla="*/ 0 w 157256"/>
+              <a:gd name="connsiteY9" fmla="*/ 0 h 175978"/>
+              <a:gd name="connsiteX0" fmla="*/ 0 w 157256"/>
+              <a:gd name="connsiteY0" fmla="*/ 0 h 175907"/>
+              <a:gd name="connsiteX1" fmla="*/ 80963 w 157256"/>
+              <a:gd name="connsiteY1" fmla="*/ 4763 h 175907"/>
+              <a:gd name="connsiteX2" fmla="*/ 100014 w 157256"/>
+              <a:gd name="connsiteY2" fmla="*/ 123825 h 175907"/>
+              <a:gd name="connsiteX3" fmla="*/ 157163 w 157256"/>
+              <a:gd name="connsiteY3" fmla="*/ 138113 h 175907"/>
+              <a:gd name="connsiteX4" fmla="*/ 111918 w 157256"/>
+              <a:gd name="connsiteY4" fmla="*/ 173832 h 175907"/>
+              <a:gd name="connsiteX5" fmla="*/ 54770 w 157256"/>
+              <a:gd name="connsiteY5" fmla="*/ 169069 h 175907"/>
+              <a:gd name="connsiteX6" fmla="*/ 78581 w 157256"/>
+              <a:gd name="connsiteY6" fmla="*/ 147639 h 175907"/>
+              <a:gd name="connsiteX7" fmla="*/ 45244 w 157256"/>
+              <a:gd name="connsiteY7" fmla="*/ 123826 h 175907"/>
+              <a:gd name="connsiteX8" fmla="*/ 54769 w 157256"/>
+              <a:gd name="connsiteY8" fmla="*/ 33338 h 175907"/>
+              <a:gd name="connsiteX9" fmla="*/ 0 w 157256"/>
+              <a:gd name="connsiteY9" fmla="*/ 0 h 175907"/>
+              <a:gd name="connsiteX0" fmla="*/ 0 w 157246"/>
+              <a:gd name="connsiteY0" fmla="*/ 0 h 180800"/>
+              <a:gd name="connsiteX1" fmla="*/ 80963 w 157246"/>
+              <a:gd name="connsiteY1" fmla="*/ 4763 h 180800"/>
+              <a:gd name="connsiteX2" fmla="*/ 100014 w 157246"/>
+              <a:gd name="connsiteY2" fmla="*/ 123825 h 180800"/>
+              <a:gd name="connsiteX3" fmla="*/ 157163 w 157246"/>
+              <a:gd name="connsiteY3" fmla="*/ 138113 h 180800"/>
+              <a:gd name="connsiteX4" fmla="*/ 111918 w 157246"/>
+              <a:gd name="connsiteY4" fmla="*/ 173832 h 180800"/>
+              <a:gd name="connsiteX5" fmla="*/ 76202 w 157246"/>
+              <a:gd name="connsiteY5" fmla="*/ 178594 h 180800"/>
+              <a:gd name="connsiteX6" fmla="*/ 78581 w 157246"/>
+              <a:gd name="connsiteY6" fmla="*/ 147639 h 180800"/>
+              <a:gd name="connsiteX7" fmla="*/ 45244 w 157246"/>
+              <a:gd name="connsiteY7" fmla="*/ 123826 h 180800"/>
+              <a:gd name="connsiteX8" fmla="*/ 54769 w 157246"/>
+              <a:gd name="connsiteY8" fmla="*/ 33338 h 180800"/>
+              <a:gd name="connsiteX9" fmla="*/ 0 w 157246"/>
+              <a:gd name="connsiteY9" fmla="*/ 0 h 180800"/>
+              <a:gd name="connsiteX0" fmla="*/ 0 w 166756"/>
+              <a:gd name="connsiteY0" fmla="*/ 0 h 180083"/>
+              <a:gd name="connsiteX1" fmla="*/ 80963 w 166756"/>
+              <a:gd name="connsiteY1" fmla="*/ 4763 h 180083"/>
+              <a:gd name="connsiteX2" fmla="*/ 100014 w 166756"/>
+              <a:gd name="connsiteY2" fmla="*/ 123825 h 180083"/>
+              <a:gd name="connsiteX3" fmla="*/ 166688 w 166756"/>
+              <a:gd name="connsiteY3" fmla="*/ 161925 h 180083"/>
+              <a:gd name="connsiteX4" fmla="*/ 111918 w 166756"/>
+              <a:gd name="connsiteY4" fmla="*/ 173832 h 180083"/>
+              <a:gd name="connsiteX5" fmla="*/ 76202 w 166756"/>
+              <a:gd name="connsiteY5" fmla="*/ 178594 h 180083"/>
+              <a:gd name="connsiteX6" fmla="*/ 78581 w 166756"/>
+              <a:gd name="connsiteY6" fmla="*/ 147639 h 180083"/>
+              <a:gd name="connsiteX7" fmla="*/ 45244 w 166756"/>
+              <a:gd name="connsiteY7" fmla="*/ 123826 h 180083"/>
+              <a:gd name="connsiteX8" fmla="*/ 54769 w 166756"/>
+              <a:gd name="connsiteY8" fmla="*/ 33338 h 180083"/>
+              <a:gd name="connsiteX9" fmla="*/ 0 w 166756"/>
+              <a:gd name="connsiteY9" fmla="*/ 0 h 180083"/>
+              <a:gd name="connsiteX0" fmla="*/ 0 w 166756"/>
+              <a:gd name="connsiteY0" fmla="*/ 0 h 179918"/>
+              <a:gd name="connsiteX1" fmla="*/ 80963 w 166756"/>
+              <a:gd name="connsiteY1" fmla="*/ 4763 h 179918"/>
+              <a:gd name="connsiteX2" fmla="*/ 100014 w 166756"/>
+              <a:gd name="connsiteY2" fmla="*/ 123825 h 179918"/>
+              <a:gd name="connsiteX3" fmla="*/ 166688 w 166756"/>
+              <a:gd name="connsiteY3" fmla="*/ 161925 h 179918"/>
+              <a:gd name="connsiteX4" fmla="*/ 111918 w 166756"/>
+              <a:gd name="connsiteY4" fmla="*/ 173832 h 179918"/>
+              <a:gd name="connsiteX5" fmla="*/ 76202 w 166756"/>
+              <a:gd name="connsiteY5" fmla="*/ 178594 h 179918"/>
+              <a:gd name="connsiteX6" fmla="*/ 90487 w 166756"/>
+              <a:gd name="connsiteY6" fmla="*/ 150020 h 179918"/>
+              <a:gd name="connsiteX7" fmla="*/ 45244 w 166756"/>
+              <a:gd name="connsiteY7" fmla="*/ 123826 h 179918"/>
+              <a:gd name="connsiteX8" fmla="*/ 54769 w 166756"/>
+              <a:gd name="connsiteY8" fmla="*/ 33338 h 179918"/>
+              <a:gd name="connsiteX9" fmla="*/ 0 w 166756"/>
+              <a:gd name="connsiteY9" fmla="*/ 0 h 179918"/>
+              <a:gd name="connsiteX0" fmla="*/ 0 w 167692"/>
+              <a:gd name="connsiteY0" fmla="*/ 0 h 188820"/>
+              <a:gd name="connsiteX1" fmla="*/ 80963 w 167692"/>
+              <a:gd name="connsiteY1" fmla="*/ 4763 h 188820"/>
+              <a:gd name="connsiteX2" fmla="*/ 100014 w 167692"/>
+              <a:gd name="connsiteY2" fmla="*/ 123825 h 188820"/>
+              <a:gd name="connsiteX3" fmla="*/ 166688 w 167692"/>
+              <a:gd name="connsiteY3" fmla="*/ 161925 h 188820"/>
+              <a:gd name="connsiteX4" fmla="*/ 135731 w 167692"/>
+              <a:gd name="connsiteY4" fmla="*/ 188120 h 188820"/>
+              <a:gd name="connsiteX5" fmla="*/ 76202 w 167692"/>
+              <a:gd name="connsiteY5" fmla="*/ 178594 h 188820"/>
+              <a:gd name="connsiteX6" fmla="*/ 90487 w 167692"/>
+              <a:gd name="connsiteY6" fmla="*/ 150020 h 188820"/>
+              <a:gd name="connsiteX7" fmla="*/ 45244 w 167692"/>
+              <a:gd name="connsiteY7" fmla="*/ 123826 h 188820"/>
+              <a:gd name="connsiteX8" fmla="*/ 54769 w 167692"/>
+              <a:gd name="connsiteY8" fmla="*/ 33338 h 188820"/>
+              <a:gd name="connsiteX9" fmla="*/ 0 w 167692"/>
+              <a:gd name="connsiteY9" fmla="*/ 0 h 188820"/>
+              <a:gd name="connsiteX0" fmla="*/ 0 w 167692"/>
+              <a:gd name="connsiteY0" fmla="*/ 0 h 188920"/>
+              <a:gd name="connsiteX1" fmla="*/ 80963 w 167692"/>
+              <a:gd name="connsiteY1" fmla="*/ 4763 h 188920"/>
+              <a:gd name="connsiteX2" fmla="*/ 100014 w 167692"/>
+              <a:gd name="connsiteY2" fmla="*/ 123825 h 188920"/>
+              <a:gd name="connsiteX3" fmla="*/ 166688 w 167692"/>
+              <a:gd name="connsiteY3" fmla="*/ 161925 h 188920"/>
+              <a:gd name="connsiteX4" fmla="*/ 135731 w 167692"/>
+              <a:gd name="connsiteY4" fmla="*/ 188120 h 188920"/>
+              <a:gd name="connsiteX5" fmla="*/ 76202 w 167692"/>
+              <a:gd name="connsiteY5" fmla="*/ 178594 h 188920"/>
+              <a:gd name="connsiteX6" fmla="*/ 85725 w 167692"/>
+              <a:gd name="connsiteY6" fmla="*/ 142876 h 188920"/>
+              <a:gd name="connsiteX7" fmla="*/ 45244 w 167692"/>
+              <a:gd name="connsiteY7" fmla="*/ 123826 h 188920"/>
+              <a:gd name="connsiteX8" fmla="*/ 54769 w 167692"/>
+              <a:gd name="connsiteY8" fmla="*/ 33338 h 188920"/>
+              <a:gd name="connsiteX9" fmla="*/ 0 w 167692"/>
+              <a:gd name="connsiteY9" fmla="*/ 0 h 188920"/>
+              <a:gd name="connsiteX0" fmla="*/ 0 w 179327"/>
+              <a:gd name="connsiteY0" fmla="*/ 0 h 189547"/>
+              <a:gd name="connsiteX1" fmla="*/ 80963 w 179327"/>
+              <a:gd name="connsiteY1" fmla="*/ 4763 h 189547"/>
+              <a:gd name="connsiteX2" fmla="*/ 100014 w 179327"/>
+              <a:gd name="connsiteY2" fmla="*/ 123825 h 189547"/>
+              <a:gd name="connsiteX3" fmla="*/ 178594 w 179327"/>
+              <a:gd name="connsiteY3" fmla="*/ 152400 h 189547"/>
+              <a:gd name="connsiteX4" fmla="*/ 135731 w 179327"/>
+              <a:gd name="connsiteY4" fmla="*/ 188120 h 189547"/>
+              <a:gd name="connsiteX5" fmla="*/ 76202 w 179327"/>
+              <a:gd name="connsiteY5" fmla="*/ 178594 h 189547"/>
+              <a:gd name="connsiteX6" fmla="*/ 85725 w 179327"/>
+              <a:gd name="connsiteY6" fmla="*/ 142876 h 189547"/>
+              <a:gd name="connsiteX7" fmla="*/ 45244 w 179327"/>
+              <a:gd name="connsiteY7" fmla="*/ 123826 h 189547"/>
+              <a:gd name="connsiteX8" fmla="*/ 54769 w 179327"/>
+              <a:gd name="connsiteY8" fmla="*/ 33338 h 189547"/>
+              <a:gd name="connsiteX9" fmla="*/ 0 w 179327"/>
+              <a:gd name="connsiteY9" fmla="*/ 0 h 189547"/>
+              <a:gd name="connsiteX0" fmla="*/ 0 w 179327"/>
+              <a:gd name="connsiteY0" fmla="*/ 0 h 189339"/>
+              <a:gd name="connsiteX1" fmla="*/ 80963 w 179327"/>
+              <a:gd name="connsiteY1" fmla="*/ 4763 h 189339"/>
+              <a:gd name="connsiteX2" fmla="*/ 100014 w 179327"/>
+              <a:gd name="connsiteY2" fmla="*/ 123825 h 189339"/>
+              <a:gd name="connsiteX3" fmla="*/ 178594 w 179327"/>
+              <a:gd name="connsiteY3" fmla="*/ 152400 h 189339"/>
+              <a:gd name="connsiteX4" fmla="*/ 135731 w 179327"/>
+              <a:gd name="connsiteY4" fmla="*/ 188120 h 189339"/>
+              <a:gd name="connsiteX5" fmla="*/ 76202 w 179327"/>
+              <a:gd name="connsiteY5" fmla="*/ 178594 h 189339"/>
+              <a:gd name="connsiteX6" fmla="*/ 61912 w 179327"/>
+              <a:gd name="connsiteY6" fmla="*/ 154783 h 189339"/>
+              <a:gd name="connsiteX7" fmla="*/ 45244 w 179327"/>
+              <a:gd name="connsiteY7" fmla="*/ 123826 h 189339"/>
+              <a:gd name="connsiteX8" fmla="*/ 54769 w 179327"/>
+              <a:gd name="connsiteY8" fmla="*/ 33338 h 189339"/>
+              <a:gd name="connsiteX9" fmla="*/ 0 w 179327"/>
+              <a:gd name="connsiteY9" fmla="*/ 0 h 189339"/>
+            </a:gdLst>
+            <a:ahLst/>
+            <a:cxnLst>
+              <a:cxn ang="0">
+                <a:pos x="connsiteX0" y="connsiteY0"/>
+              </a:cxn>
+              <a:cxn ang="0">
+                <a:pos x="connsiteX1" y="connsiteY1"/>
+              </a:cxn>
+              <a:cxn ang="0">
+                <a:pos x="connsiteX2" y="connsiteY2"/>
+              </a:cxn>
+              <a:cxn ang="0">
+                <a:pos x="connsiteX3" y="connsiteY3"/>
+              </a:cxn>
+              <a:cxn ang="0">
+                <a:pos x="connsiteX4" y="connsiteY4"/>
+              </a:cxn>
+              <a:cxn ang="0">
+                <a:pos x="connsiteX5" y="connsiteY5"/>
+              </a:cxn>
+              <a:cxn ang="0">
+                <a:pos x="connsiteX6" y="connsiteY6"/>
+              </a:cxn>
+              <a:cxn ang="0">
+                <a:pos x="connsiteX7" y="connsiteY7"/>
+              </a:cxn>
+              <a:cxn ang="0">
+                <a:pos x="connsiteX8" y="connsiteY8"/>
+              </a:cxn>
+              <a:cxn ang="0">
+                <a:pos x="connsiteX9" y="connsiteY9"/>
+              </a:cxn>
+            </a:cxnLst>
+            <a:rect l="l" t="t" r="r" b="b"/>
+            <a:pathLst>
+              <a:path w="179327" h="189339">
+                <a:moveTo>
+                  <a:pt x="0" y="0"/>
+                </a:moveTo>
+                <a:lnTo>
+                  <a:pt x="80963" y="4763"/>
+                </a:lnTo>
+                <a:lnTo>
+                  <a:pt x="100014" y="123825"/>
+                </a:lnTo>
+                <a:cubicBezTo>
+                  <a:pt x="115492" y="147638"/>
+                  <a:pt x="172641" y="141684"/>
+                  <a:pt x="178594" y="152400"/>
+                </a:cubicBezTo>
+                <a:cubicBezTo>
+                  <a:pt x="184547" y="163116"/>
+                  <a:pt x="152796" y="183754"/>
+                  <a:pt x="135731" y="188120"/>
+                </a:cubicBezTo>
+                <a:cubicBezTo>
+                  <a:pt x="118666" y="192486"/>
+                  <a:pt x="88505" y="184150"/>
+                  <a:pt x="76202" y="178594"/>
+                </a:cubicBezTo>
+                <a:cubicBezTo>
+                  <a:pt x="63899" y="173038"/>
+                  <a:pt x="67072" y="163911"/>
+                  <a:pt x="61912" y="154783"/>
+                </a:cubicBezTo>
+                <a:cubicBezTo>
+                  <a:pt x="56752" y="145655"/>
+                  <a:pt x="37703" y="142479"/>
+                  <a:pt x="45244" y="123826"/>
+                </a:cubicBezTo>
+                <a:lnTo>
+                  <a:pt x="54769" y="33338"/>
+                </a:lnTo>
+                <a:lnTo>
+                  <a:pt x="0" y="0"/>
+                </a:lnTo>
+                <a:close/>
+              </a:path>
+            </a:pathLst>
+          </a:custGeom>
+          <a:solidFill>
+            <a:schemeClr val="bg1"/>
+          </a:solidFill>
+          <a:ln>
+            <a:solidFill>
+              <a:schemeClr val="bg1"/>
+            </a:solidFill>
+          </a:ln>
+        </p:spPr>
+        <p:style>
+          <a:lnRef idx="2">
+            <a:schemeClr val="accent1">
+              <a:shade val="50000"/>
+            </a:schemeClr>
+          </a:lnRef>
+          <a:fillRef idx="1">
+            <a:schemeClr val="accent1"/>
+          </a:fillRef>
+          <a:effectRef idx="0">
+            <a:schemeClr val="accent1"/>
+          </a:effectRef>
+          <a:fontRef idx="minor">
+            <a:schemeClr val="lt1"/>
+          </a:fontRef>
+        </p:style>
+        <p:txBody>
+          <a:bodyPr rtlCol="0" anchor="ctr"/>
+          <a:lstStyle/>
+          <a:p>
+            <a:pPr algn="ctr"/>
+            <a:endParaRPr lang="en-SG"/>
+          </a:p>
+        </p:txBody>
+      </p:sp>
+      <p:grpSp>
+        <p:nvGrpSpPr>
+          <p:cNvPr id="112" name="Group 111"/>
+          <p:cNvGrpSpPr/>
+          <p:nvPr/>
+        </p:nvGrpSpPr>
+        <p:grpSpPr>
+          <a:xfrm>
+            <a:off x="2638788" y="3506884"/>
+            <a:ext cx="285541" cy="284889"/>
+            <a:chOff x="1679144" y="4075469"/>
+            <a:chExt cx="285541" cy="284889"/>
+          </a:xfrm>
+        </p:grpSpPr>
+        <p:cxnSp>
+          <p:nvCxnSpPr>
+            <p:cNvPr id="219" name="Straight Connector 218"/>
+            <p:cNvCxnSpPr/>
+            <p:nvPr/>
+          </p:nvCxnSpPr>
+          <p:spPr>
+            <a:xfrm>
+              <a:off x="1823455" y="4077866"/>
+              <a:ext cx="0" cy="282492"/>
+            </a:xfrm>
+            <a:prstGeom prst="line">
+              <a:avLst/>
+            </a:prstGeom>
+            <a:ln cap="rnd">
+              <a:solidFill>
+                <a:srgbClr val="0070C0"/>
+              </a:solidFill>
+            </a:ln>
+            <a:scene3d>
+              <a:camera prst="orthographicFront">
+                <a:rot lat="0" lon="0" rev="2700000"/>
+              </a:camera>
+              <a:lightRig rig="threePt" dir="t"/>
+            </a:scene3d>
+          </p:spPr>
+          <p:style>
+            <a:lnRef idx="2">
+              <a:schemeClr val="accent1">
+                <a:shade val="50000"/>
+              </a:schemeClr>
+            </a:lnRef>
+            <a:fillRef idx="1">
+              <a:schemeClr val="accent1"/>
+            </a:fillRef>
+            <a:effectRef idx="0">
+              <a:schemeClr val="accent1"/>
+            </a:effectRef>
+            <a:fontRef idx="minor">
+              <a:schemeClr val="lt1"/>
+            </a:fontRef>
+          </p:style>
+        </p:cxnSp>
+        <p:cxnSp>
+          <p:nvCxnSpPr>
+            <p:cNvPr id="218" name="Straight Connector 217"/>
+            <p:cNvCxnSpPr/>
+            <p:nvPr/>
+          </p:nvCxnSpPr>
+          <p:spPr>
+            <a:xfrm rot="5400000">
+              <a:off x="1823439" y="4075469"/>
+              <a:ext cx="0" cy="282492"/>
+            </a:xfrm>
+            <a:prstGeom prst="line">
+              <a:avLst/>
+            </a:prstGeom>
+            <a:ln cap="rnd">
+              <a:solidFill>
+                <a:srgbClr val="0070C0"/>
+              </a:solidFill>
+            </a:ln>
+            <a:scene3d>
+              <a:camera prst="orthographicFront">
+                <a:rot lat="0" lon="0" rev="2700000"/>
+              </a:camera>
+              <a:lightRig rig="threePt" dir="t"/>
+            </a:scene3d>
+          </p:spPr>
+          <p:style>
+            <a:lnRef idx="2">
+              <a:schemeClr val="accent1">
+                <a:shade val="50000"/>
+              </a:schemeClr>
+            </a:lnRef>
+            <a:fillRef idx="1">
+              <a:schemeClr val="accent1"/>
+            </a:fillRef>
+            <a:effectRef idx="0">
+              <a:schemeClr val="accent1"/>
+            </a:effectRef>
+            <a:fontRef idx="minor">
+              <a:schemeClr val="lt1"/>
+            </a:fontRef>
+          </p:style>
+        </p:cxnSp>
+        <p:cxnSp>
+          <p:nvCxnSpPr>
+            <p:cNvPr id="217" name="Straight Connector 216"/>
+            <p:cNvCxnSpPr/>
+            <p:nvPr/>
+          </p:nvCxnSpPr>
+          <p:spPr>
+            <a:xfrm rot="5400000">
+              <a:off x="1820390" y="4075469"/>
+              <a:ext cx="0" cy="282492"/>
+            </a:xfrm>
+            <a:prstGeom prst="line">
+              <a:avLst/>
+            </a:prstGeom>
+            <a:ln cap="rnd">
+              <a:solidFill>
+                <a:srgbClr val="0070C0"/>
+              </a:solidFill>
+            </a:ln>
+          </p:spPr>
+          <p:style>
+            <a:lnRef idx="2">
+              <a:schemeClr val="accent1">
+                <a:shade val="50000"/>
+              </a:schemeClr>
+            </a:lnRef>
+            <a:fillRef idx="1">
+              <a:schemeClr val="accent1"/>
+            </a:fillRef>
+            <a:effectRef idx="0">
+              <a:schemeClr val="accent1"/>
+            </a:effectRef>
+            <a:fontRef idx="minor">
+              <a:schemeClr val="lt1"/>
+            </a:fontRef>
+          </p:style>
+        </p:cxnSp>
+        <p:cxnSp>
+          <p:nvCxnSpPr>
+            <p:cNvPr id="109" name="Straight Connector 108"/>
+            <p:cNvCxnSpPr/>
+            <p:nvPr/>
+          </p:nvCxnSpPr>
+          <p:spPr>
+            <a:xfrm>
+              <a:off x="1820390" y="4075469"/>
+              <a:ext cx="0" cy="282492"/>
+            </a:xfrm>
+            <a:prstGeom prst="line">
+              <a:avLst/>
+            </a:prstGeom>
+            <a:ln cap="rnd">
+              <a:solidFill>
+                <a:srgbClr val="0070C0"/>
+              </a:solidFill>
+            </a:ln>
+          </p:spPr>
+          <p:style>
+            <a:lnRef idx="2">
+              <a:schemeClr val="accent1">
+                <a:shade val="50000"/>
+              </a:schemeClr>
+            </a:lnRef>
+            <a:fillRef idx="1">
+              <a:schemeClr val="accent1"/>
+            </a:fillRef>
+            <a:effectRef idx="0">
+              <a:schemeClr val="accent1"/>
+            </a:effectRef>
+            <a:fontRef idx="minor">
+              <a:schemeClr val="lt1"/>
+            </a:fontRef>
+          </p:style>
+        </p:cxnSp>
+        <p:sp>
+          <p:nvSpPr>
+            <p:cNvPr id="106" name="Flowchart: Connector 105"/>
+            <p:cNvSpPr/>
+            <p:nvPr/>
+          </p:nvSpPr>
+          <p:spPr>
+            <a:xfrm>
+              <a:off x="1727851" y="4124176"/>
+              <a:ext cx="185078" cy="185078"/>
+            </a:xfrm>
+            <a:prstGeom prst="flowChartConnector">
+              <a:avLst/>
+            </a:prstGeom>
+            <a:solidFill>
+              <a:schemeClr val="bg1"/>
+            </a:solidFill>
+            <a:ln>
+              <a:solidFill>
+                <a:srgbClr val="0070C0"/>
+              </a:solidFill>
+            </a:ln>
+          </p:spPr>
+          <p:style>
+            <a:lnRef idx="2">
+              <a:schemeClr val="accent1">
+                <a:shade val="50000"/>
+              </a:schemeClr>
+            </a:lnRef>
+            <a:fillRef idx="1">
+              <a:schemeClr val="accent1"/>
+            </a:fillRef>
+            <a:effectRef idx="0">
+              <a:schemeClr val="accent1"/>
+            </a:effectRef>
+            <a:fontRef idx="minor">
+              <a:schemeClr val="lt1"/>
+            </a:fontRef>
+          </p:style>
+          <p:txBody>
+            <a:bodyPr rtlCol="0" anchor="ctr"/>
+            <a:lstStyle/>
+            <a:p>
+              <a:pPr algn="ctr"/>
+              <a:endParaRPr lang="en-SG"/>
+            </a:p>
+          </p:txBody>
+        </p:sp>
+      </p:grpSp>
+      <p:sp>
+        <p:nvSpPr>
+          <p:cNvPr id="221" name="Flowchart: Connector 220"/>
+          <p:cNvSpPr/>
+          <p:nvPr/>
+        </p:nvSpPr>
+        <p:spPr>
+          <a:xfrm>
+            <a:off x="3198149" y="3540495"/>
+            <a:ext cx="200174" cy="200174"/>
+          </a:xfrm>
+          <a:prstGeom prst="flowChartConnector">
+            <a:avLst/>
+          </a:prstGeom>
+          <a:gradFill flip="none" rotWithShape="1">
+            <a:gsLst>
+              <a:gs pos="0">
+                <a:srgbClr val="0070C0"/>
+              </a:gs>
+              <a:gs pos="75000">
+                <a:schemeClr val="bg1"/>
+              </a:gs>
+              <a:gs pos="33000">
+                <a:srgbClr val="0070C0"/>
+              </a:gs>
+              <a:gs pos="100000">
+                <a:schemeClr val="bg1"/>
+              </a:gs>
+            </a:gsLst>
+            <a:lin ang="10800000" scaled="1"/>
+            <a:tileRect/>
+          </a:gradFill>
+          <a:ln>
+            <a:solidFill>
+              <a:srgbClr val="0070C0"/>
+            </a:solidFill>
+          </a:ln>
+        </p:spPr>
+        <p:style>
+          <a:lnRef idx="2">
+            <a:schemeClr val="accent1">
+              <a:shade val="50000"/>
+            </a:schemeClr>
+          </a:lnRef>
+          <a:fillRef idx="1">
+            <a:schemeClr val="accent1"/>
+          </a:fillRef>
+          <a:effectRef idx="0">
+            <a:schemeClr val="accent1"/>
+          </a:effectRef>
+          <a:fontRef idx="minor">
+            <a:schemeClr val="lt1"/>
+          </a:fontRef>
+        </p:style>
+        <p:txBody>
+          <a:bodyPr rtlCol="0" anchor="ctr"/>
+          <a:lstStyle/>
+          <a:p>
+            <a:pPr algn="ctr"/>
+            <a:endParaRPr lang="en-SG"/>
+          </a:p>
+        </p:txBody>
+      </p:sp>
+      <p:sp>
+        <p:nvSpPr>
+          <p:cNvPr id="138" name="TextBox 137"/>
+          <p:cNvSpPr txBox="1"/>
+          <p:nvPr/>
+        </p:nvSpPr>
+        <p:spPr>
+          <a:xfrm>
+            <a:off x="1021364" y="3898693"/>
+            <a:ext cx="474927" cy="461665"/>
+          </a:xfrm>
+          <a:prstGeom prst="rect">
+            <a:avLst/>
+          </a:prstGeom>
+          <a:noFill/>
+        </p:spPr>
+        <p:txBody>
+          <a:bodyPr wrap="square" rtlCol="0">
+            <a:spAutoFit/>
+          </a:bodyPr>
+          <a:lstStyle/>
+          <a:p>
+            <a:r>
+              <a:rPr lang="en-US" sz="800" dirty="0" smtClean="0"/>
+              <a:t>Pick text color</a:t>
+            </a:r>
+            <a:endParaRPr lang="en-SG" sz="800" dirty="0"/>
+          </a:p>
+        </p:txBody>
+      </p:sp>
+      <p:sp>
+        <p:nvSpPr>
+          <p:cNvPr id="223" name="TextBox 222"/>
+          <p:cNvSpPr txBox="1"/>
+          <p:nvPr/>
+        </p:nvSpPr>
+        <p:spPr>
+          <a:xfrm>
+            <a:off x="1568513" y="3967749"/>
+            <a:ext cx="474927" cy="461665"/>
+          </a:xfrm>
+          <a:prstGeom prst="rect">
+            <a:avLst/>
+          </a:prstGeom>
+          <a:noFill/>
+        </p:spPr>
+        <p:txBody>
+          <a:bodyPr wrap="square" rtlCol="0">
+            <a:spAutoFit/>
+          </a:bodyPr>
+          <a:lstStyle/>
+          <a:p>
+            <a:r>
+              <a:rPr lang="en-US" sz="800" dirty="0" smtClean="0"/>
+              <a:t>Pick line color</a:t>
+            </a:r>
+            <a:endParaRPr lang="en-SG" sz="800" dirty="0"/>
+          </a:p>
+        </p:txBody>
+      </p:sp>
+      <p:sp>
+        <p:nvSpPr>
+          <p:cNvPr id="224" name="TextBox 223"/>
+          <p:cNvSpPr txBox="1"/>
+          <p:nvPr/>
+        </p:nvSpPr>
+        <p:spPr>
+          <a:xfrm>
+            <a:off x="2117955" y="3975182"/>
+            <a:ext cx="474927" cy="338554"/>
+          </a:xfrm>
+          <a:prstGeom prst="rect">
+            <a:avLst/>
+          </a:prstGeom>
+          <a:noFill/>
+        </p:spPr>
+        <p:txBody>
+          <a:bodyPr wrap="square" rtlCol="0">
+            <a:spAutoFit/>
+          </a:bodyPr>
+          <a:lstStyle/>
+          <a:p>
+            <a:r>
+              <a:rPr lang="en-US" sz="800" dirty="0" smtClean="0"/>
+              <a:t>Pick fill color</a:t>
+            </a:r>
+            <a:endParaRPr lang="en-SG" sz="800" dirty="0"/>
+          </a:p>
+        </p:txBody>
+      </p:sp>
+      <p:sp>
+        <p:nvSpPr>
+          <p:cNvPr id="225" name="TextBox 224"/>
+          <p:cNvSpPr txBox="1"/>
+          <p:nvPr/>
+        </p:nvSpPr>
+        <p:spPr>
+          <a:xfrm>
+            <a:off x="2592882" y="3981193"/>
+            <a:ext cx="639741" cy="215444"/>
+          </a:xfrm>
+          <a:prstGeom prst="rect">
+            <a:avLst/>
+          </a:prstGeom>
+          <a:noFill/>
+        </p:spPr>
+        <p:txBody>
+          <a:bodyPr wrap="square" rtlCol="0">
+            <a:spAutoFit/>
+          </a:bodyPr>
+          <a:lstStyle/>
+          <a:p>
+            <a:r>
+              <a:rPr lang="en-US" sz="800" dirty="0" smtClean="0"/>
+              <a:t>brightness</a:t>
+            </a:r>
+            <a:endParaRPr lang="en-SG" sz="800" dirty="0"/>
+          </a:p>
+        </p:txBody>
+      </p:sp>
+      <p:sp>
+        <p:nvSpPr>
+          <p:cNvPr id="226" name="TextBox 225"/>
+          <p:cNvSpPr txBox="1"/>
+          <p:nvPr/>
+        </p:nvSpPr>
+        <p:spPr>
+          <a:xfrm>
+            <a:off x="3198149" y="3983137"/>
+            <a:ext cx="639741" cy="215444"/>
+          </a:xfrm>
+          <a:prstGeom prst="rect">
+            <a:avLst/>
+          </a:prstGeom>
+          <a:noFill/>
+        </p:spPr>
+        <p:txBody>
+          <a:bodyPr wrap="square" rtlCol="0">
+            <a:spAutoFit/>
+          </a:bodyPr>
+          <a:lstStyle/>
+          <a:p>
+            <a:r>
+              <a:rPr lang="en-US" sz="800" dirty="0" smtClean="0"/>
+              <a:t>saturation</a:t>
+            </a:r>
+            <a:endParaRPr lang="en-SG" sz="800" dirty="0"/>
+          </a:p>
+        </p:txBody>
+      </p:sp>
+      <p:grpSp>
+        <p:nvGrpSpPr>
+          <p:cNvPr id="232" name="Group 231"/>
+          <p:cNvGrpSpPr/>
+          <p:nvPr/>
+        </p:nvGrpSpPr>
+        <p:grpSpPr>
+          <a:xfrm>
+            <a:off x="3008849" y="1316899"/>
+            <a:ext cx="338151" cy="546439"/>
+            <a:chOff x="5159570" y="1024749"/>
+            <a:chExt cx="929609" cy="1502210"/>
+          </a:xfrm>
+        </p:grpSpPr>
+        <p:sp>
+          <p:nvSpPr>
+            <p:cNvPr id="230" name="Rounded Rectangle 227"/>
+            <p:cNvSpPr/>
+            <p:nvPr/>
+          </p:nvSpPr>
+          <p:spPr>
+            <a:xfrm rot="2223190">
+              <a:off x="5159570" y="1840571"/>
+              <a:ext cx="286327" cy="645623"/>
+            </a:xfrm>
+            <a:custGeom>
+              <a:avLst/>
+              <a:gdLst/>
+              <a:ahLst/>
+              <a:cxnLst/>
+              <a:rect l="l" t="t" r="r" b="b"/>
+              <a:pathLst>
+                <a:path w="286327" h="645623">
+                  <a:moveTo>
+                    <a:pt x="0" y="207054"/>
+                  </a:moveTo>
+                  <a:lnTo>
+                    <a:pt x="286327" y="0"/>
+                  </a:lnTo>
+                  <a:lnTo>
+                    <a:pt x="286327" y="358324"/>
+                  </a:lnTo>
+                  <a:cubicBezTo>
+                    <a:pt x="286327" y="417546"/>
+                    <a:pt x="247915" y="467798"/>
+                    <a:pt x="194109" y="483908"/>
+                  </a:cubicBezTo>
+                  <a:cubicBezTo>
+                    <a:pt x="194108" y="520831"/>
+                    <a:pt x="194108" y="557755"/>
+                    <a:pt x="194108" y="594678"/>
+                  </a:cubicBezTo>
+                  <a:cubicBezTo>
+                    <a:pt x="194108" y="622814"/>
+                    <a:pt x="171299" y="645623"/>
+                    <a:pt x="143163" y="645623"/>
+                  </a:cubicBezTo>
+                  <a:lnTo>
+                    <a:pt x="143164" y="645622"/>
+                  </a:lnTo>
+                  <a:cubicBezTo>
+                    <a:pt x="115028" y="645622"/>
+                    <a:pt x="92219" y="622813"/>
+                    <a:pt x="92219" y="594677"/>
+                  </a:cubicBezTo>
+                  <a:lnTo>
+                    <a:pt x="92219" y="483908"/>
+                  </a:lnTo>
+                  <a:cubicBezTo>
+                    <a:pt x="38413" y="467798"/>
+                    <a:pt x="0" y="417547"/>
+                    <a:pt x="0" y="358324"/>
+                  </a:cubicBezTo>
+                  <a:close/>
+                </a:path>
+              </a:pathLst>
+            </a:custGeom>
+            <a:solidFill>
+              <a:srgbClr val="0070C0"/>
+            </a:solidFill>
+            <a:ln w="28575">
+              <a:noFill/>
+            </a:ln>
+          </p:spPr>
+          <p:style>
+            <a:lnRef idx="2">
+              <a:schemeClr val="accent1">
+                <a:shade val="50000"/>
+              </a:schemeClr>
+            </a:lnRef>
+            <a:fillRef idx="1">
+              <a:schemeClr val="accent1"/>
+            </a:fillRef>
+            <a:effectRef idx="0">
+              <a:schemeClr val="accent1"/>
+            </a:effectRef>
+            <a:fontRef idx="minor">
+              <a:schemeClr val="lt1"/>
+            </a:fontRef>
+          </p:style>
+          <p:txBody>
+            <a:bodyPr rtlCol="0" anchor="ctr"/>
+            <a:lstStyle/>
+            <a:p>
+              <a:pPr algn="ctr"/>
+              <a:endParaRPr lang="en-SG"/>
+            </a:p>
+          </p:txBody>
+        </p:sp>
+        <p:sp>
+          <p:nvSpPr>
+            <p:cNvPr id="144" name="Rounded Rectangle 143"/>
+            <p:cNvSpPr/>
+            <p:nvPr/>
+          </p:nvSpPr>
+          <p:spPr>
+            <a:xfrm rot="2223190">
+              <a:off x="5730116" y="1024749"/>
+              <a:ext cx="359063" cy="669567"/>
+            </a:xfrm>
+            <a:prstGeom prst="roundRect">
+              <a:avLst>
+                <a:gd name="adj" fmla="val 45699"/>
+              </a:avLst>
+            </a:prstGeom>
+            <a:solidFill>
+              <a:schemeClr val="accent6"/>
+            </a:solidFill>
+            <a:ln w="28575">
+              <a:noFill/>
+            </a:ln>
+          </p:spPr>
+          <p:style>
+            <a:lnRef idx="2">
+              <a:schemeClr val="accent1">
+                <a:shade val="50000"/>
+              </a:schemeClr>
+            </a:lnRef>
+            <a:fillRef idx="1">
+              <a:schemeClr val="accent1"/>
+            </a:fillRef>
+            <a:effectRef idx="0">
+              <a:schemeClr val="accent1"/>
+            </a:effectRef>
+            <a:fontRef idx="minor">
+              <a:schemeClr val="lt1"/>
+            </a:fontRef>
+          </p:style>
+          <p:txBody>
+            <a:bodyPr rtlCol="0" anchor="ctr"/>
+            <a:lstStyle/>
+            <a:p>
+              <a:pPr algn="ctr"/>
+              <a:endParaRPr lang="en-SG"/>
+            </a:p>
+          </p:txBody>
+        </p:sp>
+        <p:sp>
+          <p:nvSpPr>
+            <p:cNvPr id="227" name="Rounded Rectangle 226"/>
+            <p:cNvSpPr/>
+            <p:nvPr/>
+          </p:nvSpPr>
+          <p:spPr>
+            <a:xfrm rot="2223190">
+              <a:off x="5483683" y="1486567"/>
+              <a:ext cx="541489" cy="157104"/>
+            </a:xfrm>
+            <a:prstGeom prst="roundRect">
+              <a:avLst>
+                <a:gd name="adj" fmla="val 45699"/>
+              </a:avLst>
+            </a:prstGeom>
+            <a:solidFill>
+              <a:schemeClr val="accent6"/>
+            </a:solidFill>
+            <a:ln w="28575">
+              <a:noFill/>
+            </a:ln>
+          </p:spPr>
+          <p:style>
+            <a:lnRef idx="2">
+              <a:schemeClr val="accent1">
+                <a:shade val="50000"/>
+              </a:schemeClr>
+            </a:lnRef>
+            <a:fillRef idx="1">
+              <a:schemeClr val="accent1"/>
+            </a:fillRef>
+            <a:effectRef idx="0">
+              <a:schemeClr val="accent1"/>
+            </a:effectRef>
+            <a:fontRef idx="minor">
+              <a:schemeClr val="lt1"/>
+            </a:fontRef>
+          </p:style>
+          <p:txBody>
+            <a:bodyPr rtlCol="0" anchor="ctr"/>
+            <a:lstStyle/>
+            <a:p>
+              <a:pPr algn="ctr"/>
+              <a:endParaRPr lang="en-SG"/>
+            </a:p>
+          </p:txBody>
+        </p:sp>
+        <p:sp>
+          <p:nvSpPr>
+            <p:cNvPr id="228" name="Rounded Rectangle 227"/>
+            <p:cNvSpPr/>
+            <p:nvPr/>
+          </p:nvSpPr>
+          <p:spPr>
+            <a:xfrm rot="2223190">
+              <a:off x="5262617" y="1526835"/>
+              <a:ext cx="286327" cy="1000124"/>
+            </a:xfrm>
+            <a:custGeom>
+              <a:avLst/>
+              <a:gdLst/>
+              <a:ahLst/>
+              <a:cxnLst/>
+              <a:rect l="l" t="t" r="r" b="b"/>
+              <a:pathLst>
+                <a:path w="286327" h="1000124">
+                  <a:moveTo>
+                    <a:pt x="2115" y="0"/>
+                  </a:moveTo>
+                  <a:lnTo>
+                    <a:pt x="284212" y="0"/>
+                  </a:lnTo>
+                  <a:cubicBezTo>
+                    <a:pt x="286188" y="3367"/>
+                    <a:pt x="286327" y="6905"/>
+                    <a:pt x="286327" y="10476"/>
+                  </a:cubicBezTo>
+                  <a:lnTo>
+                    <a:pt x="286327" y="712825"/>
+                  </a:lnTo>
+                  <a:cubicBezTo>
+                    <a:pt x="286327" y="772047"/>
+                    <a:pt x="247915" y="822299"/>
+                    <a:pt x="194109" y="838409"/>
+                  </a:cubicBezTo>
+                  <a:cubicBezTo>
+                    <a:pt x="194108" y="875332"/>
+                    <a:pt x="194108" y="912256"/>
+                    <a:pt x="194108" y="949179"/>
+                  </a:cubicBezTo>
+                  <a:cubicBezTo>
+                    <a:pt x="194108" y="977315"/>
+                    <a:pt x="171299" y="1000124"/>
+                    <a:pt x="143163" y="1000124"/>
+                  </a:cubicBezTo>
+                  <a:lnTo>
+                    <a:pt x="143164" y="1000123"/>
+                  </a:lnTo>
+                  <a:cubicBezTo>
+                    <a:pt x="115028" y="1000123"/>
+                    <a:pt x="92219" y="977314"/>
+                    <a:pt x="92219" y="949178"/>
+                  </a:cubicBezTo>
+                  <a:lnTo>
+                    <a:pt x="92219" y="838409"/>
+                  </a:lnTo>
+                  <a:cubicBezTo>
+                    <a:pt x="38413" y="822299"/>
+                    <a:pt x="0" y="772048"/>
+                    <a:pt x="0" y="712825"/>
+                  </a:cubicBezTo>
+                  <a:lnTo>
+                    <a:pt x="0" y="10476"/>
+                  </a:lnTo>
+                  <a:close/>
+                </a:path>
+              </a:pathLst>
+            </a:custGeom>
+            <a:noFill/>
+            <a:ln w="19050">
+              <a:solidFill>
+                <a:schemeClr val="accent6"/>
+              </a:solidFill>
+            </a:ln>
+          </p:spPr>
+          <p:style>
+            <a:lnRef idx="2">
+              <a:schemeClr val="accent1">
+                <a:shade val="50000"/>
+              </a:schemeClr>
+            </a:lnRef>
+            <a:fillRef idx="1">
+              <a:schemeClr val="accent1"/>
+            </a:fillRef>
+            <a:effectRef idx="0">
+              <a:schemeClr val="accent1"/>
+            </a:effectRef>
+            <a:fontRef idx="minor">
+              <a:schemeClr val="lt1"/>
+            </a:fontRef>
+          </p:style>
+          <p:txBody>
+            <a:bodyPr rtlCol="0" anchor="ctr"/>
+            <a:lstStyle/>
+            <a:p>
+              <a:pPr algn="ctr"/>
+              <a:endParaRPr lang="en-SG"/>
+            </a:p>
+          </p:txBody>
+        </p:sp>
+      </p:grpSp>
+      <p:sp>
+        <p:nvSpPr>
+          <p:cNvPr id="233" name="Rectangle 4"/>
+          <p:cNvSpPr/>
+          <p:nvPr/>
+        </p:nvSpPr>
+        <p:spPr>
+          <a:xfrm rot="16200000">
+            <a:off x="2826682" y="1247305"/>
+            <a:ext cx="700291" cy="690781"/>
+          </a:xfrm>
+          <a:custGeom>
+            <a:avLst/>
+            <a:gdLst/>
+            <a:ahLst/>
+            <a:cxnLst/>
+            <a:rect l="l" t="t" r="r" b="b"/>
+            <a:pathLst>
+              <a:path w="1752603" h="1752600">
+                <a:moveTo>
+                  <a:pt x="533400" y="0"/>
+                </a:moveTo>
+                <a:lnTo>
+                  <a:pt x="533403" y="0"/>
+                </a:lnTo>
+                <a:lnTo>
+                  <a:pt x="1066800" y="0"/>
+                </a:lnTo>
+                <a:lnTo>
+                  <a:pt x="1752603" y="0"/>
+                </a:lnTo>
+                <a:lnTo>
+                  <a:pt x="1752603" y="1752600"/>
+                </a:lnTo>
+                <a:lnTo>
+                  <a:pt x="1219203" y="1752600"/>
+                </a:lnTo>
+                <a:lnTo>
+                  <a:pt x="533403" y="1752600"/>
+                </a:lnTo>
+                <a:lnTo>
+                  <a:pt x="3" y="1752600"/>
+                </a:lnTo>
+                <a:lnTo>
+                  <a:pt x="3" y="533430"/>
+                </a:lnTo>
+                <a:cubicBezTo>
+                  <a:pt x="0" y="533420"/>
+                  <a:pt x="0" y="533410"/>
+                  <a:pt x="0" y="533400"/>
+                </a:cubicBezTo>
+                <a:cubicBezTo>
+                  <a:pt x="0" y="238811"/>
+                  <a:pt x="238811" y="0"/>
+                  <a:pt x="533400" y="0"/>
+                </a:cubicBezTo>
+                <a:close/>
+              </a:path>
+            </a:pathLst>
+          </a:custGeom>
+          <a:noFill/>
+          <a:ln w="76200" cmpd="sng">
+            <a:solidFill>
+              <a:srgbClr val="0070C0"/>
+            </a:solidFill>
+            <a:miter lim="800000"/>
+          </a:ln>
+        </p:spPr>
+        <p:style>
+          <a:lnRef idx="2">
+            <a:schemeClr val="accent1">
+              <a:shade val="50000"/>
+            </a:schemeClr>
+          </a:lnRef>
+          <a:fillRef idx="1">
+            <a:schemeClr val="accent1"/>
+          </a:fillRef>
+          <a:effectRef idx="0">
+            <a:schemeClr val="accent1"/>
+          </a:effectRef>
+          <a:fontRef idx="minor">
+            <a:schemeClr val="lt1"/>
+          </a:fontRef>
+        </p:style>
+        <p:txBody>
+          <a:bodyPr rtlCol="0" anchor="ctr"/>
+          <a:lstStyle/>
+          <a:p>
+            <a:pPr algn="ctr"/>
+            <a:endParaRPr lang="en-US"/>
+          </a:p>
+        </p:txBody>
+      </p:sp>
+      <p:sp>
+        <p:nvSpPr>
+          <p:cNvPr id="235" name="TextBox 234"/>
+          <p:cNvSpPr txBox="1"/>
+          <p:nvPr/>
+        </p:nvSpPr>
+        <p:spPr>
+          <a:xfrm>
+            <a:off x="2758038" y="2060640"/>
+            <a:ext cx="916799" cy="338554"/>
+          </a:xfrm>
+          <a:prstGeom prst="rect">
+            <a:avLst/>
+          </a:prstGeom>
+          <a:noFill/>
+        </p:spPr>
+        <p:txBody>
+          <a:bodyPr wrap="square" rtlCol="0">
+            <a:spAutoFit/>
+          </a:bodyPr>
+          <a:lstStyle/>
+          <a:p>
+            <a:pPr algn="ctr"/>
+            <a:r>
+              <a:rPr lang="en-US" sz="800" dirty="0" smtClean="0"/>
+              <a:t>Colors </a:t>
+            </a:r>
+            <a:r>
+              <a:rPr lang="en-US" sz="800" dirty="0" smtClean="0"/>
+              <a:t>Lab (alternative)</a:t>
+            </a:r>
+            <a:endParaRPr lang="en-SG" sz="800" dirty="0"/>
+          </a:p>
+        </p:txBody>
+      </p:sp>
+      <p:grpSp>
+        <p:nvGrpSpPr>
+          <p:cNvPr id="258" name="Group 257"/>
+          <p:cNvGrpSpPr/>
+          <p:nvPr/>
+        </p:nvGrpSpPr>
+        <p:grpSpPr>
+          <a:xfrm>
+            <a:off x="4458419" y="3547125"/>
+            <a:ext cx="421200" cy="420624"/>
+            <a:chOff x="5541069" y="3504060"/>
+            <a:chExt cx="421200" cy="420624"/>
+          </a:xfrm>
+        </p:grpSpPr>
+        <p:grpSp>
+          <p:nvGrpSpPr>
+            <p:cNvPr id="251" name="Group 250"/>
+            <p:cNvGrpSpPr/>
+            <p:nvPr/>
+          </p:nvGrpSpPr>
+          <p:grpSpPr>
+            <a:xfrm>
+              <a:off x="5541069" y="3504060"/>
+              <a:ext cx="421200" cy="420624"/>
+              <a:chOff x="2605155" y="2844833"/>
+              <a:chExt cx="421200" cy="420624"/>
+            </a:xfrm>
+          </p:grpSpPr>
+          <p:sp>
+            <p:nvSpPr>
+              <p:cNvPr id="252" name="Rectangle 251"/>
+              <p:cNvSpPr/>
+              <p:nvPr/>
+            </p:nvSpPr>
+            <p:spPr>
+              <a:xfrm rot="5400000" flipH="1">
+                <a:off x="2605443" y="2844545"/>
+                <a:ext cx="420624" cy="421200"/>
+              </a:xfrm>
+              <a:prstGeom prst="rect">
+                <a:avLst/>
+              </a:prstGeom>
+              <a:solidFill>
+                <a:srgbClr val="0070C0"/>
+              </a:solidFill>
+              <a:ln>
+                <a:noFill/>
+              </a:ln>
+            </p:spPr>
+            <p:style>
+              <a:lnRef idx="2">
+                <a:schemeClr val="accent1">
+                  <a:shade val="50000"/>
+                </a:schemeClr>
+              </a:lnRef>
+              <a:fillRef idx="1">
+                <a:schemeClr val="accent1"/>
+              </a:fillRef>
+              <a:effectRef idx="0">
+                <a:schemeClr val="accent1"/>
+              </a:effectRef>
+              <a:fontRef idx="minor">
+                <a:schemeClr val="lt1"/>
+              </a:fontRef>
+            </p:style>
+            <p:txBody>
+              <a:bodyPr wrap="none" lIns="0" tIns="0" rIns="0" bIns="0" rtlCol="0" anchor="ctr"/>
+              <a:lstStyle/>
+              <a:p>
+                <a:pPr algn="ctr"/>
+                <a:endParaRPr lang="en-US" b="1"/>
+              </a:p>
+            </p:txBody>
+          </p:sp>
+          <p:sp>
+            <p:nvSpPr>
+              <p:cNvPr id="253" name="Rectangle 252"/>
+              <p:cNvSpPr/>
+              <p:nvPr/>
+            </p:nvSpPr>
+            <p:spPr>
+              <a:xfrm>
+                <a:off x="2672422" y="3170164"/>
+                <a:ext cx="286665" cy="53741"/>
+              </a:xfrm>
+              <a:prstGeom prst="rect">
+                <a:avLst/>
+              </a:prstGeom>
+              <a:solidFill>
+                <a:schemeClr val="bg1"/>
+              </a:solidFill>
+              <a:ln>
+                <a:noFill/>
+              </a:ln>
+            </p:spPr>
+            <p:style>
+              <a:lnRef idx="2">
+                <a:schemeClr val="accent1">
+                  <a:shade val="50000"/>
+                </a:schemeClr>
+              </a:lnRef>
+              <a:fillRef idx="1">
+                <a:schemeClr val="accent1"/>
+              </a:fillRef>
+              <a:effectRef idx="0">
+                <a:schemeClr val="accent1"/>
+              </a:effectRef>
+              <a:fontRef idx="minor">
+                <a:schemeClr val="lt1"/>
+              </a:fontRef>
+            </p:style>
+            <p:txBody>
+              <a:bodyPr rtlCol="0" anchor="ctr"/>
+              <a:lstStyle/>
+              <a:p>
+                <a:pPr algn="ctr"/>
+                <a:endParaRPr lang="en-SG"/>
+              </a:p>
+            </p:txBody>
+          </p:sp>
+        </p:grpSp>
+        <p:sp>
+          <p:nvSpPr>
+            <p:cNvPr id="242" name="Down Arrow 241"/>
+            <p:cNvSpPr/>
+            <p:nvPr/>
+          </p:nvSpPr>
+          <p:spPr>
+            <a:xfrm>
+              <a:off x="5630075" y="3571548"/>
+              <a:ext cx="243189" cy="225764"/>
+            </a:xfrm>
+            <a:prstGeom prst="downArrow">
+              <a:avLst/>
+            </a:prstGeom>
+            <a:solidFill>
+              <a:schemeClr val="bg1"/>
+            </a:solidFill>
+            <a:ln>
+              <a:noFill/>
+            </a:ln>
+          </p:spPr>
+          <p:style>
+            <a:lnRef idx="2">
+              <a:schemeClr val="accent1">
+                <a:shade val="50000"/>
+              </a:schemeClr>
+            </a:lnRef>
+            <a:fillRef idx="1">
+              <a:schemeClr val="accent1"/>
+            </a:fillRef>
+            <a:effectRef idx="0">
+              <a:schemeClr val="accent1"/>
+            </a:effectRef>
+            <a:fontRef idx="minor">
+              <a:schemeClr val="lt1"/>
+            </a:fontRef>
+          </p:style>
+          <p:txBody>
+            <a:bodyPr rtlCol="0" anchor="ctr"/>
+            <a:lstStyle/>
+            <a:p>
+              <a:pPr algn="ctr"/>
+              <a:endParaRPr lang="en-SG"/>
+            </a:p>
+          </p:txBody>
+        </p:sp>
+        <p:sp>
+          <p:nvSpPr>
+            <p:cNvPr id="250" name="Rectangle 249"/>
+            <p:cNvSpPr/>
+            <p:nvPr/>
+          </p:nvSpPr>
+          <p:spPr>
+            <a:xfrm>
+              <a:off x="5623725" y="3842770"/>
+              <a:ext cx="45719" cy="25807"/>
+            </a:xfrm>
+            <a:prstGeom prst="rect">
+              <a:avLst/>
+            </a:prstGeom>
+            <a:solidFill>
+              <a:srgbClr val="0070C0"/>
+            </a:solidFill>
+            <a:ln>
+              <a:noFill/>
+            </a:ln>
+          </p:spPr>
+          <p:style>
+            <a:lnRef idx="2">
+              <a:schemeClr val="accent1">
+                <a:shade val="50000"/>
+              </a:schemeClr>
+            </a:lnRef>
+            <a:fillRef idx="1">
+              <a:schemeClr val="accent1"/>
+            </a:fillRef>
+            <a:effectRef idx="0">
+              <a:schemeClr val="accent1"/>
+            </a:effectRef>
+            <a:fontRef idx="minor">
+              <a:schemeClr val="lt1"/>
+            </a:fontRef>
+          </p:style>
+          <p:txBody>
+            <a:bodyPr rtlCol="0" anchor="ctr"/>
+            <a:lstStyle/>
+            <a:p>
+              <a:pPr algn="ctr"/>
+              <a:endParaRPr lang="en-SG"/>
+            </a:p>
+          </p:txBody>
+        </p:sp>
+      </p:grpSp>
+      <p:grpSp>
+        <p:nvGrpSpPr>
+          <p:cNvPr id="261" name="Group 260"/>
+          <p:cNvGrpSpPr/>
+          <p:nvPr/>
+        </p:nvGrpSpPr>
+        <p:grpSpPr>
+          <a:xfrm>
+            <a:off x="4994994" y="3547125"/>
+            <a:ext cx="421200" cy="420624"/>
+            <a:chOff x="5541069" y="3504060"/>
+            <a:chExt cx="421200" cy="420624"/>
+          </a:xfrm>
+        </p:grpSpPr>
+        <p:grpSp>
+          <p:nvGrpSpPr>
+            <p:cNvPr id="262" name="Group 261"/>
+            <p:cNvGrpSpPr/>
+            <p:nvPr/>
+          </p:nvGrpSpPr>
+          <p:grpSpPr>
+            <a:xfrm>
+              <a:off x="5541069" y="3504060"/>
+              <a:ext cx="421200" cy="420624"/>
+              <a:chOff x="2605155" y="2844833"/>
+              <a:chExt cx="421200" cy="420624"/>
+            </a:xfrm>
+          </p:grpSpPr>
+          <p:sp>
+            <p:nvSpPr>
+              <p:cNvPr id="265" name="Rectangle 264"/>
+              <p:cNvSpPr/>
+              <p:nvPr/>
+            </p:nvSpPr>
+            <p:spPr>
+              <a:xfrm rot="5400000" flipH="1">
+                <a:off x="2605443" y="2844545"/>
+                <a:ext cx="420624" cy="421200"/>
+              </a:xfrm>
+              <a:prstGeom prst="rect">
+                <a:avLst/>
+              </a:prstGeom>
+              <a:solidFill>
+                <a:srgbClr val="0070C0"/>
+              </a:solidFill>
+              <a:ln>
+                <a:noFill/>
+              </a:ln>
+            </p:spPr>
+            <p:style>
+              <a:lnRef idx="2">
+                <a:schemeClr val="accent1">
+                  <a:shade val="50000"/>
+                </a:schemeClr>
+              </a:lnRef>
+              <a:fillRef idx="1">
+                <a:schemeClr val="accent1"/>
+              </a:fillRef>
+              <a:effectRef idx="0">
+                <a:schemeClr val="accent1"/>
+              </a:effectRef>
+              <a:fontRef idx="minor">
+                <a:schemeClr val="lt1"/>
+              </a:fontRef>
+            </p:style>
+            <p:txBody>
+              <a:bodyPr wrap="none" lIns="0" tIns="0" rIns="0" bIns="0" rtlCol="0" anchor="ctr"/>
+              <a:lstStyle/>
+              <a:p>
+                <a:pPr algn="ctr"/>
+                <a:endParaRPr lang="en-US" b="1"/>
+              </a:p>
+            </p:txBody>
+          </p:sp>
+          <p:sp>
+            <p:nvSpPr>
+              <p:cNvPr id="266" name="Rectangle 265"/>
+              <p:cNvSpPr/>
+              <p:nvPr/>
+            </p:nvSpPr>
+            <p:spPr>
+              <a:xfrm>
+                <a:off x="2672422" y="3170164"/>
+                <a:ext cx="286665" cy="53741"/>
+              </a:xfrm>
+              <a:prstGeom prst="rect">
+                <a:avLst/>
+              </a:prstGeom>
+              <a:solidFill>
+                <a:schemeClr val="bg1"/>
+              </a:solidFill>
+              <a:ln>
+                <a:noFill/>
+              </a:ln>
+            </p:spPr>
+            <p:style>
+              <a:lnRef idx="2">
+                <a:schemeClr val="accent1">
+                  <a:shade val="50000"/>
+                </a:schemeClr>
+              </a:lnRef>
+              <a:fillRef idx="1">
+                <a:schemeClr val="accent1"/>
+              </a:fillRef>
+              <a:effectRef idx="0">
+                <a:schemeClr val="accent1"/>
+              </a:effectRef>
+              <a:fontRef idx="minor">
+                <a:schemeClr val="lt1"/>
+              </a:fontRef>
+            </p:style>
+            <p:txBody>
+              <a:bodyPr rtlCol="0" anchor="ctr"/>
+              <a:lstStyle/>
+              <a:p>
+                <a:pPr algn="ctr"/>
+                <a:endParaRPr lang="en-SG"/>
+              </a:p>
+            </p:txBody>
+          </p:sp>
+        </p:grpSp>
+        <p:sp>
+          <p:nvSpPr>
+            <p:cNvPr id="263" name="Down Arrow 262"/>
+            <p:cNvSpPr/>
+            <p:nvPr/>
+          </p:nvSpPr>
+          <p:spPr>
+            <a:xfrm flipV="1">
+              <a:off x="5630075" y="3555673"/>
+              <a:ext cx="243189" cy="225764"/>
+            </a:xfrm>
+            <a:prstGeom prst="downArrow">
+              <a:avLst/>
+            </a:prstGeom>
+            <a:solidFill>
+              <a:schemeClr val="bg1"/>
+            </a:solidFill>
+            <a:ln>
+              <a:noFill/>
+            </a:ln>
+          </p:spPr>
+          <p:style>
+            <a:lnRef idx="2">
+              <a:schemeClr val="accent1">
+                <a:shade val="50000"/>
+              </a:schemeClr>
+            </a:lnRef>
+            <a:fillRef idx="1">
+              <a:schemeClr val="accent1"/>
+            </a:fillRef>
+            <a:effectRef idx="0">
+              <a:schemeClr val="accent1"/>
+            </a:effectRef>
+            <a:fontRef idx="minor">
+              <a:schemeClr val="lt1"/>
+            </a:fontRef>
+          </p:style>
+          <p:txBody>
+            <a:bodyPr rtlCol="0" anchor="ctr"/>
+            <a:lstStyle/>
+            <a:p>
+              <a:pPr algn="ctr"/>
+              <a:endParaRPr lang="en-SG"/>
+            </a:p>
+          </p:txBody>
+        </p:sp>
+        <p:sp>
+          <p:nvSpPr>
+            <p:cNvPr id="264" name="Rectangle 263"/>
+            <p:cNvSpPr/>
+            <p:nvPr/>
+          </p:nvSpPr>
+          <p:spPr>
+            <a:xfrm>
+              <a:off x="5623725" y="3842770"/>
+              <a:ext cx="45719" cy="25807"/>
+            </a:xfrm>
+            <a:prstGeom prst="rect">
+              <a:avLst/>
+            </a:prstGeom>
+            <a:solidFill>
+              <a:srgbClr val="0070C0"/>
+            </a:solidFill>
+            <a:ln>
+              <a:noFill/>
+            </a:ln>
+          </p:spPr>
+          <p:style>
+            <a:lnRef idx="2">
+              <a:schemeClr val="accent1">
+                <a:shade val="50000"/>
+              </a:schemeClr>
+            </a:lnRef>
+            <a:fillRef idx="1">
+              <a:schemeClr val="accent1"/>
+            </a:fillRef>
+            <a:effectRef idx="0">
+              <a:schemeClr val="accent1"/>
+            </a:effectRef>
+            <a:fontRef idx="minor">
+              <a:schemeClr val="lt1"/>
+            </a:fontRef>
+          </p:style>
+          <p:txBody>
+            <a:bodyPr rtlCol="0" anchor="ctr"/>
+            <a:lstStyle/>
+            <a:p>
+              <a:pPr algn="ctr"/>
+              <a:endParaRPr lang="en-SG"/>
+            </a:p>
+          </p:txBody>
+        </p:sp>
+      </p:grpSp>
+      <p:grpSp>
+        <p:nvGrpSpPr>
+          <p:cNvPr id="260" name="Group 259"/>
+          <p:cNvGrpSpPr/>
+          <p:nvPr/>
+        </p:nvGrpSpPr>
+        <p:grpSpPr>
+          <a:xfrm>
+            <a:off x="5568594" y="3556278"/>
+            <a:ext cx="421200" cy="420624"/>
+            <a:chOff x="6651244" y="3513213"/>
+            <a:chExt cx="421200" cy="420624"/>
+          </a:xfrm>
+        </p:grpSpPr>
+        <p:grpSp>
+          <p:nvGrpSpPr>
+            <p:cNvPr id="267" name="Group 266"/>
+            <p:cNvGrpSpPr/>
+            <p:nvPr/>
+          </p:nvGrpSpPr>
+          <p:grpSpPr>
+            <a:xfrm>
+              <a:off x="6651244" y="3513213"/>
+              <a:ext cx="421200" cy="420624"/>
+              <a:chOff x="5541069" y="3504060"/>
+              <a:chExt cx="421200" cy="420624"/>
+            </a:xfrm>
+          </p:grpSpPr>
+          <p:sp>
+            <p:nvSpPr>
+              <p:cNvPr id="271" name="Rectangle 270"/>
+              <p:cNvSpPr/>
+              <p:nvPr/>
+            </p:nvSpPr>
+            <p:spPr>
+              <a:xfrm rot="5400000" flipH="1">
+                <a:off x="5541357" y="3503772"/>
+                <a:ext cx="420624" cy="421200"/>
+              </a:xfrm>
+              <a:prstGeom prst="rect">
+                <a:avLst/>
+              </a:prstGeom>
+              <a:solidFill>
+                <a:srgbClr val="0070C0"/>
+              </a:solidFill>
+              <a:ln>
+                <a:noFill/>
+              </a:ln>
+            </p:spPr>
+            <p:style>
+              <a:lnRef idx="2">
+                <a:schemeClr val="accent1">
+                  <a:shade val="50000"/>
+                </a:schemeClr>
+              </a:lnRef>
+              <a:fillRef idx="1">
+                <a:schemeClr val="accent1"/>
+              </a:fillRef>
+              <a:effectRef idx="0">
+                <a:schemeClr val="accent1"/>
+              </a:effectRef>
+              <a:fontRef idx="minor">
+                <a:schemeClr val="lt1"/>
+              </a:fontRef>
+            </p:style>
+            <p:txBody>
+              <a:bodyPr wrap="none" lIns="0" tIns="0" rIns="0" bIns="0" rtlCol="0" anchor="ctr"/>
+              <a:lstStyle/>
+              <a:p>
+                <a:pPr algn="ctr"/>
+                <a:endParaRPr lang="en-US" b="1"/>
+              </a:p>
+            </p:txBody>
+          </p:sp>
+          <p:sp>
+            <p:nvSpPr>
+              <p:cNvPr id="270" name="Rectangle 269"/>
+              <p:cNvSpPr/>
+              <p:nvPr/>
+            </p:nvSpPr>
+            <p:spPr>
+              <a:xfrm>
+                <a:off x="5623725" y="3842770"/>
+                <a:ext cx="45719" cy="25807"/>
+              </a:xfrm>
+              <a:prstGeom prst="rect">
+                <a:avLst/>
+              </a:prstGeom>
+              <a:solidFill>
+                <a:srgbClr val="0070C0"/>
+              </a:solidFill>
+              <a:ln>
+                <a:noFill/>
+              </a:ln>
+            </p:spPr>
+            <p:style>
+              <a:lnRef idx="2">
+                <a:schemeClr val="accent1">
+                  <a:shade val="50000"/>
+                </a:schemeClr>
+              </a:lnRef>
+              <a:fillRef idx="1">
+                <a:schemeClr val="accent1"/>
+              </a:fillRef>
+              <a:effectRef idx="0">
+                <a:schemeClr val="accent1"/>
+              </a:effectRef>
+              <a:fontRef idx="minor">
+                <a:schemeClr val="lt1"/>
+              </a:fontRef>
+            </p:style>
+            <p:txBody>
+              <a:bodyPr rtlCol="0" anchor="ctr"/>
+              <a:lstStyle/>
+              <a:p>
+                <a:pPr algn="ctr"/>
+                <a:endParaRPr lang="en-SG"/>
+              </a:p>
+            </p:txBody>
+          </p:sp>
+        </p:grpSp>
+        <p:sp>
+          <p:nvSpPr>
+            <p:cNvPr id="259" name="Multiply 258"/>
+            <p:cNvSpPr/>
+            <p:nvPr/>
+          </p:nvSpPr>
+          <p:spPr>
+            <a:xfrm>
+              <a:off x="6715794" y="3577957"/>
+              <a:ext cx="292100" cy="273966"/>
+            </a:xfrm>
+            <a:prstGeom prst="mathMultiply">
+              <a:avLst/>
+            </a:prstGeom>
+            <a:solidFill>
+              <a:schemeClr val="bg1"/>
+            </a:solidFill>
+            <a:ln cap="rnd">
+              <a:solidFill>
+                <a:schemeClr val="bg1"/>
+              </a:solidFill>
+            </a:ln>
+          </p:spPr>
+          <p:style>
+            <a:lnRef idx="2">
+              <a:schemeClr val="accent1">
+                <a:shade val="50000"/>
+              </a:schemeClr>
+            </a:lnRef>
+            <a:fillRef idx="1">
+              <a:schemeClr val="accent1"/>
+            </a:fillRef>
+            <a:effectRef idx="0">
+              <a:schemeClr val="accent1"/>
+            </a:effectRef>
+            <a:fontRef idx="minor">
+              <a:schemeClr val="lt1"/>
+            </a:fontRef>
+          </p:style>
+          <p:txBody>
+            <a:bodyPr rtlCol="0" anchor="ctr"/>
+            <a:lstStyle/>
+            <a:p>
+              <a:pPr algn="ctr"/>
+              <a:endParaRPr lang="en-SG"/>
+            </a:p>
+          </p:txBody>
+        </p:sp>
+      </p:grpSp>
+      <p:grpSp>
+        <p:nvGrpSpPr>
+          <p:cNvPr id="276" name="Group 275"/>
+          <p:cNvGrpSpPr/>
+          <p:nvPr/>
+        </p:nvGrpSpPr>
+        <p:grpSpPr>
+          <a:xfrm>
+            <a:off x="6077644" y="3556278"/>
+            <a:ext cx="421200" cy="420624"/>
+            <a:chOff x="5541069" y="3504060"/>
+            <a:chExt cx="421200" cy="420624"/>
+          </a:xfrm>
+        </p:grpSpPr>
+        <p:sp>
+          <p:nvSpPr>
+            <p:cNvPr id="278" name="Rectangle 277"/>
+            <p:cNvSpPr/>
+            <p:nvPr/>
+          </p:nvSpPr>
+          <p:spPr>
+            <a:xfrm rot="5400000" flipH="1">
+              <a:off x="5541357" y="3503772"/>
+              <a:ext cx="420624" cy="421200"/>
+            </a:xfrm>
+            <a:prstGeom prst="rect">
+              <a:avLst/>
+            </a:prstGeom>
+            <a:solidFill>
+              <a:srgbClr val="0070C0"/>
+            </a:solidFill>
+            <a:ln>
+              <a:noFill/>
+            </a:ln>
+          </p:spPr>
+          <p:style>
+            <a:lnRef idx="2">
+              <a:schemeClr val="accent1">
+                <a:shade val="50000"/>
+              </a:schemeClr>
+            </a:lnRef>
+            <a:fillRef idx="1">
+              <a:schemeClr val="accent1"/>
+            </a:fillRef>
+            <a:effectRef idx="0">
+              <a:schemeClr val="accent1"/>
+            </a:effectRef>
+            <a:fontRef idx="minor">
+              <a:schemeClr val="lt1"/>
+            </a:fontRef>
+          </p:style>
+          <p:txBody>
+            <a:bodyPr wrap="none" lIns="0" tIns="0" rIns="0" bIns="0" rtlCol="0" anchor="ctr"/>
+            <a:lstStyle/>
+            <a:p>
+              <a:pPr algn="ctr"/>
+              <a:endParaRPr lang="en-US" b="1"/>
+            </a:p>
+          </p:txBody>
+        </p:sp>
+        <p:sp>
+          <p:nvSpPr>
+            <p:cNvPr id="279" name="Rectangle 278"/>
+            <p:cNvSpPr/>
+            <p:nvPr/>
+          </p:nvSpPr>
+          <p:spPr>
+            <a:xfrm>
+              <a:off x="5623725" y="3842770"/>
+              <a:ext cx="45719" cy="25807"/>
+            </a:xfrm>
+            <a:prstGeom prst="rect">
+              <a:avLst/>
+            </a:prstGeom>
+            <a:solidFill>
+              <a:srgbClr val="0070C0"/>
+            </a:solidFill>
+            <a:ln>
+              <a:noFill/>
+            </a:ln>
+          </p:spPr>
+          <p:style>
+            <a:lnRef idx="2">
+              <a:schemeClr val="accent1">
+                <a:shade val="50000"/>
+              </a:schemeClr>
+            </a:lnRef>
+            <a:fillRef idx="1">
+              <a:schemeClr val="accent1"/>
+            </a:fillRef>
+            <a:effectRef idx="0">
+              <a:schemeClr val="accent1"/>
+            </a:effectRef>
+            <a:fontRef idx="minor">
+              <a:schemeClr val="lt1"/>
+            </a:fontRef>
+          </p:style>
+          <p:txBody>
+            <a:bodyPr rtlCol="0" anchor="ctr"/>
+            <a:lstStyle/>
+            <a:p>
+              <a:pPr algn="ctr"/>
+              <a:endParaRPr lang="en-SG"/>
+            </a:p>
+          </p:txBody>
+        </p:sp>
+      </p:grpSp>
+      <p:grpSp>
+        <p:nvGrpSpPr>
+          <p:cNvPr id="281" name="Group 280"/>
+          <p:cNvGrpSpPr/>
+          <p:nvPr/>
+        </p:nvGrpSpPr>
+        <p:grpSpPr>
+          <a:xfrm>
+            <a:off x="6583375" y="3556278"/>
+            <a:ext cx="421200" cy="420624"/>
+            <a:chOff x="5541069" y="3504060"/>
+            <a:chExt cx="421200" cy="420624"/>
+          </a:xfrm>
+        </p:grpSpPr>
+        <p:sp>
+          <p:nvSpPr>
+            <p:cNvPr id="282" name="Rectangle 281"/>
+            <p:cNvSpPr/>
+            <p:nvPr/>
+          </p:nvSpPr>
+          <p:spPr>
+            <a:xfrm rot="5400000" flipH="1">
+              <a:off x="5541357" y="3503772"/>
+              <a:ext cx="420624" cy="421200"/>
+            </a:xfrm>
+            <a:prstGeom prst="rect">
+              <a:avLst/>
+            </a:prstGeom>
+            <a:solidFill>
+              <a:srgbClr val="0070C0"/>
+            </a:solidFill>
+            <a:ln>
+              <a:noFill/>
+            </a:ln>
+          </p:spPr>
+          <p:style>
+            <a:lnRef idx="2">
+              <a:schemeClr val="accent1">
+                <a:shade val="50000"/>
+              </a:schemeClr>
+            </a:lnRef>
+            <a:fillRef idx="1">
+              <a:schemeClr val="accent1"/>
+            </a:fillRef>
+            <a:effectRef idx="0">
+              <a:schemeClr val="accent1"/>
+            </a:effectRef>
+            <a:fontRef idx="minor">
+              <a:schemeClr val="lt1"/>
+            </a:fontRef>
+          </p:style>
+          <p:txBody>
+            <a:bodyPr wrap="none" lIns="0" tIns="0" rIns="0" bIns="0" rtlCol="0" anchor="ctr"/>
+            <a:lstStyle/>
+            <a:p>
+              <a:pPr algn="ctr"/>
+              <a:endParaRPr lang="en-US" b="1"/>
+            </a:p>
+          </p:txBody>
+        </p:sp>
+        <p:sp>
+          <p:nvSpPr>
+            <p:cNvPr id="283" name="Rectangle 282"/>
+            <p:cNvSpPr/>
+            <p:nvPr/>
+          </p:nvSpPr>
+          <p:spPr>
+            <a:xfrm>
+              <a:off x="5623725" y="3842770"/>
+              <a:ext cx="45719" cy="25807"/>
+            </a:xfrm>
+            <a:prstGeom prst="rect">
+              <a:avLst/>
+            </a:prstGeom>
+            <a:solidFill>
+              <a:srgbClr val="0070C0"/>
+            </a:solidFill>
+            <a:ln>
+              <a:noFill/>
+            </a:ln>
+          </p:spPr>
+          <p:style>
+            <a:lnRef idx="2">
+              <a:schemeClr val="accent1">
+                <a:shade val="50000"/>
+              </a:schemeClr>
+            </a:lnRef>
+            <a:fillRef idx="1">
+              <a:schemeClr val="accent1"/>
+            </a:fillRef>
+            <a:effectRef idx="0">
+              <a:schemeClr val="accent1"/>
+            </a:effectRef>
+            <a:fontRef idx="minor">
+              <a:schemeClr val="lt1"/>
+            </a:fontRef>
+          </p:style>
+          <p:txBody>
+            <a:bodyPr rtlCol="0" anchor="ctr"/>
+            <a:lstStyle/>
+            <a:p>
+              <a:pPr algn="ctr"/>
+              <a:endParaRPr lang="en-SG"/>
+            </a:p>
+          </p:txBody>
+        </p:sp>
+      </p:grpSp>
+      <p:sp>
+        <p:nvSpPr>
+          <p:cNvPr id="284" name="Freeform 283"/>
+          <p:cNvSpPr/>
+          <p:nvPr/>
+        </p:nvSpPr>
+        <p:spPr>
+          <a:xfrm>
+            <a:off x="6666031" y="3696799"/>
+            <a:ext cx="260350" cy="168275"/>
+          </a:xfrm>
+          <a:custGeom>
+            <a:avLst/>
+            <a:gdLst>
+              <a:gd name="connsiteX0" fmla="*/ 0 w 260350"/>
+              <a:gd name="connsiteY0" fmla="*/ 73025 h 168275"/>
+              <a:gd name="connsiteX1" fmla="*/ 66675 w 260350"/>
+              <a:gd name="connsiteY1" fmla="*/ 168275 h 168275"/>
+              <a:gd name="connsiteX2" fmla="*/ 260350 w 260350"/>
+              <a:gd name="connsiteY2" fmla="*/ 0 h 168275"/>
+            </a:gdLst>
+            <a:ahLst/>
+            <a:cxnLst>
+              <a:cxn ang="0">
+                <a:pos x="connsiteX0" y="connsiteY0"/>
+              </a:cxn>
+              <a:cxn ang="0">
+                <a:pos x="connsiteX1" y="connsiteY1"/>
+              </a:cxn>
+              <a:cxn ang="0">
+                <a:pos x="connsiteX2" y="connsiteY2"/>
+              </a:cxn>
+            </a:cxnLst>
+            <a:rect l="l" t="t" r="r" b="b"/>
+            <a:pathLst>
+              <a:path w="260350" h="168275">
+                <a:moveTo>
+                  <a:pt x="0" y="73025"/>
+                </a:moveTo>
+                <a:lnTo>
+                  <a:pt x="66675" y="168275"/>
+                </a:lnTo>
+                <a:lnTo>
+                  <a:pt x="260350" y="0"/>
+                </a:lnTo>
+              </a:path>
+            </a:pathLst>
+          </a:custGeom>
+          <a:noFill/>
+          <a:ln w="76200" cap="rnd">
+            <a:solidFill>
+              <a:schemeClr val="bg1"/>
+            </a:solidFill>
+          </a:ln>
+        </p:spPr>
+        <p:style>
+          <a:lnRef idx="2">
+            <a:schemeClr val="accent1">
+              <a:shade val="50000"/>
+            </a:schemeClr>
+          </a:lnRef>
+          <a:fillRef idx="1">
+            <a:schemeClr val="accent1"/>
+          </a:fillRef>
+          <a:effectRef idx="0">
+            <a:schemeClr val="accent1"/>
+          </a:effectRef>
+          <a:fontRef idx="minor">
+            <a:schemeClr val="lt1"/>
+          </a:fontRef>
+        </p:style>
+        <p:txBody>
+          <a:bodyPr rtlCol="0" anchor="ctr"/>
+          <a:lstStyle/>
+          <a:p>
+            <a:pPr algn="ctr"/>
+            <a:endParaRPr lang="en-SG"/>
+          </a:p>
+        </p:txBody>
+      </p:sp>
+      <p:sp>
+        <p:nvSpPr>
+          <p:cNvPr id="274" name="Arc 273"/>
+          <p:cNvSpPr/>
+          <p:nvPr/>
+        </p:nvSpPr>
+        <p:spPr>
+          <a:xfrm>
+            <a:off x="6183159" y="3676752"/>
+            <a:ext cx="189066" cy="189066"/>
+          </a:xfrm>
+          <a:prstGeom prst="arc">
+            <a:avLst>
+              <a:gd name="adj1" fmla="val 14188235"/>
+              <a:gd name="adj2" fmla="val 8354547"/>
+            </a:avLst>
+          </a:prstGeom>
+          <a:noFill/>
+          <a:ln w="57150" cap="rnd">
+            <a:solidFill>
+              <a:schemeClr val="bg1"/>
+            </a:solidFill>
+            <a:headEnd type="none" w="med" len="med"/>
+            <a:tailEnd type="none" w="med" len="med"/>
+          </a:ln>
+        </p:spPr>
+        <p:style>
+          <a:lnRef idx="2">
+            <a:schemeClr val="accent1">
+              <a:shade val="50000"/>
+            </a:schemeClr>
+          </a:lnRef>
+          <a:fillRef idx="1">
+            <a:schemeClr val="accent1"/>
+          </a:fillRef>
+          <a:effectRef idx="0">
+            <a:schemeClr val="accent1"/>
+          </a:effectRef>
+          <a:fontRef idx="minor">
+            <a:schemeClr val="lt1"/>
+          </a:fontRef>
+        </p:style>
+        <p:txBody>
+          <a:bodyPr rtlCol="0" anchor="ctr"/>
+          <a:lstStyle/>
+          <a:p>
+            <a:pPr algn="ctr"/>
+            <a:endParaRPr lang="en-SG"/>
+          </a:p>
+        </p:txBody>
+      </p:sp>
+      <p:sp>
+        <p:nvSpPr>
+          <p:cNvPr id="280" name="Flowchart: Extract 279"/>
+          <p:cNvSpPr/>
+          <p:nvPr/>
+        </p:nvSpPr>
+        <p:spPr>
+          <a:xfrm rot="14735327">
+            <a:off x="6148019" y="3641259"/>
+            <a:ext cx="108989" cy="115651"/>
+          </a:xfrm>
+          <a:prstGeom prst="flowChartExtract">
+            <a:avLst/>
+          </a:prstGeom>
+          <a:solidFill>
+            <a:schemeClr val="bg1"/>
+          </a:solidFill>
+          <a:ln>
+            <a:noFill/>
+          </a:ln>
+        </p:spPr>
+        <p:style>
+          <a:lnRef idx="2">
+            <a:schemeClr val="accent1">
+              <a:shade val="50000"/>
+            </a:schemeClr>
+          </a:lnRef>
+          <a:fillRef idx="1">
+            <a:schemeClr val="accent1"/>
+          </a:fillRef>
+          <a:effectRef idx="0">
+            <a:schemeClr val="accent1"/>
+          </a:effectRef>
+          <a:fontRef idx="minor">
+            <a:schemeClr val="lt1"/>
+          </a:fontRef>
+        </p:style>
+        <p:txBody>
+          <a:bodyPr rtlCol="0" anchor="ctr"/>
+          <a:lstStyle/>
+          <a:p>
+            <a:pPr algn="ctr"/>
+            <a:endParaRPr lang="en-SG"/>
+          </a:p>
+        </p:txBody>
+      </p:sp>
+      <p:sp>
+        <p:nvSpPr>
+          <p:cNvPr id="287" name="TextBox 286"/>
+          <p:cNvSpPr txBox="1"/>
+          <p:nvPr/>
+        </p:nvSpPr>
+        <p:spPr>
+          <a:xfrm>
+            <a:off x="4437909" y="4099086"/>
+            <a:ext cx="2566666" cy="215444"/>
+          </a:xfrm>
+          <a:prstGeom prst="rect">
+            <a:avLst/>
+          </a:prstGeom>
+          <a:noFill/>
+        </p:spPr>
+        <p:txBody>
+          <a:bodyPr wrap="square" rtlCol="0">
+            <a:spAutoFit/>
+          </a:bodyPr>
+          <a:lstStyle/>
+          <a:p>
+            <a:r>
+              <a:rPr lang="en-US" sz="800" dirty="0" smtClean="0"/>
+              <a:t>Save, load, clear, reload, apply</a:t>
+            </a:r>
+            <a:endParaRPr lang="en-SG" sz="800" dirty="0"/>
+          </a:p>
+        </p:txBody>
+      </p:sp>
+    </p:spTree>
+    <p:extLst>
+      <p:ext uri="{BB962C8B-B14F-4D97-AF65-F5344CB8AC3E}">
+        <p14:creationId xmlns:p14="http://schemas.microsoft.com/office/powerpoint/2010/main" val="1593735787"/>
+      </p:ext>
+    </p:extLst>
+  </p:cSld>
+  <p:clrMapOvr>
+    <a:masterClrMapping/>
+  </p:clrMapOvr>
+  <p:timing>
+    <p:tnLst>
+      <p:par>
+        <p:cTn id="1" dur="indefinite" restart="never" nodeType="tmRoot"/>
+      </p:par>
+    </p:tnLst>
+  </p:timing>
+</p:sld>
+</file>
+
+<file path=ppt/slides/slide3.xml><?xml version="1.0" encoding="utf-8"?>
+<p:sld xmlns:a="http://schemas.openxmlformats.org/drawingml/2006/main" xmlns:r="http://schemas.openxmlformats.org/officeDocument/2006/relationships" xmlns:p="http://schemas.openxmlformats.org/presentationml/2006/main">
+  <p:cSld>
+    <p:bg>
+      <p:bgPr>
+        <a:solidFill>
+          <a:schemeClr val="bg1">
+            <a:lumMod val="95000"/>
+          </a:schemeClr>
+        </a:solidFill>
+        <a:effectLst/>
+      </p:bgPr>
+    </p:bg>
+    <p:spTree>
+      <p:nvGrpSpPr>
+        <p:cNvPr id="1" name=""/>
+        <p:cNvGrpSpPr/>
+        <p:nvPr/>
+      </p:nvGrpSpPr>
+      <p:grpSpPr>
+        <a:xfrm>
+          <a:off x="0" y="0"/>
+          <a:ext cx="0" cy="0"/>
+          <a:chOff x="0" y="0"/>
+          <a:chExt cx="0" cy="0"/>
+        </a:xfrm>
+      </p:grpSpPr>
       <p:grpSp>
         <p:nvGrpSpPr>
           <p:cNvPr id="45" name="Group 44"/>
@@ -15870,7 +19913,7 @@
       </p:sp>
       <p:grpSp>
         <p:nvGrpSpPr>
-          <p:cNvPr id="20" name="Group 19"/>
+          <p:cNvPr id="20" name="[Group 19]"/>
           <p:cNvGrpSpPr/>
           <p:nvPr/>
         </p:nvGrpSpPr>

</xml_diff>

<commit_message>
Added context menu icons for shapes lab
</commit_message>
<xml_diff>
--- a/doc/Icons.pptx
+++ b/doc/Icons.pptx
@@ -5,30 +5,31 @@
     <p:sldMasterId id="2147483648" r:id="rId1"/>
   </p:sldMasterIdLst>
   <p:notesMasterIdLst>
-    <p:notesMasterId r:id="rId5"/>
+    <p:notesMasterId r:id="rId6"/>
   </p:notesMasterIdLst>
   <p:sldIdLst>
     <p:sldId id="264" r:id="rId2"/>
     <p:sldId id="266" r:id="rId3"/>
-    <p:sldId id="265" r:id="rId4"/>
+    <p:sldId id="267" r:id="rId4"/>
+    <p:sldId id="265" r:id="rId5"/>
   </p:sldIdLst>
   <p:sldSz cx="9144000" cy="6858000" type="screen4x3"/>
   <p:notesSz cx="6858000" cy="9144000"/>
   <p:embeddedFontLst>
     <p:embeddedFont>
       <p:font typeface="Rockwell Extra Bold" panose="02060903040505020403" pitchFamily="18" charset="0"/>
-      <p:bold r:id="rId6"/>
+      <p:bold r:id="rId7"/>
     </p:embeddedFont>
     <p:embeddedFont>
       <p:font typeface="Calibri" panose="020F0502020204030204" pitchFamily="34" charset="0"/>
-      <p:regular r:id="rId7"/>
-      <p:bold r:id="rId8"/>
-      <p:italic r:id="rId9"/>
-      <p:boldItalic r:id="rId10"/>
+      <p:regular r:id="rId8"/>
+      <p:bold r:id="rId9"/>
+      <p:italic r:id="rId10"/>
+      <p:boldItalic r:id="rId11"/>
     </p:embeddedFont>
     <p:embeddedFont>
       <p:font typeface="Arial Black" panose="020B0A04020102020204" pitchFamily="34" charset="0"/>
-      <p:bold r:id="rId11"/>
+      <p:bold r:id="rId12"/>
     </p:embeddedFont>
   </p:embeddedFontLst>
   <p:defaultTextStyle>
@@ -211,7 +212,7 @@
           <a:p>
             <a:fld id="{6699ACB9-486C-4D62-A3A7-AF98E13EFDA3}" type="datetimeFigureOut">
               <a:rPr lang="en-US" smtClean="0"/>
-              <a:t>6/27/2014</a:t>
+              <a:t>7/18/2014</a:t>
             </a:fld>
             <a:endParaRPr lang="en-US"/>
           </a:p>
@@ -544,7 +545,7 @@
           <a:p>
             <a:fld id="{8EC77E60-82A0-4F8A-A861-433B3189FA8C}" type="slidenum">
               <a:rPr lang="en-US" smtClean="0"/>
-              <a:t>3</a:t>
+              <a:t>4</a:t>
             </a:fld>
             <a:endParaRPr lang="en-US"/>
           </a:p>
@@ -745,7 +746,7 @@
             <a:fld id="{1D8BD707-D9CF-40AE-B4C6-C98DA3205C09}" type="datetimeFigureOut">
               <a:rPr lang="en-US" smtClean="0"/>
               <a:pPr/>
-              <a:t>6/27/2014</a:t>
+              <a:t>7/18/2014</a:t>
             </a:fld>
             <a:endParaRPr lang="en-US"/>
           </a:p>
@@ -912,7 +913,7 @@
             <a:fld id="{1D8BD707-D9CF-40AE-B4C6-C98DA3205C09}" type="datetimeFigureOut">
               <a:rPr lang="en-US" smtClean="0"/>
               <a:pPr/>
-              <a:t>6/27/2014</a:t>
+              <a:t>7/18/2014</a:t>
             </a:fld>
             <a:endParaRPr lang="en-US"/>
           </a:p>
@@ -1089,7 +1090,7 @@
             <a:fld id="{1D8BD707-D9CF-40AE-B4C6-C98DA3205C09}" type="datetimeFigureOut">
               <a:rPr lang="en-US" smtClean="0"/>
               <a:pPr/>
-              <a:t>6/27/2014</a:t>
+              <a:t>7/18/2014</a:t>
             </a:fld>
             <a:endParaRPr lang="en-US"/>
           </a:p>
@@ -1256,7 +1257,7 @@
             <a:fld id="{1D8BD707-D9CF-40AE-B4C6-C98DA3205C09}" type="datetimeFigureOut">
               <a:rPr lang="en-US" smtClean="0"/>
               <a:pPr/>
-              <a:t>6/27/2014</a:t>
+              <a:t>7/18/2014</a:t>
             </a:fld>
             <a:endParaRPr lang="en-US"/>
           </a:p>
@@ -1499,7 +1500,7 @@
             <a:fld id="{1D8BD707-D9CF-40AE-B4C6-C98DA3205C09}" type="datetimeFigureOut">
               <a:rPr lang="en-US" smtClean="0"/>
               <a:pPr/>
-              <a:t>6/27/2014</a:t>
+              <a:t>7/18/2014</a:t>
             </a:fld>
             <a:endParaRPr lang="en-US"/>
           </a:p>
@@ -1784,7 +1785,7 @@
             <a:fld id="{1D8BD707-D9CF-40AE-B4C6-C98DA3205C09}" type="datetimeFigureOut">
               <a:rPr lang="en-US" smtClean="0"/>
               <a:pPr/>
-              <a:t>6/27/2014</a:t>
+              <a:t>7/18/2014</a:t>
             </a:fld>
             <a:endParaRPr lang="en-US"/>
           </a:p>
@@ -2203,7 +2204,7 @@
             <a:fld id="{1D8BD707-D9CF-40AE-B4C6-C98DA3205C09}" type="datetimeFigureOut">
               <a:rPr lang="en-US" smtClean="0"/>
               <a:pPr/>
-              <a:t>6/27/2014</a:t>
+              <a:t>7/18/2014</a:t>
             </a:fld>
             <a:endParaRPr lang="en-US"/>
           </a:p>
@@ -2318,7 +2319,7 @@
             <a:fld id="{1D8BD707-D9CF-40AE-B4C6-C98DA3205C09}" type="datetimeFigureOut">
               <a:rPr lang="en-US" smtClean="0"/>
               <a:pPr/>
-              <a:t>6/27/2014</a:t>
+              <a:t>7/18/2014</a:t>
             </a:fld>
             <a:endParaRPr lang="en-US"/>
           </a:p>
@@ -2410,7 +2411,7 @@
             <a:fld id="{1D8BD707-D9CF-40AE-B4C6-C98DA3205C09}" type="datetimeFigureOut">
               <a:rPr lang="en-US" smtClean="0"/>
               <a:pPr/>
-              <a:t>6/27/2014</a:t>
+              <a:t>7/18/2014</a:t>
             </a:fld>
             <a:endParaRPr lang="en-US"/>
           </a:p>
@@ -2684,7 +2685,7 @@
             <a:fld id="{1D8BD707-D9CF-40AE-B4C6-C98DA3205C09}" type="datetimeFigureOut">
               <a:rPr lang="en-US" smtClean="0"/>
               <a:pPr/>
-              <a:t>6/27/2014</a:t>
+              <a:t>7/18/2014</a:t>
             </a:fld>
             <a:endParaRPr lang="en-US"/>
           </a:p>
@@ -2934,7 +2935,7 @@
             <a:fld id="{1D8BD707-D9CF-40AE-B4C6-C98DA3205C09}" type="datetimeFigureOut">
               <a:rPr lang="en-US" smtClean="0"/>
               <a:pPr/>
-              <a:t>6/27/2014</a:t>
+              <a:t>7/18/2014</a:t>
             </a:fld>
             <a:endParaRPr lang="en-US"/>
           </a:p>
@@ -3144,7 +3145,7 @@
             <a:fld id="{1D8BD707-D9CF-40AE-B4C6-C98DA3205C09}" type="datetimeFigureOut">
               <a:rPr lang="en-US" smtClean="0"/>
               <a:pPr/>
-              <a:t>6/27/2014</a:t>
+              <a:t>7/18/2014</a:t>
             </a:fld>
             <a:endParaRPr lang="en-US"/>
           </a:p>
@@ -10771,1193 +10772,6 @@
           </a:p>
         </p:txBody>
       </p:sp>
-      <p:sp>
-        <p:nvSpPr>
-          <p:cNvPr id="211" name="TextBox 210"/>
-          <p:cNvSpPr txBox="1"/>
-          <p:nvPr/>
-        </p:nvSpPr>
-        <p:spPr>
-          <a:xfrm>
-            <a:off x="343314" y="6235526"/>
-            <a:ext cx="916799" cy="215444"/>
-          </a:xfrm>
-          <a:prstGeom prst="rect">
-            <a:avLst/>
-          </a:prstGeom>
-          <a:noFill/>
-        </p:spPr>
-        <p:txBody>
-          <a:bodyPr wrap="square" rtlCol="0">
-            <a:spAutoFit/>
-          </a:bodyPr>
-          <a:lstStyle/>
-          <a:p>
-            <a:pPr algn="ctr"/>
-            <a:r>
-              <a:rPr lang="en-US" sz="800" dirty="0" smtClean="0"/>
-              <a:t>Shapes </a:t>
-            </a:r>
-            <a:r>
-              <a:rPr lang="en-US" sz="800" dirty="0"/>
-              <a:t>L</a:t>
-            </a:r>
-            <a:r>
-              <a:rPr lang="en-US" sz="800" dirty="0" smtClean="0"/>
-              <a:t>ab</a:t>
-            </a:r>
-            <a:endParaRPr lang="en-SG" sz="800" dirty="0"/>
-          </a:p>
-        </p:txBody>
-      </p:sp>
-      <p:grpSp>
-        <p:nvGrpSpPr>
-          <p:cNvPr id="66" name="Group 65"/>
-          <p:cNvGrpSpPr/>
-          <p:nvPr/>
-        </p:nvGrpSpPr>
-        <p:grpSpPr>
-          <a:xfrm>
-            <a:off x="375266" y="5397326"/>
-            <a:ext cx="838200" cy="838200"/>
-            <a:chOff x="375266" y="5397326"/>
-            <a:chExt cx="838200" cy="838200"/>
-          </a:xfrm>
-        </p:grpSpPr>
-        <p:sp>
-          <p:nvSpPr>
-            <p:cNvPr id="208" name="Rectangle 207"/>
-            <p:cNvSpPr/>
-            <p:nvPr/>
-          </p:nvSpPr>
-          <p:spPr>
-            <a:xfrm>
-              <a:off x="375266" y="5397326"/>
-              <a:ext cx="838200" cy="838200"/>
-            </a:xfrm>
-            <a:prstGeom prst="rect">
-              <a:avLst/>
-            </a:prstGeom>
-            <a:noFill/>
-            <a:ln>
-              <a:noFill/>
-            </a:ln>
-          </p:spPr>
-          <p:style>
-            <a:lnRef idx="2">
-              <a:schemeClr val="accent1">
-                <a:shade val="50000"/>
-              </a:schemeClr>
-            </a:lnRef>
-            <a:fillRef idx="1">
-              <a:schemeClr val="accent1"/>
-            </a:fillRef>
-            <a:effectRef idx="0">
-              <a:schemeClr val="accent1"/>
-            </a:effectRef>
-            <a:fontRef idx="minor">
-              <a:schemeClr val="lt1"/>
-            </a:fontRef>
-          </p:style>
-          <p:txBody>
-            <a:bodyPr rtlCol="0" anchor="ctr"/>
-            <a:lstStyle/>
-            <a:p>
-              <a:pPr algn="ctr"/>
-              <a:endParaRPr lang="en-SG"/>
-            </a:p>
-          </p:txBody>
-        </p:sp>
-        <p:sp>
-          <p:nvSpPr>
-            <p:cNvPr id="212" name="Rectangle 4"/>
-            <p:cNvSpPr/>
-            <p:nvPr/>
-          </p:nvSpPr>
-          <p:spPr>
-            <a:xfrm rot="16200000">
-              <a:off x="444221" y="5470529"/>
-              <a:ext cx="700291" cy="690781"/>
-            </a:xfrm>
-            <a:custGeom>
-              <a:avLst/>
-              <a:gdLst/>
-              <a:ahLst/>
-              <a:cxnLst/>
-              <a:rect l="l" t="t" r="r" b="b"/>
-              <a:pathLst>
-                <a:path w="1752603" h="1752600">
-                  <a:moveTo>
-                    <a:pt x="533400" y="0"/>
-                  </a:moveTo>
-                  <a:lnTo>
-                    <a:pt x="533403" y="0"/>
-                  </a:lnTo>
-                  <a:lnTo>
-                    <a:pt x="1066800" y="0"/>
-                  </a:lnTo>
-                  <a:lnTo>
-                    <a:pt x="1752603" y="0"/>
-                  </a:lnTo>
-                  <a:lnTo>
-                    <a:pt x="1752603" y="1752600"/>
-                  </a:lnTo>
-                  <a:lnTo>
-                    <a:pt x="1219203" y="1752600"/>
-                  </a:lnTo>
-                  <a:lnTo>
-                    <a:pt x="533403" y="1752600"/>
-                  </a:lnTo>
-                  <a:lnTo>
-                    <a:pt x="3" y="1752600"/>
-                  </a:lnTo>
-                  <a:lnTo>
-                    <a:pt x="3" y="533430"/>
-                  </a:lnTo>
-                  <a:cubicBezTo>
-                    <a:pt x="0" y="533420"/>
-                    <a:pt x="0" y="533410"/>
-                    <a:pt x="0" y="533400"/>
-                  </a:cubicBezTo>
-                  <a:cubicBezTo>
-                    <a:pt x="0" y="238811"/>
-                    <a:pt x="238811" y="0"/>
-                    <a:pt x="533400" y="0"/>
-                  </a:cubicBezTo>
-                  <a:close/>
-                </a:path>
-              </a:pathLst>
-            </a:custGeom>
-            <a:noFill/>
-            <a:ln w="76200" cmpd="sng">
-              <a:solidFill>
-                <a:srgbClr val="0070C0"/>
-              </a:solidFill>
-              <a:miter lim="800000"/>
-            </a:ln>
-          </p:spPr>
-          <p:style>
-            <a:lnRef idx="2">
-              <a:schemeClr val="accent1">
-                <a:shade val="50000"/>
-              </a:schemeClr>
-            </a:lnRef>
-            <a:fillRef idx="1">
-              <a:schemeClr val="accent1"/>
-            </a:fillRef>
-            <a:effectRef idx="0">
-              <a:schemeClr val="accent1"/>
-            </a:effectRef>
-            <a:fontRef idx="minor">
-              <a:schemeClr val="lt1"/>
-            </a:fontRef>
-          </p:style>
-          <p:txBody>
-            <a:bodyPr rtlCol="0" anchor="ctr"/>
-            <a:lstStyle/>
-            <a:p>
-              <a:pPr algn="ctr"/>
-              <a:endParaRPr lang="en-US"/>
-            </a:p>
-          </p:txBody>
-        </p:sp>
-        <p:sp>
-          <p:nvSpPr>
-            <p:cNvPr id="60" name="Teardrop 59"/>
-            <p:cNvSpPr/>
-            <p:nvPr/>
-          </p:nvSpPr>
-          <p:spPr>
-            <a:xfrm>
-              <a:off x="747877" y="5557049"/>
-              <a:ext cx="309672" cy="307175"/>
-            </a:xfrm>
-            <a:prstGeom prst="teardrop">
-              <a:avLst/>
-            </a:prstGeom>
-            <a:solidFill>
-              <a:srgbClr val="0070C0"/>
-            </a:solidFill>
-            <a:ln w="19050">
-              <a:solidFill>
-                <a:schemeClr val="bg1"/>
-              </a:solidFill>
-            </a:ln>
-            <a:effectLst/>
-          </p:spPr>
-          <p:style>
-            <a:lnRef idx="2">
-              <a:schemeClr val="accent1">
-                <a:shade val="50000"/>
-              </a:schemeClr>
-            </a:lnRef>
-            <a:fillRef idx="1">
-              <a:schemeClr val="accent1"/>
-            </a:fillRef>
-            <a:effectRef idx="0">
-              <a:schemeClr val="accent1"/>
-            </a:effectRef>
-            <a:fontRef idx="minor">
-              <a:schemeClr val="lt1"/>
-            </a:fontRef>
-          </p:style>
-          <p:txBody>
-            <a:bodyPr rtlCol="0" anchor="ctr"/>
-            <a:lstStyle/>
-            <a:p>
-              <a:pPr algn="ctr"/>
-              <a:endParaRPr lang="en-SG"/>
-            </a:p>
-          </p:txBody>
-        </p:sp>
-        <p:sp>
-          <p:nvSpPr>
-            <p:cNvPr id="64" name="Flowchart: Process 63"/>
-            <p:cNvSpPr/>
-            <p:nvPr/>
-          </p:nvSpPr>
-          <p:spPr>
-            <a:xfrm>
-              <a:off x="544174" y="5670551"/>
-              <a:ext cx="299506" cy="256598"/>
-            </a:xfrm>
-            <a:prstGeom prst="flowChartProcess">
-              <a:avLst/>
-            </a:prstGeom>
-            <a:solidFill>
-              <a:schemeClr val="accent6"/>
-            </a:solidFill>
-            <a:ln w="19050">
-              <a:solidFill>
-                <a:schemeClr val="bg1"/>
-              </a:solidFill>
-            </a:ln>
-            <a:effectLst/>
-          </p:spPr>
-          <p:style>
-            <a:lnRef idx="2">
-              <a:schemeClr val="accent1">
-                <a:shade val="50000"/>
-              </a:schemeClr>
-            </a:lnRef>
-            <a:fillRef idx="1">
-              <a:schemeClr val="accent1"/>
-            </a:fillRef>
-            <a:effectRef idx="0">
-              <a:schemeClr val="accent1"/>
-            </a:effectRef>
-            <a:fontRef idx="minor">
-              <a:schemeClr val="lt1"/>
-            </a:fontRef>
-          </p:style>
-          <p:txBody>
-            <a:bodyPr rtlCol="0" anchor="ctr"/>
-            <a:lstStyle/>
-            <a:p>
-              <a:pPr algn="ctr"/>
-              <a:endParaRPr lang="en-SG"/>
-            </a:p>
-          </p:txBody>
-        </p:sp>
-        <p:sp>
-          <p:nvSpPr>
-            <p:cNvPr id="65" name="Flowchart: Magnetic Disk 64"/>
-            <p:cNvSpPr/>
-            <p:nvPr/>
-          </p:nvSpPr>
-          <p:spPr>
-            <a:xfrm>
-              <a:off x="721676" y="5747165"/>
-              <a:ext cx="258469" cy="315518"/>
-            </a:xfrm>
-            <a:prstGeom prst="flowChartMagneticDisk">
-              <a:avLst/>
-            </a:prstGeom>
-            <a:solidFill>
-              <a:schemeClr val="accent6"/>
-            </a:solidFill>
-            <a:ln w="19050">
-              <a:solidFill>
-                <a:schemeClr val="bg1"/>
-              </a:solidFill>
-            </a:ln>
-            <a:effectLst/>
-          </p:spPr>
-          <p:style>
-            <a:lnRef idx="2">
-              <a:schemeClr val="accent1">
-                <a:shade val="50000"/>
-              </a:schemeClr>
-            </a:lnRef>
-            <a:fillRef idx="1">
-              <a:schemeClr val="accent1"/>
-            </a:fillRef>
-            <a:effectRef idx="0">
-              <a:schemeClr val="accent1"/>
-            </a:effectRef>
-            <a:fontRef idx="minor">
-              <a:schemeClr val="lt1"/>
-            </a:fontRef>
-          </p:style>
-          <p:txBody>
-            <a:bodyPr rtlCol="0" anchor="ctr"/>
-            <a:lstStyle/>
-            <a:p>
-              <a:pPr algn="ctr"/>
-              <a:endParaRPr lang="en-SG"/>
-            </a:p>
-          </p:txBody>
-        </p:sp>
-      </p:grpSp>
-      <p:sp>
-        <p:nvSpPr>
-          <p:cNvPr id="213" name="Rectangle 212"/>
-          <p:cNvSpPr/>
-          <p:nvPr/>
-        </p:nvSpPr>
-        <p:spPr>
-          <a:xfrm>
-            <a:off x="1636543" y="5404357"/>
-            <a:ext cx="838200" cy="838200"/>
-          </a:xfrm>
-          <a:prstGeom prst="rect">
-            <a:avLst/>
-          </a:prstGeom>
-          <a:noFill/>
-          <a:ln>
-            <a:noFill/>
-          </a:ln>
-        </p:spPr>
-        <p:style>
-          <a:lnRef idx="2">
-            <a:schemeClr val="accent1">
-              <a:shade val="50000"/>
-            </a:schemeClr>
-          </a:lnRef>
-          <a:fillRef idx="1">
-            <a:schemeClr val="accent1"/>
-          </a:fillRef>
-          <a:effectRef idx="0">
-            <a:schemeClr val="accent1"/>
-          </a:effectRef>
-          <a:fontRef idx="minor">
-            <a:schemeClr val="lt1"/>
-          </a:fontRef>
-        </p:style>
-        <p:txBody>
-          <a:bodyPr rtlCol="0" anchor="ctr"/>
-          <a:lstStyle/>
-          <a:p>
-            <a:pPr algn="ctr"/>
-            <a:endParaRPr lang="en-SG"/>
-          </a:p>
-        </p:txBody>
-      </p:sp>
-      <p:sp>
-        <p:nvSpPr>
-          <p:cNvPr id="214" name="TextBox 213"/>
-          <p:cNvSpPr txBox="1"/>
-          <p:nvPr/>
-        </p:nvSpPr>
-        <p:spPr>
-          <a:xfrm>
-            <a:off x="1604591" y="6242557"/>
-            <a:ext cx="916799" cy="215444"/>
-          </a:xfrm>
-          <a:prstGeom prst="rect">
-            <a:avLst/>
-          </a:prstGeom>
-          <a:noFill/>
-        </p:spPr>
-        <p:txBody>
-          <a:bodyPr wrap="square" rtlCol="0">
-            <a:spAutoFit/>
-          </a:bodyPr>
-          <a:lstStyle/>
-          <a:p>
-            <a:pPr algn="ctr"/>
-            <a:r>
-              <a:rPr lang="en-US" sz="800" dirty="0" smtClean="0"/>
-              <a:t>Colors </a:t>
-            </a:r>
-            <a:r>
-              <a:rPr lang="en-US" sz="800" dirty="0"/>
-              <a:t>L</a:t>
-            </a:r>
-            <a:r>
-              <a:rPr lang="en-US" sz="800" dirty="0" smtClean="0"/>
-              <a:t>ab</a:t>
-            </a:r>
-            <a:endParaRPr lang="en-SG" sz="800" dirty="0"/>
-          </a:p>
-        </p:txBody>
-      </p:sp>
-      <p:sp>
-        <p:nvSpPr>
-          <p:cNvPr id="215" name="Rectangle 4"/>
-          <p:cNvSpPr/>
-          <p:nvPr/>
-        </p:nvSpPr>
-        <p:spPr>
-          <a:xfrm rot="16200000">
-            <a:off x="1705498" y="5477560"/>
-            <a:ext cx="700291" cy="690781"/>
-          </a:xfrm>
-          <a:custGeom>
-            <a:avLst/>
-            <a:gdLst/>
-            <a:ahLst/>
-            <a:cxnLst/>
-            <a:rect l="l" t="t" r="r" b="b"/>
-            <a:pathLst>
-              <a:path w="1752603" h="1752600">
-                <a:moveTo>
-                  <a:pt x="533400" y="0"/>
-                </a:moveTo>
-                <a:lnTo>
-                  <a:pt x="533403" y="0"/>
-                </a:lnTo>
-                <a:lnTo>
-                  <a:pt x="1066800" y="0"/>
-                </a:lnTo>
-                <a:lnTo>
-                  <a:pt x="1752603" y="0"/>
-                </a:lnTo>
-                <a:lnTo>
-                  <a:pt x="1752603" y="1752600"/>
-                </a:lnTo>
-                <a:lnTo>
-                  <a:pt x="1219203" y="1752600"/>
-                </a:lnTo>
-                <a:lnTo>
-                  <a:pt x="533403" y="1752600"/>
-                </a:lnTo>
-                <a:lnTo>
-                  <a:pt x="3" y="1752600"/>
-                </a:lnTo>
-                <a:lnTo>
-                  <a:pt x="3" y="533430"/>
-                </a:lnTo>
-                <a:cubicBezTo>
-                  <a:pt x="0" y="533420"/>
-                  <a:pt x="0" y="533410"/>
-                  <a:pt x="0" y="533400"/>
-                </a:cubicBezTo>
-                <a:cubicBezTo>
-                  <a:pt x="0" y="238811"/>
-                  <a:pt x="238811" y="0"/>
-                  <a:pt x="533400" y="0"/>
-                </a:cubicBezTo>
-                <a:close/>
-              </a:path>
-            </a:pathLst>
-          </a:custGeom>
-          <a:noFill/>
-          <a:ln w="76200" cmpd="sng">
-            <a:solidFill>
-              <a:srgbClr val="0070C0"/>
-            </a:solidFill>
-            <a:miter lim="800000"/>
-          </a:ln>
-        </p:spPr>
-        <p:style>
-          <a:lnRef idx="2">
-            <a:schemeClr val="accent1">
-              <a:shade val="50000"/>
-            </a:schemeClr>
-          </a:lnRef>
-          <a:fillRef idx="1">
-            <a:schemeClr val="accent1"/>
-          </a:fillRef>
-          <a:effectRef idx="0">
-            <a:schemeClr val="accent1"/>
-          </a:effectRef>
-          <a:fontRef idx="minor">
-            <a:schemeClr val="lt1"/>
-          </a:fontRef>
-        </p:style>
-        <p:txBody>
-          <a:bodyPr rtlCol="0" anchor="ctr"/>
-          <a:lstStyle/>
-          <a:p>
-            <a:pPr algn="ctr"/>
-            <a:endParaRPr lang="en-US"/>
-          </a:p>
-        </p:txBody>
-      </p:sp>
-      <p:sp>
-        <p:nvSpPr>
-          <p:cNvPr id="71" name="Freeform 70"/>
-          <p:cNvSpPr/>
-          <p:nvPr/>
-        </p:nvSpPr>
-        <p:spPr>
-          <a:xfrm>
-            <a:off x="2110121" y="5463394"/>
-            <a:ext cx="282242" cy="315901"/>
-          </a:xfrm>
-          <a:custGeom>
-            <a:avLst/>
-            <a:gdLst>
-              <a:gd name="connsiteX0" fmla="*/ 0 w 266700"/>
-              <a:gd name="connsiteY0" fmla="*/ 23813 h 302419"/>
-              <a:gd name="connsiteX1" fmla="*/ 259556 w 266700"/>
-              <a:gd name="connsiteY1" fmla="*/ 302419 h 302419"/>
-              <a:gd name="connsiteX2" fmla="*/ 266700 w 266700"/>
-              <a:gd name="connsiteY2" fmla="*/ 0 h 302419"/>
-              <a:gd name="connsiteX3" fmla="*/ 0 w 266700"/>
-              <a:gd name="connsiteY3" fmla="*/ 23813 h 302419"/>
-            </a:gdLst>
-            <a:ahLst/>
-            <a:cxnLst>
-              <a:cxn ang="0">
-                <a:pos x="connsiteX0" y="connsiteY0"/>
-              </a:cxn>
-              <a:cxn ang="0">
-                <a:pos x="connsiteX1" y="connsiteY1"/>
-              </a:cxn>
-              <a:cxn ang="0">
-                <a:pos x="connsiteX2" y="connsiteY2"/>
-              </a:cxn>
-              <a:cxn ang="0">
-                <a:pos x="connsiteX3" y="connsiteY3"/>
-              </a:cxn>
-            </a:cxnLst>
-            <a:rect l="l" t="t" r="r" b="b"/>
-            <a:pathLst>
-              <a:path w="266700" h="302419">
-                <a:moveTo>
-                  <a:pt x="0" y="23813"/>
-                </a:moveTo>
-                <a:lnTo>
-                  <a:pt x="259556" y="302419"/>
-                </a:lnTo>
-                <a:lnTo>
-                  <a:pt x="266700" y="0"/>
-                </a:lnTo>
-                <a:lnTo>
-                  <a:pt x="0" y="23813"/>
-                </a:lnTo>
-                <a:close/>
-              </a:path>
-            </a:pathLst>
-          </a:custGeom>
-          <a:solidFill>
-            <a:srgbClr val="0070C0"/>
-          </a:solidFill>
-          <a:ln>
-            <a:noFill/>
-          </a:ln>
-        </p:spPr>
-        <p:style>
-          <a:lnRef idx="2">
-            <a:schemeClr val="accent1">
-              <a:shade val="50000"/>
-            </a:schemeClr>
-          </a:lnRef>
-          <a:fillRef idx="1">
-            <a:schemeClr val="accent1"/>
-          </a:fillRef>
-          <a:effectRef idx="0">
-            <a:schemeClr val="accent1"/>
-          </a:effectRef>
-          <a:fontRef idx="minor">
-            <a:schemeClr val="lt1"/>
-          </a:fontRef>
-        </p:style>
-        <p:txBody>
-          <a:bodyPr rtlCol="0" anchor="ctr"/>
-          <a:lstStyle/>
-          <a:p>
-            <a:pPr algn="ctr"/>
-            <a:endParaRPr lang="en-SG"/>
-          </a:p>
-        </p:txBody>
-      </p:sp>
-      <p:grpSp>
-        <p:nvGrpSpPr>
-          <p:cNvPr id="70" name="Group 69"/>
-          <p:cNvGrpSpPr/>
-          <p:nvPr/>
-        </p:nvGrpSpPr>
-        <p:grpSpPr>
-          <a:xfrm rot="2832674">
-            <a:off x="1859302" y="5543926"/>
-            <a:ext cx="354223" cy="575756"/>
-            <a:chOff x="2833184" y="5597530"/>
-            <a:chExt cx="354106" cy="575566"/>
-          </a:xfrm>
-        </p:grpSpPr>
-        <p:sp>
-          <p:nvSpPr>
-            <p:cNvPr id="216" name="Rounded Rectangle 215"/>
-            <p:cNvSpPr/>
-            <p:nvPr/>
-          </p:nvSpPr>
-          <p:spPr>
-            <a:xfrm>
-              <a:off x="2833184" y="5833301"/>
-              <a:ext cx="354106" cy="339795"/>
-            </a:xfrm>
-            <a:custGeom>
-              <a:avLst/>
-              <a:gdLst>
-                <a:gd name="connsiteX0" fmla="*/ 0 w 277919"/>
-                <a:gd name="connsiteY0" fmla="*/ 0 h 246465"/>
-                <a:gd name="connsiteX1" fmla="*/ 277919 w 277919"/>
-                <a:gd name="connsiteY1" fmla="*/ 0 h 246465"/>
-                <a:gd name="connsiteX2" fmla="*/ 277919 w 277919"/>
-                <a:gd name="connsiteY2" fmla="*/ 29657 h 246465"/>
-                <a:gd name="connsiteX3" fmla="*/ 243947 w 277919"/>
-                <a:gd name="connsiteY3" fmla="*/ 63629 h 246465"/>
-                <a:gd name="connsiteX4" fmla="*/ 168190 w 277919"/>
-                <a:gd name="connsiteY4" fmla="*/ 63629 h 246465"/>
-                <a:gd name="connsiteX5" fmla="*/ 183567 w 277919"/>
-                <a:gd name="connsiteY5" fmla="*/ 246465 h 246465"/>
-                <a:gd name="connsiteX6" fmla="*/ 94350 w 277919"/>
-                <a:gd name="connsiteY6" fmla="*/ 246465 h 246465"/>
-                <a:gd name="connsiteX7" fmla="*/ 109728 w 277919"/>
-                <a:gd name="connsiteY7" fmla="*/ 63629 h 246465"/>
-                <a:gd name="connsiteX8" fmla="*/ 33972 w 277919"/>
-                <a:gd name="connsiteY8" fmla="*/ 63629 h 246465"/>
-                <a:gd name="connsiteX9" fmla="*/ 0 w 277919"/>
-                <a:gd name="connsiteY9" fmla="*/ 29657 h 246465"/>
-                <a:gd name="connsiteX10" fmla="*/ 0 w 277919"/>
-                <a:gd name="connsiteY10" fmla="*/ 0 h 246465"/>
-                <a:gd name="connsiteX0" fmla="*/ 0 w 277919"/>
-                <a:gd name="connsiteY0" fmla="*/ 0 h 246465"/>
-                <a:gd name="connsiteX1" fmla="*/ 277919 w 277919"/>
-                <a:gd name="connsiteY1" fmla="*/ 0 h 246465"/>
-                <a:gd name="connsiteX2" fmla="*/ 277919 w 277919"/>
-                <a:gd name="connsiteY2" fmla="*/ 29657 h 246465"/>
-                <a:gd name="connsiteX3" fmla="*/ 243947 w 277919"/>
-                <a:gd name="connsiteY3" fmla="*/ 63629 h 246465"/>
-                <a:gd name="connsiteX4" fmla="*/ 168190 w 277919"/>
-                <a:gd name="connsiteY4" fmla="*/ 63629 h 246465"/>
-                <a:gd name="connsiteX5" fmla="*/ 183567 w 277919"/>
-                <a:gd name="connsiteY5" fmla="*/ 246465 h 246465"/>
-                <a:gd name="connsiteX6" fmla="*/ 94350 w 277919"/>
-                <a:gd name="connsiteY6" fmla="*/ 246465 h 246465"/>
-                <a:gd name="connsiteX7" fmla="*/ 109728 w 277919"/>
-                <a:gd name="connsiteY7" fmla="*/ 63629 h 246465"/>
-                <a:gd name="connsiteX8" fmla="*/ 33972 w 277919"/>
-                <a:gd name="connsiteY8" fmla="*/ 63629 h 246465"/>
-                <a:gd name="connsiteX9" fmla="*/ 0 w 277919"/>
-                <a:gd name="connsiteY9" fmla="*/ 29657 h 246465"/>
-                <a:gd name="connsiteX10" fmla="*/ 0 w 277919"/>
-                <a:gd name="connsiteY10" fmla="*/ 0 h 246465"/>
-              </a:gdLst>
-              <a:ahLst/>
-              <a:cxnLst>
-                <a:cxn ang="0">
-                  <a:pos x="connsiteX0" y="connsiteY0"/>
-                </a:cxn>
-                <a:cxn ang="0">
-                  <a:pos x="connsiteX1" y="connsiteY1"/>
-                </a:cxn>
-                <a:cxn ang="0">
-                  <a:pos x="connsiteX2" y="connsiteY2"/>
-                </a:cxn>
-                <a:cxn ang="0">
-                  <a:pos x="connsiteX3" y="connsiteY3"/>
-                </a:cxn>
-                <a:cxn ang="0">
-                  <a:pos x="connsiteX4" y="connsiteY4"/>
-                </a:cxn>
-                <a:cxn ang="0">
-                  <a:pos x="connsiteX5" y="connsiteY5"/>
-                </a:cxn>
-                <a:cxn ang="0">
-                  <a:pos x="connsiteX6" y="connsiteY6"/>
-                </a:cxn>
-                <a:cxn ang="0">
-                  <a:pos x="connsiteX7" y="connsiteY7"/>
-                </a:cxn>
-                <a:cxn ang="0">
-                  <a:pos x="connsiteX8" y="connsiteY8"/>
-                </a:cxn>
-                <a:cxn ang="0">
-                  <a:pos x="connsiteX9" y="connsiteY9"/>
-                </a:cxn>
-                <a:cxn ang="0">
-                  <a:pos x="connsiteX10" y="connsiteY10"/>
-                </a:cxn>
-              </a:cxnLst>
-              <a:rect l="l" t="t" r="r" b="b"/>
-              <a:pathLst>
-                <a:path w="277919" h="246465">
-                  <a:moveTo>
-                    <a:pt x="0" y="0"/>
-                  </a:moveTo>
-                  <a:lnTo>
-                    <a:pt x="277919" y="0"/>
-                  </a:lnTo>
-                  <a:lnTo>
-                    <a:pt x="277919" y="29657"/>
-                  </a:lnTo>
-                  <a:cubicBezTo>
-                    <a:pt x="277919" y="48419"/>
-                    <a:pt x="262709" y="63629"/>
-                    <a:pt x="243947" y="63629"/>
-                  </a:cubicBezTo>
-                  <a:lnTo>
-                    <a:pt x="168190" y="63629"/>
-                  </a:lnTo>
-                  <a:cubicBezTo>
-                    <a:pt x="158127" y="94102"/>
-                    <a:pt x="195874" y="215992"/>
-                    <a:pt x="183567" y="246465"/>
-                  </a:cubicBezTo>
-                  <a:cubicBezTo>
-                    <a:pt x="171260" y="276938"/>
-                    <a:pt x="106657" y="276938"/>
-                    <a:pt x="94350" y="246465"/>
-                  </a:cubicBezTo>
-                  <a:cubicBezTo>
-                    <a:pt x="82043" y="215992"/>
-                    <a:pt x="119791" y="94102"/>
-                    <a:pt x="109728" y="63629"/>
-                  </a:cubicBezTo>
-                  <a:lnTo>
-                    <a:pt x="33972" y="63629"/>
-                  </a:lnTo>
-                  <a:cubicBezTo>
-                    <a:pt x="15210" y="63629"/>
-                    <a:pt x="0" y="48419"/>
-                    <a:pt x="0" y="29657"/>
-                  </a:cubicBezTo>
-                  <a:lnTo>
-                    <a:pt x="0" y="0"/>
-                  </a:lnTo>
-                  <a:close/>
-                </a:path>
-              </a:pathLst>
-            </a:custGeom>
-            <a:solidFill>
-              <a:schemeClr val="accent6"/>
-            </a:solidFill>
-            <a:ln w="19050">
-              <a:solidFill>
-                <a:schemeClr val="bg1"/>
-              </a:solidFill>
-            </a:ln>
-            <a:effectLst/>
-          </p:spPr>
-          <p:style>
-            <a:lnRef idx="2">
-              <a:schemeClr val="accent1">
-                <a:shade val="50000"/>
-              </a:schemeClr>
-            </a:lnRef>
-            <a:fillRef idx="1">
-              <a:schemeClr val="accent1"/>
-            </a:fillRef>
-            <a:effectRef idx="0">
-              <a:schemeClr val="accent1"/>
-            </a:effectRef>
-            <a:fontRef idx="minor">
-              <a:schemeClr val="lt1"/>
-            </a:fontRef>
-          </p:style>
-          <p:txBody>
-            <a:bodyPr rtlCol="0" anchor="ctr"/>
-            <a:lstStyle/>
-            <a:p>
-              <a:pPr algn="ctr"/>
-              <a:endParaRPr lang="en-SG"/>
-            </a:p>
-          </p:txBody>
-        </p:sp>
-        <p:sp>
-          <p:nvSpPr>
-            <p:cNvPr id="68" name="Rectangle 67"/>
-            <p:cNvSpPr/>
-            <p:nvPr/>
-          </p:nvSpPr>
-          <p:spPr>
-            <a:xfrm>
-              <a:off x="2833184" y="5597530"/>
-              <a:ext cx="354106" cy="230801"/>
-            </a:xfrm>
-            <a:prstGeom prst="rect">
-              <a:avLst/>
-            </a:prstGeom>
-            <a:solidFill>
-              <a:srgbClr val="0070C0"/>
-            </a:solidFill>
-            <a:ln w="19050">
-              <a:solidFill>
-                <a:schemeClr val="bg1"/>
-              </a:solidFill>
-            </a:ln>
-            <a:effectLst/>
-          </p:spPr>
-          <p:style>
-            <a:lnRef idx="2">
-              <a:schemeClr val="accent1">
-                <a:shade val="50000"/>
-              </a:schemeClr>
-            </a:lnRef>
-            <a:fillRef idx="1">
-              <a:schemeClr val="accent1"/>
-            </a:fillRef>
-            <a:effectRef idx="0">
-              <a:schemeClr val="accent1"/>
-            </a:effectRef>
-            <a:fontRef idx="minor">
-              <a:schemeClr val="lt1"/>
-            </a:fontRef>
-          </p:style>
-          <p:txBody>
-            <a:bodyPr rtlCol="0" anchor="ctr"/>
-            <a:lstStyle/>
-            <a:p>
-              <a:pPr algn="ctr"/>
-              <a:endParaRPr lang="en-SG"/>
-            </a:p>
-          </p:txBody>
-        </p:sp>
-        <p:sp>
-          <p:nvSpPr>
-            <p:cNvPr id="69" name="Flowchart: Manual Input 68"/>
-            <p:cNvSpPr/>
-            <p:nvPr/>
-          </p:nvSpPr>
-          <p:spPr>
-            <a:xfrm>
-              <a:off x="2833184" y="5657689"/>
-              <a:ext cx="354106" cy="175610"/>
-            </a:xfrm>
-            <a:custGeom>
-              <a:avLst/>
-              <a:gdLst>
-                <a:gd name="connsiteX0" fmla="*/ 0 w 10000"/>
-                <a:gd name="connsiteY0" fmla="*/ 2000 h 10000"/>
-                <a:gd name="connsiteX1" fmla="*/ 10000 w 10000"/>
-                <a:gd name="connsiteY1" fmla="*/ 0 h 10000"/>
-                <a:gd name="connsiteX2" fmla="*/ 10000 w 10000"/>
-                <a:gd name="connsiteY2" fmla="*/ 10000 h 10000"/>
-                <a:gd name="connsiteX3" fmla="*/ 0 w 10000"/>
-                <a:gd name="connsiteY3" fmla="*/ 10000 h 10000"/>
-                <a:gd name="connsiteX4" fmla="*/ 0 w 10000"/>
-                <a:gd name="connsiteY4" fmla="*/ 2000 h 10000"/>
-                <a:gd name="connsiteX0" fmla="*/ 0 w 10000"/>
-                <a:gd name="connsiteY0" fmla="*/ 2000 h 10000"/>
-                <a:gd name="connsiteX1" fmla="*/ 2906 w 10000"/>
-                <a:gd name="connsiteY1" fmla="*/ 1528 h 10000"/>
-                <a:gd name="connsiteX2" fmla="*/ 10000 w 10000"/>
-                <a:gd name="connsiteY2" fmla="*/ 0 h 10000"/>
-                <a:gd name="connsiteX3" fmla="*/ 10000 w 10000"/>
-                <a:gd name="connsiteY3" fmla="*/ 10000 h 10000"/>
-                <a:gd name="connsiteX4" fmla="*/ 0 w 10000"/>
-                <a:gd name="connsiteY4" fmla="*/ 10000 h 10000"/>
-                <a:gd name="connsiteX5" fmla="*/ 0 w 10000"/>
-                <a:gd name="connsiteY5" fmla="*/ 2000 h 10000"/>
-                <a:gd name="connsiteX0" fmla="*/ 0 w 10000"/>
-                <a:gd name="connsiteY0" fmla="*/ 2000 h 10000"/>
-                <a:gd name="connsiteX1" fmla="*/ 2906 w 10000"/>
-                <a:gd name="connsiteY1" fmla="*/ 1528 h 10000"/>
-                <a:gd name="connsiteX2" fmla="*/ 6470 w 10000"/>
-                <a:gd name="connsiteY2" fmla="*/ 652 h 10000"/>
-                <a:gd name="connsiteX3" fmla="*/ 10000 w 10000"/>
-                <a:gd name="connsiteY3" fmla="*/ 0 h 10000"/>
-                <a:gd name="connsiteX4" fmla="*/ 10000 w 10000"/>
-                <a:gd name="connsiteY4" fmla="*/ 10000 h 10000"/>
-                <a:gd name="connsiteX5" fmla="*/ 0 w 10000"/>
-                <a:gd name="connsiteY5" fmla="*/ 10000 h 10000"/>
-                <a:gd name="connsiteX6" fmla="*/ 0 w 10000"/>
-                <a:gd name="connsiteY6" fmla="*/ 2000 h 10000"/>
-                <a:gd name="connsiteX0" fmla="*/ 0 w 10000"/>
-                <a:gd name="connsiteY0" fmla="*/ 7262 h 15262"/>
-                <a:gd name="connsiteX1" fmla="*/ 2906 w 10000"/>
-                <a:gd name="connsiteY1" fmla="*/ 6790 h 15262"/>
-                <a:gd name="connsiteX2" fmla="*/ 6470 w 10000"/>
-                <a:gd name="connsiteY2" fmla="*/ 0 h 15262"/>
-                <a:gd name="connsiteX3" fmla="*/ 10000 w 10000"/>
-                <a:gd name="connsiteY3" fmla="*/ 5262 h 15262"/>
-                <a:gd name="connsiteX4" fmla="*/ 10000 w 10000"/>
-                <a:gd name="connsiteY4" fmla="*/ 15262 h 15262"/>
-                <a:gd name="connsiteX5" fmla="*/ 0 w 10000"/>
-                <a:gd name="connsiteY5" fmla="*/ 15262 h 15262"/>
-                <a:gd name="connsiteX6" fmla="*/ 0 w 10000"/>
-                <a:gd name="connsiteY6" fmla="*/ 7262 h 15262"/>
-                <a:gd name="connsiteX0" fmla="*/ 0 w 10000"/>
-                <a:gd name="connsiteY0" fmla="*/ 7262 h 15262"/>
-                <a:gd name="connsiteX1" fmla="*/ 2772 w 10000"/>
-                <a:gd name="connsiteY1" fmla="*/ 3943 h 15262"/>
-                <a:gd name="connsiteX2" fmla="*/ 6470 w 10000"/>
-                <a:gd name="connsiteY2" fmla="*/ 0 h 15262"/>
-                <a:gd name="connsiteX3" fmla="*/ 10000 w 10000"/>
-                <a:gd name="connsiteY3" fmla="*/ 5262 h 15262"/>
-                <a:gd name="connsiteX4" fmla="*/ 10000 w 10000"/>
-                <a:gd name="connsiteY4" fmla="*/ 15262 h 15262"/>
-                <a:gd name="connsiteX5" fmla="*/ 0 w 10000"/>
-                <a:gd name="connsiteY5" fmla="*/ 15262 h 15262"/>
-                <a:gd name="connsiteX6" fmla="*/ 0 w 10000"/>
-                <a:gd name="connsiteY6" fmla="*/ 7262 h 15262"/>
-                <a:gd name="connsiteX0" fmla="*/ 0 w 10000"/>
-                <a:gd name="connsiteY0" fmla="*/ 7262 h 15262"/>
-                <a:gd name="connsiteX1" fmla="*/ 2772 w 10000"/>
-                <a:gd name="connsiteY1" fmla="*/ 3943 h 15262"/>
-                <a:gd name="connsiteX2" fmla="*/ 4453 w 10000"/>
-                <a:gd name="connsiteY2" fmla="*/ 2190 h 15262"/>
-                <a:gd name="connsiteX3" fmla="*/ 6470 w 10000"/>
-                <a:gd name="connsiteY3" fmla="*/ 0 h 15262"/>
-                <a:gd name="connsiteX4" fmla="*/ 10000 w 10000"/>
-                <a:gd name="connsiteY4" fmla="*/ 5262 h 15262"/>
-                <a:gd name="connsiteX5" fmla="*/ 10000 w 10000"/>
-                <a:gd name="connsiteY5" fmla="*/ 15262 h 15262"/>
-                <a:gd name="connsiteX6" fmla="*/ 0 w 10000"/>
-                <a:gd name="connsiteY6" fmla="*/ 15262 h 15262"/>
-                <a:gd name="connsiteX7" fmla="*/ 0 w 10000"/>
-                <a:gd name="connsiteY7" fmla="*/ 7262 h 15262"/>
-                <a:gd name="connsiteX0" fmla="*/ 0 w 10000"/>
-                <a:gd name="connsiteY0" fmla="*/ 7262 h 15262"/>
-                <a:gd name="connsiteX1" fmla="*/ 2772 w 10000"/>
-                <a:gd name="connsiteY1" fmla="*/ 3943 h 15262"/>
-                <a:gd name="connsiteX2" fmla="*/ 4722 w 10000"/>
-                <a:gd name="connsiteY2" fmla="*/ 3942 h 15262"/>
-                <a:gd name="connsiteX3" fmla="*/ 6470 w 10000"/>
-                <a:gd name="connsiteY3" fmla="*/ 0 h 15262"/>
-                <a:gd name="connsiteX4" fmla="*/ 10000 w 10000"/>
-                <a:gd name="connsiteY4" fmla="*/ 5262 h 15262"/>
-                <a:gd name="connsiteX5" fmla="*/ 10000 w 10000"/>
-                <a:gd name="connsiteY5" fmla="*/ 15262 h 15262"/>
-                <a:gd name="connsiteX6" fmla="*/ 0 w 10000"/>
-                <a:gd name="connsiteY6" fmla="*/ 15262 h 15262"/>
-                <a:gd name="connsiteX7" fmla="*/ 0 w 10000"/>
-                <a:gd name="connsiteY7" fmla="*/ 7262 h 15262"/>
-                <a:gd name="connsiteX0" fmla="*/ 0 w 10000"/>
-                <a:gd name="connsiteY0" fmla="*/ 7262 h 15262"/>
-                <a:gd name="connsiteX1" fmla="*/ 2772 w 10000"/>
-                <a:gd name="connsiteY1" fmla="*/ 3943 h 15262"/>
-                <a:gd name="connsiteX2" fmla="*/ 4722 w 10000"/>
-                <a:gd name="connsiteY2" fmla="*/ 3942 h 15262"/>
-                <a:gd name="connsiteX3" fmla="*/ 6470 w 10000"/>
-                <a:gd name="connsiteY3" fmla="*/ 0 h 15262"/>
-                <a:gd name="connsiteX4" fmla="*/ 10000 w 10000"/>
-                <a:gd name="connsiteY4" fmla="*/ 5262 h 15262"/>
-                <a:gd name="connsiteX5" fmla="*/ 10000 w 10000"/>
-                <a:gd name="connsiteY5" fmla="*/ 15262 h 15262"/>
-                <a:gd name="connsiteX6" fmla="*/ 0 w 10000"/>
-                <a:gd name="connsiteY6" fmla="*/ 15262 h 15262"/>
-                <a:gd name="connsiteX7" fmla="*/ 0 w 10000"/>
-                <a:gd name="connsiteY7" fmla="*/ 7262 h 15262"/>
-                <a:gd name="connsiteX0" fmla="*/ 0 w 10000"/>
-                <a:gd name="connsiteY0" fmla="*/ 7262 h 15262"/>
-                <a:gd name="connsiteX1" fmla="*/ 2772 w 10000"/>
-                <a:gd name="connsiteY1" fmla="*/ 3943 h 15262"/>
-                <a:gd name="connsiteX2" fmla="*/ 4722 w 10000"/>
-                <a:gd name="connsiteY2" fmla="*/ 3942 h 15262"/>
-                <a:gd name="connsiteX3" fmla="*/ 6470 w 10000"/>
-                <a:gd name="connsiteY3" fmla="*/ 0 h 15262"/>
-                <a:gd name="connsiteX4" fmla="*/ 10000 w 10000"/>
-                <a:gd name="connsiteY4" fmla="*/ 5262 h 15262"/>
-                <a:gd name="connsiteX5" fmla="*/ 10000 w 10000"/>
-                <a:gd name="connsiteY5" fmla="*/ 15262 h 15262"/>
-                <a:gd name="connsiteX6" fmla="*/ 0 w 10000"/>
-                <a:gd name="connsiteY6" fmla="*/ 15262 h 15262"/>
-                <a:gd name="connsiteX7" fmla="*/ 0 w 10000"/>
-                <a:gd name="connsiteY7" fmla="*/ 7262 h 15262"/>
-                <a:gd name="connsiteX0" fmla="*/ 0 w 10000"/>
-                <a:gd name="connsiteY0" fmla="*/ 7518 h 15518"/>
-                <a:gd name="connsiteX1" fmla="*/ 2772 w 10000"/>
-                <a:gd name="connsiteY1" fmla="*/ 4199 h 15518"/>
-                <a:gd name="connsiteX2" fmla="*/ 4722 w 10000"/>
-                <a:gd name="connsiteY2" fmla="*/ 4198 h 15518"/>
-                <a:gd name="connsiteX3" fmla="*/ 6470 w 10000"/>
-                <a:gd name="connsiteY3" fmla="*/ 256 h 15518"/>
-                <a:gd name="connsiteX4" fmla="*/ 10000 w 10000"/>
-                <a:gd name="connsiteY4" fmla="*/ 5518 h 15518"/>
-                <a:gd name="connsiteX5" fmla="*/ 10000 w 10000"/>
-                <a:gd name="connsiteY5" fmla="*/ 15518 h 15518"/>
-                <a:gd name="connsiteX6" fmla="*/ 0 w 10000"/>
-                <a:gd name="connsiteY6" fmla="*/ 15518 h 15518"/>
-                <a:gd name="connsiteX7" fmla="*/ 0 w 10000"/>
-                <a:gd name="connsiteY7" fmla="*/ 7518 h 15518"/>
-                <a:gd name="connsiteX0" fmla="*/ 0 w 10000"/>
-                <a:gd name="connsiteY0" fmla="*/ 7518 h 15518"/>
-                <a:gd name="connsiteX1" fmla="*/ 2772 w 10000"/>
-                <a:gd name="connsiteY1" fmla="*/ 4199 h 15518"/>
-                <a:gd name="connsiteX2" fmla="*/ 4722 w 10000"/>
-                <a:gd name="connsiteY2" fmla="*/ 4198 h 15518"/>
-                <a:gd name="connsiteX3" fmla="*/ 6470 w 10000"/>
-                <a:gd name="connsiteY3" fmla="*/ 256 h 15518"/>
-                <a:gd name="connsiteX4" fmla="*/ 10000 w 10000"/>
-                <a:gd name="connsiteY4" fmla="*/ 5518 h 15518"/>
-                <a:gd name="connsiteX5" fmla="*/ 10000 w 10000"/>
-                <a:gd name="connsiteY5" fmla="*/ 15518 h 15518"/>
-                <a:gd name="connsiteX6" fmla="*/ 0 w 10000"/>
-                <a:gd name="connsiteY6" fmla="*/ 15518 h 15518"/>
-                <a:gd name="connsiteX7" fmla="*/ 0 w 10000"/>
-                <a:gd name="connsiteY7" fmla="*/ 7518 h 15518"/>
-                <a:gd name="connsiteX0" fmla="*/ 0 w 10000"/>
-                <a:gd name="connsiteY0" fmla="*/ 7282 h 15282"/>
-                <a:gd name="connsiteX1" fmla="*/ 2772 w 10000"/>
-                <a:gd name="connsiteY1" fmla="*/ 3963 h 15282"/>
-                <a:gd name="connsiteX2" fmla="*/ 4722 w 10000"/>
-                <a:gd name="connsiteY2" fmla="*/ 7028 h 15282"/>
-                <a:gd name="connsiteX3" fmla="*/ 6470 w 10000"/>
-                <a:gd name="connsiteY3" fmla="*/ 20 h 15282"/>
-                <a:gd name="connsiteX4" fmla="*/ 10000 w 10000"/>
-                <a:gd name="connsiteY4" fmla="*/ 5282 h 15282"/>
-                <a:gd name="connsiteX5" fmla="*/ 10000 w 10000"/>
-                <a:gd name="connsiteY5" fmla="*/ 15282 h 15282"/>
-                <a:gd name="connsiteX6" fmla="*/ 0 w 10000"/>
-                <a:gd name="connsiteY6" fmla="*/ 15282 h 15282"/>
-                <a:gd name="connsiteX7" fmla="*/ 0 w 10000"/>
-                <a:gd name="connsiteY7" fmla="*/ 7282 h 15282"/>
-                <a:gd name="connsiteX0" fmla="*/ 0 w 10000"/>
-                <a:gd name="connsiteY0" fmla="*/ 7282 h 15282"/>
-                <a:gd name="connsiteX1" fmla="*/ 2772 w 10000"/>
-                <a:gd name="connsiteY1" fmla="*/ 3963 h 15282"/>
-                <a:gd name="connsiteX2" fmla="*/ 4722 w 10000"/>
-                <a:gd name="connsiteY2" fmla="*/ 7028 h 15282"/>
-                <a:gd name="connsiteX3" fmla="*/ 6470 w 10000"/>
-                <a:gd name="connsiteY3" fmla="*/ 20 h 15282"/>
-                <a:gd name="connsiteX4" fmla="*/ 10000 w 10000"/>
-                <a:gd name="connsiteY4" fmla="*/ 5282 h 15282"/>
-                <a:gd name="connsiteX5" fmla="*/ 10000 w 10000"/>
-                <a:gd name="connsiteY5" fmla="*/ 15282 h 15282"/>
-                <a:gd name="connsiteX6" fmla="*/ 0 w 10000"/>
-                <a:gd name="connsiteY6" fmla="*/ 15282 h 15282"/>
-                <a:gd name="connsiteX7" fmla="*/ 0 w 10000"/>
-                <a:gd name="connsiteY7" fmla="*/ 7282 h 15282"/>
-                <a:gd name="connsiteX0" fmla="*/ 0 w 10000"/>
-                <a:gd name="connsiteY0" fmla="*/ 8153 h 16153"/>
-                <a:gd name="connsiteX1" fmla="*/ 2772 w 10000"/>
-                <a:gd name="connsiteY1" fmla="*/ 4834 h 16153"/>
-                <a:gd name="connsiteX2" fmla="*/ 4722 w 10000"/>
-                <a:gd name="connsiteY2" fmla="*/ 7899 h 16153"/>
-                <a:gd name="connsiteX3" fmla="*/ 6941 w 10000"/>
-                <a:gd name="connsiteY3" fmla="*/ 15 h 16153"/>
-                <a:gd name="connsiteX4" fmla="*/ 10000 w 10000"/>
-                <a:gd name="connsiteY4" fmla="*/ 6153 h 16153"/>
-                <a:gd name="connsiteX5" fmla="*/ 10000 w 10000"/>
-                <a:gd name="connsiteY5" fmla="*/ 16153 h 16153"/>
-                <a:gd name="connsiteX6" fmla="*/ 0 w 10000"/>
-                <a:gd name="connsiteY6" fmla="*/ 16153 h 16153"/>
-                <a:gd name="connsiteX7" fmla="*/ 0 w 10000"/>
-                <a:gd name="connsiteY7" fmla="*/ 8153 h 16153"/>
-                <a:gd name="connsiteX0" fmla="*/ 0 w 10000"/>
-                <a:gd name="connsiteY0" fmla="*/ 8153 h 16153"/>
-                <a:gd name="connsiteX1" fmla="*/ 2100 w 10000"/>
-                <a:gd name="connsiteY1" fmla="*/ 3958 h 16153"/>
-                <a:gd name="connsiteX2" fmla="*/ 4722 w 10000"/>
-                <a:gd name="connsiteY2" fmla="*/ 7899 h 16153"/>
-                <a:gd name="connsiteX3" fmla="*/ 6941 w 10000"/>
-                <a:gd name="connsiteY3" fmla="*/ 15 h 16153"/>
-                <a:gd name="connsiteX4" fmla="*/ 10000 w 10000"/>
-                <a:gd name="connsiteY4" fmla="*/ 6153 h 16153"/>
-                <a:gd name="connsiteX5" fmla="*/ 10000 w 10000"/>
-                <a:gd name="connsiteY5" fmla="*/ 16153 h 16153"/>
-                <a:gd name="connsiteX6" fmla="*/ 0 w 10000"/>
-                <a:gd name="connsiteY6" fmla="*/ 16153 h 16153"/>
-                <a:gd name="connsiteX7" fmla="*/ 0 w 10000"/>
-                <a:gd name="connsiteY7" fmla="*/ 8153 h 16153"/>
-              </a:gdLst>
-              <a:ahLst/>
-              <a:cxnLst>
-                <a:cxn ang="0">
-                  <a:pos x="connsiteX0" y="connsiteY0"/>
-                </a:cxn>
-                <a:cxn ang="0">
-                  <a:pos x="connsiteX1" y="connsiteY1"/>
-                </a:cxn>
-                <a:cxn ang="0">
-                  <a:pos x="connsiteX2" y="connsiteY2"/>
-                </a:cxn>
-                <a:cxn ang="0">
-                  <a:pos x="connsiteX3" y="connsiteY3"/>
-                </a:cxn>
-                <a:cxn ang="0">
-                  <a:pos x="connsiteX4" y="connsiteY4"/>
-                </a:cxn>
-                <a:cxn ang="0">
-                  <a:pos x="connsiteX5" y="connsiteY5"/>
-                </a:cxn>
-                <a:cxn ang="0">
-                  <a:pos x="connsiteX6" y="connsiteY6"/>
-                </a:cxn>
-                <a:cxn ang="0">
-                  <a:pos x="connsiteX7" y="connsiteY7"/>
-                </a:cxn>
-              </a:cxnLst>
-              <a:rect l="l" t="t" r="r" b="b"/>
-              <a:pathLst>
-                <a:path w="10000" h="16153">
-                  <a:moveTo>
-                    <a:pt x="0" y="8153"/>
-                  </a:moveTo>
-                  <a:cubicBezTo>
-                    <a:pt x="462" y="6267"/>
-                    <a:pt x="1313" y="4000"/>
-                    <a:pt x="2100" y="3958"/>
-                  </a:cubicBezTo>
-                  <a:cubicBezTo>
-                    <a:pt x="2887" y="3916"/>
-                    <a:pt x="3915" y="8556"/>
-                    <a:pt x="4722" y="7899"/>
-                  </a:cubicBezTo>
-                  <a:cubicBezTo>
-                    <a:pt x="5529" y="7242"/>
-                    <a:pt x="6061" y="306"/>
-                    <a:pt x="6941" y="15"/>
-                  </a:cubicBezTo>
-                  <a:cubicBezTo>
-                    <a:pt x="7821" y="-276"/>
-                    <a:pt x="9412" y="3609"/>
-                    <a:pt x="10000" y="6153"/>
-                  </a:cubicBezTo>
-                  <a:lnTo>
-                    <a:pt x="10000" y="16153"/>
-                  </a:lnTo>
-                  <a:lnTo>
-                    <a:pt x="0" y="16153"/>
-                  </a:lnTo>
-                  <a:lnTo>
-                    <a:pt x="0" y="8153"/>
-                  </a:lnTo>
-                  <a:close/>
-                </a:path>
-              </a:pathLst>
-            </a:custGeom>
-            <a:solidFill>
-              <a:schemeClr val="accent6"/>
-            </a:solidFill>
-            <a:ln w="19050">
-              <a:solidFill>
-                <a:schemeClr val="bg1"/>
-              </a:solidFill>
-            </a:ln>
-            <a:effectLst/>
-          </p:spPr>
-          <p:style>
-            <a:lnRef idx="2">
-              <a:schemeClr val="accent1">
-                <a:shade val="50000"/>
-              </a:schemeClr>
-            </a:lnRef>
-            <a:fillRef idx="1">
-              <a:schemeClr val="accent1"/>
-            </a:fillRef>
-            <a:effectRef idx="0">
-              <a:schemeClr val="accent1"/>
-            </a:effectRef>
-            <a:fontRef idx="minor">
-              <a:schemeClr val="lt1"/>
-            </a:fontRef>
-          </p:style>
-          <p:txBody>
-            <a:bodyPr rtlCol="0" anchor="ctr"/>
-            <a:lstStyle/>
-            <a:p>
-              <a:pPr algn="ctr"/>
-              <a:endParaRPr lang="en-SG"/>
-            </a:p>
-          </p:txBody>
-        </p:sp>
-      </p:grpSp>
     </p:spTree>
     <p:extLst>
       <p:ext uri="{BB962C8B-B14F-4D97-AF65-F5344CB8AC3E}">
@@ -14975,11 +13789,7 @@
             <a:pPr algn="ctr"/>
             <a:r>
               <a:rPr lang="en-US" sz="800" dirty="0" smtClean="0"/>
-              <a:t>Colors </a:t>
-            </a:r>
-            <a:r>
-              <a:rPr lang="en-US" sz="800" dirty="0" smtClean="0"/>
-              <a:t>Lab (alternative)</a:t>
+              <a:t>Colors Lab (alternative)</a:t>
             </a:r>
             <a:endParaRPr lang="en-SG" sz="800" dirty="0"/>
           </a:p>
@@ -16051,6 +14861,965 @@
           <a:chExt cx="0" cy="0"/>
         </a:xfrm>
       </p:grpSpPr>
+      <p:sp>
+        <p:nvSpPr>
+          <p:cNvPr id="116" name="TextBox 115"/>
+          <p:cNvSpPr txBox="1"/>
+          <p:nvPr/>
+        </p:nvSpPr>
+        <p:spPr>
+          <a:xfrm>
+            <a:off x="276082" y="304800"/>
+            <a:ext cx="1938215" cy="369332"/>
+          </a:xfrm>
+          <a:prstGeom prst="rect">
+            <a:avLst/>
+          </a:prstGeom>
+          <a:noFill/>
+        </p:spPr>
+        <p:txBody>
+          <a:bodyPr wrap="square" rtlCol="0">
+            <a:spAutoFit/>
+          </a:bodyPr>
+          <a:lstStyle/>
+          <a:p>
+            <a:r>
+              <a:rPr lang="en-US" dirty="0" smtClean="0"/>
+              <a:t>Shapes </a:t>
+            </a:r>
+            <a:r>
+              <a:rPr lang="en-US" dirty="0" smtClean="0"/>
+              <a:t>Lab</a:t>
+            </a:r>
+            <a:endParaRPr lang="en-SG" dirty="0"/>
+          </a:p>
+        </p:txBody>
+      </p:sp>
+      <p:sp>
+        <p:nvSpPr>
+          <p:cNvPr id="72" name="TextBox 71"/>
+          <p:cNvSpPr txBox="1"/>
+          <p:nvPr/>
+        </p:nvSpPr>
+        <p:spPr>
+          <a:xfrm>
+            <a:off x="970623" y="2069926"/>
+            <a:ext cx="916799" cy="215444"/>
+          </a:xfrm>
+          <a:prstGeom prst="rect">
+            <a:avLst/>
+          </a:prstGeom>
+          <a:noFill/>
+        </p:spPr>
+        <p:txBody>
+          <a:bodyPr wrap="square" rtlCol="0">
+            <a:spAutoFit/>
+          </a:bodyPr>
+          <a:lstStyle/>
+          <a:p>
+            <a:pPr algn="ctr"/>
+            <a:r>
+              <a:rPr lang="en-US" sz="800" dirty="0" smtClean="0"/>
+              <a:t>Shapes </a:t>
+            </a:r>
+            <a:r>
+              <a:rPr lang="en-US" sz="800" dirty="0"/>
+              <a:t>L</a:t>
+            </a:r>
+            <a:r>
+              <a:rPr lang="en-US" sz="800" dirty="0" smtClean="0"/>
+              <a:t>ab</a:t>
+            </a:r>
+            <a:endParaRPr lang="en-SG" sz="800" dirty="0"/>
+          </a:p>
+        </p:txBody>
+      </p:sp>
+      <p:grpSp>
+        <p:nvGrpSpPr>
+          <p:cNvPr id="73" name="Group 72"/>
+          <p:cNvGrpSpPr/>
+          <p:nvPr/>
+        </p:nvGrpSpPr>
+        <p:grpSpPr>
+          <a:xfrm>
+            <a:off x="1002575" y="1231726"/>
+            <a:ext cx="838200" cy="838200"/>
+            <a:chOff x="375266" y="5397326"/>
+            <a:chExt cx="838200" cy="838200"/>
+          </a:xfrm>
+        </p:grpSpPr>
+        <p:sp>
+          <p:nvSpPr>
+            <p:cNvPr id="74" name="Rectangle 73"/>
+            <p:cNvSpPr/>
+            <p:nvPr/>
+          </p:nvSpPr>
+          <p:spPr>
+            <a:xfrm>
+              <a:off x="375266" y="5397326"/>
+              <a:ext cx="838200" cy="838200"/>
+            </a:xfrm>
+            <a:prstGeom prst="rect">
+              <a:avLst/>
+            </a:prstGeom>
+            <a:noFill/>
+            <a:ln>
+              <a:noFill/>
+            </a:ln>
+          </p:spPr>
+          <p:style>
+            <a:lnRef idx="2">
+              <a:schemeClr val="accent1">
+                <a:shade val="50000"/>
+              </a:schemeClr>
+            </a:lnRef>
+            <a:fillRef idx="1">
+              <a:schemeClr val="accent1"/>
+            </a:fillRef>
+            <a:effectRef idx="0">
+              <a:schemeClr val="accent1"/>
+            </a:effectRef>
+            <a:fontRef idx="minor">
+              <a:schemeClr val="lt1"/>
+            </a:fontRef>
+          </p:style>
+          <p:txBody>
+            <a:bodyPr rtlCol="0" anchor="ctr"/>
+            <a:lstStyle/>
+            <a:p>
+              <a:pPr algn="ctr"/>
+              <a:endParaRPr lang="en-SG"/>
+            </a:p>
+          </p:txBody>
+        </p:sp>
+        <p:sp>
+          <p:nvSpPr>
+            <p:cNvPr id="75" name="Rectangle 4"/>
+            <p:cNvSpPr/>
+            <p:nvPr/>
+          </p:nvSpPr>
+          <p:spPr>
+            <a:xfrm rot="16200000">
+              <a:off x="444221" y="5470529"/>
+              <a:ext cx="700291" cy="690781"/>
+            </a:xfrm>
+            <a:custGeom>
+              <a:avLst/>
+              <a:gdLst/>
+              <a:ahLst/>
+              <a:cxnLst/>
+              <a:rect l="l" t="t" r="r" b="b"/>
+              <a:pathLst>
+                <a:path w="1752603" h="1752600">
+                  <a:moveTo>
+                    <a:pt x="533400" y="0"/>
+                  </a:moveTo>
+                  <a:lnTo>
+                    <a:pt x="533403" y="0"/>
+                  </a:lnTo>
+                  <a:lnTo>
+                    <a:pt x="1066800" y="0"/>
+                  </a:lnTo>
+                  <a:lnTo>
+                    <a:pt x="1752603" y="0"/>
+                  </a:lnTo>
+                  <a:lnTo>
+                    <a:pt x="1752603" y="1752600"/>
+                  </a:lnTo>
+                  <a:lnTo>
+                    <a:pt x="1219203" y="1752600"/>
+                  </a:lnTo>
+                  <a:lnTo>
+                    <a:pt x="533403" y="1752600"/>
+                  </a:lnTo>
+                  <a:lnTo>
+                    <a:pt x="3" y="1752600"/>
+                  </a:lnTo>
+                  <a:lnTo>
+                    <a:pt x="3" y="533430"/>
+                  </a:lnTo>
+                  <a:cubicBezTo>
+                    <a:pt x="0" y="533420"/>
+                    <a:pt x="0" y="533410"/>
+                    <a:pt x="0" y="533400"/>
+                  </a:cubicBezTo>
+                  <a:cubicBezTo>
+                    <a:pt x="0" y="238811"/>
+                    <a:pt x="238811" y="0"/>
+                    <a:pt x="533400" y="0"/>
+                  </a:cubicBezTo>
+                  <a:close/>
+                </a:path>
+              </a:pathLst>
+            </a:custGeom>
+            <a:noFill/>
+            <a:ln w="76200" cmpd="sng">
+              <a:solidFill>
+                <a:srgbClr val="0070C0"/>
+              </a:solidFill>
+              <a:miter lim="800000"/>
+            </a:ln>
+          </p:spPr>
+          <p:style>
+            <a:lnRef idx="2">
+              <a:schemeClr val="accent1">
+                <a:shade val="50000"/>
+              </a:schemeClr>
+            </a:lnRef>
+            <a:fillRef idx="1">
+              <a:schemeClr val="accent1"/>
+            </a:fillRef>
+            <a:effectRef idx="0">
+              <a:schemeClr val="accent1"/>
+            </a:effectRef>
+            <a:fontRef idx="minor">
+              <a:schemeClr val="lt1"/>
+            </a:fontRef>
+          </p:style>
+          <p:txBody>
+            <a:bodyPr rtlCol="0" anchor="ctr"/>
+            <a:lstStyle/>
+            <a:p>
+              <a:pPr algn="ctr"/>
+              <a:endParaRPr lang="en-US"/>
+            </a:p>
+          </p:txBody>
+        </p:sp>
+        <p:sp>
+          <p:nvSpPr>
+            <p:cNvPr id="76" name="Teardrop 75"/>
+            <p:cNvSpPr/>
+            <p:nvPr/>
+          </p:nvSpPr>
+          <p:spPr>
+            <a:xfrm>
+              <a:off x="747877" y="5557049"/>
+              <a:ext cx="309672" cy="307175"/>
+            </a:xfrm>
+            <a:prstGeom prst="teardrop">
+              <a:avLst/>
+            </a:prstGeom>
+            <a:solidFill>
+              <a:srgbClr val="0070C0"/>
+            </a:solidFill>
+            <a:ln w="19050">
+              <a:solidFill>
+                <a:schemeClr val="bg1"/>
+              </a:solidFill>
+            </a:ln>
+            <a:effectLst/>
+          </p:spPr>
+          <p:style>
+            <a:lnRef idx="2">
+              <a:schemeClr val="accent1">
+                <a:shade val="50000"/>
+              </a:schemeClr>
+            </a:lnRef>
+            <a:fillRef idx="1">
+              <a:schemeClr val="accent1"/>
+            </a:fillRef>
+            <a:effectRef idx="0">
+              <a:schemeClr val="accent1"/>
+            </a:effectRef>
+            <a:fontRef idx="minor">
+              <a:schemeClr val="lt1"/>
+            </a:fontRef>
+          </p:style>
+          <p:txBody>
+            <a:bodyPr rtlCol="0" anchor="ctr"/>
+            <a:lstStyle/>
+            <a:p>
+              <a:pPr algn="ctr"/>
+              <a:endParaRPr lang="en-SG"/>
+            </a:p>
+          </p:txBody>
+        </p:sp>
+        <p:sp>
+          <p:nvSpPr>
+            <p:cNvPr id="77" name="Flowchart: Process 76"/>
+            <p:cNvSpPr/>
+            <p:nvPr/>
+          </p:nvSpPr>
+          <p:spPr>
+            <a:xfrm>
+              <a:off x="544174" y="5670551"/>
+              <a:ext cx="299506" cy="256598"/>
+            </a:xfrm>
+            <a:prstGeom prst="flowChartProcess">
+              <a:avLst/>
+            </a:prstGeom>
+            <a:solidFill>
+              <a:schemeClr val="accent6"/>
+            </a:solidFill>
+            <a:ln w="19050">
+              <a:solidFill>
+                <a:schemeClr val="bg1"/>
+              </a:solidFill>
+            </a:ln>
+            <a:effectLst/>
+          </p:spPr>
+          <p:style>
+            <a:lnRef idx="2">
+              <a:schemeClr val="accent1">
+                <a:shade val="50000"/>
+              </a:schemeClr>
+            </a:lnRef>
+            <a:fillRef idx="1">
+              <a:schemeClr val="accent1"/>
+            </a:fillRef>
+            <a:effectRef idx="0">
+              <a:schemeClr val="accent1"/>
+            </a:effectRef>
+            <a:fontRef idx="minor">
+              <a:schemeClr val="lt1"/>
+            </a:fontRef>
+          </p:style>
+          <p:txBody>
+            <a:bodyPr rtlCol="0" anchor="ctr"/>
+            <a:lstStyle/>
+            <a:p>
+              <a:pPr algn="ctr"/>
+              <a:endParaRPr lang="en-SG"/>
+            </a:p>
+          </p:txBody>
+        </p:sp>
+        <p:sp>
+          <p:nvSpPr>
+            <p:cNvPr id="78" name="Flowchart: Magnetic Disk 77"/>
+            <p:cNvSpPr/>
+            <p:nvPr/>
+          </p:nvSpPr>
+          <p:spPr>
+            <a:xfrm>
+              <a:off x="721676" y="5747165"/>
+              <a:ext cx="258469" cy="315518"/>
+            </a:xfrm>
+            <a:prstGeom prst="flowChartMagneticDisk">
+              <a:avLst/>
+            </a:prstGeom>
+            <a:solidFill>
+              <a:schemeClr val="accent6"/>
+            </a:solidFill>
+            <a:ln w="19050">
+              <a:solidFill>
+                <a:schemeClr val="bg1"/>
+              </a:solidFill>
+            </a:ln>
+            <a:effectLst/>
+          </p:spPr>
+          <p:style>
+            <a:lnRef idx="2">
+              <a:schemeClr val="accent1">
+                <a:shade val="50000"/>
+              </a:schemeClr>
+            </a:lnRef>
+            <a:fillRef idx="1">
+              <a:schemeClr val="accent1"/>
+            </a:fillRef>
+            <a:effectRef idx="0">
+              <a:schemeClr val="accent1"/>
+            </a:effectRef>
+            <a:fontRef idx="minor">
+              <a:schemeClr val="lt1"/>
+            </a:fontRef>
+          </p:style>
+          <p:txBody>
+            <a:bodyPr rtlCol="0" anchor="ctr"/>
+            <a:lstStyle/>
+            <a:p>
+              <a:pPr algn="ctr"/>
+              <a:endParaRPr lang="en-SG"/>
+            </a:p>
+          </p:txBody>
+        </p:sp>
+      </p:grpSp>
+      <p:sp>
+        <p:nvSpPr>
+          <p:cNvPr id="83" name="[TextBox 40]"/>
+          <p:cNvSpPr txBox="1"/>
+          <p:nvPr/>
+        </p:nvSpPr>
+        <p:spPr>
+          <a:xfrm>
+            <a:off x="1114965" y="3545828"/>
+            <a:ext cx="762000" cy="600164"/>
+          </a:xfrm>
+          <a:prstGeom prst="rect">
+            <a:avLst/>
+          </a:prstGeom>
+          <a:noFill/>
+        </p:spPr>
+        <p:txBody>
+          <a:bodyPr wrap="square" rtlCol="0">
+            <a:spAutoFit/>
+          </a:bodyPr>
+          <a:lstStyle/>
+          <a:p>
+            <a:pPr algn="ctr"/>
+            <a:r>
+              <a:rPr lang="en-US" sz="1100" dirty="0" smtClean="0"/>
+              <a:t>Add </a:t>
+            </a:r>
+            <a:r>
+              <a:rPr lang="en-US" sz="1100" dirty="0" smtClean="0"/>
+              <a:t>to custom shapes</a:t>
+            </a:r>
+            <a:endParaRPr lang="en-SG" sz="1100" dirty="0"/>
+          </a:p>
+        </p:txBody>
+      </p:sp>
+      <p:sp>
+        <p:nvSpPr>
+          <p:cNvPr id="88" name="Rectangle 87"/>
+          <p:cNvSpPr/>
+          <p:nvPr/>
+        </p:nvSpPr>
+        <p:spPr>
+          <a:xfrm>
+            <a:off x="2555150" y="1739324"/>
+            <a:ext cx="838200" cy="838200"/>
+          </a:xfrm>
+          <a:prstGeom prst="rect">
+            <a:avLst/>
+          </a:prstGeom>
+          <a:noFill/>
+          <a:ln>
+            <a:noFill/>
+          </a:ln>
+        </p:spPr>
+        <p:style>
+          <a:lnRef idx="2">
+            <a:schemeClr val="accent1">
+              <a:shade val="50000"/>
+            </a:schemeClr>
+          </a:lnRef>
+          <a:fillRef idx="1">
+            <a:schemeClr val="accent1"/>
+          </a:fillRef>
+          <a:effectRef idx="0">
+            <a:schemeClr val="accent1"/>
+          </a:effectRef>
+          <a:fontRef idx="minor">
+            <a:schemeClr val="lt1"/>
+          </a:fontRef>
+        </p:style>
+        <p:txBody>
+          <a:bodyPr rtlCol="0" anchor="ctr"/>
+          <a:lstStyle/>
+          <a:p>
+            <a:pPr algn="ctr"/>
+            <a:endParaRPr lang="en-SG"/>
+          </a:p>
+        </p:txBody>
+      </p:sp>
+      <p:grpSp>
+        <p:nvGrpSpPr>
+          <p:cNvPr id="3" name="Group 2"/>
+          <p:cNvGrpSpPr/>
+          <p:nvPr/>
+        </p:nvGrpSpPr>
+        <p:grpSpPr>
+          <a:xfrm>
+            <a:off x="1270075" y="2900531"/>
+            <a:ext cx="414783" cy="418250"/>
+            <a:chOff x="1270075" y="2900531"/>
+            <a:chExt cx="414783" cy="418250"/>
+          </a:xfrm>
+        </p:grpSpPr>
+        <p:sp>
+          <p:nvSpPr>
+            <p:cNvPr id="80" name="Right Arrow 79"/>
+            <p:cNvSpPr>
+              <a:spLocks noChangeAspect="1"/>
+            </p:cNvSpPr>
+            <p:nvPr/>
+          </p:nvSpPr>
+          <p:spPr>
+            <a:xfrm>
+              <a:off x="1270075" y="2900531"/>
+              <a:ext cx="414783" cy="418250"/>
+            </a:xfrm>
+            <a:prstGeom prst="rightArrow">
+              <a:avLst>
+                <a:gd name="adj1" fmla="val 100000"/>
+                <a:gd name="adj2" fmla="val 41580"/>
+              </a:avLst>
+            </a:prstGeom>
+            <a:solidFill>
+              <a:srgbClr val="0070C0"/>
+            </a:solidFill>
+            <a:ln>
+              <a:noFill/>
+            </a:ln>
+          </p:spPr>
+          <p:style>
+            <a:lnRef idx="2">
+              <a:schemeClr val="accent1">
+                <a:shade val="50000"/>
+              </a:schemeClr>
+            </a:lnRef>
+            <a:fillRef idx="1">
+              <a:schemeClr val="accent1"/>
+            </a:fillRef>
+            <a:effectRef idx="0">
+              <a:schemeClr val="accent1"/>
+            </a:effectRef>
+            <a:fontRef idx="minor">
+              <a:schemeClr val="lt1"/>
+            </a:fontRef>
+          </p:style>
+          <p:txBody>
+            <a:bodyPr rtlCol="0" anchor="ctr"/>
+            <a:lstStyle/>
+            <a:p>
+              <a:pPr algn="ctr"/>
+              <a:endParaRPr lang="en-US"/>
+            </a:p>
+          </p:txBody>
+        </p:sp>
+        <p:sp>
+          <p:nvSpPr>
+            <p:cNvPr id="90" name="Teardrop 89"/>
+            <p:cNvSpPr/>
+            <p:nvPr/>
+          </p:nvSpPr>
+          <p:spPr>
+            <a:xfrm>
+              <a:off x="1348985" y="2964774"/>
+              <a:ext cx="181037" cy="175706"/>
+            </a:xfrm>
+            <a:prstGeom prst="teardrop">
+              <a:avLst/>
+            </a:prstGeom>
+            <a:solidFill>
+              <a:schemeClr val="bg1"/>
+            </a:solidFill>
+            <a:ln w="19050">
+              <a:solidFill>
+                <a:srgbClr val="0070C0"/>
+              </a:solidFill>
+            </a:ln>
+            <a:effectLst/>
+          </p:spPr>
+          <p:style>
+            <a:lnRef idx="2">
+              <a:schemeClr val="accent1">
+                <a:shade val="50000"/>
+              </a:schemeClr>
+            </a:lnRef>
+            <a:fillRef idx="1">
+              <a:schemeClr val="accent1"/>
+            </a:fillRef>
+            <a:effectRef idx="0">
+              <a:schemeClr val="accent1"/>
+            </a:effectRef>
+            <a:fontRef idx="minor">
+              <a:schemeClr val="lt1"/>
+            </a:fontRef>
+          </p:style>
+          <p:txBody>
+            <a:bodyPr rtlCol="0" anchor="ctr"/>
+            <a:lstStyle/>
+            <a:p>
+              <a:pPr algn="ctr"/>
+              <a:endParaRPr lang="en-SG"/>
+            </a:p>
+          </p:txBody>
+        </p:sp>
+        <p:sp>
+          <p:nvSpPr>
+            <p:cNvPr id="91" name="Flowchart: Process 90"/>
+            <p:cNvSpPr/>
+            <p:nvPr/>
+          </p:nvSpPr>
+          <p:spPr>
+            <a:xfrm>
+              <a:off x="1295196" y="3028764"/>
+              <a:ext cx="188837" cy="161784"/>
+            </a:xfrm>
+            <a:prstGeom prst="flowChartProcess">
+              <a:avLst/>
+            </a:prstGeom>
+            <a:solidFill>
+              <a:schemeClr val="bg1"/>
+            </a:solidFill>
+            <a:ln w="19050">
+              <a:solidFill>
+                <a:srgbClr val="0070C0"/>
+              </a:solidFill>
+            </a:ln>
+            <a:effectLst/>
+          </p:spPr>
+          <p:style>
+            <a:lnRef idx="2">
+              <a:schemeClr val="accent1">
+                <a:shade val="50000"/>
+              </a:schemeClr>
+            </a:lnRef>
+            <a:fillRef idx="1">
+              <a:schemeClr val="accent1"/>
+            </a:fillRef>
+            <a:effectRef idx="0">
+              <a:schemeClr val="accent1"/>
+            </a:effectRef>
+            <a:fontRef idx="minor">
+              <a:schemeClr val="lt1"/>
+            </a:fontRef>
+          </p:style>
+          <p:txBody>
+            <a:bodyPr rtlCol="0" anchor="ctr"/>
+            <a:lstStyle/>
+            <a:p>
+              <a:pPr algn="ctr"/>
+              <a:endParaRPr lang="en-SG"/>
+            </a:p>
+          </p:txBody>
+        </p:sp>
+        <p:sp>
+          <p:nvSpPr>
+            <p:cNvPr id="92" name="Flowchart: Magnetic Disk 91"/>
+            <p:cNvSpPr/>
+            <p:nvPr/>
+          </p:nvSpPr>
+          <p:spPr>
+            <a:xfrm>
+              <a:off x="1398940" y="3072287"/>
+              <a:ext cx="162964" cy="166213"/>
+            </a:xfrm>
+            <a:prstGeom prst="flowChartMagneticDisk">
+              <a:avLst/>
+            </a:prstGeom>
+            <a:solidFill>
+              <a:schemeClr val="bg1"/>
+            </a:solidFill>
+            <a:ln w="19050">
+              <a:solidFill>
+                <a:srgbClr val="0070C0"/>
+              </a:solidFill>
+            </a:ln>
+            <a:effectLst/>
+          </p:spPr>
+          <p:style>
+            <a:lnRef idx="2">
+              <a:schemeClr val="accent1">
+                <a:shade val="50000"/>
+              </a:schemeClr>
+            </a:lnRef>
+            <a:fillRef idx="1">
+              <a:schemeClr val="accent1"/>
+            </a:fillRef>
+            <a:effectRef idx="0">
+              <a:schemeClr val="accent1"/>
+            </a:effectRef>
+            <a:fontRef idx="minor">
+              <a:schemeClr val="lt1"/>
+            </a:fontRef>
+          </p:style>
+          <p:txBody>
+            <a:bodyPr rtlCol="0" anchor="ctr"/>
+            <a:lstStyle/>
+            <a:p>
+              <a:pPr algn="ctr"/>
+              <a:endParaRPr lang="en-SG"/>
+            </a:p>
+          </p:txBody>
+        </p:sp>
+      </p:grpSp>
+      <p:grpSp>
+        <p:nvGrpSpPr>
+          <p:cNvPr id="4" name="Group 3"/>
+          <p:cNvGrpSpPr/>
+          <p:nvPr/>
+        </p:nvGrpSpPr>
+        <p:grpSpPr>
+          <a:xfrm>
+            <a:off x="2441650" y="2911671"/>
+            <a:ext cx="414783" cy="418250"/>
+            <a:chOff x="2441650" y="2911671"/>
+            <a:chExt cx="414783" cy="418250"/>
+          </a:xfrm>
+        </p:grpSpPr>
+        <p:sp>
+          <p:nvSpPr>
+            <p:cNvPr id="99" name="Right Arrow 98"/>
+            <p:cNvSpPr>
+              <a:spLocks noChangeAspect="1"/>
+            </p:cNvSpPr>
+            <p:nvPr/>
+          </p:nvSpPr>
+          <p:spPr>
+            <a:xfrm flipH="1">
+              <a:off x="2441650" y="2911671"/>
+              <a:ext cx="414783" cy="418250"/>
+            </a:xfrm>
+            <a:prstGeom prst="rightArrow">
+              <a:avLst>
+                <a:gd name="adj1" fmla="val 100000"/>
+                <a:gd name="adj2" fmla="val 41580"/>
+              </a:avLst>
+            </a:prstGeom>
+            <a:solidFill>
+              <a:srgbClr val="0070C0"/>
+            </a:solidFill>
+            <a:ln>
+              <a:noFill/>
+            </a:ln>
+          </p:spPr>
+          <p:style>
+            <a:lnRef idx="2">
+              <a:schemeClr val="accent1">
+                <a:shade val="50000"/>
+              </a:schemeClr>
+            </a:lnRef>
+            <a:fillRef idx="1">
+              <a:schemeClr val="accent1"/>
+            </a:fillRef>
+            <a:effectRef idx="0">
+              <a:schemeClr val="accent1"/>
+            </a:effectRef>
+            <a:fontRef idx="minor">
+              <a:schemeClr val="lt1"/>
+            </a:fontRef>
+          </p:style>
+          <p:txBody>
+            <a:bodyPr rtlCol="0" anchor="ctr"/>
+            <a:lstStyle/>
+            <a:p>
+              <a:pPr algn="ctr"/>
+              <a:endParaRPr lang="en-US"/>
+            </a:p>
+          </p:txBody>
+        </p:sp>
+        <p:sp>
+          <p:nvSpPr>
+            <p:cNvPr id="100" name="Teardrop 99"/>
+            <p:cNvSpPr/>
+            <p:nvPr/>
+          </p:nvSpPr>
+          <p:spPr>
+            <a:xfrm>
+              <a:off x="2603110" y="2975914"/>
+              <a:ext cx="181037" cy="175706"/>
+            </a:xfrm>
+            <a:prstGeom prst="teardrop">
+              <a:avLst/>
+            </a:prstGeom>
+            <a:solidFill>
+              <a:schemeClr val="bg1"/>
+            </a:solidFill>
+            <a:ln w="19050">
+              <a:solidFill>
+                <a:srgbClr val="0070C0"/>
+              </a:solidFill>
+            </a:ln>
+            <a:effectLst/>
+          </p:spPr>
+          <p:style>
+            <a:lnRef idx="2">
+              <a:schemeClr val="accent1">
+                <a:shade val="50000"/>
+              </a:schemeClr>
+            </a:lnRef>
+            <a:fillRef idx="1">
+              <a:schemeClr val="accent1"/>
+            </a:fillRef>
+            <a:effectRef idx="0">
+              <a:schemeClr val="accent1"/>
+            </a:effectRef>
+            <a:fontRef idx="minor">
+              <a:schemeClr val="lt1"/>
+            </a:fontRef>
+          </p:style>
+          <p:txBody>
+            <a:bodyPr rtlCol="0" anchor="ctr"/>
+            <a:lstStyle/>
+            <a:p>
+              <a:pPr algn="ctr"/>
+              <a:endParaRPr lang="en-SG"/>
+            </a:p>
+          </p:txBody>
+        </p:sp>
+        <p:sp>
+          <p:nvSpPr>
+            <p:cNvPr id="102" name="Flowchart: Process 101"/>
+            <p:cNvSpPr/>
+            <p:nvPr/>
+          </p:nvSpPr>
+          <p:spPr>
+            <a:xfrm>
+              <a:off x="2549321" y="3039904"/>
+              <a:ext cx="188837" cy="161784"/>
+            </a:xfrm>
+            <a:prstGeom prst="flowChartProcess">
+              <a:avLst/>
+            </a:prstGeom>
+            <a:solidFill>
+              <a:schemeClr val="bg1"/>
+            </a:solidFill>
+            <a:ln w="19050">
+              <a:solidFill>
+                <a:srgbClr val="0070C0"/>
+              </a:solidFill>
+            </a:ln>
+            <a:effectLst/>
+          </p:spPr>
+          <p:style>
+            <a:lnRef idx="2">
+              <a:schemeClr val="accent1">
+                <a:shade val="50000"/>
+              </a:schemeClr>
+            </a:lnRef>
+            <a:fillRef idx="1">
+              <a:schemeClr val="accent1"/>
+            </a:fillRef>
+            <a:effectRef idx="0">
+              <a:schemeClr val="accent1"/>
+            </a:effectRef>
+            <a:fontRef idx="minor">
+              <a:schemeClr val="lt1"/>
+            </a:fontRef>
+          </p:style>
+          <p:txBody>
+            <a:bodyPr rtlCol="0" anchor="ctr"/>
+            <a:lstStyle/>
+            <a:p>
+              <a:pPr algn="ctr"/>
+              <a:endParaRPr lang="en-SG"/>
+            </a:p>
+          </p:txBody>
+        </p:sp>
+        <p:sp>
+          <p:nvSpPr>
+            <p:cNvPr id="103" name="Flowchart: Magnetic Disk 102"/>
+            <p:cNvSpPr/>
+            <p:nvPr/>
+          </p:nvSpPr>
+          <p:spPr>
+            <a:xfrm>
+              <a:off x="2653065" y="3083427"/>
+              <a:ext cx="162964" cy="166213"/>
+            </a:xfrm>
+            <a:prstGeom prst="flowChartMagneticDisk">
+              <a:avLst/>
+            </a:prstGeom>
+            <a:solidFill>
+              <a:schemeClr val="bg1"/>
+            </a:solidFill>
+            <a:ln w="19050">
+              <a:solidFill>
+                <a:srgbClr val="0070C0"/>
+              </a:solidFill>
+            </a:ln>
+            <a:effectLst/>
+          </p:spPr>
+          <p:style>
+            <a:lnRef idx="2">
+              <a:schemeClr val="accent1">
+                <a:shade val="50000"/>
+              </a:schemeClr>
+            </a:lnRef>
+            <a:fillRef idx="1">
+              <a:schemeClr val="accent1"/>
+            </a:fillRef>
+            <a:effectRef idx="0">
+              <a:schemeClr val="accent1"/>
+            </a:effectRef>
+            <a:fontRef idx="minor">
+              <a:schemeClr val="lt1"/>
+            </a:fontRef>
+          </p:style>
+          <p:txBody>
+            <a:bodyPr rtlCol="0" anchor="ctr"/>
+            <a:lstStyle/>
+            <a:p>
+              <a:pPr algn="ctr"/>
+              <a:endParaRPr lang="en-SG"/>
+            </a:p>
+          </p:txBody>
+        </p:sp>
+      </p:grpSp>
+      <p:sp>
+        <p:nvSpPr>
+          <p:cNvPr id="104" name="[TextBox 40]"/>
+          <p:cNvSpPr txBox="1"/>
+          <p:nvPr/>
+        </p:nvSpPr>
+        <p:spPr>
+          <a:xfrm>
+            <a:off x="2353547" y="3622028"/>
+            <a:ext cx="762000" cy="430887"/>
+          </a:xfrm>
+          <a:prstGeom prst="rect">
+            <a:avLst/>
+          </a:prstGeom>
+          <a:noFill/>
+        </p:spPr>
+        <p:txBody>
+          <a:bodyPr wrap="square" rtlCol="0">
+            <a:spAutoFit/>
+          </a:bodyPr>
+          <a:lstStyle/>
+          <a:p>
+            <a:pPr algn="ctr"/>
+            <a:r>
+              <a:rPr lang="en-US" sz="1100" dirty="0" smtClean="0"/>
+              <a:t>Add </a:t>
+            </a:r>
+            <a:r>
+              <a:rPr lang="en-US" sz="1100" dirty="0" smtClean="0"/>
+              <a:t>to slide</a:t>
+            </a:r>
+            <a:endParaRPr lang="en-SG" sz="1100" dirty="0"/>
+          </a:p>
+        </p:txBody>
+      </p:sp>
+    </p:spTree>
+    <p:extLst>
+      <p:ext uri="{BB962C8B-B14F-4D97-AF65-F5344CB8AC3E}">
+        <p14:creationId xmlns:p14="http://schemas.microsoft.com/office/powerpoint/2010/main" val="3287460378"/>
+      </p:ext>
+    </p:extLst>
+  </p:cSld>
+  <p:clrMapOvr>
+    <a:masterClrMapping/>
+  </p:clrMapOvr>
+  <p:timing>
+    <p:tnLst>
+      <p:par>
+        <p:cTn id="1" dur="indefinite" restart="never" nodeType="tmRoot"/>
+      </p:par>
+    </p:tnLst>
+  </p:timing>
+</p:sld>
+</file>
+
+<file path=ppt/slides/slide4.xml><?xml version="1.0" encoding="utf-8"?>
+<p:sld xmlns:a="http://schemas.openxmlformats.org/drawingml/2006/main" xmlns:r="http://schemas.openxmlformats.org/officeDocument/2006/relationships" xmlns:p="http://schemas.openxmlformats.org/presentationml/2006/main">
+  <p:cSld>
+    <p:bg>
+      <p:bgPr>
+        <a:solidFill>
+          <a:schemeClr val="bg1">
+            <a:lumMod val="95000"/>
+          </a:schemeClr>
+        </a:solidFill>
+        <a:effectLst/>
+      </p:bgPr>
+    </p:bg>
+    <p:spTree>
+      <p:nvGrpSpPr>
+        <p:cNvPr id="1" name=""/>
+        <p:cNvGrpSpPr/>
+        <p:nvPr/>
+      </p:nvGrpSpPr>
+      <p:grpSpPr>
+        <a:xfrm>
+          <a:off x="0" y="0"/>
+          <a:ext cx="0" cy="0"/>
+          <a:chOff x="0" y="0"/>
+          <a:chExt cx="0" cy="0"/>
+        </a:xfrm>
+      </p:grpSpPr>
       <p:grpSp>
         <p:nvGrpSpPr>
           <p:cNvPr id="45" name="Group 44"/>
@@ -17276,7 +17045,7 @@
       </p:sp>
       <p:grpSp>
         <p:nvGrpSpPr>
-          <p:cNvPr id="3" name="Group 2"/>
+          <p:cNvPr id="3" name="[Group 2]"/>
           <p:cNvGrpSpPr/>
           <p:nvPr/>
         </p:nvGrpSpPr>
@@ -17429,7 +17198,7 @@
       </p:grpSp>
       <p:sp>
         <p:nvSpPr>
-          <p:cNvPr id="41" name="TextBox 40"/>
+          <p:cNvPr id="41" name="[TextBox 40]"/>
           <p:cNvSpPr txBox="1"/>
           <p:nvPr/>
         </p:nvSpPr>

</xml_diff>

<commit_message>
Added icons for effects lab fixes #588
</commit_message>
<xml_diff>
--- a/doc/Icons.pptx
+++ b/doc/Icons.pptx
@@ -5,21 +5,18 @@
     <p:sldMasterId id="2147483648" r:id="rId1"/>
   </p:sldMasterIdLst>
   <p:notesMasterIdLst>
-    <p:notesMasterId r:id="rId6"/>
+    <p:notesMasterId r:id="rId7"/>
   </p:notesMasterIdLst>
   <p:sldIdLst>
     <p:sldId id="264" r:id="rId2"/>
     <p:sldId id="266" r:id="rId3"/>
     <p:sldId id="267" r:id="rId4"/>
-    <p:sldId id="265" r:id="rId5"/>
+    <p:sldId id="268" r:id="rId5"/>
+    <p:sldId id="265" r:id="rId6"/>
   </p:sldIdLst>
   <p:sldSz cx="9144000" cy="6858000" type="screen4x3"/>
   <p:notesSz cx="6858000" cy="9144000"/>
   <p:embeddedFontLst>
-    <p:embeddedFont>
-      <p:font typeface="Rockwell Extra Bold" panose="02060903040505020403" pitchFamily="18" charset="0"/>
-      <p:bold r:id="rId7"/>
-    </p:embeddedFont>
     <p:embeddedFont>
       <p:font typeface="Calibri" panose="020F0502020204030204" pitchFamily="34" charset="0"/>
       <p:regular r:id="rId8"/>
@@ -28,8 +25,12 @@
       <p:boldItalic r:id="rId11"/>
     </p:embeddedFont>
     <p:embeddedFont>
+      <p:font typeface="Rockwell Extra Bold" panose="02060903040505020403" pitchFamily="18" charset="0"/>
+      <p:bold r:id="rId12"/>
+    </p:embeddedFont>
+    <p:embeddedFont>
       <p:font typeface="Arial Black" panose="020B0A04020102020204" pitchFamily="34" charset="0"/>
-      <p:bold r:id="rId12"/>
+      <p:bold r:id="rId13"/>
     </p:embeddedFont>
   </p:embeddedFontLst>
   <p:defaultTextStyle>
@@ -212,7 +213,7 @@
           <a:p>
             <a:fld id="{6699ACB9-486C-4D62-A3A7-AF98E13EFDA3}" type="datetimeFigureOut">
               <a:rPr lang="en-US" smtClean="0"/>
-              <a:t>7/18/2014</a:t>
+              <a:t>11/1/2014</a:t>
             </a:fld>
             <a:endParaRPr lang="en-US"/>
           </a:p>
@@ -545,7 +546,7 @@
           <a:p>
             <a:fld id="{8EC77E60-82A0-4F8A-A861-433B3189FA8C}" type="slidenum">
               <a:rPr lang="en-US" smtClean="0"/>
-              <a:t>4</a:t>
+              <a:t>5</a:t>
             </a:fld>
             <a:endParaRPr lang="en-US"/>
           </a:p>
@@ -746,7 +747,7 @@
             <a:fld id="{1D8BD707-D9CF-40AE-B4C6-C98DA3205C09}" type="datetimeFigureOut">
               <a:rPr lang="en-US" smtClean="0"/>
               <a:pPr/>
-              <a:t>7/18/2014</a:t>
+              <a:t>11/1/2014</a:t>
             </a:fld>
             <a:endParaRPr lang="en-US"/>
           </a:p>
@@ -913,7 +914,7 @@
             <a:fld id="{1D8BD707-D9CF-40AE-B4C6-C98DA3205C09}" type="datetimeFigureOut">
               <a:rPr lang="en-US" smtClean="0"/>
               <a:pPr/>
-              <a:t>7/18/2014</a:t>
+              <a:t>11/1/2014</a:t>
             </a:fld>
             <a:endParaRPr lang="en-US"/>
           </a:p>
@@ -1090,7 +1091,7 @@
             <a:fld id="{1D8BD707-D9CF-40AE-B4C6-C98DA3205C09}" type="datetimeFigureOut">
               <a:rPr lang="en-US" smtClean="0"/>
               <a:pPr/>
-              <a:t>7/18/2014</a:t>
+              <a:t>11/1/2014</a:t>
             </a:fld>
             <a:endParaRPr lang="en-US"/>
           </a:p>
@@ -1257,7 +1258,7 @@
             <a:fld id="{1D8BD707-D9CF-40AE-B4C6-C98DA3205C09}" type="datetimeFigureOut">
               <a:rPr lang="en-US" smtClean="0"/>
               <a:pPr/>
-              <a:t>7/18/2014</a:t>
+              <a:t>11/1/2014</a:t>
             </a:fld>
             <a:endParaRPr lang="en-US"/>
           </a:p>
@@ -1500,7 +1501,7 @@
             <a:fld id="{1D8BD707-D9CF-40AE-B4C6-C98DA3205C09}" type="datetimeFigureOut">
               <a:rPr lang="en-US" smtClean="0"/>
               <a:pPr/>
-              <a:t>7/18/2014</a:t>
+              <a:t>11/1/2014</a:t>
             </a:fld>
             <a:endParaRPr lang="en-US"/>
           </a:p>
@@ -1785,7 +1786,7 @@
             <a:fld id="{1D8BD707-D9CF-40AE-B4C6-C98DA3205C09}" type="datetimeFigureOut">
               <a:rPr lang="en-US" smtClean="0"/>
               <a:pPr/>
-              <a:t>7/18/2014</a:t>
+              <a:t>11/1/2014</a:t>
             </a:fld>
             <a:endParaRPr lang="en-US"/>
           </a:p>
@@ -2204,7 +2205,7 @@
             <a:fld id="{1D8BD707-D9CF-40AE-B4C6-C98DA3205C09}" type="datetimeFigureOut">
               <a:rPr lang="en-US" smtClean="0"/>
               <a:pPr/>
-              <a:t>7/18/2014</a:t>
+              <a:t>11/1/2014</a:t>
             </a:fld>
             <a:endParaRPr lang="en-US"/>
           </a:p>
@@ -2319,7 +2320,7 @@
             <a:fld id="{1D8BD707-D9CF-40AE-B4C6-C98DA3205C09}" type="datetimeFigureOut">
               <a:rPr lang="en-US" smtClean="0"/>
               <a:pPr/>
-              <a:t>7/18/2014</a:t>
+              <a:t>11/1/2014</a:t>
             </a:fld>
             <a:endParaRPr lang="en-US"/>
           </a:p>
@@ -2411,7 +2412,7 @@
             <a:fld id="{1D8BD707-D9CF-40AE-B4C6-C98DA3205C09}" type="datetimeFigureOut">
               <a:rPr lang="en-US" smtClean="0"/>
               <a:pPr/>
-              <a:t>7/18/2014</a:t>
+              <a:t>11/1/2014</a:t>
             </a:fld>
             <a:endParaRPr lang="en-US"/>
           </a:p>
@@ -2685,7 +2686,7 @@
             <a:fld id="{1D8BD707-D9CF-40AE-B4C6-C98DA3205C09}" type="datetimeFigureOut">
               <a:rPr lang="en-US" smtClean="0"/>
               <a:pPr/>
-              <a:t>7/18/2014</a:t>
+              <a:t>11/1/2014</a:t>
             </a:fld>
             <a:endParaRPr lang="en-US"/>
           </a:p>
@@ -2935,7 +2936,7 @@
             <a:fld id="{1D8BD707-D9CF-40AE-B4C6-C98DA3205C09}" type="datetimeFigureOut">
               <a:rPr lang="en-US" smtClean="0"/>
               <a:pPr/>
-              <a:t>7/18/2014</a:t>
+              <a:t>11/1/2014</a:t>
             </a:fld>
             <a:endParaRPr lang="en-US"/>
           </a:p>
@@ -3145,7 +3146,7 @@
             <a:fld id="{1D8BD707-D9CF-40AE-B4C6-C98DA3205C09}" type="datetimeFigureOut">
               <a:rPr lang="en-US" smtClean="0"/>
               <a:pPr/>
-              <a:t>7/18/2014</a:t>
+              <a:t>11/1/2014</a:t>
             </a:fld>
             <a:endParaRPr lang="en-US"/>
           </a:p>
@@ -14885,11 +14886,7 @@
           <a:p>
             <a:r>
               <a:rPr lang="en-US" dirty="0" smtClean="0"/>
-              <a:t>Shapes </a:t>
-            </a:r>
-            <a:r>
-              <a:rPr lang="en-US" dirty="0" smtClean="0"/>
-              <a:t>Lab</a:t>
+              <a:t>Shapes Lab</a:t>
             </a:r>
             <a:endParaRPr lang="en-SG" dirty="0"/>
           </a:p>
@@ -15258,11 +15255,7 @@
             <a:pPr algn="ctr"/>
             <a:r>
               <a:rPr lang="en-US" sz="1100" dirty="0" smtClean="0"/>
-              <a:t>Add </a:t>
-            </a:r>
-            <a:r>
-              <a:rPr lang="en-US" sz="1100" dirty="0" smtClean="0"/>
-              <a:t>to custom shapes</a:t>
+              <a:t>Add to custom shapes</a:t>
             </a:r>
             <a:endParaRPr lang="en-SG" sz="1100" dirty="0"/>
           </a:p>
@@ -15763,11 +15756,7 @@
             <a:pPr algn="ctr"/>
             <a:r>
               <a:rPr lang="en-US" sz="1100" dirty="0" smtClean="0"/>
-              <a:t>Add </a:t>
-            </a:r>
-            <a:r>
-              <a:rPr lang="en-US" sz="1100" dirty="0" smtClean="0"/>
-              <a:t>to slide</a:t>
+              <a:t>Add to slide</a:t>
             </a:r>
             <a:endParaRPr lang="en-SG" sz="1100" dirty="0"/>
           </a:p>
@@ -15794,6 +15783,1659 @@
 </file>
 
 <file path=ppt/slides/slide4.xml><?xml version="1.0" encoding="utf-8"?>
+<p:sld xmlns:a="http://schemas.openxmlformats.org/drawingml/2006/main" xmlns:r="http://schemas.openxmlformats.org/officeDocument/2006/relationships" xmlns:p="http://schemas.openxmlformats.org/presentationml/2006/main">
+  <p:cSld>
+    <p:bg>
+      <p:bgPr>
+        <a:solidFill>
+          <a:schemeClr val="bg1">
+            <a:lumMod val="95000"/>
+          </a:schemeClr>
+        </a:solidFill>
+        <a:effectLst/>
+      </p:bgPr>
+    </p:bg>
+    <p:spTree>
+      <p:nvGrpSpPr>
+        <p:cNvPr id="1" name=""/>
+        <p:cNvGrpSpPr/>
+        <p:nvPr/>
+      </p:nvGrpSpPr>
+      <p:grpSpPr>
+        <a:xfrm>
+          <a:off x="0" y="0"/>
+          <a:ext cx="0" cy="0"/>
+          <a:chOff x="0" y="0"/>
+          <a:chExt cx="0" cy="0"/>
+        </a:xfrm>
+      </p:grpSpPr>
+      <p:sp>
+        <p:nvSpPr>
+          <p:cNvPr id="116" name="TextBox 115"/>
+          <p:cNvSpPr txBox="1"/>
+          <p:nvPr/>
+        </p:nvSpPr>
+        <p:spPr>
+          <a:xfrm>
+            <a:off x="276082" y="304800"/>
+            <a:ext cx="1938215" cy="369332"/>
+          </a:xfrm>
+          <a:prstGeom prst="rect">
+            <a:avLst/>
+          </a:prstGeom>
+          <a:noFill/>
+        </p:spPr>
+        <p:txBody>
+          <a:bodyPr wrap="square" rtlCol="0">
+            <a:spAutoFit/>
+          </a:bodyPr>
+          <a:lstStyle/>
+          <a:p>
+            <a:r>
+              <a:rPr lang="en-US" dirty="0" smtClean="0"/>
+              <a:t>Effects Lab</a:t>
+            </a:r>
+            <a:endParaRPr lang="en-SG" dirty="0"/>
+          </a:p>
+        </p:txBody>
+      </p:sp>
+      <p:sp>
+        <p:nvSpPr>
+          <p:cNvPr id="72" name="TextBox 71"/>
+          <p:cNvSpPr txBox="1"/>
+          <p:nvPr/>
+        </p:nvSpPr>
+        <p:spPr>
+          <a:xfrm>
+            <a:off x="970623" y="2069926"/>
+            <a:ext cx="916799" cy="215444"/>
+          </a:xfrm>
+          <a:prstGeom prst="rect">
+            <a:avLst/>
+          </a:prstGeom>
+          <a:noFill/>
+        </p:spPr>
+        <p:txBody>
+          <a:bodyPr wrap="square" rtlCol="0">
+            <a:spAutoFit/>
+          </a:bodyPr>
+          <a:lstStyle/>
+          <a:p>
+            <a:pPr algn="ctr"/>
+            <a:r>
+              <a:rPr lang="en-US" sz="800" dirty="0" smtClean="0"/>
+              <a:t>Effects </a:t>
+            </a:r>
+            <a:r>
+              <a:rPr lang="en-US" sz="800" dirty="0"/>
+              <a:t>L</a:t>
+            </a:r>
+            <a:r>
+              <a:rPr lang="en-US" sz="800" dirty="0" smtClean="0"/>
+              <a:t>ab</a:t>
+            </a:r>
+            <a:endParaRPr lang="en-SG" sz="800" dirty="0"/>
+          </a:p>
+        </p:txBody>
+      </p:sp>
+      <p:grpSp>
+        <p:nvGrpSpPr>
+          <p:cNvPr id="73" name="Group 72"/>
+          <p:cNvGrpSpPr/>
+          <p:nvPr/>
+        </p:nvGrpSpPr>
+        <p:grpSpPr>
+          <a:xfrm>
+            <a:off x="1002575" y="1231726"/>
+            <a:ext cx="838200" cy="838200"/>
+            <a:chOff x="375266" y="5397326"/>
+            <a:chExt cx="838200" cy="838200"/>
+          </a:xfrm>
+        </p:grpSpPr>
+        <p:sp>
+          <p:nvSpPr>
+            <p:cNvPr id="74" name="Rectangle 73"/>
+            <p:cNvSpPr/>
+            <p:nvPr/>
+          </p:nvSpPr>
+          <p:spPr>
+            <a:xfrm>
+              <a:off x="375266" y="5397326"/>
+              <a:ext cx="838200" cy="838200"/>
+            </a:xfrm>
+            <a:prstGeom prst="rect">
+              <a:avLst/>
+            </a:prstGeom>
+            <a:noFill/>
+            <a:ln>
+              <a:noFill/>
+            </a:ln>
+          </p:spPr>
+          <p:style>
+            <a:lnRef idx="2">
+              <a:schemeClr val="accent1">
+                <a:shade val="50000"/>
+              </a:schemeClr>
+            </a:lnRef>
+            <a:fillRef idx="1">
+              <a:schemeClr val="accent1"/>
+            </a:fillRef>
+            <a:effectRef idx="0">
+              <a:schemeClr val="accent1"/>
+            </a:effectRef>
+            <a:fontRef idx="minor">
+              <a:schemeClr val="lt1"/>
+            </a:fontRef>
+          </p:style>
+          <p:txBody>
+            <a:bodyPr rtlCol="0" anchor="ctr"/>
+            <a:lstStyle/>
+            <a:p>
+              <a:pPr algn="ctr"/>
+              <a:endParaRPr lang="en-SG"/>
+            </a:p>
+          </p:txBody>
+        </p:sp>
+        <p:sp>
+          <p:nvSpPr>
+            <p:cNvPr id="75" name="Rectangle 4"/>
+            <p:cNvSpPr/>
+            <p:nvPr/>
+          </p:nvSpPr>
+          <p:spPr>
+            <a:xfrm rot="16200000">
+              <a:off x="444221" y="5470529"/>
+              <a:ext cx="700291" cy="690781"/>
+            </a:xfrm>
+            <a:custGeom>
+              <a:avLst/>
+              <a:gdLst/>
+              <a:ahLst/>
+              <a:cxnLst/>
+              <a:rect l="l" t="t" r="r" b="b"/>
+              <a:pathLst>
+                <a:path w="1752603" h="1752600">
+                  <a:moveTo>
+                    <a:pt x="533400" y="0"/>
+                  </a:moveTo>
+                  <a:lnTo>
+                    <a:pt x="533403" y="0"/>
+                  </a:lnTo>
+                  <a:lnTo>
+                    <a:pt x="1066800" y="0"/>
+                  </a:lnTo>
+                  <a:lnTo>
+                    <a:pt x="1752603" y="0"/>
+                  </a:lnTo>
+                  <a:lnTo>
+                    <a:pt x="1752603" y="1752600"/>
+                  </a:lnTo>
+                  <a:lnTo>
+                    <a:pt x="1219203" y="1752600"/>
+                  </a:lnTo>
+                  <a:lnTo>
+                    <a:pt x="533403" y="1752600"/>
+                  </a:lnTo>
+                  <a:lnTo>
+                    <a:pt x="3" y="1752600"/>
+                  </a:lnTo>
+                  <a:lnTo>
+                    <a:pt x="3" y="533430"/>
+                  </a:lnTo>
+                  <a:cubicBezTo>
+                    <a:pt x="0" y="533420"/>
+                    <a:pt x="0" y="533410"/>
+                    <a:pt x="0" y="533400"/>
+                  </a:cubicBezTo>
+                  <a:cubicBezTo>
+                    <a:pt x="0" y="238811"/>
+                    <a:pt x="238811" y="0"/>
+                    <a:pt x="533400" y="0"/>
+                  </a:cubicBezTo>
+                  <a:close/>
+                </a:path>
+              </a:pathLst>
+            </a:custGeom>
+            <a:noFill/>
+            <a:ln w="76200" cmpd="sng">
+              <a:solidFill>
+                <a:srgbClr val="0070C0"/>
+              </a:solidFill>
+              <a:miter lim="800000"/>
+            </a:ln>
+          </p:spPr>
+          <p:style>
+            <a:lnRef idx="2">
+              <a:schemeClr val="accent1">
+                <a:shade val="50000"/>
+              </a:schemeClr>
+            </a:lnRef>
+            <a:fillRef idx="1">
+              <a:schemeClr val="accent1"/>
+            </a:fillRef>
+            <a:effectRef idx="0">
+              <a:schemeClr val="accent1"/>
+            </a:effectRef>
+            <a:fontRef idx="minor">
+              <a:schemeClr val="lt1"/>
+            </a:fontRef>
+          </p:style>
+          <p:txBody>
+            <a:bodyPr rtlCol="0" anchor="ctr"/>
+            <a:lstStyle/>
+            <a:p>
+              <a:pPr algn="ctr"/>
+              <a:endParaRPr lang="en-US"/>
+            </a:p>
+          </p:txBody>
+        </p:sp>
+      </p:grpSp>
+      <p:sp>
+        <p:nvSpPr>
+          <p:cNvPr id="88" name="Rectangle 87"/>
+          <p:cNvSpPr/>
+          <p:nvPr/>
+        </p:nvSpPr>
+        <p:spPr>
+          <a:xfrm>
+            <a:off x="2555150" y="1739324"/>
+            <a:ext cx="838200" cy="838200"/>
+          </a:xfrm>
+          <a:prstGeom prst="rect">
+            <a:avLst/>
+          </a:prstGeom>
+          <a:noFill/>
+          <a:ln>
+            <a:noFill/>
+          </a:ln>
+        </p:spPr>
+        <p:style>
+          <a:lnRef idx="2">
+            <a:schemeClr val="accent1">
+              <a:shade val="50000"/>
+            </a:schemeClr>
+          </a:lnRef>
+          <a:fillRef idx="1">
+            <a:schemeClr val="accent1"/>
+          </a:fillRef>
+          <a:effectRef idx="0">
+            <a:schemeClr val="accent1"/>
+          </a:effectRef>
+          <a:fontRef idx="minor">
+            <a:schemeClr val="lt1"/>
+          </a:fontRef>
+        </p:style>
+        <p:txBody>
+          <a:bodyPr rtlCol="0" anchor="ctr"/>
+          <a:lstStyle/>
+          <a:p>
+            <a:pPr algn="ctr"/>
+            <a:endParaRPr lang="en-SG"/>
+          </a:p>
+        </p:txBody>
+      </p:sp>
+      <p:sp>
+        <p:nvSpPr>
+          <p:cNvPr id="104" name="[TextBox 40]"/>
+          <p:cNvSpPr txBox="1"/>
+          <p:nvPr/>
+        </p:nvSpPr>
+        <p:spPr>
+          <a:xfrm>
+            <a:off x="2177509" y="3620323"/>
+            <a:ext cx="1039803" cy="430887"/>
+          </a:xfrm>
+          <a:prstGeom prst="rect">
+            <a:avLst/>
+          </a:prstGeom>
+          <a:noFill/>
+        </p:spPr>
+        <p:txBody>
+          <a:bodyPr wrap="square" rtlCol="0">
+            <a:spAutoFit/>
+          </a:bodyPr>
+          <a:lstStyle/>
+          <a:p>
+            <a:pPr algn="ctr"/>
+            <a:r>
+              <a:rPr lang="en-US" sz="1100" dirty="0" smtClean="0"/>
+              <a:t>Make transparent</a:t>
+            </a:r>
+          </a:p>
+        </p:txBody>
+      </p:sp>
+      <p:grpSp>
+        <p:nvGrpSpPr>
+          <p:cNvPr id="6" name="Group 5"/>
+          <p:cNvGrpSpPr/>
+          <p:nvPr/>
+        </p:nvGrpSpPr>
+        <p:grpSpPr>
+          <a:xfrm rot="19309737">
+            <a:off x="1055944" y="1716648"/>
+            <a:ext cx="451729" cy="125057"/>
+            <a:chOff x="4341446" y="3824908"/>
+            <a:chExt cx="580645" cy="91227"/>
+          </a:xfrm>
+        </p:grpSpPr>
+        <p:sp>
+          <p:nvSpPr>
+            <p:cNvPr id="5" name="Rectangle 4"/>
+            <p:cNvSpPr/>
+            <p:nvPr/>
+          </p:nvSpPr>
+          <p:spPr>
+            <a:xfrm>
+              <a:off x="4341446" y="3824908"/>
+              <a:ext cx="387077" cy="91062"/>
+            </a:xfrm>
+            <a:prstGeom prst="rect">
+              <a:avLst/>
+            </a:prstGeom>
+            <a:solidFill>
+              <a:srgbClr val="0070C0"/>
+            </a:solidFill>
+            <a:ln>
+              <a:noFill/>
+            </a:ln>
+          </p:spPr>
+          <p:style>
+            <a:lnRef idx="2">
+              <a:schemeClr val="accent1">
+                <a:shade val="50000"/>
+              </a:schemeClr>
+            </a:lnRef>
+            <a:fillRef idx="1">
+              <a:schemeClr val="accent1"/>
+            </a:fillRef>
+            <a:effectRef idx="0">
+              <a:schemeClr val="accent1"/>
+            </a:effectRef>
+            <a:fontRef idx="minor">
+              <a:schemeClr val="lt1"/>
+            </a:fontRef>
+          </p:style>
+          <p:txBody>
+            <a:bodyPr rtlCol="0" anchor="ctr"/>
+            <a:lstStyle/>
+            <a:p>
+              <a:pPr algn="ctr"/>
+              <a:endParaRPr lang="en-US"/>
+            </a:p>
+          </p:txBody>
+        </p:sp>
+        <p:sp>
+          <p:nvSpPr>
+            <p:cNvPr id="25" name="Rectangle 24"/>
+            <p:cNvSpPr/>
+            <p:nvPr/>
+          </p:nvSpPr>
+          <p:spPr>
+            <a:xfrm>
+              <a:off x="4771683" y="3825073"/>
+              <a:ext cx="150408" cy="91062"/>
+            </a:xfrm>
+            <a:prstGeom prst="rect">
+              <a:avLst/>
+            </a:prstGeom>
+            <a:solidFill>
+              <a:srgbClr val="0070C0"/>
+            </a:solidFill>
+            <a:ln>
+              <a:noFill/>
+            </a:ln>
+          </p:spPr>
+          <p:style>
+            <a:lnRef idx="2">
+              <a:schemeClr val="accent1">
+                <a:shade val="50000"/>
+              </a:schemeClr>
+            </a:lnRef>
+            <a:fillRef idx="1">
+              <a:schemeClr val="accent1"/>
+            </a:fillRef>
+            <a:effectRef idx="0">
+              <a:schemeClr val="accent1"/>
+            </a:effectRef>
+            <a:fontRef idx="minor">
+              <a:schemeClr val="lt1"/>
+            </a:fontRef>
+          </p:style>
+          <p:txBody>
+            <a:bodyPr rtlCol="0" anchor="ctr"/>
+            <a:lstStyle/>
+            <a:p>
+              <a:pPr algn="ctr"/>
+              <a:endParaRPr lang="en-US"/>
+            </a:p>
+          </p:txBody>
+        </p:sp>
+      </p:grpSp>
+      <p:sp>
+        <p:nvSpPr>
+          <p:cNvPr id="36" name="5-Point Star 35"/>
+          <p:cNvSpPr/>
+          <p:nvPr/>
+        </p:nvSpPr>
+        <p:spPr>
+          <a:xfrm>
+            <a:off x="1214564" y="1400625"/>
+            <a:ext cx="161813" cy="163340"/>
+          </a:xfrm>
+          <a:prstGeom prst="star5">
+            <a:avLst/>
+          </a:prstGeom>
+          <a:solidFill>
+            <a:schemeClr val="accent6">
+              <a:lumMod val="75000"/>
+            </a:schemeClr>
+          </a:solidFill>
+          <a:ln>
+            <a:noFill/>
+          </a:ln>
+        </p:spPr>
+        <p:style>
+          <a:lnRef idx="2">
+            <a:schemeClr val="accent1">
+              <a:shade val="50000"/>
+            </a:schemeClr>
+          </a:lnRef>
+          <a:fillRef idx="1">
+            <a:schemeClr val="accent1"/>
+          </a:fillRef>
+          <a:effectRef idx="0">
+            <a:schemeClr val="accent1"/>
+          </a:effectRef>
+          <a:fontRef idx="minor">
+            <a:schemeClr val="lt1"/>
+          </a:fontRef>
+        </p:style>
+        <p:txBody>
+          <a:bodyPr rtlCol="0" anchor="ctr"/>
+          <a:lstStyle/>
+          <a:p>
+            <a:pPr algn="ctr"/>
+            <a:endParaRPr lang="en-US"/>
+          </a:p>
+        </p:txBody>
+      </p:sp>
+      <p:sp>
+        <p:nvSpPr>
+          <p:cNvPr id="63" name="5-Point Star 62"/>
+          <p:cNvSpPr/>
+          <p:nvPr/>
+        </p:nvSpPr>
+        <p:spPr>
+          <a:xfrm>
+            <a:off x="1497932" y="1697507"/>
+            <a:ext cx="161813" cy="163340"/>
+          </a:xfrm>
+          <a:prstGeom prst="star5">
+            <a:avLst/>
+          </a:prstGeom>
+          <a:solidFill>
+            <a:schemeClr val="accent6">
+              <a:lumMod val="75000"/>
+            </a:schemeClr>
+          </a:solidFill>
+          <a:ln>
+            <a:noFill/>
+          </a:ln>
+        </p:spPr>
+        <p:style>
+          <a:lnRef idx="2">
+            <a:schemeClr val="accent1">
+              <a:shade val="50000"/>
+            </a:schemeClr>
+          </a:lnRef>
+          <a:fillRef idx="1">
+            <a:schemeClr val="accent1"/>
+          </a:fillRef>
+          <a:effectRef idx="0">
+            <a:schemeClr val="accent1"/>
+          </a:effectRef>
+          <a:fontRef idx="minor">
+            <a:schemeClr val="lt1"/>
+          </a:fontRef>
+        </p:style>
+        <p:txBody>
+          <a:bodyPr rtlCol="0" anchor="ctr"/>
+          <a:lstStyle/>
+          <a:p>
+            <a:pPr algn="ctr"/>
+            <a:endParaRPr lang="en-US"/>
+          </a:p>
+        </p:txBody>
+      </p:sp>
+      <p:sp>
+        <p:nvSpPr>
+          <p:cNvPr id="64" name="5-Point Star 63"/>
+          <p:cNvSpPr/>
+          <p:nvPr/>
+        </p:nvSpPr>
+        <p:spPr>
+          <a:xfrm>
+            <a:off x="1487436" y="1427269"/>
+            <a:ext cx="161813" cy="163340"/>
+          </a:xfrm>
+          <a:prstGeom prst="star5">
+            <a:avLst/>
+          </a:prstGeom>
+          <a:solidFill>
+            <a:schemeClr val="accent6">
+              <a:lumMod val="75000"/>
+            </a:schemeClr>
+          </a:solidFill>
+          <a:ln>
+            <a:noFill/>
+          </a:ln>
+        </p:spPr>
+        <p:style>
+          <a:lnRef idx="2">
+            <a:schemeClr val="accent1">
+              <a:shade val="50000"/>
+            </a:schemeClr>
+          </a:lnRef>
+          <a:fillRef idx="1">
+            <a:schemeClr val="accent1"/>
+          </a:fillRef>
+          <a:effectRef idx="0">
+            <a:schemeClr val="accent1"/>
+          </a:effectRef>
+          <a:fontRef idx="minor">
+            <a:schemeClr val="lt1"/>
+          </a:fontRef>
+        </p:style>
+        <p:txBody>
+          <a:bodyPr rtlCol="0" anchor="ctr"/>
+          <a:lstStyle/>
+          <a:p>
+            <a:pPr algn="ctr"/>
+            <a:endParaRPr lang="en-US"/>
+          </a:p>
+        </p:txBody>
+      </p:sp>
+      <p:grpSp>
+        <p:nvGrpSpPr>
+          <p:cNvPr id="13" name="Group 12"/>
+          <p:cNvGrpSpPr/>
+          <p:nvPr/>
+        </p:nvGrpSpPr>
+        <p:grpSpPr>
+          <a:xfrm>
+            <a:off x="2441649" y="2903641"/>
+            <a:ext cx="420624" cy="420624"/>
+            <a:chOff x="2441649" y="2903641"/>
+            <a:chExt cx="420624" cy="420624"/>
+          </a:xfrm>
+        </p:grpSpPr>
+        <p:sp>
+          <p:nvSpPr>
+            <p:cNvPr id="94" name="Rectangle 93"/>
+            <p:cNvSpPr/>
+            <p:nvPr/>
+          </p:nvSpPr>
+          <p:spPr>
+            <a:xfrm>
+              <a:off x="2441649" y="2903641"/>
+              <a:ext cx="420624" cy="420624"/>
+            </a:xfrm>
+            <a:prstGeom prst="rect">
+              <a:avLst/>
+            </a:prstGeom>
+            <a:noFill/>
+            <a:ln>
+              <a:noFill/>
+            </a:ln>
+          </p:spPr>
+          <p:style>
+            <a:lnRef idx="2">
+              <a:schemeClr val="accent1">
+                <a:shade val="50000"/>
+              </a:schemeClr>
+            </a:lnRef>
+            <a:fillRef idx="1">
+              <a:schemeClr val="accent1"/>
+            </a:fillRef>
+            <a:effectRef idx="0">
+              <a:schemeClr val="accent1"/>
+            </a:effectRef>
+            <a:fontRef idx="minor">
+              <a:schemeClr val="lt1"/>
+            </a:fontRef>
+          </p:style>
+          <p:txBody>
+            <a:bodyPr rtlCol="0" anchor="ctr"/>
+            <a:lstStyle/>
+            <a:p>
+              <a:pPr algn="ctr"/>
+              <a:endParaRPr lang="en-US"/>
+            </a:p>
+          </p:txBody>
+        </p:sp>
+        <p:sp>
+          <p:nvSpPr>
+            <p:cNvPr id="103" name="Flowchart: Connector 102"/>
+            <p:cNvSpPr/>
+            <p:nvPr/>
+          </p:nvSpPr>
+          <p:spPr>
+            <a:xfrm>
+              <a:off x="2580713" y="3048048"/>
+              <a:ext cx="247269" cy="245460"/>
+            </a:xfrm>
+            <a:prstGeom prst="flowChartConnector">
+              <a:avLst/>
+            </a:prstGeom>
+            <a:solidFill>
+              <a:schemeClr val="bg1"/>
+            </a:solidFill>
+            <a:ln w="57150">
+              <a:solidFill>
+                <a:srgbClr val="0070C0"/>
+              </a:solidFill>
+            </a:ln>
+            <a:effectLst/>
+          </p:spPr>
+          <p:style>
+            <a:lnRef idx="2">
+              <a:schemeClr val="accent1">
+                <a:shade val="50000"/>
+              </a:schemeClr>
+            </a:lnRef>
+            <a:fillRef idx="1">
+              <a:schemeClr val="accent1"/>
+            </a:fillRef>
+            <a:effectRef idx="0">
+              <a:schemeClr val="accent1"/>
+            </a:effectRef>
+            <a:fontRef idx="minor">
+              <a:schemeClr val="lt1"/>
+            </a:fontRef>
+          </p:style>
+          <p:txBody>
+            <a:bodyPr rtlCol="0" anchor="ctr"/>
+            <a:lstStyle/>
+            <a:p>
+              <a:pPr algn="ctr"/>
+              <a:endParaRPr lang="en-SG"/>
+            </a:p>
+          </p:txBody>
+        </p:sp>
+        <p:sp>
+          <p:nvSpPr>
+            <p:cNvPr id="99" name="Rectangle 98"/>
+            <p:cNvSpPr>
+              <a:spLocks noChangeAspect="1"/>
+            </p:cNvSpPr>
+            <p:nvPr/>
+          </p:nvSpPr>
+          <p:spPr>
+            <a:xfrm flipH="1">
+              <a:off x="2445459" y="2907861"/>
+              <a:ext cx="310670" cy="294714"/>
+            </a:xfrm>
+            <a:prstGeom prst="rect">
+              <a:avLst/>
+            </a:prstGeom>
+            <a:solidFill>
+              <a:srgbClr val="0070C0">
+                <a:alpha val="64000"/>
+              </a:srgbClr>
+            </a:solidFill>
+            <a:ln>
+              <a:noFill/>
+            </a:ln>
+          </p:spPr>
+          <p:style>
+            <a:lnRef idx="2">
+              <a:schemeClr val="accent1">
+                <a:shade val="50000"/>
+              </a:schemeClr>
+            </a:lnRef>
+            <a:fillRef idx="1">
+              <a:schemeClr val="accent1"/>
+            </a:fillRef>
+            <a:effectRef idx="0">
+              <a:schemeClr val="accent1"/>
+            </a:effectRef>
+            <a:fontRef idx="minor">
+              <a:schemeClr val="lt1"/>
+            </a:fontRef>
+          </p:style>
+          <p:txBody>
+            <a:bodyPr rtlCol="0" anchor="ctr"/>
+            <a:lstStyle/>
+            <a:p>
+              <a:pPr algn="ctr"/>
+              <a:endParaRPr lang="en-US"/>
+            </a:p>
+          </p:txBody>
+        </p:sp>
+      </p:grpSp>
+      <p:grpSp>
+        <p:nvGrpSpPr>
+          <p:cNvPr id="8" name="Group 7"/>
+          <p:cNvGrpSpPr/>
+          <p:nvPr/>
+        </p:nvGrpSpPr>
+        <p:grpSpPr>
+          <a:xfrm>
+            <a:off x="3998986" y="2939525"/>
+            <a:ext cx="420624" cy="420624"/>
+            <a:chOff x="3998986" y="2939525"/>
+            <a:chExt cx="420624" cy="420624"/>
+          </a:xfrm>
+        </p:grpSpPr>
+        <p:sp>
+          <p:nvSpPr>
+            <p:cNvPr id="7" name="Rectangle 6"/>
+            <p:cNvSpPr/>
+            <p:nvPr/>
+          </p:nvSpPr>
+          <p:spPr>
+            <a:xfrm>
+              <a:off x="3998986" y="2939525"/>
+              <a:ext cx="420624" cy="420624"/>
+            </a:xfrm>
+            <a:prstGeom prst="rect">
+              <a:avLst/>
+            </a:prstGeom>
+            <a:noFill/>
+            <a:ln>
+              <a:noFill/>
+            </a:ln>
+          </p:spPr>
+          <p:style>
+            <a:lnRef idx="2">
+              <a:schemeClr val="accent1">
+                <a:shade val="50000"/>
+              </a:schemeClr>
+            </a:lnRef>
+            <a:fillRef idx="1">
+              <a:schemeClr val="accent1"/>
+            </a:fillRef>
+            <a:effectRef idx="0">
+              <a:schemeClr val="accent1"/>
+            </a:effectRef>
+            <a:fontRef idx="minor">
+              <a:schemeClr val="lt1"/>
+            </a:fontRef>
+          </p:style>
+          <p:txBody>
+            <a:bodyPr rtlCol="0" anchor="ctr"/>
+            <a:lstStyle/>
+            <a:p>
+              <a:pPr algn="ctr"/>
+              <a:endParaRPr lang="en-US"/>
+            </a:p>
+          </p:txBody>
+        </p:sp>
+        <p:sp>
+          <p:nvSpPr>
+            <p:cNvPr id="33" name="Rounded Rectangle 32"/>
+            <p:cNvSpPr/>
+            <p:nvPr/>
+          </p:nvSpPr>
+          <p:spPr>
+            <a:xfrm rot="18417818">
+              <a:off x="4020366" y="3185982"/>
+              <a:ext cx="260626" cy="87067"/>
+            </a:xfrm>
+            <a:prstGeom prst="roundRect">
+              <a:avLst/>
+            </a:prstGeom>
+            <a:solidFill>
+              <a:srgbClr val="0070C0"/>
+            </a:solidFill>
+            <a:ln>
+              <a:noFill/>
+            </a:ln>
+          </p:spPr>
+          <p:style>
+            <a:lnRef idx="2">
+              <a:schemeClr val="accent1">
+                <a:shade val="50000"/>
+              </a:schemeClr>
+            </a:lnRef>
+            <a:fillRef idx="1">
+              <a:schemeClr val="accent1"/>
+            </a:fillRef>
+            <a:effectRef idx="0">
+              <a:schemeClr val="accent1"/>
+            </a:effectRef>
+            <a:fontRef idx="minor">
+              <a:schemeClr val="lt1"/>
+            </a:fontRef>
+          </p:style>
+          <p:txBody>
+            <a:bodyPr rtlCol="0" anchor="ctr"/>
+            <a:lstStyle/>
+            <a:p>
+              <a:pPr algn="ctr"/>
+              <a:endParaRPr lang="en-US"/>
+            </a:p>
+          </p:txBody>
+        </p:sp>
+        <p:sp>
+          <p:nvSpPr>
+            <p:cNvPr id="30" name="Flowchart: Connector 29"/>
+            <p:cNvSpPr/>
+            <p:nvPr/>
+          </p:nvSpPr>
+          <p:spPr>
+            <a:xfrm>
+              <a:off x="4077940" y="2976524"/>
+              <a:ext cx="292608" cy="290313"/>
+            </a:xfrm>
+            <a:prstGeom prst="flowChartConnector">
+              <a:avLst/>
+            </a:prstGeom>
+            <a:solidFill>
+              <a:schemeClr val="bg1"/>
+            </a:solidFill>
+            <a:ln w="57150">
+              <a:solidFill>
+                <a:srgbClr val="0070C0"/>
+              </a:solidFill>
+            </a:ln>
+            <a:effectLst/>
+          </p:spPr>
+          <p:style>
+            <a:lnRef idx="2">
+              <a:schemeClr val="accent1">
+                <a:shade val="50000"/>
+              </a:schemeClr>
+            </a:lnRef>
+            <a:fillRef idx="1">
+              <a:schemeClr val="accent1"/>
+            </a:fillRef>
+            <a:effectRef idx="0">
+              <a:schemeClr val="accent1"/>
+            </a:effectRef>
+            <a:fontRef idx="minor">
+              <a:schemeClr val="lt1"/>
+            </a:fontRef>
+          </p:style>
+          <p:txBody>
+            <a:bodyPr rtlCol="0" anchor="ctr"/>
+            <a:lstStyle/>
+            <a:p>
+              <a:pPr algn="ctr"/>
+              <a:endParaRPr lang="en-SG"/>
+            </a:p>
+          </p:txBody>
+        </p:sp>
+      </p:grpSp>
+      <p:sp>
+        <p:nvSpPr>
+          <p:cNvPr id="38" name="[TextBox 40]"/>
+          <p:cNvSpPr txBox="1"/>
+          <p:nvPr/>
+        </p:nvSpPr>
+        <p:spPr>
+          <a:xfrm>
+            <a:off x="3704342" y="3620322"/>
+            <a:ext cx="1039803" cy="261610"/>
+          </a:xfrm>
+          <a:prstGeom prst="rect">
+            <a:avLst/>
+          </a:prstGeom>
+          <a:noFill/>
+        </p:spPr>
+        <p:txBody>
+          <a:bodyPr wrap="square" rtlCol="0">
+            <a:spAutoFit/>
+          </a:bodyPr>
+          <a:lstStyle/>
+          <a:p>
+            <a:pPr algn="ctr"/>
+            <a:r>
+              <a:rPr lang="en-US" sz="1100" dirty="0" smtClean="0"/>
+              <a:t>Magnify</a:t>
+            </a:r>
+          </a:p>
+        </p:txBody>
+      </p:sp>
+      <p:sp>
+        <p:nvSpPr>
+          <p:cNvPr id="43" name="[TextBox 40]"/>
+          <p:cNvSpPr txBox="1"/>
+          <p:nvPr/>
+        </p:nvSpPr>
+        <p:spPr>
+          <a:xfrm>
+            <a:off x="5067476" y="3679410"/>
+            <a:ext cx="1039803" cy="430887"/>
+          </a:xfrm>
+          <a:prstGeom prst="rect">
+            <a:avLst/>
+          </a:prstGeom>
+          <a:noFill/>
+        </p:spPr>
+        <p:txBody>
+          <a:bodyPr wrap="square" rtlCol="0">
+            <a:spAutoFit/>
+          </a:bodyPr>
+          <a:lstStyle/>
+          <a:p>
+            <a:pPr algn="ctr"/>
+            <a:r>
+              <a:rPr lang="en-US" sz="1100" dirty="0" smtClean="0"/>
+              <a:t>recolor remainder</a:t>
+            </a:r>
+            <a:endParaRPr lang="en-US" sz="1100" dirty="0" smtClean="0"/>
+          </a:p>
+        </p:txBody>
+      </p:sp>
+      <p:sp>
+        <p:nvSpPr>
+          <p:cNvPr id="55" name="Rectangle 54"/>
+          <p:cNvSpPr/>
+          <p:nvPr/>
+        </p:nvSpPr>
+        <p:spPr>
+          <a:xfrm>
+            <a:off x="6543220" y="3032114"/>
+            <a:ext cx="420624" cy="420624"/>
+          </a:xfrm>
+          <a:prstGeom prst="rect">
+            <a:avLst/>
+          </a:prstGeom>
+          <a:noFill/>
+          <a:ln>
+            <a:noFill/>
+          </a:ln>
+        </p:spPr>
+        <p:style>
+          <a:lnRef idx="2">
+            <a:schemeClr val="accent1">
+              <a:shade val="50000"/>
+            </a:schemeClr>
+          </a:lnRef>
+          <a:fillRef idx="1">
+            <a:schemeClr val="accent1"/>
+          </a:fillRef>
+          <a:effectRef idx="0">
+            <a:schemeClr val="accent1"/>
+          </a:effectRef>
+          <a:fontRef idx="minor">
+            <a:schemeClr val="lt1"/>
+          </a:fontRef>
+        </p:style>
+        <p:txBody>
+          <a:bodyPr rtlCol="0" anchor="ctr"/>
+          <a:lstStyle/>
+          <a:p>
+            <a:pPr algn="ctr"/>
+            <a:endParaRPr lang="en-US"/>
+          </a:p>
+        </p:txBody>
+      </p:sp>
+      <p:sp>
+        <p:nvSpPr>
+          <p:cNvPr id="56" name="[TextBox 40]"/>
+          <p:cNvSpPr txBox="1"/>
+          <p:nvPr/>
+        </p:nvSpPr>
+        <p:spPr>
+          <a:xfrm>
+            <a:off x="6248576" y="3715451"/>
+            <a:ext cx="1039803" cy="261610"/>
+          </a:xfrm>
+          <a:prstGeom prst="rect">
+            <a:avLst/>
+          </a:prstGeom>
+          <a:noFill/>
+        </p:spPr>
+        <p:txBody>
+          <a:bodyPr wrap="square" rtlCol="0">
+            <a:spAutoFit/>
+          </a:bodyPr>
+          <a:lstStyle/>
+          <a:p>
+            <a:pPr algn="ctr"/>
+            <a:r>
+              <a:rPr lang="en-US" sz="1100" dirty="0" smtClean="0"/>
+              <a:t>Blur remainder</a:t>
+            </a:r>
+            <a:endParaRPr lang="en-US" sz="1100" dirty="0" smtClean="0"/>
+          </a:p>
+        </p:txBody>
+      </p:sp>
+      <p:grpSp>
+        <p:nvGrpSpPr>
+          <p:cNvPr id="11" name="Group 10"/>
+          <p:cNvGrpSpPr/>
+          <p:nvPr/>
+        </p:nvGrpSpPr>
+        <p:grpSpPr>
+          <a:xfrm>
+            <a:off x="5362120" y="2996073"/>
+            <a:ext cx="420624" cy="420624"/>
+            <a:chOff x="5362120" y="2996073"/>
+            <a:chExt cx="420624" cy="420624"/>
+          </a:xfrm>
+        </p:grpSpPr>
+        <p:sp>
+          <p:nvSpPr>
+            <p:cNvPr id="40" name="Rectangle 39"/>
+            <p:cNvSpPr/>
+            <p:nvPr/>
+          </p:nvSpPr>
+          <p:spPr>
+            <a:xfrm>
+              <a:off x="5362120" y="2996073"/>
+              <a:ext cx="420624" cy="420624"/>
+            </a:xfrm>
+            <a:prstGeom prst="rect">
+              <a:avLst/>
+            </a:prstGeom>
+            <a:noFill/>
+            <a:ln>
+              <a:noFill/>
+            </a:ln>
+          </p:spPr>
+          <p:style>
+            <a:lnRef idx="2">
+              <a:schemeClr val="accent1">
+                <a:shade val="50000"/>
+              </a:schemeClr>
+            </a:lnRef>
+            <a:fillRef idx="1">
+              <a:schemeClr val="accent1"/>
+            </a:fillRef>
+            <a:effectRef idx="0">
+              <a:schemeClr val="accent1"/>
+            </a:effectRef>
+            <a:fontRef idx="minor">
+              <a:schemeClr val="lt1"/>
+            </a:fontRef>
+          </p:style>
+          <p:txBody>
+            <a:bodyPr rtlCol="0" anchor="ctr"/>
+            <a:lstStyle/>
+            <a:p>
+              <a:pPr algn="ctr"/>
+              <a:endParaRPr lang="en-US"/>
+            </a:p>
+          </p:txBody>
+        </p:sp>
+        <p:sp>
+          <p:nvSpPr>
+            <p:cNvPr id="9" name="Rectangle 8"/>
+            <p:cNvSpPr/>
+            <p:nvPr/>
+          </p:nvSpPr>
+          <p:spPr>
+            <a:xfrm>
+              <a:off x="5366691" y="2998110"/>
+              <a:ext cx="108342" cy="118491"/>
+            </a:xfrm>
+            <a:prstGeom prst="rect">
+              <a:avLst/>
+            </a:prstGeom>
+            <a:solidFill>
+              <a:schemeClr val="bg1">
+                <a:lumMod val="50000"/>
+              </a:schemeClr>
+            </a:solidFill>
+            <a:ln>
+              <a:noFill/>
+            </a:ln>
+          </p:spPr>
+          <p:style>
+            <a:lnRef idx="2">
+              <a:schemeClr val="accent1">
+                <a:shade val="50000"/>
+              </a:schemeClr>
+            </a:lnRef>
+            <a:fillRef idx="1">
+              <a:schemeClr val="accent1"/>
+            </a:fillRef>
+            <a:effectRef idx="0">
+              <a:schemeClr val="accent1"/>
+            </a:effectRef>
+            <a:fontRef idx="minor">
+              <a:schemeClr val="lt1"/>
+            </a:fontRef>
+          </p:style>
+          <p:txBody>
+            <a:bodyPr rtlCol="0" anchor="ctr"/>
+            <a:lstStyle/>
+            <a:p>
+              <a:pPr algn="ctr"/>
+              <a:endParaRPr lang="en-US"/>
+            </a:p>
+          </p:txBody>
+        </p:sp>
+        <p:sp>
+          <p:nvSpPr>
+            <p:cNvPr id="45" name="Rectangle 44"/>
+            <p:cNvSpPr/>
+            <p:nvPr/>
+          </p:nvSpPr>
+          <p:spPr>
+            <a:xfrm>
+              <a:off x="5568135" y="2998110"/>
+              <a:ext cx="108342" cy="118491"/>
+            </a:xfrm>
+            <a:prstGeom prst="rect">
+              <a:avLst/>
+            </a:prstGeom>
+            <a:solidFill>
+              <a:schemeClr val="bg1">
+                <a:lumMod val="50000"/>
+              </a:schemeClr>
+            </a:solidFill>
+            <a:ln>
+              <a:noFill/>
+            </a:ln>
+          </p:spPr>
+          <p:style>
+            <a:lnRef idx="2">
+              <a:schemeClr val="accent1">
+                <a:shade val="50000"/>
+              </a:schemeClr>
+            </a:lnRef>
+            <a:fillRef idx="1">
+              <a:schemeClr val="accent1"/>
+            </a:fillRef>
+            <a:effectRef idx="0">
+              <a:schemeClr val="accent1"/>
+            </a:effectRef>
+            <a:fontRef idx="minor">
+              <a:schemeClr val="lt1"/>
+            </a:fontRef>
+          </p:style>
+          <p:txBody>
+            <a:bodyPr rtlCol="0" anchor="ctr"/>
+            <a:lstStyle/>
+            <a:p>
+              <a:pPr algn="ctr"/>
+              <a:endParaRPr lang="en-US"/>
+            </a:p>
+          </p:txBody>
+        </p:sp>
+        <p:sp>
+          <p:nvSpPr>
+            <p:cNvPr id="48" name="Rectangle 47"/>
+            <p:cNvSpPr/>
+            <p:nvPr/>
+          </p:nvSpPr>
+          <p:spPr>
+            <a:xfrm>
+              <a:off x="5468366" y="3114469"/>
+              <a:ext cx="108342" cy="118491"/>
+            </a:xfrm>
+            <a:prstGeom prst="rect">
+              <a:avLst/>
+            </a:prstGeom>
+            <a:solidFill>
+              <a:schemeClr val="bg1">
+                <a:lumMod val="50000"/>
+              </a:schemeClr>
+            </a:solidFill>
+            <a:ln>
+              <a:noFill/>
+            </a:ln>
+          </p:spPr>
+          <p:style>
+            <a:lnRef idx="2">
+              <a:schemeClr val="accent1">
+                <a:shade val="50000"/>
+              </a:schemeClr>
+            </a:lnRef>
+            <a:fillRef idx="1">
+              <a:schemeClr val="accent1"/>
+            </a:fillRef>
+            <a:effectRef idx="0">
+              <a:schemeClr val="accent1"/>
+            </a:effectRef>
+            <a:fontRef idx="minor">
+              <a:schemeClr val="lt1"/>
+            </a:fontRef>
+          </p:style>
+          <p:txBody>
+            <a:bodyPr rtlCol="0" anchor="ctr"/>
+            <a:lstStyle/>
+            <a:p>
+              <a:pPr algn="ctr"/>
+              <a:endParaRPr lang="en-US"/>
+            </a:p>
+          </p:txBody>
+        </p:sp>
+        <p:sp>
+          <p:nvSpPr>
+            <p:cNvPr id="50" name="Rectangle 49"/>
+            <p:cNvSpPr/>
+            <p:nvPr/>
+          </p:nvSpPr>
+          <p:spPr>
+            <a:xfrm>
+              <a:off x="5669811" y="3114469"/>
+              <a:ext cx="108342" cy="118491"/>
+            </a:xfrm>
+            <a:prstGeom prst="rect">
+              <a:avLst/>
+            </a:prstGeom>
+            <a:solidFill>
+              <a:schemeClr val="bg1">
+                <a:lumMod val="50000"/>
+              </a:schemeClr>
+            </a:solidFill>
+            <a:ln>
+              <a:noFill/>
+            </a:ln>
+          </p:spPr>
+          <p:style>
+            <a:lnRef idx="2">
+              <a:schemeClr val="accent1">
+                <a:shade val="50000"/>
+              </a:schemeClr>
+            </a:lnRef>
+            <a:fillRef idx="1">
+              <a:schemeClr val="accent1"/>
+            </a:fillRef>
+            <a:effectRef idx="0">
+              <a:schemeClr val="accent1"/>
+            </a:effectRef>
+            <a:fontRef idx="minor">
+              <a:schemeClr val="lt1"/>
+            </a:fontRef>
+          </p:style>
+          <p:txBody>
+            <a:bodyPr rtlCol="0" anchor="ctr"/>
+            <a:lstStyle/>
+            <a:p>
+              <a:pPr algn="ctr"/>
+              <a:endParaRPr lang="en-US"/>
+            </a:p>
+          </p:txBody>
+        </p:sp>
+        <p:sp>
+          <p:nvSpPr>
+            <p:cNvPr id="51" name="Rectangle 50"/>
+            <p:cNvSpPr/>
+            <p:nvPr/>
+          </p:nvSpPr>
+          <p:spPr>
+            <a:xfrm>
+              <a:off x="5366691" y="3229515"/>
+              <a:ext cx="108342" cy="118491"/>
+            </a:xfrm>
+            <a:prstGeom prst="rect">
+              <a:avLst/>
+            </a:prstGeom>
+            <a:solidFill>
+              <a:schemeClr val="bg1">
+                <a:lumMod val="50000"/>
+              </a:schemeClr>
+            </a:solidFill>
+            <a:ln>
+              <a:noFill/>
+            </a:ln>
+          </p:spPr>
+          <p:style>
+            <a:lnRef idx="2">
+              <a:schemeClr val="accent1">
+                <a:shade val="50000"/>
+              </a:schemeClr>
+            </a:lnRef>
+            <a:fillRef idx="1">
+              <a:schemeClr val="accent1"/>
+            </a:fillRef>
+            <a:effectRef idx="0">
+              <a:schemeClr val="accent1"/>
+            </a:effectRef>
+            <a:fontRef idx="minor">
+              <a:schemeClr val="lt1"/>
+            </a:fontRef>
+          </p:style>
+          <p:txBody>
+            <a:bodyPr rtlCol="0" anchor="ctr"/>
+            <a:lstStyle/>
+            <a:p>
+              <a:pPr algn="ctr"/>
+              <a:endParaRPr lang="en-US"/>
+            </a:p>
+          </p:txBody>
+        </p:sp>
+        <p:sp>
+          <p:nvSpPr>
+            <p:cNvPr id="52" name="Rectangle 51"/>
+            <p:cNvSpPr/>
+            <p:nvPr/>
+          </p:nvSpPr>
+          <p:spPr>
+            <a:xfrm>
+              <a:off x="5568135" y="3229515"/>
+              <a:ext cx="108342" cy="118491"/>
+            </a:xfrm>
+            <a:prstGeom prst="rect">
+              <a:avLst/>
+            </a:prstGeom>
+            <a:solidFill>
+              <a:schemeClr val="bg1">
+                <a:lumMod val="50000"/>
+              </a:schemeClr>
+            </a:solidFill>
+            <a:ln>
+              <a:noFill/>
+            </a:ln>
+          </p:spPr>
+          <p:style>
+            <a:lnRef idx="2">
+              <a:schemeClr val="accent1">
+                <a:shade val="50000"/>
+              </a:schemeClr>
+            </a:lnRef>
+            <a:fillRef idx="1">
+              <a:schemeClr val="accent1"/>
+            </a:fillRef>
+            <a:effectRef idx="0">
+              <a:schemeClr val="accent1"/>
+            </a:effectRef>
+            <a:fontRef idx="minor">
+              <a:schemeClr val="lt1"/>
+            </a:fontRef>
+          </p:style>
+          <p:txBody>
+            <a:bodyPr rtlCol="0" anchor="ctr"/>
+            <a:lstStyle/>
+            <a:p>
+              <a:pPr algn="ctr"/>
+              <a:endParaRPr lang="en-US"/>
+            </a:p>
+          </p:txBody>
+        </p:sp>
+        <p:sp>
+          <p:nvSpPr>
+            <p:cNvPr id="53" name="Rectangle 52"/>
+            <p:cNvSpPr/>
+            <p:nvPr/>
+          </p:nvSpPr>
+          <p:spPr>
+            <a:xfrm>
+              <a:off x="5468366" y="3345874"/>
+              <a:ext cx="108342" cy="70823"/>
+            </a:xfrm>
+            <a:prstGeom prst="rect">
+              <a:avLst/>
+            </a:prstGeom>
+            <a:solidFill>
+              <a:schemeClr val="bg1">
+                <a:lumMod val="50000"/>
+              </a:schemeClr>
+            </a:solidFill>
+            <a:ln>
+              <a:noFill/>
+            </a:ln>
+          </p:spPr>
+          <p:style>
+            <a:lnRef idx="2">
+              <a:schemeClr val="accent1">
+                <a:shade val="50000"/>
+              </a:schemeClr>
+            </a:lnRef>
+            <a:fillRef idx="1">
+              <a:schemeClr val="accent1"/>
+            </a:fillRef>
+            <a:effectRef idx="0">
+              <a:schemeClr val="accent1"/>
+            </a:effectRef>
+            <a:fontRef idx="minor">
+              <a:schemeClr val="lt1"/>
+            </a:fontRef>
+          </p:style>
+          <p:txBody>
+            <a:bodyPr rtlCol="0" anchor="ctr"/>
+            <a:lstStyle/>
+            <a:p>
+              <a:pPr algn="ctr"/>
+              <a:endParaRPr lang="en-US"/>
+            </a:p>
+          </p:txBody>
+        </p:sp>
+        <p:sp>
+          <p:nvSpPr>
+            <p:cNvPr id="54" name="Rectangle 53"/>
+            <p:cNvSpPr/>
+            <p:nvPr/>
+          </p:nvSpPr>
+          <p:spPr>
+            <a:xfrm>
+              <a:off x="5669811" y="3345874"/>
+              <a:ext cx="108342" cy="70823"/>
+            </a:xfrm>
+            <a:prstGeom prst="rect">
+              <a:avLst/>
+            </a:prstGeom>
+            <a:solidFill>
+              <a:schemeClr val="bg1">
+                <a:lumMod val="50000"/>
+              </a:schemeClr>
+            </a:solidFill>
+            <a:ln>
+              <a:noFill/>
+            </a:ln>
+          </p:spPr>
+          <p:style>
+            <a:lnRef idx="2">
+              <a:schemeClr val="accent1">
+                <a:shade val="50000"/>
+              </a:schemeClr>
+            </a:lnRef>
+            <a:fillRef idx="1">
+              <a:schemeClr val="accent1"/>
+            </a:fillRef>
+            <a:effectRef idx="0">
+              <a:schemeClr val="accent1"/>
+            </a:effectRef>
+            <a:fontRef idx="minor">
+              <a:schemeClr val="lt1"/>
+            </a:fontRef>
+          </p:style>
+          <p:txBody>
+            <a:bodyPr rtlCol="0" anchor="ctr"/>
+            <a:lstStyle/>
+            <a:p>
+              <a:pPr algn="ctr"/>
+              <a:endParaRPr lang="en-US"/>
+            </a:p>
+          </p:txBody>
+        </p:sp>
+        <p:sp>
+          <p:nvSpPr>
+            <p:cNvPr id="10" name="Isosceles Triangle 9"/>
+            <p:cNvSpPr/>
+            <p:nvPr/>
+          </p:nvSpPr>
+          <p:spPr>
+            <a:xfrm>
+              <a:off x="5425148" y="3057355"/>
+              <a:ext cx="303120" cy="236323"/>
+            </a:xfrm>
+            <a:prstGeom prst="triangle">
+              <a:avLst/>
+            </a:prstGeom>
+            <a:solidFill>
+              <a:srgbClr val="0070C0"/>
+            </a:solidFill>
+            <a:ln w="9525">
+              <a:solidFill>
+                <a:schemeClr val="bg1"/>
+              </a:solidFill>
+            </a:ln>
+          </p:spPr>
+          <p:style>
+            <a:lnRef idx="2">
+              <a:schemeClr val="accent1">
+                <a:shade val="50000"/>
+              </a:schemeClr>
+            </a:lnRef>
+            <a:fillRef idx="1">
+              <a:schemeClr val="accent1"/>
+            </a:fillRef>
+            <a:effectRef idx="0">
+              <a:schemeClr val="accent1"/>
+            </a:effectRef>
+            <a:fontRef idx="minor">
+              <a:schemeClr val="lt1"/>
+            </a:fontRef>
+          </p:style>
+          <p:txBody>
+            <a:bodyPr rtlCol="0" anchor="ctr"/>
+            <a:lstStyle/>
+            <a:p>
+              <a:pPr algn="ctr"/>
+              <a:endParaRPr lang="en-US"/>
+            </a:p>
+          </p:txBody>
+        </p:sp>
+      </p:grpSp>
+      <p:pic>
+        <p:nvPicPr>
+          <p:cNvPr id="1026" name="Picture 2"/>
+          <p:cNvPicPr>
+            <a:picLocks noChangeAspect="1" noChangeArrowheads="1"/>
+          </p:cNvPicPr>
+          <p:nvPr/>
+        </p:nvPicPr>
+        <p:blipFill>
+          <a:blip r:embed="rId2">
+            <a:extLst>
+              <a:ext uri="{BEBA8EAE-BF5A-486C-A8C5-ECC9F3942E4B}">
+                <a14:imgProps xmlns:a14="http://schemas.microsoft.com/office/drawing/2010/main">
+                  <a14:imgLayer r:embed="rId3">
+                    <a14:imgEffect>
+                      <a14:artisticBlur/>
+                    </a14:imgEffect>
+                  </a14:imgLayer>
+                </a14:imgProps>
+              </a:ext>
+              <a:ext uri="{28A0092B-C50C-407E-A947-70E740481C1C}">
+                <a14:useLocalDpi xmlns:a14="http://schemas.microsoft.com/office/drawing/2010/main" val="0"/>
+              </a:ext>
+            </a:extLst>
+          </a:blip>
+          <a:srcRect/>
+          <a:stretch>
+            <a:fillRect/>
+          </a:stretch>
+        </p:blipFill>
+        <p:spPr bwMode="auto">
+          <a:xfrm>
+            <a:off x="6546354" y="3036276"/>
+            <a:ext cx="414337" cy="414337"/>
+          </a:xfrm>
+          <a:prstGeom prst="rect">
+            <a:avLst/>
+          </a:prstGeom>
+          <a:noFill/>
+          <a:ln>
+            <a:noFill/>
+          </a:ln>
+          <a:effectLst/>
+          <a:extLst>
+            <a:ext uri="{909E8E84-426E-40DD-AFC4-6F175D3DCCD1}">
+              <a14:hiddenFill xmlns:a14="http://schemas.microsoft.com/office/drawing/2010/main">
+                <a:solidFill>
+                  <a:schemeClr val="accent1"/>
+                </a:solidFill>
+              </a14:hiddenFill>
+            </a:ext>
+            <a:ext uri="{91240B29-F687-4F45-9708-019B960494DF}">
+              <a14:hiddenLine xmlns:a14="http://schemas.microsoft.com/office/drawing/2010/main" w="9525">
+                <a:solidFill>
+                  <a:schemeClr val="tx1"/>
+                </a:solidFill>
+                <a:miter lim="800000"/>
+                <a:headEnd/>
+                <a:tailEnd/>
+              </a14:hiddenLine>
+            </a:ext>
+            <a:ext uri="{AF507438-7753-43E0-B8FC-AC1667EBCBE1}">
+              <a14:hiddenEffects xmlns:a14="http://schemas.microsoft.com/office/drawing/2010/main">
+                <a:effectLst>
+                  <a:outerShdw dist="35921" dir="2700000" algn="ctr" rotWithShape="0">
+                    <a:schemeClr val="bg2"/>
+                  </a:outerShdw>
+                </a:effectLst>
+              </a14:hiddenEffects>
+            </a:ext>
+          </a:extLst>
+        </p:spPr>
+      </p:pic>
+      <p:sp>
+        <p:nvSpPr>
+          <p:cNvPr id="89" name="Isosceles Triangle 88"/>
+          <p:cNvSpPr/>
+          <p:nvPr/>
+        </p:nvSpPr>
+        <p:spPr>
+          <a:xfrm>
+            <a:off x="6616917" y="3109551"/>
+            <a:ext cx="303120" cy="236323"/>
+          </a:xfrm>
+          <a:prstGeom prst="triangle">
+            <a:avLst/>
+          </a:prstGeom>
+          <a:solidFill>
+            <a:schemeClr val="bg1"/>
+          </a:solidFill>
+          <a:ln w="9525">
+            <a:solidFill>
+              <a:srgbClr val="0070C0"/>
+            </a:solidFill>
+          </a:ln>
+        </p:spPr>
+        <p:style>
+          <a:lnRef idx="2">
+            <a:schemeClr val="accent1">
+              <a:shade val="50000"/>
+            </a:schemeClr>
+          </a:lnRef>
+          <a:fillRef idx="1">
+            <a:schemeClr val="accent1"/>
+          </a:fillRef>
+          <a:effectRef idx="0">
+            <a:schemeClr val="accent1"/>
+          </a:effectRef>
+          <a:fontRef idx="minor">
+            <a:schemeClr val="lt1"/>
+          </a:fontRef>
+        </p:style>
+        <p:txBody>
+          <a:bodyPr rtlCol="0" anchor="ctr"/>
+          <a:lstStyle/>
+          <a:p>
+            <a:pPr algn="ctr"/>
+            <a:endParaRPr lang="en-US"/>
+          </a:p>
+        </p:txBody>
+      </p:sp>
+    </p:spTree>
+    <p:extLst>
+      <p:ext uri="{BB962C8B-B14F-4D97-AF65-F5344CB8AC3E}">
+        <p14:creationId xmlns:p14="http://schemas.microsoft.com/office/powerpoint/2010/main" val="3743516278"/>
+      </p:ext>
+    </p:extLst>
+  </p:cSld>
+  <p:clrMapOvr>
+    <a:masterClrMapping/>
+  </p:clrMapOvr>
+  <p:timing>
+    <p:tnLst>
+      <p:par>
+        <p:cTn id="1" dur="indefinite" restart="never" nodeType="tmRoot"/>
+      </p:par>
+    </p:tnLst>
+  </p:timing>
+</p:sld>
+</file>
+
+<file path=ppt/slides/slide5.xml><?xml version="1.0" encoding="utf-8"?>
 <p:sld xmlns:a="http://schemas.openxmlformats.org/drawingml/2006/main" xmlns:r="http://schemas.openxmlformats.org/officeDocument/2006/relationships" xmlns:p="http://schemas.openxmlformats.org/presentationml/2006/main">
   <p:cSld>
     <p:bg>

</xml_diff>

<commit_message>
Added agenda lab icons
</commit_message>
<xml_diff>
--- a/doc/Icons.pptx
+++ b/doc/Icons.pptx
@@ -5,32 +5,37 @@
     <p:sldMasterId id="2147483648" r:id="rId1"/>
   </p:sldMasterIdLst>
   <p:notesMasterIdLst>
-    <p:notesMasterId r:id="rId7"/>
+    <p:notesMasterId r:id="rId8"/>
   </p:notesMasterIdLst>
   <p:sldIdLst>
     <p:sldId id="264" r:id="rId2"/>
     <p:sldId id="266" r:id="rId3"/>
     <p:sldId id="267" r:id="rId4"/>
     <p:sldId id="268" r:id="rId5"/>
-    <p:sldId id="265" r:id="rId6"/>
+    <p:sldId id="269" r:id="rId6"/>
+    <p:sldId id="265" r:id="rId7"/>
   </p:sldIdLst>
   <p:sldSz cx="9144000" cy="6858000" type="screen4x3"/>
   <p:notesSz cx="6858000" cy="9144000"/>
   <p:embeddedFontLst>
     <p:embeddedFont>
+      <p:font typeface="Arial Black" panose="020B0A04020102020204" pitchFamily="34" charset="0"/>
+      <p:bold r:id="rId9"/>
+    </p:embeddedFont>
+    <p:embeddedFont>
       <p:font typeface="Calibri" panose="020F0502020204030204" pitchFamily="34" charset="0"/>
-      <p:regular r:id="rId8"/>
-      <p:bold r:id="rId9"/>
-      <p:italic r:id="rId10"/>
-      <p:boldItalic r:id="rId11"/>
+      <p:regular r:id="rId10"/>
+      <p:bold r:id="rId11"/>
+      <p:italic r:id="rId12"/>
+      <p:boldItalic r:id="rId13"/>
     </p:embeddedFont>
     <p:embeddedFont>
       <p:font typeface="Rockwell Extra Bold" panose="02060903040505020403" pitchFamily="18" charset="0"/>
-      <p:bold r:id="rId12"/>
+      <p:bold r:id="rId14"/>
     </p:embeddedFont>
     <p:embeddedFont>
-      <p:font typeface="Arial Black" panose="020B0A04020102020204" pitchFamily="34" charset="0"/>
-      <p:bold r:id="rId13"/>
+      <p:font typeface="Gill Sans Ultra Bold" panose="020B0A02020104020203" pitchFamily="34" charset="0"/>
+      <p:regular r:id="rId15"/>
     </p:embeddedFont>
   </p:embeddedFontLst>
   <p:defaultTextStyle>
@@ -213,7 +218,7 @@
           <a:p>
             <a:fld id="{6699ACB9-486C-4D62-A3A7-AF98E13EFDA3}" type="datetimeFigureOut">
               <a:rPr lang="en-US" smtClean="0"/>
-              <a:t>11/1/2014</a:t>
+              <a:t>2/17/2015</a:t>
             </a:fld>
             <a:endParaRPr lang="en-US"/>
           </a:p>
@@ -546,7 +551,7 @@
           <a:p>
             <a:fld id="{8EC77E60-82A0-4F8A-A861-433B3189FA8C}" type="slidenum">
               <a:rPr lang="en-US" smtClean="0"/>
-              <a:t>5</a:t>
+              <a:t>6</a:t>
             </a:fld>
             <a:endParaRPr lang="en-US"/>
           </a:p>
@@ -747,7 +752,7 @@
             <a:fld id="{1D8BD707-D9CF-40AE-B4C6-C98DA3205C09}" type="datetimeFigureOut">
               <a:rPr lang="en-US" smtClean="0"/>
               <a:pPr/>
-              <a:t>11/1/2014</a:t>
+              <a:t>2/17/2015</a:t>
             </a:fld>
             <a:endParaRPr lang="en-US"/>
           </a:p>
@@ -914,7 +919,7 @@
             <a:fld id="{1D8BD707-D9CF-40AE-B4C6-C98DA3205C09}" type="datetimeFigureOut">
               <a:rPr lang="en-US" smtClean="0"/>
               <a:pPr/>
-              <a:t>11/1/2014</a:t>
+              <a:t>2/17/2015</a:t>
             </a:fld>
             <a:endParaRPr lang="en-US"/>
           </a:p>
@@ -1091,7 +1096,7 @@
             <a:fld id="{1D8BD707-D9CF-40AE-B4C6-C98DA3205C09}" type="datetimeFigureOut">
               <a:rPr lang="en-US" smtClean="0"/>
               <a:pPr/>
-              <a:t>11/1/2014</a:t>
+              <a:t>2/17/2015</a:t>
             </a:fld>
             <a:endParaRPr lang="en-US"/>
           </a:p>
@@ -1258,7 +1263,7 @@
             <a:fld id="{1D8BD707-D9CF-40AE-B4C6-C98DA3205C09}" type="datetimeFigureOut">
               <a:rPr lang="en-US" smtClean="0"/>
               <a:pPr/>
-              <a:t>11/1/2014</a:t>
+              <a:t>2/17/2015</a:t>
             </a:fld>
             <a:endParaRPr lang="en-US"/>
           </a:p>
@@ -1501,7 +1506,7 @@
             <a:fld id="{1D8BD707-D9CF-40AE-B4C6-C98DA3205C09}" type="datetimeFigureOut">
               <a:rPr lang="en-US" smtClean="0"/>
               <a:pPr/>
-              <a:t>11/1/2014</a:t>
+              <a:t>2/17/2015</a:t>
             </a:fld>
             <a:endParaRPr lang="en-US"/>
           </a:p>
@@ -1786,7 +1791,7 @@
             <a:fld id="{1D8BD707-D9CF-40AE-B4C6-C98DA3205C09}" type="datetimeFigureOut">
               <a:rPr lang="en-US" smtClean="0"/>
               <a:pPr/>
-              <a:t>11/1/2014</a:t>
+              <a:t>2/17/2015</a:t>
             </a:fld>
             <a:endParaRPr lang="en-US"/>
           </a:p>
@@ -2205,7 +2210,7 @@
             <a:fld id="{1D8BD707-D9CF-40AE-B4C6-C98DA3205C09}" type="datetimeFigureOut">
               <a:rPr lang="en-US" smtClean="0"/>
               <a:pPr/>
-              <a:t>11/1/2014</a:t>
+              <a:t>2/17/2015</a:t>
             </a:fld>
             <a:endParaRPr lang="en-US"/>
           </a:p>
@@ -2320,7 +2325,7 @@
             <a:fld id="{1D8BD707-D9CF-40AE-B4C6-C98DA3205C09}" type="datetimeFigureOut">
               <a:rPr lang="en-US" smtClean="0"/>
               <a:pPr/>
-              <a:t>11/1/2014</a:t>
+              <a:t>2/17/2015</a:t>
             </a:fld>
             <a:endParaRPr lang="en-US"/>
           </a:p>
@@ -2412,7 +2417,7 @@
             <a:fld id="{1D8BD707-D9CF-40AE-B4C6-C98DA3205C09}" type="datetimeFigureOut">
               <a:rPr lang="en-US" smtClean="0"/>
               <a:pPr/>
-              <a:t>11/1/2014</a:t>
+              <a:t>2/17/2015</a:t>
             </a:fld>
             <a:endParaRPr lang="en-US"/>
           </a:p>
@@ -2686,7 +2691,7 @@
             <a:fld id="{1D8BD707-D9CF-40AE-B4C6-C98DA3205C09}" type="datetimeFigureOut">
               <a:rPr lang="en-US" smtClean="0"/>
               <a:pPr/>
-              <a:t>11/1/2014</a:t>
+              <a:t>2/17/2015</a:t>
             </a:fld>
             <a:endParaRPr lang="en-US"/>
           </a:p>
@@ -2936,7 +2941,7 @@
             <a:fld id="{1D8BD707-D9CF-40AE-B4C6-C98DA3205C09}" type="datetimeFigureOut">
               <a:rPr lang="en-US" smtClean="0"/>
               <a:pPr/>
-              <a:t>11/1/2014</a:t>
+              <a:t>2/17/2015</a:t>
             </a:fld>
             <a:endParaRPr lang="en-US"/>
           </a:p>
@@ -3146,7 +3151,7 @@
             <a:fld id="{1D8BD707-D9CF-40AE-B4C6-C98DA3205C09}" type="datetimeFigureOut">
               <a:rPr lang="en-US" smtClean="0"/>
               <a:pPr/>
-              <a:t>11/1/2014</a:t>
+              <a:t>2/17/2015</a:t>
             </a:fld>
             <a:endParaRPr lang="en-US"/>
           </a:p>
@@ -16724,7 +16729,6 @@
               <a:rPr lang="en-US" sz="1100" dirty="0" smtClean="0"/>
               <a:t>recolor remainder</a:t>
             </a:r>
-            <a:endParaRPr lang="en-US" sz="1100" dirty="0" smtClean="0"/>
           </a:p>
         </p:txBody>
       </p:sp>
@@ -16799,7 +16803,6 @@
               <a:rPr lang="en-US" sz="1100" dirty="0" smtClean="0"/>
               <a:t>Blur remainder</a:t>
             </a:r>
-            <a:endParaRPr lang="en-US" sz="1100" dirty="0" smtClean="0"/>
           </a:p>
         </p:txBody>
       </p:sp>
@@ -17436,6 +17439,2754 @@
 </file>
 
 <file path=ppt/slides/slide5.xml><?xml version="1.0" encoding="utf-8"?>
+<p:sld xmlns:a="http://schemas.openxmlformats.org/drawingml/2006/main" xmlns:r="http://schemas.openxmlformats.org/officeDocument/2006/relationships" xmlns:p="http://schemas.openxmlformats.org/presentationml/2006/main">
+  <p:cSld>
+    <p:bg>
+      <p:bgPr>
+        <a:solidFill>
+          <a:schemeClr val="bg1">
+            <a:lumMod val="95000"/>
+          </a:schemeClr>
+        </a:solidFill>
+        <a:effectLst/>
+      </p:bgPr>
+    </p:bg>
+    <p:spTree>
+      <p:nvGrpSpPr>
+        <p:cNvPr id="1" name=""/>
+        <p:cNvGrpSpPr/>
+        <p:nvPr/>
+      </p:nvGrpSpPr>
+      <p:grpSpPr>
+        <a:xfrm>
+          <a:off x="0" y="0"/>
+          <a:ext cx="0" cy="0"/>
+          <a:chOff x="0" y="0"/>
+          <a:chExt cx="0" cy="0"/>
+        </a:xfrm>
+      </p:grpSpPr>
+      <p:sp>
+        <p:nvSpPr>
+          <p:cNvPr id="116" name="TextBox 115"/>
+          <p:cNvSpPr txBox="1"/>
+          <p:nvPr/>
+        </p:nvSpPr>
+        <p:spPr>
+          <a:xfrm>
+            <a:off x="276082" y="304800"/>
+            <a:ext cx="1938215" cy="369332"/>
+          </a:xfrm>
+          <a:prstGeom prst="rect">
+            <a:avLst/>
+          </a:prstGeom>
+          <a:noFill/>
+        </p:spPr>
+        <p:txBody>
+          <a:bodyPr wrap="square" rtlCol="0">
+            <a:spAutoFit/>
+          </a:bodyPr>
+          <a:lstStyle/>
+          <a:p>
+            <a:r>
+              <a:rPr lang="en-US" dirty="0" smtClean="0"/>
+              <a:t>Agenda </a:t>
+            </a:r>
+            <a:r>
+              <a:rPr lang="en-US" dirty="0" smtClean="0"/>
+              <a:t>Lab</a:t>
+            </a:r>
+            <a:endParaRPr lang="en-SG" dirty="0"/>
+          </a:p>
+        </p:txBody>
+      </p:sp>
+      <p:sp>
+        <p:nvSpPr>
+          <p:cNvPr id="72" name="TextBox 71"/>
+          <p:cNvSpPr txBox="1"/>
+          <p:nvPr/>
+        </p:nvSpPr>
+        <p:spPr>
+          <a:xfrm>
+            <a:off x="970623" y="2069926"/>
+            <a:ext cx="916799" cy="215444"/>
+          </a:xfrm>
+          <a:prstGeom prst="rect">
+            <a:avLst/>
+          </a:prstGeom>
+          <a:noFill/>
+        </p:spPr>
+        <p:txBody>
+          <a:bodyPr wrap="square" rtlCol="0">
+            <a:spAutoFit/>
+          </a:bodyPr>
+          <a:lstStyle/>
+          <a:p>
+            <a:pPr algn="ctr"/>
+            <a:r>
+              <a:rPr lang="en-US" sz="800" dirty="0" smtClean="0"/>
+              <a:t>Agenda </a:t>
+            </a:r>
+            <a:r>
+              <a:rPr lang="en-US" sz="800" dirty="0"/>
+              <a:t>L</a:t>
+            </a:r>
+            <a:r>
+              <a:rPr lang="en-US" sz="800" dirty="0" smtClean="0"/>
+              <a:t>ab</a:t>
+            </a:r>
+            <a:endParaRPr lang="en-SG" sz="800" dirty="0"/>
+          </a:p>
+        </p:txBody>
+      </p:sp>
+      <p:sp>
+        <p:nvSpPr>
+          <p:cNvPr id="88" name="Rectangle 87"/>
+          <p:cNvSpPr/>
+          <p:nvPr/>
+        </p:nvSpPr>
+        <p:spPr>
+          <a:xfrm>
+            <a:off x="2555150" y="1739324"/>
+            <a:ext cx="838200" cy="838200"/>
+          </a:xfrm>
+          <a:prstGeom prst="rect">
+            <a:avLst/>
+          </a:prstGeom>
+          <a:noFill/>
+          <a:ln>
+            <a:noFill/>
+          </a:ln>
+        </p:spPr>
+        <p:style>
+          <a:lnRef idx="2">
+            <a:schemeClr val="accent1">
+              <a:shade val="50000"/>
+            </a:schemeClr>
+          </a:lnRef>
+          <a:fillRef idx="1">
+            <a:schemeClr val="accent1"/>
+          </a:fillRef>
+          <a:effectRef idx="0">
+            <a:schemeClr val="accent1"/>
+          </a:effectRef>
+          <a:fontRef idx="minor">
+            <a:schemeClr val="lt1"/>
+          </a:fontRef>
+        </p:style>
+        <p:txBody>
+          <a:bodyPr rtlCol="0" anchor="ctr"/>
+          <a:lstStyle/>
+          <a:p>
+            <a:pPr algn="ctr"/>
+            <a:endParaRPr lang="en-SG"/>
+          </a:p>
+        </p:txBody>
+      </p:sp>
+      <p:sp>
+        <p:nvSpPr>
+          <p:cNvPr id="104" name="[TextBox 40]"/>
+          <p:cNvSpPr txBox="1"/>
+          <p:nvPr/>
+        </p:nvSpPr>
+        <p:spPr>
+          <a:xfrm>
+            <a:off x="2177509" y="3620323"/>
+            <a:ext cx="1039803" cy="261610"/>
+          </a:xfrm>
+          <a:prstGeom prst="rect">
+            <a:avLst/>
+          </a:prstGeom>
+          <a:noFill/>
+        </p:spPr>
+        <p:txBody>
+          <a:bodyPr wrap="square" rtlCol="0">
+            <a:spAutoFit/>
+          </a:bodyPr>
+          <a:lstStyle/>
+          <a:p>
+            <a:pPr algn="ctr"/>
+            <a:r>
+              <a:rPr lang="en-US" sz="1100" dirty="0" smtClean="0"/>
+              <a:t>Text agenda</a:t>
+            </a:r>
+            <a:endParaRPr lang="en-US" sz="1100" dirty="0" smtClean="0"/>
+          </a:p>
+        </p:txBody>
+      </p:sp>
+      <p:sp>
+        <p:nvSpPr>
+          <p:cNvPr id="38" name="[TextBox 40]"/>
+          <p:cNvSpPr txBox="1"/>
+          <p:nvPr/>
+        </p:nvSpPr>
+        <p:spPr>
+          <a:xfrm>
+            <a:off x="3704342" y="3620322"/>
+            <a:ext cx="1039803" cy="261610"/>
+          </a:xfrm>
+          <a:prstGeom prst="rect">
+            <a:avLst/>
+          </a:prstGeom>
+          <a:noFill/>
+        </p:spPr>
+        <p:txBody>
+          <a:bodyPr wrap="square" rtlCol="0">
+            <a:spAutoFit/>
+          </a:bodyPr>
+          <a:lstStyle/>
+          <a:p>
+            <a:pPr algn="ctr"/>
+            <a:r>
+              <a:rPr lang="en-US" sz="1100" dirty="0" smtClean="0"/>
+              <a:t>Visual agenda </a:t>
+            </a:r>
+            <a:endParaRPr lang="en-US" sz="1100" dirty="0" smtClean="0"/>
+          </a:p>
+        </p:txBody>
+      </p:sp>
+      <p:sp>
+        <p:nvSpPr>
+          <p:cNvPr id="43" name="[TextBox 40]"/>
+          <p:cNvSpPr txBox="1"/>
+          <p:nvPr/>
+        </p:nvSpPr>
+        <p:spPr>
+          <a:xfrm>
+            <a:off x="5067475" y="3553489"/>
+            <a:ext cx="1039803" cy="430887"/>
+          </a:xfrm>
+          <a:prstGeom prst="rect">
+            <a:avLst/>
+          </a:prstGeom>
+          <a:noFill/>
+        </p:spPr>
+        <p:txBody>
+          <a:bodyPr wrap="square" rtlCol="0">
+            <a:spAutoFit/>
+          </a:bodyPr>
+          <a:lstStyle/>
+          <a:p>
+            <a:pPr algn="ctr"/>
+            <a:r>
+              <a:rPr lang="en-US" sz="1100" dirty="0" smtClean="0"/>
+              <a:t>Agenda sidebar</a:t>
+            </a:r>
+            <a:endParaRPr lang="en-US" sz="1100" dirty="0" smtClean="0"/>
+          </a:p>
+        </p:txBody>
+      </p:sp>
+      <p:grpSp>
+        <p:nvGrpSpPr>
+          <p:cNvPr id="18" name="Group 17"/>
+          <p:cNvGrpSpPr/>
+          <p:nvPr/>
+        </p:nvGrpSpPr>
+        <p:grpSpPr>
+          <a:xfrm>
+            <a:off x="7852524" y="674132"/>
+            <a:ext cx="364724" cy="291189"/>
+            <a:chOff x="2523142" y="1473476"/>
+            <a:chExt cx="364724" cy="291189"/>
+          </a:xfrm>
+        </p:grpSpPr>
+        <p:sp>
+          <p:nvSpPr>
+            <p:cNvPr id="49" name="Rectangle 48"/>
+            <p:cNvSpPr/>
+            <p:nvPr/>
+          </p:nvSpPr>
+          <p:spPr>
+            <a:xfrm>
+              <a:off x="2523142" y="1473476"/>
+              <a:ext cx="225360" cy="120669"/>
+            </a:xfrm>
+            <a:prstGeom prst="rect">
+              <a:avLst/>
+            </a:prstGeom>
+            <a:solidFill>
+              <a:schemeClr val="accent6">
+                <a:lumMod val="75000"/>
+              </a:schemeClr>
+            </a:solidFill>
+            <a:ln>
+              <a:noFill/>
+            </a:ln>
+          </p:spPr>
+          <p:style>
+            <a:lnRef idx="2">
+              <a:schemeClr val="accent1">
+                <a:shade val="50000"/>
+              </a:schemeClr>
+            </a:lnRef>
+            <a:fillRef idx="1">
+              <a:schemeClr val="accent1"/>
+            </a:fillRef>
+            <a:effectRef idx="0">
+              <a:schemeClr val="accent1"/>
+            </a:effectRef>
+            <a:fontRef idx="minor">
+              <a:schemeClr val="lt1"/>
+            </a:fontRef>
+          </p:style>
+          <p:txBody>
+            <a:bodyPr rtlCol="0" anchor="ctr"/>
+            <a:lstStyle/>
+            <a:p>
+              <a:pPr algn="ctr"/>
+              <a:endParaRPr lang="en-SG"/>
+            </a:p>
+          </p:txBody>
+        </p:sp>
+        <p:sp>
+          <p:nvSpPr>
+            <p:cNvPr id="57" name="Rectangle 56"/>
+            <p:cNvSpPr/>
+            <p:nvPr/>
+          </p:nvSpPr>
+          <p:spPr>
+            <a:xfrm>
+              <a:off x="2600794" y="1536986"/>
+              <a:ext cx="287072" cy="227679"/>
+            </a:xfrm>
+            <a:prstGeom prst="rect">
+              <a:avLst/>
+            </a:prstGeom>
+            <a:noFill/>
+            <a:ln>
+              <a:noFill/>
+            </a:ln>
+          </p:spPr>
+          <p:style>
+            <a:lnRef idx="2">
+              <a:schemeClr val="accent1">
+                <a:shade val="50000"/>
+              </a:schemeClr>
+            </a:lnRef>
+            <a:fillRef idx="1">
+              <a:schemeClr val="accent1"/>
+            </a:fillRef>
+            <a:effectRef idx="0">
+              <a:schemeClr val="accent1"/>
+            </a:effectRef>
+            <a:fontRef idx="minor">
+              <a:schemeClr val="lt1"/>
+            </a:fontRef>
+          </p:style>
+          <p:txBody>
+            <a:bodyPr rtlCol="0" anchor="ctr"/>
+            <a:lstStyle/>
+            <a:p>
+              <a:pPr algn="ctr"/>
+              <a:r>
+                <a:rPr lang="en-US" sz="6000" dirty="0" smtClean="0">
+                  <a:solidFill>
+                    <a:schemeClr val="accent6">
+                      <a:lumMod val="75000"/>
+                    </a:schemeClr>
+                  </a:solidFill>
+                  <a:latin typeface="Gill Sans Ultra Bold" panose="020B0A02020104020203" pitchFamily="34" charset="0"/>
+                </a:rPr>
+                <a:t>a</a:t>
+              </a:r>
+              <a:endParaRPr lang="en-SG" sz="6000" dirty="0">
+                <a:solidFill>
+                  <a:schemeClr val="accent6">
+                    <a:lumMod val="75000"/>
+                  </a:schemeClr>
+                </a:solidFill>
+                <a:latin typeface="Gill Sans Ultra Bold" panose="020B0A02020104020203" pitchFamily="34" charset="0"/>
+              </a:endParaRPr>
+            </a:p>
+          </p:txBody>
+        </p:sp>
+      </p:grpSp>
+      <p:grpSp>
+        <p:nvGrpSpPr>
+          <p:cNvPr id="17" name="Group 16"/>
+          <p:cNvGrpSpPr/>
+          <p:nvPr/>
+        </p:nvGrpSpPr>
+        <p:grpSpPr>
+          <a:xfrm>
+            <a:off x="1002575" y="1231726"/>
+            <a:ext cx="838200" cy="838200"/>
+            <a:chOff x="1002575" y="1231726"/>
+            <a:chExt cx="838200" cy="838200"/>
+          </a:xfrm>
+        </p:grpSpPr>
+        <p:grpSp>
+          <p:nvGrpSpPr>
+            <p:cNvPr id="73" name="Group 72"/>
+            <p:cNvGrpSpPr/>
+            <p:nvPr/>
+          </p:nvGrpSpPr>
+          <p:grpSpPr>
+            <a:xfrm>
+              <a:off x="1002575" y="1231726"/>
+              <a:ext cx="838200" cy="838200"/>
+              <a:chOff x="375266" y="5397326"/>
+              <a:chExt cx="838200" cy="838200"/>
+            </a:xfrm>
+          </p:grpSpPr>
+          <p:sp>
+            <p:nvSpPr>
+              <p:cNvPr id="74" name="Rectangle 73"/>
+              <p:cNvSpPr/>
+              <p:nvPr/>
+            </p:nvSpPr>
+            <p:spPr>
+              <a:xfrm>
+                <a:off x="375266" y="5397326"/>
+                <a:ext cx="838200" cy="838200"/>
+              </a:xfrm>
+              <a:prstGeom prst="rect">
+                <a:avLst/>
+              </a:prstGeom>
+              <a:noFill/>
+              <a:ln>
+                <a:noFill/>
+              </a:ln>
+            </p:spPr>
+            <p:style>
+              <a:lnRef idx="2">
+                <a:schemeClr val="accent1">
+                  <a:shade val="50000"/>
+                </a:schemeClr>
+              </a:lnRef>
+              <a:fillRef idx="1">
+                <a:schemeClr val="accent1"/>
+              </a:fillRef>
+              <a:effectRef idx="0">
+                <a:schemeClr val="accent1"/>
+              </a:effectRef>
+              <a:fontRef idx="minor">
+                <a:schemeClr val="lt1"/>
+              </a:fontRef>
+            </p:style>
+            <p:txBody>
+              <a:bodyPr rtlCol="0" anchor="ctr"/>
+              <a:lstStyle/>
+              <a:p>
+                <a:pPr algn="ctr"/>
+                <a:endParaRPr lang="en-SG"/>
+              </a:p>
+            </p:txBody>
+          </p:sp>
+          <p:sp>
+            <p:nvSpPr>
+              <p:cNvPr id="75" name="Rectangle 4"/>
+              <p:cNvSpPr/>
+              <p:nvPr/>
+            </p:nvSpPr>
+            <p:spPr>
+              <a:xfrm rot="16200000">
+                <a:off x="444221" y="5470529"/>
+                <a:ext cx="700291" cy="690781"/>
+              </a:xfrm>
+              <a:custGeom>
+                <a:avLst/>
+                <a:gdLst/>
+                <a:ahLst/>
+                <a:cxnLst/>
+                <a:rect l="l" t="t" r="r" b="b"/>
+                <a:pathLst>
+                  <a:path w="1752603" h="1752600">
+                    <a:moveTo>
+                      <a:pt x="533400" y="0"/>
+                    </a:moveTo>
+                    <a:lnTo>
+                      <a:pt x="533403" y="0"/>
+                    </a:lnTo>
+                    <a:lnTo>
+                      <a:pt x="1066800" y="0"/>
+                    </a:lnTo>
+                    <a:lnTo>
+                      <a:pt x="1752603" y="0"/>
+                    </a:lnTo>
+                    <a:lnTo>
+                      <a:pt x="1752603" y="1752600"/>
+                    </a:lnTo>
+                    <a:lnTo>
+                      <a:pt x="1219203" y="1752600"/>
+                    </a:lnTo>
+                    <a:lnTo>
+                      <a:pt x="533403" y="1752600"/>
+                    </a:lnTo>
+                    <a:lnTo>
+                      <a:pt x="3" y="1752600"/>
+                    </a:lnTo>
+                    <a:lnTo>
+                      <a:pt x="3" y="533430"/>
+                    </a:lnTo>
+                    <a:cubicBezTo>
+                      <a:pt x="0" y="533420"/>
+                      <a:pt x="0" y="533410"/>
+                      <a:pt x="0" y="533400"/>
+                    </a:cubicBezTo>
+                    <a:cubicBezTo>
+                      <a:pt x="0" y="238811"/>
+                      <a:pt x="238811" y="0"/>
+                      <a:pt x="533400" y="0"/>
+                    </a:cubicBezTo>
+                    <a:close/>
+                  </a:path>
+                </a:pathLst>
+              </a:custGeom>
+              <a:noFill/>
+              <a:ln w="76200" cmpd="sng">
+                <a:solidFill>
+                  <a:srgbClr val="0070C0"/>
+                </a:solidFill>
+                <a:miter lim="800000"/>
+              </a:ln>
+            </p:spPr>
+            <p:style>
+              <a:lnRef idx="2">
+                <a:schemeClr val="accent1">
+                  <a:shade val="50000"/>
+                </a:schemeClr>
+              </a:lnRef>
+              <a:fillRef idx="1">
+                <a:schemeClr val="accent1"/>
+              </a:fillRef>
+              <a:effectRef idx="0">
+                <a:schemeClr val="accent1"/>
+              </a:effectRef>
+              <a:fontRef idx="minor">
+                <a:schemeClr val="lt1"/>
+              </a:fontRef>
+            </p:style>
+            <p:txBody>
+              <a:bodyPr rtlCol="0" anchor="ctr"/>
+              <a:lstStyle/>
+              <a:p>
+                <a:pPr algn="ctr"/>
+                <a:endParaRPr lang="en-US"/>
+              </a:p>
+            </p:txBody>
+          </p:sp>
+        </p:grpSp>
+        <p:pic>
+          <p:nvPicPr>
+            <p:cNvPr id="1027" name="Picture 3"/>
+            <p:cNvPicPr>
+              <a:picLocks noChangeAspect="1" noChangeArrowheads="1"/>
+            </p:cNvPicPr>
+            <p:nvPr/>
+          </p:nvPicPr>
+          <p:blipFill rotWithShape="1">
+            <a:blip r:embed="rId2">
+              <a:extLst>
+                <a:ext uri="{28A0092B-C50C-407E-A947-70E740481C1C}">
+                  <a14:useLocalDpi xmlns:a14="http://schemas.microsoft.com/office/drawing/2010/main" val="0"/>
+                </a:ext>
+              </a:extLst>
+            </a:blip>
+            <a:srcRect l="32217" t="30045" r="31679" b="38469"/>
+            <a:stretch/>
+          </p:blipFill>
+          <p:spPr bwMode="auto">
+            <a:xfrm>
+              <a:off x="1157458" y="1398413"/>
+              <a:ext cx="528434" cy="504825"/>
+            </a:xfrm>
+            <a:prstGeom prst="rect">
+              <a:avLst/>
+            </a:prstGeom>
+            <a:noFill/>
+            <a:ln>
+              <a:noFill/>
+            </a:ln>
+            <a:effectLst/>
+            <a:extLst>
+              <a:ext uri="{909E8E84-426E-40DD-AFC4-6F175D3DCCD1}">
+                <a14:hiddenFill xmlns:a14="http://schemas.microsoft.com/office/drawing/2010/main">
+                  <a:solidFill>
+                    <a:schemeClr val="accent1"/>
+                  </a:solidFill>
+                </a14:hiddenFill>
+              </a:ext>
+              <a:ext uri="{91240B29-F687-4F45-9708-019B960494DF}">
+                <a14:hiddenLine xmlns:a14="http://schemas.microsoft.com/office/drawing/2010/main" w="9525">
+                  <a:solidFill>
+                    <a:schemeClr val="tx1"/>
+                  </a:solidFill>
+                  <a:miter lim="800000"/>
+                  <a:headEnd/>
+                  <a:tailEnd/>
+                </a14:hiddenLine>
+              </a:ext>
+              <a:ext uri="{AF507438-7753-43E0-B8FC-AC1667EBCBE1}">
+                <a14:hiddenEffects xmlns:a14="http://schemas.microsoft.com/office/drawing/2010/main">
+                  <a:effectLst>
+                    <a:outerShdw dist="35921" dir="2700000" algn="ctr" rotWithShape="0">
+                      <a:schemeClr val="bg2"/>
+                    </a:outerShdw>
+                  </a:effectLst>
+                </a14:hiddenEffects>
+              </a:ext>
+            </a:extLst>
+          </p:spPr>
+        </p:pic>
+      </p:grpSp>
+      <p:grpSp>
+        <p:nvGrpSpPr>
+          <p:cNvPr id="21" name="Group 20"/>
+          <p:cNvGrpSpPr/>
+          <p:nvPr/>
+        </p:nvGrpSpPr>
+        <p:grpSpPr>
+          <a:xfrm>
+            <a:off x="2393839" y="3153844"/>
+            <a:ext cx="420624" cy="420624"/>
+            <a:chOff x="2441649" y="2903641"/>
+            <a:chExt cx="420624" cy="420624"/>
+          </a:xfrm>
+        </p:grpSpPr>
+        <p:sp>
+          <p:nvSpPr>
+            <p:cNvPr id="94" name="Rectangle 93"/>
+            <p:cNvSpPr/>
+            <p:nvPr/>
+          </p:nvSpPr>
+          <p:spPr>
+            <a:xfrm>
+              <a:off x="2441649" y="2903641"/>
+              <a:ext cx="420624" cy="420624"/>
+            </a:xfrm>
+            <a:prstGeom prst="rect">
+              <a:avLst/>
+            </a:prstGeom>
+            <a:noFill/>
+            <a:ln>
+              <a:noFill/>
+            </a:ln>
+          </p:spPr>
+          <p:style>
+            <a:lnRef idx="2">
+              <a:schemeClr val="accent1">
+                <a:shade val="50000"/>
+              </a:schemeClr>
+            </a:lnRef>
+            <a:fillRef idx="1">
+              <a:schemeClr val="accent1"/>
+            </a:fillRef>
+            <a:effectRef idx="0">
+              <a:schemeClr val="accent1"/>
+            </a:effectRef>
+            <a:fontRef idx="minor">
+              <a:schemeClr val="lt1"/>
+            </a:fontRef>
+          </p:style>
+          <p:txBody>
+            <a:bodyPr rtlCol="0" anchor="ctr"/>
+            <a:lstStyle/>
+            <a:p>
+              <a:pPr algn="ctr"/>
+              <a:endParaRPr lang="en-US"/>
+            </a:p>
+          </p:txBody>
+        </p:sp>
+        <p:grpSp>
+          <p:nvGrpSpPr>
+            <p:cNvPr id="20" name="Group 19"/>
+            <p:cNvGrpSpPr/>
+            <p:nvPr/>
+          </p:nvGrpSpPr>
+          <p:grpSpPr>
+            <a:xfrm>
+              <a:off x="2493254" y="2956078"/>
+              <a:ext cx="317414" cy="77835"/>
+              <a:chOff x="4263822" y="872837"/>
+              <a:chExt cx="659160" cy="161636"/>
+            </a:xfrm>
+          </p:grpSpPr>
+          <p:sp>
+            <p:nvSpPr>
+              <p:cNvPr id="19" name="Rectangle 18"/>
+              <p:cNvSpPr/>
+              <p:nvPr/>
+            </p:nvSpPr>
+            <p:spPr>
+              <a:xfrm>
+                <a:off x="4263822" y="872837"/>
+                <a:ext cx="155788" cy="157018"/>
+              </a:xfrm>
+              <a:prstGeom prst="rect">
+                <a:avLst/>
+              </a:prstGeom>
+              <a:solidFill>
+                <a:srgbClr val="0070C0"/>
+              </a:solidFill>
+              <a:ln>
+                <a:noFill/>
+              </a:ln>
+            </p:spPr>
+            <p:style>
+              <a:lnRef idx="2">
+                <a:schemeClr val="accent1">
+                  <a:shade val="50000"/>
+                </a:schemeClr>
+              </a:lnRef>
+              <a:fillRef idx="1">
+                <a:schemeClr val="accent1"/>
+              </a:fillRef>
+              <a:effectRef idx="0">
+                <a:schemeClr val="accent1"/>
+              </a:effectRef>
+              <a:fontRef idx="minor">
+                <a:schemeClr val="lt1"/>
+              </a:fontRef>
+            </p:style>
+            <p:txBody>
+              <a:bodyPr rtlCol="0" anchor="ctr"/>
+              <a:lstStyle/>
+              <a:p>
+                <a:pPr algn="ctr"/>
+                <a:endParaRPr lang="en-SG"/>
+              </a:p>
+            </p:txBody>
+          </p:sp>
+          <p:sp>
+            <p:nvSpPr>
+              <p:cNvPr id="61" name="Rectangle 60"/>
+              <p:cNvSpPr/>
+              <p:nvPr/>
+            </p:nvSpPr>
+            <p:spPr>
+              <a:xfrm>
+                <a:off x="4494116" y="872837"/>
+                <a:ext cx="428866" cy="161636"/>
+              </a:xfrm>
+              <a:prstGeom prst="rect">
+                <a:avLst/>
+              </a:prstGeom>
+              <a:solidFill>
+                <a:srgbClr val="0070C0"/>
+              </a:solidFill>
+              <a:ln>
+                <a:noFill/>
+              </a:ln>
+            </p:spPr>
+            <p:style>
+              <a:lnRef idx="2">
+                <a:schemeClr val="accent1">
+                  <a:shade val="50000"/>
+                </a:schemeClr>
+              </a:lnRef>
+              <a:fillRef idx="1">
+                <a:schemeClr val="accent1"/>
+              </a:fillRef>
+              <a:effectRef idx="0">
+                <a:schemeClr val="accent1"/>
+              </a:effectRef>
+              <a:fontRef idx="minor">
+                <a:schemeClr val="lt1"/>
+              </a:fontRef>
+            </p:style>
+            <p:txBody>
+              <a:bodyPr rtlCol="0" anchor="ctr"/>
+              <a:lstStyle/>
+              <a:p>
+                <a:pPr algn="ctr"/>
+                <a:endParaRPr lang="en-SG"/>
+              </a:p>
+            </p:txBody>
+          </p:sp>
+        </p:grpSp>
+        <p:grpSp>
+          <p:nvGrpSpPr>
+            <p:cNvPr id="62" name="Group 61"/>
+            <p:cNvGrpSpPr/>
+            <p:nvPr/>
+          </p:nvGrpSpPr>
+          <p:grpSpPr>
+            <a:xfrm>
+              <a:off x="2493254" y="3080770"/>
+              <a:ext cx="317414" cy="77835"/>
+              <a:chOff x="4263822" y="872837"/>
+              <a:chExt cx="659160" cy="161636"/>
+            </a:xfrm>
+          </p:grpSpPr>
+          <p:sp>
+            <p:nvSpPr>
+              <p:cNvPr id="65" name="Rectangle 64"/>
+              <p:cNvSpPr/>
+              <p:nvPr/>
+            </p:nvSpPr>
+            <p:spPr>
+              <a:xfrm>
+                <a:off x="4263822" y="872837"/>
+                <a:ext cx="155788" cy="157018"/>
+              </a:xfrm>
+              <a:prstGeom prst="rect">
+                <a:avLst/>
+              </a:prstGeom>
+              <a:solidFill>
+                <a:srgbClr val="0070C0"/>
+              </a:solidFill>
+              <a:ln>
+                <a:noFill/>
+              </a:ln>
+            </p:spPr>
+            <p:style>
+              <a:lnRef idx="2">
+                <a:schemeClr val="accent1">
+                  <a:shade val="50000"/>
+                </a:schemeClr>
+              </a:lnRef>
+              <a:fillRef idx="1">
+                <a:schemeClr val="accent1"/>
+              </a:fillRef>
+              <a:effectRef idx="0">
+                <a:schemeClr val="accent1"/>
+              </a:effectRef>
+              <a:fontRef idx="minor">
+                <a:schemeClr val="lt1"/>
+              </a:fontRef>
+            </p:style>
+            <p:txBody>
+              <a:bodyPr rtlCol="0" anchor="ctr"/>
+              <a:lstStyle/>
+              <a:p>
+                <a:pPr algn="ctr"/>
+                <a:endParaRPr lang="en-SG"/>
+              </a:p>
+            </p:txBody>
+          </p:sp>
+          <p:sp>
+            <p:nvSpPr>
+              <p:cNvPr id="66" name="Rectangle 65"/>
+              <p:cNvSpPr/>
+              <p:nvPr/>
+            </p:nvSpPr>
+            <p:spPr>
+              <a:xfrm>
+                <a:off x="4494116" y="872837"/>
+                <a:ext cx="428866" cy="161636"/>
+              </a:xfrm>
+              <a:prstGeom prst="rect">
+                <a:avLst/>
+              </a:prstGeom>
+              <a:solidFill>
+                <a:srgbClr val="0070C0"/>
+              </a:solidFill>
+              <a:ln>
+                <a:noFill/>
+              </a:ln>
+            </p:spPr>
+            <p:style>
+              <a:lnRef idx="2">
+                <a:schemeClr val="accent1">
+                  <a:shade val="50000"/>
+                </a:schemeClr>
+              </a:lnRef>
+              <a:fillRef idx="1">
+                <a:schemeClr val="accent1"/>
+              </a:fillRef>
+              <a:effectRef idx="0">
+                <a:schemeClr val="accent1"/>
+              </a:effectRef>
+              <a:fontRef idx="minor">
+                <a:schemeClr val="lt1"/>
+              </a:fontRef>
+            </p:style>
+            <p:txBody>
+              <a:bodyPr rtlCol="0" anchor="ctr"/>
+              <a:lstStyle/>
+              <a:p>
+                <a:pPr algn="ctr"/>
+                <a:endParaRPr lang="en-SG"/>
+              </a:p>
+            </p:txBody>
+          </p:sp>
+        </p:grpSp>
+        <p:grpSp>
+          <p:nvGrpSpPr>
+            <p:cNvPr id="67" name="Group 66"/>
+            <p:cNvGrpSpPr/>
+            <p:nvPr/>
+          </p:nvGrpSpPr>
+          <p:grpSpPr>
+            <a:xfrm>
+              <a:off x="2493254" y="3205462"/>
+              <a:ext cx="317414" cy="77835"/>
+              <a:chOff x="4263822" y="872837"/>
+              <a:chExt cx="659160" cy="161636"/>
+            </a:xfrm>
+          </p:grpSpPr>
+          <p:sp>
+            <p:nvSpPr>
+              <p:cNvPr id="68" name="Rectangle 67"/>
+              <p:cNvSpPr/>
+              <p:nvPr/>
+            </p:nvSpPr>
+            <p:spPr>
+              <a:xfrm>
+                <a:off x="4263822" y="872837"/>
+                <a:ext cx="155788" cy="157018"/>
+              </a:xfrm>
+              <a:prstGeom prst="rect">
+                <a:avLst/>
+              </a:prstGeom>
+              <a:solidFill>
+                <a:srgbClr val="0070C0"/>
+              </a:solidFill>
+              <a:ln>
+                <a:noFill/>
+              </a:ln>
+            </p:spPr>
+            <p:style>
+              <a:lnRef idx="2">
+                <a:schemeClr val="accent1">
+                  <a:shade val="50000"/>
+                </a:schemeClr>
+              </a:lnRef>
+              <a:fillRef idx="1">
+                <a:schemeClr val="accent1"/>
+              </a:fillRef>
+              <a:effectRef idx="0">
+                <a:schemeClr val="accent1"/>
+              </a:effectRef>
+              <a:fontRef idx="minor">
+                <a:schemeClr val="lt1"/>
+              </a:fontRef>
+            </p:style>
+            <p:txBody>
+              <a:bodyPr rtlCol="0" anchor="ctr"/>
+              <a:lstStyle/>
+              <a:p>
+                <a:pPr algn="ctr"/>
+                <a:endParaRPr lang="en-SG"/>
+              </a:p>
+            </p:txBody>
+          </p:sp>
+          <p:sp>
+            <p:nvSpPr>
+              <p:cNvPr id="69" name="Rectangle 68"/>
+              <p:cNvSpPr/>
+              <p:nvPr/>
+            </p:nvSpPr>
+            <p:spPr>
+              <a:xfrm>
+                <a:off x="4494116" y="872837"/>
+                <a:ext cx="428866" cy="161636"/>
+              </a:xfrm>
+              <a:prstGeom prst="rect">
+                <a:avLst/>
+              </a:prstGeom>
+              <a:solidFill>
+                <a:srgbClr val="0070C0"/>
+              </a:solidFill>
+              <a:ln>
+                <a:noFill/>
+              </a:ln>
+            </p:spPr>
+            <p:style>
+              <a:lnRef idx="2">
+                <a:schemeClr val="accent1">
+                  <a:shade val="50000"/>
+                </a:schemeClr>
+              </a:lnRef>
+              <a:fillRef idx="1">
+                <a:schemeClr val="accent1"/>
+              </a:fillRef>
+              <a:effectRef idx="0">
+                <a:schemeClr val="accent1"/>
+              </a:effectRef>
+              <a:fontRef idx="minor">
+                <a:schemeClr val="lt1"/>
+              </a:fontRef>
+            </p:style>
+            <p:txBody>
+              <a:bodyPr rtlCol="0" anchor="ctr"/>
+              <a:lstStyle/>
+              <a:p>
+                <a:pPr algn="ctr"/>
+                <a:endParaRPr lang="en-SG"/>
+              </a:p>
+            </p:txBody>
+          </p:sp>
+        </p:grpSp>
+      </p:grpSp>
+      <p:grpSp>
+        <p:nvGrpSpPr>
+          <p:cNvPr id="31" name="Group 30"/>
+          <p:cNvGrpSpPr/>
+          <p:nvPr/>
+        </p:nvGrpSpPr>
+        <p:grpSpPr>
+          <a:xfrm>
+            <a:off x="5353557" y="3132865"/>
+            <a:ext cx="420624" cy="420624"/>
+            <a:chOff x="5338476" y="3019143"/>
+            <a:chExt cx="420624" cy="420624"/>
+          </a:xfrm>
+        </p:grpSpPr>
+        <p:sp>
+          <p:nvSpPr>
+            <p:cNvPr id="86" name="Rectangle 85"/>
+            <p:cNvSpPr/>
+            <p:nvPr/>
+          </p:nvSpPr>
+          <p:spPr>
+            <a:xfrm>
+              <a:off x="5338476" y="3019143"/>
+              <a:ext cx="420624" cy="420624"/>
+            </a:xfrm>
+            <a:prstGeom prst="rect">
+              <a:avLst/>
+            </a:prstGeom>
+            <a:noFill/>
+            <a:ln>
+              <a:noFill/>
+            </a:ln>
+          </p:spPr>
+          <p:style>
+            <a:lnRef idx="2">
+              <a:schemeClr val="accent1">
+                <a:shade val="50000"/>
+              </a:schemeClr>
+            </a:lnRef>
+            <a:fillRef idx="1">
+              <a:schemeClr val="accent1"/>
+            </a:fillRef>
+            <a:effectRef idx="0">
+              <a:schemeClr val="accent1"/>
+            </a:effectRef>
+            <a:fontRef idx="minor">
+              <a:schemeClr val="lt1"/>
+            </a:fontRef>
+          </p:style>
+          <p:txBody>
+            <a:bodyPr rtlCol="0" anchor="ctr"/>
+            <a:lstStyle/>
+            <a:p>
+              <a:pPr algn="ctr"/>
+              <a:endParaRPr lang="en-US"/>
+            </a:p>
+          </p:txBody>
+        </p:sp>
+        <p:grpSp>
+          <p:nvGrpSpPr>
+            <p:cNvPr id="87" name="Group 86"/>
+            <p:cNvGrpSpPr/>
+            <p:nvPr/>
+          </p:nvGrpSpPr>
+          <p:grpSpPr>
+            <a:xfrm>
+              <a:off x="5390081" y="3071581"/>
+              <a:ext cx="317414" cy="319450"/>
+              <a:chOff x="4263822" y="872837"/>
+              <a:chExt cx="659160" cy="157018"/>
+            </a:xfrm>
+          </p:grpSpPr>
+          <p:sp>
+            <p:nvSpPr>
+              <p:cNvPr id="97" name="Rectangle 96"/>
+              <p:cNvSpPr/>
+              <p:nvPr/>
+            </p:nvSpPr>
+            <p:spPr>
+              <a:xfrm>
+                <a:off x="4263822" y="872837"/>
+                <a:ext cx="155788" cy="157018"/>
+              </a:xfrm>
+              <a:prstGeom prst="rect">
+                <a:avLst/>
+              </a:prstGeom>
+              <a:solidFill>
+                <a:srgbClr val="0070C0"/>
+              </a:solidFill>
+              <a:ln>
+                <a:noFill/>
+              </a:ln>
+            </p:spPr>
+            <p:style>
+              <a:lnRef idx="2">
+                <a:schemeClr val="accent1">
+                  <a:shade val="50000"/>
+                </a:schemeClr>
+              </a:lnRef>
+              <a:fillRef idx="1">
+                <a:schemeClr val="accent1"/>
+              </a:fillRef>
+              <a:effectRef idx="0">
+                <a:schemeClr val="accent1"/>
+              </a:effectRef>
+              <a:fontRef idx="minor">
+                <a:schemeClr val="lt1"/>
+              </a:fontRef>
+            </p:style>
+            <p:txBody>
+              <a:bodyPr rtlCol="0" anchor="ctr"/>
+              <a:lstStyle/>
+              <a:p>
+                <a:pPr algn="ctr"/>
+                <a:endParaRPr lang="en-SG"/>
+              </a:p>
+            </p:txBody>
+          </p:sp>
+          <p:sp>
+            <p:nvSpPr>
+              <p:cNvPr id="98" name="Rectangle 97"/>
+              <p:cNvSpPr/>
+              <p:nvPr/>
+            </p:nvSpPr>
+            <p:spPr>
+              <a:xfrm>
+                <a:off x="4494117" y="872837"/>
+                <a:ext cx="428865" cy="40435"/>
+              </a:xfrm>
+              <a:prstGeom prst="rect">
+                <a:avLst/>
+              </a:prstGeom>
+              <a:solidFill>
+                <a:srgbClr val="0070C0"/>
+              </a:solidFill>
+              <a:ln>
+                <a:noFill/>
+              </a:ln>
+            </p:spPr>
+            <p:style>
+              <a:lnRef idx="2">
+                <a:schemeClr val="accent1">
+                  <a:shade val="50000"/>
+                </a:schemeClr>
+              </a:lnRef>
+              <a:fillRef idx="1">
+                <a:schemeClr val="accent1"/>
+              </a:fillRef>
+              <a:effectRef idx="0">
+                <a:schemeClr val="accent1"/>
+              </a:effectRef>
+              <a:fontRef idx="minor">
+                <a:schemeClr val="lt1"/>
+              </a:fontRef>
+            </p:style>
+            <p:txBody>
+              <a:bodyPr rtlCol="0" anchor="ctr"/>
+              <a:lstStyle/>
+              <a:p>
+                <a:pPr algn="ctr"/>
+                <a:endParaRPr lang="en-SG"/>
+              </a:p>
+            </p:txBody>
+          </p:sp>
+        </p:grpSp>
+      </p:grpSp>
+      <p:grpSp>
+        <p:nvGrpSpPr>
+          <p:cNvPr id="28" name="Group 27"/>
+          <p:cNvGrpSpPr/>
+          <p:nvPr/>
+        </p:nvGrpSpPr>
+        <p:grpSpPr>
+          <a:xfrm>
+            <a:off x="3958501" y="3153845"/>
+            <a:ext cx="420624" cy="420624"/>
+            <a:chOff x="5377065" y="2946069"/>
+            <a:chExt cx="420624" cy="420624"/>
+          </a:xfrm>
+        </p:grpSpPr>
+        <p:sp>
+          <p:nvSpPr>
+            <p:cNvPr id="71" name="Rectangle 70"/>
+            <p:cNvSpPr/>
+            <p:nvPr/>
+          </p:nvSpPr>
+          <p:spPr>
+            <a:xfrm>
+              <a:off x="5377065" y="2946069"/>
+              <a:ext cx="420624" cy="420624"/>
+            </a:xfrm>
+            <a:prstGeom prst="rect">
+              <a:avLst/>
+            </a:prstGeom>
+            <a:noFill/>
+            <a:ln>
+              <a:noFill/>
+            </a:ln>
+          </p:spPr>
+          <p:style>
+            <a:lnRef idx="2">
+              <a:schemeClr val="accent1">
+                <a:shade val="50000"/>
+              </a:schemeClr>
+            </a:lnRef>
+            <a:fillRef idx="1">
+              <a:schemeClr val="accent1"/>
+            </a:fillRef>
+            <a:effectRef idx="0">
+              <a:schemeClr val="accent1"/>
+            </a:effectRef>
+            <a:fontRef idx="minor">
+              <a:schemeClr val="lt1"/>
+            </a:fontRef>
+          </p:style>
+          <p:txBody>
+            <a:bodyPr rtlCol="0" anchor="ctr"/>
+            <a:lstStyle/>
+            <a:p>
+              <a:pPr algn="ctr"/>
+              <a:endParaRPr lang="en-US"/>
+            </a:p>
+          </p:txBody>
+        </p:sp>
+        <p:sp>
+          <p:nvSpPr>
+            <p:cNvPr id="100" name="Rectangle 99"/>
+            <p:cNvSpPr/>
+            <p:nvPr/>
+          </p:nvSpPr>
+          <p:spPr>
+            <a:xfrm flipH="1">
+              <a:off x="5587376" y="3161142"/>
+              <a:ext cx="151659" cy="138866"/>
+            </a:xfrm>
+            <a:prstGeom prst="rect">
+              <a:avLst/>
+            </a:prstGeom>
+            <a:solidFill>
+              <a:srgbClr val="0070C0"/>
+            </a:solidFill>
+            <a:ln>
+              <a:noFill/>
+            </a:ln>
+          </p:spPr>
+          <p:style>
+            <a:lnRef idx="2">
+              <a:schemeClr val="accent1">
+                <a:shade val="50000"/>
+              </a:schemeClr>
+            </a:lnRef>
+            <a:fillRef idx="1">
+              <a:schemeClr val="accent1"/>
+            </a:fillRef>
+            <a:effectRef idx="0">
+              <a:schemeClr val="accent1"/>
+            </a:effectRef>
+            <a:fontRef idx="minor">
+              <a:schemeClr val="lt1"/>
+            </a:fontRef>
+          </p:style>
+          <p:txBody>
+            <a:bodyPr rtlCol="0" anchor="ctr"/>
+            <a:lstStyle/>
+            <a:p>
+              <a:pPr algn="ctr"/>
+              <a:endParaRPr lang="en-SG"/>
+            </a:p>
+          </p:txBody>
+        </p:sp>
+        <p:cxnSp>
+          <p:nvCxnSpPr>
+            <p:cNvPr id="26" name="Straight Arrow Connector 25"/>
+            <p:cNvCxnSpPr/>
+            <p:nvPr/>
+          </p:nvCxnSpPr>
+          <p:spPr>
+            <a:xfrm>
+              <a:off x="5393048" y="2983562"/>
+              <a:ext cx="167197" cy="151839"/>
+            </a:xfrm>
+            <a:prstGeom prst="straightConnector1">
+              <a:avLst/>
+            </a:prstGeom>
+            <a:ln w="28575">
+              <a:solidFill>
+                <a:srgbClr val="0070C0"/>
+              </a:solidFill>
+              <a:headEnd type="none" w="med" len="med"/>
+              <a:tailEnd type="triangle" w="med" len="med"/>
+            </a:ln>
+          </p:spPr>
+          <p:style>
+            <a:lnRef idx="1">
+              <a:schemeClr val="accent1"/>
+            </a:lnRef>
+            <a:fillRef idx="0">
+              <a:schemeClr val="accent1"/>
+            </a:fillRef>
+            <a:effectRef idx="0">
+              <a:schemeClr val="accent1"/>
+            </a:effectRef>
+            <a:fontRef idx="minor">
+              <a:schemeClr val="tx1"/>
+            </a:fontRef>
+          </p:style>
+        </p:cxnSp>
+      </p:grpSp>
+      <p:grpSp>
+        <p:nvGrpSpPr>
+          <p:cNvPr id="112" name="Group 111"/>
+          <p:cNvGrpSpPr/>
+          <p:nvPr/>
+        </p:nvGrpSpPr>
+        <p:grpSpPr>
+          <a:xfrm>
+            <a:off x="3534823" y="4338037"/>
+            <a:ext cx="420624" cy="420624"/>
+            <a:chOff x="2134526" y="4470163"/>
+            <a:chExt cx="420624" cy="420624"/>
+          </a:xfrm>
+        </p:grpSpPr>
+        <p:sp>
+          <p:nvSpPr>
+            <p:cNvPr id="102" name="Rectangle 101"/>
+            <p:cNvSpPr/>
+            <p:nvPr/>
+          </p:nvSpPr>
+          <p:spPr>
+            <a:xfrm>
+              <a:off x="2134526" y="4470163"/>
+              <a:ext cx="420624" cy="420624"/>
+            </a:xfrm>
+            <a:prstGeom prst="rect">
+              <a:avLst/>
+            </a:prstGeom>
+            <a:noFill/>
+            <a:ln>
+              <a:noFill/>
+            </a:ln>
+          </p:spPr>
+          <p:style>
+            <a:lnRef idx="2">
+              <a:schemeClr val="accent1">
+                <a:shade val="50000"/>
+              </a:schemeClr>
+            </a:lnRef>
+            <a:fillRef idx="1">
+              <a:schemeClr val="accent1"/>
+            </a:fillRef>
+            <a:effectRef idx="0">
+              <a:schemeClr val="accent1"/>
+            </a:effectRef>
+            <a:fontRef idx="minor">
+              <a:schemeClr val="lt1"/>
+            </a:fontRef>
+          </p:style>
+          <p:txBody>
+            <a:bodyPr rtlCol="0" anchor="ctr"/>
+            <a:lstStyle/>
+            <a:p>
+              <a:pPr algn="ctr"/>
+              <a:endParaRPr lang="en-US"/>
+            </a:p>
+          </p:txBody>
+        </p:sp>
+        <p:sp>
+          <p:nvSpPr>
+            <p:cNvPr id="37" name="Freeform 9"/>
+            <p:cNvSpPr>
+              <a:spLocks noEditPoints="1"/>
+            </p:cNvSpPr>
+            <p:nvPr/>
+          </p:nvSpPr>
+          <p:spPr bwMode="auto">
+            <a:xfrm>
+              <a:off x="2193232" y="4528869"/>
+              <a:ext cx="303213" cy="303213"/>
+            </a:xfrm>
+            <a:custGeom>
+              <a:avLst/>
+              <a:gdLst>
+                <a:gd name="T0" fmla="*/ 10791 w 11200"/>
+                <a:gd name="T1" fmla="*/ 4785 h 11200"/>
+                <a:gd name="T2" fmla="*/ 9681 w 11200"/>
+                <a:gd name="T3" fmla="*/ 4600 h 11200"/>
+                <a:gd name="T4" fmla="*/ 9330 w 11200"/>
+                <a:gd name="T5" fmla="*/ 3661 h 11200"/>
+                <a:gd name="T6" fmla="*/ 10040 w 11200"/>
+                <a:gd name="T7" fmla="*/ 2780 h 11200"/>
+                <a:gd name="T8" fmla="*/ 10025 w 11200"/>
+                <a:gd name="T9" fmla="*/ 2147 h 11200"/>
+                <a:gd name="T10" fmla="*/ 9584 w 11200"/>
+                <a:gd name="T11" fmla="*/ 1650 h 11200"/>
+                <a:gd name="T12" fmla="*/ 8956 w 11200"/>
+                <a:gd name="T13" fmla="*/ 1560 h 11200"/>
+                <a:gd name="T14" fmla="*/ 8007 w 11200"/>
+                <a:gd name="T15" fmla="*/ 2157 h 11200"/>
+                <a:gd name="T16" fmla="*/ 6607 w 11200"/>
+                <a:gd name="T17" fmla="*/ 1525 h 11200"/>
+                <a:gd name="T18" fmla="*/ 6422 w 11200"/>
+                <a:gd name="T19" fmla="*/ 410 h 11200"/>
+                <a:gd name="T20" fmla="*/ 5938 w 11200"/>
+                <a:gd name="T21" fmla="*/ 0 h 11200"/>
+                <a:gd name="T22" fmla="*/ 5273 w 11200"/>
+                <a:gd name="T23" fmla="*/ 0 h 11200"/>
+                <a:gd name="T24" fmla="*/ 4791 w 11200"/>
+                <a:gd name="T25" fmla="*/ 410 h 11200"/>
+                <a:gd name="T26" fmla="*/ 4604 w 11200"/>
+                <a:gd name="T27" fmla="*/ 1525 h 11200"/>
+                <a:gd name="T28" fmla="*/ 3426 w 11200"/>
+                <a:gd name="T29" fmla="*/ 2015 h 11200"/>
+                <a:gd name="T30" fmla="*/ 2524 w 11200"/>
+                <a:gd name="T31" fmla="*/ 1371 h 11200"/>
+                <a:gd name="T32" fmla="*/ 1893 w 11200"/>
+                <a:gd name="T33" fmla="*/ 1423 h 11200"/>
+                <a:gd name="T34" fmla="*/ 1423 w 11200"/>
+                <a:gd name="T35" fmla="*/ 1893 h 11200"/>
+                <a:gd name="T36" fmla="*/ 1371 w 11200"/>
+                <a:gd name="T37" fmla="*/ 2524 h 11200"/>
+                <a:gd name="T38" fmla="*/ 2017 w 11200"/>
+                <a:gd name="T39" fmla="*/ 3428 h 11200"/>
+                <a:gd name="T40" fmla="*/ 1531 w 11200"/>
+                <a:gd name="T41" fmla="*/ 4597 h 11200"/>
+                <a:gd name="T42" fmla="*/ 409 w 11200"/>
+                <a:gd name="T43" fmla="*/ 4785 h 11200"/>
+                <a:gd name="T44" fmla="*/ 0 w 11200"/>
+                <a:gd name="T45" fmla="*/ 5268 h 11200"/>
+                <a:gd name="T46" fmla="*/ 0 w 11200"/>
+                <a:gd name="T47" fmla="*/ 5932 h 11200"/>
+                <a:gd name="T48" fmla="*/ 409 w 11200"/>
+                <a:gd name="T49" fmla="*/ 6416 h 11200"/>
+                <a:gd name="T50" fmla="*/ 1531 w 11200"/>
+                <a:gd name="T51" fmla="*/ 6603 h 11200"/>
+                <a:gd name="T52" fmla="*/ 1903 w 11200"/>
+                <a:gd name="T53" fmla="*/ 7580 h 11200"/>
+                <a:gd name="T54" fmla="*/ 1196 w 11200"/>
+                <a:gd name="T55" fmla="*/ 8456 h 11200"/>
+                <a:gd name="T56" fmla="*/ 1211 w 11200"/>
+                <a:gd name="T57" fmla="*/ 9089 h 11200"/>
+                <a:gd name="T58" fmla="*/ 1652 w 11200"/>
+                <a:gd name="T59" fmla="*/ 9585 h 11200"/>
+                <a:gd name="T60" fmla="*/ 2279 w 11200"/>
+                <a:gd name="T61" fmla="*/ 9675 h 11200"/>
+                <a:gd name="T62" fmla="*/ 3242 w 11200"/>
+                <a:gd name="T63" fmla="*/ 9070 h 11200"/>
+                <a:gd name="T64" fmla="*/ 4604 w 11200"/>
+                <a:gd name="T65" fmla="*/ 9675 h 11200"/>
+                <a:gd name="T66" fmla="*/ 4791 w 11200"/>
+                <a:gd name="T67" fmla="*/ 10791 h 11200"/>
+                <a:gd name="T68" fmla="*/ 5273 w 11200"/>
+                <a:gd name="T69" fmla="*/ 11200 h 11200"/>
+                <a:gd name="T70" fmla="*/ 5938 w 11200"/>
+                <a:gd name="T71" fmla="*/ 11200 h 11200"/>
+                <a:gd name="T72" fmla="*/ 6422 w 11200"/>
+                <a:gd name="T73" fmla="*/ 10791 h 11200"/>
+                <a:gd name="T74" fmla="*/ 6608 w 11200"/>
+                <a:gd name="T75" fmla="*/ 9675 h 11200"/>
+                <a:gd name="T76" fmla="*/ 7772 w 11200"/>
+                <a:gd name="T77" fmla="*/ 9194 h 11200"/>
+                <a:gd name="T78" fmla="*/ 8712 w 11200"/>
+                <a:gd name="T79" fmla="*/ 9865 h 11200"/>
+                <a:gd name="T80" fmla="*/ 9343 w 11200"/>
+                <a:gd name="T81" fmla="*/ 9813 h 11200"/>
+                <a:gd name="T82" fmla="*/ 9813 w 11200"/>
+                <a:gd name="T83" fmla="*/ 9343 h 11200"/>
+                <a:gd name="T84" fmla="*/ 9864 w 11200"/>
+                <a:gd name="T85" fmla="*/ 8712 h 11200"/>
+                <a:gd name="T86" fmla="*/ 9195 w 11200"/>
+                <a:gd name="T87" fmla="*/ 7774 h 11200"/>
+                <a:gd name="T88" fmla="*/ 9681 w 11200"/>
+                <a:gd name="T89" fmla="*/ 6601 h 11200"/>
+                <a:gd name="T90" fmla="*/ 10791 w 11200"/>
+                <a:gd name="T91" fmla="*/ 6416 h 11200"/>
+                <a:gd name="T92" fmla="*/ 11200 w 11200"/>
+                <a:gd name="T93" fmla="*/ 5932 h 11200"/>
+                <a:gd name="T94" fmla="*/ 11200 w 11200"/>
+                <a:gd name="T95" fmla="*/ 5268 h 11200"/>
+                <a:gd name="T96" fmla="*/ 10791 w 11200"/>
+                <a:gd name="T97" fmla="*/ 4785 h 11200"/>
+                <a:gd name="T98" fmla="*/ 5618 w 11200"/>
+                <a:gd name="T99" fmla="*/ 7700 h 11200"/>
+                <a:gd name="T100" fmla="*/ 3518 w 11200"/>
+                <a:gd name="T101" fmla="*/ 5600 h 11200"/>
+                <a:gd name="T102" fmla="*/ 5618 w 11200"/>
+                <a:gd name="T103" fmla="*/ 3500 h 11200"/>
+                <a:gd name="T104" fmla="*/ 7718 w 11200"/>
+                <a:gd name="T105" fmla="*/ 5600 h 11200"/>
+                <a:gd name="T106" fmla="*/ 5618 w 11200"/>
+                <a:gd name="T107" fmla="*/ 7700 h 11200"/>
+              </a:gdLst>
+              <a:ahLst/>
+              <a:cxnLst>
+                <a:cxn ang="0">
+                  <a:pos x="T0" y="T1"/>
+                </a:cxn>
+                <a:cxn ang="0">
+                  <a:pos x="T2" y="T3"/>
+                </a:cxn>
+                <a:cxn ang="0">
+                  <a:pos x="T4" y="T5"/>
+                </a:cxn>
+                <a:cxn ang="0">
+                  <a:pos x="T6" y="T7"/>
+                </a:cxn>
+                <a:cxn ang="0">
+                  <a:pos x="T8" y="T9"/>
+                </a:cxn>
+                <a:cxn ang="0">
+                  <a:pos x="T10" y="T11"/>
+                </a:cxn>
+                <a:cxn ang="0">
+                  <a:pos x="T12" y="T13"/>
+                </a:cxn>
+                <a:cxn ang="0">
+                  <a:pos x="T14" y="T15"/>
+                </a:cxn>
+                <a:cxn ang="0">
+                  <a:pos x="T16" y="T17"/>
+                </a:cxn>
+                <a:cxn ang="0">
+                  <a:pos x="T18" y="T19"/>
+                </a:cxn>
+                <a:cxn ang="0">
+                  <a:pos x="T20" y="T21"/>
+                </a:cxn>
+                <a:cxn ang="0">
+                  <a:pos x="T22" y="T23"/>
+                </a:cxn>
+                <a:cxn ang="0">
+                  <a:pos x="T24" y="T25"/>
+                </a:cxn>
+                <a:cxn ang="0">
+                  <a:pos x="T26" y="T27"/>
+                </a:cxn>
+                <a:cxn ang="0">
+                  <a:pos x="T28" y="T29"/>
+                </a:cxn>
+                <a:cxn ang="0">
+                  <a:pos x="T30" y="T31"/>
+                </a:cxn>
+                <a:cxn ang="0">
+                  <a:pos x="T32" y="T33"/>
+                </a:cxn>
+                <a:cxn ang="0">
+                  <a:pos x="T34" y="T35"/>
+                </a:cxn>
+                <a:cxn ang="0">
+                  <a:pos x="T36" y="T37"/>
+                </a:cxn>
+                <a:cxn ang="0">
+                  <a:pos x="T38" y="T39"/>
+                </a:cxn>
+                <a:cxn ang="0">
+                  <a:pos x="T40" y="T41"/>
+                </a:cxn>
+                <a:cxn ang="0">
+                  <a:pos x="T42" y="T43"/>
+                </a:cxn>
+                <a:cxn ang="0">
+                  <a:pos x="T44" y="T45"/>
+                </a:cxn>
+                <a:cxn ang="0">
+                  <a:pos x="T46" y="T47"/>
+                </a:cxn>
+                <a:cxn ang="0">
+                  <a:pos x="T48" y="T49"/>
+                </a:cxn>
+                <a:cxn ang="0">
+                  <a:pos x="T50" y="T51"/>
+                </a:cxn>
+                <a:cxn ang="0">
+                  <a:pos x="T52" y="T53"/>
+                </a:cxn>
+                <a:cxn ang="0">
+                  <a:pos x="T54" y="T55"/>
+                </a:cxn>
+                <a:cxn ang="0">
+                  <a:pos x="T56" y="T57"/>
+                </a:cxn>
+                <a:cxn ang="0">
+                  <a:pos x="T58" y="T59"/>
+                </a:cxn>
+                <a:cxn ang="0">
+                  <a:pos x="T60" y="T61"/>
+                </a:cxn>
+                <a:cxn ang="0">
+                  <a:pos x="T62" y="T63"/>
+                </a:cxn>
+                <a:cxn ang="0">
+                  <a:pos x="T64" y="T65"/>
+                </a:cxn>
+                <a:cxn ang="0">
+                  <a:pos x="T66" y="T67"/>
+                </a:cxn>
+                <a:cxn ang="0">
+                  <a:pos x="T68" y="T69"/>
+                </a:cxn>
+                <a:cxn ang="0">
+                  <a:pos x="T70" y="T71"/>
+                </a:cxn>
+                <a:cxn ang="0">
+                  <a:pos x="T72" y="T73"/>
+                </a:cxn>
+                <a:cxn ang="0">
+                  <a:pos x="T74" y="T75"/>
+                </a:cxn>
+                <a:cxn ang="0">
+                  <a:pos x="T76" y="T77"/>
+                </a:cxn>
+                <a:cxn ang="0">
+                  <a:pos x="T78" y="T79"/>
+                </a:cxn>
+                <a:cxn ang="0">
+                  <a:pos x="T80" y="T81"/>
+                </a:cxn>
+                <a:cxn ang="0">
+                  <a:pos x="T82" y="T83"/>
+                </a:cxn>
+                <a:cxn ang="0">
+                  <a:pos x="T84" y="T85"/>
+                </a:cxn>
+                <a:cxn ang="0">
+                  <a:pos x="T86" y="T87"/>
+                </a:cxn>
+                <a:cxn ang="0">
+                  <a:pos x="T88" y="T89"/>
+                </a:cxn>
+                <a:cxn ang="0">
+                  <a:pos x="T90" y="T91"/>
+                </a:cxn>
+                <a:cxn ang="0">
+                  <a:pos x="T92" y="T93"/>
+                </a:cxn>
+                <a:cxn ang="0">
+                  <a:pos x="T94" y="T95"/>
+                </a:cxn>
+                <a:cxn ang="0">
+                  <a:pos x="T96" y="T97"/>
+                </a:cxn>
+                <a:cxn ang="0">
+                  <a:pos x="T98" y="T99"/>
+                </a:cxn>
+                <a:cxn ang="0">
+                  <a:pos x="T100" y="T101"/>
+                </a:cxn>
+                <a:cxn ang="0">
+                  <a:pos x="T102" y="T103"/>
+                </a:cxn>
+                <a:cxn ang="0">
+                  <a:pos x="T104" y="T105"/>
+                </a:cxn>
+                <a:cxn ang="0">
+                  <a:pos x="T106" y="T107"/>
+                </a:cxn>
+              </a:cxnLst>
+              <a:rect l="0" t="0" r="r" b="b"/>
+              <a:pathLst>
+                <a:path w="11200" h="11200">
+                  <a:moveTo>
+                    <a:pt x="10791" y="4785"/>
+                  </a:moveTo>
+                  <a:lnTo>
+                    <a:pt x="9681" y="4600"/>
+                  </a:lnTo>
+                  <a:cubicBezTo>
+                    <a:pt x="9600" y="4270"/>
+                    <a:pt x="9483" y="3955"/>
+                    <a:pt x="9330" y="3661"/>
+                  </a:cubicBezTo>
+                  <a:lnTo>
+                    <a:pt x="10040" y="2780"/>
+                  </a:lnTo>
+                  <a:cubicBezTo>
+                    <a:pt x="10191" y="2594"/>
+                    <a:pt x="10184" y="2326"/>
+                    <a:pt x="10025" y="2147"/>
+                  </a:cubicBezTo>
+                  <a:lnTo>
+                    <a:pt x="9584" y="1650"/>
+                  </a:lnTo>
+                  <a:cubicBezTo>
+                    <a:pt x="9424" y="1471"/>
+                    <a:pt x="9158" y="1433"/>
+                    <a:pt x="8956" y="1560"/>
+                  </a:cubicBezTo>
+                  <a:lnTo>
+                    <a:pt x="8007" y="2157"/>
+                  </a:lnTo>
+                  <a:cubicBezTo>
+                    <a:pt x="7590" y="1865"/>
+                    <a:pt x="7117" y="1650"/>
+                    <a:pt x="6607" y="1525"/>
+                  </a:cubicBezTo>
+                  <a:lnTo>
+                    <a:pt x="6422" y="410"/>
+                  </a:lnTo>
+                  <a:cubicBezTo>
+                    <a:pt x="6383" y="173"/>
+                    <a:pt x="6178" y="0"/>
+                    <a:pt x="5938" y="0"/>
+                  </a:cubicBezTo>
+                  <a:lnTo>
+                    <a:pt x="5273" y="0"/>
+                  </a:lnTo>
+                  <a:cubicBezTo>
+                    <a:pt x="5034" y="0"/>
+                    <a:pt x="4829" y="173"/>
+                    <a:pt x="4791" y="410"/>
+                  </a:cubicBezTo>
+                  <a:lnTo>
+                    <a:pt x="4604" y="1525"/>
+                  </a:lnTo>
+                  <a:cubicBezTo>
+                    <a:pt x="4183" y="1629"/>
+                    <a:pt x="3787" y="1795"/>
+                    <a:pt x="3426" y="2015"/>
+                  </a:cubicBezTo>
+                  <a:lnTo>
+                    <a:pt x="2524" y="1371"/>
+                  </a:lnTo>
+                  <a:cubicBezTo>
+                    <a:pt x="2330" y="1232"/>
+                    <a:pt x="2063" y="1254"/>
+                    <a:pt x="1893" y="1423"/>
+                  </a:cubicBezTo>
+                  <a:lnTo>
+                    <a:pt x="1423" y="1893"/>
+                  </a:lnTo>
+                  <a:cubicBezTo>
+                    <a:pt x="1254" y="2063"/>
+                    <a:pt x="1232" y="2330"/>
+                    <a:pt x="1371" y="2524"/>
+                  </a:cubicBezTo>
+                  <a:lnTo>
+                    <a:pt x="2017" y="3428"/>
+                  </a:lnTo>
+                  <a:cubicBezTo>
+                    <a:pt x="1799" y="3786"/>
+                    <a:pt x="1634" y="4179"/>
+                    <a:pt x="1531" y="4597"/>
+                  </a:cubicBezTo>
+                  <a:lnTo>
+                    <a:pt x="409" y="4785"/>
+                  </a:lnTo>
+                  <a:cubicBezTo>
+                    <a:pt x="174" y="4824"/>
+                    <a:pt x="0" y="5028"/>
+                    <a:pt x="0" y="5268"/>
+                  </a:cubicBezTo>
+                  <a:lnTo>
+                    <a:pt x="0" y="5932"/>
+                  </a:lnTo>
+                  <a:cubicBezTo>
+                    <a:pt x="0" y="6172"/>
+                    <a:pt x="174" y="6377"/>
+                    <a:pt x="409" y="6416"/>
+                  </a:cubicBezTo>
+                  <a:lnTo>
+                    <a:pt x="1531" y="6603"/>
+                  </a:lnTo>
+                  <a:cubicBezTo>
+                    <a:pt x="1616" y="6947"/>
+                    <a:pt x="1739" y="7275"/>
+                    <a:pt x="1903" y="7580"/>
+                  </a:cubicBezTo>
+                  <a:lnTo>
+                    <a:pt x="1196" y="8456"/>
+                  </a:lnTo>
+                  <a:cubicBezTo>
+                    <a:pt x="1045" y="8641"/>
+                    <a:pt x="1051" y="8909"/>
+                    <a:pt x="1211" y="9089"/>
+                  </a:cubicBezTo>
+                  <a:lnTo>
+                    <a:pt x="1652" y="9585"/>
+                  </a:lnTo>
+                  <a:cubicBezTo>
+                    <a:pt x="1812" y="9765"/>
+                    <a:pt x="2077" y="9803"/>
+                    <a:pt x="2279" y="9675"/>
+                  </a:cubicBezTo>
+                  <a:lnTo>
+                    <a:pt x="3242" y="9070"/>
+                  </a:lnTo>
+                  <a:cubicBezTo>
+                    <a:pt x="3649" y="9349"/>
+                    <a:pt x="4110" y="9554"/>
+                    <a:pt x="4604" y="9675"/>
+                  </a:cubicBezTo>
+                  <a:lnTo>
+                    <a:pt x="4791" y="10791"/>
+                  </a:lnTo>
+                  <a:cubicBezTo>
+                    <a:pt x="4829" y="11027"/>
+                    <a:pt x="5034" y="11200"/>
+                    <a:pt x="5273" y="11200"/>
+                  </a:cubicBezTo>
+                  <a:lnTo>
+                    <a:pt x="5938" y="11200"/>
+                  </a:lnTo>
+                  <a:cubicBezTo>
+                    <a:pt x="6178" y="11200"/>
+                    <a:pt x="6383" y="11027"/>
+                    <a:pt x="6422" y="10791"/>
+                  </a:cubicBezTo>
+                  <a:lnTo>
+                    <a:pt x="6608" y="9675"/>
+                  </a:lnTo>
+                  <a:cubicBezTo>
+                    <a:pt x="7024" y="9573"/>
+                    <a:pt x="7414" y="9409"/>
+                    <a:pt x="7772" y="9194"/>
+                  </a:cubicBezTo>
+                  <a:lnTo>
+                    <a:pt x="8712" y="9865"/>
+                  </a:lnTo>
+                  <a:cubicBezTo>
+                    <a:pt x="8906" y="10005"/>
+                    <a:pt x="9173" y="9983"/>
+                    <a:pt x="9343" y="9813"/>
+                  </a:cubicBezTo>
+                  <a:lnTo>
+                    <a:pt x="9813" y="9343"/>
+                  </a:lnTo>
+                  <a:cubicBezTo>
+                    <a:pt x="9982" y="9174"/>
+                    <a:pt x="10005" y="8907"/>
+                    <a:pt x="9864" y="8712"/>
+                  </a:cubicBezTo>
+                  <a:lnTo>
+                    <a:pt x="9195" y="7774"/>
+                  </a:lnTo>
+                  <a:cubicBezTo>
+                    <a:pt x="9413" y="7414"/>
+                    <a:pt x="9579" y="7021"/>
+                    <a:pt x="9681" y="6601"/>
+                  </a:cubicBezTo>
+                  <a:lnTo>
+                    <a:pt x="10791" y="6416"/>
+                  </a:lnTo>
+                  <a:cubicBezTo>
+                    <a:pt x="11027" y="6377"/>
+                    <a:pt x="11200" y="6172"/>
+                    <a:pt x="11200" y="5932"/>
+                  </a:cubicBezTo>
+                  <a:lnTo>
+                    <a:pt x="11200" y="5268"/>
+                  </a:lnTo>
+                  <a:cubicBezTo>
+                    <a:pt x="11200" y="5028"/>
+                    <a:pt x="11027" y="4824"/>
+                    <a:pt x="10791" y="4785"/>
+                  </a:cubicBezTo>
+                  <a:close/>
+                  <a:moveTo>
+                    <a:pt x="5618" y="7700"/>
+                  </a:moveTo>
+                  <a:cubicBezTo>
+                    <a:pt x="4458" y="7700"/>
+                    <a:pt x="3518" y="6760"/>
+                    <a:pt x="3518" y="5600"/>
+                  </a:cubicBezTo>
+                  <a:cubicBezTo>
+                    <a:pt x="3518" y="4441"/>
+                    <a:pt x="4458" y="3500"/>
+                    <a:pt x="5618" y="3500"/>
+                  </a:cubicBezTo>
+                  <a:cubicBezTo>
+                    <a:pt x="6777" y="3500"/>
+                    <a:pt x="7718" y="4441"/>
+                    <a:pt x="7718" y="5600"/>
+                  </a:cubicBezTo>
+                  <a:cubicBezTo>
+                    <a:pt x="7718" y="6760"/>
+                    <a:pt x="6777" y="7700"/>
+                    <a:pt x="5618" y="7700"/>
+                  </a:cubicBezTo>
+                  <a:close/>
+                </a:path>
+              </a:pathLst>
+            </a:custGeom>
+            <a:solidFill>
+              <a:srgbClr val="0070C0"/>
+            </a:solidFill>
+            <a:ln w="0">
+              <a:solidFill>
+                <a:srgbClr val="0070C0"/>
+              </a:solidFill>
+              <a:prstDash val="solid"/>
+              <a:round/>
+              <a:headEnd/>
+              <a:tailEnd/>
+            </a:ln>
+          </p:spPr>
+          <p:txBody>
+            <a:bodyPr vert="horz" wrap="square" lIns="91440" tIns="45720" rIns="91440" bIns="45720" numCol="1" anchor="t" anchorCtr="0" compatLnSpc="1">
+              <a:prstTxWarp prst="textNoShape">
+                <a:avLst/>
+              </a:prstTxWarp>
+            </a:bodyPr>
+            <a:lstStyle/>
+            <a:p>
+              <a:endParaRPr lang="en-SG"/>
+            </a:p>
+          </p:txBody>
+        </p:sp>
+      </p:grpSp>
+      <p:grpSp>
+        <p:nvGrpSpPr>
+          <p:cNvPr id="111" name="Group 110"/>
+          <p:cNvGrpSpPr/>
+          <p:nvPr/>
+        </p:nvGrpSpPr>
+        <p:grpSpPr>
+          <a:xfrm>
+            <a:off x="4345997" y="4352433"/>
+            <a:ext cx="420624" cy="420624"/>
+            <a:chOff x="2945700" y="4484559"/>
+            <a:chExt cx="420624" cy="420624"/>
+          </a:xfrm>
+        </p:grpSpPr>
+        <p:sp>
+          <p:nvSpPr>
+            <p:cNvPr id="110" name="Rectangle 109"/>
+            <p:cNvSpPr/>
+            <p:nvPr/>
+          </p:nvSpPr>
+          <p:spPr>
+            <a:xfrm>
+              <a:off x="2945700" y="4484559"/>
+              <a:ext cx="420624" cy="420624"/>
+            </a:xfrm>
+            <a:prstGeom prst="rect">
+              <a:avLst/>
+            </a:prstGeom>
+            <a:noFill/>
+            <a:ln>
+              <a:noFill/>
+            </a:ln>
+          </p:spPr>
+          <p:style>
+            <a:lnRef idx="2">
+              <a:schemeClr val="accent1">
+                <a:shade val="50000"/>
+              </a:schemeClr>
+            </a:lnRef>
+            <a:fillRef idx="1">
+              <a:schemeClr val="accent1"/>
+            </a:fillRef>
+            <a:effectRef idx="0">
+              <a:schemeClr val="accent1"/>
+            </a:effectRef>
+            <a:fontRef idx="minor">
+              <a:schemeClr val="lt1"/>
+            </a:fontRef>
+          </p:style>
+          <p:txBody>
+            <a:bodyPr rtlCol="0" anchor="ctr"/>
+            <a:lstStyle/>
+            <a:p>
+              <a:pPr algn="ctr"/>
+              <a:endParaRPr lang="en-US"/>
+            </a:p>
+          </p:txBody>
+        </p:sp>
+        <p:grpSp>
+          <p:nvGrpSpPr>
+            <p:cNvPr id="108" name="Group 107"/>
+            <p:cNvGrpSpPr/>
+            <p:nvPr/>
+          </p:nvGrpSpPr>
+          <p:grpSpPr>
+            <a:xfrm>
+              <a:off x="3018693" y="4540380"/>
+              <a:ext cx="274638" cy="296862"/>
+              <a:chOff x="4724400" y="4468813"/>
+              <a:chExt cx="274638" cy="296862"/>
+            </a:xfrm>
+          </p:grpSpPr>
+          <p:sp>
+            <p:nvSpPr>
+              <p:cNvPr id="44" name="Freeform 13"/>
+              <p:cNvSpPr>
+                <a:spLocks/>
+              </p:cNvSpPr>
+              <p:nvPr/>
+            </p:nvSpPr>
+            <p:spPr bwMode="auto">
+              <a:xfrm>
+                <a:off x="4724400" y="4468813"/>
+                <a:ext cx="263525" cy="155575"/>
+              </a:xfrm>
+              <a:custGeom>
+                <a:avLst/>
+                <a:gdLst>
+                  <a:gd name="T0" fmla="*/ 97 w 346"/>
+                  <a:gd name="T1" fmla="*/ 112 h 205"/>
+                  <a:gd name="T2" fmla="*/ 245 w 346"/>
+                  <a:gd name="T3" fmla="*/ 95 h 205"/>
+                  <a:gd name="T4" fmla="*/ 211 w 346"/>
+                  <a:gd name="T5" fmla="*/ 128 h 205"/>
+                  <a:gd name="T6" fmla="*/ 220 w 346"/>
+                  <a:gd name="T7" fmla="*/ 152 h 205"/>
+                  <a:gd name="T8" fmla="*/ 305 w 346"/>
+                  <a:gd name="T9" fmla="*/ 152 h 205"/>
+                  <a:gd name="T10" fmla="*/ 313 w 346"/>
+                  <a:gd name="T11" fmla="*/ 152 h 205"/>
+                  <a:gd name="T12" fmla="*/ 321 w 346"/>
+                  <a:gd name="T13" fmla="*/ 152 h 205"/>
+                  <a:gd name="T14" fmla="*/ 338 w 346"/>
+                  <a:gd name="T15" fmla="*/ 152 h 205"/>
+                  <a:gd name="T16" fmla="*/ 346 w 346"/>
+                  <a:gd name="T17" fmla="*/ 144 h 205"/>
+                  <a:gd name="T18" fmla="*/ 346 w 346"/>
+                  <a:gd name="T19" fmla="*/ 27 h 205"/>
+                  <a:gd name="T20" fmla="*/ 323 w 346"/>
+                  <a:gd name="T21" fmla="*/ 18 h 205"/>
+                  <a:gd name="T22" fmla="*/ 289 w 346"/>
+                  <a:gd name="T23" fmla="*/ 52 h 205"/>
+                  <a:gd name="T24" fmla="*/ 54 w 346"/>
+                  <a:gd name="T25" fmla="*/ 70 h 205"/>
+                  <a:gd name="T26" fmla="*/ 2 w 346"/>
+                  <a:gd name="T27" fmla="*/ 205 h 205"/>
+                  <a:gd name="T28" fmla="*/ 62 w 346"/>
+                  <a:gd name="T29" fmla="*/ 205 h 205"/>
+                  <a:gd name="T30" fmla="*/ 97 w 346"/>
+                  <a:gd name="T31" fmla="*/ 112 h 205"/>
+                </a:gdLst>
+                <a:ahLst/>
+                <a:cxnLst>
+                  <a:cxn ang="0">
+                    <a:pos x="T0" y="T1"/>
+                  </a:cxn>
+                  <a:cxn ang="0">
+                    <a:pos x="T2" y="T3"/>
+                  </a:cxn>
+                  <a:cxn ang="0">
+                    <a:pos x="T4" y="T5"/>
+                  </a:cxn>
+                  <a:cxn ang="0">
+                    <a:pos x="T6" y="T7"/>
+                  </a:cxn>
+                  <a:cxn ang="0">
+                    <a:pos x="T8" y="T9"/>
+                  </a:cxn>
+                  <a:cxn ang="0">
+                    <a:pos x="T10" y="T11"/>
+                  </a:cxn>
+                  <a:cxn ang="0">
+                    <a:pos x="T12" y="T13"/>
+                  </a:cxn>
+                  <a:cxn ang="0">
+                    <a:pos x="T14" y="T15"/>
+                  </a:cxn>
+                  <a:cxn ang="0">
+                    <a:pos x="T16" y="T17"/>
+                  </a:cxn>
+                  <a:cxn ang="0">
+                    <a:pos x="T18" y="T19"/>
+                  </a:cxn>
+                  <a:cxn ang="0">
+                    <a:pos x="T20" y="T21"/>
+                  </a:cxn>
+                  <a:cxn ang="0">
+                    <a:pos x="T22" y="T23"/>
+                  </a:cxn>
+                  <a:cxn ang="0">
+                    <a:pos x="T24" y="T25"/>
+                  </a:cxn>
+                  <a:cxn ang="0">
+                    <a:pos x="T26" y="T27"/>
+                  </a:cxn>
+                  <a:cxn ang="0">
+                    <a:pos x="T28" y="T29"/>
+                  </a:cxn>
+                  <a:cxn ang="0">
+                    <a:pos x="T30" y="T31"/>
+                  </a:cxn>
+                </a:cxnLst>
+                <a:rect l="0" t="0" r="r" b="b"/>
+                <a:pathLst>
+                  <a:path w="346" h="205">
+                    <a:moveTo>
+                      <a:pt x="97" y="112"/>
+                    </a:moveTo>
+                    <a:cubicBezTo>
+                      <a:pt x="137" y="72"/>
+                      <a:pt x="199" y="66"/>
+                      <a:pt x="245" y="95"/>
+                    </a:cubicBezTo>
+                    <a:cubicBezTo>
+                      <a:pt x="229" y="110"/>
+                      <a:pt x="211" y="128"/>
+                      <a:pt x="211" y="128"/>
+                    </a:cubicBezTo>
+                    <a:cubicBezTo>
+                      <a:pt x="199" y="144"/>
+                      <a:pt x="213" y="153"/>
+                      <a:pt x="220" y="152"/>
+                    </a:cubicBezTo>
+                    <a:lnTo>
+                      <a:pt x="305" y="152"/>
+                    </a:lnTo>
+                    <a:cubicBezTo>
+                      <a:pt x="309" y="152"/>
+                      <a:pt x="313" y="152"/>
+                      <a:pt x="313" y="152"/>
+                    </a:cubicBezTo>
+                    <a:lnTo>
+                      <a:pt x="321" y="152"/>
+                    </a:lnTo>
+                    <a:lnTo>
+                      <a:pt x="338" y="152"/>
+                    </a:lnTo>
+                    <a:cubicBezTo>
+                      <a:pt x="342" y="152"/>
+                      <a:pt x="346" y="149"/>
+                      <a:pt x="346" y="144"/>
+                    </a:cubicBezTo>
+                    <a:lnTo>
+                      <a:pt x="346" y="27"/>
+                    </a:lnTo>
+                    <a:cubicBezTo>
+                      <a:pt x="346" y="17"/>
+                      <a:pt x="335" y="6"/>
+                      <a:pt x="323" y="18"/>
+                    </a:cubicBezTo>
+                    <a:cubicBezTo>
+                      <a:pt x="323" y="18"/>
+                      <a:pt x="302" y="38"/>
+                      <a:pt x="289" y="52"/>
+                    </a:cubicBezTo>
+                    <a:cubicBezTo>
+                      <a:pt x="218" y="0"/>
+                      <a:pt x="118" y="6"/>
+                      <a:pt x="54" y="70"/>
+                    </a:cubicBezTo>
+                    <a:cubicBezTo>
+                      <a:pt x="17" y="107"/>
+                      <a:pt x="0" y="156"/>
+                      <a:pt x="2" y="205"/>
+                    </a:cubicBezTo>
+                    <a:lnTo>
+                      <a:pt x="62" y="205"/>
+                    </a:lnTo>
+                    <a:cubicBezTo>
+                      <a:pt x="60" y="172"/>
+                      <a:pt x="72" y="138"/>
+                      <a:pt x="97" y="112"/>
+                    </a:cubicBezTo>
+                    <a:close/>
+                  </a:path>
+                </a:pathLst>
+              </a:custGeom>
+              <a:solidFill>
+                <a:srgbClr val="0070C0"/>
+              </a:solidFill>
+              <a:ln w="0">
+                <a:noFill/>
+                <a:prstDash val="solid"/>
+                <a:round/>
+                <a:headEnd/>
+                <a:tailEnd/>
+              </a:ln>
+            </p:spPr>
+            <p:txBody>
+              <a:bodyPr vert="horz" wrap="square" lIns="91440" tIns="45720" rIns="91440" bIns="45720" numCol="1" anchor="t" anchorCtr="0" compatLnSpc="1">
+                <a:prstTxWarp prst="textNoShape">
+                  <a:avLst/>
+                </a:prstTxWarp>
+              </a:bodyPr>
+              <a:lstStyle/>
+              <a:p>
+                <a:endParaRPr lang="en-SG"/>
+              </a:p>
+            </p:txBody>
+          </p:sp>
+          <p:sp>
+            <p:nvSpPr>
+              <p:cNvPr id="47" name="Freeform 14"/>
+              <p:cNvSpPr>
+                <a:spLocks/>
+              </p:cNvSpPr>
+              <p:nvPr/>
+            </p:nvSpPr>
+            <p:spPr bwMode="auto">
+              <a:xfrm>
+                <a:off x="4735513" y="4608513"/>
+                <a:ext cx="263525" cy="157162"/>
+              </a:xfrm>
+              <a:custGeom>
+                <a:avLst/>
+                <a:gdLst>
+                  <a:gd name="T0" fmla="*/ 284 w 346"/>
+                  <a:gd name="T1" fmla="*/ 0 h 205"/>
+                  <a:gd name="T2" fmla="*/ 249 w 346"/>
+                  <a:gd name="T3" fmla="*/ 93 h 205"/>
+                  <a:gd name="T4" fmla="*/ 101 w 346"/>
+                  <a:gd name="T5" fmla="*/ 110 h 205"/>
+                  <a:gd name="T6" fmla="*/ 135 w 346"/>
+                  <a:gd name="T7" fmla="*/ 77 h 205"/>
+                  <a:gd name="T8" fmla="*/ 126 w 346"/>
+                  <a:gd name="T9" fmla="*/ 53 h 205"/>
+                  <a:gd name="T10" fmla="*/ 41 w 346"/>
+                  <a:gd name="T11" fmla="*/ 53 h 205"/>
+                  <a:gd name="T12" fmla="*/ 33 w 346"/>
+                  <a:gd name="T13" fmla="*/ 53 h 205"/>
+                  <a:gd name="T14" fmla="*/ 25 w 346"/>
+                  <a:gd name="T15" fmla="*/ 53 h 205"/>
+                  <a:gd name="T16" fmla="*/ 8 w 346"/>
+                  <a:gd name="T17" fmla="*/ 53 h 205"/>
+                  <a:gd name="T18" fmla="*/ 0 w 346"/>
+                  <a:gd name="T19" fmla="*/ 61 h 205"/>
+                  <a:gd name="T20" fmla="*/ 0 w 346"/>
+                  <a:gd name="T21" fmla="*/ 178 h 205"/>
+                  <a:gd name="T22" fmla="*/ 23 w 346"/>
+                  <a:gd name="T23" fmla="*/ 187 h 205"/>
+                  <a:gd name="T24" fmla="*/ 57 w 346"/>
+                  <a:gd name="T25" fmla="*/ 154 h 205"/>
+                  <a:gd name="T26" fmla="*/ 292 w 346"/>
+                  <a:gd name="T27" fmla="*/ 135 h 205"/>
+                  <a:gd name="T28" fmla="*/ 344 w 346"/>
+                  <a:gd name="T29" fmla="*/ 0 h 205"/>
+                  <a:gd name="T30" fmla="*/ 284 w 346"/>
+                  <a:gd name="T31" fmla="*/ 0 h 205"/>
+                  <a:gd name="T32" fmla="*/ 284 w 346"/>
+                  <a:gd name="T33" fmla="*/ 0 h 205"/>
+                </a:gdLst>
+                <a:ahLst/>
+                <a:cxnLst>
+                  <a:cxn ang="0">
+                    <a:pos x="T0" y="T1"/>
+                  </a:cxn>
+                  <a:cxn ang="0">
+                    <a:pos x="T2" y="T3"/>
+                  </a:cxn>
+                  <a:cxn ang="0">
+                    <a:pos x="T4" y="T5"/>
+                  </a:cxn>
+                  <a:cxn ang="0">
+                    <a:pos x="T6" y="T7"/>
+                  </a:cxn>
+                  <a:cxn ang="0">
+                    <a:pos x="T8" y="T9"/>
+                  </a:cxn>
+                  <a:cxn ang="0">
+                    <a:pos x="T10" y="T11"/>
+                  </a:cxn>
+                  <a:cxn ang="0">
+                    <a:pos x="T12" y="T13"/>
+                  </a:cxn>
+                  <a:cxn ang="0">
+                    <a:pos x="T14" y="T15"/>
+                  </a:cxn>
+                  <a:cxn ang="0">
+                    <a:pos x="T16" y="T17"/>
+                  </a:cxn>
+                  <a:cxn ang="0">
+                    <a:pos x="T18" y="T19"/>
+                  </a:cxn>
+                  <a:cxn ang="0">
+                    <a:pos x="T20" y="T21"/>
+                  </a:cxn>
+                  <a:cxn ang="0">
+                    <a:pos x="T22" y="T23"/>
+                  </a:cxn>
+                  <a:cxn ang="0">
+                    <a:pos x="T24" y="T25"/>
+                  </a:cxn>
+                  <a:cxn ang="0">
+                    <a:pos x="T26" y="T27"/>
+                  </a:cxn>
+                  <a:cxn ang="0">
+                    <a:pos x="T28" y="T29"/>
+                  </a:cxn>
+                  <a:cxn ang="0">
+                    <a:pos x="T30" y="T31"/>
+                  </a:cxn>
+                  <a:cxn ang="0">
+                    <a:pos x="T32" y="T33"/>
+                  </a:cxn>
+                </a:cxnLst>
+                <a:rect l="0" t="0" r="r" b="b"/>
+                <a:pathLst>
+                  <a:path w="346" h="205">
+                    <a:moveTo>
+                      <a:pt x="284" y="0"/>
+                    </a:moveTo>
+                    <a:cubicBezTo>
+                      <a:pt x="286" y="33"/>
+                      <a:pt x="275" y="67"/>
+                      <a:pt x="249" y="93"/>
+                    </a:cubicBezTo>
+                    <a:cubicBezTo>
+                      <a:pt x="209" y="133"/>
+                      <a:pt x="147" y="139"/>
+                      <a:pt x="101" y="110"/>
+                    </a:cubicBezTo>
+                    <a:cubicBezTo>
+                      <a:pt x="117" y="95"/>
+                      <a:pt x="135" y="77"/>
+                      <a:pt x="135" y="77"/>
+                    </a:cubicBezTo>
+                    <a:cubicBezTo>
+                      <a:pt x="148" y="61"/>
+                      <a:pt x="133" y="53"/>
+                      <a:pt x="126" y="53"/>
+                    </a:cubicBezTo>
+                    <a:lnTo>
+                      <a:pt x="41" y="53"/>
+                    </a:lnTo>
+                    <a:cubicBezTo>
+                      <a:pt x="37" y="53"/>
+                      <a:pt x="33" y="53"/>
+                      <a:pt x="33" y="53"/>
+                    </a:cubicBezTo>
+                    <a:lnTo>
+                      <a:pt x="25" y="53"/>
+                    </a:lnTo>
+                    <a:lnTo>
+                      <a:pt x="8" y="53"/>
+                    </a:lnTo>
+                    <a:cubicBezTo>
+                      <a:pt x="4" y="53"/>
+                      <a:pt x="0" y="56"/>
+                      <a:pt x="0" y="61"/>
+                    </a:cubicBezTo>
+                    <a:lnTo>
+                      <a:pt x="0" y="178"/>
+                    </a:lnTo>
+                    <a:cubicBezTo>
+                      <a:pt x="0" y="188"/>
+                      <a:pt x="11" y="199"/>
+                      <a:pt x="23" y="187"/>
+                    </a:cubicBezTo>
+                    <a:cubicBezTo>
+                      <a:pt x="23" y="187"/>
+                      <a:pt x="44" y="167"/>
+                      <a:pt x="57" y="154"/>
+                    </a:cubicBezTo>
+                    <a:cubicBezTo>
+                      <a:pt x="128" y="205"/>
+                      <a:pt x="228" y="199"/>
+                      <a:pt x="292" y="135"/>
+                    </a:cubicBezTo>
+                    <a:cubicBezTo>
+                      <a:pt x="329" y="98"/>
+                      <a:pt x="346" y="49"/>
+                      <a:pt x="344" y="0"/>
+                    </a:cubicBezTo>
+                    <a:lnTo>
+                      <a:pt x="284" y="0"/>
+                    </a:lnTo>
+                    <a:lnTo>
+                      <a:pt x="284" y="0"/>
+                    </a:lnTo>
+                    <a:close/>
+                  </a:path>
+                </a:pathLst>
+              </a:custGeom>
+              <a:solidFill>
+                <a:srgbClr val="0070C0"/>
+              </a:solidFill>
+              <a:ln w="0">
+                <a:noFill/>
+                <a:prstDash val="solid"/>
+                <a:round/>
+                <a:headEnd/>
+                <a:tailEnd/>
+              </a:ln>
+            </p:spPr>
+            <p:txBody>
+              <a:bodyPr vert="horz" wrap="square" lIns="91440" tIns="45720" rIns="91440" bIns="45720" numCol="1" anchor="t" anchorCtr="0" compatLnSpc="1">
+                <a:prstTxWarp prst="textNoShape">
+                  <a:avLst/>
+                </a:prstTxWarp>
+              </a:bodyPr>
+              <a:lstStyle/>
+              <a:p>
+                <a:endParaRPr lang="en-SG"/>
+              </a:p>
+            </p:txBody>
+          </p:sp>
+        </p:grpSp>
+      </p:grpSp>
+      <p:grpSp>
+        <p:nvGrpSpPr>
+          <p:cNvPr id="118" name="Group 117"/>
+          <p:cNvGrpSpPr/>
+          <p:nvPr/>
+        </p:nvGrpSpPr>
+        <p:grpSpPr>
+          <a:xfrm>
+            <a:off x="2466241" y="4352433"/>
+            <a:ext cx="420624" cy="420624"/>
+            <a:chOff x="1065944" y="4484559"/>
+            <a:chExt cx="420624" cy="420624"/>
+          </a:xfrm>
+        </p:grpSpPr>
+        <p:sp>
+          <p:nvSpPr>
+            <p:cNvPr id="109" name="Rectangle 108"/>
+            <p:cNvSpPr/>
+            <p:nvPr/>
+          </p:nvSpPr>
+          <p:spPr>
+            <a:xfrm>
+              <a:off x="1065944" y="4484559"/>
+              <a:ext cx="420624" cy="420624"/>
+            </a:xfrm>
+            <a:prstGeom prst="rect">
+              <a:avLst/>
+            </a:prstGeom>
+            <a:noFill/>
+            <a:ln>
+              <a:noFill/>
+            </a:ln>
+          </p:spPr>
+          <p:style>
+            <a:lnRef idx="2">
+              <a:schemeClr val="accent1">
+                <a:shade val="50000"/>
+              </a:schemeClr>
+            </a:lnRef>
+            <a:fillRef idx="1">
+              <a:schemeClr val="accent1"/>
+            </a:fillRef>
+            <a:effectRef idx="0">
+              <a:schemeClr val="accent1"/>
+            </a:effectRef>
+            <a:fontRef idx="minor">
+              <a:schemeClr val="lt1"/>
+            </a:fontRef>
+          </p:style>
+          <p:txBody>
+            <a:bodyPr rtlCol="0" anchor="ctr"/>
+            <a:lstStyle/>
+            <a:p>
+              <a:pPr algn="ctr"/>
+              <a:endParaRPr lang="en-US"/>
+            </a:p>
+          </p:txBody>
+        </p:sp>
+        <p:sp>
+          <p:nvSpPr>
+            <p:cNvPr id="117" name="Freeform 19"/>
+            <p:cNvSpPr>
+              <a:spLocks noEditPoints="1"/>
+            </p:cNvSpPr>
+            <p:nvPr/>
+          </p:nvSpPr>
+          <p:spPr bwMode="auto">
+            <a:xfrm>
+              <a:off x="1114903" y="4533518"/>
+              <a:ext cx="322707" cy="322707"/>
+            </a:xfrm>
+            <a:custGeom>
+              <a:avLst/>
+              <a:gdLst>
+                <a:gd name="T0" fmla="*/ 175 w 350"/>
+                <a:gd name="T1" fmla="*/ 0 h 350"/>
+                <a:gd name="T2" fmla="*/ 0 w 350"/>
+                <a:gd name="T3" fmla="*/ 175 h 350"/>
+                <a:gd name="T4" fmla="*/ 175 w 350"/>
+                <a:gd name="T5" fmla="*/ 350 h 350"/>
+                <a:gd name="T6" fmla="*/ 350 w 350"/>
+                <a:gd name="T7" fmla="*/ 175 h 350"/>
+                <a:gd name="T8" fmla="*/ 175 w 350"/>
+                <a:gd name="T9" fmla="*/ 0 h 350"/>
+                <a:gd name="T10" fmla="*/ 250 w 350"/>
+                <a:gd name="T11" fmla="*/ 222 h 350"/>
+                <a:gd name="T12" fmla="*/ 222 w 350"/>
+                <a:gd name="T13" fmla="*/ 250 h 350"/>
+                <a:gd name="T14" fmla="*/ 175 w 350"/>
+                <a:gd name="T15" fmla="*/ 203 h 350"/>
+                <a:gd name="T16" fmla="*/ 127 w 350"/>
+                <a:gd name="T17" fmla="*/ 250 h 350"/>
+                <a:gd name="T18" fmla="*/ 100 w 350"/>
+                <a:gd name="T19" fmla="*/ 222 h 350"/>
+                <a:gd name="T20" fmla="*/ 147 w 350"/>
+                <a:gd name="T21" fmla="*/ 175 h 350"/>
+                <a:gd name="T22" fmla="*/ 100 w 350"/>
+                <a:gd name="T23" fmla="*/ 128 h 350"/>
+                <a:gd name="T24" fmla="*/ 127 w 350"/>
+                <a:gd name="T25" fmla="*/ 100 h 350"/>
+                <a:gd name="T26" fmla="*/ 175 w 350"/>
+                <a:gd name="T27" fmla="*/ 147 h 350"/>
+                <a:gd name="T28" fmla="*/ 222 w 350"/>
+                <a:gd name="T29" fmla="*/ 100 h 350"/>
+                <a:gd name="T30" fmla="*/ 250 w 350"/>
+                <a:gd name="T31" fmla="*/ 128 h 350"/>
+                <a:gd name="T32" fmla="*/ 203 w 350"/>
+                <a:gd name="T33" fmla="*/ 175 h 350"/>
+                <a:gd name="T34" fmla="*/ 250 w 350"/>
+                <a:gd name="T35" fmla="*/ 222 h 350"/>
+              </a:gdLst>
+              <a:ahLst/>
+              <a:cxnLst>
+                <a:cxn ang="0">
+                  <a:pos x="T0" y="T1"/>
+                </a:cxn>
+                <a:cxn ang="0">
+                  <a:pos x="T2" y="T3"/>
+                </a:cxn>
+                <a:cxn ang="0">
+                  <a:pos x="T4" y="T5"/>
+                </a:cxn>
+                <a:cxn ang="0">
+                  <a:pos x="T6" y="T7"/>
+                </a:cxn>
+                <a:cxn ang="0">
+                  <a:pos x="T8" y="T9"/>
+                </a:cxn>
+                <a:cxn ang="0">
+                  <a:pos x="T10" y="T11"/>
+                </a:cxn>
+                <a:cxn ang="0">
+                  <a:pos x="T12" y="T13"/>
+                </a:cxn>
+                <a:cxn ang="0">
+                  <a:pos x="T14" y="T15"/>
+                </a:cxn>
+                <a:cxn ang="0">
+                  <a:pos x="T16" y="T17"/>
+                </a:cxn>
+                <a:cxn ang="0">
+                  <a:pos x="T18" y="T19"/>
+                </a:cxn>
+                <a:cxn ang="0">
+                  <a:pos x="T20" y="T21"/>
+                </a:cxn>
+                <a:cxn ang="0">
+                  <a:pos x="T22" y="T23"/>
+                </a:cxn>
+                <a:cxn ang="0">
+                  <a:pos x="T24" y="T25"/>
+                </a:cxn>
+                <a:cxn ang="0">
+                  <a:pos x="T26" y="T27"/>
+                </a:cxn>
+                <a:cxn ang="0">
+                  <a:pos x="T28" y="T29"/>
+                </a:cxn>
+                <a:cxn ang="0">
+                  <a:pos x="T30" y="T31"/>
+                </a:cxn>
+                <a:cxn ang="0">
+                  <a:pos x="T32" y="T33"/>
+                </a:cxn>
+                <a:cxn ang="0">
+                  <a:pos x="T34" y="T35"/>
+                </a:cxn>
+              </a:cxnLst>
+              <a:rect l="0" t="0" r="r" b="b"/>
+              <a:pathLst>
+                <a:path w="350" h="350">
+                  <a:moveTo>
+                    <a:pt x="175" y="0"/>
+                  </a:moveTo>
+                  <a:cubicBezTo>
+                    <a:pt x="78" y="0"/>
+                    <a:pt x="0" y="78"/>
+                    <a:pt x="0" y="175"/>
+                  </a:cubicBezTo>
+                  <a:cubicBezTo>
+                    <a:pt x="0" y="271"/>
+                    <a:pt x="78" y="350"/>
+                    <a:pt x="175" y="350"/>
+                  </a:cubicBezTo>
+                  <a:cubicBezTo>
+                    <a:pt x="271" y="350"/>
+                    <a:pt x="350" y="271"/>
+                    <a:pt x="350" y="175"/>
+                  </a:cubicBezTo>
+                  <a:cubicBezTo>
+                    <a:pt x="350" y="78"/>
+                    <a:pt x="271" y="0"/>
+                    <a:pt x="175" y="0"/>
+                  </a:cubicBezTo>
+                  <a:close/>
+                  <a:moveTo>
+                    <a:pt x="250" y="222"/>
+                  </a:moveTo>
+                  <a:lnTo>
+                    <a:pt x="222" y="250"/>
+                  </a:lnTo>
+                  <a:cubicBezTo>
+                    <a:pt x="222" y="250"/>
+                    <a:pt x="178" y="203"/>
+                    <a:pt x="175" y="203"/>
+                  </a:cubicBezTo>
+                  <a:cubicBezTo>
+                    <a:pt x="172" y="203"/>
+                    <a:pt x="127" y="250"/>
+                    <a:pt x="127" y="250"/>
+                  </a:cubicBezTo>
+                  <a:lnTo>
+                    <a:pt x="100" y="222"/>
+                  </a:lnTo>
+                  <a:cubicBezTo>
+                    <a:pt x="100" y="222"/>
+                    <a:pt x="147" y="179"/>
+                    <a:pt x="147" y="175"/>
+                  </a:cubicBezTo>
+                  <a:cubicBezTo>
+                    <a:pt x="147" y="171"/>
+                    <a:pt x="100" y="128"/>
+                    <a:pt x="100" y="128"/>
+                  </a:cubicBezTo>
+                  <a:lnTo>
+                    <a:pt x="127" y="100"/>
+                  </a:lnTo>
+                  <a:cubicBezTo>
+                    <a:pt x="127" y="100"/>
+                    <a:pt x="172" y="147"/>
+                    <a:pt x="175" y="147"/>
+                  </a:cubicBezTo>
+                  <a:cubicBezTo>
+                    <a:pt x="178" y="147"/>
+                    <a:pt x="222" y="100"/>
+                    <a:pt x="222" y="100"/>
+                  </a:cubicBezTo>
+                  <a:lnTo>
+                    <a:pt x="250" y="128"/>
+                  </a:lnTo>
+                  <a:cubicBezTo>
+                    <a:pt x="250" y="128"/>
+                    <a:pt x="203" y="172"/>
+                    <a:pt x="203" y="175"/>
+                  </a:cubicBezTo>
+                  <a:cubicBezTo>
+                    <a:pt x="203" y="178"/>
+                    <a:pt x="250" y="222"/>
+                    <a:pt x="250" y="222"/>
+                  </a:cubicBezTo>
+                  <a:close/>
+                </a:path>
+              </a:pathLst>
+            </a:custGeom>
+            <a:solidFill>
+              <a:srgbClr val="0070C0"/>
+            </a:solidFill>
+            <a:ln w="0">
+              <a:noFill/>
+              <a:prstDash val="solid"/>
+              <a:round/>
+              <a:headEnd/>
+              <a:tailEnd/>
+            </a:ln>
+          </p:spPr>
+          <p:txBody>
+            <a:bodyPr vert="horz" wrap="square" lIns="91440" tIns="45720" rIns="91440" bIns="45720" numCol="1" anchor="t" anchorCtr="0" compatLnSpc="1">
+              <a:prstTxWarp prst="textNoShape">
+                <a:avLst/>
+              </a:prstTxWarp>
+            </a:bodyPr>
+            <a:lstStyle/>
+            <a:p>
+              <a:endParaRPr lang="en-SG"/>
+            </a:p>
+          </p:txBody>
+        </p:sp>
+      </p:grpSp>
+      <p:sp>
+        <p:nvSpPr>
+          <p:cNvPr id="124" name="[TextBox 40]"/>
+          <p:cNvSpPr txBox="1"/>
+          <p:nvPr/>
+        </p:nvSpPr>
+        <p:spPr>
+          <a:xfrm>
+            <a:off x="2201269" y="4804381"/>
+            <a:ext cx="681380" cy="261610"/>
+          </a:xfrm>
+          <a:prstGeom prst="rect">
+            <a:avLst/>
+          </a:prstGeom>
+          <a:noFill/>
+        </p:spPr>
+        <p:txBody>
+          <a:bodyPr wrap="square" rtlCol="0">
+            <a:spAutoFit/>
+          </a:bodyPr>
+          <a:lstStyle/>
+          <a:p>
+            <a:pPr algn="ctr"/>
+            <a:r>
+              <a:rPr lang="en-US" sz="1100" dirty="0" smtClean="0"/>
+              <a:t>remove</a:t>
+            </a:r>
+            <a:endParaRPr lang="en-US" sz="1100" dirty="0" smtClean="0"/>
+          </a:p>
+        </p:txBody>
+      </p:sp>
+      <p:sp>
+        <p:nvSpPr>
+          <p:cNvPr id="125" name="[TextBox 40]"/>
+          <p:cNvSpPr txBox="1"/>
+          <p:nvPr/>
+        </p:nvSpPr>
+        <p:spPr>
+          <a:xfrm>
+            <a:off x="3287719" y="4825976"/>
+            <a:ext cx="681380" cy="261610"/>
+          </a:xfrm>
+          <a:prstGeom prst="rect">
+            <a:avLst/>
+          </a:prstGeom>
+          <a:noFill/>
+        </p:spPr>
+        <p:txBody>
+          <a:bodyPr wrap="square" rtlCol="0">
+            <a:spAutoFit/>
+          </a:bodyPr>
+          <a:lstStyle/>
+          <a:p>
+            <a:pPr algn="ctr"/>
+            <a:r>
+              <a:rPr lang="en-US" sz="1100" dirty="0" smtClean="0"/>
+              <a:t>settings</a:t>
+            </a:r>
+            <a:endParaRPr lang="en-US" sz="1100" dirty="0" smtClean="0"/>
+          </a:p>
+        </p:txBody>
+      </p:sp>
+      <p:sp>
+        <p:nvSpPr>
+          <p:cNvPr id="126" name="[TextBox 40]"/>
+          <p:cNvSpPr txBox="1"/>
+          <p:nvPr/>
+        </p:nvSpPr>
+        <p:spPr>
+          <a:xfrm>
+            <a:off x="4302626" y="4834881"/>
+            <a:ext cx="681380" cy="261610"/>
+          </a:xfrm>
+          <a:prstGeom prst="rect">
+            <a:avLst/>
+          </a:prstGeom>
+          <a:noFill/>
+        </p:spPr>
+        <p:txBody>
+          <a:bodyPr wrap="square" rtlCol="0">
+            <a:spAutoFit/>
+          </a:bodyPr>
+          <a:lstStyle/>
+          <a:p>
+            <a:pPr algn="ctr"/>
+            <a:r>
+              <a:rPr lang="en-US" sz="1100" dirty="0" smtClean="0"/>
+              <a:t>sync</a:t>
+            </a:r>
+            <a:endParaRPr lang="en-US" sz="1100" dirty="0" smtClean="0"/>
+          </a:p>
+        </p:txBody>
+      </p:sp>
+    </p:spTree>
+    <p:extLst>
+      <p:ext uri="{BB962C8B-B14F-4D97-AF65-F5344CB8AC3E}">
+        <p14:creationId xmlns:p14="http://schemas.microsoft.com/office/powerpoint/2010/main" val="1863451993"/>
+      </p:ext>
+    </p:extLst>
+  </p:cSld>
+  <p:clrMapOvr>
+    <a:masterClrMapping/>
+  </p:clrMapOvr>
+  <p:timing>
+    <p:tnLst>
+      <p:par>
+        <p:cTn id="1" dur="indefinite" restart="never" nodeType="tmRoot"/>
+      </p:par>
+    </p:tnLst>
+  </p:timing>
+</p:sld>
+</file>
+
+<file path=ppt/slides/slide6.xml><?xml version="1.0" encoding="utf-8"?>
 <p:sld xmlns:a="http://schemas.openxmlformats.org/drawingml/2006/main" xmlns:r="http://schemas.openxmlformats.org/officeDocument/2006/relationships" xmlns:p="http://schemas.openxmlformats.org/presentationml/2006/main">
   <p:cSld>
     <p:bg>

</xml_diff>

<commit_message>
Added icon for images lab and pptlabs context menu
</commit_message>
<xml_diff>
--- a/doc/Icons.pptx
+++ b/doc/Icons.pptx
@@ -5,7 +5,7 @@
     <p:sldMasterId id="2147483648" r:id="rId1"/>
   </p:sldMasterIdLst>
   <p:notesMasterIdLst>
-    <p:notesMasterId r:id="rId8"/>
+    <p:notesMasterId r:id="rId9"/>
   </p:notesMasterIdLst>
   <p:sldIdLst>
     <p:sldId id="264" r:id="rId2"/>
@@ -13,29 +13,30 @@
     <p:sldId id="267" r:id="rId4"/>
     <p:sldId id="268" r:id="rId5"/>
     <p:sldId id="269" r:id="rId6"/>
-    <p:sldId id="265" r:id="rId7"/>
+    <p:sldId id="270" r:id="rId7"/>
+    <p:sldId id="265" r:id="rId8"/>
   </p:sldIdLst>
   <p:sldSz cx="9144000" cy="6858000" type="screen4x3"/>
   <p:notesSz cx="6858000" cy="9144000"/>
   <p:embeddedFontLst>
     <p:embeddedFont>
+      <p:font typeface="Rockwell Extra Bold" panose="02060903040505020403" pitchFamily="18" charset="0"/>
+      <p:bold r:id="rId10"/>
+    </p:embeddedFont>
+    <p:embeddedFont>
       <p:font typeface="Arial Black" panose="020B0A04020102020204" pitchFamily="34" charset="0"/>
-      <p:bold r:id="rId9"/>
+      <p:bold r:id="rId11"/>
+    </p:embeddedFont>
+    <p:embeddedFont>
+      <p:font typeface="Gill Sans Ultra Bold" panose="020B0A02020104020203" pitchFamily="34" charset="0"/>
+      <p:regular r:id="rId12"/>
     </p:embeddedFont>
     <p:embeddedFont>
       <p:font typeface="Calibri" panose="020F0502020204030204" pitchFamily="34" charset="0"/>
-      <p:regular r:id="rId10"/>
-      <p:bold r:id="rId11"/>
-      <p:italic r:id="rId12"/>
-      <p:boldItalic r:id="rId13"/>
-    </p:embeddedFont>
-    <p:embeddedFont>
-      <p:font typeface="Rockwell Extra Bold" panose="02060903040505020403" pitchFamily="18" charset="0"/>
+      <p:regular r:id="rId13"/>
       <p:bold r:id="rId14"/>
-    </p:embeddedFont>
-    <p:embeddedFont>
-      <p:font typeface="Gill Sans Ultra Bold" panose="020B0A02020104020203" pitchFamily="34" charset="0"/>
-      <p:regular r:id="rId15"/>
+      <p:italic r:id="rId15"/>
+      <p:boldItalic r:id="rId16"/>
     </p:embeddedFont>
   </p:embeddedFontLst>
   <p:defaultTextStyle>
@@ -218,7 +219,7 @@
           <a:p>
             <a:fld id="{6699ACB9-486C-4D62-A3A7-AF98E13EFDA3}" type="datetimeFigureOut">
               <a:rPr lang="en-US" smtClean="0"/>
-              <a:t>2/17/2015</a:t>
+              <a:t>10/25/2015</a:t>
             </a:fld>
             <a:endParaRPr lang="en-US"/>
           </a:p>
@@ -551,7 +552,7 @@
           <a:p>
             <a:fld id="{8EC77E60-82A0-4F8A-A861-433B3189FA8C}" type="slidenum">
               <a:rPr lang="en-US" smtClean="0"/>
-              <a:t>6</a:t>
+              <a:t>7</a:t>
             </a:fld>
             <a:endParaRPr lang="en-US"/>
           </a:p>
@@ -752,7 +753,7 @@
             <a:fld id="{1D8BD707-D9CF-40AE-B4C6-C98DA3205C09}" type="datetimeFigureOut">
               <a:rPr lang="en-US" smtClean="0"/>
               <a:pPr/>
-              <a:t>2/17/2015</a:t>
+              <a:t>10/25/2015</a:t>
             </a:fld>
             <a:endParaRPr lang="en-US"/>
           </a:p>
@@ -919,7 +920,7 @@
             <a:fld id="{1D8BD707-D9CF-40AE-B4C6-C98DA3205C09}" type="datetimeFigureOut">
               <a:rPr lang="en-US" smtClean="0"/>
               <a:pPr/>
-              <a:t>2/17/2015</a:t>
+              <a:t>10/25/2015</a:t>
             </a:fld>
             <a:endParaRPr lang="en-US"/>
           </a:p>
@@ -1096,7 +1097,7 @@
             <a:fld id="{1D8BD707-D9CF-40AE-B4C6-C98DA3205C09}" type="datetimeFigureOut">
               <a:rPr lang="en-US" smtClean="0"/>
               <a:pPr/>
-              <a:t>2/17/2015</a:t>
+              <a:t>10/25/2015</a:t>
             </a:fld>
             <a:endParaRPr lang="en-US"/>
           </a:p>
@@ -1263,7 +1264,7 @@
             <a:fld id="{1D8BD707-D9CF-40AE-B4C6-C98DA3205C09}" type="datetimeFigureOut">
               <a:rPr lang="en-US" smtClean="0"/>
               <a:pPr/>
-              <a:t>2/17/2015</a:t>
+              <a:t>10/25/2015</a:t>
             </a:fld>
             <a:endParaRPr lang="en-US"/>
           </a:p>
@@ -1506,7 +1507,7 @@
             <a:fld id="{1D8BD707-D9CF-40AE-B4C6-C98DA3205C09}" type="datetimeFigureOut">
               <a:rPr lang="en-US" smtClean="0"/>
               <a:pPr/>
-              <a:t>2/17/2015</a:t>
+              <a:t>10/25/2015</a:t>
             </a:fld>
             <a:endParaRPr lang="en-US"/>
           </a:p>
@@ -1791,7 +1792,7 @@
             <a:fld id="{1D8BD707-D9CF-40AE-B4C6-C98DA3205C09}" type="datetimeFigureOut">
               <a:rPr lang="en-US" smtClean="0"/>
               <a:pPr/>
-              <a:t>2/17/2015</a:t>
+              <a:t>10/25/2015</a:t>
             </a:fld>
             <a:endParaRPr lang="en-US"/>
           </a:p>
@@ -2210,7 +2211,7 @@
             <a:fld id="{1D8BD707-D9CF-40AE-B4C6-C98DA3205C09}" type="datetimeFigureOut">
               <a:rPr lang="en-US" smtClean="0"/>
               <a:pPr/>
-              <a:t>2/17/2015</a:t>
+              <a:t>10/25/2015</a:t>
             </a:fld>
             <a:endParaRPr lang="en-US"/>
           </a:p>
@@ -2325,7 +2326,7 @@
             <a:fld id="{1D8BD707-D9CF-40AE-B4C6-C98DA3205C09}" type="datetimeFigureOut">
               <a:rPr lang="en-US" smtClean="0"/>
               <a:pPr/>
-              <a:t>2/17/2015</a:t>
+              <a:t>10/25/2015</a:t>
             </a:fld>
             <a:endParaRPr lang="en-US"/>
           </a:p>
@@ -2417,7 +2418,7 @@
             <a:fld id="{1D8BD707-D9CF-40AE-B4C6-C98DA3205C09}" type="datetimeFigureOut">
               <a:rPr lang="en-US" smtClean="0"/>
               <a:pPr/>
-              <a:t>2/17/2015</a:t>
+              <a:t>10/25/2015</a:t>
             </a:fld>
             <a:endParaRPr lang="en-US"/>
           </a:p>
@@ -2691,7 +2692,7 @@
             <a:fld id="{1D8BD707-D9CF-40AE-B4C6-C98DA3205C09}" type="datetimeFigureOut">
               <a:rPr lang="en-US" smtClean="0"/>
               <a:pPr/>
-              <a:t>2/17/2015</a:t>
+              <a:t>10/25/2015</a:t>
             </a:fld>
             <a:endParaRPr lang="en-US"/>
           </a:p>
@@ -2941,7 +2942,7 @@
             <a:fld id="{1D8BD707-D9CF-40AE-B4C6-C98DA3205C09}" type="datetimeFigureOut">
               <a:rPr lang="en-US" smtClean="0"/>
               <a:pPr/>
-              <a:t>2/17/2015</a:t>
+              <a:t>10/25/2015</a:t>
             </a:fld>
             <a:endParaRPr lang="en-US"/>
           </a:p>
@@ -3151,7 +3152,7 @@
             <a:fld id="{1D8BD707-D9CF-40AE-B4C6-C98DA3205C09}" type="datetimeFigureOut">
               <a:rPr lang="en-US" smtClean="0"/>
               <a:pPr/>
-              <a:t>2/17/2015</a:t>
+              <a:t>10/25/2015</a:t>
             </a:fld>
             <a:endParaRPr lang="en-US"/>
           </a:p>
@@ -17489,11 +17490,7 @@
           <a:p>
             <a:r>
               <a:rPr lang="en-US" dirty="0" smtClean="0"/>
-              <a:t>Agenda </a:t>
-            </a:r>
-            <a:r>
-              <a:rPr lang="en-US" dirty="0" smtClean="0"/>
-              <a:t>Lab</a:t>
+              <a:t>Agenda Lab</a:t>
             </a:r>
             <a:endParaRPr lang="en-SG" dirty="0"/>
           </a:p>
@@ -17609,7 +17606,6 @@
               <a:rPr lang="en-US" sz="1100" dirty="0" smtClean="0"/>
               <a:t>Text agenda</a:t>
             </a:r>
-            <a:endParaRPr lang="en-US" sz="1100" dirty="0" smtClean="0"/>
           </a:p>
         </p:txBody>
       </p:sp>
@@ -17640,7 +17636,6 @@
               <a:rPr lang="en-US" sz="1100" dirty="0" smtClean="0"/>
               <a:t>Visual agenda </a:t>
             </a:r>
-            <a:endParaRPr lang="en-US" sz="1100" dirty="0" smtClean="0"/>
           </a:p>
         </p:txBody>
       </p:sp>
@@ -17671,7 +17666,6 @@
               <a:rPr lang="en-US" sz="1100" dirty="0" smtClean="0"/>
               <a:t>Agenda sidebar</a:t>
             </a:r>
-            <a:endParaRPr lang="en-US" sz="1100" dirty="0" smtClean="0"/>
           </a:p>
         </p:txBody>
       </p:sp>
@@ -20100,7 +20094,6 @@
               <a:rPr lang="en-US" sz="1100" dirty="0" smtClean="0"/>
               <a:t>remove</a:t>
             </a:r>
-            <a:endParaRPr lang="en-US" sz="1100" dirty="0" smtClean="0"/>
           </a:p>
         </p:txBody>
       </p:sp>
@@ -20131,7 +20124,6 @@
               <a:rPr lang="en-US" sz="1100" dirty="0" smtClean="0"/>
               <a:t>settings</a:t>
             </a:r>
-            <a:endParaRPr lang="en-US" sz="1100" dirty="0" smtClean="0"/>
           </a:p>
         </p:txBody>
       </p:sp>
@@ -20162,7 +20154,6 @@
               <a:rPr lang="en-US" sz="1100" dirty="0" smtClean="0"/>
               <a:t>sync</a:t>
             </a:r>
-            <a:endParaRPr lang="en-US" sz="1100" dirty="0" smtClean="0"/>
           </a:p>
         </p:txBody>
       </p:sp>
@@ -20187,6 +20178,887 @@
 </file>
 
 <file path=ppt/slides/slide6.xml><?xml version="1.0" encoding="utf-8"?>
+<p:sld xmlns:a="http://schemas.openxmlformats.org/drawingml/2006/main" xmlns:r="http://schemas.openxmlformats.org/officeDocument/2006/relationships" xmlns:p="http://schemas.openxmlformats.org/presentationml/2006/main">
+  <p:cSld>
+    <p:bg>
+      <p:bgPr>
+        <a:solidFill>
+          <a:schemeClr val="bg1">
+            <a:lumMod val="95000"/>
+          </a:schemeClr>
+        </a:solidFill>
+        <a:effectLst/>
+      </p:bgPr>
+    </p:bg>
+    <p:spTree>
+      <p:nvGrpSpPr>
+        <p:cNvPr id="1" name=""/>
+        <p:cNvGrpSpPr/>
+        <p:nvPr/>
+      </p:nvGrpSpPr>
+      <p:grpSpPr>
+        <a:xfrm>
+          <a:off x="0" y="0"/>
+          <a:ext cx="0" cy="0"/>
+          <a:chOff x="0" y="0"/>
+          <a:chExt cx="0" cy="0"/>
+        </a:xfrm>
+      </p:grpSpPr>
+      <p:sp>
+        <p:nvSpPr>
+          <p:cNvPr id="116" name="TextBox 115"/>
+          <p:cNvSpPr txBox="1"/>
+          <p:nvPr/>
+        </p:nvSpPr>
+        <p:spPr>
+          <a:xfrm>
+            <a:off x="276082" y="304800"/>
+            <a:ext cx="1938215" cy="369332"/>
+          </a:xfrm>
+          <a:prstGeom prst="rect">
+            <a:avLst/>
+          </a:prstGeom>
+          <a:noFill/>
+        </p:spPr>
+        <p:txBody>
+          <a:bodyPr wrap="square" rtlCol="0">
+            <a:spAutoFit/>
+          </a:bodyPr>
+          <a:lstStyle/>
+          <a:p>
+            <a:r>
+              <a:rPr lang="en-US" dirty="0" smtClean="0"/>
+              <a:t>Images Lab</a:t>
+            </a:r>
+            <a:endParaRPr lang="en-SG" dirty="0"/>
+          </a:p>
+        </p:txBody>
+      </p:sp>
+      <p:sp>
+        <p:nvSpPr>
+          <p:cNvPr id="72" name="TextBox 71"/>
+          <p:cNvSpPr txBox="1"/>
+          <p:nvPr/>
+        </p:nvSpPr>
+        <p:spPr>
+          <a:xfrm>
+            <a:off x="970623" y="2069926"/>
+            <a:ext cx="916799" cy="215444"/>
+          </a:xfrm>
+          <a:prstGeom prst="rect">
+            <a:avLst/>
+          </a:prstGeom>
+          <a:noFill/>
+        </p:spPr>
+        <p:txBody>
+          <a:bodyPr wrap="square" rtlCol="0">
+            <a:spAutoFit/>
+          </a:bodyPr>
+          <a:lstStyle/>
+          <a:p>
+            <a:pPr algn="ctr"/>
+            <a:r>
+              <a:rPr lang="en-US" sz="800" dirty="0" smtClean="0"/>
+              <a:t>Images Lab</a:t>
+            </a:r>
+            <a:endParaRPr lang="en-SG" sz="800" dirty="0"/>
+          </a:p>
+        </p:txBody>
+      </p:sp>
+      <p:grpSp>
+        <p:nvGrpSpPr>
+          <p:cNvPr id="11" name="Group 10"/>
+          <p:cNvGrpSpPr/>
+          <p:nvPr/>
+        </p:nvGrpSpPr>
+        <p:grpSpPr>
+          <a:xfrm>
+            <a:off x="1002575" y="1231726"/>
+            <a:ext cx="838200" cy="838200"/>
+            <a:chOff x="1002575" y="1231726"/>
+            <a:chExt cx="838200" cy="838200"/>
+          </a:xfrm>
+        </p:grpSpPr>
+        <p:sp>
+          <p:nvSpPr>
+            <p:cNvPr id="10" name="Freeform 9"/>
+            <p:cNvSpPr/>
+            <p:nvPr/>
+          </p:nvSpPr>
+          <p:spPr>
+            <a:xfrm>
+              <a:off x="1245189" y="1561617"/>
+              <a:ext cx="517497" cy="429107"/>
+            </a:xfrm>
+            <a:custGeom>
+              <a:avLst/>
+              <a:gdLst>
+                <a:gd name="connsiteX0" fmla="*/ 285750 w 292100"/>
+                <a:gd name="connsiteY0" fmla="*/ 0 h 330200"/>
+                <a:gd name="connsiteX1" fmla="*/ 177800 w 292100"/>
+                <a:gd name="connsiteY1" fmla="*/ 111125 h 330200"/>
+                <a:gd name="connsiteX2" fmla="*/ 0 w 292100"/>
+                <a:gd name="connsiteY2" fmla="*/ 165100 h 330200"/>
+                <a:gd name="connsiteX3" fmla="*/ 12700 w 292100"/>
+                <a:gd name="connsiteY3" fmla="*/ 330200 h 330200"/>
+                <a:gd name="connsiteX4" fmla="*/ 292100 w 292100"/>
+                <a:gd name="connsiteY4" fmla="*/ 330200 h 330200"/>
+                <a:gd name="connsiteX5" fmla="*/ 285750 w 292100"/>
+                <a:gd name="connsiteY5" fmla="*/ 0 h 330200"/>
+                <a:gd name="connsiteX0" fmla="*/ 285750 w 292100"/>
+                <a:gd name="connsiteY0" fmla="*/ 6846 h 337046"/>
+                <a:gd name="connsiteX1" fmla="*/ 177800 w 292100"/>
+                <a:gd name="connsiteY1" fmla="*/ 117971 h 337046"/>
+                <a:gd name="connsiteX2" fmla="*/ 0 w 292100"/>
+                <a:gd name="connsiteY2" fmla="*/ 171946 h 337046"/>
+                <a:gd name="connsiteX3" fmla="*/ 12700 w 292100"/>
+                <a:gd name="connsiteY3" fmla="*/ 337046 h 337046"/>
+                <a:gd name="connsiteX4" fmla="*/ 292100 w 292100"/>
+                <a:gd name="connsiteY4" fmla="*/ 337046 h 337046"/>
+                <a:gd name="connsiteX5" fmla="*/ 285750 w 292100"/>
+                <a:gd name="connsiteY5" fmla="*/ 6846 h 337046"/>
+                <a:gd name="connsiteX0" fmla="*/ 285750 w 292100"/>
+                <a:gd name="connsiteY0" fmla="*/ 7451 h 337651"/>
+                <a:gd name="connsiteX1" fmla="*/ 177800 w 292100"/>
+                <a:gd name="connsiteY1" fmla="*/ 118576 h 337651"/>
+                <a:gd name="connsiteX2" fmla="*/ 0 w 292100"/>
+                <a:gd name="connsiteY2" fmla="*/ 172551 h 337651"/>
+                <a:gd name="connsiteX3" fmla="*/ 12700 w 292100"/>
+                <a:gd name="connsiteY3" fmla="*/ 337651 h 337651"/>
+                <a:gd name="connsiteX4" fmla="*/ 292100 w 292100"/>
+                <a:gd name="connsiteY4" fmla="*/ 337651 h 337651"/>
+                <a:gd name="connsiteX5" fmla="*/ 285750 w 292100"/>
+                <a:gd name="connsiteY5" fmla="*/ 7451 h 337651"/>
+                <a:gd name="connsiteX0" fmla="*/ 307975 w 308535"/>
+                <a:gd name="connsiteY0" fmla="*/ 6176 h 355426"/>
+                <a:gd name="connsiteX1" fmla="*/ 177800 w 308535"/>
+                <a:gd name="connsiteY1" fmla="*/ 136351 h 355426"/>
+                <a:gd name="connsiteX2" fmla="*/ 0 w 308535"/>
+                <a:gd name="connsiteY2" fmla="*/ 190326 h 355426"/>
+                <a:gd name="connsiteX3" fmla="*/ 12700 w 308535"/>
+                <a:gd name="connsiteY3" fmla="*/ 355426 h 355426"/>
+                <a:gd name="connsiteX4" fmla="*/ 292100 w 308535"/>
+                <a:gd name="connsiteY4" fmla="*/ 355426 h 355426"/>
+                <a:gd name="connsiteX5" fmla="*/ 307975 w 308535"/>
+                <a:gd name="connsiteY5" fmla="*/ 6176 h 355426"/>
+              </a:gdLst>
+              <a:ahLst/>
+              <a:cxnLst>
+                <a:cxn ang="0">
+                  <a:pos x="connsiteX0" y="connsiteY0"/>
+                </a:cxn>
+                <a:cxn ang="0">
+                  <a:pos x="connsiteX1" y="connsiteY1"/>
+                </a:cxn>
+                <a:cxn ang="0">
+                  <a:pos x="connsiteX2" y="connsiteY2"/>
+                </a:cxn>
+                <a:cxn ang="0">
+                  <a:pos x="connsiteX3" y="connsiteY3"/>
+                </a:cxn>
+                <a:cxn ang="0">
+                  <a:pos x="connsiteX4" y="connsiteY4"/>
+                </a:cxn>
+                <a:cxn ang="0">
+                  <a:pos x="connsiteX5" y="connsiteY5"/>
+                </a:cxn>
+              </a:cxnLst>
+              <a:rect l="l" t="t" r="r" b="b"/>
+              <a:pathLst>
+                <a:path w="308535" h="355426">
+                  <a:moveTo>
+                    <a:pt x="307975" y="6176"/>
+                  </a:moveTo>
+                  <a:cubicBezTo>
+                    <a:pt x="288925" y="-30336"/>
+                    <a:pt x="229129" y="105659"/>
+                    <a:pt x="177800" y="136351"/>
+                  </a:cubicBezTo>
+                  <a:cubicBezTo>
+                    <a:pt x="126471" y="167043"/>
+                    <a:pt x="27517" y="153814"/>
+                    <a:pt x="0" y="190326"/>
+                  </a:cubicBezTo>
+                  <a:lnTo>
+                    <a:pt x="12700" y="355426"/>
+                  </a:lnTo>
+                  <a:lnTo>
+                    <a:pt x="292100" y="355426"/>
+                  </a:lnTo>
+                  <a:cubicBezTo>
+                    <a:pt x="291042" y="245359"/>
+                    <a:pt x="312208" y="116243"/>
+                    <a:pt x="307975" y="6176"/>
+                  </a:cubicBezTo>
+                  <a:close/>
+                </a:path>
+              </a:pathLst>
+            </a:custGeom>
+            <a:solidFill>
+              <a:schemeClr val="accent6"/>
+            </a:solidFill>
+            <a:ln w="19050">
+              <a:noFill/>
+            </a:ln>
+            <a:effectLst/>
+          </p:spPr>
+          <p:style>
+            <a:lnRef idx="2">
+              <a:schemeClr val="accent1">
+                <a:shade val="50000"/>
+              </a:schemeClr>
+            </a:lnRef>
+            <a:fillRef idx="1">
+              <a:schemeClr val="accent1"/>
+            </a:fillRef>
+            <a:effectRef idx="0">
+              <a:schemeClr val="accent1"/>
+            </a:effectRef>
+            <a:fontRef idx="minor">
+              <a:schemeClr val="lt1"/>
+            </a:fontRef>
+          </p:style>
+          <p:txBody>
+            <a:bodyPr rtlCol="0" anchor="ctr"/>
+            <a:lstStyle/>
+            <a:p>
+              <a:pPr algn="ctr"/>
+              <a:endParaRPr lang="en-SG"/>
+            </a:p>
+          </p:txBody>
+        </p:sp>
+        <p:sp>
+          <p:nvSpPr>
+            <p:cNvPr id="6" name="Flowchart: Connector 5"/>
+            <p:cNvSpPr/>
+            <p:nvPr/>
+          </p:nvSpPr>
+          <p:spPr>
+            <a:xfrm>
+              <a:off x="1155971" y="1379813"/>
+              <a:ext cx="273109" cy="273109"/>
+            </a:xfrm>
+            <a:prstGeom prst="flowChartConnector">
+              <a:avLst/>
+            </a:prstGeom>
+            <a:solidFill>
+              <a:schemeClr val="accent6"/>
+            </a:solidFill>
+            <a:ln w="19050">
+              <a:noFill/>
+            </a:ln>
+            <a:effectLst/>
+          </p:spPr>
+          <p:style>
+            <a:lnRef idx="2">
+              <a:schemeClr val="accent1">
+                <a:shade val="50000"/>
+              </a:schemeClr>
+            </a:lnRef>
+            <a:fillRef idx="1">
+              <a:schemeClr val="accent1"/>
+            </a:fillRef>
+            <a:effectRef idx="0">
+              <a:schemeClr val="accent1"/>
+            </a:effectRef>
+            <a:fontRef idx="minor">
+              <a:schemeClr val="lt1"/>
+            </a:fontRef>
+          </p:style>
+          <p:txBody>
+            <a:bodyPr rtlCol="0" anchor="ctr"/>
+            <a:lstStyle/>
+            <a:p>
+              <a:pPr algn="ctr"/>
+              <a:endParaRPr lang="en-SG"/>
+            </a:p>
+          </p:txBody>
+        </p:sp>
+        <p:sp>
+          <p:nvSpPr>
+            <p:cNvPr id="2" name="Freeform 1"/>
+            <p:cNvSpPr/>
+            <p:nvPr/>
+          </p:nvSpPr>
+          <p:spPr>
+            <a:xfrm>
+              <a:off x="1100316" y="1692275"/>
+              <a:ext cx="657530" cy="301158"/>
+            </a:xfrm>
+            <a:custGeom>
+              <a:avLst/>
+              <a:gdLst>
+                <a:gd name="connsiteX0" fmla="*/ 0 w 660400"/>
+                <a:gd name="connsiteY0" fmla="*/ 158750 h 384175"/>
+                <a:gd name="connsiteX1" fmla="*/ 206375 w 660400"/>
+                <a:gd name="connsiteY1" fmla="*/ 0 h 384175"/>
+                <a:gd name="connsiteX2" fmla="*/ 660400 w 660400"/>
+                <a:gd name="connsiteY2" fmla="*/ 269875 h 384175"/>
+                <a:gd name="connsiteX3" fmla="*/ 657225 w 660400"/>
+                <a:gd name="connsiteY3" fmla="*/ 384175 h 384175"/>
+                <a:gd name="connsiteX4" fmla="*/ 155575 w 660400"/>
+                <a:gd name="connsiteY4" fmla="*/ 384175 h 384175"/>
+                <a:gd name="connsiteX5" fmla="*/ 63500 w 660400"/>
+                <a:gd name="connsiteY5" fmla="*/ 361950 h 384175"/>
+                <a:gd name="connsiteX6" fmla="*/ 0 w 660400"/>
+                <a:gd name="connsiteY6" fmla="*/ 288925 h 384175"/>
+                <a:gd name="connsiteX7" fmla="*/ 0 w 660400"/>
+                <a:gd name="connsiteY7" fmla="*/ 158750 h 384175"/>
+                <a:gd name="connsiteX0" fmla="*/ 0 w 660400"/>
+                <a:gd name="connsiteY0" fmla="*/ 160553 h 385978"/>
+                <a:gd name="connsiteX1" fmla="*/ 206375 w 660400"/>
+                <a:gd name="connsiteY1" fmla="*/ 1803 h 385978"/>
+                <a:gd name="connsiteX2" fmla="*/ 660400 w 660400"/>
+                <a:gd name="connsiteY2" fmla="*/ 271678 h 385978"/>
+                <a:gd name="connsiteX3" fmla="*/ 657225 w 660400"/>
+                <a:gd name="connsiteY3" fmla="*/ 385978 h 385978"/>
+                <a:gd name="connsiteX4" fmla="*/ 155575 w 660400"/>
+                <a:gd name="connsiteY4" fmla="*/ 385978 h 385978"/>
+                <a:gd name="connsiteX5" fmla="*/ 63500 w 660400"/>
+                <a:gd name="connsiteY5" fmla="*/ 363753 h 385978"/>
+                <a:gd name="connsiteX6" fmla="*/ 0 w 660400"/>
+                <a:gd name="connsiteY6" fmla="*/ 290728 h 385978"/>
+                <a:gd name="connsiteX7" fmla="*/ 0 w 660400"/>
+                <a:gd name="connsiteY7" fmla="*/ 160553 h 385978"/>
+                <a:gd name="connsiteX0" fmla="*/ 0 w 660400"/>
+                <a:gd name="connsiteY0" fmla="*/ 158961 h 384386"/>
+                <a:gd name="connsiteX1" fmla="*/ 206375 w 660400"/>
+                <a:gd name="connsiteY1" fmla="*/ 211 h 384386"/>
+                <a:gd name="connsiteX2" fmla="*/ 660400 w 660400"/>
+                <a:gd name="connsiteY2" fmla="*/ 270086 h 384386"/>
+                <a:gd name="connsiteX3" fmla="*/ 657225 w 660400"/>
+                <a:gd name="connsiteY3" fmla="*/ 384386 h 384386"/>
+                <a:gd name="connsiteX4" fmla="*/ 155575 w 660400"/>
+                <a:gd name="connsiteY4" fmla="*/ 384386 h 384386"/>
+                <a:gd name="connsiteX5" fmla="*/ 63500 w 660400"/>
+                <a:gd name="connsiteY5" fmla="*/ 362161 h 384386"/>
+                <a:gd name="connsiteX6" fmla="*/ 0 w 660400"/>
+                <a:gd name="connsiteY6" fmla="*/ 289136 h 384386"/>
+                <a:gd name="connsiteX7" fmla="*/ 0 w 660400"/>
+                <a:gd name="connsiteY7" fmla="*/ 158961 h 384386"/>
+                <a:gd name="connsiteX0" fmla="*/ 0 w 660400"/>
+                <a:gd name="connsiteY0" fmla="*/ 159089 h 384514"/>
+                <a:gd name="connsiteX1" fmla="*/ 206375 w 660400"/>
+                <a:gd name="connsiteY1" fmla="*/ 339 h 384514"/>
+                <a:gd name="connsiteX2" fmla="*/ 660400 w 660400"/>
+                <a:gd name="connsiteY2" fmla="*/ 270214 h 384514"/>
+                <a:gd name="connsiteX3" fmla="*/ 657225 w 660400"/>
+                <a:gd name="connsiteY3" fmla="*/ 384514 h 384514"/>
+                <a:gd name="connsiteX4" fmla="*/ 155575 w 660400"/>
+                <a:gd name="connsiteY4" fmla="*/ 384514 h 384514"/>
+                <a:gd name="connsiteX5" fmla="*/ 63500 w 660400"/>
+                <a:gd name="connsiteY5" fmla="*/ 362289 h 384514"/>
+                <a:gd name="connsiteX6" fmla="*/ 0 w 660400"/>
+                <a:gd name="connsiteY6" fmla="*/ 289264 h 384514"/>
+                <a:gd name="connsiteX7" fmla="*/ 0 w 660400"/>
+                <a:gd name="connsiteY7" fmla="*/ 159089 h 384514"/>
+                <a:gd name="connsiteX0" fmla="*/ 0 w 660400"/>
+                <a:gd name="connsiteY0" fmla="*/ 159325 h 384750"/>
+                <a:gd name="connsiteX1" fmla="*/ 206375 w 660400"/>
+                <a:gd name="connsiteY1" fmla="*/ 575 h 384750"/>
+                <a:gd name="connsiteX2" fmla="*/ 455434 w 660400"/>
+                <a:gd name="connsiteY2" fmla="*/ 112167 h 384750"/>
+                <a:gd name="connsiteX3" fmla="*/ 660400 w 660400"/>
+                <a:gd name="connsiteY3" fmla="*/ 270450 h 384750"/>
+                <a:gd name="connsiteX4" fmla="*/ 657225 w 660400"/>
+                <a:gd name="connsiteY4" fmla="*/ 384750 h 384750"/>
+                <a:gd name="connsiteX5" fmla="*/ 155575 w 660400"/>
+                <a:gd name="connsiteY5" fmla="*/ 384750 h 384750"/>
+                <a:gd name="connsiteX6" fmla="*/ 63500 w 660400"/>
+                <a:gd name="connsiteY6" fmla="*/ 362525 h 384750"/>
+                <a:gd name="connsiteX7" fmla="*/ 0 w 660400"/>
+                <a:gd name="connsiteY7" fmla="*/ 289500 h 384750"/>
+                <a:gd name="connsiteX8" fmla="*/ 0 w 660400"/>
+                <a:gd name="connsiteY8" fmla="*/ 159325 h 384750"/>
+                <a:gd name="connsiteX0" fmla="*/ 0 w 660400"/>
+                <a:gd name="connsiteY0" fmla="*/ 159325 h 384750"/>
+                <a:gd name="connsiteX1" fmla="*/ 206375 w 660400"/>
+                <a:gd name="connsiteY1" fmla="*/ 575 h 384750"/>
+                <a:gd name="connsiteX2" fmla="*/ 455434 w 660400"/>
+                <a:gd name="connsiteY2" fmla="*/ 112167 h 384750"/>
+                <a:gd name="connsiteX3" fmla="*/ 660400 w 660400"/>
+                <a:gd name="connsiteY3" fmla="*/ 270450 h 384750"/>
+                <a:gd name="connsiteX4" fmla="*/ 657225 w 660400"/>
+                <a:gd name="connsiteY4" fmla="*/ 384750 h 384750"/>
+                <a:gd name="connsiteX5" fmla="*/ 155575 w 660400"/>
+                <a:gd name="connsiteY5" fmla="*/ 384750 h 384750"/>
+                <a:gd name="connsiteX6" fmla="*/ 63500 w 660400"/>
+                <a:gd name="connsiteY6" fmla="*/ 362525 h 384750"/>
+                <a:gd name="connsiteX7" fmla="*/ 0 w 660400"/>
+                <a:gd name="connsiteY7" fmla="*/ 289500 h 384750"/>
+                <a:gd name="connsiteX8" fmla="*/ 0 w 660400"/>
+                <a:gd name="connsiteY8" fmla="*/ 159325 h 384750"/>
+                <a:gd name="connsiteX0" fmla="*/ 0 w 660400"/>
+                <a:gd name="connsiteY0" fmla="*/ 158753 h 384178"/>
+                <a:gd name="connsiteX1" fmla="*/ 206375 w 660400"/>
+                <a:gd name="connsiteY1" fmla="*/ 3 h 384178"/>
+                <a:gd name="connsiteX2" fmla="*/ 442734 w 660400"/>
+                <a:gd name="connsiteY2" fmla="*/ 162395 h 384178"/>
+                <a:gd name="connsiteX3" fmla="*/ 660400 w 660400"/>
+                <a:gd name="connsiteY3" fmla="*/ 269878 h 384178"/>
+                <a:gd name="connsiteX4" fmla="*/ 657225 w 660400"/>
+                <a:gd name="connsiteY4" fmla="*/ 384178 h 384178"/>
+                <a:gd name="connsiteX5" fmla="*/ 155575 w 660400"/>
+                <a:gd name="connsiteY5" fmla="*/ 384178 h 384178"/>
+                <a:gd name="connsiteX6" fmla="*/ 63500 w 660400"/>
+                <a:gd name="connsiteY6" fmla="*/ 361953 h 384178"/>
+                <a:gd name="connsiteX7" fmla="*/ 0 w 660400"/>
+                <a:gd name="connsiteY7" fmla="*/ 288928 h 384178"/>
+                <a:gd name="connsiteX8" fmla="*/ 0 w 660400"/>
+                <a:gd name="connsiteY8" fmla="*/ 158753 h 384178"/>
+                <a:gd name="connsiteX0" fmla="*/ 0 w 660400"/>
+                <a:gd name="connsiteY0" fmla="*/ 158753 h 384178"/>
+                <a:gd name="connsiteX1" fmla="*/ 206375 w 660400"/>
+                <a:gd name="connsiteY1" fmla="*/ 3 h 384178"/>
+                <a:gd name="connsiteX2" fmla="*/ 442734 w 660400"/>
+                <a:gd name="connsiteY2" fmla="*/ 162395 h 384178"/>
+                <a:gd name="connsiteX3" fmla="*/ 660400 w 660400"/>
+                <a:gd name="connsiteY3" fmla="*/ 269878 h 384178"/>
+                <a:gd name="connsiteX4" fmla="*/ 657225 w 660400"/>
+                <a:gd name="connsiteY4" fmla="*/ 384178 h 384178"/>
+                <a:gd name="connsiteX5" fmla="*/ 155575 w 660400"/>
+                <a:gd name="connsiteY5" fmla="*/ 384178 h 384178"/>
+                <a:gd name="connsiteX6" fmla="*/ 63500 w 660400"/>
+                <a:gd name="connsiteY6" fmla="*/ 361953 h 384178"/>
+                <a:gd name="connsiteX7" fmla="*/ 0 w 660400"/>
+                <a:gd name="connsiteY7" fmla="*/ 288928 h 384178"/>
+                <a:gd name="connsiteX8" fmla="*/ 0 w 660400"/>
+                <a:gd name="connsiteY8" fmla="*/ 158753 h 384178"/>
+                <a:gd name="connsiteX0" fmla="*/ 0 w 657530"/>
+                <a:gd name="connsiteY0" fmla="*/ 158753 h 384178"/>
+                <a:gd name="connsiteX1" fmla="*/ 206375 w 657530"/>
+                <a:gd name="connsiteY1" fmla="*/ 3 h 384178"/>
+                <a:gd name="connsiteX2" fmla="*/ 442734 w 657530"/>
+                <a:gd name="connsiteY2" fmla="*/ 162395 h 384178"/>
+                <a:gd name="connsiteX3" fmla="*/ 657225 w 657530"/>
+                <a:gd name="connsiteY3" fmla="*/ 184153 h 384178"/>
+                <a:gd name="connsiteX4" fmla="*/ 657225 w 657530"/>
+                <a:gd name="connsiteY4" fmla="*/ 384178 h 384178"/>
+                <a:gd name="connsiteX5" fmla="*/ 155575 w 657530"/>
+                <a:gd name="connsiteY5" fmla="*/ 384178 h 384178"/>
+                <a:gd name="connsiteX6" fmla="*/ 63500 w 657530"/>
+                <a:gd name="connsiteY6" fmla="*/ 361953 h 384178"/>
+                <a:gd name="connsiteX7" fmla="*/ 0 w 657530"/>
+                <a:gd name="connsiteY7" fmla="*/ 288928 h 384178"/>
+                <a:gd name="connsiteX8" fmla="*/ 0 w 657530"/>
+                <a:gd name="connsiteY8" fmla="*/ 158753 h 384178"/>
+                <a:gd name="connsiteX0" fmla="*/ 0 w 657530"/>
+                <a:gd name="connsiteY0" fmla="*/ 158753 h 384178"/>
+                <a:gd name="connsiteX1" fmla="*/ 206375 w 657530"/>
+                <a:gd name="connsiteY1" fmla="*/ 3 h 384178"/>
+                <a:gd name="connsiteX2" fmla="*/ 442734 w 657530"/>
+                <a:gd name="connsiteY2" fmla="*/ 162395 h 384178"/>
+                <a:gd name="connsiteX3" fmla="*/ 657225 w 657530"/>
+                <a:gd name="connsiteY3" fmla="*/ 184153 h 384178"/>
+                <a:gd name="connsiteX4" fmla="*/ 657225 w 657530"/>
+                <a:gd name="connsiteY4" fmla="*/ 384178 h 384178"/>
+                <a:gd name="connsiteX5" fmla="*/ 155575 w 657530"/>
+                <a:gd name="connsiteY5" fmla="*/ 384178 h 384178"/>
+                <a:gd name="connsiteX6" fmla="*/ 63500 w 657530"/>
+                <a:gd name="connsiteY6" fmla="*/ 361953 h 384178"/>
+                <a:gd name="connsiteX7" fmla="*/ 0 w 657530"/>
+                <a:gd name="connsiteY7" fmla="*/ 288928 h 384178"/>
+                <a:gd name="connsiteX8" fmla="*/ 0 w 657530"/>
+                <a:gd name="connsiteY8" fmla="*/ 158753 h 384178"/>
+                <a:gd name="connsiteX0" fmla="*/ 0 w 657530"/>
+                <a:gd name="connsiteY0" fmla="*/ 158753 h 384178"/>
+                <a:gd name="connsiteX1" fmla="*/ 206375 w 657530"/>
+                <a:gd name="connsiteY1" fmla="*/ 3 h 384178"/>
+                <a:gd name="connsiteX2" fmla="*/ 442734 w 657530"/>
+                <a:gd name="connsiteY2" fmla="*/ 162395 h 384178"/>
+                <a:gd name="connsiteX3" fmla="*/ 657225 w 657530"/>
+                <a:gd name="connsiteY3" fmla="*/ 184153 h 384178"/>
+                <a:gd name="connsiteX4" fmla="*/ 657225 w 657530"/>
+                <a:gd name="connsiteY4" fmla="*/ 384178 h 384178"/>
+                <a:gd name="connsiteX5" fmla="*/ 155575 w 657530"/>
+                <a:gd name="connsiteY5" fmla="*/ 384178 h 384178"/>
+                <a:gd name="connsiteX6" fmla="*/ 63500 w 657530"/>
+                <a:gd name="connsiteY6" fmla="*/ 361953 h 384178"/>
+                <a:gd name="connsiteX7" fmla="*/ 0 w 657530"/>
+                <a:gd name="connsiteY7" fmla="*/ 288928 h 384178"/>
+                <a:gd name="connsiteX8" fmla="*/ 0 w 657530"/>
+                <a:gd name="connsiteY8" fmla="*/ 158753 h 384178"/>
+                <a:gd name="connsiteX0" fmla="*/ 0 w 657530"/>
+                <a:gd name="connsiteY0" fmla="*/ 158753 h 384178"/>
+                <a:gd name="connsiteX1" fmla="*/ 206375 w 657530"/>
+                <a:gd name="connsiteY1" fmla="*/ 3 h 384178"/>
+                <a:gd name="connsiteX2" fmla="*/ 442734 w 657530"/>
+                <a:gd name="connsiteY2" fmla="*/ 162395 h 384178"/>
+                <a:gd name="connsiteX3" fmla="*/ 657225 w 657530"/>
+                <a:gd name="connsiteY3" fmla="*/ 184153 h 384178"/>
+                <a:gd name="connsiteX4" fmla="*/ 657225 w 657530"/>
+                <a:gd name="connsiteY4" fmla="*/ 384178 h 384178"/>
+                <a:gd name="connsiteX5" fmla="*/ 155575 w 657530"/>
+                <a:gd name="connsiteY5" fmla="*/ 384178 h 384178"/>
+                <a:gd name="connsiteX6" fmla="*/ 63500 w 657530"/>
+                <a:gd name="connsiteY6" fmla="*/ 361953 h 384178"/>
+                <a:gd name="connsiteX7" fmla="*/ 0 w 657530"/>
+                <a:gd name="connsiteY7" fmla="*/ 288928 h 384178"/>
+                <a:gd name="connsiteX8" fmla="*/ 0 w 657530"/>
+                <a:gd name="connsiteY8" fmla="*/ 158753 h 384178"/>
+              </a:gdLst>
+              <a:ahLst/>
+              <a:cxnLst>
+                <a:cxn ang="0">
+                  <a:pos x="connsiteX0" y="connsiteY0"/>
+                </a:cxn>
+                <a:cxn ang="0">
+                  <a:pos x="connsiteX1" y="connsiteY1"/>
+                </a:cxn>
+                <a:cxn ang="0">
+                  <a:pos x="connsiteX2" y="connsiteY2"/>
+                </a:cxn>
+                <a:cxn ang="0">
+                  <a:pos x="connsiteX3" y="connsiteY3"/>
+                </a:cxn>
+                <a:cxn ang="0">
+                  <a:pos x="connsiteX4" y="connsiteY4"/>
+                </a:cxn>
+                <a:cxn ang="0">
+                  <a:pos x="connsiteX5" y="connsiteY5"/>
+                </a:cxn>
+                <a:cxn ang="0">
+                  <a:pos x="connsiteX6" y="connsiteY6"/>
+                </a:cxn>
+                <a:cxn ang="0">
+                  <a:pos x="connsiteX7" y="connsiteY7"/>
+                </a:cxn>
+                <a:cxn ang="0">
+                  <a:pos x="connsiteX8" y="connsiteY8"/>
+                </a:cxn>
+              </a:cxnLst>
+              <a:rect l="l" t="t" r="r" b="b"/>
+              <a:pathLst>
+                <a:path w="657530" h="384178">
+                  <a:moveTo>
+                    <a:pt x="0" y="158753"/>
+                  </a:moveTo>
+                  <a:cubicBezTo>
+                    <a:pt x="34396" y="110599"/>
+                    <a:pt x="132586" y="-604"/>
+                    <a:pt x="206375" y="3"/>
+                  </a:cubicBezTo>
+                  <a:cubicBezTo>
+                    <a:pt x="280164" y="610"/>
+                    <a:pt x="367592" y="119003"/>
+                    <a:pt x="442734" y="162395"/>
+                  </a:cubicBezTo>
+                  <a:cubicBezTo>
+                    <a:pt x="517876" y="205787"/>
+                    <a:pt x="579143" y="233973"/>
+                    <a:pt x="657225" y="184153"/>
+                  </a:cubicBezTo>
+                  <a:cubicBezTo>
+                    <a:pt x="656167" y="222253"/>
+                    <a:pt x="658283" y="346078"/>
+                    <a:pt x="657225" y="384178"/>
+                  </a:cubicBezTo>
+                  <a:lnTo>
+                    <a:pt x="155575" y="384178"/>
+                  </a:lnTo>
+                  <a:lnTo>
+                    <a:pt x="63500" y="361953"/>
+                  </a:lnTo>
+                  <a:lnTo>
+                    <a:pt x="0" y="288928"/>
+                  </a:lnTo>
+                  <a:cubicBezTo>
+                    <a:pt x="1058" y="243420"/>
+                    <a:pt x="2117" y="197911"/>
+                    <a:pt x="0" y="158753"/>
+                  </a:cubicBezTo>
+                  <a:close/>
+                </a:path>
+              </a:pathLst>
+            </a:custGeom>
+            <a:solidFill>
+              <a:srgbClr val="0070C0"/>
+            </a:solidFill>
+            <a:ln w="19050">
+              <a:noFill/>
+            </a:ln>
+            <a:effectLst/>
+          </p:spPr>
+          <p:style>
+            <a:lnRef idx="2">
+              <a:schemeClr val="accent1">
+                <a:shade val="50000"/>
+              </a:schemeClr>
+            </a:lnRef>
+            <a:fillRef idx="1">
+              <a:schemeClr val="accent1"/>
+            </a:fillRef>
+            <a:effectRef idx="0">
+              <a:schemeClr val="accent1"/>
+            </a:effectRef>
+            <a:fontRef idx="minor">
+              <a:schemeClr val="lt1"/>
+            </a:fontRef>
+          </p:style>
+          <p:txBody>
+            <a:bodyPr rtlCol="0" anchor="ctr"/>
+            <a:lstStyle/>
+            <a:p>
+              <a:pPr algn="ctr"/>
+              <a:endParaRPr lang="en-SG"/>
+            </a:p>
+          </p:txBody>
+        </p:sp>
+        <p:sp>
+          <p:nvSpPr>
+            <p:cNvPr id="74" name="Rectangle 73"/>
+            <p:cNvSpPr/>
+            <p:nvPr/>
+          </p:nvSpPr>
+          <p:spPr>
+            <a:xfrm>
+              <a:off x="1002575" y="1231726"/>
+              <a:ext cx="838200" cy="838200"/>
+            </a:xfrm>
+            <a:prstGeom prst="rect">
+              <a:avLst/>
+            </a:prstGeom>
+            <a:noFill/>
+            <a:ln>
+              <a:noFill/>
+            </a:ln>
+          </p:spPr>
+          <p:style>
+            <a:lnRef idx="2">
+              <a:schemeClr val="accent1">
+                <a:shade val="50000"/>
+              </a:schemeClr>
+            </a:lnRef>
+            <a:fillRef idx="1">
+              <a:schemeClr val="accent1"/>
+            </a:fillRef>
+            <a:effectRef idx="0">
+              <a:schemeClr val="accent1"/>
+            </a:effectRef>
+            <a:fontRef idx="minor">
+              <a:schemeClr val="lt1"/>
+            </a:fontRef>
+          </p:style>
+          <p:txBody>
+            <a:bodyPr rtlCol="0" anchor="ctr"/>
+            <a:lstStyle/>
+            <a:p>
+              <a:pPr algn="ctr"/>
+              <a:endParaRPr lang="en-SG"/>
+            </a:p>
+          </p:txBody>
+        </p:sp>
+        <p:sp>
+          <p:nvSpPr>
+            <p:cNvPr id="75" name="Rectangle 4"/>
+            <p:cNvSpPr/>
+            <p:nvPr/>
+          </p:nvSpPr>
+          <p:spPr>
+            <a:xfrm rot="16200000">
+              <a:off x="1071530" y="1304929"/>
+              <a:ext cx="700291" cy="690781"/>
+            </a:xfrm>
+            <a:custGeom>
+              <a:avLst/>
+              <a:gdLst/>
+              <a:ahLst/>
+              <a:cxnLst/>
+              <a:rect l="l" t="t" r="r" b="b"/>
+              <a:pathLst>
+                <a:path w="1752603" h="1752600">
+                  <a:moveTo>
+                    <a:pt x="533400" y="0"/>
+                  </a:moveTo>
+                  <a:lnTo>
+                    <a:pt x="533403" y="0"/>
+                  </a:lnTo>
+                  <a:lnTo>
+                    <a:pt x="1066800" y="0"/>
+                  </a:lnTo>
+                  <a:lnTo>
+                    <a:pt x="1752603" y="0"/>
+                  </a:lnTo>
+                  <a:lnTo>
+                    <a:pt x="1752603" y="1752600"/>
+                  </a:lnTo>
+                  <a:lnTo>
+                    <a:pt x="1219203" y="1752600"/>
+                  </a:lnTo>
+                  <a:lnTo>
+                    <a:pt x="533403" y="1752600"/>
+                  </a:lnTo>
+                  <a:lnTo>
+                    <a:pt x="3" y="1752600"/>
+                  </a:lnTo>
+                  <a:lnTo>
+                    <a:pt x="3" y="533430"/>
+                  </a:lnTo>
+                  <a:cubicBezTo>
+                    <a:pt x="0" y="533420"/>
+                    <a:pt x="0" y="533410"/>
+                    <a:pt x="0" y="533400"/>
+                  </a:cubicBezTo>
+                  <a:cubicBezTo>
+                    <a:pt x="0" y="238811"/>
+                    <a:pt x="238811" y="0"/>
+                    <a:pt x="533400" y="0"/>
+                  </a:cubicBezTo>
+                  <a:close/>
+                </a:path>
+              </a:pathLst>
+            </a:custGeom>
+            <a:noFill/>
+            <a:ln w="76200" cmpd="sng">
+              <a:solidFill>
+                <a:srgbClr val="0070C0"/>
+              </a:solidFill>
+              <a:miter lim="800000"/>
+            </a:ln>
+          </p:spPr>
+          <p:style>
+            <a:lnRef idx="2">
+              <a:schemeClr val="accent1">
+                <a:shade val="50000"/>
+              </a:schemeClr>
+            </a:lnRef>
+            <a:fillRef idx="1">
+              <a:schemeClr val="accent1"/>
+            </a:fillRef>
+            <a:effectRef idx="0">
+              <a:schemeClr val="accent1"/>
+            </a:effectRef>
+            <a:fontRef idx="minor">
+              <a:schemeClr val="lt1"/>
+            </a:fontRef>
+          </p:style>
+          <p:txBody>
+            <a:bodyPr rtlCol="0" anchor="ctr"/>
+            <a:lstStyle/>
+            <a:p>
+              <a:pPr algn="ctr"/>
+              <a:endParaRPr lang="en-US"/>
+            </a:p>
+          </p:txBody>
+        </p:sp>
+        <p:sp>
+          <p:nvSpPr>
+            <p:cNvPr id="8" name="Flowchart: Extract 7"/>
+            <p:cNvSpPr/>
+            <p:nvPr/>
+          </p:nvSpPr>
+          <p:spPr>
+            <a:xfrm rot="13378575">
+              <a:off x="1506052" y="1373065"/>
+              <a:ext cx="257153" cy="116539"/>
+            </a:xfrm>
+            <a:prstGeom prst="flowChartExtract">
+              <a:avLst/>
+            </a:prstGeom>
+            <a:solidFill>
+              <a:schemeClr val="bg1"/>
+            </a:solidFill>
+            <a:ln w="57150">
+              <a:solidFill>
+                <a:srgbClr val="0070C0"/>
+              </a:solidFill>
+            </a:ln>
+          </p:spPr>
+          <p:style>
+            <a:lnRef idx="2">
+              <a:schemeClr val="accent1">
+                <a:shade val="50000"/>
+              </a:schemeClr>
+            </a:lnRef>
+            <a:fillRef idx="1">
+              <a:schemeClr val="accent1"/>
+            </a:fillRef>
+            <a:effectRef idx="0">
+              <a:schemeClr val="accent1"/>
+            </a:effectRef>
+            <a:fontRef idx="minor">
+              <a:schemeClr val="lt1"/>
+            </a:fontRef>
+          </p:style>
+          <p:txBody>
+            <a:bodyPr rtlCol="0" anchor="ctr"/>
+            <a:lstStyle/>
+            <a:p>
+              <a:pPr algn="ctr"/>
+              <a:endParaRPr lang="en-SG"/>
+            </a:p>
+          </p:txBody>
+        </p:sp>
+        <p:sp>
+          <p:nvSpPr>
+            <p:cNvPr id="9" name="Flowchart: Extract 8"/>
+            <p:cNvSpPr/>
+            <p:nvPr/>
+          </p:nvSpPr>
+          <p:spPr>
+            <a:xfrm rot="2729248">
+              <a:off x="1659710" y="1313950"/>
+              <a:ext cx="142875" cy="88200"/>
+            </a:xfrm>
+            <a:prstGeom prst="flowChartExtract">
+              <a:avLst/>
+            </a:prstGeom>
+            <a:solidFill>
+              <a:srgbClr val="0070C0"/>
+            </a:solidFill>
+            <a:ln>
+              <a:solidFill>
+                <a:srgbClr val="0070C0"/>
+              </a:solidFill>
+            </a:ln>
+          </p:spPr>
+          <p:style>
+            <a:lnRef idx="2">
+              <a:schemeClr val="accent1">
+                <a:shade val="50000"/>
+              </a:schemeClr>
+            </a:lnRef>
+            <a:fillRef idx="1">
+              <a:schemeClr val="accent1"/>
+            </a:fillRef>
+            <a:effectRef idx="0">
+              <a:schemeClr val="accent1"/>
+            </a:effectRef>
+            <a:fontRef idx="minor">
+              <a:schemeClr val="lt1"/>
+            </a:fontRef>
+          </p:style>
+          <p:txBody>
+            <a:bodyPr rtlCol="0" anchor="ctr"/>
+            <a:lstStyle/>
+            <a:p>
+              <a:pPr algn="ctr"/>
+              <a:endParaRPr lang="en-SG"/>
+            </a:p>
+          </p:txBody>
+        </p:sp>
+      </p:grpSp>
+    </p:spTree>
+    <p:extLst>
+      <p:ext uri="{BB962C8B-B14F-4D97-AF65-F5344CB8AC3E}">
+        <p14:creationId xmlns:p14="http://schemas.microsoft.com/office/powerpoint/2010/main" val="809061646"/>
+      </p:ext>
+    </p:extLst>
+  </p:cSld>
+  <p:clrMapOvr>
+    <a:masterClrMapping/>
+  </p:clrMapOvr>
+  <p:timing>
+    <p:tnLst>
+      <p:par>
+        <p:cTn id="1" dur="indefinite" restart="never" nodeType="tmRoot"/>
+      </p:par>
+    </p:tnLst>
+  </p:timing>
+</p:sld>
+</file>
+
+<file path=ppt/slides/slide7.xml><?xml version="1.0" encoding="utf-8"?>
 <p:sld xmlns:a="http://schemas.openxmlformats.org/drawingml/2006/main" xmlns:r="http://schemas.openxmlformats.org/officeDocument/2006/relationships" xmlns:p="http://schemas.openxmlformats.org/presentationml/2006/main">
   <p:cSld>
     <p:bg>
@@ -21884,7 +22756,7 @@
         </p:nvSpPr>
         <p:spPr>
           <a:xfrm>
-            <a:off x="2057400" y="304800"/>
+            <a:off x="88872" y="110775"/>
             <a:ext cx="2958840" cy="369332"/>
           </a:xfrm>
           <a:prstGeom prst="rect">
@@ -24749,7 +25621,7 @@
         </p:nvSpPr>
         <p:spPr>
           <a:xfrm>
-            <a:off x="1676455" y="1773387"/>
+            <a:off x="1586095" y="2018225"/>
             <a:ext cx="918667" cy="430887"/>
           </a:xfrm>
           <a:prstGeom prst="rect">
@@ -24780,7 +25652,7 @@
         </p:nvGrpSpPr>
         <p:grpSpPr>
           <a:xfrm>
-            <a:off x="1566998" y="1190622"/>
+            <a:off x="1476638" y="1435460"/>
             <a:ext cx="420624" cy="421200"/>
             <a:chOff x="1566998" y="1190622"/>
             <a:chExt cx="420624" cy="421200"/>
@@ -24952,7 +25824,7 @@
         </p:nvGrpSpPr>
         <p:grpSpPr>
           <a:xfrm>
-            <a:off x="2178642" y="1186445"/>
+            <a:off x="2088282" y="1431283"/>
             <a:ext cx="420624" cy="421200"/>
             <a:chOff x="533536" y="1101557"/>
             <a:chExt cx="420624" cy="421200"/>
@@ -25099,6 +25971,154 @@
           </p:txBody>
         </p:sp>
       </p:grpSp>
+      <p:grpSp>
+        <p:nvGrpSpPr>
+          <p:cNvPr id="34" name="Group 33"/>
+          <p:cNvGrpSpPr/>
+          <p:nvPr/>
+        </p:nvGrpSpPr>
+        <p:grpSpPr>
+          <a:xfrm>
+            <a:off x="1509085" y="607226"/>
+            <a:ext cx="344238" cy="337671"/>
+            <a:chOff x="1509085" y="607226"/>
+            <a:chExt cx="344238" cy="337671"/>
+          </a:xfrm>
+        </p:grpSpPr>
+        <p:sp>
+          <p:nvSpPr>
+            <p:cNvPr id="132" name="Round Single Corner Rectangle 131"/>
+            <p:cNvSpPr/>
+            <p:nvPr/>
+          </p:nvSpPr>
+          <p:spPr>
+            <a:xfrm flipH="1" flipV="1">
+              <a:off x="1609593" y="695334"/>
+              <a:ext cx="151555" cy="150018"/>
+            </a:xfrm>
+            <a:prstGeom prst="round1Rect">
+              <a:avLst>
+                <a:gd name="adj" fmla="val 50000"/>
+              </a:avLst>
+            </a:prstGeom>
+            <a:solidFill>
+              <a:srgbClr val="0070C0"/>
+            </a:solidFill>
+            <a:ln>
+              <a:noFill/>
+            </a:ln>
+          </p:spPr>
+          <p:style>
+            <a:lnRef idx="2">
+              <a:schemeClr val="accent1">
+                <a:shade val="50000"/>
+              </a:schemeClr>
+            </a:lnRef>
+            <a:fillRef idx="1">
+              <a:schemeClr val="accent1"/>
+            </a:fillRef>
+            <a:effectRef idx="0">
+              <a:schemeClr val="accent1"/>
+            </a:effectRef>
+            <a:fontRef idx="minor">
+              <a:schemeClr val="lt1"/>
+            </a:fontRef>
+          </p:style>
+          <p:txBody>
+            <a:bodyPr wrap="none" lIns="0" tIns="0" rIns="0" bIns="0" rtlCol="0" anchor="ctr"/>
+            <a:lstStyle/>
+            <a:p>
+              <a:pPr algn="ctr"/>
+              <a:endParaRPr lang="en-SG" b="1"/>
+            </a:p>
+          </p:txBody>
+        </p:sp>
+        <p:sp>
+          <p:nvSpPr>
+            <p:cNvPr id="133" name="Round Single Corner Rectangle 132"/>
+            <p:cNvSpPr/>
+            <p:nvPr/>
+          </p:nvSpPr>
+          <p:spPr>
+            <a:xfrm flipH="1" flipV="1">
+              <a:off x="1509085" y="607226"/>
+              <a:ext cx="344238" cy="337671"/>
+            </a:xfrm>
+            <a:prstGeom prst="round1Rect">
+              <a:avLst>
+                <a:gd name="adj" fmla="val 50000"/>
+              </a:avLst>
+            </a:prstGeom>
+            <a:noFill/>
+            <a:ln w="76200" cmpd="sng">
+              <a:solidFill>
+                <a:schemeClr val="accent6">
+                  <a:lumMod val="75000"/>
+                </a:schemeClr>
+              </a:solidFill>
+              <a:miter lim="800000"/>
+            </a:ln>
+          </p:spPr>
+          <p:style>
+            <a:lnRef idx="2">
+              <a:schemeClr val="accent1">
+                <a:shade val="50000"/>
+              </a:schemeClr>
+            </a:lnRef>
+            <a:fillRef idx="1">
+              <a:schemeClr val="accent1"/>
+            </a:fillRef>
+            <a:effectRef idx="0">
+              <a:schemeClr val="accent1"/>
+            </a:effectRef>
+            <a:fontRef idx="minor">
+              <a:schemeClr val="lt1"/>
+            </a:fontRef>
+          </p:style>
+          <p:txBody>
+            <a:bodyPr rtlCol="0" anchor="ctr"/>
+            <a:lstStyle/>
+            <a:p>
+              <a:pPr algn="ctr"/>
+              <a:endParaRPr lang="en-SG"/>
+            </a:p>
+          </p:txBody>
+        </p:sp>
+      </p:grpSp>
+      <p:sp>
+        <p:nvSpPr>
+          <p:cNvPr id="134" name="TextBox 133"/>
+          <p:cNvSpPr txBox="1"/>
+          <p:nvPr/>
+        </p:nvSpPr>
+        <p:spPr>
+          <a:xfrm>
+            <a:off x="2059214" y="554898"/>
+            <a:ext cx="1710871" cy="430887"/>
+          </a:xfrm>
+          <a:prstGeom prst="rect">
+            <a:avLst/>
+          </a:prstGeom>
+          <a:noFill/>
+        </p:spPr>
+        <p:txBody>
+          <a:bodyPr wrap="square" rtlCol="0">
+            <a:spAutoFit/>
+          </a:bodyPr>
+          <a:lstStyle/>
+          <a:p>
+            <a:r>
+              <a:rPr lang="en-US" sz="1100" dirty="0" err="1" smtClean="0"/>
+              <a:t>PptLabs</a:t>
+            </a:r>
+            <a:r>
+              <a:rPr lang="en-US" sz="1100" dirty="0" smtClean="0"/>
+              <a:t> main context menu icon</a:t>
+            </a:r>
+            <a:endParaRPr lang="en-SG" sz="1100" dirty="0"/>
+          </a:p>
+        </p:txBody>
+      </p:sp>
     </p:spTree>
     <p:extLst>
       <p:ext uri="{BB962C8B-B14F-4D97-AF65-F5344CB8AC3E}">

</xml_diff>

<commit_message>
Added an icon for 'hide'
</commit_message>
<xml_diff>
--- a/doc/Icons.pptx
+++ b/doc/Icons.pptx
@@ -20,23 +20,23 @@
   <p:notesSz cx="6858000" cy="9144000"/>
   <p:embeddedFontLst>
     <p:embeddedFont>
-      <p:font typeface="Rockwell Extra Bold" panose="02060903040505020403" pitchFamily="18" charset="0"/>
+      <p:font typeface="Arial Black" panose="020B0A04020102020204" pitchFamily="34" charset="0"/>
       <p:bold r:id="rId10"/>
     </p:embeddedFont>
     <p:embeddedFont>
-      <p:font typeface="Arial Black" panose="020B0A04020102020204" pitchFamily="34" charset="0"/>
-      <p:bold r:id="rId11"/>
-    </p:embeddedFont>
-    <p:embeddedFont>
       <p:font typeface="Gill Sans Ultra Bold" panose="020B0A02020104020203" pitchFamily="34" charset="0"/>
-      <p:regular r:id="rId12"/>
+      <p:regular r:id="rId11"/>
     </p:embeddedFont>
     <p:embeddedFont>
       <p:font typeface="Calibri" panose="020F0502020204030204" pitchFamily="34" charset="0"/>
-      <p:regular r:id="rId13"/>
-      <p:bold r:id="rId14"/>
-      <p:italic r:id="rId15"/>
-      <p:boldItalic r:id="rId16"/>
+      <p:regular r:id="rId12"/>
+      <p:bold r:id="rId13"/>
+      <p:italic r:id="rId14"/>
+      <p:boldItalic r:id="rId15"/>
+    </p:embeddedFont>
+    <p:embeddedFont>
+      <p:font typeface="Rockwell Extra Bold" panose="02060903040505020403" pitchFamily="18" charset="0"/>
+      <p:bold r:id="rId16"/>
     </p:embeddedFont>
   </p:embeddedFontLst>
   <p:defaultTextStyle>
@@ -219,7 +219,7 @@
           <a:p>
             <a:fld id="{6699ACB9-486C-4D62-A3A7-AF98E13EFDA3}" type="datetimeFigureOut">
               <a:rPr lang="en-US" smtClean="0"/>
-              <a:t>10/25/2015</a:t>
+              <a:t>12/7/2015</a:t>
             </a:fld>
             <a:endParaRPr lang="en-US"/>
           </a:p>
@@ -753,7 +753,7 @@
             <a:fld id="{1D8BD707-D9CF-40AE-B4C6-C98DA3205C09}" type="datetimeFigureOut">
               <a:rPr lang="en-US" smtClean="0"/>
               <a:pPr/>
-              <a:t>10/25/2015</a:t>
+              <a:t>12/7/2015</a:t>
             </a:fld>
             <a:endParaRPr lang="en-US"/>
           </a:p>
@@ -920,7 +920,7 @@
             <a:fld id="{1D8BD707-D9CF-40AE-B4C6-C98DA3205C09}" type="datetimeFigureOut">
               <a:rPr lang="en-US" smtClean="0"/>
               <a:pPr/>
-              <a:t>10/25/2015</a:t>
+              <a:t>12/7/2015</a:t>
             </a:fld>
             <a:endParaRPr lang="en-US"/>
           </a:p>
@@ -1097,7 +1097,7 @@
             <a:fld id="{1D8BD707-D9CF-40AE-B4C6-C98DA3205C09}" type="datetimeFigureOut">
               <a:rPr lang="en-US" smtClean="0"/>
               <a:pPr/>
-              <a:t>10/25/2015</a:t>
+              <a:t>12/7/2015</a:t>
             </a:fld>
             <a:endParaRPr lang="en-US"/>
           </a:p>
@@ -1264,7 +1264,7 @@
             <a:fld id="{1D8BD707-D9CF-40AE-B4C6-C98DA3205C09}" type="datetimeFigureOut">
               <a:rPr lang="en-US" smtClean="0"/>
               <a:pPr/>
-              <a:t>10/25/2015</a:t>
+              <a:t>12/7/2015</a:t>
             </a:fld>
             <a:endParaRPr lang="en-US"/>
           </a:p>
@@ -1507,7 +1507,7 @@
             <a:fld id="{1D8BD707-D9CF-40AE-B4C6-C98DA3205C09}" type="datetimeFigureOut">
               <a:rPr lang="en-US" smtClean="0"/>
               <a:pPr/>
-              <a:t>10/25/2015</a:t>
+              <a:t>12/7/2015</a:t>
             </a:fld>
             <a:endParaRPr lang="en-US"/>
           </a:p>
@@ -1792,7 +1792,7 @@
             <a:fld id="{1D8BD707-D9CF-40AE-B4C6-C98DA3205C09}" type="datetimeFigureOut">
               <a:rPr lang="en-US" smtClean="0"/>
               <a:pPr/>
-              <a:t>10/25/2015</a:t>
+              <a:t>12/7/2015</a:t>
             </a:fld>
             <a:endParaRPr lang="en-US"/>
           </a:p>
@@ -2211,7 +2211,7 @@
             <a:fld id="{1D8BD707-D9CF-40AE-B4C6-C98DA3205C09}" type="datetimeFigureOut">
               <a:rPr lang="en-US" smtClean="0"/>
               <a:pPr/>
-              <a:t>10/25/2015</a:t>
+              <a:t>12/7/2015</a:t>
             </a:fld>
             <a:endParaRPr lang="en-US"/>
           </a:p>
@@ -2326,7 +2326,7 @@
             <a:fld id="{1D8BD707-D9CF-40AE-B4C6-C98DA3205C09}" type="datetimeFigureOut">
               <a:rPr lang="en-US" smtClean="0"/>
               <a:pPr/>
-              <a:t>10/25/2015</a:t>
+              <a:t>12/7/2015</a:t>
             </a:fld>
             <a:endParaRPr lang="en-US"/>
           </a:p>
@@ -2418,7 +2418,7 @@
             <a:fld id="{1D8BD707-D9CF-40AE-B4C6-C98DA3205C09}" type="datetimeFigureOut">
               <a:rPr lang="en-US" smtClean="0"/>
               <a:pPr/>
-              <a:t>10/25/2015</a:t>
+              <a:t>12/7/2015</a:t>
             </a:fld>
             <a:endParaRPr lang="en-US"/>
           </a:p>
@@ -2692,7 +2692,7 @@
             <a:fld id="{1D8BD707-D9CF-40AE-B4C6-C98DA3205C09}" type="datetimeFigureOut">
               <a:rPr lang="en-US" smtClean="0"/>
               <a:pPr/>
-              <a:t>10/25/2015</a:t>
+              <a:t>12/7/2015</a:t>
             </a:fld>
             <a:endParaRPr lang="en-US"/>
           </a:p>
@@ -2942,7 +2942,7 @@
             <a:fld id="{1D8BD707-D9CF-40AE-B4C6-C98DA3205C09}" type="datetimeFigureOut">
               <a:rPr lang="en-US" smtClean="0"/>
               <a:pPr/>
-              <a:t>10/25/2015</a:t>
+              <a:t>12/7/2015</a:t>
             </a:fld>
             <a:endParaRPr lang="en-US"/>
           </a:p>
@@ -3152,7 +3152,7 @@
             <a:fld id="{1D8BD707-D9CF-40AE-B4C6-C98DA3205C09}" type="datetimeFigureOut">
               <a:rPr lang="en-US" smtClean="0"/>
               <a:pPr/>
-              <a:t>10/25/2015</a:t>
+              <a:t>12/7/2015</a:t>
             </a:fld>
             <a:endParaRPr lang="en-US"/>
           </a:p>
@@ -22193,7 +22193,7 @@
         </p:nvSpPr>
         <p:spPr>
           <a:xfrm>
-            <a:off x="6582232" y="5410200"/>
+            <a:off x="6298239" y="5678027"/>
             <a:ext cx="2333168" cy="307777"/>
           </a:xfrm>
           <a:prstGeom prst="rect">
@@ -24724,8 +24724,8 @@
         </p:nvSpPr>
         <p:spPr>
           <a:xfrm>
-            <a:off x="7322389" y="4942281"/>
-            <a:ext cx="918667" cy="261610"/>
+            <a:off x="8375063" y="4935223"/>
+            <a:ext cx="459333" cy="261610"/>
           </a:xfrm>
           <a:prstGeom prst="rect">
             <a:avLst/>
@@ -24741,7 +24741,7 @@
             <a:pPr algn="ctr"/>
             <a:r>
               <a:rPr lang="en-US" sz="1100" dirty="0" smtClean="0"/>
-              <a:t>Cut to shape</a:t>
+              <a:t>hide</a:t>
             </a:r>
             <a:endParaRPr lang="en-SG" sz="1100" dirty="0"/>
           </a:p>
@@ -26114,6 +26114,148 @@
             <a:r>
               <a:rPr lang="en-US" sz="1100" dirty="0" smtClean="0"/>
               <a:t> main context menu icon</a:t>
+            </a:r>
+            <a:endParaRPr lang="en-SG" sz="1100" dirty="0"/>
+          </a:p>
+        </p:txBody>
+      </p:sp>
+      <p:grpSp>
+        <p:nvGrpSpPr>
+          <p:cNvPr id="18" name="Group 17"/>
+          <p:cNvGrpSpPr/>
+          <p:nvPr/>
+        </p:nvGrpSpPr>
+        <p:grpSpPr>
+          <a:xfrm>
+            <a:off x="8414913" y="4295205"/>
+            <a:ext cx="400209" cy="381306"/>
+            <a:chOff x="8414913" y="4295205"/>
+            <a:chExt cx="400209" cy="381306"/>
+          </a:xfrm>
+        </p:grpSpPr>
+        <p:sp>
+          <p:nvSpPr>
+            <p:cNvPr id="121" name="Rectangle 120"/>
+            <p:cNvSpPr/>
+            <p:nvPr/>
+          </p:nvSpPr>
+          <p:spPr>
+            <a:xfrm flipH="1">
+              <a:off x="8414913" y="4295205"/>
+              <a:ext cx="400209" cy="381306"/>
+            </a:xfrm>
+            <a:prstGeom prst="rect">
+              <a:avLst/>
+            </a:prstGeom>
+            <a:solidFill>
+              <a:schemeClr val="bg1"/>
+            </a:solidFill>
+            <a:ln w="76200">
+              <a:solidFill>
+                <a:schemeClr val="bg1"/>
+              </a:solidFill>
+              <a:prstDash val="solid"/>
+            </a:ln>
+          </p:spPr>
+          <p:style>
+            <a:lnRef idx="2">
+              <a:schemeClr val="accent1">
+                <a:shade val="50000"/>
+              </a:schemeClr>
+            </a:lnRef>
+            <a:fillRef idx="1">
+              <a:schemeClr val="accent1"/>
+            </a:fillRef>
+            <a:effectRef idx="0">
+              <a:schemeClr val="accent1"/>
+            </a:effectRef>
+            <a:fontRef idx="minor">
+              <a:schemeClr val="lt1"/>
+            </a:fontRef>
+          </p:style>
+          <p:txBody>
+            <a:bodyPr wrap="none" lIns="0" tIns="0" rIns="0" bIns="0" rtlCol="0" anchor="ctr"/>
+            <a:lstStyle/>
+            <a:p>
+              <a:pPr algn="ctr"/>
+              <a:endParaRPr lang="en-US" b="1"/>
+            </a:p>
+          </p:txBody>
+        </p:sp>
+        <p:sp>
+          <p:nvSpPr>
+            <p:cNvPr id="120" name="Rectangle 119"/>
+            <p:cNvSpPr/>
+            <p:nvPr/>
+          </p:nvSpPr>
+          <p:spPr>
+            <a:xfrm flipH="1">
+              <a:off x="8414913" y="4295205"/>
+              <a:ext cx="400209" cy="381306"/>
+            </a:xfrm>
+            <a:prstGeom prst="rect">
+              <a:avLst/>
+            </a:prstGeom>
+            <a:noFill/>
+            <a:ln w="76200">
+              <a:solidFill>
+                <a:srgbClr val="0070C0"/>
+              </a:solidFill>
+              <a:prstDash val="sysDot"/>
+            </a:ln>
+          </p:spPr>
+          <p:style>
+            <a:lnRef idx="2">
+              <a:schemeClr val="accent1">
+                <a:shade val="50000"/>
+              </a:schemeClr>
+            </a:lnRef>
+            <a:fillRef idx="1">
+              <a:schemeClr val="accent1"/>
+            </a:fillRef>
+            <a:effectRef idx="0">
+              <a:schemeClr val="accent1"/>
+            </a:effectRef>
+            <a:fontRef idx="minor">
+              <a:schemeClr val="lt1"/>
+            </a:fontRef>
+          </p:style>
+          <p:txBody>
+            <a:bodyPr wrap="none" lIns="0" tIns="0" rIns="0" bIns="0" rtlCol="0" anchor="ctr"/>
+            <a:lstStyle/>
+            <a:p>
+              <a:pPr algn="ctr"/>
+              <a:endParaRPr lang="en-US" b="1"/>
+            </a:p>
+          </p:txBody>
+        </p:sp>
+      </p:grpSp>
+      <p:sp>
+        <p:nvSpPr>
+          <p:cNvPr id="122" name="TextBox 121"/>
+          <p:cNvSpPr txBox="1"/>
+          <p:nvPr/>
+        </p:nvSpPr>
+        <p:spPr>
+          <a:xfrm>
+            <a:off x="7322389" y="4935223"/>
+            <a:ext cx="918667" cy="261610"/>
+          </a:xfrm>
+          <a:prstGeom prst="rect">
+            <a:avLst/>
+          </a:prstGeom>
+          <a:noFill/>
+        </p:spPr>
+        <p:txBody>
+          <a:bodyPr wrap="square" rtlCol="0">
+            <a:spAutoFit/>
+          </a:bodyPr>
+          <a:lstStyle/>
+          <a:p>
+            <a:pPr algn="ctr"/>
+            <a:r>
+              <a:rPr lang="en-US" sz="1100" dirty="0" smtClean="0"/>
+              <a:t>Cut to shape</a:t>
             </a:r>
             <a:endParaRPr lang="en-SG" sz="1100" dirty="0"/>
           </a:p>

</xml_diff>

<commit_message>
#944 Add button for frosted glass feature
Add buttons and text for the button, but still working on the function
of the button.
</commit_message>
<xml_diff>
--- a/doc/Icons.pptx
+++ b/doc/Icons.pptx
@@ -20,22 +20,22 @@
   <p:notesSz cx="6858000" cy="9144000"/>
   <p:embeddedFontLst>
     <p:embeddedFont>
-      <p:font typeface="Arial Black" panose="020B0A04020102020204" pitchFamily="34" charset="0"/>
-      <p:bold r:id="rId10"/>
+      <p:font typeface="Calibri" panose="020F0502020204030204" pitchFamily="34" charset="0"/>
+      <p:regular r:id="rId10"/>
+      <p:bold r:id="rId11"/>
+      <p:italic r:id="rId12"/>
+      <p:boldItalic r:id="rId13"/>
+    </p:embeddedFont>
+    <p:embeddedFont>
+      <p:font typeface="Rockwell Extra Bold" panose="02060903040505020403" pitchFamily="18" charset="0"/>
+      <p:bold r:id="rId14"/>
     </p:embeddedFont>
     <p:embeddedFont>
       <p:font typeface="Gill Sans Ultra Bold" panose="020B0A02020104020203" pitchFamily="34" charset="0"/>
-      <p:regular r:id="rId11"/>
+      <p:regular r:id="rId15"/>
     </p:embeddedFont>
     <p:embeddedFont>
-      <p:font typeface="Calibri" panose="020F0502020204030204" pitchFamily="34" charset="0"/>
-      <p:regular r:id="rId12"/>
-      <p:bold r:id="rId13"/>
-      <p:italic r:id="rId14"/>
-      <p:boldItalic r:id="rId15"/>
-    </p:embeddedFont>
-    <p:embeddedFont>
-      <p:font typeface="Rockwell Extra Bold" panose="02060903040505020403" pitchFamily="18" charset="0"/>
+      <p:font typeface="Arial Black" panose="020B0A04020102020204" pitchFamily="34" charset="0"/>
       <p:bold r:id="rId16"/>
     </p:embeddedFont>
   </p:embeddedFontLst>
@@ -134,6 +134,22 @@
       </a:defRPr>
     </a:lvl9pPr>
   </p:defaultTextStyle>
+  <p:extLst>
+    <p:ext uri="{EFAFB233-063F-42B5-8137-9DF3F51BA10A}">
+      <p15:sldGuideLst xmlns:p15="http://schemas.microsoft.com/office/powerpoint/2012/main">
+        <p15:guide id="1" orient="horz" pos="2160">
+          <p15:clr>
+            <a:srgbClr val="A4A3A4"/>
+          </p15:clr>
+        </p15:guide>
+        <p15:guide id="2" pos="2880">
+          <p15:clr>
+            <a:srgbClr val="A4A3A4"/>
+          </p15:clr>
+        </p15:guide>
+      </p15:sldGuideLst>
+    </p:ext>
+  </p:extLst>
 </p:presentation>
 </file>
 
@@ -219,7 +235,7 @@
           <a:p>
             <a:fld id="{6699ACB9-486C-4D62-A3A7-AF98E13EFDA3}" type="datetimeFigureOut">
               <a:rPr lang="en-US" smtClean="0"/>
-              <a:t>12/7/2015</a:t>
+              <a:t>5/16/2016</a:t>
             </a:fld>
             <a:endParaRPr lang="en-US"/>
           </a:p>
@@ -753,7 +769,7 @@
             <a:fld id="{1D8BD707-D9CF-40AE-B4C6-C98DA3205C09}" type="datetimeFigureOut">
               <a:rPr lang="en-US" smtClean="0"/>
               <a:pPr/>
-              <a:t>12/7/2015</a:t>
+              <a:t>5/16/2016</a:t>
             </a:fld>
             <a:endParaRPr lang="en-US"/>
           </a:p>
@@ -920,7 +936,7 @@
             <a:fld id="{1D8BD707-D9CF-40AE-B4C6-C98DA3205C09}" type="datetimeFigureOut">
               <a:rPr lang="en-US" smtClean="0"/>
               <a:pPr/>
-              <a:t>12/7/2015</a:t>
+              <a:t>5/16/2016</a:t>
             </a:fld>
             <a:endParaRPr lang="en-US"/>
           </a:p>
@@ -1097,7 +1113,7 @@
             <a:fld id="{1D8BD707-D9CF-40AE-B4C6-C98DA3205C09}" type="datetimeFigureOut">
               <a:rPr lang="en-US" smtClean="0"/>
               <a:pPr/>
-              <a:t>12/7/2015</a:t>
+              <a:t>5/16/2016</a:t>
             </a:fld>
             <a:endParaRPr lang="en-US"/>
           </a:p>
@@ -1264,7 +1280,7 @@
             <a:fld id="{1D8BD707-D9CF-40AE-B4C6-C98DA3205C09}" type="datetimeFigureOut">
               <a:rPr lang="en-US" smtClean="0"/>
               <a:pPr/>
-              <a:t>12/7/2015</a:t>
+              <a:t>5/16/2016</a:t>
             </a:fld>
             <a:endParaRPr lang="en-US"/>
           </a:p>
@@ -1507,7 +1523,7 @@
             <a:fld id="{1D8BD707-D9CF-40AE-B4C6-C98DA3205C09}" type="datetimeFigureOut">
               <a:rPr lang="en-US" smtClean="0"/>
               <a:pPr/>
-              <a:t>12/7/2015</a:t>
+              <a:t>5/16/2016</a:t>
             </a:fld>
             <a:endParaRPr lang="en-US"/>
           </a:p>
@@ -1792,7 +1808,7 @@
             <a:fld id="{1D8BD707-D9CF-40AE-B4C6-C98DA3205C09}" type="datetimeFigureOut">
               <a:rPr lang="en-US" smtClean="0"/>
               <a:pPr/>
-              <a:t>12/7/2015</a:t>
+              <a:t>5/16/2016</a:t>
             </a:fld>
             <a:endParaRPr lang="en-US"/>
           </a:p>
@@ -2211,7 +2227,7 @@
             <a:fld id="{1D8BD707-D9CF-40AE-B4C6-C98DA3205C09}" type="datetimeFigureOut">
               <a:rPr lang="en-US" smtClean="0"/>
               <a:pPr/>
-              <a:t>12/7/2015</a:t>
+              <a:t>5/16/2016</a:t>
             </a:fld>
             <a:endParaRPr lang="en-US"/>
           </a:p>
@@ -2326,7 +2342,7 @@
             <a:fld id="{1D8BD707-D9CF-40AE-B4C6-C98DA3205C09}" type="datetimeFigureOut">
               <a:rPr lang="en-US" smtClean="0"/>
               <a:pPr/>
-              <a:t>12/7/2015</a:t>
+              <a:t>5/16/2016</a:t>
             </a:fld>
             <a:endParaRPr lang="en-US"/>
           </a:p>
@@ -2418,7 +2434,7 @@
             <a:fld id="{1D8BD707-D9CF-40AE-B4C6-C98DA3205C09}" type="datetimeFigureOut">
               <a:rPr lang="en-US" smtClean="0"/>
               <a:pPr/>
-              <a:t>12/7/2015</a:t>
+              <a:t>5/16/2016</a:t>
             </a:fld>
             <a:endParaRPr lang="en-US"/>
           </a:p>
@@ -2692,7 +2708,7 @@
             <a:fld id="{1D8BD707-D9CF-40AE-B4C6-C98DA3205C09}" type="datetimeFigureOut">
               <a:rPr lang="en-US" smtClean="0"/>
               <a:pPr/>
-              <a:t>12/7/2015</a:t>
+              <a:t>5/16/2016</a:t>
             </a:fld>
             <a:endParaRPr lang="en-US"/>
           </a:p>
@@ -2942,7 +2958,7 @@
             <a:fld id="{1D8BD707-D9CF-40AE-B4C6-C98DA3205C09}" type="datetimeFigureOut">
               <a:rPr lang="en-US" smtClean="0"/>
               <a:pPr/>
-              <a:t>12/7/2015</a:t>
+              <a:t>5/16/2016</a:t>
             </a:fld>
             <a:endParaRPr lang="en-US"/>
           </a:p>
@@ -3152,7 +3168,7 @@
             <a:fld id="{1D8BD707-D9CF-40AE-B4C6-C98DA3205C09}" type="datetimeFigureOut">
               <a:rPr lang="en-US" smtClean="0"/>
               <a:pPr/>
-              <a:t>12/7/2015</a:t>
+              <a:t>5/16/2016</a:t>
             </a:fld>
             <a:endParaRPr lang="en-US"/>
           </a:p>
@@ -17419,6 +17435,169 @@
           </a:p>
         </p:txBody>
       </p:sp>
+      <p:grpSp>
+        <p:nvGrpSpPr>
+          <p:cNvPr id="2" name="组合 1"/>
+          <p:cNvGrpSpPr/>
+          <p:nvPr/>
+        </p:nvGrpSpPr>
+        <p:grpSpPr>
+          <a:xfrm>
+            <a:off x="7927222" y="3027952"/>
+            <a:ext cx="420624" cy="420624"/>
+            <a:chOff x="7927222" y="3027952"/>
+            <a:chExt cx="420624" cy="420624"/>
+          </a:xfrm>
+        </p:grpSpPr>
+        <p:sp>
+          <p:nvSpPr>
+            <p:cNvPr id="68" name="Rectangle 54"/>
+            <p:cNvSpPr/>
+            <p:nvPr/>
+          </p:nvSpPr>
+          <p:spPr>
+            <a:xfrm>
+              <a:off x="7927222" y="3027952"/>
+              <a:ext cx="420624" cy="420624"/>
+            </a:xfrm>
+            <a:prstGeom prst="rect">
+              <a:avLst/>
+            </a:prstGeom>
+            <a:noFill/>
+            <a:ln>
+              <a:noFill/>
+            </a:ln>
+          </p:spPr>
+          <p:style>
+            <a:lnRef idx="2">
+              <a:schemeClr val="accent1">
+                <a:shade val="50000"/>
+              </a:schemeClr>
+            </a:lnRef>
+            <a:fillRef idx="1">
+              <a:schemeClr val="accent1"/>
+            </a:fillRef>
+            <a:effectRef idx="0">
+              <a:schemeClr val="accent1"/>
+            </a:effectRef>
+            <a:fontRef idx="minor">
+              <a:schemeClr val="lt1"/>
+            </a:fontRef>
+          </p:style>
+          <p:txBody>
+            <a:bodyPr rtlCol="0" anchor="ctr"/>
+            <a:lstStyle/>
+            <a:p>
+              <a:pPr algn="ctr"/>
+              <a:endParaRPr lang="en-US"/>
+            </a:p>
+          </p:txBody>
+        </p:sp>
+        <p:pic>
+          <p:nvPicPr>
+            <p:cNvPr id="69" name="Picture 2"/>
+            <p:cNvPicPr>
+              <a:picLocks noChangeAspect="1" noChangeArrowheads="1"/>
+            </p:cNvPicPr>
+            <p:nvPr/>
+          </p:nvPicPr>
+          <p:blipFill>
+            <a:blip r:embed="rId2">
+              <a:extLst>
+                <a:ext uri="{BEBA8EAE-BF5A-486C-A8C5-ECC9F3942E4B}">
+                  <a14:imgProps xmlns:a14="http://schemas.microsoft.com/office/drawing/2010/main">
+                    <a14:imgLayer r:embed="rId3">
+                      <a14:imgEffect>
+                        <a14:artisticBlur/>
+                      </a14:imgEffect>
+                    </a14:imgLayer>
+                  </a14:imgProps>
+                </a:ext>
+                <a:ext uri="{28A0092B-C50C-407E-A947-70E740481C1C}">
+                  <a14:useLocalDpi xmlns:a14="http://schemas.microsoft.com/office/drawing/2010/main" val="0"/>
+                </a:ext>
+              </a:extLst>
+            </a:blip>
+            <a:srcRect/>
+            <a:stretch>
+              <a:fillRect/>
+            </a:stretch>
+          </p:blipFill>
+          <p:spPr bwMode="auto">
+            <a:xfrm>
+              <a:off x="7930356" y="3032114"/>
+              <a:ext cx="414337" cy="414337"/>
+            </a:xfrm>
+            <a:prstGeom prst="rect">
+              <a:avLst/>
+            </a:prstGeom>
+            <a:noFill/>
+            <a:ln>
+              <a:noFill/>
+            </a:ln>
+            <a:effectLst/>
+            <a:extLst>
+              <a:ext uri="{909E8E84-426E-40DD-AFC4-6F175D3DCCD1}">
+                <a14:hiddenFill xmlns:a14="http://schemas.microsoft.com/office/drawing/2010/main">
+                  <a:solidFill>
+                    <a:schemeClr val="accent1"/>
+                  </a:solidFill>
+                </a14:hiddenFill>
+              </a:ext>
+              <a:ext uri="{91240B29-F687-4F45-9708-019B960494DF}">
+                <a14:hiddenLine xmlns:a14="http://schemas.microsoft.com/office/drawing/2010/main" w="9525">
+                  <a:solidFill>
+                    <a:schemeClr val="tx1"/>
+                  </a:solidFill>
+                  <a:miter lim="800000"/>
+                  <a:headEnd/>
+                  <a:tailEnd/>
+                </a14:hiddenLine>
+              </a:ext>
+              <a:ext uri="{AF507438-7753-43E0-B8FC-AC1667EBCBE1}">
+                <a14:hiddenEffects xmlns:a14="http://schemas.microsoft.com/office/drawing/2010/main">
+                  <a:effectLst>
+                    <a:outerShdw dist="35921" dir="2700000" algn="ctr" rotWithShape="0">
+                      <a:schemeClr val="bg2"/>
+                    </a:outerShdw>
+                  </a:effectLst>
+                </a14:hiddenEffects>
+              </a:ext>
+            </a:extLst>
+          </p:spPr>
+        </p:pic>
+      </p:grpSp>
+      <p:sp>
+        <p:nvSpPr>
+          <p:cNvPr id="87" name="[TextBox 40]"/>
+          <p:cNvSpPr txBox="1"/>
+          <p:nvPr/>
+        </p:nvSpPr>
+        <p:spPr>
+          <a:xfrm>
+            <a:off x="7617622" y="3704961"/>
+            <a:ext cx="1039803" cy="261610"/>
+          </a:xfrm>
+          <a:prstGeom prst="rect">
+            <a:avLst/>
+          </a:prstGeom>
+          <a:noFill/>
+        </p:spPr>
+        <p:txBody>
+          <a:bodyPr wrap="square" rtlCol="0">
+            <a:spAutoFit/>
+          </a:bodyPr>
+          <a:lstStyle/>
+          <a:p>
+            <a:pPr algn="ctr"/>
+            <a:r>
+              <a:rPr lang="en-US" sz="1100" dirty="0" smtClean="0"/>
+              <a:t>Frost</a:t>
+            </a:r>
+            <a:endParaRPr lang="en-US" sz="1100" dirty="0" smtClean="0"/>
+          </a:p>
+        </p:txBody>
+      </p:sp>
     </p:spTree>
     <p:extLst>
       <p:ext uri="{BB962C8B-B14F-4D97-AF65-F5344CB8AC3E}">

</xml_diff>

<commit_message>
Revert "#944 Add button for frosted glass feature"
This reverts commit 2d1268bbd5f498cc560392d2ff2ce7bc981160e2.
</commit_message>
<xml_diff>
--- a/doc/Icons.pptx
+++ b/doc/Icons.pptx
@@ -20,22 +20,22 @@
   <p:notesSz cx="6858000" cy="9144000"/>
   <p:embeddedFontLst>
     <p:embeddedFont>
+      <p:font typeface="Arial Black" panose="020B0A04020102020204" pitchFamily="34" charset="0"/>
+      <p:bold r:id="rId10"/>
+    </p:embeddedFont>
+    <p:embeddedFont>
+      <p:font typeface="Gill Sans Ultra Bold" panose="020B0A02020104020203" pitchFamily="34" charset="0"/>
+      <p:regular r:id="rId11"/>
+    </p:embeddedFont>
+    <p:embeddedFont>
       <p:font typeface="Calibri" panose="020F0502020204030204" pitchFamily="34" charset="0"/>
-      <p:regular r:id="rId10"/>
-      <p:bold r:id="rId11"/>
-      <p:italic r:id="rId12"/>
-      <p:boldItalic r:id="rId13"/>
+      <p:regular r:id="rId12"/>
+      <p:bold r:id="rId13"/>
+      <p:italic r:id="rId14"/>
+      <p:boldItalic r:id="rId15"/>
     </p:embeddedFont>
     <p:embeddedFont>
       <p:font typeface="Rockwell Extra Bold" panose="02060903040505020403" pitchFamily="18" charset="0"/>
-      <p:bold r:id="rId14"/>
-    </p:embeddedFont>
-    <p:embeddedFont>
-      <p:font typeface="Gill Sans Ultra Bold" panose="020B0A02020104020203" pitchFamily="34" charset="0"/>
-      <p:regular r:id="rId15"/>
-    </p:embeddedFont>
-    <p:embeddedFont>
-      <p:font typeface="Arial Black" panose="020B0A04020102020204" pitchFamily="34" charset="0"/>
       <p:bold r:id="rId16"/>
     </p:embeddedFont>
   </p:embeddedFontLst>
@@ -134,22 +134,6 @@
       </a:defRPr>
     </a:lvl9pPr>
   </p:defaultTextStyle>
-  <p:extLst>
-    <p:ext uri="{EFAFB233-063F-42B5-8137-9DF3F51BA10A}">
-      <p15:sldGuideLst xmlns:p15="http://schemas.microsoft.com/office/powerpoint/2012/main">
-        <p15:guide id="1" orient="horz" pos="2160">
-          <p15:clr>
-            <a:srgbClr val="A4A3A4"/>
-          </p15:clr>
-        </p15:guide>
-        <p15:guide id="2" pos="2880">
-          <p15:clr>
-            <a:srgbClr val="A4A3A4"/>
-          </p15:clr>
-        </p15:guide>
-      </p15:sldGuideLst>
-    </p:ext>
-  </p:extLst>
 </p:presentation>
 </file>
 
@@ -235,7 +219,7 @@
           <a:p>
             <a:fld id="{6699ACB9-486C-4D62-A3A7-AF98E13EFDA3}" type="datetimeFigureOut">
               <a:rPr lang="en-US" smtClean="0"/>
-              <a:t>5/16/2016</a:t>
+              <a:t>12/7/2015</a:t>
             </a:fld>
             <a:endParaRPr lang="en-US"/>
           </a:p>
@@ -769,7 +753,7 @@
             <a:fld id="{1D8BD707-D9CF-40AE-B4C6-C98DA3205C09}" type="datetimeFigureOut">
               <a:rPr lang="en-US" smtClean="0"/>
               <a:pPr/>
-              <a:t>5/16/2016</a:t>
+              <a:t>12/7/2015</a:t>
             </a:fld>
             <a:endParaRPr lang="en-US"/>
           </a:p>
@@ -936,7 +920,7 @@
             <a:fld id="{1D8BD707-D9CF-40AE-B4C6-C98DA3205C09}" type="datetimeFigureOut">
               <a:rPr lang="en-US" smtClean="0"/>
               <a:pPr/>
-              <a:t>5/16/2016</a:t>
+              <a:t>12/7/2015</a:t>
             </a:fld>
             <a:endParaRPr lang="en-US"/>
           </a:p>
@@ -1113,7 +1097,7 @@
             <a:fld id="{1D8BD707-D9CF-40AE-B4C6-C98DA3205C09}" type="datetimeFigureOut">
               <a:rPr lang="en-US" smtClean="0"/>
               <a:pPr/>
-              <a:t>5/16/2016</a:t>
+              <a:t>12/7/2015</a:t>
             </a:fld>
             <a:endParaRPr lang="en-US"/>
           </a:p>
@@ -1280,7 +1264,7 @@
             <a:fld id="{1D8BD707-D9CF-40AE-B4C6-C98DA3205C09}" type="datetimeFigureOut">
               <a:rPr lang="en-US" smtClean="0"/>
               <a:pPr/>
-              <a:t>5/16/2016</a:t>
+              <a:t>12/7/2015</a:t>
             </a:fld>
             <a:endParaRPr lang="en-US"/>
           </a:p>
@@ -1523,7 +1507,7 @@
             <a:fld id="{1D8BD707-D9CF-40AE-B4C6-C98DA3205C09}" type="datetimeFigureOut">
               <a:rPr lang="en-US" smtClean="0"/>
               <a:pPr/>
-              <a:t>5/16/2016</a:t>
+              <a:t>12/7/2015</a:t>
             </a:fld>
             <a:endParaRPr lang="en-US"/>
           </a:p>
@@ -1808,7 +1792,7 @@
             <a:fld id="{1D8BD707-D9CF-40AE-B4C6-C98DA3205C09}" type="datetimeFigureOut">
               <a:rPr lang="en-US" smtClean="0"/>
               <a:pPr/>
-              <a:t>5/16/2016</a:t>
+              <a:t>12/7/2015</a:t>
             </a:fld>
             <a:endParaRPr lang="en-US"/>
           </a:p>
@@ -2227,7 +2211,7 @@
             <a:fld id="{1D8BD707-D9CF-40AE-B4C6-C98DA3205C09}" type="datetimeFigureOut">
               <a:rPr lang="en-US" smtClean="0"/>
               <a:pPr/>
-              <a:t>5/16/2016</a:t>
+              <a:t>12/7/2015</a:t>
             </a:fld>
             <a:endParaRPr lang="en-US"/>
           </a:p>
@@ -2342,7 +2326,7 @@
             <a:fld id="{1D8BD707-D9CF-40AE-B4C6-C98DA3205C09}" type="datetimeFigureOut">
               <a:rPr lang="en-US" smtClean="0"/>
               <a:pPr/>
-              <a:t>5/16/2016</a:t>
+              <a:t>12/7/2015</a:t>
             </a:fld>
             <a:endParaRPr lang="en-US"/>
           </a:p>
@@ -2434,7 +2418,7 @@
             <a:fld id="{1D8BD707-D9CF-40AE-B4C6-C98DA3205C09}" type="datetimeFigureOut">
               <a:rPr lang="en-US" smtClean="0"/>
               <a:pPr/>
-              <a:t>5/16/2016</a:t>
+              <a:t>12/7/2015</a:t>
             </a:fld>
             <a:endParaRPr lang="en-US"/>
           </a:p>
@@ -2708,7 +2692,7 @@
             <a:fld id="{1D8BD707-D9CF-40AE-B4C6-C98DA3205C09}" type="datetimeFigureOut">
               <a:rPr lang="en-US" smtClean="0"/>
               <a:pPr/>
-              <a:t>5/16/2016</a:t>
+              <a:t>12/7/2015</a:t>
             </a:fld>
             <a:endParaRPr lang="en-US"/>
           </a:p>
@@ -2958,7 +2942,7 @@
             <a:fld id="{1D8BD707-D9CF-40AE-B4C6-C98DA3205C09}" type="datetimeFigureOut">
               <a:rPr lang="en-US" smtClean="0"/>
               <a:pPr/>
-              <a:t>5/16/2016</a:t>
+              <a:t>12/7/2015</a:t>
             </a:fld>
             <a:endParaRPr lang="en-US"/>
           </a:p>
@@ -3168,7 +3152,7 @@
             <a:fld id="{1D8BD707-D9CF-40AE-B4C6-C98DA3205C09}" type="datetimeFigureOut">
               <a:rPr lang="en-US" smtClean="0"/>
               <a:pPr/>
-              <a:t>5/16/2016</a:t>
+              <a:t>12/7/2015</a:t>
             </a:fld>
             <a:endParaRPr lang="en-US"/>
           </a:p>
@@ -17435,169 +17419,6 @@
           </a:p>
         </p:txBody>
       </p:sp>
-      <p:grpSp>
-        <p:nvGrpSpPr>
-          <p:cNvPr id="2" name="组合 1"/>
-          <p:cNvGrpSpPr/>
-          <p:nvPr/>
-        </p:nvGrpSpPr>
-        <p:grpSpPr>
-          <a:xfrm>
-            <a:off x="7927222" y="3027952"/>
-            <a:ext cx="420624" cy="420624"/>
-            <a:chOff x="7927222" y="3027952"/>
-            <a:chExt cx="420624" cy="420624"/>
-          </a:xfrm>
-        </p:grpSpPr>
-        <p:sp>
-          <p:nvSpPr>
-            <p:cNvPr id="68" name="Rectangle 54"/>
-            <p:cNvSpPr/>
-            <p:nvPr/>
-          </p:nvSpPr>
-          <p:spPr>
-            <a:xfrm>
-              <a:off x="7927222" y="3027952"/>
-              <a:ext cx="420624" cy="420624"/>
-            </a:xfrm>
-            <a:prstGeom prst="rect">
-              <a:avLst/>
-            </a:prstGeom>
-            <a:noFill/>
-            <a:ln>
-              <a:noFill/>
-            </a:ln>
-          </p:spPr>
-          <p:style>
-            <a:lnRef idx="2">
-              <a:schemeClr val="accent1">
-                <a:shade val="50000"/>
-              </a:schemeClr>
-            </a:lnRef>
-            <a:fillRef idx="1">
-              <a:schemeClr val="accent1"/>
-            </a:fillRef>
-            <a:effectRef idx="0">
-              <a:schemeClr val="accent1"/>
-            </a:effectRef>
-            <a:fontRef idx="minor">
-              <a:schemeClr val="lt1"/>
-            </a:fontRef>
-          </p:style>
-          <p:txBody>
-            <a:bodyPr rtlCol="0" anchor="ctr"/>
-            <a:lstStyle/>
-            <a:p>
-              <a:pPr algn="ctr"/>
-              <a:endParaRPr lang="en-US"/>
-            </a:p>
-          </p:txBody>
-        </p:sp>
-        <p:pic>
-          <p:nvPicPr>
-            <p:cNvPr id="69" name="Picture 2"/>
-            <p:cNvPicPr>
-              <a:picLocks noChangeAspect="1" noChangeArrowheads="1"/>
-            </p:cNvPicPr>
-            <p:nvPr/>
-          </p:nvPicPr>
-          <p:blipFill>
-            <a:blip r:embed="rId2">
-              <a:extLst>
-                <a:ext uri="{BEBA8EAE-BF5A-486C-A8C5-ECC9F3942E4B}">
-                  <a14:imgProps xmlns:a14="http://schemas.microsoft.com/office/drawing/2010/main">
-                    <a14:imgLayer r:embed="rId3">
-                      <a14:imgEffect>
-                        <a14:artisticBlur/>
-                      </a14:imgEffect>
-                    </a14:imgLayer>
-                  </a14:imgProps>
-                </a:ext>
-                <a:ext uri="{28A0092B-C50C-407E-A947-70E740481C1C}">
-                  <a14:useLocalDpi xmlns:a14="http://schemas.microsoft.com/office/drawing/2010/main" val="0"/>
-                </a:ext>
-              </a:extLst>
-            </a:blip>
-            <a:srcRect/>
-            <a:stretch>
-              <a:fillRect/>
-            </a:stretch>
-          </p:blipFill>
-          <p:spPr bwMode="auto">
-            <a:xfrm>
-              <a:off x="7930356" y="3032114"/>
-              <a:ext cx="414337" cy="414337"/>
-            </a:xfrm>
-            <a:prstGeom prst="rect">
-              <a:avLst/>
-            </a:prstGeom>
-            <a:noFill/>
-            <a:ln>
-              <a:noFill/>
-            </a:ln>
-            <a:effectLst/>
-            <a:extLst>
-              <a:ext uri="{909E8E84-426E-40DD-AFC4-6F175D3DCCD1}">
-                <a14:hiddenFill xmlns:a14="http://schemas.microsoft.com/office/drawing/2010/main">
-                  <a:solidFill>
-                    <a:schemeClr val="accent1"/>
-                  </a:solidFill>
-                </a14:hiddenFill>
-              </a:ext>
-              <a:ext uri="{91240B29-F687-4F45-9708-019B960494DF}">
-                <a14:hiddenLine xmlns:a14="http://schemas.microsoft.com/office/drawing/2010/main" w="9525">
-                  <a:solidFill>
-                    <a:schemeClr val="tx1"/>
-                  </a:solidFill>
-                  <a:miter lim="800000"/>
-                  <a:headEnd/>
-                  <a:tailEnd/>
-                </a14:hiddenLine>
-              </a:ext>
-              <a:ext uri="{AF507438-7753-43E0-B8FC-AC1667EBCBE1}">
-                <a14:hiddenEffects xmlns:a14="http://schemas.microsoft.com/office/drawing/2010/main">
-                  <a:effectLst>
-                    <a:outerShdw dist="35921" dir="2700000" algn="ctr" rotWithShape="0">
-                      <a:schemeClr val="bg2"/>
-                    </a:outerShdw>
-                  </a:effectLst>
-                </a14:hiddenEffects>
-              </a:ext>
-            </a:extLst>
-          </p:spPr>
-        </p:pic>
-      </p:grpSp>
-      <p:sp>
-        <p:nvSpPr>
-          <p:cNvPr id="87" name="[TextBox 40]"/>
-          <p:cNvSpPr txBox="1"/>
-          <p:nvPr/>
-        </p:nvSpPr>
-        <p:spPr>
-          <a:xfrm>
-            <a:off x="7617622" y="3704961"/>
-            <a:ext cx="1039803" cy="261610"/>
-          </a:xfrm>
-          <a:prstGeom prst="rect">
-            <a:avLst/>
-          </a:prstGeom>
-          <a:noFill/>
-        </p:spPr>
-        <p:txBody>
-          <a:bodyPr wrap="square" rtlCol="0">
-            <a:spAutoFit/>
-          </a:bodyPr>
-          <a:lstStyle/>
-          <a:p>
-            <a:pPr algn="ctr"/>
-            <a:r>
-              <a:rPr lang="en-US" sz="1100" dirty="0" smtClean="0"/>
-              <a:t>Frost</a:t>
-            </a:r>
-            <a:endParaRPr lang="en-US" sz="1100" dirty="0" smtClean="0"/>
-          </a:p>
-        </p:txBody>
-      </p:sp>
     </p:spTree>
     <p:extLst>
       <p:ext uri="{BB962C8B-B14F-4D97-AF65-F5344CB8AC3E}">

</xml_diff>

<commit_message>
#994 Add button for the function
Add button for the function, but still working on the function of the
button.
</commit_message>
<xml_diff>
--- a/doc/Icons.pptx
+++ b/doc/Icons.pptx
@@ -20,22 +20,22 @@
   <p:notesSz cx="6858000" cy="9144000"/>
   <p:embeddedFontLst>
     <p:embeddedFont>
-      <p:font typeface="Arial Black" panose="020B0A04020102020204" pitchFamily="34" charset="0"/>
-      <p:bold r:id="rId10"/>
+      <p:font typeface="Calibri" panose="020F0502020204030204" pitchFamily="34" charset="0"/>
+      <p:regular r:id="rId10"/>
+      <p:bold r:id="rId11"/>
+      <p:italic r:id="rId12"/>
+      <p:boldItalic r:id="rId13"/>
+    </p:embeddedFont>
+    <p:embeddedFont>
+      <p:font typeface="Rockwell Extra Bold" panose="02060903040505020403" pitchFamily="18" charset="0"/>
+      <p:bold r:id="rId14"/>
     </p:embeddedFont>
     <p:embeddedFont>
       <p:font typeface="Gill Sans Ultra Bold" panose="020B0A02020104020203" pitchFamily="34" charset="0"/>
-      <p:regular r:id="rId11"/>
+      <p:regular r:id="rId15"/>
     </p:embeddedFont>
     <p:embeddedFont>
-      <p:font typeface="Calibri" panose="020F0502020204030204" pitchFamily="34" charset="0"/>
-      <p:regular r:id="rId12"/>
-      <p:bold r:id="rId13"/>
-      <p:italic r:id="rId14"/>
-      <p:boldItalic r:id="rId15"/>
-    </p:embeddedFont>
-    <p:embeddedFont>
-      <p:font typeface="Rockwell Extra Bold" panose="02060903040505020403" pitchFamily="18" charset="0"/>
+      <p:font typeface="Arial Black" panose="020B0A04020102020204" pitchFamily="34" charset="0"/>
       <p:bold r:id="rId16"/>
     </p:embeddedFont>
   </p:embeddedFontLst>
@@ -134,6 +134,22 @@
       </a:defRPr>
     </a:lvl9pPr>
   </p:defaultTextStyle>
+  <p:extLst>
+    <p:ext uri="{EFAFB233-063F-42B5-8137-9DF3F51BA10A}">
+      <p15:sldGuideLst xmlns:p15="http://schemas.microsoft.com/office/powerpoint/2012/main">
+        <p15:guide id="1" orient="horz" pos="2160">
+          <p15:clr>
+            <a:srgbClr val="A4A3A4"/>
+          </p15:clr>
+        </p15:guide>
+        <p15:guide id="2" pos="2880">
+          <p15:clr>
+            <a:srgbClr val="A4A3A4"/>
+          </p15:clr>
+        </p15:guide>
+      </p15:sldGuideLst>
+    </p:ext>
+  </p:extLst>
 </p:presentation>
 </file>
 
@@ -219,7 +235,7 @@
           <a:p>
             <a:fld id="{6699ACB9-486C-4D62-A3A7-AF98E13EFDA3}" type="datetimeFigureOut">
               <a:rPr lang="en-US" smtClean="0"/>
-              <a:t>12/7/2015</a:t>
+              <a:t>5/17/2016</a:t>
             </a:fld>
             <a:endParaRPr lang="en-US"/>
           </a:p>
@@ -753,7 +769,7 @@
             <a:fld id="{1D8BD707-D9CF-40AE-B4C6-C98DA3205C09}" type="datetimeFigureOut">
               <a:rPr lang="en-US" smtClean="0"/>
               <a:pPr/>
-              <a:t>12/7/2015</a:t>
+              <a:t>5/17/2016</a:t>
             </a:fld>
             <a:endParaRPr lang="en-US"/>
           </a:p>
@@ -920,7 +936,7 @@
             <a:fld id="{1D8BD707-D9CF-40AE-B4C6-C98DA3205C09}" type="datetimeFigureOut">
               <a:rPr lang="en-US" smtClean="0"/>
               <a:pPr/>
-              <a:t>12/7/2015</a:t>
+              <a:t>5/17/2016</a:t>
             </a:fld>
             <a:endParaRPr lang="en-US"/>
           </a:p>
@@ -1097,7 +1113,7 @@
             <a:fld id="{1D8BD707-D9CF-40AE-B4C6-C98DA3205C09}" type="datetimeFigureOut">
               <a:rPr lang="en-US" smtClean="0"/>
               <a:pPr/>
-              <a:t>12/7/2015</a:t>
+              <a:t>5/17/2016</a:t>
             </a:fld>
             <a:endParaRPr lang="en-US"/>
           </a:p>
@@ -1264,7 +1280,7 @@
             <a:fld id="{1D8BD707-D9CF-40AE-B4C6-C98DA3205C09}" type="datetimeFigureOut">
               <a:rPr lang="en-US" smtClean="0"/>
               <a:pPr/>
-              <a:t>12/7/2015</a:t>
+              <a:t>5/17/2016</a:t>
             </a:fld>
             <a:endParaRPr lang="en-US"/>
           </a:p>
@@ -1507,7 +1523,7 @@
             <a:fld id="{1D8BD707-D9CF-40AE-B4C6-C98DA3205C09}" type="datetimeFigureOut">
               <a:rPr lang="en-US" smtClean="0"/>
               <a:pPr/>
-              <a:t>12/7/2015</a:t>
+              <a:t>5/17/2016</a:t>
             </a:fld>
             <a:endParaRPr lang="en-US"/>
           </a:p>
@@ -1792,7 +1808,7 @@
             <a:fld id="{1D8BD707-D9CF-40AE-B4C6-C98DA3205C09}" type="datetimeFigureOut">
               <a:rPr lang="en-US" smtClean="0"/>
               <a:pPr/>
-              <a:t>12/7/2015</a:t>
+              <a:t>5/17/2016</a:t>
             </a:fld>
             <a:endParaRPr lang="en-US"/>
           </a:p>
@@ -2211,7 +2227,7 @@
             <a:fld id="{1D8BD707-D9CF-40AE-B4C6-C98DA3205C09}" type="datetimeFigureOut">
               <a:rPr lang="en-US" smtClean="0"/>
               <a:pPr/>
-              <a:t>12/7/2015</a:t>
+              <a:t>5/17/2016</a:t>
             </a:fld>
             <a:endParaRPr lang="en-US"/>
           </a:p>
@@ -2326,7 +2342,7 @@
             <a:fld id="{1D8BD707-D9CF-40AE-B4C6-C98DA3205C09}" type="datetimeFigureOut">
               <a:rPr lang="en-US" smtClean="0"/>
               <a:pPr/>
-              <a:t>12/7/2015</a:t>
+              <a:t>5/17/2016</a:t>
             </a:fld>
             <a:endParaRPr lang="en-US"/>
           </a:p>
@@ -2418,7 +2434,7 @@
             <a:fld id="{1D8BD707-D9CF-40AE-B4C6-C98DA3205C09}" type="datetimeFigureOut">
               <a:rPr lang="en-US" smtClean="0"/>
               <a:pPr/>
-              <a:t>12/7/2015</a:t>
+              <a:t>5/17/2016</a:t>
             </a:fld>
             <a:endParaRPr lang="en-US"/>
           </a:p>
@@ -2692,7 +2708,7 @@
             <a:fld id="{1D8BD707-D9CF-40AE-B4C6-C98DA3205C09}" type="datetimeFigureOut">
               <a:rPr lang="en-US" smtClean="0"/>
               <a:pPr/>
-              <a:t>12/7/2015</a:t>
+              <a:t>5/17/2016</a:t>
             </a:fld>
             <a:endParaRPr lang="en-US"/>
           </a:p>
@@ -2942,7 +2958,7 @@
             <a:fld id="{1D8BD707-D9CF-40AE-B4C6-C98DA3205C09}" type="datetimeFigureOut">
               <a:rPr lang="en-US" smtClean="0"/>
               <a:pPr/>
-              <a:t>12/7/2015</a:t>
+              <a:t>5/17/2016</a:t>
             </a:fld>
             <a:endParaRPr lang="en-US"/>
           </a:p>
@@ -3152,7 +3168,7 @@
             <a:fld id="{1D8BD707-D9CF-40AE-B4C6-C98DA3205C09}" type="datetimeFigureOut">
               <a:rPr lang="en-US" smtClean="0"/>
               <a:pPr/>
-              <a:t>12/7/2015</a:t>
+              <a:t>5/17/2016</a:t>
             </a:fld>
             <a:endParaRPr lang="en-US"/>
           </a:p>
@@ -17419,6 +17435,168 @@
           </a:p>
         </p:txBody>
       </p:sp>
+      <p:sp>
+        <p:nvSpPr>
+          <p:cNvPr id="42" name="[TextBox 40]"/>
+          <p:cNvSpPr txBox="1"/>
+          <p:nvPr/>
+        </p:nvSpPr>
+        <p:spPr>
+          <a:xfrm>
+            <a:off x="7617622" y="3688341"/>
+            <a:ext cx="1039803" cy="261610"/>
+          </a:xfrm>
+          <a:prstGeom prst="rect">
+            <a:avLst/>
+          </a:prstGeom>
+          <a:noFill/>
+        </p:spPr>
+        <p:txBody>
+          <a:bodyPr wrap="square" rtlCol="0">
+            <a:spAutoFit/>
+          </a:bodyPr>
+          <a:lstStyle/>
+          <a:p>
+            <a:pPr algn="ctr"/>
+            <a:r>
+              <a:rPr lang="en-US" sz="1100" dirty="0" smtClean="0"/>
+              <a:t>Frost</a:t>
+            </a:r>
+          </a:p>
+        </p:txBody>
+      </p:sp>
+      <p:grpSp>
+        <p:nvGrpSpPr>
+          <p:cNvPr id="2" name="组合 1"/>
+          <p:cNvGrpSpPr/>
+          <p:nvPr/>
+        </p:nvGrpSpPr>
+        <p:grpSpPr>
+          <a:xfrm>
+            <a:off x="7930356" y="3083196"/>
+            <a:ext cx="420624" cy="420624"/>
+            <a:chOff x="7927728" y="2986770"/>
+            <a:chExt cx="420624" cy="420624"/>
+          </a:xfrm>
+        </p:grpSpPr>
+        <p:sp>
+          <p:nvSpPr>
+            <p:cNvPr id="44" name="Rectangle 54"/>
+            <p:cNvSpPr/>
+            <p:nvPr/>
+          </p:nvSpPr>
+          <p:spPr>
+            <a:xfrm>
+              <a:off x="7927728" y="2986770"/>
+              <a:ext cx="420624" cy="420624"/>
+            </a:xfrm>
+            <a:prstGeom prst="rect">
+              <a:avLst/>
+            </a:prstGeom>
+            <a:noFill/>
+            <a:ln>
+              <a:noFill/>
+            </a:ln>
+          </p:spPr>
+          <p:style>
+            <a:lnRef idx="2">
+              <a:schemeClr val="accent1">
+                <a:shade val="50000"/>
+              </a:schemeClr>
+            </a:lnRef>
+            <a:fillRef idx="1">
+              <a:schemeClr val="accent1"/>
+            </a:fillRef>
+            <a:effectRef idx="0">
+              <a:schemeClr val="accent1"/>
+            </a:effectRef>
+            <a:fontRef idx="minor">
+              <a:schemeClr val="lt1"/>
+            </a:fontRef>
+          </p:style>
+          <p:txBody>
+            <a:bodyPr rtlCol="0" anchor="ctr"/>
+            <a:lstStyle/>
+            <a:p>
+              <a:pPr algn="ctr"/>
+              <a:endParaRPr lang="en-US"/>
+            </a:p>
+          </p:txBody>
+        </p:sp>
+        <p:pic>
+          <p:nvPicPr>
+            <p:cNvPr id="46" name="Picture 2"/>
+            <p:cNvPicPr>
+              <a:picLocks noChangeAspect="1" noChangeArrowheads="1"/>
+            </p:cNvPicPr>
+            <p:nvPr/>
+          </p:nvPicPr>
+          <p:blipFill>
+            <a:blip r:embed="rId2">
+              <a:extLst>
+                <a:ext uri="{BEBA8EAE-BF5A-486C-A8C5-ECC9F3942E4B}">
+                  <a14:imgProps xmlns:a14="http://schemas.microsoft.com/office/drawing/2010/main">
+                    <a14:imgLayer r:embed="rId3">
+                      <a14:imgEffect>
+                        <a14:artisticBlur/>
+                      </a14:imgEffect>
+                    </a14:imgLayer>
+                  </a14:imgProps>
+                </a:ext>
+                <a:ext uri="{28A0092B-C50C-407E-A947-70E740481C1C}">
+                  <a14:useLocalDpi xmlns:a14="http://schemas.microsoft.com/office/drawing/2010/main" val="0"/>
+                </a:ext>
+              </a:extLst>
+            </a:blip>
+            <a:srcRect/>
+            <a:stretch>
+              <a:fillRect/>
+            </a:stretch>
+          </p:blipFill>
+          <p:spPr bwMode="auto">
+            <a:xfrm>
+              <a:off x="7930862" y="2990932"/>
+              <a:ext cx="414337" cy="414337"/>
+            </a:xfrm>
+            <a:prstGeom prst="rect">
+              <a:avLst/>
+            </a:prstGeom>
+            <a:noFill/>
+            <a:ln>
+              <a:noFill/>
+            </a:ln>
+            <a:effectLst/>
+            <a:extLst>
+              <a:ext uri="{909E8E84-426E-40DD-AFC4-6F175D3DCCD1}">
+                <a14:hiddenFill xmlns:a14="http://schemas.microsoft.com/office/drawing/2010/main">
+                  <a:solidFill>
+                    <a:schemeClr val="accent1"/>
+                  </a:solidFill>
+                </a14:hiddenFill>
+              </a:ext>
+              <a:ext uri="{91240B29-F687-4F45-9708-019B960494DF}">
+                <a14:hiddenLine xmlns:a14="http://schemas.microsoft.com/office/drawing/2010/main" w="9525">
+                  <a:solidFill>
+                    <a:schemeClr val="tx1"/>
+                  </a:solidFill>
+                  <a:miter lim="800000"/>
+                  <a:headEnd/>
+                  <a:tailEnd/>
+                </a14:hiddenLine>
+              </a:ext>
+              <a:ext uri="{AF507438-7753-43E0-B8FC-AC1667EBCBE1}">
+                <a14:hiddenEffects xmlns:a14="http://schemas.microsoft.com/office/drawing/2010/main">
+                  <a:effectLst>
+                    <a:outerShdw dist="35921" dir="2700000" algn="ctr" rotWithShape="0">
+                      <a:schemeClr val="bg2"/>
+                    </a:outerShdw>
+                  </a:effectLst>
+                </a14:hiddenEffects>
+              </a:ext>
+            </a:extLst>
+          </p:spPr>
+        </p:pic>
+      </p:grpSp>
     </p:spTree>
     <p:extLst>
       <p:ext uri="{BB962C8B-B14F-4D97-AF65-F5344CB8AC3E}">

</xml_diff>

<commit_message>
added icon for frosted glass effect
</commit_message>
<xml_diff>
--- a/doc/Icons.pptx
+++ b/doc/Icons.pptx
@@ -24,15 +24,15 @@
       <p:bold r:id="rId10"/>
     </p:embeddedFont>
     <p:embeddedFont>
-      <p:font typeface="Gill Sans Ultra Bold" panose="020B0A02020104020203" pitchFamily="34" charset="0"/>
+      <p:font typeface="Calibri" panose="020F0502020204030204" pitchFamily="34" charset="0"/>
       <p:regular r:id="rId11"/>
+      <p:bold r:id="rId12"/>
+      <p:italic r:id="rId13"/>
+      <p:boldItalic r:id="rId14"/>
     </p:embeddedFont>
     <p:embeddedFont>
-      <p:font typeface="Calibri" panose="020F0502020204030204" pitchFamily="34" charset="0"/>
-      <p:regular r:id="rId12"/>
-      <p:bold r:id="rId13"/>
-      <p:italic r:id="rId14"/>
-      <p:boldItalic r:id="rId15"/>
+      <p:font typeface="Gill Sans Ultra Bold" panose="020B0A02020104020203" pitchFamily="34" charset="0"/>
+      <p:regular r:id="rId15"/>
     </p:embeddedFont>
     <p:embeddedFont>
       <p:font typeface="Rockwell Extra Bold" panose="02060903040505020403" pitchFamily="18" charset="0"/>
@@ -219,7 +219,7 @@
           <a:p>
             <a:fld id="{6699ACB9-486C-4D62-A3A7-AF98E13EFDA3}" type="datetimeFigureOut">
               <a:rPr lang="en-US" smtClean="0"/>
-              <a:t>12/7/2015</a:t>
+              <a:t>5/24/2016</a:t>
             </a:fld>
             <a:endParaRPr lang="en-US"/>
           </a:p>
@@ -753,7 +753,7 @@
             <a:fld id="{1D8BD707-D9CF-40AE-B4C6-C98DA3205C09}" type="datetimeFigureOut">
               <a:rPr lang="en-US" smtClean="0"/>
               <a:pPr/>
-              <a:t>12/7/2015</a:t>
+              <a:t>5/24/2016</a:t>
             </a:fld>
             <a:endParaRPr lang="en-US"/>
           </a:p>
@@ -920,7 +920,7 @@
             <a:fld id="{1D8BD707-D9CF-40AE-B4C6-C98DA3205C09}" type="datetimeFigureOut">
               <a:rPr lang="en-US" smtClean="0"/>
               <a:pPr/>
-              <a:t>12/7/2015</a:t>
+              <a:t>5/24/2016</a:t>
             </a:fld>
             <a:endParaRPr lang="en-US"/>
           </a:p>
@@ -1097,7 +1097,7 @@
             <a:fld id="{1D8BD707-D9CF-40AE-B4C6-C98DA3205C09}" type="datetimeFigureOut">
               <a:rPr lang="en-US" smtClean="0"/>
               <a:pPr/>
-              <a:t>12/7/2015</a:t>
+              <a:t>5/24/2016</a:t>
             </a:fld>
             <a:endParaRPr lang="en-US"/>
           </a:p>
@@ -1264,7 +1264,7 @@
             <a:fld id="{1D8BD707-D9CF-40AE-B4C6-C98DA3205C09}" type="datetimeFigureOut">
               <a:rPr lang="en-US" smtClean="0"/>
               <a:pPr/>
-              <a:t>12/7/2015</a:t>
+              <a:t>5/24/2016</a:t>
             </a:fld>
             <a:endParaRPr lang="en-US"/>
           </a:p>
@@ -1507,7 +1507,7 @@
             <a:fld id="{1D8BD707-D9CF-40AE-B4C6-C98DA3205C09}" type="datetimeFigureOut">
               <a:rPr lang="en-US" smtClean="0"/>
               <a:pPr/>
-              <a:t>12/7/2015</a:t>
+              <a:t>5/24/2016</a:t>
             </a:fld>
             <a:endParaRPr lang="en-US"/>
           </a:p>
@@ -1792,7 +1792,7 @@
             <a:fld id="{1D8BD707-D9CF-40AE-B4C6-C98DA3205C09}" type="datetimeFigureOut">
               <a:rPr lang="en-US" smtClean="0"/>
               <a:pPr/>
-              <a:t>12/7/2015</a:t>
+              <a:t>5/24/2016</a:t>
             </a:fld>
             <a:endParaRPr lang="en-US"/>
           </a:p>
@@ -2211,7 +2211,7 @@
             <a:fld id="{1D8BD707-D9CF-40AE-B4C6-C98DA3205C09}" type="datetimeFigureOut">
               <a:rPr lang="en-US" smtClean="0"/>
               <a:pPr/>
-              <a:t>12/7/2015</a:t>
+              <a:t>5/24/2016</a:t>
             </a:fld>
             <a:endParaRPr lang="en-US"/>
           </a:p>
@@ -2326,7 +2326,7 @@
             <a:fld id="{1D8BD707-D9CF-40AE-B4C6-C98DA3205C09}" type="datetimeFigureOut">
               <a:rPr lang="en-US" smtClean="0"/>
               <a:pPr/>
-              <a:t>12/7/2015</a:t>
+              <a:t>5/24/2016</a:t>
             </a:fld>
             <a:endParaRPr lang="en-US"/>
           </a:p>
@@ -2418,7 +2418,7 @@
             <a:fld id="{1D8BD707-D9CF-40AE-B4C6-C98DA3205C09}" type="datetimeFigureOut">
               <a:rPr lang="en-US" smtClean="0"/>
               <a:pPr/>
-              <a:t>12/7/2015</a:t>
+              <a:t>5/24/2016</a:t>
             </a:fld>
             <a:endParaRPr lang="en-US"/>
           </a:p>
@@ -2692,7 +2692,7 @@
             <a:fld id="{1D8BD707-D9CF-40AE-B4C6-C98DA3205C09}" type="datetimeFigureOut">
               <a:rPr lang="en-US" smtClean="0"/>
               <a:pPr/>
-              <a:t>12/7/2015</a:t>
+              <a:t>5/24/2016</a:t>
             </a:fld>
             <a:endParaRPr lang="en-US"/>
           </a:p>
@@ -2942,7 +2942,7 @@
             <a:fld id="{1D8BD707-D9CF-40AE-B4C6-C98DA3205C09}" type="datetimeFigureOut">
               <a:rPr lang="en-US" smtClean="0"/>
               <a:pPr/>
-              <a:t>12/7/2015</a:t>
+              <a:t>5/24/2016</a:t>
             </a:fld>
             <a:endParaRPr lang="en-US"/>
           </a:p>
@@ -3152,7 +3152,7 @@
             <a:fld id="{1D8BD707-D9CF-40AE-B4C6-C98DA3205C09}" type="datetimeFigureOut">
               <a:rPr lang="en-US" smtClean="0"/>
               <a:pPr/>
-              <a:t>12/7/2015</a:t>
+              <a:t>5/24/2016</a:t>
             </a:fld>
             <a:endParaRPr lang="en-US"/>
           </a:p>
@@ -17419,6 +17419,609 @@
           </a:p>
         </p:txBody>
       </p:sp>
+      <p:grpSp>
+        <p:nvGrpSpPr>
+          <p:cNvPr id="4" name="Group 3"/>
+          <p:cNvGrpSpPr/>
+          <p:nvPr/>
+        </p:nvGrpSpPr>
+        <p:grpSpPr>
+          <a:xfrm>
+            <a:off x="7683288" y="3029989"/>
+            <a:ext cx="420624" cy="420624"/>
+            <a:chOff x="5466561" y="4940328"/>
+            <a:chExt cx="420624" cy="420624"/>
+          </a:xfrm>
+        </p:grpSpPr>
+        <p:grpSp>
+          <p:nvGrpSpPr>
+            <p:cNvPr id="41" name="Group 40"/>
+            <p:cNvGrpSpPr/>
+            <p:nvPr/>
+          </p:nvGrpSpPr>
+          <p:grpSpPr>
+            <a:xfrm>
+              <a:off x="5466561" y="4940328"/>
+              <a:ext cx="420624" cy="420624"/>
+              <a:chOff x="5362120" y="2996073"/>
+              <a:chExt cx="420624" cy="420624"/>
+            </a:xfrm>
+          </p:grpSpPr>
+          <p:sp>
+            <p:nvSpPr>
+              <p:cNvPr id="42" name="Rectangle 41"/>
+              <p:cNvSpPr/>
+              <p:nvPr/>
+            </p:nvSpPr>
+            <p:spPr>
+              <a:xfrm>
+                <a:off x="5362120" y="2996073"/>
+                <a:ext cx="420624" cy="420624"/>
+              </a:xfrm>
+              <a:prstGeom prst="rect">
+                <a:avLst/>
+              </a:prstGeom>
+              <a:noFill/>
+              <a:ln>
+                <a:noFill/>
+              </a:ln>
+            </p:spPr>
+            <p:style>
+              <a:lnRef idx="2">
+                <a:schemeClr val="accent1">
+                  <a:shade val="50000"/>
+                </a:schemeClr>
+              </a:lnRef>
+              <a:fillRef idx="1">
+                <a:schemeClr val="accent1"/>
+              </a:fillRef>
+              <a:effectRef idx="0">
+                <a:schemeClr val="accent1"/>
+              </a:effectRef>
+              <a:fontRef idx="minor">
+                <a:schemeClr val="lt1"/>
+              </a:fontRef>
+            </p:style>
+            <p:txBody>
+              <a:bodyPr rtlCol="0" anchor="ctr"/>
+              <a:lstStyle/>
+              <a:p>
+                <a:pPr algn="ctr"/>
+                <a:endParaRPr lang="en-US"/>
+              </a:p>
+            </p:txBody>
+          </p:sp>
+          <p:sp>
+            <p:nvSpPr>
+              <p:cNvPr id="44" name="Rectangle 43"/>
+              <p:cNvSpPr/>
+              <p:nvPr/>
+            </p:nvSpPr>
+            <p:spPr>
+              <a:xfrm>
+                <a:off x="5366691" y="2998110"/>
+                <a:ext cx="108342" cy="118491"/>
+              </a:xfrm>
+              <a:prstGeom prst="rect">
+                <a:avLst/>
+              </a:prstGeom>
+              <a:solidFill>
+                <a:schemeClr val="bg1">
+                  <a:lumMod val="50000"/>
+                </a:schemeClr>
+              </a:solidFill>
+              <a:ln>
+                <a:noFill/>
+              </a:ln>
+            </p:spPr>
+            <p:style>
+              <a:lnRef idx="2">
+                <a:schemeClr val="accent1">
+                  <a:shade val="50000"/>
+                </a:schemeClr>
+              </a:lnRef>
+              <a:fillRef idx="1">
+                <a:schemeClr val="accent1"/>
+              </a:fillRef>
+              <a:effectRef idx="0">
+                <a:schemeClr val="accent1"/>
+              </a:effectRef>
+              <a:fontRef idx="minor">
+                <a:schemeClr val="lt1"/>
+              </a:fontRef>
+            </p:style>
+            <p:txBody>
+              <a:bodyPr rtlCol="0" anchor="ctr"/>
+              <a:lstStyle/>
+              <a:p>
+                <a:pPr algn="ctr"/>
+                <a:endParaRPr lang="en-US"/>
+              </a:p>
+            </p:txBody>
+          </p:sp>
+          <p:sp>
+            <p:nvSpPr>
+              <p:cNvPr id="46" name="Rectangle 45"/>
+              <p:cNvSpPr/>
+              <p:nvPr/>
+            </p:nvSpPr>
+            <p:spPr>
+              <a:xfrm>
+                <a:off x="5568135" y="2998110"/>
+                <a:ext cx="108342" cy="118491"/>
+              </a:xfrm>
+              <a:prstGeom prst="rect">
+                <a:avLst/>
+              </a:prstGeom>
+              <a:solidFill>
+                <a:schemeClr val="bg1">
+                  <a:lumMod val="50000"/>
+                </a:schemeClr>
+              </a:solidFill>
+              <a:ln>
+                <a:noFill/>
+              </a:ln>
+            </p:spPr>
+            <p:style>
+              <a:lnRef idx="2">
+                <a:schemeClr val="accent1">
+                  <a:shade val="50000"/>
+                </a:schemeClr>
+              </a:lnRef>
+              <a:fillRef idx="1">
+                <a:schemeClr val="accent1"/>
+              </a:fillRef>
+              <a:effectRef idx="0">
+                <a:schemeClr val="accent1"/>
+              </a:effectRef>
+              <a:fontRef idx="minor">
+                <a:schemeClr val="lt1"/>
+              </a:fontRef>
+            </p:style>
+            <p:txBody>
+              <a:bodyPr rtlCol="0" anchor="ctr"/>
+              <a:lstStyle/>
+              <a:p>
+                <a:pPr algn="ctr"/>
+                <a:endParaRPr lang="en-US"/>
+              </a:p>
+            </p:txBody>
+          </p:sp>
+          <p:sp>
+            <p:nvSpPr>
+              <p:cNvPr id="47" name="Rectangle 46"/>
+              <p:cNvSpPr/>
+              <p:nvPr/>
+            </p:nvSpPr>
+            <p:spPr>
+              <a:xfrm>
+                <a:off x="5468366" y="3114469"/>
+                <a:ext cx="108342" cy="118491"/>
+              </a:xfrm>
+              <a:prstGeom prst="rect">
+                <a:avLst/>
+              </a:prstGeom>
+              <a:solidFill>
+                <a:schemeClr val="bg1">
+                  <a:lumMod val="50000"/>
+                </a:schemeClr>
+              </a:solidFill>
+              <a:ln>
+                <a:noFill/>
+              </a:ln>
+            </p:spPr>
+            <p:style>
+              <a:lnRef idx="2">
+                <a:schemeClr val="accent1">
+                  <a:shade val="50000"/>
+                </a:schemeClr>
+              </a:lnRef>
+              <a:fillRef idx="1">
+                <a:schemeClr val="accent1"/>
+              </a:fillRef>
+              <a:effectRef idx="0">
+                <a:schemeClr val="accent1"/>
+              </a:effectRef>
+              <a:fontRef idx="minor">
+                <a:schemeClr val="lt1"/>
+              </a:fontRef>
+            </p:style>
+            <p:txBody>
+              <a:bodyPr rtlCol="0" anchor="ctr"/>
+              <a:lstStyle/>
+              <a:p>
+                <a:pPr algn="ctr"/>
+                <a:endParaRPr lang="en-US"/>
+              </a:p>
+            </p:txBody>
+          </p:sp>
+          <p:sp>
+            <p:nvSpPr>
+              <p:cNvPr id="49" name="Rectangle 48"/>
+              <p:cNvSpPr/>
+              <p:nvPr/>
+            </p:nvSpPr>
+            <p:spPr>
+              <a:xfrm>
+                <a:off x="5669811" y="3114469"/>
+                <a:ext cx="108342" cy="118491"/>
+              </a:xfrm>
+              <a:prstGeom prst="rect">
+                <a:avLst/>
+              </a:prstGeom>
+              <a:solidFill>
+                <a:schemeClr val="bg1">
+                  <a:lumMod val="50000"/>
+                </a:schemeClr>
+              </a:solidFill>
+              <a:ln>
+                <a:noFill/>
+              </a:ln>
+            </p:spPr>
+            <p:style>
+              <a:lnRef idx="2">
+                <a:schemeClr val="accent1">
+                  <a:shade val="50000"/>
+                </a:schemeClr>
+              </a:lnRef>
+              <a:fillRef idx="1">
+                <a:schemeClr val="accent1"/>
+              </a:fillRef>
+              <a:effectRef idx="0">
+                <a:schemeClr val="accent1"/>
+              </a:effectRef>
+              <a:fontRef idx="minor">
+                <a:schemeClr val="lt1"/>
+              </a:fontRef>
+            </p:style>
+            <p:txBody>
+              <a:bodyPr rtlCol="0" anchor="ctr"/>
+              <a:lstStyle/>
+              <a:p>
+                <a:pPr algn="ctr"/>
+                <a:endParaRPr lang="en-US"/>
+              </a:p>
+            </p:txBody>
+          </p:sp>
+          <p:sp>
+            <p:nvSpPr>
+              <p:cNvPr id="57" name="Rectangle 56"/>
+              <p:cNvSpPr/>
+              <p:nvPr/>
+            </p:nvSpPr>
+            <p:spPr>
+              <a:xfrm>
+                <a:off x="5366691" y="3229515"/>
+                <a:ext cx="108342" cy="118491"/>
+              </a:xfrm>
+              <a:prstGeom prst="rect">
+                <a:avLst/>
+              </a:prstGeom>
+              <a:solidFill>
+                <a:schemeClr val="bg1">
+                  <a:lumMod val="50000"/>
+                </a:schemeClr>
+              </a:solidFill>
+              <a:ln>
+                <a:noFill/>
+              </a:ln>
+            </p:spPr>
+            <p:style>
+              <a:lnRef idx="2">
+                <a:schemeClr val="accent1">
+                  <a:shade val="50000"/>
+                </a:schemeClr>
+              </a:lnRef>
+              <a:fillRef idx="1">
+                <a:schemeClr val="accent1"/>
+              </a:fillRef>
+              <a:effectRef idx="0">
+                <a:schemeClr val="accent1"/>
+              </a:effectRef>
+              <a:fontRef idx="minor">
+                <a:schemeClr val="lt1"/>
+              </a:fontRef>
+            </p:style>
+            <p:txBody>
+              <a:bodyPr rtlCol="0" anchor="ctr"/>
+              <a:lstStyle/>
+              <a:p>
+                <a:pPr algn="ctr"/>
+                <a:endParaRPr lang="en-US"/>
+              </a:p>
+            </p:txBody>
+          </p:sp>
+          <p:sp>
+            <p:nvSpPr>
+              <p:cNvPr id="58" name="Rectangle 57"/>
+              <p:cNvSpPr/>
+              <p:nvPr/>
+            </p:nvSpPr>
+            <p:spPr>
+              <a:xfrm>
+                <a:off x="5568135" y="3229515"/>
+                <a:ext cx="108342" cy="118491"/>
+              </a:xfrm>
+              <a:prstGeom prst="rect">
+                <a:avLst/>
+              </a:prstGeom>
+              <a:solidFill>
+                <a:schemeClr val="bg1">
+                  <a:lumMod val="50000"/>
+                </a:schemeClr>
+              </a:solidFill>
+              <a:ln>
+                <a:noFill/>
+              </a:ln>
+            </p:spPr>
+            <p:style>
+              <a:lnRef idx="2">
+                <a:schemeClr val="accent1">
+                  <a:shade val="50000"/>
+                </a:schemeClr>
+              </a:lnRef>
+              <a:fillRef idx="1">
+                <a:schemeClr val="accent1"/>
+              </a:fillRef>
+              <a:effectRef idx="0">
+                <a:schemeClr val="accent1"/>
+              </a:effectRef>
+              <a:fontRef idx="minor">
+                <a:schemeClr val="lt1"/>
+              </a:fontRef>
+            </p:style>
+            <p:txBody>
+              <a:bodyPr rtlCol="0" anchor="ctr"/>
+              <a:lstStyle/>
+              <a:p>
+                <a:pPr algn="ctr"/>
+                <a:endParaRPr lang="en-US"/>
+              </a:p>
+            </p:txBody>
+          </p:sp>
+          <p:sp>
+            <p:nvSpPr>
+              <p:cNvPr id="59" name="Rectangle 58"/>
+              <p:cNvSpPr/>
+              <p:nvPr/>
+            </p:nvSpPr>
+            <p:spPr>
+              <a:xfrm>
+                <a:off x="5468366" y="3345874"/>
+                <a:ext cx="108342" cy="70823"/>
+              </a:xfrm>
+              <a:prstGeom prst="rect">
+                <a:avLst/>
+              </a:prstGeom>
+              <a:solidFill>
+                <a:schemeClr val="bg1">
+                  <a:lumMod val="50000"/>
+                </a:schemeClr>
+              </a:solidFill>
+              <a:ln>
+                <a:noFill/>
+              </a:ln>
+            </p:spPr>
+            <p:style>
+              <a:lnRef idx="2">
+                <a:schemeClr val="accent1">
+                  <a:shade val="50000"/>
+                </a:schemeClr>
+              </a:lnRef>
+              <a:fillRef idx="1">
+                <a:schemeClr val="accent1"/>
+              </a:fillRef>
+              <a:effectRef idx="0">
+                <a:schemeClr val="accent1"/>
+              </a:effectRef>
+              <a:fontRef idx="minor">
+                <a:schemeClr val="lt1"/>
+              </a:fontRef>
+            </p:style>
+            <p:txBody>
+              <a:bodyPr rtlCol="0" anchor="ctr"/>
+              <a:lstStyle/>
+              <a:p>
+                <a:pPr algn="ctr"/>
+                <a:endParaRPr lang="en-US"/>
+              </a:p>
+            </p:txBody>
+          </p:sp>
+          <p:sp>
+            <p:nvSpPr>
+              <p:cNvPr id="60" name="Rectangle 59"/>
+              <p:cNvSpPr/>
+              <p:nvPr/>
+            </p:nvSpPr>
+            <p:spPr>
+              <a:xfrm>
+                <a:off x="5669811" y="3345874"/>
+                <a:ext cx="108342" cy="70823"/>
+              </a:xfrm>
+              <a:prstGeom prst="rect">
+                <a:avLst/>
+              </a:prstGeom>
+              <a:solidFill>
+                <a:schemeClr val="bg1">
+                  <a:lumMod val="50000"/>
+                </a:schemeClr>
+              </a:solidFill>
+              <a:ln>
+                <a:noFill/>
+              </a:ln>
+            </p:spPr>
+            <p:style>
+              <a:lnRef idx="2">
+                <a:schemeClr val="accent1">
+                  <a:shade val="50000"/>
+                </a:schemeClr>
+              </a:lnRef>
+              <a:fillRef idx="1">
+                <a:schemeClr val="accent1"/>
+              </a:fillRef>
+              <a:effectRef idx="0">
+                <a:schemeClr val="accent1"/>
+              </a:effectRef>
+              <a:fontRef idx="minor">
+                <a:schemeClr val="lt1"/>
+              </a:fontRef>
+            </p:style>
+            <p:txBody>
+              <a:bodyPr rtlCol="0" anchor="ctr"/>
+              <a:lstStyle/>
+              <a:p>
+                <a:pPr algn="ctr"/>
+                <a:endParaRPr lang="en-US"/>
+              </a:p>
+            </p:txBody>
+          </p:sp>
+        </p:grpSp>
+        <p:sp>
+          <p:nvSpPr>
+            <p:cNvPr id="2" name="Isosceles Triangle 1"/>
+            <p:cNvSpPr>
+              <a:spLocks/>
+            </p:cNvSpPr>
+            <p:nvPr/>
+          </p:nvSpPr>
+          <p:spPr>
+            <a:xfrm>
+              <a:off x="5502644" y="5001611"/>
+              <a:ext cx="361950" cy="249046"/>
+            </a:xfrm>
+            <a:prstGeom prst="triangle">
+              <a:avLst/>
+            </a:prstGeom>
+            <a:solidFill>
+              <a:schemeClr val="bg1"/>
+            </a:solidFill>
+            <a:ln>
+              <a:noFill/>
+            </a:ln>
+          </p:spPr>
+          <p:style>
+            <a:lnRef idx="2">
+              <a:schemeClr val="accent1">
+                <a:shade val="50000"/>
+              </a:schemeClr>
+            </a:lnRef>
+            <a:fillRef idx="1">
+              <a:schemeClr val="accent1"/>
+            </a:fillRef>
+            <a:effectRef idx="0">
+              <a:schemeClr val="accent1"/>
+            </a:effectRef>
+            <a:fontRef idx="minor">
+              <a:schemeClr val="lt1"/>
+            </a:fontRef>
+          </p:style>
+          <p:txBody>
+            <a:bodyPr rtlCol="0" anchor="ctr"/>
+            <a:lstStyle/>
+            <a:p>
+              <a:pPr algn="ctr"/>
+              <a:endParaRPr lang="en-SG"/>
+            </a:p>
+          </p:txBody>
+        </p:sp>
+        <p:pic>
+          <p:nvPicPr>
+            <p:cNvPr id="62" name="Picture 2"/>
+            <p:cNvPicPr>
+              <a:picLocks noChangeArrowheads="1"/>
+            </p:cNvPicPr>
+            <p:nvPr/>
+          </p:nvPicPr>
+          <p:blipFill rotWithShape="1">
+            <a:blip r:embed="rId2">
+              <a:extLst>
+                <a:ext uri="{BEBA8EAE-BF5A-486C-A8C5-ECC9F3942E4B}">
+                  <a14:imgProps xmlns:a14="http://schemas.microsoft.com/office/drawing/2010/main">
+                    <a14:imgLayer r:embed="rId3">
+                      <a14:imgEffect>
+                        <a14:artisticBlur/>
+                      </a14:imgEffect>
+                    </a14:imgLayer>
+                  </a14:imgProps>
+                </a:ext>
+                <a:ext uri="{28A0092B-C50C-407E-A947-70E740481C1C}">
+                  <a14:useLocalDpi xmlns:a14="http://schemas.microsoft.com/office/drawing/2010/main" val="0"/>
+                </a:ext>
+              </a:extLst>
+            </a:blip>
+            <a:srcRect l="8054" t="13611" r="4588" b="26284"/>
+            <a:stretch/>
+          </p:blipFill>
+          <p:spPr bwMode="auto">
+            <a:xfrm>
+              <a:off x="5502644" y="5001611"/>
+              <a:ext cx="361950" cy="249046"/>
+            </a:xfrm>
+            <a:prstGeom prst="triangle">
+              <a:avLst/>
+            </a:prstGeom>
+            <a:noFill/>
+            <a:ln w="9525">
+              <a:solidFill>
+                <a:schemeClr val="bg1"/>
+              </a:solidFill>
+              <a:miter lim="800000"/>
+              <a:headEnd/>
+              <a:tailEnd/>
+            </a:ln>
+            <a:effectLst/>
+            <a:extLst>
+              <a:ext uri="{909E8E84-426E-40DD-AFC4-6F175D3DCCD1}">
+                <a14:hiddenFill xmlns:a14="http://schemas.microsoft.com/office/drawing/2010/main">
+                  <a:solidFill>
+                    <a:schemeClr val="accent1"/>
+                  </a:solidFill>
+                </a14:hiddenFill>
+              </a:ext>
+              <a:ext uri="{AF507438-7753-43E0-B8FC-AC1667EBCBE1}">
+                <a14:hiddenEffects xmlns:a14="http://schemas.microsoft.com/office/drawing/2010/main">
+                  <a:effectLst>
+                    <a:outerShdw dist="35921" dir="2700000" algn="ctr" rotWithShape="0">
+                      <a:schemeClr val="bg2"/>
+                    </a:outerShdw>
+                  </a:effectLst>
+                </a14:hiddenEffects>
+              </a:ext>
+            </a:extLst>
+          </p:spPr>
+        </p:pic>
+      </p:grpSp>
+      <p:sp>
+        <p:nvSpPr>
+          <p:cNvPr id="67" name="[TextBox 40]"/>
+          <p:cNvSpPr txBox="1"/>
+          <p:nvPr/>
+        </p:nvSpPr>
+        <p:spPr>
+          <a:xfrm>
+            <a:off x="7473178" y="3698688"/>
+            <a:ext cx="1039803" cy="261610"/>
+          </a:xfrm>
+          <a:prstGeom prst="rect">
+            <a:avLst/>
+          </a:prstGeom>
+          <a:noFill/>
+        </p:spPr>
+        <p:txBody>
+          <a:bodyPr wrap="square" rtlCol="0">
+            <a:spAutoFit/>
+          </a:bodyPr>
+          <a:lstStyle/>
+          <a:p>
+            <a:pPr algn="ctr"/>
+            <a:r>
+              <a:rPr lang="en-US" sz="1100" dirty="0" smtClean="0"/>
+              <a:t>Frosted glass</a:t>
+            </a:r>
+            <a:endParaRPr lang="en-US" sz="1100" dirty="0" smtClean="0"/>
+          </a:p>
+        </p:txBody>
+      </p:sp>
     </p:spTree>
     <p:extLst>
       <p:ext uri="{BB962C8B-B14F-4D97-AF65-F5344CB8AC3E}">

</xml_diff>

<commit_message>
Design crop lab large icon and minimized icon
</commit_message>
<xml_diff>
--- a/doc/Icons.pptx
+++ b/doc/Icons.pptx
@@ -5,38 +5,40 @@
     <p:sldMasterId id="2147483648" r:id="rId1"/>
   </p:sldMasterIdLst>
   <p:notesMasterIdLst>
-    <p:notesMasterId r:id="rId9"/>
+    <p:notesMasterId r:id="rId11"/>
   </p:notesMasterIdLst>
   <p:sldIdLst>
     <p:sldId id="264" r:id="rId2"/>
-    <p:sldId id="266" r:id="rId3"/>
-    <p:sldId id="267" r:id="rId4"/>
-    <p:sldId id="268" r:id="rId5"/>
-    <p:sldId id="269" r:id="rId6"/>
-    <p:sldId id="270" r:id="rId7"/>
-    <p:sldId id="265" r:id="rId8"/>
+    <p:sldId id="271" r:id="rId3"/>
+    <p:sldId id="266" r:id="rId4"/>
+    <p:sldId id="267" r:id="rId5"/>
+    <p:sldId id="268" r:id="rId6"/>
+    <p:sldId id="269" r:id="rId7"/>
+    <p:sldId id="270" r:id="rId8"/>
+    <p:sldId id="272" r:id="rId9"/>
+    <p:sldId id="265" r:id="rId10"/>
   </p:sldIdLst>
   <p:sldSz cx="9144000" cy="6858000" type="screen4x3"/>
   <p:notesSz cx="6858000" cy="9144000"/>
   <p:embeddedFontLst>
     <p:embeddedFont>
-      <p:font typeface="Arial Black" panose="020B0A04020102020204" pitchFamily="34" charset="0"/>
-      <p:bold r:id="rId10"/>
+      <p:font typeface="Calibri" panose="020F0502020204030204" pitchFamily="34" charset="0"/>
+      <p:regular r:id="rId12"/>
+      <p:bold r:id="rId13"/>
+      <p:italic r:id="rId14"/>
+      <p:boldItalic r:id="rId15"/>
     </p:embeddedFont>
     <p:embeddedFont>
-      <p:font typeface="Calibri" panose="020F0502020204030204" pitchFamily="34" charset="0"/>
-      <p:regular r:id="rId11"/>
-      <p:bold r:id="rId12"/>
-      <p:italic r:id="rId13"/>
-      <p:boldItalic r:id="rId14"/>
+      <p:font typeface="Arial Black" panose="020B0A04020102020204" pitchFamily="34" charset="0"/>
+      <p:bold r:id="rId16"/>
     </p:embeddedFont>
     <p:embeddedFont>
       <p:font typeface="Gill Sans Ultra Bold" panose="020B0A02020104020203" pitchFamily="34" charset="0"/>
-      <p:regular r:id="rId15"/>
+      <p:regular r:id="rId17"/>
     </p:embeddedFont>
     <p:embeddedFont>
       <p:font typeface="Rockwell Extra Bold" panose="02060903040505020403" pitchFamily="18" charset="0"/>
-      <p:bold r:id="rId16"/>
+      <p:bold r:id="rId18"/>
     </p:embeddedFont>
   </p:embeddedFontLst>
   <p:defaultTextStyle>
@@ -134,6 +136,22 @@
       </a:defRPr>
     </a:lvl9pPr>
   </p:defaultTextStyle>
+  <p:extLst>
+    <p:ext uri="{EFAFB233-063F-42B5-8137-9DF3F51BA10A}">
+      <p15:sldGuideLst xmlns:p15="http://schemas.microsoft.com/office/powerpoint/2012/main">
+        <p15:guide id="1" orient="horz" pos="2160">
+          <p15:clr>
+            <a:srgbClr val="A4A3A4"/>
+          </p15:clr>
+        </p15:guide>
+        <p15:guide id="2" pos="2880">
+          <p15:clr>
+            <a:srgbClr val="A4A3A4"/>
+          </p15:clr>
+        </p15:guide>
+      </p15:sldGuideLst>
+    </p:ext>
+  </p:extLst>
 </p:presentation>
 </file>
 
@@ -219,7 +237,7 @@
           <a:p>
             <a:fld id="{6699ACB9-486C-4D62-A3A7-AF98E13EFDA3}" type="datetimeFigureOut">
               <a:rPr lang="en-US" smtClean="0"/>
-              <a:t>5/24/2016</a:t>
+              <a:t>2/7/2017</a:t>
             </a:fld>
             <a:endParaRPr lang="en-US"/>
           </a:p>
@@ -552,7 +570,7 @@
           <a:p>
             <a:fld id="{8EC77E60-82A0-4F8A-A861-433B3189FA8C}" type="slidenum">
               <a:rPr lang="en-US" smtClean="0"/>
-              <a:t>7</a:t>
+              <a:t>9</a:t>
             </a:fld>
             <a:endParaRPr lang="en-US"/>
           </a:p>
@@ -753,7 +771,7 @@
             <a:fld id="{1D8BD707-D9CF-40AE-B4C6-C98DA3205C09}" type="datetimeFigureOut">
               <a:rPr lang="en-US" smtClean="0"/>
               <a:pPr/>
-              <a:t>5/24/2016</a:t>
+              <a:t>2/7/2017</a:t>
             </a:fld>
             <a:endParaRPr lang="en-US"/>
           </a:p>
@@ -920,7 +938,7 @@
             <a:fld id="{1D8BD707-D9CF-40AE-B4C6-C98DA3205C09}" type="datetimeFigureOut">
               <a:rPr lang="en-US" smtClean="0"/>
               <a:pPr/>
-              <a:t>5/24/2016</a:t>
+              <a:t>2/7/2017</a:t>
             </a:fld>
             <a:endParaRPr lang="en-US"/>
           </a:p>
@@ -1097,7 +1115,7 @@
             <a:fld id="{1D8BD707-D9CF-40AE-B4C6-C98DA3205C09}" type="datetimeFigureOut">
               <a:rPr lang="en-US" smtClean="0"/>
               <a:pPr/>
-              <a:t>5/24/2016</a:t>
+              <a:t>2/7/2017</a:t>
             </a:fld>
             <a:endParaRPr lang="en-US"/>
           </a:p>
@@ -1264,7 +1282,7 @@
             <a:fld id="{1D8BD707-D9CF-40AE-B4C6-C98DA3205C09}" type="datetimeFigureOut">
               <a:rPr lang="en-US" smtClean="0"/>
               <a:pPr/>
-              <a:t>5/24/2016</a:t>
+              <a:t>2/7/2017</a:t>
             </a:fld>
             <a:endParaRPr lang="en-US"/>
           </a:p>
@@ -1507,7 +1525,7 @@
             <a:fld id="{1D8BD707-D9CF-40AE-B4C6-C98DA3205C09}" type="datetimeFigureOut">
               <a:rPr lang="en-US" smtClean="0"/>
               <a:pPr/>
-              <a:t>5/24/2016</a:t>
+              <a:t>2/7/2017</a:t>
             </a:fld>
             <a:endParaRPr lang="en-US"/>
           </a:p>
@@ -1792,7 +1810,7 @@
             <a:fld id="{1D8BD707-D9CF-40AE-B4C6-C98DA3205C09}" type="datetimeFigureOut">
               <a:rPr lang="en-US" smtClean="0"/>
               <a:pPr/>
-              <a:t>5/24/2016</a:t>
+              <a:t>2/7/2017</a:t>
             </a:fld>
             <a:endParaRPr lang="en-US"/>
           </a:p>
@@ -2211,7 +2229,7 @@
             <a:fld id="{1D8BD707-D9CF-40AE-B4C6-C98DA3205C09}" type="datetimeFigureOut">
               <a:rPr lang="en-US" smtClean="0"/>
               <a:pPr/>
-              <a:t>5/24/2016</a:t>
+              <a:t>2/7/2017</a:t>
             </a:fld>
             <a:endParaRPr lang="en-US"/>
           </a:p>
@@ -2326,7 +2344,7 @@
             <a:fld id="{1D8BD707-D9CF-40AE-B4C6-C98DA3205C09}" type="datetimeFigureOut">
               <a:rPr lang="en-US" smtClean="0"/>
               <a:pPr/>
-              <a:t>5/24/2016</a:t>
+              <a:t>2/7/2017</a:t>
             </a:fld>
             <a:endParaRPr lang="en-US"/>
           </a:p>
@@ -2418,7 +2436,7 @@
             <a:fld id="{1D8BD707-D9CF-40AE-B4C6-C98DA3205C09}" type="datetimeFigureOut">
               <a:rPr lang="en-US" smtClean="0"/>
               <a:pPr/>
-              <a:t>5/24/2016</a:t>
+              <a:t>2/7/2017</a:t>
             </a:fld>
             <a:endParaRPr lang="en-US"/>
           </a:p>
@@ -2692,7 +2710,7 @@
             <a:fld id="{1D8BD707-D9CF-40AE-B4C6-C98DA3205C09}" type="datetimeFigureOut">
               <a:rPr lang="en-US" smtClean="0"/>
               <a:pPr/>
-              <a:t>5/24/2016</a:t>
+              <a:t>2/7/2017</a:t>
             </a:fld>
             <a:endParaRPr lang="en-US"/>
           </a:p>
@@ -2942,7 +2960,7 @@
             <a:fld id="{1D8BD707-D9CF-40AE-B4C6-C98DA3205C09}" type="datetimeFigureOut">
               <a:rPr lang="en-US" smtClean="0"/>
               <a:pPr/>
-              <a:t>5/24/2016</a:t>
+              <a:t>2/7/2017</a:t>
             </a:fld>
             <a:endParaRPr lang="en-US"/>
           </a:p>
@@ -3003,9 +3021,14 @@
 <p:sldMaster xmlns:a="http://schemas.openxmlformats.org/drawingml/2006/main" xmlns:r="http://schemas.openxmlformats.org/officeDocument/2006/relationships" xmlns:p="http://schemas.openxmlformats.org/presentationml/2006/main">
   <p:cSld>
     <p:bg>
-      <p:bgRef idx="1001">
-        <a:schemeClr val="bg1"/>
-      </p:bgRef>
+      <p:bgPr>
+        <a:solidFill>
+          <a:schemeClr val="bg1">
+            <a:lumMod val="95000"/>
+          </a:schemeClr>
+        </a:solidFill>
+        <a:effectLst/>
+      </p:bgPr>
     </p:bg>
     <p:spTree>
       <p:nvGrpSpPr>
@@ -3152,7 +3175,7 @@
             <a:fld id="{1D8BD707-D9CF-40AE-B4C6-C98DA3205C09}" type="datetimeFigureOut">
               <a:rPr lang="en-US" smtClean="0"/>
               <a:pPr/>
-              <a:t>5/24/2016</a:t>
+              <a:t>2/7/2017</a:t>
             </a:fld>
             <a:endParaRPr lang="en-US"/>
           </a:p>
@@ -3509,16 +3532,6 @@
 <file path=ppt/slides/slide1.xml><?xml version="1.0" encoding="utf-8"?>
 <p:sld xmlns:a="http://schemas.openxmlformats.org/drawingml/2006/main" xmlns:r="http://schemas.openxmlformats.org/officeDocument/2006/relationships" xmlns:p="http://schemas.openxmlformats.org/presentationml/2006/main">
   <p:cSld>
-    <p:bg>
-      <p:bgPr>
-        <a:solidFill>
-          <a:schemeClr val="bg1">
-            <a:lumMod val="95000"/>
-          </a:schemeClr>
-        </a:solidFill>
-        <a:effectLst/>
-      </p:bgPr>
-    </p:bg>
     <p:spTree>
       <p:nvGrpSpPr>
         <p:cNvPr id="1" name=""/>
@@ -10802,16 +10815,1931 @@
 <file path=ppt/slides/slide2.xml><?xml version="1.0" encoding="utf-8"?>
 <p:sld xmlns:a="http://schemas.openxmlformats.org/drawingml/2006/main" xmlns:r="http://schemas.openxmlformats.org/officeDocument/2006/relationships" xmlns:p="http://schemas.openxmlformats.org/presentationml/2006/main">
   <p:cSld>
-    <p:bg>
-      <p:bgPr>
-        <a:solidFill>
-          <a:schemeClr val="bg1">
-            <a:lumMod val="95000"/>
-          </a:schemeClr>
-        </a:solidFill>
-        <a:effectLst/>
-      </p:bgPr>
-    </p:bg>
+    <p:spTree>
+      <p:nvGrpSpPr>
+        <p:cNvPr id="1" name=""/>
+        <p:cNvGrpSpPr/>
+        <p:nvPr/>
+      </p:nvGrpSpPr>
+      <p:grpSpPr>
+        <a:xfrm>
+          <a:off x="0" y="0"/>
+          <a:ext cx="0" cy="0"/>
+          <a:chOff x="0" y="0"/>
+          <a:chExt cx="0" cy="0"/>
+        </a:xfrm>
+      </p:grpSpPr>
+      <p:sp>
+        <p:nvSpPr>
+          <p:cNvPr id="116" name="TextBox 115"/>
+          <p:cNvSpPr txBox="1"/>
+          <p:nvPr/>
+        </p:nvSpPr>
+        <p:spPr>
+          <a:xfrm>
+            <a:off x="1244672" y="1407727"/>
+            <a:ext cx="371870" cy="138499"/>
+          </a:xfrm>
+          <a:prstGeom prst="rect">
+            <a:avLst/>
+          </a:prstGeom>
+          <a:noFill/>
+        </p:spPr>
+        <p:txBody>
+          <a:bodyPr wrap="square" rtlCol="0">
+            <a:spAutoFit/>
+          </a:bodyPr>
+          <a:lstStyle/>
+          <a:p>
+            <a:r>
+              <a:rPr lang="en-US" sz="300" dirty="0" smtClean="0"/>
+              <a:t>Zoom Lab</a:t>
+            </a:r>
+            <a:endParaRPr lang="en-SG" sz="300" dirty="0"/>
+          </a:p>
+        </p:txBody>
+      </p:sp>
+      <p:grpSp>
+        <p:nvGrpSpPr>
+          <p:cNvPr id="112" name="Group 111"/>
+          <p:cNvGrpSpPr/>
+          <p:nvPr/>
+        </p:nvGrpSpPr>
+        <p:grpSpPr>
+          <a:xfrm>
+            <a:off x="1592380" y="1241883"/>
+            <a:ext cx="190500" cy="190500"/>
+            <a:chOff x="1627666" y="1241884"/>
+            <a:chExt cx="190500" cy="190500"/>
+          </a:xfrm>
+        </p:grpSpPr>
+        <p:sp>
+          <p:nvSpPr>
+            <p:cNvPr id="64" name="Oval 63"/>
+            <p:cNvSpPr/>
+            <p:nvPr/>
+          </p:nvSpPr>
+          <p:spPr>
+            <a:xfrm>
+              <a:off x="1627666" y="1241884"/>
+              <a:ext cx="190500" cy="190500"/>
+            </a:xfrm>
+            <a:prstGeom prst="ellipse">
+              <a:avLst/>
+            </a:prstGeom>
+            <a:solidFill>
+              <a:schemeClr val="accent6"/>
+            </a:solidFill>
+            <a:ln>
+              <a:noFill/>
+            </a:ln>
+          </p:spPr>
+          <p:style>
+            <a:lnRef idx="2">
+              <a:schemeClr val="accent1">
+                <a:shade val="50000"/>
+              </a:schemeClr>
+            </a:lnRef>
+            <a:fillRef idx="1">
+              <a:schemeClr val="accent1"/>
+            </a:fillRef>
+            <a:effectRef idx="0">
+              <a:schemeClr val="accent1"/>
+            </a:effectRef>
+            <a:fontRef idx="minor">
+              <a:schemeClr val="lt1"/>
+            </a:fontRef>
+          </p:style>
+          <p:txBody>
+            <a:bodyPr rtlCol="0" anchor="ctr"/>
+            <a:lstStyle/>
+            <a:p>
+              <a:pPr algn="ctr"/>
+              <a:endParaRPr lang="en-SG"/>
+            </a:p>
+          </p:txBody>
+        </p:sp>
+        <p:sp>
+          <p:nvSpPr>
+            <p:cNvPr id="166" name="Rectangle 5"/>
+            <p:cNvSpPr/>
+            <p:nvPr/>
+          </p:nvSpPr>
+          <p:spPr>
+            <a:xfrm>
+              <a:off x="1688712" y="1281275"/>
+              <a:ext cx="59004" cy="117025"/>
+            </a:xfrm>
+            <a:custGeom>
+              <a:avLst/>
+              <a:gdLst>
+                <a:gd name="connsiteX0" fmla="*/ 0 w 247861"/>
+                <a:gd name="connsiteY0" fmla="*/ 168438 h 491595"/>
+                <a:gd name="connsiteX1" fmla="*/ 83956 w 247861"/>
+                <a:gd name="connsiteY1" fmla="*/ 162984 h 491595"/>
+                <a:gd name="connsiteX2" fmla="*/ 56685 w 247861"/>
+                <a:gd name="connsiteY2" fmla="*/ 318394 h 491595"/>
+                <a:gd name="connsiteX3" fmla="*/ 0 w 247861"/>
+                <a:gd name="connsiteY3" fmla="*/ 318394 h 491595"/>
+                <a:gd name="connsiteX4" fmla="*/ 0 w 247861"/>
+                <a:gd name="connsiteY4" fmla="*/ 168438 h 491595"/>
+                <a:gd name="connsiteX5" fmla="*/ 247861 w 247861"/>
+                <a:gd name="connsiteY5" fmla="*/ 0 h 491595"/>
+                <a:gd name="connsiteX6" fmla="*/ 242826 w 247861"/>
+                <a:gd name="connsiteY6" fmla="*/ 491595 h 491595"/>
+                <a:gd name="connsiteX7" fmla="*/ 82985 w 247861"/>
+                <a:gd name="connsiteY7" fmla="*/ 327947 h 491595"/>
+                <a:gd name="connsiteX8" fmla="*/ 84711 w 247861"/>
+                <a:gd name="connsiteY8" fmla="*/ 159354 h 491595"/>
+                <a:gd name="connsiteX9" fmla="*/ 247861 w 247861"/>
+                <a:gd name="connsiteY9" fmla="*/ 0 h 491595"/>
+                <a:gd name="connsiteX0" fmla="*/ 0 w 247861"/>
+                <a:gd name="connsiteY0" fmla="*/ 168438 h 491595"/>
+                <a:gd name="connsiteX1" fmla="*/ 83956 w 247861"/>
+                <a:gd name="connsiteY1" fmla="*/ 162984 h 491595"/>
+                <a:gd name="connsiteX2" fmla="*/ 81228 w 247861"/>
+                <a:gd name="connsiteY2" fmla="*/ 326575 h 491595"/>
+                <a:gd name="connsiteX3" fmla="*/ 0 w 247861"/>
+                <a:gd name="connsiteY3" fmla="*/ 318394 h 491595"/>
+                <a:gd name="connsiteX4" fmla="*/ 0 w 247861"/>
+                <a:gd name="connsiteY4" fmla="*/ 168438 h 491595"/>
+                <a:gd name="connsiteX5" fmla="*/ 247861 w 247861"/>
+                <a:gd name="connsiteY5" fmla="*/ 0 h 491595"/>
+                <a:gd name="connsiteX6" fmla="*/ 242826 w 247861"/>
+                <a:gd name="connsiteY6" fmla="*/ 491595 h 491595"/>
+                <a:gd name="connsiteX7" fmla="*/ 82985 w 247861"/>
+                <a:gd name="connsiteY7" fmla="*/ 327947 h 491595"/>
+                <a:gd name="connsiteX8" fmla="*/ 84711 w 247861"/>
+                <a:gd name="connsiteY8" fmla="*/ 159354 h 491595"/>
+                <a:gd name="connsiteX9" fmla="*/ 247861 w 247861"/>
+                <a:gd name="connsiteY9" fmla="*/ 0 h 491595"/>
+              </a:gdLst>
+              <a:ahLst/>
+              <a:cxnLst>
+                <a:cxn ang="0">
+                  <a:pos x="connsiteX0" y="connsiteY0"/>
+                </a:cxn>
+                <a:cxn ang="0">
+                  <a:pos x="connsiteX1" y="connsiteY1"/>
+                </a:cxn>
+                <a:cxn ang="0">
+                  <a:pos x="connsiteX2" y="connsiteY2"/>
+                </a:cxn>
+                <a:cxn ang="0">
+                  <a:pos x="connsiteX3" y="connsiteY3"/>
+                </a:cxn>
+                <a:cxn ang="0">
+                  <a:pos x="connsiteX4" y="connsiteY4"/>
+                </a:cxn>
+                <a:cxn ang="0">
+                  <a:pos x="connsiteX5" y="connsiteY5"/>
+                </a:cxn>
+                <a:cxn ang="0">
+                  <a:pos x="connsiteX6" y="connsiteY6"/>
+                </a:cxn>
+                <a:cxn ang="0">
+                  <a:pos x="connsiteX7" y="connsiteY7"/>
+                </a:cxn>
+                <a:cxn ang="0">
+                  <a:pos x="connsiteX8" y="connsiteY8"/>
+                </a:cxn>
+                <a:cxn ang="0">
+                  <a:pos x="connsiteX9" y="connsiteY9"/>
+                </a:cxn>
+              </a:cxnLst>
+              <a:rect l="l" t="t" r="r" b="b"/>
+              <a:pathLst>
+                <a:path w="247861" h="491595">
+                  <a:moveTo>
+                    <a:pt x="0" y="168438"/>
+                  </a:moveTo>
+                  <a:lnTo>
+                    <a:pt x="83956" y="162984"/>
+                  </a:lnTo>
+                  <a:cubicBezTo>
+                    <a:pt x="83047" y="217514"/>
+                    <a:pt x="82137" y="272045"/>
+                    <a:pt x="81228" y="326575"/>
+                  </a:cubicBezTo>
+                  <a:lnTo>
+                    <a:pt x="0" y="318394"/>
+                  </a:lnTo>
+                  <a:lnTo>
+                    <a:pt x="0" y="168438"/>
+                  </a:lnTo>
+                  <a:close/>
+                  <a:moveTo>
+                    <a:pt x="247861" y="0"/>
+                  </a:moveTo>
+                  <a:cubicBezTo>
+                    <a:pt x="246183" y="163865"/>
+                    <a:pt x="244504" y="327730"/>
+                    <a:pt x="242826" y="491595"/>
+                  </a:cubicBezTo>
+                  <a:lnTo>
+                    <a:pt x="82985" y="327947"/>
+                  </a:lnTo>
+                  <a:cubicBezTo>
+                    <a:pt x="83560" y="271749"/>
+                    <a:pt x="84136" y="215552"/>
+                    <a:pt x="84711" y="159354"/>
+                  </a:cubicBezTo>
+                  <a:lnTo>
+                    <a:pt x="247861" y="0"/>
+                  </a:lnTo>
+                  <a:close/>
+                </a:path>
+              </a:pathLst>
+            </a:custGeom>
+            <a:solidFill>
+              <a:srgbClr val="0070C0"/>
+            </a:solidFill>
+            <a:ln w="6350">
+              <a:solidFill>
+                <a:schemeClr val="bg1"/>
+              </a:solidFill>
+            </a:ln>
+          </p:spPr>
+          <p:style>
+            <a:lnRef idx="2">
+              <a:schemeClr val="accent1">
+                <a:shade val="50000"/>
+              </a:schemeClr>
+            </a:lnRef>
+            <a:fillRef idx="1">
+              <a:schemeClr val="accent1"/>
+            </a:fillRef>
+            <a:effectRef idx="0">
+              <a:schemeClr val="accent1"/>
+            </a:effectRef>
+            <a:fontRef idx="minor">
+              <a:schemeClr val="lt1"/>
+            </a:fontRef>
+          </p:style>
+          <p:txBody>
+            <a:bodyPr rtlCol="0" anchor="ctr"/>
+            <a:lstStyle/>
+            <a:p>
+              <a:pPr algn="ctr"/>
+              <a:endParaRPr lang="en-SG"/>
+            </a:p>
+          </p:txBody>
+        </p:sp>
+      </p:grpSp>
+      <p:grpSp>
+        <p:nvGrpSpPr>
+          <p:cNvPr id="109" name="Group 108"/>
+          <p:cNvGrpSpPr/>
+          <p:nvPr/>
+        </p:nvGrpSpPr>
+        <p:grpSpPr>
+          <a:xfrm>
+            <a:off x="1310960" y="1241884"/>
+            <a:ext cx="190500" cy="190500"/>
+            <a:chOff x="1310960" y="1241884"/>
+            <a:chExt cx="190500" cy="190500"/>
+          </a:xfrm>
+        </p:grpSpPr>
+        <p:sp>
+          <p:nvSpPr>
+            <p:cNvPr id="189" name="Oval 188"/>
+            <p:cNvSpPr/>
+            <p:nvPr/>
+          </p:nvSpPr>
+          <p:spPr>
+            <a:xfrm>
+              <a:off x="1310960" y="1241884"/>
+              <a:ext cx="190500" cy="190500"/>
+            </a:xfrm>
+            <a:prstGeom prst="ellipse">
+              <a:avLst/>
+            </a:prstGeom>
+            <a:solidFill>
+              <a:schemeClr val="accent6"/>
+            </a:solidFill>
+            <a:ln>
+              <a:noFill/>
+            </a:ln>
+          </p:spPr>
+          <p:style>
+            <a:lnRef idx="2">
+              <a:schemeClr val="accent1">
+                <a:shade val="50000"/>
+              </a:schemeClr>
+            </a:lnRef>
+            <a:fillRef idx="1">
+              <a:schemeClr val="accent1"/>
+            </a:fillRef>
+            <a:effectRef idx="0">
+              <a:schemeClr val="accent1"/>
+            </a:effectRef>
+            <a:fontRef idx="minor">
+              <a:schemeClr val="lt1"/>
+            </a:fontRef>
+          </p:style>
+          <p:txBody>
+            <a:bodyPr rtlCol="0" anchor="ctr"/>
+            <a:lstStyle/>
+            <a:p>
+              <a:pPr algn="ctr"/>
+              <a:endParaRPr lang="en-SG"/>
+            </a:p>
+          </p:txBody>
+        </p:sp>
+        <p:sp>
+          <p:nvSpPr>
+            <p:cNvPr id="190" name="Freeform 189"/>
+            <p:cNvSpPr/>
+            <p:nvPr/>
+          </p:nvSpPr>
+          <p:spPr>
+            <a:xfrm>
+              <a:off x="1342966" y="1277641"/>
+              <a:ext cx="126488" cy="118985"/>
+            </a:xfrm>
+            <a:custGeom>
+              <a:avLst/>
+              <a:gdLst>
+                <a:gd name="connsiteX0" fmla="*/ 4763 w 1209675"/>
+                <a:gd name="connsiteY0" fmla="*/ 119063 h 838200"/>
+                <a:gd name="connsiteX1" fmla="*/ 171450 w 1209675"/>
+                <a:gd name="connsiteY1" fmla="*/ 838200 h 838200"/>
+                <a:gd name="connsiteX2" fmla="*/ 1209675 w 1209675"/>
+                <a:gd name="connsiteY2" fmla="*/ 838200 h 838200"/>
+                <a:gd name="connsiteX3" fmla="*/ 1209675 w 1209675"/>
+                <a:gd name="connsiteY3" fmla="*/ 247650 h 838200"/>
+                <a:gd name="connsiteX4" fmla="*/ 238125 w 1209675"/>
+                <a:gd name="connsiteY4" fmla="*/ 0 h 838200"/>
+                <a:gd name="connsiteX5" fmla="*/ 0 w 1209675"/>
+                <a:gd name="connsiteY5" fmla="*/ 0 h 838200"/>
+                <a:gd name="connsiteX6" fmla="*/ 4763 w 1209675"/>
+                <a:gd name="connsiteY6" fmla="*/ 119063 h 838200"/>
+                <a:gd name="connsiteX0" fmla="*/ 4763 w 1209675"/>
+                <a:gd name="connsiteY0" fmla="*/ 119063 h 838200"/>
+                <a:gd name="connsiteX1" fmla="*/ 224786 w 1209675"/>
+                <a:gd name="connsiteY1" fmla="*/ 838200 h 838200"/>
+                <a:gd name="connsiteX2" fmla="*/ 1209675 w 1209675"/>
+                <a:gd name="connsiteY2" fmla="*/ 838200 h 838200"/>
+                <a:gd name="connsiteX3" fmla="*/ 1209675 w 1209675"/>
+                <a:gd name="connsiteY3" fmla="*/ 247650 h 838200"/>
+                <a:gd name="connsiteX4" fmla="*/ 238125 w 1209675"/>
+                <a:gd name="connsiteY4" fmla="*/ 0 h 838200"/>
+                <a:gd name="connsiteX5" fmla="*/ 0 w 1209675"/>
+                <a:gd name="connsiteY5" fmla="*/ 0 h 838200"/>
+                <a:gd name="connsiteX6" fmla="*/ 4763 w 1209675"/>
+                <a:gd name="connsiteY6" fmla="*/ 119063 h 838200"/>
+                <a:gd name="connsiteX0" fmla="*/ 4763 w 1209675"/>
+                <a:gd name="connsiteY0" fmla="*/ 119063 h 838200"/>
+                <a:gd name="connsiteX1" fmla="*/ 224786 w 1209675"/>
+                <a:gd name="connsiteY1" fmla="*/ 822358 h 838200"/>
+                <a:gd name="connsiteX2" fmla="*/ 1209675 w 1209675"/>
+                <a:gd name="connsiteY2" fmla="*/ 838200 h 838200"/>
+                <a:gd name="connsiteX3" fmla="*/ 1209675 w 1209675"/>
+                <a:gd name="connsiteY3" fmla="*/ 247650 h 838200"/>
+                <a:gd name="connsiteX4" fmla="*/ 238125 w 1209675"/>
+                <a:gd name="connsiteY4" fmla="*/ 0 h 838200"/>
+                <a:gd name="connsiteX5" fmla="*/ 0 w 1209675"/>
+                <a:gd name="connsiteY5" fmla="*/ 0 h 838200"/>
+                <a:gd name="connsiteX6" fmla="*/ 4763 w 1209675"/>
+                <a:gd name="connsiteY6" fmla="*/ 119063 h 838200"/>
+                <a:gd name="connsiteX0" fmla="*/ 4763 w 1209675"/>
+                <a:gd name="connsiteY0" fmla="*/ 119063 h 838200"/>
+                <a:gd name="connsiteX1" fmla="*/ 224786 w 1209675"/>
+                <a:gd name="connsiteY1" fmla="*/ 822358 h 838200"/>
+                <a:gd name="connsiteX2" fmla="*/ 1209675 w 1209675"/>
+                <a:gd name="connsiteY2" fmla="*/ 838200 h 838200"/>
+                <a:gd name="connsiteX3" fmla="*/ 1188340 w 1209675"/>
+                <a:gd name="connsiteY3" fmla="*/ 247650 h 838200"/>
+                <a:gd name="connsiteX4" fmla="*/ 238125 w 1209675"/>
+                <a:gd name="connsiteY4" fmla="*/ 0 h 838200"/>
+                <a:gd name="connsiteX5" fmla="*/ 0 w 1209675"/>
+                <a:gd name="connsiteY5" fmla="*/ 0 h 838200"/>
+                <a:gd name="connsiteX6" fmla="*/ 4763 w 1209675"/>
+                <a:gd name="connsiteY6" fmla="*/ 119063 h 838200"/>
+                <a:gd name="connsiteX0" fmla="*/ 4763 w 1188340"/>
+                <a:gd name="connsiteY0" fmla="*/ 119063 h 822358"/>
+                <a:gd name="connsiteX1" fmla="*/ 224786 w 1188340"/>
+                <a:gd name="connsiteY1" fmla="*/ 822358 h 822358"/>
+                <a:gd name="connsiteX2" fmla="*/ 1183007 w 1188340"/>
+                <a:gd name="connsiteY2" fmla="*/ 818397 h 822358"/>
+                <a:gd name="connsiteX3" fmla="*/ 1188340 w 1188340"/>
+                <a:gd name="connsiteY3" fmla="*/ 247650 h 822358"/>
+                <a:gd name="connsiteX4" fmla="*/ 238125 w 1188340"/>
+                <a:gd name="connsiteY4" fmla="*/ 0 h 822358"/>
+                <a:gd name="connsiteX5" fmla="*/ 0 w 1188340"/>
+                <a:gd name="connsiteY5" fmla="*/ 0 h 822358"/>
+                <a:gd name="connsiteX6" fmla="*/ 4763 w 1188340"/>
+                <a:gd name="connsiteY6" fmla="*/ 119063 h 822358"/>
+                <a:gd name="connsiteX0" fmla="*/ 4763 w 1188340"/>
+                <a:gd name="connsiteY0" fmla="*/ 119063 h 822358"/>
+                <a:gd name="connsiteX1" fmla="*/ 224786 w 1188340"/>
+                <a:gd name="connsiteY1" fmla="*/ 822358 h 822358"/>
+                <a:gd name="connsiteX2" fmla="*/ 1183007 w 1188340"/>
+                <a:gd name="connsiteY2" fmla="*/ 818397 h 822358"/>
+                <a:gd name="connsiteX3" fmla="*/ 1188340 w 1188340"/>
+                <a:gd name="connsiteY3" fmla="*/ 283674 h 822358"/>
+                <a:gd name="connsiteX4" fmla="*/ 238125 w 1188340"/>
+                <a:gd name="connsiteY4" fmla="*/ 0 h 822358"/>
+                <a:gd name="connsiteX5" fmla="*/ 0 w 1188340"/>
+                <a:gd name="connsiteY5" fmla="*/ 0 h 822358"/>
+                <a:gd name="connsiteX6" fmla="*/ 4763 w 1188340"/>
+                <a:gd name="connsiteY6" fmla="*/ 119063 h 822358"/>
+              </a:gdLst>
+              <a:ahLst/>
+              <a:cxnLst>
+                <a:cxn ang="0">
+                  <a:pos x="connsiteX0" y="connsiteY0"/>
+                </a:cxn>
+                <a:cxn ang="0">
+                  <a:pos x="connsiteX1" y="connsiteY1"/>
+                </a:cxn>
+                <a:cxn ang="0">
+                  <a:pos x="connsiteX2" y="connsiteY2"/>
+                </a:cxn>
+                <a:cxn ang="0">
+                  <a:pos x="connsiteX3" y="connsiteY3"/>
+                </a:cxn>
+                <a:cxn ang="0">
+                  <a:pos x="connsiteX4" y="connsiteY4"/>
+                </a:cxn>
+                <a:cxn ang="0">
+                  <a:pos x="connsiteX5" y="connsiteY5"/>
+                </a:cxn>
+                <a:cxn ang="0">
+                  <a:pos x="connsiteX6" y="connsiteY6"/>
+                </a:cxn>
+              </a:cxnLst>
+              <a:rect l="l" t="t" r="r" b="b"/>
+              <a:pathLst>
+                <a:path w="1188340" h="822358">
+                  <a:moveTo>
+                    <a:pt x="4763" y="119063"/>
+                  </a:moveTo>
+                  <a:lnTo>
+                    <a:pt x="224786" y="822358"/>
+                  </a:lnTo>
+                  <a:lnTo>
+                    <a:pt x="1183007" y="818397"/>
+                  </a:lnTo>
+                  <a:cubicBezTo>
+                    <a:pt x="1184785" y="628148"/>
+                    <a:pt x="1186562" y="473923"/>
+                    <a:pt x="1188340" y="283674"/>
+                  </a:cubicBezTo>
+                  <a:lnTo>
+                    <a:pt x="238125" y="0"/>
+                  </a:lnTo>
+                  <a:lnTo>
+                    <a:pt x="0" y="0"/>
+                  </a:lnTo>
+                  <a:lnTo>
+                    <a:pt x="4763" y="119063"/>
+                  </a:lnTo>
+                  <a:close/>
+                </a:path>
+              </a:pathLst>
+            </a:custGeom>
+            <a:solidFill>
+              <a:srgbClr val="0070C0">
+                <a:alpha val="55000"/>
+              </a:srgbClr>
+            </a:solidFill>
+            <a:ln>
+              <a:noFill/>
+            </a:ln>
+          </p:spPr>
+          <p:style>
+            <a:lnRef idx="2">
+              <a:schemeClr val="accent1">
+                <a:shade val="50000"/>
+              </a:schemeClr>
+            </a:lnRef>
+            <a:fillRef idx="1">
+              <a:schemeClr val="accent1"/>
+            </a:fillRef>
+            <a:effectRef idx="0">
+              <a:schemeClr val="accent1"/>
+            </a:effectRef>
+            <a:fontRef idx="minor">
+              <a:schemeClr val="lt1"/>
+            </a:fontRef>
+          </p:style>
+          <p:txBody>
+            <a:bodyPr rtlCol="0" anchor="ctr"/>
+            <a:lstStyle/>
+            <a:p>
+              <a:pPr algn="ctr"/>
+              <a:endParaRPr lang="en-US"/>
+            </a:p>
+          </p:txBody>
+        </p:sp>
+        <p:sp>
+          <p:nvSpPr>
+            <p:cNvPr id="191" name="Rectangle 190"/>
+            <p:cNvSpPr/>
+            <p:nvPr/>
+          </p:nvSpPr>
+          <p:spPr>
+            <a:xfrm>
+              <a:off x="1361583" y="1317702"/>
+              <a:ext cx="103920" cy="74655"/>
+            </a:xfrm>
+            <a:prstGeom prst="rect">
+              <a:avLst/>
+            </a:prstGeom>
+            <a:solidFill>
+              <a:srgbClr val="00589A">
+                <a:alpha val="60784"/>
+              </a:srgbClr>
+            </a:solidFill>
+            <a:ln w="6350">
+              <a:solidFill>
+                <a:schemeClr val="bg1"/>
+              </a:solidFill>
+              <a:miter lim="800000"/>
+            </a:ln>
+          </p:spPr>
+          <p:style>
+            <a:lnRef idx="2">
+              <a:schemeClr val="accent1">
+                <a:shade val="50000"/>
+              </a:schemeClr>
+            </a:lnRef>
+            <a:fillRef idx="1">
+              <a:schemeClr val="accent1"/>
+            </a:fillRef>
+            <a:effectRef idx="0">
+              <a:schemeClr val="accent1"/>
+            </a:effectRef>
+            <a:fontRef idx="minor">
+              <a:schemeClr val="lt1"/>
+            </a:fontRef>
+          </p:style>
+          <p:txBody>
+            <a:bodyPr rtlCol="0" anchor="ctr"/>
+            <a:lstStyle/>
+            <a:p>
+              <a:pPr algn="ctr"/>
+              <a:endParaRPr lang="en-US"/>
+            </a:p>
+          </p:txBody>
+        </p:sp>
+      </p:grpSp>
+      <p:pic>
+        <p:nvPicPr>
+          <p:cNvPr id="98" name="Picture 97"/>
+          <p:cNvPicPr>
+            <a:picLocks noChangeAspect="1"/>
+          </p:cNvPicPr>
+          <p:nvPr/>
+        </p:nvPicPr>
+        <p:blipFill>
+          <a:blip r:embed="rId2"/>
+          <a:stretch>
+            <a:fillRect/>
+          </a:stretch>
+        </p:blipFill>
+        <p:spPr>
+          <a:xfrm>
+            <a:off x="1876963" y="1241883"/>
+            <a:ext cx="190500" cy="190500"/>
+          </a:xfrm>
+          <a:prstGeom prst="rect">
+            <a:avLst/>
+          </a:prstGeom>
+        </p:spPr>
+      </p:pic>
+      <p:pic>
+        <p:nvPicPr>
+          <p:cNvPr id="102" name="Picture 101"/>
+          <p:cNvPicPr>
+            <a:picLocks noChangeAspect="1"/>
+          </p:cNvPicPr>
+          <p:nvPr/>
+        </p:nvPicPr>
+        <p:blipFill>
+          <a:blip r:embed="rId3"/>
+          <a:stretch>
+            <a:fillRect/>
+          </a:stretch>
+        </p:blipFill>
+        <p:spPr>
+          <a:xfrm>
+            <a:off x="2160686" y="1245948"/>
+            <a:ext cx="190500" cy="190500"/>
+          </a:xfrm>
+          <a:prstGeom prst="rect">
+            <a:avLst/>
+          </a:prstGeom>
+        </p:spPr>
+      </p:pic>
+      <p:grpSp>
+        <p:nvGrpSpPr>
+          <p:cNvPr id="108" name="Group 107"/>
+          <p:cNvGrpSpPr/>
+          <p:nvPr/>
+        </p:nvGrpSpPr>
+        <p:grpSpPr>
+          <a:xfrm>
+            <a:off x="2391009" y="1156532"/>
+            <a:ext cx="330540" cy="369332"/>
+            <a:chOff x="2573313" y="1173309"/>
+            <a:chExt cx="330540" cy="369332"/>
+          </a:xfrm>
+        </p:grpSpPr>
+        <p:sp>
+          <p:nvSpPr>
+            <p:cNvPr id="194" name="Oval 193"/>
+            <p:cNvSpPr/>
+            <p:nvPr/>
+          </p:nvSpPr>
+          <p:spPr>
+            <a:xfrm>
+              <a:off x="2642252" y="1265900"/>
+              <a:ext cx="190500" cy="190500"/>
+            </a:xfrm>
+            <a:prstGeom prst="ellipse">
+              <a:avLst/>
+            </a:prstGeom>
+            <a:solidFill>
+              <a:schemeClr val="accent6"/>
+            </a:solidFill>
+            <a:ln>
+              <a:noFill/>
+            </a:ln>
+          </p:spPr>
+          <p:style>
+            <a:lnRef idx="2">
+              <a:schemeClr val="accent1">
+                <a:shade val="50000"/>
+              </a:schemeClr>
+            </a:lnRef>
+            <a:fillRef idx="1">
+              <a:schemeClr val="accent1"/>
+            </a:fillRef>
+            <a:effectRef idx="0">
+              <a:schemeClr val="accent1"/>
+            </a:effectRef>
+            <a:fontRef idx="minor">
+              <a:schemeClr val="lt1"/>
+            </a:fontRef>
+          </p:style>
+          <p:txBody>
+            <a:bodyPr rtlCol="0" anchor="ctr"/>
+            <a:lstStyle/>
+            <a:p>
+              <a:pPr algn="ctr"/>
+              <a:endParaRPr lang="en-SG"/>
+            </a:p>
+          </p:txBody>
+        </p:sp>
+        <p:sp>
+          <p:nvSpPr>
+            <p:cNvPr id="106" name="TextBox 105"/>
+            <p:cNvSpPr txBox="1"/>
+            <p:nvPr/>
+          </p:nvSpPr>
+          <p:spPr>
+            <a:xfrm>
+              <a:off x="2573313" y="1173309"/>
+              <a:ext cx="330540" cy="369332"/>
+            </a:xfrm>
+            <a:prstGeom prst="rect">
+              <a:avLst/>
+            </a:prstGeom>
+            <a:noFill/>
+          </p:spPr>
+          <p:txBody>
+            <a:bodyPr wrap="none" rtlCol="0">
+              <a:spAutoFit/>
+            </a:bodyPr>
+            <a:lstStyle/>
+            <a:p>
+              <a:r>
+                <a:rPr lang="en-US" b="1" dirty="0" smtClean="0">
+                  <a:ln w="12700">
+                    <a:solidFill>
+                      <a:schemeClr val="bg1"/>
+                    </a:solidFill>
+                  </a:ln>
+                  <a:solidFill>
+                    <a:srgbClr val="0070C0"/>
+                  </a:solidFill>
+                  <a:latin typeface="Rockwell Extra Bold" pitchFamily="18" charset="0"/>
+                </a:rPr>
+                <a:t>?</a:t>
+              </a:r>
+              <a:endParaRPr lang="en-SG" b="1" dirty="0">
+                <a:ln w="12700">
+                  <a:solidFill>
+                    <a:schemeClr val="bg1"/>
+                  </a:solidFill>
+                </a:ln>
+                <a:solidFill>
+                  <a:srgbClr val="0070C0"/>
+                </a:solidFill>
+                <a:latin typeface="Rockwell Extra Bold" pitchFamily="18" charset="0"/>
+              </a:endParaRPr>
+            </a:p>
+          </p:txBody>
+        </p:sp>
+      </p:grpSp>
+      <p:grpSp>
+        <p:nvGrpSpPr>
+          <p:cNvPr id="117" name="Group 116"/>
+          <p:cNvGrpSpPr/>
+          <p:nvPr/>
+        </p:nvGrpSpPr>
+        <p:grpSpPr>
+          <a:xfrm>
+            <a:off x="2780962" y="1249123"/>
+            <a:ext cx="190500" cy="190500"/>
+            <a:chOff x="3001076" y="1269587"/>
+            <a:chExt cx="190500" cy="190500"/>
+          </a:xfrm>
+        </p:grpSpPr>
+        <p:sp>
+          <p:nvSpPr>
+            <p:cNvPr id="213" name="Oval 212"/>
+            <p:cNvSpPr/>
+            <p:nvPr/>
+          </p:nvSpPr>
+          <p:spPr>
+            <a:xfrm>
+              <a:off x="3001076" y="1269587"/>
+              <a:ext cx="190500" cy="190500"/>
+            </a:xfrm>
+            <a:prstGeom prst="ellipse">
+              <a:avLst/>
+            </a:prstGeom>
+            <a:solidFill>
+              <a:schemeClr val="accent6"/>
+            </a:solidFill>
+            <a:ln>
+              <a:noFill/>
+            </a:ln>
+          </p:spPr>
+          <p:style>
+            <a:lnRef idx="2">
+              <a:schemeClr val="accent1">
+                <a:shade val="50000"/>
+              </a:schemeClr>
+            </a:lnRef>
+            <a:fillRef idx="1">
+              <a:schemeClr val="accent1"/>
+            </a:fillRef>
+            <a:effectRef idx="0">
+              <a:schemeClr val="accent1"/>
+            </a:effectRef>
+            <a:fontRef idx="minor">
+              <a:schemeClr val="lt1"/>
+            </a:fontRef>
+          </p:style>
+          <p:txBody>
+            <a:bodyPr rtlCol="0" anchor="ctr"/>
+            <a:lstStyle/>
+            <a:p>
+              <a:pPr algn="ctr"/>
+              <a:endParaRPr lang="en-SG"/>
+            </a:p>
+          </p:txBody>
+        </p:sp>
+        <p:sp>
+          <p:nvSpPr>
+            <p:cNvPr id="217" name="Rectangle 216"/>
+            <p:cNvSpPr/>
+            <p:nvPr/>
+          </p:nvSpPr>
+          <p:spPr>
+            <a:xfrm>
+              <a:off x="3058269" y="1303871"/>
+              <a:ext cx="103920" cy="74655"/>
+            </a:xfrm>
+            <a:prstGeom prst="rect">
+              <a:avLst/>
+            </a:prstGeom>
+            <a:solidFill>
+              <a:srgbClr val="00589A">
+                <a:alpha val="60784"/>
+              </a:srgbClr>
+            </a:solidFill>
+            <a:ln w="6350">
+              <a:solidFill>
+                <a:schemeClr val="bg1"/>
+              </a:solidFill>
+              <a:miter lim="800000"/>
+            </a:ln>
+          </p:spPr>
+          <p:style>
+            <a:lnRef idx="2">
+              <a:schemeClr val="accent1">
+                <a:shade val="50000"/>
+              </a:schemeClr>
+            </a:lnRef>
+            <a:fillRef idx="1">
+              <a:schemeClr val="accent1"/>
+            </a:fillRef>
+            <a:effectRef idx="0">
+              <a:schemeClr val="accent1"/>
+            </a:effectRef>
+            <a:fontRef idx="minor">
+              <a:schemeClr val="lt1"/>
+            </a:fontRef>
+          </p:style>
+          <p:txBody>
+            <a:bodyPr rtlCol="0" anchor="ctr"/>
+            <a:lstStyle/>
+            <a:p>
+              <a:pPr algn="ctr"/>
+              <a:endParaRPr lang="en-US"/>
+            </a:p>
+          </p:txBody>
+        </p:sp>
+        <p:sp>
+          <p:nvSpPr>
+            <p:cNvPr id="218" name="Rectangle 217"/>
+            <p:cNvSpPr/>
+            <p:nvPr/>
+          </p:nvSpPr>
+          <p:spPr>
+            <a:xfrm>
+              <a:off x="3044204" y="1327509"/>
+              <a:ext cx="103920" cy="74655"/>
+            </a:xfrm>
+            <a:prstGeom prst="rect">
+              <a:avLst/>
+            </a:prstGeom>
+            <a:solidFill>
+              <a:srgbClr val="00589A">
+                <a:alpha val="60784"/>
+              </a:srgbClr>
+            </a:solidFill>
+            <a:ln w="6350">
+              <a:solidFill>
+                <a:schemeClr val="bg1"/>
+              </a:solidFill>
+              <a:miter lim="800000"/>
+            </a:ln>
+          </p:spPr>
+          <p:style>
+            <a:lnRef idx="2">
+              <a:schemeClr val="accent1">
+                <a:shade val="50000"/>
+              </a:schemeClr>
+            </a:lnRef>
+            <a:fillRef idx="1">
+              <a:schemeClr val="accent1"/>
+            </a:fillRef>
+            <a:effectRef idx="0">
+              <a:schemeClr val="accent1"/>
+            </a:effectRef>
+            <a:fontRef idx="minor">
+              <a:schemeClr val="lt1"/>
+            </a:fontRef>
+          </p:style>
+          <p:txBody>
+            <a:bodyPr rtlCol="0" anchor="ctr"/>
+            <a:lstStyle/>
+            <a:p>
+              <a:pPr algn="ctr"/>
+              <a:endParaRPr lang="en-US"/>
+            </a:p>
+          </p:txBody>
+        </p:sp>
+        <p:sp>
+          <p:nvSpPr>
+            <p:cNvPr id="219" name="Rectangle 218"/>
+            <p:cNvSpPr/>
+            <p:nvPr/>
+          </p:nvSpPr>
+          <p:spPr>
+            <a:xfrm>
+              <a:off x="3030456" y="1349655"/>
+              <a:ext cx="103920" cy="74655"/>
+            </a:xfrm>
+            <a:prstGeom prst="rect">
+              <a:avLst/>
+            </a:prstGeom>
+            <a:solidFill>
+              <a:srgbClr val="00589A">
+                <a:alpha val="60784"/>
+              </a:srgbClr>
+            </a:solidFill>
+            <a:ln w="6350">
+              <a:solidFill>
+                <a:schemeClr val="bg1"/>
+              </a:solidFill>
+              <a:miter lim="800000"/>
+            </a:ln>
+          </p:spPr>
+          <p:style>
+            <a:lnRef idx="2">
+              <a:schemeClr val="accent1">
+                <a:shade val="50000"/>
+              </a:schemeClr>
+            </a:lnRef>
+            <a:fillRef idx="1">
+              <a:schemeClr val="accent1"/>
+            </a:fillRef>
+            <a:effectRef idx="0">
+              <a:schemeClr val="accent1"/>
+            </a:effectRef>
+            <a:fontRef idx="minor">
+              <a:schemeClr val="lt1"/>
+            </a:fontRef>
+          </p:style>
+          <p:txBody>
+            <a:bodyPr rtlCol="0" anchor="ctr"/>
+            <a:lstStyle/>
+            <a:p>
+              <a:pPr algn="ctr"/>
+              <a:endParaRPr lang="en-US"/>
+            </a:p>
+          </p:txBody>
+        </p:sp>
+      </p:grpSp>
+      <p:sp>
+        <p:nvSpPr>
+          <p:cNvPr id="222" name="TextBox 221"/>
+          <p:cNvSpPr txBox="1"/>
+          <p:nvPr/>
+        </p:nvSpPr>
+        <p:spPr>
+          <a:xfrm>
+            <a:off x="428483" y="457200"/>
+            <a:ext cx="3502684" cy="369332"/>
+          </a:xfrm>
+          <a:prstGeom prst="rect">
+            <a:avLst/>
+          </a:prstGeom>
+          <a:noFill/>
+        </p:spPr>
+        <p:txBody>
+          <a:bodyPr wrap="square" rtlCol="0">
+            <a:spAutoFit/>
+          </a:bodyPr>
+          <a:lstStyle/>
+          <a:p>
+            <a:r>
+              <a:rPr lang="en-US" dirty="0" smtClean="0"/>
+              <a:t>Minimized Icons</a:t>
+            </a:r>
+            <a:endParaRPr lang="en-SG" dirty="0"/>
+          </a:p>
+        </p:txBody>
+      </p:sp>
+      <p:sp>
+        <p:nvSpPr>
+          <p:cNvPr id="223" name="TextBox 222"/>
+          <p:cNvSpPr txBox="1"/>
+          <p:nvPr/>
+        </p:nvSpPr>
+        <p:spPr>
+          <a:xfrm>
+            <a:off x="1485585" y="1403846"/>
+            <a:ext cx="399550" cy="184666"/>
+          </a:xfrm>
+          <a:prstGeom prst="rect">
+            <a:avLst/>
+          </a:prstGeom>
+          <a:noFill/>
+        </p:spPr>
+        <p:txBody>
+          <a:bodyPr wrap="square" rtlCol="0">
+            <a:spAutoFit/>
+          </a:bodyPr>
+          <a:lstStyle/>
+          <a:p>
+            <a:pPr algn="ctr"/>
+            <a:r>
+              <a:rPr lang="en-US" sz="300" dirty="0" smtClean="0"/>
+              <a:t>Narrations Lab</a:t>
+            </a:r>
+            <a:endParaRPr lang="en-SG" sz="300" dirty="0"/>
+          </a:p>
+        </p:txBody>
+      </p:sp>
+      <p:sp>
+        <p:nvSpPr>
+          <p:cNvPr id="224" name="TextBox 223"/>
+          <p:cNvSpPr txBox="1"/>
+          <p:nvPr/>
+        </p:nvSpPr>
+        <p:spPr>
+          <a:xfrm>
+            <a:off x="1772438" y="1403846"/>
+            <a:ext cx="399550" cy="138499"/>
+          </a:xfrm>
+          <a:prstGeom prst="rect">
+            <a:avLst/>
+          </a:prstGeom>
+          <a:noFill/>
+        </p:spPr>
+        <p:txBody>
+          <a:bodyPr wrap="square" rtlCol="0">
+            <a:spAutoFit/>
+          </a:bodyPr>
+          <a:lstStyle/>
+          <a:p>
+            <a:pPr algn="ctr"/>
+            <a:r>
+              <a:rPr lang="en-US" sz="300" dirty="0" smtClean="0"/>
+              <a:t>Captions Lab</a:t>
+            </a:r>
+            <a:endParaRPr lang="en-SG" sz="300" dirty="0"/>
+          </a:p>
+        </p:txBody>
+      </p:sp>
+      <p:sp>
+        <p:nvSpPr>
+          <p:cNvPr id="225" name="TextBox 224"/>
+          <p:cNvSpPr txBox="1"/>
+          <p:nvPr/>
+        </p:nvSpPr>
+        <p:spPr>
+          <a:xfrm>
+            <a:off x="2059643" y="1403846"/>
+            <a:ext cx="399550" cy="138499"/>
+          </a:xfrm>
+          <a:prstGeom prst="rect">
+            <a:avLst/>
+          </a:prstGeom>
+          <a:noFill/>
+        </p:spPr>
+        <p:txBody>
+          <a:bodyPr wrap="square" rtlCol="0">
+            <a:spAutoFit/>
+          </a:bodyPr>
+          <a:lstStyle/>
+          <a:p>
+            <a:pPr algn="ctr"/>
+            <a:r>
+              <a:rPr lang="en-US" sz="300" dirty="0" smtClean="0"/>
+              <a:t>Highlight Lab</a:t>
+            </a:r>
+            <a:endParaRPr lang="en-SG" sz="300" dirty="0"/>
+          </a:p>
+        </p:txBody>
+      </p:sp>
+      <p:sp>
+        <p:nvSpPr>
+          <p:cNvPr id="226" name="TextBox 225"/>
+          <p:cNvSpPr txBox="1"/>
+          <p:nvPr/>
+        </p:nvSpPr>
+        <p:spPr>
+          <a:xfrm>
+            <a:off x="2352480" y="1407144"/>
+            <a:ext cx="399550" cy="138499"/>
+          </a:xfrm>
+          <a:prstGeom prst="rect">
+            <a:avLst/>
+          </a:prstGeom>
+          <a:noFill/>
+        </p:spPr>
+        <p:txBody>
+          <a:bodyPr wrap="square" rtlCol="0">
+            <a:spAutoFit/>
+          </a:bodyPr>
+          <a:lstStyle/>
+          <a:p>
+            <a:pPr algn="ctr"/>
+            <a:r>
+              <a:rPr lang="en-US" sz="300" dirty="0" smtClean="0"/>
+              <a:t>Help</a:t>
+            </a:r>
+            <a:endParaRPr lang="en-SG" sz="300" dirty="0"/>
+          </a:p>
+        </p:txBody>
+      </p:sp>
+      <p:sp>
+        <p:nvSpPr>
+          <p:cNvPr id="227" name="TextBox 226"/>
+          <p:cNvSpPr txBox="1"/>
+          <p:nvPr/>
+        </p:nvSpPr>
+        <p:spPr>
+          <a:xfrm>
+            <a:off x="2682625" y="1403846"/>
+            <a:ext cx="399550" cy="138499"/>
+          </a:xfrm>
+          <a:prstGeom prst="rect">
+            <a:avLst/>
+          </a:prstGeom>
+          <a:noFill/>
+        </p:spPr>
+        <p:txBody>
+          <a:bodyPr wrap="square" rtlCol="0">
+            <a:spAutoFit/>
+          </a:bodyPr>
+          <a:lstStyle/>
+          <a:p>
+            <a:pPr algn="ctr"/>
+            <a:r>
+              <a:rPr lang="en-US" sz="300" dirty="0" smtClean="0"/>
+              <a:t>More Labs</a:t>
+            </a:r>
+            <a:endParaRPr lang="en-SG" sz="300" dirty="0"/>
+          </a:p>
+        </p:txBody>
+      </p:sp>
+      <p:sp>
+        <p:nvSpPr>
+          <p:cNvPr id="228" name="TextBox 227"/>
+          <p:cNvSpPr txBox="1"/>
+          <p:nvPr/>
+        </p:nvSpPr>
+        <p:spPr>
+          <a:xfrm>
+            <a:off x="2960049" y="1398373"/>
+            <a:ext cx="399550" cy="138499"/>
+          </a:xfrm>
+          <a:prstGeom prst="rect">
+            <a:avLst/>
+          </a:prstGeom>
+          <a:noFill/>
+        </p:spPr>
+        <p:txBody>
+          <a:bodyPr wrap="square" rtlCol="0">
+            <a:spAutoFit/>
+          </a:bodyPr>
+          <a:lstStyle/>
+          <a:p>
+            <a:pPr algn="ctr"/>
+            <a:r>
+              <a:rPr lang="en-US" sz="300" dirty="0" smtClean="0"/>
+              <a:t>Crop Lab</a:t>
+            </a:r>
+            <a:endParaRPr lang="en-SG" sz="300" dirty="0"/>
+          </a:p>
+        </p:txBody>
+      </p:sp>
+      <p:grpSp>
+        <p:nvGrpSpPr>
+          <p:cNvPr id="3" name="Group 2"/>
+          <p:cNvGrpSpPr/>
+          <p:nvPr/>
+        </p:nvGrpSpPr>
+        <p:grpSpPr>
+          <a:xfrm>
+            <a:off x="3061537" y="1249656"/>
+            <a:ext cx="190500" cy="190500"/>
+            <a:chOff x="3066293" y="1648512"/>
+            <a:chExt cx="190500" cy="190500"/>
+          </a:xfrm>
+        </p:grpSpPr>
+        <p:sp>
+          <p:nvSpPr>
+            <p:cNvPr id="91" name="Oval 90"/>
+            <p:cNvSpPr/>
+            <p:nvPr/>
+          </p:nvSpPr>
+          <p:spPr>
+            <a:xfrm>
+              <a:off x="3066293" y="1648512"/>
+              <a:ext cx="190500" cy="190500"/>
+            </a:xfrm>
+            <a:prstGeom prst="ellipse">
+              <a:avLst/>
+            </a:prstGeom>
+            <a:solidFill>
+              <a:schemeClr val="accent6"/>
+            </a:solidFill>
+            <a:ln>
+              <a:noFill/>
+            </a:ln>
+          </p:spPr>
+          <p:style>
+            <a:lnRef idx="2">
+              <a:schemeClr val="accent1">
+                <a:shade val="50000"/>
+              </a:schemeClr>
+            </a:lnRef>
+            <a:fillRef idx="1">
+              <a:schemeClr val="accent1"/>
+            </a:fillRef>
+            <a:effectRef idx="0">
+              <a:schemeClr val="accent1"/>
+            </a:effectRef>
+            <a:fontRef idx="minor">
+              <a:schemeClr val="lt1"/>
+            </a:fontRef>
+          </p:style>
+          <p:txBody>
+            <a:bodyPr rtlCol="0" anchor="ctr"/>
+            <a:lstStyle/>
+            <a:p>
+              <a:pPr algn="ctr"/>
+              <a:endParaRPr lang="en-SG"/>
+            </a:p>
+          </p:txBody>
+        </p:sp>
+        <p:grpSp>
+          <p:nvGrpSpPr>
+            <p:cNvPr id="2" name="Group 1"/>
+            <p:cNvGrpSpPr>
+              <a:grpSpLocks noChangeAspect="1"/>
+            </p:cNvGrpSpPr>
+            <p:nvPr/>
+          </p:nvGrpSpPr>
+          <p:grpSpPr>
+            <a:xfrm>
+              <a:off x="3122012" y="1711364"/>
+              <a:ext cx="86400" cy="80042"/>
+              <a:chOff x="2094461" y="2218013"/>
+              <a:chExt cx="662370" cy="613620"/>
+            </a:xfrm>
+          </p:grpSpPr>
+          <p:sp>
+            <p:nvSpPr>
+              <p:cNvPr id="92" name="Freeform 91"/>
+              <p:cNvSpPr/>
+              <p:nvPr/>
+            </p:nvSpPr>
+            <p:spPr>
+              <a:xfrm>
+                <a:off x="2239334" y="2399817"/>
+                <a:ext cx="517497" cy="429107"/>
+              </a:xfrm>
+              <a:custGeom>
+                <a:avLst/>
+                <a:gdLst>
+                  <a:gd name="connsiteX0" fmla="*/ 285750 w 292100"/>
+                  <a:gd name="connsiteY0" fmla="*/ 0 h 330200"/>
+                  <a:gd name="connsiteX1" fmla="*/ 177800 w 292100"/>
+                  <a:gd name="connsiteY1" fmla="*/ 111125 h 330200"/>
+                  <a:gd name="connsiteX2" fmla="*/ 0 w 292100"/>
+                  <a:gd name="connsiteY2" fmla="*/ 165100 h 330200"/>
+                  <a:gd name="connsiteX3" fmla="*/ 12700 w 292100"/>
+                  <a:gd name="connsiteY3" fmla="*/ 330200 h 330200"/>
+                  <a:gd name="connsiteX4" fmla="*/ 292100 w 292100"/>
+                  <a:gd name="connsiteY4" fmla="*/ 330200 h 330200"/>
+                  <a:gd name="connsiteX5" fmla="*/ 285750 w 292100"/>
+                  <a:gd name="connsiteY5" fmla="*/ 0 h 330200"/>
+                  <a:gd name="connsiteX0" fmla="*/ 285750 w 292100"/>
+                  <a:gd name="connsiteY0" fmla="*/ 6846 h 337046"/>
+                  <a:gd name="connsiteX1" fmla="*/ 177800 w 292100"/>
+                  <a:gd name="connsiteY1" fmla="*/ 117971 h 337046"/>
+                  <a:gd name="connsiteX2" fmla="*/ 0 w 292100"/>
+                  <a:gd name="connsiteY2" fmla="*/ 171946 h 337046"/>
+                  <a:gd name="connsiteX3" fmla="*/ 12700 w 292100"/>
+                  <a:gd name="connsiteY3" fmla="*/ 337046 h 337046"/>
+                  <a:gd name="connsiteX4" fmla="*/ 292100 w 292100"/>
+                  <a:gd name="connsiteY4" fmla="*/ 337046 h 337046"/>
+                  <a:gd name="connsiteX5" fmla="*/ 285750 w 292100"/>
+                  <a:gd name="connsiteY5" fmla="*/ 6846 h 337046"/>
+                  <a:gd name="connsiteX0" fmla="*/ 285750 w 292100"/>
+                  <a:gd name="connsiteY0" fmla="*/ 7451 h 337651"/>
+                  <a:gd name="connsiteX1" fmla="*/ 177800 w 292100"/>
+                  <a:gd name="connsiteY1" fmla="*/ 118576 h 337651"/>
+                  <a:gd name="connsiteX2" fmla="*/ 0 w 292100"/>
+                  <a:gd name="connsiteY2" fmla="*/ 172551 h 337651"/>
+                  <a:gd name="connsiteX3" fmla="*/ 12700 w 292100"/>
+                  <a:gd name="connsiteY3" fmla="*/ 337651 h 337651"/>
+                  <a:gd name="connsiteX4" fmla="*/ 292100 w 292100"/>
+                  <a:gd name="connsiteY4" fmla="*/ 337651 h 337651"/>
+                  <a:gd name="connsiteX5" fmla="*/ 285750 w 292100"/>
+                  <a:gd name="connsiteY5" fmla="*/ 7451 h 337651"/>
+                  <a:gd name="connsiteX0" fmla="*/ 307975 w 308535"/>
+                  <a:gd name="connsiteY0" fmla="*/ 6176 h 355426"/>
+                  <a:gd name="connsiteX1" fmla="*/ 177800 w 308535"/>
+                  <a:gd name="connsiteY1" fmla="*/ 136351 h 355426"/>
+                  <a:gd name="connsiteX2" fmla="*/ 0 w 308535"/>
+                  <a:gd name="connsiteY2" fmla="*/ 190326 h 355426"/>
+                  <a:gd name="connsiteX3" fmla="*/ 12700 w 308535"/>
+                  <a:gd name="connsiteY3" fmla="*/ 355426 h 355426"/>
+                  <a:gd name="connsiteX4" fmla="*/ 292100 w 308535"/>
+                  <a:gd name="connsiteY4" fmla="*/ 355426 h 355426"/>
+                  <a:gd name="connsiteX5" fmla="*/ 307975 w 308535"/>
+                  <a:gd name="connsiteY5" fmla="*/ 6176 h 355426"/>
+                </a:gdLst>
+                <a:ahLst/>
+                <a:cxnLst>
+                  <a:cxn ang="0">
+                    <a:pos x="connsiteX0" y="connsiteY0"/>
+                  </a:cxn>
+                  <a:cxn ang="0">
+                    <a:pos x="connsiteX1" y="connsiteY1"/>
+                  </a:cxn>
+                  <a:cxn ang="0">
+                    <a:pos x="connsiteX2" y="connsiteY2"/>
+                  </a:cxn>
+                  <a:cxn ang="0">
+                    <a:pos x="connsiteX3" y="connsiteY3"/>
+                  </a:cxn>
+                  <a:cxn ang="0">
+                    <a:pos x="connsiteX4" y="connsiteY4"/>
+                  </a:cxn>
+                  <a:cxn ang="0">
+                    <a:pos x="connsiteX5" y="connsiteY5"/>
+                  </a:cxn>
+                </a:cxnLst>
+                <a:rect l="l" t="t" r="r" b="b"/>
+                <a:pathLst>
+                  <a:path w="308535" h="355426">
+                    <a:moveTo>
+                      <a:pt x="307975" y="6176"/>
+                    </a:moveTo>
+                    <a:cubicBezTo>
+                      <a:pt x="288925" y="-30336"/>
+                      <a:pt x="229129" y="105659"/>
+                      <a:pt x="177800" y="136351"/>
+                    </a:cubicBezTo>
+                    <a:cubicBezTo>
+                      <a:pt x="126471" y="167043"/>
+                      <a:pt x="27517" y="153814"/>
+                      <a:pt x="0" y="190326"/>
+                    </a:cubicBezTo>
+                    <a:lnTo>
+                      <a:pt x="12700" y="355426"/>
+                    </a:lnTo>
+                    <a:lnTo>
+                      <a:pt x="292100" y="355426"/>
+                    </a:lnTo>
+                    <a:cubicBezTo>
+                      <a:pt x="291042" y="245359"/>
+                      <a:pt x="312208" y="116243"/>
+                      <a:pt x="307975" y="6176"/>
+                    </a:cubicBezTo>
+                    <a:close/>
+                  </a:path>
+                </a:pathLst>
+              </a:custGeom>
+              <a:solidFill>
+                <a:schemeClr val="bg1"/>
+              </a:solidFill>
+              <a:ln w="19050">
+                <a:noFill/>
+              </a:ln>
+              <a:effectLst/>
+            </p:spPr>
+            <p:style>
+              <a:lnRef idx="2">
+                <a:schemeClr val="accent1">
+                  <a:shade val="50000"/>
+                </a:schemeClr>
+              </a:lnRef>
+              <a:fillRef idx="1">
+                <a:schemeClr val="accent1"/>
+              </a:fillRef>
+              <a:effectRef idx="0">
+                <a:schemeClr val="accent1"/>
+              </a:effectRef>
+              <a:fontRef idx="minor">
+                <a:schemeClr val="lt1"/>
+              </a:fontRef>
+            </p:style>
+            <p:txBody>
+              <a:bodyPr rtlCol="0" anchor="ctr"/>
+              <a:lstStyle/>
+              <a:p>
+                <a:pPr algn="ctr"/>
+                <a:endParaRPr lang="en-SG"/>
+              </a:p>
+            </p:txBody>
+          </p:sp>
+          <p:sp>
+            <p:nvSpPr>
+              <p:cNvPr id="93" name="Flowchart: Connector 92"/>
+              <p:cNvSpPr/>
+              <p:nvPr/>
+            </p:nvSpPr>
+            <p:spPr>
+              <a:xfrm>
+                <a:off x="2150116" y="2218013"/>
+                <a:ext cx="273109" cy="273109"/>
+              </a:xfrm>
+              <a:prstGeom prst="flowChartConnector">
+                <a:avLst/>
+              </a:prstGeom>
+              <a:solidFill>
+                <a:schemeClr val="bg1"/>
+              </a:solidFill>
+              <a:ln w="19050">
+                <a:noFill/>
+              </a:ln>
+              <a:effectLst/>
+            </p:spPr>
+            <p:style>
+              <a:lnRef idx="2">
+                <a:schemeClr val="accent1">
+                  <a:shade val="50000"/>
+                </a:schemeClr>
+              </a:lnRef>
+              <a:fillRef idx="1">
+                <a:schemeClr val="accent1"/>
+              </a:fillRef>
+              <a:effectRef idx="0">
+                <a:schemeClr val="accent1"/>
+              </a:effectRef>
+              <a:fontRef idx="minor">
+                <a:schemeClr val="lt1"/>
+              </a:fontRef>
+            </p:style>
+            <p:txBody>
+              <a:bodyPr rtlCol="0" anchor="ctr"/>
+              <a:lstStyle/>
+              <a:p>
+                <a:pPr algn="ctr"/>
+                <a:endParaRPr lang="en-SG"/>
+              </a:p>
+            </p:txBody>
+          </p:sp>
+          <p:sp>
+            <p:nvSpPr>
+              <p:cNvPr id="94" name="Freeform 93"/>
+              <p:cNvSpPr/>
+              <p:nvPr/>
+            </p:nvSpPr>
+            <p:spPr>
+              <a:xfrm>
+                <a:off x="2094461" y="2530475"/>
+                <a:ext cx="657530" cy="301158"/>
+              </a:xfrm>
+              <a:custGeom>
+                <a:avLst/>
+                <a:gdLst>
+                  <a:gd name="connsiteX0" fmla="*/ 0 w 660400"/>
+                  <a:gd name="connsiteY0" fmla="*/ 158750 h 384175"/>
+                  <a:gd name="connsiteX1" fmla="*/ 206375 w 660400"/>
+                  <a:gd name="connsiteY1" fmla="*/ 0 h 384175"/>
+                  <a:gd name="connsiteX2" fmla="*/ 660400 w 660400"/>
+                  <a:gd name="connsiteY2" fmla="*/ 269875 h 384175"/>
+                  <a:gd name="connsiteX3" fmla="*/ 657225 w 660400"/>
+                  <a:gd name="connsiteY3" fmla="*/ 384175 h 384175"/>
+                  <a:gd name="connsiteX4" fmla="*/ 155575 w 660400"/>
+                  <a:gd name="connsiteY4" fmla="*/ 384175 h 384175"/>
+                  <a:gd name="connsiteX5" fmla="*/ 63500 w 660400"/>
+                  <a:gd name="connsiteY5" fmla="*/ 361950 h 384175"/>
+                  <a:gd name="connsiteX6" fmla="*/ 0 w 660400"/>
+                  <a:gd name="connsiteY6" fmla="*/ 288925 h 384175"/>
+                  <a:gd name="connsiteX7" fmla="*/ 0 w 660400"/>
+                  <a:gd name="connsiteY7" fmla="*/ 158750 h 384175"/>
+                  <a:gd name="connsiteX0" fmla="*/ 0 w 660400"/>
+                  <a:gd name="connsiteY0" fmla="*/ 160553 h 385978"/>
+                  <a:gd name="connsiteX1" fmla="*/ 206375 w 660400"/>
+                  <a:gd name="connsiteY1" fmla="*/ 1803 h 385978"/>
+                  <a:gd name="connsiteX2" fmla="*/ 660400 w 660400"/>
+                  <a:gd name="connsiteY2" fmla="*/ 271678 h 385978"/>
+                  <a:gd name="connsiteX3" fmla="*/ 657225 w 660400"/>
+                  <a:gd name="connsiteY3" fmla="*/ 385978 h 385978"/>
+                  <a:gd name="connsiteX4" fmla="*/ 155575 w 660400"/>
+                  <a:gd name="connsiteY4" fmla="*/ 385978 h 385978"/>
+                  <a:gd name="connsiteX5" fmla="*/ 63500 w 660400"/>
+                  <a:gd name="connsiteY5" fmla="*/ 363753 h 385978"/>
+                  <a:gd name="connsiteX6" fmla="*/ 0 w 660400"/>
+                  <a:gd name="connsiteY6" fmla="*/ 290728 h 385978"/>
+                  <a:gd name="connsiteX7" fmla="*/ 0 w 660400"/>
+                  <a:gd name="connsiteY7" fmla="*/ 160553 h 385978"/>
+                  <a:gd name="connsiteX0" fmla="*/ 0 w 660400"/>
+                  <a:gd name="connsiteY0" fmla="*/ 158961 h 384386"/>
+                  <a:gd name="connsiteX1" fmla="*/ 206375 w 660400"/>
+                  <a:gd name="connsiteY1" fmla="*/ 211 h 384386"/>
+                  <a:gd name="connsiteX2" fmla="*/ 660400 w 660400"/>
+                  <a:gd name="connsiteY2" fmla="*/ 270086 h 384386"/>
+                  <a:gd name="connsiteX3" fmla="*/ 657225 w 660400"/>
+                  <a:gd name="connsiteY3" fmla="*/ 384386 h 384386"/>
+                  <a:gd name="connsiteX4" fmla="*/ 155575 w 660400"/>
+                  <a:gd name="connsiteY4" fmla="*/ 384386 h 384386"/>
+                  <a:gd name="connsiteX5" fmla="*/ 63500 w 660400"/>
+                  <a:gd name="connsiteY5" fmla="*/ 362161 h 384386"/>
+                  <a:gd name="connsiteX6" fmla="*/ 0 w 660400"/>
+                  <a:gd name="connsiteY6" fmla="*/ 289136 h 384386"/>
+                  <a:gd name="connsiteX7" fmla="*/ 0 w 660400"/>
+                  <a:gd name="connsiteY7" fmla="*/ 158961 h 384386"/>
+                  <a:gd name="connsiteX0" fmla="*/ 0 w 660400"/>
+                  <a:gd name="connsiteY0" fmla="*/ 159089 h 384514"/>
+                  <a:gd name="connsiteX1" fmla="*/ 206375 w 660400"/>
+                  <a:gd name="connsiteY1" fmla="*/ 339 h 384514"/>
+                  <a:gd name="connsiteX2" fmla="*/ 660400 w 660400"/>
+                  <a:gd name="connsiteY2" fmla="*/ 270214 h 384514"/>
+                  <a:gd name="connsiteX3" fmla="*/ 657225 w 660400"/>
+                  <a:gd name="connsiteY3" fmla="*/ 384514 h 384514"/>
+                  <a:gd name="connsiteX4" fmla="*/ 155575 w 660400"/>
+                  <a:gd name="connsiteY4" fmla="*/ 384514 h 384514"/>
+                  <a:gd name="connsiteX5" fmla="*/ 63500 w 660400"/>
+                  <a:gd name="connsiteY5" fmla="*/ 362289 h 384514"/>
+                  <a:gd name="connsiteX6" fmla="*/ 0 w 660400"/>
+                  <a:gd name="connsiteY6" fmla="*/ 289264 h 384514"/>
+                  <a:gd name="connsiteX7" fmla="*/ 0 w 660400"/>
+                  <a:gd name="connsiteY7" fmla="*/ 159089 h 384514"/>
+                  <a:gd name="connsiteX0" fmla="*/ 0 w 660400"/>
+                  <a:gd name="connsiteY0" fmla="*/ 159325 h 384750"/>
+                  <a:gd name="connsiteX1" fmla="*/ 206375 w 660400"/>
+                  <a:gd name="connsiteY1" fmla="*/ 575 h 384750"/>
+                  <a:gd name="connsiteX2" fmla="*/ 455434 w 660400"/>
+                  <a:gd name="connsiteY2" fmla="*/ 112167 h 384750"/>
+                  <a:gd name="connsiteX3" fmla="*/ 660400 w 660400"/>
+                  <a:gd name="connsiteY3" fmla="*/ 270450 h 384750"/>
+                  <a:gd name="connsiteX4" fmla="*/ 657225 w 660400"/>
+                  <a:gd name="connsiteY4" fmla="*/ 384750 h 384750"/>
+                  <a:gd name="connsiteX5" fmla="*/ 155575 w 660400"/>
+                  <a:gd name="connsiteY5" fmla="*/ 384750 h 384750"/>
+                  <a:gd name="connsiteX6" fmla="*/ 63500 w 660400"/>
+                  <a:gd name="connsiteY6" fmla="*/ 362525 h 384750"/>
+                  <a:gd name="connsiteX7" fmla="*/ 0 w 660400"/>
+                  <a:gd name="connsiteY7" fmla="*/ 289500 h 384750"/>
+                  <a:gd name="connsiteX8" fmla="*/ 0 w 660400"/>
+                  <a:gd name="connsiteY8" fmla="*/ 159325 h 384750"/>
+                  <a:gd name="connsiteX0" fmla="*/ 0 w 660400"/>
+                  <a:gd name="connsiteY0" fmla="*/ 159325 h 384750"/>
+                  <a:gd name="connsiteX1" fmla="*/ 206375 w 660400"/>
+                  <a:gd name="connsiteY1" fmla="*/ 575 h 384750"/>
+                  <a:gd name="connsiteX2" fmla="*/ 455434 w 660400"/>
+                  <a:gd name="connsiteY2" fmla="*/ 112167 h 384750"/>
+                  <a:gd name="connsiteX3" fmla="*/ 660400 w 660400"/>
+                  <a:gd name="connsiteY3" fmla="*/ 270450 h 384750"/>
+                  <a:gd name="connsiteX4" fmla="*/ 657225 w 660400"/>
+                  <a:gd name="connsiteY4" fmla="*/ 384750 h 384750"/>
+                  <a:gd name="connsiteX5" fmla="*/ 155575 w 660400"/>
+                  <a:gd name="connsiteY5" fmla="*/ 384750 h 384750"/>
+                  <a:gd name="connsiteX6" fmla="*/ 63500 w 660400"/>
+                  <a:gd name="connsiteY6" fmla="*/ 362525 h 384750"/>
+                  <a:gd name="connsiteX7" fmla="*/ 0 w 660400"/>
+                  <a:gd name="connsiteY7" fmla="*/ 289500 h 384750"/>
+                  <a:gd name="connsiteX8" fmla="*/ 0 w 660400"/>
+                  <a:gd name="connsiteY8" fmla="*/ 159325 h 384750"/>
+                  <a:gd name="connsiteX0" fmla="*/ 0 w 660400"/>
+                  <a:gd name="connsiteY0" fmla="*/ 158753 h 384178"/>
+                  <a:gd name="connsiteX1" fmla="*/ 206375 w 660400"/>
+                  <a:gd name="connsiteY1" fmla="*/ 3 h 384178"/>
+                  <a:gd name="connsiteX2" fmla="*/ 442734 w 660400"/>
+                  <a:gd name="connsiteY2" fmla="*/ 162395 h 384178"/>
+                  <a:gd name="connsiteX3" fmla="*/ 660400 w 660400"/>
+                  <a:gd name="connsiteY3" fmla="*/ 269878 h 384178"/>
+                  <a:gd name="connsiteX4" fmla="*/ 657225 w 660400"/>
+                  <a:gd name="connsiteY4" fmla="*/ 384178 h 384178"/>
+                  <a:gd name="connsiteX5" fmla="*/ 155575 w 660400"/>
+                  <a:gd name="connsiteY5" fmla="*/ 384178 h 384178"/>
+                  <a:gd name="connsiteX6" fmla="*/ 63500 w 660400"/>
+                  <a:gd name="connsiteY6" fmla="*/ 361953 h 384178"/>
+                  <a:gd name="connsiteX7" fmla="*/ 0 w 660400"/>
+                  <a:gd name="connsiteY7" fmla="*/ 288928 h 384178"/>
+                  <a:gd name="connsiteX8" fmla="*/ 0 w 660400"/>
+                  <a:gd name="connsiteY8" fmla="*/ 158753 h 384178"/>
+                  <a:gd name="connsiteX0" fmla="*/ 0 w 660400"/>
+                  <a:gd name="connsiteY0" fmla="*/ 158753 h 384178"/>
+                  <a:gd name="connsiteX1" fmla="*/ 206375 w 660400"/>
+                  <a:gd name="connsiteY1" fmla="*/ 3 h 384178"/>
+                  <a:gd name="connsiteX2" fmla="*/ 442734 w 660400"/>
+                  <a:gd name="connsiteY2" fmla="*/ 162395 h 384178"/>
+                  <a:gd name="connsiteX3" fmla="*/ 660400 w 660400"/>
+                  <a:gd name="connsiteY3" fmla="*/ 269878 h 384178"/>
+                  <a:gd name="connsiteX4" fmla="*/ 657225 w 660400"/>
+                  <a:gd name="connsiteY4" fmla="*/ 384178 h 384178"/>
+                  <a:gd name="connsiteX5" fmla="*/ 155575 w 660400"/>
+                  <a:gd name="connsiteY5" fmla="*/ 384178 h 384178"/>
+                  <a:gd name="connsiteX6" fmla="*/ 63500 w 660400"/>
+                  <a:gd name="connsiteY6" fmla="*/ 361953 h 384178"/>
+                  <a:gd name="connsiteX7" fmla="*/ 0 w 660400"/>
+                  <a:gd name="connsiteY7" fmla="*/ 288928 h 384178"/>
+                  <a:gd name="connsiteX8" fmla="*/ 0 w 660400"/>
+                  <a:gd name="connsiteY8" fmla="*/ 158753 h 384178"/>
+                  <a:gd name="connsiteX0" fmla="*/ 0 w 657530"/>
+                  <a:gd name="connsiteY0" fmla="*/ 158753 h 384178"/>
+                  <a:gd name="connsiteX1" fmla="*/ 206375 w 657530"/>
+                  <a:gd name="connsiteY1" fmla="*/ 3 h 384178"/>
+                  <a:gd name="connsiteX2" fmla="*/ 442734 w 657530"/>
+                  <a:gd name="connsiteY2" fmla="*/ 162395 h 384178"/>
+                  <a:gd name="connsiteX3" fmla="*/ 657225 w 657530"/>
+                  <a:gd name="connsiteY3" fmla="*/ 184153 h 384178"/>
+                  <a:gd name="connsiteX4" fmla="*/ 657225 w 657530"/>
+                  <a:gd name="connsiteY4" fmla="*/ 384178 h 384178"/>
+                  <a:gd name="connsiteX5" fmla="*/ 155575 w 657530"/>
+                  <a:gd name="connsiteY5" fmla="*/ 384178 h 384178"/>
+                  <a:gd name="connsiteX6" fmla="*/ 63500 w 657530"/>
+                  <a:gd name="connsiteY6" fmla="*/ 361953 h 384178"/>
+                  <a:gd name="connsiteX7" fmla="*/ 0 w 657530"/>
+                  <a:gd name="connsiteY7" fmla="*/ 288928 h 384178"/>
+                  <a:gd name="connsiteX8" fmla="*/ 0 w 657530"/>
+                  <a:gd name="connsiteY8" fmla="*/ 158753 h 384178"/>
+                  <a:gd name="connsiteX0" fmla="*/ 0 w 657530"/>
+                  <a:gd name="connsiteY0" fmla="*/ 158753 h 384178"/>
+                  <a:gd name="connsiteX1" fmla="*/ 206375 w 657530"/>
+                  <a:gd name="connsiteY1" fmla="*/ 3 h 384178"/>
+                  <a:gd name="connsiteX2" fmla="*/ 442734 w 657530"/>
+                  <a:gd name="connsiteY2" fmla="*/ 162395 h 384178"/>
+                  <a:gd name="connsiteX3" fmla="*/ 657225 w 657530"/>
+                  <a:gd name="connsiteY3" fmla="*/ 184153 h 384178"/>
+                  <a:gd name="connsiteX4" fmla="*/ 657225 w 657530"/>
+                  <a:gd name="connsiteY4" fmla="*/ 384178 h 384178"/>
+                  <a:gd name="connsiteX5" fmla="*/ 155575 w 657530"/>
+                  <a:gd name="connsiteY5" fmla="*/ 384178 h 384178"/>
+                  <a:gd name="connsiteX6" fmla="*/ 63500 w 657530"/>
+                  <a:gd name="connsiteY6" fmla="*/ 361953 h 384178"/>
+                  <a:gd name="connsiteX7" fmla="*/ 0 w 657530"/>
+                  <a:gd name="connsiteY7" fmla="*/ 288928 h 384178"/>
+                  <a:gd name="connsiteX8" fmla="*/ 0 w 657530"/>
+                  <a:gd name="connsiteY8" fmla="*/ 158753 h 384178"/>
+                  <a:gd name="connsiteX0" fmla="*/ 0 w 657530"/>
+                  <a:gd name="connsiteY0" fmla="*/ 158753 h 384178"/>
+                  <a:gd name="connsiteX1" fmla="*/ 206375 w 657530"/>
+                  <a:gd name="connsiteY1" fmla="*/ 3 h 384178"/>
+                  <a:gd name="connsiteX2" fmla="*/ 442734 w 657530"/>
+                  <a:gd name="connsiteY2" fmla="*/ 162395 h 384178"/>
+                  <a:gd name="connsiteX3" fmla="*/ 657225 w 657530"/>
+                  <a:gd name="connsiteY3" fmla="*/ 184153 h 384178"/>
+                  <a:gd name="connsiteX4" fmla="*/ 657225 w 657530"/>
+                  <a:gd name="connsiteY4" fmla="*/ 384178 h 384178"/>
+                  <a:gd name="connsiteX5" fmla="*/ 155575 w 657530"/>
+                  <a:gd name="connsiteY5" fmla="*/ 384178 h 384178"/>
+                  <a:gd name="connsiteX6" fmla="*/ 63500 w 657530"/>
+                  <a:gd name="connsiteY6" fmla="*/ 361953 h 384178"/>
+                  <a:gd name="connsiteX7" fmla="*/ 0 w 657530"/>
+                  <a:gd name="connsiteY7" fmla="*/ 288928 h 384178"/>
+                  <a:gd name="connsiteX8" fmla="*/ 0 w 657530"/>
+                  <a:gd name="connsiteY8" fmla="*/ 158753 h 384178"/>
+                  <a:gd name="connsiteX0" fmla="*/ 0 w 657530"/>
+                  <a:gd name="connsiteY0" fmla="*/ 158753 h 384178"/>
+                  <a:gd name="connsiteX1" fmla="*/ 206375 w 657530"/>
+                  <a:gd name="connsiteY1" fmla="*/ 3 h 384178"/>
+                  <a:gd name="connsiteX2" fmla="*/ 442734 w 657530"/>
+                  <a:gd name="connsiteY2" fmla="*/ 162395 h 384178"/>
+                  <a:gd name="connsiteX3" fmla="*/ 657225 w 657530"/>
+                  <a:gd name="connsiteY3" fmla="*/ 184153 h 384178"/>
+                  <a:gd name="connsiteX4" fmla="*/ 657225 w 657530"/>
+                  <a:gd name="connsiteY4" fmla="*/ 384178 h 384178"/>
+                  <a:gd name="connsiteX5" fmla="*/ 155575 w 657530"/>
+                  <a:gd name="connsiteY5" fmla="*/ 384178 h 384178"/>
+                  <a:gd name="connsiteX6" fmla="*/ 63500 w 657530"/>
+                  <a:gd name="connsiteY6" fmla="*/ 361953 h 384178"/>
+                  <a:gd name="connsiteX7" fmla="*/ 0 w 657530"/>
+                  <a:gd name="connsiteY7" fmla="*/ 288928 h 384178"/>
+                  <a:gd name="connsiteX8" fmla="*/ 0 w 657530"/>
+                  <a:gd name="connsiteY8" fmla="*/ 158753 h 384178"/>
+                </a:gdLst>
+                <a:ahLst/>
+                <a:cxnLst>
+                  <a:cxn ang="0">
+                    <a:pos x="connsiteX0" y="connsiteY0"/>
+                  </a:cxn>
+                  <a:cxn ang="0">
+                    <a:pos x="connsiteX1" y="connsiteY1"/>
+                  </a:cxn>
+                  <a:cxn ang="0">
+                    <a:pos x="connsiteX2" y="connsiteY2"/>
+                  </a:cxn>
+                  <a:cxn ang="0">
+                    <a:pos x="connsiteX3" y="connsiteY3"/>
+                  </a:cxn>
+                  <a:cxn ang="0">
+                    <a:pos x="connsiteX4" y="connsiteY4"/>
+                  </a:cxn>
+                  <a:cxn ang="0">
+                    <a:pos x="connsiteX5" y="connsiteY5"/>
+                  </a:cxn>
+                  <a:cxn ang="0">
+                    <a:pos x="connsiteX6" y="connsiteY6"/>
+                  </a:cxn>
+                  <a:cxn ang="0">
+                    <a:pos x="connsiteX7" y="connsiteY7"/>
+                  </a:cxn>
+                  <a:cxn ang="0">
+                    <a:pos x="connsiteX8" y="connsiteY8"/>
+                  </a:cxn>
+                </a:cxnLst>
+                <a:rect l="l" t="t" r="r" b="b"/>
+                <a:pathLst>
+                  <a:path w="657530" h="384178">
+                    <a:moveTo>
+                      <a:pt x="0" y="158753"/>
+                    </a:moveTo>
+                    <a:cubicBezTo>
+                      <a:pt x="34396" y="110599"/>
+                      <a:pt x="132586" y="-604"/>
+                      <a:pt x="206375" y="3"/>
+                    </a:cubicBezTo>
+                    <a:cubicBezTo>
+                      <a:pt x="280164" y="610"/>
+                      <a:pt x="367592" y="119003"/>
+                      <a:pt x="442734" y="162395"/>
+                    </a:cubicBezTo>
+                    <a:cubicBezTo>
+                      <a:pt x="517876" y="205787"/>
+                      <a:pt x="579143" y="233973"/>
+                      <a:pt x="657225" y="184153"/>
+                    </a:cubicBezTo>
+                    <a:cubicBezTo>
+                      <a:pt x="656167" y="222253"/>
+                      <a:pt x="658283" y="346078"/>
+                      <a:pt x="657225" y="384178"/>
+                    </a:cubicBezTo>
+                    <a:lnTo>
+                      <a:pt x="155575" y="384178"/>
+                    </a:lnTo>
+                    <a:lnTo>
+                      <a:pt x="63500" y="361953"/>
+                    </a:lnTo>
+                    <a:lnTo>
+                      <a:pt x="0" y="288928"/>
+                    </a:lnTo>
+                    <a:cubicBezTo>
+                      <a:pt x="1058" y="243420"/>
+                      <a:pt x="2117" y="197911"/>
+                      <a:pt x="0" y="158753"/>
+                    </a:cubicBezTo>
+                    <a:close/>
+                  </a:path>
+                </a:pathLst>
+              </a:custGeom>
+              <a:solidFill>
+                <a:srgbClr val="0070C0"/>
+              </a:solidFill>
+              <a:ln w="19050">
+                <a:noFill/>
+              </a:ln>
+              <a:effectLst/>
+            </p:spPr>
+            <p:style>
+              <a:lnRef idx="2">
+                <a:schemeClr val="accent1">
+                  <a:shade val="50000"/>
+                </a:schemeClr>
+              </a:lnRef>
+              <a:fillRef idx="1">
+                <a:schemeClr val="accent1"/>
+              </a:fillRef>
+              <a:effectRef idx="0">
+                <a:schemeClr val="accent1"/>
+              </a:effectRef>
+              <a:fontRef idx="minor">
+                <a:schemeClr val="lt1"/>
+              </a:fontRef>
+            </p:style>
+            <p:txBody>
+              <a:bodyPr rtlCol="0" anchor="ctr"/>
+              <a:lstStyle/>
+              <a:p>
+                <a:pPr algn="ctr"/>
+                <a:endParaRPr lang="en-SG"/>
+              </a:p>
+            </p:txBody>
+          </p:sp>
+        </p:grpSp>
+        <p:cxnSp>
+          <p:nvCxnSpPr>
+            <p:cNvPr id="89" name="Straight Connector 88"/>
+            <p:cNvCxnSpPr/>
+            <p:nvPr/>
+          </p:nvCxnSpPr>
+          <p:spPr>
+            <a:xfrm rot="10800000">
+              <a:off x="3089710" y="1788061"/>
+              <a:ext cx="116176" cy="0"/>
+            </a:xfrm>
+            <a:prstGeom prst="line">
+              <a:avLst/>
+            </a:prstGeom>
+            <a:ln w="12700" cap="sq">
+              <a:solidFill>
+                <a:srgbClr val="0070C0"/>
+              </a:solidFill>
+            </a:ln>
+          </p:spPr>
+          <p:style>
+            <a:lnRef idx="1">
+              <a:schemeClr val="accent1"/>
+            </a:lnRef>
+            <a:fillRef idx="0">
+              <a:schemeClr val="accent1"/>
+            </a:fillRef>
+            <a:effectRef idx="0">
+              <a:schemeClr val="accent1"/>
+            </a:effectRef>
+            <a:fontRef idx="minor">
+              <a:schemeClr val="tx1"/>
+            </a:fontRef>
+          </p:style>
+        </p:cxnSp>
+        <p:cxnSp>
+          <p:nvCxnSpPr>
+            <p:cNvPr id="90" name="Straight Connector 89"/>
+            <p:cNvCxnSpPr/>
+            <p:nvPr/>
+          </p:nvCxnSpPr>
+          <p:spPr>
+            <a:xfrm rot="5400000">
+              <a:off x="3149189" y="1727592"/>
+              <a:ext cx="116176" cy="0"/>
+            </a:xfrm>
+            <a:prstGeom prst="line">
+              <a:avLst/>
+            </a:prstGeom>
+            <a:ln w="12700" cap="sq">
+              <a:solidFill>
+                <a:srgbClr val="0070C0"/>
+              </a:solidFill>
+            </a:ln>
+          </p:spPr>
+          <p:style>
+            <a:lnRef idx="1">
+              <a:schemeClr val="accent1"/>
+            </a:lnRef>
+            <a:fillRef idx="0">
+              <a:schemeClr val="accent1"/>
+            </a:fillRef>
+            <a:effectRef idx="0">
+              <a:schemeClr val="accent1"/>
+            </a:effectRef>
+            <a:fontRef idx="minor">
+              <a:schemeClr val="tx1"/>
+            </a:fontRef>
+          </p:style>
+        </p:cxnSp>
+        <p:cxnSp>
+          <p:nvCxnSpPr>
+            <p:cNvPr id="87" name="Straight Connector 86"/>
+            <p:cNvCxnSpPr/>
+            <p:nvPr/>
+          </p:nvCxnSpPr>
+          <p:spPr>
+            <a:xfrm>
+              <a:off x="3123232" y="1701843"/>
+              <a:ext cx="116177" cy="0"/>
+            </a:xfrm>
+            <a:prstGeom prst="line">
+              <a:avLst/>
+            </a:prstGeom>
+            <a:ln w="12700" cap="sq">
+              <a:solidFill>
+                <a:srgbClr val="0070C0"/>
+              </a:solidFill>
+            </a:ln>
+          </p:spPr>
+          <p:style>
+            <a:lnRef idx="1">
+              <a:schemeClr val="accent1"/>
+            </a:lnRef>
+            <a:fillRef idx="0">
+              <a:schemeClr val="accent1"/>
+            </a:fillRef>
+            <a:effectRef idx="0">
+              <a:schemeClr val="accent1"/>
+            </a:effectRef>
+            <a:fontRef idx="minor">
+              <a:schemeClr val="tx1"/>
+            </a:fontRef>
+          </p:style>
+        </p:cxnSp>
+        <p:cxnSp>
+          <p:nvCxnSpPr>
+            <p:cNvPr id="88" name="Straight Connector 87"/>
+            <p:cNvCxnSpPr/>
+            <p:nvPr/>
+          </p:nvCxnSpPr>
+          <p:spPr>
+            <a:xfrm rot="16200000">
+              <a:off x="3065144" y="1759931"/>
+              <a:ext cx="116176" cy="0"/>
+            </a:xfrm>
+            <a:prstGeom prst="line">
+              <a:avLst/>
+            </a:prstGeom>
+            <a:ln w="12700" cap="sq">
+              <a:solidFill>
+                <a:srgbClr val="0070C0"/>
+              </a:solidFill>
+            </a:ln>
+          </p:spPr>
+          <p:style>
+            <a:lnRef idx="1">
+              <a:schemeClr val="accent1"/>
+            </a:lnRef>
+            <a:fillRef idx="0">
+              <a:schemeClr val="accent1"/>
+            </a:fillRef>
+            <a:effectRef idx="0">
+              <a:schemeClr val="accent1"/>
+            </a:effectRef>
+            <a:fontRef idx="minor">
+              <a:schemeClr val="tx1"/>
+            </a:fontRef>
+          </p:style>
+        </p:cxnSp>
+      </p:grpSp>
+    </p:spTree>
+    <p:extLst>
+      <p:ext uri="{BB962C8B-B14F-4D97-AF65-F5344CB8AC3E}">
+        <p14:creationId xmlns:p14="http://schemas.microsoft.com/office/powerpoint/2010/main" val="1317039341"/>
+      </p:ext>
+    </p:extLst>
+  </p:cSld>
+  <p:clrMapOvr>
+    <a:masterClrMapping/>
+  </p:clrMapOvr>
+  <p:timing>
+    <p:tnLst>
+      <p:par>
+        <p:cTn id="1" dur="indefinite" restart="never" nodeType="tmRoot"/>
+      </p:par>
+    </p:tnLst>
+  </p:timing>
+</p:sld>
+</file>
+
+<file path=ppt/slides/slide3.xml><?xml version="1.0" encoding="utf-8"?>
+<p:sld xmlns:a="http://schemas.openxmlformats.org/drawingml/2006/main" xmlns:r="http://schemas.openxmlformats.org/officeDocument/2006/relationships" xmlns:p="http://schemas.openxmlformats.org/presentationml/2006/main">
+  <p:cSld>
     <p:spTree>
       <p:nvGrpSpPr>
         <p:cNvPr id="1" name=""/>
@@ -14841,19 +16769,9 @@
 </p:sld>
 </file>
 
-<file path=ppt/slides/slide3.xml><?xml version="1.0" encoding="utf-8"?>
+<file path=ppt/slides/slide4.xml><?xml version="1.0" encoding="utf-8"?>
 <p:sld xmlns:a="http://schemas.openxmlformats.org/drawingml/2006/main" xmlns:r="http://schemas.openxmlformats.org/officeDocument/2006/relationships" xmlns:p="http://schemas.openxmlformats.org/presentationml/2006/main">
   <p:cSld>
-    <p:bg>
-      <p:bgPr>
-        <a:solidFill>
-          <a:schemeClr val="bg1">
-            <a:lumMod val="95000"/>
-          </a:schemeClr>
-        </a:solidFill>
-        <a:effectLst/>
-      </p:bgPr>
-    </p:bg>
     <p:spTree>
       <p:nvGrpSpPr>
         <p:cNvPr id="1" name=""/>
@@ -15788,19 +17706,9 @@
 </p:sld>
 </file>
 
-<file path=ppt/slides/slide4.xml><?xml version="1.0" encoding="utf-8"?>
+<file path=ppt/slides/slide5.xml><?xml version="1.0" encoding="utf-8"?>
 <p:sld xmlns:a="http://schemas.openxmlformats.org/drawingml/2006/main" xmlns:r="http://schemas.openxmlformats.org/officeDocument/2006/relationships" xmlns:p="http://schemas.openxmlformats.org/presentationml/2006/main">
   <p:cSld>
-    <p:bg>
-      <p:bgPr>
-        <a:solidFill>
-          <a:schemeClr val="bg1">
-            <a:lumMod val="95000"/>
-          </a:schemeClr>
-        </a:solidFill>
-        <a:effectLst/>
-      </p:bgPr>
-    </p:bg>
     <p:spTree>
       <p:nvGrpSpPr>
         <p:cNvPr id="1" name=""/>
@@ -18018,7 +19926,6 @@
               <a:rPr lang="en-US" sz="1100" dirty="0" smtClean="0"/>
               <a:t>Frosted glass</a:t>
             </a:r>
-            <a:endParaRPr lang="en-US" sz="1100" dirty="0" smtClean="0"/>
           </a:p>
         </p:txBody>
       </p:sp>
@@ -18042,19 +19949,9 @@
 </p:sld>
 </file>
 
-<file path=ppt/slides/slide5.xml><?xml version="1.0" encoding="utf-8"?>
+<file path=ppt/slides/slide6.xml><?xml version="1.0" encoding="utf-8"?>
 <p:sld xmlns:a="http://schemas.openxmlformats.org/drawingml/2006/main" xmlns:r="http://schemas.openxmlformats.org/officeDocument/2006/relationships" xmlns:p="http://schemas.openxmlformats.org/presentationml/2006/main">
   <p:cSld>
-    <p:bg>
-      <p:bgPr>
-        <a:solidFill>
-          <a:schemeClr val="bg1">
-            <a:lumMod val="95000"/>
-          </a:schemeClr>
-        </a:solidFill>
-        <a:effectLst/>
-      </p:bgPr>
-    </p:bg>
     <p:spTree>
       <p:nvGrpSpPr>
         <p:cNvPr id="1" name=""/>
@@ -20780,19 +22677,9 @@
 </p:sld>
 </file>
 
-<file path=ppt/slides/slide6.xml><?xml version="1.0" encoding="utf-8"?>
+<file path=ppt/slides/slide7.xml><?xml version="1.0" encoding="utf-8"?>
 <p:sld xmlns:a="http://schemas.openxmlformats.org/drawingml/2006/main" xmlns:r="http://schemas.openxmlformats.org/officeDocument/2006/relationships" xmlns:p="http://schemas.openxmlformats.org/presentationml/2006/main">
   <p:cSld>
-    <p:bg>
-      <p:bgPr>
-        <a:solidFill>
-          <a:schemeClr val="bg1">
-            <a:lumMod val="95000"/>
-          </a:schemeClr>
-        </a:solidFill>
-        <a:effectLst/>
-      </p:bgPr>
-    </p:bg>
     <p:spTree>
       <p:nvGrpSpPr>
         <p:cNvPr id="1" name=""/>
@@ -21661,19 +23548,468 @@
 </p:sld>
 </file>
 
-<file path=ppt/slides/slide7.xml><?xml version="1.0" encoding="utf-8"?>
+<file path=ppt/slides/slide8.xml><?xml version="1.0" encoding="utf-8"?>
 <p:sld xmlns:a="http://schemas.openxmlformats.org/drawingml/2006/main" xmlns:r="http://schemas.openxmlformats.org/officeDocument/2006/relationships" xmlns:p="http://schemas.openxmlformats.org/presentationml/2006/main">
   <p:cSld>
-    <p:bg>
-      <p:bgPr>
-        <a:solidFill>
-          <a:schemeClr val="bg1">
-            <a:lumMod val="95000"/>
-          </a:schemeClr>
-        </a:solidFill>
-        <a:effectLst/>
-      </p:bgPr>
-    </p:bg>
+    <p:spTree>
+      <p:nvGrpSpPr>
+        <p:cNvPr id="1" name=""/>
+        <p:cNvGrpSpPr/>
+        <p:nvPr/>
+      </p:nvGrpSpPr>
+      <p:grpSpPr>
+        <a:xfrm>
+          <a:off x="0" y="0"/>
+          <a:ext cx="0" cy="0"/>
+          <a:chOff x="0" y="0"/>
+          <a:chExt cx="0" cy="0"/>
+        </a:xfrm>
+      </p:grpSpPr>
+      <p:sp>
+        <p:nvSpPr>
+          <p:cNvPr id="116" name="TextBox 115"/>
+          <p:cNvSpPr txBox="1"/>
+          <p:nvPr/>
+        </p:nvSpPr>
+        <p:spPr>
+          <a:xfrm>
+            <a:off x="276082" y="304800"/>
+            <a:ext cx="1938215" cy="369332"/>
+          </a:xfrm>
+          <a:prstGeom prst="rect">
+            <a:avLst/>
+          </a:prstGeom>
+          <a:noFill/>
+        </p:spPr>
+        <p:txBody>
+          <a:bodyPr wrap="square" rtlCol="0">
+            <a:spAutoFit/>
+          </a:bodyPr>
+          <a:lstStyle/>
+          <a:p>
+            <a:r>
+              <a:rPr lang="en-US" dirty="0" smtClean="0"/>
+              <a:t>Crop Lab</a:t>
+            </a:r>
+            <a:endParaRPr lang="en-SG" dirty="0"/>
+          </a:p>
+        </p:txBody>
+      </p:sp>
+      <p:sp>
+        <p:nvSpPr>
+          <p:cNvPr id="72" name="TextBox 71"/>
+          <p:cNvSpPr txBox="1"/>
+          <p:nvPr/>
+        </p:nvSpPr>
+        <p:spPr>
+          <a:xfrm>
+            <a:off x="970623" y="2069926"/>
+            <a:ext cx="916799" cy="215444"/>
+          </a:xfrm>
+          <a:prstGeom prst="rect">
+            <a:avLst/>
+          </a:prstGeom>
+          <a:noFill/>
+        </p:spPr>
+        <p:txBody>
+          <a:bodyPr wrap="square" rtlCol="0">
+            <a:spAutoFit/>
+          </a:bodyPr>
+          <a:lstStyle/>
+          <a:p>
+            <a:pPr algn="ctr"/>
+            <a:r>
+              <a:rPr lang="en-US" sz="800" dirty="0" smtClean="0"/>
+              <a:t>Crop Lab</a:t>
+            </a:r>
+            <a:endParaRPr lang="en-SG" sz="800" dirty="0"/>
+          </a:p>
+        </p:txBody>
+      </p:sp>
+      <p:grpSp>
+        <p:nvGrpSpPr>
+          <p:cNvPr id="11" name="Group 10"/>
+          <p:cNvGrpSpPr/>
+          <p:nvPr/>
+        </p:nvGrpSpPr>
+        <p:grpSpPr>
+          <a:xfrm>
+            <a:off x="1002575" y="1231726"/>
+            <a:ext cx="838200" cy="838200"/>
+            <a:chOff x="1002575" y="1231726"/>
+            <a:chExt cx="838200" cy="838200"/>
+          </a:xfrm>
+        </p:grpSpPr>
+        <p:sp>
+          <p:nvSpPr>
+            <p:cNvPr id="74" name="Rectangle 73"/>
+            <p:cNvSpPr/>
+            <p:nvPr/>
+          </p:nvSpPr>
+          <p:spPr>
+            <a:xfrm>
+              <a:off x="1002575" y="1231726"/>
+              <a:ext cx="838200" cy="838200"/>
+            </a:xfrm>
+            <a:prstGeom prst="rect">
+              <a:avLst/>
+            </a:prstGeom>
+            <a:noFill/>
+            <a:ln>
+              <a:noFill/>
+            </a:ln>
+          </p:spPr>
+          <p:style>
+            <a:lnRef idx="2">
+              <a:schemeClr val="accent1">
+                <a:shade val="50000"/>
+              </a:schemeClr>
+            </a:lnRef>
+            <a:fillRef idx="1">
+              <a:schemeClr val="accent1"/>
+            </a:fillRef>
+            <a:effectRef idx="0">
+              <a:schemeClr val="accent1"/>
+            </a:effectRef>
+            <a:fontRef idx="minor">
+              <a:schemeClr val="lt1"/>
+            </a:fontRef>
+          </p:style>
+          <p:txBody>
+            <a:bodyPr rtlCol="0" anchor="ctr"/>
+            <a:lstStyle/>
+            <a:p>
+              <a:pPr algn="ctr"/>
+              <a:endParaRPr lang="en-SG"/>
+            </a:p>
+          </p:txBody>
+        </p:sp>
+        <p:sp>
+          <p:nvSpPr>
+            <p:cNvPr id="75" name="Rectangle 4"/>
+            <p:cNvSpPr/>
+            <p:nvPr/>
+          </p:nvSpPr>
+          <p:spPr>
+            <a:xfrm rot="16200000">
+              <a:off x="1071530" y="1304929"/>
+              <a:ext cx="700291" cy="690781"/>
+            </a:xfrm>
+            <a:custGeom>
+              <a:avLst/>
+              <a:gdLst/>
+              <a:ahLst/>
+              <a:cxnLst/>
+              <a:rect l="l" t="t" r="r" b="b"/>
+              <a:pathLst>
+                <a:path w="1752603" h="1752600">
+                  <a:moveTo>
+                    <a:pt x="533400" y="0"/>
+                  </a:moveTo>
+                  <a:lnTo>
+                    <a:pt x="533403" y="0"/>
+                  </a:lnTo>
+                  <a:lnTo>
+                    <a:pt x="1066800" y="0"/>
+                  </a:lnTo>
+                  <a:lnTo>
+                    <a:pt x="1752603" y="0"/>
+                  </a:lnTo>
+                  <a:lnTo>
+                    <a:pt x="1752603" y="1752600"/>
+                  </a:lnTo>
+                  <a:lnTo>
+                    <a:pt x="1219203" y="1752600"/>
+                  </a:lnTo>
+                  <a:lnTo>
+                    <a:pt x="533403" y="1752600"/>
+                  </a:lnTo>
+                  <a:lnTo>
+                    <a:pt x="3" y="1752600"/>
+                  </a:lnTo>
+                  <a:lnTo>
+                    <a:pt x="3" y="533430"/>
+                  </a:lnTo>
+                  <a:cubicBezTo>
+                    <a:pt x="0" y="533420"/>
+                    <a:pt x="0" y="533410"/>
+                    <a:pt x="0" y="533400"/>
+                  </a:cubicBezTo>
+                  <a:cubicBezTo>
+                    <a:pt x="0" y="238811"/>
+                    <a:pt x="238811" y="0"/>
+                    <a:pt x="533400" y="0"/>
+                  </a:cubicBezTo>
+                  <a:close/>
+                </a:path>
+              </a:pathLst>
+            </a:custGeom>
+            <a:noFill/>
+            <a:ln w="76200" cmpd="sng">
+              <a:solidFill>
+                <a:srgbClr val="0070C0"/>
+              </a:solidFill>
+              <a:miter lim="800000"/>
+            </a:ln>
+          </p:spPr>
+          <p:style>
+            <a:lnRef idx="2">
+              <a:schemeClr val="accent1">
+                <a:shade val="50000"/>
+              </a:schemeClr>
+            </a:lnRef>
+            <a:fillRef idx="1">
+              <a:schemeClr val="accent1"/>
+            </a:fillRef>
+            <a:effectRef idx="0">
+              <a:schemeClr val="accent1"/>
+            </a:effectRef>
+            <a:fontRef idx="minor">
+              <a:schemeClr val="lt1"/>
+            </a:fontRef>
+          </p:style>
+          <p:txBody>
+            <a:bodyPr rtlCol="0" anchor="ctr"/>
+            <a:lstStyle/>
+            <a:p>
+              <a:pPr algn="ctr"/>
+              <a:endParaRPr lang="en-US"/>
+            </a:p>
+          </p:txBody>
+        </p:sp>
+      </p:grpSp>
+      <p:grpSp>
+        <p:nvGrpSpPr>
+          <p:cNvPr id="4" name="Group 3"/>
+          <p:cNvGrpSpPr/>
+          <p:nvPr/>
+        </p:nvGrpSpPr>
+        <p:grpSpPr>
+          <a:xfrm>
+            <a:off x="1170259" y="1395966"/>
+            <a:ext cx="512764" cy="508708"/>
+            <a:chOff x="2530422" y="1554885"/>
+            <a:chExt cx="1030967" cy="1022813"/>
+          </a:xfrm>
+        </p:grpSpPr>
+        <p:pic>
+          <p:nvPicPr>
+            <p:cNvPr id="3" name="Picture 2"/>
+            <p:cNvPicPr>
+              <a:picLocks noChangeAspect="1"/>
+            </p:cNvPicPr>
+            <p:nvPr/>
+          </p:nvPicPr>
+          <p:blipFill>
+            <a:blip r:embed="rId2"/>
+            <a:stretch>
+              <a:fillRect/>
+            </a:stretch>
+          </p:blipFill>
+          <p:spPr>
+            <a:xfrm>
+              <a:off x="2761289" y="1776170"/>
+              <a:ext cx="578811" cy="578811"/>
+            </a:xfrm>
+            <a:prstGeom prst="rect">
+              <a:avLst/>
+            </a:prstGeom>
+          </p:spPr>
+        </p:pic>
+        <p:grpSp>
+          <p:nvGrpSpPr>
+            <p:cNvPr id="12" name="Group 19"/>
+            <p:cNvGrpSpPr/>
+            <p:nvPr/>
+          </p:nvGrpSpPr>
+          <p:grpSpPr>
+            <a:xfrm rot="10800000">
+              <a:off x="2530422" y="1554885"/>
+              <a:ext cx="809677" cy="806483"/>
+              <a:chOff x="1429022" y="1677198"/>
+              <a:chExt cx="243913" cy="242951"/>
+            </a:xfrm>
+          </p:grpSpPr>
+          <p:cxnSp>
+            <p:nvCxnSpPr>
+              <p:cNvPr id="13" name="Straight Connector 12"/>
+              <p:cNvCxnSpPr/>
+              <p:nvPr/>
+            </p:nvCxnSpPr>
+            <p:spPr>
+              <a:xfrm>
+                <a:off x="1431907" y="1677198"/>
+                <a:ext cx="241028" cy="0"/>
+              </a:xfrm>
+              <a:prstGeom prst="line">
+                <a:avLst/>
+              </a:prstGeom>
+              <a:ln w="44450" cap="sq">
+                <a:solidFill>
+                  <a:srgbClr val="0070C0"/>
+                </a:solidFill>
+              </a:ln>
+            </p:spPr>
+            <p:style>
+              <a:lnRef idx="1">
+                <a:schemeClr val="accent1"/>
+              </a:lnRef>
+              <a:fillRef idx="0">
+                <a:schemeClr val="accent1"/>
+              </a:fillRef>
+              <a:effectRef idx="0">
+                <a:schemeClr val="accent1"/>
+              </a:effectRef>
+              <a:fontRef idx="minor">
+                <a:schemeClr val="tx1"/>
+              </a:fontRef>
+            </p:style>
+          </p:cxnSp>
+          <p:cxnSp>
+            <p:nvCxnSpPr>
+              <p:cNvPr id="14" name="Straight Connector 13"/>
+              <p:cNvCxnSpPr/>
+              <p:nvPr/>
+            </p:nvCxnSpPr>
+            <p:spPr>
+              <a:xfrm rot="16200000">
+                <a:off x="1308508" y="1799635"/>
+                <a:ext cx="241028" cy="0"/>
+              </a:xfrm>
+              <a:prstGeom prst="line">
+                <a:avLst/>
+              </a:prstGeom>
+              <a:ln w="44450" cap="sq">
+                <a:solidFill>
+                  <a:srgbClr val="0070C0"/>
+                </a:solidFill>
+              </a:ln>
+            </p:spPr>
+            <p:style>
+              <a:lnRef idx="1">
+                <a:schemeClr val="accent1"/>
+              </a:lnRef>
+              <a:fillRef idx="0">
+                <a:schemeClr val="accent1"/>
+              </a:fillRef>
+              <a:effectRef idx="0">
+                <a:schemeClr val="accent1"/>
+              </a:effectRef>
+              <a:fontRef idx="minor">
+                <a:schemeClr val="tx1"/>
+              </a:fontRef>
+            </p:style>
+          </p:cxnSp>
+        </p:grpSp>
+        <p:grpSp>
+          <p:nvGrpSpPr>
+            <p:cNvPr id="16" name="Group 19"/>
+            <p:cNvGrpSpPr/>
+            <p:nvPr/>
+          </p:nvGrpSpPr>
+          <p:grpSpPr>
+            <a:xfrm>
+              <a:off x="2761289" y="1777598"/>
+              <a:ext cx="800100" cy="800100"/>
+              <a:chOff x="1429022" y="1679121"/>
+              <a:chExt cx="241028" cy="241028"/>
+            </a:xfrm>
+          </p:grpSpPr>
+          <p:cxnSp>
+            <p:nvCxnSpPr>
+              <p:cNvPr id="17" name="Straight Connector 16"/>
+              <p:cNvCxnSpPr/>
+              <p:nvPr/>
+            </p:nvCxnSpPr>
+            <p:spPr>
+              <a:xfrm>
+                <a:off x="1429022" y="1679121"/>
+                <a:ext cx="241028" cy="0"/>
+              </a:xfrm>
+              <a:prstGeom prst="line">
+                <a:avLst/>
+              </a:prstGeom>
+              <a:ln w="44450" cap="sq">
+                <a:solidFill>
+                  <a:srgbClr val="0070C0"/>
+                </a:solidFill>
+              </a:ln>
+            </p:spPr>
+            <p:style>
+              <a:lnRef idx="1">
+                <a:schemeClr val="accent1"/>
+              </a:lnRef>
+              <a:fillRef idx="0">
+                <a:schemeClr val="accent1"/>
+              </a:fillRef>
+              <a:effectRef idx="0">
+                <a:schemeClr val="accent1"/>
+              </a:effectRef>
+              <a:fontRef idx="minor">
+                <a:schemeClr val="tx1"/>
+              </a:fontRef>
+            </p:style>
+          </p:cxnSp>
+          <p:cxnSp>
+            <p:nvCxnSpPr>
+              <p:cNvPr id="18" name="Straight Connector 17"/>
+              <p:cNvCxnSpPr/>
+              <p:nvPr/>
+            </p:nvCxnSpPr>
+            <p:spPr>
+              <a:xfrm rot="16200000">
+                <a:off x="1308508" y="1799635"/>
+                <a:ext cx="241028" cy="0"/>
+              </a:xfrm>
+              <a:prstGeom prst="line">
+                <a:avLst/>
+              </a:prstGeom>
+              <a:ln w="44450" cap="sq">
+                <a:solidFill>
+                  <a:srgbClr val="0070C0"/>
+                </a:solidFill>
+              </a:ln>
+            </p:spPr>
+            <p:style>
+              <a:lnRef idx="1">
+                <a:schemeClr val="accent1"/>
+              </a:lnRef>
+              <a:fillRef idx="0">
+                <a:schemeClr val="accent1"/>
+              </a:fillRef>
+              <a:effectRef idx="0">
+                <a:schemeClr val="accent1"/>
+              </a:effectRef>
+              <a:fontRef idx="minor">
+                <a:schemeClr val="tx1"/>
+              </a:fontRef>
+            </p:style>
+          </p:cxnSp>
+        </p:grpSp>
+      </p:grpSp>
+    </p:spTree>
+    <p:extLst>
+      <p:ext uri="{BB962C8B-B14F-4D97-AF65-F5344CB8AC3E}">
+        <p14:creationId xmlns:p14="http://schemas.microsoft.com/office/powerpoint/2010/main" val="3836992189"/>
+      </p:ext>
+    </p:extLst>
+  </p:cSld>
+  <p:clrMapOvr>
+    <a:masterClrMapping/>
+  </p:clrMapOvr>
+  <p:timing>
+    <p:tnLst>
+      <p:par>
+        <p:cTn id="1" dur="indefinite" restart="never" nodeType="tmRoot"/>
+      </p:par>
+    </p:tnLst>
+  </p:timing>
+</p:sld>
+</file>
+
+<file path=ppt/slides/slide9.xml><?xml version="1.0" encoding="utf-8"?>
+<p:sld xmlns:a="http://schemas.openxmlformats.org/drawingml/2006/main" xmlns:r="http://schemas.openxmlformats.org/officeDocument/2006/relationships" xmlns:p="http://schemas.openxmlformats.org/presentationml/2006/main">
+  <p:cSld>
     <p:spTree>
       <p:nvGrpSpPr>
         <p:cNvPr id="1" name=""/>

</xml_diff>

<commit_message>
Add in crop lab icons
</commit_message>
<xml_diff>
--- a/doc/Icons.pptx
+++ b/doc/Icons.pptx
@@ -5,7 +5,7 @@
     <p:sldMasterId id="2147483648" r:id="rId1"/>
   </p:sldMasterIdLst>
   <p:notesMasterIdLst>
-    <p:notesMasterId r:id="rId11"/>
+    <p:notesMasterId r:id="rId10"/>
   </p:notesMasterIdLst>
   <p:sldIdLst>
     <p:sldId id="264" r:id="rId2"/>
@@ -15,30 +15,29 @@
     <p:sldId id="268" r:id="rId6"/>
     <p:sldId id="269" r:id="rId7"/>
     <p:sldId id="270" r:id="rId8"/>
-    <p:sldId id="272" r:id="rId9"/>
-    <p:sldId id="265" r:id="rId10"/>
+    <p:sldId id="265" r:id="rId9"/>
   </p:sldIdLst>
   <p:sldSz cx="9144000" cy="6858000" type="screen4x3"/>
   <p:notesSz cx="6858000" cy="9144000"/>
   <p:embeddedFontLst>
     <p:embeddedFont>
       <p:font typeface="Calibri" panose="020F0502020204030204" pitchFamily="34" charset="0"/>
-      <p:regular r:id="rId12"/>
-      <p:bold r:id="rId13"/>
-      <p:italic r:id="rId14"/>
-      <p:boldItalic r:id="rId15"/>
+      <p:regular r:id="rId11"/>
+      <p:bold r:id="rId12"/>
+      <p:italic r:id="rId13"/>
+      <p:boldItalic r:id="rId14"/>
     </p:embeddedFont>
     <p:embeddedFont>
       <p:font typeface="Arial Black" panose="020B0A04020102020204" pitchFamily="34" charset="0"/>
+      <p:bold r:id="rId15"/>
+    </p:embeddedFont>
+    <p:embeddedFont>
+      <p:font typeface="Rockwell Extra Bold" panose="02060903040505020403" pitchFamily="18" charset="0"/>
       <p:bold r:id="rId16"/>
     </p:embeddedFont>
     <p:embeddedFont>
       <p:font typeface="Gill Sans Ultra Bold" panose="020B0A02020104020203" pitchFamily="34" charset="0"/>
       <p:regular r:id="rId17"/>
-    </p:embeddedFont>
-    <p:embeddedFont>
-      <p:font typeface="Rockwell Extra Bold" panose="02060903040505020403" pitchFamily="18" charset="0"/>
-      <p:bold r:id="rId18"/>
     </p:embeddedFont>
   </p:embeddedFontLst>
   <p:defaultTextStyle>
@@ -237,7 +236,7 @@
           <a:p>
             <a:fld id="{6699ACB9-486C-4D62-A3A7-AF98E13EFDA3}" type="datetimeFigureOut">
               <a:rPr lang="en-US" smtClean="0"/>
-              <a:t>2/7/2017</a:t>
+              <a:t>2/12/2017</a:t>
             </a:fld>
             <a:endParaRPr lang="en-US"/>
           </a:p>
@@ -570,7 +569,7 @@
           <a:p>
             <a:fld id="{8EC77E60-82A0-4F8A-A861-433B3189FA8C}" type="slidenum">
               <a:rPr lang="en-US" smtClean="0"/>
-              <a:t>9</a:t>
+              <a:t>8</a:t>
             </a:fld>
             <a:endParaRPr lang="en-US"/>
           </a:p>
@@ -771,7 +770,7 @@
             <a:fld id="{1D8BD707-D9CF-40AE-B4C6-C98DA3205C09}" type="datetimeFigureOut">
               <a:rPr lang="en-US" smtClean="0"/>
               <a:pPr/>
-              <a:t>2/7/2017</a:t>
+              <a:t>2/12/2017</a:t>
             </a:fld>
             <a:endParaRPr lang="en-US"/>
           </a:p>
@@ -938,7 +937,7 @@
             <a:fld id="{1D8BD707-D9CF-40AE-B4C6-C98DA3205C09}" type="datetimeFigureOut">
               <a:rPr lang="en-US" smtClean="0"/>
               <a:pPr/>
-              <a:t>2/7/2017</a:t>
+              <a:t>2/12/2017</a:t>
             </a:fld>
             <a:endParaRPr lang="en-US"/>
           </a:p>
@@ -1115,7 +1114,7 @@
             <a:fld id="{1D8BD707-D9CF-40AE-B4C6-C98DA3205C09}" type="datetimeFigureOut">
               <a:rPr lang="en-US" smtClean="0"/>
               <a:pPr/>
-              <a:t>2/7/2017</a:t>
+              <a:t>2/12/2017</a:t>
             </a:fld>
             <a:endParaRPr lang="en-US"/>
           </a:p>
@@ -1282,7 +1281,7 @@
             <a:fld id="{1D8BD707-D9CF-40AE-B4C6-C98DA3205C09}" type="datetimeFigureOut">
               <a:rPr lang="en-US" smtClean="0"/>
               <a:pPr/>
-              <a:t>2/7/2017</a:t>
+              <a:t>2/12/2017</a:t>
             </a:fld>
             <a:endParaRPr lang="en-US"/>
           </a:p>
@@ -1525,7 +1524,7 @@
             <a:fld id="{1D8BD707-D9CF-40AE-B4C6-C98DA3205C09}" type="datetimeFigureOut">
               <a:rPr lang="en-US" smtClean="0"/>
               <a:pPr/>
-              <a:t>2/7/2017</a:t>
+              <a:t>2/12/2017</a:t>
             </a:fld>
             <a:endParaRPr lang="en-US"/>
           </a:p>
@@ -1810,7 +1809,7 @@
             <a:fld id="{1D8BD707-D9CF-40AE-B4C6-C98DA3205C09}" type="datetimeFigureOut">
               <a:rPr lang="en-US" smtClean="0"/>
               <a:pPr/>
-              <a:t>2/7/2017</a:t>
+              <a:t>2/12/2017</a:t>
             </a:fld>
             <a:endParaRPr lang="en-US"/>
           </a:p>
@@ -2229,7 +2228,7 @@
             <a:fld id="{1D8BD707-D9CF-40AE-B4C6-C98DA3205C09}" type="datetimeFigureOut">
               <a:rPr lang="en-US" smtClean="0"/>
               <a:pPr/>
-              <a:t>2/7/2017</a:t>
+              <a:t>2/12/2017</a:t>
             </a:fld>
             <a:endParaRPr lang="en-US"/>
           </a:p>
@@ -2344,7 +2343,7 @@
             <a:fld id="{1D8BD707-D9CF-40AE-B4C6-C98DA3205C09}" type="datetimeFigureOut">
               <a:rPr lang="en-US" smtClean="0"/>
               <a:pPr/>
-              <a:t>2/7/2017</a:t>
+              <a:t>2/12/2017</a:t>
             </a:fld>
             <a:endParaRPr lang="en-US"/>
           </a:p>
@@ -2436,7 +2435,7 @@
             <a:fld id="{1D8BD707-D9CF-40AE-B4C6-C98DA3205C09}" type="datetimeFigureOut">
               <a:rPr lang="en-US" smtClean="0"/>
               <a:pPr/>
-              <a:t>2/7/2017</a:t>
+              <a:t>2/12/2017</a:t>
             </a:fld>
             <a:endParaRPr lang="en-US"/>
           </a:p>
@@ -2710,7 +2709,7 @@
             <a:fld id="{1D8BD707-D9CF-40AE-B4C6-C98DA3205C09}" type="datetimeFigureOut">
               <a:rPr lang="en-US" smtClean="0"/>
               <a:pPr/>
-              <a:t>2/7/2017</a:t>
+              <a:t>2/12/2017</a:t>
             </a:fld>
             <a:endParaRPr lang="en-US"/>
           </a:p>
@@ -2960,7 +2959,7 @@
             <a:fld id="{1D8BD707-D9CF-40AE-B4C6-C98DA3205C09}" type="datetimeFigureOut">
               <a:rPr lang="en-US" smtClean="0"/>
               <a:pPr/>
-              <a:t>2/7/2017</a:t>
+              <a:t>2/12/2017</a:t>
             </a:fld>
             <a:endParaRPr lang="en-US"/>
           </a:p>
@@ -3175,7 +3174,7 @@
             <a:fld id="{1D8BD707-D9CF-40AE-B4C6-C98DA3205C09}" type="datetimeFigureOut">
               <a:rPr lang="en-US" smtClean="0"/>
               <a:pPr/>
-              <a:t>2/7/2017</a:t>
+              <a:t>2/12/2017</a:t>
             </a:fld>
             <a:endParaRPr lang="en-US"/>
           </a:p>
@@ -23565,465 +23564,6 @@
           <a:chExt cx="0" cy="0"/>
         </a:xfrm>
       </p:grpSpPr>
-      <p:sp>
-        <p:nvSpPr>
-          <p:cNvPr id="116" name="TextBox 115"/>
-          <p:cNvSpPr txBox="1"/>
-          <p:nvPr/>
-        </p:nvSpPr>
-        <p:spPr>
-          <a:xfrm>
-            <a:off x="276082" y="304800"/>
-            <a:ext cx="1938215" cy="369332"/>
-          </a:xfrm>
-          <a:prstGeom prst="rect">
-            <a:avLst/>
-          </a:prstGeom>
-          <a:noFill/>
-        </p:spPr>
-        <p:txBody>
-          <a:bodyPr wrap="square" rtlCol="0">
-            <a:spAutoFit/>
-          </a:bodyPr>
-          <a:lstStyle/>
-          <a:p>
-            <a:r>
-              <a:rPr lang="en-US" dirty="0" smtClean="0"/>
-              <a:t>Crop Lab</a:t>
-            </a:r>
-            <a:endParaRPr lang="en-SG" dirty="0"/>
-          </a:p>
-        </p:txBody>
-      </p:sp>
-      <p:sp>
-        <p:nvSpPr>
-          <p:cNvPr id="72" name="TextBox 71"/>
-          <p:cNvSpPr txBox="1"/>
-          <p:nvPr/>
-        </p:nvSpPr>
-        <p:spPr>
-          <a:xfrm>
-            <a:off x="970623" y="2069926"/>
-            <a:ext cx="916799" cy="215444"/>
-          </a:xfrm>
-          <a:prstGeom prst="rect">
-            <a:avLst/>
-          </a:prstGeom>
-          <a:noFill/>
-        </p:spPr>
-        <p:txBody>
-          <a:bodyPr wrap="square" rtlCol="0">
-            <a:spAutoFit/>
-          </a:bodyPr>
-          <a:lstStyle/>
-          <a:p>
-            <a:pPr algn="ctr"/>
-            <a:r>
-              <a:rPr lang="en-US" sz="800" dirty="0" smtClean="0"/>
-              <a:t>Crop Lab</a:t>
-            </a:r>
-            <a:endParaRPr lang="en-SG" sz="800" dirty="0"/>
-          </a:p>
-        </p:txBody>
-      </p:sp>
-      <p:grpSp>
-        <p:nvGrpSpPr>
-          <p:cNvPr id="11" name="Group 10"/>
-          <p:cNvGrpSpPr/>
-          <p:nvPr/>
-        </p:nvGrpSpPr>
-        <p:grpSpPr>
-          <a:xfrm>
-            <a:off x="1002575" y="1231726"/>
-            <a:ext cx="838200" cy="838200"/>
-            <a:chOff x="1002575" y="1231726"/>
-            <a:chExt cx="838200" cy="838200"/>
-          </a:xfrm>
-        </p:grpSpPr>
-        <p:sp>
-          <p:nvSpPr>
-            <p:cNvPr id="74" name="Rectangle 73"/>
-            <p:cNvSpPr/>
-            <p:nvPr/>
-          </p:nvSpPr>
-          <p:spPr>
-            <a:xfrm>
-              <a:off x="1002575" y="1231726"/>
-              <a:ext cx="838200" cy="838200"/>
-            </a:xfrm>
-            <a:prstGeom prst="rect">
-              <a:avLst/>
-            </a:prstGeom>
-            <a:noFill/>
-            <a:ln>
-              <a:noFill/>
-            </a:ln>
-          </p:spPr>
-          <p:style>
-            <a:lnRef idx="2">
-              <a:schemeClr val="accent1">
-                <a:shade val="50000"/>
-              </a:schemeClr>
-            </a:lnRef>
-            <a:fillRef idx="1">
-              <a:schemeClr val="accent1"/>
-            </a:fillRef>
-            <a:effectRef idx="0">
-              <a:schemeClr val="accent1"/>
-            </a:effectRef>
-            <a:fontRef idx="minor">
-              <a:schemeClr val="lt1"/>
-            </a:fontRef>
-          </p:style>
-          <p:txBody>
-            <a:bodyPr rtlCol="0" anchor="ctr"/>
-            <a:lstStyle/>
-            <a:p>
-              <a:pPr algn="ctr"/>
-              <a:endParaRPr lang="en-SG"/>
-            </a:p>
-          </p:txBody>
-        </p:sp>
-        <p:sp>
-          <p:nvSpPr>
-            <p:cNvPr id="75" name="Rectangle 4"/>
-            <p:cNvSpPr/>
-            <p:nvPr/>
-          </p:nvSpPr>
-          <p:spPr>
-            <a:xfrm rot="16200000">
-              <a:off x="1071530" y="1304929"/>
-              <a:ext cx="700291" cy="690781"/>
-            </a:xfrm>
-            <a:custGeom>
-              <a:avLst/>
-              <a:gdLst/>
-              <a:ahLst/>
-              <a:cxnLst/>
-              <a:rect l="l" t="t" r="r" b="b"/>
-              <a:pathLst>
-                <a:path w="1752603" h="1752600">
-                  <a:moveTo>
-                    <a:pt x="533400" y="0"/>
-                  </a:moveTo>
-                  <a:lnTo>
-                    <a:pt x="533403" y="0"/>
-                  </a:lnTo>
-                  <a:lnTo>
-                    <a:pt x="1066800" y="0"/>
-                  </a:lnTo>
-                  <a:lnTo>
-                    <a:pt x="1752603" y="0"/>
-                  </a:lnTo>
-                  <a:lnTo>
-                    <a:pt x="1752603" y="1752600"/>
-                  </a:lnTo>
-                  <a:lnTo>
-                    <a:pt x="1219203" y="1752600"/>
-                  </a:lnTo>
-                  <a:lnTo>
-                    <a:pt x="533403" y="1752600"/>
-                  </a:lnTo>
-                  <a:lnTo>
-                    <a:pt x="3" y="1752600"/>
-                  </a:lnTo>
-                  <a:lnTo>
-                    <a:pt x="3" y="533430"/>
-                  </a:lnTo>
-                  <a:cubicBezTo>
-                    <a:pt x="0" y="533420"/>
-                    <a:pt x="0" y="533410"/>
-                    <a:pt x="0" y="533400"/>
-                  </a:cubicBezTo>
-                  <a:cubicBezTo>
-                    <a:pt x="0" y="238811"/>
-                    <a:pt x="238811" y="0"/>
-                    <a:pt x="533400" y="0"/>
-                  </a:cubicBezTo>
-                  <a:close/>
-                </a:path>
-              </a:pathLst>
-            </a:custGeom>
-            <a:noFill/>
-            <a:ln w="76200" cmpd="sng">
-              <a:solidFill>
-                <a:srgbClr val="0070C0"/>
-              </a:solidFill>
-              <a:miter lim="800000"/>
-            </a:ln>
-          </p:spPr>
-          <p:style>
-            <a:lnRef idx="2">
-              <a:schemeClr val="accent1">
-                <a:shade val="50000"/>
-              </a:schemeClr>
-            </a:lnRef>
-            <a:fillRef idx="1">
-              <a:schemeClr val="accent1"/>
-            </a:fillRef>
-            <a:effectRef idx="0">
-              <a:schemeClr val="accent1"/>
-            </a:effectRef>
-            <a:fontRef idx="minor">
-              <a:schemeClr val="lt1"/>
-            </a:fontRef>
-          </p:style>
-          <p:txBody>
-            <a:bodyPr rtlCol="0" anchor="ctr"/>
-            <a:lstStyle/>
-            <a:p>
-              <a:pPr algn="ctr"/>
-              <a:endParaRPr lang="en-US"/>
-            </a:p>
-          </p:txBody>
-        </p:sp>
-      </p:grpSp>
-      <p:grpSp>
-        <p:nvGrpSpPr>
-          <p:cNvPr id="4" name="Group 3"/>
-          <p:cNvGrpSpPr/>
-          <p:nvPr/>
-        </p:nvGrpSpPr>
-        <p:grpSpPr>
-          <a:xfrm>
-            <a:off x="1170259" y="1395966"/>
-            <a:ext cx="512764" cy="508708"/>
-            <a:chOff x="2530422" y="1554885"/>
-            <a:chExt cx="1030967" cy="1022813"/>
-          </a:xfrm>
-        </p:grpSpPr>
-        <p:pic>
-          <p:nvPicPr>
-            <p:cNvPr id="3" name="Picture 2"/>
-            <p:cNvPicPr>
-              <a:picLocks noChangeAspect="1"/>
-            </p:cNvPicPr>
-            <p:nvPr/>
-          </p:nvPicPr>
-          <p:blipFill>
-            <a:blip r:embed="rId2"/>
-            <a:stretch>
-              <a:fillRect/>
-            </a:stretch>
-          </p:blipFill>
-          <p:spPr>
-            <a:xfrm>
-              <a:off x="2761289" y="1776170"/>
-              <a:ext cx="578811" cy="578811"/>
-            </a:xfrm>
-            <a:prstGeom prst="rect">
-              <a:avLst/>
-            </a:prstGeom>
-          </p:spPr>
-        </p:pic>
-        <p:grpSp>
-          <p:nvGrpSpPr>
-            <p:cNvPr id="12" name="Group 19"/>
-            <p:cNvGrpSpPr/>
-            <p:nvPr/>
-          </p:nvGrpSpPr>
-          <p:grpSpPr>
-            <a:xfrm rot="10800000">
-              <a:off x="2530422" y="1554885"/>
-              <a:ext cx="809677" cy="806483"/>
-              <a:chOff x="1429022" y="1677198"/>
-              <a:chExt cx="243913" cy="242951"/>
-            </a:xfrm>
-          </p:grpSpPr>
-          <p:cxnSp>
-            <p:nvCxnSpPr>
-              <p:cNvPr id="13" name="Straight Connector 12"/>
-              <p:cNvCxnSpPr/>
-              <p:nvPr/>
-            </p:nvCxnSpPr>
-            <p:spPr>
-              <a:xfrm>
-                <a:off x="1431907" y="1677198"/>
-                <a:ext cx="241028" cy="0"/>
-              </a:xfrm>
-              <a:prstGeom prst="line">
-                <a:avLst/>
-              </a:prstGeom>
-              <a:ln w="44450" cap="sq">
-                <a:solidFill>
-                  <a:srgbClr val="0070C0"/>
-                </a:solidFill>
-              </a:ln>
-            </p:spPr>
-            <p:style>
-              <a:lnRef idx="1">
-                <a:schemeClr val="accent1"/>
-              </a:lnRef>
-              <a:fillRef idx="0">
-                <a:schemeClr val="accent1"/>
-              </a:fillRef>
-              <a:effectRef idx="0">
-                <a:schemeClr val="accent1"/>
-              </a:effectRef>
-              <a:fontRef idx="minor">
-                <a:schemeClr val="tx1"/>
-              </a:fontRef>
-            </p:style>
-          </p:cxnSp>
-          <p:cxnSp>
-            <p:nvCxnSpPr>
-              <p:cNvPr id="14" name="Straight Connector 13"/>
-              <p:cNvCxnSpPr/>
-              <p:nvPr/>
-            </p:nvCxnSpPr>
-            <p:spPr>
-              <a:xfrm rot="16200000">
-                <a:off x="1308508" y="1799635"/>
-                <a:ext cx="241028" cy="0"/>
-              </a:xfrm>
-              <a:prstGeom prst="line">
-                <a:avLst/>
-              </a:prstGeom>
-              <a:ln w="44450" cap="sq">
-                <a:solidFill>
-                  <a:srgbClr val="0070C0"/>
-                </a:solidFill>
-              </a:ln>
-            </p:spPr>
-            <p:style>
-              <a:lnRef idx="1">
-                <a:schemeClr val="accent1"/>
-              </a:lnRef>
-              <a:fillRef idx="0">
-                <a:schemeClr val="accent1"/>
-              </a:fillRef>
-              <a:effectRef idx="0">
-                <a:schemeClr val="accent1"/>
-              </a:effectRef>
-              <a:fontRef idx="minor">
-                <a:schemeClr val="tx1"/>
-              </a:fontRef>
-            </p:style>
-          </p:cxnSp>
-        </p:grpSp>
-        <p:grpSp>
-          <p:nvGrpSpPr>
-            <p:cNvPr id="16" name="Group 19"/>
-            <p:cNvGrpSpPr/>
-            <p:nvPr/>
-          </p:nvGrpSpPr>
-          <p:grpSpPr>
-            <a:xfrm>
-              <a:off x="2761289" y="1777598"/>
-              <a:ext cx="800100" cy="800100"/>
-              <a:chOff x="1429022" y="1679121"/>
-              <a:chExt cx="241028" cy="241028"/>
-            </a:xfrm>
-          </p:grpSpPr>
-          <p:cxnSp>
-            <p:nvCxnSpPr>
-              <p:cNvPr id="17" name="Straight Connector 16"/>
-              <p:cNvCxnSpPr/>
-              <p:nvPr/>
-            </p:nvCxnSpPr>
-            <p:spPr>
-              <a:xfrm>
-                <a:off x="1429022" y="1679121"/>
-                <a:ext cx="241028" cy="0"/>
-              </a:xfrm>
-              <a:prstGeom prst="line">
-                <a:avLst/>
-              </a:prstGeom>
-              <a:ln w="44450" cap="sq">
-                <a:solidFill>
-                  <a:srgbClr val="0070C0"/>
-                </a:solidFill>
-              </a:ln>
-            </p:spPr>
-            <p:style>
-              <a:lnRef idx="1">
-                <a:schemeClr val="accent1"/>
-              </a:lnRef>
-              <a:fillRef idx="0">
-                <a:schemeClr val="accent1"/>
-              </a:fillRef>
-              <a:effectRef idx="0">
-                <a:schemeClr val="accent1"/>
-              </a:effectRef>
-              <a:fontRef idx="minor">
-                <a:schemeClr val="tx1"/>
-              </a:fontRef>
-            </p:style>
-          </p:cxnSp>
-          <p:cxnSp>
-            <p:nvCxnSpPr>
-              <p:cNvPr id="18" name="Straight Connector 17"/>
-              <p:cNvCxnSpPr/>
-              <p:nvPr/>
-            </p:nvCxnSpPr>
-            <p:spPr>
-              <a:xfrm rot="16200000">
-                <a:off x="1308508" y="1799635"/>
-                <a:ext cx="241028" cy="0"/>
-              </a:xfrm>
-              <a:prstGeom prst="line">
-                <a:avLst/>
-              </a:prstGeom>
-              <a:ln w="44450" cap="sq">
-                <a:solidFill>
-                  <a:srgbClr val="0070C0"/>
-                </a:solidFill>
-              </a:ln>
-            </p:spPr>
-            <p:style>
-              <a:lnRef idx="1">
-                <a:schemeClr val="accent1"/>
-              </a:lnRef>
-              <a:fillRef idx="0">
-                <a:schemeClr val="accent1"/>
-              </a:fillRef>
-              <a:effectRef idx="0">
-                <a:schemeClr val="accent1"/>
-              </a:effectRef>
-              <a:fontRef idx="minor">
-                <a:schemeClr val="tx1"/>
-              </a:fontRef>
-            </p:style>
-          </p:cxnSp>
-        </p:grpSp>
-      </p:grpSp>
-    </p:spTree>
-    <p:extLst>
-      <p:ext uri="{BB962C8B-B14F-4D97-AF65-F5344CB8AC3E}">
-        <p14:creationId xmlns:p14="http://schemas.microsoft.com/office/powerpoint/2010/main" val="3836992189"/>
-      </p:ext>
-    </p:extLst>
-  </p:cSld>
-  <p:clrMapOvr>
-    <a:masterClrMapping/>
-  </p:clrMapOvr>
-  <p:timing>
-    <p:tnLst>
-      <p:par>
-        <p:cTn id="1" dur="indefinite" restart="never" nodeType="tmRoot"/>
-      </p:par>
-    </p:tnLst>
-  </p:timing>
-</p:sld>
-</file>
-
-<file path=ppt/slides/slide9.xml><?xml version="1.0" encoding="utf-8"?>
-<p:sld xmlns:a="http://schemas.openxmlformats.org/drawingml/2006/main" xmlns:r="http://schemas.openxmlformats.org/officeDocument/2006/relationships" xmlns:p="http://schemas.openxmlformats.org/presentationml/2006/main">
-  <p:cSld>
-    <p:spTree>
-      <p:nvGrpSpPr>
-        <p:cNvPr id="1" name=""/>
-        <p:cNvGrpSpPr/>
-        <p:nvPr/>
-      </p:nvGrpSpPr>
-      <p:grpSpPr>
-        <a:xfrm>
-          <a:off x="0" y="0"/>
-          <a:ext cx="0" cy="0"/>
-          <a:chOff x="0" y="0"/>
-          <a:chExt cx="0" cy="0"/>
-        </a:xfrm>
-      </p:grpSpPr>
       <p:grpSp>
         <p:nvGrpSpPr>
           <p:cNvPr id="45" name="Group 44"/>

</xml_diff>

<commit_message>
Add crop lab functionality
</commit_message>
<xml_diff>
--- a/doc/Icons.pptx
+++ b/doc/Icons.pptx
@@ -32,12 +32,12 @@
       <p:bold r:id="rId15"/>
     </p:embeddedFont>
     <p:embeddedFont>
-      <p:font typeface="Gill Sans Ultra Bold" panose="020B0A02020104020203" pitchFamily="34" charset="0"/>
-      <p:regular r:id="rId16"/>
+      <p:font typeface="Rockwell Extra Bold" panose="02060903040505020403" pitchFamily="18" charset="0"/>
+      <p:bold r:id="rId16"/>
     </p:embeddedFont>
     <p:embeddedFont>
-      <p:font typeface="Rockwell Extra Bold" panose="02060903040505020403" pitchFamily="18" charset="0"/>
-      <p:bold r:id="rId17"/>
+      <p:font typeface="Gill Sans Ultra Bold" panose="020B0A02020104020203" pitchFamily="34" charset="0"/>
+      <p:regular r:id="rId17"/>
     </p:embeddedFont>
   </p:embeddedFontLst>
   <p:defaultTextStyle>
@@ -236,7 +236,7 @@
           <a:p>
             <a:fld id="{6699ACB9-486C-4D62-A3A7-AF98E13EFDA3}" type="datetimeFigureOut">
               <a:rPr lang="en-US" smtClean="0"/>
-              <a:t>2/7/2017</a:t>
+              <a:t>2/12/2017</a:t>
             </a:fld>
             <a:endParaRPr lang="en-US"/>
           </a:p>
@@ -770,7 +770,7 @@
             <a:fld id="{1D8BD707-D9CF-40AE-B4C6-C98DA3205C09}" type="datetimeFigureOut">
               <a:rPr lang="en-US" smtClean="0"/>
               <a:pPr/>
-              <a:t>2/7/2017</a:t>
+              <a:t>2/12/2017</a:t>
             </a:fld>
             <a:endParaRPr lang="en-US"/>
           </a:p>
@@ -937,7 +937,7 @@
             <a:fld id="{1D8BD707-D9CF-40AE-B4C6-C98DA3205C09}" type="datetimeFigureOut">
               <a:rPr lang="en-US" smtClean="0"/>
               <a:pPr/>
-              <a:t>2/7/2017</a:t>
+              <a:t>2/12/2017</a:t>
             </a:fld>
             <a:endParaRPr lang="en-US"/>
           </a:p>
@@ -1114,7 +1114,7 @@
             <a:fld id="{1D8BD707-D9CF-40AE-B4C6-C98DA3205C09}" type="datetimeFigureOut">
               <a:rPr lang="en-US" smtClean="0"/>
               <a:pPr/>
-              <a:t>2/7/2017</a:t>
+              <a:t>2/12/2017</a:t>
             </a:fld>
             <a:endParaRPr lang="en-US"/>
           </a:p>
@@ -1281,7 +1281,7 @@
             <a:fld id="{1D8BD707-D9CF-40AE-B4C6-C98DA3205C09}" type="datetimeFigureOut">
               <a:rPr lang="en-US" smtClean="0"/>
               <a:pPr/>
-              <a:t>2/7/2017</a:t>
+              <a:t>2/12/2017</a:t>
             </a:fld>
             <a:endParaRPr lang="en-US"/>
           </a:p>
@@ -1524,7 +1524,7 @@
             <a:fld id="{1D8BD707-D9CF-40AE-B4C6-C98DA3205C09}" type="datetimeFigureOut">
               <a:rPr lang="en-US" smtClean="0"/>
               <a:pPr/>
-              <a:t>2/7/2017</a:t>
+              <a:t>2/12/2017</a:t>
             </a:fld>
             <a:endParaRPr lang="en-US"/>
           </a:p>
@@ -1809,7 +1809,7 @@
             <a:fld id="{1D8BD707-D9CF-40AE-B4C6-C98DA3205C09}" type="datetimeFigureOut">
               <a:rPr lang="en-US" smtClean="0"/>
               <a:pPr/>
-              <a:t>2/7/2017</a:t>
+              <a:t>2/12/2017</a:t>
             </a:fld>
             <a:endParaRPr lang="en-US"/>
           </a:p>
@@ -2228,7 +2228,7 @@
             <a:fld id="{1D8BD707-D9CF-40AE-B4C6-C98DA3205C09}" type="datetimeFigureOut">
               <a:rPr lang="en-US" smtClean="0"/>
               <a:pPr/>
-              <a:t>2/7/2017</a:t>
+              <a:t>2/12/2017</a:t>
             </a:fld>
             <a:endParaRPr lang="en-US"/>
           </a:p>
@@ -2343,7 +2343,7 @@
             <a:fld id="{1D8BD707-D9CF-40AE-B4C6-C98DA3205C09}" type="datetimeFigureOut">
               <a:rPr lang="en-US" smtClean="0"/>
               <a:pPr/>
-              <a:t>2/7/2017</a:t>
+              <a:t>2/12/2017</a:t>
             </a:fld>
             <a:endParaRPr lang="en-US"/>
           </a:p>
@@ -2435,7 +2435,7 @@
             <a:fld id="{1D8BD707-D9CF-40AE-B4C6-C98DA3205C09}" type="datetimeFigureOut">
               <a:rPr lang="en-US" smtClean="0"/>
               <a:pPr/>
-              <a:t>2/7/2017</a:t>
+              <a:t>2/12/2017</a:t>
             </a:fld>
             <a:endParaRPr lang="en-US"/>
           </a:p>
@@ -2709,7 +2709,7 @@
             <a:fld id="{1D8BD707-D9CF-40AE-B4C6-C98DA3205C09}" type="datetimeFigureOut">
               <a:rPr lang="en-US" smtClean="0"/>
               <a:pPr/>
-              <a:t>2/7/2017</a:t>
+              <a:t>2/12/2017</a:t>
             </a:fld>
             <a:endParaRPr lang="en-US"/>
           </a:p>
@@ -2959,7 +2959,7 @@
             <a:fld id="{1D8BD707-D9CF-40AE-B4C6-C98DA3205C09}" type="datetimeFigureOut">
               <a:rPr lang="en-US" smtClean="0"/>
               <a:pPr/>
-              <a:t>2/7/2017</a:t>
+              <a:t>2/12/2017</a:t>
             </a:fld>
             <a:endParaRPr lang="en-US"/>
           </a:p>
@@ -3174,7 +3174,7 @@
             <a:fld id="{1D8BD707-D9CF-40AE-B4C6-C98DA3205C09}" type="datetimeFigureOut">
               <a:rPr lang="en-US" smtClean="0"/>
               <a:pPr/>
-              <a:t>2/7/2017</a:t>
+              <a:t>2/12/2017</a:t>
             </a:fld>
             <a:endParaRPr lang="en-US"/>
           </a:p>
@@ -11757,285 +11757,6 @@
           </p:txBody>
         </p:sp>
       </p:grpSp>
-      <p:grpSp>
-        <p:nvGrpSpPr>
-          <p:cNvPr id="138" name="Group 137"/>
-          <p:cNvGrpSpPr/>
-          <p:nvPr/>
-        </p:nvGrpSpPr>
-        <p:grpSpPr>
-          <a:xfrm>
-            <a:off x="3064524" y="1241883"/>
-            <a:ext cx="190500" cy="190500"/>
-            <a:chOff x="3321025" y="1253436"/>
-            <a:chExt cx="190500" cy="190500"/>
-          </a:xfrm>
-        </p:grpSpPr>
-        <p:sp>
-          <p:nvSpPr>
-            <p:cNvPr id="214" name="Oval 213"/>
-            <p:cNvSpPr/>
-            <p:nvPr/>
-          </p:nvSpPr>
-          <p:spPr>
-            <a:xfrm>
-              <a:off x="3321025" y="1253436"/>
-              <a:ext cx="190500" cy="190500"/>
-            </a:xfrm>
-            <a:prstGeom prst="ellipse">
-              <a:avLst/>
-            </a:prstGeom>
-            <a:solidFill>
-              <a:schemeClr val="accent6"/>
-            </a:solidFill>
-            <a:ln>
-              <a:noFill/>
-            </a:ln>
-          </p:spPr>
-          <p:style>
-            <a:lnRef idx="2">
-              <a:schemeClr val="accent1">
-                <a:shade val="50000"/>
-              </a:schemeClr>
-            </a:lnRef>
-            <a:fillRef idx="1">
-              <a:schemeClr val="accent1"/>
-            </a:fillRef>
-            <a:effectRef idx="0">
-              <a:schemeClr val="accent1"/>
-            </a:effectRef>
-            <a:fontRef idx="minor">
-              <a:schemeClr val="lt1"/>
-            </a:fontRef>
-          </p:style>
-          <p:txBody>
-            <a:bodyPr rtlCol="0" anchor="ctr"/>
-            <a:lstStyle/>
-            <a:p>
-              <a:pPr algn="ctr"/>
-              <a:endParaRPr lang="en-SG"/>
-            </a:p>
-          </p:txBody>
-        </p:sp>
-        <p:sp>
-          <p:nvSpPr>
-            <p:cNvPr id="221" name="Flowchart: Connector 41"/>
-            <p:cNvSpPr/>
-            <p:nvPr/>
-          </p:nvSpPr>
-          <p:spPr>
-            <a:xfrm>
-              <a:off x="3346906" y="1280846"/>
-              <a:ext cx="85531" cy="88763"/>
-            </a:xfrm>
-            <a:custGeom>
-              <a:avLst/>
-              <a:gdLst/>
-              <a:ahLst/>
-              <a:cxnLst/>
-              <a:rect l="l" t="t" r="r" b="b"/>
-              <a:pathLst>
-                <a:path w="469900" h="582615">
-                  <a:moveTo>
-                    <a:pt x="228600" y="0"/>
-                  </a:moveTo>
-                  <a:cubicBezTo>
-                    <a:pt x="314512" y="0"/>
-                    <a:pt x="387142" y="56871"/>
-                    <a:pt x="410009" y="135289"/>
-                  </a:cubicBezTo>
-                  <a:lnTo>
-                    <a:pt x="412750" y="131765"/>
-                  </a:lnTo>
-                  <a:lnTo>
-                    <a:pt x="469900" y="265115"/>
-                  </a:lnTo>
-                  <a:lnTo>
-                    <a:pt x="406551" y="256852"/>
-                  </a:lnTo>
-                  <a:cubicBezTo>
-                    <a:pt x="387409" y="309479"/>
-                    <a:pt x="345491" y="351043"/>
-                    <a:pt x="292452" y="369176"/>
-                  </a:cubicBezTo>
-                  <a:lnTo>
-                    <a:pt x="298450" y="411165"/>
-                  </a:lnTo>
-                  <a:lnTo>
-                    <a:pt x="444500" y="569915"/>
-                  </a:lnTo>
-                  <a:lnTo>
-                    <a:pt x="0" y="582615"/>
-                  </a:lnTo>
-                  <a:lnTo>
-                    <a:pt x="6350" y="474665"/>
-                  </a:lnTo>
-                  <a:lnTo>
-                    <a:pt x="158750" y="411165"/>
-                  </a:lnTo>
-                  <a:lnTo>
-                    <a:pt x="158750" y="367365"/>
-                  </a:lnTo>
-                  <a:cubicBezTo>
-                    <a:pt x="88028" y="339833"/>
-                    <a:pt x="38100" y="270997"/>
-                    <a:pt x="38100" y="190500"/>
-                  </a:cubicBezTo>
-                  <a:cubicBezTo>
-                    <a:pt x="38100" y="85290"/>
-                    <a:pt x="123390" y="0"/>
-                    <a:pt x="228600" y="0"/>
-                  </a:cubicBezTo>
-                  <a:close/>
-                </a:path>
-              </a:pathLst>
-            </a:custGeom>
-            <a:solidFill>
-              <a:srgbClr val="F2F2F2"/>
-            </a:solidFill>
-            <a:ln w="6350">
-              <a:solidFill>
-                <a:srgbClr val="F2F2F2"/>
-              </a:solidFill>
-            </a:ln>
-            <a:effectLst/>
-          </p:spPr>
-          <p:style>
-            <a:lnRef idx="2">
-              <a:schemeClr val="accent1">
-                <a:shade val="50000"/>
-              </a:schemeClr>
-            </a:lnRef>
-            <a:fillRef idx="1">
-              <a:schemeClr val="accent1"/>
-            </a:fillRef>
-            <a:effectRef idx="0">
-              <a:schemeClr val="accent1"/>
-            </a:effectRef>
-            <a:fontRef idx="minor">
-              <a:schemeClr val="lt1"/>
-            </a:fontRef>
-          </p:style>
-          <p:txBody>
-            <a:bodyPr rtlCol="0" anchor="ctr"/>
-            <a:lstStyle/>
-            <a:p>
-              <a:pPr algn="ctr"/>
-              <a:endParaRPr lang="en-US"/>
-            </a:p>
-          </p:txBody>
-        </p:sp>
-        <p:sp>
-          <p:nvSpPr>
-            <p:cNvPr id="220" name="Flowchart: Connector 41"/>
-            <p:cNvSpPr/>
-            <p:nvPr/>
-          </p:nvSpPr>
-          <p:spPr>
-            <a:xfrm rot="771170">
-              <a:off x="3401577" y="1319036"/>
-              <a:ext cx="85531" cy="88763"/>
-            </a:xfrm>
-            <a:custGeom>
-              <a:avLst/>
-              <a:gdLst/>
-              <a:ahLst/>
-              <a:cxnLst/>
-              <a:rect l="l" t="t" r="r" b="b"/>
-              <a:pathLst>
-                <a:path w="469900" h="582615">
-                  <a:moveTo>
-                    <a:pt x="228600" y="0"/>
-                  </a:moveTo>
-                  <a:cubicBezTo>
-                    <a:pt x="314512" y="0"/>
-                    <a:pt x="387142" y="56871"/>
-                    <a:pt x="410009" y="135289"/>
-                  </a:cubicBezTo>
-                  <a:lnTo>
-                    <a:pt x="412750" y="131765"/>
-                  </a:lnTo>
-                  <a:lnTo>
-                    <a:pt x="469900" y="265115"/>
-                  </a:lnTo>
-                  <a:lnTo>
-                    <a:pt x="406551" y="256852"/>
-                  </a:lnTo>
-                  <a:cubicBezTo>
-                    <a:pt x="387409" y="309479"/>
-                    <a:pt x="345491" y="351043"/>
-                    <a:pt x="292452" y="369176"/>
-                  </a:cubicBezTo>
-                  <a:lnTo>
-                    <a:pt x="298450" y="411165"/>
-                  </a:lnTo>
-                  <a:lnTo>
-                    <a:pt x="444500" y="569915"/>
-                  </a:lnTo>
-                  <a:lnTo>
-                    <a:pt x="0" y="582615"/>
-                  </a:lnTo>
-                  <a:lnTo>
-                    <a:pt x="6350" y="474665"/>
-                  </a:lnTo>
-                  <a:lnTo>
-                    <a:pt x="158750" y="411165"/>
-                  </a:lnTo>
-                  <a:lnTo>
-                    <a:pt x="158750" y="367365"/>
-                  </a:lnTo>
-                  <a:cubicBezTo>
-                    <a:pt x="88028" y="339833"/>
-                    <a:pt x="38100" y="270997"/>
-                    <a:pt x="38100" y="190500"/>
-                  </a:cubicBezTo>
-                  <a:cubicBezTo>
-                    <a:pt x="38100" y="85290"/>
-                    <a:pt x="123390" y="0"/>
-                    <a:pt x="228600" y="0"/>
-                  </a:cubicBezTo>
-                  <a:close/>
-                </a:path>
-              </a:pathLst>
-            </a:custGeom>
-            <a:solidFill>
-              <a:srgbClr val="0070C0"/>
-            </a:solidFill>
-            <a:ln w="6350">
-              <a:solidFill>
-                <a:schemeClr val="bg1">
-                  <a:lumMod val="95000"/>
-                </a:schemeClr>
-              </a:solidFill>
-            </a:ln>
-            <a:effectLst/>
-          </p:spPr>
-          <p:style>
-            <a:lnRef idx="2">
-              <a:schemeClr val="accent1">
-                <a:shade val="50000"/>
-              </a:schemeClr>
-            </a:lnRef>
-            <a:fillRef idx="1">
-              <a:schemeClr val="accent1"/>
-            </a:fillRef>
-            <a:effectRef idx="0">
-              <a:schemeClr val="accent1"/>
-            </a:effectRef>
-            <a:fontRef idx="minor">
-              <a:schemeClr val="lt1"/>
-            </a:fontRef>
-          </p:style>
-          <p:txBody>
-            <a:bodyPr rtlCol="0" anchor="ctr"/>
-            <a:lstStyle/>
-            <a:p>
-              <a:pPr algn="ctr"/>
-              <a:endParaRPr lang="en-US"/>
-            </a:p>
-          </p:txBody>
-        </p:sp>
-      </p:grpSp>
       <p:sp>
         <p:nvSpPr>
           <p:cNvPr id="222" name="TextBox 221"/>
@@ -12229,7 +11950,7 @@
         </p:nvSpPr>
         <p:spPr>
           <a:xfrm>
-            <a:off x="2962430" y="1398373"/>
+            <a:off x="2960049" y="1398373"/>
             <a:ext cx="399550" cy="138499"/>
           </a:xfrm>
           <a:prstGeom prst="rect">
@@ -12252,10 +11973,753 @@
           </a:p>
         </p:txBody>
       </p:sp>
+      <p:grpSp>
+        <p:nvGrpSpPr>
+          <p:cNvPr id="3" name="Group 2"/>
+          <p:cNvGrpSpPr/>
+          <p:nvPr/>
+        </p:nvGrpSpPr>
+        <p:grpSpPr>
+          <a:xfrm>
+            <a:off x="3061537" y="1249656"/>
+            <a:ext cx="190500" cy="190500"/>
+            <a:chOff x="3066293" y="1648512"/>
+            <a:chExt cx="190500" cy="190500"/>
+          </a:xfrm>
+        </p:grpSpPr>
+        <p:sp>
+          <p:nvSpPr>
+            <p:cNvPr id="91" name="Oval 90"/>
+            <p:cNvSpPr/>
+            <p:nvPr/>
+          </p:nvSpPr>
+          <p:spPr>
+            <a:xfrm>
+              <a:off x="3066293" y="1648512"/>
+              <a:ext cx="190500" cy="190500"/>
+            </a:xfrm>
+            <a:prstGeom prst="ellipse">
+              <a:avLst/>
+            </a:prstGeom>
+            <a:solidFill>
+              <a:schemeClr val="accent6"/>
+            </a:solidFill>
+            <a:ln>
+              <a:noFill/>
+            </a:ln>
+          </p:spPr>
+          <p:style>
+            <a:lnRef idx="2">
+              <a:schemeClr val="accent1">
+                <a:shade val="50000"/>
+              </a:schemeClr>
+            </a:lnRef>
+            <a:fillRef idx="1">
+              <a:schemeClr val="accent1"/>
+            </a:fillRef>
+            <a:effectRef idx="0">
+              <a:schemeClr val="accent1"/>
+            </a:effectRef>
+            <a:fontRef idx="minor">
+              <a:schemeClr val="lt1"/>
+            </a:fontRef>
+          </p:style>
+          <p:txBody>
+            <a:bodyPr rtlCol="0" anchor="ctr"/>
+            <a:lstStyle/>
+            <a:p>
+              <a:pPr algn="ctr"/>
+              <a:endParaRPr lang="en-SG"/>
+            </a:p>
+          </p:txBody>
+        </p:sp>
+        <p:grpSp>
+          <p:nvGrpSpPr>
+            <p:cNvPr id="2" name="Group 1"/>
+            <p:cNvGrpSpPr>
+              <a:grpSpLocks noChangeAspect="1"/>
+            </p:cNvGrpSpPr>
+            <p:nvPr/>
+          </p:nvGrpSpPr>
+          <p:grpSpPr>
+            <a:xfrm>
+              <a:off x="3122012" y="1711364"/>
+              <a:ext cx="86400" cy="80042"/>
+              <a:chOff x="2094461" y="2218013"/>
+              <a:chExt cx="662370" cy="613620"/>
+            </a:xfrm>
+          </p:grpSpPr>
+          <p:sp>
+            <p:nvSpPr>
+              <p:cNvPr id="92" name="Freeform 91"/>
+              <p:cNvSpPr/>
+              <p:nvPr/>
+            </p:nvSpPr>
+            <p:spPr>
+              <a:xfrm>
+                <a:off x="2239334" y="2399817"/>
+                <a:ext cx="517497" cy="429107"/>
+              </a:xfrm>
+              <a:custGeom>
+                <a:avLst/>
+                <a:gdLst>
+                  <a:gd name="connsiteX0" fmla="*/ 285750 w 292100"/>
+                  <a:gd name="connsiteY0" fmla="*/ 0 h 330200"/>
+                  <a:gd name="connsiteX1" fmla="*/ 177800 w 292100"/>
+                  <a:gd name="connsiteY1" fmla="*/ 111125 h 330200"/>
+                  <a:gd name="connsiteX2" fmla="*/ 0 w 292100"/>
+                  <a:gd name="connsiteY2" fmla="*/ 165100 h 330200"/>
+                  <a:gd name="connsiteX3" fmla="*/ 12700 w 292100"/>
+                  <a:gd name="connsiteY3" fmla="*/ 330200 h 330200"/>
+                  <a:gd name="connsiteX4" fmla="*/ 292100 w 292100"/>
+                  <a:gd name="connsiteY4" fmla="*/ 330200 h 330200"/>
+                  <a:gd name="connsiteX5" fmla="*/ 285750 w 292100"/>
+                  <a:gd name="connsiteY5" fmla="*/ 0 h 330200"/>
+                  <a:gd name="connsiteX0" fmla="*/ 285750 w 292100"/>
+                  <a:gd name="connsiteY0" fmla="*/ 6846 h 337046"/>
+                  <a:gd name="connsiteX1" fmla="*/ 177800 w 292100"/>
+                  <a:gd name="connsiteY1" fmla="*/ 117971 h 337046"/>
+                  <a:gd name="connsiteX2" fmla="*/ 0 w 292100"/>
+                  <a:gd name="connsiteY2" fmla="*/ 171946 h 337046"/>
+                  <a:gd name="connsiteX3" fmla="*/ 12700 w 292100"/>
+                  <a:gd name="connsiteY3" fmla="*/ 337046 h 337046"/>
+                  <a:gd name="connsiteX4" fmla="*/ 292100 w 292100"/>
+                  <a:gd name="connsiteY4" fmla="*/ 337046 h 337046"/>
+                  <a:gd name="connsiteX5" fmla="*/ 285750 w 292100"/>
+                  <a:gd name="connsiteY5" fmla="*/ 6846 h 337046"/>
+                  <a:gd name="connsiteX0" fmla="*/ 285750 w 292100"/>
+                  <a:gd name="connsiteY0" fmla="*/ 7451 h 337651"/>
+                  <a:gd name="connsiteX1" fmla="*/ 177800 w 292100"/>
+                  <a:gd name="connsiteY1" fmla="*/ 118576 h 337651"/>
+                  <a:gd name="connsiteX2" fmla="*/ 0 w 292100"/>
+                  <a:gd name="connsiteY2" fmla="*/ 172551 h 337651"/>
+                  <a:gd name="connsiteX3" fmla="*/ 12700 w 292100"/>
+                  <a:gd name="connsiteY3" fmla="*/ 337651 h 337651"/>
+                  <a:gd name="connsiteX4" fmla="*/ 292100 w 292100"/>
+                  <a:gd name="connsiteY4" fmla="*/ 337651 h 337651"/>
+                  <a:gd name="connsiteX5" fmla="*/ 285750 w 292100"/>
+                  <a:gd name="connsiteY5" fmla="*/ 7451 h 337651"/>
+                  <a:gd name="connsiteX0" fmla="*/ 307975 w 308535"/>
+                  <a:gd name="connsiteY0" fmla="*/ 6176 h 355426"/>
+                  <a:gd name="connsiteX1" fmla="*/ 177800 w 308535"/>
+                  <a:gd name="connsiteY1" fmla="*/ 136351 h 355426"/>
+                  <a:gd name="connsiteX2" fmla="*/ 0 w 308535"/>
+                  <a:gd name="connsiteY2" fmla="*/ 190326 h 355426"/>
+                  <a:gd name="connsiteX3" fmla="*/ 12700 w 308535"/>
+                  <a:gd name="connsiteY3" fmla="*/ 355426 h 355426"/>
+                  <a:gd name="connsiteX4" fmla="*/ 292100 w 308535"/>
+                  <a:gd name="connsiteY4" fmla="*/ 355426 h 355426"/>
+                  <a:gd name="connsiteX5" fmla="*/ 307975 w 308535"/>
+                  <a:gd name="connsiteY5" fmla="*/ 6176 h 355426"/>
+                </a:gdLst>
+                <a:ahLst/>
+                <a:cxnLst>
+                  <a:cxn ang="0">
+                    <a:pos x="connsiteX0" y="connsiteY0"/>
+                  </a:cxn>
+                  <a:cxn ang="0">
+                    <a:pos x="connsiteX1" y="connsiteY1"/>
+                  </a:cxn>
+                  <a:cxn ang="0">
+                    <a:pos x="connsiteX2" y="connsiteY2"/>
+                  </a:cxn>
+                  <a:cxn ang="0">
+                    <a:pos x="connsiteX3" y="connsiteY3"/>
+                  </a:cxn>
+                  <a:cxn ang="0">
+                    <a:pos x="connsiteX4" y="connsiteY4"/>
+                  </a:cxn>
+                  <a:cxn ang="0">
+                    <a:pos x="connsiteX5" y="connsiteY5"/>
+                  </a:cxn>
+                </a:cxnLst>
+                <a:rect l="l" t="t" r="r" b="b"/>
+                <a:pathLst>
+                  <a:path w="308535" h="355426">
+                    <a:moveTo>
+                      <a:pt x="307975" y="6176"/>
+                    </a:moveTo>
+                    <a:cubicBezTo>
+                      <a:pt x="288925" y="-30336"/>
+                      <a:pt x="229129" y="105659"/>
+                      <a:pt x="177800" y="136351"/>
+                    </a:cubicBezTo>
+                    <a:cubicBezTo>
+                      <a:pt x="126471" y="167043"/>
+                      <a:pt x="27517" y="153814"/>
+                      <a:pt x="0" y="190326"/>
+                    </a:cubicBezTo>
+                    <a:lnTo>
+                      <a:pt x="12700" y="355426"/>
+                    </a:lnTo>
+                    <a:lnTo>
+                      <a:pt x="292100" y="355426"/>
+                    </a:lnTo>
+                    <a:cubicBezTo>
+                      <a:pt x="291042" y="245359"/>
+                      <a:pt x="312208" y="116243"/>
+                      <a:pt x="307975" y="6176"/>
+                    </a:cubicBezTo>
+                    <a:close/>
+                  </a:path>
+                </a:pathLst>
+              </a:custGeom>
+              <a:solidFill>
+                <a:schemeClr val="bg1"/>
+              </a:solidFill>
+              <a:ln w="19050">
+                <a:noFill/>
+              </a:ln>
+              <a:effectLst/>
+            </p:spPr>
+            <p:style>
+              <a:lnRef idx="2">
+                <a:schemeClr val="accent1">
+                  <a:shade val="50000"/>
+                </a:schemeClr>
+              </a:lnRef>
+              <a:fillRef idx="1">
+                <a:schemeClr val="accent1"/>
+              </a:fillRef>
+              <a:effectRef idx="0">
+                <a:schemeClr val="accent1"/>
+              </a:effectRef>
+              <a:fontRef idx="minor">
+                <a:schemeClr val="lt1"/>
+              </a:fontRef>
+            </p:style>
+            <p:txBody>
+              <a:bodyPr rtlCol="0" anchor="ctr"/>
+              <a:lstStyle/>
+              <a:p>
+                <a:pPr algn="ctr"/>
+                <a:endParaRPr lang="en-SG"/>
+              </a:p>
+            </p:txBody>
+          </p:sp>
+          <p:sp>
+            <p:nvSpPr>
+              <p:cNvPr id="93" name="Flowchart: Connector 92"/>
+              <p:cNvSpPr/>
+              <p:nvPr/>
+            </p:nvSpPr>
+            <p:spPr>
+              <a:xfrm>
+                <a:off x="2150116" y="2218013"/>
+                <a:ext cx="273109" cy="273109"/>
+              </a:xfrm>
+              <a:prstGeom prst="flowChartConnector">
+                <a:avLst/>
+              </a:prstGeom>
+              <a:solidFill>
+                <a:schemeClr val="bg1"/>
+              </a:solidFill>
+              <a:ln w="19050">
+                <a:noFill/>
+              </a:ln>
+              <a:effectLst/>
+            </p:spPr>
+            <p:style>
+              <a:lnRef idx="2">
+                <a:schemeClr val="accent1">
+                  <a:shade val="50000"/>
+                </a:schemeClr>
+              </a:lnRef>
+              <a:fillRef idx="1">
+                <a:schemeClr val="accent1"/>
+              </a:fillRef>
+              <a:effectRef idx="0">
+                <a:schemeClr val="accent1"/>
+              </a:effectRef>
+              <a:fontRef idx="minor">
+                <a:schemeClr val="lt1"/>
+              </a:fontRef>
+            </p:style>
+            <p:txBody>
+              <a:bodyPr rtlCol="0" anchor="ctr"/>
+              <a:lstStyle/>
+              <a:p>
+                <a:pPr algn="ctr"/>
+                <a:endParaRPr lang="en-SG"/>
+              </a:p>
+            </p:txBody>
+          </p:sp>
+          <p:sp>
+            <p:nvSpPr>
+              <p:cNvPr id="94" name="Freeform 93"/>
+              <p:cNvSpPr/>
+              <p:nvPr/>
+            </p:nvSpPr>
+            <p:spPr>
+              <a:xfrm>
+                <a:off x="2094461" y="2530475"/>
+                <a:ext cx="657530" cy="301158"/>
+              </a:xfrm>
+              <a:custGeom>
+                <a:avLst/>
+                <a:gdLst>
+                  <a:gd name="connsiteX0" fmla="*/ 0 w 660400"/>
+                  <a:gd name="connsiteY0" fmla="*/ 158750 h 384175"/>
+                  <a:gd name="connsiteX1" fmla="*/ 206375 w 660400"/>
+                  <a:gd name="connsiteY1" fmla="*/ 0 h 384175"/>
+                  <a:gd name="connsiteX2" fmla="*/ 660400 w 660400"/>
+                  <a:gd name="connsiteY2" fmla="*/ 269875 h 384175"/>
+                  <a:gd name="connsiteX3" fmla="*/ 657225 w 660400"/>
+                  <a:gd name="connsiteY3" fmla="*/ 384175 h 384175"/>
+                  <a:gd name="connsiteX4" fmla="*/ 155575 w 660400"/>
+                  <a:gd name="connsiteY4" fmla="*/ 384175 h 384175"/>
+                  <a:gd name="connsiteX5" fmla="*/ 63500 w 660400"/>
+                  <a:gd name="connsiteY5" fmla="*/ 361950 h 384175"/>
+                  <a:gd name="connsiteX6" fmla="*/ 0 w 660400"/>
+                  <a:gd name="connsiteY6" fmla="*/ 288925 h 384175"/>
+                  <a:gd name="connsiteX7" fmla="*/ 0 w 660400"/>
+                  <a:gd name="connsiteY7" fmla="*/ 158750 h 384175"/>
+                  <a:gd name="connsiteX0" fmla="*/ 0 w 660400"/>
+                  <a:gd name="connsiteY0" fmla="*/ 160553 h 385978"/>
+                  <a:gd name="connsiteX1" fmla="*/ 206375 w 660400"/>
+                  <a:gd name="connsiteY1" fmla="*/ 1803 h 385978"/>
+                  <a:gd name="connsiteX2" fmla="*/ 660400 w 660400"/>
+                  <a:gd name="connsiteY2" fmla="*/ 271678 h 385978"/>
+                  <a:gd name="connsiteX3" fmla="*/ 657225 w 660400"/>
+                  <a:gd name="connsiteY3" fmla="*/ 385978 h 385978"/>
+                  <a:gd name="connsiteX4" fmla="*/ 155575 w 660400"/>
+                  <a:gd name="connsiteY4" fmla="*/ 385978 h 385978"/>
+                  <a:gd name="connsiteX5" fmla="*/ 63500 w 660400"/>
+                  <a:gd name="connsiteY5" fmla="*/ 363753 h 385978"/>
+                  <a:gd name="connsiteX6" fmla="*/ 0 w 660400"/>
+                  <a:gd name="connsiteY6" fmla="*/ 290728 h 385978"/>
+                  <a:gd name="connsiteX7" fmla="*/ 0 w 660400"/>
+                  <a:gd name="connsiteY7" fmla="*/ 160553 h 385978"/>
+                  <a:gd name="connsiteX0" fmla="*/ 0 w 660400"/>
+                  <a:gd name="connsiteY0" fmla="*/ 158961 h 384386"/>
+                  <a:gd name="connsiteX1" fmla="*/ 206375 w 660400"/>
+                  <a:gd name="connsiteY1" fmla="*/ 211 h 384386"/>
+                  <a:gd name="connsiteX2" fmla="*/ 660400 w 660400"/>
+                  <a:gd name="connsiteY2" fmla="*/ 270086 h 384386"/>
+                  <a:gd name="connsiteX3" fmla="*/ 657225 w 660400"/>
+                  <a:gd name="connsiteY3" fmla="*/ 384386 h 384386"/>
+                  <a:gd name="connsiteX4" fmla="*/ 155575 w 660400"/>
+                  <a:gd name="connsiteY4" fmla="*/ 384386 h 384386"/>
+                  <a:gd name="connsiteX5" fmla="*/ 63500 w 660400"/>
+                  <a:gd name="connsiteY5" fmla="*/ 362161 h 384386"/>
+                  <a:gd name="connsiteX6" fmla="*/ 0 w 660400"/>
+                  <a:gd name="connsiteY6" fmla="*/ 289136 h 384386"/>
+                  <a:gd name="connsiteX7" fmla="*/ 0 w 660400"/>
+                  <a:gd name="connsiteY7" fmla="*/ 158961 h 384386"/>
+                  <a:gd name="connsiteX0" fmla="*/ 0 w 660400"/>
+                  <a:gd name="connsiteY0" fmla="*/ 159089 h 384514"/>
+                  <a:gd name="connsiteX1" fmla="*/ 206375 w 660400"/>
+                  <a:gd name="connsiteY1" fmla="*/ 339 h 384514"/>
+                  <a:gd name="connsiteX2" fmla="*/ 660400 w 660400"/>
+                  <a:gd name="connsiteY2" fmla="*/ 270214 h 384514"/>
+                  <a:gd name="connsiteX3" fmla="*/ 657225 w 660400"/>
+                  <a:gd name="connsiteY3" fmla="*/ 384514 h 384514"/>
+                  <a:gd name="connsiteX4" fmla="*/ 155575 w 660400"/>
+                  <a:gd name="connsiteY4" fmla="*/ 384514 h 384514"/>
+                  <a:gd name="connsiteX5" fmla="*/ 63500 w 660400"/>
+                  <a:gd name="connsiteY5" fmla="*/ 362289 h 384514"/>
+                  <a:gd name="connsiteX6" fmla="*/ 0 w 660400"/>
+                  <a:gd name="connsiteY6" fmla="*/ 289264 h 384514"/>
+                  <a:gd name="connsiteX7" fmla="*/ 0 w 660400"/>
+                  <a:gd name="connsiteY7" fmla="*/ 159089 h 384514"/>
+                  <a:gd name="connsiteX0" fmla="*/ 0 w 660400"/>
+                  <a:gd name="connsiteY0" fmla="*/ 159325 h 384750"/>
+                  <a:gd name="connsiteX1" fmla="*/ 206375 w 660400"/>
+                  <a:gd name="connsiteY1" fmla="*/ 575 h 384750"/>
+                  <a:gd name="connsiteX2" fmla="*/ 455434 w 660400"/>
+                  <a:gd name="connsiteY2" fmla="*/ 112167 h 384750"/>
+                  <a:gd name="connsiteX3" fmla="*/ 660400 w 660400"/>
+                  <a:gd name="connsiteY3" fmla="*/ 270450 h 384750"/>
+                  <a:gd name="connsiteX4" fmla="*/ 657225 w 660400"/>
+                  <a:gd name="connsiteY4" fmla="*/ 384750 h 384750"/>
+                  <a:gd name="connsiteX5" fmla="*/ 155575 w 660400"/>
+                  <a:gd name="connsiteY5" fmla="*/ 384750 h 384750"/>
+                  <a:gd name="connsiteX6" fmla="*/ 63500 w 660400"/>
+                  <a:gd name="connsiteY6" fmla="*/ 362525 h 384750"/>
+                  <a:gd name="connsiteX7" fmla="*/ 0 w 660400"/>
+                  <a:gd name="connsiteY7" fmla="*/ 289500 h 384750"/>
+                  <a:gd name="connsiteX8" fmla="*/ 0 w 660400"/>
+                  <a:gd name="connsiteY8" fmla="*/ 159325 h 384750"/>
+                  <a:gd name="connsiteX0" fmla="*/ 0 w 660400"/>
+                  <a:gd name="connsiteY0" fmla="*/ 159325 h 384750"/>
+                  <a:gd name="connsiteX1" fmla="*/ 206375 w 660400"/>
+                  <a:gd name="connsiteY1" fmla="*/ 575 h 384750"/>
+                  <a:gd name="connsiteX2" fmla="*/ 455434 w 660400"/>
+                  <a:gd name="connsiteY2" fmla="*/ 112167 h 384750"/>
+                  <a:gd name="connsiteX3" fmla="*/ 660400 w 660400"/>
+                  <a:gd name="connsiteY3" fmla="*/ 270450 h 384750"/>
+                  <a:gd name="connsiteX4" fmla="*/ 657225 w 660400"/>
+                  <a:gd name="connsiteY4" fmla="*/ 384750 h 384750"/>
+                  <a:gd name="connsiteX5" fmla="*/ 155575 w 660400"/>
+                  <a:gd name="connsiteY5" fmla="*/ 384750 h 384750"/>
+                  <a:gd name="connsiteX6" fmla="*/ 63500 w 660400"/>
+                  <a:gd name="connsiteY6" fmla="*/ 362525 h 384750"/>
+                  <a:gd name="connsiteX7" fmla="*/ 0 w 660400"/>
+                  <a:gd name="connsiteY7" fmla="*/ 289500 h 384750"/>
+                  <a:gd name="connsiteX8" fmla="*/ 0 w 660400"/>
+                  <a:gd name="connsiteY8" fmla="*/ 159325 h 384750"/>
+                  <a:gd name="connsiteX0" fmla="*/ 0 w 660400"/>
+                  <a:gd name="connsiteY0" fmla="*/ 158753 h 384178"/>
+                  <a:gd name="connsiteX1" fmla="*/ 206375 w 660400"/>
+                  <a:gd name="connsiteY1" fmla="*/ 3 h 384178"/>
+                  <a:gd name="connsiteX2" fmla="*/ 442734 w 660400"/>
+                  <a:gd name="connsiteY2" fmla="*/ 162395 h 384178"/>
+                  <a:gd name="connsiteX3" fmla="*/ 660400 w 660400"/>
+                  <a:gd name="connsiteY3" fmla="*/ 269878 h 384178"/>
+                  <a:gd name="connsiteX4" fmla="*/ 657225 w 660400"/>
+                  <a:gd name="connsiteY4" fmla="*/ 384178 h 384178"/>
+                  <a:gd name="connsiteX5" fmla="*/ 155575 w 660400"/>
+                  <a:gd name="connsiteY5" fmla="*/ 384178 h 384178"/>
+                  <a:gd name="connsiteX6" fmla="*/ 63500 w 660400"/>
+                  <a:gd name="connsiteY6" fmla="*/ 361953 h 384178"/>
+                  <a:gd name="connsiteX7" fmla="*/ 0 w 660400"/>
+                  <a:gd name="connsiteY7" fmla="*/ 288928 h 384178"/>
+                  <a:gd name="connsiteX8" fmla="*/ 0 w 660400"/>
+                  <a:gd name="connsiteY8" fmla="*/ 158753 h 384178"/>
+                  <a:gd name="connsiteX0" fmla="*/ 0 w 660400"/>
+                  <a:gd name="connsiteY0" fmla="*/ 158753 h 384178"/>
+                  <a:gd name="connsiteX1" fmla="*/ 206375 w 660400"/>
+                  <a:gd name="connsiteY1" fmla="*/ 3 h 384178"/>
+                  <a:gd name="connsiteX2" fmla="*/ 442734 w 660400"/>
+                  <a:gd name="connsiteY2" fmla="*/ 162395 h 384178"/>
+                  <a:gd name="connsiteX3" fmla="*/ 660400 w 660400"/>
+                  <a:gd name="connsiteY3" fmla="*/ 269878 h 384178"/>
+                  <a:gd name="connsiteX4" fmla="*/ 657225 w 660400"/>
+                  <a:gd name="connsiteY4" fmla="*/ 384178 h 384178"/>
+                  <a:gd name="connsiteX5" fmla="*/ 155575 w 660400"/>
+                  <a:gd name="connsiteY5" fmla="*/ 384178 h 384178"/>
+                  <a:gd name="connsiteX6" fmla="*/ 63500 w 660400"/>
+                  <a:gd name="connsiteY6" fmla="*/ 361953 h 384178"/>
+                  <a:gd name="connsiteX7" fmla="*/ 0 w 660400"/>
+                  <a:gd name="connsiteY7" fmla="*/ 288928 h 384178"/>
+                  <a:gd name="connsiteX8" fmla="*/ 0 w 660400"/>
+                  <a:gd name="connsiteY8" fmla="*/ 158753 h 384178"/>
+                  <a:gd name="connsiteX0" fmla="*/ 0 w 657530"/>
+                  <a:gd name="connsiteY0" fmla="*/ 158753 h 384178"/>
+                  <a:gd name="connsiteX1" fmla="*/ 206375 w 657530"/>
+                  <a:gd name="connsiteY1" fmla="*/ 3 h 384178"/>
+                  <a:gd name="connsiteX2" fmla="*/ 442734 w 657530"/>
+                  <a:gd name="connsiteY2" fmla="*/ 162395 h 384178"/>
+                  <a:gd name="connsiteX3" fmla="*/ 657225 w 657530"/>
+                  <a:gd name="connsiteY3" fmla="*/ 184153 h 384178"/>
+                  <a:gd name="connsiteX4" fmla="*/ 657225 w 657530"/>
+                  <a:gd name="connsiteY4" fmla="*/ 384178 h 384178"/>
+                  <a:gd name="connsiteX5" fmla="*/ 155575 w 657530"/>
+                  <a:gd name="connsiteY5" fmla="*/ 384178 h 384178"/>
+                  <a:gd name="connsiteX6" fmla="*/ 63500 w 657530"/>
+                  <a:gd name="connsiteY6" fmla="*/ 361953 h 384178"/>
+                  <a:gd name="connsiteX7" fmla="*/ 0 w 657530"/>
+                  <a:gd name="connsiteY7" fmla="*/ 288928 h 384178"/>
+                  <a:gd name="connsiteX8" fmla="*/ 0 w 657530"/>
+                  <a:gd name="connsiteY8" fmla="*/ 158753 h 384178"/>
+                  <a:gd name="connsiteX0" fmla="*/ 0 w 657530"/>
+                  <a:gd name="connsiteY0" fmla="*/ 158753 h 384178"/>
+                  <a:gd name="connsiteX1" fmla="*/ 206375 w 657530"/>
+                  <a:gd name="connsiteY1" fmla="*/ 3 h 384178"/>
+                  <a:gd name="connsiteX2" fmla="*/ 442734 w 657530"/>
+                  <a:gd name="connsiteY2" fmla="*/ 162395 h 384178"/>
+                  <a:gd name="connsiteX3" fmla="*/ 657225 w 657530"/>
+                  <a:gd name="connsiteY3" fmla="*/ 184153 h 384178"/>
+                  <a:gd name="connsiteX4" fmla="*/ 657225 w 657530"/>
+                  <a:gd name="connsiteY4" fmla="*/ 384178 h 384178"/>
+                  <a:gd name="connsiteX5" fmla="*/ 155575 w 657530"/>
+                  <a:gd name="connsiteY5" fmla="*/ 384178 h 384178"/>
+                  <a:gd name="connsiteX6" fmla="*/ 63500 w 657530"/>
+                  <a:gd name="connsiteY6" fmla="*/ 361953 h 384178"/>
+                  <a:gd name="connsiteX7" fmla="*/ 0 w 657530"/>
+                  <a:gd name="connsiteY7" fmla="*/ 288928 h 384178"/>
+                  <a:gd name="connsiteX8" fmla="*/ 0 w 657530"/>
+                  <a:gd name="connsiteY8" fmla="*/ 158753 h 384178"/>
+                  <a:gd name="connsiteX0" fmla="*/ 0 w 657530"/>
+                  <a:gd name="connsiteY0" fmla="*/ 158753 h 384178"/>
+                  <a:gd name="connsiteX1" fmla="*/ 206375 w 657530"/>
+                  <a:gd name="connsiteY1" fmla="*/ 3 h 384178"/>
+                  <a:gd name="connsiteX2" fmla="*/ 442734 w 657530"/>
+                  <a:gd name="connsiteY2" fmla="*/ 162395 h 384178"/>
+                  <a:gd name="connsiteX3" fmla="*/ 657225 w 657530"/>
+                  <a:gd name="connsiteY3" fmla="*/ 184153 h 384178"/>
+                  <a:gd name="connsiteX4" fmla="*/ 657225 w 657530"/>
+                  <a:gd name="connsiteY4" fmla="*/ 384178 h 384178"/>
+                  <a:gd name="connsiteX5" fmla="*/ 155575 w 657530"/>
+                  <a:gd name="connsiteY5" fmla="*/ 384178 h 384178"/>
+                  <a:gd name="connsiteX6" fmla="*/ 63500 w 657530"/>
+                  <a:gd name="connsiteY6" fmla="*/ 361953 h 384178"/>
+                  <a:gd name="connsiteX7" fmla="*/ 0 w 657530"/>
+                  <a:gd name="connsiteY7" fmla="*/ 288928 h 384178"/>
+                  <a:gd name="connsiteX8" fmla="*/ 0 w 657530"/>
+                  <a:gd name="connsiteY8" fmla="*/ 158753 h 384178"/>
+                  <a:gd name="connsiteX0" fmla="*/ 0 w 657530"/>
+                  <a:gd name="connsiteY0" fmla="*/ 158753 h 384178"/>
+                  <a:gd name="connsiteX1" fmla="*/ 206375 w 657530"/>
+                  <a:gd name="connsiteY1" fmla="*/ 3 h 384178"/>
+                  <a:gd name="connsiteX2" fmla="*/ 442734 w 657530"/>
+                  <a:gd name="connsiteY2" fmla="*/ 162395 h 384178"/>
+                  <a:gd name="connsiteX3" fmla="*/ 657225 w 657530"/>
+                  <a:gd name="connsiteY3" fmla="*/ 184153 h 384178"/>
+                  <a:gd name="connsiteX4" fmla="*/ 657225 w 657530"/>
+                  <a:gd name="connsiteY4" fmla="*/ 384178 h 384178"/>
+                  <a:gd name="connsiteX5" fmla="*/ 155575 w 657530"/>
+                  <a:gd name="connsiteY5" fmla="*/ 384178 h 384178"/>
+                  <a:gd name="connsiteX6" fmla="*/ 63500 w 657530"/>
+                  <a:gd name="connsiteY6" fmla="*/ 361953 h 384178"/>
+                  <a:gd name="connsiteX7" fmla="*/ 0 w 657530"/>
+                  <a:gd name="connsiteY7" fmla="*/ 288928 h 384178"/>
+                  <a:gd name="connsiteX8" fmla="*/ 0 w 657530"/>
+                  <a:gd name="connsiteY8" fmla="*/ 158753 h 384178"/>
+                </a:gdLst>
+                <a:ahLst/>
+                <a:cxnLst>
+                  <a:cxn ang="0">
+                    <a:pos x="connsiteX0" y="connsiteY0"/>
+                  </a:cxn>
+                  <a:cxn ang="0">
+                    <a:pos x="connsiteX1" y="connsiteY1"/>
+                  </a:cxn>
+                  <a:cxn ang="0">
+                    <a:pos x="connsiteX2" y="connsiteY2"/>
+                  </a:cxn>
+                  <a:cxn ang="0">
+                    <a:pos x="connsiteX3" y="connsiteY3"/>
+                  </a:cxn>
+                  <a:cxn ang="0">
+                    <a:pos x="connsiteX4" y="connsiteY4"/>
+                  </a:cxn>
+                  <a:cxn ang="0">
+                    <a:pos x="connsiteX5" y="connsiteY5"/>
+                  </a:cxn>
+                  <a:cxn ang="0">
+                    <a:pos x="connsiteX6" y="connsiteY6"/>
+                  </a:cxn>
+                  <a:cxn ang="0">
+                    <a:pos x="connsiteX7" y="connsiteY7"/>
+                  </a:cxn>
+                  <a:cxn ang="0">
+                    <a:pos x="connsiteX8" y="connsiteY8"/>
+                  </a:cxn>
+                </a:cxnLst>
+                <a:rect l="l" t="t" r="r" b="b"/>
+                <a:pathLst>
+                  <a:path w="657530" h="384178">
+                    <a:moveTo>
+                      <a:pt x="0" y="158753"/>
+                    </a:moveTo>
+                    <a:cubicBezTo>
+                      <a:pt x="34396" y="110599"/>
+                      <a:pt x="132586" y="-604"/>
+                      <a:pt x="206375" y="3"/>
+                    </a:cubicBezTo>
+                    <a:cubicBezTo>
+                      <a:pt x="280164" y="610"/>
+                      <a:pt x="367592" y="119003"/>
+                      <a:pt x="442734" y="162395"/>
+                    </a:cubicBezTo>
+                    <a:cubicBezTo>
+                      <a:pt x="517876" y="205787"/>
+                      <a:pt x="579143" y="233973"/>
+                      <a:pt x="657225" y="184153"/>
+                    </a:cubicBezTo>
+                    <a:cubicBezTo>
+                      <a:pt x="656167" y="222253"/>
+                      <a:pt x="658283" y="346078"/>
+                      <a:pt x="657225" y="384178"/>
+                    </a:cubicBezTo>
+                    <a:lnTo>
+                      <a:pt x="155575" y="384178"/>
+                    </a:lnTo>
+                    <a:lnTo>
+                      <a:pt x="63500" y="361953"/>
+                    </a:lnTo>
+                    <a:lnTo>
+                      <a:pt x="0" y="288928"/>
+                    </a:lnTo>
+                    <a:cubicBezTo>
+                      <a:pt x="1058" y="243420"/>
+                      <a:pt x="2117" y="197911"/>
+                      <a:pt x="0" y="158753"/>
+                    </a:cubicBezTo>
+                    <a:close/>
+                  </a:path>
+                </a:pathLst>
+              </a:custGeom>
+              <a:solidFill>
+                <a:srgbClr val="0070C0"/>
+              </a:solidFill>
+              <a:ln w="19050">
+                <a:noFill/>
+              </a:ln>
+              <a:effectLst/>
+            </p:spPr>
+            <p:style>
+              <a:lnRef idx="2">
+                <a:schemeClr val="accent1">
+                  <a:shade val="50000"/>
+                </a:schemeClr>
+              </a:lnRef>
+              <a:fillRef idx="1">
+                <a:schemeClr val="accent1"/>
+              </a:fillRef>
+              <a:effectRef idx="0">
+                <a:schemeClr val="accent1"/>
+              </a:effectRef>
+              <a:fontRef idx="minor">
+                <a:schemeClr val="lt1"/>
+              </a:fontRef>
+            </p:style>
+            <p:txBody>
+              <a:bodyPr rtlCol="0" anchor="ctr"/>
+              <a:lstStyle/>
+              <a:p>
+                <a:pPr algn="ctr"/>
+                <a:endParaRPr lang="en-SG"/>
+              </a:p>
+            </p:txBody>
+          </p:sp>
+        </p:grpSp>
+        <p:cxnSp>
+          <p:nvCxnSpPr>
+            <p:cNvPr id="89" name="Straight Connector 88"/>
+            <p:cNvCxnSpPr/>
+            <p:nvPr/>
+          </p:nvCxnSpPr>
+          <p:spPr>
+            <a:xfrm rot="10800000">
+              <a:off x="3089710" y="1788061"/>
+              <a:ext cx="116176" cy="0"/>
+            </a:xfrm>
+            <a:prstGeom prst="line">
+              <a:avLst/>
+            </a:prstGeom>
+            <a:ln w="12700" cap="sq">
+              <a:solidFill>
+                <a:srgbClr val="0070C0"/>
+              </a:solidFill>
+            </a:ln>
+          </p:spPr>
+          <p:style>
+            <a:lnRef idx="1">
+              <a:schemeClr val="accent1"/>
+            </a:lnRef>
+            <a:fillRef idx="0">
+              <a:schemeClr val="accent1"/>
+            </a:fillRef>
+            <a:effectRef idx="0">
+              <a:schemeClr val="accent1"/>
+            </a:effectRef>
+            <a:fontRef idx="minor">
+              <a:schemeClr val="tx1"/>
+            </a:fontRef>
+          </p:style>
+        </p:cxnSp>
+        <p:cxnSp>
+          <p:nvCxnSpPr>
+            <p:cNvPr id="90" name="Straight Connector 89"/>
+            <p:cNvCxnSpPr/>
+            <p:nvPr/>
+          </p:nvCxnSpPr>
+          <p:spPr>
+            <a:xfrm rot="5400000">
+              <a:off x="3149189" y="1727592"/>
+              <a:ext cx="116176" cy="0"/>
+            </a:xfrm>
+            <a:prstGeom prst="line">
+              <a:avLst/>
+            </a:prstGeom>
+            <a:ln w="12700" cap="sq">
+              <a:solidFill>
+                <a:srgbClr val="0070C0"/>
+              </a:solidFill>
+            </a:ln>
+          </p:spPr>
+          <p:style>
+            <a:lnRef idx="1">
+              <a:schemeClr val="accent1"/>
+            </a:lnRef>
+            <a:fillRef idx="0">
+              <a:schemeClr val="accent1"/>
+            </a:fillRef>
+            <a:effectRef idx="0">
+              <a:schemeClr val="accent1"/>
+            </a:effectRef>
+            <a:fontRef idx="minor">
+              <a:schemeClr val="tx1"/>
+            </a:fontRef>
+          </p:style>
+        </p:cxnSp>
+        <p:cxnSp>
+          <p:nvCxnSpPr>
+            <p:cNvPr id="87" name="Straight Connector 86"/>
+            <p:cNvCxnSpPr/>
+            <p:nvPr/>
+          </p:nvCxnSpPr>
+          <p:spPr>
+            <a:xfrm>
+              <a:off x="3123232" y="1701843"/>
+              <a:ext cx="116177" cy="0"/>
+            </a:xfrm>
+            <a:prstGeom prst="line">
+              <a:avLst/>
+            </a:prstGeom>
+            <a:ln w="12700" cap="sq">
+              <a:solidFill>
+                <a:srgbClr val="0070C0"/>
+              </a:solidFill>
+            </a:ln>
+          </p:spPr>
+          <p:style>
+            <a:lnRef idx="1">
+              <a:schemeClr val="accent1"/>
+            </a:lnRef>
+            <a:fillRef idx="0">
+              <a:schemeClr val="accent1"/>
+            </a:fillRef>
+            <a:effectRef idx="0">
+              <a:schemeClr val="accent1"/>
+            </a:effectRef>
+            <a:fontRef idx="minor">
+              <a:schemeClr val="tx1"/>
+            </a:fontRef>
+          </p:style>
+        </p:cxnSp>
+        <p:cxnSp>
+          <p:nvCxnSpPr>
+            <p:cNvPr id="88" name="Straight Connector 87"/>
+            <p:cNvCxnSpPr/>
+            <p:nvPr/>
+          </p:nvCxnSpPr>
+          <p:spPr>
+            <a:xfrm rot="16200000">
+              <a:off x="3065144" y="1759931"/>
+              <a:ext cx="116176" cy="0"/>
+            </a:xfrm>
+            <a:prstGeom prst="line">
+              <a:avLst/>
+            </a:prstGeom>
+            <a:ln w="12700" cap="sq">
+              <a:solidFill>
+                <a:srgbClr val="0070C0"/>
+              </a:solidFill>
+            </a:ln>
+          </p:spPr>
+          <p:style>
+            <a:lnRef idx="1">
+              <a:schemeClr val="accent1"/>
+            </a:lnRef>
+            <a:fillRef idx="0">
+              <a:schemeClr val="accent1"/>
+            </a:fillRef>
+            <a:effectRef idx="0">
+              <a:schemeClr val="accent1"/>
+            </a:effectRef>
+            <a:fontRef idx="minor">
+              <a:schemeClr val="tx1"/>
+            </a:fontRef>
+          </p:style>
+        </p:cxnSp>
+      </p:grpSp>
     </p:spTree>
     <p:extLst>
       <p:ext uri="{BB962C8B-B14F-4D97-AF65-F5344CB8AC3E}">
-        <p14:creationId xmlns:p14="http://schemas.microsoft.com/office/powerpoint/2010/main" val="2784023609"/>
+        <p14:creationId xmlns:p14="http://schemas.microsoft.com/office/powerpoint/2010/main" val="1317039341"/>
       </p:ext>
     </p:extLst>
   </p:cSld>

</xml_diff>

<commit_message>
Redesigned small icons and added Animation Lab icon
</commit_message>
<xml_diff>
--- a/doc/Icons.pptx
+++ b/doc/Icons.pptx
@@ -28,16 +28,16 @@
       <p:boldItalic r:id="rId14"/>
     </p:embeddedFont>
     <p:embeddedFont>
-      <p:font typeface="Arial Black" panose="020B0A04020102020204" pitchFamily="34" charset="0"/>
+      <p:font typeface="Rockwell Extra Bold" panose="02060903040505020403" pitchFamily="18" charset="0"/>
       <p:bold r:id="rId15"/>
     </p:embeddedFont>
     <p:embeddedFont>
-      <p:font typeface="Gill Sans Ultra Bold" panose="020B0A02020104020203" pitchFamily="34" charset="0"/>
-      <p:regular r:id="rId16"/>
+      <p:font typeface="Arial Black" panose="020B0A04020102020204" pitchFamily="34" charset="0"/>
+      <p:bold r:id="rId16"/>
     </p:embeddedFont>
     <p:embeddedFont>
-      <p:font typeface="Rockwell Extra Bold" panose="02060903040505020403" pitchFamily="18" charset="0"/>
-      <p:bold r:id="rId17"/>
+      <p:font typeface="Gill Sans Ultra Bold" panose="020B0A02020104020203" pitchFamily="34" charset="0"/>
+      <p:regular r:id="rId17"/>
     </p:embeddedFont>
   </p:embeddedFontLst>
   <p:defaultTextStyle>
@@ -236,7 +236,7 @@
           <a:p>
             <a:fld id="{6699ACB9-486C-4D62-A3A7-AF98E13EFDA3}" type="datetimeFigureOut">
               <a:rPr lang="en-US" smtClean="0"/>
-              <a:t>2/7/2017</a:t>
+              <a:t>3/12/2017</a:t>
             </a:fld>
             <a:endParaRPr lang="en-US"/>
           </a:p>
@@ -300,38 +300,37 @@
           <a:p>
             <a:pPr lvl="0"/>
             <a:r>
-              <a:rPr lang="en-US" smtClean="0"/>
+              <a:rPr lang="en-US"/>
               <a:t>Click to edit Master text styles</a:t>
             </a:r>
           </a:p>
           <a:p>
             <a:pPr lvl="1"/>
             <a:r>
-              <a:rPr lang="en-US" smtClean="0"/>
+              <a:rPr lang="en-US"/>
               <a:t>Second level</a:t>
             </a:r>
           </a:p>
           <a:p>
             <a:pPr lvl="2"/>
             <a:r>
-              <a:rPr lang="en-US" smtClean="0"/>
+              <a:rPr lang="en-US"/>
               <a:t>Third level</a:t>
             </a:r>
           </a:p>
           <a:p>
             <a:pPr lvl="3"/>
             <a:r>
-              <a:rPr lang="en-US" smtClean="0"/>
+              <a:rPr lang="en-US"/>
               <a:t>Fourth level</a:t>
             </a:r>
           </a:p>
           <a:p>
             <a:pPr lvl="4"/>
             <a:r>
-              <a:rPr lang="en-US" smtClean="0"/>
+              <a:rPr lang="en-US"/>
               <a:t>Fifth level</a:t>
             </a:r>
-            <a:endParaRPr lang="en-US"/>
           </a:p>
         </p:txBody>
       </p:sp>
@@ -548,6 +547,90 @@
           <a:bodyPr/>
           <a:lstStyle/>
           <a:p>
+            <a:endParaRPr lang="en-US" dirty="0"/>
+          </a:p>
+        </p:txBody>
+      </p:sp>
+      <p:sp>
+        <p:nvSpPr>
+          <p:cNvPr id="4" name="Slide Number Placeholder 3"/>
+          <p:cNvSpPr>
+            <a:spLocks noGrp="1"/>
+          </p:cNvSpPr>
+          <p:nvPr>
+            <p:ph type="sldNum" sz="quarter" idx="10"/>
+          </p:nvPr>
+        </p:nvSpPr>
+        <p:spPr/>
+        <p:txBody>
+          <a:bodyPr/>
+          <a:lstStyle/>
+          <a:p>
+            <a:fld id="{8EC77E60-82A0-4F8A-A861-433B3189FA8C}" type="slidenum">
+              <a:rPr lang="en-US" smtClean="0"/>
+              <a:t>1</a:t>
+            </a:fld>
+            <a:endParaRPr lang="en-US"/>
+          </a:p>
+        </p:txBody>
+      </p:sp>
+    </p:spTree>
+    <p:extLst>
+      <p:ext uri="{BB962C8B-B14F-4D97-AF65-F5344CB8AC3E}">
+        <p14:creationId xmlns:p14="http://schemas.microsoft.com/office/powerpoint/2010/main" val="3135094531"/>
+      </p:ext>
+    </p:extLst>
+  </p:cSld>
+  <p:clrMapOvr>
+    <a:masterClrMapping/>
+  </p:clrMapOvr>
+</p:notes>
+</file>
+
+<file path=ppt/notesSlides/notesSlide2.xml><?xml version="1.0" encoding="utf-8"?>
+<p:notes xmlns:a="http://schemas.openxmlformats.org/drawingml/2006/main" xmlns:r="http://schemas.openxmlformats.org/officeDocument/2006/relationships" xmlns:p="http://schemas.openxmlformats.org/presentationml/2006/main">
+  <p:cSld>
+    <p:spTree>
+      <p:nvGrpSpPr>
+        <p:cNvPr id="1" name=""/>
+        <p:cNvGrpSpPr/>
+        <p:nvPr/>
+      </p:nvGrpSpPr>
+      <p:grpSpPr>
+        <a:xfrm>
+          <a:off x="0" y="0"/>
+          <a:ext cx="0" cy="0"/>
+          <a:chOff x="0" y="0"/>
+          <a:chExt cx="0" cy="0"/>
+        </a:xfrm>
+      </p:grpSpPr>
+      <p:sp>
+        <p:nvSpPr>
+          <p:cNvPr id="2" name="Slide Image Placeholder 1"/>
+          <p:cNvSpPr>
+            <a:spLocks noGrp="1" noRot="1" noChangeAspect="1"/>
+          </p:cNvSpPr>
+          <p:nvPr>
+            <p:ph type="sldImg"/>
+          </p:nvPr>
+        </p:nvSpPr>
+        <p:spPr/>
+      </p:sp>
+      <p:sp>
+        <p:nvSpPr>
+          <p:cNvPr id="3" name="Notes Placeholder 2"/>
+          <p:cNvSpPr>
+            <a:spLocks noGrp="1"/>
+          </p:cNvSpPr>
+          <p:nvPr>
+            <p:ph type="body" idx="1"/>
+          </p:nvPr>
+        </p:nvSpPr>
+        <p:spPr/>
+        <p:txBody>
+          <a:bodyPr/>
+          <a:lstStyle/>
+          <a:p>
             <a:endParaRPr lang="en-SG" dirty="0"/>
           </a:p>
         </p:txBody>
@@ -626,10 +709,9 @@
           <a:lstStyle/>
           <a:p>
             <a:r>
-              <a:rPr lang="en-US" smtClean="0"/>
+              <a:rPr lang="en-US"/>
               <a:t>Click to edit Master title style</a:t>
             </a:r>
-            <a:endParaRPr lang="en-US"/>
           </a:p>
         </p:txBody>
       </p:sp>
@@ -745,10 +827,9 @@
           </a:lstStyle>
           <a:p>
             <a:r>
-              <a:rPr lang="en-US" smtClean="0"/>
+              <a:rPr lang="en-US"/>
               <a:t>Click to edit Master subtitle style</a:t>
             </a:r>
-            <a:endParaRPr lang="en-US"/>
           </a:p>
         </p:txBody>
       </p:sp>
@@ -770,7 +851,7 @@
             <a:fld id="{1D8BD707-D9CF-40AE-B4C6-C98DA3205C09}" type="datetimeFigureOut">
               <a:rPr lang="en-US" smtClean="0"/>
               <a:pPr/>
-              <a:t>2/7/2017</a:t>
+              <a:t>3/12/2017</a:t>
             </a:fld>
             <a:endParaRPr lang="en-US"/>
           </a:p>
@@ -860,10 +941,9 @@
           <a:lstStyle/>
           <a:p>
             <a:r>
-              <a:rPr lang="en-US" smtClean="0"/>
+              <a:rPr lang="en-US"/>
               <a:t>Click to edit Master title style</a:t>
             </a:r>
-            <a:endParaRPr lang="en-US"/>
           </a:p>
         </p:txBody>
       </p:sp>
@@ -884,38 +964,37 @@
           <a:p>
             <a:pPr lvl="0"/>
             <a:r>
-              <a:rPr lang="en-US" smtClean="0"/>
+              <a:rPr lang="en-US"/>
               <a:t>Click to edit Master text styles</a:t>
             </a:r>
           </a:p>
           <a:p>
             <a:pPr lvl="1"/>
             <a:r>
-              <a:rPr lang="en-US" smtClean="0"/>
+              <a:rPr lang="en-US"/>
               <a:t>Second level</a:t>
             </a:r>
           </a:p>
           <a:p>
             <a:pPr lvl="2"/>
             <a:r>
-              <a:rPr lang="en-US" smtClean="0"/>
+              <a:rPr lang="en-US"/>
               <a:t>Third level</a:t>
             </a:r>
           </a:p>
           <a:p>
             <a:pPr lvl="3"/>
             <a:r>
-              <a:rPr lang="en-US" smtClean="0"/>
+              <a:rPr lang="en-US"/>
               <a:t>Fourth level</a:t>
             </a:r>
           </a:p>
           <a:p>
             <a:pPr lvl="4"/>
             <a:r>
-              <a:rPr lang="en-US" smtClean="0"/>
+              <a:rPr lang="en-US"/>
               <a:t>Fifth level</a:t>
             </a:r>
-            <a:endParaRPr lang="en-US"/>
           </a:p>
         </p:txBody>
       </p:sp>
@@ -937,7 +1016,7 @@
             <a:fld id="{1D8BD707-D9CF-40AE-B4C6-C98DA3205C09}" type="datetimeFigureOut">
               <a:rPr lang="en-US" smtClean="0"/>
               <a:pPr/>
-              <a:t>2/7/2017</a:t>
+              <a:t>3/12/2017</a:t>
             </a:fld>
             <a:endParaRPr lang="en-US"/>
           </a:p>
@@ -1032,10 +1111,9 @@
           <a:lstStyle/>
           <a:p>
             <a:r>
-              <a:rPr lang="en-US" smtClean="0"/>
+              <a:rPr lang="en-US"/>
               <a:t>Click to edit Master title style</a:t>
             </a:r>
-            <a:endParaRPr lang="en-US"/>
           </a:p>
         </p:txBody>
       </p:sp>
@@ -1061,38 +1139,37 @@
           <a:p>
             <a:pPr lvl="0"/>
             <a:r>
-              <a:rPr lang="en-US" smtClean="0"/>
+              <a:rPr lang="en-US"/>
               <a:t>Click to edit Master text styles</a:t>
             </a:r>
           </a:p>
           <a:p>
             <a:pPr lvl="1"/>
             <a:r>
-              <a:rPr lang="en-US" smtClean="0"/>
+              <a:rPr lang="en-US"/>
               <a:t>Second level</a:t>
             </a:r>
           </a:p>
           <a:p>
             <a:pPr lvl="2"/>
             <a:r>
-              <a:rPr lang="en-US" smtClean="0"/>
+              <a:rPr lang="en-US"/>
               <a:t>Third level</a:t>
             </a:r>
           </a:p>
           <a:p>
             <a:pPr lvl="3"/>
             <a:r>
-              <a:rPr lang="en-US" smtClean="0"/>
+              <a:rPr lang="en-US"/>
               <a:t>Fourth level</a:t>
             </a:r>
           </a:p>
           <a:p>
             <a:pPr lvl="4"/>
             <a:r>
-              <a:rPr lang="en-US" smtClean="0"/>
+              <a:rPr lang="en-US"/>
               <a:t>Fifth level</a:t>
             </a:r>
-            <a:endParaRPr lang="en-US"/>
           </a:p>
         </p:txBody>
       </p:sp>
@@ -1114,7 +1191,7 @@
             <a:fld id="{1D8BD707-D9CF-40AE-B4C6-C98DA3205C09}" type="datetimeFigureOut">
               <a:rPr lang="en-US" smtClean="0"/>
               <a:pPr/>
-              <a:t>2/7/2017</a:t>
+              <a:t>3/12/2017</a:t>
             </a:fld>
             <a:endParaRPr lang="en-US"/>
           </a:p>
@@ -1204,10 +1281,9 @@
           <a:lstStyle/>
           <a:p>
             <a:r>
-              <a:rPr lang="en-US" smtClean="0"/>
+              <a:rPr lang="en-US"/>
               <a:t>Click to edit Master title style</a:t>
             </a:r>
-            <a:endParaRPr lang="en-US"/>
           </a:p>
         </p:txBody>
       </p:sp>
@@ -1228,38 +1304,37 @@
           <a:p>
             <a:pPr lvl="0"/>
             <a:r>
-              <a:rPr lang="en-US" smtClean="0"/>
+              <a:rPr lang="en-US"/>
               <a:t>Click to edit Master text styles</a:t>
             </a:r>
           </a:p>
           <a:p>
             <a:pPr lvl="1"/>
             <a:r>
-              <a:rPr lang="en-US" smtClean="0"/>
+              <a:rPr lang="en-US"/>
               <a:t>Second level</a:t>
             </a:r>
           </a:p>
           <a:p>
             <a:pPr lvl="2"/>
             <a:r>
-              <a:rPr lang="en-US" smtClean="0"/>
+              <a:rPr lang="en-US"/>
               <a:t>Third level</a:t>
             </a:r>
           </a:p>
           <a:p>
             <a:pPr lvl="3"/>
             <a:r>
-              <a:rPr lang="en-US" smtClean="0"/>
+              <a:rPr lang="en-US"/>
               <a:t>Fourth level</a:t>
             </a:r>
           </a:p>
           <a:p>
             <a:pPr lvl="4"/>
             <a:r>
-              <a:rPr lang="en-US" smtClean="0"/>
+              <a:rPr lang="en-US"/>
               <a:t>Fifth level</a:t>
             </a:r>
-            <a:endParaRPr lang="en-US"/>
           </a:p>
         </p:txBody>
       </p:sp>
@@ -1281,7 +1356,7 @@
             <a:fld id="{1D8BD707-D9CF-40AE-B4C6-C98DA3205C09}" type="datetimeFigureOut">
               <a:rPr lang="en-US" smtClean="0"/>
               <a:pPr/>
-              <a:t>2/7/2017</a:t>
+              <a:t>3/12/2017</a:t>
             </a:fld>
             <a:endParaRPr lang="en-US"/>
           </a:p>
@@ -1380,10 +1455,9 @@
           </a:lstStyle>
           <a:p>
             <a:r>
-              <a:rPr lang="en-US" smtClean="0"/>
+              <a:rPr lang="en-US"/>
               <a:t>Click to edit Master title style</a:t>
             </a:r>
-            <a:endParaRPr lang="en-US"/>
           </a:p>
         </p:txBody>
       </p:sp>
@@ -1500,7 +1574,7 @@
           <a:p>
             <a:pPr lvl="0"/>
             <a:r>
-              <a:rPr lang="en-US" smtClean="0"/>
+              <a:rPr lang="en-US"/>
               <a:t>Click to edit Master text styles</a:t>
             </a:r>
           </a:p>
@@ -1524,7 +1598,7 @@
             <a:fld id="{1D8BD707-D9CF-40AE-B4C6-C98DA3205C09}" type="datetimeFigureOut">
               <a:rPr lang="en-US" smtClean="0"/>
               <a:pPr/>
-              <a:t>2/7/2017</a:t>
+              <a:t>3/12/2017</a:t>
             </a:fld>
             <a:endParaRPr lang="en-US"/>
           </a:p>
@@ -1614,10 +1688,9 @@
           <a:lstStyle/>
           <a:p>
             <a:r>
-              <a:rPr lang="en-US" smtClean="0"/>
+              <a:rPr lang="en-US"/>
               <a:t>Click to edit Master title style</a:t>
             </a:r>
-            <a:endParaRPr lang="en-US"/>
           </a:p>
         </p:txBody>
       </p:sp>
@@ -1671,38 +1744,37 @@
           <a:p>
             <a:pPr lvl="0"/>
             <a:r>
-              <a:rPr lang="en-US" smtClean="0"/>
+              <a:rPr lang="en-US"/>
               <a:t>Click to edit Master text styles</a:t>
             </a:r>
           </a:p>
           <a:p>
             <a:pPr lvl="1"/>
             <a:r>
-              <a:rPr lang="en-US" smtClean="0"/>
+              <a:rPr lang="en-US"/>
               <a:t>Second level</a:t>
             </a:r>
           </a:p>
           <a:p>
             <a:pPr lvl="2"/>
             <a:r>
-              <a:rPr lang="en-US" smtClean="0"/>
+              <a:rPr lang="en-US"/>
               <a:t>Third level</a:t>
             </a:r>
           </a:p>
           <a:p>
             <a:pPr lvl="3"/>
             <a:r>
-              <a:rPr lang="en-US" smtClean="0"/>
+              <a:rPr lang="en-US"/>
               <a:t>Fourth level</a:t>
             </a:r>
           </a:p>
           <a:p>
             <a:pPr lvl="4"/>
             <a:r>
-              <a:rPr lang="en-US" smtClean="0"/>
+              <a:rPr lang="en-US"/>
               <a:t>Fifth level</a:t>
             </a:r>
-            <a:endParaRPr lang="en-US"/>
           </a:p>
         </p:txBody>
       </p:sp>
@@ -1756,38 +1828,37 @@
           <a:p>
             <a:pPr lvl="0"/>
             <a:r>
-              <a:rPr lang="en-US" smtClean="0"/>
+              <a:rPr lang="en-US"/>
               <a:t>Click to edit Master text styles</a:t>
             </a:r>
           </a:p>
           <a:p>
             <a:pPr lvl="1"/>
             <a:r>
-              <a:rPr lang="en-US" smtClean="0"/>
+              <a:rPr lang="en-US"/>
               <a:t>Second level</a:t>
             </a:r>
           </a:p>
           <a:p>
             <a:pPr lvl="2"/>
             <a:r>
-              <a:rPr lang="en-US" smtClean="0"/>
+              <a:rPr lang="en-US"/>
               <a:t>Third level</a:t>
             </a:r>
           </a:p>
           <a:p>
             <a:pPr lvl="3"/>
             <a:r>
-              <a:rPr lang="en-US" smtClean="0"/>
+              <a:rPr lang="en-US"/>
               <a:t>Fourth level</a:t>
             </a:r>
           </a:p>
           <a:p>
             <a:pPr lvl="4"/>
             <a:r>
-              <a:rPr lang="en-US" smtClean="0"/>
+              <a:rPr lang="en-US"/>
               <a:t>Fifth level</a:t>
             </a:r>
-            <a:endParaRPr lang="en-US"/>
           </a:p>
         </p:txBody>
       </p:sp>
@@ -1809,7 +1880,7 @@
             <a:fld id="{1D8BD707-D9CF-40AE-B4C6-C98DA3205C09}" type="datetimeFigureOut">
               <a:rPr lang="en-US" smtClean="0"/>
               <a:pPr/>
-              <a:t>2/7/2017</a:t>
+              <a:t>3/12/2017</a:t>
             </a:fld>
             <a:endParaRPr lang="en-US"/>
           </a:p>
@@ -1903,10 +1974,9 @@
           </a:lstStyle>
           <a:p>
             <a:r>
-              <a:rPr lang="en-US" smtClean="0"/>
+              <a:rPr lang="en-US"/>
               <a:t>Click to edit Master title style</a:t>
             </a:r>
-            <a:endParaRPr lang="en-US"/>
           </a:p>
         </p:txBody>
       </p:sp>
@@ -1969,7 +2039,7 @@
           <a:p>
             <a:pPr lvl="0"/>
             <a:r>
-              <a:rPr lang="en-US" smtClean="0"/>
+              <a:rPr lang="en-US"/>
               <a:t>Click to edit Master text styles</a:t>
             </a:r>
           </a:p>
@@ -2025,38 +2095,37 @@
           <a:p>
             <a:pPr lvl="0"/>
             <a:r>
-              <a:rPr lang="en-US" smtClean="0"/>
+              <a:rPr lang="en-US"/>
               <a:t>Click to edit Master text styles</a:t>
             </a:r>
           </a:p>
           <a:p>
             <a:pPr lvl="1"/>
             <a:r>
-              <a:rPr lang="en-US" smtClean="0"/>
+              <a:rPr lang="en-US"/>
               <a:t>Second level</a:t>
             </a:r>
           </a:p>
           <a:p>
             <a:pPr lvl="2"/>
             <a:r>
-              <a:rPr lang="en-US" smtClean="0"/>
+              <a:rPr lang="en-US"/>
               <a:t>Third level</a:t>
             </a:r>
           </a:p>
           <a:p>
             <a:pPr lvl="3"/>
             <a:r>
-              <a:rPr lang="en-US" smtClean="0"/>
+              <a:rPr lang="en-US"/>
               <a:t>Fourth level</a:t>
             </a:r>
           </a:p>
           <a:p>
             <a:pPr lvl="4"/>
             <a:r>
-              <a:rPr lang="en-US" smtClean="0"/>
+              <a:rPr lang="en-US"/>
               <a:t>Fifth level</a:t>
             </a:r>
-            <a:endParaRPr lang="en-US"/>
           </a:p>
         </p:txBody>
       </p:sp>
@@ -2119,7 +2188,7 @@
           <a:p>
             <a:pPr lvl="0"/>
             <a:r>
-              <a:rPr lang="en-US" smtClean="0"/>
+              <a:rPr lang="en-US"/>
               <a:t>Click to edit Master text styles</a:t>
             </a:r>
           </a:p>
@@ -2175,38 +2244,37 @@
           <a:p>
             <a:pPr lvl="0"/>
             <a:r>
-              <a:rPr lang="en-US" smtClean="0"/>
+              <a:rPr lang="en-US"/>
               <a:t>Click to edit Master text styles</a:t>
             </a:r>
           </a:p>
           <a:p>
             <a:pPr lvl="1"/>
             <a:r>
-              <a:rPr lang="en-US" smtClean="0"/>
+              <a:rPr lang="en-US"/>
               <a:t>Second level</a:t>
             </a:r>
           </a:p>
           <a:p>
             <a:pPr lvl="2"/>
             <a:r>
-              <a:rPr lang="en-US" smtClean="0"/>
+              <a:rPr lang="en-US"/>
               <a:t>Third level</a:t>
             </a:r>
           </a:p>
           <a:p>
             <a:pPr lvl="3"/>
             <a:r>
-              <a:rPr lang="en-US" smtClean="0"/>
+              <a:rPr lang="en-US"/>
               <a:t>Fourth level</a:t>
             </a:r>
           </a:p>
           <a:p>
             <a:pPr lvl="4"/>
             <a:r>
-              <a:rPr lang="en-US" smtClean="0"/>
+              <a:rPr lang="en-US"/>
               <a:t>Fifth level</a:t>
             </a:r>
-            <a:endParaRPr lang="en-US"/>
           </a:p>
         </p:txBody>
       </p:sp>
@@ -2228,7 +2296,7 @@
             <a:fld id="{1D8BD707-D9CF-40AE-B4C6-C98DA3205C09}" type="datetimeFigureOut">
               <a:rPr lang="en-US" smtClean="0"/>
               <a:pPr/>
-              <a:t>2/7/2017</a:t>
+              <a:t>3/12/2017</a:t>
             </a:fld>
             <a:endParaRPr lang="en-US"/>
           </a:p>
@@ -2318,10 +2386,9 @@
           <a:lstStyle/>
           <a:p>
             <a:r>
-              <a:rPr lang="en-US" smtClean="0"/>
+              <a:rPr lang="en-US"/>
               <a:t>Click to edit Master title style</a:t>
             </a:r>
-            <a:endParaRPr lang="en-US"/>
           </a:p>
         </p:txBody>
       </p:sp>
@@ -2343,7 +2410,7 @@
             <a:fld id="{1D8BD707-D9CF-40AE-B4C6-C98DA3205C09}" type="datetimeFigureOut">
               <a:rPr lang="en-US" smtClean="0"/>
               <a:pPr/>
-              <a:t>2/7/2017</a:t>
+              <a:t>3/12/2017</a:t>
             </a:fld>
             <a:endParaRPr lang="en-US"/>
           </a:p>
@@ -2435,7 +2502,7 @@
             <a:fld id="{1D8BD707-D9CF-40AE-B4C6-C98DA3205C09}" type="datetimeFigureOut">
               <a:rPr lang="en-US" smtClean="0"/>
               <a:pPr/>
-              <a:t>2/7/2017</a:t>
+              <a:t>3/12/2017</a:t>
             </a:fld>
             <a:endParaRPr lang="en-US"/>
           </a:p>
@@ -2534,10 +2601,9 @@
           </a:lstStyle>
           <a:p>
             <a:r>
-              <a:rPr lang="en-US" smtClean="0"/>
+              <a:rPr lang="en-US"/>
               <a:t>Click to edit Master title style</a:t>
             </a:r>
-            <a:endParaRPr lang="en-US"/>
           </a:p>
         </p:txBody>
       </p:sp>
@@ -2591,38 +2657,37 @@
           <a:p>
             <a:pPr lvl="0"/>
             <a:r>
-              <a:rPr lang="en-US" smtClean="0"/>
+              <a:rPr lang="en-US"/>
               <a:t>Click to edit Master text styles</a:t>
             </a:r>
           </a:p>
           <a:p>
             <a:pPr lvl="1"/>
             <a:r>
-              <a:rPr lang="en-US" smtClean="0"/>
+              <a:rPr lang="en-US"/>
               <a:t>Second level</a:t>
             </a:r>
           </a:p>
           <a:p>
             <a:pPr lvl="2"/>
             <a:r>
-              <a:rPr lang="en-US" smtClean="0"/>
+              <a:rPr lang="en-US"/>
               <a:t>Third level</a:t>
             </a:r>
           </a:p>
           <a:p>
             <a:pPr lvl="3"/>
             <a:r>
-              <a:rPr lang="en-US" smtClean="0"/>
+              <a:rPr lang="en-US"/>
               <a:t>Fourth level</a:t>
             </a:r>
           </a:p>
           <a:p>
             <a:pPr lvl="4"/>
             <a:r>
-              <a:rPr lang="en-US" smtClean="0"/>
+              <a:rPr lang="en-US"/>
               <a:t>Fifth level</a:t>
             </a:r>
-            <a:endParaRPr lang="en-US"/>
           </a:p>
         </p:txBody>
       </p:sp>
@@ -2685,7 +2750,7 @@
           <a:p>
             <a:pPr lvl="0"/>
             <a:r>
-              <a:rPr lang="en-US" smtClean="0"/>
+              <a:rPr lang="en-US"/>
               <a:t>Click to edit Master text styles</a:t>
             </a:r>
           </a:p>
@@ -2709,7 +2774,7 @@
             <a:fld id="{1D8BD707-D9CF-40AE-B4C6-C98DA3205C09}" type="datetimeFigureOut">
               <a:rPr lang="en-US" smtClean="0"/>
               <a:pPr/>
-              <a:t>2/7/2017</a:t>
+              <a:t>3/12/2017</a:t>
             </a:fld>
             <a:endParaRPr lang="en-US"/>
           </a:p>
@@ -2808,10 +2873,9 @@
           </a:lstStyle>
           <a:p>
             <a:r>
-              <a:rPr lang="en-US" smtClean="0"/>
+              <a:rPr lang="en-US"/>
               <a:t>Click to edit Master title style</a:t>
             </a:r>
-            <a:endParaRPr lang="en-US"/>
           </a:p>
         </p:txBody>
       </p:sp>
@@ -2935,7 +2999,7 @@
           <a:p>
             <a:pPr lvl="0"/>
             <a:r>
-              <a:rPr lang="en-US" smtClean="0"/>
+              <a:rPr lang="en-US"/>
               <a:t>Click to edit Master text styles</a:t>
             </a:r>
           </a:p>
@@ -2959,7 +3023,7 @@
             <a:fld id="{1D8BD707-D9CF-40AE-B4C6-C98DA3205C09}" type="datetimeFigureOut">
               <a:rPr lang="en-US" smtClean="0"/>
               <a:pPr/>
-              <a:t>2/7/2017</a:t>
+              <a:t>3/12/2017</a:t>
             </a:fld>
             <a:endParaRPr lang="en-US"/>
           </a:p>
@@ -3069,10 +3133,9 @@
           <a:lstStyle/>
           <a:p>
             <a:r>
-              <a:rPr lang="en-US" smtClean="0"/>
+              <a:rPr lang="en-US"/>
               <a:t>Click to edit Master title style</a:t>
             </a:r>
-            <a:endParaRPr lang="en-US"/>
           </a:p>
         </p:txBody>
       </p:sp>
@@ -3103,38 +3166,37 @@
           <a:p>
             <a:pPr lvl="0"/>
             <a:r>
-              <a:rPr lang="en-US" smtClean="0"/>
+              <a:rPr lang="en-US"/>
               <a:t>Click to edit Master text styles</a:t>
             </a:r>
           </a:p>
           <a:p>
             <a:pPr lvl="1"/>
             <a:r>
-              <a:rPr lang="en-US" smtClean="0"/>
+              <a:rPr lang="en-US"/>
               <a:t>Second level</a:t>
             </a:r>
           </a:p>
           <a:p>
             <a:pPr lvl="2"/>
             <a:r>
-              <a:rPr lang="en-US" smtClean="0"/>
+              <a:rPr lang="en-US"/>
               <a:t>Third level</a:t>
             </a:r>
           </a:p>
           <a:p>
             <a:pPr lvl="3"/>
             <a:r>
-              <a:rPr lang="en-US" smtClean="0"/>
+              <a:rPr lang="en-US"/>
               <a:t>Fourth level</a:t>
             </a:r>
           </a:p>
           <a:p>
             <a:pPr lvl="4"/>
             <a:r>
-              <a:rPr lang="en-US" smtClean="0"/>
+              <a:rPr lang="en-US"/>
               <a:t>Fifth level</a:t>
             </a:r>
-            <a:endParaRPr lang="en-US"/>
           </a:p>
         </p:txBody>
       </p:sp>
@@ -3174,7 +3236,7 @@
             <a:fld id="{1D8BD707-D9CF-40AE-B4C6-C98DA3205C09}" type="datetimeFigureOut">
               <a:rPr lang="en-US" smtClean="0"/>
               <a:pPr/>
-              <a:t>2/7/2017</a:t>
+              <a:t>3/12/2017</a:t>
             </a:fld>
             <a:endParaRPr lang="en-US"/>
           </a:p>
@@ -4625,7 +4687,7 @@
             <a:p>
               <a:pPr algn="ctr"/>
               <a:r>
-                <a:rPr lang="en-US" sz="5400" b="1" dirty="0" smtClean="0">
+                <a:rPr lang="en-US" sz="5400" b="1" dirty="0">
                   <a:ln w="12700">
                     <a:solidFill>
                       <a:schemeClr val="bg1"/>
@@ -5520,7 +5582,7 @@
           <a:lstStyle/>
           <a:p>
             <a:r>
-              <a:rPr lang="en-US" sz="800" dirty="0" smtClean="0"/>
+              <a:rPr lang="en-US" sz="800" dirty="0"/>
               <a:t>Auto animate</a:t>
             </a:r>
             <a:endParaRPr lang="en-SG" sz="800" dirty="0"/>
@@ -5550,7 +5612,7 @@
           <a:lstStyle/>
           <a:p>
             <a:r>
-              <a:rPr lang="en-US" sz="800" dirty="0" smtClean="0"/>
+              <a:rPr lang="en-US" sz="800" dirty="0"/>
               <a:t>Recreate animation</a:t>
             </a:r>
             <a:endParaRPr lang="en-SG" sz="800" dirty="0"/>
@@ -5580,7 +5642,7 @@
           <a:lstStyle/>
           <a:p>
             <a:r>
-              <a:rPr lang="en-US" sz="800" dirty="0" smtClean="0"/>
+              <a:rPr lang="en-US" sz="800" dirty="0"/>
               <a:t>Create spotlight</a:t>
             </a:r>
             <a:endParaRPr lang="en-SG" sz="800" dirty="0"/>
@@ -5610,7 +5672,7 @@
           <a:lstStyle/>
           <a:p>
             <a:r>
-              <a:rPr lang="en-US" sz="800" dirty="0" smtClean="0"/>
+              <a:rPr lang="en-US" sz="800" dirty="0"/>
               <a:t>Highlight point</a:t>
             </a:r>
             <a:endParaRPr lang="en-SG" sz="800" dirty="0"/>
@@ -5640,7 +5702,7 @@
           <a:lstStyle/>
           <a:p>
             <a:r>
-              <a:rPr lang="en-US" sz="800" dirty="0" smtClean="0"/>
+              <a:rPr lang="en-US" sz="800" dirty="0"/>
               <a:t>Drill down</a:t>
             </a:r>
             <a:endParaRPr lang="en-SG" sz="800" dirty="0"/>
@@ -5670,7 +5732,7 @@
           <a:lstStyle/>
           <a:p>
             <a:r>
-              <a:rPr lang="en-US" sz="800" dirty="0" smtClean="0"/>
+              <a:rPr lang="en-US" sz="800" dirty="0"/>
               <a:t>Cut out shape</a:t>
             </a:r>
             <a:endParaRPr lang="en-SG" sz="800" dirty="0"/>
@@ -5700,7 +5762,7 @@
           <a:lstStyle/>
           <a:p>
             <a:r>
-              <a:rPr lang="en-US" sz="800" dirty="0" smtClean="0"/>
+              <a:rPr lang="en-US" sz="800" dirty="0"/>
               <a:t>Help</a:t>
             </a:r>
             <a:endParaRPr lang="en-SG" sz="800" dirty="0"/>
@@ -5730,7 +5792,7 @@
           <a:lstStyle/>
           <a:p>
             <a:r>
-              <a:rPr lang="en-US" sz="800" dirty="0" smtClean="0"/>
+              <a:rPr lang="en-US" sz="800" dirty="0"/>
               <a:t>Report issues/feedback</a:t>
             </a:r>
             <a:endParaRPr lang="en-SG" sz="800" dirty="0"/>
@@ -5760,7 +5822,7 @@
           <a:lstStyle/>
           <a:p>
             <a:r>
-              <a:rPr lang="en-US" sz="800" dirty="0" smtClean="0"/>
+              <a:rPr lang="en-US" sz="800" dirty="0"/>
               <a:t>About</a:t>
             </a:r>
             <a:endParaRPr lang="en-SG" sz="800" dirty="0"/>
@@ -5790,7 +5852,7 @@
           <a:lstStyle/>
           <a:p>
             <a:r>
-              <a:rPr lang="en-US" dirty="0" smtClean="0"/>
+              <a:rPr lang="en-US" dirty="0"/>
               <a:t>Right-click and ‘save as picture’</a:t>
             </a:r>
             <a:endParaRPr lang="en-SG" dirty="0"/>
@@ -6932,7 +6994,7 @@
           <a:lstStyle/>
           <a:p>
             <a:r>
-              <a:rPr lang="en-US" sz="800" dirty="0" smtClean="0"/>
+              <a:rPr lang="en-US" sz="800" dirty="0"/>
               <a:t>Recreate spotlight</a:t>
             </a:r>
             <a:endParaRPr lang="en-SG" sz="800" dirty="0"/>
@@ -6962,7 +7024,7 @@
           <a:lstStyle/>
           <a:p>
             <a:r>
-              <a:rPr lang="en-US" sz="800" dirty="0" smtClean="0"/>
+              <a:rPr lang="en-US" sz="800" dirty="0"/>
               <a:t>Add audio</a:t>
             </a:r>
             <a:endParaRPr lang="en-SG" sz="800" dirty="0"/>
@@ -6992,7 +7054,7 @@
           <a:lstStyle/>
           <a:p>
             <a:r>
-              <a:rPr lang="en-US" sz="800" dirty="0" smtClean="0"/>
+              <a:rPr lang="en-US" sz="800" dirty="0"/>
               <a:t>Remove audio</a:t>
             </a:r>
             <a:endParaRPr lang="en-SG" sz="800" dirty="0"/>
@@ -7813,7 +7875,7 @@
           <a:lstStyle/>
           <a:p>
             <a:r>
-              <a:rPr lang="en-US" sz="800" dirty="0" smtClean="0"/>
+              <a:rPr lang="en-US" sz="800" dirty="0"/>
               <a:t>Add captions</a:t>
             </a:r>
             <a:endParaRPr lang="en-SG" sz="800" dirty="0"/>
@@ -7843,7 +7905,7 @@
           <a:lstStyle/>
           <a:p>
             <a:r>
-              <a:rPr lang="en-US" sz="800" dirty="0" smtClean="0"/>
+              <a:rPr lang="en-US" sz="800" dirty="0"/>
               <a:t>Remove captions</a:t>
             </a:r>
             <a:endParaRPr lang="en-SG" sz="800" dirty="0"/>
@@ -8196,7 +8258,7 @@
           <a:lstStyle/>
           <a:p>
             <a:r>
-              <a:rPr lang="en-US" sz="800" dirty="0" smtClean="0"/>
+              <a:rPr lang="en-US" sz="800" dirty="0"/>
               <a:t>Animate in slide</a:t>
             </a:r>
             <a:endParaRPr lang="en-SG" sz="800" dirty="0"/>
@@ -8695,7 +8757,7 @@
           <a:lstStyle/>
           <a:p>
             <a:r>
-              <a:rPr lang="en-US" sz="800" dirty="0" smtClean="0"/>
+              <a:rPr lang="en-US" sz="800" dirty="0"/>
               <a:t>Step back</a:t>
             </a:r>
             <a:endParaRPr lang="en-SG" sz="800" dirty="0"/>
@@ -9543,7 +9605,7 @@
           <a:lstStyle/>
           <a:p>
             <a:r>
-              <a:rPr lang="en-US" sz="800" dirty="0" smtClean="0"/>
+              <a:rPr lang="en-US" sz="800" dirty="0"/>
               <a:t>Magnify</a:t>
             </a:r>
             <a:endParaRPr lang="en-SG" sz="800" dirty="0"/>
@@ -10754,7 +10816,7 @@
           <a:lstStyle/>
           <a:p>
             <a:r>
-              <a:rPr lang="en-US" sz="800" dirty="0" smtClean="0"/>
+              <a:rPr lang="en-US" sz="800" dirty="0"/>
               <a:t>Highlight words</a:t>
             </a:r>
             <a:endParaRPr lang="en-SG" sz="800" dirty="0"/>
@@ -10784,7 +10846,7 @@
           <a:lstStyle/>
           <a:p>
             <a:r>
-              <a:rPr lang="en-US" sz="800" dirty="0" smtClean="0"/>
+              <a:rPr lang="en-US" sz="800" dirty="0"/>
               <a:t>Highlight background</a:t>
             </a:r>
             <a:endParaRPr lang="en-SG" sz="800" dirty="0"/>
@@ -10801,13 +10863,6 @@
   <p:clrMapOvr>
     <a:masterClrMapping/>
   </p:clrMapOvr>
-  <p:timing>
-    <p:tnLst>
-      <p:par>
-        <p:cTn id="1" dur="indefinite" restart="never" nodeType="tmRoot"/>
-      </p:par>
-    </p:tnLst>
-  </p:timing>
 </p:sld>
 </file>
 
@@ -10851,300 +10906,193 @@
           <a:lstStyle/>
           <a:p>
             <a:r>
-              <a:rPr lang="en-US" sz="300" dirty="0" smtClean="0"/>
+              <a:rPr lang="en-US" sz="300" dirty="0"/>
               <a:t>Zoom Lab</a:t>
             </a:r>
             <a:endParaRPr lang="en-SG" sz="300" dirty="0"/>
           </a:p>
         </p:txBody>
       </p:sp>
+      <p:sp>
+        <p:nvSpPr>
+          <p:cNvPr id="166" name="Rectangle 5"/>
+          <p:cNvSpPr/>
+          <p:nvPr/>
+        </p:nvSpPr>
+        <p:spPr>
+          <a:xfrm>
+            <a:off x="1639940" y="1250998"/>
+            <a:ext cx="89937" cy="178376"/>
+          </a:xfrm>
+          <a:custGeom>
+            <a:avLst/>
+            <a:gdLst>
+              <a:gd name="connsiteX0" fmla="*/ 0 w 247861"/>
+              <a:gd name="connsiteY0" fmla="*/ 168438 h 491595"/>
+              <a:gd name="connsiteX1" fmla="*/ 83956 w 247861"/>
+              <a:gd name="connsiteY1" fmla="*/ 162984 h 491595"/>
+              <a:gd name="connsiteX2" fmla="*/ 56685 w 247861"/>
+              <a:gd name="connsiteY2" fmla="*/ 318394 h 491595"/>
+              <a:gd name="connsiteX3" fmla="*/ 0 w 247861"/>
+              <a:gd name="connsiteY3" fmla="*/ 318394 h 491595"/>
+              <a:gd name="connsiteX4" fmla="*/ 0 w 247861"/>
+              <a:gd name="connsiteY4" fmla="*/ 168438 h 491595"/>
+              <a:gd name="connsiteX5" fmla="*/ 247861 w 247861"/>
+              <a:gd name="connsiteY5" fmla="*/ 0 h 491595"/>
+              <a:gd name="connsiteX6" fmla="*/ 242826 w 247861"/>
+              <a:gd name="connsiteY6" fmla="*/ 491595 h 491595"/>
+              <a:gd name="connsiteX7" fmla="*/ 82985 w 247861"/>
+              <a:gd name="connsiteY7" fmla="*/ 327947 h 491595"/>
+              <a:gd name="connsiteX8" fmla="*/ 84711 w 247861"/>
+              <a:gd name="connsiteY8" fmla="*/ 159354 h 491595"/>
+              <a:gd name="connsiteX9" fmla="*/ 247861 w 247861"/>
+              <a:gd name="connsiteY9" fmla="*/ 0 h 491595"/>
+              <a:gd name="connsiteX0" fmla="*/ 0 w 247861"/>
+              <a:gd name="connsiteY0" fmla="*/ 168438 h 491595"/>
+              <a:gd name="connsiteX1" fmla="*/ 83956 w 247861"/>
+              <a:gd name="connsiteY1" fmla="*/ 162984 h 491595"/>
+              <a:gd name="connsiteX2" fmla="*/ 81228 w 247861"/>
+              <a:gd name="connsiteY2" fmla="*/ 326575 h 491595"/>
+              <a:gd name="connsiteX3" fmla="*/ 0 w 247861"/>
+              <a:gd name="connsiteY3" fmla="*/ 318394 h 491595"/>
+              <a:gd name="connsiteX4" fmla="*/ 0 w 247861"/>
+              <a:gd name="connsiteY4" fmla="*/ 168438 h 491595"/>
+              <a:gd name="connsiteX5" fmla="*/ 247861 w 247861"/>
+              <a:gd name="connsiteY5" fmla="*/ 0 h 491595"/>
+              <a:gd name="connsiteX6" fmla="*/ 242826 w 247861"/>
+              <a:gd name="connsiteY6" fmla="*/ 491595 h 491595"/>
+              <a:gd name="connsiteX7" fmla="*/ 82985 w 247861"/>
+              <a:gd name="connsiteY7" fmla="*/ 327947 h 491595"/>
+              <a:gd name="connsiteX8" fmla="*/ 84711 w 247861"/>
+              <a:gd name="connsiteY8" fmla="*/ 159354 h 491595"/>
+              <a:gd name="connsiteX9" fmla="*/ 247861 w 247861"/>
+              <a:gd name="connsiteY9" fmla="*/ 0 h 491595"/>
+            </a:gdLst>
+            <a:ahLst/>
+            <a:cxnLst>
+              <a:cxn ang="0">
+                <a:pos x="connsiteX0" y="connsiteY0"/>
+              </a:cxn>
+              <a:cxn ang="0">
+                <a:pos x="connsiteX1" y="connsiteY1"/>
+              </a:cxn>
+              <a:cxn ang="0">
+                <a:pos x="connsiteX2" y="connsiteY2"/>
+              </a:cxn>
+              <a:cxn ang="0">
+                <a:pos x="connsiteX3" y="connsiteY3"/>
+              </a:cxn>
+              <a:cxn ang="0">
+                <a:pos x="connsiteX4" y="connsiteY4"/>
+              </a:cxn>
+              <a:cxn ang="0">
+                <a:pos x="connsiteX5" y="connsiteY5"/>
+              </a:cxn>
+              <a:cxn ang="0">
+                <a:pos x="connsiteX6" y="connsiteY6"/>
+              </a:cxn>
+              <a:cxn ang="0">
+                <a:pos x="connsiteX7" y="connsiteY7"/>
+              </a:cxn>
+              <a:cxn ang="0">
+                <a:pos x="connsiteX8" y="connsiteY8"/>
+              </a:cxn>
+              <a:cxn ang="0">
+                <a:pos x="connsiteX9" y="connsiteY9"/>
+              </a:cxn>
+            </a:cxnLst>
+            <a:rect l="l" t="t" r="r" b="b"/>
+            <a:pathLst>
+              <a:path w="247861" h="491595">
+                <a:moveTo>
+                  <a:pt x="0" y="168438"/>
+                </a:moveTo>
+                <a:lnTo>
+                  <a:pt x="83956" y="162984"/>
+                </a:lnTo>
+                <a:cubicBezTo>
+                  <a:pt x="83047" y="217514"/>
+                  <a:pt x="82137" y="272045"/>
+                  <a:pt x="81228" y="326575"/>
+                </a:cubicBezTo>
+                <a:lnTo>
+                  <a:pt x="0" y="318394"/>
+                </a:lnTo>
+                <a:lnTo>
+                  <a:pt x="0" y="168438"/>
+                </a:lnTo>
+                <a:close/>
+                <a:moveTo>
+                  <a:pt x="247861" y="0"/>
+                </a:moveTo>
+                <a:cubicBezTo>
+                  <a:pt x="246183" y="163865"/>
+                  <a:pt x="244504" y="327730"/>
+                  <a:pt x="242826" y="491595"/>
+                </a:cubicBezTo>
+                <a:lnTo>
+                  <a:pt x="82985" y="327947"/>
+                </a:lnTo>
+                <a:cubicBezTo>
+                  <a:pt x="83560" y="271749"/>
+                  <a:pt x="84136" y="215552"/>
+                  <a:pt x="84711" y="159354"/>
+                </a:cubicBezTo>
+                <a:lnTo>
+                  <a:pt x="247861" y="0"/>
+                </a:lnTo>
+                <a:close/>
+              </a:path>
+            </a:pathLst>
+          </a:custGeom>
+          <a:solidFill>
+            <a:srgbClr val="0070C0"/>
+          </a:solidFill>
+          <a:ln w="6350">
+            <a:solidFill>
+              <a:schemeClr val="bg1"/>
+            </a:solidFill>
+          </a:ln>
+        </p:spPr>
+        <p:style>
+          <a:lnRef idx="2">
+            <a:schemeClr val="accent1">
+              <a:shade val="50000"/>
+            </a:schemeClr>
+          </a:lnRef>
+          <a:fillRef idx="1">
+            <a:schemeClr val="accent1"/>
+          </a:fillRef>
+          <a:effectRef idx="0">
+            <a:schemeClr val="accent1"/>
+          </a:effectRef>
+          <a:fontRef idx="minor">
+            <a:schemeClr val="lt1"/>
+          </a:fontRef>
+        </p:style>
+        <p:txBody>
+          <a:bodyPr rtlCol="0" anchor="ctr"/>
+          <a:lstStyle/>
+          <a:p>
+            <a:pPr algn="ctr"/>
+            <a:endParaRPr lang="en-SG"/>
+          </a:p>
+        </p:txBody>
+      </p:sp>
       <p:grpSp>
         <p:nvGrpSpPr>
-          <p:cNvPr id="112" name="Group 111"/>
+          <p:cNvPr id="2" name="Group 1"/>
           <p:cNvGrpSpPr/>
           <p:nvPr/>
         </p:nvGrpSpPr>
         <p:grpSpPr>
           <a:xfrm>
-            <a:off x="1592380" y="1241883"/>
-            <a:ext cx="190500" cy="190500"/>
-            <a:chOff x="1627666" y="1241884"/>
-            <a:chExt cx="190500" cy="190500"/>
+            <a:off x="1342966" y="1277641"/>
+            <a:ext cx="126488" cy="118985"/>
+            <a:chOff x="1342966" y="1277641"/>
+            <a:chExt cx="126488" cy="118985"/>
           </a:xfrm>
         </p:grpSpPr>
-        <p:sp>
-          <p:nvSpPr>
-            <p:cNvPr id="64" name="Oval 63"/>
-            <p:cNvSpPr/>
-            <p:nvPr/>
-          </p:nvSpPr>
-          <p:spPr>
-            <a:xfrm>
-              <a:off x="1627666" y="1241884"/>
-              <a:ext cx="190500" cy="190500"/>
-            </a:xfrm>
-            <a:prstGeom prst="ellipse">
-              <a:avLst/>
-            </a:prstGeom>
-            <a:solidFill>
-              <a:schemeClr val="accent6"/>
-            </a:solidFill>
-            <a:ln>
-              <a:noFill/>
-            </a:ln>
-          </p:spPr>
-          <p:style>
-            <a:lnRef idx="2">
-              <a:schemeClr val="accent1">
-                <a:shade val="50000"/>
-              </a:schemeClr>
-            </a:lnRef>
-            <a:fillRef idx="1">
-              <a:schemeClr val="accent1"/>
-            </a:fillRef>
-            <a:effectRef idx="0">
-              <a:schemeClr val="accent1"/>
-            </a:effectRef>
-            <a:fontRef idx="minor">
-              <a:schemeClr val="lt1"/>
-            </a:fontRef>
-          </p:style>
-          <p:txBody>
-            <a:bodyPr rtlCol="0" anchor="ctr"/>
-            <a:lstStyle/>
-            <a:p>
-              <a:pPr algn="ctr"/>
-              <a:endParaRPr lang="en-SG"/>
-            </a:p>
-          </p:txBody>
-        </p:sp>
-        <p:sp>
-          <p:nvSpPr>
-            <p:cNvPr id="166" name="Rectangle 5"/>
-            <p:cNvSpPr/>
-            <p:nvPr/>
-          </p:nvSpPr>
-          <p:spPr>
-            <a:xfrm>
-              <a:off x="1688712" y="1281275"/>
-              <a:ext cx="59004" cy="117025"/>
-            </a:xfrm>
-            <a:custGeom>
-              <a:avLst/>
-              <a:gdLst>
-                <a:gd name="connsiteX0" fmla="*/ 0 w 247861"/>
-                <a:gd name="connsiteY0" fmla="*/ 168438 h 491595"/>
-                <a:gd name="connsiteX1" fmla="*/ 83956 w 247861"/>
-                <a:gd name="connsiteY1" fmla="*/ 162984 h 491595"/>
-                <a:gd name="connsiteX2" fmla="*/ 56685 w 247861"/>
-                <a:gd name="connsiteY2" fmla="*/ 318394 h 491595"/>
-                <a:gd name="connsiteX3" fmla="*/ 0 w 247861"/>
-                <a:gd name="connsiteY3" fmla="*/ 318394 h 491595"/>
-                <a:gd name="connsiteX4" fmla="*/ 0 w 247861"/>
-                <a:gd name="connsiteY4" fmla="*/ 168438 h 491595"/>
-                <a:gd name="connsiteX5" fmla="*/ 247861 w 247861"/>
-                <a:gd name="connsiteY5" fmla="*/ 0 h 491595"/>
-                <a:gd name="connsiteX6" fmla="*/ 242826 w 247861"/>
-                <a:gd name="connsiteY6" fmla="*/ 491595 h 491595"/>
-                <a:gd name="connsiteX7" fmla="*/ 82985 w 247861"/>
-                <a:gd name="connsiteY7" fmla="*/ 327947 h 491595"/>
-                <a:gd name="connsiteX8" fmla="*/ 84711 w 247861"/>
-                <a:gd name="connsiteY8" fmla="*/ 159354 h 491595"/>
-                <a:gd name="connsiteX9" fmla="*/ 247861 w 247861"/>
-                <a:gd name="connsiteY9" fmla="*/ 0 h 491595"/>
-                <a:gd name="connsiteX0" fmla="*/ 0 w 247861"/>
-                <a:gd name="connsiteY0" fmla="*/ 168438 h 491595"/>
-                <a:gd name="connsiteX1" fmla="*/ 83956 w 247861"/>
-                <a:gd name="connsiteY1" fmla="*/ 162984 h 491595"/>
-                <a:gd name="connsiteX2" fmla="*/ 81228 w 247861"/>
-                <a:gd name="connsiteY2" fmla="*/ 326575 h 491595"/>
-                <a:gd name="connsiteX3" fmla="*/ 0 w 247861"/>
-                <a:gd name="connsiteY3" fmla="*/ 318394 h 491595"/>
-                <a:gd name="connsiteX4" fmla="*/ 0 w 247861"/>
-                <a:gd name="connsiteY4" fmla="*/ 168438 h 491595"/>
-                <a:gd name="connsiteX5" fmla="*/ 247861 w 247861"/>
-                <a:gd name="connsiteY5" fmla="*/ 0 h 491595"/>
-                <a:gd name="connsiteX6" fmla="*/ 242826 w 247861"/>
-                <a:gd name="connsiteY6" fmla="*/ 491595 h 491595"/>
-                <a:gd name="connsiteX7" fmla="*/ 82985 w 247861"/>
-                <a:gd name="connsiteY7" fmla="*/ 327947 h 491595"/>
-                <a:gd name="connsiteX8" fmla="*/ 84711 w 247861"/>
-                <a:gd name="connsiteY8" fmla="*/ 159354 h 491595"/>
-                <a:gd name="connsiteX9" fmla="*/ 247861 w 247861"/>
-                <a:gd name="connsiteY9" fmla="*/ 0 h 491595"/>
-              </a:gdLst>
-              <a:ahLst/>
-              <a:cxnLst>
-                <a:cxn ang="0">
-                  <a:pos x="connsiteX0" y="connsiteY0"/>
-                </a:cxn>
-                <a:cxn ang="0">
-                  <a:pos x="connsiteX1" y="connsiteY1"/>
-                </a:cxn>
-                <a:cxn ang="0">
-                  <a:pos x="connsiteX2" y="connsiteY2"/>
-                </a:cxn>
-                <a:cxn ang="0">
-                  <a:pos x="connsiteX3" y="connsiteY3"/>
-                </a:cxn>
-                <a:cxn ang="0">
-                  <a:pos x="connsiteX4" y="connsiteY4"/>
-                </a:cxn>
-                <a:cxn ang="0">
-                  <a:pos x="connsiteX5" y="connsiteY5"/>
-                </a:cxn>
-                <a:cxn ang="0">
-                  <a:pos x="connsiteX6" y="connsiteY6"/>
-                </a:cxn>
-                <a:cxn ang="0">
-                  <a:pos x="connsiteX7" y="connsiteY7"/>
-                </a:cxn>
-                <a:cxn ang="0">
-                  <a:pos x="connsiteX8" y="connsiteY8"/>
-                </a:cxn>
-                <a:cxn ang="0">
-                  <a:pos x="connsiteX9" y="connsiteY9"/>
-                </a:cxn>
-              </a:cxnLst>
-              <a:rect l="l" t="t" r="r" b="b"/>
-              <a:pathLst>
-                <a:path w="247861" h="491595">
-                  <a:moveTo>
-                    <a:pt x="0" y="168438"/>
-                  </a:moveTo>
-                  <a:lnTo>
-                    <a:pt x="83956" y="162984"/>
-                  </a:lnTo>
-                  <a:cubicBezTo>
-                    <a:pt x="83047" y="217514"/>
-                    <a:pt x="82137" y="272045"/>
-                    <a:pt x="81228" y="326575"/>
-                  </a:cubicBezTo>
-                  <a:lnTo>
-                    <a:pt x="0" y="318394"/>
-                  </a:lnTo>
-                  <a:lnTo>
-                    <a:pt x="0" y="168438"/>
-                  </a:lnTo>
-                  <a:close/>
-                  <a:moveTo>
-                    <a:pt x="247861" y="0"/>
-                  </a:moveTo>
-                  <a:cubicBezTo>
-                    <a:pt x="246183" y="163865"/>
-                    <a:pt x="244504" y="327730"/>
-                    <a:pt x="242826" y="491595"/>
-                  </a:cubicBezTo>
-                  <a:lnTo>
-                    <a:pt x="82985" y="327947"/>
-                  </a:lnTo>
-                  <a:cubicBezTo>
-                    <a:pt x="83560" y="271749"/>
-                    <a:pt x="84136" y="215552"/>
-                    <a:pt x="84711" y="159354"/>
-                  </a:cubicBezTo>
-                  <a:lnTo>
-                    <a:pt x="247861" y="0"/>
-                  </a:lnTo>
-                  <a:close/>
-                </a:path>
-              </a:pathLst>
-            </a:custGeom>
-            <a:solidFill>
-              <a:srgbClr val="0070C0"/>
-            </a:solidFill>
-            <a:ln w="6350">
-              <a:solidFill>
-                <a:schemeClr val="bg1"/>
-              </a:solidFill>
-            </a:ln>
-          </p:spPr>
-          <p:style>
-            <a:lnRef idx="2">
-              <a:schemeClr val="accent1">
-                <a:shade val="50000"/>
-              </a:schemeClr>
-            </a:lnRef>
-            <a:fillRef idx="1">
-              <a:schemeClr val="accent1"/>
-            </a:fillRef>
-            <a:effectRef idx="0">
-              <a:schemeClr val="accent1"/>
-            </a:effectRef>
-            <a:fontRef idx="minor">
-              <a:schemeClr val="lt1"/>
-            </a:fontRef>
-          </p:style>
-          <p:txBody>
-            <a:bodyPr rtlCol="0" anchor="ctr"/>
-            <a:lstStyle/>
-            <a:p>
-              <a:pPr algn="ctr"/>
-              <a:endParaRPr lang="en-SG"/>
-            </a:p>
-          </p:txBody>
-        </p:sp>
-      </p:grpSp>
-      <p:grpSp>
-        <p:nvGrpSpPr>
-          <p:cNvPr id="109" name="Group 108"/>
-          <p:cNvGrpSpPr/>
-          <p:nvPr/>
-        </p:nvGrpSpPr>
-        <p:grpSpPr>
-          <a:xfrm>
-            <a:off x="1310960" y="1241884"/>
-            <a:ext cx="190500" cy="190500"/>
-            <a:chOff x="1310960" y="1241884"/>
-            <a:chExt cx="190500" cy="190500"/>
-          </a:xfrm>
-        </p:grpSpPr>
-        <p:sp>
-          <p:nvSpPr>
-            <p:cNvPr id="189" name="Oval 188"/>
-            <p:cNvSpPr/>
-            <p:nvPr/>
-          </p:nvSpPr>
-          <p:spPr>
-            <a:xfrm>
-              <a:off x="1310960" y="1241884"/>
-              <a:ext cx="190500" cy="190500"/>
-            </a:xfrm>
-            <a:prstGeom prst="ellipse">
-              <a:avLst/>
-            </a:prstGeom>
-            <a:solidFill>
-              <a:schemeClr val="accent6"/>
-            </a:solidFill>
-            <a:ln>
-              <a:noFill/>
-            </a:ln>
-          </p:spPr>
-          <p:style>
-            <a:lnRef idx="2">
-              <a:schemeClr val="accent1">
-                <a:shade val="50000"/>
-              </a:schemeClr>
-            </a:lnRef>
-            <a:fillRef idx="1">
-              <a:schemeClr val="accent1"/>
-            </a:fillRef>
-            <a:effectRef idx="0">
-              <a:schemeClr val="accent1"/>
-            </a:effectRef>
-            <a:fontRef idx="minor">
-              <a:schemeClr val="lt1"/>
-            </a:fontRef>
-          </p:style>
-          <p:txBody>
-            <a:bodyPr rtlCol="0" anchor="ctr"/>
-            <a:lstStyle/>
-            <a:p>
-              <a:pPr algn="ctr"/>
-              <a:endParaRPr lang="en-SG"/>
-            </a:p>
-          </p:txBody>
-        </p:sp>
         <p:sp>
           <p:nvSpPr>
             <p:cNvPr id="190" name="Freeform 189"/>
@@ -11384,225 +11332,66 @@
           </p:txBody>
         </p:sp>
       </p:grpSp>
-      <p:pic>
-        <p:nvPicPr>
-          <p:cNvPr id="98" name="Picture 97"/>
-          <p:cNvPicPr>
-            <a:picLocks noChangeAspect="1"/>
-          </p:cNvPicPr>
+      <p:sp>
+        <p:nvSpPr>
+          <p:cNvPr id="106" name="TextBox 105"/>
+          <p:cNvSpPr txBox="1"/>
           <p:nvPr/>
-        </p:nvPicPr>
-        <p:blipFill>
-          <a:blip r:embed="rId2"/>
-          <a:stretch>
-            <a:fillRect/>
-          </a:stretch>
-        </p:blipFill>
+        </p:nvSpPr>
         <p:spPr>
           <a:xfrm>
-            <a:off x="1876963" y="1241883"/>
-            <a:ext cx="190500" cy="190500"/>
+            <a:off x="2389651" y="1159706"/>
+            <a:ext cx="330540" cy="369332"/>
           </a:xfrm>
           <a:prstGeom prst="rect">
             <a:avLst/>
           </a:prstGeom>
+          <a:noFill/>
         </p:spPr>
-      </p:pic>
-      <p:pic>
-        <p:nvPicPr>
-          <p:cNvPr id="102" name="Picture 101"/>
-          <p:cNvPicPr>
-            <a:picLocks noChangeAspect="1"/>
-          </p:cNvPicPr>
-          <p:nvPr/>
-        </p:nvPicPr>
-        <p:blipFill>
-          <a:blip r:embed="rId3"/>
-          <a:stretch>
-            <a:fillRect/>
-          </a:stretch>
-        </p:blipFill>
-        <p:spPr>
-          <a:xfrm>
-            <a:off x="2160686" y="1245948"/>
-            <a:ext cx="190500" cy="190500"/>
-          </a:xfrm>
-          <a:prstGeom prst="rect">
-            <a:avLst/>
-          </a:prstGeom>
-        </p:spPr>
-      </p:pic>
+        <p:txBody>
+          <a:bodyPr wrap="none" rtlCol="0">
+            <a:spAutoFit/>
+          </a:bodyPr>
+          <a:lstStyle/>
+          <a:p>
+            <a:r>
+              <a:rPr lang="en-US" b="1" dirty="0">
+                <a:ln w="12700">
+                  <a:noFill/>
+                </a:ln>
+                <a:solidFill>
+                  <a:srgbClr val="0070C0"/>
+                </a:solidFill>
+                <a:latin typeface="Rockwell Extra Bold" pitchFamily="18" charset="0"/>
+              </a:rPr>
+              <a:t>?</a:t>
+            </a:r>
+            <a:endParaRPr lang="en-SG" b="1" dirty="0">
+              <a:ln w="12700">
+                <a:noFill/>
+              </a:ln>
+              <a:solidFill>
+                <a:srgbClr val="0070C0"/>
+              </a:solidFill>
+              <a:latin typeface="Rockwell Extra Bold" pitchFamily="18" charset="0"/>
+            </a:endParaRPr>
+          </a:p>
+        </p:txBody>
+      </p:sp>
       <p:grpSp>
         <p:nvGrpSpPr>
-          <p:cNvPr id="108" name="Group 107"/>
+          <p:cNvPr id="7" name="Group 6"/>
           <p:cNvGrpSpPr/>
           <p:nvPr/>
         </p:nvGrpSpPr>
         <p:grpSpPr>
           <a:xfrm>
-            <a:off x="2391009" y="1156532"/>
-            <a:ext cx="330540" cy="369332"/>
-            <a:chOff x="2573313" y="1173309"/>
-            <a:chExt cx="330540" cy="369332"/>
+            <a:off x="2798474" y="1246087"/>
+            <a:ext cx="184722" cy="168885"/>
+            <a:chOff x="2810342" y="1283407"/>
+            <a:chExt cx="131733" cy="120439"/>
           </a:xfrm>
         </p:grpSpPr>
-        <p:sp>
-          <p:nvSpPr>
-            <p:cNvPr id="194" name="Oval 193"/>
-            <p:cNvSpPr/>
-            <p:nvPr/>
-          </p:nvSpPr>
-          <p:spPr>
-            <a:xfrm>
-              <a:off x="2642252" y="1265900"/>
-              <a:ext cx="190500" cy="190500"/>
-            </a:xfrm>
-            <a:prstGeom prst="ellipse">
-              <a:avLst/>
-            </a:prstGeom>
-            <a:solidFill>
-              <a:schemeClr val="accent6"/>
-            </a:solidFill>
-            <a:ln>
-              <a:noFill/>
-            </a:ln>
-          </p:spPr>
-          <p:style>
-            <a:lnRef idx="2">
-              <a:schemeClr val="accent1">
-                <a:shade val="50000"/>
-              </a:schemeClr>
-            </a:lnRef>
-            <a:fillRef idx="1">
-              <a:schemeClr val="accent1"/>
-            </a:fillRef>
-            <a:effectRef idx="0">
-              <a:schemeClr val="accent1"/>
-            </a:effectRef>
-            <a:fontRef idx="minor">
-              <a:schemeClr val="lt1"/>
-            </a:fontRef>
-          </p:style>
-          <p:txBody>
-            <a:bodyPr rtlCol="0" anchor="ctr"/>
-            <a:lstStyle/>
-            <a:p>
-              <a:pPr algn="ctr"/>
-              <a:endParaRPr lang="en-SG"/>
-            </a:p>
-          </p:txBody>
-        </p:sp>
-        <p:sp>
-          <p:nvSpPr>
-            <p:cNvPr id="106" name="TextBox 105"/>
-            <p:cNvSpPr txBox="1"/>
-            <p:nvPr/>
-          </p:nvSpPr>
-          <p:spPr>
-            <a:xfrm>
-              <a:off x="2573313" y="1173309"/>
-              <a:ext cx="330540" cy="369332"/>
-            </a:xfrm>
-            <a:prstGeom prst="rect">
-              <a:avLst/>
-            </a:prstGeom>
-            <a:noFill/>
-          </p:spPr>
-          <p:txBody>
-            <a:bodyPr wrap="none" rtlCol="0">
-              <a:spAutoFit/>
-            </a:bodyPr>
-            <a:lstStyle/>
-            <a:p>
-              <a:r>
-                <a:rPr lang="en-US" b="1" dirty="0" smtClean="0">
-                  <a:ln w="12700">
-                    <a:solidFill>
-                      <a:schemeClr val="bg1"/>
-                    </a:solidFill>
-                  </a:ln>
-                  <a:solidFill>
-                    <a:srgbClr val="0070C0"/>
-                  </a:solidFill>
-                  <a:latin typeface="Rockwell Extra Bold" pitchFamily="18" charset="0"/>
-                </a:rPr>
-                <a:t>?</a:t>
-              </a:r>
-              <a:endParaRPr lang="en-SG" b="1" dirty="0">
-                <a:ln w="12700">
-                  <a:solidFill>
-                    <a:schemeClr val="bg1"/>
-                  </a:solidFill>
-                </a:ln>
-                <a:solidFill>
-                  <a:srgbClr val="0070C0"/>
-                </a:solidFill>
-                <a:latin typeface="Rockwell Extra Bold" pitchFamily="18" charset="0"/>
-              </a:endParaRPr>
-            </a:p>
-          </p:txBody>
-        </p:sp>
-      </p:grpSp>
-      <p:grpSp>
-        <p:nvGrpSpPr>
-          <p:cNvPr id="117" name="Group 116"/>
-          <p:cNvGrpSpPr/>
-          <p:nvPr/>
-        </p:nvGrpSpPr>
-        <p:grpSpPr>
-          <a:xfrm>
-            <a:off x="2780962" y="1249123"/>
-            <a:ext cx="190500" cy="190500"/>
-            <a:chOff x="3001076" y="1269587"/>
-            <a:chExt cx="190500" cy="190500"/>
-          </a:xfrm>
-        </p:grpSpPr>
-        <p:sp>
-          <p:nvSpPr>
-            <p:cNvPr id="213" name="Oval 212"/>
-            <p:cNvSpPr/>
-            <p:nvPr/>
-          </p:nvSpPr>
-          <p:spPr>
-            <a:xfrm>
-              <a:off x="3001076" y="1269587"/>
-              <a:ext cx="190500" cy="190500"/>
-            </a:xfrm>
-            <a:prstGeom prst="ellipse">
-              <a:avLst/>
-            </a:prstGeom>
-            <a:solidFill>
-              <a:schemeClr val="accent6"/>
-            </a:solidFill>
-            <a:ln>
-              <a:noFill/>
-            </a:ln>
-          </p:spPr>
-          <p:style>
-            <a:lnRef idx="2">
-              <a:schemeClr val="accent1">
-                <a:shade val="50000"/>
-              </a:schemeClr>
-            </a:lnRef>
-            <a:fillRef idx="1">
-              <a:schemeClr val="accent1"/>
-            </a:fillRef>
-            <a:effectRef idx="0">
-              <a:schemeClr val="accent1"/>
-            </a:effectRef>
-            <a:fontRef idx="minor">
-              <a:schemeClr val="lt1"/>
-            </a:fontRef>
-          </p:style>
-          <p:txBody>
-            <a:bodyPr rtlCol="0" anchor="ctr"/>
-            <a:lstStyle/>
-            <a:p>
-              <a:pPr algn="ctr"/>
-              <a:endParaRPr lang="en-SG"/>
-            </a:p>
-          </p:txBody>
-        </p:sp>
         <p:sp>
           <p:nvSpPr>
             <p:cNvPr id="217" name="Rectangle 216"/>
@@ -11611,7 +11400,7 @@
           </p:nvSpPr>
           <p:spPr>
             <a:xfrm>
-              <a:off x="3058269" y="1303871"/>
+              <a:off x="2838155" y="1283407"/>
               <a:ext cx="103920" cy="74655"/>
             </a:xfrm>
             <a:prstGeom prst="rect">
@@ -11662,7 +11451,7 @@
           </p:nvSpPr>
           <p:spPr>
             <a:xfrm>
-              <a:off x="3044204" y="1327509"/>
+              <a:off x="2824090" y="1307045"/>
               <a:ext cx="103920" cy="74655"/>
             </a:xfrm>
             <a:prstGeom prst="rect">
@@ -11713,7 +11502,7 @@
           </p:nvSpPr>
           <p:spPr>
             <a:xfrm>
-              <a:off x="3030456" y="1349655"/>
+              <a:off x="2810342" y="1329191"/>
               <a:ext cx="103920" cy="74655"/>
             </a:xfrm>
             <a:prstGeom prst="rect">
@@ -11759,16 +11548,16 @@
       </p:grpSp>
       <p:grpSp>
         <p:nvGrpSpPr>
-          <p:cNvPr id="138" name="Group 137"/>
+          <p:cNvPr id="8" name="Group 7"/>
           <p:cNvGrpSpPr/>
           <p:nvPr/>
         </p:nvGrpSpPr>
         <p:grpSpPr>
           <a:xfrm>
             <a:off x="3064524" y="1241883"/>
-            <a:ext cx="190500" cy="190500"/>
-            <a:chOff x="3321025" y="1253436"/>
-            <a:chExt cx="190500" cy="190500"/>
+            <a:ext cx="166083" cy="154363"/>
+            <a:chOff x="3064524" y="1241883"/>
+            <a:chExt cx="166083" cy="154363"/>
           </a:xfrm>
         </p:grpSpPr>
         <p:sp>
@@ -11779,8 +11568,8 @@
           </p:nvSpPr>
           <p:spPr>
             <a:xfrm>
-              <a:off x="3321025" y="1253436"/>
-              <a:ext cx="190500" cy="190500"/>
+              <a:off x="3064524" y="1241883"/>
+              <a:ext cx="150164" cy="150164"/>
             </a:xfrm>
             <a:prstGeom prst="ellipse">
               <a:avLst/>
@@ -11825,7 +11614,7 @@
           </p:nvSpPr>
           <p:spPr>
             <a:xfrm>
-              <a:off x="3346906" y="1280846"/>
+              <a:off x="3090405" y="1269293"/>
               <a:ext cx="85531" cy="88763"/>
             </a:xfrm>
             <a:custGeom>
@@ -11933,7 +11722,7 @@
           </p:nvSpPr>
           <p:spPr>
             <a:xfrm rot="771170">
-              <a:off x="3401577" y="1319036"/>
+              <a:off x="3145076" y="1307483"/>
               <a:ext cx="85531" cy="88763"/>
             </a:xfrm>
             <a:custGeom>
@@ -12059,7 +11848,7 @@
           <a:lstStyle/>
           <a:p>
             <a:r>
-              <a:rPr lang="en-US" dirty="0" smtClean="0"/>
+              <a:rPr lang="en-US" dirty="0"/>
               <a:t>Minimized Icons</a:t>
             </a:r>
             <a:endParaRPr lang="en-SG" dirty="0"/>
@@ -12090,7 +11879,7 @@
           <a:p>
             <a:pPr algn="ctr"/>
             <a:r>
-              <a:rPr lang="en-US" sz="300" dirty="0" smtClean="0"/>
+              <a:rPr lang="en-US" sz="300" dirty="0"/>
               <a:t>Narrations Lab</a:t>
             </a:r>
             <a:endParaRPr lang="en-SG" sz="300" dirty="0"/>
@@ -12121,7 +11910,7 @@
           <a:p>
             <a:pPr algn="ctr"/>
             <a:r>
-              <a:rPr lang="en-US" sz="300" dirty="0" smtClean="0"/>
+              <a:rPr lang="en-US" sz="300" dirty="0"/>
               <a:t>Captions Lab</a:t>
             </a:r>
             <a:endParaRPr lang="en-SG" sz="300" dirty="0"/>
@@ -12152,7 +11941,7 @@
           <a:p>
             <a:pPr algn="ctr"/>
             <a:r>
-              <a:rPr lang="en-US" sz="300" dirty="0" smtClean="0"/>
+              <a:rPr lang="en-US" sz="300" dirty="0"/>
               <a:t>Highlight Lab</a:t>
             </a:r>
             <a:endParaRPr lang="en-SG" sz="300" dirty="0"/>
@@ -12183,7 +11972,7 @@
           <a:p>
             <a:pPr algn="ctr"/>
             <a:r>
-              <a:rPr lang="en-US" sz="300" dirty="0" smtClean="0"/>
+              <a:rPr lang="en-US" sz="300" dirty="0"/>
               <a:t>Help</a:t>
             </a:r>
             <a:endParaRPr lang="en-SG" sz="300" dirty="0"/>
@@ -12214,7 +12003,7 @@
           <a:p>
             <a:pPr algn="ctr"/>
             <a:r>
-              <a:rPr lang="en-US" sz="300" dirty="0" smtClean="0"/>
+              <a:rPr lang="en-US" sz="300" dirty="0"/>
               <a:t>More Labs</a:t>
             </a:r>
             <a:endParaRPr lang="en-SG" sz="300" dirty="0"/>
@@ -12245,8 +12034,1050 @@
           <a:p>
             <a:pPr algn="ctr"/>
             <a:r>
-              <a:rPr lang="en-US" sz="300" dirty="0" smtClean="0"/>
+              <a:rPr lang="en-US" sz="300" dirty="0"/>
               <a:t>Crop Lab</a:t>
+            </a:r>
+            <a:endParaRPr lang="en-SG" sz="300" dirty="0"/>
+          </a:p>
+        </p:txBody>
+      </p:sp>
+      <p:grpSp>
+        <p:nvGrpSpPr>
+          <p:cNvPr id="5" name="Group 4"/>
+          <p:cNvGrpSpPr/>
+          <p:nvPr/>
+        </p:nvGrpSpPr>
+        <p:grpSpPr>
+          <a:xfrm>
+            <a:off x="1875882" y="1248295"/>
+            <a:ext cx="205174" cy="194001"/>
+            <a:chOff x="1875882" y="1248295"/>
+            <a:chExt cx="205174" cy="194001"/>
+          </a:xfrm>
+        </p:grpSpPr>
+        <p:sp>
+          <p:nvSpPr>
+            <p:cNvPr id="33" name="Rectangle 32"/>
+            <p:cNvSpPr/>
+            <p:nvPr/>
+          </p:nvSpPr>
+          <p:spPr>
+            <a:xfrm>
+              <a:off x="1885720" y="1248841"/>
+              <a:ext cx="182880" cy="182880"/>
+            </a:xfrm>
+            <a:prstGeom prst="rect">
+              <a:avLst/>
+            </a:prstGeom>
+            <a:solidFill>
+              <a:schemeClr val="accent6"/>
+            </a:solidFill>
+            <a:ln>
+              <a:solidFill>
+                <a:schemeClr val="accent6"/>
+              </a:solidFill>
+            </a:ln>
+          </p:spPr>
+          <p:style>
+            <a:lnRef idx="2">
+              <a:schemeClr val="accent1">
+                <a:shade val="50000"/>
+              </a:schemeClr>
+            </a:lnRef>
+            <a:fillRef idx="1">
+              <a:schemeClr val="accent1"/>
+            </a:fillRef>
+            <a:effectRef idx="0">
+              <a:schemeClr val="accent1"/>
+            </a:effectRef>
+            <a:fontRef idx="minor">
+              <a:schemeClr val="lt1"/>
+            </a:fontRef>
+          </p:style>
+          <p:txBody>
+            <a:bodyPr rtlCol="0" anchor="ctr"/>
+            <a:lstStyle/>
+            <a:p>
+              <a:pPr algn="ctr"/>
+              <a:endParaRPr lang="en-US"/>
+            </a:p>
+          </p:txBody>
+        </p:sp>
+        <p:sp>
+          <p:nvSpPr>
+            <p:cNvPr id="35" name="Right Arrow 140"/>
+            <p:cNvSpPr>
+              <a:spLocks noChangeAspect="1"/>
+            </p:cNvSpPr>
+            <p:nvPr/>
+          </p:nvSpPr>
+          <p:spPr>
+            <a:xfrm rot="4632386">
+              <a:off x="1908881" y="1248295"/>
+              <a:ext cx="132835" cy="132835"/>
+            </a:xfrm>
+            <a:prstGeom prst="rightArrow">
+              <a:avLst/>
+            </a:prstGeom>
+            <a:solidFill>
+              <a:srgbClr val="0070C0"/>
+            </a:solidFill>
+            <a:ln w="6350">
+              <a:solidFill>
+                <a:schemeClr val="bg1"/>
+              </a:solidFill>
+            </a:ln>
+          </p:spPr>
+          <p:style>
+            <a:lnRef idx="2">
+              <a:schemeClr val="accent1">
+                <a:shade val="50000"/>
+              </a:schemeClr>
+            </a:lnRef>
+            <a:fillRef idx="1">
+              <a:schemeClr val="accent1"/>
+            </a:fillRef>
+            <a:effectRef idx="0">
+              <a:schemeClr val="accent1"/>
+            </a:effectRef>
+            <a:fontRef idx="minor">
+              <a:schemeClr val="lt1"/>
+            </a:fontRef>
+          </p:style>
+          <p:txBody>
+            <a:bodyPr rtlCol="0" anchor="ctr"/>
+            <a:lstStyle/>
+            <a:p>
+              <a:pPr algn="ctr"/>
+              <a:endParaRPr lang="en-US" dirty="0"/>
+            </a:p>
+          </p:txBody>
+        </p:sp>
+        <p:sp>
+          <p:nvSpPr>
+            <p:cNvPr id="36" name="Rectangle 35"/>
+            <p:cNvSpPr/>
+            <p:nvPr/>
+          </p:nvSpPr>
+          <p:spPr>
+            <a:xfrm>
+              <a:off x="1875882" y="1396577"/>
+              <a:ext cx="205174" cy="45719"/>
+            </a:xfrm>
+            <a:prstGeom prst="rect">
+              <a:avLst/>
+            </a:prstGeom>
+            <a:solidFill>
+              <a:srgbClr val="0070C0"/>
+            </a:solidFill>
+            <a:ln w="9525">
+              <a:solidFill>
+                <a:schemeClr val="bg1"/>
+              </a:solidFill>
+            </a:ln>
+          </p:spPr>
+          <p:style>
+            <a:lnRef idx="2">
+              <a:schemeClr val="accent1">
+                <a:shade val="50000"/>
+              </a:schemeClr>
+            </a:lnRef>
+            <a:fillRef idx="1">
+              <a:schemeClr val="accent1"/>
+            </a:fillRef>
+            <a:effectRef idx="0">
+              <a:schemeClr val="accent1"/>
+            </a:effectRef>
+            <a:fontRef idx="minor">
+              <a:schemeClr val="lt1"/>
+            </a:fontRef>
+          </p:style>
+          <p:txBody>
+            <a:bodyPr rtlCol="0" anchor="ctr"/>
+            <a:lstStyle/>
+            <a:p>
+              <a:pPr algn="ctr"/>
+              <a:endParaRPr lang="en-US" dirty="0"/>
+            </a:p>
+          </p:txBody>
+        </p:sp>
+      </p:grpSp>
+      <p:grpSp>
+        <p:nvGrpSpPr>
+          <p:cNvPr id="6" name="Group 5"/>
+          <p:cNvGrpSpPr/>
+          <p:nvPr/>
+        </p:nvGrpSpPr>
+        <p:grpSpPr>
+          <a:xfrm>
+            <a:off x="2162847" y="1265401"/>
+            <a:ext cx="198456" cy="149571"/>
+            <a:chOff x="3644773" y="1069336"/>
+            <a:chExt cx="741789" cy="559070"/>
+          </a:xfrm>
+        </p:grpSpPr>
+        <p:sp>
+          <p:nvSpPr>
+            <p:cNvPr id="42" name="Rectangle 41"/>
+            <p:cNvSpPr/>
+            <p:nvPr/>
+          </p:nvSpPr>
+          <p:spPr>
+            <a:xfrm>
+              <a:off x="3644773" y="1069336"/>
+              <a:ext cx="741789" cy="559070"/>
+            </a:xfrm>
+            <a:prstGeom prst="rect">
+              <a:avLst/>
+            </a:prstGeom>
+            <a:solidFill>
+              <a:schemeClr val="accent6"/>
+            </a:solidFill>
+            <a:ln>
+              <a:noFill/>
+            </a:ln>
+          </p:spPr>
+          <p:style>
+            <a:lnRef idx="2">
+              <a:schemeClr val="accent1">
+                <a:shade val="50000"/>
+              </a:schemeClr>
+            </a:lnRef>
+            <a:fillRef idx="1">
+              <a:schemeClr val="accent1"/>
+            </a:fillRef>
+            <a:effectRef idx="0">
+              <a:schemeClr val="accent1"/>
+            </a:effectRef>
+            <a:fontRef idx="minor">
+              <a:schemeClr val="lt1"/>
+            </a:fontRef>
+          </p:style>
+          <p:txBody>
+            <a:bodyPr rtlCol="0" anchor="ctr"/>
+            <a:lstStyle/>
+            <a:p>
+              <a:pPr algn="ctr"/>
+              <a:endParaRPr lang="en-US"/>
+            </a:p>
+          </p:txBody>
+        </p:sp>
+        <p:grpSp>
+          <p:nvGrpSpPr>
+            <p:cNvPr id="43" name="Group 42"/>
+            <p:cNvGrpSpPr/>
+            <p:nvPr/>
+          </p:nvGrpSpPr>
+          <p:grpSpPr>
+            <a:xfrm>
+              <a:off x="3768102" y="1150174"/>
+              <a:ext cx="522208" cy="64354"/>
+              <a:chOff x="3370502" y="2494280"/>
+              <a:chExt cx="522207" cy="64353"/>
+            </a:xfrm>
+          </p:grpSpPr>
+          <p:sp>
+            <p:nvSpPr>
+              <p:cNvPr id="51" name="Rounded Rectangle 182"/>
+              <p:cNvSpPr/>
+              <p:nvPr/>
+            </p:nvSpPr>
+            <p:spPr>
+              <a:xfrm>
+                <a:off x="3483859" y="2494280"/>
+                <a:ext cx="408850" cy="64353"/>
+              </a:xfrm>
+              <a:prstGeom prst="roundRect">
+                <a:avLst/>
+              </a:prstGeom>
+              <a:solidFill>
+                <a:schemeClr val="bg1"/>
+              </a:solidFill>
+              <a:ln>
+                <a:noFill/>
+              </a:ln>
+            </p:spPr>
+            <p:style>
+              <a:lnRef idx="2">
+                <a:schemeClr val="accent1">
+                  <a:shade val="50000"/>
+                </a:schemeClr>
+              </a:lnRef>
+              <a:fillRef idx="1">
+                <a:schemeClr val="accent1"/>
+              </a:fillRef>
+              <a:effectRef idx="0">
+                <a:schemeClr val="accent1"/>
+              </a:effectRef>
+              <a:fontRef idx="minor">
+                <a:schemeClr val="lt1"/>
+              </a:fontRef>
+            </p:style>
+            <p:txBody>
+              <a:bodyPr rtlCol="0" anchor="ctr"/>
+              <a:lstStyle/>
+              <a:p>
+                <a:pPr algn="ctr"/>
+                <a:endParaRPr lang="en-US"/>
+              </a:p>
+            </p:txBody>
+          </p:sp>
+          <p:sp>
+            <p:nvSpPr>
+              <p:cNvPr id="52" name="Rounded Rectangle 183"/>
+              <p:cNvSpPr/>
+              <p:nvPr/>
+            </p:nvSpPr>
+            <p:spPr>
+              <a:xfrm>
+                <a:off x="3370502" y="2494280"/>
+                <a:ext cx="51086" cy="64353"/>
+              </a:xfrm>
+              <a:prstGeom prst="roundRect">
+                <a:avLst/>
+              </a:prstGeom>
+              <a:solidFill>
+                <a:schemeClr val="bg1"/>
+              </a:solidFill>
+              <a:ln>
+                <a:noFill/>
+              </a:ln>
+            </p:spPr>
+            <p:style>
+              <a:lnRef idx="2">
+                <a:schemeClr val="accent1">
+                  <a:shade val="50000"/>
+                </a:schemeClr>
+              </a:lnRef>
+              <a:fillRef idx="1">
+                <a:schemeClr val="accent1"/>
+              </a:fillRef>
+              <a:effectRef idx="0">
+                <a:schemeClr val="accent1"/>
+              </a:effectRef>
+              <a:fontRef idx="minor">
+                <a:schemeClr val="lt1"/>
+              </a:fontRef>
+            </p:style>
+            <p:txBody>
+              <a:bodyPr rtlCol="0" anchor="ctr"/>
+              <a:lstStyle/>
+              <a:p>
+                <a:pPr algn="ctr"/>
+                <a:endParaRPr lang="en-US"/>
+              </a:p>
+            </p:txBody>
+          </p:sp>
+        </p:grpSp>
+        <p:grpSp>
+          <p:nvGrpSpPr>
+            <p:cNvPr id="44" name="Group 43"/>
+            <p:cNvGrpSpPr/>
+            <p:nvPr/>
+          </p:nvGrpSpPr>
+          <p:grpSpPr>
+            <a:xfrm>
+              <a:off x="3770965" y="1498199"/>
+              <a:ext cx="522208" cy="64354"/>
+              <a:chOff x="3373366" y="2880398"/>
+              <a:chExt cx="522207" cy="64353"/>
+            </a:xfrm>
+          </p:grpSpPr>
+          <p:sp>
+            <p:nvSpPr>
+              <p:cNvPr id="49" name="Rounded Rectangle 178"/>
+              <p:cNvSpPr/>
+              <p:nvPr/>
+            </p:nvSpPr>
+            <p:spPr>
+              <a:xfrm>
+                <a:off x="3486723" y="2880398"/>
+                <a:ext cx="408850" cy="64353"/>
+              </a:xfrm>
+              <a:prstGeom prst="roundRect">
+                <a:avLst/>
+              </a:prstGeom>
+              <a:solidFill>
+                <a:schemeClr val="bg1"/>
+              </a:solidFill>
+              <a:ln>
+                <a:noFill/>
+              </a:ln>
+            </p:spPr>
+            <p:style>
+              <a:lnRef idx="2">
+                <a:schemeClr val="accent1">
+                  <a:shade val="50000"/>
+                </a:schemeClr>
+              </a:lnRef>
+              <a:fillRef idx="1">
+                <a:schemeClr val="accent1"/>
+              </a:fillRef>
+              <a:effectRef idx="0">
+                <a:schemeClr val="accent1"/>
+              </a:effectRef>
+              <a:fontRef idx="minor">
+                <a:schemeClr val="lt1"/>
+              </a:fontRef>
+            </p:style>
+            <p:txBody>
+              <a:bodyPr rtlCol="0" anchor="ctr"/>
+              <a:lstStyle/>
+              <a:p>
+                <a:pPr algn="ctr"/>
+                <a:endParaRPr lang="en-US"/>
+              </a:p>
+            </p:txBody>
+          </p:sp>
+          <p:sp>
+            <p:nvSpPr>
+              <p:cNvPr id="50" name="Rounded Rectangle 179"/>
+              <p:cNvSpPr/>
+              <p:nvPr/>
+            </p:nvSpPr>
+            <p:spPr>
+              <a:xfrm>
+                <a:off x="3373366" y="2880398"/>
+                <a:ext cx="51086" cy="64353"/>
+              </a:xfrm>
+              <a:prstGeom prst="roundRect">
+                <a:avLst/>
+              </a:prstGeom>
+              <a:solidFill>
+                <a:schemeClr val="bg1"/>
+              </a:solidFill>
+              <a:ln>
+                <a:noFill/>
+              </a:ln>
+            </p:spPr>
+            <p:style>
+              <a:lnRef idx="2">
+                <a:schemeClr val="accent1">
+                  <a:shade val="50000"/>
+                </a:schemeClr>
+              </a:lnRef>
+              <a:fillRef idx="1">
+                <a:schemeClr val="accent1"/>
+              </a:fillRef>
+              <a:effectRef idx="0">
+                <a:schemeClr val="accent1"/>
+              </a:effectRef>
+              <a:fontRef idx="minor">
+                <a:schemeClr val="lt1"/>
+              </a:fontRef>
+            </p:style>
+            <p:txBody>
+              <a:bodyPr rtlCol="0" anchor="ctr"/>
+              <a:lstStyle/>
+              <a:p>
+                <a:pPr algn="ctr"/>
+                <a:endParaRPr lang="en-US"/>
+              </a:p>
+            </p:txBody>
+          </p:sp>
+        </p:grpSp>
+        <p:sp>
+          <p:nvSpPr>
+            <p:cNvPr id="45" name="Rectangle 44"/>
+            <p:cNvSpPr/>
+            <p:nvPr/>
+          </p:nvSpPr>
+          <p:spPr>
+            <a:xfrm>
+              <a:off x="3644773" y="1276075"/>
+              <a:ext cx="741789" cy="152821"/>
+            </a:xfrm>
+            <a:prstGeom prst="rect">
+              <a:avLst/>
+            </a:prstGeom>
+            <a:solidFill>
+              <a:srgbClr val="0070C0"/>
+            </a:solidFill>
+            <a:ln>
+              <a:noFill/>
+            </a:ln>
+          </p:spPr>
+          <p:style>
+            <a:lnRef idx="2">
+              <a:schemeClr val="accent1">
+                <a:shade val="50000"/>
+              </a:schemeClr>
+            </a:lnRef>
+            <a:fillRef idx="1">
+              <a:schemeClr val="accent1"/>
+            </a:fillRef>
+            <a:effectRef idx="0">
+              <a:schemeClr val="accent1"/>
+            </a:effectRef>
+            <a:fontRef idx="minor">
+              <a:schemeClr val="lt1"/>
+            </a:fontRef>
+          </p:style>
+          <p:txBody>
+            <a:bodyPr rtlCol="0" anchor="ctr"/>
+            <a:lstStyle/>
+            <a:p>
+              <a:pPr algn="ctr"/>
+              <a:endParaRPr lang="en-SG"/>
+            </a:p>
+          </p:txBody>
+        </p:sp>
+        <p:grpSp>
+          <p:nvGrpSpPr>
+            <p:cNvPr id="46" name="Group 45"/>
+            <p:cNvGrpSpPr/>
+            <p:nvPr/>
+          </p:nvGrpSpPr>
+          <p:grpSpPr>
+            <a:xfrm>
+              <a:off x="3771309" y="1324173"/>
+              <a:ext cx="522208" cy="64354"/>
+              <a:chOff x="3373711" y="2751692"/>
+              <a:chExt cx="522207" cy="64353"/>
+            </a:xfrm>
+            <a:solidFill>
+              <a:schemeClr val="bg1"/>
+            </a:solidFill>
+          </p:grpSpPr>
+          <p:sp>
+            <p:nvSpPr>
+              <p:cNvPr id="47" name="Rounded Rectangle 180"/>
+              <p:cNvSpPr/>
+              <p:nvPr/>
+            </p:nvSpPr>
+            <p:spPr>
+              <a:xfrm>
+                <a:off x="3487068" y="2751692"/>
+                <a:ext cx="408850" cy="64353"/>
+              </a:xfrm>
+              <a:prstGeom prst="roundRect">
+                <a:avLst/>
+              </a:prstGeom>
+              <a:grpFill/>
+              <a:ln>
+                <a:noFill/>
+              </a:ln>
+            </p:spPr>
+            <p:style>
+              <a:lnRef idx="2">
+                <a:schemeClr val="accent1">
+                  <a:shade val="50000"/>
+                </a:schemeClr>
+              </a:lnRef>
+              <a:fillRef idx="1">
+                <a:schemeClr val="accent1"/>
+              </a:fillRef>
+              <a:effectRef idx="0">
+                <a:schemeClr val="accent1"/>
+              </a:effectRef>
+              <a:fontRef idx="minor">
+                <a:schemeClr val="lt1"/>
+              </a:fontRef>
+            </p:style>
+            <p:txBody>
+              <a:bodyPr rtlCol="0" anchor="ctr"/>
+              <a:lstStyle/>
+              <a:p>
+                <a:pPr algn="ctr"/>
+                <a:endParaRPr lang="en-US"/>
+              </a:p>
+            </p:txBody>
+          </p:sp>
+          <p:sp>
+            <p:nvSpPr>
+              <p:cNvPr id="48" name="Rounded Rectangle 181"/>
+              <p:cNvSpPr/>
+              <p:nvPr/>
+            </p:nvSpPr>
+            <p:spPr>
+              <a:xfrm>
+                <a:off x="3373711" y="2751692"/>
+                <a:ext cx="51086" cy="64353"/>
+              </a:xfrm>
+              <a:prstGeom prst="roundRect">
+                <a:avLst/>
+              </a:prstGeom>
+              <a:grpFill/>
+              <a:ln>
+                <a:noFill/>
+              </a:ln>
+            </p:spPr>
+            <p:style>
+              <a:lnRef idx="2">
+                <a:schemeClr val="accent1">
+                  <a:shade val="50000"/>
+                </a:schemeClr>
+              </a:lnRef>
+              <a:fillRef idx="1">
+                <a:schemeClr val="accent1"/>
+              </a:fillRef>
+              <a:effectRef idx="0">
+                <a:schemeClr val="accent1"/>
+              </a:effectRef>
+              <a:fontRef idx="minor">
+                <a:schemeClr val="lt1"/>
+              </a:fontRef>
+            </p:style>
+            <p:txBody>
+              <a:bodyPr rtlCol="0" anchor="ctr"/>
+              <a:lstStyle/>
+              <a:p>
+                <a:pPr algn="ctr"/>
+                <a:endParaRPr lang="en-US"/>
+              </a:p>
+            </p:txBody>
+          </p:sp>
+        </p:grpSp>
+      </p:grpSp>
+      <p:grpSp>
+        <p:nvGrpSpPr>
+          <p:cNvPr id="4" name="Group 3"/>
+          <p:cNvGrpSpPr/>
+          <p:nvPr/>
+        </p:nvGrpSpPr>
+        <p:grpSpPr>
+          <a:xfrm>
+            <a:off x="3388322" y="1206098"/>
+            <a:ext cx="228600" cy="228600"/>
+            <a:chOff x="3388322" y="1206098"/>
+            <a:chExt cx="228600" cy="228600"/>
+          </a:xfrm>
+        </p:grpSpPr>
+        <p:sp>
+          <p:nvSpPr>
+            <p:cNvPr id="58" name="Rectangle 57"/>
+            <p:cNvSpPr/>
+            <p:nvPr/>
+          </p:nvSpPr>
+          <p:spPr>
+            <a:xfrm>
+              <a:off x="3388322" y="1206098"/>
+              <a:ext cx="228600" cy="228600"/>
+            </a:xfrm>
+            <a:prstGeom prst="rect">
+              <a:avLst/>
+            </a:prstGeom>
+            <a:solidFill>
+              <a:schemeClr val="accent6"/>
+            </a:solidFill>
+            <a:ln>
+              <a:noFill/>
+            </a:ln>
+          </p:spPr>
+          <p:style>
+            <a:lnRef idx="2">
+              <a:schemeClr val="accent1">
+                <a:shade val="50000"/>
+              </a:schemeClr>
+            </a:lnRef>
+            <a:fillRef idx="1">
+              <a:schemeClr val="accent1"/>
+            </a:fillRef>
+            <a:effectRef idx="0">
+              <a:schemeClr val="accent1"/>
+            </a:effectRef>
+            <a:fontRef idx="minor">
+              <a:schemeClr val="lt1"/>
+            </a:fontRef>
+          </p:style>
+          <p:txBody>
+            <a:bodyPr rtlCol="0" anchor="ctr"/>
+            <a:lstStyle/>
+            <a:p>
+              <a:pPr algn="ctr"/>
+              <a:endParaRPr lang="en-US" u="sng"/>
+            </a:p>
+          </p:txBody>
+        </p:sp>
+        <p:sp>
+          <p:nvSpPr>
+            <p:cNvPr id="60" name="Flowchart: Connector 59"/>
+            <p:cNvSpPr/>
+            <p:nvPr/>
+          </p:nvSpPr>
+          <p:spPr>
+            <a:xfrm rot="5400000">
+              <a:off x="3420969" y="1235237"/>
+              <a:ext cx="32294" cy="32294"/>
+            </a:xfrm>
+            <a:prstGeom prst="flowChartConnector">
+              <a:avLst/>
+            </a:prstGeom>
+            <a:solidFill>
+              <a:schemeClr val="bg1"/>
+            </a:solidFill>
+            <a:ln>
+              <a:solidFill>
+                <a:schemeClr val="bg1"/>
+              </a:solidFill>
+            </a:ln>
+          </p:spPr>
+          <p:style>
+            <a:lnRef idx="2">
+              <a:schemeClr val="accent1">
+                <a:shade val="50000"/>
+              </a:schemeClr>
+            </a:lnRef>
+            <a:fillRef idx="1">
+              <a:schemeClr val="accent1"/>
+            </a:fillRef>
+            <a:effectRef idx="0">
+              <a:schemeClr val="accent1"/>
+            </a:effectRef>
+            <a:fontRef idx="minor">
+              <a:schemeClr val="lt1"/>
+            </a:fontRef>
+          </p:style>
+          <p:txBody>
+            <a:bodyPr rtlCol="0" anchor="ctr"/>
+            <a:lstStyle/>
+            <a:p>
+              <a:pPr algn="ctr"/>
+              <a:endParaRPr lang="en-US" u="sng"/>
+            </a:p>
+          </p:txBody>
+        </p:sp>
+        <p:sp>
+          <p:nvSpPr>
+            <p:cNvPr id="61" name="Flowchart: Connector 60"/>
+            <p:cNvSpPr/>
+            <p:nvPr/>
+          </p:nvSpPr>
+          <p:spPr>
+            <a:xfrm rot="18937352">
+              <a:off x="3555557" y="1293338"/>
+              <a:ext cx="32294" cy="32294"/>
+            </a:xfrm>
+            <a:prstGeom prst="flowChartConnector">
+              <a:avLst/>
+            </a:prstGeom>
+            <a:solidFill>
+              <a:schemeClr val="bg1"/>
+            </a:solidFill>
+            <a:ln>
+              <a:solidFill>
+                <a:schemeClr val="bg1"/>
+              </a:solidFill>
+            </a:ln>
+          </p:spPr>
+          <p:style>
+            <a:lnRef idx="2">
+              <a:schemeClr val="accent1">
+                <a:shade val="50000"/>
+              </a:schemeClr>
+            </a:lnRef>
+            <a:fillRef idx="1">
+              <a:schemeClr val="accent1"/>
+            </a:fillRef>
+            <a:effectRef idx="0">
+              <a:schemeClr val="accent1"/>
+            </a:effectRef>
+            <a:fontRef idx="minor">
+              <a:schemeClr val="lt1"/>
+            </a:fontRef>
+          </p:style>
+          <p:txBody>
+            <a:bodyPr rtlCol="0" anchor="ctr"/>
+            <a:lstStyle/>
+            <a:p>
+              <a:pPr algn="ctr"/>
+              <a:endParaRPr lang="en-US" u="sng"/>
+            </a:p>
+          </p:txBody>
+        </p:sp>
+        <p:sp>
+          <p:nvSpPr>
+            <p:cNvPr id="62" name="Freeform 98"/>
+            <p:cNvSpPr/>
+            <p:nvPr/>
+          </p:nvSpPr>
+          <p:spPr>
+            <a:xfrm>
+              <a:off x="3479605" y="1235237"/>
+              <a:ext cx="79416" cy="45719"/>
+            </a:xfrm>
+            <a:custGeom>
+              <a:avLst/>
+              <a:gdLst>
+                <a:gd name="connsiteX0" fmla="*/ 0 w 365125"/>
+                <a:gd name="connsiteY0" fmla="*/ 0 h 79375"/>
+                <a:gd name="connsiteX1" fmla="*/ 196850 w 365125"/>
+                <a:gd name="connsiteY1" fmla="*/ 0 h 79375"/>
+                <a:gd name="connsiteX2" fmla="*/ 365125 w 365125"/>
+                <a:gd name="connsiteY2" fmla="*/ 79375 h 79375"/>
+                <a:gd name="connsiteX0" fmla="*/ 0 w 365125"/>
+                <a:gd name="connsiteY0" fmla="*/ 5879 h 85254"/>
+                <a:gd name="connsiteX1" fmla="*/ 196850 w 365125"/>
+                <a:gd name="connsiteY1" fmla="*/ 5879 h 85254"/>
+                <a:gd name="connsiteX2" fmla="*/ 365125 w 365125"/>
+                <a:gd name="connsiteY2" fmla="*/ 85254 h 85254"/>
+                <a:gd name="connsiteX0" fmla="*/ 0 w 365125"/>
+                <a:gd name="connsiteY0" fmla="*/ 16459 h 95834"/>
+                <a:gd name="connsiteX1" fmla="*/ 142875 w 365125"/>
+                <a:gd name="connsiteY1" fmla="*/ 3759 h 95834"/>
+                <a:gd name="connsiteX2" fmla="*/ 365125 w 365125"/>
+                <a:gd name="connsiteY2" fmla="*/ 95834 h 95834"/>
+                <a:gd name="connsiteX0" fmla="*/ 0 w 365125"/>
+                <a:gd name="connsiteY0" fmla="*/ 13245 h 92620"/>
+                <a:gd name="connsiteX1" fmla="*/ 142875 w 365125"/>
+                <a:gd name="connsiteY1" fmla="*/ 545 h 92620"/>
+                <a:gd name="connsiteX2" fmla="*/ 365125 w 365125"/>
+                <a:gd name="connsiteY2" fmla="*/ 92620 h 92620"/>
+                <a:gd name="connsiteX0" fmla="*/ 0 w 365125"/>
+                <a:gd name="connsiteY0" fmla="*/ 15332 h 94707"/>
+                <a:gd name="connsiteX1" fmla="*/ 142875 w 365125"/>
+                <a:gd name="connsiteY1" fmla="*/ 2632 h 94707"/>
+                <a:gd name="connsiteX2" fmla="*/ 365125 w 365125"/>
+                <a:gd name="connsiteY2" fmla="*/ 94707 h 94707"/>
+              </a:gdLst>
+              <a:ahLst/>
+              <a:cxnLst>
+                <a:cxn ang="0">
+                  <a:pos x="connsiteX0" y="connsiteY0"/>
+                </a:cxn>
+                <a:cxn ang="0">
+                  <a:pos x="connsiteX1" y="connsiteY1"/>
+                </a:cxn>
+                <a:cxn ang="0">
+                  <a:pos x="connsiteX2" y="connsiteY2"/>
+                </a:cxn>
+              </a:cxnLst>
+              <a:rect l="l" t="t" r="r" b="b"/>
+              <a:pathLst>
+                <a:path w="365125" h="94707">
+                  <a:moveTo>
+                    <a:pt x="0" y="15332"/>
+                  </a:moveTo>
+                  <a:cubicBezTo>
+                    <a:pt x="68792" y="-3718"/>
+                    <a:pt x="75671" y="-1072"/>
+                    <a:pt x="142875" y="2632"/>
+                  </a:cubicBezTo>
+                  <a:cubicBezTo>
+                    <a:pt x="210079" y="6336"/>
+                    <a:pt x="309033" y="68249"/>
+                    <a:pt x="365125" y="94707"/>
+                  </a:cubicBezTo>
+                </a:path>
+              </a:pathLst>
+            </a:custGeom>
+            <a:ln w="9525" cap="rnd">
+              <a:solidFill>
+                <a:srgbClr val="0070C0"/>
+              </a:solidFill>
+              <a:headEnd type="none" w="sm" len="sm"/>
+              <a:tailEnd type="triangle" w="sm" len="sm"/>
+            </a:ln>
+          </p:spPr>
+          <p:style>
+            <a:lnRef idx="1">
+              <a:schemeClr val="accent1"/>
+            </a:lnRef>
+            <a:fillRef idx="0">
+              <a:schemeClr val="accent1"/>
+            </a:fillRef>
+            <a:effectRef idx="0">
+              <a:schemeClr val="accent1"/>
+            </a:effectRef>
+            <a:fontRef idx="minor">
+              <a:schemeClr val="tx1"/>
+            </a:fontRef>
+          </p:style>
+          <p:txBody>
+            <a:bodyPr rtlCol="0" anchor="ctr"/>
+            <a:lstStyle/>
+            <a:p>
+              <a:pPr algn="ctr"/>
+              <a:endParaRPr lang="en-US" u="sng" dirty="0"/>
+            </a:p>
+          </p:txBody>
+        </p:sp>
+        <p:sp>
+          <p:nvSpPr>
+            <p:cNvPr id="63" name="Freeform 122"/>
+            <p:cNvSpPr/>
+            <p:nvPr/>
+          </p:nvSpPr>
+          <p:spPr>
+            <a:xfrm rot="685869">
+              <a:off x="3475686" y="1334403"/>
+              <a:ext cx="63861" cy="64613"/>
+            </a:xfrm>
+            <a:custGeom>
+              <a:avLst/>
+              <a:gdLst>
+                <a:gd name="connsiteX0" fmla="*/ 361950 w 361950"/>
+                <a:gd name="connsiteY0" fmla="*/ 0 h 190500"/>
+                <a:gd name="connsiteX1" fmla="*/ 225425 w 361950"/>
+                <a:gd name="connsiteY1" fmla="*/ 146050 h 190500"/>
+                <a:gd name="connsiteX2" fmla="*/ 0 w 361950"/>
+                <a:gd name="connsiteY2" fmla="*/ 190500 h 190500"/>
+                <a:gd name="connsiteX0" fmla="*/ 361950 w 361950"/>
+                <a:gd name="connsiteY0" fmla="*/ 0 h 190500"/>
+                <a:gd name="connsiteX1" fmla="*/ 225425 w 361950"/>
+                <a:gd name="connsiteY1" fmla="*/ 146050 h 190500"/>
+                <a:gd name="connsiteX2" fmla="*/ 0 w 361950"/>
+                <a:gd name="connsiteY2" fmla="*/ 190500 h 190500"/>
+                <a:gd name="connsiteX0" fmla="*/ 361950 w 361950"/>
+                <a:gd name="connsiteY0" fmla="*/ 0 h 190500"/>
+                <a:gd name="connsiteX1" fmla="*/ 225425 w 361950"/>
+                <a:gd name="connsiteY1" fmla="*/ 146050 h 190500"/>
+                <a:gd name="connsiteX2" fmla="*/ 0 w 361950"/>
+                <a:gd name="connsiteY2" fmla="*/ 190500 h 190500"/>
+                <a:gd name="connsiteX0" fmla="*/ 358775 w 358775"/>
+                <a:gd name="connsiteY0" fmla="*/ 0 h 177800"/>
+                <a:gd name="connsiteX1" fmla="*/ 225425 w 358775"/>
+                <a:gd name="connsiteY1" fmla="*/ 133350 h 177800"/>
+                <a:gd name="connsiteX2" fmla="*/ 0 w 358775"/>
+                <a:gd name="connsiteY2" fmla="*/ 177800 h 177800"/>
+                <a:gd name="connsiteX0" fmla="*/ 358775 w 358775"/>
+                <a:gd name="connsiteY0" fmla="*/ 0 h 177800"/>
+                <a:gd name="connsiteX1" fmla="*/ 222250 w 358775"/>
+                <a:gd name="connsiteY1" fmla="*/ 120650 h 177800"/>
+                <a:gd name="connsiteX2" fmla="*/ 0 w 358775"/>
+                <a:gd name="connsiteY2" fmla="*/ 177800 h 177800"/>
+              </a:gdLst>
+              <a:ahLst/>
+              <a:cxnLst>
+                <a:cxn ang="0">
+                  <a:pos x="connsiteX0" y="connsiteY0"/>
+                </a:cxn>
+                <a:cxn ang="0">
+                  <a:pos x="connsiteX1" y="connsiteY1"/>
+                </a:cxn>
+                <a:cxn ang="0">
+                  <a:pos x="connsiteX2" y="connsiteY2"/>
+                </a:cxn>
+              </a:cxnLst>
+              <a:rect l="l" t="t" r="r" b="b"/>
+              <a:pathLst>
+                <a:path w="358775" h="177800">
+                  <a:moveTo>
+                    <a:pt x="358775" y="0"/>
+                  </a:moveTo>
+                  <a:cubicBezTo>
+                    <a:pt x="322792" y="67733"/>
+                    <a:pt x="282046" y="91017"/>
+                    <a:pt x="222250" y="120650"/>
+                  </a:cubicBezTo>
+                  <a:cubicBezTo>
+                    <a:pt x="162454" y="150283"/>
+                    <a:pt x="75142" y="162983"/>
+                    <a:pt x="0" y="177800"/>
+                  </a:cubicBezTo>
+                </a:path>
+              </a:pathLst>
+            </a:custGeom>
+            <a:ln w="9525" cap="rnd">
+              <a:solidFill>
+                <a:srgbClr val="0070C0"/>
+              </a:solidFill>
+              <a:headEnd type="none" w="med" len="med"/>
+              <a:tailEnd type="triangle" w="sm" len="sm"/>
+            </a:ln>
+          </p:spPr>
+          <p:style>
+            <a:lnRef idx="1">
+              <a:schemeClr val="accent1"/>
+            </a:lnRef>
+            <a:fillRef idx="0">
+              <a:schemeClr val="accent1"/>
+            </a:fillRef>
+            <a:effectRef idx="0">
+              <a:schemeClr val="accent1"/>
+            </a:effectRef>
+            <a:fontRef idx="minor">
+              <a:schemeClr val="tx1"/>
+            </a:fontRef>
+          </p:style>
+          <p:txBody>
+            <a:bodyPr rtlCol="0" anchor="ctr"/>
+            <a:lstStyle/>
+            <a:p>
+              <a:pPr algn="ctr"/>
+              <a:endParaRPr lang="en-US" u="sng">
+                <a:solidFill>
+                  <a:schemeClr val="tx1"/>
+                </a:solidFill>
+              </a:endParaRPr>
+            </a:p>
+          </p:txBody>
+        </p:sp>
+        <p:sp>
+          <p:nvSpPr>
+            <p:cNvPr id="65" name="Flowchart: Connector 64"/>
+            <p:cNvSpPr/>
+            <p:nvPr/>
+          </p:nvSpPr>
+          <p:spPr>
+            <a:xfrm rot="5400000">
+              <a:off x="3421008" y="1369701"/>
+              <a:ext cx="32294" cy="32294"/>
+            </a:xfrm>
+            <a:prstGeom prst="flowChartConnector">
+              <a:avLst/>
+            </a:prstGeom>
+            <a:solidFill>
+              <a:schemeClr val="bg1"/>
+            </a:solidFill>
+            <a:ln>
+              <a:solidFill>
+                <a:schemeClr val="bg1"/>
+              </a:solidFill>
+            </a:ln>
+          </p:spPr>
+          <p:style>
+            <a:lnRef idx="2">
+              <a:schemeClr val="accent1">
+                <a:shade val="50000"/>
+              </a:schemeClr>
+            </a:lnRef>
+            <a:fillRef idx="1">
+              <a:schemeClr val="accent1"/>
+            </a:fillRef>
+            <a:effectRef idx="0">
+              <a:schemeClr val="accent1"/>
+            </a:effectRef>
+            <a:fontRef idx="minor">
+              <a:schemeClr val="lt1"/>
+            </a:fontRef>
+          </p:style>
+          <p:txBody>
+            <a:bodyPr rtlCol="0" anchor="ctr"/>
+            <a:lstStyle/>
+            <a:p>
+              <a:pPr algn="ctr"/>
+              <a:endParaRPr lang="en-US" u="sng"/>
+            </a:p>
+          </p:txBody>
+        </p:sp>
+      </p:grpSp>
+      <p:sp>
+        <p:nvSpPr>
+          <p:cNvPr id="67" name="TextBox 66"/>
+          <p:cNvSpPr txBox="1"/>
+          <p:nvPr/>
+        </p:nvSpPr>
+        <p:spPr>
+          <a:xfrm>
+            <a:off x="3264310" y="1443949"/>
+            <a:ext cx="482001" cy="138499"/>
+          </a:xfrm>
+          <a:prstGeom prst="rect">
+            <a:avLst/>
+          </a:prstGeom>
+          <a:noFill/>
+        </p:spPr>
+        <p:txBody>
+          <a:bodyPr wrap="square" rtlCol="0">
+            <a:spAutoFit/>
+          </a:bodyPr>
+          <a:lstStyle/>
+          <a:p>
+            <a:pPr algn="ctr"/>
+            <a:r>
+              <a:rPr lang="en-US" sz="300" dirty="0"/>
+              <a:t>Animation Lab</a:t>
             </a:r>
             <a:endParaRPr lang="en-SG" sz="300" dirty="0"/>
           </a:p>
@@ -12262,13 +13093,6 @@
   <p:clrMapOvr>
     <a:masterClrMapping/>
   </p:clrMapOvr>
-  <p:timing>
-    <p:tnLst>
-      <p:par>
-        <p:cTn id="1" dur="indefinite" restart="never" nodeType="tmRoot"/>
-      </p:par>
-    </p:tnLst>
-  </p:timing>
 </p:sld>
 </file>
 
@@ -12312,7 +13136,7 @@
           <a:lstStyle/>
           <a:p>
             <a:r>
-              <a:rPr lang="en-US" dirty="0" smtClean="0"/>
+              <a:rPr lang="en-US" dirty="0"/>
               <a:t>Colors Lab</a:t>
             </a:r>
             <a:endParaRPr lang="en-SG" dirty="0"/>
@@ -12387,16 +13211,8 @@
           <a:p>
             <a:pPr algn="ctr"/>
             <a:r>
-              <a:rPr lang="en-US" sz="800" dirty="0" smtClean="0"/>
-              <a:t>Colors </a:t>
-            </a:r>
-            <a:r>
               <a:rPr lang="en-US" sz="800" dirty="0"/>
-              <a:t>L</a:t>
-            </a:r>
-            <a:r>
-              <a:rPr lang="en-US" sz="800" dirty="0" smtClean="0"/>
-              <a:t>ab</a:t>
+              <a:t>Colors Lab</a:t>
             </a:r>
             <a:endParaRPr lang="en-SG" sz="800" dirty="0"/>
           </a:p>
@@ -14705,7 +15521,7 @@
           <a:lstStyle/>
           <a:p>
             <a:r>
-              <a:rPr lang="en-US" sz="800" dirty="0" smtClean="0"/>
+              <a:rPr lang="en-US" sz="800" dirty="0"/>
               <a:t>Pick text color</a:t>
             </a:r>
             <a:endParaRPr lang="en-SG" sz="800" dirty="0"/>
@@ -14735,7 +15551,7 @@
           <a:lstStyle/>
           <a:p>
             <a:r>
-              <a:rPr lang="en-US" sz="800" dirty="0" smtClean="0"/>
+              <a:rPr lang="en-US" sz="800" dirty="0"/>
               <a:t>Pick line color</a:t>
             </a:r>
             <a:endParaRPr lang="en-SG" sz="800" dirty="0"/>
@@ -14765,7 +15581,7 @@
           <a:lstStyle/>
           <a:p>
             <a:r>
-              <a:rPr lang="en-US" sz="800" dirty="0" smtClean="0"/>
+              <a:rPr lang="en-US" sz="800" dirty="0"/>
               <a:t>Pick fill color</a:t>
             </a:r>
             <a:endParaRPr lang="en-SG" sz="800" dirty="0"/>
@@ -14795,7 +15611,7 @@
           <a:lstStyle/>
           <a:p>
             <a:r>
-              <a:rPr lang="en-US" sz="800" dirty="0" smtClean="0"/>
+              <a:rPr lang="en-US" sz="800" dirty="0"/>
               <a:t>brightness</a:t>
             </a:r>
             <a:endParaRPr lang="en-SG" sz="800" dirty="0"/>
@@ -14825,7 +15641,7 @@
           <a:lstStyle/>
           <a:p>
             <a:r>
-              <a:rPr lang="en-US" sz="800" dirty="0" smtClean="0"/>
+              <a:rPr lang="en-US" sz="800" dirty="0"/>
               <a:t>saturation</a:t>
             </a:r>
             <a:endParaRPr lang="en-SG" sz="800" dirty="0"/>
@@ -15258,7 +16074,7 @@
           <a:p>
             <a:pPr algn="ctr"/>
             <a:r>
-              <a:rPr lang="en-US" sz="800" dirty="0" smtClean="0"/>
+              <a:rPr lang="en-US" sz="800" dirty="0"/>
               <a:t>Colors Lab (alternative)</a:t>
             </a:r>
             <a:endParaRPr lang="en-SG" sz="800" dirty="0"/>
@@ -16277,7 +17093,7 @@
           <a:lstStyle/>
           <a:p>
             <a:r>
-              <a:rPr lang="en-US" sz="800" dirty="0" smtClean="0"/>
+              <a:rPr lang="en-US" sz="800" dirty="0"/>
               <a:t>Save, load, clear, reload, apply</a:t>
             </a:r>
             <a:endParaRPr lang="en-SG" sz="800" dirty="0"/>
@@ -16294,13 +17110,6 @@
   <p:clrMapOvr>
     <a:masterClrMapping/>
   </p:clrMapOvr>
-  <p:timing>
-    <p:tnLst>
-      <p:par>
-        <p:cTn id="1" dur="indefinite" restart="never" nodeType="tmRoot"/>
-      </p:par>
-    </p:tnLst>
-  </p:timing>
 </p:sld>
 </file>
 
@@ -16344,7 +17153,7 @@
           <a:lstStyle/>
           <a:p>
             <a:r>
-              <a:rPr lang="en-US" dirty="0" smtClean="0"/>
+              <a:rPr lang="en-US" dirty="0"/>
               <a:t>Shapes Lab</a:t>
             </a:r>
             <a:endParaRPr lang="en-SG" dirty="0"/>
@@ -16375,16 +17184,8 @@
           <a:p>
             <a:pPr algn="ctr"/>
             <a:r>
-              <a:rPr lang="en-US" sz="800" dirty="0" smtClean="0"/>
-              <a:t>Shapes </a:t>
-            </a:r>
-            <a:r>
               <a:rPr lang="en-US" sz="800" dirty="0"/>
-              <a:t>L</a:t>
-            </a:r>
-            <a:r>
-              <a:rPr lang="en-US" sz="800" dirty="0" smtClean="0"/>
-              <a:t>ab</a:t>
+              <a:t>Shapes Lab</a:t>
             </a:r>
             <a:endParaRPr lang="en-SG" sz="800" dirty="0"/>
           </a:p>
@@ -16713,7 +17514,7 @@
           <a:p>
             <a:pPr algn="ctr"/>
             <a:r>
-              <a:rPr lang="en-US" sz="1100" dirty="0" smtClean="0"/>
+              <a:rPr lang="en-US" sz="1100" dirty="0"/>
               <a:t>Add to custom shapes</a:t>
             </a:r>
             <a:endParaRPr lang="en-SG" sz="1100" dirty="0"/>
@@ -17214,7 +18015,7 @@
           <a:p>
             <a:pPr algn="ctr"/>
             <a:r>
-              <a:rPr lang="en-US" sz="1100" dirty="0" smtClean="0"/>
+              <a:rPr lang="en-US" sz="1100" dirty="0"/>
               <a:t>Add to slide</a:t>
             </a:r>
             <a:endParaRPr lang="en-SG" sz="1100" dirty="0"/>
@@ -17231,13 +18032,6 @@
   <p:clrMapOvr>
     <a:masterClrMapping/>
   </p:clrMapOvr>
-  <p:timing>
-    <p:tnLst>
-      <p:par>
-        <p:cTn id="1" dur="indefinite" restart="never" nodeType="tmRoot"/>
-      </p:par>
-    </p:tnLst>
-  </p:timing>
 </p:sld>
 </file>
 
@@ -17281,7 +18075,7 @@
           <a:lstStyle/>
           <a:p>
             <a:r>
-              <a:rPr lang="en-US" dirty="0" smtClean="0"/>
+              <a:rPr lang="en-US" dirty="0"/>
               <a:t>Effects Lab</a:t>
             </a:r>
             <a:endParaRPr lang="en-SG" dirty="0"/>
@@ -17312,16 +18106,8 @@
           <a:p>
             <a:pPr algn="ctr"/>
             <a:r>
-              <a:rPr lang="en-US" sz="800" dirty="0" smtClean="0"/>
-              <a:t>Effects </a:t>
-            </a:r>
-            <a:r>
               <a:rPr lang="en-US" sz="800" dirty="0"/>
-              <a:t>L</a:t>
-            </a:r>
-            <a:r>
-              <a:rPr lang="en-US" sz="800" dirty="0" smtClean="0"/>
-              <a:t>ab</a:t>
+              <a:t>Effects Lab</a:t>
             </a:r>
             <a:endParaRPr lang="en-SG" sz="800" dirty="0"/>
           </a:p>
@@ -17547,7 +18333,7 @@
           <a:p>
             <a:pPr algn="ctr"/>
             <a:r>
-              <a:rPr lang="en-US" sz="1100" dirty="0" smtClean="0"/>
+              <a:rPr lang="en-US" sz="1100" dirty="0"/>
               <a:t>Make transparent</a:t>
             </a:r>
           </a:p>
@@ -18140,7 +18926,7 @@
           <a:p>
             <a:pPr algn="ctr"/>
             <a:r>
-              <a:rPr lang="en-US" sz="1100" dirty="0" smtClean="0"/>
+              <a:rPr lang="en-US" sz="1100" dirty="0"/>
               <a:t>Magnify</a:t>
             </a:r>
           </a:p>
@@ -18170,7 +18956,7 @@
           <a:p>
             <a:pPr algn="ctr"/>
             <a:r>
-              <a:rPr lang="en-US" sz="1100" dirty="0" smtClean="0"/>
+              <a:rPr lang="en-US" sz="1100" dirty="0"/>
               <a:t>recolor remainder</a:t>
             </a:r>
           </a:p>
@@ -18244,7 +19030,7 @@
           <a:p>
             <a:pPr algn="ctr"/>
             <a:r>
-              <a:rPr lang="en-US" sz="1100" dirty="0" smtClean="0"/>
+              <a:rPr lang="en-US" sz="1100" dirty="0"/>
               <a:t>Blur remainder</a:t>
             </a:r>
           </a:p>
@@ -19458,7 +20244,7 @@
           <a:p>
             <a:pPr algn="ctr"/>
             <a:r>
-              <a:rPr lang="en-US" sz="1100" dirty="0" smtClean="0"/>
+              <a:rPr lang="en-US" sz="1100" dirty="0"/>
               <a:t>Frosted glass</a:t>
             </a:r>
           </a:p>
@@ -19474,13 +20260,6 @@
   <p:clrMapOvr>
     <a:masterClrMapping/>
   </p:clrMapOvr>
-  <p:timing>
-    <p:tnLst>
-      <p:par>
-        <p:cTn id="1" dur="indefinite" restart="never" nodeType="tmRoot"/>
-      </p:par>
-    </p:tnLst>
-  </p:timing>
 </p:sld>
 </file>
 
@@ -19524,7 +20303,7 @@
           <a:lstStyle/>
           <a:p>
             <a:r>
-              <a:rPr lang="en-US" dirty="0" smtClean="0"/>
+              <a:rPr lang="en-US" dirty="0"/>
               <a:t>Agenda Lab</a:t>
             </a:r>
             <a:endParaRPr lang="en-SG" dirty="0"/>
@@ -19555,16 +20334,8 @@
           <a:p>
             <a:pPr algn="ctr"/>
             <a:r>
-              <a:rPr lang="en-US" sz="800" dirty="0" smtClean="0"/>
-              <a:t>Agenda </a:t>
-            </a:r>
-            <a:r>
               <a:rPr lang="en-US" sz="800" dirty="0"/>
-              <a:t>L</a:t>
-            </a:r>
-            <a:r>
-              <a:rPr lang="en-US" sz="800" dirty="0" smtClean="0"/>
-              <a:t>ab</a:t>
+              <a:t>Agenda Lab</a:t>
             </a:r>
             <a:endParaRPr lang="en-SG" sz="800" dirty="0"/>
           </a:p>
@@ -19638,7 +20409,7 @@
           <a:p>
             <a:pPr algn="ctr"/>
             <a:r>
-              <a:rPr lang="en-US" sz="1100" dirty="0" smtClean="0"/>
+              <a:rPr lang="en-US" sz="1100" dirty="0"/>
               <a:t>Text agenda</a:t>
             </a:r>
           </a:p>
@@ -19668,7 +20439,7 @@
           <a:p>
             <a:pPr algn="ctr"/>
             <a:r>
-              <a:rPr lang="en-US" sz="1100" dirty="0" smtClean="0"/>
+              <a:rPr lang="en-US" sz="1100" dirty="0"/>
               <a:t>Visual agenda </a:t>
             </a:r>
           </a:p>
@@ -19698,7 +20469,7 @@
           <a:p>
             <a:pPr algn="ctr"/>
             <a:r>
-              <a:rPr lang="en-US" sz="1100" dirty="0" smtClean="0"/>
+              <a:rPr lang="en-US" sz="1100" dirty="0"/>
               <a:t>Agenda sidebar</a:t>
             </a:r>
           </a:p>
@@ -19807,7 +20578,7 @@
             <a:p>
               <a:pPr algn="ctr"/>
               <a:r>
-                <a:rPr lang="en-US" sz="6000" dirty="0" smtClean="0">
+                <a:rPr lang="en-US" sz="6000" dirty="0">
                   <a:solidFill>
                     <a:schemeClr val="accent6">
                       <a:lumMod val="75000"/>
@@ -22126,7 +22897,7 @@
           <a:p>
             <a:pPr algn="ctr"/>
             <a:r>
-              <a:rPr lang="en-US" sz="1100" dirty="0" smtClean="0"/>
+              <a:rPr lang="en-US" sz="1100" dirty="0"/>
               <a:t>remove</a:t>
             </a:r>
           </a:p>
@@ -22156,7 +22927,7 @@
           <a:p>
             <a:pPr algn="ctr"/>
             <a:r>
-              <a:rPr lang="en-US" sz="1100" dirty="0" smtClean="0"/>
+              <a:rPr lang="en-US" sz="1100" dirty="0"/>
               <a:t>settings</a:t>
             </a:r>
           </a:p>
@@ -22186,7 +22957,7 @@
           <a:p>
             <a:pPr algn="ctr"/>
             <a:r>
-              <a:rPr lang="en-US" sz="1100" dirty="0" smtClean="0"/>
+              <a:rPr lang="en-US" sz="1100" dirty="0"/>
               <a:t>sync</a:t>
             </a:r>
           </a:p>
@@ -22202,13 +22973,6 @@
   <p:clrMapOvr>
     <a:masterClrMapping/>
   </p:clrMapOvr>
-  <p:timing>
-    <p:tnLst>
-      <p:par>
-        <p:cTn id="1" dur="indefinite" restart="never" nodeType="tmRoot"/>
-      </p:par>
-    </p:tnLst>
-  </p:timing>
 </p:sld>
 </file>
 
@@ -22252,7 +23016,7 @@
           <a:lstStyle/>
           <a:p>
             <a:r>
-              <a:rPr lang="en-US" dirty="0" smtClean="0"/>
+              <a:rPr lang="en-US" dirty="0"/>
               <a:t>Images Lab</a:t>
             </a:r>
             <a:endParaRPr lang="en-SG" dirty="0"/>
@@ -22283,7 +23047,7 @@
           <a:p>
             <a:pPr algn="ctr"/>
             <a:r>
-              <a:rPr lang="en-US" sz="800" dirty="0" smtClean="0"/>
+              <a:rPr lang="en-US" sz="800" dirty="0"/>
               <a:t>Images Lab</a:t>
             </a:r>
             <a:endParaRPr lang="en-SG" sz="800" dirty="0"/>
@@ -23073,13 +23837,6 @@
   <p:clrMapOvr>
     <a:masterClrMapping/>
   </p:clrMapOvr>
-  <p:timing>
-    <p:tnLst>
-      <p:par>
-        <p:cTn id="1" dur="indefinite" restart="never" nodeType="tmRoot"/>
-      </p:par>
-    </p:tnLst>
-  </p:timing>
 </p:sld>
 </file>
 
@@ -24223,7 +24980,7 @@
           <a:lstStyle/>
           <a:p>
             <a:r>
-              <a:rPr lang="en-US" sz="1400" dirty="0" smtClean="0"/>
+              <a:rPr lang="en-US" sz="1400" dirty="0"/>
               <a:t>Not used</a:t>
             </a:r>
             <a:endParaRPr lang="en-SG" sz="1400" dirty="0"/>
@@ -24254,7 +25011,7 @@
           <a:p>
             <a:pPr algn="ctr"/>
             <a:r>
-              <a:rPr lang="en-US" sz="1100" dirty="0" smtClean="0"/>
+              <a:rPr lang="en-US" sz="1100" dirty="0"/>
               <a:t>Add animation slide</a:t>
             </a:r>
             <a:endParaRPr lang="en-SG" sz="1100" dirty="0"/>
@@ -24285,7 +25042,7 @@
           <a:p>
             <a:pPr algn="ctr"/>
             <a:r>
-              <a:rPr lang="en-US" sz="1100" dirty="0" smtClean="0"/>
+              <a:rPr lang="en-US" sz="1100" dirty="0"/>
               <a:t>Recreate animation slide</a:t>
             </a:r>
             <a:endParaRPr lang="en-SG" sz="1100" dirty="0"/>
@@ -24316,7 +25073,7 @@
           <a:p>
             <a:pPr algn="ctr"/>
             <a:r>
-              <a:rPr lang="en-US" sz="1100" dirty="0" smtClean="0"/>
+              <a:rPr lang="en-US" sz="1100" dirty="0"/>
               <a:t>spotlight</a:t>
             </a:r>
             <a:endParaRPr lang="en-SG" sz="1100" dirty="0"/>
@@ -24500,7 +25257,7 @@
           <a:p>
             <a:pPr algn="ctr"/>
             <a:r>
-              <a:rPr lang="en-US" sz="1100" dirty="0" smtClean="0"/>
+              <a:rPr lang="en-US" sz="1100" dirty="0"/>
               <a:t>Add captions</a:t>
             </a:r>
             <a:endParaRPr lang="en-SG" sz="1100" dirty="0"/>
@@ -24756,7 +25513,7 @@
           <a:p>
             <a:pPr algn="ctr"/>
             <a:r>
-              <a:rPr lang="en-US" sz="1100" dirty="0" smtClean="0"/>
+              <a:rPr lang="en-US" sz="1100" dirty="0"/>
               <a:t>Speak selected text</a:t>
             </a:r>
             <a:endParaRPr lang="en-SG" sz="1100" dirty="0"/>
@@ -24786,7 +25543,7 @@
           <a:lstStyle/>
           <a:p>
             <a:r>
-              <a:rPr lang="en-US" dirty="0" smtClean="0"/>
+              <a:rPr lang="en-US" dirty="0"/>
               <a:t>Context menu icons</a:t>
             </a:r>
             <a:endParaRPr lang="en-SG" dirty="0"/>
@@ -24863,7 +25620,7 @@
           <a:p>
             <a:pPr algn="ctr"/>
             <a:r>
-              <a:rPr lang="en-US" sz="1100" dirty="0" smtClean="0"/>
+              <a:rPr lang="en-US" sz="1100" dirty="0"/>
               <a:t>Add narrations</a:t>
             </a:r>
             <a:endParaRPr lang="en-SG" sz="1100" dirty="0"/>
@@ -25060,7 +25817,7 @@
           <a:p>
             <a:pPr algn="ctr"/>
             <a:r>
-              <a:rPr lang="en-US" sz="1100" dirty="0" smtClean="0"/>
+              <a:rPr lang="en-US" sz="1100" dirty="0"/>
               <a:t>Edit name</a:t>
             </a:r>
             <a:endParaRPr lang="en-SG" sz="1100" dirty="0"/>
@@ -25275,7 +26032,7 @@
           <a:p>
             <a:pPr algn="ctr"/>
             <a:r>
-              <a:rPr lang="en-US" sz="1100" dirty="0" smtClean="0"/>
+              <a:rPr lang="en-US" sz="1100" dirty="0"/>
               <a:t>Animate in slide</a:t>
             </a:r>
             <a:endParaRPr lang="en-SG" sz="1100" dirty="0"/>
@@ -25306,7 +26063,7 @@
           <a:p>
             <a:pPr algn="ctr"/>
             <a:r>
-              <a:rPr lang="en-US" sz="1100" dirty="0" smtClean="0"/>
+              <a:rPr lang="en-US" sz="1100" dirty="0"/>
               <a:t>Fit to width</a:t>
             </a:r>
             <a:endParaRPr lang="en-SG" sz="1100" dirty="0"/>
@@ -25337,7 +26094,7 @@
           <a:p>
             <a:pPr algn="ctr"/>
             <a:r>
-              <a:rPr lang="en-US" sz="1100" dirty="0" smtClean="0"/>
+              <a:rPr lang="en-US" sz="1100" dirty="0"/>
               <a:t>Fit to height</a:t>
             </a:r>
             <a:endParaRPr lang="en-SG" sz="1100" dirty="0"/>
@@ -26050,7 +26807,7 @@
           <a:p>
             <a:pPr algn="ctr"/>
             <a:r>
-              <a:rPr lang="en-US" sz="1100" dirty="0" smtClean="0"/>
+              <a:rPr lang="en-US" sz="1100" dirty="0"/>
               <a:t>Step back</a:t>
             </a:r>
             <a:endParaRPr lang="en-SG" sz="1100" dirty="0"/>
@@ -26081,7 +26838,7 @@
           <a:p>
             <a:pPr algn="ctr"/>
             <a:r>
-              <a:rPr lang="en-US" sz="1100" dirty="0" smtClean="0"/>
+              <a:rPr lang="en-US" sz="1100" dirty="0"/>
               <a:t>Drill down</a:t>
             </a:r>
             <a:endParaRPr lang="en-SG" sz="1100" dirty="0"/>
@@ -26724,7 +27481,7 @@
           <a:p>
             <a:pPr algn="ctr"/>
             <a:r>
-              <a:rPr lang="en-US" sz="1100" dirty="0" smtClean="0"/>
+              <a:rPr lang="en-US" sz="1100" dirty="0"/>
               <a:t>Magnify</a:t>
             </a:r>
             <a:endParaRPr lang="en-SG" sz="1100" dirty="0"/>
@@ -26755,7 +27512,7 @@
           <a:p>
             <a:pPr algn="ctr"/>
             <a:r>
-              <a:rPr lang="en-US" sz="1100" dirty="0" smtClean="0"/>
+              <a:rPr lang="en-US" sz="1100" dirty="0"/>
               <a:t>hide</a:t>
             </a:r>
             <a:endParaRPr lang="en-SG" sz="1100" dirty="0"/>
@@ -26953,7 +27710,7 @@
           <a:p>
             <a:pPr algn="ctr"/>
             <a:r>
-              <a:rPr lang="en-US" sz="1100" dirty="0" smtClean="0"/>
+              <a:rPr lang="en-US" sz="1100" dirty="0"/>
               <a:t>Double click to open properties</a:t>
             </a:r>
             <a:endParaRPr lang="en-SG" sz="1100" dirty="0"/>
@@ -27309,7 +28066,7 @@
           <a:p>
             <a:pPr algn="ctr"/>
             <a:r>
-              <a:rPr lang="en-US" sz="1100" dirty="0" smtClean="0"/>
+              <a:rPr lang="en-US" sz="1100" dirty="0"/>
               <a:t>Convert to picture</a:t>
             </a:r>
             <a:endParaRPr lang="en-SG" sz="1100" dirty="0"/>
@@ -27652,7 +28409,7 @@
           <a:p>
             <a:pPr algn="ctr"/>
             <a:r>
-              <a:rPr lang="en-US" sz="1100" dirty="0" smtClean="0"/>
+              <a:rPr lang="en-US" sz="1100" dirty="0"/>
               <a:t>Highlight points</a:t>
             </a:r>
             <a:endParaRPr lang="en-SG" sz="1100" dirty="0"/>
@@ -28123,11 +28880,11 @@
           <a:lstStyle/>
           <a:p>
             <a:r>
-              <a:rPr lang="en-US" sz="1100" dirty="0" err="1" smtClean="0"/>
+              <a:rPr lang="en-US" sz="1100" dirty="0" err="1"/>
               <a:t>PptLabs</a:t>
             </a:r>
             <a:r>
-              <a:rPr lang="en-US" sz="1100" dirty="0" smtClean="0"/>
+              <a:rPr lang="en-US" sz="1100" dirty="0"/>
               <a:t> main context menu icon</a:t>
             </a:r>
             <a:endParaRPr lang="en-SG" sz="1100" dirty="0"/>
@@ -28269,7 +29026,7 @@
           <a:p>
             <a:pPr algn="ctr"/>
             <a:r>
-              <a:rPr lang="en-US" sz="1100" dirty="0" smtClean="0"/>
+              <a:rPr lang="en-US" sz="1100" dirty="0"/>
               <a:t>Cut to shape</a:t>
             </a:r>
             <a:endParaRPr lang="en-SG" sz="1100" dirty="0"/>
@@ -28286,13 +29043,6 @@
   <p:clrMapOvr>
     <a:masterClrMapping/>
   </p:clrMapOvr>
-  <p:timing>
-    <p:tnLst>
-      <p:par>
-        <p:cTn id="1" dur="indefinite" restart="never" nodeType="tmRoot"/>
-      </p:par>
-    </p:tnLst>
-  </p:timing>
 </p:sld>
 </file>
 

</xml_diff>

<commit_message>
Add missing icons for minimized groups in ribbon #1105 (#1172)
* Add small icons to Ribbon

* Redesigned small icons and added Animation Lab icon
</commit_message>
<xml_diff>
--- a/doc/Icons.pptx
+++ b/doc/Icons.pptx
@@ -28,16 +28,16 @@
       <p:boldItalic r:id="rId14"/>
     </p:embeddedFont>
     <p:embeddedFont>
-      <p:font typeface="Arial Black" panose="020B0A04020102020204" pitchFamily="34" charset="0"/>
+      <p:font typeface="Rockwell Extra Bold" panose="02060903040505020403" pitchFamily="18" charset="0"/>
       <p:bold r:id="rId15"/>
     </p:embeddedFont>
     <p:embeddedFont>
-      <p:font typeface="Gill Sans Ultra Bold" panose="020B0A02020104020203" pitchFamily="34" charset="0"/>
-      <p:regular r:id="rId16"/>
+      <p:font typeface="Arial Black" panose="020B0A04020102020204" pitchFamily="34" charset="0"/>
+      <p:bold r:id="rId16"/>
     </p:embeddedFont>
     <p:embeddedFont>
-      <p:font typeface="Rockwell Extra Bold" panose="02060903040505020403" pitchFamily="18" charset="0"/>
-      <p:bold r:id="rId17"/>
+      <p:font typeface="Gill Sans Ultra Bold" panose="020B0A02020104020203" pitchFamily="34" charset="0"/>
+      <p:regular r:id="rId17"/>
     </p:embeddedFont>
   </p:embeddedFontLst>
   <p:defaultTextStyle>
@@ -236,7 +236,7 @@
           <a:p>
             <a:fld id="{6699ACB9-486C-4D62-A3A7-AF98E13EFDA3}" type="datetimeFigureOut">
               <a:rPr lang="en-US" smtClean="0"/>
-              <a:t>2/7/2017</a:t>
+              <a:t>3/12/2017</a:t>
             </a:fld>
             <a:endParaRPr lang="en-US"/>
           </a:p>
@@ -300,38 +300,37 @@
           <a:p>
             <a:pPr lvl="0"/>
             <a:r>
-              <a:rPr lang="en-US" smtClean="0"/>
+              <a:rPr lang="en-US"/>
               <a:t>Click to edit Master text styles</a:t>
             </a:r>
           </a:p>
           <a:p>
             <a:pPr lvl="1"/>
             <a:r>
-              <a:rPr lang="en-US" smtClean="0"/>
+              <a:rPr lang="en-US"/>
               <a:t>Second level</a:t>
             </a:r>
           </a:p>
           <a:p>
             <a:pPr lvl="2"/>
             <a:r>
-              <a:rPr lang="en-US" smtClean="0"/>
+              <a:rPr lang="en-US"/>
               <a:t>Third level</a:t>
             </a:r>
           </a:p>
           <a:p>
             <a:pPr lvl="3"/>
             <a:r>
-              <a:rPr lang="en-US" smtClean="0"/>
+              <a:rPr lang="en-US"/>
               <a:t>Fourth level</a:t>
             </a:r>
           </a:p>
           <a:p>
             <a:pPr lvl="4"/>
             <a:r>
-              <a:rPr lang="en-US" smtClean="0"/>
+              <a:rPr lang="en-US"/>
               <a:t>Fifth level</a:t>
             </a:r>
-            <a:endParaRPr lang="en-US"/>
           </a:p>
         </p:txBody>
       </p:sp>
@@ -548,6 +547,90 @@
           <a:bodyPr/>
           <a:lstStyle/>
           <a:p>
+            <a:endParaRPr lang="en-US" dirty="0"/>
+          </a:p>
+        </p:txBody>
+      </p:sp>
+      <p:sp>
+        <p:nvSpPr>
+          <p:cNvPr id="4" name="Slide Number Placeholder 3"/>
+          <p:cNvSpPr>
+            <a:spLocks noGrp="1"/>
+          </p:cNvSpPr>
+          <p:nvPr>
+            <p:ph type="sldNum" sz="quarter" idx="10"/>
+          </p:nvPr>
+        </p:nvSpPr>
+        <p:spPr/>
+        <p:txBody>
+          <a:bodyPr/>
+          <a:lstStyle/>
+          <a:p>
+            <a:fld id="{8EC77E60-82A0-4F8A-A861-433B3189FA8C}" type="slidenum">
+              <a:rPr lang="en-US" smtClean="0"/>
+              <a:t>1</a:t>
+            </a:fld>
+            <a:endParaRPr lang="en-US"/>
+          </a:p>
+        </p:txBody>
+      </p:sp>
+    </p:spTree>
+    <p:extLst>
+      <p:ext uri="{BB962C8B-B14F-4D97-AF65-F5344CB8AC3E}">
+        <p14:creationId xmlns:p14="http://schemas.microsoft.com/office/powerpoint/2010/main" val="3135094531"/>
+      </p:ext>
+    </p:extLst>
+  </p:cSld>
+  <p:clrMapOvr>
+    <a:masterClrMapping/>
+  </p:clrMapOvr>
+</p:notes>
+</file>
+
+<file path=ppt/notesSlides/notesSlide2.xml><?xml version="1.0" encoding="utf-8"?>
+<p:notes xmlns:a="http://schemas.openxmlformats.org/drawingml/2006/main" xmlns:r="http://schemas.openxmlformats.org/officeDocument/2006/relationships" xmlns:p="http://schemas.openxmlformats.org/presentationml/2006/main">
+  <p:cSld>
+    <p:spTree>
+      <p:nvGrpSpPr>
+        <p:cNvPr id="1" name=""/>
+        <p:cNvGrpSpPr/>
+        <p:nvPr/>
+      </p:nvGrpSpPr>
+      <p:grpSpPr>
+        <a:xfrm>
+          <a:off x="0" y="0"/>
+          <a:ext cx="0" cy="0"/>
+          <a:chOff x="0" y="0"/>
+          <a:chExt cx="0" cy="0"/>
+        </a:xfrm>
+      </p:grpSpPr>
+      <p:sp>
+        <p:nvSpPr>
+          <p:cNvPr id="2" name="Slide Image Placeholder 1"/>
+          <p:cNvSpPr>
+            <a:spLocks noGrp="1" noRot="1" noChangeAspect="1"/>
+          </p:cNvSpPr>
+          <p:nvPr>
+            <p:ph type="sldImg"/>
+          </p:nvPr>
+        </p:nvSpPr>
+        <p:spPr/>
+      </p:sp>
+      <p:sp>
+        <p:nvSpPr>
+          <p:cNvPr id="3" name="Notes Placeholder 2"/>
+          <p:cNvSpPr>
+            <a:spLocks noGrp="1"/>
+          </p:cNvSpPr>
+          <p:nvPr>
+            <p:ph type="body" idx="1"/>
+          </p:nvPr>
+        </p:nvSpPr>
+        <p:spPr/>
+        <p:txBody>
+          <a:bodyPr/>
+          <a:lstStyle/>
+          <a:p>
             <a:endParaRPr lang="en-SG" dirty="0"/>
           </a:p>
         </p:txBody>
@@ -626,10 +709,9 @@
           <a:lstStyle/>
           <a:p>
             <a:r>
-              <a:rPr lang="en-US" smtClean="0"/>
+              <a:rPr lang="en-US"/>
               <a:t>Click to edit Master title style</a:t>
             </a:r>
-            <a:endParaRPr lang="en-US"/>
           </a:p>
         </p:txBody>
       </p:sp>
@@ -745,10 +827,9 @@
           </a:lstStyle>
           <a:p>
             <a:r>
-              <a:rPr lang="en-US" smtClean="0"/>
+              <a:rPr lang="en-US"/>
               <a:t>Click to edit Master subtitle style</a:t>
             </a:r>
-            <a:endParaRPr lang="en-US"/>
           </a:p>
         </p:txBody>
       </p:sp>
@@ -770,7 +851,7 @@
             <a:fld id="{1D8BD707-D9CF-40AE-B4C6-C98DA3205C09}" type="datetimeFigureOut">
               <a:rPr lang="en-US" smtClean="0"/>
               <a:pPr/>
-              <a:t>2/7/2017</a:t>
+              <a:t>3/12/2017</a:t>
             </a:fld>
             <a:endParaRPr lang="en-US"/>
           </a:p>
@@ -860,10 +941,9 @@
           <a:lstStyle/>
           <a:p>
             <a:r>
-              <a:rPr lang="en-US" smtClean="0"/>
+              <a:rPr lang="en-US"/>
               <a:t>Click to edit Master title style</a:t>
             </a:r>
-            <a:endParaRPr lang="en-US"/>
           </a:p>
         </p:txBody>
       </p:sp>
@@ -884,38 +964,37 @@
           <a:p>
             <a:pPr lvl="0"/>
             <a:r>
-              <a:rPr lang="en-US" smtClean="0"/>
+              <a:rPr lang="en-US"/>
               <a:t>Click to edit Master text styles</a:t>
             </a:r>
           </a:p>
           <a:p>
             <a:pPr lvl="1"/>
             <a:r>
-              <a:rPr lang="en-US" smtClean="0"/>
+              <a:rPr lang="en-US"/>
               <a:t>Second level</a:t>
             </a:r>
           </a:p>
           <a:p>
             <a:pPr lvl="2"/>
             <a:r>
-              <a:rPr lang="en-US" smtClean="0"/>
+              <a:rPr lang="en-US"/>
               <a:t>Third level</a:t>
             </a:r>
           </a:p>
           <a:p>
             <a:pPr lvl="3"/>
             <a:r>
-              <a:rPr lang="en-US" smtClean="0"/>
+              <a:rPr lang="en-US"/>
               <a:t>Fourth level</a:t>
             </a:r>
           </a:p>
           <a:p>
             <a:pPr lvl="4"/>
             <a:r>
-              <a:rPr lang="en-US" smtClean="0"/>
+              <a:rPr lang="en-US"/>
               <a:t>Fifth level</a:t>
             </a:r>
-            <a:endParaRPr lang="en-US"/>
           </a:p>
         </p:txBody>
       </p:sp>
@@ -937,7 +1016,7 @@
             <a:fld id="{1D8BD707-D9CF-40AE-B4C6-C98DA3205C09}" type="datetimeFigureOut">
               <a:rPr lang="en-US" smtClean="0"/>
               <a:pPr/>
-              <a:t>2/7/2017</a:t>
+              <a:t>3/12/2017</a:t>
             </a:fld>
             <a:endParaRPr lang="en-US"/>
           </a:p>
@@ -1032,10 +1111,9 @@
           <a:lstStyle/>
           <a:p>
             <a:r>
-              <a:rPr lang="en-US" smtClean="0"/>
+              <a:rPr lang="en-US"/>
               <a:t>Click to edit Master title style</a:t>
             </a:r>
-            <a:endParaRPr lang="en-US"/>
           </a:p>
         </p:txBody>
       </p:sp>
@@ -1061,38 +1139,37 @@
           <a:p>
             <a:pPr lvl="0"/>
             <a:r>
-              <a:rPr lang="en-US" smtClean="0"/>
+              <a:rPr lang="en-US"/>
               <a:t>Click to edit Master text styles</a:t>
             </a:r>
           </a:p>
           <a:p>
             <a:pPr lvl="1"/>
             <a:r>
-              <a:rPr lang="en-US" smtClean="0"/>
+              <a:rPr lang="en-US"/>
               <a:t>Second level</a:t>
             </a:r>
           </a:p>
           <a:p>
             <a:pPr lvl="2"/>
             <a:r>
-              <a:rPr lang="en-US" smtClean="0"/>
+              <a:rPr lang="en-US"/>
               <a:t>Third level</a:t>
             </a:r>
           </a:p>
           <a:p>
             <a:pPr lvl="3"/>
             <a:r>
-              <a:rPr lang="en-US" smtClean="0"/>
+              <a:rPr lang="en-US"/>
               <a:t>Fourth level</a:t>
             </a:r>
           </a:p>
           <a:p>
             <a:pPr lvl="4"/>
             <a:r>
-              <a:rPr lang="en-US" smtClean="0"/>
+              <a:rPr lang="en-US"/>
               <a:t>Fifth level</a:t>
             </a:r>
-            <a:endParaRPr lang="en-US"/>
           </a:p>
         </p:txBody>
       </p:sp>
@@ -1114,7 +1191,7 @@
             <a:fld id="{1D8BD707-D9CF-40AE-B4C6-C98DA3205C09}" type="datetimeFigureOut">
               <a:rPr lang="en-US" smtClean="0"/>
               <a:pPr/>
-              <a:t>2/7/2017</a:t>
+              <a:t>3/12/2017</a:t>
             </a:fld>
             <a:endParaRPr lang="en-US"/>
           </a:p>
@@ -1204,10 +1281,9 @@
           <a:lstStyle/>
           <a:p>
             <a:r>
-              <a:rPr lang="en-US" smtClean="0"/>
+              <a:rPr lang="en-US"/>
               <a:t>Click to edit Master title style</a:t>
             </a:r>
-            <a:endParaRPr lang="en-US"/>
           </a:p>
         </p:txBody>
       </p:sp>
@@ -1228,38 +1304,37 @@
           <a:p>
             <a:pPr lvl="0"/>
             <a:r>
-              <a:rPr lang="en-US" smtClean="0"/>
+              <a:rPr lang="en-US"/>
               <a:t>Click to edit Master text styles</a:t>
             </a:r>
           </a:p>
           <a:p>
             <a:pPr lvl="1"/>
             <a:r>
-              <a:rPr lang="en-US" smtClean="0"/>
+              <a:rPr lang="en-US"/>
               <a:t>Second level</a:t>
             </a:r>
           </a:p>
           <a:p>
             <a:pPr lvl="2"/>
             <a:r>
-              <a:rPr lang="en-US" smtClean="0"/>
+              <a:rPr lang="en-US"/>
               <a:t>Third level</a:t>
             </a:r>
           </a:p>
           <a:p>
             <a:pPr lvl="3"/>
             <a:r>
-              <a:rPr lang="en-US" smtClean="0"/>
+              <a:rPr lang="en-US"/>
               <a:t>Fourth level</a:t>
             </a:r>
           </a:p>
           <a:p>
             <a:pPr lvl="4"/>
             <a:r>
-              <a:rPr lang="en-US" smtClean="0"/>
+              <a:rPr lang="en-US"/>
               <a:t>Fifth level</a:t>
             </a:r>
-            <a:endParaRPr lang="en-US"/>
           </a:p>
         </p:txBody>
       </p:sp>
@@ -1281,7 +1356,7 @@
             <a:fld id="{1D8BD707-D9CF-40AE-B4C6-C98DA3205C09}" type="datetimeFigureOut">
               <a:rPr lang="en-US" smtClean="0"/>
               <a:pPr/>
-              <a:t>2/7/2017</a:t>
+              <a:t>3/12/2017</a:t>
             </a:fld>
             <a:endParaRPr lang="en-US"/>
           </a:p>
@@ -1380,10 +1455,9 @@
           </a:lstStyle>
           <a:p>
             <a:r>
-              <a:rPr lang="en-US" smtClean="0"/>
+              <a:rPr lang="en-US"/>
               <a:t>Click to edit Master title style</a:t>
             </a:r>
-            <a:endParaRPr lang="en-US"/>
           </a:p>
         </p:txBody>
       </p:sp>
@@ -1500,7 +1574,7 @@
           <a:p>
             <a:pPr lvl="0"/>
             <a:r>
-              <a:rPr lang="en-US" smtClean="0"/>
+              <a:rPr lang="en-US"/>
               <a:t>Click to edit Master text styles</a:t>
             </a:r>
           </a:p>
@@ -1524,7 +1598,7 @@
             <a:fld id="{1D8BD707-D9CF-40AE-B4C6-C98DA3205C09}" type="datetimeFigureOut">
               <a:rPr lang="en-US" smtClean="0"/>
               <a:pPr/>
-              <a:t>2/7/2017</a:t>
+              <a:t>3/12/2017</a:t>
             </a:fld>
             <a:endParaRPr lang="en-US"/>
           </a:p>
@@ -1614,10 +1688,9 @@
           <a:lstStyle/>
           <a:p>
             <a:r>
-              <a:rPr lang="en-US" smtClean="0"/>
+              <a:rPr lang="en-US"/>
               <a:t>Click to edit Master title style</a:t>
             </a:r>
-            <a:endParaRPr lang="en-US"/>
           </a:p>
         </p:txBody>
       </p:sp>
@@ -1671,38 +1744,37 @@
           <a:p>
             <a:pPr lvl="0"/>
             <a:r>
-              <a:rPr lang="en-US" smtClean="0"/>
+              <a:rPr lang="en-US"/>
               <a:t>Click to edit Master text styles</a:t>
             </a:r>
           </a:p>
           <a:p>
             <a:pPr lvl="1"/>
             <a:r>
-              <a:rPr lang="en-US" smtClean="0"/>
+              <a:rPr lang="en-US"/>
               <a:t>Second level</a:t>
             </a:r>
           </a:p>
           <a:p>
             <a:pPr lvl="2"/>
             <a:r>
-              <a:rPr lang="en-US" smtClean="0"/>
+              <a:rPr lang="en-US"/>
               <a:t>Third level</a:t>
             </a:r>
           </a:p>
           <a:p>
             <a:pPr lvl="3"/>
             <a:r>
-              <a:rPr lang="en-US" smtClean="0"/>
+              <a:rPr lang="en-US"/>
               <a:t>Fourth level</a:t>
             </a:r>
           </a:p>
           <a:p>
             <a:pPr lvl="4"/>
             <a:r>
-              <a:rPr lang="en-US" smtClean="0"/>
+              <a:rPr lang="en-US"/>
               <a:t>Fifth level</a:t>
             </a:r>
-            <a:endParaRPr lang="en-US"/>
           </a:p>
         </p:txBody>
       </p:sp>
@@ -1756,38 +1828,37 @@
           <a:p>
             <a:pPr lvl="0"/>
             <a:r>
-              <a:rPr lang="en-US" smtClean="0"/>
+              <a:rPr lang="en-US"/>
               <a:t>Click to edit Master text styles</a:t>
             </a:r>
           </a:p>
           <a:p>
             <a:pPr lvl="1"/>
             <a:r>
-              <a:rPr lang="en-US" smtClean="0"/>
+              <a:rPr lang="en-US"/>
               <a:t>Second level</a:t>
             </a:r>
           </a:p>
           <a:p>
             <a:pPr lvl="2"/>
             <a:r>
-              <a:rPr lang="en-US" smtClean="0"/>
+              <a:rPr lang="en-US"/>
               <a:t>Third level</a:t>
             </a:r>
           </a:p>
           <a:p>
             <a:pPr lvl="3"/>
             <a:r>
-              <a:rPr lang="en-US" smtClean="0"/>
+              <a:rPr lang="en-US"/>
               <a:t>Fourth level</a:t>
             </a:r>
           </a:p>
           <a:p>
             <a:pPr lvl="4"/>
             <a:r>
-              <a:rPr lang="en-US" smtClean="0"/>
+              <a:rPr lang="en-US"/>
               <a:t>Fifth level</a:t>
             </a:r>
-            <a:endParaRPr lang="en-US"/>
           </a:p>
         </p:txBody>
       </p:sp>
@@ -1809,7 +1880,7 @@
             <a:fld id="{1D8BD707-D9CF-40AE-B4C6-C98DA3205C09}" type="datetimeFigureOut">
               <a:rPr lang="en-US" smtClean="0"/>
               <a:pPr/>
-              <a:t>2/7/2017</a:t>
+              <a:t>3/12/2017</a:t>
             </a:fld>
             <a:endParaRPr lang="en-US"/>
           </a:p>
@@ -1903,10 +1974,9 @@
           </a:lstStyle>
           <a:p>
             <a:r>
-              <a:rPr lang="en-US" smtClean="0"/>
+              <a:rPr lang="en-US"/>
               <a:t>Click to edit Master title style</a:t>
             </a:r>
-            <a:endParaRPr lang="en-US"/>
           </a:p>
         </p:txBody>
       </p:sp>
@@ -1969,7 +2039,7 @@
           <a:p>
             <a:pPr lvl="0"/>
             <a:r>
-              <a:rPr lang="en-US" smtClean="0"/>
+              <a:rPr lang="en-US"/>
               <a:t>Click to edit Master text styles</a:t>
             </a:r>
           </a:p>
@@ -2025,38 +2095,37 @@
           <a:p>
             <a:pPr lvl="0"/>
             <a:r>
-              <a:rPr lang="en-US" smtClean="0"/>
+              <a:rPr lang="en-US"/>
               <a:t>Click to edit Master text styles</a:t>
             </a:r>
           </a:p>
           <a:p>
             <a:pPr lvl="1"/>
             <a:r>
-              <a:rPr lang="en-US" smtClean="0"/>
+              <a:rPr lang="en-US"/>
               <a:t>Second level</a:t>
             </a:r>
           </a:p>
           <a:p>
             <a:pPr lvl="2"/>
             <a:r>
-              <a:rPr lang="en-US" smtClean="0"/>
+              <a:rPr lang="en-US"/>
               <a:t>Third level</a:t>
             </a:r>
           </a:p>
           <a:p>
             <a:pPr lvl="3"/>
             <a:r>
-              <a:rPr lang="en-US" smtClean="0"/>
+              <a:rPr lang="en-US"/>
               <a:t>Fourth level</a:t>
             </a:r>
           </a:p>
           <a:p>
             <a:pPr lvl="4"/>
             <a:r>
-              <a:rPr lang="en-US" smtClean="0"/>
+              <a:rPr lang="en-US"/>
               <a:t>Fifth level</a:t>
             </a:r>
-            <a:endParaRPr lang="en-US"/>
           </a:p>
         </p:txBody>
       </p:sp>
@@ -2119,7 +2188,7 @@
           <a:p>
             <a:pPr lvl="0"/>
             <a:r>
-              <a:rPr lang="en-US" smtClean="0"/>
+              <a:rPr lang="en-US"/>
               <a:t>Click to edit Master text styles</a:t>
             </a:r>
           </a:p>
@@ -2175,38 +2244,37 @@
           <a:p>
             <a:pPr lvl="0"/>
             <a:r>
-              <a:rPr lang="en-US" smtClean="0"/>
+              <a:rPr lang="en-US"/>
               <a:t>Click to edit Master text styles</a:t>
             </a:r>
           </a:p>
           <a:p>
             <a:pPr lvl="1"/>
             <a:r>
-              <a:rPr lang="en-US" smtClean="0"/>
+              <a:rPr lang="en-US"/>
               <a:t>Second level</a:t>
             </a:r>
           </a:p>
           <a:p>
             <a:pPr lvl="2"/>
             <a:r>
-              <a:rPr lang="en-US" smtClean="0"/>
+              <a:rPr lang="en-US"/>
               <a:t>Third level</a:t>
             </a:r>
           </a:p>
           <a:p>
             <a:pPr lvl="3"/>
             <a:r>
-              <a:rPr lang="en-US" smtClean="0"/>
+              <a:rPr lang="en-US"/>
               <a:t>Fourth level</a:t>
             </a:r>
           </a:p>
           <a:p>
             <a:pPr lvl="4"/>
             <a:r>
-              <a:rPr lang="en-US" smtClean="0"/>
+              <a:rPr lang="en-US"/>
               <a:t>Fifth level</a:t>
             </a:r>
-            <a:endParaRPr lang="en-US"/>
           </a:p>
         </p:txBody>
       </p:sp>
@@ -2228,7 +2296,7 @@
             <a:fld id="{1D8BD707-D9CF-40AE-B4C6-C98DA3205C09}" type="datetimeFigureOut">
               <a:rPr lang="en-US" smtClean="0"/>
               <a:pPr/>
-              <a:t>2/7/2017</a:t>
+              <a:t>3/12/2017</a:t>
             </a:fld>
             <a:endParaRPr lang="en-US"/>
           </a:p>
@@ -2318,10 +2386,9 @@
           <a:lstStyle/>
           <a:p>
             <a:r>
-              <a:rPr lang="en-US" smtClean="0"/>
+              <a:rPr lang="en-US"/>
               <a:t>Click to edit Master title style</a:t>
             </a:r>
-            <a:endParaRPr lang="en-US"/>
           </a:p>
         </p:txBody>
       </p:sp>
@@ -2343,7 +2410,7 @@
             <a:fld id="{1D8BD707-D9CF-40AE-B4C6-C98DA3205C09}" type="datetimeFigureOut">
               <a:rPr lang="en-US" smtClean="0"/>
               <a:pPr/>
-              <a:t>2/7/2017</a:t>
+              <a:t>3/12/2017</a:t>
             </a:fld>
             <a:endParaRPr lang="en-US"/>
           </a:p>
@@ -2435,7 +2502,7 @@
             <a:fld id="{1D8BD707-D9CF-40AE-B4C6-C98DA3205C09}" type="datetimeFigureOut">
               <a:rPr lang="en-US" smtClean="0"/>
               <a:pPr/>
-              <a:t>2/7/2017</a:t>
+              <a:t>3/12/2017</a:t>
             </a:fld>
             <a:endParaRPr lang="en-US"/>
           </a:p>
@@ -2534,10 +2601,9 @@
           </a:lstStyle>
           <a:p>
             <a:r>
-              <a:rPr lang="en-US" smtClean="0"/>
+              <a:rPr lang="en-US"/>
               <a:t>Click to edit Master title style</a:t>
             </a:r>
-            <a:endParaRPr lang="en-US"/>
           </a:p>
         </p:txBody>
       </p:sp>
@@ -2591,38 +2657,37 @@
           <a:p>
             <a:pPr lvl="0"/>
             <a:r>
-              <a:rPr lang="en-US" smtClean="0"/>
+              <a:rPr lang="en-US"/>
               <a:t>Click to edit Master text styles</a:t>
             </a:r>
           </a:p>
           <a:p>
             <a:pPr lvl="1"/>
             <a:r>
-              <a:rPr lang="en-US" smtClean="0"/>
+              <a:rPr lang="en-US"/>
               <a:t>Second level</a:t>
             </a:r>
           </a:p>
           <a:p>
             <a:pPr lvl="2"/>
             <a:r>
-              <a:rPr lang="en-US" smtClean="0"/>
+              <a:rPr lang="en-US"/>
               <a:t>Third level</a:t>
             </a:r>
           </a:p>
           <a:p>
             <a:pPr lvl="3"/>
             <a:r>
-              <a:rPr lang="en-US" smtClean="0"/>
+              <a:rPr lang="en-US"/>
               <a:t>Fourth level</a:t>
             </a:r>
           </a:p>
           <a:p>
             <a:pPr lvl="4"/>
             <a:r>
-              <a:rPr lang="en-US" smtClean="0"/>
+              <a:rPr lang="en-US"/>
               <a:t>Fifth level</a:t>
             </a:r>
-            <a:endParaRPr lang="en-US"/>
           </a:p>
         </p:txBody>
       </p:sp>
@@ -2685,7 +2750,7 @@
           <a:p>
             <a:pPr lvl="0"/>
             <a:r>
-              <a:rPr lang="en-US" smtClean="0"/>
+              <a:rPr lang="en-US"/>
               <a:t>Click to edit Master text styles</a:t>
             </a:r>
           </a:p>
@@ -2709,7 +2774,7 @@
             <a:fld id="{1D8BD707-D9CF-40AE-B4C6-C98DA3205C09}" type="datetimeFigureOut">
               <a:rPr lang="en-US" smtClean="0"/>
               <a:pPr/>
-              <a:t>2/7/2017</a:t>
+              <a:t>3/12/2017</a:t>
             </a:fld>
             <a:endParaRPr lang="en-US"/>
           </a:p>
@@ -2808,10 +2873,9 @@
           </a:lstStyle>
           <a:p>
             <a:r>
-              <a:rPr lang="en-US" smtClean="0"/>
+              <a:rPr lang="en-US"/>
               <a:t>Click to edit Master title style</a:t>
             </a:r>
-            <a:endParaRPr lang="en-US"/>
           </a:p>
         </p:txBody>
       </p:sp>
@@ -2935,7 +2999,7 @@
           <a:p>
             <a:pPr lvl="0"/>
             <a:r>
-              <a:rPr lang="en-US" smtClean="0"/>
+              <a:rPr lang="en-US"/>
               <a:t>Click to edit Master text styles</a:t>
             </a:r>
           </a:p>
@@ -2959,7 +3023,7 @@
             <a:fld id="{1D8BD707-D9CF-40AE-B4C6-C98DA3205C09}" type="datetimeFigureOut">
               <a:rPr lang="en-US" smtClean="0"/>
               <a:pPr/>
-              <a:t>2/7/2017</a:t>
+              <a:t>3/12/2017</a:t>
             </a:fld>
             <a:endParaRPr lang="en-US"/>
           </a:p>
@@ -3069,10 +3133,9 @@
           <a:lstStyle/>
           <a:p>
             <a:r>
-              <a:rPr lang="en-US" smtClean="0"/>
+              <a:rPr lang="en-US"/>
               <a:t>Click to edit Master title style</a:t>
             </a:r>
-            <a:endParaRPr lang="en-US"/>
           </a:p>
         </p:txBody>
       </p:sp>
@@ -3103,38 +3166,37 @@
           <a:p>
             <a:pPr lvl="0"/>
             <a:r>
-              <a:rPr lang="en-US" smtClean="0"/>
+              <a:rPr lang="en-US"/>
               <a:t>Click to edit Master text styles</a:t>
             </a:r>
           </a:p>
           <a:p>
             <a:pPr lvl="1"/>
             <a:r>
-              <a:rPr lang="en-US" smtClean="0"/>
+              <a:rPr lang="en-US"/>
               <a:t>Second level</a:t>
             </a:r>
           </a:p>
           <a:p>
             <a:pPr lvl="2"/>
             <a:r>
-              <a:rPr lang="en-US" smtClean="0"/>
+              <a:rPr lang="en-US"/>
               <a:t>Third level</a:t>
             </a:r>
           </a:p>
           <a:p>
             <a:pPr lvl="3"/>
             <a:r>
-              <a:rPr lang="en-US" smtClean="0"/>
+              <a:rPr lang="en-US"/>
               <a:t>Fourth level</a:t>
             </a:r>
           </a:p>
           <a:p>
             <a:pPr lvl="4"/>
             <a:r>
-              <a:rPr lang="en-US" smtClean="0"/>
+              <a:rPr lang="en-US"/>
               <a:t>Fifth level</a:t>
             </a:r>
-            <a:endParaRPr lang="en-US"/>
           </a:p>
         </p:txBody>
       </p:sp>
@@ -3174,7 +3236,7 @@
             <a:fld id="{1D8BD707-D9CF-40AE-B4C6-C98DA3205C09}" type="datetimeFigureOut">
               <a:rPr lang="en-US" smtClean="0"/>
               <a:pPr/>
-              <a:t>2/7/2017</a:t>
+              <a:t>3/12/2017</a:t>
             </a:fld>
             <a:endParaRPr lang="en-US"/>
           </a:p>
@@ -4625,7 +4687,7 @@
             <a:p>
               <a:pPr algn="ctr"/>
               <a:r>
-                <a:rPr lang="en-US" sz="5400" b="1" dirty="0" smtClean="0">
+                <a:rPr lang="en-US" sz="5400" b="1" dirty="0">
                   <a:ln w="12700">
                     <a:solidFill>
                       <a:schemeClr val="bg1"/>
@@ -5520,7 +5582,7 @@
           <a:lstStyle/>
           <a:p>
             <a:r>
-              <a:rPr lang="en-US" sz="800" dirty="0" smtClean="0"/>
+              <a:rPr lang="en-US" sz="800" dirty="0"/>
               <a:t>Auto animate</a:t>
             </a:r>
             <a:endParaRPr lang="en-SG" sz="800" dirty="0"/>
@@ -5550,7 +5612,7 @@
           <a:lstStyle/>
           <a:p>
             <a:r>
-              <a:rPr lang="en-US" sz="800" dirty="0" smtClean="0"/>
+              <a:rPr lang="en-US" sz="800" dirty="0"/>
               <a:t>Recreate animation</a:t>
             </a:r>
             <a:endParaRPr lang="en-SG" sz="800" dirty="0"/>
@@ -5580,7 +5642,7 @@
           <a:lstStyle/>
           <a:p>
             <a:r>
-              <a:rPr lang="en-US" sz="800" dirty="0" smtClean="0"/>
+              <a:rPr lang="en-US" sz="800" dirty="0"/>
               <a:t>Create spotlight</a:t>
             </a:r>
             <a:endParaRPr lang="en-SG" sz="800" dirty="0"/>
@@ -5610,7 +5672,7 @@
           <a:lstStyle/>
           <a:p>
             <a:r>
-              <a:rPr lang="en-US" sz="800" dirty="0" smtClean="0"/>
+              <a:rPr lang="en-US" sz="800" dirty="0"/>
               <a:t>Highlight point</a:t>
             </a:r>
             <a:endParaRPr lang="en-SG" sz="800" dirty="0"/>
@@ -5640,7 +5702,7 @@
           <a:lstStyle/>
           <a:p>
             <a:r>
-              <a:rPr lang="en-US" sz="800" dirty="0" smtClean="0"/>
+              <a:rPr lang="en-US" sz="800" dirty="0"/>
               <a:t>Drill down</a:t>
             </a:r>
             <a:endParaRPr lang="en-SG" sz="800" dirty="0"/>
@@ -5670,7 +5732,7 @@
           <a:lstStyle/>
           <a:p>
             <a:r>
-              <a:rPr lang="en-US" sz="800" dirty="0" smtClean="0"/>
+              <a:rPr lang="en-US" sz="800" dirty="0"/>
               <a:t>Cut out shape</a:t>
             </a:r>
             <a:endParaRPr lang="en-SG" sz="800" dirty="0"/>
@@ -5700,7 +5762,7 @@
           <a:lstStyle/>
           <a:p>
             <a:r>
-              <a:rPr lang="en-US" sz="800" dirty="0" smtClean="0"/>
+              <a:rPr lang="en-US" sz="800" dirty="0"/>
               <a:t>Help</a:t>
             </a:r>
             <a:endParaRPr lang="en-SG" sz="800" dirty="0"/>
@@ -5730,7 +5792,7 @@
           <a:lstStyle/>
           <a:p>
             <a:r>
-              <a:rPr lang="en-US" sz="800" dirty="0" smtClean="0"/>
+              <a:rPr lang="en-US" sz="800" dirty="0"/>
               <a:t>Report issues/feedback</a:t>
             </a:r>
             <a:endParaRPr lang="en-SG" sz="800" dirty="0"/>
@@ -5760,7 +5822,7 @@
           <a:lstStyle/>
           <a:p>
             <a:r>
-              <a:rPr lang="en-US" sz="800" dirty="0" smtClean="0"/>
+              <a:rPr lang="en-US" sz="800" dirty="0"/>
               <a:t>About</a:t>
             </a:r>
             <a:endParaRPr lang="en-SG" sz="800" dirty="0"/>
@@ -5790,7 +5852,7 @@
           <a:lstStyle/>
           <a:p>
             <a:r>
-              <a:rPr lang="en-US" dirty="0" smtClean="0"/>
+              <a:rPr lang="en-US" dirty="0"/>
               <a:t>Right-click and ‘save as picture’</a:t>
             </a:r>
             <a:endParaRPr lang="en-SG" dirty="0"/>
@@ -6932,7 +6994,7 @@
           <a:lstStyle/>
           <a:p>
             <a:r>
-              <a:rPr lang="en-US" sz="800" dirty="0" smtClean="0"/>
+              <a:rPr lang="en-US" sz="800" dirty="0"/>
               <a:t>Recreate spotlight</a:t>
             </a:r>
             <a:endParaRPr lang="en-SG" sz="800" dirty="0"/>
@@ -6962,7 +7024,7 @@
           <a:lstStyle/>
           <a:p>
             <a:r>
-              <a:rPr lang="en-US" sz="800" dirty="0" smtClean="0"/>
+              <a:rPr lang="en-US" sz="800" dirty="0"/>
               <a:t>Add audio</a:t>
             </a:r>
             <a:endParaRPr lang="en-SG" sz="800" dirty="0"/>
@@ -6992,7 +7054,7 @@
           <a:lstStyle/>
           <a:p>
             <a:r>
-              <a:rPr lang="en-US" sz="800" dirty="0" smtClean="0"/>
+              <a:rPr lang="en-US" sz="800" dirty="0"/>
               <a:t>Remove audio</a:t>
             </a:r>
             <a:endParaRPr lang="en-SG" sz="800" dirty="0"/>
@@ -7813,7 +7875,7 @@
           <a:lstStyle/>
           <a:p>
             <a:r>
-              <a:rPr lang="en-US" sz="800" dirty="0" smtClean="0"/>
+              <a:rPr lang="en-US" sz="800" dirty="0"/>
               <a:t>Add captions</a:t>
             </a:r>
             <a:endParaRPr lang="en-SG" sz="800" dirty="0"/>
@@ -7843,7 +7905,7 @@
           <a:lstStyle/>
           <a:p>
             <a:r>
-              <a:rPr lang="en-US" sz="800" dirty="0" smtClean="0"/>
+              <a:rPr lang="en-US" sz="800" dirty="0"/>
               <a:t>Remove captions</a:t>
             </a:r>
             <a:endParaRPr lang="en-SG" sz="800" dirty="0"/>
@@ -8196,7 +8258,7 @@
           <a:lstStyle/>
           <a:p>
             <a:r>
-              <a:rPr lang="en-US" sz="800" dirty="0" smtClean="0"/>
+              <a:rPr lang="en-US" sz="800" dirty="0"/>
               <a:t>Animate in slide</a:t>
             </a:r>
             <a:endParaRPr lang="en-SG" sz="800" dirty="0"/>
@@ -8695,7 +8757,7 @@
           <a:lstStyle/>
           <a:p>
             <a:r>
-              <a:rPr lang="en-US" sz="800" dirty="0" smtClean="0"/>
+              <a:rPr lang="en-US" sz="800" dirty="0"/>
               <a:t>Step back</a:t>
             </a:r>
             <a:endParaRPr lang="en-SG" sz="800" dirty="0"/>
@@ -9543,7 +9605,7 @@
           <a:lstStyle/>
           <a:p>
             <a:r>
-              <a:rPr lang="en-US" sz="800" dirty="0" smtClean="0"/>
+              <a:rPr lang="en-US" sz="800" dirty="0"/>
               <a:t>Magnify</a:t>
             </a:r>
             <a:endParaRPr lang="en-SG" sz="800" dirty="0"/>
@@ -10754,7 +10816,7 @@
           <a:lstStyle/>
           <a:p>
             <a:r>
-              <a:rPr lang="en-US" sz="800" dirty="0" smtClean="0"/>
+              <a:rPr lang="en-US" sz="800" dirty="0"/>
               <a:t>Highlight words</a:t>
             </a:r>
             <a:endParaRPr lang="en-SG" sz="800" dirty="0"/>
@@ -10784,7 +10846,7 @@
           <a:lstStyle/>
           <a:p>
             <a:r>
-              <a:rPr lang="en-US" sz="800" dirty="0" smtClean="0"/>
+              <a:rPr lang="en-US" sz="800" dirty="0"/>
               <a:t>Highlight background</a:t>
             </a:r>
             <a:endParaRPr lang="en-SG" sz="800" dirty="0"/>
@@ -10801,13 +10863,6 @@
   <p:clrMapOvr>
     <a:masterClrMapping/>
   </p:clrMapOvr>
-  <p:timing>
-    <p:tnLst>
-      <p:par>
-        <p:cTn id="1" dur="indefinite" restart="never" nodeType="tmRoot"/>
-      </p:par>
-    </p:tnLst>
-  </p:timing>
 </p:sld>
 </file>
 
@@ -10851,300 +10906,193 @@
           <a:lstStyle/>
           <a:p>
             <a:r>
-              <a:rPr lang="en-US" sz="300" dirty="0" smtClean="0"/>
+              <a:rPr lang="en-US" sz="300" dirty="0"/>
               <a:t>Zoom Lab</a:t>
             </a:r>
             <a:endParaRPr lang="en-SG" sz="300" dirty="0"/>
           </a:p>
         </p:txBody>
       </p:sp>
+      <p:sp>
+        <p:nvSpPr>
+          <p:cNvPr id="166" name="Rectangle 5"/>
+          <p:cNvSpPr/>
+          <p:nvPr/>
+        </p:nvSpPr>
+        <p:spPr>
+          <a:xfrm>
+            <a:off x="1639940" y="1250998"/>
+            <a:ext cx="89937" cy="178376"/>
+          </a:xfrm>
+          <a:custGeom>
+            <a:avLst/>
+            <a:gdLst>
+              <a:gd name="connsiteX0" fmla="*/ 0 w 247861"/>
+              <a:gd name="connsiteY0" fmla="*/ 168438 h 491595"/>
+              <a:gd name="connsiteX1" fmla="*/ 83956 w 247861"/>
+              <a:gd name="connsiteY1" fmla="*/ 162984 h 491595"/>
+              <a:gd name="connsiteX2" fmla="*/ 56685 w 247861"/>
+              <a:gd name="connsiteY2" fmla="*/ 318394 h 491595"/>
+              <a:gd name="connsiteX3" fmla="*/ 0 w 247861"/>
+              <a:gd name="connsiteY3" fmla="*/ 318394 h 491595"/>
+              <a:gd name="connsiteX4" fmla="*/ 0 w 247861"/>
+              <a:gd name="connsiteY4" fmla="*/ 168438 h 491595"/>
+              <a:gd name="connsiteX5" fmla="*/ 247861 w 247861"/>
+              <a:gd name="connsiteY5" fmla="*/ 0 h 491595"/>
+              <a:gd name="connsiteX6" fmla="*/ 242826 w 247861"/>
+              <a:gd name="connsiteY6" fmla="*/ 491595 h 491595"/>
+              <a:gd name="connsiteX7" fmla="*/ 82985 w 247861"/>
+              <a:gd name="connsiteY7" fmla="*/ 327947 h 491595"/>
+              <a:gd name="connsiteX8" fmla="*/ 84711 w 247861"/>
+              <a:gd name="connsiteY8" fmla="*/ 159354 h 491595"/>
+              <a:gd name="connsiteX9" fmla="*/ 247861 w 247861"/>
+              <a:gd name="connsiteY9" fmla="*/ 0 h 491595"/>
+              <a:gd name="connsiteX0" fmla="*/ 0 w 247861"/>
+              <a:gd name="connsiteY0" fmla="*/ 168438 h 491595"/>
+              <a:gd name="connsiteX1" fmla="*/ 83956 w 247861"/>
+              <a:gd name="connsiteY1" fmla="*/ 162984 h 491595"/>
+              <a:gd name="connsiteX2" fmla="*/ 81228 w 247861"/>
+              <a:gd name="connsiteY2" fmla="*/ 326575 h 491595"/>
+              <a:gd name="connsiteX3" fmla="*/ 0 w 247861"/>
+              <a:gd name="connsiteY3" fmla="*/ 318394 h 491595"/>
+              <a:gd name="connsiteX4" fmla="*/ 0 w 247861"/>
+              <a:gd name="connsiteY4" fmla="*/ 168438 h 491595"/>
+              <a:gd name="connsiteX5" fmla="*/ 247861 w 247861"/>
+              <a:gd name="connsiteY5" fmla="*/ 0 h 491595"/>
+              <a:gd name="connsiteX6" fmla="*/ 242826 w 247861"/>
+              <a:gd name="connsiteY6" fmla="*/ 491595 h 491595"/>
+              <a:gd name="connsiteX7" fmla="*/ 82985 w 247861"/>
+              <a:gd name="connsiteY7" fmla="*/ 327947 h 491595"/>
+              <a:gd name="connsiteX8" fmla="*/ 84711 w 247861"/>
+              <a:gd name="connsiteY8" fmla="*/ 159354 h 491595"/>
+              <a:gd name="connsiteX9" fmla="*/ 247861 w 247861"/>
+              <a:gd name="connsiteY9" fmla="*/ 0 h 491595"/>
+            </a:gdLst>
+            <a:ahLst/>
+            <a:cxnLst>
+              <a:cxn ang="0">
+                <a:pos x="connsiteX0" y="connsiteY0"/>
+              </a:cxn>
+              <a:cxn ang="0">
+                <a:pos x="connsiteX1" y="connsiteY1"/>
+              </a:cxn>
+              <a:cxn ang="0">
+                <a:pos x="connsiteX2" y="connsiteY2"/>
+              </a:cxn>
+              <a:cxn ang="0">
+                <a:pos x="connsiteX3" y="connsiteY3"/>
+              </a:cxn>
+              <a:cxn ang="0">
+                <a:pos x="connsiteX4" y="connsiteY4"/>
+              </a:cxn>
+              <a:cxn ang="0">
+                <a:pos x="connsiteX5" y="connsiteY5"/>
+              </a:cxn>
+              <a:cxn ang="0">
+                <a:pos x="connsiteX6" y="connsiteY6"/>
+              </a:cxn>
+              <a:cxn ang="0">
+                <a:pos x="connsiteX7" y="connsiteY7"/>
+              </a:cxn>
+              <a:cxn ang="0">
+                <a:pos x="connsiteX8" y="connsiteY8"/>
+              </a:cxn>
+              <a:cxn ang="0">
+                <a:pos x="connsiteX9" y="connsiteY9"/>
+              </a:cxn>
+            </a:cxnLst>
+            <a:rect l="l" t="t" r="r" b="b"/>
+            <a:pathLst>
+              <a:path w="247861" h="491595">
+                <a:moveTo>
+                  <a:pt x="0" y="168438"/>
+                </a:moveTo>
+                <a:lnTo>
+                  <a:pt x="83956" y="162984"/>
+                </a:lnTo>
+                <a:cubicBezTo>
+                  <a:pt x="83047" y="217514"/>
+                  <a:pt x="82137" y="272045"/>
+                  <a:pt x="81228" y="326575"/>
+                </a:cubicBezTo>
+                <a:lnTo>
+                  <a:pt x="0" y="318394"/>
+                </a:lnTo>
+                <a:lnTo>
+                  <a:pt x="0" y="168438"/>
+                </a:lnTo>
+                <a:close/>
+                <a:moveTo>
+                  <a:pt x="247861" y="0"/>
+                </a:moveTo>
+                <a:cubicBezTo>
+                  <a:pt x="246183" y="163865"/>
+                  <a:pt x="244504" y="327730"/>
+                  <a:pt x="242826" y="491595"/>
+                </a:cubicBezTo>
+                <a:lnTo>
+                  <a:pt x="82985" y="327947"/>
+                </a:lnTo>
+                <a:cubicBezTo>
+                  <a:pt x="83560" y="271749"/>
+                  <a:pt x="84136" y="215552"/>
+                  <a:pt x="84711" y="159354"/>
+                </a:cubicBezTo>
+                <a:lnTo>
+                  <a:pt x="247861" y="0"/>
+                </a:lnTo>
+                <a:close/>
+              </a:path>
+            </a:pathLst>
+          </a:custGeom>
+          <a:solidFill>
+            <a:srgbClr val="0070C0"/>
+          </a:solidFill>
+          <a:ln w="6350">
+            <a:solidFill>
+              <a:schemeClr val="bg1"/>
+            </a:solidFill>
+          </a:ln>
+        </p:spPr>
+        <p:style>
+          <a:lnRef idx="2">
+            <a:schemeClr val="accent1">
+              <a:shade val="50000"/>
+            </a:schemeClr>
+          </a:lnRef>
+          <a:fillRef idx="1">
+            <a:schemeClr val="accent1"/>
+          </a:fillRef>
+          <a:effectRef idx="0">
+            <a:schemeClr val="accent1"/>
+          </a:effectRef>
+          <a:fontRef idx="minor">
+            <a:schemeClr val="lt1"/>
+          </a:fontRef>
+        </p:style>
+        <p:txBody>
+          <a:bodyPr rtlCol="0" anchor="ctr"/>
+          <a:lstStyle/>
+          <a:p>
+            <a:pPr algn="ctr"/>
+            <a:endParaRPr lang="en-SG"/>
+          </a:p>
+        </p:txBody>
+      </p:sp>
       <p:grpSp>
         <p:nvGrpSpPr>
-          <p:cNvPr id="112" name="Group 111"/>
+          <p:cNvPr id="2" name="Group 1"/>
           <p:cNvGrpSpPr/>
           <p:nvPr/>
         </p:nvGrpSpPr>
         <p:grpSpPr>
           <a:xfrm>
-            <a:off x="1592380" y="1241883"/>
-            <a:ext cx="190500" cy="190500"/>
-            <a:chOff x="1627666" y="1241884"/>
-            <a:chExt cx="190500" cy="190500"/>
+            <a:off x="1342966" y="1277641"/>
+            <a:ext cx="126488" cy="118985"/>
+            <a:chOff x="1342966" y="1277641"/>
+            <a:chExt cx="126488" cy="118985"/>
           </a:xfrm>
         </p:grpSpPr>
-        <p:sp>
-          <p:nvSpPr>
-            <p:cNvPr id="64" name="Oval 63"/>
-            <p:cNvSpPr/>
-            <p:nvPr/>
-          </p:nvSpPr>
-          <p:spPr>
-            <a:xfrm>
-              <a:off x="1627666" y="1241884"/>
-              <a:ext cx="190500" cy="190500"/>
-            </a:xfrm>
-            <a:prstGeom prst="ellipse">
-              <a:avLst/>
-            </a:prstGeom>
-            <a:solidFill>
-              <a:schemeClr val="accent6"/>
-            </a:solidFill>
-            <a:ln>
-              <a:noFill/>
-            </a:ln>
-          </p:spPr>
-          <p:style>
-            <a:lnRef idx="2">
-              <a:schemeClr val="accent1">
-                <a:shade val="50000"/>
-              </a:schemeClr>
-            </a:lnRef>
-            <a:fillRef idx="1">
-              <a:schemeClr val="accent1"/>
-            </a:fillRef>
-            <a:effectRef idx="0">
-              <a:schemeClr val="accent1"/>
-            </a:effectRef>
-            <a:fontRef idx="minor">
-              <a:schemeClr val="lt1"/>
-            </a:fontRef>
-          </p:style>
-          <p:txBody>
-            <a:bodyPr rtlCol="0" anchor="ctr"/>
-            <a:lstStyle/>
-            <a:p>
-              <a:pPr algn="ctr"/>
-              <a:endParaRPr lang="en-SG"/>
-            </a:p>
-          </p:txBody>
-        </p:sp>
-        <p:sp>
-          <p:nvSpPr>
-            <p:cNvPr id="166" name="Rectangle 5"/>
-            <p:cNvSpPr/>
-            <p:nvPr/>
-          </p:nvSpPr>
-          <p:spPr>
-            <a:xfrm>
-              <a:off x="1688712" y="1281275"/>
-              <a:ext cx="59004" cy="117025"/>
-            </a:xfrm>
-            <a:custGeom>
-              <a:avLst/>
-              <a:gdLst>
-                <a:gd name="connsiteX0" fmla="*/ 0 w 247861"/>
-                <a:gd name="connsiteY0" fmla="*/ 168438 h 491595"/>
-                <a:gd name="connsiteX1" fmla="*/ 83956 w 247861"/>
-                <a:gd name="connsiteY1" fmla="*/ 162984 h 491595"/>
-                <a:gd name="connsiteX2" fmla="*/ 56685 w 247861"/>
-                <a:gd name="connsiteY2" fmla="*/ 318394 h 491595"/>
-                <a:gd name="connsiteX3" fmla="*/ 0 w 247861"/>
-                <a:gd name="connsiteY3" fmla="*/ 318394 h 491595"/>
-                <a:gd name="connsiteX4" fmla="*/ 0 w 247861"/>
-                <a:gd name="connsiteY4" fmla="*/ 168438 h 491595"/>
-                <a:gd name="connsiteX5" fmla="*/ 247861 w 247861"/>
-                <a:gd name="connsiteY5" fmla="*/ 0 h 491595"/>
-                <a:gd name="connsiteX6" fmla="*/ 242826 w 247861"/>
-                <a:gd name="connsiteY6" fmla="*/ 491595 h 491595"/>
-                <a:gd name="connsiteX7" fmla="*/ 82985 w 247861"/>
-                <a:gd name="connsiteY7" fmla="*/ 327947 h 491595"/>
-                <a:gd name="connsiteX8" fmla="*/ 84711 w 247861"/>
-                <a:gd name="connsiteY8" fmla="*/ 159354 h 491595"/>
-                <a:gd name="connsiteX9" fmla="*/ 247861 w 247861"/>
-                <a:gd name="connsiteY9" fmla="*/ 0 h 491595"/>
-                <a:gd name="connsiteX0" fmla="*/ 0 w 247861"/>
-                <a:gd name="connsiteY0" fmla="*/ 168438 h 491595"/>
-                <a:gd name="connsiteX1" fmla="*/ 83956 w 247861"/>
-                <a:gd name="connsiteY1" fmla="*/ 162984 h 491595"/>
-                <a:gd name="connsiteX2" fmla="*/ 81228 w 247861"/>
-                <a:gd name="connsiteY2" fmla="*/ 326575 h 491595"/>
-                <a:gd name="connsiteX3" fmla="*/ 0 w 247861"/>
-                <a:gd name="connsiteY3" fmla="*/ 318394 h 491595"/>
-                <a:gd name="connsiteX4" fmla="*/ 0 w 247861"/>
-                <a:gd name="connsiteY4" fmla="*/ 168438 h 491595"/>
-                <a:gd name="connsiteX5" fmla="*/ 247861 w 247861"/>
-                <a:gd name="connsiteY5" fmla="*/ 0 h 491595"/>
-                <a:gd name="connsiteX6" fmla="*/ 242826 w 247861"/>
-                <a:gd name="connsiteY6" fmla="*/ 491595 h 491595"/>
-                <a:gd name="connsiteX7" fmla="*/ 82985 w 247861"/>
-                <a:gd name="connsiteY7" fmla="*/ 327947 h 491595"/>
-                <a:gd name="connsiteX8" fmla="*/ 84711 w 247861"/>
-                <a:gd name="connsiteY8" fmla="*/ 159354 h 491595"/>
-                <a:gd name="connsiteX9" fmla="*/ 247861 w 247861"/>
-                <a:gd name="connsiteY9" fmla="*/ 0 h 491595"/>
-              </a:gdLst>
-              <a:ahLst/>
-              <a:cxnLst>
-                <a:cxn ang="0">
-                  <a:pos x="connsiteX0" y="connsiteY0"/>
-                </a:cxn>
-                <a:cxn ang="0">
-                  <a:pos x="connsiteX1" y="connsiteY1"/>
-                </a:cxn>
-                <a:cxn ang="0">
-                  <a:pos x="connsiteX2" y="connsiteY2"/>
-                </a:cxn>
-                <a:cxn ang="0">
-                  <a:pos x="connsiteX3" y="connsiteY3"/>
-                </a:cxn>
-                <a:cxn ang="0">
-                  <a:pos x="connsiteX4" y="connsiteY4"/>
-                </a:cxn>
-                <a:cxn ang="0">
-                  <a:pos x="connsiteX5" y="connsiteY5"/>
-                </a:cxn>
-                <a:cxn ang="0">
-                  <a:pos x="connsiteX6" y="connsiteY6"/>
-                </a:cxn>
-                <a:cxn ang="0">
-                  <a:pos x="connsiteX7" y="connsiteY7"/>
-                </a:cxn>
-                <a:cxn ang="0">
-                  <a:pos x="connsiteX8" y="connsiteY8"/>
-                </a:cxn>
-                <a:cxn ang="0">
-                  <a:pos x="connsiteX9" y="connsiteY9"/>
-                </a:cxn>
-              </a:cxnLst>
-              <a:rect l="l" t="t" r="r" b="b"/>
-              <a:pathLst>
-                <a:path w="247861" h="491595">
-                  <a:moveTo>
-                    <a:pt x="0" y="168438"/>
-                  </a:moveTo>
-                  <a:lnTo>
-                    <a:pt x="83956" y="162984"/>
-                  </a:lnTo>
-                  <a:cubicBezTo>
-                    <a:pt x="83047" y="217514"/>
-                    <a:pt x="82137" y="272045"/>
-                    <a:pt x="81228" y="326575"/>
-                  </a:cubicBezTo>
-                  <a:lnTo>
-                    <a:pt x="0" y="318394"/>
-                  </a:lnTo>
-                  <a:lnTo>
-                    <a:pt x="0" y="168438"/>
-                  </a:lnTo>
-                  <a:close/>
-                  <a:moveTo>
-                    <a:pt x="247861" y="0"/>
-                  </a:moveTo>
-                  <a:cubicBezTo>
-                    <a:pt x="246183" y="163865"/>
-                    <a:pt x="244504" y="327730"/>
-                    <a:pt x="242826" y="491595"/>
-                  </a:cubicBezTo>
-                  <a:lnTo>
-                    <a:pt x="82985" y="327947"/>
-                  </a:lnTo>
-                  <a:cubicBezTo>
-                    <a:pt x="83560" y="271749"/>
-                    <a:pt x="84136" y="215552"/>
-                    <a:pt x="84711" y="159354"/>
-                  </a:cubicBezTo>
-                  <a:lnTo>
-                    <a:pt x="247861" y="0"/>
-                  </a:lnTo>
-                  <a:close/>
-                </a:path>
-              </a:pathLst>
-            </a:custGeom>
-            <a:solidFill>
-              <a:srgbClr val="0070C0"/>
-            </a:solidFill>
-            <a:ln w="6350">
-              <a:solidFill>
-                <a:schemeClr val="bg1"/>
-              </a:solidFill>
-            </a:ln>
-          </p:spPr>
-          <p:style>
-            <a:lnRef idx="2">
-              <a:schemeClr val="accent1">
-                <a:shade val="50000"/>
-              </a:schemeClr>
-            </a:lnRef>
-            <a:fillRef idx="1">
-              <a:schemeClr val="accent1"/>
-            </a:fillRef>
-            <a:effectRef idx="0">
-              <a:schemeClr val="accent1"/>
-            </a:effectRef>
-            <a:fontRef idx="minor">
-              <a:schemeClr val="lt1"/>
-            </a:fontRef>
-          </p:style>
-          <p:txBody>
-            <a:bodyPr rtlCol="0" anchor="ctr"/>
-            <a:lstStyle/>
-            <a:p>
-              <a:pPr algn="ctr"/>
-              <a:endParaRPr lang="en-SG"/>
-            </a:p>
-          </p:txBody>
-        </p:sp>
-      </p:grpSp>
-      <p:grpSp>
-        <p:nvGrpSpPr>
-          <p:cNvPr id="109" name="Group 108"/>
-          <p:cNvGrpSpPr/>
-          <p:nvPr/>
-        </p:nvGrpSpPr>
-        <p:grpSpPr>
-          <a:xfrm>
-            <a:off x="1310960" y="1241884"/>
-            <a:ext cx="190500" cy="190500"/>
-            <a:chOff x="1310960" y="1241884"/>
-            <a:chExt cx="190500" cy="190500"/>
-          </a:xfrm>
-        </p:grpSpPr>
-        <p:sp>
-          <p:nvSpPr>
-            <p:cNvPr id="189" name="Oval 188"/>
-            <p:cNvSpPr/>
-            <p:nvPr/>
-          </p:nvSpPr>
-          <p:spPr>
-            <a:xfrm>
-              <a:off x="1310960" y="1241884"/>
-              <a:ext cx="190500" cy="190500"/>
-            </a:xfrm>
-            <a:prstGeom prst="ellipse">
-              <a:avLst/>
-            </a:prstGeom>
-            <a:solidFill>
-              <a:schemeClr val="accent6"/>
-            </a:solidFill>
-            <a:ln>
-              <a:noFill/>
-            </a:ln>
-          </p:spPr>
-          <p:style>
-            <a:lnRef idx="2">
-              <a:schemeClr val="accent1">
-                <a:shade val="50000"/>
-              </a:schemeClr>
-            </a:lnRef>
-            <a:fillRef idx="1">
-              <a:schemeClr val="accent1"/>
-            </a:fillRef>
-            <a:effectRef idx="0">
-              <a:schemeClr val="accent1"/>
-            </a:effectRef>
-            <a:fontRef idx="minor">
-              <a:schemeClr val="lt1"/>
-            </a:fontRef>
-          </p:style>
-          <p:txBody>
-            <a:bodyPr rtlCol="0" anchor="ctr"/>
-            <a:lstStyle/>
-            <a:p>
-              <a:pPr algn="ctr"/>
-              <a:endParaRPr lang="en-SG"/>
-            </a:p>
-          </p:txBody>
-        </p:sp>
         <p:sp>
           <p:nvSpPr>
             <p:cNvPr id="190" name="Freeform 189"/>
@@ -11384,225 +11332,66 @@
           </p:txBody>
         </p:sp>
       </p:grpSp>
-      <p:pic>
-        <p:nvPicPr>
-          <p:cNvPr id="98" name="Picture 97"/>
-          <p:cNvPicPr>
-            <a:picLocks noChangeAspect="1"/>
-          </p:cNvPicPr>
+      <p:sp>
+        <p:nvSpPr>
+          <p:cNvPr id="106" name="TextBox 105"/>
+          <p:cNvSpPr txBox="1"/>
           <p:nvPr/>
-        </p:nvPicPr>
-        <p:blipFill>
-          <a:blip r:embed="rId2"/>
-          <a:stretch>
-            <a:fillRect/>
-          </a:stretch>
-        </p:blipFill>
+        </p:nvSpPr>
         <p:spPr>
           <a:xfrm>
-            <a:off x="1876963" y="1241883"/>
-            <a:ext cx="190500" cy="190500"/>
+            <a:off x="2389651" y="1159706"/>
+            <a:ext cx="330540" cy="369332"/>
           </a:xfrm>
           <a:prstGeom prst="rect">
             <a:avLst/>
           </a:prstGeom>
+          <a:noFill/>
         </p:spPr>
-      </p:pic>
-      <p:pic>
-        <p:nvPicPr>
-          <p:cNvPr id="102" name="Picture 101"/>
-          <p:cNvPicPr>
-            <a:picLocks noChangeAspect="1"/>
-          </p:cNvPicPr>
-          <p:nvPr/>
-        </p:nvPicPr>
-        <p:blipFill>
-          <a:blip r:embed="rId3"/>
-          <a:stretch>
-            <a:fillRect/>
-          </a:stretch>
-        </p:blipFill>
-        <p:spPr>
-          <a:xfrm>
-            <a:off x="2160686" y="1245948"/>
-            <a:ext cx="190500" cy="190500"/>
-          </a:xfrm>
-          <a:prstGeom prst="rect">
-            <a:avLst/>
-          </a:prstGeom>
-        </p:spPr>
-      </p:pic>
+        <p:txBody>
+          <a:bodyPr wrap="none" rtlCol="0">
+            <a:spAutoFit/>
+          </a:bodyPr>
+          <a:lstStyle/>
+          <a:p>
+            <a:r>
+              <a:rPr lang="en-US" b="1" dirty="0">
+                <a:ln w="12700">
+                  <a:noFill/>
+                </a:ln>
+                <a:solidFill>
+                  <a:srgbClr val="0070C0"/>
+                </a:solidFill>
+                <a:latin typeface="Rockwell Extra Bold" pitchFamily="18" charset="0"/>
+              </a:rPr>
+              <a:t>?</a:t>
+            </a:r>
+            <a:endParaRPr lang="en-SG" b="1" dirty="0">
+              <a:ln w="12700">
+                <a:noFill/>
+              </a:ln>
+              <a:solidFill>
+                <a:srgbClr val="0070C0"/>
+              </a:solidFill>
+              <a:latin typeface="Rockwell Extra Bold" pitchFamily="18" charset="0"/>
+            </a:endParaRPr>
+          </a:p>
+        </p:txBody>
+      </p:sp>
       <p:grpSp>
         <p:nvGrpSpPr>
-          <p:cNvPr id="108" name="Group 107"/>
+          <p:cNvPr id="7" name="Group 6"/>
           <p:cNvGrpSpPr/>
           <p:nvPr/>
         </p:nvGrpSpPr>
         <p:grpSpPr>
           <a:xfrm>
-            <a:off x="2391009" y="1156532"/>
-            <a:ext cx="330540" cy="369332"/>
-            <a:chOff x="2573313" y="1173309"/>
-            <a:chExt cx="330540" cy="369332"/>
+            <a:off x="2798474" y="1246087"/>
+            <a:ext cx="184722" cy="168885"/>
+            <a:chOff x="2810342" y="1283407"/>
+            <a:chExt cx="131733" cy="120439"/>
           </a:xfrm>
         </p:grpSpPr>
-        <p:sp>
-          <p:nvSpPr>
-            <p:cNvPr id="194" name="Oval 193"/>
-            <p:cNvSpPr/>
-            <p:nvPr/>
-          </p:nvSpPr>
-          <p:spPr>
-            <a:xfrm>
-              <a:off x="2642252" y="1265900"/>
-              <a:ext cx="190500" cy="190500"/>
-            </a:xfrm>
-            <a:prstGeom prst="ellipse">
-              <a:avLst/>
-            </a:prstGeom>
-            <a:solidFill>
-              <a:schemeClr val="accent6"/>
-            </a:solidFill>
-            <a:ln>
-              <a:noFill/>
-            </a:ln>
-          </p:spPr>
-          <p:style>
-            <a:lnRef idx="2">
-              <a:schemeClr val="accent1">
-                <a:shade val="50000"/>
-              </a:schemeClr>
-            </a:lnRef>
-            <a:fillRef idx="1">
-              <a:schemeClr val="accent1"/>
-            </a:fillRef>
-            <a:effectRef idx="0">
-              <a:schemeClr val="accent1"/>
-            </a:effectRef>
-            <a:fontRef idx="minor">
-              <a:schemeClr val="lt1"/>
-            </a:fontRef>
-          </p:style>
-          <p:txBody>
-            <a:bodyPr rtlCol="0" anchor="ctr"/>
-            <a:lstStyle/>
-            <a:p>
-              <a:pPr algn="ctr"/>
-              <a:endParaRPr lang="en-SG"/>
-            </a:p>
-          </p:txBody>
-        </p:sp>
-        <p:sp>
-          <p:nvSpPr>
-            <p:cNvPr id="106" name="TextBox 105"/>
-            <p:cNvSpPr txBox="1"/>
-            <p:nvPr/>
-          </p:nvSpPr>
-          <p:spPr>
-            <a:xfrm>
-              <a:off x="2573313" y="1173309"/>
-              <a:ext cx="330540" cy="369332"/>
-            </a:xfrm>
-            <a:prstGeom prst="rect">
-              <a:avLst/>
-            </a:prstGeom>
-            <a:noFill/>
-          </p:spPr>
-          <p:txBody>
-            <a:bodyPr wrap="none" rtlCol="0">
-              <a:spAutoFit/>
-            </a:bodyPr>
-            <a:lstStyle/>
-            <a:p>
-              <a:r>
-                <a:rPr lang="en-US" b="1" dirty="0" smtClean="0">
-                  <a:ln w="12700">
-                    <a:solidFill>
-                      <a:schemeClr val="bg1"/>
-                    </a:solidFill>
-                  </a:ln>
-                  <a:solidFill>
-                    <a:srgbClr val="0070C0"/>
-                  </a:solidFill>
-                  <a:latin typeface="Rockwell Extra Bold" pitchFamily="18" charset="0"/>
-                </a:rPr>
-                <a:t>?</a:t>
-              </a:r>
-              <a:endParaRPr lang="en-SG" b="1" dirty="0">
-                <a:ln w="12700">
-                  <a:solidFill>
-                    <a:schemeClr val="bg1"/>
-                  </a:solidFill>
-                </a:ln>
-                <a:solidFill>
-                  <a:srgbClr val="0070C0"/>
-                </a:solidFill>
-                <a:latin typeface="Rockwell Extra Bold" pitchFamily="18" charset="0"/>
-              </a:endParaRPr>
-            </a:p>
-          </p:txBody>
-        </p:sp>
-      </p:grpSp>
-      <p:grpSp>
-        <p:nvGrpSpPr>
-          <p:cNvPr id="117" name="Group 116"/>
-          <p:cNvGrpSpPr/>
-          <p:nvPr/>
-        </p:nvGrpSpPr>
-        <p:grpSpPr>
-          <a:xfrm>
-            <a:off x="2780962" y="1249123"/>
-            <a:ext cx="190500" cy="190500"/>
-            <a:chOff x="3001076" y="1269587"/>
-            <a:chExt cx="190500" cy="190500"/>
-          </a:xfrm>
-        </p:grpSpPr>
-        <p:sp>
-          <p:nvSpPr>
-            <p:cNvPr id="213" name="Oval 212"/>
-            <p:cNvSpPr/>
-            <p:nvPr/>
-          </p:nvSpPr>
-          <p:spPr>
-            <a:xfrm>
-              <a:off x="3001076" y="1269587"/>
-              <a:ext cx="190500" cy="190500"/>
-            </a:xfrm>
-            <a:prstGeom prst="ellipse">
-              <a:avLst/>
-            </a:prstGeom>
-            <a:solidFill>
-              <a:schemeClr val="accent6"/>
-            </a:solidFill>
-            <a:ln>
-              <a:noFill/>
-            </a:ln>
-          </p:spPr>
-          <p:style>
-            <a:lnRef idx="2">
-              <a:schemeClr val="accent1">
-                <a:shade val="50000"/>
-              </a:schemeClr>
-            </a:lnRef>
-            <a:fillRef idx="1">
-              <a:schemeClr val="accent1"/>
-            </a:fillRef>
-            <a:effectRef idx="0">
-              <a:schemeClr val="accent1"/>
-            </a:effectRef>
-            <a:fontRef idx="minor">
-              <a:schemeClr val="lt1"/>
-            </a:fontRef>
-          </p:style>
-          <p:txBody>
-            <a:bodyPr rtlCol="0" anchor="ctr"/>
-            <a:lstStyle/>
-            <a:p>
-              <a:pPr algn="ctr"/>
-              <a:endParaRPr lang="en-SG"/>
-            </a:p>
-          </p:txBody>
-        </p:sp>
         <p:sp>
           <p:nvSpPr>
             <p:cNvPr id="217" name="Rectangle 216"/>
@@ -11611,7 +11400,7 @@
           </p:nvSpPr>
           <p:spPr>
             <a:xfrm>
-              <a:off x="3058269" y="1303871"/>
+              <a:off x="2838155" y="1283407"/>
               <a:ext cx="103920" cy="74655"/>
             </a:xfrm>
             <a:prstGeom prst="rect">
@@ -11662,7 +11451,7 @@
           </p:nvSpPr>
           <p:spPr>
             <a:xfrm>
-              <a:off x="3044204" y="1327509"/>
+              <a:off x="2824090" y="1307045"/>
               <a:ext cx="103920" cy="74655"/>
             </a:xfrm>
             <a:prstGeom prst="rect">
@@ -11713,7 +11502,7 @@
           </p:nvSpPr>
           <p:spPr>
             <a:xfrm>
-              <a:off x="3030456" y="1349655"/>
+              <a:off x="2810342" y="1329191"/>
               <a:ext cx="103920" cy="74655"/>
             </a:xfrm>
             <a:prstGeom prst="rect">
@@ -11759,16 +11548,16 @@
       </p:grpSp>
       <p:grpSp>
         <p:nvGrpSpPr>
-          <p:cNvPr id="138" name="Group 137"/>
+          <p:cNvPr id="8" name="Group 7"/>
           <p:cNvGrpSpPr/>
           <p:nvPr/>
         </p:nvGrpSpPr>
         <p:grpSpPr>
           <a:xfrm>
             <a:off x="3064524" y="1241883"/>
-            <a:ext cx="190500" cy="190500"/>
-            <a:chOff x="3321025" y="1253436"/>
-            <a:chExt cx="190500" cy="190500"/>
+            <a:ext cx="166083" cy="154363"/>
+            <a:chOff x="3064524" y="1241883"/>
+            <a:chExt cx="166083" cy="154363"/>
           </a:xfrm>
         </p:grpSpPr>
         <p:sp>
@@ -11779,8 +11568,8 @@
           </p:nvSpPr>
           <p:spPr>
             <a:xfrm>
-              <a:off x="3321025" y="1253436"/>
-              <a:ext cx="190500" cy="190500"/>
+              <a:off x="3064524" y="1241883"/>
+              <a:ext cx="150164" cy="150164"/>
             </a:xfrm>
             <a:prstGeom prst="ellipse">
               <a:avLst/>
@@ -11825,7 +11614,7 @@
           </p:nvSpPr>
           <p:spPr>
             <a:xfrm>
-              <a:off x="3346906" y="1280846"/>
+              <a:off x="3090405" y="1269293"/>
               <a:ext cx="85531" cy="88763"/>
             </a:xfrm>
             <a:custGeom>
@@ -11933,7 +11722,7 @@
           </p:nvSpPr>
           <p:spPr>
             <a:xfrm rot="771170">
-              <a:off x="3401577" y="1319036"/>
+              <a:off x="3145076" y="1307483"/>
               <a:ext cx="85531" cy="88763"/>
             </a:xfrm>
             <a:custGeom>
@@ -12059,7 +11848,7 @@
           <a:lstStyle/>
           <a:p>
             <a:r>
-              <a:rPr lang="en-US" dirty="0" smtClean="0"/>
+              <a:rPr lang="en-US" dirty="0"/>
               <a:t>Minimized Icons</a:t>
             </a:r>
             <a:endParaRPr lang="en-SG" dirty="0"/>
@@ -12090,7 +11879,7 @@
           <a:p>
             <a:pPr algn="ctr"/>
             <a:r>
-              <a:rPr lang="en-US" sz="300" dirty="0" smtClean="0"/>
+              <a:rPr lang="en-US" sz="300" dirty="0"/>
               <a:t>Narrations Lab</a:t>
             </a:r>
             <a:endParaRPr lang="en-SG" sz="300" dirty="0"/>
@@ -12121,7 +11910,7 @@
           <a:p>
             <a:pPr algn="ctr"/>
             <a:r>
-              <a:rPr lang="en-US" sz="300" dirty="0" smtClean="0"/>
+              <a:rPr lang="en-US" sz="300" dirty="0"/>
               <a:t>Captions Lab</a:t>
             </a:r>
             <a:endParaRPr lang="en-SG" sz="300" dirty="0"/>
@@ -12152,7 +11941,7 @@
           <a:p>
             <a:pPr algn="ctr"/>
             <a:r>
-              <a:rPr lang="en-US" sz="300" dirty="0" smtClean="0"/>
+              <a:rPr lang="en-US" sz="300" dirty="0"/>
               <a:t>Highlight Lab</a:t>
             </a:r>
             <a:endParaRPr lang="en-SG" sz="300" dirty="0"/>
@@ -12183,7 +11972,7 @@
           <a:p>
             <a:pPr algn="ctr"/>
             <a:r>
-              <a:rPr lang="en-US" sz="300" dirty="0" smtClean="0"/>
+              <a:rPr lang="en-US" sz="300" dirty="0"/>
               <a:t>Help</a:t>
             </a:r>
             <a:endParaRPr lang="en-SG" sz="300" dirty="0"/>
@@ -12214,7 +12003,7 @@
           <a:p>
             <a:pPr algn="ctr"/>
             <a:r>
-              <a:rPr lang="en-US" sz="300" dirty="0" smtClean="0"/>
+              <a:rPr lang="en-US" sz="300" dirty="0"/>
               <a:t>More Labs</a:t>
             </a:r>
             <a:endParaRPr lang="en-SG" sz="300" dirty="0"/>
@@ -12245,8 +12034,1050 @@
           <a:p>
             <a:pPr algn="ctr"/>
             <a:r>
-              <a:rPr lang="en-US" sz="300" dirty="0" smtClean="0"/>
+              <a:rPr lang="en-US" sz="300" dirty="0"/>
               <a:t>Crop Lab</a:t>
+            </a:r>
+            <a:endParaRPr lang="en-SG" sz="300" dirty="0"/>
+          </a:p>
+        </p:txBody>
+      </p:sp>
+      <p:grpSp>
+        <p:nvGrpSpPr>
+          <p:cNvPr id="5" name="Group 4"/>
+          <p:cNvGrpSpPr/>
+          <p:nvPr/>
+        </p:nvGrpSpPr>
+        <p:grpSpPr>
+          <a:xfrm>
+            <a:off x="1875882" y="1248295"/>
+            <a:ext cx="205174" cy="194001"/>
+            <a:chOff x="1875882" y="1248295"/>
+            <a:chExt cx="205174" cy="194001"/>
+          </a:xfrm>
+        </p:grpSpPr>
+        <p:sp>
+          <p:nvSpPr>
+            <p:cNvPr id="33" name="Rectangle 32"/>
+            <p:cNvSpPr/>
+            <p:nvPr/>
+          </p:nvSpPr>
+          <p:spPr>
+            <a:xfrm>
+              <a:off x="1885720" y="1248841"/>
+              <a:ext cx="182880" cy="182880"/>
+            </a:xfrm>
+            <a:prstGeom prst="rect">
+              <a:avLst/>
+            </a:prstGeom>
+            <a:solidFill>
+              <a:schemeClr val="accent6"/>
+            </a:solidFill>
+            <a:ln>
+              <a:solidFill>
+                <a:schemeClr val="accent6"/>
+              </a:solidFill>
+            </a:ln>
+          </p:spPr>
+          <p:style>
+            <a:lnRef idx="2">
+              <a:schemeClr val="accent1">
+                <a:shade val="50000"/>
+              </a:schemeClr>
+            </a:lnRef>
+            <a:fillRef idx="1">
+              <a:schemeClr val="accent1"/>
+            </a:fillRef>
+            <a:effectRef idx="0">
+              <a:schemeClr val="accent1"/>
+            </a:effectRef>
+            <a:fontRef idx="minor">
+              <a:schemeClr val="lt1"/>
+            </a:fontRef>
+          </p:style>
+          <p:txBody>
+            <a:bodyPr rtlCol="0" anchor="ctr"/>
+            <a:lstStyle/>
+            <a:p>
+              <a:pPr algn="ctr"/>
+              <a:endParaRPr lang="en-US"/>
+            </a:p>
+          </p:txBody>
+        </p:sp>
+        <p:sp>
+          <p:nvSpPr>
+            <p:cNvPr id="35" name="Right Arrow 140"/>
+            <p:cNvSpPr>
+              <a:spLocks noChangeAspect="1"/>
+            </p:cNvSpPr>
+            <p:nvPr/>
+          </p:nvSpPr>
+          <p:spPr>
+            <a:xfrm rot="4632386">
+              <a:off x="1908881" y="1248295"/>
+              <a:ext cx="132835" cy="132835"/>
+            </a:xfrm>
+            <a:prstGeom prst="rightArrow">
+              <a:avLst/>
+            </a:prstGeom>
+            <a:solidFill>
+              <a:srgbClr val="0070C0"/>
+            </a:solidFill>
+            <a:ln w="6350">
+              <a:solidFill>
+                <a:schemeClr val="bg1"/>
+              </a:solidFill>
+            </a:ln>
+          </p:spPr>
+          <p:style>
+            <a:lnRef idx="2">
+              <a:schemeClr val="accent1">
+                <a:shade val="50000"/>
+              </a:schemeClr>
+            </a:lnRef>
+            <a:fillRef idx="1">
+              <a:schemeClr val="accent1"/>
+            </a:fillRef>
+            <a:effectRef idx="0">
+              <a:schemeClr val="accent1"/>
+            </a:effectRef>
+            <a:fontRef idx="minor">
+              <a:schemeClr val="lt1"/>
+            </a:fontRef>
+          </p:style>
+          <p:txBody>
+            <a:bodyPr rtlCol="0" anchor="ctr"/>
+            <a:lstStyle/>
+            <a:p>
+              <a:pPr algn="ctr"/>
+              <a:endParaRPr lang="en-US" dirty="0"/>
+            </a:p>
+          </p:txBody>
+        </p:sp>
+        <p:sp>
+          <p:nvSpPr>
+            <p:cNvPr id="36" name="Rectangle 35"/>
+            <p:cNvSpPr/>
+            <p:nvPr/>
+          </p:nvSpPr>
+          <p:spPr>
+            <a:xfrm>
+              <a:off x="1875882" y="1396577"/>
+              <a:ext cx="205174" cy="45719"/>
+            </a:xfrm>
+            <a:prstGeom prst="rect">
+              <a:avLst/>
+            </a:prstGeom>
+            <a:solidFill>
+              <a:srgbClr val="0070C0"/>
+            </a:solidFill>
+            <a:ln w="9525">
+              <a:solidFill>
+                <a:schemeClr val="bg1"/>
+              </a:solidFill>
+            </a:ln>
+          </p:spPr>
+          <p:style>
+            <a:lnRef idx="2">
+              <a:schemeClr val="accent1">
+                <a:shade val="50000"/>
+              </a:schemeClr>
+            </a:lnRef>
+            <a:fillRef idx="1">
+              <a:schemeClr val="accent1"/>
+            </a:fillRef>
+            <a:effectRef idx="0">
+              <a:schemeClr val="accent1"/>
+            </a:effectRef>
+            <a:fontRef idx="minor">
+              <a:schemeClr val="lt1"/>
+            </a:fontRef>
+          </p:style>
+          <p:txBody>
+            <a:bodyPr rtlCol="0" anchor="ctr"/>
+            <a:lstStyle/>
+            <a:p>
+              <a:pPr algn="ctr"/>
+              <a:endParaRPr lang="en-US" dirty="0"/>
+            </a:p>
+          </p:txBody>
+        </p:sp>
+      </p:grpSp>
+      <p:grpSp>
+        <p:nvGrpSpPr>
+          <p:cNvPr id="6" name="Group 5"/>
+          <p:cNvGrpSpPr/>
+          <p:nvPr/>
+        </p:nvGrpSpPr>
+        <p:grpSpPr>
+          <a:xfrm>
+            <a:off x="2162847" y="1265401"/>
+            <a:ext cx="198456" cy="149571"/>
+            <a:chOff x="3644773" y="1069336"/>
+            <a:chExt cx="741789" cy="559070"/>
+          </a:xfrm>
+        </p:grpSpPr>
+        <p:sp>
+          <p:nvSpPr>
+            <p:cNvPr id="42" name="Rectangle 41"/>
+            <p:cNvSpPr/>
+            <p:nvPr/>
+          </p:nvSpPr>
+          <p:spPr>
+            <a:xfrm>
+              <a:off x="3644773" y="1069336"/>
+              <a:ext cx="741789" cy="559070"/>
+            </a:xfrm>
+            <a:prstGeom prst="rect">
+              <a:avLst/>
+            </a:prstGeom>
+            <a:solidFill>
+              <a:schemeClr val="accent6"/>
+            </a:solidFill>
+            <a:ln>
+              <a:noFill/>
+            </a:ln>
+          </p:spPr>
+          <p:style>
+            <a:lnRef idx="2">
+              <a:schemeClr val="accent1">
+                <a:shade val="50000"/>
+              </a:schemeClr>
+            </a:lnRef>
+            <a:fillRef idx="1">
+              <a:schemeClr val="accent1"/>
+            </a:fillRef>
+            <a:effectRef idx="0">
+              <a:schemeClr val="accent1"/>
+            </a:effectRef>
+            <a:fontRef idx="minor">
+              <a:schemeClr val="lt1"/>
+            </a:fontRef>
+          </p:style>
+          <p:txBody>
+            <a:bodyPr rtlCol="0" anchor="ctr"/>
+            <a:lstStyle/>
+            <a:p>
+              <a:pPr algn="ctr"/>
+              <a:endParaRPr lang="en-US"/>
+            </a:p>
+          </p:txBody>
+        </p:sp>
+        <p:grpSp>
+          <p:nvGrpSpPr>
+            <p:cNvPr id="43" name="Group 42"/>
+            <p:cNvGrpSpPr/>
+            <p:nvPr/>
+          </p:nvGrpSpPr>
+          <p:grpSpPr>
+            <a:xfrm>
+              <a:off x="3768102" y="1150174"/>
+              <a:ext cx="522208" cy="64354"/>
+              <a:chOff x="3370502" y="2494280"/>
+              <a:chExt cx="522207" cy="64353"/>
+            </a:xfrm>
+          </p:grpSpPr>
+          <p:sp>
+            <p:nvSpPr>
+              <p:cNvPr id="51" name="Rounded Rectangle 182"/>
+              <p:cNvSpPr/>
+              <p:nvPr/>
+            </p:nvSpPr>
+            <p:spPr>
+              <a:xfrm>
+                <a:off x="3483859" y="2494280"/>
+                <a:ext cx="408850" cy="64353"/>
+              </a:xfrm>
+              <a:prstGeom prst="roundRect">
+                <a:avLst/>
+              </a:prstGeom>
+              <a:solidFill>
+                <a:schemeClr val="bg1"/>
+              </a:solidFill>
+              <a:ln>
+                <a:noFill/>
+              </a:ln>
+            </p:spPr>
+            <p:style>
+              <a:lnRef idx="2">
+                <a:schemeClr val="accent1">
+                  <a:shade val="50000"/>
+                </a:schemeClr>
+              </a:lnRef>
+              <a:fillRef idx="1">
+                <a:schemeClr val="accent1"/>
+              </a:fillRef>
+              <a:effectRef idx="0">
+                <a:schemeClr val="accent1"/>
+              </a:effectRef>
+              <a:fontRef idx="minor">
+                <a:schemeClr val="lt1"/>
+              </a:fontRef>
+            </p:style>
+            <p:txBody>
+              <a:bodyPr rtlCol="0" anchor="ctr"/>
+              <a:lstStyle/>
+              <a:p>
+                <a:pPr algn="ctr"/>
+                <a:endParaRPr lang="en-US"/>
+              </a:p>
+            </p:txBody>
+          </p:sp>
+          <p:sp>
+            <p:nvSpPr>
+              <p:cNvPr id="52" name="Rounded Rectangle 183"/>
+              <p:cNvSpPr/>
+              <p:nvPr/>
+            </p:nvSpPr>
+            <p:spPr>
+              <a:xfrm>
+                <a:off x="3370502" y="2494280"/>
+                <a:ext cx="51086" cy="64353"/>
+              </a:xfrm>
+              <a:prstGeom prst="roundRect">
+                <a:avLst/>
+              </a:prstGeom>
+              <a:solidFill>
+                <a:schemeClr val="bg1"/>
+              </a:solidFill>
+              <a:ln>
+                <a:noFill/>
+              </a:ln>
+            </p:spPr>
+            <p:style>
+              <a:lnRef idx="2">
+                <a:schemeClr val="accent1">
+                  <a:shade val="50000"/>
+                </a:schemeClr>
+              </a:lnRef>
+              <a:fillRef idx="1">
+                <a:schemeClr val="accent1"/>
+              </a:fillRef>
+              <a:effectRef idx="0">
+                <a:schemeClr val="accent1"/>
+              </a:effectRef>
+              <a:fontRef idx="minor">
+                <a:schemeClr val="lt1"/>
+              </a:fontRef>
+            </p:style>
+            <p:txBody>
+              <a:bodyPr rtlCol="0" anchor="ctr"/>
+              <a:lstStyle/>
+              <a:p>
+                <a:pPr algn="ctr"/>
+                <a:endParaRPr lang="en-US"/>
+              </a:p>
+            </p:txBody>
+          </p:sp>
+        </p:grpSp>
+        <p:grpSp>
+          <p:nvGrpSpPr>
+            <p:cNvPr id="44" name="Group 43"/>
+            <p:cNvGrpSpPr/>
+            <p:nvPr/>
+          </p:nvGrpSpPr>
+          <p:grpSpPr>
+            <a:xfrm>
+              <a:off x="3770965" y="1498199"/>
+              <a:ext cx="522208" cy="64354"/>
+              <a:chOff x="3373366" y="2880398"/>
+              <a:chExt cx="522207" cy="64353"/>
+            </a:xfrm>
+          </p:grpSpPr>
+          <p:sp>
+            <p:nvSpPr>
+              <p:cNvPr id="49" name="Rounded Rectangle 178"/>
+              <p:cNvSpPr/>
+              <p:nvPr/>
+            </p:nvSpPr>
+            <p:spPr>
+              <a:xfrm>
+                <a:off x="3486723" y="2880398"/>
+                <a:ext cx="408850" cy="64353"/>
+              </a:xfrm>
+              <a:prstGeom prst="roundRect">
+                <a:avLst/>
+              </a:prstGeom>
+              <a:solidFill>
+                <a:schemeClr val="bg1"/>
+              </a:solidFill>
+              <a:ln>
+                <a:noFill/>
+              </a:ln>
+            </p:spPr>
+            <p:style>
+              <a:lnRef idx="2">
+                <a:schemeClr val="accent1">
+                  <a:shade val="50000"/>
+                </a:schemeClr>
+              </a:lnRef>
+              <a:fillRef idx="1">
+                <a:schemeClr val="accent1"/>
+              </a:fillRef>
+              <a:effectRef idx="0">
+                <a:schemeClr val="accent1"/>
+              </a:effectRef>
+              <a:fontRef idx="minor">
+                <a:schemeClr val="lt1"/>
+              </a:fontRef>
+            </p:style>
+            <p:txBody>
+              <a:bodyPr rtlCol="0" anchor="ctr"/>
+              <a:lstStyle/>
+              <a:p>
+                <a:pPr algn="ctr"/>
+                <a:endParaRPr lang="en-US"/>
+              </a:p>
+            </p:txBody>
+          </p:sp>
+          <p:sp>
+            <p:nvSpPr>
+              <p:cNvPr id="50" name="Rounded Rectangle 179"/>
+              <p:cNvSpPr/>
+              <p:nvPr/>
+            </p:nvSpPr>
+            <p:spPr>
+              <a:xfrm>
+                <a:off x="3373366" y="2880398"/>
+                <a:ext cx="51086" cy="64353"/>
+              </a:xfrm>
+              <a:prstGeom prst="roundRect">
+                <a:avLst/>
+              </a:prstGeom>
+              <a:solidFill>
+                <a:schemeClr val="bg1"/>
+              </a:solidFill>
+              <a:ln>
+                <a:noFill/>
+              </a:ln>
+            </p:spPr>
+            <p:style>
+              <a:lnRef idx="2">
+                <a:schemeClr val="accent1">
+                  <a:shade val="50000"/>
+                </a:schemeClr>
+              </a:lnRef>
+              <a:fillRef idx="1">
+                <a:schemeClr val="accent1"/>
+              </a:fillRef>
+              <a:effectRef idx="0">
+                <a:schemeClr val="accent1"/>
+              </a:effectRef>
+              <a:fontRef idx="minor">
+                <a:schemeClr val="lt1"/>
+              </a:fontRef>
+            </p:style>
+            <p:txBody>
+              <a:bodyPr rtlCol="0" anchor="ctr"/>
+              <a:lstStyle/>
+              <a:p>
+                <a:pPr algn="ctr"/>
+                <a:endParaRPr lang="en-US"/>
+              </a:p>
+            </p:txBody>
+          </p:sp>
+        </p:grpSp>
+        <p:sp>
+          <p:nvSpPr>
+            <p:cNvPr id="45" name="Rectangle 44"/>
+            <p:cNvSpPr/>
+            <p:nvPr/>
+          </p:nvSpPr>
+          <p:spPr>
+            <a:xfrm>
+              <a:off x="3644773" y="1276075"/>
+              <a:ext cx="741789" cy="152821"/>
+            </a:xfrm>
+            <a:prstGeom prst="rect">
+              <a:avLst/>
+            </a:prstGeom>
+            <a:solidFill>
+              <a:srgbClr val="0070C0"/>
+            </a:solidFill>
+            <a:ln>
+              <a:noFill/>
+            </a:ln>
+          </p:spPr>
+          <p:style>
+            <a:lnRef idx="2">
+              <a:schemeClr val="accent1">
+                <a:shade val="50000"/>
+              </a:schemeClr>
+            </a:lnRef>
+            <a:fillRef idx="1">
+              <a:schemeClr val="accent1"/>
+            </a:fillRef>
+            <a:effectRef idx="0">
+              <a:schemeClr val="accent1"/>
+            </a:effectRef>
+            <a:fontRef idx="minor">
+              <a:schemeClr val="lt1"/>
+            </a:fontRef>
+          </p:style>
+          <p:txBody>
+            <a:bodyPr rtlCol="0" anchor="ctr"/>
+            <a:lstStyle/>
+            <a:p>
+              <a:pPr algn="ctr"/>
+              <a:endParaRPr lang="en-SG"/>
+            </a:p>
+          </p:txBody>
+        </p:sp>
+        <p:grpSp>
+          <p:nvGrpSpPr>
+            <p:cNvPr id="46" name="Group 45"/>
+            <p:cNvGrpSpPr/>
+            <p:nvPr/>
+          </p:nvGrpSpPr>
+          <p:grpSpPr>
+            <a:xfrm>
+              <a:off x="3771309" y="1324173"/>
+              <a:ext cx="522208" cy="64354"/>
+              <a:chOff x="3373711" y="2751692"/>
+              <a:chExt cx="522207" cy="64353"/>
+            </a:xfrm>
+            <a:solidFill>
+              <a:schemeClr val="bg1"/>
+            </a:solidFill>
+          </p:grpSpPr>
+          <p:sp>
+            <p:nvSpPr>
+              <p:cNvPr id="47" name="Rounded Rectangle 180"/>
+              <p:cNvSpPr/>
+              <p:nvPr/>
+            </p:nvSpPr>
+            <p:spPr>
+              <a:xfrm>
+                <a:off x="3487068" y="2751692"/>
+                <a:ext cx="408850" cy="64353"/>
+              </a:xfrm>
+              <a:prstGeom prst="roundRect">
+                <a:avLst/>
+              </a:prstGeom>
+              <a:grpFill/>
+              <a:ln>
+                <a:noFill/>
+              </a:ln>
+            </p:spPr>
+            <p:style>
+              <a:lnRef idx="2">
+                <a:schemeClr val="accent1">
+                  <a:shade val="50000"/>
+                </a:schemeClr>
+              </a:lnRef>
+              <a:fillRef idx="1">
+                <a:schemeClr val="accent1"/>
+              </a:fillRef>
+              <a:effectRef idx="0">
+                <a:schemeClr val="accent1"/>
+              </a:effectRef>
+              <a:fontRef idx="minor">
+                <a:schemeClr val="lt1"/>
+              </a:fontRef>
+            </p:style>
+            <p:txBody>
+              <a:bodyPr rtlCol="0" anchor="ctr"/>
+              <a:lstStyle/>
+              <a:p>
+                <a:pPr algn="ctr"/>
+                <a:endParaRPr lang="en-US"/>
+              </a:p>
+            </p:txBody>
+          </p:sp>
+          <p:sp>
+            <p:nvSpPr>
+              <p:cNvPr id="48" name="Rounded Rectangle 181"/>
+              <p:cNvSpPr/>
+              <p:nvPr/>
+            </p:nvSpPr>
+            <p:spPr>
+              <a:xfrm>
+                <a:off x="3373711" y="2751692"/>
+                <a:ext cx="51086" cy="64353"/>
+              </a:xfrm>
+              <a:prstGeom prst="roundRect">
+                <a:avLst/>
+              </a:prstGeom>
+              <a:grpFill/>
+              <a:ln>
+                <a:noFill/>
+              </a:ln>
+            </p:spPr>
+            <p:style>
+              <a:lnRef idx="2">
+                <a:schemeClr val="accent1">
+                  <a:shade val="50000"/>
+                </a:schemeClr>
+              </a:lnRef>
+              <a:fillRef idx="1">
+                <a:schemeClr val="accent1"/>
+              </a:fillRef>
+              <a:effectRef idx="0">
+                <a:schemeClr val="accent1"/>
+              </a:effectRef>
+              <a:fontRef idx="minor">
+                <a:schemeClr val="lt1"/>
+              </a:fontRef>
+            </p:style>
+            <p:txBody>
+              <a:bodyPr rtlCol="0" anchor="ctr"/>
+              <a:lstStyle/>
+              <a:p>
+                <a:pPr algn="ctr"/>
+                <a:endParaRPr lang="en-US"/>
+              </a:p>
+            </p:txBody>
+          </p:sp>
+        </p:grpSp>
+      </p:grpSp>
+      <p:grpSp>
+        <p:nvGrpSpPr>
+          <p:cNvPr id="4" name="Group 3"/>
+          <p:cNvGrpSpPr/>
+          <p:nvPr/>
+        </p:nvGrpSpPr>
+        <p:grpSpPr>
+          <a:xfrm>
+            <a:off x="3388322" y="1206098"/>
+            <a:ext cx="228600" cy="228600"/>
+            <a:chOff x="3388322" y="1206098"/>
+            <a:chExt cx="228600" cy="228600"/>
+          </a:xfrm>
+        </p:grpSpPr>
+        <p:sp>
+          <p:nvSpPr>
+            <p:cNvPr id="58" name="Rectangle 57"/>
+            <p:cNvSpPr/>
+            <p:nvPr/>
+          </p:nvSpPr>
+          <p:spPr>
+            <a:xfrm>
+              <a:off x="3388322" y="1206098"/>
+              <a:ext cx="228600" cy="228600"/>
+            </a:xfrm>
+            <a:prstGeom prst="rect">
+              <a:avLst/>
+            </a:prstGeom>
+            <a:solidFill>
+              <a:schemeClr val="accent6"/>
+            </a:solidFill>
+            <a:ln>
+              <a:noFill/>
+            </a:ln>
+          </p:spPr>
+          <p:style>
+            <a:lnRef idx="2">
+              <a:schemeClr val="accent1">
+                <a:shade val="50000"/>
+              </a:schemeClr>
+            </a:lnRef>
+            <a:fillRef idx="1">
+              <a:schemeClr val="accent1"/>
+            </a:fillRef>
+            <a:effectRef idx="0">
+              <a:schemeClr val="accent1"/>
+            </a:effectRef>
+            <a:fontRef idx="minor">
+              <a:schemeClr val="lt1"/>
+            </a:fontRef>
+          </p:style>
+          <p:txBody>
+            <a:bodyPr rtlCol="0" anchor="ctr"/>
+            <a:lstStyle/>
+            <a:p>
+              <a:pPr algn="ctr"/>
+              <a:endParaRPr lang="en-US" u="sng"/>
+            </a:p>
+          </p:txBody>
+        </p:sp>
+        <p:sp>
+          <p:nvSpPr>
+            <p:cNvPr id="60" name="Flowchart: Connector 59"/>
+            <p:cNvSpPr/>
+            <p:nvPr/>
+          </p:nvSpPr>
+          <p:spPr>
+            <a:xfrm rot="5400000">
+              <a:off x="3420969" y="1235237"/>
+              <a:ext cx="32294" cy="32294"/>
+            </a:xfrm>
+            <a:prstGeom prst="flowChartConnector">
+              <a:avLst/>
+            </a:prstGeom>
+            <a:solidFill>
+              <a:schemeClr val="bg1"/>
+            </a:solidFill>
+            <a:ln>
+              <a:solidFill>
+                <a:schemeClr val="bg1"/>
+              </a:solidFill>
+            </a:ln>
+          </p:spPr>
+          <p:style>
+            <a:lnRef idx="2">
+              <a:schemeClr val="accent1">
+                <a:shade val="50000"/>
+              </a:schemeClr>
+            </a:lnRef>
+            <a:fillRef idx="1">
+              <a:schemeClr val="accent1"/>
+            </a:fillRef>
+            <a:effectRef idx="0">
+              <a:schemeClr val="accent1"/>
+            </a:effectRef>
+            <a:fontRef idx="minor">
+              <a:schemeClr val="lt1"/>
+            </a:fontRef>
+          </p:style>
+          <p:txBody>
+            <a:bodyPr rtlCol="0" anchor="ctr"/>
+            <a:lstStyle/>
+            <a:p>
+              <a:pPr algn="ctr"/>
+              <a:endParaRPr lang="en-US" u="sng"/>
+            </a:p>
+          </p:txBody>
+        </p:sp>
+        <p:sp>
+          <p:nvSpPr>
+            <p:cNvPr id="61" name="Flowchart: Connector 60"/>
+            <p:cNvSpPr/>
+            <p:nvPr/>
+          </p:nvSpPr>
+          <p:spPr>
+            <a:xfrm rot="18937352">
+              <a:off x="3555557" y="1293338"/>
+              <a:ext cx="32294" cy="32294"/>
+            </a:xfrm>
+            <a:prstGeom prst="flowChartConnector">
+              <a:avLst/>
+            </a:prstGeom>
+            <a:solidFill>
+              <a:schemeClr val="bg1"/>
+            </a:solidFill>
+            <a:ln>
+              <a:solidFill>
+                <a:schemeClr val="bg1"/>
+              </a:solidFill>
+            </a:ln>
+          </p:spPr>
+          <p:style>
+            <a:lnRef idx="2">
+              <a:schemeClr val="accent1">
+                <a:shade val="50000"/>
+              </a:schemeClr>
+            </a:lnRef>
+            <a:fillRef idx="1">
+              <a:schemeClr val="accent1"/>
+            </a:fillRef>
+            <a:effectRef idx="0">
+              <a:schemeClr val="accent1"/>
+            </a:effectRef>
+            <a:fontRef idx="minor">
+              <a:schemeClr val="lt1"/>
+            </a:fontRef>
+          </p:style>
+          <p:txBody>
+            <a:bodyPr rtlCol="0" anchor="ctr"/>
+            <a:lstStyle/>
+            <a:p>
+              <a:pPr algn="ctr"/>
+              <a:endParaRPr lang="en-US" u="sng"/>
+            </a:p>
+          </p:txBody>
+        </p:sp>
+        <p:sp>
+          <p:nvSpPr>
+            <p:cNvPr id="62" name="Freeform 98"/>
+            <p:cNvSpPr/>
+            <p:nvPr/>
+          </p:nvSpPr>
+          <p:spPr>
+            <a:xfrm>
+              <a:off x="3479605" y="1235237"/>
+              <a:ext cx="79416" cy="45719"/>
+            </a:xfrm>
+            <a:custGeom>
+              <a:avLst/>
+              <a:gdLst>
+                <a:gd name="connsiteX0" fmla="*/ 0 w 365125"/>
+                <a:gd name="connsiteY0" fmla="*/ 0 h 79375"/>
+                <a:gd name="connsiteX1" fmla="*/ 196850 w 365125"/>
+                <a:gd name="connsiteY1" fmla="*/ 0 h 79375"/>
+                <a:gd name="connsiteX2" fmla="*/ 365125 w 365125"/>
+                <a:gd name="connsiteY2" fmla="*/ 79375 h 79375"/>
+                <a:gd name="connsiteX0" fmla="*/ 0 w 365125"/>
+                <a:gd name="connsiteY0" fmla="*/ 5879 h 85254"/>
+                <a:gd name="connsiteX1" fmla="*/ 196850 w 365125"/>
+                <a:gd name="connsiteY1" fmla="*/ 5879 h 85254"/>
+                <a:gd name="connsiteX2" fmla="*/ 365125 w 365125"/>
+                <a:gd name="connsiteY2" fmla="*/ 85254 h 85254"/>
+                <a:gd name="connsiteX0" fmla="*/ 0 w 365125"/>
+                <a:gd name="connsiteY0" fmla="*/ 16459 h 95834"/>
+                <a:gd name="connsiteX1" fmla="*/ 142875 w 365125"/>
+                <a:gd name="connsiteY1" fmla="*/ 3759 h 95834"/>
+                <a:gd name="connsiteX2" fmla="*/ 365125 w 365125"/>
+                <a:gd name="connsiteY2" fmla="*/ 95834 h 95834"/>
+                <a:gd name="connsiteX0" fmla="*/ 0 w 365125"/>
+                <a:gd name="connsiteY0" fmla="*/ 13245 h 92620"/>
+                <a:gd name="connsiteX1" fmla="*/ 142875 w 365125"/>
+                <a:gd name="connsiteY1" fmla="*/ 545 h 92620"/>
+                <a:gd name="connsiteX2" fmla="*/ 365125 w 365125"/>
+                <a:gd name="connsiteY2" fmla="*/ 92620 h 92620"/>
+                <a:gd name="connsiteX0" fmla="*/ 0 w 365125"/>
+                <a:gd name="connsiteY0" fmla="*/ 15332 h 94707"/>
+                <a:gd name="connsiteX1" fmla="*/ 142875 w 365125"/>
+                <a:gd name="connsiteY1" fmla="*/ 2632 h 94707"/>
+                <a:gd name="connsiteX2" fmla="*/ 365125 w 365125"/>
+                <a:gd name="connsiteY2" fmla="*/ 94707 h 94707"/>
+              </a:gdLst>
+              <a:ahLst/>
+              <a:cxnLst>
+                <a:cxn ang="0">
+                  <a:pos x="connsiteX0" y="connsiteY0"/>
+                </a:cxn>
+                <a:cxn ang="0">
+                  <a:pos x="connsiteX1" y="connsiteY1"/>
+                </a:cxn>
+                <a:cxn ang="0">
+                  <a:pos x="connsiteX2" y="connsiteY2"/>
+                </a:cxn>
+              </a:cxnLst>
+              <a:rect l="l" t="t" r="r" b="b"/>
+              <a:pathLst>
+                <a:path w="365125" h="94707">
+                  <a:moveTo>
+                    <a:pt x="0" y="15332"/>
+                  </a:moveTo>
+                  <a:cubicBezTo>
+                    <a:pt x="68792" y="-3718"/>
+                    <a:pt x="75671" y="-1072"/>
+                    <a:pt x="142875" y="2632"/>
+                  </a:cubicBezTo>
+                  <a:cubicBezTo>
+                    <a:pt x="210079" y="6336"/>
+                    <a:pt x="309033" y="68249"/>
+                    <a:pt x="365125" y="94707"/>
+                  </a:cubicBezTo>
+                </a:path>
+              </a:pathLst>
+            </a:custGeom>
+            <a:ln w="9525" cap="rnd">
+              <a:solidFill>
+                <a:srgbClr val="0070C0"/>
+              </a:solidFill>
+              <a:headEnd type="none" w="sm" len="sm"/>
+              <a:tailEnd type="triangle" w="sm" len="sm"/>
+            </a:ln>
+          </p:spPr>
+          <p:style>
+            <a:lnRef idx="1">
+              <a:schemeClr val="accent1"/>
+            </a:lnRef>
+            <a:fillRef idx="0">
+              <a:schemeClr val="accent1"/>
+            </a:fillRef>
+            <a:effectRef idx="0">
+              <a:schemeClr val="accent1"/>
+            </a:effectRef>
+            <a:fontRef idx="minor">
+              <a:schemeClr val="tx1"/>
+            </a:fontRef>
+          </p:style>
+          <p:txBody>
+            <a:bodyPr rtlCol="0" anchor="ctr"/>
+            <a:lstStyle/>
+            <a:p>
+              <a:pPr algn="ctr"/>
+              <a:endParaRPr lang="en-US" u="sng" dirty="0"/>
+            </a:p>
+          </p:txBody>
+        </p:sp>
+        <p:sp>
+          <p:nvSpPr>
+            <p:cNvPr id="63" name="Freeform 122"/>
+            <p:cNvSpPr/>
+            <p:nvPr/>
+          </p:nvSpPr>
+          <p:spPr>
+            <a:xfrm rot="685869">
+              <a:off x="3475686" y="1334403"/>
+              <a:ext cx="63861" cy="64613"/>
+            </a:xfrm>
+            <a:custGeom>
+              <a:avLst/>
+              <a:gdLst>
+                <a:gd name="connsiteX0" fmla="*/ 361950 w 361950"/>
+                <a:gd name="connsiteY0" fmla="*/ 0 h 190500"/>
+                <a:gd name="connsiteX1" fmla="*/ 225425 w 361950"/>
+                <a:gd name="connsiteY1" fmla="*/ 146050 h 190500"/>
+                <a:gd name="connsiteX2" fmla="*/ 0 w 361950"/>
+                <a:gd name="connsiteY2" fmla="*/ 190500 h 190500"/>
+                <a:gd name="connsiteX0" fmla="*/ 361950 w 361950"/>
+                <a:gd name="connsiteY0" fmla="*/ 0 h 190500"/>
+                <a:gd name="connsiteX1" fmla="*/ 225425 w 361950"/>
+                <a:gd name="connsiteY1" fmla="*/ 146050 h 190500"/>
+                <a:gd name="connsiteX2" fmla="*/ 0 w 361950"/>
+                <a:gd name="connsiteY2" fmla="*/ 190500 h 190500"/>
+                <a:gd name="connsiteX0" fmla="*/ 361950 w 361950"/>
+                <a:gd name="connsiteY0" fmla="*/ 0 h 190500"/>
+                <a:gd name="connsiteX1" fmla="*/ 225425 w 361950"/>
+                <a:gd name="connsiteY1" fmla="*/ 146050 h 190500"/>
+                <a:gd name="connsiteX2" fmla="*/ 0 w 361950"/>
+                <a:gd name="connsiteY2" fmla="*/ 190500 h 190500"/>
+                <a:gd name="connsiteX0" fmla="*/ 358775 w 358775"/>
+                <a:gd name="connsiteY0" fmla="*/ 0 h 177800"/>
+                <a:gd name="connsiteX1" fmla="*/ 225425 w 358775"/>
+                <a:gd name="connsiteY1" fmla="*/ 133350 h 177800"/>
+                <a:gd name="connsiteX2" fmla="*/ 0 w 358775"/>
+                <a:gd name="connsiteY2" fmla="*/ 177800 h 177800"/>
+                <a:gd name="connsiteX0" fmla="*/ 358775 w 358775"/>
+                <a:gd name="connsiteY0" fmla="*/ 0 h 177800"/>
+                <a:gd name="connsiteX1" fmla="*/ 222250 w 358775"/>
+                <a:gd name="connsiteY1" fmla="*/ 120650 h 177800"/>
+                <a:gd name="connsiteX2" fmla="*/ 0 w 358775"/>
+                <a:gd name="connsiteY2" fmla="*/ 177800 h 177800"/>
+              </a:gdLst>
+              <a:ahLst/>
+              <a:cxnLst>
+                <a:cxn ang="0">
+                  <a:pos x="connsiteX0" y="connsiteY0"/>
+                </a:cxn>
+                <a:cxn ang="0">
+                  <a:pos x="connsiteX1" y="connsiteY1"/>
+                </a:cxn>
+                <a:cxn ang="0">
+                  <a:pos x="connsiteX2" y="connsiteY2"/>
+                </a:cxn>
+              </a:cxnLst>
+              <a:rect l="l" t="t" r="r" b="b"/>
+              <a:pathLst>
+                <a:path w="358775" h="177800">
+                  <a:moveTo>
+                    <a:pt x="358775" y="0"/>
+                  </a:moveTo>
+                  <a:cubicBezTo>
+                    <a:pt x="322792" y="67733"/>
+                    <a:pt x="282046" y="91017"/>
+                    <a:pt x="222250" y="120650"/>
+                  </a:cubicBezTo>
+                  <a:cubicBezTo>
+                    <a:pt x="162454" y="150283"/>
+                    <a:pt x="75142" y="162983"/>
+                    <a:pt x="0" y="177800"/>
+                  </a:cubicBezTo>
+                </a:path>
+              </a:pathLst>
+            </a:custGeom>
+            <a:ln w="9525" cap="rnd">
+              <a:solidFill>
+                <a:srgbClr val="0070C0"/>
+              </a:solidFill>
+              <a:headEnd type="none" w="med" len="med"/>
+              <a:tailEnd type="triangle" w="sm" len="sm"/>
+            </a:ln>
+          </p:spPr>
+          <p:style>
+            <a:lnRef idx="1">
+              <a:schemeClr val="accent1"/>
+            </a:lnRef>
+            <a:fillRef idx="0">
+              <a:schemeClr val="accent1"/>
+            </a:fillRef>
+            <a:effectRef idx="0">
+              <a:schemeClr val="accent1"/>
+            </a:effectRef>
+            <a:fontRef idx="minor">
+              <a:schemeClr val="tx1"/>
+            </a:fontRef>
+          </p:style>
+          <p:txBody>
+            <a:bodyPr rtlCol="0" anchor="ctr"/>
+            <a:lstStyle/>
+            <a:p>
+              <a:pPr algn="ctr"/>
+              <a:endParaRPr lang="en-US" u="sng">
+                <a:solidFill>
+                  <a:schemeClr val="tx1"/>
+                </a:solidFill>
+              </a:endParaRPr>
+            </a:p>
+          </p:txBody>
+        </p:sp>
+        <p:sp>
+          <p:nvSpPr>
+            <p:cNvPr id="65" name="Flowchart: Connector 64"/>
+            <p:cNvSpPr/>
+            <p:nvPr/>
+          </p:nvSpPr>
+          <p:spPr>
+            <a:xfrm rot="5400000">
+              <a:off x="3421008" y="1369701"/>
+              <a:ext cx="32294" cy="32294"/>
+            </a:xfrm>
+            <a:prstGeom prst="flowChartConnector">
+              <a:avLst/>
+            </a:prstGeom>
+            <a:solidFill>
+              <a:schemeClr val="bg1"/>
+            </a:solidFill>
+            <a:ln>
+              <a:solidFill>
+                <a:schemeClr val="bg1"/>
+              </a:solidFill>
+            </a:ln>
+          </p:spPr>
+          <p:style>
+            <a:lnRef idx="2">
+              <a:schemeClr val="accent1">
+                <a:shade val="50000"/>
+              </a:schemeClr>
+            </a:lnRef>
+            <a:fillRef idx="1">
+              <a:schemeClr val="accent1"/>
+            </a:fillRef>
+            <a:effectRef idx="0">
+              <a:schemeClr val="accent1"/>
+            </a:effectRef>
+            <a:fontRef idx="minor">
+              <a:schemeClr val="lt1"/>
+            </a:fontRef>
+          </p:style>
+          <p:txBody>
+            <a:bodyPr rtlCol="0" anchor="ctr"/>
+            <a:lstStyle/>
+            <a:p>
+              <a:pPr algn="ctr"/>
+              <a:endParaRPr lang="en-US" u="sng"/>
+            </a:p>
+          </p:txBody>
+        </p:sp>
+      </p:grpSp>
+      <p:sp>
+        <p:nvSpPr>
+          <p:cNvPr id="67" name="TextBox 66"/>
+          <p:cNvSpPr txBox="1"/>
+          <p:nvPr/>
+        </p:nvSpPr>
+        <p:spPr>
+          <a:xfrm>
+            <a:off x="3264310" y="1443949"/>
+            <a:ext cx="482001" cy="138499"/>
+          </a:xfrm>
+          <a:prstGeom prst="rect">
+            <a:avLst/>
+          </a:prstGeom>
+          <a:noFill/>
+        </p:spPr>
+        <p:txBody>
+          <a:bodyPr wrap="square" rtlCol="0">
+            <a:spAutoFit/>
+          </a:bodyPr>
+          <a:lstStyle/>
+          <a:p>
+            <a:pPr algn="ctr"/>
+            <a:r>
+              <a:rPr lang="en-US" sz="300" dirty="0"/>
+              <a:t>Animation Lab</a:t>
             </a:r>
             <a:endParaRPr lang="en-SG" sz="300" dirty="0"/>
           </a:p>
@@ -12262,13 +13093,6 @@
   <p:clrMapOvr>
     <a:masterClrMapping/>
   </p:clrMapOvr>
-  <p:timing>
-    <p:tnLst>
-      <p:par>
-        <p:cTn id="1" dur="indefinite" restart="never" nodeType="tmRoot"/>
-      </p:par>
-    </p:tnLst>
-  </p:timing>
 </p:sld>
 </file>
 
@@ -12312,7 +13136,7 @@
           <a:lstStyle/>
           <a:p>
             <a:r>
-              <a:rPr lang="en-US" dirty="0" smtClean="0"/>
+              <a:rPr lang="en-US" dirty="0"/>
               <a:t>Colors Lab</a:t>
             </a:r>
             <a:endParaRPr lang="en-SG" dirty="0"/>
@@ -12387,16 +13211,8 @@
           <a:p>
             <a:pPr algn="ctr"/>
             <a:r>
-              <a:rPr lang="en-US" sz="800" dirty="0" smtClean="0"/>
-              <a:t>Colors </a:t>
-            </a:r>
-            <a:r>
               <a:rPr lang="en-US" sz="800" dirty="0"/>
-              <a:t>L</a:t>
-            </a:r>
-            <a:r>
-              <a:rPr lang="en-US" sz="800" dirty="0" smtClean="0"/>
-              <a:t>ab</a:t>
+              <a:t>Colors Lab</a:t>
             </a:r>
             <a:endParaRPr lang="en-SG" sz="800" dirty="0"/>
           </a:p>
@@ -14705,7 +15521,7 @@
           <a:lstStyle/>
           <a:p>
             <a:r>
-              <a:rPr lang="en-US" sz="800" dirty="0" smtClean="0"/>
+              <a:rPr lang="en-US" sz="800" dirty="0"/>
               <a:t>Pick text color</a:t>
             </a:r>
             <a:endParaRPr lang="en-SG" sz="800" dirty="0"/>
@@ -14735,7 +15551,7 @@
           <a:lstStyle/>
           <a:p>
             <a:r>
-              <a:rPr lang="en-US" sz="800" dirty="0" smtClean="0"/>
+              <a:rPr lang="en-US" sz="800" dirty="0"/>
               <a:t>Pick line color</a:t>
             </a:r>
             <a:endParaRPr lang="en-SG" sz="800" dirty="0"/>
@@ -14765,7 +15581,7 @@
           <a:lstStyle/>
           <a:p>
             <a:r>
-              <a:rPr lang="en-US" sz="800" dirty="0" smtClean="0"/>
+              <a:rPr lang="en-US" sz="800" dirty="0"/>
               <a:t>Pick fill color</a:t>
             </a:r>
             <a:endParaRPr lang="en-SG" sz="800" dirty="0"/>
@@ -14795,7 +15611,7 @@
           <a:lstStyle/>
           <a:p>
             <a:r>
-              <a:rPr lang="en-US" sz="800" dirty="0" smtClean="0"/>
+              <a:rPr lang="en-US" sz="800" dirty="0"/>
               <a:t>brightness</a:t>
             </a:r>
             <a:endParaRPr lang="en-SG" sz="800" dirty="0"/>
@@ -14825,7 +15641,7 @@
           <a:lstStyle/>
           <a:p>
             <a:r>
-              <a:rPr lang="en-US" sz="800" dirty="0" smtClean="0"/>
+              <a:rPr lang="en-US" sz="800" dirty="0"/>
               <a:t>saturation</a:t>
             </a:r>
             <a:endParaRPr lang="en-SG" sz="800" dirty="0"/>
@@ -15258,7 +16074,7 @@
           <a:p>
             <a:pPr algn="ctr"/>
             <a:r>
-              <a:rPr lang="en-US" sz="800" dirty="0" smtClean="0"/>
+              <a:rPr lang="en-US" sz="800" dirty="0"/>
               <a:t>Colors Lab (alternative)</a:t>
             </a:r>
             <a:endParaRPr lang="en-SG" sz="800" dirty="0"/>
@@ -16277,7 +17093,7 @@
           <a:lstStyle/>
           <a:p>
             <a:r>
-              <a:rPr lang="en-US" sz="800" dirty="0" smtClean="0"/>
+              <a:rPr lang="en-US" sz="800" dirty="0"/>
               <a:t>Save, load, clear, reload, apply</a:t>
             </a:r>
             <a:endParaRPr lang="en-SG" sz="800" dirty="0"/>
@@ -16294,13 +17110,6 @@
   <p:clrMapOvr>
     <a:masterClrMapping/>
   </p:clrMapOvr>
-  <p:timing>
-    <p:tnLst>
-      <p:par>
-        <p:cTn id="1" dur="indefinite" restart="never" nodeType="tmRoot"/>
-      </p:par>
-    </p:tnLst>
-  </p:timing>
 </p:sld>
 </file>
 
@@ -16344,7 +17153,7 @@
           <a:lstStyle/>
           <a:p>
             <a:r>
-              <a:rPr lang="en-US" dirty="0" smtClean="0"/>
+              <a:rPr lang="en-US" dirty="0"/>
               <a:t>Shapes Lab</a:t>
             </a:r>
             <a:endParaRPr lang="en-SG" dirty="0"/>
@@ -16375,16 +17184,8 @@
           <a:p>
             <a:pPr algn="ctr"/>
             <a:r>
-              <a:rPr lang="en-US" sz="800" dirty="0" smtClean="0"/>
-              <a:t>Shapes </a:t>
-            </a:r>
-            <a:r>
               <a:rPr lang="en-US" sz="800" dirty="0"/>
-              <a:t>L</a:t>
-            </a:r>
-            <a:r>
-              <a:rPr lang="en-US" sz="800" dirty="0" smtClean="0"/>
-              <a:t>ab</a:t>
+              <a:t>Shapes Lab</a:t>
             </a:r>
             <a:endParaRPr lang="en-SG" sz="800" dirty="0"/>
           </a:p>
@@ -16713,7 +17514,7 @@
           <a:p>
             <a:pPr algn="ctr"/>
             <a:r>
-              <a:rPr lang="en-US" sz="1100" dirty="0" smtClean="0"/>
+              <a:rPr lang="en-US" sz="1100" dirty="0"/>
               <a:t>Add to custom shapes</a:t>
             </a:r>
             <a:endParaRPr lang="en-SG" sz="1100" dirty="0"/>
@@ -17214,7 +18015,7 @@
           <a:p>
             <a:pPr algn="ctr"/>
             <a:r>
-              <a:rPr lang="en-US" sz="1100" dirty="0" smtClean="0"/>
+              <a:rPr lang="en-US" sz="1100" dirty="0"/>
               <a:t>Add to slide</a:t>
             </a:r>
             <a:endParaRPr lang="en-SG" sz="1100" dirty="0"/>
@@ -17231,13 +18032,6 @@
   <p:clrMapOvr>
     <a:masterClrMapping/>
   </p:clrMapOvr>
-  <p:timing>
-    <p:tnLst>
-      <p:par>
-        <p:cTn id="1" dur="indefinite" restart="never" nodeType="tmRoot"/>
-      </p:par>
-    </p:tnLst>
-  </p:timing>
 </p:sld>
 </file>
 
@@ -17281,7 +18075,7 @@
           <a:lstStyle/>
           <a:p>
             <a:r>
-              <a:rPr lang="en-US" dirty="0" smtClean="0"/>
+              <a:rPr lang="en-US" dirty="0"/>
               <a:t>Effects Lab</a:t>
             </a:r>
             <a:endParaRPr lang="en-SG" dirty="0"/>
@@ -17312,16 +18106,8 @@
           <a:p>
             <a:pPr algn="ctr"/>
             <a:r>
-              <a:rPr lang="en-US" sz="800" dirty="0" smtClean="0"/>
-              <a:t>Effects </a:t>
-            </a:r>
-            <a:r>
               <a:rPr lang="en-US" sz="800" dirty="0"/>
-              <a:t>L</a:t>
-            </a:r>
-            <a:r>
-              <a:rPr lang="en-US" sz="800" dirty="0" smtClean="0"/>
-              <a:t>ab</a:t>
+              <a:t>Effects Lab</a:t>
             </a:r>
             <a:endParaRPr lang="en-SG" sz="800" dirty="0"/>
           </a:p>
@@ -17547,7 +18333,7 @@
           <a:p>
             <a:pPr algn="ctr"/>
             <a:r>
-              <a:rPr lang="en-US" sz="1100" dirty="0" smtClean="0"/>
+              <a:rPr lang="en-US" sz="1100" dirty="0"/>
               <a:t>Make transparent</a:t>
             </a:r>
           </a:p>
@@ -18140,7 +18926,7 @@
           <a:p>
             <a:pPr algn="ctr"/>
             <a:r>
-              <a:rPr lang="en-US" sz="1100" dirty="0" smtClean="0"/>
+              <a:rPr lang="en-US" sz="1100" dirty="0"/>
               <a:t>Magnify</a:t>
             </a:r>
           </a:p>
@@ -18170,7 +18956,7 @@
           <a:p>
             <a:pPr algn="ctr"/>
             <a:r>
-              <a:rPr lang="en-US" sz="1100" dirty="0" smtClean="0"/>
+              <a:rPr lang="en-US" sz="1100" dirty="0"/>
               <a:t>recolor remainder</a:t>
             </a:r>
           </a:p>
@@ -18244,7 +19030,7 @@
           <a:p>
             <a:pPr algn="ctr"/>
             <a:r>
-              <a:rPr lang="en-US" sz="1100" dirty="0" smtClean="0"/>
+              <a:rPr lang="en-US" sz="1100" dirty="0"/>
               <a:t>Blur remainder</a:t>
             </a:r>
           </a:p>
@@ -19458,7 +20244,7 @@
           <a:p>
             <a:pPr algn="ctr"/>
             <a:r>
-              <a:rPr lang="en-US" sz="1100" dirty="0" smtClean="0"/>
+              <a:rPr lang="en-US" sz="1100" dirty="0"/>
               <a:t>Frosted glass</a:t>
             </a:r>
           </a:p>
@@ -19474,13 +20260,6 @@
   <p:clrMapOvr>
     <a:masterClrMapping/>
   </p:clrMapOvr>
-  <p:timing>
-    <p:tnLst>
-      <p:par>
-        <p:cTn id="1" dur="indefinite" restart="never" nodeType="tmRoot"/>
-      </p:par>
-    </p:tnLst>
-  </p:timing>
 </p:sld>
 </file>
 
@@ -19524,7 +20303,7 @@
           <a:lstStyle/>
           <a:p>
             <a:r>
-              <a:rPr lang="en-US" dirty="0" smtClean="0"/>
+              <a:rPr lang="en-US" dirty="0"/>
               <a:t>Agenda Lab</a:t>
             </a:r>
             <a:endParaRPr lang="en-SG" dirty="0"/>
@@ -19555,16 +20334,8 @@
           <a:p>
             <a:pPr algn="ctr"/>
             <a:r>
-              <a:rPr lang="en-US" sz="800" dirty="0" smtClean="0"/>
-              <a:t>Agenda </a:t>
-            </a:r>
-            <a:r>
               <a:rPr lang="en-US" sz="800" dirty="0"/>
-              <a:t>L</a:t>
-            </a:r>
-            <a:r>
-              <a:rPr lang="en-US" sz="800" dirty="0" smtClean="0"/>
-              <a:t>ab</a:t>
+              <a:t>Agenda Lab</a:t>
             </a:r>
             <a:endParaRPr lang="en-SG" sz="800" dirty="0"/>
           </a:p>
@@ -19638,7 +20409,7 @@
           <a:p>
             <a:pPr algn="ctr"/>
             <a:r>
-              <a:rPr lang="en-US" sz="1100" dirty="0" smtClean="0"/>
+              <a:rPr lang="en-US" sz="1100" dirty="0"/>
               <a:t>Text agenda</a:t>
             </a:r>
           </a:p>
@@ -19668,7 +20439,7 @@
           <a:p>
             <a:pPr algn="ctr"/>
             <a:r>
-              <a:rPr lang="en-US" sz="1100" dirty="0" smtClean="0"/>
+              <a:rPr lang="en-US" sz="1100" dirty="0"/>
               <a:t>Visual agenda </a:t>
             </a:r>
           </a:p>
@@ -19698,7 +20469,7 @@
           <a:p>
             <a:pPr algn="ctr"/>
             <a:r>
-              <a:rPr lang="en-US" sz="1100" dirty="0" smtClean="0"/>
+              <a:rPr lang="en-US" sz="1100" dirty="0"/>
               <a:t>Agenda sidebar</a:t>
             </a:r>
           </a:p>
@@ -19807,7 +20578,7 @@
             <a:p>
               <a:pPr algn="ctr"/>
               <a:r>
-                <a:rPr lang="en-US" sz="6000" dirty="0" smtClean="0">
+                <a:rPr lang="en-US" sz="6000" dirty="0">
                   <a:solidFill>
                     <a:schemeClr val="accent6">
                       <a:lumMod val="75000"/>
@@ -22126,7 +22897,7 @@
           <a:p>
             <a:pPr algn="ctr"/>
             <a:r>
-              <a:rPr lang="en-US" sz="1100" dirty="0" smtClean="0"/>
+              <a:rPr lang="en-US" sz="1100" dirty="0"/>
               <a:t>remove</a:t>
             </a:r>
           </a:p>
@@ -22156,7 +22927,7 @@
           <a:p>
             <a:pPr algn="ctr"/>
             <a:r>
-              <a:rPr lang="en-US" sz="1100" dirty="0" smtClean="0"/>
+              <a:rPr lang="en-US" sz="1100" dirty="0"/>
               <a:t>settings</a:t>
             </a:r>
           </a:p>
@@ -22186,7 +22957,7 @@
           <a:p>
             <a:pPr algn="ctr"/>
             <a:r>
-              <a:rPr lang="en-US" sz="1100" dirty="0" smtClean="0"/>
+              <a:rPr lang="en-US" sz="1100" dirty="0"/>
               <a:t>sync</a:t>
             </a:r>
           </a:p>
@@ -22202,13 +22973,6 @@
   <p:clrMapOvr>
     <a:masterClrMapping/>
   </p:clrMapOvr>
-  <p:timing>
-    <p:tnLst>
-      <p:par>
-        <p:cTn id="1" dur="indefinite" restart="never" nodeType="tmRoot"/>
-      </p:par>
-    </p:tnLst>
-  </p:timing>
 </p:sld>
 </file>
 
@@ -22252,7 +23016,7 @@
           <a:lstStyle/>
           <a:p>
             <a:r>
-              <a:rPr lang="en-US" dirty="0" smtClean="0"/>
+              <a:rPr lang="en-US" dirty="0"/>
               <a:t>Images Lab</a:t>
             </a:r>
             <a:endParaRPr lang="en-SG" dirty="0"/>
@@ -22283,7 +23047,7 @@
           <a:p>
             <a:pPr algn="ctr"/>
             <a:r>
-              <a:rPr lang="en-US" sz="800" dirty="0" smtClean="0"/>
+              <a:rPr lang="en-US" sz="800" dirty="0"/>
               <a:t>Images Lab</a:t>
             </a:r>
             <a:endParaRPr lang="en-SG" sz="800" dirty="0"/>
@@ -23073,13 +23837,6 @@
   <p:clrMapOvr>
     <a:masterClrMapping/>
   </p:clrMapOvr>
-  <p:timing>
-    <p:tnLst>
-      <p:par>
-        <p:cTn id="1" dur="indefinite" restart="never" nodeType="tmRoot"/>
-      </p:par>
-    </p:tnLst>
-  </p:timing>
 </p:sld>
 </file>
 
@@ -24223,7 +24980,7 @@
           <a:lstStyle/>
           <a:p>
             <a:r>
-              <a:rPr lang="en-US" sz="1400" dirty="0" smtClean="0"/>
+              <a:rPr lang="en-US" sz="1400" dirty="0"/>
               <a:t>Not used</a:t>
             </a:r>
             <a:endParaRPr lang="en-SG" sz="1400" dirty="0"/>
@@ -24254,7 +25011,7 @@
           <a:p>
             <a:pPr algn="ctr"/>
             <a:r>
-              <a:rPr lang="en-US" sz="1100" dirty="0" smtClean="0"/>
+              <a:rPr lang="en-US" sz="1100" dirty="0"/>
               <a:t>Add animation slide</a:t>
             </a:r>
             <a:endParaRPr lang="en-SG" sz="1100" dirty="0"/>
@@ -24285,7 +25042,7 @@
           <a:p>
             <a:pPr algn="ctr"/>
             <a:r>
-              <a:rPr lang="en-US" sz="1100" dirty="0" smtClean="0"/>
+              <a:rPr lang="en-US" sz="1100" dirty="0"/>
               <a:t>Recreate animation slide</a:t>
             </a:r>
             <a:endParaRPr lang="en-SG" sz="1100" dirty="0"/>
@@ -24316,7 +25073,7 @@
           <a:p>
             <a:pPr algn="ctr"/>
             <a:r>
-              <a:rPr lang="en-US" sz="1100" dirty="0" smtClean="0"/>
+              <a:rPr lang="en-US" sz="1100" dirty="0"/>
               <a:t>spotlight</a:t>
             </a:r>
             <a:endParaRPr lang="en-SG" sz="1100" dirty="0"/>
@@ -24500,7 +25257,7 @@
           <a:p>
             <a:pPr algn="ctr"/>
             <a:r>
-              <a:rPr lang="en-US" sz="1100" dirty="0" smtClean="0"/>
+              <a:rPr lang="en-US" sz="1100" dirty="0"/>
               <a:t>Add captions</a:t>
             </a:r>
             <a:endParaRPr lang="en-SG" sz="1100" dirty="0"/>
@@ -24756,7 +25513,7 @@
           <a:p>
             <a:pPr algn="ctr"/>
             <a:r>
-              <a:rPr lang="en-US" sz="1100" dirty="0" smtClean="0"/>
+              <a:rPr lang="en-US" sz="1100" dirty="0"/>
               <a:t>Speak selected text</a:t>
             </a:r>
             <a:endParaRPr lang="en-SG" sz="1100" dirty="0"/>
@@ -24786,7 +25543,7 @@
           <a:lstStyle/>
           <a:p>
             <a:r>
-              <a:rPr lang="en-US" dirty="0" smtClean="0"/>
+              <a:rPr lang="en-US" dirty="0"/>
               <a:t>Context menu icons</a:t>
             </a:r>
             <a:endParaRPr lang="en-SG" dirty="0"/>
@@ -24863,7 +25620,7 @@
           <a:p>
             <a:pPr algn="ctr"/>
             <a:r>
-              <a:rPr lang="en-US" sz="1100" dirty="0" smtClean="0"/>
+              <a:rPr lang="en-US" sz="1100" dirty="0"/>
               <a:t>Add narrations</a:t>
             </a:r>
             <a:endParaRPr lang="en-SG" sz="1100" dirty="0"/>
@@ -25060,7 +25817,7 @@
           <a:p>
             <a:pPr algn="ctr"/>
             <a:r>
-              <a:rPr lang="en-US" sz="1100" dirty="0" smtClean="0"/>
+              <a:rPr lang="en-US" sz="1100" dirty="0"/>
               <a:t>Edit name</a:t>
             </a:r>
             <a:endParaRPr lang="en-SG" sz="1100" dirty="0"/>
@@ -25275,7 +26032,7 @@
           <a:p>
             <a:pPr algn="ctr"/>
             <a:r>
-              <a:rPr lang="en-US" sz="1100" dirty="0" smtClean="0"/>
+              <a:rPr lang="en-US" sz="1100" dirty="0"/>
               <a:t>Animate in slide</a:t>
             </a:r>
             <a:endParaRPr lang="en-SG" sz="1100" dirty="0"/>
@@ -25306,7 +26063,7 @@
           <a:p>
             <a:pPr algn="ctr"/>
             <a:r>
-              <a:rPr lang="en-US" sz="1100" dirty="0" smtClean="0"/>
+              <a:rPr lang="en-US" sz="1100" dirty="0"/>
               <a:t>Fit to width</a:t>
             </a:r>
             <a:endParaRPr lang="en-SG" sz="1100" dirty="0"/>
@@ -25337,7 +26094,7 @@
           <a:p>
             <a:pPr algn="ctr"/>
             <a:r>
-              <a:rPr lang="en-US" sz="1100" dirty="0" smtClean="0"/>
+              <a:rPr lang="en-US" sz="1100" dirty="0"/>
               <a:t>Fit to height</a:t>
             </a:r>
             <a:endParaRPr lang="en-SG" sz="1100" dirty="0"/>
@@ -26050,7 +26807,7 @@
           <a:p>
             <a:pPr algn="ctr"/>
             <a:r>
-              <a:rPr lang="en-US" sz="1100" dirty="0" smtClean="0"/>
+              <a:rPr lang="en-US" sz="1100" dirty="0"/>
               <a:t>Step back</a:t>
             </a:r>
             <a:endParaRPr lang="en-SG" sz="1100" dirty="0"/>
@@ -26081,7 +26838,7 @@
           <a:p>
             <a:pPr algn="ctr"/>
             <a:r>
-              <a:rPr lang="en-US" sz="1100" dirty="0" smtClean="0"/>
+              <a:rPr lang="en-US" sz="1100" dirty="0"/>
               <a:t>Drill down</a:t>
             </a:r>
             <a:endParaRPr lang="en-SG" sz="1100" dirty="0"/>
@@ -26724,7 +27481,7 @@
           <a:p>
             <a:pPr algn="ctr"/>
             <a:r>
-              <a:rPr lang="en-US" sz="1100" dirty="0" smtClean="0"/>
+              <a:rPr lang="en-US" sz="1100" dirty="0"/>
               <a:t>Magnify</a:t>
             </a:r>
             <a:endParaRPr lang="en-SG" sz="1100" dirty="0"/>
@@ -26755,7 +27512,7 @@
           <a:p>
             <a:pPr algn="ctr"/>
             <a:r>
-              <a:rPr lang="en-US" sz="1100" dirty="0" smtClean="0"/>
+              <a:rPr lang="en-US" sz="1100" dirty="0"/>
               <a:t>hide</a:t>
             </a:r>
             <a:endParaRPr lang="en-SG" sz="1100" dirty="0"/>
@@ -26953,7 +27710,7 @@
           <a:p>
             <a:pPr algn="ctr"/>
             <a:r>
-              <a:rPr lang="en-US" sz="1100" dirty="0" smtClean="0"/>
+              <a:rPr lang="en-US" sz="1100" dirty="0"/>
               <a:t>Double click to open properties</a:t>
             </a:r>
             <a:endParaRPr lang="en-SG" sz="1100" dirty="0"/>
@@ -27309,7 +28066,7 @@
           <a:p>
             <a:pPr algn="ctr"/>
             <a:r>
-              <a:rPr lang="en-US" sz="1100" dirty="0" smtClean="0"/>
+              <a:rPr lang="en-US" sz="1100" dirty="0"/>
               <a:t>Convert to picture</a:t>
             </a:r>
             <a:endParaRPr lang="en-SG" sz="1100" dirty="0"/>
@@ -27652,7 +28409,7 @@
           <a:p>
             <a:pPr algn="ctr"/>
             <a:r>
-              <a:rPr lang="en-US" sz="1100" dirty="0" smtClean="0"/>
+              <a:rPr lang="en-US" sz="1100" dirty="0"/>
               <a:t>Highlight points</a:t>
             </a:r>
             <a:endParaRPr lang="en-SG" sz="1100" dirty="0"/>
@@ -28123,11 +28880,11 @@
           <a:lstStyle/>
           <a:p>
             <a:r>
-              <a:rPr lang="en-US" sz="1100" dirty="0" err="1" smtClean="0"/>
+              <a:rPr lang="en-US" sz="1100" dirty="0" err="1"/>
               <a:t>PptLabs</a:t>
             </a:r>
             <a:r>
-              <a:rPr lang="en-US" sz="1100" dirty="0" smtClean="0"/>
+              <a:rPr lang="en-US" sz="1100" dirty="0"/>
               <a:t> main context menu icon</a:t>
             </a:r>
             <a:endParaRPr lang="en-SG" sz="1100" dirty="0"/>
@@ -28269,7 +29026,7 @@
           <a:p>
             <a:pPr algn="ctr"/>
             <a:r>
-              <a:rPr lang="en-US" sz="1100" dirty="0" smtClean="0"/>
+              <a:rPr lang="en-US" sz="1100" dirty="0"/>
               <a:t>Cut to shape</a:t>
             </a:r>
             <a:endParaRPr lang="en-SG" sz="1100" dirty="0"/>
@@ -28286,13 +29043,6 @@
   <p:clrMapOvr>
     <a:masterClrMapping/>
   </p:clrMapOvr>
-  <p:timing>
-    <p:tnLst>
-      <p:par>
-        <p:cTn id="1" dur="indefinite" restart="never" nodeType="tmRoot"/>
-      </p:par>
-    </p:tnLst>
-  </p:timing>
 </p:sld>
 </file>
 

</xml_diff>

<commit_message>
Add paste lab icons
</commit_message>
<xml_diff>
--- a/doc/Icons.pptx
+++ b/doc/Icons.pptx
@@ -21,23 +21,23 @@
   <p:notesSz cx="6858000" cy="9144000"/>
   <p:embeddedFontLst>
     <p:embeddedFont>
-      <p:font typeface="Gill Sans Ultra Bold" panose="020B0A02020104020203" pitchFamily="34" charset="0"/>
+      <p:font typeface="Calibri" panose="020F0502020204030204" pitchFamily="34" charset="0"/>
       <p:regular r:id="rId11"/>
+      <p:bold r:id="rId12"/>
+      <p:italic r:id="rId13"/>
+      <p:boldItalic r:id="rId14"/>
     </p:embeddedFont>
     <p:embeddedFont>
       <p:font typeface="Rockwell Extra Bold" panose="02060903040505020403" pitchFamily="18" charset="0"/>
-      <p:bold r:id="rId12"/>
+      <p:bold r:id="rId15"/>
     </p:embeddedFont>
     <p:embeddedFont>
       <p:font typeface="Arial Black" panose="020B0A04020102020204" pitchFamily="34" charset="0"/>
-      <p:bold r:id="rId13"/>
+      <p:bold r:id="rId16"/>
     </p:embeddedFont>
     <p:embeddedFont>
-      <p:font typeface="Calibri" panose="020F0502020204030204" pitchFamily="34" charset="0"/>
-      <p:regular r:id="rId14"/>
-      <p:bold r:id="rId15"/>
-      <p:italic r:id="rId16"/>
-      <p:boldItalic r:id="rId17"/>
+      <p:font typeface="Gill Sans Ultra Bold" panose="020B0A02020104020203" pitchFamily="34" charset="0"/>
+      <p:regular r:id="rId17"/>
     </p:embeddedFont>
   </p:embeddedFontLst>
   <p:defaultTextStyle>
@@ -154,6 +154,10 @@
 </p:presentation>
 </file>
 
+<file path=ppt/revisionInfo.xml><?xml version="1.0" encoding="utf-8"?>
+<p1510:revInfo xmlns:a="http://schemas.openxmlformats.org/drawingml/2006/main" xmlns:r="http://schemas.openxmlformats.org/officeDocument/2006/relationships" xmlns:p1510="http://schemas.microsoft.com/office/powerpoint/2015/10/main"/>
+</file>
+
 <file path=ppt/notesMasters/notesMaster1.xml><?xml version="1.0" encoding="utf-8"?>
 <p:notesMaster xmlns:a="http://schemas.openxmlformats.org/drawingml/2006/main" xmlns:r="http://schemas.openxmlformats.org/officeDocument/2006/relationships" xmlns:p="http://schemas.openxmlformats.org/presentationml/2006/main">
   <p:cSld>
@@ -236,7 +240,7 @@
           <a:p>
             <a:fld id="{6699ACB9-486C-4D62-A3A7-AF98E13EFDA3}" type="datetimeFigureOut">
               <a:rPr lang="en-US" smtClean="0"/>
-              <a:t>4/15/2017</a:t>
+              <a:t>5/24/2017</a:t>
             </a:fld>
             <a:endParaRPr lang="en-US"/>
           </a:p>
@@ -767,7 +771,7 @@
             <a:fld id="{1D8BD707-D9CF-40AE-B4C6-C98DA3205C09}" type="datetimeFigureOut">
               <a:rPr lang="en-US" smtClean="0"/>
               <a:pPr/>
-              <a:t>4/15/2017</a:t>
+              <a:t>5/24/2017</a:t>
             </a:fld>
             <a:endParaRPr lang="en-US"/>
           </a:p>
@@ -932,7 +936,7 @@
             <a:fld id="{1D8BD707-D9CF-40AE-B4C6-C98DA3205C09}" type="datetimeFigureOut">
               <a:rPr lang="en-US" smtClean="0"/>
               <a:pPr/>
-              <a:t>4/15/2017</a:t>
+              <a:t>5/24/2017</a:t>
             </a:fld>
             <a:endParaRPr lang="en-US"/>
           </a:p>
@@ -1107,7 +1111,7 @@
             <a:fld id="{1D8BD707-D9CF-40AE-B4C6-C98DA3205C09}" type="datetimeFigureOut">
               <a:rPr lang="en-US" smtClean="0"/>
               <a:pPr/>
-              <a:t>4/15/2017</a:t>
+              <a:t>5/24/2017</a:t>
             </a:fld>
             <a:endParaRPr lang="en-US"/>
           </a:p>
@@ -1272,7 +1276,7 @@
             <a:fld id="{1D8BD707-D9CF-40AE-B4C6-C98DA3205C09}" type="datetimeFigureOut">
               <a:rPr lang="en-US" smtClean="0"/>
               <a:pPr/>
-              <a:t>4/15/2017</a:t>
+              <a:t>5/24/2017</a:t>
             </a:fld>
             <a:endParaRPr lang="en-US"/>
           </a:p>
@@ -1514,7 +1518,7 @@
             <a:fld id="{1D8BD707-D9CF-40AE-B4C6-C98DA3205C09}" type="datetimeFigureOut">
               <a:rPr lang="en-US" smtClean="0"/>
               <a:pPr/>
-              <a:t>4/15/2017</a:t>
+              <a:t>5/24/2017</a:t>
             </a:fld>
             <a:endParaRPr lang="en-US"/>
           </a:p>
@@ -1796,7 +1800,7 @@
             <a:fld id="{1D8BD707-D9CF-40AE-B4C6-C98DA3205C09}" type="datetimeFigureOut">
               <a:rPr lang="en-US" smtClean="0"/>
               <a:pPr/>
-              <a:t>4/15/2017</a:t>
+              <a:t>5/24/2017</a:t>
             </a:fld>
             <a:endParaRPr lang="en-US"/>
           </a:p>
@@ -2212,7 +2216,7 @@
             <a:fld id="{1D8BD707-D9CF-40AE-B4C6-C98DA3205C09}" type="datetimeFigureOut">
               <a:rPr lang="en-US" smtClean="0"/>
               <a:pPr/>
-              <a:t>4/15/2017</a:t>
+              <a:t>5/24/2017</a:t>
             </a:fld>
             <a:endParaRPr lang="en-US"/>
           </a:p>
@@ -2326,7 +2330,7 @@
             <a:fld id="{1D8BD707-D9CF-40AE-B4C6-C98DA3205C09}" type="datetimeFigureOut">
               <a:rPr lang="en-US" smtClean="0"/>
               <a:pPr/>
-              <a:t>4/15/2017</a:t>
+              <a:t>5/24/2017</a:t>
             </a:fld>
             <a:endParaRPr lang="en-US"/>
           </a:p>
@@ -2418,7 +2422,7 @@
             <a:fld id="{1D8BD707-D9CF-40AE-B4C6-C98DA3205C09}" type="datetimeFigureOut">
               <a:rPr lang="en-US" smtClean="0"/>
               <a:pPr/>
-              <a:t>4/15/2017</a:t>
+              <a:t>5/24/2017</a:t>
             </a:fld>
             <a:endParaRPr lang="en-US"/>
           </a:p>
@@ -2690,7 +2694,7 @@
             <a:fld id="{1D8BD707-D9CF-40AE-B4C6-C98DA3205C09}" type="datetimeFigureOut">
               <a:rPr lang="en-US" smtClean="0"/>
               <a:pPr/>
-              <a:t>4/15/2017</a:t>
+              <a:t>5/24/2017</a:t>
             </a:fld>
             <a:endParaRPr lang="en-US"/>
           </a:p>
@@ -2939,7 +2943,7 @@
             <a:fld id="{1D8BD707-D9CF-40AE-B4C6-C98DA3205C09}" type="datetimeFigureOut">
               <a:rPr lang="en-US" smtClean="0"/>
               <a:pPr/>
-              <a:t>4/15/2017</a:t>
+              <a:t>5/24/2017</a:t>
             </a:fld>
             <a:endParaRPr lang="en-US"/>
           </a:p>
@@ -3152,7 +3156,7 @@
             <a:fld id="{1D8BD707-D9CF-40AE-B4C6-C98DA3205C09}" type="datetimeFigureOut">
               <a:rPr lang="en-US" smtClean="0"/>
               <a:pPr/>
-              <a:t>4/15/2017</a:t>
+              <a:t>5/24/2017</a:t>
             </a:fld>
             <a:endParaRPr lang="en-US"/>
           </a:p>
@@ -6180,10 +6184,10 @@
         </p:nvGrpSpPr>
         <p:grpSpPr>
           <a:xfrm>
-            <a:off x="1250074" y="2362200"/>
-            <a:ext cx="838200" cy="838200"/>
-            <a:chOff x="1250074" y="2362200"/>
-            <a:chExt cx="838200" cy="838200"/>
+            <a:off x="1222859" y="2362200"/>
+            <a:ext cx="856967" cy="838200"/>
+            <a:chOff x="1222859" y="2362200"/>
+            <a:chExt cx="856967" cy="838200"/>
           </a:xfrm>
         </p:grpSpPr>
         <p:sp>
@@ -6434,7 +6438,7 @@
           </p:nvSpPr>
           <p:spPr>
             <a:xfrm>
-              <a:off x="1250074" y="2362200"/>
+              <a:off x="1222859" y="2362200"/>
               <a:ext cx="838200" cy="838200"/>
             </a:xfrm>
             <a:prstGeom prst="rect">
@@ -28949,6 +28953,614 @@
           </a:p>
         </p:txBody>
       </p:sp>
+      <p:sp>
+        <p:nvSpPr>
+          <p:cNvPr id="146" name="TextBox 145"/>
+          <p:cNvSpPr txBox="1"/>
+          <p:nvPr/>
+        </p:nvSpPr>
+        <p:spPr>
+          <a:xfrm>
+            <a:off x="3048000" y="1873793"/>
+            <a:ext cx="762000" cy="430887"/>
+          </a:xfrm>
+          <a:prstGeom prst="rect">
+            <a:avLst/>
+          </a:prstGeom>
+          <a:noFill/>
+        </p:spPr>
+        <p:txBody>
+          <a:bodyPr wrap="square" rtlCol="0">
+            <a:spAutoFit/>
+          </a:bodyPr>
+          <a:lstStyle/>
+          <a:p>
+            <a:pPr algn="ctr"/>
+            <a:r>
+              <a:rPr lang="en-US" sz="1100" dirty="0"/>
+              <a:t>Add Into Group</a:t>
+            </a:r>
+            <a:endParaRPr lang="en-SG" sz="1100" dirty="0"/>
+          </a:p>
+        </p:txBody>
+      </p:sp>
+      <p:sp>
+        <p:nvSpPr>
+          <p:cNvPr id="199" name="TextBox 198"/>
+          <p:cNvSpPr txBox="1"/>
+          <p:nvPr/>
+        </p:nvSpPr>
+        <p:spPr>
+          <a:xfrm>
+            <a:off x="4110573" y="1956905"/>
+            <a:ext cx="762000" cy="261610"/>
+          </a:xfrm>
+          <a:prstGeom prst="rect">
+            <a:avLst/>
+          </a:prstGeom>
+          <a:noFill/>
+        </p:spPr>
+        <p:txBody>
+          <a:bodyPr wrap="square" rtlCol="0">
+            <a:spAutoFit/>
+          </a:bodyPr>
+          <a:lstStyle/>
+          <a:p>
+            <a:pPr algn="ctr"/>
+            <a:r>
+              <a:rPr lang="en-US" sz="1100" dirty="0"/>
+              <a:t>Paste Lab</a:t>
+            </a:r>
+            <a:endParaRPr lang="en-SG" sz="1100" dirty="0"/>
+          </a:p>
+        </p:txBody>
+      </p:sp>
+      <p:grpSp>
+        <p:nvGrpSpPr>
+          <p:cNvPr id="48" name="Group 47"/>
+          <p:cNvGrpSpPr/>
+          <p:nvPr/>
+        </p:nvGrpSpPr>
+        <p:grpSpPr>
+          <a:xfrm>
+            <a:off x="3178079" y="1440083"/>
+            <a:ext cx="402336" cy="399078"/>
+            <a:chOff x="3178080" y="1440083"/>
+            <a:chExt cx="390387" cy="399078"/>
+          </a:xfrm>
+        </p:grpSpPr>
+        <p:grpSp>
+          <p:nvGrpSpPr>
+            <p:cNvPr id="72" name="Group 71"/>
+            <p:cNvGrpSpPr/>
+            <p:nvPr/>
+          </p:nvGrpSpPr>
+          <p:grpSpPr>
+            <a:xfrm>
+              <a:off x="3238368" y="1440083"/>
+              <a:ext cx="330099" cy="266804"/>
+              <a:chOff x="2797628" y="1644225"/>
+              <a:chExt cx="256151" cy="208259"/>
+            </a:xfrm>
+          </p:grpSpPr>
+          <p:sp>
+            <p:nvSpPr>
+              <p:cNvPr id="135" name="Rectangle 134"/>
+              <p:cNvSpPr/>
+              <p:nvPr/>
+            </p:nvSpPr>
+            <p:spPr>
+              <a:xfrm>
+                <a:off x="2797628" y="1644225"/>
+                <a:ext cx="256151" cy="208259"/>
+              </a:xfrm>
+              <a:prstGeom prst="rect">
+                <a:avLst/>
+              </a:prstGeom>
+              <a:solidFill>
+                <a:srgbClr val="0070C0"/>
+              </a:solidFill>
+              <a:ln>
+                <a:noFill/>
+              </a:ln>
+            </p:spPr>
+            <p:style>
+              <a:lnRef idx="2">
+                <a:schemeClr val="accent1">
+                  <a:shade val="50000"/>
+                </a:schemeClr>
+              </a:lnRef>
+              <a:fillRef idx="1">
+                <a:schemeClr val="accent1"/>
+              </a:fillRef>
+              <a:effectRef idx="0">
+                <a:schemeClr val="accent1"/>
+              </a:effectRef>
+              <a:fontRef idx="minor">
+                <a:schemeClr val="lt1"/>
+              </a:fontRef>
+            </p:style>
+            <p:txBody>
+              <a:bodyPr wrap="none" lIns="0" tIns="0" rIns="0" bIns="0" rtlCol="0" anchor="ctr"/>
+              <a:lstStyle/>
+              <a:p>
+                <a:pPr algn="ctr"/>
+                <a:endParaRPr lang="en-SG" b="1"/>
+              </a:p>
+            </p:txBody>
+          </p:sp>
+          <p:sp>
+            <p:nvSpPr>
+              <p:cNvPr id="139" name="Isosceles Triangle 138"/>
+              <p:cNvSpPr/>
+              <p:nvPr/>
+            </p:nvSpPr>
+            <p:spPr>
+              <a:xfrm>
+                <a:off x="2956033" y="1735484"/>
+                <a:ext cx="63331" cy="77278"/>
+              </a:xfrm>
+              <a:prstGeom prst="triangle">
+                <a:avLst/>
+              </a:prstGeom>
+              <a:solidFill>
+                <a:schemeClr val="bg1"/>
+              </a:solidFill>
+              <a:ln>
+                <a:solidFill>
+                  <a:schemeClr val="bg1"/>
+                </a:solidFill>
+              </a:ln>
+            </p:spPr>
+            <p:style>
+              <a:lnRef idx="2">
+                <a:schemeClr val="accent1">
+                  <a:shade val="50000"/>
+                </a:schemeClr>
+              </a:lnRef>
+              <a:fillRef idx="1">
+                <a:schemeClr val="accent1"/>
+              </a:fillRef>
+              <a:effectRef idx="0">
+                <a:schemeClr val="accent1"/>
+              </a:effectRef>
+              <a:fontRef idx="minor">
+                <a:schemeClr val="lt1"/>
+              </a:fontRef>
+            </p:style>
+            <p:txBody>
+              <a:bodyPr rtlCol="0" anchor="ctr"/>
+              <a:lstStyle/>
+              <a:p>
+                <a:pPr algn="ctr"/>
+                <a:endParaRPr lang="en-US"/>
+              </a:p>
+            </p:txBody>
+          </p:sp>
+          <p:sp>
+            <p:nvSpPr>
+              <p:cNvPr id="140" name="Flowchart: Connector 139"/>
+              <p:cNvSpPr>
+                <a:spLocks noChangeAspect="1"/>
+              </p:cNvSpPr>
+              <p:nvPr/>
+            </p:nvSpPr>
+            <p:spPr>
+              <a:xfrm>
+                <a:off x="2843153" y="1676118"/>
+                <a:ext cx="60738" cy="61168"/>
+              </a:xfrm>
+              <a:prstGeom prst="flowChartConnector">
+                <a:avLst/>
+              </a:prstGeom>
+              <a:solidFill>
+                <a:schemeClr val="bg1"/>
+              </a:solidFill>
+              <a:ln>
+                <a:solidFill>
+                  <a:schemeClr val="bg1"/>
+                </a:solidFill>
+              </a:ln>
+            </p:spPr>
+            <p:style>
+              <a:lnRef idx="2">
+                <a:schemeClr val="accent1">
+                  <a:shade val="50000"/>
+                </a:schemeClr>
+              </a:lnRef>
+              <a:fillRef idx="1">
+                <a:schemeClr val="accent1"/>
+              </a:fillRef>
+              <a:effectRef idx="0">
+                <a:schemeClr val="accent1"/>
+              </a:effectRef>
+              <a:fontRef idx="minor">
+                <a:schemeClr val="lt1"/>
+              </a:fontRef>
+            </p:style>
+            <p:txBody>
+              <a:bodyPr rtlCol="0" anchor="ctr"/>
+              <a:lstStyle/>
+              <a:p>
+                <a:pPr algn="ctr"/>
+                <a:endParaRPr lang="en-SG" dirty="0"/>
+              </a:p>
+            </p:txBody>
+          </p:sp>
+        </p:grpSp>
+        <p:sp>
+          <p:nvSpPr>
+            <p:cNvPr id="144" name="Right Arrow 35"/>
+            <p:cNvSpPr>
+              <a:spLocks noChangeAspect="1"/>
+            </p:cNvSpPr>
+            <p:nvPr/>
+          </p:nvSpPr>
+          <p:spPr>
+            <a:xfrm rot="18679808">
+              <a:off x="3172011" y="1569311"/>
+              <a:ext cx="275919" cy="263781"/>
+            </a:xfrm>
+            <a:prstGeom prst="rightArrow">
+              <a:avLst>
+                <a:gd name="adj1" fmla="val 50000"/>
+                <a:gd name="adj2" fmla="val 66274"/>
+              </a:avLst>
+            </a:prstGeom>
+            <a:solidFill>
+              <a:srgbClr val="0070C0"/>
+            </a:solidFill>
+            <a:ln w="19050">
+              <a:solidFill>
+                <a:schemeClr val="bg1"/>
+              </a:solidFill>
+            </a:ln>
+          </p:spPr>
+          <p:style>
+            <a:lnRef idx="2">
+              <a:schemeClr val="accent1">
+                <a:shade val="50000"/>
+              </a:schemeClr>
+            </a:lnRef>
+            <a:fillRef idx="1">
+              <a:schemeClr val="accent1"/>
+            </a:fillRef>
+            <a:effectRef idx="0">
+              <a:schemeClr val="accent1"/>
+            </a:effectRef>
+            <a:fontRef idx="minor">
+              <a:schemeClr val="lt1"/>
+            </a:fontRef>
+          </p:style>
+          <p:txBody>
+            <a:bodyPr rtlCol="0" anchor="ctr"/>
+            <a:lstStyle/>
+            <a:p>
+              <a:pPr algn="ctr"/>
+              <a:endParaRPr lang="en-US"/>
+            </a:p>
+          </p:txBody>
+        </p:sp>
+      </p:grpSp>
+      <p:sp>
+        <p:nvSpPr>
+          <p:cNvPr id="205" name="Rectangle 204"/>
+          <p:cNvSpPr/>
+          <p:nvPr/>
+        </p:nvSpPr>
+        <p:spPr>
+          <a:xfrm rot="10800000">
+            <a:off x="3170960" y="1439596"/>
+            <a:ext cx="420624" cy="421200"/>
+          </a:xfrm>
+          <a:prstGeom prst="rect">
+            <a:avLst/>
+          </a:prstGeom>
+          <a:noFill/>
+          <a:ln>
+            <a:noFill/>
+          </a:ln>
+        </p:spPr>
+        <p:style>
+          <a:lnRef idx="2">
+            <a:schemeClr val="accent1">
+              <a:shade val="50000"/>
+            </a:schemeClr>
+          </a:lnRef>
+          <a:fillRef idx="1">
+            <a:schemeClr val="accent1"/>
+          </a:fillRef>
+          <a:effectRef idx="0">
+            <a:schemeClr val="accent1"/>
+          </a:effectRef>
+          <a:fontRef idx="minor">
+            <a:schemeClr val="lt1"/>
+          </a:fontRef>
+        </p:style>
+        <p:txBody>
+          <a:bodyPr wrap="none" lIns="0" tIns="0" rIns="0" bIns="0" rtlCol="0" anchor="ctr"/>
+          <a:lstStyle/>
+          <a:p>
+            <a:pPr algn="ctr"/>
+            <a:endParaRPr lang="en-US" b="1"/>
+          </a:p>
+        </p:txBody>
+      </p:sp>
+      <p:grpSp>
+        <p:nvGrpSpPr>
+          <p:cNvPr id="1033" name="Group 1032"/>
+          <p:cNvGrpSpPr/>
+          <p:nvPr/>
+        </p:nvGrpSpPr>
+        <p:grpSpPr>
+          <a:xfrm>
+            <a:off x="4180111" y="1375544"/>
+            <a:ext cx="549071" cy="549822"/>
+            <a:chOff x="4180111" y="1375544"/>
+            <a:chExt cx="549071" cy="549822"/>
+          </a:xfrm>
+        </p:grpSpPr>
+        <p:grpSp>
+          <p:nvGrpSpPr>
+            <p:cNvPr id="1030" name="Group 1029"/>
+            <p:cNvGrpSpPr/>
+            <p:nvPr/>
+          </p:nvGrpSpPr>
+          <p:grpSpPr>
+            <a:xfrm>
+              <a:off x="4235574" y="1385216"/>
+              <a:ext cx="446467" cy="521728"/>
+              <a:chOff x="4821567" y="919204"/>
+              <a:chExt cx="446467" cy="521728"/>
+            </a:xfrm>
+          </p:grpSpPr>
+          <p:sp>
+            <p:nvSpPr>
+              <p:cNvPr id="1028" name="Rectangle 1027"/>
+              <p:cNvSpPr/>
+              <p:nvPr/>
+            </p:nvSpPr>
+            <p:spPr>
+              <a:xfrm>
+                <a:off x="4821567" y="971454"/>
+                <a:ext cx="343904" cy="406070"/>
+              </a:xfrm>
+              <a:prstGeom prst="rect">
+                <a:avLst/>
+              </a:prstGeom>
+              <a:solidFill>
+                <a:srgbClr val="0070C0"/>
+              </a:solidFill>
+              <a:ln>
+                <a:noFill/>
+              </a:ln>
+            </p:spPr>
+            <p:style>
+              <a:lnRef idx="2">
+                <a:schemeClr val="accent1">
+                  <a:shade val="50000"/>
+                </a:schemeClr>
+              </a:lnRef>
+              <a:fillRef idx="1">
+                <a:schemeClr val="accent1"/>
+              </a:fillRef>
+              <a:effectRef idx="0">
+                <a:schemeClr val="accent1"/>
+              </a:effectRef>
+              <a:fontRef idx="minor">
+                <a:schemeClr val="lt1"/>
+              </a:fontRef>
+            </p:style>
+            <p:txBody>
+              <a:bodyPr rtlCol="0" anchor="ctr"/>
+              <a:lstStyle/>
+              <a:p>
+                <a:pPr algn="ctr"/>
+                <a:endParaRPr lang="en-US"/>
+              </a:p>
+            </p:txBody>
+          </p:sp>
+          <p:sp>
+            <p:nvSpPr>
+              <p:cNvPr id="1027" name="Rectangle: Folded Corner 1026"/>
+              <p:cNvSpPr/>
+              <p:nvPr/>
+            </p:nvSpPr>
+            <p:spPr>
+              <a:xfrm rot="10800000" flipH="1">
+                <a:off x="4990894" y="1102754"/>
+                <a:ext cx="277140" cy="338178"/>
+              </a:xfrm>
+              <a:prstGeom prst="foldedCorner">
+                <a:avLst>
+                  <a:gd name="adj" fmla="val 44103"/>
+                </a:avLst>
+              </a:prstGeom>
+              <a:solidFill>
+                <a:schemeClr val="bg1"/>
+              </a:solidFill>
+              <a:ln>
+                <a:solidFill>
+                  <a:srgbClr val="0070C0"/>
+                </a:solidFill>
+              </a:ln>
+            </p:spPr>
+            <p:style>
+              <a:lnRef idx="2">
+                <a:schemeClr val="accent1">
+                  <a:shade val="50000"/>
+                </a:schemeClr>
+              </a:lnRef>
+              <a:fillRef idx="1">
+                <a:schemeClr val="accent1"/>
+              </a:fillRef>
+              <a:effectRef idx="0">
+                <a:schemeClr val="accent1"/>
+              </a:effectRef>
+              <a:fontRef idx="minor">
+                <a:schemeClr val="lt1"/>
+              </a:fontRef>
+            </p:style>
+            <p:txBody>
+              <a:bodyPr rtlCol="0" anchor="ctr"/>
+              <a:lstStyle/>
+              <a:p>
+                <a:pPr algn="ctr"/>
+                <a:endParaRPr lang="en-US"/>
+              </a:p>
+            </p:txBody>
+          </p:sp>
+          <p:sp>
+            <p:nvSpPr>
+              <p:cNvPr id="165" name="Rounded Rectangle 227"/>
+              <p:cNvSpPr/>
+              <p:nvPr/>
+            </p:nvSpPr>
+            <p:spPr>
+              <a:xfrm rot="10800000">
+                <a:off x="4879960" y="919204"/>
+                <a:ext cx="234247" cy="101171"/>
+              </a:xfrm>
+              <a:custGeom>
+                <a:avLst/>
+                <a:gdLst/>
+                <a:ahLst/>
+                <a:cxnLst/>
+                <a:rect l="l" t="t" r="r" b="b"/>
+                <a:pathLst>
+                  <a:path w="286327" h="1000124">
+                    <a:moveTo>
+                      <a:pt x="2115" y="0"/>
+                    </a:moveTo>
+                    <a:lnTo>
+                      <a:pt x="284212" y="0"/>
+                    </a:lnTo>
+                    <a:cubicBezTo>
+                      <a:pt x="286188" y="3367"/>
+                      <a:pt x="286327" y="6905"/>
+                      <a:pt x="286327" y="10476"/>
+                    </a:cubicBezTo>
+                    <a:lnTo>
+                      <a:pt x="286327" y="712825"/>
+                    </a:lnTo>
+                    <a:cubicBezTo>
+                      <a:pt x="286327" y="772047"/>
+                      <a:pt x="247915" y="822299"/>
+                      <a:pt x="194109" y="838409"/>
+                    </a:cubicBezTo>
+                    <a:cubicBezTo>
+                      <a:pt x="194108" y="875332"/>
+                      <a:pt x="194108" y="912256"/>
+                      <a:pt x="194108" y="949179"/>
+                    </a:cubicBezTo>
+                    <a:cubicBezTo>
+                      <a:pt x="194108" y="977315"/>
+                      <a:pt x="171299" y="1000124"/>
+                      <a:pt x="143163" y="1000124"/>
+                    </a:cubicBezTo>
+                    <a:lnTo>
+                      <a:pt x="143164" y="1000123"/>
+                    </a:lnTo>
+                    <a:cubicBezTo>
+                      <a:pt x="115028" y="1000123"/>
+                      <a:pt x="92219" y="977314"/>
+                      <a:pt x="92219" y="949178"/>
+                    </a:cubicBezTo>
+                    <a:lnTo>
+                      <a:pt x="92219" y="838409"/>
+                    </a:lnTo>
+                    <a:cubicBezTo>
+                      <a:pt x="38413" y="822299"/>
+                      <a:pt x="0" y="772048"/>
+                      <a:pt x="0" y="712825"/>
+                    </a:cubicBezTo>
+                    <a:lnTo>
+                      <a:pt x="0" y="10476"/>
+                    </a:lnTo>
+                    <a:close/>
+                  </a:path>
+                </a:pathLst>
+              </a:custGeom>
+              <a:solidFill>
+                <a:srgbClr val="0070C0"/>
+              </a:solidFill>
+              <a:ln w="19050">
+                <a:solidFill>
+                  <a:schemeClr val="bg1"/>
+                </a:solidFill>
+              </a:ln>
+            </p:spPr>
+            <p:style>
+              <a:lnRef idx="2">
+                <a:schemeClr val="accent1">
+                  <a:shade val="50000"/>
+                </a:schemeClr>
+              </a:lnRef>
+              <a:fillRef idx="1">
+                <a:schemeClr val="accent1"/>
+              </a:fillRef>
+              <a:effectRef idx="0">
+                <a:schemeClr val="accent1"/>
+              </a:effectRef>
+              <a:fontRef idx="minor">
+                <a:schemeClr val="lt1"/>
+              </a:fontRef>
+            </p:style>
+            <p:txBody>
+              <a:bodyPr rtlCol="0" anchor="ctr"/>
+              <a:lstStyle/>
+              <a:p>
+                <a:pPr algn="ctr"/>
+                <a:endParaRPr lang="en-SG"/>
+              </a:p>
+            </p:txBody>
+          </p:sp>
+        </p:grpSp>
+        <p:sp>
+          <p:nvSpPr>
+            <p:cNvPr id="206" name="Rectangle 205"/>
+            <p:cNvSpPr/>
+            <p:nvPr/>
+          </p:nvSpPr>
+          <p:spPr>
+            <a:xfrm rot="10800000">
+              <a:off x="4180111" y="1375544"/>
+              <a:ext cx="549071" cy="549822"/>
+            </a:xfrm>
+            <a:prstGeom prst="rect">
+              <a:avLst/>
+            </a:prstGeom>
+            <a:noFill/>
+            <a:ln>
+              <a:noFill/>
+            </a:ln>
+          </p:spPr>
+          <p:style>
+            <a:lnRef idx="2">
+              <a:schemeClr val="accent1">
+                <a:shade val="50000"/>
+              </a:schemeClr>
+            </a:lnRef>
+            <a:fillRef idx="1">
+              <a:schemeClr val="accent1"/>
+            </a:fillRef>
+            <a:effectRef idx="0">
+              <a:schemeClr val="accent1"/>
+            </a:effectRef>
+            <a:fontRef idx="minor">
+              <a:schemeClr val="lt1"/>
+            </a:fontRef>
+          </p:style>
+          <p:txBody>
+            <a:bodyPr wrap="none" lIns="0" tIns="0" rIns="0" bIns="0" rtlCol="0" anchor="ctr"/>
+            <a:lstStyle/>
+            <a:p>
+              <a:pPr algn="ctr"/>
+              <a:endParaRPr lang="en-US" b="1"/>
+            </a:p>
+          </p:txBody>
+        </p:sp>
+      </p:grpSp>
     </p:spTree>
     <p:extLst>
       <p:ext uri="{BB962C8B-B14F-4D97-AF65-F5344CB8AC3E}">

</xml_diff>

<commit_message>
Update Add Into Group icon
</commit_message>
<xml_diff>
--- a/doc/Icons.pptx
+++ b/doc/Icons.pptx
@@ -24886,7 +24886,7 @@
         <p:spPr>
           <a:xfrm>
             <a:off x="6298239" y="5678027"/>
-            <a:ext cx="2333168" cy="307777"/>
+            <a:ext cx="881955" cy="307777"/>
           </a:xfrm>
           <a:prstGeom prst="rect">
             <a:avLst/>
@@ -29023,7 +29023,7 @@
         </p:nvGrpSpPr>
         <p:grpSpPr>
           <a:xfrm>
-            <a:off x="3178079" y="1440083"/>
+            <a:off x="7664818" y="1661257"/>
             <a:ext cx="402336" cy="399078"/>
             <a:chOff x="3178080" y="1440083"/>
             <a:chExt cx="390387" cy="399078"/>
@@ -29557,6 +29557,237 @@
             <a:p>
               <a:pPr algn="ctr"/>
               <a:endParaRPr lang="en-US" b="1"/>
+            </a:p>
+          </p:txBody>
+        </p:sp>
+      </p:grpSp>
+      <p:sp>
+        <p:nvSpPr>
+          <p:cNvPr id="138" name="TextBox 137"/>
+          <p:cNvSpPr txBox="1"/>
+          <p:nvPr/>
+        </p:nvSpPr>
+        <p:spPr>
+          <a:xfrm>
+            <a:off x="7510337" y="1357797"/>
+            <a:ext cx="864726" cy="307777"/>
+          </a:xfrm>
+          <a:prstGeom prst="rect">
+            <a:avLst/>
+          </a:prstGeom>
+          <a:noFill/>
+        </p:spPr>
+        <p:txBody>
+          <a:bodyPr wrap="square" rtlCol="0">
+            <a:spAutoFit/>
+          </a:bodyPr>
+          <a:lstStyle/>
+          <a:p>
+            <a:r>
+              <a:rPr lang="en-US" sz="1400" dirty="0"/>
+              <a:t>Not used</a:t>
+            </a:r>
+            <a:endParaRPr lang="en-SG" sz="1400" dirty="0"/>
+          </a:p>
+        </p:txBody>
+      </p:sp>
+      <p:grpSp>
+        <p:nvGrpSpPr>
+          <p:cNvPr id="64" name="Group 63"/>
+          <p:cNvGrpSpPr/>
+          <p:nvPr/>
+        </p:nvGrpSpPr>
+        <p:grpSpPr>
+          <a:xfrm>
+            <a:off x="3192352" y="1457551"/>
+            <a:ext cx="445953" cy="443902"/>
+            <a:chOff x="2764335" y="1430070"/>
+            <a:chExt cx="445953" cy="443902"/>
+          </a:xfrm>
+        </p:grpSpPr>
+        <p:sp>
+          <p:nvSpPr>
+            <p:cNvPr id="19" name="Rectangle 18"/>
+            <p:cNvSpPr/>
+            <p:nvPr/>
+          </p:nvSpPr>
+          <p:spPr>
+            <a:xfrm>
+              <a:off x="2764335" y="1431283"/>
+              <a:ext cx="212942" cy="212942"/>
+            </a:xfrm>
+            <a:prstGeom prst="rect">
+              <a:avLst/>
+            </a:prstGeom>
+            <a:noFill/>
+            <a:ln>
+              <a:solidFill>
+                <a:srgbClr val="0070C0"/>
+              </a:solidFill>
+            </a:ln>
+          </p:spPr>
+          <p:style>
+            <a:lnRef idx="2">
+              <a:schemeClr val="accent1">
+                <a:shade val="50000"/>
+              </a:schemeClr>
+            </a:lnRef>
+            <a:fillRef idx="1">
+              <a:schemeClr val="accent1"/>
+            </a:fillRef>
+            <a:effectRef idx="0">
+              <a:schemeClr val="accent1"/>
+            </a:effectRef>
+            <a:fontRef idx="minor">
+              <a:schemeClr val="lt1"/>
+            </a:fontRef>
+          </p:style>
+          <p:txBody>
+            <a:bodyPr rtlCol="0" anchor="ctr"/>
+            <a:lstStyle/>
+            <a:p>
+              <a:pPr algn="ctr"/>
+              <a:endParaRPr lang="en-US"/>
+            </a:p>
+          </p:txBody>
+        </p:sp>
+        <p:sp>
+          <p:nvSpPr>
+            <p:cNvPr id="141" name="Rectangle 140"/>
+            <p:cNvSpPr/>
+            <p:nvPr/>
+          </p:nvSpPr>
+          <p:spPr>
+            <a:xfrm>
+              <a:off x="2765404" y="1641480"/>
+              <a:ext cx="212942" cy="212942"/>
+            </a:xfrm>
+            <a:prstGeom prst="rect">
+              <a:avLst/>
+            </a:prstGeom>
+            <a:noFill/>
+            <a:ln>
+              <a:solidFill>
+                <a:srgbClr val="0070C0"/>
+              </a:solidFill>
+            </a:ln>
+          </p:spPr>
+          <p:style>
+            <a:lnRef idx="2">
+              <a:schemeClr val="accent1">
+                <a:shade val="50000"/>
+              </a:schemeClr>
+            </a:lnRef>
+            <a:fillRef idx="1">
+              <a:schemeClr val="accent1"/>
+            </a:fillRef>
+            <a:effectRef idx="0">
+              <a:schemeClr val="accent1"/>
+            </a:effectRef>
+            <a:fontRef idx="minor">
+              <a:schemeClr val="lt1"/>
+            </a:fontRef>
+          </p:style>
+          <p:txBody>
+            <a:bodyPr rtlCol="0" anchor="ctr"/>
+            <a:lstStyle/>
+            <a:p>
+              <a:pPr algn="ctr"/>
+              <a:endParaRPr lang="en-US"/>
+            </a:p>
+          </p:txBody>
+        </p:sp>
+        <p:sp>
+          <p:nvSpPr>
+            <p:cNvPr id="142" name="Rectangle 141"/>
+            <p:cNvSpPr/>
+            <p:nvPr/>
+          </p:nvSpPr>
+          <p:spPr>
+            <a:xfrm>
+              <a:off x="2979312" y="1430070"/>
+              <a:ext cx="212942" cy="212942"/>
+            </a:xfrm>
+            <a:prstGeom prst="rect">
+              <a:avLst/>
+            </a:prstGeom>
+            <a:noFill/>
+            <a:ln>
+              <a:solidFill>
+                <a:srgbClr val="0070C0"/>
+              </a:solidFill>
+            </a:ln>
+          </p:spPr>
+          <p:style>
+            <a:lnRef idx="2">
+              <a:schemeClr val="accent1">
+                <a:shade val="50000"/>
+              </a:schemeClr>
+            </a:lnRef>
+            <a:fillRef idx="1">
+              <a:schemeClr val="accent1"/>
+            </a:fillRef>
+            <a:effectRef idx="0">
+              <a:schemeClr val="accent1"/>
+            </a:effectRef>
+            <a:fontRef idx="minor">
+              <a:schemeClr val="lt1"/>
+            </a:fontRef>
+          </p:style>
+          <p:txBody>
+            <a:bodyPr rtlCol="0" anchor="ctr"/>
+            <a:lstStyle/>
+            <a:p>
+              <a:pPr algn="ctr"/>
+              <a:endParaRPr lang="en-US"/>
+            </a:p>
+          </p:txBody>
+        </p:sp>
+        <p:sp>
+          <p:nvSpPr>
+            <p:cNvPr id="55" name="Cross 54"/>
+            <p:cNvSpPr/>
+            <p:nvPr/>
+          </p:nvSpPr>
+          <p:spPr>
+            <a:xfrm>
+              <a:off x="3019061" y="1682745"/>
+              <a:ext cx="191227" cy="191227"/>
+            </a:xfrm>
+            <a:prstGeom prst="plus">
+              <a:avLst>
+                <a:gd name="adj" fmla="val 33338"/>
+              </a:avLst>
+            </a:prstGeom>
+            <a:solidFill>
+              <a:srgbClr val="0070C0"/>
+            </a:solidFill>
+            <a:ln>
+              <a:noFill/>
+            </a:ln>
+          </p:spPr>
+          <p:style>
+            <a:lnRef idx="2">
+              <a:schemeClr val="accent1">
+                <a:shade val="50000"/>
+              </a:schemeClr>
+            </a:lnRef>
+            <a:fillRef idx="1">
+              <a:schemeClr val="accent1"/>
+            </a:fillRef>
+            <a:effectRef idx="0">
+              <a:schemeClr val="accent1"/>
+            </a:effectRef>
+            <a:fontRef idx="minor">
+              <a:schemeClr val="lt1"/>
+            </a:fontRef>
+          </p:style>
+          <p:txBody>
+            <a:bodyPr rtlCol="0" anchor="ctr"/>
+            <a:lstStyle/>
+            <a:p>
+              <a:pPr algn="ctr"/>
+              <a:endParaRPr lang="en-US"/>
             </a:p>
           </p:txBody>
         </p:sp>

</xml_diff>

<commit_message>
Icons for Paste Lab #1349  (#1369)
* Add paste lab icons

* Update Add Into Group icon
</commit_message>
<xml_diff>
--- a/doc/Icons.pptx
+++ b/doc/Icons.pptx
@@ -21,23 +21,23 @@
   <p:notesSz cx="6858000" cy="9144000"/>
   <p:embeddedFontLst>
     <p:embeddedFont>
-      <p:font typeface="Gill Sans Ultra Bold" panose="020B0A02020104020203" pitchFamily="34" charset="0"/>
+      <p:font typeface="Calibri" panose="020F0502020204030204" pitchFamily="34" charset="0"/>
       <p:regular r:id="rId11"/>
+      <p:bold r:id="rId12"/>
+      <p:italic r:id="rId13"/>
+      <p:boldItalic r:id="rId14"/>
     </p:embeddedFont>
     <p:embeddedFont>
       <p:font typeface="Rockwell Extra Bold" panose="02060903040505020403" pitchFamily="18" charset="0"/>
-      <p:bold r:id="rId12"/>
+      <p:bold r:id="rId15"/>
     </p:embeddedFont>
     <p:embeddedFont>
       <p:font typeface="Arial Black" panose="020B0A04020102020204" pitchFamily="34" charset="0"/>
-      <p:bold r:id="rId13"/>
+      <p:bold r:id="rId16"/>
     </p:embeddedFont>
     <p:embeddedFont>
-      <p:font typeface="Calibri" panose="020F0502020204030204" pitchFamily="34" charset="0"/>
-      <p:regular r:id="rId14"/>
-      <p:bold r:id="rId15"/>
-      <p:italic r:id="rId16"/>
-      <p:boldItalic r:id="rId17"/>
+      <p:font typeface="Gill Sans Ultra Bold" panose="020B0A02020104020203" pitchFamily="34" charset="0"/>
+      <p:regular r:id="rId17"/>
     </p:embeddedFont>
   </p:embeddedFontLst>
   <p:defaultTextStyle>
@@ -154,6 +154,10 @@
 </p:presentation>
 </file>
 
+<file path=ppt/revisionInfo.xml><?xml version="1.0" encoding="utf-8"?>
+<p1510:revInfo xmlns:a="http://schemas.openxmlformats.org/drawingml/2006/main" xmlns:r="http://schemas.openxmlformats.org/officeDocument/2006/relationships" xmlns:p1510="http://schemas.microsoft.com/office/powerpoint/2015/10/main"/>
+</file>
+
 <file path=ppt/notesMasters/notesMaster1.xml><?xml version="1.0" encoding="utf-8"?>
 <p:notesMaster xmlns:a="http://schemas.openxmlformats.org/drawingml/2006/main" xmlns:r="http://schemas.openxmlformats.org/officeDocument/2006/relationships" xmlns:p="http://schemas.openxmlformats.org/presentationml/2006/main">
   <p:cSld>
@@ -236,7 +240,7 @@
           <a:p>
             <a:fld id="{6699ACB9-486C-4D62-A3A7-AF98E13EFDA3}" type="datetimeFigureOut">
               <a:rPr lang="en-US" smtClean="0"/>
-              <a:t>4/15/2017</a:t>
+              <a:t>5/24/2017</a:t>
             </a:fld>
             <a:endParaRPr lang="en-US"/>
           </a:p>
@@ -767,7 +771,7 @@
             <a:fld id="{1D8BD707-D9CF-40AE-B4C6-C98DA3205C09}" type="datetimeFigureOut">
               <a:rPr lang="en-US" smtClean="0"/>
               <a:pPr/>
-              <a:t>4/15/2017</a:t>
+              <a:t>5/24/2017</a:t>
             </a:fld>
             <a:endParaRPr lang="en-US"/>
           </a:p>
@@ -932,7 +936,7 @@
             <a:fld id="{1D8BD707-D9CF-40AE-B4C6-C98DA3205C09}" type="datetimeFigureOut">
               <a:rPr lang="en-US" smtClean="0"/>
               <a:pPr/>
-              <a:t>4/15/2017</a:t>
+              <a:t>5/24/2017</a:t>
             </a:fld>
             <a:endParaRPr lang="en-US"/>
           </a:p>
@@ -1107,7 +1111,7 @@
             <a:fld id="{1D8BD707-D9CF-40AE-B4C6-C98DA3205C09}" type="datetimeFigureOut">
               <a:rPr lang="en-US" smtClean="0"/>
               <a:pPr/>
-              <a:t>4/15/2017</a:t>
+              <a:t>5/24/2017</a:t>
             </a:fld>
             <a:endParaRPr lang="en-US"/>
           </a:p>
@@ -1272,7 +1276,7 @@
             <a:fld id="{1D8BD707-D9CF-40AE-B4C6-C98DA3205C09}" type="datetimeFigureOut">
               <a:rPr lang="en-US" smtClean="0"/>
               <a:pPr/>
-              <a:t>4/15/2017</a:t>
+              <a:t>5/24/2017</a:t>
             </a:fld>
             <a:endParaRPr lang="en-US"/>
           </a:p>
@@ -1514,7 +1518,7 @@
             <a:fld id="{1D8BD707-D9CF-40AE-B4C6-C98DA3205C09}" type="datetimeFigureOut">
               <a:rPr lang="en-US" smtClean="0"/>
               <a:pPr/>
-              <a:t>4/15/2017</a:t>
+              <a:t>5/24/2017</a:t>
             </a:fld>
             <a:endParaRPr lang="en-US"/>
           </a:p>
@@ -1796,7 +1800,7 @@
             <a:fld id="{1D8BD707-D9CF-40AE-B4C6-C98DA3205C09}" type="datetimeFigureOut">
               <a:rPr lang="en-US" smtClean="0"/>
               <a:pPr/>
-              <a:t>4/15/2017</a:t>
+              <a:t>5/24/2017</a:t>
             </a:fld>
             <a:endParaRPr lang="en-US"/>
           </a:p>
@@ -2212,7 +2216,7 @@
             <a:fld id="{1D8BD707-D9CF-40AE-B4C6-C98DA3205C09}" type="datetimeFigureOut">
               <a:rPr lang="en-US" smtClean="0"/>
               <a:pPr/>
-              <a:t>4/15/2017</a:t>
+              <a:t>5/24/2017</a:t>
             </a:fld>
             <a:endParaRPr lang="en-US"/>
           </a:p>
@@ -2326,7 +2330,7 @@
             <a:fld id="{1D8BD707-D9CF-40AE-B4C6-C98DA3205C09}" type="datetimeFigureOut">
               <a:rPr lang="en-US" smtClean="0"/>
               <a:pPr/>
-              <a:t>4/15/2017</a:t>
+              <a:t>5/24/2017</a:t>
             </a:fld>
             <a:endParaRPr lang="en-US"/>
           </a:p>
@@ -2418,7 +2422,7 @@
             <a:fld id="{1D8BD707-D9CF-40AE-B4C6-C98DA3205C09}" type="datetimeFigureOut">
               <a:rPr lang="en-US" smtClean="0"/>
               <a:pPr/>
-              <a:t>4/15/2017</a:t>
+              <a:t>5/24/2017</a:t>
             </a:fld>
             <a:endParaRPr lang="en-US"/>
           </a:p>
@@ -2690,7 +2694,7 @@
             <a:fld id="{1D8BD707-D9CF-40AE-B4C6-C98DA3205C09}" type="datetimeFigureOut">
               <a:rPr lang="en-US" smtClean="0"/>
               <a:pPr/>
-              <a:t>4/15/2017</a:t>
+              <a:t>5/24/2017</a:t>
             </a:fld>
             <a:endParaRPr lang="en-US"/>
           </a:p>
@@ -2939,7 +2943,7 @@
             <a:fld id="{1D8BD707-D9CF-40AE-B4C6-C98DA3205C09}" type="datetimeFigureOut">
               <a:rPr lang="en-US" smtClean="0"/>
               <a:pPr/>
-              <a:t>4/15/2017</a:t>
+              <a:t>5/24/2017</a:t>
             </a:fld>
             <a:endParaRPr lang="en-US"/>
           </a:p>
@@ -3152,7 +3156,7 @@
             <a:fld id="{1D8BD707-D9CF-40AE-B4C6-C98DA3205C09}" type="datetimeFigureOut">
               <a:rPr lang="en-US" smtClean="0"/>
               <a:pPr/>
-              <a:t>4/15/2017</a:t>
+              <a:t>5/24/2017</a:t>
             </a:fld>
             <a:endParaRPr lang="en-US"/>
           </a:p>
@@ -6180,10 +6184,10 @@
         </p:nvGrpSpPr>
         <p:grpSpPr>
           <a:xfrm>
-            <a:off x="1250074" y="2362200"/>
-            <a:ext cx="838200" cy="838200"/>
-            <a:chOff x="1250074" y="2362200"/>
-            <a:chExt cx="838200" cy="838200"/>
+            <a:off x="1222859" y="2362200"/>
+            <a:ext cx="856967" cy="838200"/>
+            <a:chOff x="1222859" y="2362200"/>
+            <a:chExt cx="856967" cy="838200"/>
           </a:xfrm>
         </p:grpSpPr>
         <p:sp>
@@ -6434,7 +6438,7 @@
           </p:nvSpPr>
           <p:spPr>
             <a:xfrm>
-              <a:off x="1250074" y="2362200"/>
+              <a:off x="1222859" y="2362200"/>
               <a:ext cx="838200" cy="838200"/>
             </a:xfrm>
             <a:prstGeom prst="rect">
@@ -24882,7 +24886,7 @@
         <p:spPr>
           <a:xfrm>
             <a:off x="6298239" y="5678027"/>
-            <a:ext cx="2333168" cy="307777"/>
+            <a:ext cx="881955" cy="307777"/>
           </a:xfrm>
           <a:prstGeom prst="rect">
             <a:avLst/>
@@ -28949,6 +28953,845 @@
           </a:p>
         </p:txBody>
       </p:sp>
+      <p:sp>
+        <p:nvSpPr>
+          <p:cNvPr id="146" name="TextBox 145"/>
+          <p:cNvSpPr txBox="1"/>
+          <p:nvPr/>
+        </p:nvSpPr>
+        <p:spPr>
+          <a:xfrm>
+            <a:off x="3048000" y="1873793"/>
+            <a:ext cx="762000" cy="430887"/>
+          </a:xfrm>
+          <a:prstGeom prst="rect">
+            <a:avLst/>
+          </a:prstGeom>
+          <a:noFill/>
+        </p:spPr>
+        <p:txBody>
+          <a:bodyPr wrap="square" rtlCol="0">
+            <a:spAutoFit/>
+          </a:bodyPr>
+          <a:lstStyle/>
+          <a:p>
+            <a:pPr algn="ctr"/>
+            <a:r>
+              <a:rPr lang="en-US" sz="1100" dirty="0"/>
+              <a:t>Add Into Group</a:t>
+            </a:r>
+            <a:endParaRPr lang="en-SG" sz="1100" dirty="0"/>
+          </a:p>
+        </p:txBody>
+      </p:sp>
+      <p:sp>
+        <p:nvSpPr>
+          <p:cNvPr id="199" name="TextBox 198"/>
+          <p:cNvSpPr txBox="1"/>
+          <p:nvPr/>
+        </p:nvSpPr>
+        <p:spPr>
+          <a:xfrm>
+            <a:off x="4110573" y="1956905"/>
+            <a:ext cx="762000" cy="261610"/>
+          </a:xfrm>
+          <a:prstGeom prst="rect">
+            <a:avLst/>
+          </a:prstGeom>
+          <a:noFill/>
+        </p:spPr>
+        <p:txBody>
+          <a:bodyPr wrap="square" rtlCol="0">
+            <a:spAutoFit/>
+          </a:bodyPr>
+          <a:lstStyle/>
+          <a:p>
+            <a:pPr algn="ctr"/>
+            <a:r>
+              <a:rPr lang="en-US" sz="1100" dirty="0"/>
+              <a:t>Paste Lab</a:t>
+            </a:r>
+            <a:endParaRPr lang="en-SG" sz="1100" dirty="0"/>
+          </a:p>
+        </p:txBody>
+      </p:sp>
+      <p:grpSp>
+        <p:nvGrpSpPr>
+          <p:cNvPr id="48" name="Group 47"/>
+          <p:cNvGrpSpPr/>
+          <p:nvPr/>
+        </p:nvGrpSpPr>
+        <p:grpSpPr>
+          <a:xfrm>
+            <a:off x="7664818" y="1661257"/>
+            <a:ext cx="402336" cy="399078"/>
+            <a:chOff x="3178080" y="1440083"/>
+            <a:chExt cx="390387" cy="399078"/>
+          </a:xfrm>
+        </p:grpSpPr>
+        <p:grpSp>
+          <p:nvGrpSpPr>
+            <p:cNvPr id="72" name="Group 71"/>
+            <p:cNvGrpSpPr/>
+            <p:nvPr/>
+          </p:nvGrpSpPr>
+          <p:grpSpPr>
+            <a:xfrm>
+              <a:off x="3238368" y="1440083"/>
+              <a:ext cx="330099" cy="266804"/>
+              <a:chOff x="2797628" y="1644225"/>
+              <a:chExt cx="256151" cy="208259"/>
+            </a:xfrm>
+          </p:grpSpPr>
+          <p:sp>
+            <p:nvSpPr>
+              <p:cNvPr id="135" name="Rectangle 134"/>
+              <p:cNvSpPr/>
+              <p:nvPr/>
+            </p:nvSpPr>
+            <p:spPr>
+              <a:xfrm>
+                <a:off x="2797628" y="1644225"/>
+                <a:ext cx="256151" cy="208259"/>
+              </a:xfrm>
+              <a:prstGeom prst="rect">
+                <a:avLst/>
+              </a:prstGeom>
+              <a:solidFill>
+                <a:srgbClr val="0070C0"/>
+              </a:solidFill>
+              <a:ln>
+                <a:noFill/>
+              </a:ln>
+            </p:spPr>
+            <p:style>
+              <a:lnRef idx="2">
+                <a:schemeClr val="accent1">
+                  <a:shade val="50000"/>
+                </a:schemeClr>
+              </a:lnRef>
+              <a:fillRef idx="1">
+                <a:schemeClr val="accent1"/>
+              </a:fillRef>
+              <a:effectRef idx="0">
+                <a:schemeClr val="accent1"/>
+              </a:effectRef>
+              <a:fontRef idx="minor">
+                <a:schemeClr val="lt1"/>
+              </a:fontRef>
+            </p:style>
+            <p:txBody>
+              <a:bodyPr wrap="none" lIns="0" tIns="0" rIns="0" bIns="0" rtlCol="0" anchor="ctr"/>
+              <a:lstStyle/>
+              <a:p>
+                <a:pPr algn="ctr"/>
+                <a:endParaRPr lang="en-SG" b="1"/>
+              </a:p>
+            </p:txBody>
+          </p:sp>
+          <p:sp>
+            <p:nvSpPr>
+              <p:cNvPr id="139" name="Isosceles Triangle 138"/>
+              <p:cNvSpPr/>
+              <p:nvPr/>
+            </p:nvSpPr>
+            <p:spPr>
+              <a:xfrm>
+                <a:off x="2956033" y="1735484"/>
+                <a:ext cx="63331" cy="77278"/>
+              </a:xfrm>
+              <a:prstGeom prst="triangle">
+                <a:avLst/>
+              </a:prstGeom>
+              <a:solidFill>
+                <a:schemeClr val="bg1"/>
+              </a:solidFill>
+              <a:ln>
+                <a:solidFill>
+                  <a:schemeClr val="bg1"/>
+                </a:solidFill>
+              </a:ln>
+            </p:spPr>
+            <p:style>
+              <a:lnRef idx="2">
+                <a:schemeClr val="accent1">
+                  <a:shade val="50000"/>
+                </a:schemeClr>
+              </a:lnRef>
+              <a:fillRef idx="1">
+                <a:schemeClr val="accent1"/>
+              </a:fillRef>
+              <a:effectRef idx="0">
+                <a:schemeClr val="accent1"/>
+              </a:effectRef>
+              <a:fontRef idx="minor">
+                <a:schemeClr val="lt1"/>
+              </a:fontRef>
+            </p:style>
+            <p:txBody>
+              <a:bodyPr rtlCol="0" anchor="ctr"/>
+              <a:lstStyle/>
+              <a:p>
+                <a:pPr algn="ctr"/>
+                <a:endParaRPr lang="en-US"/>
+              </a:p>
+            </p:txBody>
+          </p:sp>
+          <p:sp>
+            <p:nvSpPr>
+              <p:cNvPr id="140" name="Flowchart: Connector 139"/>
+              <p:cNvSpPr>
+                <a:spLocks noChangeAspect="1"/>
+              </p:cNvSpPr>
+              <p:nvPr/>
+            </p:nvSpPr>
+            <p:spPr>
+              <a:xfrm>
+                <a:off x="2843153" y="1676118"/>
+                <a:ext cx="60738" cy="61168"/>
+              </a:xfrm>
+              <a:prstGeom prst="flowChartConnector">
+                <a:avLst/>
+              </a:prstGeom>
+              <a:solidFill>
+                <a:schemeClr val="bg1"/>
+              </a:solidFill>
+              <a:ln>
+                <a:solidFill>
+                  <a:schemeClr val="bg1"/>
+                </a:solidFill>
+              </a:ln>
+            </p:spPr>
+            <p:style>
+              <a:lnRef idx="2">
+                <a:schemeClr val="accent1">
+                  <a:shade val="50000"/>
+                </a:schemeClr>
+              </a:lnRef>
+              <a:fillRef idx="1">
+                <a:schemeClr val="accent1"/>
+              </a:fillRef>
+              <a:effectRef idx="0">
+                <a:schemeClr val="accent1"/>
+              </a:effectRef>
+              <a:fontRef idx="minor">
+                <a:schemeClr val="lt1"/>
+              </a:fontRef>
+            </p:style>
+            <p:txBody>
+              <a:bodyPr rtlCol="0" anchor="ctr"/>
+              <a:lstStyle/>
+              <a:p>
+                <a:pPr algn="ctr"/>
+                <a:endParaRPr lang="en-SG" dirty="0"/>
+              </a:p>
+            </p:txBody>
+          </p:sp>
+        </p:grpSp>
+        <p:sp>
+          <p:nvSpPr>
+            <p:cNvPr id="144" name="Right Arrow 35"/>
+            <p:cNvSpPr>
+              <a:spLocks noChangeAspect="1"/>
+            </p:cNvSpPr>
+            <p:nvPr/>
+          </p:nvSpPr>
+          <p:spPr>
+            <a:xfrm rot="18679808">
+              <a:off x="3172011" y="1569311"/>
+              <a:ext cx="275919" cy="263781"/>
+            </a:xfrm>
+            <a:prstGeom prst="rightArrow">
+              <a:avLst>
+                <a:gd name="adj1" fmla="val 50000"/>
+                <a:gd name="adj2" fmla="val 66274"/>
+              </a:avLst>
+            </a:prstGeom>
+            <a:solidFill>
+              <a:srgbClr val="0070C0"/>
+            </a:solidFill>
+            <a:ln w="19050">
+              <a:solidFill>
+                <a:schemeClr val="bg1"/>
+              </a:solidFill>
+            </a:ln>
+          </p:spPr>
+          <p:style>
+            <a:lnRef idx="2">
+              <a:schemeClr val="accent1">
+                <a:shade val="50000"/>
+              </a:schemeClr>
+            </a:lnRef>
+            <a:fillRef idx="1">
+              <a:schemeClr val="accent1"/>
+            </a:fillRef>
+            <a:effectRef idx="0">
+              <a:schemeClr val="accent1"/>
+            </a:effectRef>
+            <a:fontRef idx="minor">
+              <a:schemeClr val="lt1"/>
+            </a:fontRef>
+          </p:style>
+          <p:txBody>
+            <a:bodyPr rtlCol="0" anchor="ctr"/>
+            <a:lstStyle/>
+            <a:p>
+              <a:pPr algn="ctr"/>
+              <a:endParaRPr lang="en-US"/>
+            </a:p>
+          </p:txBody>
+        </p:sp>
+      </p:grpSp>
+      <p:sp>
+        <p:nvSpPr>
+          <p:cNvPr id="205" name="Rectangle 204"/>
+          <p:cNvSpPr/>
+          <p:nvPr/>
+        </p:nvSpPr>
+        <p:spPr>
+          <a:xfrm rot="10800000">
+            <a:off x="3170960" y="1439596"/>
+            <a:ext cx="420624" cy="421200"/>
+          </a:xfrm>
+          <a:prstGeom prst="rect">
+            <a:avLst/>
+          </a:prstGeom>
+          <a:noFill/>
+          <a:ln>
+            <a:noFill/>
+          </a:ln>
+        </p:spPr>
+        <p:style>
+          <a:lnRef idx="2">
+            <a:schemeClr val="accent1">
+              <a:shade val="50000"/>
+            </a:schemeClr>
+          </a:lnRef>
+          <a:fillRef idx="1">
+            <a:schemeClr val="accent1"/>
+          </a:fillRef>
+          <a:effectRef idx="0">
+            <a:schemeClr val="accent1"/>
+          </a:effectRef>
+          <a:fontRef idx="minor">
+            <a:schemeClr val="lt1"/>
+          </a:fontRef>
+        </p:style>
+        <p:txBody>
+          <a:bodyPr wrap="none" lIns="0" tIns="0" rIns="0" bIns="0" rtlCol="0" anchor="ctr"/>
+          <a:lstStyle/>
+          <a:p>
+            <a:pPr algn="ctr"/>
+            <a:endParaRPr lang="en-US" b="1"/>
+          </a:p>
+        </p:txBody>
+      </p:sp>
+      <p:grpSp>
+        <p:nvGrpSpPr>
+          <p:cNvPr id="1033" name="Group 1032"/>
+          <p:cNvGrpSpPr/>
+          <p:nvPr/>
+        </p:nvGrpSpPr>
+        <p:grpSpPr>
+          <a:xfrm>
+            <a:off x="4180111" y="1375544"/>
+            <a:ext cx="549071" cy="549822"/>
+            <a:chOff x="4180111" y="1375544"/>
+            <a:chExt cx="549071" cy="549822"/>
+          </a:xfrm>
+        </p:grpSpPr>
+        <p:grpSp>
+          <p:nvGrpSpPr>
+            <p:cNvPr id="1030" name="Group 1029"/>
+            <p:cNvGrpSpPr/>
+            <p:nvPr/>
+          </p:nvGrpSpPr>
+          <p:grpSpPr>
+            <a:xfrm>
+              <a:off x="4235574" y="1385216"/>
+              <a:ext cx="446467" cy="521728"/>
+              <a:chOff x="4821567" y="919204"/>
+              <a:chExt cx="446467" cy="521728"/>
+            </a:xfrm>
+          </p:grpSpPr>
+          <p:sp>
+            <p:nvSpPr>
+              <p:cNvPr id="1028" name="Rectangle 1027"/>
+              <p:cNvSpPr/>
+              <p:nvPr/>
+            </p:nvSpPr>
+            <p:spPr>
+              <a:xfrm>
+                <a:off x="4821567" y="971454"/>
+                <a:ext cx="343904" cy="406070"/>
+              </a:xfrm>
+              <a:prstGeom prst="rect">
+                <a:avLst/>
+              </a:prstGeom>
+              <a:solidFill>
+                <a:srgbClr val="0070C0"/>
+              </a:solidFill>
+              <a:ln>
+                <a:noFill/>
+              </a:ln>
+            </p:spPr>
+            <p:style>
+              <a:lnRef idx="2">
+                <a:schemeClr val="accent1">
+                  <a:shade val="50000"/>
+                </a:schemeClr>
+              </a:lnRef>
+              <a:fillRef idx="1">
+                <a:schemeClr val="accent1"/>
+              </a:fillRef>
+              <a:effectRef idx="0">
+                <a:schemeClr val="accent1"/>
+              </a:effectRef>
+              <a:fontRef idx="minor">
+                <a:schemeClr val="lt1"/>
+              </a:fontRef>
+            </p:style>
+            <p:txBody>
+              <a:bodyPr rtlCol="0" anchor="ctr"/>
+              <a:lstStyle/>
+              <a:p>
+                <a:pPr algn="ctr"/>
+                <a:endParaRPr lang="en-US"/>
+              </a:p>
+            </p:txBody>
+          </p:sp>
+          <p:sp>
+            <p:nvSpPr>
+              <p:cNvPr id="1027" name="Rectangle: Folded Corner 1026"/>
+              <p:cNvSpPr/>
+              <p:nvPr/>
+            </p:nvSpPr>
+            <p:spPr>
+              <a:xfrm rot="10800000" flipH="1">
+                <a:off x="4990894" y="1102754"/>
+                <a:ext cx="277140" cy="338178"/>
+              </a:xfrm>
+              <a:prstGeom prst="foldedCorner">
+                <a:avLst>
+                  <a:gd name="adj" fmla="val 44103"/>
+                </a:avLst>
+              </a:prstGeom>
+              <a:solidFill>
+                <a:schemeClr val="bg1"/>
+              </a:solidFill>
+              <a:ln>
+                <a:solidFill>
+                  <a:srgbClr val="0070C0"/>
+                </a:solidFill>
+              </a:ln>
+            </p:spPr>
+            <p:style>
+              <a:lnRef idx="2">
+                <a:schemeClr val="accent1">
+                  <a:shade val="50000"/>
+                </a:schemeClr>
+              </a:lnRef>
+              <a:fillRef idx="1">
+                <a:schemeClr val="accent1"/>
+              </a:fillRef>
+              <a:effectRef idx="0">
+                <a:schemeClr val="accent1"/>
+              </a:effectRef>
+              <a:fontRef idx="minor">
+                <a:schemeClr val="lt1"/>
+              </a:fontRef>
+            </p:style>
+            <p:txBody>
+              <a:bodyPr rtlCol="0" anchor="ctr"/>
+              <a:lstStyle/>
+              <a:p>
+                <a:pPr algn="ctr"/>
+                <a:endParaRPr lang="en-US"/>
+              </a:p>
+            </p:txBody>
+          </p:sp>
+          <p:sp>
+            <p:nvSpPr>
+              <p:cNvPr id="165" name="Rounded Rectangle 227"/>
+              <p:cNvSpPr/>
+              <p:nvPr/>
+            </p:nvSpPr>
+            <p:spPr>
+              <a:xfrm rot="10800000">
+                <a:off x="4879960" y="919204"/>
+                <a:ext cx="234247" cy="101171"/>
+              </a:xfrm>
+              <a:custGeom>
+                <a:avLst/>
+                <a:gdLst/>
+                <a:ahLst/>
+                <a:cxnLst/>
+                <a:rect l="l" t="t" r="r" b="b"/>
+                <a:pathLst>
+                  <a:path w="286327" h="1000124">
+                    <a:moveTo>
+                      <a:pt x="2115" y="0"/>
+                    </a:moveTo>
+                    <a:lnTo>
+                      <a:pt x="284212" y="0"/>
+                    </a:lnTo>
+                    <a:cubicBezTo>
+                      <a:pt x="286188" y="3367"/>
+                      <a:pt x="286327" y="6905"/>
+                      <a:pt x="286327" y="10476"/>
+                    </a:cubicBezTo>
+                    <a:lnTo>
+                      <a:pt x="286327" y="712825"/>
+                    </a:lnTo>
+                    <a:cubicBezTo>
+                      <a:pt x="286327" y="772047"/>
+                      <a:pt x="247915" y="822299"/>
+                      <a:pt x="194109" y="838409"/>
+                    </a:cubicBezTo>
+                    <a:cubicBezTo>
+                      <a:pt x="194108" y="875332"/>
+                      <a:pt x="194108" y="912256"/>
+                      <a:pt x="194108" y="949179"/>
+                    </a:cubicBezTo>
+                    <a:cubicBezTo>
+                      <a:pt x="194108" y="977315"/>
+                      <a:pt x="171299" y="1000124"/>
+                      <a:pt x="143163" y="1000124"/>
+                    </a:cubicBezTo>
+                    <a:lnTo>
+                      <a:pt x="143164" y="1000123"/>
+                    </a:lnTo>
+                    <a:cubicBezTo>
+                      <a:pt x="115028" y="1000123"/>
+                      <a:pt x="92219" y="977314"/>
+                      <a:pt x="92219" y="949178"/>
+                    </a:cubicBezTo>
+                    <a:lnTo>
+                      <a:pt x="92219" y="838409"/>
+                    </a:lnTo>
+                    <a:cubicBezTo>
+                      <a:pt x="38413" y="822299"/>
+                      <a:pt x="0" y="772048"/>
+                      <a:pt x="0" y="712825"/>
+                    </a:cubicBezTo>
+                    <a:lnTo>
+                      <a:pt x="0" y="10476"/>
+                    </a:lnTo>
+                    <a:close/>
+                  </a:path>
+                </a:pathLst>
+              </a:custGeom>
+              <a:solidFill>
+                <a:srgbClr val="0070C0"/>
+              </a:solidFill>
+              <a:ln w="19050">
+                <a:solidFill>
+                  <a:schemeClr val="bg1"/>
+                </a:solidFill>
+              </a:ln>
+            </p:spPr>
+            <p:style>
+              <a:lnRef idx="2">
+                <a:schemeClr val="accent1">
+                  <a:shade val="50000"/>
+                </a:schemeClr>
+              </a:lnRef>
+              <a:fillRef idx="1">
+                <a:schemeClr val="accent1"/>
+              </a:fillRef>
+              <a:effectRef idx="0">
+                <a:schemeClr val="accent1"/>
+              </a:effectRef>
+              <a:fontRef idx="minor">
+                <a:schemeClr val="lt1"/>
+              </a:fontRef>
+            </p:style>
+            <p:txBody>
+              <a:bodyPr rtlCol="0" anchor="ctr"/>
+              <a:lstStyle/>
+              <a:p>
+                <a:pPr algn="ctr"/>
+                <a:endParaRPr lang="en-SG"/>
+              </a:p>
+            </p:txBody>
+          </p:sp>
+        </p:grpSp>
+        <p:sp>
+          <p:nvSpPr>
+            <p:cNvPr id="206" name="Rectangle 205"/>
+            <p:cNvSpPr/>
+            <p:nvPr/>
+          </p:nvSpPr>
+          <p:spPr>
+            <a:xfrm rot="10800000">
+              <a:off x="4180111" y="1375544"/>
+              <a:ext cx="549071" cy="549822"/>
+            </a:xfrm>
+            <a:prstGeom prst="rect">
+              <a:avLst/>
+            </a:prstGeom>
+            <a:noFill/>
+            <a:ln>
+              <a:noFill/>
+            </a:ln>
+          </p:spPr>
+          <p:style>
+            <a:lnRef idx="2">
+              <a:schemeClr val="accent1">
+                <a:shade val="50000"/>
+              </a:schemeClr>
+            </a:lnRef>
+            <a:fillRef idx="1">
+              <a:schemeClr val="accent1"/>
+            </a:fillRef>
+            <a:effectRef idx="0">
+              <a:schemeClr val="accent1"/>
+            </a:effectRef>
+            <a:fontRef idx="minor">
+              <a:schemeClr val="lt1"/>
+            </a:fontRef>
+          </p:style>
+          <p:txBody>
+            <a:bodyPr wrap="none" lIns="0" tIns="0" rIns="0" bIns="0" rtlCol="0" anchor="ctr"/>
+            <a:lstStyle/>
+            <a:p>
+              <a:pPr algn="ctr"/>
+              <a:endParaRPr lang="en-US" b="1"/>
+            </a:p>
+          </p:txBody>
+        </p:sp>
+      </p:grpSp>
+      <p:sp>
+        <p:nvSpPr>
+          <p:cNvPr id="138" name="TextBox 137"/>
+          <p:cNvSpPr txBox="1"/>
+          <p:nvPr/>
+        </p:nvSpPr>
+        <p:spPr>
+          <a:xfrm>
+            <a:off x="7510337" y="1357797"/>
+            <a:ext cx="864726" cy="307777"/>
+          </a:xfrm>
+          <a:prstGeom prst="rect">
+            <a:avLst/>
+          </a:prstGeom>
+          <a:noFill/>
+        </p:spPr>
+        <p:txBody>
+          <a:bodyPr wrap="square" rtlCol="0">
+            <a:spAutoFit/>
+          </a:bodyPr>
+          <a:lstStyle/>
+          <a:p>
+            <a:r>
+              <a:rPr lang="en-US" sz="1400" dirty="0"/>
+              <a:t>Not used</a:t>
+            </a:r>
+            <a:endParaRPr lang="en-SG" sz="1400" dirty="0"/>
+          </a:p>
+        </p:txBody>
+      </p:sp>
+      <p:grpSp>
+        <p:nvGrpSpPr>
+          <p:cNvPr id="64" name="Group 63"/>
+          <p:cNvGrpSpPr/>
+          <p:nvPr/>
+        </p:nvGrpSpPr>
+        <p:grpSpPr>
+          <a:xfrm>
+            <a:off x="3192352" y="1457551"/>
+            <a:ext cx="445953" cy="443902"/>
+            <a:chOff x="2764335" y="1430070"/>
+            <a:chExt cx="445953" cy="443902"/>
+          </a:xfrm>
+        </p:grpSpPr>
+        <p:sp>
+          <p:nvSpPr>
+            <p:cNvPr id="19" name="Rectangle 18"/>
+            <p:cNvSpPr/>
+            <p:nvPr/>
+          </p:nvSpPr>
+          <p:spPr>
+            <a:xfrm>
+              <a:off x="2764335" y="1431283"/>
+              <a:ext cx="212942" cy="212942"/>
+            </a:xfrm>
+            <a:prstGeom prst="rect">
+              <a:avLst/>
+            </a:prstGeom>
+            <a:noFill/>
+            <a:ln>
+              <a:solidFill>
+                <a:srgbClr val="0070C0"/>
+              </a:solidFill>
+            </a:ln>
+          </p:spPr>
+          <p:style>
+            <a:lnRef idx="2">
+              <a:schemeClr val="accent1">
+                <a:shade val="50000"/>
+              </a:schemeClr>
+            </a:lnRef>
+            <a:fillRef idx="1">
+              <a:schemeClr val="accent1"/>
+            </a:fillRef>
+            <a:effectRef idx="0">
+              <a:schemeClr val="accent1"/>
+            </a:effectRef>
+            <a:fontRef idx="minor">
+              <a:schemeClr val="lt1"/>
+            </a:fontRef>
+          </p:style>
+          <p:txBody>
+            <a:bodyPr rtlCol="0" anchor="ctr"/>
+            <a:lstStyle/>
+            <a:p>
+              <a:pPr algn="ctr"/>
+              <a:endParaRPr lang="en-US"/>
+            </a:p>
+          </p:txBody>
+        </p:sp>
+        <p:sp>
+          <p:nvSpPr>
+            <p:cNvPr id="141" name="Rectangle 140"/>
+            <p:cNvSpPr/>
+            <p:nvPr/>
+          </p:nvSpPr>
+          <p:spPr>
+            <a:xfrm>
+              <a:off x="2765404" y="1641480"/>
+              <a:ext cx="212942" cy="212942"/>
+            </a:xfrm>
+            <a:prstGeom prst="rect">
+              <a:avLst/>
+            </a:prstGeom>
+            <a:noFill/>
+            <a:ln>
+              <a:solidFill>
+                <a:srgbClr val="0070C0"/>
+              </a:solidFill>
+            </a:ln>
+          </p:spPr>
+          <p:style>
+            <a:lnRef idx="2">
+              <a:schemeClr val="accent1">
+                <a:shade val="50000"/>
+              </a:schemeClr>
+            </a:lnRef>
+            <a:fillRef idx="1">
+              <a:schemeClr val="accent1"/>
+            </a:fillRef>
+            <a:effectRef idx="0">
+              <a:schemeClr val="accent1"/>
+            </a:effectRef>
+            <a:fontRef idx="minor">
+              <a:schemeClr val="lt1"/>
+            </a:fontRef>
+          </p:style>
+          <p:txBody>
+            <a:bodyPr rtlCol="0" anchor="ctr"/>
+            <a:lstStyle/>
+            <a:p>
+              <a:pPr algn="ctr"/>
+              <a:endParaRPr lang="en-US"/>
+            </a:p>
+          </p:txBody>
+        </p:sp>
+        <p:sp>
+          <p:nvSpPr>
+            <p:cNvPr id="142" name="Rectangle 141"/>
+            <p:cNvSpPr/>
+            <p:nvPr/>
+          </p:nvSpPr>
+          <p:spPr>
+            <a:xfrm>
+              <a:off x="2979312" y="1430070"/>
+              <a:ext cx="212942" cy="212942"/>
+            </a:xfrm>
+            <a:prstGeom prst="rect">
+              <a:avLst/>
+            </a:prstGeom>
+            <a:noFill/>
+            <a:ln>
+              <a:solidFill>
+                <a:srgbClr val="0070C0"/>
+              </a:solidFill>
+            </a:ln>
+          </p:spPr>
+          <p:style>
+            <a:lnRef idx="2">
+              <a:schemeClr val="accent1">
+                <a:shade val="50000"/>
+              </a:schemeClr>
+            </a:lnRef>
+            <a:fillRef idx="1">
+              <a:schemeClr val="accent1"/>
+            </a:fillRef>
+            <a:effectRef idx="0">
+              <a:schemeClr val="accent1"/>
+            </a:effectRef>
+            <a:fontRef idx="minor">
+              <a:schemeClr val="lt1"/>
+            </a:fontRef>
+          </p:style>
+          <p:txBody>
+            <a:bodyPr rtlCol="0" anchor="ctr"/>
+            <a:lstStyle/>
+            <a:p>
+              <a:pPr algn="ctr"/>
+              <a:endParaRPr lang="en-US"/>
+            </a:p>
+          </p:txBody>
+        </p:sp>
+        <p:sp>
+          <p:nvSpPr>
+            <p:cNvPr id="55" name="Cross 54"/>
+            <p:cNvSpPr/>
+            <p:nvPr/>
+          </p:nvSpPr>
+          <p:spPr>
+            <a:xfrm>
+              <a:off x="3019061" y="1682745"/>
+              <a:ext cx="191227" cy="191227"/>
+            </a:xfrm>
+            <a:prstGeom prst="plus">
+              <a:avLst>
+                <a:gd name="adj" fmla="val 33338"/>
+              </a:avLst>
+            </a:prstGeom>
+            <a:solidFill>
+              <a:srgbClr val="0070C0"/>
+            </a:solidFill>
+            <a:ln>
+              <a:noFill/>
+            </a:ln>
+          </p:spPr>
+          <p:style>
+            <a:lnRef idx="2">
+              <a:schemeClr val="accent1">
+                <a:shade val="50000"/>
+              </a:schemeClr>
+            </a:lnRef>
+            <a:fillRef idx="1">
+              <a:schemeClr val="accent1"/>
+            </a:fillRef>
+            <a:effectRef idx="0">
+              <a:schemeClr val="accent1"/>
+            </a:effectRef>
+            <a:fontRef idx="minor">
+              <a:schemeClr val="lt1"/>
+            </a:fontRef>
+          </p:style>
+          <p:txBody>
+            <a:bodyPr rtlCol="0" anchor="ctr"/>
+            <a:lstStyle/>
+            <a:p>
+              <a:pPr algn="ctr"/>
+              <a:endParaRPr lang="en-US"/>
+            </a:p>
+          </p:txBody>
+        </p:sp>
+      </p:grpSp>
     </p:spTree>
     <p:extLst>
       <p:ext uri="{BB962C8B-B14F-4D97-AF65-F5344CB8AC3E}">

</xml_diff>

<commit_message>
Update Hide Shape icon
</commit_message>
<xml_diff>
--- a/doc/Icons.pptx
+++ b/doc/Icons.pptx
@@ -21,19 +21,19 @@
   <p:notesSz cx="6858000" cy="9144000"/>
   <p:embeddedFontLst>
     <p:embeddedFont>
-      <p:font typeface="Rockwell Extra Bold" panose="02060903040505020403" pitchFamily="18" charset="0"/>
-      <p:bold r:id="rId11"/>
-    </p:embeddedFont>
-    <p:embeddedFont>
       <p:font typeface="Gill Sans Ultra Bold" panose="020B0A02020104020203" pitchFamily="34" charset="0"/>
-      <p:regular r:id="rId12"/>
+      <p:regular r:id="rId11"/>
     </p:embeddedFont>
     <p:embeddedFont>
       <p:font typeface="Calibri" panose="020F0502020204030204" pitchFamily="34" charset="0"/>
-      <p:regular r:id="rId13"/>
-      <p:bold r:id="rId14"/>
-      <p:italic r:id="rId15"/>
-      <p:boldItalic r:id="rId16"/>
+      <p:regular r:id="rId12"/>
+      <p:bold r:id="rId13"/>
+      <p:italic r:id="rId14"/>
+      <p:boldItalic r:id="rId15"/>
+    </p:embeddedFont>
+    <p:embeddedFont>
+      <p:font typeface="Rockwell Extra Bold" panose="02060903040505020403" pitchFamily="18" charset="0"/>
+      <p:bold r:id="rId16"/>
     </p:embeddedFont>
   </p:embeddedFontLst>
   <p:defaultTextStyle>
@@ -22368,6 +22368,7 @@
             <a:chOff x="8414913" y="4295205"/>
             <a:chExt cx="400209" cy="381306"/>
           </a:xfrm>
+          <a:noFill/>
         </p:grpSpPr>
         <p:sp>
           <p:nvSpPr>
@@ -22380,17 +22381,15 @@
               <a:off x="8414913" y="4295205"/>
               <a:ext cx="400209" cy="381306"/>
             </a:xfrm>
-            <a:prstGeom prst="rect">
+            <a:prstGeom prst="ellipse">
               <a:avLst/>
             </a:prstGeom>
-            <a:solidFill>
-              <a:schemeClr val="bg1"/>
-            </a:solidFill>
+            <a:grpFill/>
             <a:ln w="76200">
               <a:solidFill>
-                <a:schemeClr val="bg1"/>
+                <a:srgbClr val="0070C0"/>
               </a:solidFill>
-              <a:prstDash val="solid"/>
+              <a:prstDash val="sysDot"/>
             </a:ln>
           </p:spPr>
           <p:style>
@@ -22429,10 +22428,10 @@
               <a:off x="8414913" y="4295205"/>
               <a:ext cx="400209" cy="381306"/>
             </a:xfrm>
-            <a:prstGeom prst="rect">
+            <a:prstGeom prst="ellipse">
               <a:avLst/>
             </a:prstGeom>
-            <a:noFill/>
+            <a:grpFill/>
             <a:ln w="76200">
               <a:solidFill>
                 <a:srgbClr val="0070C0"/>

</xml_diff>

<commit_message>
Add new Effects Lab icons
</commit_message>
<xml_diff>
--- a/doc/Icons.pptx
+++ b/doc/Icons.pptx
@@ -5,20 +5,23 @@
     <p:sldMasterId id="2147483648" r:id="rId1"/>
   </p:sldMasterIdLst>
   <p:notesMasterIdLst>
-    <p:notesMasterId r:id="rId9"/>
+    <p:notesMasterId r:id="rId8"/>
   </p:notesMasterIdLst>
   <p:sldIdLst>
     <p:sldId id="272" r:id="rId2"/>
     <p:sldId id="266" r:id="rId3"/>
     <p:sldId id="267" r:id="rId4"/>
-    <p:sldId id="268" r:id="rId5"/>
-    <p:sldId id="269" r:id="rId6"/>
-    <p:sldId id="270" r:id="rId7"/>
-    <p:sldId id="265" r:id="rId8"/>
+    <p:sldId id="269" r:id="rId5"/>
+    <p:sldId id="270" r:id="rId6"/>
+    <p:sldId id="265" r:id="rId7"/>
   </p:sldIdLst>
   <p:sldSz cx="9144000" cy="6858000" type="screen4x3"/>
   <p:notesSz cx="6858000" cy="9144000"/>
   <p:embeddedFontLst>
+    <p:embeddedFont>
+      <p:font typeface="Rockwell Extra Bold" panose="02060903040505020403" pitchFamily="18" charset="0"/>
+      <p:bold r:id="rId9"/>
+    </p:embeddedFont>
     <p:embeddedFont>
       <p:font typeface="Gill Sans Ultra Bold" panose="020B0A02020104020203" pitchFamily="34" charset="0"/>
       <p:regular r:id="rId10"/>
@@ -29,10 +32,6 @@
       <p:bold r:id="rId12"/>
       <p:italic r:id="rId13"/>
       <p:boldItalic r:id="rId14"/>
-    </p:embeddedFont>
-    <p:embeddedFont>
-      <p:font typeface="Rockwell Extra Bold" panose="02060903040505020403" pitchFamily="18" charset="0"/>
-      <p:bold r:id="rId15"/>
     </p:embeddedFont>
   </p:embeddedFontLst>
   <p:defaultTextStyle>
@@ -235,7 +234,7 @@
           <a:p>
             <a:fld id="{6699ACB9-486C-4D62-A3A7-AF98E13EFDA3}" type="datetimeFigureOut">
               <a:rPr lang="en-US" smtClean="0"/>
-              <a:t>6/15/2017</a:t>
+              <a:t>7/4/2017</a:t>
             </a:fld>
             <a:endParaRPr lang="en-US"/>
           </a:p>
@@ -567,7 +566,7 @@
           <a:p>
             <a:fld id="{8EC77E60-82A0-4F8A-A861-433B3189FA8C}" type="slidenum">
               <a:rPr lang="en-US" smtClean="0"/>
-              <a:t>7</a:t>
+              <a:t>6</a:t>
             </a:fld>
             <a:endParaRPr lang="en-US"/>
           </a:p>
@@ -766,7 +765,7 @@
             <a:fld id="{1D8BD707-D9CF-40AE-B4C6-C98DA3205C09}" type="datetimeFigureOut">
               <a:rPr lang="en-US" smtClean="0"/>
               <a:pPr/>
-              <a:t>6/15/2017</a:t>
+              <a:t>7/4/2017</a:t>
             </a:fld>
             <a:endParaRPr lang="en-US"/>
           </a:p>
@@ -931,7 +930,7 @@
             <a:fld id="{1D8BD707-D9CF-40AE-B4C6-C98DA3205C09}" type="datetimeFigureOut">
               <a:rPr lang="en-US" smtClean="0"/>
               <a:pPr/>
-              <a:t>6/15/2017</a:t>
+              <a:t>7/4/2017</a:t>
             </a:fld>
             <a:endParaRPr lang="en-US"/>
           </a:p>
@@ -1106,7 +1105,7 @@
             <a:fld id="{1D8BD707-D9CF-40AE-B4C6-C98DA3205C09}" type="datetimeFigureOut">
               <a:rPr lang="en-US" smtClean="0"/>
               <a:pPr/>
-              <a:t>6/15/2017</a:t>
+              <a:t>7/4/2017</a:t>
             </a:fld>
             <a:endParaRPr lang="en-US"/>
           </a:p>
@@ -1271,7 +1270,7 @@
             <a:fld id="{1D8BD707-D9CF-40AE-B4C6-C98DA3205C09}" type="datetimeFigureOut">
               <a:rPr lang="en-US" smtClean="0"/>
               <a:pPr/>
-              <a:t>6/15/2017</a:t>
+              <a:t>7/4/2017</a:t>
             </a:fld>
             <a:endParaRPr lang="en-US"/>
           </a:p>
@@ -1513,7 +1512,7 @@
             <a:fld id="{1D8BD707-D9CF-40AE-B4C6-C98DA3205C09}" type="datetimeFigureOut">
               <a:rPr lang="en-US" smtClean="0"/>
               <a:pPr/>
-              <a:t>6/15/2017</a:t>
+              <a:t>7/4/2017</a:t>
             </a:fld>
             <a:endParaRPr lang="en-US"/>
           </a:p>
@@ -1795,7 +1794,7 @@
             <a:fld id="{1D8BD707-D9CF-40AE-B4C6-C98DA3205C09}" type="datetimeFigureOut">
               <a:rPr lang="en-US" smtClean="0"/>
               <a:pPr/>
-              <a:t>6/15/2017</a:t>
+              <a:t>7/4/2017</a:t>
             </a:fld>
             <a:endParaRPr lang="en-US"/>
           </a:p>
@@ -2211,7 +2210,7 @@
             <a:fld id="{1D8BD707-D9CF-40AE-B4C6-C98DA3205C09}" type="datetimeFigureOut">
               <a:rPr lang="en-US" smtClean="0"/>
               <a:pPr/>
-              <a:t>6/15/2017</a:t>
+              <a:t>7/4/2017</a:t>
             </a:fld>
             <a:endParaRPr lang="en-US"/>
           </a:p>
@@ -2325,7 +2324,7 @@
             <a:fld id="{1D8BD707-D9CF-40AE-B4C6-C98DA3205C09}" type="datetimeFigureOut">
               <a:rPr lang="en-US" smtClean="0"/>
               <a:pPr/>
-              <a:t>6/15/2017</a:t>
+              <a:t>7/4/2017</a:t>
             </a:fld>
             <a:endParaRPr lang="en-US"/>
           </a:p>
@@ -2417,7 +2416,7 @@
             <a:fld id="{1D8BD707-D9CF-40AE-B4C6-C98DA3205C09}" type="datetimeFigureOut">
               <a:rPr lang="en-US" smtClean="0"/>
               <a:pPr/>
-              <a:t>6/15/2017</a:t>
+              <a:t>7/4/2017</a:t>
             </a:fld>
             <a:endParaRPr lang="en-US"/>
           </a:p>
@@ -2689,7 +2688,7 @@
             <a:fld id="{1D8BD707-D9CF-40AE-B4C6-C98DA3205C09}" type="datetimeFigureOut">
               <a:rPr lang="en-US" smtClean="0"/>
               <a:pPr/>
-              <a:t>6/15/2017</a:t>
+              <a:t>7/4/2017</a:t>
             </a:fld>
             <a:endParaRPr lang="en-US"/>
           </a:p>
@@ -2938,7 +2937,7 @@
             <a:fld id="{1D8BD707-D9CF-40AE-B4C6-C98DA3205C09}" type="datetimeFigureOut">
               <a:rPr lang="en-US" smtClean="0"/>
               <a:pPr/>
-              <a:t>6/15/2017</a:t>
+              <a:t>7/4/2017</a:t>
             </a:fld>
             <a:endParaRPr lang="en-US"/>
           </a:p>
@@ -3151,7 +3150,7 @@
             <a:fld id="{1D8BD707-D9CF-40AE-B4C6-C98DA3205C09}" type="datetimeFigureOut">
               <a:rPr lang="en-US" smtClean="0"/>
               <a:pPr/>
-              <a:t>6/15/2017</a:t>
+              <a:t>7/4/2017</a:t>
             </a:fld>
             <a:endParaRPr lang="en-US"/>
           </a:p>
@@ -12484,3075 +12483,6 @@
           <a:p>
             <a:r>
               <a:rPr lang="en-US" dirty="0"/>
-              <a:t>Effects Lab</a:t>
-            </a:r>
-            <a:endParaRPr lang="en-SG" dirty="0"/>
-          </a:p>
-        </p:txBody>
-      </p:sp>
-      <p:sp>
-        <p:nvSpPr>
-          <p:cNvPr id="72" name="TextBox 71"/>
-          <p:cNvSpPr txBox="1"/>
-          <p:nvPr/>
-        </p:nvSpPr>
-        <p:spPr>
-          <a:xfrm>
-            <a:off x="970623" y="2069926"/>
-            <a:ext cx="916799" cy="215444"/>
-          </a:xfrm>
-          <a:prstGeom prst="rect">
-            <a:avLst/>
-          </a:prstGeom>
-          <a:noFill/>
-        </p:spPr>
-        <p:txBody>
-          <a:bodyPr wrap="square" rtlCol="0">
-            <a:spAutoFit/>
-          </a:bodyPr>
-          <a:lstStyle/>
-          <a:p>
-            <a:pPr algn="ctr"/>
-            <a:r>
-              <a:rPr lang="en-US" sz="800" dirty="0"/>
-              <a:t>Effects Lab</a:t>
-            </a:r>
-            <a:endParaRPr lang="en-SG" sz="800" dirty="0"/>
-          </a:p>
-        </p:txBody>
-      </p:sp>
-      <p:sp>
-        <p:nvSpPr>
-          <p:cNvPr id="88" name="Rectangle 87"/>
-          <p:cNvSpPr/>
-          <p:nvPr/>
-        </p:nvSpPr>
-        <p:spPr>
-          <a:xfrm>
-            <a:off x="2555150" y="1739324"/>
-            <a:ext cx="838200" cy="838200"/>
-          </a:xfrm>
-          <a:prstGeom prst="rect">
-            <a:avLst/>
-          </a:prstGeom>
-          <a:noFill/>
-          <a:ln>
-            <a:noFill/>
-          </a:ln>
-        </p:spPr>
-        <p:style>
-          <a:lnRef idx="2">
-            <a:schemeClr val="accent1">
-              <a:shade val="50000"/>
-            </a:schemeClr>
-          </a:lnRef>
-          <a:fillRef idx="1">
-            <a:schemeClr val="accent1"/>
-          </a:fillRef>
-          <a:effectRef idx="0">
-            <a:schemeClr val="accent1"/>
-          </a:effectRef>
-          <a:fontRef idx="minor">
-            <a:schemeClr val="lt1"/>
-          </a:fontRef>
-        </p:style>
-        <p:txBody>
-          <a:bodyPr rtlCol="0" anchor="ctr"/>
-          <a:lstStyle/>
-          <a:p>
-            <a:pPr algn="ctr"/>
-            <a:endParaRPr lang="en-SG"/>
-          </a:p>
-        </p:txBody>
-      </p:sp>
-      <p:sp>
-        <p:nvSpPr>
-          <p:cNvPr id="104" name="[TextBox 40]"/>
-          <p:cNvSpPr txBox="1"/>
-          <p:nvPr/>
-        </p:nvSpPr>
-        <p:spPr>
-          <a:xfrm>
-            <a:off x="2177509" y="3620323"/>
-            <a:ext cx="1039803" cy="430887"/>
-          </a:xfrm>
-          <a:prstGeom prst="rect">
-            <a:avLst/>
-          </a:prstGeom>
-          <a:noFill/>
-        </p:spPr>
-        <p:txBody>
-          <a:bodyPr wrap="square" rtlCol="0">
-            <a:spAutoFit/>
-          </a:bodyPr>
-          <a:lstStyle/>
-          <a:p>
-            <a:pPr algn="ctr"/>
-            <a:r>
-              <a:rPr lang="en-US" sz="1100" dirty="0"/>
-              <a:t>Make transparent</a:t>
-            </a:r>
-          </a:p>
-        </p:txBody>
-      </p:sp>
-      <p:grpSp>
-        <p:nvGrpSpPr>
-          <p:cNvPr id="3" name="Group 2"/>
-          <p:cNvGrpSpPr/>
-          <p:nvPr/>
-        </p:nvGrpSpPr>
-        <p:grpSpPr>
-          <a:xfrm>
-            <a:off x="1002575" y="1231726"/>
-            <a:ext cx="838200" cy="838200"/>
-            <a:chOff x="1002575" y="1231726"/>
-            <a:chExt cx="838200" cy="838200"/>
-          </a:xfrm>
-        </p:grpSpPr>
-        <p:grpSp>
-          <p:nvGrpSpPr>
-            <p:cNvPr id="73" name="Group 72"/>
-            <p:cNvGrpSpPr/>
-            <p:nvPr/>
-          </p:nvGrpSpPr>
-          <p:grpSpPr>
-            <a:xfrm>
-              <a:off x="1002575" y="1231726"/>
-              <a:ext cx="838200" cy="838200"/>
-              <a:chOff x="375266" y="5397326"/>
-              <a:chExt cx="838200" cy="838200"/>
-            </a:xfrm>
-          </p:grpSpPr>
-          <p:sp>
-            <p:nvSpPr>
-              <p:cNvPr id="74" name="Rectangle 73"/>
-              <p:cNvSpPr/>
-              <p:nvPr/>
-            </p:nvSpPr>
-            <p:spPr>
-              <a:xfrm>
-                <a:off x="375266" y="5397326"/>
-                <a:ext cx="838200" cy="838200"/>
-              </a:xfrm>
-              <a:prstGeom prst="rect">
-                <a:avLst/>
-              </a:prstGeom>
-              <a:noFill/>
-              <a:ln>
-                <a:noFill/>
-              </a:ln>
-            </p:spPr>
-            <p:style>
-              <a:lnRef idx="2">
-                <a:schemeClr val="accent1">
-                  <a:shade val="50000"/>
-                </a:schemeClr>
-              </a:lnRef>
-              <a:fillRef idx="1">
-                <a:schemeClr val="accent1"/>
-              </a:fillRef>
-              <a:effectRef idx="0">
-                <a:schemeClr val="accent1"/>
-              </a:effectRef>
-              <a:fontRef idx="minor">
-                <a:schemeClr val="lt1"/>
-              </a:fontRef>
-            </p:style>
-            <p:txBody>
-              <a:bodyPr rtlCol="0" anchor="ctr"/>
-              <a:lstStyle/>
-              <a:p>
-                <a:pPr algn="ctr"/>
-                <a:endParaRPr lang="en-SG"/>
-              </a:p>
-            </p:txBody>
-          </p:sp>
-          <p:sp>
-            <p:nvSpPr>
-              <p:cNvPr id="75" name="Rectangle 4"/>
-              <p:cNvSpPr/>
-              <p:nvPr/>
-            </p:nvSpPr>
-            <p:spPr>
-              <a:xfrm rot="16200000">
-                <a:off x="444221" y="5470529"/>
-                <a:ext cx="700291" cy="690781"/>
-              </a:xfrm>
-              <a:custGeom>
-                <a:avLst/>
-                <a:gdLst/>
-                <a:ahLst/>
-                <a:cxnLst/>
-                <a:rect l="l" t="t" r="r" b="b"/>
-                <a:pathLst>
-                  <a:path w="1752603" h="1752600">
-                    <a:moveTo>
-                      <a:pt x="533400" y="0"/>
-                    </a:moveTo>
-                    <a:lnTo>
-                      <a:pt x="533403" y="0"/>
-                    </a:lnTo>
-                    <a:lnTo>
-                      <a:pt x="1066800" y="0"/>
-                    </a:lnTo>
-                    <a:lnTo>
-                      <a:pt x="1752603" y="0"/>
-                    </a:lnTo>
-                    <a:lnTo>
-                      <a:pt x="1752603" y="1752600"/>
-                    </a:lnTo>
-                    <a:lnTo>
-                      <a:pt x="1219203" y="1752600"/>
-                    </a:lnTo>
-                    <a:lnTo>
-                      <a:pt x="533403" y="1752600"/>
-                    </a:lnTo>
-                    <a:lnTo>
-                      <a:pt x="3" y="1752600"/>
-                    </a:lnTo>
-                    <a:lnTo>
-                      <a:pt x="3" y="533430"/>
-                    </a:lnTo>
-                    <a:cubicBezTo>
-                      <a:pt x="0" y="533420"/>
-                      <a:pt x="0" y="533410"/>
-                      <a:pt x="0" y="533400"/>
-                    </a:cubicBezTo>
-                    <a:cubicBezTo>
-                      <a:pt x="0" y="238811"/>
-                      <a:pt x="238811" y="0"/>
-                      <a:pt x="533400" y="0"/>
-                    </a:cubicBezTo>
-                    <a:close/>
-                  </a:path>
-                </a:pathLst>
-              </a:custGeom>
-              <a:noFill/>
-              <a:ln w="76200" cmpd="sng">
-                <a:solidFill>
-                  <a:srgbClr val="0070C0"/>
-                </a:solidFill>
-                <a:miter lim="800000"/>
-              </a:ln>
-            </p:spPr>
-            <p:style>
-              <a:lnRef idx="2">
-                <a:schemeClr val="accent1">
-                  <a:shade val="50000"/>
-                </a:schemeClr>
-              </a:lnRef>
-              <a:fillRef idx="1">
-                <a:schemeClr val="accent1"/>
-              </a:fillRef>
-              <a:effectRef idx="0">
-                <a:schemeClr val="accent1"/>
-              </a:effectRef>
-              <a:fontRef idx="minor">
-                <a:schemeClr val="lt1"/>
-              </a:fontRef>
-            </p:style>
-            <p:txBody>
-              <a:bodyPr rtlCol="0" anchor="ctr"/>
-              <a:lstStyle/>
-              <a:p>
-                <a:pPr algn="ctr"/>
-                <a:endParaRPr lang="en-US"/>
-              </a:p>
-            </p:txBody>
-          </p:sp>
-        </p:grpSp>
-        <p:grpSp>
-          <p:nvGrpSpPr>
-            <p:cNvPr id="6" name="Group 5"/>
-            <p:cNvGrpSpPr/>
-            <p:nvPr/>
-          </p:nvGrpSpPr>
-          <p:grpSpPr>
-            <a:xfrm rot="19309737">
-              <a:off x="1055944" y="1716648"/>
-              <a:ext cx="451729" cy="125057"/>
-              <a:chOff x="4341446" y="3824908"/>
-              <a:chExt cx="580645" cy="91227"/>
-            </a:xfrm>
-          </p:grpSpPr>
-          <p:sp>
-            <p:nvSpPr>
-              <p:cNvPr id="5" name="Rectangle 4"/>
-              <p:cNvSpPr/>
-              <p:nvPr/>
-            </p:nvSpPr>
-            <p:spPr>
-              <a:xfrm>
-                <a:off x="4341446" y="3824908"/>
-                <a:ext cx="387077" cy="91062"/>
-              </a:xfrm>
-              <a:prstGeom prst="rect">
-                <a:avLst/>
-              </a:prstGeom>
-              <a:solidFill>
-                <a:srgbClr val="0070C0"/>
-              </a:solidFill>
-              <a:ln>
-                <a:noFill/>
-              </a:ln>
-            </p:spPr>
-            <p:style>
-              <a:lnRef idx="2">
-                <a:schemeClr val="accent1">
-                  <a:shade val="50000"/>
-                </a:schemeClr>
-              </a:lnRef>
-              <a:fillRef idx="1">
-                <a:schemeClr val="accent1"/>
-              </a:fillRef>
-              <a:effectRef idx="0">
-                <a:schemeClr val="accent1"/>
-              </a:effectRef>
-              <a:fontRef idx="minor">
-                <a:schemeClr val="lt1"/>
-              </a:fontRef>
-            </p:style>
-            <p:txBody>
-              <a:bodyPr rtlCol="0" anchor="ctr"/>
-              <a:lstStyle/>
-              <a:p>
-                <a:pPr algn="ctr"/>
-                <a:endParaRPr lang="en-US"/>
-              </a:p>
-            </p:txBody>
-          </p:sp>
-          <p:sp>
-            <p:nvSpPr>
-              <p:cNvPr id="25" name="Rectangle 24"/>
-              <p:cNvSpPr/>
-              <p:nvPr/>
-            </p:nvSpPr>
-            <p:spPr>
-              <a:xfrm>
-                <a:off x="4771683" y="3825073"/>
-                <a:ext cx="150408" cy="91062"/>
-              </a:xfrm>
-              <a:prstGeom prst="rect">
-                <a:avLst/>
-              </a:prstGeom>
-              <a:solidFill>
-                <a:srgbClr val="0070C0"/>
-              </a:solidFill>
-              <a:ln>
-                <a:noFill/>
-              </a:ln>
-            </p:spPr>
-            <p:style>
-              <a:lnRef idx="2">
-                <a:schemeClr val="accent1">
-                  <a:shade val="50000"/>
-                </a:schemeClr>
-              </a:lnRef>
-              <a:fillRef idx="1">
-                <a:schemeClr val="accent1"/>
-              </a:fillRef>
-              <a:effectRef idx="0">
-                <a:schemeClr val="accent1"/>
-              </a:effectRef>
-              <a:fontRef idx="minor">
-                <a:schemeClr val="lt1"/>
-              </a:fontRef>
-            </p:style>
-            <p:txBody>
-              <a:bodyPr rtlCol="0" anchor="ctr"/>
-              <a:lstStyle/>
-              <a:p>
-                <a:pPr algn="ctr"/>
-                <a:endParaRPr lang="en-US"/>
-              </a:p>
-            </p:txBody>
-          </p:sp>
-        </p:grpSp>
-        <p:sp>
-          <p:nvSpPr>
-            <p:cNvPr id="36" name="5-Point Star 35"/>
-            <p:cNvSpPr/>
-            <p:nvPr/>
-          </p:nvSpPr>
-          <p:spPr>
-            <a:xfrm>
-              <a:off x="1214564" y="1400625"/>
-              <a:ext cx="161813" cy="163340"/>
-            </a:xfrm>
-            <a:prstGeom prst="star5">
-              <a:avLst/>
-            </a:prstGeom>
-            <a:solidFill>
-              <a:srgbClr val="F79646"/>
-            </a:solidFill>
-            <a:ln>
-              <a:noFill/>
-            </a:ln>
-          </p:spPr>
-          <p:style>
-            <a:lnRef idx="2">
-              <a:schemeClr val="accent1">
-                <a:shade val="50000"/>
-              </a:schemeClr>
-            </a:lnRef>
-            <a:fillRef idx="1">
-              <a:schemeClr val="accent1"/>
-            </a:fillRef>
-            <a:effectRef idx="0">
-              <a:schemeClr val="accent1"/>
-            </a:effectRef>
-            <a:fontRef idx="minor">
-              <a:schemeClr val="lt1"/>
-            </a:fontRef>
-          </p:style>
-          <p:txBody>
-            <a:bodyPr rtlCol="0" anchor="ctr"/>
-            <a:lstStyle/>
-            <a:p>
-              <a:pPr algn="ctr"/>
-              <a:endParaRPr lang="en-US"/>
-            </a:p>
-          </p:txBody>
-        </p:sp>
-        <p:sp>
-          <p:nvSpPr>
-            <p:cNvPr id="63" name="5-Point Star 62"/>
-            <p:cNvSpPr/>
-            <p:nvPr/>
-          </p:nvSpPr>
-          <p:spPr>
-            <a:xfrm>
-              <a:off x="1497932" y="1697507"/>
-              <a:ext cx="161813" cy="163340"/>
-            </a:xfrm>
-            <a:prstGeom prst="star5">
-              <a:avLst/>
-            </a:prstGeom>
-            <a:solidFill>
-              <a:srgbClr val="F79646"/>
-            </a:solidFill>
-            <a:ln>
-              <a:noFill/>
-            </a:ln>
-          </p:spPr>
-          <p:style>
-            <a:lnRef idx="2">
-              <a:schemeClr val="accent1">
-                <a:shade val="50000"/>
-              </a:schemeClr>
-            </a:lnRef>
-            <a:fillRef idx="1">
-              <a:schemeClr val="accent1"/>
-            </a:fillRef>
-            <a:effectRef idx="0">
-              <a:schemeClr val="accent1"/>
-            </a:effectRef>
-            <a:fontRef idx="minor">
-              <a:schemeClr val="lt1"/>
-            </a:fontRef>
-          </p:style>
-          <p:txBody>
-            <a:bodyPr rtlCol="0" anchor="ctr"/>
-            <a:lstStyle/>
-            <a:p>
-              <a:pPr algn="ctr"/>
-              <a:endParaRPr lang="en-US"/>
-            </a:p>
-          </p:txBody>
-        </p:sp>
-        <p:sp>
-          <p:nvSpPr>
-            <p:cNvPr id="64" name="5-Point Star 63"/>
-            <p:cNvSpPr/>
-            <p:nvPr/>
-          </p:nvSpPr>
-          <p:spPr>
-            <a:xfrm>
-              <a:off x="1487436" y="1427269"/>
-              <a:ext cx="161813" cy="163340"/>
-            </a:xfrm>
-            <a:prstGeom prst="star5">
-              <a:avLst/>
-            </a:prstGeom>
-            <a:solidFill>
-              <a:srgbClr val="F79646"/>
-            </a:solidFill>
-            <a:ln>
-              <a:noFill/>
-            </a:ln>
-          </p:spPr>
-          <p:style>
-            <a:lnRef idx="2">
-              <a:schemeClr val="accent1">
-                <a:shade val="50000"/>
-              </a:schemeClr>
-            </a:lnRef>
-            <a:fillRef idx="1">
-              <a:schemeClr val="accent1"/>
-            </a:fillRef>
-            <a:effectRef idx="0">
-              <a:schemeClr val="accent1"/>
-            </a:effectRef>
-            <a:fontRef idx="minor">
-              <a:schemeClr val="lt1"/>
-            </a:fontRef>
-          </p:style>
-          <p:txBody>
-            <a:bodyPr rtlCol="0" anchor="ctr"/>
-            <a:lstStyle/>
-            <a:p>
-              <a:pPr algn="ctr"/>
-              <a:endParaRPr lang="en-US"/>
-            </a:p>
-          </p:txBody>
-        </p:sp>
-      </p:grpSp>
-      <p:grpSp>
-        <p:nvGrpSpPr>
-          <p:cNvPr id="13" name="Group 12"/>
-          <p:cNvGrpSpPr/>
-          <p:nvPr/>
-        </p:nvGrpSpPr>
-        <p:grpSpPr>
-          <a:xfrm>
-            <a:off x="2441649" y="2903641"/>
-            <a:ext cx="420624" cy="420624"/>
-            <a:chOff x="2441649" y="2903641"/>
-            <a:chExt cx="420624" cy="420624"/>
-          </a:xfrm>
-        </p:grpSpPr>
-        <p:sp>
-          <p:nvSpPr>
-            <p:cNvPr id="94" name="Rectangle 93"/>
-            <p:cNvSpPr/>
-            <p:nvPr/>
-          </p:nvSpPr>
-          <p:spPr>
-            <a:xfrm>
-              <a:off x="2441649" y="2903641"/>
-              <a:ext cx="420624" cy="420624"/>
-            </a:xfrm>
-            <a:prstGeom prst="rect">
-              <a:avLst/>
-            </a:prstGeom>
-            <a:noFill/>
-            <a:ln>
-              <a:noFill/>
-            </a:ln>
-          </p:spPr>
-          <p:style>
-            <a:lnRef idx="2">
-              <a:schemeClr val="accent1">
-                <a:shade val="50000"/>
-              </a:schemeClr>
-            </a:lnRef>
-            <a:fillRef idx="1">
-              <a:schemeClr val="accent1"/>
-            </a:fillRef>
-            <a:effectRef idx="0">
-              <a:schemeClr val="accent1"/>
-            </a:effectRef>
-            <a:fontRef idx="minor">
-              <a:schemeClr val="lt1"/>
-            </a:fontRef>
-          </p:style>
-          <p:txBody>
-            <a:bodyPr rtlCol="0" anchor="ctr"/>
-            <a:lstStyle/>
-            <a:p>
-              <a:pPr algn="ctr"/>
-              <a:endParaRPr lang="en-US"/>
-            </a:p>
-          </p:txBody>
-        </p:sp>
-        <p:sp>
-          <p:nvSpPr>
-            <p:cNvPr id="103" name="Flowchart: Connector 102"/>
-            <p:cNvSpPr/>
-            <p:nvPr/>
-          </p:nvSpPr>
-          <p:spPr>
-            <a:xfrm>
-              <a:off x="2580713" y="3048048"/>
-              <a:ext cx="247269" cy="245460"/>
-            </a:xfrm>
-            <a:prstGeom prst="flowChartConnector">
-              <a:avLst/>
-            </a:prstGeom>
-            <a:solidFill>
-              <a:schemeClr val="bg1"/>
-            </a:solidFill>
-            <a:ln w="57150">
-              <a:solidFill>
-                <a:srgbClr val="0070C0"/>
-              </a:solidFill>
-            </a:ln>
-            <a:effectLst/>
-          </p:spPr>
-          <p:style>
-            <a:lnRef idx="2">
-              <a:schemeClr val="accent1">
-                <a:shade val="50000"/>
-              </a:schemeClr>
-            </a:lnRef>
-            <a:fillRef idx="1">
-              <a:schemeClr val="accent1"/>
-            </a:fillRef>
-            <a:effectRef idx="0">
-              <a:schemeClr val="accent1"/>
-            </a:effectRef>
-            <a:fontRef idx="minor">
-              <a:schemeClr val="lt1"/>
-            </a:fontRef>
-          </p:style>
-          <p:txBody>
-            <a:bodyPr rtlCol="0" anchor="ctr"/>
-            <a:lstStyle/>
-            <a:p>
-              <a:pPr algn="ctr"/>
-              <a:endParaRPr lang="en-SG"/>
-            </a:p>
-          </p:txBody>
-        </p:sp>
-        <p:sp>
-          <p:nvSpPr>
-            <p:cNvPr id="99" name="Rectangle 98"/>
-            <p:cNvSpPr>
-              <a:spLocks noChangeAspect="1"/>
-            </p:cNvSpPr>
-            <p:nvPr/>
-          </p:nvSpPr>
-          <p:spPr>
-            <a:xfrm flipH="1">
-              <a:off x="2445459" y="2907861"/>
-              <a:ext cx="310670" cy="294714"/>
-            </a:xfrm>
-            <a:prstGeom prst="rect">
-              <a:avLst/>
-            </a:prstGeom>
-            <a:solidFill>
-              <a:srgbClr val="0070C0">
-                <a:alpha val="64000"/>
-              </a:srgbClr>
-            </a:solidFill>
-            <a:ln>
-              <a:noFill/>
-            </a:ln>
-          </p:spPr>
-          <p:style>
-            <a:lnRef idx="2">
-              <a:schemeClr val="accent1">
-                <a:shade val="50000"/>
-              </a:schemeClr>
-            </a:lnRef>
-            <a:fillRef idx="1">
-              <a:schemeClr val="accent1"/>
-            </a:fillRef>
-            <a:effectRef idx="0">
-              <a:schemeClr val="accent1"/>
-            </a:effectRef>
-            <a:fontRef idx="minor">
-              <a:schemeClr val="lt1"/>
-            </a:fontRef>
-          </p:style>
-          <p:txBody>
-            <a:bodyPr rtlCol="0" anchor="ctr"/>
-            <a:lstStyle/>
-            <a:p>
-              <a:pPr algn="ctr"/>
-              <a:endParaRPr lang="en-US"/>
-            </a:p>
-          </p:txBody>
-        </p:sp>
-      </p:grpSp>
-      <p:grpSp>
-        <p:nvGrpSpPr>
-          <p:cNvPr id="8" name="Group 7"/>
-          <p:cNvGrpSpPr/>
-          <p:nvPr/>
-        </p:nvGrpSpPr>
-        <p:grpSpPr>
-          <a:xfrm>
-            <a:off x="3998986" y="2939525"/>
-            <a:ext cx="420624" cy="420624"/>
-            <a:chOff x="3998986" y="2939525"/>
-            <a:chExt cx="420624" cy="420624"/>
-          </a:xfrm>
-        </p:grpSpPr>
-        <p:sp>
-          <p:nvSpPr>
-            <p:cNvPr id="7" name="Rectangle 6"/>
-            <p:cNvSpPr/>
-            <p:nvPr/>
-          </p:nvSpPr>
-          <p:spPr>
-            <a:xfrm>
-              <a:off x="3998986" y="2939525"/>
-              <a:ext cx="420624" cy="420624"/>
-            </a:xfrm>
-            <a:prstGeom prst="rect">
-              <a:avLst/>
-            </a:prstGeom>
-            <a:noFill/>
-            <a:ln>
-              <a:noFill/>
-            </a:ln>
-          </p:spPr>
-          <p:style>
-            <a:lnRef idx="2">
-              <a:schemeClr val="accent1">
-                <a:shade val="50000"/>
-              </a:schemeClr>
-            </a:lnRef>
-            <a:fillRef idx="1">
-              <a:schemeClr val="accent1"/>
-            </a:fillRef>
-            <a:effectRef idx="0">
-              <a:schemeClr val="accent1"/>
-            </a:effectRef>
-            <a:fontRef idx="minor">
-              <a:schemeClr val="lt1"/>
-            </a:fontRef>
-          </p:style>
-          <p:txBody>
-            <a:bodyPr rtlCol="0" anchor="ctr"/>
-            <a:lstStyle/>
-            <a:p>
-              <a:pPr algn="ctr"/>
-              <a:endParaRPr lang="en-US"/>
-            </a:p>
-          </p:txBody>
-        </p:sp>
-        <p:sp>
-          <p:nvSpPr>
-            <p:cNvPr id="33" name="Rounded Rectangle 32"/>
-            <p:cNvSpPr/>
-            <p:nvPr/>
-          </p:nvSpPr>
-          <p:spPr>
-            <a:xfrm rot="18417818">
-              <a:off x="4020366" y="3185982"/>
-              <a:ext cx="260626" cy="87067"/>
-            </a:xfrm>
-            <a:prstGeom prst="roundRect">
-              <a:avLst/>
-            </a:prstGeom>
-            <a:solidFill>
-              <a:srgbClr val="0070C0"/>
-            </a:solidFill>
-            <a:ln>
-              <a:noFill/>
-            </a:ln>
-          </p:spPr>
-          <p:style>
-            <a:lnRef idx="2">
-              <a:schemeClr val="accent1">
-                <a:shade val="50000"/>
-              </a:schemeClr>
-            </a:lnRef>
-            <a:fillRef idx="1">
-              <a:schemeClr val="accent1"/>
-            </a:fillRef>
-            <a:effectRef idx="0">
-              <a:schemeClr val="accent1"/>
-            </a:effectRef>
-            <a:fontRef idx="minor">
-              <a:schemeClr val="lt1"/>
-            </a:fontRef>
-          </p:style>
-          <p:txBody>
-            <a:bodyPr rtlCol="0" anchor="ctr"/>
-            <a:lstStyle/>
-            <a:p>
-              <a:pPr algn="ctr"/>
-              <a:endParaRPr lang="en-US"/>
-            </a:p>
-          </p:txBody>
-        </p:sp>
-        <p:sp>
-          <p:nvSpPr>
-            <p:cNvPr id="30" name="Flowchart: Connector 29"/>
-            <p:cNvSpPr/>
-            <p:nvPr/>
-          </p:nvSpPr>
-          <p:spPr>
-            <a:xfrm>
-              <a:off x="4077940" y="2976524"/>
-              <a:ext cx="292608" cy="290313"/>
-            </a:xfrm>
-            <a:prstGeom prst="flowChartConnector">
-              <a:avLst/>
-            </a:prstGeom>
-            <a:solidFill>
-              <a:schemeClr val="bg1"/>
-            </a:solidFill>
-            <a:ln w="57150">
-              <a:solidFill>
-                <a:srgbClr val="0070C0"/>
-              </a:solidFill>
-            </a:ln>
-            <a:effectLst/>
-          </p:spPr>
-          <p:style>
-            <a:lnRef idx="2">
-              <a:schemeClr val="accent1">
-                <a:shade val="50000"/>
-              </a:schemeClr>
-            </a:lnRef>
-            <a:fillRef idx="1">
-              <a:schemeClr val="accent1"/>
-            </a:fillRef>
-            <a:effectRef idx="0">
-              <a:schemeClr val="accent1"/>
-            </a:effectRef>
-            <a:fontRef idx="minor">
-              <a:schemeClr val="lt1"/>
-            </a:fontRef>
-          </p:style>
-          <p:txBody>
-            <a:bodyPr rtlCol="0" anchor="ctr"/>
-            <a:lstStyle/>
-            <a:p>
-              <a:pPr algn="ctr"/>
-              <a:endParaRPr lang="en-SG"/>
-            </a:p>
-          </p:txBody>
-        </p:sp>
-      </p:grpSp>
-      <p:sp>
-        <p:nvSpPr>
-          <p:cNvPr id="38" name="[TextBox 40]"/>
-          <p:cNvSpPr txBox="1"/>
-          <p:nvPr/>
-        </p:nvSpPr>
-        <p:spPr>
-          <a:xfrm>
-            <a:off x="3704342" y="3620322"/>
-            <a:ext cx="1039803" cy="261610"/>
-          </a:xfrm>
-          <a:prstGeom prst="rect">
-            <a:avLst/>
-          </a:prstGeom>
-          <a:noFill/>
-        </p:spPr>
-        <p:txBody>
-          <a:bodyPr wrap="square" rtlCol="0">
-            <a:spAutoFit/>
-          </a:bodyPr>
-          <a:lstStyle/>
-          <a:p>
-            <a:pPr algn="ctr"/>
-            <a:r>
-              <a:rPr lang="en-US" sz="1100" dirty="0"/>
-              <a:t>Magnify</a:t>
-            </a:r>
-          </a:p>
-        </p:txBody>
-      </p:sp>
-      <p:sp>
-        <p:nvSpPr>
-          <p:cNvPr id="43" name="[TextBox 40]"/>
-          <p:cNvSpPr txBox="1"/>
-          <p:nvPr/>
-        </p:nvSpPr>
-        <p:spPr>
-          <a:xfrm>
-            <a:off x="5067476" y="3679410"/>
-            <a:ext cx="1039803" cy="430887"/>
-          </a:xfrm>
-          <a:prstGeom prst="rect">
-            <a:avLst/>
-          </a:prstGeom>
-          <a:noFill/>
-        </p:spPr>
-        <p:txBody>
-          <a:bodyPr wrap="square" rtlCol="0">
-            <a:spAutoFit/>
-          </a:bodyPr>
-          <a:lstStyle/>
-          <a:p>
-            <a:pPr algn="ctr"/>
-            <a:r>
-              <a:rPr lang="en-US" sz="1100" dirty="0"/>
-              <a:t>recolor remainder</a:t>
-            </a:r>
-          </a:p>
-        </p:txBody>
-      </p:sp>
-      <p:sp>
-        <p:nvSpPr>
-          <p:cNvPr id="55" name="Rectangle 54"/>
-          <p:cNvSpPr/>
-          <p:nvPr/>
-        </p:nvSpPr>
-        <p:spPr>
-          <a:xfrm>
-            <a:off x="6543220" y="3032114"/>
-            <a:ext cx="420624" cy="420624"/>
-          </a:xfrm>
-          <a:prstGeom prst="rect">
-            <a:avLst/>
-          </a:prstGeom>
-          <a:noFill/>
-          <a:ln>
-            <a:noFill/>
-          </a:ln>
-        </p:spPr>
-        <p:style>
-          <a:lnRef idx="2">
-            <a:schemeClr val="accent1">
-              <a:shade val="50000"/>
-            </a:schemeClr>
-          </a:lnRef>
-          <a:fillRef idx="1">
-            <a:schemeClr val="accent1"/>
-          </a:fillRef>
-          <a:effectRef idx="0">
-            <a:schemeClr val="accent1"/>
-          </a:effectRef>
-          <a:fontRef idx="minor">
-            <a:schemeClr val="lt1"/>
-          </a:fontRef>
-        </p:style>
-        <p:txBody>
-          <a:bodyPr rtlCol="0" anchor="ctr"/>
-          <a:lstStyle/>
-          <a:p>
-            <a:pPr algn="ctr"/>
-            <a:endParaRPr lang="en-US"/>
-          </a:p>
-        </p:txBody>
-      </p:sp>
-      <p:sp>
-        <p:nvSpPr>
-          <p:cNvPr id="56" name="[TextBox 40]"/>
-          <p:cNvSpPr txBox="1"/>
-          <p:nvPr/>
-        </p:nvSpPr>
-        <p:spPr>
-          <a:xfrm>
-            <a:off x="6248576" y="3715451"/>
-            <a:ext cx="1039803" cy="261610"/>
-          </a:xfrm>
-          <a:prstGeom prst="rect">
-            <a:avLst/>
-          </a:prstGeom>
-          <a:noFill/>
-        </p:spPr>
-        <p:txBody>
-          <a:bodyPr wrap="square" rtlCol="0">
-            <a:spAutoFit/>
-          </a:bodyPr>
-          <a:lstStyle/>
-          <a:p>
-            <a:pPr algn="ctr"/>
-            <a:r>
-              <a:rPr lang="en-US" sz="1100" dirty="0"/>
-              <a:t>Blur remainder</a:t>
-            </a:r>
-          </a:p>
-        </p:txBody>
-      </p:sp>
-      <p:grpSp>
-        <p:nvGrpSpPr>
-          <p:cNvPr id="11" name="Group 10"/>
-          <p:cNvGrpSpPr/>
-          <p:nvPr/>
-        </p:nvGrpSpPr>
-        <p:grpSpPr>
-          <a:xfrm>
-            <a:off x="5362120" y="2996073"/>
-            <a:ext cx="420624" cy="420624"/>
-            <a:chOff x="5362120" y="2996073"/>
-            <a:chExt cx="420624" cy="420624"/>
-          </a:xfrm>
-        </p:grpSpPr>
-        <p:sp>
-          <p:nvSpPr>
-            <p:cNvPr id="40" name="Rectangle 39"/>
-            <p:cNvSpPr/>
-            <p:nvPr/>
-          </p:nvSpPr>
-          <p:spPr>
-            <a:xfrm>
-              <a:off x="5362120" y="2996073"/>
-              <a:ext cx="420624" cy="420624"/>
-            </a:xfrm>
-            <a:prstGeom prst="rect">
-              <a:avLst/>
-            </a:prstGeom>
-            <a:noFill/>
-            <a:ln>
-              <a:noFill/>
-            </a:ln>
-          </p:spPr>
-          <p:style>
-            <a:lnRef idx="2">
-              <a:schemeClr val="accent1">
-                <a:shade val="50000"/>
-              </a:schemeClr>
-            </a:lnRef>
-            <a:fillRef idx="1">
-              <a:schemeClr val="accent1"/>
-            </a:fillRef>
-            <a:effectRef idx="0">
-              <a:schemeClr val="accent1"/>
-            </a:effectRef>
-            <a:fontRef idx="minor">
-              <a:schemeClr val="lt1"/>
-            </a:fontRef>
-          </p:style>
-          <p:txBody>
-            <a:bodyPr rtlCol="0" anchor="ctr"/>
-            <a:lstStyle/>
-            <a:p>
-              <a:pPr algn="ctr"/>
-              <a:endParaRPr lang="en-US"/>
-            </a:p>
-          </p:txBody>
-        </p:sp>
-        <p:sp>
-          <p:nvSpPr>
-            <p:cNvPr id="9" name="Rectangle 8"/>
-            <p:cNvSpPr/>
-            <p:nvPr/>
-          </p:nvSpPr>
-          <p:spPr>
-            <a:xfrm>
-              <a:off x="5366691" y="2998110"/>
-              <a:ext cx="108342" cy="118491"/>
-            </a:xfrm>
-            <a:prstGeom prst="rect">
-              <a:avLst/>
-            </a:prstGeom>
-            <a:solidFill>
-              <a:schemeClr val="bg1">
-                <a:lumMod val="50000"/>
-              </a:schemeClr>
-            </a:solidFill>
-            <a:ln>
-              <a:noFill/>
-            </a:ln>
-          </p:spPr>
-          <p:style>
-            <a:lnRef idx="2">
-              <a:schemeClr val="accent1">
-                <a:shade val="50000"/>
-              </a:schemeClr>
-            </a:lnRef>
-            <a:fillRef idx="1">
-              <a:schemeClr val="accent1"/>
-            </a:fillRef>
-            <a:effectRef idx="0">
-              <a:schemeClr val="accent1"/>
-            </a:effectRef>
-            <a:fontRef idx="minor">
-              <a:schemeClr val="lt1"/>
-            </a:fontRef>
-          </p:style>
-          <p:txBody>
-            <a:bodyPr rtlCol="0" anchor="ctr"/>
-            <a:lstStyle/>
-            <a:p>
-              <a:pPr algn="ctr"/>
-              <a:endParaRPr lang="en-US"/>
-            </a:p>
-          </p:txBody>
-        </p:sp>
-        <p:sp>
-          <p:nvSpPr>
-            <p:cNvPr id="45" name="Rectangle 44"/>
-            <p:cNvSpPr/>
-            <p:nvPr/>
-          </p:nvSpPr>
-          <p:spPr>
-            <a:xfrm>
-              <a:off x="5568135" y="2998110"/>
-              <a:ext cx="108342" cy="118491"/>
-            </a:xfrm>
-            <a:prstGeom prst="rect">
-              <a:avLst/>
-            </a:prstGeom>
-            <a:solidFill>
-              <a:schemeClr val="bg1">
-                <a:lumMod val="50000"/>
-              </a:schemeClr>
-            </a:solidFill>
-            <a:ln>
-              <a:noFill/>
-            </a:ln>
-          </p:spPr>
-          <p:style>
-            <a:lnRef idx="2">
-              <a:schemeClr val="accent1">
-                <a:shade val="50000"/>
-              </a:schemeClr>
-            </a:lnRef>
-            <a:fillRef idx="1">
-              <a:schemeClr val="accent1"/>
-            </a:fillRef>
-            <a:effectRef idx="0">
-              <a:schemeClr val="accent1"/>
-            </a:effectRef>
-            <a:fontRef idx="minor">
-              <a:schemeClr val="lt1"/>
-            </a:fontRef>
-          </p:style>
-          <p:txBody>
-            <a:bodyPr rtlCol="0" anchor="ctr"/>
-            <a:lstStyle/>
-            <a:p>
-              <a:pPr algn="ctr"/>
-              <a:endParaRPr lang="en-US"/>
-            </a:p>
-          </p:txBody>
-        </p:sp>
-        <p:sp>
-          <p:nvSpPr>
-            <p:cNvPr id="48" name="Rectangle 47"/>
-            <p:cNvSpPr/>
-            <p:nvPr/>
-          </p:nvSpPr>
-          <p:spPr>
-            <a:xfrm>
-              <a:off x="5468366" y="3114469"/>
-              <a:ext cx="108342" cy="118491"/>
-            </a:xfrm>
-            <a:prstGeom prst="rect">
-              <a:avLst/>
-            </a:prstGeom>
-            <a:solidFill>
-              <a:schemeClr val="bg1">
-                <a:lumMod val="50000"/>
-              </a:schemeClr>
-            </a:solidFill>
-            <a:ln>
-              <a:noFill/>
-            </a:ln>
-          </p:spPr>
-          <p:style>
-            <a:lnRef idx="2">
-              <a:schemeClr val="accent1">
-                <a:shade val="50000"/>
-              </a:schemeClr>
-            </a:lnRef>
-            <a:fillRef idx="1">
-              <a:schemeClr val="accent1"/>
-            </a:fillRef>
-            <a:effectRef idx="0">
-              <a:schemeClr val="accent1"/>
-            </a:effectRef>
-            <a:fontRef idx="minor">
-              <a:schemeClr val="lt1"/>
-            </a:fontRef>
-          </p:style>
-          <p:txBody>
-            <a:bodyPr rtlCol="0" anchor="ctr"/>
-            <a:lstStyle/>
-            <a:p>
-              <a:pPr algn="ctr"/>
-              <a:endParaRPr lang="en-US"/>
-            </a:p>
-          </p:txBody>
-        </p:sp>
-        <p:sp>
-          <p:nvSpPr>
-            <p:cNvPr id="50" name="Rectangle 49"/>
-            <p:cNvSpPr/>
-            <p:nvPr/>
-          </p:nvSpPr>
-          <p:spPr>
-            <a:xfrm>
-              <a:off x="5669811" y="3114469"/>
-              <a:ext cx="108342" cy="118491"/>
-            </a:xfrm>
-            <a:prstGeom prst="rect">
-              <a:avLst/>
-            </a:prstGeom>
-            <a:solidFill>
-              <a:schemeClr val="bg1">
-                <a:lumMod val="50000"/>
-              </a:schemeClr>
-            </a:solidFill>
-            <a:ln>
-              <a:noFill/>
-            </a:ln>
-          </p:spPr>
-          <p:style>
-            <a:lnRef idx="2">
-              <a:schemeClr val="accent1">
-                <a:shade val="50000"/>
-              </a:schemeClr>
-            </a:lnRef>
-            <a:fillRef idx="1">
-              <a:schemeClr val="accent1"/>
-            </a:fillRef>
-            <a:effectRef idx="0">
-              <a:schemeClr val="accent1"/>
-            </a:effectRef>
-            <a:fontRef idx="minor">
-              <a:schemeClr val="lt1"/>
-            </a:fontRef>
-          </p:style>
-          <p:txBody>
-            <a:bodyPr rtlCol="0" anchor="ctr"/>
-            <a:lstStyle/>
-            <a:p>
-              <a:pPr algn="ctr"/>
-              <a:endParaRPr lang="en-US"/>
-            </a:p>
-          </p:txBody>
-        </p:sp>
-        <p:sp>
-          <p:nvSpPr>
-            <p:cNvPr id="51" name="Rectangle 50"/>
-            <p:cNvSpPr/>
-            <p:nvPr/>
-          </p:nvSpPr>
-          <p:spPr>
-            <a:xfrm>
-              <a:off x="5366691" y="3229515"/>
-              <a:ext cx="108342" cy="118491"/>
-            </a:xfrm>
-            <a:prstGeom prst="rect">
-              <a:avLst/>
-            </a:prstGeom>
-            <a:solidFill>
-              <a:schemeClr val="bg1">
-                <a:lumMod val="50000"/>
-              </a:schemeClr>
-            </a:solidFill>
-            <a:ln>
-              <a:noFill/>
-            </a:ln>
-          </p:spPr>
-          <p:style>
-            <a:lnRef idx="2">
-              <a:schemeClr val="accent1">
-                <a:shade val="50000"/>
-              </a:schemeClr>
-            </a:lnRef>
-            <a:fillRef idx="1">
-              <a:schemeClr val="accent1"/>
-            </a:fillRef>
-            <a:effectRef idx="0">
-              <a:schemeClr val="accent1"/>
-            </a:effectRef>
-            <a:fontRef idx="minor">
-              <a:schemeClr val="lt1"/>
-            </a:fontRef>
-          </p:style>
-          <p:txBody>
-            <a:bodyPr rtlCol="0" anchor="ctr"/>
-            <a:lstStyle/>
-            <a:p>
-              <a:pPr algn="ctr"/>
-              <a:endParaRPr lang="en-US"/>
-            </a:p>
-          </p:txBody>
-        </p:sp>
-        <p:sp>
-          <p:nvSpPr>
-            <p:cNvPr id="52" name="Rectangle 51"/>
-            <p:cNvSpPr/>
-            <p:nvPr/>
-          </p:nvSpPr>
-          <p:spPr>
-            <a:xfrm>
-              <a:off x="5568135" y="3229515"/>
-              <a:ext cx="108342" cy="118491"/>
-            </a:xfrm>
-            <a:prstGeom prst="rect">
-              <a:avLst/>
-            </a:prstGeom>
-            <a:solidFill>
-              <a:schemeClr val="bg1">
-                <a:lumMod val="50000"/>
-              </a:schemeClr>
-            </a:solidFill>
-            <a:ln>
-              <a:noFill/>
-            </a:ln>
-          </p:spPr>
-          <p:style>
-            <a:lnRef idx="2">
-              <a:schemeClr val="accent1">
-                <a:shade val="50000"/>
-              </a:schemeClr>
-            </a:lnRef>
-            <a:fillRef idx="1">
-              <a:schemeClr val="accent1"/>
-            </a:fillRef>
-            <a:effectRef idx="0">
-              <a:schemeClr val="accent1"/>
-            </a:effectRef>
-            <a:fontRef idx="minor">
-              <a:schemeClr val="lt1"/>
-            </a:fontRef>
-          </p:style>
-          <p:txBody>
-            <a:bodyPr rtlCol="0" anchor="ctr"/>
-            <a:lstStyle/>
-            <a:p>
-              <a:pPr algn="ctr"/>
-              <a:endParaRPr lang="en-US"/>
-            </a:p>
-          </p:txBody>
-        </p:sp>
-        <p:sp>
-          <p:nvSpPr>
-            <p:cNvPr id="53" name="Rectangle 52"/>
-            <p:cNvSpPr/>
-            <p:nvPr/>
-          </p:nvSpPr>
-          <p:spPr>
-            <a:xfrm>
-              <a:off x="5468366" y="3345874"/>
-              <a:ext cx="108342" cy="70823"/>
-            </a:xfrm>
-            <a:prstGeom prst="rect">
-              <a:avLst/>
-            </a:prstGeom>
-            <a:solidFill>
-              <a:schemeClr val="bg1">
-                <a:lumMod val="50000"/>
-              </a:schemeClr>
-            </a:solidFill>
-            <a:ln>
-              <a:noFill/>
-            </a:ln>
-          </p:spPr>
-          <p:style>
-            <a:lnRef idx="2">
-              <a:schemeClr val="accent1">
-                <a:shade val="50000"/>
-              </a:schemeClr>
-            </a:lnRef>
-            <a:fillRef idx="1">
-              <a:schemeClr val="accent1"/>
-            </a:fillRef>
-            <a:effectRef idx="0">
-              <a:schemeClr val="accent1"/>
-            </a:effectRef>
-            <a:fontRef idx="minor">
-              <a:schemeClr val="lt1"/>
-            </a:fontRef>
-          </p:style>
-          <p:txBody>
-            <a:bodyPr rtlCol="0" anchor="ctr"/>
-            <a:lstStyle/>
-            <a:p>
-              <a:pPr algn="ctr"/>
-              <a:endParaRPr lang="en-US"/>
-            </a:p>
-          </p:txBody>
-        </p:sp>
-        <p:sp>
-          <p:nvSpPr>
-            <p:cNvPr id="54" name="Rectangle 53"/>
-            <p:cNvSpPr/>
-            <p:nvPr/>
-          </p:nvSpPr>
-          <p:spPr>
-            <a:xfrm>
-              <a:off x="5669811" y="3345874"/>
-              <a:ext cx="108342" cy="70823"/>
-            </a:xfrm>
-            <a:prstGeom prst="rect">
-              <a:avLst/>
-            </a:prstGeom>
-            <a:solidFill>
-              <a:schemeClr val="bg1">
-                <a:lumMod val="50000"/>
-              </a:schemeClr>
-            </a:solidFill>
-            <a:ln>
-              <a:noFill/>
-            </a:ln>
-          </p:spPr>
-          <p:style>
-            <a:lnRef idx="2">
-              <a:schemeClr val="accent1">
-                <a:shade val="50000"/>
-              </a:schemeClr>
-            </a:lnRef>
-            <a:fillRef idx="1">
-              <a:schemeClr val="accent1"/>
-            </a:fillRef>
-            <a:effectRef idx="0">
-              <a:schemeClr val="accent1"/>
-            </a:effectRef>
-            <a:fontRef idx="minor">
-              <a:schemeClr val="lt1"/>
-            </a:fontRef>
-          </p:style>
-          <p:txBody>
-            <a:bodyPr rtlCol="0" anchor="ctr"/>
-            <a:lstStyle/>
-            <a:p>
-              <a:pPr algn="ctr"/>
-              <a:endParaRPr lang="en-US"/>
-            </a:p>
-          </p:txBody>
-        </p:sp>
-        <p:sp>
-          <p:nvSpPr>
-            <p:cNvPr id="10" name="Isosceles Triangle 9"/>
-            <p:cNvSpPr/>
-            <p:nvPr/>
-          </p:nvSpPr>
-          <p:spPr>
-            <a:xfrm>
-              <a:off x="5425148" y="3057355"/>
-              <a:ext cx="303120" cy="236323"/>
-            </a:xfrm>
-            <a:prstGeom prst="triangle">
-              <a:avLst/>
-            </a:prstGeom>
-            <a:solidFill>
-              <a:srgbClr val="0070C0"/>
-            </a:solidFill>
-            <a:ln w="9525">
-              <a:solidFill>
-                <a:schemeClr val="bg1"/>
-              </a:solidFill>
-            </a:ln>
-          </p:spPr>
-          <p:style>
-            <a:lnRef idx="2">
-              <a:schemeClr val="accent1">
-                <a:shade val="50000"/>
-              </a:schemeClr>
-            </a:lnRef>
-            <a:fillRef idx="1">
-              <a:schemeClr val="accent1"/>
-            </a:fillRef>
-            <a:effectRef idx="0">
-              <a:schemeClr val="accent1"/>
-            </a:effectRef>
-            <a:fontRef idx="minor">
-              <a:schemeClr val="lt1"/>
-            </a:fontRef>
-          </p:style>
-          <p:txBody>
-            <a:bodyPr rtlCol="0" anchor="ctr"/>
-            <a:lstStyle/>
-            <a:p>
-              <a:pPr algn="ctr"/>
-              <a:endParaRPr lang="en-US"/>
-            </a:p>
-          </p:txBody>
-        </p:sp>
-      </p:grpSp>
-      <p:pic>
-        <p:nvPicPr>
-          <p:cNvPr id="1026" name="Picture 2"/>
-          <p:cNvPicPr>
-            <a:picLocks noChangeAspect="1" noChangeArrowheads="1"/>
-          </p:cNvPicPr>
-          <p:nvPr/>
-        </p:nvPicPr>
-        <p:blipFill>
-          <a:blip r:embed="rId2">
-            <a:extLst>
-              <a:ext uri="{BEBA8EAE-BF5A-486C-A8C5-ECC9F3942E4B}">
-                <a14:imgProps xmlns:a14="http://schemas.microsoft.com/office/drawing/2010/main">
-                  <a14:imgLayer r:embed="rId3">
-                    <a14:imgEffect>
-                      <a14:artisticBlur/>
-                    </a14:imgEffect>
-                  </a14:imgLayer>
-                </a14:imgProps>
-              </a:ext>
-              <a:ext uri="{28A0092B-C50C-407E-A947-70E740481C1C}">
-                <a14:useLocalDpi xmlns:a14="http://schemas.microsoft.com/office/drawing/2010/main" val="0"/>
-              </a:ext>
-            </a:extLst>
-          </a:blip>
-          <a:srcRect/>
-          <a:stretch>
-            <a:fillRect/>
-          </a:stretch>
-        </p:blipFill>
-        <p:spPr bwMode="auto">
-          <a:xfrm>
-            <a:off x="6546354" y="3036276"/>
-            <a:ext cx="414337" cy="414337"/>
-          </a:xfrm>
-          <a:prstGeom prst="rect">
-            <a:avLst/>
-          </a:prstGeom>
-          <a:noFill/>
-          <a:ln>
-            <a:noFill/>
-          </a:ln>
-          <a:effectLst/>
-          <a:extLst>
-            <a:ext uri="{909E8E84-426E-40DD-AFC4-6F175D3DCCD1}">
-              <a14:hiddenFill xmlns:a14="http://schemas.microsoft.com/office/drawing/2010/main">
-                <a:solidFill>
-                  <a:schemeClr val="accent1"/>
-                </a:solidFill>
-              </a14:hiddenFill>
-            </a:ext>
-            <a:ext uri="{91240B29-F687-4F45-9708-019B960494DF}">
-              <a14:hiddenLine xmlns:a14="http://schemas.microsoft.com/office/drawing/2010/main" w="9525">
-                <a:solidFill>
-                  <a:schemeClr val="tx1"/>
-                </a:solidFill>
-                <a:miter lim="800000"/>
-                <a:headEnd/>
-                <a:tailEnd/>
-              </a14:hiddenLine>
-            </a:ext>
-            <a:ext uri="{AF507438-7753-43E0-B8FC-AC1667EBCBE1}">
-              <a14:hiddenEffects xmlns:a14="http://schemas.microsoft.com/office/drawing/2010/main">
-                <a:effectLst>
-                  <a:outerShdw dist="35921" dir="2700000" algn="ctr" rotWithShape="0">
-                    <a:schemeClr val="bg2"/>
-                  </a:outerShdw>
-                </a:effectLst>
-              </a14:hiddenEffects>
-            </a:ext>
-          </a:extLst>
-        </p:spPr>
-      </p:pic>
-      <p:sp>
-        <p:nvSpPr>
-          <p:cNvPr id="89" name="Isosceles Triangle 88"/>
-          <p:cNvSpPr/>
-          <p:nvPr/>
-        </p:nvSpPr>
-        <p:spPr>
-          <a:xfrm>
-            <a:off x="6616917" y="3109551"/>
-            <a:ext cx="303120" cy="236323"/>
-          </a:xfrm>
-          <a:prstGeom prst="triangle">
-            <a:avLst/>
-          </a:prstGeom>
-          <a:solidFill>
-            <a:schemeClr val="bg1"/>
-          </a:solidFill>
-          <a:ln w="9525">
-            <a:solidFill>
-              <a:srgbClr val="0070C0"/>
-            </a:solidFill>
-          </a:ln>
-        </p:spPr>
-        <p:style>
-          <a:lnRef idx="2">
-            <a:schemeClr val="accent1">
-              <a:shade val="50000"/>
-            </a:schemeClr>
-          </a:lnRef>
-          <a:fillRef idx="1">
-            <a:schemeClr val="accent1"/>
-          </a:fillRef>
-          <a:effectRef idx="0">
-            <a:schemeClr val="accent1"/>
-          </a:effectRef>
-          <a:fontRef idx="minor">
-            <a:schemeClr val="lt1"/>
-          </a:fontRef>
-        </p:style>
-        <p:txBody>
-          <a:bodyPr rtlCol="0" anchor="ctr"/>
-          <a:lstStyle/>
-          <a:p>
-            <a:pPr algn="ctr"/>
-            <a:endParaRPr lang="en-US"/>
-          </a:p>
-        </p:txBody>
-      </p:sp>
-      <p:grpSp>
-        <p:nvGrpSpPr>
-          <p:cNvPr id="4" name="Group 3"/>
-          <p:cNvGrpSpPr/>
-          <p:nvPr/>
-        </p:nvGrpSpPr>
-        <p:grpSpPr>
-          <a:xfrm>
-            <a:off x="7683288" y="3029989"/>
-            <a:ext cx="420624" cy="420624"/>
-            <a:chOff x="5466561" y="4940328"/>
-            <a:chExt cx="420624" cy="420624"/>
-          </a:xfrm>
-        </p:grpSpPr>
-        <p:grpSp>
-          <p:nvGrpSpPr>
-            <p:cNvPr id="41" name="Group 40"/>
-            <p:cNvGrpSpPr/>
-            <p:nvPr/>
-          </p:nvGrpSpPr>
-          <p:grpSpPr>
-            <a:xfrm>
-              <a:off x="5466561" y="4940328"/>
-              <a:ext cx="420624" cy="420624"/>
-              <a:chOff x="5362120" y="2996073"/>
-              <a:chExt cx="420624" cy="420624"/>
-            </a:xfrm>
-          </p:grpSpPr>
-          <p:sp>
-            <p:nvSpPr>
-              <p:cNvPr id="42" name="Rectangle 41"/>
-              <p:cNvSpPr/>
-              <p:nvPr/>
-            </p:nvSpPr>
-            <p:spPr>
-              <a:xfrm>
-                <a:off x="5362120" y="2996073"/>
-                <a:ext cx="420624" cy="420624"/>
-              </a:xfrm>
-              <a:prstGeom prst="rect">
-                <a:avLst/>
-              </a:prstGeom>
-              <a:noFill/>
-              <a:ln>
-                <a:noFill/>
-              </a:ln>
-            </p:spPr>
-            <p:style>
-              <a:lnRef idx="2">
-                <a:schemeClr val="accent1">
-                  <a:shade val="50000"/>
-                </a:schemeClr>
-              </a:lnRef>
-              <a:fillRef idx="1">
-                <a:schemeClr val="accent1"/>
-              </a:fillRef>
-              <a:effectRef idx="0">
-                <a:schemeClr val="accent1"/>
-              </a:effectRef>
-              <a:fontRef idx="minor">
-                <a:schemeClr val="lt1"/>
-              </a:fontRef>
-            </p:style>
-            <p:txBody>
-              <a:bodyPr rtlCol="0" anchor="ctr"/>
-              <a:lstStyle/>
-              <a:p>
-                <a:pPr algn="ctr"/>
-                <a:endParaRPr lang="en-US"/>
-              </a:p>
-            </p:txBody>
-          </p:sp>
-          <p:sp>
-            <p:nvSpPr>
-              <p:cNvPr id="44" name="Rectangle 43"/>
-              <p:cNvSpPr/>
-              <p:nvPr/>
-            </p:nvSpPr>
-            <p:spPr>
-              <a:xfrm>
-                <a:off x="5366691" y="2998110"/>
-                <a:ext cx="108342" cy="118491"/>
-              </a:xfrm>
-              <a:prstGeom prst="rect">
-                <a:avLst/>
-              </a:prstGeom>
-              <a:solidFill>
-                <a:schemeClr val="bg1">
-                  <a:lumMod val="50000"/>
-                </a:schemeClr>
-              </a:solidFill>
-              <a:ln>
-                <a:noFill/>
-              </a:ln>
-            </p:spPr>
-            <p:style>
-              <a:lnRef idx="2">
-                <a:schemeClr val="accent1">
-                  <a:shade val="50000"/>
-                </a:schemeClr>
-              </a:lnRef>
-              <a:fillRef idx="1">
-                <a:schemeClr val="accent1"/>
-              </a:fillRef>
-              <a:effectRef idx="0">
-                <a:schemeClr val="accent1"/>
-              </a:effectRef>
-              <a:fontRef idx="minor">
-                <a:schemeClr val="lt1"/>
-              </a:fontRef>
-            </p:style>
-            <p:txBody>
-              <a:bodyPr rtlCol="0" anchor="ctr"/>
-              <a:lstStyle/>
-              <a:p>
-                <a:pPr algn="ctr"/>
-                <a:endParaRPr lang="en-US"/>
-              </a:p>
-            </p:txBody>
-          </p:sp>
-          <p:sp>
-            <p:nvSpPr>
-              <p:cNvPr id="46" name="Rectangle 45"/>
-              <p:cNvSpPr/>
-              <p:nvPr/>
-            </p:nvSpPr>
-            <p:spPr>
-              <a:xfrm>
-                <a:off x="5568135" y="2998110"/>
-                <a:ext cx="108342" cy="118491"/>
-              </a:xfrm>
-              <a:prstGeom prst="rect">
-                <a:avLst/>
-              </a:prstGeom>
-              <a:solidFill>
-                <a:schemeClr val="bg1">
-                  <a:lumMod val="50000"/>
-                </a:schemeClr>
-              </a:solidFill>
-              <a:ln>
-                <a:noFill/>
-              </a:ln>
-            </p:spPr>
-            <p:style>
-              <a:lnRef idx="2">
-                <a:schemeClr val="accent1">
-                  <a:shade val="50000"/>
-                </a:schemeClr>
-              </a:lnRef>
-              <a:fillRef idx="1">
-                <a:schemeClr val="accent1"/>
-              </a:fillRef>
-              <a:effectRef idx="0">
-                <a:schemeClr val="accent1"/>
-              </a:effectRef>
-              <a:fontRef idx="minor">
-                <a:schemeClr val="lt1"/>
-              </a:fontRef>
-            </p:style>
-            <p:txBody>
-              <a:bodyPr rtlCol="0" anchor="ctr"/>
-              <a:lstStyle/>
-              <a:p>
-                <a:pPr algn="ctr"/>
-                <a:endParaRPr lang="en-US"/>
-              </a:p>
-            </p:txBody>
-          </p:sp>
-          <p:sp>
-            <p:nvSpPr>
-              <p:cNvPr id="47" name="Rectangle 46"/>
-              <p:cNvSpPr/>
-              <p:nvPr/>
-            </p:nvSpPr>
-            <p:spPr>
-              <a:xfrm>
-                <a:off x="5468366" y="3114469"/>
-                <a:ext cx="108342" cy="118491"/>
-              </a:xfrm>
-              <a:prstGeom prst="rect">
-                <a:avLst/>
-              </a:prstGeom>
-              <a:solidFill>
-                <a:schemeClr val="bg1">
-                  <a:lumMod val="50000"/>
-                </a:schemeClr>
-              </a:solidFill>
-              <a:ln>
-                <a:noFill/>
-              </a:ln>
-            </p:spPr>
-            <p:style>
-              <a:lnRef idx="2">
-                <a:schemeClr val="accent1">
-                  <a:shade val="50000"/>
-                </a:schemeClr>
-              </a:lnRef>
-              <a:fillRef idx="1">
-                <a:schemeClr val="accent1"/>
-              </a:fillRef>
-              <a:effectRef idx="0">
-                <a:schemeClr val="accent1"/>
-              </a:effectRef>
-              <a:fontRef idx="minor">
-                <a:schemeClr val="lt1"/>
-              </a:fontRef>
-            </p:style>
-            <p:txBody>
-              <a:bodyPr rtlCol="0" anchor="ctr"/>
-              <a:lstStyle/>
-              <a:p>
-                <a:pPr algn="ctr"/>
-                <a:endParaRPr lang="en-US"/>
-              </a:p>
-            </p:txBody>
-          </p:sp>
-          <p:sp>
-            <p:nvSpPr>
-              <p:cNvPr id="49" name="Rectangle 48"/>
-              <p:cNvSpPr/>
-              <p:nvPr/>
-            </p:nvSpPr>
-            <p:spPr>
-              <a:xfrm>
-                <a:off x="5669811" y="3114469"/>
-                <a:ext cx="108342" cy="118491"/>
-              </a:xfrm>
-              <a:prstGeom prst="rect">
-                <a:avLst/>
-              </a:prstGeom>
-              <a:solidFill>
-                <a:schemeClr val="bg1">
-                  <a:lumMod val="50000"/>
-                </a:schemeClr>
-              </a:solidFill>
-              <a:ln>
-                <a:noFill/>
-              </a:ln>
-            </p:spPr>
-            <p:style>
-              <a:lnRef idx="2">
-                <a:schemeClr val="accent1">
-                  <a:shade val="50000"/>
-                </a:schemeClr>
-              </a:lnRef>
-              <a:fillRef idx="1">
-                <a:schemeClr val="accent1"/>
-              </a:fillRef>
-              <a:effectRef idx="0">
-                <a:schemeClr val="accent1"/>
-              </a:effectRef>
-              <a:fontRef idx="minor">
-                <a:schemeClr val="lt1"/>
-              </a:fontRef>
-            </p:style>
-            <p:txBody>
-              <a:bodyPr rtlCol="0" anchor="ctr"/>
-              <a:lstStyle/>
-              <a:p>
-                <a:pPr algn="ctr"/>
-                <a:endParaRPr lang="en-US"/>
-              </a:p>
-            </p:txBody>
-          </p:sp>
-          <p:sp>
-            <p:nvSpPr>
-              <p:cNvPr id="57" name="Rectangle 56"/>
-              <p:cNvSpPr/>
-              <p:nvPr/>
-            </p:nvSpPr>
-            <p:spPr>
-              <a:xfrm>
-                <a:off x="5366691" y="3229515"/>
-                <a:ext cx="108342" cy="118491"/>
-              </a:xfrm>
-              <a:prstGeom prst="rect">
-                <a:avLst/>
-              </a:prstGeom>
-              <a:solidFill>
-                <a:schemeClr val="bg1">
-                  <a:lumMod val="50000"/>
-                </a:schemeClr>
-              </a:solidFill>
-              <a:ln>
-                <a:noFill/>
-              </a:ln>
-            </p:spPr>
-            <p:style>
-              <a:lnRef idx="2">
-                <a:schemeClr val="accent1">
-                  <a:shade val="50000"/>
-                </a:schemeClr>
-              </a:lnRef>
-              <a:fillRef idx="1">
-                <a:schemeClr val="accent1"/>
-              </a:fillRef>
-              <a:effectRef idx="0">
-                <a:schemeClr val="accent1"/>
-              </a:effectRef>
-              <a:fontRef idx="minor">
-                <a:schemeClr val="lt1"/>
-              </a:fontRef>
-            </p:style>
-            <p:txBody>
-              <a:bodyPr rtlCol="0" anchor="ctr"/>
-              <a:lstStyle/>
-              <a:p>
-                <a:pPr algn="ctr"/>
-                <a:endParaRPr lang="en-US"/>
-              </a:p>
-            </p:txBody>
-          </p:sp>
-          <p:sp>
-            <p:nvSpPr>
-              <p:cNvPr id="58" name="Rectangle 57"/>
-              <p:cNvSpPr/>
-              <p:nvPr/>
-            </p:nvSpPr>
-            <p:spPr>
-              <a:xfrm>
-                <a:off x="5568135" y="3229515"/>
-                <a:ext cx="108342" cy="118491"/>
-              </a:xfrm>
-              <a:prstGeom prst="rect">
-                <a:avLst/>
-              </a:prstGeom>
-              <a:solidFill>
-                <a:schemeClr val="bg1">
-                  <a:lumMod val="50000"/>
-                </a:schemeClr>
-              </a:solidFill>
-              <a:ln>
-                <a:noFill/>
-              </a:ln>
-            </p:spPr>
-            <p:style>
-              <a:lnRef idx="2">
-                <a:schemeClr val="accent1">
-                  <a:shade val="50000"/>
-                </a:schemeClr>
-              </a:lnRef>
-              <a:fillRef idx="1">
-                <a:schemeClr val="accent1"/>
-              </a:fillRef>
-              <a:effectRef idx="0">
-                <a:schemeClr val="accent1"/>
-              </a:effectRef>
-              <a:fontRef idx="minor">
-                <a:schemeClr val="lt1"/>
-              </a:fontRef>
-            </p:style>
-            <p:txBody>
-              <a:bodyPr rtlCol="0" anchor="ctr"/>
-              <a:lstStyle/>
-              <a:p>
-                <a:pPr algn="ctr"/>
-                <a:endParaRPr lang="en-US"/>
-              </a:p>
-            </p:txBody>
-          </p:sp>
-          <p:sp>
-            <p:nvSpPr>
-              <p:cNvPr id="59" name="Rectangle 58"/>
-              <p:cNvSpPr/>
-              <p:nvPr/>
-            </p:nvSpPr>
-            <p:spPr>
-              <a:xfrm>
-                <a:off x="5468366" y="3345874"/>
-                <a:ext cx="108342" cy="70823"/>
-              </a:xfrm>
-              <a:prstGeom prst="rect">
-                <a:avLst/>
-              </a:prstGeom>
-              <a:solidFill>
-                <a:schemeClr val="bg1">
-                  <a:lumMod val="50000"/>
-                </a:schemeClr>
-              </a:solidFill>
-              <a:ln>
-                <a:noFill/>
-              </a:ln>
-            </p:spPr>
-            <p:style>
-              <a:lnRef idx="2">
-                <a:schemeClr val="accent1">
-                  <a:shade val="50000"/>
-                </a:schemeClr>
-              </a:lnRef>
-              <a:fillRef idx="1">
-                <a:schemeClr val="accent1"/>
-              </a:fillRef>
-              <a:effectRef idx="0">
-                <a:schemeClr val="accent1"/>
-              </a:effectRef>
-              <a:fontRef idx="minor">
-                <a:schemeClr val="lt1"/>
-              </a:fontRef>
-            </p:style>
-            <p:txBody>
-              <a:bodyPr rtlCol="0" anchor="ctr"/>
-              <a:lstStyle/>
-              <a:p>
-                <a:pPr algn="ctr"/>
-                <a:endParaRPr lang="en-US"/>
-              </a:p>
-            </p:txBody>
-          </p:sp>
-          <p:sp>
-            <p:nvSpPr>
-              <p:cNvPr id="60" name="Rectangle 59"/>
-              <p:cNvSpPr/>
-              <p:nvPr/>
-            </p:nvSpPr>
-            <p:spPr>
-              <a:xfrm>
-                <a:off x="5669811" y="3345874"/>
-                <a:ext cx="108342" cy="70823"/>
-              </a:xfrm>
-              <a:prstGeom prst="rect">
-                <a:avLst/>
-              </a:prstGeom>
-              <a:solidFill>
-                <a:schemeClr val="bg1">
-                  <a:lumMod val="50000"/>
-                </a:schemeClr>
-              </a:solidFill>
-              <a:ln>
-                <a:noFill/>
-              </a:ln>
-            </p:spPr>
-            <p:style>
-              <a:lnRef idx="2">
-                <a:schemeClr val="accent1">
-                  <a:shade val="50000"/>
-                </a:schemeClr>
-              </a:lnRef>
-              <a:fillRef idx="1">
-                <a:schemeClr val="accent1"/>
-              </a:fillRef>
-              <a:effectRef idx="0">
-                <a:schemeClr val="accent1"/>
-              </a:effectRef>
-              <a:fontRef idx="minor">
-                <a:schemeClr val="lt1"/>
-              </a:fontRef>
-            </p:style>
-            <p:txBody>
-              <a:bodyPr rtlCol="0" anchor="ctr"/>
-              <a:lstStyle/>
-              <a:p>
-                <a:pPr algn="ctr"/>
-                <a:endParaRPr lang="en-US"/>
-              </a:p>
-            </p:txBody>
-          </p:sp>
-        </p:grpSp>
-        <p:sp>
-          <p:nvSpPr>
-            <p:cNvPr id="2" name="Isosceles Triangle 1"/>
-            <p:cNvSpPr>
-              <a:spLocks/>
-            </p:cNvSpPr>
-            <p:nvPr/>
-          </p:nvSpPr>
-          <p:spPr>
-            <a:xfrm>
-              <a:off x="5502644" y="5001611"/>
-              <a:ext cx="361950" cy="249046"/>
-            </a:xfrm>
-            <a:prstGeom prst="triangle">
-              <a:avLst/>
-            </a:prstGeom>
-            <a:solidFill>
-              <a:schemeClr val="bg1"/>
-            </a:solidFill>
-            <a:ln>
-              <a:noFill/>
-            </a:ln>
-          </p:spPr>
-          <p:style>
-            <a:lnRef idx="2">
-              <a:schemeClr val="accent1">
-                <a:shade val="50000"/>
-              </a:schemeClr>
-            </a:lnRef>
-            <a:fillRef idx="1">
-              <a:schemeClr val="accent1"/>
-            </a:fillRef>
-            <a:effectRef idx="0">
-              <a:schemeClr val="accent1"/>
-            </a:effectRef>
-            <a:fontRef idx="minor">
-              <a:schemeClr val="lt1"/>
-            </a:fontRef>
-          </p:style>
-          <p:txBody>
-            <a:bodyPr rtlCol="0" anchor="ctr"/>
-            <a:lstStyle/>
-            <a:p>
-              <a:pPr algn="ctr"/>
-              <a:endParaRPr lang="en-SG"/>
-            </a:p>
-          </p:txBody>
-        </p:sp>
-        <p:pic>
-          <p:nvPicPr>
-            <p:cNvPr id="62" name="Picture 2"/>
-            <p:cNvPicPr>
-              <a:picLocks noChangeArrowheads="1"/>
-            </p:cNvPicPr>
-            <p:nvPr/>
-          </p:nvPicPr>
-          <p:blipFill rotWithShape="1">
-            <a:blip r:embed="rId2">
-              <a:extLst>
-                <a:ext uri="{BEBA8EAE-BF5A-486C-A8C5-ECC9F3942E4B}">
-                  <a14:imgProps xmlns:a14="http://schemas.microsoft.com/office/drawing/2010/main">
-                    <a14:imgLayer r:embed="rId3">
-                      <a14:imgEffect>
-                        <a14:artisticBlur/>
-                      </a14:imgEffect>
-                    </a14:imgLayer>
-                  </a14:imgProps>
-                </a:ext>
-                <a:ext uri="{28A0092B-C50C-407E-A947-70E740481C1C}">
-                  <a14:useLocalDpi xmlns:a14="http://schemas.microsoft.com/office/drawing/2010/main" val="0"/>
-                </a:ext>
-              </a:extLst>
-            </a:blip>
-            <a:srcRect l="8054" t="13611" r="4588" b="26284"/>
-            <a:stretch/>
-          </p:blipFill>
-          <p:spPr bwMode="auto">
-            <a:xfrm>
-              <a:off x="5502644" y="5001611"/>
-              <a:ext cx="361950" cy="249046"/>
-            </a:xfrm>
-            <a:prstGeom prst="triangle">
-              <a:avLst/>
-            </a:prstGeom>
-            <a:noFill/>
-            <a:ln w="9525">
-              <a:solidFill>
-                <a:schemeClr val="bg1"/>
-              </a:solidFill>
-              <a:miter lim="800000"/>
-              <a:headEnd/>
-              <a:tailEnd/>
-            </a:ln>
-            <a:effectLst/>
-            <a:extLst>
-              <a:ext uri="{909E8E84-426E-40DD-AFC4-6F175D3DCCD1}">
-                <a14:hiddenFill xmlns:a14="http://schemas.microsoft.com/office/drawing/2010/main">
-                  <a:solidFill>
-                    <a:schemeClr val="accent1"/>
-                  </a:solidFill>
-                </a14:hiddenFill>
-              </a:ext>
-              <a:ext uri="{AF507438-7753-43E0-B8FC-AC1667EBCBE1}">
-                <a14:hiddenEffects xmlns:a14="http://schemas.microsoft.com/office/drawing/2010/main">
-                  <a:effectLst>
-                    <a:outerShdw dist="35921" dir="2700000" algn="ctr" rotWithShape="0">
-                      <a:schemeClr val="bg2"/>
-                    </a:outerShdw>
-                  </a:effectLst>
-                </a14:hiddenEffects>
-              </a:ext>
-            </a:extLst>
-          </p:spPr>
-        </p:pic>
-      </p:grpSp>
-      <p:sp>
-        <p:nvSpPr>
-          <p:cNvPr id="67" name="[TextBox 40]"/>
-          <p:cNvSpPr txBox="1"/>
-          <p:nvPr/>
-        </p:nvSpPr>
-        <p:spPr>
-          <a:xfrm>
-            <a:off x="7473178" y="3698688"/>
-            <a:ext cx="1039803" cy="261610"/>
-          </a:xfrm>
-          <a:prstGeom prst="rect">
-            <a:avLst/>
-          </a:prstGeom>
-          <a:noFill/>
-        </p:spPr>
-        <p:txBody>
-          <a:bodyPr wrap="square" rtlCol="0">
-            <a:spAutoFit/>
-          </a:bodyPr>
-          <a:lstStyle/>
-          <a:p>
-            <a:pPr algn="ctr"/>
-            <a:r>
-              <a:rPr lang="en-US" sz="1100" dirty="0"/>
-              <a:t>Frosted glass</a:t>
-            </a:r>
-          </a:p>
-        </p:txBody>
-      </p:sp>
-      <p:grpSp>
-        <p:nvGrpSpPr>
-          <p:cNvPr id="61" name="Group 60"/>
-          <p:cNvGrpSpPr/>
-          <p:nvPr/>
-        </p:nvGrpSpPr>
-        <p:grpSpPr>
-          <a:xfrm>
-            <a:off x="1049222" y="2737758"/>
-            <a:ext cx="838200" cy="838200"/>
-            <a:chOff x="2150418" y="2361045"/>
-            <a:chExt cx="838200" cy="838200"/>
-          </a:xfrm>
-        </p:grpSpPr>
-        <p:sp>
-          <p:nvSpPr>
-            <p:cNvPr id="65" name="Rectangle 64"/>
-            <p:cNvSpPr/>
-            <p:nvPr/>
-          </p:nvSpPr>
-          <p:spPr>
-            <a:xfrm>
-              <a:off x="2228551" y="2432718"/>
-              <a:ext cx="587583" cy="541382"/>
-            </a:xfrm>
-            <a:prstGeom prst="rect">
-              <a:avLst/>
-            </a:prstGeom>
-            <a:solidFill>
-              <a:schemeClr val="accent6"/>
-            </a:solidFill>
-            <a:ln>
-              <a:noFill/>
-            </a:ln>
-          </p:spPr>
-          <p:style>
-            <a:lnRef idx="2">
-              <a:schemeClr val="accent1">
-                <a:shade val="50000"/>
-              </a:schemeClr>
-            </a:lnRef>
-            <a:fillRef idx="1">
-              <a:schemeClr val="accent1"/>
-            </a:fillRef>
-            <a:effectRef idx="0">
-              <a:schemeClr val="accent1"/>
-            </a:effectRef>
-            <a:fontRef idx="minor">
-              <a:schemeClr val="lt1"/>
-            </a:fontRef>
-          </p:style>
-          <p:txBody>
-            <a:bodyPr rtlCol="0" anchor="ctr"/>
-            <a:lstStyle/>
-            <a:p>
-              <a:pPr algn="ctr"/>
-              <a:endParaRPr lang="en-US"/>
-            </a:p>
-          </p:txBody>
-        </p:sp>
-        <p:sp>
-          <p:nvSpPr>
-            <p:cNvPr id="66" name="Rectangle 4"/>
-            <p:cNvSpPr/>
-            <p:nvPr/>
-          </p:nvSpPr>
-          <p:spPr>
-            <a:xfrm>
-              <a:off x="2325531" y="2515843"/>
-              <a:ext cx="571012" cy="541382"/>
-            </a:xfrm>
-            <a:custGeom>
-              <a:avLst/>
-              <a:gdLst/>
-              <a:ahLst/>
-              <a:cxnLst/>
-              <a:rect l="l" t="t" r="r" b="b"/>
-              <a:pathLst>
-                <a:path w="716030" h="678875">
-                  <a:moveTo>
-                    <a:pt x="332954" y="123435"/>
-                  </a:moveTo>
-                  <a:cubicBezTo>
-                    <a:pt x="241011" y="123435"/>
-                    <a:pt x="166477" y="199421"/>
-                    <a:pt x="166477" y="293154"/>
-                  </a:cubicBezTo>
-                  <a:cubicBezTo>
-                    <a:pt x="166477" y="386887"/>
-                    <a:pt x="241011" y="462873"/>
-                    <a:pt x="332954" y="462873"/>
-                  </a:cubicBezTo>
-                  <a:cubicBezTo>
-                    <a:pt x="424896" y="462873"/>
-                    <a:pt x="499431" y="386887"/>
-                    <a:pt x="499431" y="293154"/>
-                  </a:cubicBezTo>
-                  <a:cubicBezTo>
-                    <a:pt x="499431" y="199421"/>
-                    <a:pt x="424896" y="123435"/>
-                    <a:pt x="332954" y="123435"/>
-                  </a:cubicBezTo>
-                  <a:close/>
-                  <a:moveTo>
-                    <a:pt x="0" y="0"/>
-                  </a:moveTo>
-                  <a:lnTo>
-                    <a:pt x="716030" y="0"/>
-                  </a:lnTo>
-                  <a:lnTo>
-                    <a:pt x="716030" y="678875"/>
-                  </a:lnTo>
-                  <a:lnTo>
-                    <a:pt x="0" y="678875"/>
-                  </a:lnTo>
-                  <a:close/>
-                </a:path>
-              </a:pathLst>
-            </a:custGeom>
-            <a:solidFill>
-              <a:srgbClr val="0070C0">
-                <a:alpha val="67000"/>
-              </a:srgbClr>
-            </a:solidFill>
-            <a:ln>
-              <a:noFill/>
-            </a:ln>
-          </p:spPr>
-          <p:style>
-            <a:lnRef idx="2">
-              <a:schemeClr val="accent1">
-                <a:shade val="50000"/>
-              </a:schemeClr>
-            </a:lnRef>
-            <a:fillRef idx="1">
-              <a:schemeClr val="accent1"/>
-            </a:fillRef>
-            <a:effectRef idx="0">
-              <a:schemeClr val="accent1"/>
-            </a:effectRef>
-            <a:fontRef idx="minor">
-              <a:schemeClr val="lt1"/>
-            </a:fontRef>
-          </p:style>
-          <p:txBody>
-            <a:bodyPr rtlCol="0" anchor="ctr"/>
-            <a:lstStyle/>
-            <a:p>
-              <a:pPr algn="ctr"/>
-              <a:endParaRPr lang="en-US"/>
-            </a:p>
-          </p:txBody>
-        </p:sp>
-        <p:sp>
-          <p:nvSpPr>
-            <p:cNvPr id="68" name="Rectangle 67"/>
-            <p:cNvSpPr/>
-            <p:nvPr/>
-          </p:nvSpPr>
-          <p:spPr>
-            <a:xfrm>
-              <a:off x="2150418" y="2361045"/>
-              <a:ext cx="838200" cy="838200"/>
-            </a:xfrm>
-            <a:prstGeom prst="rect">
-              <a:avLst/>
-            </a:prstGeom>
-            <a:noFill/>
-            <a:ln>
-              <a:noFill/>
-            </a:ln>
-          </p:spPr>
-          <p:style>
-            <a:lnRef idx="2">
-              <a:schemeClr val="accent1">
-                <a:shade val="50000"/>
-              </a:schemeClr>
-            </a:lnRef>
-            <a:fillRef idx="1">
-              <a:schemeClr val="accent1"/>
-            </a:fillRef>
-            <a:effectRef idx="0">
-              <a:schemeClr val="accent1"/>
-            </a:effectRef>
-            <a:fontRef idx="minor">
-              <a:schemeClr val="lt1"/>
-            </a:fontRef>
-          </p:style>
-          <p:txBody>
-            <a:bodyPr rtlCol="0" anchor="ctr"/>
-            <a:lstStyle/>
-            <a:p>
-              <a:pPr algn="ctr"/>
-              <a:endParaRPr lang="en-SG"/>
-            </a:p>
-          </p:txBody>
-        </p:sp>
-      </p:grpSp>
-      <p:sp>
-        <p:nvSpPr>
-          <p:cNvPr id="69" name="TextBox 68"/>
-          <p:cNvSpPr txBox="1"/>
-          <p:nvPr/>
-        </p:nvSpPr>
-        <p:spPr>
-          <a:xfrm>
-            <a:off x="1165122" y="3711938"/>
-            <a:ext cx="689438" cy="338554"/>
-          </a:xfrm>
-          <a:prstGeom prst="rect">
-            <a:avLst/>
-          </a:prstGeom>
-          <a:noFill/>
-        </p:spPr>
-        <p:txBody>
-          <a:bodyPr wrap="square" rtlCol="0">
-            <a:spAutoFit/>
-          </a:bodyPr>
-          <a:lstStyle/>
-          <a:p>
-            <a:r>
-              <a:rPr lang="en-US" sz="800" dirty="0"/>
-              <a:t>Create spotlight</a:t>
-            </a:r>
-            <a:endParaRPr lang="en-SG" sz="800" dirty="0"/>
-          </a:p>
-        </p:txBody>
-      </p:sp>
-      <p:grpSp>
-        <p:nvGrpSpPr>
-          <p:cNvPr id="70" name="Group 69"/>
-          <p:cNvGrpSpPr/>
-          <p:nvPr/>
-        </p:nvGrpSpPr>
-        <p:grpSpPr>
-          <a:xfrm>
-            <a:off x="1049222" y="4274311"/>
-            <a:ext cx="838200" cy="838200"/>
-            <a:chOff x="2228551" y="4068544"/>
-            <a:chExt cx="838200" cy="838200"/>
-          </a:xfrm>
-        </p:grpSpPr>
-        <p:sp>
-          <p:nvSpPr>
-            <p:cNvPr id="71" name="Rectangle 70"/>
-            <p:cNvSpPr/>
-            <p:nvPr/>
-          </p:nvSpPr>
-          <p:spPr>
-            <a:xfrm>
-              <a:off x="2306684" y="4140217"/>
-              <a:ext cx="587583" cy="541382"/>
-            </a:xfrm>
-            <a:prstGeom prst="rect">
-              <a:avLst/>
-            </a:prstGeom>
-            <a:solidFill>
-              <a:schemeClr val="accent6"/>
-            </a:solidFill>
-            <a:ln>
-              <a:noFill/>
-            </a:ln>
-          </p:spPr>
-          <p:style>
-            <a:lnRef idx="2">
-              <a:schemeClr val="accent1">
-                <a:shade val="50000"/>
-              </a:schemeClr>
-            </a:lnRef>
-            <a:fillRef idx="1">
-              <a:schemeClr val="accent1"/>
-            </a:fillRef>
-            <a:effectRef idx="0">
-              <a:schemeClr val="accent1"/>
-            </a:effectRef>
-            <a:fontRef idx="minor">
-              <a:schemeClr val="lt1"/>
-            </a:fontRef>
-          </p:style>
-          <p:txBody>
-            <a:bodyPr rtlCol="0" anchor="ctr"/>
-            <a:lstStyle/>
-            <a:p>
-              <a:pPr algn="ctr"/>
-              <a:endParaRPr lang="en-US"/>
-            </a:p>
-          </p:txBody>
-        </p:sp>
-        <p:sp>
-          <p:nvSpPr>
-            <p:cNvPr id="76" name="Rectangle 75"/>
-            <p:cNvSpPr/>
-            <p:nvPr/>
-          </p:nvSpPr>
-          <p:spPr>
-            <a:xfrm>
-              <a:off x="2228551" y="4068544"/>
-              <a:ext cx="838200" cy="838200"/>
-            </a:xfrm>
-            <a:prstGeom prst="rect">
-              <a:avLst/>
-            </a:prstGeom>
-            <a:noFill/>
-            <a:ln>
-              <a:noFill/>
-            </a:ln>
-          </p:spPr>
-          <p:style>
-            <a:lnRef idx="2">
-              <a:schemeClr val="accent1">
-                <a:shade val="50000"/>
-              </a:schemeClr>
-            </a:lnRef>
-            <a:fillRef idx="1">
-              <a:schemeClr val="accent1"/>
-            </a:fillRef>
-            <a:effectRef idx="0">
-              <a:schemeClr val="accent1"/>
-            </a:effectRef>
-            <a:fontRef idx="minor">
-              <a:schemeClr val="lt1"/>
-            </a:fontRef>
-          </p:style>
-          <p:txBody>
-            <a:bodyPr rtlCol="0" anchor="ctr"/>
-            <a:lstStyle/>
-            <a:p>
-              <a:pPr algn="ctr"/>
-              <a:endParaRPr lang="en-SG"/>
-            </a:p>
-          </p:txBody>
-        </p:sp>
-        <p:sp>
-          <p:nvSpPr>
-            <p:cNvPr id="77" name="Rectangle 4"/>
-            <p:cNvSpPr/>
-            <p:nvPr/>
-          </p:nvSpPr>
-          <p:spPr>
-            <a:xfrm>
-              <a:off x="2403664" y="4223342"/>
-              <a:ext cx="571012" cy="541382"/>
-            </a:xfrm>
-            <a:custGeom>
-              <a:avLst/>
-              <a:gdLst/>
-              <a:ahLst/>
-              <a:cxnLst/>
-              <a:rect l="l" t="t" r="r" b="b"/>
-              <a:pathLst>
-                <a:path w="571012" h="541382">
-                  <a:moveTo>
-                    <a:pt x="0" y="0"/>
-                  </a:moveTo>
-                  <a:lnTo>
-                    <a:pt x="571012" y="0"/>
-                  </a:lnTo>
-                  <a:lnTo>
-                    <a:pt x="571012" y="541382"/>
-                  </a:lnTo>
-                  <a:lnTo>
-                    <a:pt x="0" y="541382"/>
-                  </a:lnTo>
-                  <a:close/>
-                </a:path>
-              </a:pathLst>
-            </a:custGeom>
-            <a:solidFill>
-              <a:srgbClr val="0070C0">
-                <a:alpha val="67000"/>
-              </a:srgbClr>
-            </a:solidFill>
-            <a:ln>
-              <a:noFill/>
-            </a:ln>
-          </p:spPr>
-          <p:style>
-            <a:lnRef idx="2">
-              <a:schemeClr val="accent1">
-                <a:shade val="50000"/>
-              </a:schemeClr>
-            </a:lnRef>
-            <a:fillRef idx="1">
-              <a:schemeClr val="accent1"/>
-            </a:fillRef>
-            <a:effectRef idx="0">
-              <a:schemeClr val="accent1"/>
-            </a:effectRef>
-            <a:fontRef idx="minor">
-              <a:schemeClr val="lt1"/>
-            </a:fontRef>
-          </p:style>
-          <p:txBody>
-            <a:bodyPr rtlCol="0" anchor="ctr"/>
-            <a:lstStyle/>
-            <a:p>
-              <a:pPr algn="ctr"/>
-              <a:endParaRPr lang="en-US"/>
-            </a:p>
-          </p:txBody>
-        </p:sp>
-        <p:sp>
-          <p:nvSpPr>
-            <p:cNvPr id="78" name="Arc 77"/>
-            <p:cNvSpPr>
-              <a:spLocks noChangeAspect="1"/>
-            </p:cNvSpPr>
-            <p:nvPr/>
-          </p:nvSpPr>
-          <p:spPr>
-            <a:xfrm>
-              <a:off x="2509371" y="4316698"/>
-              <a:ext cx="269264" cy="269264"/>
-            </a:xfrm>
-            <a:prstGeom prst="arc">
-              <a:avLst>
-                <a:gd name="adj1" fmla="val 372342"/>
-                <a:gd name="adj2" fmla="val 14560863"/>
-              </a:avLst>
-            </a:prstGeom>
-            <a:ln w="76200" cap="sq">
-              <a:solidFill>
-                <a:schemeClr val="accent6"/>
-              </a:solidFill>
-              <a:headEnd type="none" w="med" len="med"/>
-              <a:tailEnd type="none" w="med" len="med"/>
-            </a:ln>
-          </p:spPr>
-          <p:style>
-            <a:lnRef idx="1">
-              <a:schemeClr val="accent1"/>
-            </a:lnRef>
-            <a:fillRef idx="0">
-              <a:schemeClr val="accent1"/>
-            </a:fillRef>
-            <a:effectRef idx="0">
-              <a:schemeClr val="accent1"/>
-            </a:effectRef>
-            <a:fontRef idx="minor">
-              <a:schemeClr val="tx1"/>
-            </a:fontRef>
-          </p:style>
-          <p:txBody>
-            <a:bodyPr rtlCol="0" anchor="ctr"/>
-            <a:lstStyle/>
-            <a:p>
-              <a:pPr algn="ctr"/>
-              <a:endParaRPr lang="en-SG"/>
-            </a:p>
-          </p:txBody>
-        </p:sp>
-        <p:sp>
-          <p:nvSpPr>
-            <p:cNvPr id="79" name="Isosceles Triangle 78"/>
-            <p:cNvSpPr/>
-            <p:nvPr/>
-          </p:nvSpPr>
-          <p:spPr>
-            <a:xfrm>
-              <a:off x="2675385" y="4365074"/>
-              <a:ext cx="187446" cy="111564"/>
-            </a:xfrm>
-            <a:prstGeom prst="triangle">
-              <a:avLst/>
-            </a:prstGeom>
-            <a:solidFill>
-              <a:schemeClr val="accent6"/>
-            </a:solidFill>
-            <a:ln>
-              <a:noFill/>
-            </a:ln>
-          </p:spPr>
-          <p:style>
-            <a:lnRef idx="2">
-              <a:schemeClr val="accent1">
-                <a:shade val="50000"/>
-              </a:schemeClr>
-            </a:lnRef>
-            <a:fillRef idx="1">
-              <a:schemeClr val="accent1"/>
-            </a:fillRef>
-            <a:effectRef idx="0">
-              <a:schemeClr val="accent1"/>
-            </a:effectRef>
-            <a:fontRef idx="minor">
-              <a:schemeClr val="lt1"/>
-            </a:fontRef>
-          </p:style>
-          <p:txBody>
-            <a:bodyPr rtlCol="0" anchor="ctr"/>
-            <a:lstStyle/>
-            <a:p>
-              <a:pPr algn="ctr"/>
-              <a:endParaRPr lang="en-SG"/>
-            </a:p>
-          </p:txBody>
-        </p:sp>
-      </p:grpSp>
-      <p:sp>
-        <p:nvSpPr>
-          <p:cNvPr id="80" name="TextBox 79"/>
-          <p:cNvSpPr txBox="1"/>
-          <p:nvPr/>
-        </p:nvSpPr>
-        <p:spPr>
-          <a:xfrm>
-            <a:off x="1151337" y="5112511"/>
-            <a:ext cx="689438" cy="338554"/>
-          </a:xfrm>
-          <a:prstGeom prst="rect">
-            <a:avLst/>
-          </a:prstGeom>
-          <a:noFill/>
-        </p:spPr>
-        <p:txBody>
-          <a:bodyPr wrap="square" rtlCol="0">
-            <a:spAutoFit/>
-          </a:bodyPr>
-          <a:lstStyle/>
-          <a:p>
-            <a:r>
-              <a:rPr lang="en-US" sz="800" dirty="0"/>
-              <a:t>Recreate spotlight</a:t>
-            </a:r>
-            <a:endParaRPr lang="en-SG" sz="800" dirty="0"/>
-          </a:p>
-        </p:txBody>
-      </p:sp>
-      <p:grpSp>
-        <p:nvGrpSpPr>
-          <p:cNvPr id="84" name="Group 83"/>
-          <p:cNvGrpSpPr/>
-          <p:nvPr/>
-        </p:nvGrpSpPr>
-        <p:grpSpPr>
-          <a:xfrm>
-            <a:off x="2408882" y="1289467"/>
-            <a:ext cx="838200" cy="838200"/>
-            <a:chOff x="1002575" y="1231726"/>
-            <a:chExt cx="838200" cy="838200"/>
-          </a:xfrm>
-        </p:grpSpPr>
-        <p:sp>
-          <p:nvSpPr>
-            <p:cNvPr id="95" name="Rectangle 94"/>
-            <p:cNvSpPr/>
-            <p:nvPr/>
-          </p:nvSpPr>
-          <p:spPr>
-            <a:xfrm>
-              <a:off x="1002575" y="1231726"/>
-              <a:ext cx="838200" cy="838200"/>
-            </a:xfrm>
-            <a:prstGeom prst="rect">
-              <a:avLst/>
-            </a:prstGeom>
-            <a:noFill/>
-            <a:ln>
-              <a:noFill/>
-            </a:ln>
-          </p:spPr>
-          <p:style>
-            <a:lnRef idx="2">
-              <a:schemeClr val="accent1">
-                <a:shade val="50000"/>
-              </a:schemeClr>
-            </a:lnRef>
-            <a:fillRef idx="1">
-              <a:schemeClr val="accent1"/>
-            </a:fillRef>
-            <a:effectRef idx="0">
-              <a:schemeClr val="accent1"/>
-            </a:effectRef>
-            <a:fontRef idx="minor">
-              <a:schemeClr val="lt1"/>
-            </a:fontRef>
-          </p:style>
-          <p:txBody>
-            <a:bodyPr rtlCol="0" anchor="ctr"/>
-            <a:lstStyle/>
-            <a:p>
-              <a:pPr algn="ctr"/>
-              <a:endParaRPr lang="en-SG"/>
-            </a:p>
-          </p:txBody>
-        </p:sp>
-        <p:grpSp>
-          <p:nvGrpSpPr>
-            <p:cNvPr id="86" name="Group 85"/>
-            <p:cNvGrpSpPr/>
-            <p:nvPr/>
-          </p:nvGrpSpPr>
-          <p:grpSpPr>
-            <a:xfrm rot="19309737">
-              <a:off x="1055944" y="1716648"/>
-              <a:ext cx="451729" cy="125057"/>
-              <a:chOff x="4341446" y="3824908"/>
-              <a:chExt cx="580645" cy="91227"/>
-            </a:xfrm>
-          </p:grpSpPr>
-          <p:sp>
-            <p:nvSpPr>
-              <p:cNvPr id="92" name="Rectangle 91"/>
-              <p:cNvSpPr/>
-              <p:nvPr/>
-            </p:nvSpPr>
-            <p:spPr>
-              <a:xfrm>
-                <a:off x="4341446" y="3824908"/>
-                <a:ext cx="387077" cy="91062"/>
-              </a:xfrm>
-              <a:prstGeom prst="rect">
-                <a:avLst/>
-              </a:prstGeom>
-              <a:solidFill>
-                <a:srgbClr val="0070C0"/>
-              </a:solidFill>
-              <a:ln>
-                <a:noFill/>
-              </a:ln>
-            </p:spPr>
-            <p:style>
-              <a:lnRef idx="2">
-                <a:schemeClr val="accent1">
-                  <a:shade val="50000"/>
-                </a:schemeClr>
-              </a:lnRef>
-              <a:fillRef idx="1">
-                <a:schemeClr val="accent1"/>
-              </a:fillRef>
-              <a:effectRef idx="0">
-                <a:schemeClr val="accent1"/>
-              </a:effectRef>
-              <a:fontRef idx="minor">
-                <a:schemeClr val="lt1"/>
-              </a:fontRef>
-            </p:style>
-            <p:txBody>
-              <a:bodyPr rtlCol="0" anchor="ctr"/>
-              <a:lstStyle/>
-              <a:p>
-                <a:pPr algn="ctr"/>
-                <a:endParaRPr lang="en-US"/>
-              </a:p>
-            </p:txBody>
-          </p:sp>
-          <p:sp>
-            <p:nvSpPr>
-              <p:cNvPr id="93" name="Rectangle 92"/>
-              <p:cNvSpPr/>
-              <p:nvPr/>
-            </p:nvSpPr>
-            <p:spPr>
-              <a:xfrm>
-                <a:off x="4771683" y="3825073"/>
-                <a:ext cx="150408" cy="91062"/>
-              </a:xfrm>
-              <a:prstGeom prst="rect">
-                <a:avLst/>
-              </a:prstGeom>
-              <a:solidFill>
-                <a:srgbClr val="0070C0"/>
-              </a:solidFill>
-              <a:ln>
-                <a:noFill/>
-              </a:ln>
-            </p:spPr>
-            <p:style>
-              <a:lnRef idx="2">
-                <a:schemeClr val="accent1">
-                  <a:shade val="50000"/>
-                </a:schemeClr>
-              </a:lnRef>
-              <a:fillRef idx="1">
-                <a:schemeClr val="accent1"/>
-              </a:fillRef>
-              <a:effectRef idx="0">
-                <a:schemeClr val="accent1"/>
-              </a:effectRef>
-              <a:fontRef idx="minor">
-                <a:schemeClr val="lt1"/>
-              </a:fontRef>
-            </p:style>
-            <p:txBody>
-              <a:bodyPr rtlCol="0" anchor="ctr"/>
-              <a:lstStyle/>
-              <a:p>
-                <a:pPr algn="ctr"/>
-                <a:endParaRPr lang="en-US"/>
-              </a:p>
-            </p:txBody>
-          </p:sp>
-        </p:grpSp>
-        <p:sp>
-          <p:nvSpPr>
-            <p:cNvPr id="87" name="5-Point Star 35"/>
-            <p:cNvSpPr/>
-            <p:nvPr/>
-          </p:nvSpPr>
-          <p:spPr>
-            <a:xfrm>
-              <a:off x="1214564" y="1400625"/>
-              <a:ext cx="161813" cy="163340"/>
-            </a:xfrm>
-            <a:prstGeom prst="star5">
-              <a:avLst/>
-            </a:prstGeom>
-            <a:solidFill>
-              <a:srgbClr val="F79646"/>
-            </a:solidFill>
-            <a:ln>
-              <a:noFill/>
-            </a:ln>
-          </p:spPr>
-          <p:style>
-            <a:lnRef idx="2">
-              <a:schemeClr val="accent1">
-                <a:shade val="50000"/>
-              </a:schemeClr>
-            </a:lnRef>
-            <a:fillRef idx="1">
-              <a:schemeClr val="accent1"/>
-            </a:fillRef>
-            <a:effectRef idx="0">
-              <a:schemeClr val="accent1"/>
-            </a:effectRef>
-            <a:fontRef idx="minor">
-              <a:schemeClr val="lt1"/>
-            </a:fontRef>
-          </p:style>
-          <p:txBody>
-            <a:bodyPr rtlCol="0" anchor="ctr"/>
-            <a:lstStyle/>
-            <a:p>
-              <a:pPr algn="ctr"/>
-              <a:endParaRPr lang="en-US"/>
-            </a:p>
-          </p:txBody>
-        </p:sp>
-        <p:sp>
-          <p:nvSpPr>
-            <p:cNvPr id="90" name="5-Point Star 62"/>
-            <p:cNvSpPr/>
-            <p:nvPr/>
-          </p:nvSpPr>
-          <p:spPr>
-            <a:xfrm>
-              <a:off x="1497932" y="1697507"/>
-              <a:ext cx="161813" cy="163340"/>
-            </a:xfrm>
-            <a:prstGeom prst="star5">
-              <a:avLst/>
-            </a:prstGeom>
-            <a:solidFill>
-              <a:srgbClr val="F79646"/>
-            </a:solidFill>
-            <a:ln>
-              <a:noFill/>
-            </a:ln>
-          </p:spPr>
-          <p:style>
-            <a:lnRef idx="2">
-              <a:schemeClr val="accent1">
-                <a:shade val="50000"/>
-              </a:schemeClr>
-            </a:lnRef>
-            <a:fillRef idx="1">
-              <a:schemeClr val="accent1"/>
-            </a:fillRef>
-            <a:effectRef idx="0">
-              <a:schemeClr val="accent1"/>
-            </a:effectRef>
-            <a:fontRef idx="minor">
-              <a:schemeClr val="lt1"/>
-            </a:fontRef>
-          </p:style>
-          <p:txBody>
-            <a:bodyPr rtlCol="0" anchor="ctr"/>
-            <a:lstStyle/>
-            <a:p>
-              <a:pPr algn="ctr"/>
-              <a:endParaRPr lang="en-US"/>
-            </a:p>
-          </p:txBody>
-        </p:sp>
-        <p:sp>
-          <p:nvSpPr>
-            <p:cNvPr id="91" name="5-Point Star 63"/>
-            <p:cNvSpPr/>
-            <p:nvPr/>
-          </p:nvSpPr>
-          <p:spPr>
-            <a:xfrm>
-              <a:off x="1487436" y="1427269"/>
-              <a:ext cx="161813" cy="163340"/>
-            </a:xfrm>
-            <a:prstGeom prst="star5">
-              <a:avLst/>
-            </a:prstGeom>
-            <a:solidFill>
-              <a:srgbClr val="F79646"/>
-            </a:solidFill>
-            <a:ln>
-              <a:noFill/>
-            </a:ln>
-          </p:spPr>
-          <p:style>
-            <a:lnRef idx="2">
-              <a:schemeClr val="accent1">
-                <a:shade val="50000"/>
-              </a:schemeClr>
-            </a:lnRef>
-            <a:fillRef idx="1">
-              <a:schemeClr val="accent1"/>
-            </a:fillRef>
-            <a:effectRef idx="0">
-              <a:schemeClr val="accent1"/>
-            </a:effectRef>
-            <a:fontRef idx="minor">
-              <a:schemeClr val="lt1"/>
-            </a:fontRef>
-          </p:style>
-          <p:txBody>
-            <a:bodyPr rtlCol="0" anchor="ctr"/>
-            <a:lstStyle/>
-            <a:p>
-              <a:pPr algn="ctr"/>
-              <a:endParaRPr lang="en-US"/>
-            </a:p>
-          </p:txBody>
-        </p:sp>
-      </p:grpSp>
-    </p:spTree>
-    <p:extLst>
-      <p:ext uri="{BB962C8B-B14F-4D97-AF65-F5344CB8AC3E}">
-        <p14:creationId xmlns:p14="http://schemas.microsoft.com/office/powerpoint/2010/main" val="3743516278"/>
-      </p:ext>
-    </p:extLst>
-  </p:cSld>
-  <p:clrMapOvr>
-    <a:masterClrMapping/>
-  </p:clrMapOvr>
-</p:sld>
-</file>
-
-<file path=ppt/slides/slide5.xml><?xml version="1.0" encoding="utf-8"?>
-<p:sld xmlns:a="http://schemas.openxmlformats.org/drawingml/2006/main" xmlns:r="http://schemas.openxmlformats.org/officeDocument/2006/relationships" xmlns:p="http://schemas.openxmlformats.org/presentationml/2006/main">
-  <p:cSld>
-    <p:spTree>
-      <p:nvGrpSpPr>
-        <p:cNvPr id="1" name=""/>
-        <p:cNvGrpSpPr/>
-        <p:nvPr/>
-      </p:nvGrpSpPr>
-      <p:grpSpPr>
-        <a:xfrm>
-          <a:off x="0" y="0"/>
-          <a:ext cx="0" cy="0"/>
-          <a:chOff x="0" y="0"/>
-          <a:chExt cx="0" cy="0"/>
-        </a:xfrm>
-      </p:grpSpPr>
-      <p:sp>
-        <p:nvSpPr>
-          <p:cNvPr id="116" name="TextBox 115"/>
-          <p:cNvSpPr txBox="1"/>
-          <p:nvPr/>
-        </p:nvSpPr>
-        <p:spPr>
-          <a:xfrm>
-            <a:off x="276082" y="304800"/>
-            <a:ext cx="1938215" cy="369332"/>
-          </a:xfrm>
-          <a:prstGeom prst="rect">
-            <a:avLst/>
-          </a:prstGeom>
-          <a:noFill/>
-        </p:spPr>
-        <p:txBody>
-          <a:bodyPr wrap="square" rtlCol="0">
-            <a:spAutoFit/>
-          </a:bodyPr>
-          <a:lstStyle/>
-          <a:p>
-            <a:r>
-              <a:rPr lang="en-US" dirty="0"/>
               <a:t>Agenda Lab</a:t>
             </a:r>
             <a:endParaRPr lang="en-SG" dirty="0"/>
@@ -18146,7 +15076,7 @@
 </p:sld>
 </file>
 
-<file path=ppt/slides/slide6.xml><?xml version="1.0" encoding="utf-8"?>
+<file path=ppt/slides/slide5.xml><?xml version="1.0" encoding="utf-8"?>
 <p:sld xmlns:a="http://schemas.openxmlformats.org/drawingml/2006/main" xmlns:r="http://schemas.openxmlformats.org/officeDocument/2006/relationships" xmlns:p="http://schemas.openxmlformats.org/presentationml/2006/main">
   <p:cSld>
     <p:spTree>
@@ -19010,7 +15940,7 @@
 </p:sld>
 </file>
 
-<file path=ppt/slides/slide7.xml><?xml version="1.0" encoding="utf-8"?>
+<file path=ppt/slides/slide6.xml><?xml version="1.0" encoding="utf-8"?>
 <p:sld xmlns:a="http://schemas.openxmlformats.org/drawingml/2006/main" xmlns:r="http://schemas.openxmlformats.org/officeDocument/2006/relationships" xmlns:p="http://schemas.openxmlformats.org/presentationml/2006/main">
   <p:cSld>
     <p:spTree>

</xml_diff>